<commit_message>
working on fig 4c
</commit_message>
<xml_diff>
--- a/output/plots/all_figs_with_legends.pptx
+++ b/output/plots/all_figs_with_legends.pptx
@@ -204,7 +204,7 @@
           <a:p>
             <a:fld id="{7FA21820-D199-4D82-91AF-C50B1D3B111A}" type="datetimeFigureOut">
               <a:rPr lang="en-US" smtClean="0"/>
-              <a:t>2/21/2017</a:t>
+              <a:t>3/1/2017</a:t>
             </a:fld>
             <a:endParaRPr lang="en-US"/>
           </a:p>
@@ -818,7 +818,7 @@
           <a:p>
             <a:fld id="{916B8C92-D5E3-4480-8685-D57BEE386DE2}" type="datetimeFigureOut">
               <a:rPr lang="en-US" smtClean="0"/>
-              <a:t>2/21/2017</a:t>
+              <a:t>3/1/2017</a:t>
             </a:fld>
             <a:endParaRPr lang="en-US"/>
           </a:p>
@@ -988,7 +988,7 @@
           <a:p>
             <a:fld id="{916B8C92-D5E3-4480-8685-D57BEE386DE2}" type="datetimeFigureOut">
               <a:rPr lang="en-US" smtClean="0"/>
-              <a:t>2/21/2017</a:t>
+              <a:t>3/1/2017</a:t>
             </a:fld>
             <a:endParaRPr lang="en-US"/>
           </a:p>
@@ -1168,7 +1168,7 @@
           <a:p>
             <a:fld id="{916B8C92-D5E3-4480-8685-D57BEE386DE2}" type="datetimeFigureOut">
               <a:rPr lang="en-US" smtClean="0"/>
-              <a:t>2/21/2017</a:t>
+              <a:t>3/1/2017</a:t>
             </a:fld>
             <a:endParaRPr lang="en-US"/>
           </a:p>
@@ -1338,7 +1338,7 @@
           <a:p>
             <a:fld id="{916B8C92-D5E3-4480-8685-D57BEE386DE2}" type="datetimeFigureOut">
               <a:rPr lang="en-US" smtClean="0"/>
-              <a:t>2/21/2017</a:t>
+              <a:t>3/1/2017</a:t>
             </a:fld>
             <a:endParaRPr lang="en-US"/>
           </a:p>
@@ -1584,7 +1584,7 @@
           <a:p>
             <a:fld id="{916B8C92-D5E3-4480-8685-D57BEE386DE2}" type="datetimeFigureOut">
               <a:rPr lang="en-US" smtClean="0"/>
-              <a:t>2/21/2017</a:t>
+              <a:t>3/1/2017</a:t>
             </a:fld>
             <a:endParaRPr lang="en-US"/>
           </a:p>
@@ -1816,7 +1816,7 @@
           <a:p>
             <a:fld id="{916B8C92-D5E3-4480-8685-D57BEE386DE2}" type="datetimeFigureOut">
               <a:rPr lang="en-US" smtClean="0"/>
-              <a:t>2/21/2017</a:t>
+              <a:t>3/1/2017</a:t>
             </a:fld>
             <a:endParaRPr lang="en-US"/>
           </a:p>
@@ -2183,7 +2183,7 @@
           <a:p>
             <a:fld id="{916B8C92-D5E3-4480-8685-D57BEE386DE2}" type="datetimeFigureOut">
               <a:rPr lang="en-US" smtClean="0"/>
-              <a:t>2/21/2017</a:t>
+              <a:t>3/1/2017</a:t>
             </a:fld>
             <a:endParaRPr lang="en-US"/>
           </a:p>
@@ -2301,7 +2301,7 @@
           <a:p>
             <a:fld id="{916B8C92-D5E3-4480-8685-D57BEE386DE2}" type="datetimeFigureOut">
               <a:rPr lang="en-US" smtClean="0"/>
-              <a:t>2/21/2017</a:t>
+              <a:t>3/1/2017</a:t>
             </a:fld>
             <a:endParaRPr lang="en-US"/>
           </a:p>
@@ -2396,7 +2396,7 @@
           <a:p>
             <a:fld id="{916B8C92-D5E3-4480-8685-D57BEE386DE2}" type="datetimeFigureOut">
               <a:rPr lang="en-US" smtClean="0"/>
-              <a:t>2/21/2017</a:t>
+              <a:t>3/1/2017</a:t>
             </a:fld>
             <a:endParaRPr lang="en-US"/>
           </a:p>
@@ -2673,7 +2673,7 @@
           <a:p>
             <a:fld id="{916B8C92-D5E3-4480-8685-D57BEE386DE2}" type="datetimeFigureOut">
               <a:rPr lang="en-US" smtClean="0"/>
-              <a:t>2/21/2017</a:t>
+              <a:t>3/1/2017</a:t>
             </a:fld>
             <a:endParaRPr lang="en-US"/>
           </a:p>
@@ -2926,7 +2926,7 @@
           <a:p>
             <a:fld id="{916B8C92-D5E3-4480-8685-D57BEE386DE2}" type="datetimeFigureOut">
               <a:rPr lang="en-US" smtClean="0"/>
-              <a:t>2/21/2017</a:t>
+              <a:t>3/1/2017</a:t>
             </a:fld>
             <a:endParaRPr lang="en-US"/>
           </a:p>
@@ -3139,7 +3139,7 @@
           <a:p>
             <a:fld id="{916B8C92-D5E3-4480-8685-D57BEE386DE2}" type="datetimeFigureOut">
               <a:rPr lang="en-US" smtClean="0"/>
-              <a:t>2/21/2017</a:t>
+              <a:t>3/1/2017</a:t>
             </a:fld>
             <a:endParaRPr lang="en-US"/>
           </a:p>
@@ -5182,29 +5182,6 @@
       </p:grpSpPr>
       <p:pic>
         <p:nvPicPr>
-          <p:cNvPr id="3" name="Picture 2"/>
-          <p:cNvPicPr>
-            <a:picLocks noChangeAspect="1"/>
-          </p:cNvPicPr>
-          <p:nvPr/>
-        </p:nvPicPr>
-        <p:blipFill rotWithShape="1">
-          <a:blip r:embed="rId2"/>
-          <a:srcRect l="18987" r="6611"/>
-          <a:stretch/>
-        </p:blipFill>
-        <p:spPr>
-          <a:xfrm>
-            <a:off x="7842741" y="5587284"/>
-            <a:ext cx="1301259" cy="1027853"/>
-          </a:xfrm>
-          <a:prstGeom prst="rect">
-            <a:avLst/>
-          </a:prstGeom>
-        </p:spPr>
-      </p:pic>
-      <p:pic>
-        <p:nvPicPr>
           <p:cNvPr id="5" name="Picture 4"/>
           <p:cNvPicPr>
             <a:picLocks noChangeAspect="1"/>
@@ -5212,7 +5189,7 @@
           <p:nvPr/>
         </p:nvPicPr>
         <p:blipFill>
-          <a:blip r:embed="rId3"/>
+          <a:blip r:embed="rId2"/>
           <a:stretch>
             <a:fillRect/>
           </a:stretch>
@@ -5278,7 +5255,7 @@
                 <p:nvPr/>
               </p:nvPicPr>
               <p:blipFill>
-                <a:blip r:embed="rId4" cstate="print">
+                <a:blip r:embed="rId3" cstate="print">
                   <a:extLst>
                     <a:ext uri="{28A0092B-C50C-407E-A947-70E740481C1C}">
                       <a14:useLocalDpi xmlns:a14="http://schemas.microsoft.com/office/drawing/2010/main" val="0"/>
@@ -5308,7 +5285,7 @@
                 <p:nvPr/>
               </p:nvPicPr>
               <p:blipFill>
-                <a:blip r:embed="rId5" cstate="print">
+                <a:blip r:embed="rId4" cstate="print">
                   <a:extLst>
                     <a:ext uri="{28A0092B-C50C-407E-A947-70E740481C1C}">
                       <a14:useLocalDpi xmlns:a14="http://schemas.microsoft.com/office/drawing/2010/main" val="0"/>
@@ -5338,7 +5315,7 @@
                 <p:nvPr/>
               </p:nvPicPr>
               <p:blipFill>
-                <a:blip r:embed="rId6" cstate="print">
+                <a:blip r:embed="rId5" cstate="print">
                   <a:extLst>
                     <a:ext uri="{28A0092B-C50C-407E-A947-70E740481C1C}">
                       <a14:useLocalDpi xmlns:a14="http://schemas.microsoft.com/office/drawing/2010/main" val="0"/>
@@ -5368,7 +5345,7 @@
                 <p:nvPr/>
               </p:nvPicPr>
               <p:blipFill>
-                <a:blip r:embed="rId7" cstate="print">
+                <a:blip r:embed="rId6" cstate="print">
                   <a:extLst>
                     <a:ext uri="{28A0092B-C50C-407E-A947-70E740481C1C}">
                       <a14:useLocalDpi xmlns:a14="http://schemas.microsoft.com/office/drawing/2010/main" val="0"/>
@@ -5399,7 +5376,7 @@
               <p:nvPr/>
             </p:nvPicPr>
             <p:blipFill>
-              <a:blip r:embed="rId8"/>
+              <a:blip r:embed="rId7"/>
               <a:stretch>
                 <a:fillRect/>
               </a:stretch>
@@ -5424,7 +5401,7 @@
             <p:nvPr/>
           </p:nvPicPr>
           <p:blipFill>
-            <a:blip r:embed="rId9"/>
+            <a:blip r:embed="rId8"/>
             <a:stretch>
               <a:fillRect/>
             </a:stretch>
@@ -5448,7 +5425,7 @@
             <p:nvPr/>
           </p:nvPicPr>
           <p:blipFill>
-            <a:blip r:embed="rId10"/>
+            <a:blip r:embed="rId9"/>
             <a:stretch>
               <a:fillRect/>
             </a:stretch>
@@ -5466,36 +5443,6 @@
       </p:grpSp>
       <p:sp>
         <p:nvSpPr>
-          <p:cNvPr id="4" name="TextBox 3"/>
-          <p:cNvSpPr txBox="1"/>
-          <p:nvPr/>
-        </p:nvSpPr>
-        <p:spPr>
-          <a:xfrm>
-            <a:off x="8120918" y="4290856"/>
-            <a:ext cx="2697480" cy="369332"/>
-          </a:xfrm>
-          <a:prstGeom prst="rect">
-            <a:avLst/>
-          </a:prstGeom>
-          <a:noFill/>
-        </p:spPr>
-        <p:txBody>
-          <a:bodyPr wrap="square" rtlCol="0">
-            <a:spAutoFit/>
-          </a:bodyPr>
-          <a:lstStyle/>
-          <a:p>
-            <a:r>
-              <a:rPr lang="en-US" dirty="0" smtClean="0"/>
-              <a:t>Check colors, grid print?</a:t>
-            </a:r>
-            <a:endParaRPr lang="en-US" dirty="0"/>
-          </a:p>
-        </p:txBody>
-      </p:sp>
-      <p:sp>
-        <p:nvSpPr>
           <p:cNvPr id="17" name="TextBox 16"/>
           <p:cNvSpPr txBox="1"/>
           <p:nvPr/>
@@ -5525,46 +5472,22 @@
       </p:sp>
       <p:pic>
         <p:nvPicPr>
-          <p:cNvPr id="6" name="Picture 5"/>
+          <p:cNvPr id="18" name="Picture 17"/>
           <p:cNvPicPr>
             <a:picLocks noChangeAspect="1"/>
           </p:cNvPicPr>
           <p:nvPr/>
         </p:nvPicPr>
         <p:blipFill>
-          <a:blip r:embed="rId11"/>
+          <a:blip r:embed="rId10"/>
           <a:stretch>
             <a:fillRect/>
           </a:stretch>
         </p:blipFill>
         <p:spPr>
           <a:xfrm>
-            <a:off x="9144000" y="5587284"/>
-            <a:ext cx="1866310" cy="1109773"/>
-          </a:xfrm>
-          <a:prstGeom prst="rect">
-            <a:avLst/>
-          </a:prstGeom>
-        </p:spPr>
-      </p:pic>
-      <p:pic>
-        <p:nvPicPr>
-          <p:cNvPr id="2" name="Picture 1"/>
-          <p:cNvPicPr>
-            <a:picLocks noChangeAspect="1"/>
-          </p:cNvPicPr>
-          <p:nvPr/>
-        </p:nvPicPr>
-        <p:blipFill>
-          <a:blip r:embed="rId12"/>
-          <a:stretch>
-            <a:fillRect/>
-          </a:stretch>
-        </p:blipFill>
-        <p:spPr>
-          <a:xfrm>
-            <a:off x="7385722" y="193318"/>
-            <a:ext cx="3851348" cy="5067563"/>
+            <a:off x="7121266" y="193318"/>
+            <a:ext cx="4476535" cy="6247158"/>
           </a:xfrm>
           <a:prstGeom prst="rect">
             <a:avLst/>
@@ -5640,11 +5563,7 @@
             </a:r>
             <a:r>
               <a:rPr lang="en-US" dirty="0" smtClean="0"/>
-              <a:t>log of </a:t>
-            </a:r>
-            <a:r>
-              <a:rPr lang="en-US" dirty="0" smtClean="0"/>
-              <a:t>area, colored </a:t>
+              <a:t>log of area, colored </a:t>
             </a:r>
             <a:r>
               <a:rPr lang="en-US" dirty="0"/>
@@ -5663,7 +5582,7 @@
       </p:sp>
       <p:pic>
         <p:nvPicPr>
-          <p:cNvPr id="5" name="Picture 4"/>
+          <p:cNvPr id="2" name="Picture 1"/>
           <p:cNvPicPr>
             <a:picLocks noChangeAspect="1"/>
           </p:cNvPicPr>
@@ -5677,8 +5596,8 @@
         </p:blipFill>
         <p:spPr>
           <a:xfrm>
-            <a:off x="2259624" y="270644"/>
-            <a:ext cx="6122375" cy="4807197"/>
+            <a:off x="2075688" y="134914"/>
+            <a:ext cx="6142199" cy="4780304"/>
           </a:xfrm>
           <a:prstGeom prst="rect">
             <a:avLst/>
@@ -5803,9 +5722,38 @@
           </a:prstGeom>
         </p:spPr>
       </p:pic>
+      <p:sp>
+        <p:nvSpPr>
+          <p:cNvPr id="4" name="TextBox 3"/>
+          <p:cNvSpPr txBox="1"/>
+          <p:nvPr/>
+        </p:nvSpPr>
+        <p:spPr>
+          <a:xfrm>
+            <a:off x="8765931" y="1757124"/>
+            <a:ext cx="1761764" cy="369332"/>
+          </a:xfrm>
+          <a:prstGeom prst="rect">
+            <a:avLst/>
+          </a:prstGeom>
+          <a:noFill/>
+        </p:spPr>
+        <p:txBody>
+          <a:bodyPr wrap="none" rtlCol="0">
+            <a:spAutoFit/>
+          </a:bodyPr>
+          <a:lstStyle/>
+          <a:p>
+            <a:r>
+              <a:rPr lang="en-US" dirty="0" smtClean="0"/>
+              <a:t>Count data ONLY</a:t>
+            </a:r>
+          </a:p>
+        </p:txBody>
+      </p:sp>
       <p:pic>
         <p:nvPicPr>
-          <p:cNvPr id="3" name="Picture 2"/>
+          <p:cNvPr id="5" name="Picture 4"/>
           <p:cNvPicPr>
             <a:picLocks noChangeAspect="1"/>
           </p:cNvPicPr>
@@ -5819,44 +5767,14 @@
         </p:blipFill>
         <p:spPr>
           <a:xfrm>
-            <a:off x="2942406" y="95166"/>
-            <a:ext cx="5300236" cy="4252913"/>
+            <a:off x="2523744" y="129172"/>
+            <a:ext cx="5449824" cy="4218907"/>
           </a:xfrm>
           <a:prstGeom prst="rect">
             <a:avLst/>
           </a:prstGeom>
         </p:spPr>
       </p:pic>
-      <p:sp>
-        <p:nvSpPr>
-          <p:cNvPr id="4" name="TextBox 3"/>
-          <p:cNvSpPr txBox="1"/>
-          <p:nvPr/>
-        </p:nvSpPr>
-        <p:spPr>
-          <a:xfrm>
-            <a:off x="8765931" y="1757124"/>
-            <a:ext cx="2106154" cy="369332"/>
-          </a:xfrm>
-          <a:prstGeom prst="rect">
-            <a:avLst/>
-          </a:prstGeom>
-          <a:noFill/>
-        </p:spPr>
-        <p:txBody>
-          <a:bodyPr wrap="none" rtlCol="0">
-            <a:spAutoFit/>
-          </a:bodyPr>
-          <a:lstStyle/>
-          <a:p>
-            <a:r>
-              <a:rPr lang="en-US" dirty="0" smtClean="0"/>
-              <a:t>Count data removed</a:t>
-            </a:r>
-            <a:endParaRPr lang="en-US" dirty="0"/>
-          </a:p>
-        </p:txBody>
-      </p:sp>
     </p:spTree>
     <p:extLst>
       <p:ext uri="{BB962C8B-B14F-4D97-AF65-F5344CB8AC3E}">
@@ -5887,6 +5805,29 @@
           <a:chExt cx="0" cy="0"/>
         </a:xfrm>
       </p:grpSpPr>
+      <p:pic>
+        <p:nvPicPr>
+          <p:cNvPr id="2" name="Picture 1"/>
+          <p:cNvPicPr>
+            <a:picLocks noChangeAspect="1"/>
+          </p:cNvPicPr>
+          <p:nvPr/>
+        </p:nvPicPr>
+        <p:blipFill rotWithShape="1">
+          <a:blip r:embed="rId2"/>
+          <a:srcRect b="12443"/>
+          <a:stretch/>
+        </p:blipFill>
+        <p:spPr>
+          <a:xfrm>
+            <a:off x="1952223" y="390061"/>
+            <a:ext cx="5336599" cy="3079154"/>
+          </a:xfrm>
+          <a:prstGeom prst="rect">
+            <a:avLst/>
+          </a:prstGeom>
+        </p:spPr>
+      </p:pic>
       <p:sp>
         <p:nvSpPr>
           <p:cNvPr id="6" name="Rectangle 5"/>
@@ -5916,30 +5857,6 @@
           </a:p>
         </p:txBody>
       </p:sp>
-      <p:pic>
-        <p:nvPicPr>
-          <p:cNvPr id="3" name="Picture 2"/>
-          <p:cNvPicPr>
-            <a:picLocks noChangeAspect="1"/>
-          </p:cNvPicPr>
-          <p:nvPr/>
-        </p:nvPicPr>
-        <p:blipFill>
-          <a:blip r:embed="rId2"/>
-          <a:stretch>
-            <a:fillRect/>
-          </a:stretch>
-        </p:blipFill>
-        <p:spPr>
-          <a:xfrm>
-            <a:off x="1733908" y="687208"/>
-            <a:ext cx="4962133" cy="2956810"/>
-          </a:xfrm>
-          <a:prstGeom prst="rect">
-            <a:avLst/>
-          </a:prstGeom>
-        </p:spPr>
-      </p:pic>
       <p:grpSp>
         <p:nvGrpSpPr>
           <p:cNvPr id="7" name="Group 6"/>
@@ -5948,10 +5865,10 @@
         </p:nvGrpSpPr>
         <p:grpSpPr>
           <a:xfrm>
-            <a:off x="2170360" y="3447174"/>
-            <a:ext cx="4293483" cy="377620"/>
-            <a:chOff x="4076090" y="5589042"/>
-            <a:chExt cx="2768069" cy="243042"/>
+            <a:off x="2406580" y="3343650"/>
+            <a:ext cx="4744647" cy="431854"/>
+            <a:chOff x="4122147" y="5589042"/>
+            <a:chExt cx="2631740" cy="243042"/>
           </a:xfrm>
         </p:grpSpPr>
         <p:grpSp>
@@ -5962,10 +5879,10 @@
           </p:nvGrpSpPr>
           <p:grpSpPr>
             <a:xfrm>
-              <a:off x="4076090" y="5589042"/>
-              <a:ext cx="2768069" cy="243042"/>
-              <a:chOff x="4242089" y="5589042"/>
-              <a:chExt cx="2768069" cy="243042"/>
+              <a:off x="4122147" y="5589042"/>
+              <a:ext cx="2631740" cy="243042"/>
+              <a:chOff x="4288146" y="5589042"/>
+              <a:chExt cx="2631740" cy="243042"/>
             </a:xfrm>
           </p:grpSpPr>
           <p:pic>
@@ -6050,7 +5967,7 @@
             </p:blipFill>
             <p:spPr>
               <a:xfrm>
-                <a:off x="4242089" y="5589042"/>
+                <a:off x="4288146" y="5589042"/>
                 <a:ext cx="274386" cy="225596"/>
               </a:xfrm>
               <a:prstGeom prst="rect">
@@ -6080,7 +5997,7 @@
             </p:blipFill>
             <p:spPr>
               <a:xfrm flipH="1">
-                <a:off x="6754369" y="5606488"/>
+                <a:off x="6664097" y="5596143"/>
                 <a:ext cx="255789" cy="218495"/>
               </a:xfrm>
               <a:prstGeom prst="rect">
@@ -6105,7 +6022,7 @@
           </p:blipFill>
           <p:spPr>
             <a:xfrm>
-              <a:off x="5531841" y="5598294"/>
+              <a:off x="5472766" y="5596143"/>
               <a:ext cx="334903" cy="198223"/>
             </a:xfrm>
             <a:prstGeom prst="rect">
@@ -6129,7 +6046,7 @@
           </p:blipFill>
           <p:spPr>
             <a:xfrm>
-              <a:off x="6038358" y="5603347"/>
+              <a:off x="5965563" y="5603347"/>
               <a:ext cx="327300" cy="196986"/>
             </a:xfrm>
             <a:prstGeom prst="rect">

</xml_diff>

<commit_message>
reran grain analysis after fixing dataSubsetFun
</commit_message>
<xml_diff>
--- a/output/plots/all_figs_with_legends.pptx
+++ b/output/plots/all_figs_with_legends.pptx
@@ -204,7 +204,7 @@
           <a:p>
             <a:fld id="{7FA21820-D199-4D82-91AF-C50B1D3B111A}" type="datetimeFigureOut">
               <a:rPr lang="en-US" smtClean="0"/>
-              <a:t>3/1/2017</a:t>
+              <a:t>3/10/2017</a:t>
             </a:fld>
             <a:endParaRPr lang="en-US"/>
           </a:p>
@@ -818,7 +818,7 @@
           <a:p>
             <a:fld id="{916B8C92-D5E3-4480-8685-D57BEE386DE2}" type="datetimeFigureOut">
               <a:rPr lang="en-US" smtClean="0"/>
-              <a:t>3/1/2017</a:t>
+              <a:t>3/10/2017</a:t>
             </a:fld>
             <a:endParaRPr lang="en-US"/>
           </a:p>
@@ -988,7 +988,7 @@
           <a:p>
             <a:fld id="{916B8C92-D5E3-4480-8685-D57BEE386DE2}" type="datetimeFigureOut">
               <a:rPr lang="en-US" smtClean="0"/>
-              <a:t>3/1/2017</a:t>
+              <a:t>3/10/2017</a:t>
             </a:fld>
             <a:endParaRPr lang="en-US"/>
           </a:p>
@@ -1168,7 +1168,7 @@
           <a:p>
             <a:fld id="{916B8C92-D5E3-4480-8685-D57BEE386DE2}" type="datetimeFigureOut">
               <a:rPr lang="en-US" smtClean="0"/>
-              <a:t>3/1/2017</a:t>
+              <a:t>3/10/2017</a:t>
             </a:fld>
             <a:endParaRPr lang="en-US"/>
           </a:p>
@@ -1338,7 +1338,7 @@
           <a:p>
             <a:fld id="{916B8C92-D5E3-4480-8685-D57BEE386DE2}" type="datetimeFigureOut">
               <a:rPr lang="en-US" smtClean="0"/>
-              <a:t>3/1/2017</a:t>
+              <a:t>3/10/2017</a:t>
             </a:fld>
             <a:endParaRPr lang="en-US"/>
           </a:p>
@@ -1584,7 +1584,7 @@
           <a:p>
             <a:fld id="{916B8C92-D5E3-4480-8685-D57BEE386DE2}" type="datetimeFigureOut">
               <a:rPr lang="en-US" smtClean="0"/>
-              <a:t>3/1/2017</a:t>
+              <a:t>3/10/2017</a:t>
             </a:fld>
             <a:endParaRPr lang="en-US"/>
           </a:p>
@@ -1816,7 +1816,7 @@
           <a:p>
             <a:fld id="{916B8C92-D5E3-4480-8685-D57BEE386DE2}" type="datetimeFigureOut">
               <a:rPr lang="en-US" smtClean="0"/>
-              <a:t>3/1/2017</a:t>
+              <a:t>3/10/2017</a:t>
             </a:fld>
             <a:endParaRPr lang="en-US"/>
           </a:p>
@@ -2183,7 +2183,7 @@
           <a:p>
             <a:fld id="{916B8C92-D5E3-4480-8685-D57BEE386DE2}" type="datetimeFigureOut">
               <a:rPr lang="en-US" smtClean="0"/>
-              <a:t>3/1/2017</a:t>
+              <a:t>3/10/2017</a:t>
             </a:fld>
             <a:endParaRPr lang="en-US"/>
           </a:p>
@@ -2301,7 +2301,7 @@
           <a:p>
             <a:fld id="{916B8C92-D5E3-4480-8685-D57BEE386DE2}" type="datetimeFigureOut">
               <a:rPr lang="en-US" smtClean="0"/>
-              <a:t>3/1/2017</a:t>
+              <a:t>3/10/2017</a:t>
             </a:fld>
             <a:endParaRPr lang="en-US"/>
           </a:p>
@@ -2396,7 +2396,7 @@
           <a:p>
             <a:fld id="{916B8C92-D5E3-4480-8685-D57BEE386DE2}" type="datetimeFigureOut">
               <a:rPr lang="en-US" smtClean="0"/>
-              <a:t>3/1/2017</a:t>
+              <a:t>3/10/2017</a:t>
             </a:fld>
             <a:endParaRPr lang="en-US"/>
           </a:p>
@@ -2673,7 +2673,7 @@
           <a:p>
             <a:fld id="{916B8C92-D5E3-4480-8685-D57BEE386DE2}" type="datetimeFigureOut">
               <a:rPr lang="en-US" smtClean="0"/>
-              <a:t>3/1/2017</a:t>
+              <a:t>3/10/2017</a:t>
             </a:fld>
             <a:endParaRPr lang="en-US"/>
           </a:p>
@@ -2926,7 +2926,7 @@
           <a:p>
             <a:fld id="{916B8C92-D5E3-4480-8685-D57BEE386DE2}" type="datetimeFigureOut">
               <a:rPr lang="en-US" smtClean="0"/>
-              <a:t>3/1/2017</a:t>
+              <a:t>3/10/2017</a:t>
             </a:fld>
             <a:endParaRPr lang="en-US"/>
           </a:p>
@@ -3139,7 +3139,7 @@
           <a:p>
             <a:fld id="{916B8C92-D5E3-4480-8685-D57BEE386DE2}" type="datetimeFigureOut">
               <a:rPr lang="en-US" smtClean="0"/>
-              <a:t>3/1/2017</a:t>
+              <a:t>3/10/2017</a:t>
             </a:fld>
             <a:endParaRPr lang="en-US"/>
           </a:p>
@@ -5150,6 +5150,36 @@
           </p:spPr>
         </p:pic>
       </p:grpSp>
+      <p:sp>
+        <p:nvSpPr>
+          <p:cNvPr id="10" name="TextBox 9"/>
+          <p:cNvSpPr txBox="1"/>
+          <p:nvPr/>
+        </p:nvSpPr>
+        <p:spPr>
+          <a:xfrm>
+            <a:off x="7948246" y="936260"/>
+            <a:ext cx="2391508" cy="369332"/>
+          </a:xfrm>
+          <a:prstGeom prst="rect">
+            <a:avLst/>
+          </a:prstGeom>
+          <a:noFill/>
+        </p:spPr>
+        <p:txBody>
+          <a:bodyPr wrap="square" rtlCol="0">
+            <a:spAutoFit/>
+          </a:bodyPr>
+          <a:lstStyle/>
+          <a:p>
+            <a:r>
+              <a:rPr lang="en-US" dirty="0" smtClean="0"/>
+              <a:t>Need to order better</a:t>
+            </a:r>
+            <a:endParaRPr lang="en-US" dirty="0"/>
+          </a:p>
+        </p:txBody>
+      </p:sp>
     </p:spTree>
     <p:extLst>
       <p:ext uri="{BB962C8B-B14F-4D97-AF65-F5344CB8AC3E}">
@@ -6132,25 +6162,30 @@
           </a:p>
         </p:txBody>
       </p:sp>
-      <p:sp>
-        <p:nvSpPr>
-          <p:cNvPr id="3" name="Content Placeholder 2"/>
-          <p:cNvSpPr>
-            <a:spLocks noGrp="1"/>
-          </p:cNvSpPr>
-          <p:nvPr>
-            <p:ph idx="1"/>
-          </p:nvPr>
-        </p:nvSpPr>
-        <p:spPr/>
-        <p:txBody>
-          <a:bodyPr/>
-          <a:lstStyle/>
-          <a:p>
-            <a:endParaRPr lang="en-US"/>
-          </a:p>
-        </p:txBody>
-      </p:sp>
+      <p:pic>
+        <p:nvPicPr>
+          <p:cNvPr id="4" name="Picture 3"/>
+          <p:cNvPicPr>
+            <a:picLocks noChangeAspect="1"/>
+          </p:cNvPicPr>
+          <p:nvPr/>
+        </p:nvPicPr>
+        <p:blipFill>
+          <a:blip r:embed="rId2"/>
+          <a:stretch>
+            <a:fillRect/>
+          </a:stretch>
+        </p:blipFill>
+        <p:spPr>
+          <a:xfrm>
+            <a:off x="3894992" y="744625"/>
+            <a:ext cx="7063154" cy="4717817"/>
+          </a:xfrm>
+          <a:prstGeom prst="rect">
+            <a:avLst/>
+          </a:prstGeom>
+        </p:spPr>
+      </p:pic>
     </p:spTree>
     <p:extLst>
       <p:ext uri="{BB962C8B-B14F-4D97-AF65-F5344CB8AC3E}">

</xml_diff>

<commit_message>
working on fig 4b richness
</commit_message>
<xml_diff>
--- a/output/plots/all_figs_with_legends.pptx
+++ b/output/plots/all_figs_with_legends.pptx
@@ -204,7 +204,7 @@
           <a:p>
             <a:fld id="{7FA21820-D199-4D82-91AF-C50B1D3B111A}" type="datetimeFigureOut">
               <a:rPr lang="en-US" smtClean="0"/>
-              <a:t>3/10/2017</a:t>
+              <a:t>3/14/2017</a:t>
             </a:fld>
             <a:endParaRPr lang="en-US"/>
           </a:p>
@@ -818,7 +818,7 @@
           <a:p>
             <a:fld id="{916B8C92-D5E3-4480-8685-D57BEE386DE2}" type="datetimeFigureOut">
               <a:rPr lang="en-US" smtClean="0"/>
-              <a:t>3/10/2017</a:t>
+              <a:t>3/14/2017</a:t>
             </a:fld>
             <a:endParaRPr lang="en-US"/>
           </a:p>
@@ -988,7 +988,7 @@
           <a:p>
             <a:fld id="{916B8C92-D5E3-4480-8685-D57BEE386DE2}" type="datetimeFigureOut">
               <a:rPr lang="en-US" smtClean="0"/>
-              <a:t>3/10/2017</a:t>
+              <a:t>3/14/2017</a:t>
             </a:fld>
             <a:endParaRPr lang="en-US"/>
           </a:p>
@@ -1168,7 +1168,7 @@
           <a:p>
             <a:fld id="{916B8C92-D5E3-4480-8685-D57BEE386DE2}" type="datetimeFigureOut">
               <a:rPr lang="en-US" smtClean="0"/>
-              <a:t>3/10/2017</a:t>
+              <a:t>3/14/2017</a:t>
             </a:fld>
             <a:endParaRPr lang="en-US"/>
           </a:p>
@@ -1338,7 +1338,7 @@
           <a:p>
             <a:fld id="{916B8C92-D5E3-4480-8685-D57BEE386DE2}" type="datetimeFigureOut">
               <a:rPr lang="en-US" smtClean="0"/>
-              <a:t>3/10/2017</a:t>
+              <a:t>3/14/2017</a:t>
             </a:fld>
             <a:endParaRPr lang="en-US"/>
           </a:p>
@@ -1584,7 +1584,7 @@
           <a:p>
             <a:fld id="{916B8C92-D5E3-4480-8685-D57BEE386DE2}" type="datetimeFigureOut">
               <a:rPr lang="en-US" smtClean="0"/>
-              <a:t>3/10/2017</a:t>
+              <a:t>3/14/2017</a:t>
             </a:fld>
             <a:endParaRPr lang="en-US"/>
           </a:p>
@@ -1816,7 +1816,7 @@
           <a:p>
             <a:fld id="{916B8C92-D5E3-4480-8685-D57BEE386DE2}" type="datetimeFigureOut">
               <a:rPr lang="en-US" smtClean="0"/>
-              <a:t>3/10/2017</a:t>
+              <a:t>3/14/2017</a:t>
             </a:fld>
             <a:endParaRPr lang="en-US"/>
           </a:p>
@@ -2183,7 +2183,7 @@
           <a:p>
             <a:fld id="{916B8C92-D5E3-4480-8685-D57BEE386DE2}" type="datetimeFigureOut">
               <a:rPr lang="en-US" smtClean="0"/>
-              <a:t>3/10/2017</a:t>
+              <a:t>3/14/2017</a:t>
             </a:fld>
             <a:endParaRPr lang="en-US"/>
           </a:p>
@@ -2301,7 +2301,7 @@
           <a:p>
             <a:fld id="{916B8C92-D5E3-4480-8685-D57BEE386DE2}" type="datetimeFigureOut">
               <a:rPr lang="en-US" smtClean="0"/>
-              <a:t>3/10/2017</a:t>
+              <a:t>3/14/2017</a:t>
             </a:fld>
             <a:endParaRPr lang="en-US"/>
           </a:p>
@@ -2396,7 +2396,7 @@
           <a:p>
             <a:fld id="{916B8C92-D5E3-4480-8685-D57BEE386DE2}" type="datetimeFigureOut">
               <a:rPr lang="en-US" smtClean="0"/>
-              <a:t>3/10/2017</a:t>
+              <a:t>3/14/2017</a:t>
             </a:fld>
             <a:endParaRPr lang="en-US"/>
           </a:p>
@@ -2673,7 +2673,7 @@
           <a:p>
             <a:fld id="{916B8C92-D5E3-4480-8685-D57BEE386DE2}" type="datetimeFigureOut">
               <a:rPr lang="en-US" smtClean="0"/>
-              <a:t>3/10/2017</a:t>
+              <a:t>3/14/2017</a:t>
             </a:fld>
             <a:endParaRPr lang="en-US"/>
           </a:p>
@@ -2926,7 +2926,7 @@
           <a:p>
             <a:fld id="{916B8C92-D5E3-4480-8685-D57BEE386DE2}" type="datetimeFigureOut">
               <a:rPr lang="en-US" smtClean="0"/>
-              <a:t>3/10/2017</a:t>
+              <a:t>3/14/2017</a:t>
             </a:fld>
             <a:endParaRPr lang="en-US"/>
           </a:p>
@@ -3139,7 +3139,7 @@
           <a:p>
             <a:fld id="{916B8C92-D5E3-4480-8685-D57BEE386DE2}" type="datetimeFigureOut">
               <a:rPr lang="en-US" smtClean="0"/>
-              <a:t>3/10/2017</a:t>
+              <a:t>3/14/2017</a:t>
             </a:fld>
             <a:endParaRPr lang="en-US"/>
           </a:p>
@@ -6139,32 +6139,9 @@
           <a:chExt cx="0" cy="0"/>
         </a:xfrm>
       </p:grpSpPr>
-      <p:sp>
-        <p:nvSpPr>
-          <p:cNvPr id="2" name="Title 1"/>
-          <p:cNvSpPr>
-            <a:spLocks noGrp="1"/>
-          </p:cNvSpPr>
-          <p:nvPr>
-            <p:ph type="title"/>
-          </p:nvPr>
-        </p:nvSpPr>
-        <p:spPr/>
-        <p:txBody>
-          <a:bodyPr/>
-          <a:lstStyle/>
-          <a:p>
-            <a:r>
-              <a:rPr lang="en-US" dirty="0" smtClean="0"/>
-              <a:t>Fig 4a – 4d</a:t>
-            </a:r>
-            <a:endParaRPr lang="en-US" dirty="0"/>
-          </a:p>
-        </p:txBody>
-      </p:sp>
       <p:pic>
         <p:nvPicPr>
-          <p:cNvPr id="4" name="Picture 3"/>
+          <p:cNvPr id="3" name="Picture 2"/>
           <p:cNvPicPr>
             <a:picLocks noChangeAspect="1"/>
           </p:cNvPicPr>
@@ -6178,8 +6155,56 @@
         </p:blipFill>
         <p:spPr>
           <a:xfrm>
-            <a:off x="3894992" y="744625"/>
-            <a:ext cx="7063154" cy="4717817"/>
+            <a:off x="5303519" y="3000077"/>
+            <a:ext cx="5044615" cy="3340094"/>
+          </a:xfrm>
+          <a:prstGeom prst="rect">
+            <a:avLst/>
+          </a:prstGeom>
+        </p:spPr>
+      </p:pic>
+      <p:pic>
+        <p:nvPicPr>
+          <p:cNvPr id="5" name="Picture 4"/>
+          <p:cNvPicPr>
+            <a:picLocks noChangeAspect="1"/>
+          </p:cNvPicPr>
+          <p:nvPr/>
+        </p:nvPicPr>
+        <p:blipFill>
+          <a:blip r:embed="rId3"/>
+          <a:stretch>
+            <a:fillRect/>
+          </a:stretch>
+        </p:blipFill>
+        <p:spPr>
+          <a:xfrm>
+            <a:off x="914399" y="3500634"/>
+            <a:ext cx="4192287" cy="2810995"/>
+          </a:xfrm>
+          <a:prstGeom prst="rect">
+            <a:avLst/>
+          </a:prstGeom>
+        </p:spPr>
+      </p:pic>
+      <p:pic>
+        <p:nvPicPr>
+          <p:cNvPr id="6" name="Picture 5"/>
+          <p:cNvPicPr>
+            <a:picLocks noChangeAspect="1"/>
+          </p:cNvPicPr>
+          <p:nvPr/>
+        </p:nvPicPr>
+        <p:blipFill>
+          <a:blip r:embed="rId4"/>
+          <a:stretch>
+            <a:fillRect/>
+          </a:stretch>
+        </p:blipFill>
+        <p:spPr>
+          <a:xfrm>
+            <a:off x="1106424" y="128913"/>
+            <a:ext cx="3410712" cy="2871164"/>
           </a:xfrm>
           <a:prstGeom prst="rect">
             <a:avLst/>

</xml_diff>

<commit_message>
got new 40 km radius data for elevation, ndvi still processing
</commit_message>
<xml_diff>
--- a/output/plots/all_figs_with_legends.pptx
+++ b/output/plots/all_figs_with_legends.pptx
@@ -204,7 +204,7 @@
           <a:p>
             <a:fld id="{7FA21820-D199-4D82-91AF-C50B1D3B111A}" type="datetimeFigureOut">
               <a:rPr lang="en-US" smtClean="0"/>
-              <a:t>3/14/2017</a:t>
+              <a:t>3/17/2017</a:t>
             </a:fld>
             <a:endParaRPr lang="en-US"/>
           </a:p>
@@ -818,7 +818,7 @@
           <a:p>
             <a:fld id="{916B8C92-D5E3-4480-8685-D57BEE386DE2}" type="datetimeFigureOut">
               <a:rPr lang="en-US" smtClean="0"/>
-              <a:t>3/14/2017</a:t>
+              <a:t>3/17/2017</a:t>
             </a:fld>
             <a:endParaRPr lang="en-US"/>
           </a:p>
@@ -988,7 +988,7 @@
           <a:p>
             <a:fld id="{916B8C92-D5E3-4480-8685-D57BEE386DE2}" type="datetimeFigureOut">
               <a:rPr lang="en-US" smtClean="0"/>
-              <a:t>3/14/2017</a:t>
+              <a:t>3/17/2017</a:t>
             </a:fld>
             <a:endParaRPr lang="en-US"/>
           </a:p>
@@ -1168,7 +1168,7 @@
           <a:p>
             <a:fld id="{916B8C92-D5E3-4480-8685-D57BEE386DE2}" type="datetimeFigureOut">
               <a:rPr lang="en-US" smtClean="0"/>
-              <a:t>3/14/2017</a:t>
+              <a:t>3/17/2017</a:t>
             </a:fld>
             <a:endParaRPr lang="en-US"/>
           </a:p>
@@ -1338,7 +1338,7 @@
           <a:p>
             <a:fld id="{916B8C92-D5E3-4480-8685-D57BEE386DE2}" type="datetimeFigureOut">
               <a:rPr lang="en-US" smtClean="0"/>
-              <a:t>3/14/2017</a:t>
+              <a:t>3/17/2017</a:t>
             </a:fld>
             <a:endParaRPr lang="en-US"/>
           </a:p>
@@ -1584,7 +1584,7 @@
           <a:p>
             <a:fld id="{916B8C92-D5E3-4480-8685-D57BEE386DE2}" type="datetimeFigureOut">
               <a:rPr lang="en-US" smtClean="0"/>
-              <a:t>3/14/2017</a:t>
+              <a:t>3/17/2017</a:t>
             </a:fld>
             <a:endParaRPr lang="en-US"/>
           </a:p>
@@ -1816,7 +1816,7 @@
           <a:p>
             <a:fld id="{916B8C92-D5E3-4480-8685-D57BEE386DE2}" type="datetimeFigureOut">
               <a:rPr lang="en-US" smtClean="0"/>
-              <a:t>3/14/2017</a:t>
+              <a:t>3/17/2017</a:t>
             </a:fld>
             <a:endParaRPr lang="en-US"/>
           </a:p>
@@ -2183,7 +2183,7 @@
           <a:p>
             <a:fld id="{916B8C92-D5E3-4480-8685-D57BEE386DE2}" type="datetimeFigureOut">
               <a:rPr lang="en-US" smtClean="0"/>
-              <a:t>3/14/2017</a:t>
+              <a:t>3/17/2017</a:t>
             </a:fld>
             <a:endParaRPr lang="en-US"/>
           </a:p>
@@ -2301,7 +2301,7 @@
           <a:p>
             <a:fld id="{916B8C92-D5E3-4480-8685-D57BEE386DE2}" type="datetimeFigureOut">
               <a:rPr lang="en-US" smtClean="0"/>
-              <a:t>3/14/2017</a:t>
+              <a:t>3/17/2017</a:t>
             </a:fld>
             <a:endParaRPr lang="en-US"/>
           </a:p>
@@ -2396,7 +2396,7 @@
           <a:p>
             <a:fld id="{916B8C92-D5E3-4480-8685-D57BEE386DE2}" type="datetimeFigureOut">
               <a:rPr lang="en-US" smtClean="0"/>
-              <a:t>3/14/2017</a:t>
+              <a:t>3/17/2017</a:t>
             </a:fld>
             <a:endParaRPr lang="en-US"/>
           </a:p>
@@ -2673,7 +2673,7 @@
           <a:p>
             <a:fld id="{916B8C92-D5E3-4480-8685-D57BEE386DE2}" type="datetimeFigureOut">
               <a:rPr lang="en-US" smtClean="0"/>
-              <a:t>3/14/2017</a:t>
+              <a:t>3/17/2017</a:t>
             </a:fld>
             <a:endParaRPr lang="en-US"/>
           </a:p>
@@ -2926,7 +2926,7 @@
           <a:p>
             <a:fld id="{916B8C92-D5E3-4480-8685-D57BEE386DE2}" type="datetimeFigureOut">
               <a:rPr lang="en-US" smtClean="0"/>
-              <a:t>3/14/2017</a:t>
+              <a:t>3/17/2017</a:t>
             </a:fld>
             <a:endParaRPr lang="en-US"/>
           </a:p>
@@ -3139,7 +3139,7 @@
           <a:p>
             <a:fld id="{916B8C92-D5E3-4480-8685-D57BEE386DE2}" type="datetimeFigureOut">
               <a:rPr lang="en-US" smtClean="0"/>
-              <a:t>3/14/2017</a:t>
+              <a:t>3/17/2017</a:t>
             </a:fld>
             <a:endParaRPr lang="en-US"/>
           </a:p>
@@ -5210,186 +5210,225 @@
           <a:chExt cx="0" cy="0"/>
         </a:xfrm>
       </p:grpSpPr>
-      <p:pic>
-        <p:nvPicPr>
-          <p:cNvPr id="5" name="Picture 4"/>
-          <p:cNvPicPr>
-            <a:picLocks noChangeAspect="1"/>
-          </p:cNvPicPr>
-          <p:nvPr/>
-        </p:nvPicPr>
-        <p:blipFill>
-          <a:blip r:embed="rId2"/>
-          <a:stretch>
-            <a:fillRect/>
-          </a:stretch>
-        </p:blipFill>
-        <p:spPr>
-          <a:xfrm>
-            <a:off x="383197" y="193318"/>
-            <a:ext cx="6496050" cy="4371975"/>
-          </a:xfrm>
-          <a:prstGeom prst="rect">
-            <a:avLst/>
-          </a:prstGeom>
-        </p:spPr>
-      </p:pic>
       <p:grpSp>
         <p:nvGrpSpPr>
-          <p:cNvPr id="7" name="Group 6"/>
+          <p:cNvPr id="2" name="Group 1"/>
           <p:cNvGrpSpPr/>
           <p:nvPr/>
         </p:nvGrpSpPr>
         <p:grpSpPr>
           <a:xfrm>
-            <a:off x="1484560" y="3929312"/>
-            <a:ext cx="5078346" cy="377620"/>
-            <a:chOff x="4076090" y="5589042"/>
-            <a:chExt cx="3274081" cy="243042"/>
+            <a:off x="383197" y="193318"/>
+            <a:ext cx="6496050" cy="4371975"/>
+            <a:chOff x="383197" y="193318"/>
+            <a:chExt cx="6496050" cy="4371975"/>
           </a:xfrm>
         </p:grpSpPr>
+        <p:pic>
+          <p:nvPicPr>
+            <p:cNvPr id="5" name="Picture 4"/>
+            <p:cNvPicPr>
+              <a:picLocks noChangeAspect="1"/>
+            </p:cNvPicPr>
+            <p:nvPr/>
+          </p:nvPicPr>
+          <p:blipFill>
+            <a:blip r:embed="rId2"/>
+            <a:stretch>
+              <a:fillRect/>
+            </a:stretch>
+          </p:blipFill>
+          <p:spPr>
+            <a:xfrm>
+              <a:off x="383197" y="193318"/>
+              <a:ext cx="6496050" cy="4371975"/>
+            </a:xfrm>
+            <a:prstGeom prst="rect">
+              <a:avLst/>
+            </a:prstGeom>
+          </p:spPr>
+        </p:pic>
         <p:grpSp>
           <p:nvGrpSpPr>
-            <p:cNvPr id="8" name="Group 7"/>
+            <p:cNvPr id="7" name="Group 6"/>
             <p:cNvGrpSpPr/>
             <p:nvPr/>
           </p:nvGrpSpPr>
           <p:grpSpPr>
             <a:xfrm>
-              <a:off x="4076090" y="5589042"/>
-              <a:ext cx="3274081" cy="243042"/>
+              <a:off x="1484560" y="3929312"/>
+              <a:ext cx="5078346" cy="377620"/>
               <a:chOff x="4076090" y="5589042"/>
               <a:chExt cx="3274081" cy="243042"/>
             </a:xfrm>
           </p:grpSpPr>
           <p:grpSp>
             <p:nvGrpSpPr>
-              <p:cNvPr id="11" name="Group 10"/>
+              <p:cNvPr id="8" name="Group 7"/>
               <p:cNvGrpSpPr/>
               <p:nvPr/>
             </p:nvGrpSpPr>
             <p:grpSpPr>
               <a:xfrm>
                 <a:off x="4076090" y="5589042"/>
-                <a:ext cx="2768069" cy="243042"/>
-                <a:chOff x="4242089" y="5589042"/>
-                <a:chExt cx="2768069" cy="243042"/>
+                <a:ext cx="3274081" cy="243042"/>
+                <a:chOff x="4076090" y="5589042"/>
+                <a:chExt cx="3274081" cy="243042"/>
               </a:xfrm>
             </p:grpSpPr>
+            <p:grpSp>
+              <p:nvGrpSpPr>
+                <p:cNvPr id="11" name="Group 10"/>
+                <p:cNvGrpSpPr/>
+                <p:nvPr/>
+              </p:nvGrpSpPr>
+              <p:grpSpPr>
+                <a:xfrm>
+                  <a:off x="4076090" y="5589042"/>
+                  <a:ext cx="2768069" cy="243042"/>
+                  <a:chOff x="4242089" y="5589042"/>
+                  <a:chExt cx="2768069" cy="243042"/>
+                </a:xfrm>
+              </p:grpSpPr>
+              <p:pic>
+                <p:nvPicPr>
+                  <p:cNvPr id="13" name="Picture 12"/>
+                  <p:cNvPicPr>
+                    <a:picLocks noChangeAspect="1"/>
+                  </p:cNvPicPr>
+                  <p:nvPr/>
+                </p:nvPicPr>
+                <p:blipFill>
+                  <a:blip r:embed="rId3" cstate="print">
+                    <a:extLst>
+                      <a:ext uri="{28A0092B-C50C-407E-A947-70E740481C1C}">
+                        <a14:useLocalDpi xmlns:a14="http://schemas.microsoft.com/office/drawing/2010/main" val="0"/>
+                      </a:ext>
+                    </a:extLst>
+                  </a:blip>
+                  <a:stretch>
+                    <a:fillRect/>
+                  </a:stretch>
+                </p:blipFill>
+                <p:spPr>
+                  <a:xfrm>
+                    <a:off x="4720426" y="5634952"/>
+                    <a:ext cx="325640" cy="161565"/>
+                  </a:xfrm>
+                  <a:prstGeom prst="rect">
+                    <a:avLst/>
+                  </a:prstGeom>
+                </p:spPr>
+              </p:pic>
+              <p:pic>
+                <p:nvPicPr>
+                  <p:cNvPr id="14" name="Picture 13"/>
+                  <p:cNvPicPr>
+                    <a:picLocks noChangeAspect="1"/>
+                  </p:cNvPicPr>
+                  <p:nvPr/>
+                </p:nvPicPr>
+                <p:blipFill>
+                  <a:blip r:embed="rId4" cstate="print">
+                    <a:extLst>
+                      <a:ext uri="{28A0092B-C50C-407E-A947-70E740481C1C}">
+                        <a14:useLocalDpi xmlns:a14="http://schemas.microsoft.com/office/drawing/2010/main" val="0"/>
+                      </a:ext>
+                    </a:extLst>
+                  </a:blip>
+                  <a:stretch>
+                    <a:fillRect/>
+                  </a:stretch>
+                </p:blipFill>
+                <p:spPr>
+                  <a:xfrm>
+                    <a:off x="5202099" y="5606488"/>
+                    <a:ext cx="280633" cy="225596"/>
+                  </a:xfrm>
+                  <a:prstGeom prst="rect">
+                    <a:avLst/>
+                  </a:prstGeom>
+                </p:spPr>
+              </p:pic>
+              <p:pic>
+                <p:nvPicPr>
+                  <p:cNvPr id="15" name="Picture 14"/>
+                  <p:cNvPicPr>
+                    <a:picLocks noChangeAspect="1"/>
+                  </p:cNvPicPr>
+                  <p:nvPr/>
+                </p:nvPicPr>
+                <p:blipFill>
+                  <a:blip r:embed="rId5" cstate="print">
+                    <a:extLst>
+                      <a:ext uri="{28A0092B-C50C-407E-A947-70E740481C1C}">
+                        <a14:useLocalDpi xmlns:a14="http://schemas.microsoft.com/office/drawing/2010/main" val="0"/>
+                      </a:ext>
+                    </a:extLst>
+                  </a:blip>
+                  <a:stretch>
+                    <a:fillRect/>
+                  </a:stretch>
+                </p:blipFill>
+                <p:spPr>
+                  <a:xfrm>
+                    <a:off x="4242089" y="5589042"/>
+                    <a:ext cx="274386" cy="225596"/>
+                  </a:xfrm>
+                  <a:prstGeom prst="rect">
+                    <a:avLst/>
+                  </a:prstGeom>
+                </p:spPr>
+              </p:pic>
+              <p:pic>
+                <p:nvPicPr>
+                  <p:cNvPr id="16" name="Picture 15"/>
+                  <p:cNvPicPr>
+                    <a:picLocks noChangeAspect="1"/>
+                  </p:cNvPicPr>
+                  <p:nvPr/>
+                </p:nvPicPr>
+                <p:blipFill>
+                  <a:blip r:embed="rId6" cstate="print">
+                    <a:extLst>
+                      <a:ext uri="{28A0092B-C50C-407E-A947-70E740481C1C}">
+                        <a14:useLocalDpi xmlns:a14="http://schemas.microsoft.com/office/drawing/2010/main" val="0"/>
+                      </a:ext>
+                    </a:extLst>
+                  </a:blip>
+                  <a:stretch>
+                    <a:fillRect/>
+                  </a:stretch>
+                </p:blipFill>
+                <p:spPr>
+                  <a:xfrm flipH="1">
+                    <a:off x="6754369" y="5606488"/>
+                    <a:ext cx="255789" cy="218495"/>
+                  </a:xfrm>
+                  <a:prstGeom prst="rect">
+                    <a:avLst/>
+                  </a:prstGeom>
+                </p:spPr>
+              </p:pic>
+            </p:grpSp>
             <p:pic>
               <p:nvPicPr>
-                <p:cNvPr id="13" name="Picture 12"/>
+                <p:cNvPr id="12" name="Picture 11"/>
                 <p:cNvPicPr>
                   <a:picLocks noChangeAspect="1"/>
                 </p:cNvPicPr>
                 <p:nvPr/>
               </p:nvPicPr>
               <p:blipFill>
-                <a:blip r:embed="rId3" cstate="print">
-                  <a:extLst>
-                    <a:ext uri="{28A0092B-C50C-407E-A947-70E740481C1C}">
-                      <a14:useLocalDpi xmlns:a14="http://schemas.microsoft.com/office/drawing/2010/main" val="0"/>
-                    </a:ext>
-                  </a:extLst>
-                </a:blip>
+                <a:blip r:embed="rId7"/>
                 <a:stretch>
                   <a:fillRect/>
                 </a:stretch>
               </p:blipFill>
               <p:spPr>
                 <a:xfrm>
-                  <a:off x="4720426" y="5634952"/>
-                  <a:ext cx="325640" cy="161565"/>
-                </a:xfrm>
-                <a:prstGeom prst="rect">
-                  <a:avLst/>
-                </a:prstGeom>
-              </p:spPr>
-            </p:pic>
-            <p:pic>
-              <p:nvPicPr>
-                <p:cNvPr id="14" name="Picture 13"/>
-                <p:cNvPicPr>
-                  <a:picLocks noChangeAspect="1"/>
-                </p:cNvPicPr>
-                <p:nvPr/>
-              </p:nvPicPr>
-              <p:blipFill>
-                <a:blip r:embed="rId4" cstate="print">
-                  <a:extLst>
-                    <a:ext uri="{28A0092B-C50C-407E-A947-70E740481C1C}">
-                      <a14:useLocalDpi xmlns:a14="http://schemas.microsoft.com/office/drawing/2010/main" val="0"/>
-                    </a:ext>
-                  </a:extLst>
-                </a:blip>
-                <a:stretch>
-                  <a:fillRect/>
-                </a:stretch>
-              </p:blipFill>
-              <p:spPr>
-                <a:xfrm>
-                  <a:off x="5202099" y="5606488"/>
-                  <a:ext cx="280633" cy="225596"/>
-                </a:xfrm>
-                <a:prstGeom prst="rect">
-                  <a:avLst/>
-                </a:prstGeom>
-              </p:spPr>
-            </p:pic>
-            <p:pic>
-              <p:nvPicPr>
-                <p:cNvPr id="15" name="Picture 14"/>
-                <p:cNvPicPr>
-                  <a:picLocks noChangeAspect="1"/>
-                </p:cNvPicPr>
-                <p:nvPr/>
-              </p:nvPicPr>
-              <p:blipFill>
-                <a:blip r:embed="rId5" cstate="print">
-                  <a:extLst>
-                    <a:ext uri="{28A0092B-C50C-407E-A947-70E740481C1C}">
-                      <a14:useLocalDpi xmlns:a14="http://schemas.microsoft.com/office/drawing/2010/main" val="0"/>
-                    </a:ext>
-                  </a:extLst>
-                </a:blip>
-                <a:stretch>
-                  <a:fillRect/>
-                </a:stretch>
-              </p:blipFill>
-              <p:spPr>
-                <a:xfrm>
-                  <a:off x="4242089" y="5589042"/>
-                  <a:ext cx="274386" cy="225596"/>
-                </a:xfrm>
-                <a:prstGeom prst="rect">
-                  <a:avLst/>
-                </a:prstGeom>
-              </p:spPr>
-            </p:pic>
-            <p:pic>
-              <p:nvPicPr>
-                <p:cNvPr id="16" name="Picture 15"/>
-                <p:cNvPicPr>
-                  <a:picLocks noChangeAspect="1"/>
-                </p:cNvPicPr>
-                <p:nvPr/>
-              </p:nvPicPr>
-              <p:blipFill>
-                <a:blip r:embed="rId6" cstate="print">
-                  <a:extLst>
-                    <a:ext uri="{28A0092B-C50C-407E-A947-70E740481C1C}">
-                      <a14:useLocalDpi xmlns:a14="http://schemas.microsoft.com/office/drawing/2010/main" val="0"/>
-                    </a:ext>
-                  </a:extLst>
-                </a:blip>
-                <a:stretch>
-                  <a:fillRect/>
-                </a:stretch>
-              </p:blipFill>
-              <p:spPr>
-                <a:xfrm flipH="1">
-                  <a:off x="6754369" y="5606488"/>
-                  <a:ext cx="255789" cy="218495"/>
+                  <a:off x="7048110" y="5589042"/>
+                  <a:ext cx="302061" cy="235941"/>
                 </a:xfrm>
                 <a:prstGeom prst="rect">
                   <a:avLst/>
@@ -5399,22 +5438,46 @@
           </p:grpSp>
           <p:pic>
             <p:nvPicPr>
-              <p:cNvPr id="12" name="Picture 11"/>
+              <p:cNvPr id="9" name="Picture 8"/>
               <p:cNvPicPr>
                 <a:picLocks noChangeAspect="1"/>
               </p:cNvPicPr>
               <p:nvPr/>
             </p:nvPicPr>
             <p:blipFill>
-              <a:blip r:embed="rId7"/>
+              <a:blip r:embed="rId8"/>
               <a:stretch>
                 <a:fillRect/>
               </a:stretch>
             </p:blipFill>
             <p:spPr>
               <a:xfrm>
-                <a:off x="7048110" y="5589042"/>
-                <a:ext cx="302061" cy="235941"/>
+                <a:off x="5531841" y="5598294"/>
+                <a:ext cx="334903" cy="198223"/>
+              </a:xfrm>
+              <a:prstGeom prst="rect">
+                <a:avLst/>
+              </a:prstGeom>
+            </p:spPr>
+          </p:pic>
+          <p:pic>
+            <p:nvPicPr>
+              <p:cNvPr id="10" name="Picture 9"/>
+              <p:cNvPicPr>
+                <a:picLocks noChangeAspect="1"/>
+              </p:cNvPicPr>
+              <p:nvPr/>
+            </p:nvPicPr>
+            <p:blipFill>
+              <a:blip r:embed="rId9"/>
+              <a:stretch>
+                <a:fillRect/>
+              </a:stretch>
+            </p:blipFill>
+            <p:spPr>
+              <a:xfrm>
+                <a:off x="6038358" y="5603347"/>
+                <a:ext cx="327300" cy="196986"/>
               </a:xfrm>
               <a:prstGeom prst="rect">
                 <a:avLst/>
@@ -5422,54 +5485,6 @@
             </p:spPr>
           </p:pic>
         </p:grpSp>
-        <p:pic>
-          <p:nvPicPr>
-            <p:cNvPr id="9" name="Picture 8"/>
-            <p:cNvPicPr>
-              <a:picLocks noChangeAspect="1"/>
-            </p:cNvPicPr>
-            <p:nvPr/>
-          </p:nvPicPr>
-          <p:blipFill>
-            <a:blip r:embed="rId8"/>
-            <a:stretch>
-              <a:fillRect/>
-            </a:stretch>
-          </p:blipFill>
-          <p:spPr>
-            <a:xfrm>
-              <a:off x="5531841" y="5598294"/>
-              <a:ext cx="334903" cy="198223"/>
-            </a:xfrm>
-            <a:prstGeom prst="rect">
-              <a:avLst/>
-            </a:prstGeom>
-          </p:spPr>
-        </p:pic>
-        <p:pic>
-          <p:nvPicPr>
-            <p:cNvPr id="10" name="Picture 9"/>
-            <p:cNvPicPr>
-              <a:picLocks noChangeAspect="1"/>
-            </p:cNvPicPr>
-            <p:nvPr/>
-          </p:nvPicPr>
-          <p:blipFill>
-            <a:blip r:embed="rId9"/>
-            <a:stretch>
-              <a:fillRect/>
-            </a:stretch>
-          </p:blipFill>
-          <p:spPr>
-            <a:xfrm>
-              <a:off x="6038358" y="5603347"/>
-              <a:ext cx="327300" cy="196986"/>
-            </a:xfrm>
-            <a:prstGeom prst="rect">
-              <a:avLst/>
-            </a:prstGeom>
-          </p:spPr>
-        </p:pic>
       </p:grpSp>
       <p:sp>
         <p:nvSpPr>
@@ -5835,29 +5850,6 @@
           <a:chExt cx="0" cy="0"/>
         </a:xfrm>
       </p:grpSpPr>
-      <p:pic>
-        <p:nvPicPr>
-          <p:cNvPr id="2" name="Picture 1"/>
-          <p:cNvPicPr>
-            <a:picLocks noChangeAspect="1"/>
-          </p:cNvPicPr>
-          <p:nvPr/>
-        </p:nvPicPr>
-        <p:blipFill rotWithShape="1">
-          <a:blip r:embed="rId2"/>
-          <a:srcRect b="12443"/>
-          <a:stretch/>
-        </p:blipFill>
-        <p:spPr>
-          <a:xfrm>
-            <a:off x="1952223" y="390061"/>
-            <a:ext cx="5336599" cy="3079154"/>
-          </a:xfrm>
-          <a:prstGeom prst="rect">
-            <a:avLst/>
-          </a:prstGeom>
-        </p:spPr>
-      </p:pic>
       <p:sp>
         <p:nvSpPr>
           <p:cNvPr id="6" name="Rectangle 5"/>
@@ -5889,195 +5881,272 @@
       </p:sp>
       <p:grpSp>
         <p:nvGrpSpPr>
-          <p:cNvPr id="7" name="Group 6"/>
+          <p:cNvPr id="5" name="Group 4"/>
           <p:cNvGrpSpPr/>
           <p:nvPr/>
         </p:nvGrpSpPr>
         <p:grpSpPr>
           <a:xfrm>
-            <a:off x="2406580" y="3343650"/>
-            <a:ext cx="4744647" cy="431854"/>
-            <a:chOff x="4122147" y="5589042"/>
-            <a:chExt cx="2631740" cy="243042"/>
+            <a:off x="1952223" y="390061"/>
+            <a:ext cx="5336599" cy="3740837"/>
+            <a:chOff x="1952223" y="390061"/>
+            <a:chExt cx="5336599" cy="3740837"/>
           </a:xfrm>
         </p:grpSpPr>
         <p:grpSp>
           <p:nvGrpSpPr>
-            <p:cNvPr id="11" name="Group 10"/>
+            <p:cNvPr id="3" name="Group 2"/>
             <p:cNvGrpSpPr/>
             <p:nvPr/>
           </p:nvGrpSpPr>
           <p:grpSpPr>
             <a:xfrm>
-              <a:off x="4122147" y="5589042"/>
-              <a:ext cx="2631740" cy="243042"/>
-              <a:chOff x="4288146" y="5589042"/>
-              <a:chExt cx="2631740" cy="243042"/>
+              <a:off x="1952223" y="390061"/>
+              <a:ext cx="5336599" cy="3385443"/>
+              <a:chOff x="1952223" y="390061"/>
+              <a:chExt cx="5336599" cy="3385443"/>
             </a:xfrm>
           </p:grpSpPr>
           <p:pic>
             <p:nvPicPr>
-              <p:cNvPr id="13" name="Picture 12"/>
+              <p:cNvPr id="2" name="Picture 1"/>
               <p:cNvPicPr>
                 <a:picLocks noChangeAspect="1"/>
               </p:cNvPicPr>
               <p:nvPr/>
             </p:nvPicPr>
-            <p:blipFill>
-              <a:blip r:embed="rId3" cstate="print">
-                <a:extLst>
-                  <a:ext uri="{28A0092B-C50C-407E-A947-70E740481C1C}">
-                    <a14:useLocalDpi xmlns:a14="http://schemas.microsoft.com/office/drawing/2010/main" val="0"/>
-                  </a:ext>
-                </a:extLst>
-              </a:blip>
-              <a:stretch>
-                <a:fillRect/>
-              </a:stretch>
+            <p:blipFill rotWithShape="1">
+              <a:blip r:embed="rId2"/>
+              <a:srcRect b="12443"/>
+              <a:stretch/>
             </p:blipFill>
             <p:spPr>
               <a:xfrm>
-                <a:off x="4720426" y="5634952"/>
-                <a:ext cx="325640" cy="161565"/>
+                <a:off x="1952223" y="390061"/>
+                <a:ext cx="5336599" cy="3079154"/>
               </a:xfrm>
               <a:prstGeom prst="rect">
                 <a:avLst/>
               </a:prstGeom>
             </p:spPr>
           </p:pic>
-          <p:pic>
-            <p:nvPicPr>
-              <p:cNvPr id="14" name="Picture 13"/>
-              <p:cNvPicPr>
-                <a:picLocks noChangeAspect="1"/>
-              </p:cNvPicPr>
+          <p:grpSp>
+            <p:nvGrpSpPr>
+              <p:cNvPr id="7" name="Group 6"/>
+              <p:cNvGrpSpPr/>
               <p:nvPr/>
-            </p:nvPicPr>
-            <p:blipFill>
-              <a:blip r:embed="rId4" cstate="print">
-                <a:extLst>
-                  <a:ext uri="{28A0092B-C50C-407E-A947-70E740481C1C}">
-                    <a14:useLocalDpi xmlns:a14="http://schemas.microsoft.com/office/drawing/2010/main" val="0"/>
-                  </a:ext>
-                </a:extLst>
-              </a:blip>
-              <a:stretch>
-                <a:fillRect/>
-              </a:stretch>
-            </p:blipFill>
-            <p:spPr>
+            </p:nvGrpSpPr>
+            <p:grpSpPr>
               <a:xfrm>
-                <a:off x="5202099" y="5606488"/>
-                <a:ext cx="280633" cy="225596"/>
+                <a:off x="2406580" y="3343650"/>
+                <a:ext cx="4744647" cy="431854"/>
+                <a:chOff x="4122147" y="5589042"/>
+                <a:chExt cx="2631740" cy="243042"/>
               </a:xfrm>
-              <a:prstGeom prst="rect">
-                <a:avLst/>
-              </a:prstGeom>
-            </p:spPr>
-          </p:pic>
-          <p:pic>
-            <p:nvPicPr>
-              <p:cNvPr id="15" name="Picture 14"/>
-              <p:cNvPicPr>
-                <a:picLocks noChangeAspect="1"/>
-              </p:cNvPicPr>
-              <p:nvPr/>
-            </p:nvPicPr>
-            <p:blipFill>
-              <a:blip r:embed="rId5" cstate="print">
-                <a:extLst>
-                  <a:ext uri="{28A0092B-C50C-407E-A947-70E740481C1C}">
-                    <a14:useLocalDpi xmlns:a14="http://schemas.microsoft.com/office/drawing/2010/main" val="0"/>
-                  </a:ext>
-                </a:extLst>
-              </a:blip>
-              <a:stretch>
-                <a:fillRect/>
-              </a:stretch>
-            </p:blipFill>
-            <p:spPr>
-              <a:xfrm>
-                <a:off x="4288146" y="5589042"/>
-                <a:ext cx="274386" cy="225596"/>
-              </a:xfrm>
-              <a:prstGeom prst="rect">
-                <a:avLst/>
-              </a:prstGeom>
-            </p:spPr>
-          </p:pic>
-          <p:pic>
-            <p:nvPicPr>
-              <p:cNvPr id="16" name="Picture 15"/>
-              <p:cNvPicPr>
-                <a:picLocks noChangeAspect="1"/>
-              </p:cNvPicPr>
-              <p:nvPr/>
-            </p:nvPicPr>
-            <p:blipFill>
-              <a:blip r:embed="rId6" cstate="print">
-                <a:extLst>
-                  <a:ext uri="{28A0092B-C50C-407E-A947-70E740481C1C}">
-                    <a14:useLocalDpi xmlns:a14="http://schemas.microsoft.com/office/drawing/2010/main" val="0"/>
-                  </a:ext>
-                </a:extLst>
-              </a:blip>
-              <a:stretch>
-                <a:fillRect/>
-              </a:stretch>
-            </p:blipFill>
-            <p:spPr>
-              <a:xfrm flipH="1">
-                <a:off x="6664097" y="5596143"/>
-                <a:ext cx="255789" cy="218495"/>
-              </a:xfrm>
-              <a:prstGeom prst="rect">
-                <a:avLst/>
-              </a:prstGeom>
-            </p:spPr>
-          </p:pic>
+            </p:grpSpPr>
+            <p:grpSp>
+              <p:nvGrpSpPr>
+                <p:cNvPr id="11" name="Group 10"/>
+                <p:cNvGrpSpPr/>
+                <p:nvPr/>
+              </p:nvGrpSpPr>
+              <p:grpSpPr>
+                <a:xfrm>
+                  <a:off x="4122147" y="5589042"/>
+                  <a:ext cx="2631740" cy="243042"/>
+                  <a:chOff x="4288146" y="5589042"/>
+                  <a:chExt cx="2631740" cy="243042"/>
+                </a:xfrm>
+              </p:grpSpPr>
+              <p:pic>
+                <p:nvPicPr>
+                  <p:cNvPr id="13" name="Picture 12"/>
+                  <p:cNvPicPr>
+                    <a:picLocks noChangeAspect="1"/>
+                  </p:cNvPicPr>
+                  <p:nvPr/>
+                </p:nvPicPr>
+                <p:blipFill>
+                  <a:blip r:embed="rId3" cstate="print">
+                    <a:extLst>
+                      <a:ext uri="{28A0092B-C50C-407E-A947-70E740481C1C}">
+                        <a14:useLocalDpi xmlns:a14="http://schemas.microsoft.com/office/drawing/2010/main" val="0"/>
+                      </a:ext>
+                    </a:extLst>
+                  </a:blip>
+                  <a:stretch>
+                    <a:fillRect/>
+                  </a:stretch>
+                </p:blipFill>
+                <p:spPr>
+                  <a:xfrm>
+                    <a:off x="4720426" y="5634952"/>
+                    <a:ext cx="325640" cy="161565"/>
+                  </a:xfrm>
+                  <a:prstGeom prst="rect">
+                    <a:avLst/>
+                  </a:prstGeom>
+                </p:spPr>
+              </p:pic>
+              <p:pic>
+                <p:nvPicPr>
+                  <p:cNvPr id="14" name="Picture 13"/>
+                  <p:cNvPicPr>
+                    <a:picLocks noChangeAspect="1"/>
+                  </p:cNvPicPr>
+                  <p:nvPr/>
+                </p:nvPicPr>
+                <p:blipFill>
+                  <a:blip r:embed="rId4" cstate="print">
+                    <a:extLst>
+                      <a:ext uri="{28A0092B-C50C-407E-A947-70E740481C1C}">
+                        <a14:useLocalDpi xmlns:a14="http://schemas.microsoft.com/office/drawing/2010/main" val="0"/>
+                      </a:ext>
+                    </a:extLst>
+                  </a:blip>
+                  <a:stretch>
+                    <a:fillRect/>
+                  </a:stretch>
+                </p:blipFill>
+                <p:spPr>
+                  <a:xfrm>
+                    <a:off x="5202099" y="5606488"/>
+                    <a:ext cx="280633" cy="225596"/>
+                  </a:xfrm>
+                  <a:prstGeom prst="rect">
+                    <a:avLst/>
+                  </a:prstGeom>
+                </p:spPr>
+              </p:pic>
+              <p:pic>
+                <p:nvPicPr>
+                  <p:cNvPr id="15" name="Picture 14"/>
+                  <p:cNvPicPr>
+                    <a:picLocks noChangeAspect="1"/>
+                  </p:cNvPicPr>
+                  <p:nvPr/>
+                </p:nvPicPr>
+                <p:blipFill>
+                  <a:blip r:embed="rId5" cstate="print">
+                    <a:extLst>
+                      <a:ext uri="{28A0092B-C50C-407E-A947-70E740481C1C}">
+                        <a14:useLocalDpi xmlns:a14="http://schemas.microsoft.com/office/drawing/2010/main" val="0"/>
+                      </a:ext>
+                    </a:extLst>
+                  </a:blip>
+                  <a:stretch>
+                    <a:fillRect/>
+                  </a:stretch>
+                </p:blipFill>
+                <p:spPr>
+                  <a:xfrm>
+                    <a:off x="4288146" y="5589042"/>
+                    <a:ext cx="274386" cy="225596"/>
+                  </a:xfrm>
+                  <a:prstGeom prst="rect">
+                    <a:avLst/>
+                  </a:prstGeom>
+                </p:spPr>
+              </p:pic>
+              <p:pic>
+                <p:nvPicPr>
+                  <p:cNvPr id="16" name="Picture 15"/>
+                  <p:cNvPicPr>
+                    <a:picLocks noChangeAspect="1"/>
+                  </p:cNvPicPr>
+                  <p:nvPr/>
+                </p:nvPicPr>
+                <p:blipFill>
+                  <a:blip r:embed="rId6" cstate="print">
+                    <a:extLst>
+                      <a:ext uri="{28A0092B-C50C-407E-A947-70E740481C1C}">
+                        <a14:useLocalDpi xmlns:a14="http://schemas.microsoft.com/office/drawing/2010/main" val="0"/>
+                      </a:ext>
+                    </a:extLst>
+                  </a:blip>
+                  <a:stretch>
+                    <a:fillRect/>
+                  </a:stretch>
+                </p:blipFill>
+                <p:spPr>
+                  <a:xfrm flipH="1">
+                    <a:off x="6664097" y="5596143"/>
+                    <a:ext cx="255789" cy="218495"/>
+                  </a:xfrm>
+                  <a:prstGeom prst="rect">
+                    <a:avLst/>
+                  </a:prstGeom>
+                </p:spPr>
+              </p:pic>
+            </p:grpSp>
+            <p:pic>
+              <p:nvPicPr>
+                <p:cNvPr id="9" name="Picture 8"/>
+                <p:cNvPicPr>
+                  <a:picLocks noChangeAspect="1"/>
+                </p:cNvPicPr>
+                <p:nvPr/>
+              </p:nvPicPr>
+              <p:blipFill>
+                <a:blip r:embed="rId7"/>
+                <a:stretch>
+                  <a:fillRect/>
+                </a:stretch>
+              </p:blipFill>
+              <p:spPr>
+                <a:xfrm>
+                  <a:off x="5472766" y="5596143"/>
+                  <a:ext cx="334903" cy="198223"/>
+                </a:xfrm>
+                <a:prstGeom prst="rect">
+                  <a:avLst/>
+                </a:prstGeom>
+              </p:spPr>
+            </p:pic>
+            <p:pic>
+              <p:nvPicPr>
+                <p:cNvPr id="10" name="Picture 9"/>
+                <p:cNvPicPr>
+                  <a:picLocks noChangeAspect="1"/>
+                </p:cNvPicPr>
+                <p:nvPr/>
+              </p:nvPicPr>
+              <p:blipFill>
+                <a:blip r:embed="rId8"/>
+                <a:stretch>
+                  <a:fillRect/>
+                </a:stretch>
+              </p:blipFill>
+              <p:spPr>
+                <a:xfrm>
+                  <a:off x="5965563" y="5603347"/>
+                  <a:ext cx="327300" cy="196986"/>
+                </a:xfrm>
+                <a:prstGeom prst="rect">
+                  <a:avLst/>
+                </a:prstGeom>
+              </p:spPr>
+            </p:pic>
+          </p:grpSp>
         </p:grpSp>
         <p:pic>
           <p:nvPicPr>
-            <p:cNvPr id="9" name="Picture 8"/>
+            <p:cNvPr id="4" name="Picture 3"/>
             <p:cNvPicPr>
               <a:picLocks noChangeAspect="1"/>
             </p:cNvPicPr>
             <p:nvPr/>
           </p:nvPicPr>
           <p:blipFill>
-            <a:blip r:embed="rId7"/>
+            <a:blip r:embed="rId9"/>
             <a:stretch>
               <a:fillRect/>
             </a:stretch>
           </p:blipFill>
           <p:spPr>
             <a:xfrm>
-              <a:off x="5472766" y="5596143"/>
-              <a:ext cx="334903" cy="198223"/>
-            </a:xfrm>
-            <a:prstGeom prst="rect">
-              <a:avLst/>
-            </a:prstGeom>
-          </p:spPr>
-        </p:pic>
-        <p:pic>
-          <p:nvPicPr>
-            <p:cNvPr id="10" name="Picture 9"/>
-            <p:cNvPicPr>
-              <a:picLocks noChangeAspect="1"/>
-            </p:cNvPicPr>
-            <p:nvPr/>
-          </p:nvPicPr>
-          <p:blipFill>
-            <a:blip r:embed="rId8"/>
-            <a:stretch>
-              <a:fillRect/>
-            </a:stretch>
-          </p:blipFill>
-          <p:spPr>
-            <a:xfrm>
-              <a:off x="5965563" y="5603347"/>
-              <a:ext cx="327300" cy="196986"/>
+              <a:off x="4237588" y="3820904"/>
+              <a:ext cx="765868" cy="309994"/>
             </a:xfrm>
             <a:prstGeom prst="rect">
               <a:avLst/>
@@ -6085,30 +6154,6 @@
           </p:spPr>
         </p:pic>
       </p:grpSp>
-      <p:pic>
-        <p:nvPicPr>
-          <p:cNvPr id="4" name="Picture 3"/>
-          <p:cNvPicPr>
-            <a:picLocks noChangeAspect="1"/>
-          </p:cNvPicPr>
-          <p:nvPr/>
-        </p:nvPicPr>
-        <p:blipFill>
-          <a:blip r:embed="rId9"/>
-          <a:stretch>
-            <a:fillRect/>
-          </a:stretch>
-        </p:blipFill>
-        <p:spPr>
-          <a:xfrm>
-            <a:off x="3814924" y="3824794"/>
-            <a:ext cx="765868" cy="309994"/>
-          </a:xfrm>
-          <a:prstGeom prst="rect">
-            <a:avLst/>
-          </a:prstGeom>
-        </p:spPr>
-      </p:pic>
     </p:spTree>
     <p:extLst>
       <p:ext uri="{BB962C8B-B14F-4D97-AF65-F5344CB8AC3E}">

</xml_diff>

<commit_message>
got BBS area scale data added to fig 4d sp area
</commit_message>
<xml_diff>
--- a/output/plots/all_figs_with_legends.pptx
+++ b/output/plots/all_figs_with_legends.pptx
@@ -6186,7 +6186,7 @@
       </p:grpSpPr>
       <p:pic>
         <p:nvPicPr>
-          <p:cNvPr id="3" name="Picture 2"/>
+          <p:cNvPr id="5" name="Picture 4"/>
           <p:cNvPicPr>
             <a:picLocks noChangeAspect="1"/>
           </p:cNvPicPr>
@@ -6194,30 +6194,6 @@
         </p:nvPicPr>
         <p:blipFill>
           <a:blip r:embed="rId2"/>
-          <a:stretch>
-            <a:fillRect/>
-          </a:stretch>
-        </p:blipFill>
-        <p:spPr>
-          <a:xfrm>
-            <a:off x="5303519" y="3000077"/>
-            <a:ext cx="5044615" cy="3340094"/>
-          </a:xfrm>
-          <a:prstGeom prst="rect">
-            <a:avLst/>
-          </a:prstGeom>
-        </p:spPr>
-      </p:pic>
-      <p:pic>
-        <p:nvPicPr>
-          <p:cNvPr id="5" name="Picture 4"/>
-          <p:cNvPicPr>
-            <a:picLocks noChangeAspect="1"/>
-          </p:cNvPicPr>
-          <p:nvPr/>
-        </p:nvPicPr>
-        <p:blipFill>
-          <a:blip r:embed="rId3"/>
           <a:stretch>
             <a:fillRect/>
           </a:stretch>
@@ -6241,7 +6217,7 @@
           <p:nvPr/>
         </p:nvPicPr>
         <p:blipFill>
-          <a:blip r:embed="rId4"/>
+          <a:blip r:embed="rId3"/>
           <a:stretch>
             <a:fillRect/>
           </a:stretch>

</xml_diff>

<commit_message>
panelled plots 2, 4
</commit_message>
<xml_diff>
--- a/output/plots/all_figs_with_legends.pptx
+++ b/output/plots/all_figs_with_legends.pptx
@@ -5,17 +5,15 @@
     <p:sldMasterId id="2147483648" r:id="rId1"/>
   </p:sldMasterIdLst>
   <p:notesMasterIdLst>
-    <p:notesMasterId r:id="rId10"/>
+    <p:notesMasterId r:id="rId8"/>
   </p:notesMasterIdLst>
   <p:sldIdLst>
     <p:sldId id="258" r:id="rId2"/>
     <p:sldId id="257" r:id="rId3"/>
     <p:sldId id="260" r:id="rId4"/>
     <p:sldId id="262" r:id="rId5"/>
-    <p:sldId id="263" r:id="rId6"/>
-    <p:sldId id="264" r:id="rId7"/>
-    <p:sldId id="261" r:id="rId8"/>
-    <p:sldId id="256" r:id="rId9"/>
+    <p:sldId id="261" r:id="rId6"/>
+    <p:sldId id="256" r:id="rId7"/>
   </p:sldIdLst>
   <p:sldSz cx="12192000" cy="6858000"/>
   <p:notesSz cx="6858000" cy="9144000"/>
@@ -204,7 +202,7 @@
           <a:p>
             <a:fld id="{7FA21820-D199-4D82-91AF-C50B1D3B111A}" type="datetimeFigureOut">
               <a:rPr lang="en-US" smtClean="0"/>
-              <a:t>3/17/2017</a:t>
+              <a:t>3/29/2017</a:t>
             </a:fld>
             <a:endParaRPr lang="en-US"/>
           </a:p>
@@ -818,7 +816,7 @@
           <a:p>
             <a:fld id="{916B8C92-D5E3-4480-8685-D57BEE386DE2}" type="datetimeFigureOut">
               <a:rPr lang="en-US" smtClean="0"/>
-              <a:t>3/17/2017</a:t>
+              <a:t>3/29/2017</a:t>
             </a:fld>
             <a:endParaRPr lang="en-US"/>
           </a:p>
@@ -988,7 +986,7 @@
           <a:p>
             <a:fld id="{916B8C92-D5E3-4480-8685-D57BEE386DE2}" type="datetimeFigureOut">
               <a:rPr lang="en-US" smtClean="0"/>
-              <a:t>3/17/2017</a:t>
+              <a:t>3/29/2017</a:t>
             </a:fld>
             <a:endParaRPr lang="en-US"/>
           </a:p>
@@ -1168,7 +1166,7 @@
           <a:p>
             <a:fld id="{916B8C92-D5E3-4480-8685-D57BEE386DE2}" type="datetimeFigureOut">
               <a:rPr lang="en-US" smtClean="0"/>
-              <a:t>3/17/2017</a:t>
+              <a:t>3/29/2017</a:t>
             </a:fld>
             <a:endParaRPr lang="en-US"/>
           </a:p>
@@ -1338,7 +1336,7 @@
           <a:p>
             <a:fld id="{916B8C92-D5E3-4480-8685-D57BEE386DE2}" type="datetimeFigureOut">
               <a:rPr lang="en-US" smtClean="0"/>
-              <a:t>3/17/2017</a:t>
+              <a:t>3/29/2017</a:t>
             </a:fld>
             <a:endParaRPr lang="en-US"/>
           </a:p>
@@ -1584,7 +1582,7 @@
           <a:p>
             <a:fld id="{916B8C92-D5E3-4480-8685-D57BEE386DE2}" type="datetimeFigureOut">
               <a:rPr lang="en-US" smtClean="0"/>
-              <a:t>3/17/2017</a:t>
+              <a:t>3/29/2017</a:t>
             </a:fld>
             <a:endParaRPr lang="en-US"/>
           </a:p>
@@ -1816,7 +1814,7 @@
           <a:p>
             <a:fld id="{916B8C92-D5E3-4480-8685-D57BEE386DE2}" type="datetimeFigureOut">
               <a:rPr lang="en-US" smtClean="0"/>
-              <a:t>3/17/2017</a:t>
+              <a:t>3/29/2017</a:t>
             </a:fld>
             <a:endParaRPr lang="en-US"/>
           </a:p>
@@ -2183,7 +2181,7 @@
           <a:p>
             <a:fld id="{916B8C92-D5E3-4480-8685-D57BEE386DE2}" type="datetimeFigureOut">
               <a:rPr lang="en-US" smtClean="0"/>
-              <a:t>3/17/2017</a:t>
+              <a:t>3/29/2017</a:t>
             </a:fld>
             <a:endParaRPr lang="en-US"/>
           </a:p>
@@ -2301,7 +2299,7 @@
           <a:p>
             <a:fld id="{916B8C92-D5E3-4480-8685-D57BEE386DE2}" type="datetimeFigureOut">
               <a:rPr lang="en-US" smtClean="0"/>
-              <a:t>3/17/2017</a:t>
+              <a:t>3/29/2017</a:t>
             </a:fld>
             <a:endParaRPr lang="en-US"/>
           </a:p>
@@ -2396,7 +2394,7 @@
           <a:p>
             <a:fld id="{916B8C92-D5E3-4480-8685-D57BEE386DE2}" type="datetimeFigureOut">
               <a:rPr lang="en-US" smtClean="0"/>
-              <a:t>3/17/2017</a:t>
+              <a:t>3/29/2017</a:t>
             </a:fld>
             <a:endParaRPr lang="en-US"/>
           </a:p>
@@ -2673,7 +2671,7 @@
           <a:p>
             <a:fld id="{916B8C92-D5E3-4480-8685-D57BEE386DE2}" type="datetimeFigureOut">
               <a:rPr lang="en-US" smtClean="0"/>
-              <a:t>3/17/2017</a:t>
+              <a:t>3/29/2017</a:t>
             </a:fld>
             <a:endParaRPr lang="en-US"/>
           </a:p>
@@ -2926,7 +2924,7 @@
           <a:p>
             <a:fld id="{916B8C92-D5E3-4480-8685-D57BEE386DE2}" type="datetimeFigureOut">
               <a:rPr lang="en-US" smtClean="0"/>
-              <a:t>3/17/2017</a:t>
+              <a:t>3/29/2017</a:t>
             </a:fld>
             <a:endParaRPr lang="en-US"/>
           </a:p>
@@ -3139,7 +3137,7 @@
           <a:p>
             <a:fld id="{916B8C92-D5E3-4480-8685-D57BEE386DE2}" type="datetimeFigureOut">
               <a:rPr lang="en-US" smtClean="0"/>
-              <a:t>3/17/2017</a:t>
+              <a:t>3/29/2017</a:t>
             </a:fld>
             <a:endParaRPr lang="en-US"/>
           </a:p>
@@ -4055,44 +4053,524 @@
           <a:chExt cx="0" cy="0"/>
         </a:xfrm>
       </p:grpSpPr>
+      <p:sp>
+        <p:nvSpPr>
+          <p:cNvPr id="2" name="TextBox 1"/>
+          <p:cNvSpPr txBox="1"/>
+          <p:nvPr/>
+        </p:nvSpPr>
+        <p:spPr>
+          <a:xfrm>
+            <a:off x="320040" y="566928"/>
+            <a:ext cx="1060704" cy="369332"/>
+          </a:xfrm>
+          <a:prstGeom prst="rect">
+            <a:avLst/>
+          </a:prstGeom>
+          <a:noFill/>
+        </p:spPr>
+        <p:txBody>
+          <a:bodyPr wrap="square" rtlCol="0">
+            <a:spAutoFit/>
+          </a:bodyPr>
+          <a:lstStyle/>
+          <a:p>
+            <a:r>
+              <a:rPr lang="en-US" dirty="0" smtClean="0"/>
+              <a:t>Fig 1a-1f</a:t>
+            </a:r>
+            <a:endParaRPr lang="en-US" dirty="0"/>
+          </a:p>
+        </p:txBody>
+      </p:sp>
       <p:grpSp>
         <p:nvGrpSpPr>
-          <p:cNvPr id="8" name="Group 7"/>
+          <p:cNvPr id="40" name="Group 39"/>
           <p:cNvGrpSpPr/>
           <p:nvPr/>
         </p:nvGrpSpPr>
         <p:grpSpPr>
           <a:xfrm>
-            <a:off x="2346384" y="324434"/>
-            <a:ext cx="5316289" cy="3784421"/>
-            <a:chOff x="1291276" y="119864"/>
-            <a:chExt cx="9003587" cy="6222848"/>
+            <a:off x="6793821" y="5254218"/>
+            <a:ext cx="1872544" cy="192467"/>
+            <a:chOff x="2721075" y="6066646"/>
+            <a:chExt cx="2738999" cy="243895"/>
           </a:xfrm>
         </p:grpSpPr>
+        <p:grpSp>
+          <p:nvGrpSpPr>
+            <p:cNvPr id="52" name="Group 51"/>
+            <p:cNvGrpSpPr/>
+            <p:nvPr/>
+          </p:nvGrpSpPr>
+          <p:grpSpPr>
+            <a:xfrm>
+              <a:off x="2721075" y="6066646"/>
+              <a:ext cx="2738999" cy="243895"/>
+              <a:chOff x="2721075" y="6066646"/>
+              <a:chExt cx="2738999" cy="243895"/>
+            </a:xfrm>
+          </p:grpSpPr>
+          <p:grpSp>
+            <p:nvGrpSpPr>
+              <p:cNvPr id="55" name="Group 54"/>
+              <p:cNvGrpSpPr/>
+              <p:nvPr/>
+            </p:nvGrpSpPr>
+            <p:grpSpPr>
+              <a:xfrm>
+                <a:off x="2721075" y="6083191"/>
+                <a:ext cx="2738999" cy="227350"/>
+                <a:chOff x="2887074" y="6083191"/>
+                <a:chExt cx="2738999" cy="227350"/>
+              </a:xfrm>
+            </p:grpSpPr>
+            <p:pic>
+              <p:nvPicPr>
+                <p:cNvPr id="57" name="Picture 56"/>
+                <p:cNvPicPr>
+                  <a:picLocks noChangeAspect="1"/>
+                </p:cNvPicPr>
+                <p:nvPr/>
+              </p:nvPicPr>
+              <p:blipFill>
+                <a:blip r:embed="rId2" cstate="print">
+                  <a:extLst>
+                    <a:ext uri="{28A0092B-C50C-407E-A947-70E740481C1C}">
+                      <a14:useLocalDpi xmlns:a14="http://schemas.microsoft.com/office/drawing/2010/main" val="0"/>
+                    </a:ext>
+                  </a:extLst>
+                </a:blip>
+                <a:stretch>
+                  <a:fillRect/>
+                </a:stretch>
+              </p:blipFill>
+              <p:spPr>
+                <a:xfrm>
+                  <a:off x="4079269" y="6103833"/>
+                  <a:ext cx="325640" cy="161565"/>
+                </a:xfrm>
+                <a:prstGeom prst="rect">
+                  <a:avLst/>
+                </a:prstGeom>
+              </p:spPr>
+            </p:pic>
+            <p:pic>
+              <p:nvPicPr>
+                <p:cNvPr id="58" name="Picture 57"/>
+                <p:cNvPicPr>
+                  <a:picLocks noChangeAspect="1"/>
+                </p:cNvPicPr>
+                <p:nvPr/>
+              </p:nvPicPr>
+              <p:blipFill>
+                <a:blip r:embed="rId3" cstate="print">
+                  <a:extLst>
+                    <a:ext uri="{28A0092B-C50C-407E-A947-70E740481C1C}">
+                      <a14:useLocalDpi xmlns:a14="http://schemas.microsoft.com/office/drawing/2010/main" val="0"/>
+                    </a:ext>
+                  </a:extLst>
+                </a:blip>
+                <a:stretch>
+                  <a:fillRect/>
+                </a:stretch>
+              </p:blipFill>
+              <p:spPr>
+                <a:xfrm>
+                  <a:off x="5345440" y="6084945"/>
+                  <a:ext cx="280633" cy="225596"/>
+                </a:xfrm>
+                <a:prstGeom prst="rect">
+                  <a:avLst/>
+                </a:prstGeom>
+              </p:spPr>
+            </p:pic>
+            <p:pic>
+              <p:nvPicPr>
+                <p:cNvPr id="59" name="Picture 58"/>
+                <p:cNvPicPr>
+                  <a:picLocks noChangeAspect="1"/>
+                </p:cNvPicPr>
+                <p:nvPr/>
+              </p:nvPicPr>
+              <p:blipFill>
+                <a:blip r:embed="rId4" cstate="print">
+                  <a:extLst>
+                    <a:ext uri="{28A0092B-C50C-407E-A947-70E740481C1C}">
+                      <a14:useLocalDpi xmlns:a14="http://schemas.microsoft.com/office/drawing/2010/main" val="0"/>
+                    </a:ext>
+                  </a:extLst>
+                </a:blip>
+                <a:stretch>
+                  <a:fillRect/>
+                </a:stretch>
+              </p:blipFill>
+              <p:spPr>
+                <a:xfrm>
+                  <a:off x="4515280" y="6084945"/>
+                  <a:ext cx="274386" cy="225596"/>
+                </a:xfrm>
+                <a:prstGeom prst="rect">
+                  <a:avLst/>
+                </a:prstGeom>
+              </p:spPr>
+            </p:pic>
+            <p:pic>
+              <p:nvPicPr>
+                <p:cNvPr id="60" name="Picture 59"/>
+                <p:cNvPicPr>
+                  <a:picLocks noChangeAspect="1"/>
+                </p:cNvPicPr>
+                <p:nvPr/>
+              </p:nvPicPr>
+              <p:blipFill>
+                <a:blip r:embed="rId5" cstate="print">
+                  <a:extLst>
+                    <a:ext uri="{28A0092B-C50C-407E-A947-70E740481C1C}">
+                      <a14:useLocalDpi xmlns:a14="http://schemas.microsoft.com/office/drawing/2010/main" val="0"/>
+                    </a:ext>
+                  </a:extLst>
+                </a:blip>
+                <a:stretch>
+                  <a:fillRect/>
+                </a:stretch>
+              </p:blipFill>
+              <p:spPr>
+                <a:xfrm flipH="1">
+                  <a:off x="2887074" y="6083191"/>
+                  <a:ext cx="255789" cy="218495"/>
+                </a:xfrm>
+                <a:prstGeom prst="rect">
+                  <a:avLst/>
+                </a:prstGeom>
+              </p:spPr>
+            </p:pic>
+          </p:grpSp>
+          <p:pic>
+            <p:nvPicPr>
+              <p:cNvPr id="56" name="Picture 55"/>
+              <p:cNvPicPr>
+                <a:picLocks noChangeAspect="1"/>
+              </p:cNvPicPr>
+              <p:nvPr/>
+            </p:nvPicPr>
+            <p:blipFill>
+              <a:blip r:embed="rId6"/>
+              <a:stretch>
+                <a:fillRect/>
+              </a:stretch>
+            </p:blipFill>
+            <p:spPr>
+              <a:xfrm>
+                <a:off x="4734039" y="6066646"/>
+                <a:ext cx="302061" cy="235941"/>
+              </a:xfrm>
+              <a:prstGeom prst="rect">
+                <a:avLst/>
+              </a:prstGeom>
+            </p:spPr>
+          </p:pic>
+        </p:grpSp>
         <p:pic>
           <p:nvPicPr>
-            <p:cNvPr id="4" name="Picture 3"/>
+            <p:cNvPr id="53" name="Picture 52"/>
             <p:cNvPicPr>
               <a:picLocks noChangeAspect="1"/>
             </p:cNvPicPr>
             <p:nvPr/>
           </p:nvPicPr>
           <p:blipFill>
-            <a:blip r:embed="rId2"/>
+            <a:blip r:embed="rId7"/>
             <a:stretch>
               <a:fillRect/>
             </a:stretch>
           </p:blipFill>
           <p:spPr>
             <a:xfrm>
-              <a:off x="1291276" y="119864"/>
-              <a:ext cx="9003587" cy="6196018"/>
+              <a:off x="3506696" y="6098817"/>
+              <a:ext cx="334903" cy="198223"/>
             </a:xfrm>
             <a:prstGeom prst="rect">
               <a:avLst/>
             </a:prstGeom>
           </p:spPr>
         </p:pic>
+        <p:pic>
+          <p:nvPicPr>
+            <p:cNvPr id="54" name="Picture 53"/>
+            <p:cNvPicPr>
+              <a:picLocks noChangeAspect="1"/>
+            </p:cNvPicPr>
+            <p:nvPr/>
+          </p:nvPicPr>
+          <p:blipFill>
+            <a:blip r:embed="rId8"/>
+            <a:stretch>
+              <a:fillRect/>
+            </a:stretch>
+          </p:blipFill>
+          <p:spPr>
+            <a:xfrm>
+              <a:off x="3107726" y="6098817"/>
+              <a:ext cx="327300" cy="196986"/>
+            </a:xfrm>
+            <a:prstGeom prst="rect">
+              <a:avLst/>
+            </a:prstGeom>
+          </p:spPr>
+        </p:pic>
+      </p:grpSp>
+      <p:grpSp>
+        <p:nvGrpSpPr>
+          <p:cNvPr id="41" name="Group 40"/>
+          <p:cNvGrpSpPr/>
+          <p:nvPr/>
+        </p:nvGrpSpPr>
+        <p:grpSpPr>
+          <a:xfrm>
+            <a:off x="9854367" y="5249751"/>
+            <a:ext cx="1872544" cy="192467"/>
+            <a:chOff x="2721075" y="6066646"/>
+            <a:chExt cx="2738999" cy="243895"/>
+          </a:xfrm>
+        </p:grpSpPr>
+        <p:grpSp>
+          <p:nvGrpSpPr>
+            <p:cNvPr id="43" name="Group 42"/>
+            <p:cNvGrpSpPr/>
+            <p:nvPr/>
+          </p:nvGrpSpPr>
+          <p:grpSpPr>
+            <a:xfrm>
+              <a:off x="2721075" y="6066646"/>
+              <a:ext cx="2738999" cy="243895"/>
+              <a:chOff x="2721075" y="6066646"/>
+              <a:chExt cx="2738999" cy="243895"/>
+            </a:xfrm>
+          </p:grpSpPr>
+          <p:grpSp>
+            <p:nvGrpSpPr>
+              <p:cNvPr id="46" name="Group 45"/>
+              <p:cNvGrpSpPr/>
+              <p:nvPr/>
+            </p:nvGrpSpPr>
+            <p:grpSpPr>
+              <a:xfrm>
+                <a:off x="2721075" y="6083191"/>
+                <a:ext cx="2738999" cy="227350"/>
+                <a:chOff x="2887074" y="6083191"/>
+                <a:chExt cx="2738999" cy="227350"/>
+              </a:xfrm>
+            </p:grpSpPr>
+            <p:pic>
+              <p:nvPicPr>
+                <p:cNvPr id="48" name="Picture 47"/>
+                <p:cNvPicPr>
+                  <a:picLocks noChangeAspect="1"/>
+                </p:cNvPicPr>
+                <p:nvPr/>
+              </p:nvPicPr>
+              <p:blipFill>
+                <a:blip r:embed="rId2" cstate="print">
+                  <a:extLst>
+                    <a:ext uri="{28A0092B-C50C-407E-A947-70E740481C1C}">
+                      <a14:useLocalDpi xmlns:a14="http://schemas.microsoft.com/office/drawing/2010/main" val="0"/>
+                    </a:ext>
+                  </a:extLst>
+                </a:blip>
+                <a:stretch>
+                  <a:fillRect/>
+                </a:stretch>
+              </p:blipFill>
+              <p:spPr>
+                <a:xfrm>
+                  <a:off x="4079269" y="6103833"/>
+                  <a:ext cx="325640" cy="161565"/>
+                </a:xfrm>
+                <a:prstGeom prst="rect">
+                  <a:avLst/>
+                </a:prstGeom>
+              </p:spPr>
+            </p:pic>
+            <p:pic>
+              <p:nvPicPr>
+                <p:cNvPr id="49" name="Picture 48"/>
+                <p:cNvPicPr>
+                  <a:picLocks noChangeAspect="1"/>
+                </p:cNvPicPr>
+                <p:nvPr/>
+              </p:nvPicPr>
+              <p:blipFill>
+                <a:blip r:embed="rId3" cstate="print">
+                  <a:extLst>
+                    <a:ext uri="{28A0092B-C50C-407E-A947-70E740481C1C}">
+                      <a14:useLocalDpi xmlns:a14="http://schemas.microsoft.com/office/drawing/2010/main" val="0"/>
+                    </a:ext>
+                  </a:extLst>
+                </a:blip>
+                <a:stretch>
+                  <a:fillRect/>
+                </a:stretch>
+              </p:blipFill>
+              <p:spPr>
+                <a:xfrm>
+                  <a:off x="5345440" y="6084945"/>
+                  <a:ext cx="280633" cy="225596"/>
+                </a:xfrm>
+                <a:prstGeom prst="rect">
+                  <a:avLst/>
+                </a:prstGeom>
+              </p:spPr>
+            </p:pic>
+            <p:pic>
+              <p:nvPicPr>
+                <p:cNvPr id="50" name="Picture 49"/>
+                <p:cNvPicPr>
+                  <a:picLocks noChangeAspect="1"/>
+                </p:cNvPicPr>
+                <p:nvPr/>
+              </p:nvPicPr>
+              <p:blipFill>
+                <a:blip r:embed="rId4" cstate="print">
+                  <a:extLst>
+                    <a:ext uri="{28A0092B-C50C-407E-A947-70E740481C1C}">
+                      <a14:useLocalDpi xmlns:a14="http://schemas.microsoft.com/office/drawing/2010/main" val="0"/>
+                    </a:ext>
+                  </a:extLst>
+                </a:blip>
+                <a:stretch>
+                  <a:fillRect/>
+                </a:stretch>
+              </p:blipFill>
+              <p:spPr>
+                <a:xfrm>
+                  <a:off x="4515280" y="6084945"/>
+                  <a:ext cx="274386" cy="225596"/>
+                </a:xfrm>
+                <a:prstGeom prst="rect">
+                  <a:avLst/>
+                </a:prstGeom>
+              </p:spPr>
+            </p:pic>
+            <p:pic>
+              <p:nvPicPr>
+                <p:cNvPr id="51" name="Picture 50"/>
+                <p:cNvPicPr>
+                  <a:picLocks noChangeAspect="1"/>
+                </p:cNvPicPr>
+                <p:nvPr/>
+              </p:nvPicPr>
+              <p:blipFill>
+                <a:blip r:embed="rId5" cstate="print">
+                  <a:extLst>
+                    <a:ext uri="{28A0092B-C50C-407E-A947-70E740481C1C}">
+                      <a14:useLocalDpi xmlns:a14="http://schemas.microsoft.com/office/drawing/2010/main" val="0"/>
+                    </a:ext>
+                  </a:extLst>
+                </a:blip>
+                <a:stretch>
+                  <a:fillRect/>
+                </a:stretch>
+              </p:blipFill>
+              <p:spPr>
+                <a:xfrm flipH="1">
+                  <a:off x="2887074" y="6083191"/>
+                  <a:ext cx="255789" cy="218495"/>
+                </a:xfrm>
+                <a:prstGeom prst="rect">
+                  <a:avLst/>
+                </a:prstGeom>
+              </p:spPr>
+            </p:pic>
+          </p:grpSp>
+          <p:pic>
+            <p:nvPicPr>
+              <p:cNvPr id="47" name="Picture 46"/>
+              <p:cNvPicPr>
+                <a:picLocks noChangeAspect="1"/>
+              </p:cNvPicPr>
+              <p:nvPr/>
+            </p:nvPicPr>
+            <p:blipFill>
+              <a:blip r:embed="rId6"/>
+              <a:stretch>
+                <a:fillRect/>
+              </a:stretch>
+            </p:blipFill>
+            <p:spPr>
+              <a:xfrm>
+                <a:off x="4734039" y="6066646"/>
+                <a:ext cx="302061" cy="235941"/>
+              </a:xfrm>
+              <a:prstGeom prst="rect">
+                <a:avLst/>
+              </a:prstGeom>
+            </p:spPr>
+          </p:pic>
+        </p:grpSp>
+        <p:pic>
+          <p:nvPicPr>
+            <p:cNvPr id="44" name="Picture 43"/>
+            <p:cNvPicPr>
+              <a:picLocks noChangeAspect="1"/>
+            </p:cNvPicPr>
+            <p:nvPr/>
+          </p:nvPicPr>
+          <p:blipFill>
+            <a:blip r:embed="rId7"/>
+            <a:stretch>
+              <a:fillRect/>
+            </a:stretch>
+          </p:blipFill>
+          <p:spPr>
+            <a:xfrm>
+              <a:off x="3506696" y="6098817"/>
+              <a:ext cx="334903" cy="198223"/>
+            </a:xfrm>
+            <a:prstGeom prst="rect">
+              <a:avLst/>
+            </a:prstGeom>
+          </p:spPr>
+        </p:pic>
+        <p:pic>
+          <p:nvPicPr>
+            <p:cNvPr id="45" name="Picture 44"/>
+            <p:cNvPicPr>
+              <a:picLocks noChangeAspect="1"/>
+            </p:cNvPicPr>
+            <p:nvPr/>
+          </p:nvPicPr>
+          <p:blipFill>
+            <a:blip r:embed="rId8"/>
+            <a:stretch>
+              <a:fillRect/>
+            </a:stretch>
+          </p:blipFill>
+          <p:spPr>
+            <a:xfrm>
+              <a:off x="3107726" y="6098817"/>
+              <a:ext cx="327300" cy="196986"/>
+            </a:xfrm>
+            <a:prstGeom prst="rect">
+              <a:avLst/>
+            </a:prstGeom>
+          </p:spPr>
+        </p:pic>
+      </p:grpSp>
+      <p:grpSp>
+        <p:nvGrpSpPr>
+          <p:cNvPr id="11" name="Group 10"/>
+          <p:cNvGrpSpPr/>
+          <p:nvPr/>
+        </p:nvGrpSpPr>
+        <p:grpSpPr>
+          <a:xfrm>
+            <a:off x="70913" y="1203435"/>
+            <a:ext cx="5659509" cy="4035703"/>
+            <a:chOff x="2366005" y="357098"/>
+            <a:chExt cx="5305184" cy="3751757"/>
+          </a:xfrm>
+        </p:grpSpPr>
         <p:grpSp>
           <p:nvGrpSpPr>
             <p:cNvPr id="7" name="Group 6"/>
@@ -4101,8 +4579,8 @@
           </p:nvGrpSpPr>
           <p:grpSpPr>
             <a:xfrm>
-              <a:off x="2721075" y="6066646"/>
-              <a:ext cx="7348959" cy="276066"/>
+              <a:off x="3190628" y="3940966"/>
+              <a:ext cx="4339292" cy="167889"/>
               <a:chOff x="2721075" y="6066646"/>
               <a:chExt cx="7348959" cy="276066"/>
             </a:xfrm>
@@ -4158,7 +4636,7 @@
                     <p:nvPr/>
                   </p:nvPicPr>
                   <p:blipFill>
-                    <a:blip r:embed="rId3" cstate="print">
+                    <a:blip r:embed="rId2" cstate="print">
                       <a:extLst>
                         <a:ext uri="{28A0092B-C50C-407E-A947-70E740481C1C}">
                           <a14:useLocalDpi xmlns:a14="http://schemas.microsoft.com/office/drawing/2010/main" val="0"/>
@@ -4188,7 +4666,7 @@
                     <p:nvPr/>
                   </p:nvPicPr>
                   <p:blipFill>
-                    <a:blip r:embed="rId4" cstate="print">
+                    <a:blip r:embed="rId3" cstate="print">
                       <a:extLst>
                         <a:ext uri="{28A0092B-C50C-407E-A947-70E740481C1C}">
                           <a14:useLocalDpi xmlns:a14="http://schemas.microsoft.com/office/drawing/2010/main" val="0"/>
@@ -4218,7 +4696,7 @@
                     <p:nvPr/>
                   </p:nvPicPr>
                   <p:blipFill>
-                    <a:blip r:embed="rId5" cstate="print">
+                    <a:blip r:embed="rId4" cstate="print">
                       <a:extLst>
                         <a:ext uri="{28A0092B-C50C-407E-A947-70E740481C1C}">
                           <a14:useLocalDpi xmlns:a14="http://schemas.microsoft.com/office/drawing/2010/main" val="0"/>
@@ -4248,7 +4726,7 @@
                     <p:nvPr/>
                   </p:nvPicPr>
                   <p:blipFill>
-                    <a:blip r:embed="rId6" cstate="print">
+                    <a:blip r:embed="rId5" cstate="print">
                       <a:extLst>
                         <a:ext uri="{28A0092B-C50C-407E-A947-70E740481C1C}">
                           <a14:useLocalDpi xmlns:a14="http://schemas.microsoft.com/office/drawing/2010/main" val="0"/>
@@ -4279,7 +4757,7 @@
                   <p:nvPr/>
                 </p:nvPicPr>
                 <p:blipFill>
-                  <a:blip r:embed="rId7"/>
+                  <a:blip r:embed="rId6"/>
                   <a:stretch>
                     <a:fillRect/>
                   </a:stretch>
@@ -4304,7 +4782,7 @@
                 <p:nvPr/>
               </p:nvPicPr>
               <p:blipFill>
-                <a:blip r:embed="rId8"/>
+                <a:blip r:embed="rId7"/>
                 <a:stretch>
                   <a:fillRect/>
                 </a:stretch>
@@ -4328,7 +4806,7 @@
                 <p:nvPr/>
               </p:nvPicPr>
               <p:blipFill>
-                <a:blip r:embed="rId9"/>
+                <a:blip r:embed="rId8"/>
                 <a:stretch>
                   <a:fillRect/>
                 </a:stretch>
@@ -4395,7 +4873,7 @@
                     <p:nvPr/>
                   </p:nvPicPr>
                   <p:blipFill>
-                    <a:blip r:embed="rId3" cstate="print">
+                    <a:blip r:embed="rId2" cstate="print">
                       <a:extLst>
                         <a:ext uri="{28A0092B-C50C-407E-A947-70E740481C1C}">
                           <a14:useLocalDpi xmlns:a14="http://schemas.microsoft.com/office/drawing/2010/main" val="0"/>
@@ -4425,7 +4903,7 @@
                     <p:nvPr/>
                   </p:nvPicPr>
                   <p:blipFill>
-                    <a:blip r:embed="rId4" cstate="print">
+                    <a:blip r:embed="rId3" cstate="print">
                       <a:extLst>
                         <a:ext uri="{28A0092B-C50C-407E-A947-70E740481C1C}">
                           <a14:useLocalDpi xmlns:a14="http://schemas.microsoft.com/office/drawing/2010/main" val="0"/>
@@ -4455,7 +4933,7 @@
                     <p:nvPr/>
                   </p:nvPicPr>
                   <p:blipFill>
-                    <a:blip r:embed="rId5" cstate="print">
+                    <a:blip r:embed="rId4" cstate="print">
                       <a:extLst>
                         <a:ext uri="{28A0092B-C50C-407E-A947-70E740481C1C}">
                           <a14:useLocalDpi xmlns:a14="http://schemas.microsoft.com/office/drawing/2010/main" val="0"/>
@@ -4485,7 +4963,7 @@
                     <p:nvPr/>
                   </p:nvPicPr>
                   <p:blipFill>
-                    <a:blip r:embed="rId6" cstate="print">
+                    <a:blip r:embed="rId5" cstate="print">
                       <a:extLst>
                         <a:ext uri="{28A0092B-C50C-407E-A947-70E740481C1C}">
                           <a14:useLocalDpi xmlns:a14="http://schemas.microsoft.com/office/drawing/2010/main" val="0"/>
@@ -4516,7 +4994,7 @@
                   <p:nvPr/>
                 </p:nvPicPr>
                 <p:blipFill>
-                  <a:blip r:embed="rId7"/>
+                  <a:blip r:embed="rId6"/>
                   <a:stretch>
                     <a:fillRect/>
                   </a:stretch>
@@ -4541,7 +5019,7 @@
                 <p:nvPr/>
               </p:nvPicPr>
               <p:blipFill>
-                <a:blip r:embed="rId8"/>
+                <a:blip r:embed="rId7"/>
                 <a:stretch>
                   <a:fillRect/>
                 </a:stretch>
@@ -4565,7 +5043,7 @@
                 <p:nvPr/>
               </p:nvPicPr>
               <p:blipFill>
-                <a:blip r:embed="rId9"/>
+                <a:blip r:embed="rId8"/>
                 <a:stretch>
                   <a:fillRect/>
                 </a:stretch>
@@ -4582,567 +5060,24 @@
             </p:pic>
           </p:grpSp>
         </p:grpSp>
-      </p:grpSp>
-      <p:sp>
-        <p:nvSpPr>
-          <p:cNvPr id="2" name="TextBox 1"/>
-          <p:cNvSpPr txBox="1"/>
-          <p:nvPr/>
-        </p:nvSpPr>
-        <p:spPr>
-          <a:xfrm>
-            <a:off x="320040" y="566928"/>
-            <a:ext cx="1060704" cy="369332"/>
-          </a:xfrm>
-          <a:prstGeom prst="rect">
-            <a:avLst/>
-          </a:prstGeom>
-          <a:noFill/>
-        </p:spPr>
-        <p:txBody>
-          <a:bodyPr wrap="square" rtlCol="0">
-            <a:spAutoFit/>
-          </a:bodyPr>
-          <a:lstStyle/>
-          <a:p>
-            <a:r>
-              <a:rPr lang="en-US" dirty="0" smtClean="0"/>
-              <a:t>Fig 1a-1f</a:t>
-            </a:r>
-            <a:endParaRPr lang="en-US" dirty="0"/>
-          </a:p>
-        </p:txBody>
-      </p:sp>
-      <p:grpSp>
-        <p:nvGrpSpPr>
-          <p:cNvPr id="28" name="Group 27"/>
-          <p:cNvGrpSpPr/>
-          <p:nvPr/>
-        </p:nvGrpSpPr>
-        <p:grpSpPr>
-          <a:xfrm>
-            <a:off x="2770004" y="4197096"/>
-            <a:ext cx="4901185" cy="2039112"/>
-            <a:chOff x="402796" y="1109733"/>
-            <a:chExt cx="11119716" cy="4014780"/>
-          </a:xfrm>
-        </p:grpSpPr>
         <p:pic>
           <p:nvPicPr>
-            <p:cNvPr id="39" name="Picture 38"/>
+            <p:cNvPr id="9" name="Picture 8"/>
             <p:cNvPicPr>
               <a:picLocks noChangeAspect="1"/>
             </p:cNvPicPr>
             <p:nvPr/>
           </p:nvPicPr>
           <p:blipFill>
-            <a:blip r:embed="rId10"/>
+            <a:blip r:embed="rId9"/>
             <a:stretch>
               <a:fillRect/>
             </a:stretch>
           </p:blipFill>
           <p:spPr>
             <a:xfrm>
-              <a:off x="402796" y="1160584"/>
-              <a:ext cx="5510030" cy="3578470"/>
-            </a:xfrm>
-            <a:prstGeom prst="rect">
-              <a:avLst/>
-            </a:prstGeom>
-          </p:spPr>
-        </p:pic>
-        <p:grpSp>
-          <p:nvGrpSpPr>
-            <p:cNvPr id="40" name="Group 39"/>
-            <p:cNvGrpSpPr/>
-            <p:nvPr/>
-          </p:nvGrpSpPr>
-          <p:grpSpPr>
-            <a:xfrm>
-              <a:off x="1211629" y="4687790"/>
-              <a:ext cx="4248393" cy="378945"/>
-              <a:chOff x="2721075" y="6066646"/>
-              <a:chExt cx="2738999" cy="243895"/>
-            </a:xfrm>
-          </p:grpSpPr>
-          <p:grpSp>
-            <p:nvGrpSpPr>
-              <p:cNvPr id="52" name="Group 51"/>
-              <p:cNvGrpSpPr/>
-              <p:nvPr/>
-            </p:nvGrpSpPr>
-            <p:grpSpPr>
-              <a:xfrm>
-                <a:off x="2721075" y="6066646"/>
-                <a:ext cx="2738999" cy="243895"/>
-                <a:chOff x="2721075" y="6066646"/>
-                <a:chExt cx="2738999" cy="243895"/>
-              </a:xfrm>
-            </p:grpSpPr>
-            <p:grpSp>
-              <p:nvGrpSpPr>
-                <p:cNvPr id="55" name="Group 54"/>
-                <p:cNvGrpSpPr/>
-                <p:nvPr/>
-              </p:nvGrpSpPr>
-              <p:grpSpPr>
-                <a:xfrm>
-                  <a:off x="2721075" y="6083191"/>
-                  <a:ext cx="2738999" cy="227350"/>
-                  <a:chOff x="2887074" y="6083191"/>
-                  <a:chExt cx="2738999" cy="227350"/>
-                </a:xfrm>
-              </p:grpSpPr>
-              <p:pic>
-                <p:nvPicPr>
-                  <p:cNvPr id="57" name="Picture 56"/>
-                  <p:cNvPicPr>
-                    <a:picLocks noChangeAspect="1"/>
-                  </p:cNvPicPr>
-                  <p:nvPr/>
-                </p:nvPicPr>
-                <p:blipFill>
-                  <a:blip r:embed="rId3" cstate="print">
-                    <a:extLst>
-                      <a:ext uri="{28A0092B-C50C-407E-A947-70E740481C1C}">
-                        <a14:useLocalDpi xmlns:a14="http://schemas.microsoft.com/office/drawing/2010/main" val="0"/>
-                      </a:ext>
-                    </a:extLst>
-                  </a:blip>
-                  <a:stretch>
-                    <a:fillRect/>
-                  </a:stretch>
-                </p:blipFill>
-                <p:spPr>
-                  <a:xfrm>
-                    <a:off x="4079269" y="6103833"/>
-                    <a:ext cx="325640" cy="161565"/>
-                  </a:xfrm>
-                  <a:prstGeom prst="rect">
-                    <a:avLst/>
-                  </a:prstGeom>
-                </p:spPr>
-              </p:pic>
-              <p:pic>
-                <p:nvPicPr>
-                  <p:cNvPr id="58" name="Picture 57"/>
-                  <p:cNvPicPr>
-                    <a:picLocks noChangeAspect="1"/>
-                  </p:cNvPicPr>
-                  <p:nvPr/>
-                </p:nvPicPr>
-                <p:blipFill>
-                  <a:blip r:embed="rId4" cstate="print">
-                    <a:extLst>
-                      <a:ext uri="{28A0092B-C50C-407E-A947-70E740481C1C}">
-                        <a14:useLocalDpi xmlns:a14="http://schemas.microsoft.com/office/drawing/2010/main" val="0"/>
-                      </a:ext>
-                    </a:extLst>
-                  </a:blip>
-                  <a:stretch>
-                    <a:fillRect/>
-                  </a:stretch>
-                </p:blipFill>
-                <p:spPr>
-                  <a:xfrm>
-                    <a:off x="5345440" y="6084945"/>
-                    <a:ext cx="280633" cy="225596"/>
-                  </a:xfrm>
-                  <a:prstGeom prst="rect">
-                    <a:avLst/>
-                  </a:prstGeom>
-                </p:spPr>
-              </p:pic>
-              <p:pic>
-                <p:nvPicPr>
-                  <p:cNvPr id="59" name="Picture 58"/>
-                  <p:cNvPicPr>
-                    <a:picLocks noChangeAspect="1"/>
-                  </p:cNvPicPr>
-                  <p:nvPr/>
-                </p:nvPicPr>
-                <p:blipFill>
-                  <a:blip r:embed="rId5" cstate="print">
-                    <a:extLst>
-                      <a:ext uri="{28A0092B-C50C-407E-A947-70E740481C1C}">
-                        <a14:useLocalDpi xmlns:a14="http://schemas.microsoft.com/office/drawing/2010/main" val="0"/>
-                      </a:ext>
-                    </a:extLst>
-                  </a:blip>
-                  <a:stretch>
-                    <a:fillRect/>
-                  </a:stretch>
-                </p:blipFill>
-                <p:spPr>
-                  <a:xfrm>
-                    <a:off x="4515280" y="6084945"/>
-                    <a:ext cx="274386" cy="225596"/>
-                  </a:xfrm>
-                  <a:prstGeom prst="rect">
-                    <a:avLst/>
-                  </a:prstGeom>
-                </p:spPr>
-              </p:pic>
-              <p:pic>
-                <p:nvPicPr>
-                  <p:cNvPr id="60" name="Picture 59"/>
-                  <p:cNvPicPr>
-                    <a:picLocks noChangeAspect="1"/>
-                  </p:cNvPicPr>
-                  <p:nvPr/>
-                </p:nvPicPr>
-                <p:blipFill>
-                  <a:blip r:embed="rId6" cstate="print">
-                    <a:extLst>
-                      <a:ext uri="{28A0092B-C50C-407E-A947-70E740481C1C}">
-                        <a14:useLocalDpi xmlns:a14="http://schemas.microsoft.com/office/drawing/2010/main" val="0"/>
-                      </a:ext>
-                    </a:extLst>
-                  </a:blip>
-                  <a:stretch>
-                    <a:fillRect/>
-                  </a:stretch>
-                </p:blipFill>
-                <p:spPr>
-                  <a:xfrm flipH="1">
-                    <a:off x="2887074" y="6083191"/>
-                    <a:ext cx="255789" cy="218495"/>
-                  </a:xfrm>
-                  <a:prstGeom prst="rect">
-                    <a:avLst/>
-                  </a:prstGeom>
-                </p:spPr>
-              </p:pic>
-            </p:grpSp>
-            <p:pic>
-              <p:nvPicPr>
-                <p:cNvPr id="56" name="Picture 55"/>
-                <p:cNvPicPr>
-                  <a:picLocks noChangeAspect="1"/>
-                </p:cNvPicPr>
-                <p:nvPr/>
-              </p:nvPicPr>
-              <p:blipFill>
-                <a:blip r:embed="rId7"/>
-                <a:stretch>
-                  <a:fillRect/>
-                </a:stretch>
-              </p:blipFill>
-              <p:spPr>
-                <a:xfrm>
-                  <a:off x="4734039" y="6066646"/>
-                  <a:ext cx="302061" cy="235941"/>
-                </a:xfrm>
-                <a:prstGeom prst="rect">
-                  <a:avLst/>
-                </a:prstGeom>
-              </p:spPr>
-            </p:pic>
-          </p:grpSp>
-          <p:pic>
-            <p:nvPicPr>
-              <p:cNvPr id="53" name="Picture 52"/>
-              <p:cNvPicPr>
-                <a:picLocks noChangeAspect="1"/>
-              </p:cNvPicPr>
-              <p:nvPr/>
-            </p:nvPicPr>
-            <p:blipFill>
-              <a:blip r:embed="rId8"/>
-              <a:stretch>
-                <a:fillRect/>
-              </a:stretch>
-            </p:blipFill>
-            <p:spPr>
-              <a:xfrm>
-                <a:off x="3506696" y="6098817"/>
-                <a:ext cx="334903" cy="198223"/>
-              </a:xfrm>
-              <a:prstGeom prst="rect">
-                <a:avLst/>
-              </a:prstGeom>
-            </p:spPr>
-          </p:pic>
-          <p:pic>
-            <p:nvPicPr>
-              <p:cNvPr id="54" name="Picture 53"/>
-              <p:cNvPicPr>
-                <a:picLocks noChangeAspect="1"/>
-              </p:cNvPicPr>
-              <p:nvPr/>
-            </p:nvPicPr>
-            <p:blipFill>
-              <a:blip r:embed="rId9"/>
-              <a:stretch>
-                <a:fillRect/>
-              </a:stretch>
-            </p:blipFill>
-            <p:spPr>
-              <a:xfrm>
-                <a:off x="3107726" y="6098817"/>
-                <a:ext cx="327300" cy="196986"/>
-              </a:xfrm>
-              <a:prstGeom prst="rect">
-                <a:avLst/>
-              </a:prstGeom>
-            </p:spPr>
-          </p:pic>
-        </p:grpSp>
-        <p:grpSp>
-          <p:nvGrpSpPr>
-            <p:cNvPr id="41" name="Group 40"/>
-            <p:cNvGrpSpPr/>
-            <p:nvPr/>
-          </p:nvGrpSpPr>
-          <p:grpSpPr>
-            <a:xfrm>
-              <a:off x="6788883" y="4745568"/>
-              <a:ext cx="4248393" cy="378945"/>
-              <a:chOff x="2721075" y="6066646"/>
-              <a:chExt cx="2738999" cy="243895"/>
-            </a:xfrm>
-          </p:grpSpPr>
-          <p:grpSp>
-            <p:nvGrpSpPr>
-              <p:cNvPr id="43" name="Group 42"/>
-              <p:cNvGrpSpPr/>
-              <p:nvPr/>
-            </p:nvGrpSpPr>
-            <p:grpSpPr>
-              <a:xfrm>
-                <a:off x="2721075" y="6066646"/>
-                <a:ext cx="2738999" cy="243895"/>
-                <a:chOff x="2721075" y="6066646"/>
-                <a:chExt cx="2738999" cy="243895"/>
-              </a:xfrm>
-            </p:grpSpPr>
-            <p:grpSp>
-              <p:nvGrpSpPr>
-                <p:cNvPr id="46" name="Group 45"/>
-                <p:cNvGrpSpPr/>
-                <p:nvPr/>
-              </p:nvGrpSpPr>
-              <p:grpSpPr>
-                <a:xfrm>
-                  <a:off x="2721075" y="6083191"/>
-                  <a:ext cx="2738999" cy="227350"/>
-                  <a:chOff x="2887074" y="6083191"/>
-                  <a:chExt cx="2738999" cy="227350"/>
-                </a:xfrm>
-              </p:grpSpPr>
-              <p:pic>
-                <p:nvPicPr>
-                  <p:cNvPr id="48" name="Picture 47"/>
-                  <p:cNvPicPr>
-                    <a:picLocks noChangeAspect="1"/>
-                  </p:cNvPicPr>
-                  <p:nvPr/>
-                </p:nvPicPr>
-                <p:blipFill>
-                  <a:blip r:embed="rId3" cstate="print">
-                    <a:extLst>
-                      <a:ext uri="{28A0092B-C50C-407E-A947-70E740481C1C}">
-                        <a14:useLocalDpi xmlns:a14="http://schemas.microsoft.com/office/drawing/2010/main" val="0"/>
-                      </a:ext>
-                    </a:extLst>
-                  </a:blip>
-                  <a:stretch>
-                    <a:fillRect/>
-                  </a:stretch>
-                </p:blipFill>
-                <p:spPr>
-                  <a:xfrm>
-                    <a:off x="4079269" y="6103833"/>
-                    <a:ext cx="325640" cy="161565"/>
-                  </a:xfrm>
-                  <a:prstGeom prst="rect">
-                    <a:avLst/>
-                  </a:prstGeom>
-                </p:spPr>
-              </p:pic>
-              <p:pic>
-                <p:nvPicPr>
-                  <p:cNvPr id="49" name="Picture 48"/>
-                  <p:cNvPicPr>
-                    <a:picLocks noChangeAspect="1"/>
-                  </p:cNvPicPr>
-                  <p:nvPr/>
-                </p:nvPicPr>
-                <p:blipFill>
-                  <a:blip r:embed="rId4" cstate="print">
-                    <a:extLst>
-                      <a:ext uri="{28A0092B-C50C-407E-A947-70E740481C1C}">
-                        <a14:useLocalDpi xmlns:a14="http://schemas.microsoft.com/office/drawing/2010/main" val="0"/>
-                      </a:ext>
-                    </a:extLst>
-                  </a:blip>
-                  <a:stretch>
-                    <a:fillRect/>
-                  </a:stretch>
-                </p:blipFill>
-                <p:spPr>
-                  <a:xfrm>
-                    <a:off x="5345440" y="6084945"/>
-                    <a:ext cx="280633" cy="225596"/>
-                  </a:xfrm>
-                  <a:prstGeom prst="rect">
-                    <a:avLst/>
-                  </a:prstGeom>
-                </p:spPr>
-              </p:pic>
-              <p:pic>
-                <p:nvPicPr>
-                  <p:cNvPr id="50" name="Picture 49"/>
-                  <p:cNvPicPr>
-                    <a:picLocks noChangeAspect="1"/>
-                  </p:cNvPicPr>
-                  <p:nvPr/>
-                </p:nvPicPr>
-                <p:blipFill>
-                  <a:blip r:embed="rId5" cstate="print">
-                    <a:extLst>
-                      <a:ext uri="{28A0092B-C50C-407E-A947-70E740481C1C}">
-                        <a14:useLocalDpi xmlns:a14="http://schemas.microsoft.com/office/drawing/2010/main" val="0"/>
-                      </a:ext>
-                    </a:extLst>
-                  </a:blip>
-                  <a:stretch>
-                    <a:fillRect/>
-                  </a:stretch>
-                </p:blipFill>
-                <p:spPr>
-                  <a:xfrm>
-                    <a:off x="4515280" y="6084945"/>
-                    <a:ext cx="274386" cy="225596"/>
-                  </a:xfrm>
-                  <a:prstGeom prst="rect">
-                    <a:avLst/>
-                  </a:prstGeom>
-                </p:spPr>
-              </p:pic>
-              <p:pic>
-                <p:nvPicPr>
-                  <p:cNvPr id="51" name="Picture 50"/>
-                  <p:cNvPicPr>
-                    <a:picLocks noChangeAspect="1"/>
-                  </p:cNvPicPr>
-                  <p:nvPr/>
-                </p:nvPicPr>
-                <p:blipFill>
-                  <a:blip r:embed="rId6" cstate="print">
-                    <a:extLst>
-                      <a:ext uri="{28A0092B-C50C-407E-A947-70E740481C1C}">
-                        <a14:useLocalDpi xmlns:a14="http://schemas.microsoft.com/office/drawing/2010/main" val="0"/>
-                      </a:ext>
-                    </a:extLst>
-                  </a:blip>
-                  <a:stretch>
-                    <a:fillRect/>
-                  </a:stretch>
-                </p:blipFill>
-                <p:spPr>
-                  <a:xfrm flipH="1">
-                    <a:off x="2887074" y="6083191"/>
-                    <a:ext cx="255789" cy="218495"/>
-                  </a:xfrm>
-                  <a:prstGeom prst="rect">
-                    <a:avLst/>
-                  </a:prstGeom>
-                </p:spPr>
-              </p:pic>
-            </p:grpSp>
-            <p:pic>
-              <p:nvPicPr>
-                <p:cNvPr id="47" name="Picture 46"/>
-                <p:cNvPicPr>
-                  <a:picLocks noChangeAspect="1"/>
-                </p:cNvPicPr>
-                <p:nvPr/>
-              </p:nvPicPr>
-              <p:blipFill>
-                <a:blip r:embed="rId7"/>
-                <a:stretch>
-                  <a:fillRect/>
-                </a:stretch>
-              </p:blipFill>
-              <p:spPr>
-                <a:xfrm>
-                  <a:off x="4734039" y="6066646"/>
-                  <a:ext cx="302061" cy="235941"/>
-                </a:xfrm>
-                <a:prstGeom prst="rect">
-                  <a:avLst/>
-                </a:prstGeom>
-              </p:spPr>
-            </p:pic>
-          </p:grpSp>
-          <p:pic>
-            <p:nvPicPr>
-              <p:cNvPr id="44" name="Picture 43"/>
-              <p:cNvPicPr>
-                <a:picLocks noChangeAspect="1"/>
-              </p:cNvPicPr>
-              <p:nvPr/>
-            </p:nvPicPr>
-            <p:blipFill>
-              <a:blip r:embed="rId8"/>
-              <a:stretch>
-                <a:fillRect/>
-              </a:stretch>
-            </p:blipFill>
-            <p:spPr>
-              <a:xfrm>
-                <a:off x="3506696" y="6098817"/>
-                <a:ext cx="334903" cy="198223"/>
-              </a:xfrm>
-              <a:prstGeom prst="rect">
-                <a:avLst/>
-              </a:prstGeom>
-            </p:spPr>
-          </p:pic>
-          <p:pic>
-            <p:nvPicPr>
-              <p:cNvPr id="45" name="Picture 44"/>
-              <p:cNvPicPr>
-                <a:picLocks noChangeAspect="1"/>
-              </p:cNvPicPr>
-              <p:nvPr/>
-            </p:nvPicPr>
-            <p:blipFill>
-              <a:blip r:embed="rId9"/>
-              <a:stretch>
-                <a:fillRect/>
-              </a:stretch>
-            </p:blipFill>
-            <p:spPr>
-              <a:xfrm>
-                <a:off x="3107726" y="6098817"/>
-                <a:ext cx="327300" cy="196986"/>
-              </a:xfrm>
-              <a:prstGeom prst="rect">
-                <a:avLst/>
-              </a:prstGeom>
-            </p:spPr>
-          </p:pic>
-        </p:grpSp>
-        <p:pic>
-          <p:nvPicPr>
-            <p:cNvPr id="42" name="Picture 41"/>
-            <p:cNvPicPr>
-              <a:picLocks noChangeAspect="1"/>
-            </p:cNvPicPr>
-            <p:nvPr/>
-          </p:nvPicPr>
-          <p:blipFill>
-            <a:blip r:embed="rId11"/>
-            <a:stretch>
-              <a:fillRect/>
-            </a:stretch>
-          </p:blipFill>
-          <p:spPr>
-            <a:xfrm>
-              <a:off x="6023991" y="1109733"/>
-              <a:ext cx="5498521" cy="3628041"/>
+              <a:off x="2366005" y="357098"/>
+              <a:ext cx="5305184" cy="3597548"/>
             </a:xfrm>
             <a:prstGeom prst="rect">
               <a:avLst/>
@@ -5150,36 +5085,30 @@
           </p:spPr>
         </p:pic>
       </p:grpSp>
-      <p:sp>
-        <p:nvSpPr>
-          <p:cNvPr id="10" name="TextBox 9"/>
-          <p:cNvSpPr txBox="1"/>
+      <p:pic>
+        <p:nvPicPr>
+          <p:cNvPr id="13" name="Picture 12"/>
+          <p:cNvPicPr>
+            <a:picLocks noChangeAspect="1"/>
+          </p:cNvPicPr>
           <p:nvPr/>
-        </p:nvSpPr>
+        </p:nvPicPr>
+        <p:blipFill>
+          <a:blip r:embed="rId10"/>
+          <a:stretch>
+            <a:fillRect/>
+          </a:stretch>
+        </p:blipFill>
         <p:spPr>
           <a:xfrm>
-            <a:off x="7948246" y="936260"/>
-            <a:ext cx="2391508" cy="369332"/>
+            <a:off x="6050211" y="1203435"/>
+            <a:ext cx="5830565" cy="4049454"/>
           </a:xfrm>
           <a:prstGeom prst="rect">
             <a:avLst/>
           </a:prstGeom>
-          <a:noFill/>
         </p:spPr>
-        <p:txBody>
-          <a:bodyPr wrap="square" rtlCol="0">
-            <a:spAutoFit/>
-          </a:bodyPr>
-          <a:lstStyle/>
-          <a:p>
-            <a:r>
-              <a:rPr lang="en-US" dirty="0" smtClean="0"/>
-              <a:t>Need to order better</a:t>
-            </a:r>
-            <a:endParaRPr lang="en-US" dirty="0"/>
-          </a:p>
-        </p:txBody>
-      </p:sp>
+      </p:pic>
     </p:spTree>
     <p:extLst>
       <p:ext uri="{BB962C8B-B14F-4D97-AF65-F5344CB8AC3E}">
@@ -5212,21 +5141,21 @@
       </p:grpSpPr>
       <p:grpSp>
         <p:nvGrpSpPr>
-          <p:cNvPr id="2" name="Group 1"/>
+          <p:cNvPr id="6" name="Group 5"/>
           <p:cNvGrpSpPr/>
           <p:nvPr/>
         </p:nvGrpSpPr>
         <p:grpSpPr>
           <a:xfrm>
-            <a:off x="383197" y="193318"/>
-            <a:ext cx="6496050" cy="4371975"/>
-            <a:chOff x="383197" y="193318"/>
-            <a:chExt cx="6496050" cy="4371975"/>
+            <a:off x="1011163" y="65596"/>
+            <a:ext cx="9413888" cy="6414784"/>
+            <a:chOff x="1011163" y="65596"/>
+            <a:chExt cx="9413888" cy="6414784"/>
           </a:xfrm>
         </p:grpSpPr>
         <p:pic>
           <p:nvPicPr>
-            <p:cNvPr id="5" name="Picture 4"/>
+            <p:cNvPr id="4" name="Picture 3"/>
             <p:cNvPicPr>
               <a:picLocks noChangeAspect="1"/>
             </p:cNvPicPr>
@@ -5240,8 +5169,8 @@
           </p:blipFill>
           <p:spPr>
             <a:xfrm>
-              <a:off x="383197" y="193318"/>
-              <a:ext cx="6496050" cy="4371975"/>
+              <a:off x="1011163" y="271073"/>
+              <a:ext cx="9413888" cy="6209307"/>
             </a:xfrm>
             <a:prstGeom prst="rect">
               <a:avLst/>
@@ -5256,10 +5185,10 @@
           </p:nvGrpSpPr>
           <p:grpSpPr>
             <a:xfrm>
-              <a:off x="1484560" y="3929312"/>
-              <a:ext cx="5078346" cy="377620"/>
-              <a:chOff x="4076090" y="5589042"/>
-              <a:chExt cx="3274081" cy="243042"/>
+              <a:off x="1899786" y="5483456"/>
+              <a:ext cx="3544834" cy="310479"/>
+              <a:chOff x="4092064" y="5579770"/>
+              <a:chExt cx="3105944" cy="245213"/>
             </a:xfrm>
           </p:grpSpPr>
           <p:grpSp>
@@ -5270,10 +5199,10 @@
             </p:nvGrpSpPr>
             <p:grpSpPr>
               <a:xfrm>
-                <a:off x="4076090" y="5589042"/>
-                <a:ext cx="3274081" cy="243042"/>
-                <a:chOff x="4076090" y="5589042"/>
-                <a:chExt cx="3274081" cy="243042"/>
+                <a:off x="4092064" y="5579770"/>
+                <a:ext cx="3105944" cy="245213"/>
+                <a:chOff x="4092064" y="5579770"/>
+                <a:chExt cx="3105944" cy="245213"/>
               </a:xfrm>
             </p:grpSpPr>
             <p:grpSp>
@@ -5284,10 +5213,10 @@
               </p:nvGrpSpPr>
               <p:grpSpPr>
                 <a:xfrm>
-                  <a:off x="4076090" y="5589042"/>
-                  <a:ext cx="2768069" cy="243042"/>
-                  <a:chOff x="4242089" y="5589042"/>
-                  <a:chExt cx="2768069" cy="243042"/>
+                  <a:off x="4092064" y="5579770"/>
+                  <a:ext cx="2638534" cy="231317"/>
+                  <a:chOff x="4258063" y="5579770"/>
+                  <a:chExt cx="2638534" cy="231317"/>
                 </a:xfrm>
               </p:grpSpPr>
               <p:pic>
@@ -5312,7 +5241,7 @@
                 </p:blipFill>
                 <p:spPr>
                   <a:xfrm>
-                    <a:off x="4720426" y="5634952"/>
+                    <a:off x="4690969" y="5623587"/>
                     <a:ext cx="325640" cy="161565"/>
                   </a:xfrm>
                   <a:prstGeom prst="rect">
@@ -5342,7 +5271,7 @@
                 </p:blipFill>
                 <p:spPr>
                   <a:xfrm>
-                    <a:off x="5202099" y="5606488"/>
+                    <a:off x="5178545" y="5585491"/>
                     <a:ext cx="280633" cy="225596"/>
                   </a:xfrm>
                   <a:prstGeom prst="rect">
@@ -5372,7 +5301,7 @@
                 </p:blipFill>
                 <p:spPr>
                   <a:xfrm>
-                    <a:off x="4242089" y="5589042"/>
+                    <a:off x="4258063" y="5579770"/>
                     <a:ext cx="274386" cy="225596"/>
                   </a:xfrm>
                   <a:prstGeom prst="rect">
@@ -5402,7 +5331,7 @@
                 </p:blipFill>
                 <p:spPr>
                   <a:xfrm flipH="1">
-                    <a:off x="6754369" y="5606488"/>
+                    <a:off x="6640808" y="5592592"/>
                     <a:ext cx="255789" cy="218495"/>
                   </a:xfrm>
                   <a:prstGeom prst="rect">
@@ -5427,7 +5356,7 @@
               </p:blipFill>
               <p:spPr>
                 <a:xfrm>
-                  <a:off x="7048110" y="5589042"/>
+                  <a:off x="6895947" y="5589042"/>
                   <a:ext cx="302061" cy="235941"/>
                 </a:xfrm>
                 <a:prstGeom prst="rect">
@@ -5452,7 +5381,7 @@
             </p:blipFill>
             <p:spPr>
               <a:xfrm>
-                <a:off x="5531841" y="5598294"/>
+                <a:off x="5470546" y="5589042"/>
                 <a:ext cx="334903" cy="198223"/>
               </a:xfrm>
               <a:prstGeom prst="rect">
@@ -5476,7 +5405,7 @@
             </p:blipFill>
             <p:spPr>
               <a:xfrm>
-                <a:off x="6038358" y="5603347"/>
+                <a:off x="5942690" y="5606488"/>
                 <a:ext cx="327300" cy="196986"/>
               </a:xfrm>
               <a:prstGeom prst="rect">
@@ -5485,6 +5414,29 @@
             </p:spPr>
           </p:pic>
         </p:grpSp>
+        <p:pic>
+          <p:nvPicPr>
+            <p:cNvPr id="18" name="Picture 17"/>
+            <p:cNvPicPr>
+              <a:picLocks noChangeAspect="1"/>
+            </p:cNvPicPr>
+            <p:nvPr/>
+          </p:nvPicPr>
+          <p:blipFill rotWithShape="1">
+            <a:blip r:embed="rId10"/>
+            <a:srcRect l="14954" t="272" r="6404" b="94166"/>
+            <a:stretch/>
+          </p:blipFill>
+          <p:spPr>
+            <a:xfrm>
+              <a:off x="3855283" y="65596"/>
+              <a:ext cx="3520440" cy="347472"/>
+            </a:xfrm>
+            <a:prstGeom prst="rect">
+              <a:avLst/>
+            </a:prstGeom>
+          </p:spPr>
+        </p:pic>
       </p:grpSp>
       <p:sp>
         <p:nvSpPr>
@@ -5515,30 +5467,6 @@
           </a:p>
         </p:txBody>
       </p:sp>
-      <p:pic>
-        <p:nvPicPr>
-          <p:cNvPr id="18" name="Picture 17"/>
-          <p:cNvPicPr>
-            <a:picLocks noChangeAspect="1"/>
-          </p:cNvPicPr>
-          <p:nvPr/>
-        </p:nvPicPr>
-        <p:blipFill>
-          <a:blip r:embed="rId10"/>
-          <a:stretch>
-            <a:fillRect/>
-          </a:stretch>
-        </p:blipFill>
-        <p:spPr>
-          <a:xfrm>
-            <a:off x="7121266" y="193318"/>
-            <a:ext cx="4476535" cy="6247158"/>
-          </a:xfrm>
-          <a:prstGeom prst="rect">
-            <a:avLst/>
-          </a:prstGeom>
-        </p:spPr>
-      </p:pic>
     </p:spTree>
     <p:extLst>
       <p:ext uri="{BB962C8B-B14F-4D97-AF65-F5344CB8AC3E}">
@@ -5577,7 +5505,7 @@
         </p:nvSpPr>
         <p:spPr>
           <a:xfrm>
-            <a:off x="1423895" y="5077841"/>
+            <a:off x="1488545" y="5262479"/>
             <a:ext cx="8805672" cy="646331"/>
           </a:xfrm>
           <a:prstGeom prst="rect">
@@ -5641,14 +5569,402 @@
         </p:blipFill>
         <p:spPr>
           <a:xfrm>
-            <a:off x="2075688" y="134914"/>
-            <a:ext cx="6142199" cy="4780304"/>
+            <a:off x="182764" y="1590112"/>
+            <a:ext cx="3639731" cy="2832702"/>
           </a:xfrm>
           <a:prstGeom prst="rect">
             <a:avLst/>
           </a:prstGeom>
         </p:spPr>
       </p:pic>
+      <p:sp>
+        <p:nvSpPr>
+          <p:cNvPr id="3" name="TextBox 2"/>
+          <p:cNvSpPr txBox="1"/>
+          <p:nvPr/>
+        </p:nvSpPr>
+        <p:spPr>
+          <a:xfrm>
+            <a:off x="1802775" y="1220780"/>
+            <a:ext cx="905608" cy="369332"/>
+          </a:xfrm>
+          <a:prstGeom prst="rect">
+            <a:avLst/>
+          </a:prstGeom>
+          <a:noFill/>
+        </p:spPr>
+        <p:txBody>
+          <a:bodyPr wrap="square" rtlCol="0">
+            <a:spAutoFit/>
+          </a:bodyPr>
+          <a:lstStyle/>
+          <a:p>
+            <a:r>
+              <a:rPr lang="en-US" dirty="0" smtClean="0"/>
+              <a:t>OLD</a:t>
+            </a:r>
+            <a:endParaRPr lang="en-US" dirty="0"/>
+          </a:p>
+        </p:txBody>
+      </p:sp>
+      <p:sp>
+        <p:nvSpPr>
+          <p:cNvPr id="5" name="TextBox 4"/>
+          <p:cNvSpPr txBox="1"/>
+          <p:nvPr/>
+        </p:nvSpPr>
+        <p:spPr>
+          <a:xfrm>
+            <a:off x="117817" y="134914"/>
+            <a:ext cx="1060704" cy="369332"/>
+          </a:xfrm>
+          <a:prstGeom prst="rect">
+            <a:avLst/>
+          </a:prstGeom>
+          <a:noFill/>
+        </p:spPr>
+        <p:txBody>
+          <a:bodyPr wrap="square" rtlCol="0">
+            <a:spAutoFit/>
+          </a:bodyPr>
+          <a:lstStyle/>
+          <a:p>
+            <a:r>
+              <a:rPr lang="en-US" dirty="0" smtClean="0"/>
+              <a:t>Fig </a:t>
+            </a:r>
+            <a:r>
+              <a:rPr lang="en-US" dirty="0" smtClean="0"/>
+              <a:t>3a-3c</a:t>
+            </a:r>
+            <a:endParaRPr lang="en-US" dirty="0"/>
+          </a:p>
+        </p:txBody>
+      </p:sp>
+      <p:sp>
+        <p:nvSpPr>
+          <p:cNvPr id="7" name="Rectangle 6"/>
+          <p:cNvSpPr/>
+          <p:nvPr/>
+        </p:nvSpPr>
+        <p:spPr>
+          <a:xfrm>
+            <a:off x="1488545" y="5771846"/>
+            <a:ext cx="8805672" cy="646331"/>
+          </a:xfrm>
+          <a:prstGeom prst="rect">
+            <a:avLst/>
+          </a:prstGeom>
+        </p:spPr>
+        <p:txBody>
+          <a:bodyPr wrap="square">
+            <a:spAutoFit/>
+          </a:bodyPr>
+          <a:lstStyle/>
+          <a:p>
+            <a:r>
+              <a:rPr lang="en-US" dirty="0" smtClean="0"/>
+              <a:t>Figure3b</a:t>
+            </a:r>
+            <a:r>
+              <a:rPr lang="en-US" dirty="0"/>
+              <a:t>. Proportion of transient </a:t>
+            </a:r>
+            <a:r>
+              <a:rPr lang="en-US" dirty="0" smtClean="0"/>
+              <a:t>species </a:t>
+            </a:r>
+            <a:r>
+              <a:rPr lang="en-US" dirty="0"/>
+              <a:t>by </a:t>
+            </a:r>
+            <a:r>
+              <a:rPr lang="en-US" dirty="0" smtClean="0"/>
+              <a:t>log of community </a:t>
+            </a:r>
+            <a:r>
+              <a:rPr lang="en-US" dirty="0"/>
+              <a:t>size </a:t>
+            </a:r>
+            <a:r>
+              <a:rPr lang="en-US" dirty="0" smtClean="0"/>
+              <a:t>(number of individuals), </a:t>
+            </a:r>
+            <a:r>
+              <a:rPr lang="en-US" dirty="0"/>
+              <a:t>colored by taxa, using the hierarchically scaled </a:t>
+            </a:r>
+            <a:r>
+              <a:rPr lang="en-US" dirty="0" smtClean="0"/>
+              <a:t>count datasets</a:t>
+            </a:r>
+            <a:r>
+              <a:rPr lang="en-US" dirty="0"/>
+              <a:t>.</a:t>
+            </a:r>
+          </a:p>
+        </p:txBody>
+      </p:sp>
+      <p:pic>
+        <p:nvPicPr>
+          <p:cNvPr id="9" name="Picture 8"/>
+          <p:cNvPicPr>
+            <a:picLocks noChangeAspect="1"/>
+          </p:cNvPicPr>
+          <p:nvPr/>
+        </p:nvPicPr>
+        <p:blipFill>
+          <a:blip r:embed="rId3"/>
+          <a:stretch>
+            <a:fillRect/>
+          </a:stretch>
+        </p:blipFill>
+        <p:spPr>
+          <a:xfrm>
+            <a:off x="3794298" y="1554417"/>
+            <a:ext cx="3702031" cy="2904091"/>
+          </a:xfrm>
+          <a:prstGeom prst="rect">
+            <a:avLst/>
+          </a:prstGeom>
+        </p:spPr>
+      </p:pic>
+      <p:sp>
+        <p:nvSpPr>
+          <p:cNvPr id="10" name="Rectangle 9"/>
+          <p:cNvSpPr/>
+          <p:nvPr/>
+        </p:nvSpPr>
+        <p:spPr>
+          <a:xfrm>
+            <a:off x="1488545" y="6418177"/>
+            <a:ext cx="8805672" cy="369332"/>
+          </a:xfrm>
+          <a:prstGeom prst="rect">
+            <a:avLst/>
+          </a:prstGeom>
+        </p:spPr>
+        <p:txBody>
+          <a:bodyPr wrap="square">
+            <a:spAutoFit/>
+          </a:bodyPr>
+          <a:lstStyle/>
+          <a:p>
+            <a:r>
+              <a:rPr lang="en-US" dirty="0" smtClean="0"/>
+              <a:t>Figure3c. Predicted values of hierarchically scaled count datasets by taxa. </a:t>
+            </a:r>
+            <a:endParaRPr lang="en-US" dirty="0"/>
+          </a:p>
+        </p:txBody>
+      </p:sp>
+      <p:grpSp>
+        <p:nvGrpSpPr>
+          <p:cNvPr id="11" name="Group 10"/>
+          <p:cNvGrpSpPr/>
+          <p:nvPr/>
+        </p:nvGrpSpPr>
+        <p:grpSpPr>
+          <a:xfrm>
+            <a:off x="7550900" y="1220780"/>
+            <a:ext cx="4641100" cy="3107842"/>
+            <a:chOff x="2523391" y="2055046"/>
+            <a:chExt cx="5603165" cy="3804378"/>
+          </a:xfrm>
+        </p:grpSpPr>
+        <p:pic>
+          <p:nvPicPr>
+            <p:cNvPr id="12" name="Picture 11"/>
+            <p:cNvPicPr>
+              <a:picLocks noChangeAspect="1"/>
+            </p:cNvPicPr>
+            <p:nvPr/>
+          </p:nvPicPr>
+          <p:blipFill>
+            <a:blip r:embed="rId4"/>
+            <a:stretch>
+              <a:fillRect/>
+            </a:stretch>
+          </p:blipFill>
+          <p:spPr>
+            <a:xfrm>
+              <a:off x="2523391" y="2055046"/>
+              <a:ext cx="5603165" cy="3695431"/>
+            </a:xfrm>
+            <a:prstGeom prst="rect">
+              <a:avLst/>
+            </a:prstGeom>
+          </p:spPr>
+        </p:pic>
+        <p:pic>
+          <p:nvPicPr>
+            <p:cNvPr id="13" name="Picture 12"/>
+            <p:cNvPicPr>
+              <a:picLocks noChangeAspect="1"/>
+            </p:cNvPicPr>
+            <p:nvPr/>
+          </p:nvPicPr>
+          <p:blipFill>
+            <a:blip r:embed="rId5" cstate="print">
+              <a:extLst>
+                <a:ext uri="{28A0092B-C50C-407E-A947-70E740481C1C}">
+                  <a14:useLocalDpi xmlns:a14="http://schemas.microsoft.com/office/drawing/2010/main" val="0"/>
+                </a:ext>
+              </a:extLst>
+            </a:blip>
+            <a:stretch>
+              <a:fillRect/>
+            </a:stretch>
+          </p:blipFill>
+          <p:spPr>
+            <a:xfrm>
+              <a:off x="4087390" y="5509841"/>
+              <a:ext cx="496473" cy="287080"/>
+            </a:xfrm>
+            <a:prstGeom prst="rect">
+              <a:avLst/>
+            </a:prstGeom>
+          </p:spPr>
+        </p:pic>
+        <p:pic>
+          <p:nvPicPr>
+            <p:cNvPr id="14" name="Picture 13"/>
+            <p:cNvPicPr>
+              <a:picLocks noChangeAspect="1"/>
+            </p:cNvPicPr>
+            <p:nvPr/>
+          </p:nvPicPr>
+          <p:blipFill>
+            <a:blip r:embed="rId6" cstate="print">
+              <a:extLst>
+                <a:ext uri="{28A0092B-C50C-407E-A947-70E740481C1C}">
+                  <a14:useLocalDpi xmlns:a14="http://schemas.microsoft.com/office/drawing/2010/main" val="0"/>
+                </a:ext>
+              </a:extLst>
+            </a:blip>
+            <a:stretch>
+              <a:fillRect/>
+            </a:stretch>
+          </p:blipFill>
+          <p:spPr>
+            <a:xfrm>
+              <a:off x="4943339" y="5452954"/>
+              <a:ext cx="427855" cy="400855"/>
+            </a:xfrm>
+            <a:prstGeom prst="rect">
+              <a:avLst/>
+            </a:prstGeom>
+          </p:spPr>
+        </p:pic>
+        <p:pic>
+          <p:nvPicPr>
+            <p:cNvPr id="15" name="Picture 14"/>
+            <p:cNvPicPr>
+              <a:picLocks noChangeAspect="1"/>
+            </p:cNvPicPr>
+            <p:nvPr/>
+          </p:nvPicPr>
+          <p:blipFill>
+            <a:blip r:embed="rId7" cstate="print">
+              <a:extLst>
+                <a:ext uri="{28A0092B-C50C-407E-A947-70E740481C1C}">
+                  <a14:useLocalDpi xmlns:a14="http://schemas.microsoft.com/office/drawing/2010/main" val="0"/>
+                </a:ext>
+              </a:extLst>
+            </a:blip>
+            <a:stretch>
+              <a:fillRect/>
+            </a:stretch>
+          </p:blipFill>
+          <p:spPr>
+            <a:xfrm>
+              <a:off x="3303442" y="5452954"/>
+              <a:ext cx="418331" cy="400855"/>
+            </a:xfrm>
+            <a:prstGeom prst="rect">
+              <a:avLst/>
+            </a:prstGeom>
+          </p:spPr>
+        </p:pic>
+        <p:pic>
+          <p:nvPicPr>
+            <p:cNvPr id="16" name="Picture 15"/>
+            <p:cNvPicPr>
+              <a:picLocks noChangeAspect="1"/>
+            </p:cNvPicPr>
+            <p:nvPr/>
+          </p:nvPicPr>
+          <p:blipFill>
+            <a:blip r:embed="rId8" cstate="print">
+              <a:extLst>
+                <a:ext uri="{28A0092B-C50C-407E-A947-70E740481C1C}">
+                  <a14:useLocalDpi xmlns:a14="http://schemas.microsoft.com/office/drawing/2010/main" val="0"/>
+                </a:ext>
+              </a:extLst>
+            </a:blip>
+            <a:stretch>
+              <a:fillRect/>
+            </a:stretch>
+          </p:blipFill>
+          <p:spPr>
+            <a:xfrm flipH="1">
+              <a:off x="7517388" y="5471187"/>
+              <a:ext cx="389978" cy="388237"/>
+            </a:xfrm>
+            <a:prstGeom prst="rect">
+              <a:avLst/>
+            </a:prstGeom>
+          </p:spPr>
+        </p:pic>
+        <p:pic>
+          <p:nvPicPr>
+            <p:cNvPr id="17" name="Picture 16"/>
+            <p:cNvPicPr>
+              <a:picLocks noChangeAspect="1"/>
+            </p:cNvPicPr>
+            <p:nvPr/>
+          </p:nvPicPr>
+          <p:blipFill>
+            <a:blip r:embed="rId9"/>
+            <a:stretch>
+              <a:fillRect/>
+            </a:stretch>
+          </p:blipFill>
+          <p:spPr>
+            <a:xfrm>
+              <a:off x="5765321" y="5477273"/>
+              <a:ext cx="510596" cy="352216"/>
+            </a:xfrm>
+            <a:prstGeom prst="rect">
+              <a:avLst/>
+            </a:prstGeom>
+          </p:spPr>
+        </p:pic>
+        <p:pic>
+          <p:nvPicPr>
+            <p:cNvPr id="18" name="Picture 17"/>
+            <p:cNvPicPr>
+              <a:picLocks noChangeAspect="1"/>
+            </p:cNvPicPr>
+            <p:nvPr/>
+          </p:nvPicPr>
+          <p:blipFill>
+            <a:blip r:embed="rId10"/>
+            <a:stretch>
+              <a:fillRect/>
+            </a:stretch>
+          </p:blipFill>
+          <p:spPr>
+            <a:xfrm>
+              <a:off x="6577228" y="5479471"/>
+              <a:ext cx="499004" cy="350018"/>
+            </a:xfrm>
+            <a:prstGeom prst="rect">
+              <a:avLst/>
+            </a:prstGeom>
+          </p:spPr>
+        </p:pic>
+      </p:grpSp>
     </p:spTree>
     <p:extLst>
       <p:ext uri="{BB962C8B-B14F-4D97-AF65-F5344CB8AC3E}">
@@ -5679,70 +5995,6 @@
           <a:chExt cx="0" cy="0"/>
         </a:xfrm>
       </p:grpSpPr>
-      <p:sp>
-        <p:nvSpPr>
-          <p:cNvPr id="6" name="Rectangle 5"/>
-          <p:cNvSpPr/>
-          <p:nvPr/>
-        </p:nvSpPr>
-        <p:spPr>
-          <a:xfrm>
-            <a:off x="1432687" y="4348079"/>
-            <a:ext cx="8805672" cy="646331"/>
-          </a:xfrm>
-          <a:prstGeom prst="rect">
-            <a:avLst/>
-          </a:prstGeom>
-        </p:spPr>
-        <p:txBody>
-          <a:bodyPr wrap="square">
-            <a:spAutoFit/>
-          </a:bodyPr>
-          <a:lstStyle/>
-          <a:p>
-            <a:r>
-              <a:rPr lang="en-US" dirty="0" smtClean="0"/>
-              <a:t>Figure3b</a:t>
-            </a:r>
-            <a:r>
-              <a:rPr lang="en-US" dirty="0"/>
-              <a:t>. Proportion of transient </a:t>
-            </a:r>
-            <a:r>
-              <a:rPr lang="en-US" dirty="0" smtClean="0"/>
-              <a:t>species </a:t>
-            </a:r>
-            <a:r>
-              <a:rPr lang="en-US" dirty="0"/>
-              <a:t>by </a:t>
-            </a:r>
-            <a:r>
-              <a:rPr lang="en-US" dirty="0" smtClean="0"/>
-              <a:t>log of community </a:t>
-            </a:r>
-            <a:r>
-              <a:rPr lang="en-US" dirty="0"/>
-              <a:t>size </a:t>
-            </a:r>
-            <a:r>
-              <a:rPr lang="en-US" dirty="0" smtClean="0"/>
-              <a:t>(number of individuals), </a:t>
-            </a:r>
-            <a:r>
-              <a:rPr lang="en-US" dirty="0"/>
-              <a:t>colored by taxa, using the hierarchically scaled </a:t>
-            </a:r>
-            <a:r>
-              <a:rPr lang="en-US" dirty="0" smtClean="0"/>
-              <a:t>count datasets</a:t>
-            </a:r>
-            <a:r>
-              <a:rPr lang="en-US" dirty="0"/>
-              <a:t>.</a:t>
-            </a:r>
-          </a:p>
-        </p:txBody>
-      </p:sp>
       <p:pic>
         <p:nvPicPr>
           <p:cNvPr id="2" name="Picture 1"/>
@@ -5759,449 +6011,8 @@
         </p:blipFill>
         <p:spPr>
           <a:xfrm>
-            <a:off x="9601981" y="4914900"/>
-            <a:ext cx="2315845" cy="1789517"/>
-          </a:xfrm>
-          <a:prstGeom prst="rect">
-            <a:avLst/>
-          </a:prstGeom>
-        </p:spPr>
-      </p:pic>
-      <p:sp>
-        <p:nvSpPr>
-          <p:cNvPr id="4" name="TextBox 3"/>
-          <p:cNvSpPr txBox="1"/>
-          <p:nvPr/>
-        </p:nvSpPr>
-        <p:spPr>
-          <a:xfrm>
-            <a:off x="8765931" y="1757124"/>
-            <a:ext cx="1761764" cy="369332"/>
-          </a:xfrm>
-          <a:prstGeom prst="rect">
-            <a:avLst/>
-          </a:prstGeom>
-          <a:noFill/>
-        </p:spPr>
-        <p:txBody>
-          <a:bodyPr wrap="none" rtlCol="0">
-            <a:spAutoFit/>
-          </a:bodyPr>
-          <a:lstStyle/>
-          <a:p>
-            <a:r>
-              <a:rPr lang="en-US" dirty="0" smtClean="0"/>
-              <a:t>Count data ONLY</a:t>
-            </a:r>
-          </a:p>
-        </p:txBody>
-      </p:sp>
-      <p:pic>
-        <p:nvPicPr>
-          <p:cNvPr id="5" name="Picture 4"/>
-          <p:cNvPicPr>
-            <a:picLocks noChangeAspect="1"/>
-          </p:cNvPicPr>
-          <p:nvPr/>
-        </p:nvPicPr>
-        <p:blipFill>
-          <a:blip r:embed="rId3"/>
-          <a:stretch>
-            <a:fillRect/>
-          </a:stretch>
-        </p:blipFill>
-        <p:spPr>
-          <a:xfrm>
-            <a:off x="2523744" y="129172"/>
-            <a:ext cx="5449824" cy="4218907"/>
-          </a:xfrm>
-          <a:prstGeom prst="rect">
-            <a:avLst/>
-          </a:prstGeom>
-        </p:spPr>
-      </p:pic>
-    </p:spTree>
-    <p:extLst>
-      <p:ext uri="{BB962C8B-B14F-4D97-AF65-F5344CB8AC3E}">
-        <p14:creationId xmlns:p14="http://schemas.microsoft.com/office/powerpoint/2010/main" val="2173986586"/>
-      </p:ext>
-    </p:extLst>
-  </p:cSld>
-  <p:clrMapOvr>
-    <a:masterClrMapping/>
-  </p:clrMapOvr>
-</p:sld>
-</file>
-
-<file path=ppt/slides/slide6.xml><?xml version="1.0" encoding="utf-8"?>
-<p:sld xmlns:a="http://schemas.openxmlformats.org/drawingml/2006/main" xmlns:r="http://schemas.openxmlformats.org/officeDocument/2006/relationships" xmlns:p="http://schemas.openxmlformats.org/presentationml/2006/main">
-  <p:cSld>
-    <p:spTree>
-      <p:nvGrpSpPr>
-        <p:cNvPr id="1" name=""/>
-        <p:cNvGrpSpPr/>
-        <p:nvPr/>
-      </p:nvGrpSpPr>
-      <p:grpSpPr>
-        <a:xfrm>
-          <a:off x="0" y="0"/>
-          <a:ext cx="0" cy="0"/>
-          <a:chOff x="0" y="0"/>
-          <a:chExt cx="0" cy="0"/>
-        </a:xfrm>
-      </p:grpSpPr>
-      <p:sp>
-        <p:nvSpPr>
-          <p:cNvPr id="6" name="Rectangle 5"/>
-          <p:cNvSpPr/>
-          <p:nvPr/>
-        </p:nvSpPr>
-        <p:spPr>
-          <a:xfrm>
-            <a:off x="1318816" y="4130898"/>
-            <a:ext cx="8805672" cy="369332"/>
-          </a:xfrm>
-          <a:prstGeom prst="rect">
-            <a:avLst/>
-          </a:prstGeom>
-        </p:spPr>
-        <p:txBody>
-          <a:bodyPr wrap="square">
-            <a:spAutoFit/>
-          </a:bodyPr>
-          <a:lstStyle/>
-          <a:p>
-            <a:r>
-              <a:rPr lang="en-US" dirty="0" smtClean="0"/>
-              <a:t>Figure3c. Predicted values of hierarchically scaled count datasets by taxa. </a:t>
-            </a:r>
-            <a:endParaRPr lang="en-US" dirty="0"/>
-          </a:p>
-        </p:txBody>
-      </p:sp>
-      <p:grpSp>
-        <p:nvGrpSpPr>
-          <p:cNvPr id="5" name="Group 4"/>
-          <p:cNvGrpSpPr/>
-          <p:nvPr/>
-        </p:nvGrpSpPr>
-        <p:grpSpPr>
-          <a:xfrm>
-            <a:off x="1952223" y="390061"/>
-            <a:ext cx="5336599" cy="3740837"/>
-            <a:chOff x="1952223" y="390061"/>
-            <a:chExt cx="5336599" cy="3740837"/>
-          </a:xfrm>
-        </p:grpSpPr>
-        <p:grpSp>
-          <p:nvGrpSpPr>
-            <p:cNvPr id="3" name="Group 2"/>
-            <p:cNvGrpSpPr/>
-            <p:nvPr/>
-          </p:nvGrpSpPr>
-          <p:grpSpPr>
-            <a:xfrm>
-              <a:off x="1952223" y="390061"/>
-              <a:ext cx="5336599" cy="3385443"/>
-              <a:chOff x="1952223" y="390061"/>
-              <a:chExt cx="5336599" cy="3385443"/>
-            </a:xfrm>
-          </p:grpSpPr>
-          <p:pic>
-            <p:nvPicPr>
-              <p:cNvPr id="2" name="Picture 1"/>
-              <p:cNvPicPr>
-                <a:picLocks noChangeAspect="1"/>
-              </p:cNvPicPr>
-              <p:nvPr/>
-            </p:nvPicPr>
-            <p:blipFill rotWithShape="1">
-              <a:blip r:embed="rId2"/>
-              <a:srcRect b="12443"/>
-              <a:stretch/>
-            </p:blipFill>
-            <p:spPr>
-              <a:xfrm>
-                <a:off x="1952223" y="390061"/>
-                <a:ext cx="5336599" cy="3079154"/>
-              </a:xfrm>
-              <a:prstGeom prst="rect">
-                <a:avLst/>
-              </a:prstGeom>
-            </p:spPr>
-          </p:pic>
-          <p:grpSp>
-            <p:nvGrpSpPr>
-              <p:cNvPr id="7" name="Group 6"/>
-              <p:cNvGrpSpPr/>
-              <p:nvPr/>
-            </p:nvGrpSpPr>
-            <p:grpSpPr>
-              <a:xfrm>
-                <a:off x="2406580" y="3343650"/>
-                <a:ext cx="4744647" cy="431854"/>
-                <a:chOff x="4122147" y="5589042"/>
-                <a:chExt cx="2631740" cy="243042"/>
-              </a:xfrm>
-            </p:grpSpPr>
-            <p:grpSp>
-              <p:nvGrpSpPr>
-                <p:cNvPr id="11" name="Group 10"/>
-                <p:cNvGrpSpPr/>
-                <p:nvPr/>
-              </p:nvGrpSpPr>
-              <p:grpSpPr>
-                <a:xfrm>
-                  <a:off x="4122147" y="5589042"/>
-                  <a:ext cx="2631740" cy="243042"/>
-                  <a:chOff x="4288146" y="5589042"/>
-                  <a:chExt cx="2631740" cy="243042"/>
-                </a:xfrm>
-              </p:grpSpPr>
-              <p:pic>
-                <p:nvPicPr>
-                  <p:cNvPr id="13" name="Picture 12"/>
-                  <p:cNvPicPr>
-                    <a:picLocks noChangeAspect="1"/>
-                  </p:cNvPicPr>
-                  <p:nvPr/>
-                </p:nvPicPr>
-                <p:blipFill>
-                  <a:blip r:embed="rId3" cstate="print">
-                    <a:extLst>
-                      <a:ext uri="{28A0092B-C50C-407E-A947-70E740481C1C}">
-                        <a14:useLocalDpi xmlns:a14="http://schemas.microsoft.com/office/drawing/2010/main" val="0"/>
-                      </a:ext>
-                    </a:extLst>
-                  </a:blip>
-                  <a:stretch>
-                    <a:fillRect/>
-                  </a:stretch>
-                </p:blipFill>
-                <p:spPr>
-                  <a:xfrm>
-                    <a:off x="4720426" y="5634952"/>
-                    <a:ext cx="325640" cy="161565"/>
-                  </a:xfrm>
-                  <a:prstGeom prst="rect">
-                    <a:avLst/>
-                  </a:prstGeom>
-                </p:spPr>
-              </p:pic>
-              <p:pic>
-                <p:nvPicPr>
-                  <p:cNvPr id="14" name="Picture 13"/>
-                  <p:cNvPicPr>
-                    <a:picLocks noChangeAspect="1"/>
-                  </p:cNvPicPr>
-                  <p:nvPr/>
-                </p:nvPicPr>
-                <p:blipFill>
-                  <a:blip r:embed="rId4" cstate="print">
-                    <a:extLst>
-                      <a:ext uri="{28A0092B-C50C-407E-A947-70E740481C1C}">
-                        <a14:useLocalDpi xmlns:a14="http://schemas.microsoft.com/office/drawing/2010/main" val="0"/>
-                      </a:ext>
-                    </a:extLst>
-                  </a:blip>
-                  <a:stretch>
-                    <a:fillRect/>
-                  </a:stretch>
-                </p:blipFill>
-                <p:spPr>
-                  <a:xfrm>
-                    <a:off x="5202099" y="5606488"/>
-                    <a:ext cx="280633" cy="225596"/>
-                  </a:xfrm>
-                  <a:prstGeom prst="rect">
-                    <a:avLst/>
-                  </a:prstGeom>
-                </p:spPr>
-              </p:pic>
-              <p:pic>
-                <p:nvPicPr>
-                  <p:cNvPr id="15" name="Picture 14"/>
-                  <p:cNvPicPr>
-                    <a:picLocks noChangeAspect="1"/>
-                  </p:cNvPicPr>
-                  <p:nvPr/>
-                </p:nvPicPr>
-                <p:blipFill>
-                  <a:blip r:embed="rId5" cstate="print">
-                    <a:extLst>
-                      <a:ext uri="{28A0092B-C50C-407E-A947-70E740481C1C}">
-                        <a14:useLocalDpi xmlns:a14="http://schemas.microsoft.com/office/drawing/2010/main" val="0"/>
-                      </a:ext>
-                    </a:extLst>
-                  </a:blip>
-                  <a:stretch>
-                    <a:fillRect/>
-                  </a:stretch>
-                </p:blipFill>
-                <p:spPr>
-                  <a:xfrm>
-                    <a:off x="4288146" y="5589042"/>
-                    <a:ext cx="274386" cy="225596"/>
-                  </a:xfrm>
-                  <a:prstGeom prst="rect">
-                    <a:avLst/>
-                  </a:prstGeom>
-                </p:spPr>
-              </p:pic>
-              <p:pic>
-                <p:nvPicPr>
-                  <p:cNvPr id="16" name="Picture 15"/>
-                  <p:cNvPicPr>
-                    <a:picLocks noChangeAspect="1"/>
-                  </p:cNvPicPr>
-                  <p:nvPr/>
-                </p:nvPicPr>
-                <p:blipFill>
-                  <a:blip r:embed="rId6" cstate="print">
-                    <a:extLst>
-                      <a:ext uri="{28A0092B-C50C-407E-A947-70E740481C1C}">
-                        <a14:useLocalDpi xmlns:a14="http://schemas.microsoft.com/office/drawing/2010/main" val="0"/>
-                      </a:ext>
-                    </a:extLst>
-                  </a:blip>
-                  <a:stretch>
-                    <a:fillRect/>
-                  </a:stretch>
-                </p:blipFill>
-                <p:spPr>
-                  <a:xfrm flipH="1">
-                    <a:off x="6664097" y="5596143"/>
-                    <a:ext cx="255789" cy="218495"/>
-                  </a:xfrm>
-                  <a:prstGeom prst="rect">
-                    <a:avLst/>
-                  </a:prstGeom>
-                </p:spPr>
-              </p:pic>
-            </p:grpSp>
-            <p:pic>
-              <p:nvPicPr>
-                <p:cNvPr id="9" name="Picture 8"/>
-                <p:cNvPicPr>
-                  <a:picLocks noChangeAspect="1"/>
-                </p:cNvPicPr>
-                <p:nvPr/>
-              </p:nvPicPr>
-              <p:blipFill>
-                <a:blip r:embed="rId7"/>
-                <a:stretch>
-                  <a:fillRect/>
-                </a:stretch>
-              </p:blipFill>
-              <p:spPr>
-                <a:xfrm>
-                  <a:off x="5472766" y="5596143"/>
-                  <a:ext cx="334903" cy="198223"/>
-                </a:xfrm>
-                <a:prstGeom prst="rect">
-                  <a:avLst/>
-                </a:prstGeom>
-              </p:spPr>
-            </p:pic>
-            <p:pic>
-              <p:nvPicPr>
-                <p:cNvPr id="10" name="Picture 9"/>
-                <p:cNvPicPr>
-                  <a:picLocks noChangeAspect="1"/>
-                </p:cNvPicPr>
-                <p:nvPr/>
-              </p:nvPicPr>
-              <p:blipFill>
-                <a:blip r:embed="rId8"/>
-                <a:stretch>
-                  <a:fillRect/>
-                </a:stretch>
-              </p:blipFill>
-              <p:spPr>
-                <a:xfrm>
-                  <a:off x="5965563" y="5603347"/>
-                  <a:ext cx="327300" cy="196986"/>
-                </a:xfrm>
-                <a:prstGeom prst="rect">
-                  <a:avLst/>
-                </a:prstGeom>
-              </p:spPr>
-            </p:pic>
-          </p:grpSp>
-        </p:grpSp>
-        <p:pic>
-          <p:nvPicPr>
-            <p:cNvPr id="4" name="Picture 3"/>
-            <p:cNvPicPr>
-              <a:picLocks noChangeAspect="1"/>
-            </p:cNvPicPr>
-            <p:nvPr/>
-          </p:nvPicPr>
-          <p:blipFill>
-            <a:blip r:embed="rId9"/>
-            <a:stretch>
-              <a:fillRect/>
-            </a:stretch>
-          </p:blipFill>
-          <p:spPr>
-            <a:xfrm>
-              <a:off x="4237588" y="3820904"/>
-              <a:ext cx="765868" cy="309994"/>
-            </a:xfrm>
-            <a:prstGeom prst="rect">
-              <a:avLst/>
-            </a:prstGeom>
-          </p:spPr>
-        </p:pic>
-      </p:grpSp>
-    </p:spTree>
-    <p:extLst>
-      <p:ext uri="{BB962C8B-B14F-4D97-AF65-F5344CB8AC3E}">
-        <p14:creationId xmlns:p14="http://schemas.microsoft.com/office/powerpoint/2010/main" val="894196904"/>
-      </p:ext>
-    </p:extLst>
-  </p:cSld>
-  <p:clrMapOvr>
-    <a:masterClrMapping/>
-  </p:clrMapOvr>
-</p:sld>
-</file>
-
-<file path=ppt/slides/slide7.xml><?xml version="1.0" encoding="utf-8"?>
-<p:sld xmlns:a="http://schemas.openxmlformats.org/drawingml/2006/main" xmlns:r="http://schemas.openxmlformats.org/officeDocument/2006/relationships" xmlns:p="http://schemas.openxmlformats.org/presentationml/2006/main">
-  <p:cSld>
-    <p:spTree>
-      <p:nvGrpSpPr>
-        <p:cNvPr id="1" name=""/>
-        <p:cNvGrpSpPr/>
-        <p:nvPr/>
-      </p:nvGrpSpPr>
-      <p:grpSpPr>
-        <a:xfrm>
-          <a:off x="0" y="0"/>
-          <a:ext cx="0" cy="0"/>
-          <a:chOff x="0" y="0"/>
-          <a:chExt cx="0" cy="0"/>
-        </a:xfrm>
-      </p:grpSpPr>
-      <p:pic>
-        <p:nvPicPr>
-          <p:cNvPr id="5" name="Picture 4"/>
-          <p:cNvPicPr>
-            <a:picLocks noChangeAspect="1"/>
-          </p:cNvPicPr>
-          <p:nvPr/>
-        </p:nvPicPr>
-        <p:blipFill>
-          <a:blip r:embed="rId2"/>
-          <a:stretch>
-            <a:fillRect/>
-          </a:stretch>
-        </p:blipFill>
-        <p:spPr>
-          <a:xfrm>
-            <a:off x="914399" y="3500634"/>
-            <a:ext cx="4192287" cy="2810995"/>
+            <a:off x="0" y="940777"/>
+            <a:ext cx="5667375" cy="390525"/>
           </a:xfrm>
           <a:prstGeom prst="rect">
             <a:avLst/>
@@ -6210,28 +6021,112 @@
       </p:pic>
       <p:pic>
         <p:nvPicPr>
-          <p:cNvPr id="6" name="Picture 5"/>
+          <p:cNvPr id="3" name="Picture 2"/>
+          <p:cNvPicPr>
+            <a:picLocks noChangeAspect="1"/>
+          </p:cNvPicPr>
+          <p:nvPr/>
+        </p:nvPicPr>
+        <p:blipFill rotWithShape="1">
+          <a:blip r:embed="rId3"/>
+          <a:srcRect b="396"/>
+          <a:stretch/>
+        </p:blipFill>
+        <p:spPr>
+          <a:xfrm>
+            <a:off x="195993" y="1331302"/>
+            <a:ext cx="5275387" cy="3918031"/>
+          </a:xfrm>
+          <a:prstGeom prst="rect">
+            <a:avLst/>
+          </a:prstGeom>
+        </p:spPr>
+      </p:pic>
+      <p:pic>
+        <p:nvPicPr>
+          <p:cNvPr id="4" name="Picture 3"/>
+          <p:cNvPicPr>
+            <a:picLocks noChangeAspect="1"/>
+          </p:cNvPicPr>
+          <p:nvPr/>
+        </p:nvPicPr>
+        <p:blipFill rotWithShape="1">
+          <a:blip r:embed="rId4"/>
+          <a:srcRect l="327"/>
+          <a:stretch/>
+        </p:blipFill>
+        <p:spPr>
+          <a:xfrm>
+            <a:off x="6418388" y="1268158"/>
+            <a:ext cx="5349934" cy="3981175"/>
+          </a:xfrm>
+          <a:prstGeom prst="rect">
+            <a:avLst/>
+          </a:prstGeom>
+        </p:spPr>
+      </p:pic>
+      <p:pic>
+        <p:nvPicPr>
+          <p:cNvPr id="7" name="Picture 6"/>
           <p:cNvPicPr>
             <a:picLocks noChangeAspect="1"/>
           </p:cNvPicPr>
           <p:nvPr/>
         </p:nvPicPr>
         <p:blipFill>
-          <a:blip r:embed="rId3"/>
+          <a:blip r:embed="rId5"/>
           <a:stretch>
             <a:fillRect/>
           </a:stretch>
         </p:blipFill>
         <p:spPr>
           <a:xfrm>
-            <a:off x="1106424" y="128913"/>
-            <a:ext cx="3410712" cy="2871164"/>
+            <a:off x="5237288" y="1736282"/>
+            <a:ext cx="1181100" cy="2457450"/>
           </a:xfrm>
           <a:prstGeom prst="rect">
             <a:avLst/>
           </a:prstGeom>
         </p:spPr>
       </p:pic>
+      <p:sp>
+        <p:nvSpPr>
+          <p:cNvPr id="8" name="TextBox 7"/>
+          <p:cNvSpPr txBox="1"/>
+          <p:nvPr/>
+        </p:nvSpPr>
+        <p:spPr>
+          <a:xfrm>
+            <a:off x="117817" y="134914"/>
+            <a:ext cx="1060704" cy="369332"/>
+          </a:xfrm>
+          <a:prstGeom prst="rect">
+            <a:avLst/>
+          </a:prstGeom>
+          <a:noFill/>
+        </p:spPr>
+        <p:txBody>
+          <a:bodyPr wrap="square" rtlCol="0">
+            <a:spAutoFit/>
+          </a:bodyPr>
+          <a:lstStyle/>
+          <a:p>
+            <a:r>
+              <a:rPr lang="en-US" dirty="0" smtClean="0"/>
+              <a:t>Fig </a:t>
+            </a:r>
+            <a:r>
+              <a:rPr lang="en-US" dirty="0"/>
+              <a:t>4</a:t>
+            </a:r>
+            <a:r>
+              <a:rPr lang="en-US" dirty="0" smtClean="0"/>
+              <a:t>a-4d</a:t>
+            </a:r>
+            <a:endParaRPr lang="en-US" dirty="0"/>
+          </a:p>
+        </p:txBody>
+      </p:sp>
     </p:spTree>
     <p:extLst>
       <p:ext uri="{BB962C8B-B14F-4D97-AF65-F5344CB8AC3E}">
@@ -6245,7 +6140,7 @@
 </p:sld>
 </file>
 
-<file path=ppt/slides/slide8.xml><?xml version="1.0" encoding="utf-8"?>
+<file path=ppt/slides/slide6.xml><?xml version="1.0" encoding="utf-8"?>
 <p:sld xmlns:a="http://schemas.openxmlformats.org/drawingml/2006/main" xmlns:r="http://schemas.openxmlformats.org/officeDocument/2006/relationships" xmlns:p="http://schemas.openxmlformats.org/presentationml/2006/main">
   <p:cSld>
     <p:spTree>

</xml_diff>

<commit_message>
fixed area plot formatting
</commit_message>
<xml_diff>
--- a/output/plots/all_figs_with_legends.pptx
+++ b/output/plots/all_figs_with_legends.pptx
@@ -5553,60 +5553,6 @@
           </a:p>
         </p:txBody>
       </p:sp>
-      <p:pic>
-        <p:nvPicPr>
-          <p:cNvPr id="2" name="Picture 1"/>
-          <p:cNvPicPr>
-            <a:picLocks noChangeAspect="1"/>
-          </p:cNvPicPr>
-          <p:nvPr/>
-        </p:nvPicPr>
-        <p:blipFill>
-          <a:blip r:embed="rId2"/>
-          <a:stretch>
-            <a:fillRect/>
-          </a:stretch>
-        </p:blipFill>
-        <p:spPr>
-          <a:xfrm>
-            <a:off x="182764" y="1590112"/>
-            <a:ext cx="3639731" cy="2832702"/>
-          </a:xfrm>
-          <a:prstGeom prst="rect">
-            <a:avLst/>
-          </a:prstGeom>
-        </p:spPr>
-      </p:pic>
-      <p:sp>
-        <p:nvSpPr>
-          <p:cNvPr id="3" name="TextBox 2"/>
-          <p:cNvSpPr txBox="1"/>
-          <p:nvPr/>
-        </p:nvSpPr>
-        <p:spPr>
-          <a:xfrm>
-            <a:off x="1802775" y="1220780"/>
-            <a:ext cx="905608" cy="369332"/>
-          </a:xfrm>
-          <a:prstGeom prst="rect">
-            <a:avLst/>
-          </a:prstGeom>
-          <a:noFill/>
-        </p:spPr>
-        <p:txBody>
-          <a:bodyPr wrap="square" rtlCol="0">
-            <a:spAutoFit/>
-          </a:bodyPr>
-          <a:lstStyle/>
-          <a:p>
-            <a:r>
-              <a:rPr lang="en-US" dirty="0" smtClean="0"/>
-              <a:t>OLD</a:t>
-            </a:r>
-            <a:endParaRPr lang="en-US" dirty="0"/>
-          </a:p>
-        </p:txBody>
-      </p:sp>
       <p:sp>
         <p:nvSpPr>
           <p:cNvPr id="5" name="TextBox 4"/>
@@ -5631,11 +5577,7 @@
           <a:p>
             <a:r>
               <a:rPr lang="en-US" dirty="0" smtClean="0"/>
-              <a:t>Fig </a:t>
-            </a:r>
-            <a:r>
-              <a:rPr lang="en-US" dirty="0" smtClean="0"/>
-              <a:t>3a-3c</a:t>
+              <a:t>Fig 3a-3c</a:t>
             </a:r>
             <a:endParaRPr lang="en-US" dirty="0"/>
           </a:p>
@@ -5714,7 +5656,7 @@
           <p:nvPr/>
         </p:nvPicPr>
         <p:blipFill>
-          <a:blip r:embed="rId3"/>
+          <a:blip r:embed="rId2"/>
           <a:stretch>
             <a:fillRect/>
           </a:stretch>
@@ -5781,7 +5723,7 @@
             <p:nvPr/>
           </p:nvPicPr>
           <p:blipFill>
-            <a:blip r:embed="rId4"/>
+            <a:blip r:embed="rId3"/>
             <a:stretch>
               <a:fillRect/>
             </a:stretch>
@@ -5805,7 +5747,7 @@
             <p:nvPr/>
           </p:nvPicPr>
           <p:blipFill>
-            <a:blip r:embed="rId5" cstate="print">
+            <a:blip r:embed="rId4" cstate="print">
               <a:extLst>
                 <a:ext uri="{28A0092B-C50C-407E-A947-70E740481C1C}">
                   <a14:useLocalDpi xmlns:a14="http://schemas.microsoft.com/office/drawing/2010/main" val="0"/>
@@ -5835,7 +5777,7 @@
             <p:nvPr/>
           </p:nvPicPr>
           <p:blipFill>
-            <a:blip r:embed="rId6" cstate="print">
+            <a:blip r:embed="rId5" cstate="print">
               <a:extLst>
                 <a:ext uri="{28A0092B-C50C-407E-A947-70E740481C1C}">
                   <a14:useLocalDpi xmlns:a14="http://schemas.microsoft.com/office/drawing/2010/main" val="0"/>
@@ -5865,7 +5807,7 @@
             <p:nvPr/>
           </p:nvPicPr>
           <p:blipFill>
-            <a:blip r:embed="rId7" cstate="print">
+            <a:blip r:embed="rId6" cstate="print">
               <a:extLst>
                 <a:ext uri="{28A0092B-C50C-407E-A947-70E740481C1C}">
                   <a14:useLocalDpi xmlns:a14="http://schemas.microsoft.com/office/drawing/2010/main" val="0"/>
@@ -5895,7 +5837,7 @@
             <p:nvPr/>
           </p:nvPicPr>
           <p:blipFill>
-            <a:blip r:embed="rId8" cstate="print">
+            <a:blip r:embed="rId7" cstate="print">
               <a:extLst>
                 <a:ext uri="{28A0092B-C50C-407E-A947-70E740481C1C}">
                   <a14:useLocalDpi xmlns:a14="http://schemas.microsoft.com/office/drawing/2010/main" val="0"/>
@@ -5925,7 +5867,7 @@
             <p:nvPr/>
           </p:nvPicPr>
           <p:blipFill>
-            <a:blip r:embed="rId9"/>
+            <a:blip r:embed="rId8"/>
             <a:stretch>
               <a:fillRect/>
             </a:stretch>
@@ -5949,7 +5891,7 @@
             <p:nvPr/>
           </p:nvPicPr>
           <p:blipFill>
-            <a:blip r:embed="rId10"/>
+            <a:blip r:embed="rId9"/>
             <a:stretch>
               <a:fillRect/>
             </a:stretch>
@@ -5965,6 +5907,30 @@
           </p:spPr>
         </p:pic>
       </p:grpSp>
+      <p:pic>
+        <p:nvPicPr>
+          <p:cNvPr id="4" name="Picture 3"/>
+          <p:cNvPicPr>
+            <a:picLocks noChangeAspect="1"/>
+          </p:cNvPicPr>
+          <p:nvPr/>
+        </p:nvPicPr>
+        <p:blipFill>
+          <a:blip r:embed="rId10"/>
+          <a:stretch>
+            <a:fillRect/>
+          </a:stretch>
+        </p:blipFill>
+        <p:spPr>
+          <a:xfrm>
+            <a:off x="36670" y="1554417"/>
+            <a:ext cx="3769065" cy="2904091"/>
+          </a:xfrm>
+          <a:prstGeom prst="rect">
+            <a:avLst/>
+          </a:prstGeom>
+        </p:spPr>
+      </p:pic>
     </p:spTree>
     <p:extLst>
       <p:ext uri="{BB962C8B-B14F-4D97-AF65-F5344CB8AC3E}">

</xml_diff>

<commit_message>
tweaking powerpoint for new Fig 4 template
</commit_message>
<xml_diff>
--- a/output/plots/all_figs_with_legends.pptx
+++ b/output/plots/all_figs_with_legends.pptx
@@ -202,7 +202,7 @@
           <a:p>
             <a:fld id="{7FA21820-D199-4D82-91AF-C50B1D3B111A}" type="datetimeFigureOut">
               <a:rPr lang="en-US" smtClean="0"/>
-              <a:t>3/29/2017</a:t>
+              <a:t>4/3/2017</a:t>
             </a:fld>
             <a:endParaRPr lang="en-US"/>
           </a:p>
@@ -816,7 +816,7 @@
           <a:p>
             <a:fld id="{916B8C92-D5E3-4480-8685-D57BEE386DE2}" type="datetimeFigureOut">
               <a:rPr lang="en-US" smtClean="0"/>
-              <a:t>3/29/2017</a:t>
+              <a:t>4/3/2017</a:t>
             </a:fld>
             <a:endParaRPr lang="en-US"/>
           </a:p>
@@ -986,7 +986,7 @@
           <a:p>
             <a:fld id="{916B8C92-D5E3-4480-8685-D57BEE386DE2}" type="datetimeFigureOut">
               <a:rPr lang="en-US" smtClean="0"/>
-              <a:t>3/29/2017</a:t>
+              <a:t>4/3/2017</a:t>
             </a:fld>
             <a:endParaRPr lang="en-US"/>
           </a:p>
@@ -1166,7 +1166,7 @@
           <a:p>
             <a:fld id="{916B8C92-D5E3-4480-8685-D57BEE386DE2}" type="datetimeFigureOut">
               <a:rPr lang="en-US" smtClean="0"/>
-              <a:t>3/29/2017</a:t>
+              <a:t>4/3/2017</a:t>
             </a:fld>
             <a:endParaRPr lang="en-US"/>
           </a:p>
@@ -1336,7 +1336,7 @@
           <a:p>
             <a:fld id="{916B8C92-D5E3-4480-8685-D57BEE386DE2}" type="datetimeFigureOut">
               <a:rPr lang="en-US" smtClean="0"/>
-              <a:t>3/29/2017</a:t>
+              <a:t>4/3/2017</a:t>
             </a:fld>
             <a:endParaRPr lang="en-US"/>
           </a:p>
@@ -1582,7 +1582,7 @@
           <a:p>
             <a:fld id="{916B8C92-D5E3-4480-8685-D57BEE386DE2}" type="datetimeFigureOut">
               <a:rPr lang="en-US" smtClean="0"/>
-              <a:t>3/29/2017</a:t>
+              <a:t>4/3/2017</a:t>
             </a:fld>
             <a:endParaRPr lang="en-US"/>
           </a:p>
@@ -1814,7 +1814,7 @@
           <a:p>
             <a:fld id="{916B8C92-D5E3-4480-8685-D57BEE386DE2}" type="datetimeFigureOut">
               <a:rPr lang="en-US" smtClean="0"/>
-              <a:t>3/29/2017</a:t>
+              <a:t>4/3/2017</a:t>
             </a:fld>
             <a:endParaRPr lang="en-US"/>
           </a:p>
@@ -2181,7 +2181,7 @@
           <a:p>
             <a:fld id="{916B8C92-D5E3-4480-8685-D57BEE386DE2}" type="datetimeFigureOut">
               <a:rPr lang="en-US" smtClean="0"/>
-              <a:t>3/29/2017</a:t>
+              <a:t>4/3/2017</a:t>
             </a:fld>
             <a:endParaRPr lang="en-US"/>
           </a:p>
@@ -2299,7 +2299,7 @@
           <a:p>
             <a:fld id="{916B8C92-D5E3-4480-8685-D57BEE386DE2}" type="datetimeFigureOut">
               <a:rPr lang="en-US" smtClean="0"/>
-              <a:t>3/29/2017</a:t>
+              <a:t>4/3/2017</a:t>
             </a:fld>
             <a:endParaRPr lang="en-US"/>
           </a:p>
@@ -2394,7 +2394,7 @@
           <a:p>
             <a:fld id="{916B8C92-D5E3-4480-8685-D57BEE386DE2}" type="datetimeFigureOut">
               <a:rPr lang="en-US" smtClean="0"/>
-              <a:t>3/29/2017</a:t>
+              <a:t>4/3/2017</a:t>
             </a:fld>
             <a:endParaRPr lang="en-US"/>
           </a:p>
@@ -2671,7 +2671,7 @@
           <a:p>
             <a:fld id="{916B8C92-D5E3-4480-8685-D57BEE386DE2}" type="datetimeFigureOut">
               <a:rPr lang="en-US" smtClean="0"/>
-              <a:t>3/29/2017</a:t>
+              <a:t>4/3/2017</a:t>
             </a:fld>
             <a:endParaRPr lang="en-US"/>
           </a:p>
@@ -2924,7 +2924,7 @@
           <a:p>
             <a:fld id="{916B8C92-D5E3-4480-8685-D57BEE386DE2}" type="datetimeFigureOut">
               <a:rPr lang="en-US" smtClean="0"/>
-              <a:t>3/29/2017</a:t>
+              <a:t>4/3/2017</a:t>
             </a:fld>
             <a:endParaRPr lang="en-US"/>
           </a:p>
@@ -3137,7 +3137,7 @@
           <a:p>
             <a:fld id="{916B8C92-D5E3-4480-8685-D57BEE386DE2}" type="datetimeFigureOut">
               <a:rPr lang="en-US" smtClean="0"/>
-              <a:t>3/29/2017</a:t>
+              <a:t>4/3/2017</a:t>
             </a:fld>
             <a:endParaRPr lang="en-US"/>
           </a:p>
@@ -3570,14 +3570,14 @@
                 <a:gridCol w="487265">
                   <a:extLst>
                     <a:ext uri="{9D8B030D-6E8A-4147-A177-3AD203B41FA5}">
-                      <a16:colId xmlns:a16="http://schemas.microsoft.com/office/drawing/2014/main" val="1812283001"/>
+                      <a16:colId xmlns:a16="http://schemas.microsoft.com/office/drawing/2014/main" xmlns="" val="1812283001"/>
                     </a:ext>
                   </a:extLst>
                 </a:gridCol>
                 <a:gridCol w="1427585">
                   <a:extLst>
                     <a:ext uri="{9D8B030D-6E8A-4147-A177-3AD203B41FA5}">
-                      <a16:colId xmlns:a16="http://schemas.microsoft.com/office/drawing/2014/main" val="3574134326"/>
+                      <a16:colId xmlns:a16="http://schemas.microsoft.com/office/drawing/2014/main" xmlns="" val="3574134326"/>
                     </a:ext>
                   </a:extLst>
                 </a:gridCol>
@@ -3609,7 +3609,7 @@
                 </a:tc>
                 <a:extLst>
                   <a:ext uri="{0D108BD9-81ED-4DB2-BD59-A6C34878D82A}">
-                    <a16:rowId xmlns:a16="http://schemas.microsoft.com/office/drawing/2014/main" val="34741539"/>
+                    <a16:rowId xmlns:a16="http://schemas.microsoft.com/office/drawing/2014/main" xmlns="" val="34741539"/>
                   </a:ext>
                 </a:extLst>
               </a:tr>
@@ -3640,7 +3640,7 @@
                 </a:tc>
                 <a:extLst>
                   <a:ext uri="{0D108BD9-81ED-4DB2-BD59-A6C34878D82A}">
-                    <a16:rowId xmlns:a16="http://schemas.microsoft.com/office/drawing/2014/main" val="1816204491"/>
+                    <a16:rowId xmlns:a16="http://schemas.microsoft.com/office/drawing/2014/main" xmlns="" val="1816204491"/>
                   </a:ext>
                 </a:extLst>
               </a:tr>
@@ -3671,7 +3671,7 @@
                 </a:tc>
                 <a:extLst>
                   <a:ext uri="{0D108BD9-81ED-4DB2-BD59-A6C34878D82A}">
-                    <a16:rowId xmlns:a16="http://schemas.microsoft.com/office/drawing/2014/main" val="3053943592"/>
+                    <a16:rowId xmlns:a16="http://schemas.microsoft.com/office/drawing/2014/main" xmlns="" val="3053943592"/>
                   </a:ext>
                 </a:extLst>
               </a:tr>
@@ -3702,7 +3702,7 @@
                 </a:tc>
                 <a:extLst>
                   <a:ext uri="{0D108BD9-81ED-4DB2-BD59-A6C34878D82A}">
-                    <a16:rowId xmlns:a16="http://schemas.microsoft.com/office/drawing/2014/main" val="1425409090"/>
+                    <a16:rowId xmlns:a16="http://schemas.microsoft.com/office/drawing/2014/main" xmlns="" val="1425409090"/>
                   </a:ext>
                 </a:extLst>
               </a:tr>
@@ -3733,7 +3733,7 @@
                 </a:tc>
                 <a:extLst>
                   <a:ext uri="{0D108BD9-81ED-4DB2-BD59-A6C34878D82A}">
-                    <a16:rowId xmlns:a16="http://schemas.microsoft.com/office/drawing/2014/main" val="3097088923"/>
+                    <a16:rowId xmlns:a16="http://schemas.microsoft.com/office/drawing/2014/main" xmlns="" val="3097088923"/>
                   </a:ext>
                 </a:extLst>
               </a:tr>
@@ -3764,7 +3764,7 @@
                 </a:tc>
                 <a:extLst>
                   <a:ext uri="{0D108BD9-81ED-4DB2-BD59-A6C34878D82A}">
-                    <a16:rowId xmlns:a16="http://schemas.microsoft.com/office/drawing/2014/main" val="1149511687"/>
+                    <a16:rowId xmlns:a16="http://schemas.microsoft.com/office/drawing/2014/main" xmlns="" val="1149511687"/>
                   </a:ext>
                 </a:extLst>
               </a:tr>
@@ -3795,7 +3795,7 @@
                 </a:tc>
                 <a:extLst>
                   <a:ext uri="{0D108BD9-81ED-4DB2-BD59-A6C34878D82A}">
-                    <a16:rowId xmlns:a16="http://schemas.microsoft.com/office/drawing/2014/main" val="785655806"/>
+                    <a16:rowId xmlns:a16="http://schemas.microsoft.com/office/drawing/2014/main" xmlns="" val="785655806"/>
                   </a:ext>
                 </a:extLst>
               </a:tr>
@@ -5961,115 +5961,75 @@
           <a:chExt cx="0" cy="0"/>
         </a:xfrm>
       </p:grpSpPr>
-      <p:grpSp>
-        <p:nvGrpSpPr>
-          <p:cNvPr id="5" name="Group 4"/>
-          <p:cNvGrpSpPr/>
+      <p:pic>
+        <p:nvPicPr>
+          <p:cNvPr id="3" name="Picture 2"/>
+          <p:cNvPicPr>
+            <a:picLocks noChangeAspect="1"/>
+          </p:cNvPicPr>
           <p:nvPr/>
-        </p:nvGrpSpPr>
-        <p:grpSpPr>
+        </p:nvPicPr>
+        <p:blipFill rotWithShape="1">
+          <a:blip r:embed="rId2"/>
+          <a:srcRect b="396"/>
+          <a:stretch/>
+        </p:blipFill>
+        <p:spPr>
           <a:xfrm>
-            <a:off x="0" y="940777"/>
-            <a:ext cx="11768322" cy="4308556"/>
-            <a:chOff x="0" y="940777"/>
-            <a:chExt cx="11768322" cy="4308556"/>
+            <a:off x="650165" y="950329"/>
+            <a:ext cx="5696690" cy="2391938"/>
           </a:xfrm>
-        </p:grpSpPr>
-        <p:pic>
-          <p:nvPicPr>
-            <p:cNvPr id="2" name="Picture 1"/>
-            <p:cNvPicPr>
-              <a:picLocks noChangeAspect="1"/>
-            </p:cNvPicPr>
-            <p:nvPr/>
-          </p:nvPicPr>
-          <p:blipFill>
-            <a:blip r:embed="rId2"/>
-            <a:stretch>
-              <a:fillRect/>
-            </a:stretch>
-          </p:blipFill>
-          <p:spPr>
-            <a:xfrm>
-              <a:off x="0" y="940777"/>
-              <a:ext cx="5667375" cy="390525"/>
-            </a:xfrm>
-            <a:prstGeom prst="rect">
-              <a:avLst/>
-            </a:prstGeom>
-          </p:spPr>
-        </p:pic>
-        <p:pic>
-          <p:nvPicPr>
-            <p:cNvPr id="3" name="Picture 2"/>
-            <p:cNvPicPr>
-              <a:picLocks noChangeAspect="1"/>
-            </p:cNvPicPr>
-            <p:nvPr/>
-          </p:nvPicPr>
-          <p:blipFill rotWithShape="1">
-            <a:blip r:embed="rId3"/>
-            <a:srcRect b="396"/>
-            <a:stretch/>
-          </p:blipFill>
-          <p:spPr>
-            <a:xfrm>
-              <a:off x="195993" y="1331302"/>
-              <a:ext cx="5275387" cy="3918031"/>
-            </a:xfrm>
-            <a:prstGeom prst="rect">
-              <a:avLst/>
-            </a:prstGeom>
-          </p:spPr>
-        </p:pic>
-        <p:pic>
-          <p:nvPicPr>
-            <p:cNvPr id="4" name="Picture 3"/>
-            <p:cNvPicPr>
-              <a:picLocks noChangeAspect="1"/>
-            </p:cNvPicPr>
-            <p:nvPr/>
-          </p:nvPicPr>
-          <p:blipFill rotWithShape="1">
-            <a:blip r:embed="rId4"/>
-            <a:srcRect l="327"/>
-            <a:stretch/>
-          </p:blipFill>
-          <p:spPr>
-            <a:xfrm>
-              <a:off x="6418388" y="1268158"/>
-              <a:ext cx="5349934" cy="3981175"/>
-            </a:xfrm>
-            <a:prstGeom prst="rect">
-              <a:avLst/>
-            </a:prstGeom>
-          </p:spPr>
-        </p:pic>
-        <p:pic>
-          <p:nvPicPr>
-            <p:cNvPr id="7" name="Picture 6"/>
-            <p:cNvPicPr>
-              <a:picLocks noChangeAspect="1"/>
-            </p:cNvPicPr>
-            <p:nvPr/>
-          </p:nvPicPr>
-          <p:blipFill>
-            <a:blip r:embed="rId5"/>
-            <a:stretch>
-              <a:fillRect/>
-            </a:stretch>
-          </p:blipFill>
-          <p:spPr>
-            <a:xfrm>
-              <a:off x="5237288" y="1736282"/>
-              <a:ext cx="1181100" cy="2457450"/>
-            </a:xfrm>
-            <a:prstGeom prst="rect">
-              <a:avLst/>
-            </a:prstGeom>
-          </p:spPr>
-        </p:pic>
-      </p:grpSp>
+          <a:prstGeom prst="rect">
+            <a:avLst/>
+          </a:prstGeom>
+        </p:spPr>
+      </p:pic>
+      <p:pic>
+        <p:nvPicPr>
+          <p:cNvPr id="4" name="Picture 3"/>
+          <p:cNvPicPr>
+            <a:picLocks noChangeAspect="1"/>
+          </p:cNvPicPr>
+          <p:nvPr/>
+        </p:nvPicPr>
+        <p:blipFill rotWithShape="1">
+          <a:blip r:embed="rId3"/>
+          <a:srcRect l="327"/>
+          <a:stretch/>
+        </p:blipFill>
+        <p:spPr>
+          <a:xfrm>
+            <a:off x="338562" y="3747248"/>
+            <a:ext cx="5603620" cy="2716306"/>
+          </a:xfrm>
+          <a:prstGeom prst="rect">
+            <a:avLst/>
+          </a:prstGeom>
+        </p:spPr>
+      </p:pic>
+      <p:pic>
+        <p:nvPicPr>
+          <p:cNvPr id="7" name="Picture 6"/>
+          <p:cNvPicPr>
+            <a:picLocks noChangeAspect="1"/>
+          </p:cNvPicPr>
+          <p:nvPr/>
+        </p:nvPicPr>
+        <p:blipFill rotWithShape="1">
+          <a:blip r:embed="rId4"/>
+          <a:srcRect b="61580"/>
+          <a:stretch/>
+        </p:blipFill>
+        <p:spPr>
+          <a:xfrm>
+            <a:off x="4761082" y="5241482"/>
+            <a:ext cx="1181100" cy="944165"/>
+          </a:xfrm>
+          <a:prstGeom prst="rect">
+            <a:avLst/>
+          </a:prstGeom>
+        </p:spPr>
+      </p:pic>
       <p:sp>
         <p:nvSpPr>
           <p:cNvPr id="8" name="TextBox 7"/>
@@ -6108,6 +6068,53 @@
           </a:p>
         </p:txBody>
       </p:sp>
+      <p:pic>
+        <p:nvPicPr>
+          <p:cNvPr id="9" name="Picture 8"/>
+          <p:cNvPicPr>
+            <a:picLocks noChangeAspect="1"/>
+          </p:cNvPicPr>
+          <p:nvPr/>
+        </p:nvPicPr>
+        <p:blipFill rotWithShape="1">
+          <a:blip r:embed="rId4"/>
+          <a:srcRect t="40244"/>
+          <a:stretch/>
+        </p:blipFill>
+        <p:spPr>
+          <a:xfrm>
+            <a:off x="754935" y="3836893"/>
+            <a:ext cx="1181100" cy="1468461"/>
+          </a:xfrm>
+          <a:prstGeom prst="rect">
+            <a:avLst/>
+          </a:prstGeom>
+        </p:spPr>
+      </p:pic>
+      <p:pic>
+        <p:nvPicPr>
+          <p:cNvPr id="2" name="Picture 1"/>
+          <p:cNvPicPr>
+            <a:picLocks noChangeAspect="1"/>
+          </p:cNvPicPr>
+          <p:nvPr/>
+        </p:nvPicPr>
+        <p:blipFill>
+          <a:blip r:embed="rId5"/>
+          <a:stretch>
+            <a:fillRect/>
+          </a:stretch>
+        </p:blipFill>
+        <p:spPr>
+          <a:xfrm>
+            <a:off x="4955644" y="950329"/>
+            <a:ext cx="5667375" cy="390525"/>
+          </a:xfrm>
+          <a:prstGeom prst="rect">
+            <a:avLst/>
+          </a:prstGeom>
+        </p:spPr>
+      </p:pic>
     </p:spTree>
     <p:extLst>
       <p:ext uri="{BB962C8B-B14F-4D97-AF65-F5344CB8AC3E}">

</xml_diff>

<commit_message>
got panelled and labelled plots for fig 1,2, & 4(ish). Working on 3 which mixes base and ggplot, probably need to change
</commit_message>
<xml_diff>
--- a/output/plots/all_figs_with_legends.pptx
+++ b/output/plots/all_figs_with_legends.pptx
@@ -202,7 +202,7 @@
           <a:p>
             <a:fld id="{7FA21820-D199-4D82-91AF-C50B1D3B111A}" type="datetimeFigureOut">
               <a:rPr lang="en-US" smtClean="0"/>
-              <a:t>4/6/2017</a:t>
+              <a:t>4/11/2017</a:t>
             </a:fld>
             <a:endParaRPr lang="en-US"/>
           </a:p>
@@ -674,11 +674,19 @@
             </a:r>
             <a:r>
               <a:rPr lang="en-US" baseline="0" dirty="0" smtClean="0"/>
-              <a:t>, lake by Pieter </a:t>
+              <a:t>, lake by </a:t>
             </a:r>
             <a:r>
               <a:rPr lang="en-US" baseline="0" dirty="0" err="1" smtClean="0"/>
-              <a:t>smits</a:t>
+              <a:t>By</a:t>
+            </a:r>
+            <a:r>
+              <a:rPr lang="en-US" baseline="0" dirty="0" smtClean="0"/>
+              <a:t> Anton </a:t>
+            </a:r>
+            <a:r>
+              <a:rPr lang="en-US" baseline="0" dirty="0" err="1" smtClean="0"/>
+              <a:t>Gajdosik</a:t>
             </a:r>
             <a:endParaRPr lang="en-US" dirty="0"/>
           </a:p>
@@ -711,6 +719,182 @@
     <p:extLst>
       <p:ext uri="{BB962C8B-B14F-4D97-AF65-F5344CB8AC3E}">
         <p14:creationId xmlns:p14="http://schemas.microsoft.com/office/powerpoint/2010/main" val="3600764841"/>
+      </p:ext>
+    </p:extLst>
+  </p:cSld>
+  <p:clrMapOvr>
+    <a:masterClrMapping/>
+  </p:clrMapOvr>
+</p:notes>
+</file>
+
+<file path=ppt/notesSlides/notesSlide2.xml><?xml version="1.0" encoding="utf-8"?>
+<p:notes xmlns:a="http://schemas.openxmlformats.org/drawingml/2006/main" xmlns:r="http://schemas.openxmlformats.org/officeDocument/2006/relationships" xmlns:p="http://schemas.openxmlformats.org/presentationml/2006/main">
+  <p:cSld>
+    <p:spTree>
+      <p:nvGrpSpPr>
+        <p:cNvPr id="1" name=""/>
+        <p:cNvGrpSpPr/>
+        <p:nvPr/>
+      </p:nvGrpSpPr>
+      <p:grpSpPr>
+        <a:xfrm>
+          <a:off x="0" y="0"/>
+          <a:ext cx="0" cy="0"/>
+          <a:chOff x="0" y="0"/>
+          <a:chExt cx="0" cy="0"/>
+        </a:xfrm>
+      </p:grpSpPr>
+      <p:sp>
+        <p:nvSpPr>
+          <p:cNvPr id="2" name="Slide Image Placeholder 1"/>
+          <p:cNvSpPr>
+            <a:spLocks noGrp="1" noRot="1" noChangeAspect="1"/>
+          </p:cNvSpPr>
+          <p:nvPr>
+            <p:ph type="sldImg"/>
+          </p:nvPr>
+        </p:nvSpPr>
+        <p:spPr/>
+      </p:sp>
+      <p:sp>
+        <p:nvSpPr>
+          <p:cNvPr id="3" name="Notes Placeholder 2"/>
+          <p:cNvSpPr>
+            <a:spLocks noGrp="1"/>
+          </p:cNvSpPr>
+          <p:nvPr>
+            <p:ph type="body" idx="1"/>
+          </p:nvPr>
+        </p:nvSpPr>
+        <p:spPr/>
+        <p:txBody>
+          <a:bodyPr/>
+          <a:lstStyle/>
+          <a:p>
+            <a:r>
+              <a:rPr lang="en-US" dirty="0" smtClean="0"/>
+              <a:t>FIXED – log transformed E</a:t>
+            </a:r>
+            <a:endParaRPr lang="en-US" dirty="0"/>
+          </a:p>
+        </p:txBody>
+      </p:sp>
+      <p:sp>
+        <p:nvSpPr>
+          <p:cNvPr id="4" name="Slide Number Placeholder 3"/>
+          <p:cNvSpPr>
+            <a:spLocks noGrp="1"/>
+          </p:cNvSpPr>
+          <p:nvPr>
+            <p:ph type="sldNum" sz="quarter" idx="10"/>
+          </p:nvPr>
+        </p:nvSpPr>
+        <p:spPr/>
+        <p:txBody>
+          <a:bodyPr/>
+          <a:lstStyle/>
+          <a:p>
+            <a:fld id="{0160E3DB-BCAB-42BD-8DDD-04198F92E62D}" type="slidenum">
+              <a:rPr lang="en-US" smtClean="0"/>
+              <a:t>2</a:t>
+            </a:fld>
+            <a:endParaRPr lang="en-US"/>
+          </a:p>
+        </p:txBody>
+      </p:sp>
+    </p:spTree>
+    <p:extLst>
+      <p:ext uri="{BB962C8B-B14F-4D97-AF65-F5344CB8AC3E}">
+        <p14:creationId xmlns:p14="http://schemas.microsoft.com/office/powerpoint/2010/main" val="2728871139"/>
+      </p:ext>
+    </p:extLst>
+  </p:cSld>
+  <p:clrMapOvr>
+    <a:masterClrMapping/>
+  </p:clrMapOvr>
+</p:notes>
+</file>
+
+<file path=ppt/notesSlides/notesSlide3.xml><?xml version="1.0" encoding="utf-8"?>
+<p:notes xmlns:a="http://schemas.openxmlformats.org/drawingml/2006/main" xmlns:r="http://schemas.openxmlformats.org/officeDocument/2006/relationships" xmlns:p="http://schemas.openxmlformats.org/presentationml/2006/main">
+  <p:cSld>
+    <p:spTree>
+      <p:nvGrpSpPr>
+        <p:cNvPr id="1" name=""/>
+        <p:cNvGrpSpPr/>
+        <p:nvPr/>
+      </p:nvGrpSpPr>
+      <p:grpSpPr>
+        <a:xfrm>
+          <a:off x="0" y="0"/>
+          <a:ext cx="0" cy="0"/>
+          <a:chOff x="0" y="0"/>
+          <a:chExt cx="0" cy="0"/>
+        </a:xfrm>
+      </p:grpSpPr>
+      <p:sp>
+        <p:nvSpPr>
+          <p:cNvPr id="2" name="Slide Image Placeholder 1"/>
+          <p:cNvSpPr>
+            <a:spLocks noGrp="1" noRot="1" noChangeAspect="1"/>
+          </p:cNvSpPr>
+          <p:nvPr>
+            <p:ph type="sldImg"/>
+          </p:nvPr>
+        </p:nvSpPr>
+        <p:spPr/>
+      </p:sp>
+      <p:sp>
+        <p:nvSpPr>
+          <p:cNvPr id="3" name="Notes Placeholder 2"/>
+          <p:cNvSpPr>
+            <a:spLocks noGrp="1"/>
+          </p:cNvSpPr>
+          <p:nvPr>
+            <p:ph type="body" idx="1"/>
+          </p:nvPr>
+        </p:nvSpPr>
+        <p:spPr/>
+        <p:txBody>
+          <a:bodyPr/>
+          <a:lstStyle/>
+          <a:p>
+            <a:r>
+              <a:rPr lang="en-US" dirty="0" smtClean="0"/>
+              <a:t>FIXED</a:t>
+            </a:r>
+            <a:endParaRPr lang="en-US" dirty="0"/>
+          </a:p>
+        </p:txBody>
+      </p:sp>
+      <p:sp>
+        <p:nvSpPr>
+          <p:cNvPr id="4" name="Slide Number Placeholder 3"/>
+          <p:cNvSpPr>
+            <a:spLocks noGrp="1"/>
+          </p:cNvSpPr>
+          <p:nvPr>
+            <p:ph type="sldNum" sz="quarter" idx="10"/>
+          </p:nvPr>
+        </p:nvSpPr>
+        <p:spPr/>
+        <p:txBody>
+          <a:bodyPr/>
+          <a:lstStyle/>
+          <a:p>
+            <a:fld id="{0160E3DB-BCAB-42BD-8DDD-04198F92E62D}" type="slidenum">
+              <a:rPr lang="en-US" smtClean="0"/>
+              <a:t>3</a:t>
+            </a:fld>
+            <a:endParaRPr lang="en-US"/>
+          </a:p>
+        </p:txBody>
+      </p:sp>
+    </p:spTree>
+    <p:extLst>
+      <p:ext uri="{BB962C8B-B14F-4D97-AF65-F5344CB8AC3E}">
+        <p14:creationId xmlns:p14="http://schemas.microsoft.com/office/powerpoint/2010/main" val="494307569"/>
       </p:ext>
     </p:extLst>
   </p:cSld>
@@ -851,7 +1035,7 @@
           <a:p>
             <a:fld id="{916B8C92-D5E3-4480-8685-D57BEE386DE2}" type="datetimeFigureOut">
               <a:rPr lang="en-US" smtClean="0"/>
-              <a:t>4/6/2017</a:t>
+              <a:t>4/11/2017</a:t>
             </a:fld>
             <a:endParaRPr lang="en-US"/>
           </a:p>
@@ -1021,7 +1205,7 @@
           <a:p>
             <a:fld id="{916B8C92-D5E3-4480-8685-D57BEE386DE2}" type="datetimeFigureOut">
               <a:rPr lang="en-US" smtClean="0"/>
-              <a:t>4/6/2017</a:t>
+              <a:t>4/11/2017</a:t>
             </a:fld>
             <a:endParaRPr lang="en-US"/>
           </a:p>
@@ -1201,7 +1385,7 @@
           <a:p>
             <a:fld id="{916B8C92-D5E3-4480-8685-D57BEE386DE2}" type="datetimeFigureOut">
               <a:rPr lang="en-US" smtClean="0"/>
-              <a:t>4/6/2017</a:t>
+              <a:t>4/11/2017</a:t>
             </a:fld>
             <a:endParaRPr lang="en-US"/>
           </a:p>
@@ -1371,7 +1555,7 @@
           <a:p>
             <a:fld id="{916B8C92-D5E3-4480-8685-D57BEE386DE2}" type="datetimeFigureOut">
               <a:rPr lang="en-US" smtClean="0"/>
-              <a:t>4/6/2017</a:t>
+              <a:t>4/11/2017</a:t>
             </a:fld>
             <a:endParaRPr lang="en-US"/>
           </a:p>
@@ -1617,7 +1801,7 @@
           <a:p>
             <a:fld id="{916B8C92-D5E3-4480-8685-D57BEE386DE2}" type="datetimeFigureOut">
               <a:rPr lang="en-US" smtClean="0"/>
-              <a:t>4/6/2017</a:t>
+              <a:t>4/11/2017</a:t>
             </a:fld>
             <a:endParaRPr lang="en-US"/>
           </a:p>
@@ -1849,7 +2033,7 @@
           <a:p>
             <a:fld id="{916B8C92-D5E3-4480-8685-D57BEE386DE2}" type="datetimeFigureOut">
               <a:rPr lang="en-US" smtClean="0"/>
-              <a:t>4/6/2017</a:t>
+              <a:t>4/11/2017</a:t>
             </a:fld>
             <a:endParaRPr lang="en-US"/>
           </a:p>
@@ -2216,7 +2400,7 @@
           <a:p>
             <a:fld id="{916B8C92-D5E3-4480-8685-D57BEE386DE2}" type="datetimeFigureOut">
               <a:rPr lang="en-US" smtClean="0"/>
-              <a:t>4/6/2017</a:t>
+              <a:t>4/11/2017</a:t>
             </a:fld>
             <a:endParaRPr lang="en-US"/>
           </a:p>
@@ -2334,7 +2518,7 @@
           <a:p>
             <a:fld id="{916B8C92-D5E3-4480-8685-D57BEE386DE2}" type="datetimeFigureOut">
               <a:rPr lang="en-US" smtClean="0"/>
-              <a:t>4/6/2017</a:t>
+              <a:t>4/11/2017</a:t>
             </a:fld>
             <a:endParaRPr lang="en-US"/>
           </a:p>
@@ -2429,7 +2613,7 @@
           <a:p>
             <a:fld id="{916B8C92-D5E3-4480-8685-D57BEE386DE2}" type="datetimeFigureOut">
               <a:rPr lang="en-US" smtClean="0"/>
-              <a:t>4/6/2017</a:t>
+              <a:t>4/11/2017</a:t>
             </a:fld>
             <a:endParaRPr lang="en-US"/>
           </a:p>
@@ -2706,7 +2890,7 @@
           <a:p>
             <a:fld id="{916B8C92-D5E3-4480-8685-D57BEE386DE2}" type="datetimeFigureOut">
               <a:rPr lang="en-US" smtClean="0"/>
-              <a:t>4/6/2017</a:t>
+              <a:t>4/11/2017</a:t>
             </a:fld>
             <a:endParaRPr lang="en-US"/>
           </a:p>
@@ -2959,7 +3143,7 @@
           <a:p>
             <a:fld id="{916B8C92-D5E3-4480-8685-D57BEE386DE2}" type="datetimeFigureOut">
               <a:rPr lang="en-US" smtClean="0"/>
-              <a:t>4/6/2017</a:t>
+              <a:t>4/11/2017</a:t>
             </a:fld>
             <a:endParaRPr lang="en-US"/>
           </a:p>
@@ -3172,7 +3356,7 @@
           <a:p>
             <a:fld id="{916B8C92-D5E3-4480-8685-D57BEE386DE2}" type="datetimeFigureOut">
               <a:rPr lang="en-US" smtClean="0"/>
-              <a:t>4/6/2017</a:t>
+              <a:t>4/11/2017</a:t>
             </a:fld>
             <a:endParaRPr lang="en-US"/>
           </a:p>
@@ -3577,6 +3761,30 @@
           <a:chExt cx="0" cy="0"/>
         </a:xfrm>
       </p:grpSpPr>
+      <p:pic>
+        <p:nvPicPr>
+          <p:cNvPr id="16" name="Picture 15"/>
+          <p:cNvPicPr>
+            <a:picLocks noChangeAspect="1"/>
+          </p:cNvPicPr>
+          <p:nvPr/>
+        </p:nvPicPr>
+        <p:blipFill>
+          <a:blip r:embed="rId3"/>
+          <a:stretch>
+            <a:fillRect/>
+          </a:stretch>
+        </p:blipFill>
+        <p:spPr>
+          <a:xfrm>
+            <a:off x="6538467" y="1591805"/>
+            <a:ext cx="640805" cy="408944"/>
+          </a:xfrm>
+          <a:prstGeom prst="rect">
+            <a:avLst/>
+          </a:prstGeom>
+        </p:spPr>
+      </p:pic>
       <p:graphicFrame>
         <p:nvGraphicFramePr>
           <p:cNvPr id="12" name="Table 11"/>
@@ -3847,7 +4055,7 @@
           <p:nvPr/>
         </p:nvPicPr>
         <p:blipFill>
-          <a:blip r:embed="rId3" cstate="print">
+          <a:blip r:embed="rId4" cstate="print">
             <a:extLst>
               <a:ext uri="{28A0092B-C50C-407E-A947-70E740481C1C}">
                 <a14:useLocalDpi xmlns:a14="http://schemas.microsoft.com/office/drawing/2010/main" val="0"/>
@@ -3905,7 +4113,7 @@
           <p:nvPr/>
         </p:nvPicPr>
         <p:blipFill>
-          <a:blip r:embed="rId4" cstate="print">
+          <a:blip r:embed="rId5" cstate="print">
             <a:extLst>
               <a:ext uri="{28A0092B-C50C-407E-A947-70E740481C1C}">
                 <a14:useLocalDpi xmlns:a14="http://schemas.microsoft.com/office/drawing/2010/main" val="0"/>
@@ -3935,7 +4143,7 @@
           <p:nvPr/>
         </p:nvPicPr>
         <p:blipFill>
-          <a:blip r:embed="rId5" cstate="print">
+          <a:blip r:embed="rId6" cstate="print">
             <a:extLst>
               <a:ext uri="{28A0092B-C50C-407E-A947-70E740481C1C}">
                 <a14:useLocalDpi xmlns:a14="http://schemas.microsoft.com/office/drawing/2010/main" val="0"/>
@@ -3965,7 +4173,7 @@
           <p:nvPr/>
         </p:nvPicPr>
         <p:blipFill>
-          <a:blip r:embed="rId6" cstate="print">
+          <a:blip r:embed="rId7" cstate="print">
             <a:extLst>
               <a:ext uri="{28A0092B-C50C-407E-A947-70E740481C1C}">
                 <a14:useLocalDpi xmlns:a14="http://schemas.microsoft.com/office/drawing/2010/main" val="0"/>
@@ -3995,7 +4203,7 @@
           <p:nvPr/>
         </p:nvPicPr>
         <p:blipFill>
-          <a:blip r:embed="rId7"/>
+          <a:blip r:embed="rId8"/>
           <a:stretch>
             <a:fillRect/>
           </a:stretch>
@@ -4019,7 +4227,7 @@
           <p:nvPr/>
         </p:nvPicPr>
         <p:blipFill>
-          <a:blip r:embed="rId8"/>
+          <a:blip r:embed="rId9"/>
           <a:stretch>
             <a:fillRect/>
           </a:stretch>
@@ -4043,7 +4251,7 @@
           <p:nvPr/>
         </p:nvPicPr>
         <p:blipFill>
-          <a:blip r:embed="rId9"/>
+          <a:blip r:embed="rId10"/>
           <a:stretch>
             <a:fillRect/>
           </a:stretch>
@@ -4067,14 +4275,14 @@
           <p:nvPr>
             <p:extLst>
               <p:ext uri="{D42A27DB-BD31-4B8C-83A1-F6EECF244321}">
-                <p14:modId xmlns:p14="http://schemas.microsoft.com/office/powerpoint/2010/main" val="903193953"/>
+                <p14:modId xmlns:p14="http://schemas.microsoft.com/office/powerpoint/2010/main" val="1874564918"/>
               </p:ext>
             </p:extLst>
           </p:nvPr>
         </p:nvGraphicFramePr>
         <p:xfrm>
-          <a:off x="5794129" y="719666"/>
-          <a:ext cx="1547448" cy="1274526"/>
+          <a:off x="5152293" y="719666"/>
+          <a:ext cx="2189284" cy="1274526"/>
         </p:xfrm>
         <a:graphic>
           <a:graphicData uri="http://schemas.openxmlformats.org/drawingml/2006/table">
@@ -4083,14 +4291,14 @@
                 <a:tableStyleId>{0505E3EF-67EA-436B-97B2-0124C06EBD24}</a:tableStyleId>
               </a:tblPr>
               <a:tblGrid>
-                <a:gridCol w="730739">
+                <a:gridCol w="1261110">
                   <a:extLst>
                     <a:ext uri="{9D8B030D-6E8A-4147-A177-3AD203B41FA5}">
                       <a16:colId xmlns:a16="http://schemas.microsoft.com/office/drawing/2014/main" val="1963467705"/>
                     </a:ext>
                   </a:extLst>
                 </a:gridCol>
-                <a:gridCol w="816709">
+                <a:gridCol w="928174">
                   <a:extLst>
                     <a:ext uri="{9D8B030D-6E8A-4147-A177-3AD203B41FA5}">
                       <a16:colId xmlns:a16="http://schemas.microsoft.com/office/drawing/2014/main" val="464586843"/>
@@ -4104,7 +4312,11 @@
                     <a:bodyPr/>
                     <a:lstStyle/>
                     <a:p>
-                      <a:endParaRPr lang="en-US" dirty="0"/>
+                      <a:r>
+                        <a:rPr lang="en-US" b="0" dirty="0" smtClean="0"/>
+                        <a:t>Terrestrial</a:t>
+                      </a:r>
+                      <a:endParaRPr lang="en-US" b="0" dirty="0"/>
                     </a:p>
                   </a:txBody>
                   <a:tcPr>
@@ -4207,7 +4419,11 @@
                     <a:bodyPr/>
                     <a:lstStyle/>
                     <a:p>
-                      <a:endParaRPr lang="en-US"/>
+                      <a:r>
+                        <a:rPr lang="en-US" dirty="0" smtClean="0"/>
+                        <a:t>Marine</a:t>
+                      </a:r>
+                      <a:endParaRPr lang="en-US" dirty="0"/>
                     </a:p>
                   </a:txBody>
                   <a:tcPr>
@@ -4310,7 +4526,11 @@
                     <a:bodyPr/>
                     <a:lstStyle/>
                     <a:p>
-                      <a:endParaRPr lang="en-US"/>
+                      <a:r>
+                        <a:rPr lang="en-US" dirty="0" smtClean="0"/>
+                        <a:t>Freshwater</a:t>
+                      </a:r>
+                      <a:endParaRPr lang="en-US" dirty="0"/>
                     </a:p>
                   </a:txBody>
                   <a:tcPr>
@@ -4420,14 +4640,14 @@
           <p:nvPr/>
         </p:nvPicPr>
         <p:blipFill>
-          <a:blip r:embed="rId10"/>
+          <a:blip r:embed="rId11"/>
           <a:stretch>
             <a:fillRect/>
           </a:stretch>
         </p:blipFill>
         <p:spPr>
           <a:xfrm>
-            <a:off x="6567853" y="733268"/>
+            <a:off x="6494631" y="733268"/>
             <a:ext cx="655912" cy="396304"/>
           </a:xfrm>
           <a:prstGeom prst="rect">
@@ -4444,62 +4664,15 @@
           <p:nvPr/>
         </p:nvPicPr>
         <p:blipFill>
-          <a:blip r:embed="rId11"/>
+          <a:blip r:embed="rId12"/>
           <a:stretch>
             <a:fillRect/>
           </a:stretch>
         </p:blipFill>
         <p:spPr>
           <a:xfrm>
-            <a:off x="6567852" y="1266093"/>
+            <a:off x="6494631" y="1209988"/>
             <a:ext cx="728479" cy="293882"/>
-          </a:xfrm>
-          <a:prstGeom prst="rect">
-            <a:avLst/>
-          </a:prstGeom>
-        </p:spPr>
-      </p:pic>
-      <p:pic>
-        <p:nvPicPr>
-          <p:cNvPr id="14" name="Picture 13"/>
-          <p:cNvPicPr>
-            <a:picLocks noChangeAspect="1"/>
-          </p:cNvPicPr>
-          <p:nvPr/>
-        </p:nvPicPr>
-        <p:blipFill rotWithShape="1">
-          <a:blip r:embed="rId12"/>
-          <a:srcRect l="457" r="546" b="636"/>
-          <a:stretch/>
-        </p:blipFill>
-        <p:spPr>
-          <a:xfrm>
-            <a:off x="8521828" y="1623649"/>
-            <a:ext cx="326078" cy="326162"/>
-          </a:xfrm>
-          <a:prstGeom prst="rect">
-            <a:avLst/>
-          </a:prstGeom>
-        </p:spPr>
-      </p:pic>
-      <p:pic>
-        <p:nvPicPr>
-          <p:cNvPr id="15" name="Picture 14"/>
-          <p:cNvPicPr>
-            <a:picLocks noChangeAspect="1"/>
-          </p:cNvPicPr>
-          <p:nvPr/>
-        </p:nvPicPr>
-        <p:blipFill>
-          <a:blip r:embed="rId13"/>
-          <a:stretch>
-            <a:fillRect/>
-          </a:stretch>
-        </p:blipFill>
-        <p:spPr>
-          <a:xfrm>
-            <a:off x="7794737" y="1635934"/>
-            <a:ext cx="404974" cy="369277"/>
           </a:xfrm>
           <a:prstGeom prst="rect">
             <a:avLst/>
@@ -4536,6 +4709,29 @@
           <a:chExt cx="0" cy="0"/>
         </a:xfrm>
       </p:grpSpPr>
+      <p:pic>
+        <p:nvPicPr>
+          <p:cNvPr id="4" name="Picture 3"/>
+          <p:cNvPicPr>
+            <a:picLocks noChangeAspect="1"/>
+          </p:cNvPicPr>
+          <p:nvPr/>
+        </p:nvPicPr>
+        <p:blipFill rotWithShape="1">
+          <a:blip r:embed="rId3"/>
+          <a:srcRect l="468"/>
+          <a:stretch/>
+        </p:blipFill>
+        <p:spPr>
+          <a:xfrm>
+            <a:off x="1185598" y="0"/>
+            <a:ext cx="8642055" cy="6629400"/>
+          </a:xfrm>
+          <a:prstGeom prst="rect">
+            <a:avLst/>
+          </a:prstGeom>
+        </p:spPr>
+      </p:pic>
       <p:sp>
         <p:nvSpPr>
           <p:cNvPr id="2" name="TextBox 1"/>
@@ -4544,7 +4740,7 @@
         </p:nvSpPr>
         <p:spPr>
           <a:xfrm>
-            <a:off x="320040" y="566928"/>
+            <a:off x="142861" y="192024"/>
             <a:ext cx="1060704" cy="369332"/>
           </a:xfrm>
           <a:prstGeom prst="rect">
@@ -4574,8 +4770,8 @@
         </p:nvGrpSpPr>
         <p:grpSpPr>
           <a:xfrm>
-            <a:off x="6793821" y="5254218"/>
-            <a:ext cx="1872544" cy="192467"/>
+            <a:off x="1955798" y="4009611"/>
+            <a:ext cx="3255436" cy="375380"/>
             <a:chOff x="2721075" y="6066646"/>
             <a:chExt cx="2738999" cy="243895"/>
           </a:xfrm>
@@ -4617,7 +4813,7 @@
                 <p:nvPr/>
               </p:nvPicPr>
               <p:blipFill>
-                <a:blip r:embed="rId2" cstate="print">
+                <a:blip r:embed="rId4" cstate="print">
                   <a:extLst>
                     <a:ext uri="{28A0092B-C50C-407E-A947-70E740481C1C}">
                       <a14:useLocalDpi xmlns:a14="http://schemas.microsoft.com/office/drawing/2010/main" val="0"/>
@@ -4647,7 +4843,7 @@
                 <p:nvPr/>
               </p:nvPicPr>
               <p:blipFill>
-                <a:blip r:embed="rId3" cstate="print">
+                <a:blip r:embed="rId5" cstate="print">
                   <a:extLst>
                     <a:ext uri="{28A0092B-C50C-407E-A947-70E740481C1C}">
                       <a14:useLocalDpi xmlns:a14="http://schemas.microsoft.com/office/drawing/2010/main" val="0"/>
@@ -4677,7 +4873,7 @@
                 <p:nvPr/>
               </p:nvPicPr>
               <p:blipFill>
-                <a:blip r:embed="rId4" cstate="print">
+                <a:blip r:embed="rId6" cstate="print">
                   <a:extLst>
                     <a:ext uri="{28A0092B-C50C-407E-A947-70E740481C1C}">
                       <a14:useLocalDpi xmlns:a14="http://schemas.microsoft.com/office/drawing/2010/main" val="0"/>
@@ -4707,7 +4903,7 @@
                 <p:nvPr/>
               </p:nvPicPr>
               <p:blipFill>
-                <a:blip r:embed="rId5" cstate="print">
+                <a:blip r:embed="rId7" cstate="print">
                   <a:extLst>
                     <a:ext uri="{28A0092B-C50C-407E-A947-70E740481C1C}">
                       <a14:useLocalDpi xmlns:a14="http://schemas.microsoft.com/office/drawing/2010/main" val="0"/>
@@ -4738,7 +4934,7 @@
               <p:nvPr/>
             </p:nvPicPr>
             <p:blipFill>
-              <a:blip r:embed="rId6"/>
+              <a:blip r:embed="rId8"/>
               <a:stretch>
                 <a:fillRect/>
               </a:stretch>
@@ -4763,7 +4959,7 @@
             <p:nvPr/>
           </p:nvPicPr>
           <p:blipFill>
-            <a:blip r:embed="rId7"/>
+            <a:blip r:embed="rId9"/>
             <a:stretch>
               <a:fillRect/>
             </a:stretch>
@@ -4787,7 +4983,7 @@
             <p:nvPr/>
           </p:nvPicPr>
           <p:blipFill>
-            <a:blip r:embed="rId8"/>
+            <a:blip r:embed="rId10"/>
             <a:stretch>
               <a:fillRect/>
             </a:stretch>
@@ -4805,21 +5001,195 @@
       </p:grpSp>
       <p:grpSp>
         <p:nvGrpSpPr>
-          <p:cNvPr id="41" name="Group 40"/>
+          <p:cNvPr id="8" name="Group 7"/>
           <p:cNvGrpSpPr/>
           <p:nvPr/>
         </p:nvGrpSpPr>
         <p:grpSpPr>
           <a:xfrm>
-            <a:off x="9854367" y="5249751"/>
-            <a:ext cx="1872544" cy="192467"/>
+            <a:off x="2066372" y="1693067"/>
+            <a:ext cx="3063411" cy="422147"/>
+            <a:chOff x="2066372" y="1693067"/>
+            <a:chExt cx="3063411" cy="422147"/>
+          </a:xfrm>
+        </p:grpSpPr>
+        <p:pic>
+          <p:nvPicPr>
+            <p:cNvPr id="64" name="Picture 63"/>
+            <p:cNvPicPr>
+              <a:picLocks noChangeAspect="1"/>
+            </p:cNvPicPr>
+            <p:nvPr/>
+          </p:nvPicPr>
+          <p:blipFill>
+            <a:blip r:embed="rId11"/>
+            <a:stretch>
+              <a:fillRect/>
+            </a:stretch>
+          </p:blipFill>
+          <p:spPr>
+            <a:xfrm>
+              <a:off x="2066372" y="1693067"/>
+              <a:ext cx="655912" cy="396304"/>
+            </a:xfrm>
+            <a:prstGeom prst="rect">
+              <a:avLst/>
+            </a:prstGeom>
+          </p:spPr>
+        </p:pic>
+        <p:pic>
+          <p:nvPicPr>
+            <p:cNvPr id="66" name="Picture 65"/>
+            <p:cNvPicPr>
+              <a:picLocks noChangeAspect="1"/>
+            </p:cNvPicPr>
+            <p:nvPr/>
+          </p:nvPicPr>
+          <p:blipFill>
+            <a:blip r:embed="rId12"/>
+            <a:stretch>
+              <a:fillRect/>
+            </a:stretch>
+          </p:blipFill>
+          <p:spPr>
+            <a:xfrm>
+              <a:off x="4401304" y="1744278"/>
+              <a:ext cx="728479" cy="293882"/>
+            </a:xfrm>
+            <a:prstGeom prst="rect">
+              <a:avLst/>
+            </a:prstGeom>
+          </p:spPr>
+        </p:pic>
+        <p:pic>
+          <p:nvPicPr>
+            <p:cNvPr id="67" name="Picture 66"/>
+            <p:cNvPicPr>
+              <a:picLocks noChangeAspect="1"/>
+            </p:cNvPicPr>
+            <p:nvPr/>
+          </p:nvPicPr>
+          <p:blipFill>
+            <a:blip r:embed="rId13"/>
+            <a:stretch>
+              <a:fillRect/>
+            </a:stretch>
+          </p:blipFill>
+          <p:spPr>
+            <a:xfrm>
+              <a:off x="3263114" y="1706270"/>
+              <a:ext cx="640805" cy="408944"/>
+            </a:xfrm>
+            <a:prstGeom prst="rect">
+              <a:avLst/>
+            </a:prstGeom>
+          </p:spPr>
+        </p:pic>
+      </p:grpSp>
+      <p:grpSp>
+        <p:nvGrpSpPr>
+          <p:cNvPr id="68" name="Group 67"/>
+          <p:cNvGrpSpPr/>
+          <p:nvPr/>
+        </p:nvGrpSpPr>
+        <p:grpSpPr>
+          <a:xfrm>
+            <a:off x="6434156" y="1706270"/>
+            <a:ext cx="3063411" cy="422147"/>
+            <a:chOff x="2066372" y="1693067"/>
+            <a:chExt cx="3063411" cy="422147"/>
+          </a:xfrm>
+        </p:grpSpPr>
+        <p:pic>
+          <p:nvPicPr>
+            <p:cNvPr id="69" name="Picture 68"/>
+            <p:cNvPicPr>
+              <a:picLocks noChangeAspect="1"/>
+            </p:cNvPicPr>
+            <p:nvPr/>
+          </p:nvPicPr>
+          <p:blipFill>
+            <a:blip r:embed="rId11"/>
+            <a:stretch>
+              <a:fillRect/>
+            </a:stretch>
+          </p:blipFill>
+          <p:spPr>
+            <a:xfrm>
+              <a:off x="2066372" y="1693067"/>
+              <a:ext cx="655912" cy="396304"/>
+            </a:xfrm>
+            <a:prstGeom prst="rect">
+              <a:avLst/>
+            </a:prstGeom>
+          </p:spPr>
+        </p:pic>
+        <p:pic>
+          <p:nvPicPr>
+            <p:cNvPr id="70" name="Picture 69"/>
+            <p:cNvPicPr>
+              <a:picLocks noChangeAspect="1"/>
+            </p:cNvPicPr>
+            <p:nvPr/>
+          </p:nvPicPr>
+          <p:blipFill>
+            <a:blip r:embed="rId12"/>
+            <a:stretch>
+              <a:fillRect/>
+            </a:stretch>
+          </p:blipFill>
+          <p:spPr>
+            <a:xfrm>
+              <a:off x="4401304" y="1744278"/>
+              <a:ext cx="728479" cy="293882"/>
+            </a:xfrm>
+            <a:prstGeom prst="rect">
+              <a:avLst/>
+            </a:prstGeom>
+          </p:spPr>
+        </p:pic>
+        <p:pic>
+          <p:nvPicPr>
+            <p:cNvPr id="71" name="Picture 70"/>
+            <p:cNvPicPr>
+              <a:picLocks noChangeAspect="1"/>
+            </p:cNvPicPr>
+            <p:nvPr/>
+          </p:nvPicPr>
+          <p:blipFill>
+            <a:blip r:embed="rId13"/>
+            <a:stretch>
+              <a:fillRect/>
+            </a:stretch>
+          </p:blipFill>
+          <p:spPr>
+            <a:xfrm>
+              <a:off x="3263114" y="1706270"/>
+              <a:ext cx="640805" cy="408944"/>
+            </a:xfrm>
+            <a:prstGeom prst="rect">
+              <a:avLst/>
+            </a:prstGeom>
+          </p:spPr>
+        </p:pic>
+      </p:grpSp>
+      <p:grpSp>
+        <p:nvGrpSpPr>
+          <p:cNvPr id="72" name="Group 71"/>
+          <p:cNvGrpSpPr/>
+          <p:nvPr/>
+        </p:nvGrpSpPr>
+        <p:grpSpPr>
+          <a:xfrm>
+            <a:off x="6323582" y="4059126"/>
+            <a:ext cx="3255436" cy="375380"/>
             <a:chOff x="2721075" y="6066646"/>
             <a:chExt cx="2738999" cy="243895"/>
           </a:xfrm>
         </p:grpSpPr>
         <p:grpSp>
           <p:nvGrpSpPr>
-            <p:cNvPr id="43" name="Group 42"/>
+            <p:cNvPr id="73" name="Group 72"/>
             <p:cNvGrpSpPr/>
             <p:nvPr/>
           </p:nvGrpSpPr>
@@ -4833,7 +5203,7 @@
           </p:grpSpPr>
           <p:grpSp>
             <p:nvGrpSpPr>
-              <p:cNvPr id="46" name="Group 45"/>
+              <p:cNvPr id="76" name="Group 75"/>
               <p:cNvGrpSpPr/>
               <p:nvPr/>
             </p:nvGrpSpPr>
@@ -4847,14 +5217,14 @@
             </p:grpSpPr>
             <p:pic>
               <p:nvPicPr>
-                <p:cNvPr id="48" name="Picture 47"/>
+                <p:cNvPr id="78" name="Picture 77"/>
                 <p:cNvPicPr>
                   <a:picLocks noChangeAspect="1"/>
                 </p:cNvPicPr>
                 <p:nvPr/>
               </p:nvPicPr>
               <p:blipFill>
-                <a:blip r:embed="rId2" cstate="print">
+                <a:blip r:embed="rId4" cstate="print">
                   <a:extLst>
                     <a:ext uri="{28A0092B-C50C-407E-A947-70E740481C1C}">
                       <a14:useLocalDpi xmlns:a14="http://schemas.microsoft.com/office/drawing/2010/main" val="0"/>
@@ -4877,14 +5247,14 @@
             </p:pic>
             <p:pic>
               <p:nvPicPr>
-                <p:cNvPr id="49" name="Picture 48"/>
+                <p:cNvPr id="79" name="Picture 78"/>
                 <p:cNvPicPr>
                   <a:picLocks noChangeAspect="1"/>
                 </p:cNvPicPr>
                 <p:nvPr/>
               </p:nvPicPr>
               <p:blipFill>
-                <a:blip r:embed="rId3" cstate="print">
+                <a:blip r:embed="rId5" cstate="print">
                   <a:extLst>
                     <a:ext uri="{28A0092B-C50C-407E-A947-70E740481C1C}">
                       <a14:useLocalDpi xmlns:a14="http://schemas.microsoft.com/office/drawing/2010/main" val="0"/>
@@ -4907,14 +5277,14 @@
             </p:pic>
             <p:pic>
               <p:nvPicPr>
-                <p:cNvPr id="50" name="Picture 49"/>
+                <p:cNvPr id="80" name="Picture 79"/>
                 <p:cNvPicPr>
                   <a:picLocks noChangeAspect="1"/>
                 </p:cNvPicPr>
                 <p:nvPr/>
               </p:nvPicPr>
               <p:blipFill>
-                <a:blip r:embed="rId4" cstate="print">
+                <a:blip r:embed="rId6" cstate="print">
                   <a:extLst>
                     <a:ext uri="{28A0092B-C50C-407E-A947-70E740481C1C}">
                       <a14:useLocalDpi xmlns:a14="http://schemas.microsoft.com/office/drawing/2010/main" val="0"/>
@@ -4937,14 +5307,14 @@
             </p:pic>
             <p:pic>
               <p:nvPicPr>
-                <p:cNvPr id="51" name="Picture 50"/>
+                <p:cNvPr id="81" name="Picture 80"/>
                 <p:cNvPicPr>
                   <a:picLocks noChangeAspect="1"/>
                 </p:cNvPicPr>
                 <p:nvPr/>
               </p:nvPicPr>
               <p:blipFill>
-                <a:blip r:embed="rId5" cstate="print">
+                <a:blip r:embed="rId7" cstate="print">
                   <a:extLst>
                     <a:ext uri="{28A0092B-C50C-407E-A947-70E740481C1C}">
                       <a14:useLocalDpi xmlns:a14="http://schemas.microsoft.com/office/drawing/2010/main" val="0"/>
@@ -4968,14 +5338,14 @@
           </p:grpSp>
           <p:pic>
             <p:nvPicPr>
-              <p:cNvPr id="47" name="Picture 46"/>
+              <p:cNvPr id="77" name="Picture 76"/>
               <p:cNvPicPr>
                 <a:picLocks noChangeAspect="1"/>
               </p:cNvPicPr>
               <p:nvPr/>
             </p:nvPicPr>
             <p:blipFill>
-              <a:blip r:embed="rId6"/>
+              <a:blip r:embed="rId8"/>
               <a:stretch>
                 <a:fillRect/>
               </a:stretch>
@@ -4993,14 +5363,14 @@
         </p:grpSp>
         <p:pic>
           <p:nvPicPr>
-            <p:cNvPr id="44" name="Picture 43"/>
+            <p:cNvPr id="74" name="Picture 73"/>
             <p:cNvPicPr>
               <a:picLocks noChangeAspect="1"/>
             </p:cNvPicPr>
             <p:nvPr/>
           </p:nvPicPr>
           <p:blipFill>
-            <a:blip r:embed="rId7"/>
+            <a:blip r:embed="rId9"/>
             <a:stretch>
               <a:fillRect/>
             </a:stretch>
@@ -5017,14 +5387,14 @@
         </p:pic>
         <p:pic>
           <p:nvPicPr>
-            <p:cNvPr id="45" name="Picture 44"/>
+            <p:cNvPr id="75" name="Picture 74"/>
             <p:cNvPicPr>
               <a:picLocks noChangeAspect="1"/>
             </p:cNvPicPr>
             <p:nvPr/>
           </p:nvPicPr>
           <p:blipFill>
-            <a:blip r:embed="rId8"/>
+            <a:blip r:embed="rId10"/>
             <a:stretch>
               <a:fillRect/>
             </a:stretch>
@@ -5042,238 +5412,70 @@
       </p:grpSp>
       <p:grpSp>
         <p:nvGrpSpPr>
-          <p:cNvPr id="11" name="Group 10"/>
+          <p:cNvPr id="82" name="Group 81"/>
           <p:cNvGrpSpPr/>
           <p:nvPr/>
         </p:nvGrpSpPr>
         <p:grpSpPr>
           <a:xfrm>
-            <a:off x="70913" y="1203435"/>
-            <a:ext cx="5659509" cy="4035703"/>
-            <a:chOff x="2366005" y="357098"/>
-            <a:chExt cx="5305184" cy="3751757"/>
+            <a:off x="1955798" y="6380121"/>
+            <a:ext cx="3255436" cy="375380"/>
+            <a:chOff x="2721075" y="6066646"/>
+            <a:chExt cx="2738999" cy="243895"/>
           </a:xfrm>
         </p:grpSpPr>
         <p:grpSp>
           <p:nvGrpSpPr>
-            <p:cNvPr id="7" name="Group 6"/>
+            <p:cNvPr id="83" name="Group 82"/>
             <p:cNvGrpSpPr/>
             <p:nvPr/>
           </p:nvGrpSpPr>
           <p:grpSpPr>
             <a:xfrm>
-              <a:off x="3190628" y="3940966"/>
-              <a:ext cx="4339292" cy="167889"/>
+              <a:off x="2721075" y="6066646"/>
+              <a:ext cx="2738999" cy="243895"/>
               <a:chOff x="2721075" y="6066646"/>
-              <a:chExt cx="7348959" cy="276066"/>
+              <a:chExt cx="2738999" cy="243895"/>
             </a:xfrm>
           </p:grpSpPr>
           <p:grpSp>
             <p:nvGrpSpPr>
-              <p:cNvPr id="6" name="Group 5"/>
+              <p:cNvPr id="86" name="Group 85"/>
               <p:cNvGrpSpPr/>
               <p:nvPr/>
             </p:nvGrpSpPr>
             <p:grpSpPr>
               <a:xfrm>
-                <a:off x="2721075" y="6066646"/>
-                <a:ext cx="2738999" cy="243895"/>
-                <a:chOff x="2721075" y="6066646"/>
-                <a:chExt cx="2738999" cy="243895"/>
+                <a:off x="2721075" y="6083191"/>
+                <a:ext cx="2738999" cy="227350"/>
+                <a:chOff x="2887074" y="6083191"/>
+                <a:chExt cx="2738999" cy="227350"/>
               </a:xfrm>
             </p:grpSpPr>
-            <p:grpSp>
-              <p:nvGrpSpPr>
-                <p:cNvPr id="5" name="Group 4"/>
-                <p:cNvGrpSpPr/>
-                <p:nvPr/>
-              </p:nvGrpSpPr>
-              <p:grpSpPr>
-                <a:xfrm>
-                  <a:off x="2721075" y="6066646"/>
-                  <a:ext cx="2738999" cy="243895"/>
-                  <a:chOff x="2721075" y="6066646"/>
-                  <a:chExt cx="2738999" cy="243895"/>
-                </a:xfrm>
-              </p:grpSpPr>
-              <p:grpSp>
-                <p:nvGrpSpPr>
-                  <p:cNvPr id="3" name="Group 2"/>
-                  <p:cNvGrpSpPr/>
-                  <p:nvPr/>
-                </p:nvGrpSpPr>
-                <p:grpSpPr>
-                  <a:xfrm>
-                    <a:off x="2721075" y="6083191"/>
-                    <a:ext cx="2738999" cy="227350"/>
-                    <a:chOff x="2887074" y="6083191"/>
-                    <a:chExt cx="2738999" cy="227350"/>
-                  </a:xfrm>
-                </p:grpSpPr>
-                <p:pic>
-                  <p:nvPicPr>
-                    <p:cNvPr id="12" name="Picture 11"/>
-                    <p:cNvPicPr>
-                      <a:picLocks noChangeAspect="1"/>
-                    </p:cNvPicPr>
-                    <p:nvPr/>
-                  </p:nvPicPr>
-                  <p:blipFill>
-                    <a:blip r:embed="rId2" cstate="print">
-                      <a:extLst>
-                        <a:ext uri="{28A0092B-C50C-407E-A947-70E740481C1C}">
-                          <a14:useLocalDpi xmlns:a14="http://schemas.microsoft.com/office/drawing/2010/main" val="0"/>
-                        </a:ext>
-                      </a:extLst>
-                    </a:blip>
-                    <a:stretch>
-                      <a:fillRect/>
-                    </a:stretch>
-                  </p:blipFill>
-                  <p:spPr>
-                    <a:xfrm>
-                      <a:off x="4079269" y="6103833"/>
-                      <a:ext cx="325640" cy="161565"/>
-                    </a:xfrm>
-                    <a:prstGeom prst="rect">
-                      <a:avLst/>
-                    </a:prstGeom>
-                  </p:spPr>
-                </p:pic>
-                <p:pic>
-                  <p:nvPicPr>
-                    <p:cNvPr id="15" name="Picture 14"/>
-                    <p:cNvPicPr>
-                      <a:picLocks noChangeAspect="1"/>
-                    </p:cNvPicPr>
-                    <p:nvPr/>
-                  </p:nvPicPr>
-                  <p:blipFill>
-                    <a:blip r:embed="rId3" cstate="print">
-                      <a:extLst>
-                        <a:ext uri="{28A0092B-C50C-407E-A947-70E740481C1C}">
-                          <a14:useLocalDpi xmlns:a14="http://schemas.microsoft.com/office/drawing/2010/main" val="0"/>
-                        </a:ext>
-                      </a:extLst>
-                    </a:blip>
-                    <a:stretch>
-                      <a:fillRect/>
-                    </a:stretch>
-                  </p:blipFill>
-                  <p:spPr>
-                    <a:xfrm>
-                      <a:off x="5345440" y="6084945"/>
-                      <a:ext cx="280633" cy="225596"/>
-                    </a:xfrm>
-                    <a:prstGeom prst="rect">
-                      <a:avLst/>
-                    </a:prstGeom>
-                  </p:spPr>
-                </p:pic>
-                <p:pic>
-                  <p:nvPicPr>
-                    <p:cNvPr id="17" name="Picture 16"/>
-                    <p:cNvPicPr>
-                      <a:picLocks noChangeAspect="1"/>
-                    </p:cNvPicPr>
-                    <p:nvPr/>
-                  </p:nvPicPr>
-                  <p:blipFill>
-                    <a:blip r:embed="rId4" cstate="print">
-                      <a:extLst>
-                        <a:ext uri="{28A0092B-C50C-407E-A947-70E740481C1C}">
-                          <a14:useLocalDpi xmlns:a14="http://schemas.microsoft.com/office/drawing/2010/main" val="0"/>
-                        </a:ext>
-                      </a:extLst>
-                    </a:blip>
-                    <a:stretch>
-                      <a:fillRect/>
-                    </a:stretch>
-                  </p:blipFill>
-                  <p:spPr>
-                    <a:xfrm>
-                      <a:off x="4515280" y="6084945"/>
-                      <a:ext cx="274386" cy="225596"/>
-                    </a:xfrm>
-                    <a:prstGeom prst="rect">
-                      <a:avLst/>
-                    </a:prstGeom>
-                  </p:spPr>
-                </p:pic>
-                <p:pic>
-                  <p:nvPicPr>
-                    <p:cNvPr id="18" name="Picture 17"/>
-                    <p:cNvPicPr>
-                      <a:picLocks noChangeAspect="1"/>
-                    </p:cNvPicPr>
-                    <p:nvPr/>
-                  </p:nvPicPr>
-                  <p:blipFill>
-                    <a:blip r:embed="rId5" cstate="print">
-                      <a:extLst>
-                        <a:ext uri="{28A0092B-C50C-407E-A947-70E740481C1C}">
-                          <a14:useLocalDpi xmlns:a14="http://schemas.microsoft.com/office/drawing/2010/main" val="0"/>
-                        </a:ext>
-                      </a:extLst>
-                    </a:blip>
-                    <a:stretch>
-                      <a:fillRect/>
-                    </a:stretch>
-                  </p:blipFill>
-                  <p:spPr>
-                    <a:xfrm flipH="1">
-                      <a:off x="2887074" y="6083191"/>
-                      <a:ext cx="255789" cy="218495"/>
-                    </a:xfrm>
-                    <a:prstGeom prst="rect">
-                      <a:avLst/>
-                    </a:prstGeom>
-                  </p:spPr>
-                </p:pic>
-              </p:grpSp>
-              <p:pic>
-                <p:nvPicPr>
-                  <p:cNvPr id="20" name="Picture 19"/>
-                  <p:cNvPicPr>
-                    <a:picLocks noChangeAspect="1"/>
-                  </p:cNvPicPr>
-                  <p:nvPr/>
-                </p:nvPicPr>
-                <p:blipFill>
-                  <a:blip r:embed="rId6"/>
-                  <a:stretch>
-                    <a:fillRect/>
-                  </a:stretch>
-                </p:blipFill>
-                <p:spPr>
-                  <a:xfrm>
-                    <a:off x="4734039" y="6066646"/>
-                    <a:ext cx="302061" cy="235941"/>
-                  </a:xfrm>
-                  <a:prstGeom prst="rect">
-                    <a:avLst/>
-                  </a:prstGeom>
-                </p:spPr>
-              </p:pic>
-            </p:grpSp>
             <p:pic>
               <p:nvPicPr>
-                <p:cNvPr id="26" name="Picture 25"/>
+                <p:cNvPr id="88" name="Picture 87"/>
                 <p:cNvPicPr>
                   <a:picLocks noChangeAspect="1"/>
                 </p:cNvPicPr>
                 <p:nvPr/>
               </p:nvPicPr>
               <p:blipFill>
-                <a:blip r:embed="rId7"/>
+                <a:blip r:embed="rId4" cstate="print">
+                  <a:extLst>
+                    <a:ext uri="{28A0092B-C50C-407E-A947-70E740481C1C}">
+                      <a14:useLocalDpi xmlns:a14="http://schemas.microsoft.com/office/drawing/2010/main" val="0"/>
+                    </a:ext>
+                  </a:extLst>
+                </a:blip>
                 <a:stretch>
                   <a:fillRect/>
                 </a:stretch>
               </p:blipFill>
               <p:spPr>
                 <a:xfrm>
-                  <a:off x="3506696" y="6098817"/>
-                  <a:ext cx="334903" cy="198223"/>
+                  <a:off x="4079269" y="6103833"/>
+                  <a:ext cx="325640" cy="161565"/>
                 </a:xfrm>
                 <a:prstGeom prst="rect">
                   <a:avLst/>
@@ -5282,235 +5484,28 @@
             </p:pic>
             <p:pic>
               <p:nvPicPr>
-                <p:cNvPr id="27" name="Picture 26"/>
+                <p:cNvPr id="89" name="Picture 88"/>
                 <p:cNvPicPr>
                   <a:picLocks noChangeAspect="1"/>
                 </p:cNvPicPr>
                 <p:nvPr/>
               </p:nvPicPr>
               <p:blipFill>
-                <a:blip r:embed="rId8"/>
+                <a:blip r:embed="rId5" cstate="print">
+                  <a:extLst>
+                    <a:ext uri="{28A0092B-C50C-407E-A947-70E740481C1C}">
+                      <a14:useLocalDpi xmlns:a14="http://schemas.microsoft.com/office/drawing/2010/main" val="0"/>
+                    </a:ext>
+                  </a:extLst>
+                </a:blip>
                 <a:stretch>
                   <a:fillRect/>
                 </a:stretch>
               </p:blipFill>
               <p:spPr>
                 <a:xfrm>
-                  <a:off x="3107726" y="6098817"/>
-                  <a:ext cx="327300" cy="196986"/>
-                </a:xfrm>
-                <a:prstGeom prst="rect">
-                  <a:avLst/>
-                </a:prstGeom>
-              </p:spPr>
-            </p:pic>
-          </p:grpSp>
-          <p:grpSp>
-            <p:nvGrpSpPr>
-              <p:cNvPr id="29" name="Group 28"/>
-              <p:cNvGrpSpPr/>
-              <p:nvPr/>
-            </p:nvGrpSpPr>
-            <p:grpSpPr>
-              <a:xfrm>
-                <a:off x="7331035" y="6098817"/>
-                <a:ext cx="2738999" cy="243895"/>
-                <a:chOff x="2721075" y="6066646"/>
-                <a:chExt cx="2738999" cy="243895"/>
-              </a:xfrm>
-            </p:grpSpPr>
-            <p:grpSp>
-              <p:nvGrpSpPr>
-                <p:cNvPr id="30" name="Group 29"/>
-                <p:cNvGrpSpPr/>
-                <p:nvPr/>
-              </p:nvGrpSpPr>
-              <p:grpSpPr>
-                <a:xfrm>
-                  <a:off x="2721075" y="6066646"/>
-                  <a:ext cx="2738999" cy="243895"/>
-                  <a:chOff x="2721075" y="6066646"/>
-                  <a:chExt cx="2738999" cy="243895"/>
-                </a:xfrm>
-              </p:grpSpPr>
-              <p:grpSp>
-                <p:nvGrpSpPr>
-                  <p:cNvPr id="33" name="Group 32"/>
-                  <p:cNvGrpSpPr/>
-                  <p:nvPr/>
-                </p:nvGrpSpPr>
-                <p:grpSpPr>
-                  <a:xfrm>
-                    <a:off x="2721075" y="6083191"/>
-                    <a:ext cx="2738999" cy="227350"/>
-                    <a:chOff x="2887074" y="6083191"/>
-                    <a:chExt cx="2738999" cy="227350"/>
-                  </a:xfrm>
-                </p:grpSpPr>
-                <p:pic>
-                  <p:nvPicPr>
-                    <p:cNvPr id="35" name="Picture 34"/>
-                    <p:cNvPicPr>
-                      <a:picLocks noChangeAspect="1"/>
-                    </p:cNvPicPr>
-                    <p:nvPr/>
-                  </p:nvPicPr>
-                  <p:blipFill>
-                    <a:blip r:embed="rId2" cstate="print">
-                      <a:extLst>
-                        <a:ext uri="{28A0092B-C50C-407E-A947-70E740481C1C}">
-                          <a14:useLocalDpi xmlns:a14="http://schemas.microsoft.com/office/drawing/2010/main" val="0"/>
-                        </a:ext>
-                      </a:extLst>
-                    </a:blip>
-                    <a:stretch>
-                      <a:fillRect/>
-                    </a:stretch>
-                  </p:blipFill>
-                  <p:spPr>
-                    <a:xfrm>
-                      <a:off x="4079269" y="6103833"/>
-                      <a:ext cx="325640" cy="161565"/>
-                    </a:xfrm>
-                    <a:prstGeom prst="rect">
-                      <a:avLst/>
-                    </a:prstGeom>
-                  </p:spPr>
-                </p:pic>
-                <p:pic>
-                  <p:nvPicPr>
-                    <p:cNvPr id="36" name="Picture 35"/>
-                    <p:cNvPicPr>
-                      <a:picLocks noChangeAspect="1"/>
-                    </p:cNvPicPr>
-                    <p:nvPr/>
-                  </p:nvPicPr>
-                  <p:blipFill>
-                    <a:blip r:embed="rId3" cstate="print">
-                      <a:extLst>
-                        <a:ext uri="{28A0092B-C50C-407E-A947-70E740481C1C}">
-                          <a14:useLocalDpi xmlns:a14="http://schemas.microsoft.com/office/drawing/2010/main" val="0"/>
-                        </a:ext>
-                      </a:extLst>
-                    </a:blip>
-                    <a:stretch>
-                      <a:fillRect/>
-                    </a:stretch>
-                  </p:blipFill>
-                  <p:spPr>
-                    <a:xfrm>
-                      <a:off x="5345440" y="6084945"/>
-                      <a:ext cx="280633" cy="225596"/>
-                    </a:xfrm>
-                    <a:prstGeom prst="rect">
-                      <a:avLst/>
-                    </a:prstGeom>
-                  </p:spPr>
-                </p:pic>
-                <p:pic>
-                  <p:nvPicPr>
-                    <p:cNvPr id="37" name="Picture 36"/>
-                    <p:cNvPicPr>
-                      <a:picLocks noChangeAspect="1"/>
-                    </p:cNvPicPr>
-                    <p:nvPr/>
-                  </p:nvPicPr>
-                  <p:blipFill>
-                    <a:blip r:embed="rId4" cstate="print">
-                      <a:extLst>
-                        <a:ext uri="{28A0092B-C50C-407E-A947-70E740481C1C}">
-                          <a14:useLocalDpi xmlns:a14="http://schemas.microsoft.com/office/drawing/2010/main" val="0"/>
-                        </a:ext>
-                      </a:extLst>
-                    </a:blip>
-                    <a:stretch>
-                      <a:fillRect/>
-                    </a:stretch>
-                  </p:blipFill>
-                  <p:spPr>
-                    <a:xfrm>
-                      <a:off x="4515280" y="6084945"/>
-                      <a:ext cx="274386" cy="225596"/>
-                    </a:xfrm>
-                    <a:prstGeom prst="rect">
-                      <a:avLst/>
-                    </a:prstGeom>
-                  </p:spPr>
-                </p:pic>
-                <p:pic>
-                  <p:nvPicPr>
-                    <p:cNvPr id="38" name="Picture 37"/>
-                    <p:cNvPicPr>
-                      <a:picLocks noChangeAspect="1"/>
-                    </p:cNvPicPr>
-                    <p:nvPr/>
-                  </p:nvPicPr>
-                  <p:blipFill>
-                    <a:blip r:embed="rId5" cstate="print">
-                      <a:extLst>
-                        <a:ext uri="{28A0092B-C50C-407E-A947-70E740481C1C}">
-                          <a14:useLocalDpi xmlns:a14="http://schemas.microsoft.com/office/drawing/2010/main" val="0"/>
-                        </a:ext>
-                      </a:extLst>
-                    </a:blip>
-                    <a:stretch>
-                      <a:fillRect/>
-                    </a:stretch>
-                  </p:blipFill>
-                  <p:spPr>
-                    <a:xfrm flipH="1">
-                      <a:off x="2887074" y="6083191"/>
-                      <a:ext cx="255789" cy="218495"/>
-                    </a:xfrm>
-                    <a:prstGeom prst="rect">
-                      <a:avLst/>
-                    </a:prstGeom>
-                  </p:spPr>
-                </p:pic>
-              </p:grpSp>
-              <p:pic>
-                <p:nvPicPr>
-                  <p:cNvPr id="34" name="Picture 33"/>
-                  <p:cNvPicPr>
-                    <a:picLocks noChangeAspect="1"/>
-                  </p:cNvPicPr>
-                  <p:nvPr/>
-                </p:nvPicPr>
-                <p:blipFill>
-                  <a:blip r:embed="rId6"/>
-                  <a:stretch>
-                    <a:fillRect/>
-                  </a:stretch>
-                </p:blipFill>
-                <p:spPr>
-                  <a:xfrm>
-                    <a:off x="4734039" y="6066646"/>
-                    <a:ext cx="302061" cy="235941"/>
-                  </a:xfrm>
-                  <a:prstGeom prst="rect">
-                    <a:avLst/>
-                  </a:prstGeom>
-                </p:spPr>
-              </p:pic>
-            </p:grpSp>
-            <p:pic>
-              <p:nvPicPr>
-                <p:cNvPr id="31" name="Picture 30"/>
-                <p:cNvPicPr>
-                  <a:picLocks noChangeAspect="1"/>
-                </p:cNvPicPr>
-                <p:nvPr/>
-              </p:nvPicPr>
-              <p:blipFill>
-                <a:blip r:embed="rId7"/>
-                <a:stretch>
-                  <a:fillRect/>
-                </a:stretch>
-              </p:blipFill>
-              <p:spPr>
-                <a:xfrm>
-                  <a:off x="3506696" y="6098817"/>
-                  <a:ext cx="334903" cy="198223"/>
+                  <a:off x="5345440" y="6084945"/>
+                  <a:ext cx="280633" cy="225596"/>
                 </a:xfrm>
                 <a:prstGeom prst="rect">
                   <a:avLst/>
@@ -5519,22 +5514,58 @@
             </p:pic>
             <p:pic>
               <p:nvPicPr>
-                <p:cNvPr id="32" name="Picture 31"/>
+                <p:cNvPr id="90" name="Picture 89"/>
                 <p:cNvPicPr>
                   <a:picLocks noChangeAspect="1"/>
                 </p:cNvPicPr>
                 <p:nvPr/>
               </p:nvPicPr>
               <p:blipFill>
-                <a:blip r:embed="rId8"/>
+                <a:blip r:embed="rId6" cstate="print">
+                  <a:extLst>
+                    <a:ext uri="{28A0092B-C50C-407E-A947-70E740481C1C}">
+                      <a14:useLocalDpi xmlns:a14="http://schemas.microsoft.com/office/drawing/2010/main" val="0"/>
+                    </a:ext>
+                  </a:extLst>
+                </a:blip>
                 <a:stretch>
                   <a:fillRect/>
                 </a:stretch>
               </p:blipFill>
               <p:spPr>
                 <a:xfrm>
-                  <a:off x="3107726" y="6098817"/>
-                  <a:ext cx="327300" cy="196986"/>
+                  <a:off x="4515280" y="6084945"/>
+                  <a:ext cx="274386" cy="225596"/>
+                </a:xfrm>
+                <a:prstGeom prst="rect">
+                  <a:avLst/>
+                </a:prstGeom>
+              </p:spPr>
+            </p:pic>
+            <p:pic>
+              <p:nvPicPr>
+                <p:cNvPr id="91" name="Picture 90"/>
+                <p:cNvPicPr>
+                  <a:picLocks noChangeAspect="1"/>
+                </p:cNvPicPr>
+                <p:nvPr/>
+              </p:nvPicPr>
+              <p:blipFill>
+                <a:blip r:embed="rId7" cstate="print">
+                  <a:extLst>
+                    <a:ext uri="{28A0092B-C50C-407E-A947-70E740481C1C}">
+                      <a14:useLocalDpi xmlns:a14="http://schemas.microsoft.com/office/drawing/2010/main" val="0"/>
+                    </a:ext>
+                  </a:extLst>
+                </a:blip>
+                <a:stretch>
+                  <a:fillRect/>
+                </a:stretch>
+              </p:blipFill>
+              <p:spPr>
+                <a:xfrm flipH="1">
+                  <a:off x="2887074" y="6083191"/>
+                  <a:ext cx="255789" cy="218495"/>
                 </a:xfrm>
                 <a:prstGeom prst="rect">
                   <a:avLst/>
@@ -5542,10 +5573,34 @@
               </p:spPr>
             </p:pic>
           </p:grpSp>
+          <p:pic>
+            <p:nvPicPr>
+              <p:cNvPr id="87" name="Picture 86"/>
+              <p:cNvPicPr>
+                <a:picLocks noChangeAspect="1"/>
+              </p:cNvPicPr>
+              <p:nvPr/>
+            </p:nvPicPr>
+            <p:blipFill>
+              <a:blip r:embed="rId8"/>
+              <a:stretch>
+                <a:fillRect/>
+              </a:stretch>
+            </p:blipFill>
+            <p:spPr>
+              <a:xfrm>
+                <a:off x="4734039" y="6066646"/>
+                <a:ext cx="302061" cy="235941"/>
+              </a:xfrm>
+              <a:prstGeom prst="rect">
+                <a:avLst/>
+              </a:prstGeom>
+            </p:spPr>
+          </p:pic>
         </p:grpSp>
         <p:pic>
           <p:nvPicPr>
-            <p:cNvPr id="9" name="Picture 8"/>
+            <p:cNvPr id="84" name="Picture 83"/>
             <p:cNvPicPr>
               <a:picLocks noChangeAspect="1"/>
             </p:cNvPicPr>
@@ -5559,8 +5614,32 @@
           </p:blipFill>
           <p:spPr>
             <a:xfrm>
-              <a:off x="2366005" y="357098"/>
-              <a:ext cx="5305184" cy="3597548"/>
+              <a:off x="3506696" y="6098817"/>
+              <a:ext cx="334903" cy="198223"/>
+            </a:xfrm>
+            <a:prstGeom prst="rect">
+              <a:avLst/>
+            </a:prstGeom>
+          </p:spPr>
+        </p:pic>
+        <p:pic>
+          <p:nvPicPr>
+            <p:cNvPr id="85" name="Picture 84"/>
+            <p:cNvPicPr>
+              <a:picLocks noChangeAspect="1"/>
+            </p:cNvPicPr>
+            <p:nvPr/>
+          </p:nvPicPr>
+          <p:blipFill>
+            <a:blip r:embed="rId10"/>
+            <a:stretch>
+              <a:fillRect/>
+            </a:stretch>
+          </p:blipFill>
+          <p:spPr>
+            <a:xfrm>
+              <a:off x="3107726" y="6098817"/>
+              <a:ext cx="327300" cy="196986"/>
             </a:xfrm>
             <a:prstGeom prst="rect">
               <a:avLst/>
@@ -5568,30 +5647,243 @@
           </p:spPr>
         </p:pic>
       </p:grpSp>
-      <p:pic>
-        <p:nvPicPr>
-          <p:cNvPr id="13" name="Picture 12"/>
-          <p:cNvPicPr>
-            <a:picLocks noChangeAspect="1"/>
-          </p:cNvPicPr>
+      <p:grpSp>
+        <p:nvGrpSpPr>
+          <p:cNvPr id="92" name="Group 91"/>
+          <p:cNvGrpSpPr/>
           <p:nvPr/>
-        </p:nvPicPr>
-        <p:blipFill>
-          <a:blip r:embed="rId10"/>
-          <a:stretch>
-            <a:fillRect/>
-          </a:stretch>
-        </p:blipFill>
-        <p:spPr>
+        </p:nvGrpSpPr>
+        <p:grpSpPr>
           <a:xfrm>
-            <a:off x="6050211" y="1203435"/>
-            <a:ext cx="5830565" cy="4049454"/>
+            <a:off x="6345338" y="6357438"/>
+            <a:ext cx="3255436" cy="375380"/>
+            <a:chOff x="2721075" y="6066646"/>
+            <a:chExt cx="2738999" cy="243895"/>
           </a:xfrm>
-          <a:prstGeom prst="rect">
-            <a:avLst/>
-          </a:prstGeom>
-        </p:spPr>
-      </p:pic>
+        </p:grpSpPr>
+        <p:grpSp>
+          <p:nvGrpSpPr>
+            <p:cNvPr id="93" name="Group 92"/>
+            <p:cNvGrpSpPr/>
+            <p:nvPr/>
+          </p:nvGrpSpPr>
+          <p:grpSpPr>
+            <a:xfrm>
+              <a:off x="2721075" y="6066646"/>
+              <a:ext cx="2738999" cy="243895"/>
+              <a:chOff x="2721075" y="6066646"/>
+              <a:chExt cx="2738999" cy="243895"/>
+            </a:xfrm>
+          </p:grpSpPr>
+          <p:grpSp>
+            <p:nvGrpSpPr>
+              <p:cNvPr id="96" name="Group 95"/>
+              <p:cNvGrpSpPr/>
+              <p:nvPr/>
+            </p:nvGrpSpPr>
+            <p:grpSpPr>
+              <a:xfrm>
+                <a:off x="2721075" y="6083191"/>
+                <a:ext cx="2738999" cy="227350"/>
+                <a:chOff x="2887074" y="6083191"/>
+                <a:chExt cx="2738999" cy="227350"/>
+              </a:xfrm>
+            </p:grpSpPr>
+            <p:pic>
+              <p:nvPicPr>
+                <p:cNvPr id="98" name="Picture 97"/>
+                <p:cNvPicPr>
+                  <a:picLocks noChangeAspect="1"/>
+                </p:cNvPicPr>
+                <p:nvPr/>
+              </p:nvPicPr>
+              <p:blipFill>
+                <a:blip r:embed="rId4" cstate="print">
+                  <a:extLst>
+                    <a:ext uri="{28A0092B-C50C-407E-A947-70E740481C1C}">
+                      <a14:useLocalDpi xmlns:a14="http://schemas.microsoft.com/office/drawing/2010/main" val="0"/>
+                    </a:ext>
+                  </a:extLst>
+                </a:blip>
+                <a:stretch>
+                  <a:fillRect/>
+                </a:stretch>
+              </p:blipFill>
+              <p:spPr>
+                <a:xfrm>
+                  <a:off x="4079269" y="6103833"/>
+                  <a:ext cx="325640" cy="161565"/>
+                </a:xfrm>
+                <a:prstGeom prst="rect">
+                  <a:avLst/>
+                </a:prstGeom>
+              </p:spPr>
+            </p:pic>
+            <p:pic>
+              <p:nvPicPr>
+                <p:cNvPr id="99" name="Picture 98"/>
+                <p:cNvPicPr>
+                  <a:picLocks noChangeAspect="1"/>
+                </p:cNvPicPr>
+                <p:nvPr/>
+              </p:nvPicPr>
+              <p:blipFill>
+                <a:blip r:embed="rId5" cstate="print">
+                  <a:extLst>
+                    <a:ext uri="{28A0092B-C50C-407E-A947-70E740481C1C}">
+                      <a14:useLocalDpi xmlns:a14="http://schemas.microsoft.com/office/drawing/2010/main" val="0"/>
+                    </a:ext>
+                  </a:extLst>
+                </a:blip>
+                <a:stretch>
+                  <a:fillRect/>
+                </a:stretch>
+              </p:blipFill>
+              <p:spPr>
+                <a:xfrm>
+                  <a:off x="5345440" y="6084945"/>
+                  <a:ext cx="280633" cy="225596"/>
+                </a:xfrm>
+                <a:prstGeom prst="rect">
+                  <a:avLst/>
+                </a:prstGeom>
+              </p:spPr>
+            </p:pic>
+            <p:pic>
+              <p:nvPicPr>
+                <p:cNvPr id="100" name="Picture 99"/>
+                <p:cNvPicPr>
+                  <a:picLocks noChangeAspect="1"/>
+                </p:cNvPicPr>
+                <p:nvPr/>
+              </p:nvPicPr>
+              <p:blipFill>
+                <a:blip r:embed="rId6" cstate="print">
+                  <a:extLst>
+                    <a:ext uri="{28A0092B-C50C-407E-A947-70E740481C1C}">
+                      <a14:useLocalDpi xmlns:a14="http://schemas.microsoft.com/office/drawing/2010/main" val="0"/>
+                    </a:ext>
+                  </a:extLst>
+                </a:blip>
+                <a:stretch>
+                  <a:fillRect/>
+                </a:stretch>
+              </p:blipFill>
+              <p:spPr>
+                <a:xfrm>
+                  <a:off x="4515280" y="6084945"/>
+                  <a:ext cx="274386" cy="225596"/>
+                </a:xfrm>
+                <a:prstGeom prst="rect">
+                  <a:avLst/>
+                </a:prstGeom>
+              </p:spPr>
+            </p:pic>
+            <p:pic>
+              <p:nvPicPr>
+                <p:cNvPr id="101" name="Picture 100"/>
+                <p:cNvPicPr>
+                  <a:picLocks noChangeAspect="1"/>
+                </p:cNvPicPr>
+                <p:nvPr/>
+              </p:nvPicPr>
+              <p:blipFill>
+                <a:blip r:embed="rId7" cstate="print">
+                  <a:extLst>
+                    <a:ext uri="{28A0092B-C50C-407E-A947-70E740481C1C}">
+                      <a14:useLocalDpi xmlns:a14="http://schemas.microsoft.com/office/drawing/2010/main" val="0"/>
+                    </a:ext>
+                  </a:extLst>
+                </a:blip>
+                <a:stretch>
+                  <a:fillRect/>
+                </a:stretch>
+              </p:blipFill>
+              <p:spPr>
+                <a:xfrm flipH="1">
+                  <a:off x="2887074" y="6083191"/>
+                  <a:ext cx="255789" cy="218495"/>
+                </a:xfrm>
+                <a:prstGeom prst="rect">
+                  <a:avLst/>
+                </a:prstGeom>
+              </p:spPr>
+            </p:pic>
+          </p:grpSp>
+          <p:pic>
+            <p:nvPicPr>
+              <p:cNvPr id="97" name="Picture 96"/>
+              <p:cNvPicPr>
+                <a:picLocks noChangeAspect="1"/>
+              </p:cNvPicPr>
+              <p:nvPr/>
+            </p:nvPicPr>
+            <p:blipFill>
+              <a:blip r:embed="rId8"/>
+              <a:stretch>
+                <a:fillRect/>
+              </a:stretch>
+            </p:blipFill>
+            <p:spPr>
+              <a:xfrm>
+                <a:off x="4734039" y="6066646"/>
+                <a:ext cx="302061" cy="235941"/>
+              </a:xfrm>
+              <a:prstGeom prst="rect">
+                <a:avLst/>
+              </a:prstGeom>
+            </p:spPr>
+          </p:pic>
+        </p:grpSp>
+        <p:pic>
+          <p:nvPicPr>
+            <p:cNvPr id="94" name="Picture 93"/>
+            <p:cNvPicPr>
+              <a:picLocks noChangeAspect="1"/>
+            </p:cNvPicPr>
+            <p:nvPr/>
+          </p:nvPicPr>
+          <p:blipFill>
+            <a:blip r:embed="rId9"/>
+            <a:stretch>
+              <a:fillRect/>
+            </a:stretch>
+          </p:blipFill>
+          <p:spPr>
+            <a:xfrm>
+              <a:off x="3506696" y="6098817"/>
+              <a:ext cx="334903" cy="198223"/>
+            </a:xfrm>
+            <a:prstGeom prst="rect">
+              <a:avLst/>
+            </a:prstGeom>
+          </p:spPr>
+        </p:pic>
+        <p:pic>
+          <p:nvPicPr>
+            <p:cNvPr id="95" name="Picture 94"/>
+            <p:cNvPicPr>
+              <a:picLocks noChangeAspect="1"/>
+            </p:cNvPicPr>
+            <p:nvPr/>
+          </p:nvPicPr>
+          <p:blipFill>
+            <a:blip r:embed="rId10"/>
+            <a:stretch>
+              <a:fillRect/>
+            </a:stretch>
+          </p:blipFill>
+          <p:spPr>
+            <a:xfrm>
+              <a:off x="3107726" y="6098817"/>
+              <a:ext cx="327300" cy="196986"/>
+            </a:xfrm>
+            <a:prstGeom prst="rect">
+              <a:avLst/>
+            </a:prstGeom>
+          </p:spPr>
+        </p:pic>
+      </p:grpSp>
     </p:spTree>
     <p:extLst>
       <p:ext uri="{BB962C8B-B14F-4D97-AF65-F5344CB8AC3E}">
@@ -5622,225 +5914,215 @@
           <a:chExt cx="0" cy="0"/>
         </a:xfrm>
       </p:grpSpPr>
+      <p:sp>
+        <p:nvSpPr>
+          <p:cNvPr id="17" name="TextBox 16"/>
+          <p:cNvSpPr txBox="1"/>
+          <p:nvPr/>
+        </p:nvSpPr>
+        <p:spPr>
+          <a:xfrm>
+            <a:off x="228600" y="193318"/>
+            <a:ext cx="1060704" cy="369332"/>
+          </a:xfrm>
+          <a:prstGeom prst="rect">
+            <a:avLst/>
+          </a:prstGeom>
+          <a:noFill/>
+        </p:spPr>
+        <p:txBody>
+          <a:bodyPr wrap="square" rtlCol="0">
+            <a:spAutoFit/>
+          </a:bodyPr>
+          <a:lstStyle/>
+          <a:p>
+            <a:r>
+              <a:rPr lang="en-US" dirty="0" smtClean="0"/>
+              <a:t>Fig 2a-2b</a:t>
+            </a:r>
+          </a:p>
+        </p:txBody>
+      </p:sp>
+      <p:pic>
+        <p:nvPicPr>
+          <p:cNvPr id="2" name="Picture 1"/>
+          <p:cNvPicPr>
+            <a:picLocks noChangeAspect="1"/>
+          </p:cNvPicPr>
+          <p:nvPr/>
+        </p:nvPicPr>
+        <p:blipFill>
+          <a:blip r:embed="rId3"/>
+          <a:stretch>
+            <a:fillRect/>
+          </a:stretch>
+        </p:blipFill>
+        <p:spPr>
+          <a:xfrm>
+            <a:off x="1289304" y="70226"/>
+            <a:ext cx="9626664" cy="6427235"/>
+          </a:xfrm>
+          <a:prstGeom prst="rect">
+            <a:avLst/>
+          </a:prstGeom>
+        </p:spPr>
+      </p:pic>
       <p:grpSp>
         <p:nvGrpSpPr>
-          <p:cNvPr id="6" name="Group 5"/>
+          <p:cNvPr id="7" name="Group 6"/>
           <p:cNvGrpSpPr/>
           <p:nvPr/>
         </p:nvGrpSpPr>
         <p:grpSpPr>
           <a:xfrm>
-            <a:off x="1011163" y="65596"/>
-            <a:ext cx="9413888" cy="6414784"/>
-            <a:chOff x="1011163" y="65596"/>
-            <a:chExt cx="9413888" cy="6414784"/>
+            <a:off x="2092569" y="5642156"/>
+            <a:ext cx="3815862" cy="377873"/>
+            <a:chOff x="4092064" y="5579770"/>
+            <a:chExt cx="3105944" cy="245213"/>
           </a:xfrm>
         </p:grpSpPr>
-        <p:pic>
-          <p:nvPicPr>
-            <p:cNvPr id="4" name="Picture 3"/>
-            <p:cNvPicPr>
-              <a:picLocks noChangeAspect="1"/>
-            </p:cNvPicPr>
-            <p:nvPr/>
-          </p:nvPicPr>
-          <p:blipFill>
-            <a:blip r:embed="rId2"/>
-            <a:stretch>
-              <a:fillRect/>
-            </a:stretch>
-          </p:blipFill>
-          <p:spPr>
-            <a:xfrm>
-              <a:off x="1011163" y="271073"/>
-              <a:ext cx="9413888" cy="6209307"/>
-            </a:xfrm>
-            <a:prstGeom prst="rect">
-              <a:avLst/>
-            </a:prstGeom>
-          </p:spPr>
-        </p:pic>
         <p:grpSp>
           <p:nvGrpSpPr>
-            <p:cNvPr id="7" name="Group 6"/>
+            <p:cNvPr id="8" name="Group 7"/>
             <p:cNvGrpSpPr/>
             <p:nvPr/>
           </p:nvGrpSpPr>
           <p:grpSpPr>
             <a:xfrm>
-              <a:off x="1899786" y="5483456"/>
-              <a:ext cx="3544834" cy="310479"/>
+              <a:off x="4092064" y="5579770"/>
+              <a:ext cx="3105944" cy="245213"/>
               <a:chOff x="4092064" y="5579770"/>
               <a:chExt cx="3105944" cy="245213"/>
             </a:xfrm>
           </p:grpSpPr>
           <p:grpSp>
             <p:nvGrpSpPr>
-              <p:cNvPr id="8" name="Group 7"/>
+              <p:cNvPr id="11" name="Group 10"/>
               <p:cNvGrpSpPr/>
               <p:nvPr/>
             </p:nvGrpSpPr>
             <p:grpSpPr>
               <a:xfrm>
                 <a:off x="4092064" y="5579770"/>
-                <a:ext cx="3105944" cy="245213"/>
-                <a:chOff x="4092064" y="5579770"/>
-                <a:chExt cx="3105944" cy="245213"/>
+                <a:ext cx="2638534" cy="231317"/>
+                <a:chOff x="4258063" y="5579770"/>
+                <a:chExt cx="2638534" cy="231317"/>
               </a:xfrm>
             </p:grpSpPr>
-            <p:grpSp>
-              <p:nvGrpSpPr>
-                <p:cNvPr id="11" name="Group 10"/>
-                <p:cNvGrpSpPr/>
-                <p:nvPr/>
-              </p:nvGrpSpPr>
-              <p:grpSpPr>
-                <a:xfrm>
-                  <a:off x="4092064" y="5579770"/>
-                  <a:ext cx="2638534" cy="231317"/>
-                  <a:chOff x="4258063" y="5579770"/>
-                  <a:chExt cx="2638534" cy="231317"/>
-                </a:xfrm>
-              </p:grpSpPr>
-              <p:pic>
-                <p:nvPicPr>
-                  <p:cNvPr id="13" name="Picture 12"/>
-                  <p:cNvPicPr>
-                    <a:picLocks noChangeAspect="1"/>
-                  </p:cNvPicPr>
-                  <p:nvPr/>
-                </p:nvPicPr>
-                <p:blipFill>
-                  <a:blip r:embed="rId3" cstate="print">
-                    <a:extLst>
-                      <a:ext uri="{28A0092B-C50C-407E-A947-70E740481C1C}">
-                        <a14:useLocalDpi xmlns:a14="http://schemas.microsoft.com/office/drawing/2010/main" val="0"/>
-                      </a:ext>
-                    </a:extLst>
-                  </a:blip>
-                  <a:stretch>
-                    <a:fillRect/>
-                  </a:stretch>
-                </p:blipFill>
-                <p:spPr>
-                  <a:xfrm>
-                    <a:off x="4690969" y="5623587"/>
-                    <a:ext cx="325640" cy="161565"/>
-                  </a:xfrm>
-                  <a:prstGeom prst="rect">
-                    <a:avLst/>
-                  </a:prstGeom>
-                </p:spPr>
-              </p:pic>
-              <p:pic>
-                <p:nvPicPr>
-                  <p:cNvPr id="14" name="Picture 13"/>
-                  <p:cNvPicPr>
-                    <a:picLocks noChangeAspect="1"/>
-                  </p:cNvPicPr>
-                  <p:nvPr/>
-                </p:nvPicPr>
-                <p:blipFill>
-                  <a:blip r:embed="rId4" cstate="print">
-                    <a:extLst>
-                      <a:ext uri="{28A0092B-C50C-407E-A947-70E740481C1C}">
-                        <a14:useLocalDpi xmlns:a14="http://schemas.microsoft.com/office/drawing/2010/main" val="0"/>
-                      </a:ext>
-                    </a:extLst>
-                  </a:blip>
-                  <a:stretch>
-                    <a:fillRect/>
-                  </a:stretch>
-                </p:blipFill>
-                <p:spPr>
-                  <a:xfrm>
-                    <a:off x="5178545" y="5585491"/>
-                    <a:ext cx="280633" cy="225596"/>
-                  </a:xfrm>
-                  <a:prstGeom prst="rect">
-                    <a:avLst/>
-                  </a:prstGeom>
-                </p:spPr>
-              </p:pic>
-              <p:pic>
-                <p:nvPicPr>
-                  <p:cNvPr id="15" name="Picture 14"/>
-                  <p:cNvPicPr>
-                    <a:picLocks noChangeAspect="1"/>
-                  </p:cNvPicPr>
-                  <p:nvPr/>
-                </p:nvPicPr>
-                <p:blipFill>
-                  <a:blip r:embed="rId5" cstate="print">
-                    <a:extLst>
-                      <a:ext uri="{28A0092B-C50C-407E-A947-70E740481C1C}">
-                        <a14:useLocalDpi xmlns:a14="http://schemas.microsoft.com/office/drawing/2010/main" val="0"/>
-                      </a:ext>
-                    </a:extLst>
-                  </a:blip>
-                  <a:stretch>
-                    <a:fillRect/>
-                  </a:stretch>
-                </p:blipFill>
-                <p:spPr>
-                  <a:xfrm>
-                    <a:off x="4258063" y="5579770"/>
-                    <a:ext cx="274386" cy="225596"/>
-                  </a:xfrm>
-                  <a:prstGeom prst="rect">
-                    <a:avLst/>
-                  </a:prstGeom>
-                </p:spPr>
-              </p:pic>
-              <p:pic>
-                <p:nvPicPr>
-                  <p:cNvPr id="16" name="Picture 15"/>
-                  <p:cNvPicPr>
-                    <a:picLocks noChangeAspect="1"/>
-                  </p:cNvPicPr>
-                  <p:nvPr/>
-                </p:nvPicPr>
-                <p:blipFill>
-                  <a:blip r:embed="rId6" cstate="print">
-                    <a:extLst>
-                      <a:ext uri="{28A0092B-C50C-407E-A947-70E740481C1C}">
-                        <a14:useLocalDpi xmlns:a14="http://schemas.microsoft.com/office/drawing/2010/main" val="0"/>
-                      </a:ext>
-                    </a:extLst>
-                  </a:blip>
-                  <a:stretch>
-                    <a:fillRect/>
-                  </a:stretch>
-                </p:blipFill>
-                <p:spPr>
-                  <a:xfrm flipH="1">
-                    <a:off x="6640808" y="5592592"/>
-                    <a:ext cx="255789" cy="218495"/>
-                  </a:xfrm>
-                  <a:prstGeom prst="rect">
-                    <a:avLst/>
-                  </a:prstGeom>
-                </p:spPr>
-              </p:pic>
-            </p:grpSp>
             <p:pic>
               <p:nvPicPr>
-                <p:cNvPr id="12" name="Picture 11"/>
+                <p:cNvPr id="13" name="Picture 12"/>
                 <p:cNvPicPr>
                   <a:picLocks noChangeAspect="1"/>
                 </p:cNvPicPr>
                 <p:nvPr/>
               </p:nvPicPr>
               <p:blipFill>
-                <a:blip r:embed="rId7"/>
+                <a:blip r:embed="rId4" cstate="print">
+                  <a:extLst>
+                    <a:ext uri="{28A0092B-C50C-407E-A947-70E740481C1C}">
+                      <a14:useLocalDpi xmlns:a14="http://schemas.microsoft.com/office/drawing/2010/main" val="0"/>
+                    </a:ext>
+                  </a:extLst>
+                </a:blip>
                 <a:stretch>
                   <a:fillRect/>
                 </a:stretch>
               </p:blipFill>
               <p:spPr>
                 <a:xfrm>
-                  <a:off x="6895947" y="5589042"/>
-                  <a:ext cx="302061" cy="235941"/>
+                  <a:off x="4690969" y="5623587"/>
+                  <a:ext cx="325640" cy="161565"/>
+                </a:xfrm>
+                <a:prstGeom prst="rect">
+                  <a:avLst/>
+                </a:prstGeom>
+              </p:spPr>
+            </p:pic>
+            <p:pic>
+              <p:nvPicPr>
+                <p:cNvPr id="14" name="Picture 13"/>
+                <p:cNvPicPr>
+                  <a:picLocks noChangeAspect="1"/>
+                </p:cNvPicPr>
+                <p:nvPr/>
+              </p:nvPicPr>
+              <p:blipFill>
+                <a:blip r:embed="rId5" cstate="print">
+                  <a:extLst>
+                    <a:ext uri="{28A0092B-C50C-407E-A947-70E740481C1C}">
+                      <a14:useLocalDpi xmlns:a14="http://schemas.microsoft.com/office/drawing/2010/main" val="0"/>
+                    </a:ext>
+                  </a:extLst>
+                </a:blip>
+                <a:stretch>
+                  <a:fillRect/>
+                </a:stretch>
+              </p:blipFill>
+              <p:spPr>
+                <a:xfrm>
+                  <a:off x="5178545" y="5585491"/>
+                  <a:ext cx="280633" cy="225596"/>
+                </a:xfrm>
+                <a:prstGeom prst="rect">
+                  <a:avLst/>
+                </a:prstGeom>
+              </p:spPr>
+            </p:pic>
+            <p:pic>
+              <p:nvPicPr>
+                <p:cNvPr id="15" name="Picture 14"/>
+                <p:cNvPicPr>
+                  <a:picLocks noChangeAspect="1"/>
+                </p:cNvPicPr>
+                <p:nvPr/>
+              </p:nvPicPr>
+              <p:blipFill>
+                <a:blip r:embed="rId6" cstate="print">
+                  <a:extLst>
+                    <a:ext uri="{28A0092B-C50C-407E-A947-70E740481C1C}">
+                      <a14:useLocalDpi xmlns:a14="http://schemas.microsoft.com/office/drawing/2010/main" val="0"/>
+                    </a:ext>
+                  </a:extLst>
+                </a:blip>
+                <a:stretch>
+                  <a:fillRect/>
+                </a:stretch>
+              </p:blipFill>
+              <p:spPr>
+                <a:xfrm>
+                  <a:off x="4258063" y="5579770"/>
+                  <a:ext cx="274386" cy="225596"/>
+                </a:xfrm>
+                <a:prstGeom prst="rect">
+                  <a:avLst/>
+                </a:prstGeom>
+              </p:spPr>
+            </p:pic>
+            <p:pic>
+              <p:nvPicPr>
+                <p:cNvPr id="16" name="Picture 15"/>
+                <p:cNvPicPr>
+                  <a:picLocks noChangeAspect="1"/>
+                </p:cNvPicPr>
+                <p:nvPr/>
+              </p:nvPicPr>
+              <p:blipFill>
+                <a:blip r:embed="rId7" cstate="print">
+                  <a:extLst>
+                    <a:ext uri="{28A0092B-C50C-407E-A947-70E740481C1C}">
+                      <a14:useLocalDpi xmlns:a14="http://schemas.microsoft.com/office/drawing/2010/main" val="0"/>
+                    </a:ext>
+                  </a:extLst>
+                </a:blip>
+                <a:stretch>
+                  <a:fillRect/>
+                </a:stretch>
+              </p:blipFill>
+              <p:spPr>
+                <a:xfrm flipH="1">
+                  <a:off x="6640808" y="5592592"/>
+                  <a:ext cx="255789" cy="218495"/>
                 </a:xfrm>
                 <a:prstGeom prst="rect">
                   <a:avLst/>
@@ -5850,7 +6132,7 @@
           </p:grpSp>
           <p:pic>
             <p:nvPicPr>
-              <p:cNvPr id="9" name="Picture 8"/>
+              <p:cNvPr id="12" name="Picture 11"/>
               <p:cNvPicPr>
                 <a:picLocks noChangeAspect="1"/>
               </p:cNvPicPr>
@@ -5864,32 +6146,8 @@
             </p:blipFill>
             <p:spPr>
               <a:xfrm>
-                <a:off x="5470546" y="5589042"/>
-                <a:ext cx="334903" cy="198223"/>
-              </a:xfrm>
-              <a:prstGeom prst="rect">
-                <a:avLst/>
-              </a:prstGeom>
-            </p:spPr>
-          </p:pic>
-          <p:pic>
-            <p:nvPicPr>
-              <p:cNvPr id="10" name="Picture 9"/>
-              <p:cNvPicPr>
-                <a:picLocks noChangeAspect="1"/>
-              </p:cNvPicPr>
-              <p:nvPr/>
-            </p:nvPicPr>
-            <p:blipFill>
-              <a:blip r:embed="rId9"/>
-              <a:stretch>
-                <a:fillRect/>
-              </a:stretch>
-            </p:blipFill>
-            <p:spPr>
-              <a:xfrm>
-                <a:off x="5942690" y="5606488"/>
-                <a:ext cx="327300" cy="196986"/>
+                <a:off x="6895947" y="5589042"/>
+                <a:ext cx="302061" cy="235941"/>
               </a:xfrm>
               <a:prstGeom prst="rect">
                 <a:avLst/>
@@ -5899,21 +6157,46 @@
         </p:grpSp>
         <p:pic>
           <p:nvPicPr>
-            <p:cNvPr id="18" name="Picture 17"/>
+            <p:cNvPr id="9" name="Picture 8"/>
             <p:cNvPicPr>
               <a:picLocks noChangeAspect="1"/>
             </p:cNvPicPr>
             <p:nvPr/>
           </p:nvPicPr>
-          <p:blipFill rotWithShape="1">
-            <a:blip r:embed="rId10"/>
-            <a:srcRect l="14954" t="272" r="6404" b="94166"/>
-            <a:stretch/>
+          <p:blipFill>
+            <a:blip r:embed="rId9"/>
+            <a:stretch>
+              <a:fillRect/>
+            </a:stretch>
           </p:blipFill>
           <p:spPr>
             <a:xfrm>
-              <a:off x="3855283" y="65596"/>
-              <a:ext cx="3520440" cy="347472"/>
+              <a:off x="5470546" y="5589042"/>
+              <a:ext cx="334903" cy="198223"/>
+            </a:xfrm>
+            <a:prstGeom prst="rect">
+              <a:avLst/>
+            </a:prstGeom>
+          </p:spPr>
+        </p:pic>
+        <p:pic>
+          <p:nvPicPr>
+            <p:cNvPr id="10" name="Picture 9"/>
+            <p:cNvPicPr>
+              <a:picLocks noChangeAspect="1"/>
+            </p:cNvPicPr>
+            <p:nvPr/>
+          </p:nvPicPr>
+          <p:blipFill>
+            <a:blip r:embed="rId10"/>
+            <a:stretch>
+              <a:fillRect/>
+            </a:stretch>
+          </p:blipFill>
+          <p:spPr>
+            <a:xfrm>
+              <a:off x="5942690" y="5606488"/>
+              <a:ext cx="327300" cy="196986"/>
             </a:xfrm>
             <a:prstGeom prst="rect">
               <a:avLst/>
@@ -5921,35 +6204,108 @@
           </p:spPr>
         </p:pic>
       </p:grpSp>
-      <p:sp>
-        <p:nvSpPr>
-          <p:cNvPr id="17" name="TextBox 16"/>
-          <p:cNvSpPr txBox="1"/>
+      <p:grpSp>
+        <p:nvGrpSpPr>
+          <p:cNvPr id="23" name="Group 22"/>
+          <p:cNvGrpSpPr/>
           <p:nvPr/>
-        </p:nvSpPr>
-        <p:spPr>
+        </p:nvGrpSpPr>
+        <p:grpSpPr>
           <a:xfrm>
-            <a:off x="228600" y="193318"/>
-            <a:ext cx="1060704" cy="369332"/>
+            <a:off x="7248182" y="5582091"/>
+            <a:ext cx="3201060" cy="408944"/>
+            <a:chOff x="7248182" y="5582091"/>
+            <a:chExt cx="3201060" cy="408944"/>
           </a:xfrm>
-          <a:prstGeom prst="rect">
-            <a:avLst/>
-          </a:prstGeom>
-          <a:noFill/>
-        </p:spPr>
-        <p:txBody>
-          <a:bodyPr wrap="square" rtlCol="0">
-            <a:spAutoFit/>
-          </a:bodyPr>
-          <a:lstStyle/>
-          <a:p>
-            <a:r>
-              <a:rPr lang="en-US" dirty="0" smtClean="0"/>
-              <a:t>Fig 2a-2b</a:t>
-            </a:r>
-          </a:p>
-        </p:txBody>
-      </p:sp>
+        </p:grpSpPr>
+        <p:pic>
+          <p:nvPicPr>
+            <p:cNvPr id="19" name="Picture 18"/>
+            <p:cNvPicPr>
+              <a:picLocks noChangeAspect="1"/>
+            </p:cNvPicPr>
+            <p:nvPr/>
+          </p:nvPicPr>
+          <p:blipFill>
+            <a:blip r:embed="rId11"/>
+            <a:stretch>
+              <a:fillRect/>
+            </a:stretch>
+          </p:blipFill>
+          <p:spPr>
+            <a:xfrm>
+              <a:off x="9793330" y="5588411"/>
+              <a:ext cx="655912" cy="396304"/>
+            </a:xfrm>
+            <a:prstGeom prst="rect">
+              <a:avLst/>
+            </a:prstGeom>
+          </p:spPr>
+        </p:pic>
+        <p:grpSp>
+          <p:nvGrpSpPr>
+            <p:cNvPr id="22" name="Group 21"/>
+            <p:cNvGrpSpPr/>
+            <p:nvPr/>
+          </p:nvGrpSpPr>
+          <p:grpSpPr>
+            <a:xfrm>
+              <a:off x="7248182" y="5582091"/>
+              <a:ext cx="1970903" cy="408944"/>
+              <a:chOff x="7248182" y="5582091"/>
+              <a:chExt cx="1970903" cy="408944"/>
+            </a:xfrm>
+          </p:grpSpPr>
+          <p:pic>
+            <p:nvPicPr>
+              <p:cNvPr id="20" name="Picture 19"/>
+              <p:cNvPicPr>
+                <a:picLocks noChangeAspect="1"/>
+              </p:cNvPicPr>
+              <p:nvPr/>
+            </p:nvPicPr>
+            <p:blipFill>
+              <a:blip r:embed="rId12"/>
+              <a:stretch>
+                <a:fillRect/>
+              </a:stretch>
+            </p:blipFill>
+            <p:spPr>
+              <a:xfrm>
+                <a:off x="8490606" y="5642156"/>
+                <a:ext cx="728479" cy="293882"/>
+              </a:xfrm>
+              <a:prstGeom prst="rect">
+                <a:avLst/>
+              </a:prstGeom>
+            </p:spPr>
+          </p:pic>
+          <p:pic>
+            <p:nvPicPr>
+              <p:cNvPr id="5" name="Picture 4"/>
+              <p:cNvPicPr>
+                <a:picLocks noChangeAspect="1"/>
+              </p:cNvPicPr>
+              <p:nvPr/>
+            </p:nvPicPr>
+            <p:blipFill>
+              <a:blip r:embed="rId13"/>
+              <a:stretch>
+                <a:fillRect/>
+              </a:stretch>
+            </p:blipFill>
+            <p:spPr>
+              <a:xfrm>
+                <a:off x="7248182" y="5582091"/>
+                <a:ext cx="640805" cy="408944"/>
+              </a:xfrm>
+              <a:prstGeom prst="rect">
+                <a:avLst/>
+              </a:prstGeom>
+            </p:spPr>
+          </p:pic>
+        </p:grpSp>
+      </p:grpSp>
     </p:spTree>
     <p:extLst>
       <p:ext uri="{BB962C8B-B14F-4D97-AF65-F5344CB8AC3E}">
@@ -5988,7 +6344,7 @@
         </p:nvSpPr>
         <p:spPr>
           <a:xfrm>
-            <a:off x="1488545" y="5262479"/>
+            <a:off x="1523714" y="4754467"/>
             <a:ext cx="8805672" cy="646331"/>
           </a:xfrm>
           <a:prstGeom prst="rect">
@@ -6074,7 +6430,7 @@
         </p:nvSpPr>
         <p:spPr>
           <a:xfrm>
-            <a:off x="1488545" y="5771846"/>
+            <a:off x="1523714" y="5263834"/>
             <a:ext cx="8805672" cy="646331"/>
           </a:xfrm>
           <a:prstGeom prst="rect">
@@ -6138,8 +6494,8 @@
         </p:nvSpPr>
         <p:spPr>
           <a:xfrm>
-            <a:off x="1488545" y="6418177"/>
-            <a:ext cx="8805672" cy="369332"/>
+            <a:off x="1523714" y="5910165"/>
+            <a:ext cx="8805672" cy="646331"/>
           </a:xfrm>
           <a:prstGeom prst="rect">
             <a:avLst/>
@@ -6153,7 +6509,11 @@
           <a:p>
             <a:r>
               <a:rPr lang="en-US" dirty="0" smtClean="0"/>
-              <a:t>Figure3c. Predicted values of hierarchically scaled count datasets by taxa. </a:t>
+              <a:t>Figure3c. Predicted values of hierarchically scaled count datasets by </a:t>
+            </a:r>
+            <a:r>
+              <a:rPr lang="en-US" dirty="0" smtClean="0"/>
+              <a:t>taxa using average community size XXX. </a:t>
             </a:r>
             <a:endParaRPr lang="en-US" dirty="0"/>
           </a:p>
@@ -6429,75 +6789,6 @@
           <a:chExt cx="0" cy="0"/>
         </a:xfrm>
       </p:grpSpPr>
-      <p:pic>
-        <p:nvPicPr>
-          <p:cNvPr id="3" name="Picture 2"/>
-          <p:cNvPicPr>
-            <a:picLocks noChangeAspect="1"/>
-          </p:cNvPicPr>
-          <p:nvPr/>
-        </p:nvPicPr>
-        <p:blipFill rotWithShape="1">
-          <a:blip r:embed="rId2"/>
-          <a:srcRect b="396"/>
-          <a:stretch/>
-        </p:blipFill>
-        <p:spPr>
-          <a:xfrm>
-            <a:off x="650165" y="950329"/>
-            <a:ext cx="5696690" cy="2391938"/>
-          </a:xfrm>
-          <a:prstGeom prst="rect">
-            <a:avLst/>
-          </a:prstGeom>
-        </p:spPr>
-      </p:pic>
-      <p:pic>
-        <p:nvPicPr>
-          <p:cNvPr id="4" name="Picture 3"/>
-          <p:cNvPicPr>
-            <a:picLocks noChangeAspect="1"/>
-          </p:cNvPicPr>
-          <p:nvPr/>
-        </p:nvPicPr>
-        <p:blipFill rotWithShape="1">
-          <a:blip r:embed="rId3"/>
-          <a:srcRect l="327"/>
-          <a:stretch/>
-        </p:blipFill>
-        <p:spPr>
-          <a:xfrm>
-            <a:off x="338562" y="3747248"/>
-            <a:ext cx="5603620" cy="2716306"/>
-          </a:xfrm>
-          <a:prstGeom prst="rect">
-            <a:avLst/>
-          </a:prstGeom>
-        </p:spPr>
-      </p:pic>
-      <p:pic>
-        <p:nvPicPr>
-          <p:cNvPr id="7" name="Picture 6"/>
-          <p:cNvPicPr>
-            <a:picLocks noChangeAspect="1"/>
-          </p:cNvPicPr>
-          <p:nvPr/>
-        </p:nvPicPr>
-        <p:blipFill rotWithShape="1">
-          <a:blip r:embed="rId4"/>
-          <a:srcRect b="61580"/>
-          <a:stretch/>
-        </p:blipFill>
-        <p:spPr>
-          <a:xfrm>
-            <a:off x="4761082" y="5241482"/>
-            <a:ext cx="1181100" cy="944165"/>
-          </a:xfrm>
-          <a:prstGeom prst="rect">
-            <a:avLst/>
-          </a:prstGeom>
-        </p:spPr>
-      </p:pic>
       <p:sp>
         <p:nvSpPr>
           <p:cNvPr id="8" name="TextBox 7"/>
@@ -6538,21 +6829,21 @@
       </p:sp>
       <p:pic>
         <p:nvPicPr>
-          <p:cNvPr id="9" name="Picture 8"/>
+          <p:cNvPr id="5" name="Picture 4"/>
           <p:cNvPicPr>
             <a:picLocks noChangeAspect="1"/>
           </p:cNvPicPr>
           <p:nvPr/>
         </p:nvPicPr>
         <p:blipFill rotWithShape="1">
-          <a:blip r:embed="rId4"/>
-          <a:srcRect t="40244"/>
+          <a:blip r:embed="rId2"/>
+          <a:srcRect t="480" b="1"/>
           <a:stretch/>
         </p:blipFill>
         <p:spPr>
           <a:xfrm>
-            <a:off x="754935" y="3836893"/>
-            <a:ext cx="1181100" cy="1468461"/>
+            <a:off x="3288322" y="2684890"/>
+            <a:ext cx="5610091" cy="4173110"/>
           </a:xfrm>
           <a:prstGeom prst="rect">
             <a:avLst/>
@@ -6561,22 +6852,22 @@
       </p:pic>
       <p:pic>
         <p:nvPicPr>
-          <p:cNvPr id="2" name="Picture 1"/>
+          <p:cNvPr id="6" name="Picture 5"/>
           <p:cNvPicPr>
             <a:picLocks noChangeAspect="1"/>
           </p:cNvPicPr>
           <p:nvPr/>
         </p:nvPicPr>
         <p:blipFill>
-          <a:blip r:embed="rId5"/>
+          <a:blip r:embed="rId3"/>
           <a:stretch>
             <a:fillRect/>
           </a:stretch>
         </p:blipFill>
         <p:spPr>
           <a:xfrm>
-            <a:off x="4955644" y="950329"/>
-            <a:ext cx="5667375" cy="390525"/>
+            <a:off x="3288322" y="134914"/>
+            <a:ext cx="5613636" cy="2549977"/>
           </a:xfrm>
           <a:prstGeom prst="rect">
             <a:avLst/>

</xml_diff>

<commit_message>
fixed legend issue for figure 4
</commit_message>
<xml_diff>
--- a/output/plots/all_figs_with_legends.pptx
+++ b/output/plots/all_figs_with_legends.pptx
@@ -202,7 +202,7 @@
           <a:p>
             <a:fld id="{7FA21820-D199-4D82-91AF-C50B1D3B111A}" type="datetimeFigureOut">
               <a:rPr lang="en-US" smtClean="0"/>
-              <a:t>4/11/2017</a:t>
+              <a:t>4/12/2017</a:t>
             </a:fld>
             <a:endParaRPr lang="en-US"/>
           </a:p>
@@ -1035,7 +1035,7 @@
           <a:p>
             <a:fld id="{916B8C92-D5E3-4480-8685-D57BEE386DE2}" type="datetimeFigureOut">
               <a:rPr lang="en-US" smtClean="0"/>
-              <a:t>4/11/2017</a:t>
+              <a:t>4/12/2017</a:t>
             </a:fld>
             <a:endParaRPr lang="en-US"/>
           </a:p>
@@ -1205,7 +1205,7 @@
           <a:p>
             <a:fld id="{916B8C92-D5E3-4480-8685-D57BEE386DE2}" type="datetimeFigureOut">
               <a:rPr lang="en-US" smtClean="0"/>
-              <a:t>4/11/2017</a:t>
+              <a:t>4/12/2017</a:t>
             </a:fld>
             <a:endParaRPr lang="en-US"/>
           </a:p>
@@ -1385,7 +1385,7 @@
           <a:p>
             <a:fld id="{916B8C92-D5E3-4480-8685-D57BEE386DE2}" type="datetimeFigureOut">
               <a:rPr lang="en-US" smtClean="0"/>
-              <a:t>4/11/2017</a:t>
+              <a:t>4/12/2017</a:t>
             </a:fld>
             <a:endParaRPr lang="en-US"/>
           </a:p>
@@ -1555,7 +1555,7 @@
           <a:p>
             <a:fld id="{916B8C92-D5E3-4480-8685-D57BEE386DE2}" type="datetimeFigureOut">
               <a:rPr lang="en-US" smtClean="0"/>
-              <a:t>4/11/2017</a:t>
+              <a:t>4/12/2017</a:t>
             </a:fld>
             <a:endParaRPr lang="en-US"/>
           </a:p>
@@ -1801,7 +1801,7 @@
           <a:p>
             <a:fld id="{916B8C92-D5E3-4480-8685-D57BEE386DE2}" type="datetimeFigureOut">
               <a:rPr lang="en-US" smtClean="0"/>
-              <a:t>4/11/2017</a:t>
+              <a:t>4/12/2017</a:t>
             </a:fld>
             <a:endParaRPr lang="en-US"/>
           </a:p>
@@ -2033,7 +2033,7 @@
           <a:p>
             <a:fld id="{916B8C92-D5E3-4480-8685-D57BEE386DE2}" type="datetimeFigureOut">
               <a:rPr lang="en-US" smtClean="0"/>
-              <a:t>4/11/2017</a:t>
+              <a:t>4/12/2017</a:t>
             </a:fld>
             <a:endParaRPr lang="en-US"/>
           </a:p>
@@ -2400,7 +2400,7 @@
           <a:p>
             <a:fld id="{916B8C92-D5E3-4480-8685-D57BEE386DE2}" type="datetimeFigureOut">
               <a:rPr lang="en-US" smtClean="0"/>
-              <a:t>4/11/2017</a:t>
+              <a:t>4/12/2017</a:t>
             </a:fld>
             <a:endParaRPr lang="en-US"/>
           </a:p>
@@ -2518,7 +2518,7 @@
           <a:p>
             <a:fld id="{916B8C92-D5E3-4480-8685-D57BEE386DE2}" type="datetimeFigureOut">
               <a:rPr lang="en-US" smtClean="0"/>
-              <a:t>4/11/2017</a:t>
+              <a:t>4/12/2017</a:t>
             </a:fld>
             <a:endParaRPr lang="en-US"/>
           </a:p>
@@ -2613,7 +2613,7 @@
           <a:p>
             <a:fld id="{916B8C92-D5E3-4480-8685-D57BEE386DE2}" type="datetimeFigureOut">
               <a:rPr lang="en-US" smtClean="0"/>
-              <a:t>4/11/2017</a:t>
+              <a:t>4/12/2017</a:t>
             </a:fld>
             <a:endParaRPr lang="en-US"/>
           </a:p>
@@ -2890,7 +2890,7 @@
           <a:p>
             <a:fld id="{916B8C92-D5E3-4480-8685-D57BEE386DE2}" type="datetimeFigureOut">
               <a:rPr lang="en-US" smtClean="0"/>
-              <a:t>4/11/2017</a:t>
+              <a:t>4/12/2017</a:t>
             </a:fld>
             <a:endParaRPr lang="en-US"/>
           </a:p>
@@ -3143,7 +3143,7 @@
           <a:p>
             <a:fld id="{916B8C92-D5E3-4480-8685-D57BEE386DE2}" type="datetimeFigureOut">
               <a:rPr lang="en-US" smtClean="0"/>
-              <a:t>4/11/2017</a:t>
+              <a:t>4/12/2017</a:t>
             </a:fld>
             <a:endParaRPr lang="en-US"/>
           </a:p>
@@ -3356,7 +3356,7 @@
           <a:p>
             <a:fld id="{916B8C92-D5E3-4480-8685-D57BEE386DE2}" type="datetimeFigureOut">
               <a:rPr lang="en-US" smtClean="0"/>
-              <a:t>4/11/2017</a:t>
+              <a:t>4/12/2017</a:t>
             </a:fld>
             <a:endParaRPr lang="en-US"/>
           </a:p>
@@ -6509,11 +6509,7 @@
           <a:p>
             <a:r>
               <a:rPr lang="en-US" dirty="0" smtClean="0"/>
-              <a:t>Figure3c. Predicted values of hierarchically scaled count datasets by </a:t>
-            </a:r>
-            <a:r>
-              <a:rPr lang="en-US" dirty="0" smtClean="0"/>
-              <a:t>taxa using average community size XXX. </a:t>
+              <a:t>Figure3c. Predicted values of hierarchically scaled count datasets by taxa using average community size XXX. </a:t>
             </a:r>
             <a:endParaRPr lang="en-US" dirty="0"/>
           </a:p>
@@ -6829,7 +6825,7 @@
       </p:sp>
       <p:pic>
         <p:nvPicPr>
-          <p:cNvPr id="5" name="Picture 4"/>
+          <p:cNvPr id="3" name="Picture 2"/>
           <p:cNvPicPr>
             <a:picLocks noChangeAspect="1"/>
           </p:cNvPicPr>
@@ -6837,37 +6833,13 @@
         </p:nvPicPr>
         <p:blipFill rotWithShape="1">
           <a:blip r:embed="rId2"/>
-          <a:srcRect t="480" b="1"/>
+          <a:srcRect l="302" r="338"/>
           <a:stretch/>
         </p:blipFill>
         <p:spPr>
           <a:xfrm>
-            <a:off x="3288322" y="2684890"/>
-            <a:ext cx="5610091" cy="4173110"/>
-          </a:xfrm>
-          <a:prstGeom prst="rect">
-            <a:avLst/>
-          </a:prstGeom>
-        </p:spPr>
-      </p:pic>
-      <p:pic>
-        <p:nvPicPr>
-          <p:cNvPr id="6" name="Picture 5"/>
-          <p:cNvPicPr>
-            <a:picLocks noChangeAspect="1"/>
-          </p:cNvPicPr>
-          <p:nvPr/>
-        </p:nvPicPr>
-        <p:blipFill>
-          <a:blip r:embed="rId3"/>
-          <a:stretch>
-            <a:fillRect/>
-          </a:stretch>
-        </p:blipFill>
-        <p:spPr>
-          <a:xfrm>
-            <a:off x="3288322" y="134914"/>
-            <a:ext cx="5613636" cy="2549977"/>
+            <a:off x="1499616" y="134914"/>
+            <a:ext cx="9025128" cy="6723086"/>
           </a:xfrm>
           <a:prstGeom prst="rect">
             <a:avLst/>

</xml_diff>

<commit_message>
got fig 3 in panel form, need to tweak size  of pdf a little
</commit_message>
<xml_diff>
--- a/output/plots/all_figs_with_legends.pptx
+++ b/output/plots/all_figs_with_legends.pptx
@@ -6537,7 +6537,7 @@
         </p:blipFill>
         <p:spPr>
           <a:xfrm>
-            <a:off x="8846360" y="4043043"/>
+            <a:off x="8928428" y="4379928"/>
             <a:ext cx="411228" cy="234519"/>
           </a:xfrm>
           <a:prstGeom prst="rect">
@@ -6567,7 +6567,7 @@
         </p:blipFill>
         <p:spPr>
           <a:xfrm>
-            <a:off x="9555342" y="3996572"/>
+            <a:off x="9637410" y="4333457"/>
             <a:ext cx="354392" cy="327463"/>
           </a:xfrm>
           <a:prstGeom prst="rect">
@@ -6597,7 +6597,7 @@
         </p:blipFill>
         <p:spPr>
           <a:xfrm>
-            <a:off x="8197016" y="3996572"/>
+            <a:off x="8279084" y="4333457"/>
             <a:ext cx="346503" cy="327463"/>
           </a:xfrm>
           <a:prstGeom prst="rect">
@@ -6627,7 +6627,7 @@
         </p:blipFill>
         <p:spPr>
           <a:xfrm flipH="1">
-            <a:off x="11687426" y="4011467"/>
+            <a:off x="11769494" y="4348352"/>
             <a:ext cx="323019" cy="317155"/>
           </a:xfrm>
           <a:prstGeom prst="rect">
@@ -6651,7 +6651,7 @@
         </p:blipFill>
         <p:spPr>
           <a:xfrm>
-            <a:off x="10236190" y="4016438"/>
+            <a:off x="10318258" y="4353323"/>
             <a:ext cx="422927" cy="287729"/>
           </a:xfrm>
           <a:prstGeom prst="rect">
@@ -6675,7 +6675,7 @@
         </p:blipFill>
         <p:spPr>
           <a:xfrm>
-            <a:off x="10908692" y="4018234"/>
+            <a:off x="10990760" y="4355119"/>
             <a:ext cx="413325" cy="285934"/>
           </a:xfrm>
           <a:prstGeom prst="rect">
@@ -6685,7 +6685,7 @@
       </p:pic>
       <p:pic>
         <p:nvPicPr>
-          <p:cNvPr id="4" name="Picture 3"/>
+          <p:cNvPr id="8" name="Picture 7"/>
           <p:cNvPicPr>
             <a:picLocks noChangeAspect="1"/>
           </p:cNvPicPr>
@@ -6699,56 +6699,8 @@
         </p:blipFill>
         <p:spPr>
           <a:xfrm>
-            <a:off x="36670" y="1554417"/>
-            <a:ext cx="3769065" cy="2904091"/>
-          </a:xfrm>
-          <a:prstGeom prst="rect">
-            <a:avLst/>
-          </a:prstGeom>
-        </p:spPr>
-      </p:pic>
-      <p:pic>
-        <p:nvPicPr>
-          <p:cNvPr id="2" name="Picture 1"/>
-          <p:cNvPicPr>
-            <a:picLocks noChangeAspect="1"/>
-          </p:cNvPicPr>
-          <p:nvPr/>
-        </p:nvPicPr>
-        <p:blipFill>
-          <a:blip r:embed="rId9"/>
-          <a:stretch>
-            <a:fillRect/>
-          </a:stretch>
-        </p:blipFill>
-        <p:spPr>
-          <a:xfrm>
-            <a:off x="7689930" y="1294997"/>
-            <a:ext cx="4425869" cy="2732465"/>
-          </a:xfrm>
-          <a:prstGeom prst="rect">
-            <a:avLst/>
-          </a:prstGeom>
-        </p:spPr>
-      </p:pic>
-      <p:pic>
-        <p:nvPicPr>
-          <p:cNvPr id="3" name="Picture 2"/>
-          <p:cNvPicPr>
-            <a:picLocks noChangeAspect="1"/>
-          </p:cNvPicPr>
-          <p:nvPr/>
-        </p:nvPicPr>
-        <p:blipFill>
-          <a:blip r:embed="rId10"/>
-          <a:stretch>
-            <a:fillRect/>
-          </a:stretch>
-        </p:blipFill>
-        <p:spPr>
-          <a:xfrm>
-            <a:off x="3869222" y="1476921"/>
-            <a:ext cx="3457761" cy="2693123"/>
+            <a:off x="-77904" y="134914"/>
+            <a:ext cx="12008908" cy="3973222"/>
           </a:xfrm>
           <a:prstGeom prst="rect">
             <a:avLst/>

</xml_diff>

<commit_message>
new round of figure edits complete
</commit_message>
<xml_diff>
--- a/output/plots/all_figs_with_legends.pptx
+++ b/output/plots/all_figs_with_legends.pptx
@@ -202,7 +202,7 @@
           <a:p>
             <a:fld id="{7FA21820-D199-4D82-91AF-C50B1D3B111A}" type="datetimeFigureOut">
               <a:rPr lang="en-US" smtClean="0"/>
-              <a:t>4/12/2017</a:t>
+              <a:t>4/13/2017</a:t>
             </a:fld>
             <a:endParaRPr lang="en-US"/>
           </a:p>
@@ -1035,7 +1035,7 @@
           <a:p>
             <a:fld id="{916B8C92-D5E3-4480-8685-D57BEE386DE2}" type="datetimeFigureOut">
               <a:rPr lang="en-US" smtClean="0"/>
-              <a:t>4/12/2017</a:t>
+              <a:t>4/13/2017</a:t>
             </a:fld>
             <a:endParaRPr lang="en-US"/>
           </a:p>
@@ -1205,7 +1205,7 @@
           <a:p>
             <a:fld id="{916B8C92-D5E3-4480-8685-D57BEE386DE2}" type="datetimeFigureOut">
               <a:rPr lang="en-US" smtClean="0"/>
-              <a:t>4/12/2017</a:t>
+              <a:t>4/13/2017</a:t>
             </a:fld>
             <a:endParaRPr lang="en-US"/>
           </a:p>
@@ -1385,7 +1385,7 @@
           <a:p>
             <a:fld id="{916B8C92-D5E3-4480-8685-D57BEE386DE2}" type="datetimeFigureOut">
               <a:rPr lang="en-US" smtClean="0"/>
-              <a:t>4/12/2017</a:t>
+              <a:t>4/13/2017</a:t>
             </a:fld>
             <a:endParaRPr lang="en-US"/>
           </a:p>
@@ -1555,7 +1555,7 @@
           <a:p>
             <a:fld id="{916B8C92-D5E3-4480-8685-D57BEE386DE2}" type="datetimeFigureOut">
               <a:rPr lang="en-US" smtClean="0"/>
-              <a:t>4/12/2017</a:t>
+              <a:t>4/13/2017</a:t>
             </a:fld>
             <a:endParaRPr lang="en-US"/>
           </a:p>
@@ -1801,7 +1801,7 @@
           <a:p>
             <a:fld id="{916B8C92-D5E3-4480-8685-D57BEE386DE2}" type="datetimeFigureOut">
               <a:rPr lang="en-US" smtClean="0"/>
-              <a:t>4/12/2017</a:t>
+              <a:t>4/13/2017</a:t>
             </a:fld>
             <a:endParaRPr lang="en-US"/>
           </a:p>
@@ -2033,7 +2033,7 @@
           <a:p>
             <a:fld id="{916B8C92-D5E3-4480-8685-D57BEE386DE2}" type="datetimeFigureOut">
               <a:rPr lang="en-US" smtClean="0"/>
-              <a:t>4/12/2017</a:t>
+              <a:t>4/13/2017</a:t>
             </a:fld>
             <a:endParaRPr lang="en-US"/>
           </a:p>
@@ -2400,7 +2400,7 @@
           <a:p>
             <a:fld id="{916B8C92-D5E3-4480-8685-D57BEE386DE2}" type="datetimeFigureOut">
               <a:rPr lang="en-US" smtClean="0"/>
-              <a:t>4/12/2017</a:t>
+              <a:t>4/13/2017</a:t>
             </a:fld>
             <a:endParaRPr lang="en-US"/>
           </a:p>
@@ -2518,7 +2518,7 @@
           <a:p>
             <a:fld id="{916B8C92-D5E3-4480-8685-D57BEE386DE2}" type="datetimeFigureOut">
               <a:rPr lang="en-US" smtClean="0"/>
-              <a:t>4/12/2017</a:t>
+              <a:t>4/13/2017</a:t>
             </a:fld>
             <a:endParaRPr lang="en-US"/>
           </a:p>
@@ -2613,7 +2613,7 @@
           <a:p>
             <a:fld id="{916B8C92-D5E3-4480-8685-D57BEE386DE2}" type="datetimeFigureOut">
               <a:rPr lang="en-US" smtClean="0"/>
-              <a:t>4/12/2017</a:t>
+              <a:t>4/13/2017</a:t>
             </a:fld>
             <a:endParaRPr lang="en-US"/>
           </a:p>
@@ -2890,7 +2890,7 @@
           <a:p>
             <a:fld id="{916B8C92-D5E3-4480-8685-D57BEE386DE2}" type="datetimeFigureOut">
               <a:rPr lang="en-US" smtClean="0"/>
-              <a:t>4/12/2017</a:t>
+              <a:t>4/13/2017</a:t>
             </a:fld>
             <a:endParaRPr lang="en-US"/>
           </a:p>
@@ -3143,7 +3143,7 @@
           <a:p>
             <a:fld id="{916B8C92-D5E3-4480-8685-D57BEE386DE2}" type="datetimeFigureOut">
               <a:rPr lang="en-US" smtClean="0"/>
-              <a:t>4/12/2017</a:t>
+              <a:t>4/13/2017</a:t>
             </a:fld>
             <a:endParaRPr lang="en-US"/>
           </a:p>
@@ -3356,7 +3356,7 @@
           <a:p>
             <a:fld id="{916B8C92-D5E3-4480-8685-D57BEE386DE2}" type="datetimeFigureOut">
               <a:rPr lang="en-US" smtClean="0"/>
-              <a:t>4/12/2017</a:t>
+              <a:t>4/13/2017</a:t>
             </a:fld>
             <a:endParaRPr lang="en-US"/>
           </a:p>
@@ -4689,6 +4689,13 @@
   <p:clrMapOvr>
     <a:masterClrMapping/>
   </p:clrMapOvr>
+  <p:timing>
+    <p:tnLst>
+      <p:par>
+        <p:cTn id="1" dur="indefinite" restart="never" nodeType="tmRoot"/>
+      </p:par>
+    </p:tnLst>
+  </p:timing>
 </p:sld>
 </file>
 
@@ -5894,6 +5901,13 @@
   <p:clrMapOvr>
     <a:masterClrMapping/>
   </p:clrMapOvr>
+  <p:timing>
+    <p:tnLst>
+      <p:par>
+        <p:cTn id="1" dur="indefinite" restart="never" nodeType="tmRoot"/>
+      </p:par>
+    </p:tnLst>
+  </p:timing>
 </p:sld>
 </file>
 
@@ -6316,6 +6330,13 @@
   <p:clrMapOvr>
     <a:masterClrMapping/>
   </p:clrMapOvr>
+  <p:timing>
+    <p:tnLst>
+      <p:par>
+        <p:cTn id="1" dur="indefinite" restart="never" nodeType="tmRoot"/>
+      </p:par>
+    </p:tnLst>
+  </p:timing>
 </p:sld>
 </file>
 
@@ -6344,7 +6365,7 @@
         </p:nvSpPr>
         <p:spPr>
           <a:xfrm>
-            <a:off x="1523714" y="4754467"/>
+            <a:off x="1433279" y="5055971"/>
             <a:ext cx="8805672" cy="646331"/>
           </a:xfrm>
           <a:prstGeom prst="rect">
@@ -6392,6 +6413,321 @@
           </a:p>
         </p:txBody>
       </p:sp>
+      <p:sp>
+        <p:nvSpPr>
+          <p:cNvPr id="7" name="Rectangle 6"/>
+          <p:cNvSpPr/>
+          <p:nvPr/>
+        </p:nvSpPr>
+        <p:spPr>
+          <a:xfrm>
+            <a:off x="1433279" y="5565338"/>
+            <a:ext cx="8805672" cy="646331"/>
+          </a:xfrm>
+          <a:prstGeom prst="rect">
+            <a:avLst/>
+          </a:prstGeom>
+        </p:spPr>
+        <p:txBody>
+          <a:bodyPr wrap="square">
+            <a:spAutoFit/>
+          </a:bodyPr>
+          <a:lstStyle/>
+          <a:p>
+            <a:r>
+              <a:rPr lang="en-US" dirty="0" smtClean="0"/>
+              <a:t>Figure3b</a:t>
+            </a:r>
+            <a:r>
+              <a:rPr lang="en-US" dirty="0"/>
+              <a:t>. Proportion of transient </a:t>
+            </a:r>
+            <a:r>
+              <a:rPr lang="en-US" dirty="0" smtClean="0"/>
+              <a:t>species </a:t>
+            </a:r>
+            <a:r>
+              <a:rPr lang="en-US" dirty="0"/>
+              <a:t>by </a:t>
+            </a:r>
+            <a:r>
+              <a:rPr lang="en-US" dirty="0" smtClean="0"/>
+              <a:t>log of community </a:t>
+            </a:r>
+            <a:r>
+              <a:rPr lang="en-US" dirty="0"/>
+              <a:t>size </a:t>
+            </a:r>
+            <a:r>
+              <a:rPr lang="en-US" dirty="0" smtClean="0"/>
+              <a:t>(number of individuals), </a:t>
+            </a:r>
+            <a:r>
+              <a:rPr lang="en-US" dirty="0"/>
+              <a:t>colored by taxa, using the hierarchically scaled </a:t>
+            </a:r>
+            <a:r>
+              <a:rPr lang="en-US" dirty="0" smtClean="0"/>
+              <a:t>count datasets</a:t>
+            </a:r>
+            <a:r>
+              <a:rPr lang="en-US" dirty="0"/>
+              <a:t>.</a:t>
+            </a:r>
+          </a:p>
+        </p:txBody>
+      </p:sp>
+      <p:sp>
+        <p:nvSpPr>
+          <p:cNvPr id="10" name="Rectangle 9"/>
+          <p:cNvSpPr/>
+          <p:nvPr/>
+        </p:nvSpPr>
+        <p:spPr>
+          <a:xfrm>
+            <a:off x="1433279" y="6211669"/>
+            <a:ext cx="8805672" cy="646331"/>
+          </a:xfrm>
+          <a:prstGeom prst="rect">
+            <a:avLst/>
+          </a:prstGeom>
+        </p:spPr>
+        <p:txBody>
+          <a:bodyPr wrap="square">
+            <a:spAutoFit/>
+          </a:bodyPr>
+          <a:lstStyle/>
+          <a:p>
+            <a:r>
+              <a:rPr lang="en-US" dirty="0" smtClean="0"/>
+              <a:t>Figure3c. Predicted values of hierarchically scaled count datasets by taxa using average community size XXX. </a:t>
+            </a:r>
+            <a:endParaRPr lang="en-US" dirty="0"/>
+          </a:p>
+        </p:txBody>
+      </p:sp>
+      <p:grpSp>
+        <p:nvGrpSpPr>
+          <p:cNvPr id="20" name="Group 19"/>
+          <p:cNvGrpSpPr/>
+          <p:nvPr/>
+        </p:nvGrpSpPr>
+        <p:grpSpPr>
+          <a:xfrm>
+            <a:off x="559148" y="0"/>
+            <a:ext cx="10553933" cy="5150007"/>
+            <a:chOff x="559148" y="0"/>
+            <a:chExt cx="10553933" cy="5150007"/>
+          </a:xfrm>
+        </p:grpSpPr>
+        <p:pic>
+          <p:nvPicPr>
+            <p:cNvPr id="12" name="Picture 11"/>
+            <p:cNvPicPr>
+              <a:picLocks noChangeAspect="1"/>
+            </p:cNvPicPr>
+            <p:nvPr/>
+          </p:nvPicPr>
+          <p:blipFill>
+            <a:blip r:embed="rId2"/>
+            <a:stretch>
+              <a:fillRect/>
+            </a:stretch>
+          </p:blipFill>
+          <p:spPr>
+            <a:xfrm>
+              <a:off x="559148" y="0"/>
+              <a:ext cx="10553933" cy="5150007"/>
+            </a:xfrm>
+            <a:prstGeom prst="rect">
+              <a:avLst/>
+            </a:prstGeom>
+          </p:spPr>
+        </p:pic>
+        <p:grpSp>
+          <p:nvGrpSpPr>
+            <p:cNvPr id="9" name="Group 8"/>
+            <p:cNvGrpSpPr/>
+            <p:nvPr/>
+          </p:nvGrpSpPr>
+          <p:grpSpPr>
+            <a:xfrm>
+              <a:off x="8371432" y="4724406"/>
+              <a:ext cx="2559828" cy="326505"/>
+              <a:chOff x="7395844" y="4435501"/>
+              <a:chExt cx="1722234" cy="179225"/>
+            </a:xfrm>
+          </p:grpSpPr>
+          <p:pic>
+            <p:nvPicPr>
+              <p:cNvPr id="13" name="Picture 12"/>
+              <p:cNvPicPr>
+                <a:picLocks noChangeAspect="1"/>
+              </p:cNvPicPr>
+              <p:nvPr/>
+            </p:nvPicPr>
+            <p:blipFill>
+              <a:blip r:embed="rId3" cstate="print">
+                <a:extLst>
+                  <a:ext uri="{28A0092B-C50C-407E-A947-70E740481C1C}">
+                    <a14:useLocalDpi xmlns:a14="http://schemas.microsoft.com/office/drawing/2010/main" val="0"/>
+                  </a:ext>
+                </a:extLst>
+              </a:blip>
+              <a:stretch>
+                <a:fillRect/>
+              </a:stretch>
+            </p:blipFill>
+            <p:spPr>
+              <a:xfrm>
+                <a:off x="7673596" y="4466095"/>
+                <a:ext cx="221584" cy="126367"/>
+              </a:xfrm>
+              <a:prstGeom prst="rect">
+                <a:avLst/>
+              </a:prstGeom>
+            </p:spPr>
+          </p:pic>
+          <p:pic>
+            <p:nvPicPr>
+              <p:cNvPr id="14" name="Picture 13"/>
+              <p:cNvPicPr>
+                <a:picLocks noChangeAspect="1"/>
+              </p:cNvPicPr>
+              <p:nvPr/>
+            </p:nvPicPr>
+            <p:blipFill>
+              <a:blip r:embed="rId4" cstate="print">
+                <a:extLst>
+                  <a:ext uri="{28A0092B-C50C-407E-A947-70E740481C1C}">
+                    <a14:useLocalDpi xmlns:a14="http://schemas.microsoft.com/office/drawing/2010/main" val="0"/>
+                  </a:ext>
+                </a:extLst>
+              </a:blip>
+              <a:stretch>
+                <a:fillRect/>
+              </a:stretch>
+            </p:blipFill>
+            <p:spPr>
+              <a:xfrm>
+                <a:off x="8597159" y="4435501"/>
+                <a:ext cx="190958" cy="176448"/>
+              </a:xfrm>
+              <a:prstGeom prst="rect">
+                <a:avLst/>
+              </a:prstGeom>
+            </p:spPr>
+          </p:pic>
+          <p:pic>
+            <p:nvPicPr>
+              <p:cNvPr id="15" name="Picture 14"/>
+              <p:cNvPicPr>
+                <a:picLocks noChangeAspect="1"/>
+              </p:cNvPicPr>
+              <p:nvPr/>
+            </p:nvPicPr>
+            <p:blipFill>
+              <a:blip r:embed="rId5" cstate="print">
+                <a:extLst>
+                  <a:ext uri="{28A0092B-C50C-407E-A947-70E740481C1C}">
+                    <a14:useLocalDpi xmlns:a14="http://schemas.microsoft.com/office/drawing/2010/main" val="0"/>
+                  </a:ext>
+                </a:extLst>
+              </a:blip>
+              <a:stretch>
+                <a:fillRect/>
+              </a:stretch>
+            </p:blipFill>
+            <p:spPr>
+              <a:xfrm>
+                <a:off x="7998878" y="4438278"/>
+                <a:ext cx="186707" cy="176448"/>
+              </a:xfrm>
+              <a:prstGeom prst="rect">
+                <a:avLst/>
+              </a:prstGeom>
+            </p:spPr>
+          </p:pic>
+          <p:pic>
+            <p:nvPicPr>
+              <p:cNvPr id="16" name="Picture 15"/>
+              <p:cNvPicPr>
+                <a:picLocks noChangeAspect="1"/>
+              </p:cNvPicPr>
+              <p:nvPr/>
+            </p:nvPicPr>
+            <p:blipFill>
+              <a:blip r:embed="rId6" cstate="print">
+                <a:extLst>
+                  <a:ext uri="{28A0092B-C50C-407E-A947-70E740481C1C}">
+                    <a14:useLocalDpi xmlns:a14="http://schemas.microsoft.com/office/drawing/2010/main" val="0"/>
+                  </a:ext>
+                </a:extLst>
+              </a:blip>
+              <a:stretch>
+                <a:fillRect/>
+              </a:stretch>
+            </p:blipFill>
+            <p:spPr>
+              <a:xfrm flipH="1">
+                <a:off x="7395844" y="4441055"/>
+                <a:ext cx="174054" cy="170894"/>
+              </a:xfrm>
+              <a:prstGeom prst="rect">
+                <a:avLst/>
+              </a:prstGeom>
+            </p:spPr>
+          </p:pic>
+          <p:pic>
+            <p:nvPicPr>
+              <p:cNvPr id="17" name="Picture 16"/>
+              <p:cNvPicPr>
+                <a:picLocks noChangeAspect="1"/>
+              </p:cNvPicPr>
+              <p:nvPr/>
+            </p:nvPicPr>
+            <p:blipFill>
+              <a:blip r:embed="rId7"/>
+              <a:stretch>
+                <a:fillRect/>
+              </a:stretch>
+            </p:blipFill>
+            <p:spPr>
+              <a:xfrm>
+                <a:off x="8275535" y="4446578"/>
+                <a:ext cx="227887" cy="155038"/>
+              </a:xfrm>
+              <a:prstGeom prst="rect">
+                <a:avLst/>
+              </a:prstGeom>
+            </p:spPr>
+          </p:pic>
+          <p:pic>
+            <p:nvPicPr>
+              <p:cNvPr id="18" name="Picture 17"/>
+              <p:cNvPicPr>
+                <a:picLocks noChangeAspect="1"/>
+              </p:cNvPicPr>
+              <p:nvPr/>
+            </p:nvPicPr>
+            <p:blipFill>
+              <a:blip r:embed="rId8"/>
+              <a:stretch>
+                <a:fillRect/>
+              </a:stretch>
+            </p:blipFill>
+            <p:spPr>
+              <a:xfrm>
+                <a:off x="8895364" y="4438278"/>
+                <a:ext cx="222714" cy="154071"/>
+              </a:xfrm>
+              <a:prstGeom prst="rect">
+                <a:avLst/>
+              </a:prstGeom>
+            </p:spPr>
+          </p:pic>
+        </p:grpSp>
+      </p:grpSp>
       <p:sp>
         <p:nvSpPr>
           <p:cNvPr id="5" name="TextBox 4"/>
@@ -6422,291 +6758,6 @@
           </a:p>
         </p:txBody>
       </p:sp>
-      <p:sp>
-        <p:nvSpPr>
-          <p:cNvPr id="7" name="Rectangle 6"/>
-          <p:cNvSpPr/>
-          <p:nvPr/>
-        </p:nvSpPr>
-        <p:spPr>
-          <a:xfrm>
-            <a:off x="1523714" y="5263834"/>
-            <a:ext cx="8805672" cy="646331"/>
-          </a:xfrm>
-          <a:prstGeom prst="rect">
-            <a:avLst/>
-          </a:prstGeom>
-        </p:spPr>
-        <p:txBody>
-          <a:bodyPr wrap="square">
-            <a:spAutoFit/>
-          </a:bodyPr>
-          <a:lstStyle/>
-          <a:p>
-            <a:r>
-              <a:rPr lang="en-US" dirty="0" smtClean="0"/>
-              <a:t>Figure3b</a:t>
-            </a:r>
-            <a:r>
-              <a:rPr lang="en-US" dirty="0"/>
-              <a:t>. Proportion of transient </a:t>
-            </a:r>
-            <a:r>
-              <a:rPr lang="en-US" dirty="0" smtClean="0"/>
-              <a:t>species </a:t>
-            </a:r>
-            <a:r>
-              <a:rPr lang="en-US" dirty="0"/>
-              <a:t>by </a:t>
-            </a:r>
-            <a:r>
-              <a:rPr lang="en-US" dirty="0" smtClean="0"/>
-              <a:t>log of community </a:t>
-            </a:r>
-            <a:r>
-              <a:rPr lang="en-US" dirty="0"/>
-              <a:t>size </a:t>
-            </a:r>
-            <a:r>
-              <a:rPr lang="en-US" dirty="0" smtClean="0"/>
-              <a:t>(number of individuals), </a:t>
-            </a:r>
-            <a:r>
-              <a:rPr lang="en-US" dirty="0"/>
-              <a:t>colored by taxa, using the hierarchically scaled </a:t>
-            </a:r>
-            <a:r>
-              <a:rPr lang="en-US" dirty="0" smtClean="0"/>
-              <a:t>count datasets</a:t>
-            </a:r>
-            <a:r>
-              <a:rPr lang="en-US" dirty="0"/>
-              <a:t>.</a:t>
-            </a:r>
-          </a:p>
-        </p:txBody>
-      </p:sp>
-      <p:sp>
-        <p:nvSpPr>
-          <p:cNvPr id="10" name="Rectangle 9"/>
-          <p:cNvSpPr/>
-          <p:nvPr/>
-        </p:nvSpPr>
-        <p:spPr>
-          <a:xfrm>
-            <a:off x="1523714" y="5910165"/>
-            <a:ext cx="8805672" cy="646331"/>
-          </a:xfrm>
-          <a:prstGeom prst="rect">
-            <a:avLst/>
-          </a:prstGeom>
-        </p:spPr>
-        <p:txBody>
-          <a:bodyPr wrap="square">
-            <a:spAutoFit/>
-          </a:bodyPr>
-          <a:lstStyle/>
-          <a:p>
-            <a:r>
-              <a:rPr lang="en-US" dirty="0" smtClean="0"/>
-              <a:t>Figure3c. Predicted values of hierarchically scaled count datasets by taxa using average community size XXX. </a:t>
-            </a:r>
-            <a:endParaRPr lang="en-US" dirty="0"/>
-          </a:p>
-        </p:txBody>
-      </p:sp>
-      <p:pic>
-        <p:nvPicPr>
-          <p:cNvPr id="13" name="Picture 12"/>
-          <p:cNvPicPr>
-            <a:picLocks noChangeAspect="1"/>
-          </p:cNvPicPr>
-          <p:nvPr/>
-        </p:nvPicPr>
-        <p:blipFill>
-          <a:blip r:embed="rId2" cstate="print">
-            <a:extLst>
-              <a:ext uri="{28A0092B-C50C-407E-A947-70E740481C1C}">
-                <a14:useLocalDpi xmlns:a14="http://schemas.microsoft.com/office/drawing/2010/main" val="0"/>
-              </a:ext>
-            </a:extLst>
-          </a:blip>
-          <a:stretch>
-            <a:fillRect/>
-          </a:stretch>
-        </p:blipFill>
-        <p:spPr>
-          <a:xfrm>
-            <a:off x="8928428" y="4379928"/>
-            <a:ext cx="411228" cy="234519"/>
-          </a:xfrm>
-          <a:prstGeom prst="rect">
-            <a:avLst/>
-          </a:prstGeom>
-        </p:spPr>
-      </p:pic>
-      <p:pic>
-        <p:nvPicPr>
-          <p:cNvPr id="14" name="Picture 13"/>
-          <p:cNvPicPr>
-            <a:picLocks noChangeAspect="1"/>
-          </p:cNvPicPr>
-          <p:nvPr/>
-        </p:nvPicPr>
-        <p:blipFill>
-          <a:blip r:embed="rId3" cstate="print">
-            <a:extLst>
-              <a:ext uri="{28A0092B-C50C-407E-A947-70E740481C1C}">
-                <a14:useLocalDpi xmlns:a14="http://schemas.microsoft.com/office/drawing/2010/main" val="0"/>
-              </a:ext>
-            </a:extLst>
-          </a:blip>
-          <a:stretch>
-            <a:fillRect/>
-          </a:stretch>
-        </p:blipFill>
-        <p:spPr>
-          <a:xfrm>
-            <a:off x="9637410" y="4333457"/>
-            <a:ext cx="354392" cy="327463"/>
-          </a:xfrm>
-          <a:prstGeom prst="rect">
-            <a:avLst/>
-          </a:prstGeom>
-        </p:spPr>
-      </p:pic>
-      <p:pic>
-        <p:nvPicPr>
-          <p:cNvPr id="15" name="Picture 14"/>
-          <p:cNvPicPr>
-            <a:picLocks noChangeAspect="1"/>
-          </p:cNvPicPr>
-          <p:nvPr/>
-        </p:nvPicPr>
-        <p:blipFill>
-          <a:blip r:embed="rId4" cstate="print">
-            <a:extLst>
-              <a:ext uri="{28A0092B-C50C-407E-A947-70E740481C1C}">
-                <a14:useLocalDpi xmlns:a14="http://schemas.microsoft.com/office/drawing/2010/main" val="0"/>
-              </a:ext>
-            </a:extLst>
-          </a:blip>
-          <a:stretch>
-            <a:fillRect/>
-          </a:stretch>
-        </p:blipFill>
-        <p:spPr>
-          <a:xfrm>
-            <a:off x="8279084" y="4333457"/>
-            <a:ext cx="346503" cy="327463"/>
-          </a:xfrm>
-          <a:prstGeom prst="rect">
-            <a:avLst/>
-          </a:prstGeom>
-        </p:spPr>
-      </p:pic>
-      <p:pic>
-        <p:nvPicPr>
-          <p:cNvPr id="16" name="Picture 15"/>
-          <p:cNvPicPr>
-            <a:picLocks noChangeAspect="1"/>
-          </p:cNvPicPr>
-          <p:nvPr/>
-        </p:nvPicPr>
-        <p:blipFill>
-          <a:blip r:embed="rId5" cstate="print">
-            <a:extLst>
-              <a:ext uri="{28A0092B-C50C-407E-A947-70E740481C1C}">
-                <a14:useLocalDpi xmlns:a14="http://schemas.microsoft.com/office/drawing/2010/main" val="0"/>
-              </a:ext>
-            </a:extLst>
-          </a:blip>
-          <a:stretch>
-            <a:fillRect/>
-          </a:stretch>
-        </p:blipFill>
-        <p:spPr>
-          <a:xfrm flipH="1">
-            <a:off x="11769494" y="4348352"/>
-            <a:ext cx="323019" cy="317155"/>
-          </a:xfrm>
-          <a:prstGeom prst="rect">
-            <a:avLst/>
-          </a:prstGeom>
-        </p:spPr>
-      </p:pic>
-      <p:pic>
-        <p:nvPicPr>
-          <p:cNvPr id="17" name="Picture 16"/>
-          <p:cNvPicPr>
-            <a:picLocks noChangeAspect="1"/>
-          </p:cNvPicPr>
-          <p:nvPr/>
-        </p:nvPicPr>
-        <p:blipFill>
-          <a:blip r:embed="rId6"/>
-          <a:stretch>
-            <a:fillRect/>
-          </a:stretch>
-        </p:blipFill>
-        <p:spPr>
-          <a:xfrm>
-            <a:off x="10318258" y="4353323"/>
-            <a:ext cx="422927" cy="287729"/>
-          </a:xfrm>
-          <a:prstGeom prst="rect">
-            <a:avLst/>
-          </a:prstGeom>
-        </p:spPr>
-      </p:pic>
-      <p:pic>
-        <p:nvPicPr>
-          <p:cNvPr id="18" name="Picture 17"/>
-          <p:cNvPicPr>
-            <a:picLocks noChangeAspect="1"/>
-          </p:cNvPicPr>
-          <p:nvPr/>
-        </p:nvPicPr>
-        <p:blipFill>
-          <a:blip r:embed="rId7"/>
-          <a:stretch>
-            <a:fillRect/>
-          </a:stretch>
-        </p:blipFill>
-        <p:spPr>
-          <a:xfrm>
-            <a:off x="10990760" y="4355119"/>
-            <a:ext cx="413325" cy="285934"/>
-          </a:xfrm>
-          <a:prstGeom prst="rect">
-            <a:avLst/>
-          </a:prstGeom>
-        </p:spPr>
-      </p:pic>
-      <p:pic>
-        <p:nvPicPr>
-          <p:cNvPr id="8" name="Picture 7"/>
-          <p:cNvPicPr>
-            <a:picLocks noChangeAspect="1"/>
-          </p:cNvPicPr>
-          <p:nvPr/>
-        </p:nvPicPr>
-        <p:blipFill>
-          <a:blip r:embed="rId8"/>
-          <a:stretch>
-            <a:fillRect/>
-          </a:stretch>
-        </p:blipFill>
-        <p:spPr>
-          <a:xfrm>
-            <a:off x="-77904" y="134914"/>
-            <a:ext cx="12008908" cy="3973222"/>
-          </a:xfrm>
-          <a:prstGeom prst="rect">
-            <a:avLst/>
-          </a:prstGeom>
-        </p:spPr>
-      </p:pic>
     </p:spTree>
     <p:extLst>
       <p:ext uri="{BB962C8B-B14F-4D97-AF65-F5344CB8AC3E}">
@@ -6717,6 +6768,13 @@
   <p:clrMapOvr>
     <a:masterClrMapping/>
   </p:clrMapOvr>
+  <p:timing>
+    <p:tnLst>
+      <p:par>
+        <p:cTn id="1" dur="indefinite" restart="never" nodeType="tmRoot"/>
+      </p:par>
+    </p:tnLst>
+  </p:timing>
 </p:sld>
 </file>
 
@@ -6808,6 +6866,13 @@
   <p:clrMapOvr>
     <a:masterClrMapping/>
   </p:clrMapOvr>
+  <p:timing>
+    <p:tnLst>
+      <p:par>
+        <p:cTn id="1" dur="indefinite" restart="never" nodeType="tmRoot"/>
+      </p:par>
+    </p:tnLst>
+  </p:timing>
 </p:sld>
 </file>
 
@@ -7315,6 +7380,13 @@
   <p:clrMapOvr>
     <a:masterClrMapping/>
   </p:clrMapOvr>
+  <p:timing>
+    <p:tnLst>
+      <p:par>
+        <p:cTn id="1" dur="indefinite" restart="never" nodeType="tmRoot"/>
+      </p:par>
+    </p:tnLst>
+  </p:timing>
 </p:sld>
 </file>
 

</xml_diff>

<commit_message>
little changes to CT figs
</commit_message>
<xml_diff>
--- a/output/plots/all_figs_with_legends.pptx
+++ b/output/plots/all_figs_with_legends.pptx
@@ -5957,96 +5957,264 @@
           </a:p>
         </p:txBody>
       </p:sp>
-      <p:pic>
-        <p:nvPicPr>
-          <p:cNvPr id="2" name="Picture 1"/>
-          <p:cNvPicPr>
-            <a:picLocks noChangeAspect="1"/>
-          </p:cNvPicPr>
-          <p:nvPr/>
-        </p:nvPicPr>
-        <p:blipFill>
-          <a:blip r:embed="rId3"/>
-          <a:stretch>
-            <a:fillRect/>
-          </a:stretch>
-        </p:blipFill>
-        <p:spPr>
-          <a:xfrm>
-            <a:off x="1289304" y="70226"/>
-            <a:ext cx="9626664" cy="6427235"/>
-          </a:xfrm>
-          <a:prstGeom prst="rect">
-            <a:avLst/>
-          </a:prstGeom>
-        </p:spPr>
-      </p:pic>
       <p:grpSp>
         <p:nvGrpSpPr>
-          <p:cNvPr id="7" name="Group 6"/>
+          <p:cNvPr id="4" name="Group 3"/>
           <p:cNvGrpSpPr/>
           <p:nvPr/>
         </p:nvGrpSpPr>
         <p:grpSpPr>
           <a:xfrm>
-            <a:off x="2092569" y="5642156"/>
-            <a:ext cx="3815862" cy="377873"/>
-            <a:chOff x="4092064" y="5579770"/>
-            <a:chExt cx="3105944" cy="245213"/>
+            <a:off x="1289304" y="70226"/>
+            <a:ext cx="9626664" cy="6427235"/>
+            <a:chOff x="1289304" y="70226"/>
+            <a:chExt cx="9626664" cy="6427235"/>
           </a:xfrm>
         </p:grpSpPr>
+        <p:pic>
+          <p:nvPicPr>
+            <p:cNvPr id="2" name="Picture 1"/>
+            <p:cNvPicPr>
+              <a:picLocks noChangeAspect="1"/>
+            </p:cNvPicPr>
+            <p:nvPr/>
+          </p:nvPicPr>
+          <p:blipFill>
+            <a:blip r:embed="rId3"/>
+            <a:stretch>
+              <a:fillRect/>
+            </a:stretch>
+          </p:blipFill>
+          <p:spPr>
+            <a:xfrm>
+              <a:off x="1289304" y="70226"/>
+              <a:ext cx="9626664" cy="6427235"/>
+            </a:xfrm>
+            <a:prstGeom prst="rect">
+              <a:avLst/>
+            </a:prstGeom>
+          </p:spPr>
+        </p:pic>
         <p:grpSp>
           <p:nvGrpSpPr>
-            <p:cNvPr id="8" name="Group 7"/>
+            <p:cNvPr id="3" name="Group 2"/>
             <p:cNvGrpSpPr/>
             <p:nvPr/>
           </p:nvGrpSpPr>
           <p:grpSpPr>
             <a:xfrm>
-              <a:off x="4092064" y="5579770"/>
-              <a:ext cx="3105944" cy="245213"/>
-              <a:chOff x="4092064" y="5579770"/>
-              <a:chExt cx="3105944" cy="245213"/>
+              <a:off x="2092569" y="5582091"/>
+              <a:ext cx="8356673" cy="437938"/>
+              <a:chOff x="2092569" y="5582091"/>
+              <a:chExt cx="8356673" cy="437938"/>
             </a:xfrm>
           </p:grpSpPr>
           <p:grpSp>
             <p:nvGrpSpPr>
-              <p:cNvPr id="11" name="Group 10"/>
+              <p:cNvPr id="7" name="Group 6"/>
               <p:cNvGrpSpPr/>
               <p:nvPr/>
             </p:nvGrpSpPr>
             <p:grpSpPr>
               <a:xfrm>
-                <a:off x="4092064" y="5579770"/>
-                <a:ext cx="2638534" cy="231317"/>
-                <a:chOff x="4258063" y="5579770"/>
-                <a:chExt cx="2638534" cy="231317"/>
+                <a:off x="2092569" y="5642156"/>
+                <a:ext cx="3815862" cy="377873"/>
+                <a:chOff x="4092064" y="5579770"/>
+                <a:chExt cx="3105944" cy="245213"/>
               </a:xfrm>
             </p:grpSpPr>
+            <p:grpSp>
+              <p:nvGrpSpPr>
+                <p:cNvPr id="8" name="Group 7"/>
+                <p:cNvGrpSpPr/>
+                <p:nvPr/>
+              </p:nvGrpSpPr>
+              <p:grpSpPr>
+                <a:xfrm>
+                  <a:off x="4092064" y="5579770"/>
+                  <a:ext cx="3105944" cy="245213"/>
+                  <a:chOff x="4092064" y="5579770"/>
+                  <a:chExt cx="3105944" cy="245213"/>
+                </a:xfrm>
+              </p:grpSpPr>
+              <p:grpSp>
+                <p:nvGrpSpPr>
+                  <p:cNvPr id="11" name="Group 10"/>
+                  <p:cNvGrpSpPr/>
+                  <p:nvPr/>
+                </p:nvGrpSpPr>
+                <p:grpSpPr>
+                  <a:xfrm>
+                    <a:off x="4092064" y="5579770"/>
+                    <a:ext cx="2638534" cy="231317"/>
+                    <a:chOff x="4258063" y="5579770"/>
+                    <a:chExt cx="2638534" cy="231317"/>
+                  </a:xfrm>
+                </p:grpSpPr>
+                <p:pic>
+                  <p:nvPicPr>
+                    <p:cNvPr id="13" name="Picture 12"/>
+                    <p:cNvPicPr>
+                      <a:picLocks noChangeAspect="1"/>
+                    </p:cNvPicPr>
+                    <p:nvPr/>
+                  </p:nvPicPr>
+                  <p:blipFill>
+                    <a:blip r:embed="rId4" cstate="print">
+                      <a:extLst>
+                        <a:ext uri="{28A0092B-C50C-407E-A947-70E740481C1C}">
+                          <a14:useLocalDpi xmlns:a14="http://schemas.microsoft.com/office/drawing/2010/main" val="0"/>
+                        </a:ext>
+                      </a:extLst>
+                    </a:blip>
+                    <a:stretch>
+                      <a:fillRect/>
+                    </a:stretch>
+                  </p:blipFill>
+                  <p:spPr>
+                    <a:xfrm>
+                      <a:off x="4690969" y="5623587"/>
+                      <a:ext cx="325640" cy="161565"/>
+                    </a:xfrm>
+                    <a:prstGeom prst="rect">
+                      <a:avLst/>
+                    </a:prstGeom>
+                  </p:spPr>
+                </p:pic>
+                <p:pic>
+                  <p:nvPicPr>
+                    <p:cNvPr id="14" name="Picture 13"/>
+                    <p:cNvPicPr>
+                      <a:picLocks noChangeAspect="1"/>
+                    </p:cNvPicPr>
+                    <p:nvPr/>
+                  </p:nvPicPr>
+                  <p:blipFill>
+                    <a:blip r:embed="rId5" cstate="print">
+                      <a:extLst>
+                        <a:ext uri="{28A0092B-C50C-407E-A947-70E740481C1C}">
+                          <a14:useLocalDpi xmlns:a14="http://schemas.microsoft.com/office/drawing/2010/main" val="0"/>
+                        </a:ext>
+                      </a:extLst>
+                    </a:blip>
+                    <a:stretch>
+                      <a:fillRect/>
+                    </a:stretch>
+                  </p:blipFill>
+                  <p:spPr>
+                    <a:xfrm>
+                      <a:off x="5178545" y="5585491"/>
+                      <a:ext cx="280633" cy="225596"/>
+                    </a:xfrm>
+                    <a:prstGeom prst="rect">
+                      <a:avLst/>
+                    </a:prstGeom>
+                  </p:spPr>
+                </p:pic>
+                <p:pic>
+                  <p:nvPicPr>
+                    <p:cNvPr id="15" name="Picture 14"/>
+                    <p:cNvPicPr>
+                      <a:picLocks noChangeAspect="1"/>
+                    </p:cNvPicPr>
+                    <p:nvPr/>
+                  </p:nvPicPr>
+                  <p:blipFill>
+                    <a:blip r:embed="rId6" cstate="print">
+                      <a:extLst>
+                        <a:ext uri="{28A0092B-C50C-407E-A947-70E740481C1C}">
+                          <a14:useLocalDpi xmlns:a14="http://schemas.microsoft.com/office/drawing/2010/main" val="0"/>
+                        </a:ext>
+                      </a:extLst>
+                    </a:blip>
+                    <a:stretch>
+                      <a:fillRect/>
+                    </a:stretch>
+                  </p:blipFill>
+                  <p:spPr>
+                    <a:xfrm>
+                      <a:off x="4258063" y="5579770"/>
+                      <a:ext cx="274386" cy="225596"/>
+                    </a:xfrm>
+                    <a:prstGeom prst="rect">
+                      <a:avLst/>
+                    </a:prstGeom>
+                  </p:spPr>
+                </p:pic>
+                <p:pic>
+                  <p:nvPicPr>
+                    <p:cNvPr id="16" name="Picture 15"/>
+                    <p:cNvPicPr>
+                      <a:picLocks noChangeAspect="1"/>
+                    </p:cNvPicPr>
+                    <p:nvPr/>
+                  </p:nvPicPr>
+                  <p:blipFill>
+                    <a:blip r:embed="rId7" cstate="print">
+                      <a:extLst>
+                        <a:ext uri="{28A0092B-C50C-407E-A947-70E740481C1C}">
+                          <a14:useLocalDpi xmlns:a14="http://schemas.microsoft.com/office/drawing/2010/main" val="0"/>
+                        </a:ext>
+                      </a:extLst>
+                    </a:blip>
+                    <a:stretch>
+                      <a:fillRect/>
+                    </a:stretch>
+                  </p:blipFill>
+                  <p:spPr>
+                    <a:xfrm flipH="1">
+                      <a:off x="6640808" y="5592592"/>
+                      <a:ext cx="255789" cy="218495"/>
+                    </a:xfrm>
+                    <a:prstGeom prst="rect">
+                      <a:avLst/>
+                    </a:prstGeom>
+                  </p:spPr>
+                </p:pic>
+              </p:grpSp>
+              <p:pic>
+                <p:nvPicPr>
+                  <p:cNvPr id="12" name="Picture 11"/>
+                  <p:cNvPicPr>
+                    <a:picLocks noChangeAspect="1"/>
+                  </p:cNvPicPr>
+                  <p:nvPr/>
+                </p:nvPicPr>
+                <p:blipFill>
+                  <a:blip r:embed="rId8"/>
+                  <a:stretch>
+                    <a:fillRect/>
+                  </a:stretch>
+                </p:blipFill>
+                <p:spPr>
+                  <a:xfrm>
+                    <a:off x="6895947" y="5589042"/>
+                    <a:ext cx="302061" cy="235941"/>
+                  </a:xfrm>
+                  <a:prstGeom prst="rect">
+                    <a:avLst/>
+                  </a:prstGeom>
+                </p:spPr>
+              </p:pic>
+            </p:grpSp>
             <p:pic>
               <p:nvPicPr>
-                <p:cNvPr id="13" name="Picture 12"/>
+                <p:cNvPr id="9" name="Picture 8"/>
                 <p:cNvPicPr>
                   <a:picLocks noChangeAspect="1"/>
                 </p:cNvPicPr>
                 <p:nvPr/>
               </p:nvPicPr>
               <p:blipFill>
-                <a:blip r:embed="rId4" cstate="print">
-                  <a:extLst>
-                    <a:ext uri="{28A0092B-C50C-407E-A947-70E740481C1C}">
-                      <a14:useLocalDpi xmlns:a14="http://schemas.microsoft.com/office/drawing/2010/main" val="0"/>
-                    </a:ext>
-                  </a:extLst>
-                </a:blip>
+                <a:blip r:embed="rId9"/>
                 <a:stretch>
                   <a:fillRect/>
                 </a:stretch>
               </p:blipFill>
               <p:spPr>
                 <a:xfrm>
-                  <a:off x="4690969" y="5623587"/>
-                  <a:ext cx="325640" cy="161565"/>
+                  <a:off x="5470546" y="5589042"/>
+                  <a:ext cx="334903" cy="198223"/>
                 </a:xfrm>
                 <a:prstGeom prst="rect">
                   <a:avLst/>
@@ -6055,88 +6223,22 @@
             </p:pic>
             <p:pic>
               <p:nvPicPr>
-                <p:cNvPr id="14" name="Picture 13"/>
+                <p:cNvPr id="10" name="Picture 9"/>
                 <p:cNvPicPr>
                   <a:picLocks noChangeAspect="1"/>
                 </p:cNvPicPr>
                 <p:nvPr/>
               </p:nvPicPr>
               <p:blipFill>
-                <a:blip r:embed="rId5" cstate="print">
-                  <a:extLst>
-                    <a:ext uri="{28A0092B-C50C-407E-A947-70E740481C1C}">
-                      <a14:useLocalDpi xmlns:a14="http://schemas.microsoft.com/office/drawing/2010/main" val="0"/>
-                    </a:ext>
-                  </a:extLst>
-                </a:blip>
+                <a:blip r:embed="rId10"/>
                 <a:stretch>
                   <a:fillRect/>
                 </a:stretch>
               </p:blipFill>
               <p:spPr>
                 <a:xfrm>
-                  <a:off x="5178545" y="5585491"/>
-                  <a:ext cx="280633" cy="225596"/>
-                </a:xfrm>
-                <a:prstGeom prst="rect">
-                  <a:avLst/>
-                </a:prstGeom>
-              </p:spPr>
-            </p:pic>
-            <p:pic>
-              <p:nvPicPr>
-                <p:cNvPr id="15" name="Picture 14"/>
-                <p:cNvPicPr>
-                  <a:picLocks noChangeAspect="1"/>
-                </p:cNvPicPr>
-                <p:nvPr/>
-              </p:nvPicPr>
-              <p:blipFill>
-                <a:blip r:embed="rId6" cstate="print">
-                  <a:extLst>
-                    <a:ext uri="{28A0092B-C50C-407E-A947-70E740481C1C}">
-                      <a14:useLocalDpi xmlns:a14="http://schemas.microsoft.com/office/drawing/2010/main" val="0"/>
-                    </a:ext>
-                  </a:extLst>
-                </a:blip>
-                <a:stretch>
-                  <a:fillRect/>
-                </a:stretch>
-              </p:blipFill>
-              <p:spPr>
-                <a:xfrm>
-                  <a:off x="4258063" y="5579770"/>
-                  <a:ext cx="274386" cy="225596"/>
-                </a:xfrm>
-                <a:prstGeom prst="rect">
-                  <a:avLst/>
-                </a:prstGeom>
-              </p:spPr>
-            </p:pic>
-            <p:pic>
-              <p:nvPicPr>
-                <p:cNvPr id="16" name="Picture 15"/>
-                <p:cNvPicPr>
-                  <a:picLocks noChangeAspect="1"/>
-                </p:cNvPicPr>
-                <p:nvPr/>
-              </p:nvPicPr>
-              <p:blipFill>
-                <a:blip r:embed="rId7" cstate="print">
-                  <a:extLst>
-                    <a:ext uri="{28A0092B-C50C-407E-A947-70E740481C1C}">
-                      <a14:useLocalDpi xmlns:a14="http://schemas.microsoft.com/office/drawing/2010/main" val="0"/>
-                    </a:ext>
-                  </a:extLst>
-                </a:blip>
-                <a:stretch>
-                  <a:fillRect/>
-                </a:stretch>
-              </p:blipFill>
-              <p:spPr>
-                <a:xfrm flipH="1">
-                  <a:off x="6640808" y="5592592"/>
-                  <a:ext cx="255789" cy="218495"/>
+                  <a:off x="5942690" y="5606488"/>
+                  <a:ext cx="327300" cy="196986"/>
                 </a:xfrm>
                 <a:prstGeom prst="rect">
                   <a:avLst/>
@@ -6144,180 +6246,108 @@
               </p:spPr>
             </p:pic>
           </p:grpSp>
-          <p:pic>
-            <p:nvPicPr>
-              <p:cNvPr id="12" name="Picture 11"/>
-              <p:cNvPicPr>
-                <a:picLocks noChangeAspect="1"/>
-              </p:cNvPicPr>
+          <p:grpSp>
+            <p:nvGrpSpPr>
+              <p:cNvPr id="23" name="Group 22"/>
+              <p:cNvGrpSpPr/>
               <p:nvPr/>
-            </p:nvPicPr>
-            <p:blipFill>
-              <a:blip r:embed="rId8"/>
-              <a:stretch>
-                <a:fillRect/>
-              </a:stretch>
-            </p:blipFill>
-            <p:spPr>
-              <a:xfrm>
-                <a:off x="6895947" y="5589042"/>
-                <a:ext cx="302061" cy="235941"/>
-              </a:xfrm>
-              <a:prstGeom prst="rect">
-                <a:avLst/>
-              </a:prstGeom>
-            </p:spPr>
-          </p:pic>
-        </p:grpSp>
-        <p:pic>
-          <p:nvPicPr>
-            <p:cNvPr id="9" name="Picture 8"/>
-            <p:cNvPicPr>
-              <a:picLocks noChangeAspect="1"/>
-            </p:cNvPicPr>
-            <p:nvPr/>
-          </p:nvPicPr>
-          <p:blipFill>
-            <a:blip r:embed="rId9"/>
-            <a:stretch>
-              <a:fillRect/>
-            </a:stretch>
-          </p:blipFill>
-          <p:spPr>
-            <a:xfrm>
-              <a:off x="5470546" y="5589042"/>
-              <a:ext cx="334903" cy="198223"/>
-            </a:xfrm>
-            <a:prstGeom prst="rect">
-              <a:avLst/>
-            </a:prstGeom>
-          </p:spPr>
-        </p:pic>
-        <p:pic>
-          <p:nvPicPr>
-            <p:cNvPr id="10" name="Picture 9"/>
-            <p:cNvPicPr>
-              <a:picLocks noChangeAspect="1"/>
-            </p:cNvPicPr>
-            <p:nvPr/>
-          </p:nvPicPr>
-          <p:blipFill>
-            <a:blip r:embed="rId10"/>
-            <a:stretch>
-              <a:fillRect/>
-            </a:stretch>
-          </p:blipFill>
-          <p:spPr>
-            <a:xfrm>
-              <a:off x="5942690" y="5606488"/>
-              <a:ext cx="327300" cy="196986"/>
-            </a:xfrm>
-            <a:prstGeom prst="rect">
-              <a:avLst/>
-            </a:prstGeom>
-          </p:spPr>
-        </p:pic>
-      </p:grpSp>
-      <p:grpSp>
-        <p:nvGrpSpPr>
-          <p:cNvPr id="23" name="Group 22"/>
-          <p:cNvGrpSpPr/>
-          <p:nvPr/>
-        </p:nvGrpSpPr>
-        <p:grpSpPr>
-          <a:xfrm>
-            <a:off x="7248182" y="5582091"/>
-            <a:ext cx="3201060" cy="408944"/>
-            <a:chOff x="7248182" y="5582091"/>
-            <a:chExt cx="3201060" cy="408944"/>
-          </a:xfrm>
-        </p:grpSpPr>
-        <p:pic>
-          <p:nvPicPr>
-            <p:cNvPr id="19" name="Picture 18"/>
-            <p:cNvPicPr>
-              <a:picLocks noChangeAspect="1"/>
-            </p:cNvPicPr>
-            <p:nvPr/>
-          </p:nvPicPr>
-          <p:blipFill>
-            <a:blip r:embed="rId11"/>
-            <a:stretch>
-              <a:fillRect/>
-            </a:stretch>
-          </p:blipFill>
-          <p:spPr>
-            <a:xfrm>
-              <a:off x="9793330" y="5588411"/>
-              <a:ext cx="655912" cy="396304"/>
-            </a:xfrm>
-            <a:prstGeom prst="rect">
-              <a:avLst/>
-            </a:prstGeom>
-          </p:spPr>
-        </p:pic>
-        <p:grpSp>
-          <p:nvGrpSpPr>
-            <p:cNvPr id="22" name="Group 21"/>
-            <p:cNvGrpSpPr/>
-            <p:nvPr/>
-          </p:nvGrpSpPr>
-          <p:grpSpPr>
-            <a:xfrm>
-              <a:off x="7248182" y="5582091"/>
-              <a:ext cx="1970903" cy="408944"/>
-              <a:chOff x="7248182" y="5582091"/>
-              <a:chExt cx="1970903" cy="408944"/>
-            </a:xfrm>
-          </p:grpSpPr>
-          <p:pic>
-            <p:nvPicPr>
-              <p:cNvPr id="20" name="Picture 19"/>
-              <p:cNvPicPr>
-                <a:picLocks noChangeAspect="1"/>
-              </p:cNvPicPr>
-              <p:nvPr/>
-            </p:nvPicPr>
-            <p:blipFill>
-              <a:blip r:embed="rId12"/>
-              <a:stretch>
-                <a:fillRect/>
-              </a:stretch>
-            </p:blipFill>
-            <p:spPr>
-              <a:xfrm>
-                <a:off x="8490606" y="5642156"/>
-                <a:ext cx="728479" cy="293882"/>
-              </a:xfrm>
-              <a:prstGeom prst="rect">
-                <a:avLst/>
-              </a:prstGeom>
-            </p:spPr>
-          </p:pic>
-          <p:pic>
-            <p:nvPicPr>
-              <p:cNvPr id="5" name="Picture 4"/>
-              <p:cNvPicPr>
-                <a:picLocks noChangeAspect="1"/>
-              </p:cNvPicPr>
-              <p:nvPr/>
-            </p:nvPicPr>
-            <p:blipFill>
-              <a:blip r:embed="rId13"/>
-              <a:stretch>
-                <a:fillRect/>
-              </a:stretch>
-            </p:blipFill>
-            <p:spPr>
+            </p:nvGrpSpPr>
+            <p:grpSpPr>
               <a:xfrm>
                 <a:off x="7248182" y="5582091"/>
-                <a:ext cx="640805" cy="408944"/>
+                <a:ext cx="3201060" cy="408944"/>
+                <a:chOff x="7248182" y="5582091"/>
+                <a:chExt cx="3201060" cy="408944"/>
               </a:xfrm>
-              <a:prstGeom prst="rect">
-                <a:avLst/>
-              </a:prstGeom>
-            </p:spPr>
-          </p:pic>
+            </p:grpSpPr>
+            <p:pic>
+              <p:nvPicPr>
+                <p:cNvPr id="19" name="Picture 18"/>
+                <p:cNvPicPr>
+                  <a:picLocks noChangeAspect="1"/>
+                </p:cNvPicPr>
+                <p:nvPr/>
+              </p:nvPicPr>
+              <p:blipFill>
+                <a:blip r:embed="rId11"/>
+                <a:stretch>
+                  <a:fillRect/>
+                </a:stretch>
+              </p:blipFill>
+              <p:spPr>
+                <a:xfrm>
+                  <a:off x="9793330" y="5588411"/>
+                  <a:ext cx="655912" cy="396304"/>
+                </a:xfrm>
+                <a:prstGeom prst="rect">
+                  <a:avLst/>
+                </a:prstGeom>
+              </p:spPr>
+            </p:pic>
+            <p:grpSp>
+              <p:nvGrpSpPr>
+                <p:cNvPr id="22" name="Group 21"/>
+                <p:cNvGrpSpPr/>
+                <p:nvPr/>
+              </p:nvGrpSpPr>
+              <p:grpSpPr>
+                <a:xfrm>
+                  <a:off x="7248182" y="5582091"/>
+                  <a:ext cx="1970903" cy="408944"/>
+                  <a:chOff x="7248182" y="5582091"/>
+                  <a:chExt cx="1970903" cy="408944"/>
+                </a:xfrm>
+              </p:grpSpPr>
+              <p:pic>
+                <p:nvPicPr>
+                  <p:cNvPr id="20" name="Picture 19"/>
+                  <p:cNvPicPr>
+                    <a:picLocks noChangeAspect="1"/>
+                  </p:cNvPicPr>
+                  <p:nvPr/>
+                </p:nvPicPr>
+                <p:blipFill>
+                  <a:blip r:embed="rId12"/>
+                  <a:stretch>
+                    <a:fillRect/>
+                  </a:stretch>
+                </p:blipFill>
+                <p:spPr>
+                  <a:xfrm>
+                    <a:off x="8490606" y="5642156"/>
+                    <a:ext cx="728479" cy="293882"/>
+                  </a:xfrm>
+                  <a:prstGeom prst="rect">
+                    <a:avLst/>
+                  </a:prstGeom>
+                </p:spPr>
+              </p:pic>
+              <p:pic>
+                <p:nvPicPr>
+                  <p:cNvPr id="5" name="Picture 4"/>
+                  <p:cNvPicPr>
+                    <a:picLocks noChangeAspect="1"/>
+                  </p:cNvPicPr>
+                  <p:nvPr/>
+                </p:nvPicPr>
+                <p:blipFill>
+                  <a:blip r:embed="rId13"/>
+                  <a:stretch>
+                    <a:fillRect/>
+                  </a:stretch>
+                </p:blipFill>
+                <p:spPr>
+                  <a:xfrm>
+                    <a:off x="7248182" y="5582091"/>
+                    <a:ext cx="640805" cy="408944"/>
+                  </a:xfrm>
+                  <a:prstGeom prst="rect">
+                    <a:avLst/>
+                  </a:prstGeom>
+                </p:spPr>
+              </p:pic>
+            </p:grpSp>
+          </p:grpSp>
         </p:grpSp>
       </p:grpSp>
     </p:spTree>

</xml_diff>

<commit_message>
cleaning up plot subfolder and tweaks to figs
</commit_message>
<xml_diff>
--- a/output/plots/all_figs_with_legends.pptx
+++ b/output/plots/all_figs_with_legends.pptx
@@ -202,7 +202,7 @@
           <a:p>
             <a:fld id="{7FA21820-D199-4D82-91AF-C50B1D3B111A}" type="datetimeFigureOut">
               <a:rPr lang="en-US" smtClean="0"/>
-              <a:t>4/13/2017</a:t>
+              <a:t>4/17/2017</a:t>
             </a:fld>
             <a:endParaRPr lang="en-US"/>
           </a:p>
@@ -774,7 +774,7 @@
           <a:p>
             <a:r>
               <a:rPr lang="en-US" dirty="0" smtClean="0"/>
-              <a:t>FIXED – log transformed E</a:t>
+              <a:t>Not fixed</a:t>
             </a:r>
             <a:endParaRPr lang="en-US" dirty="0"/>
           </a:p>
@@ -1035,7 +1035,7 @@
           <a:p>
             <a:fld id="{916B8C92-D5E3-4480-8685-D57BEE386DE2}" type="datetimeFigureOut">
               <a:rPr lang="en-US" smtClean="0"/>
-              <a:t>4/13/2017</a:t>
+              <a:t>4/17/2017</a:t>
             </a:fld>
             <a:endParaRPr lang="en-US"/>
           </a:p>
@@ -1205,7 +1205,7 @@
           <a:p>
             <a:fld id="{916B8C92-D5E3-4480-8685-D57BEE386DE2}" type="datetimeFigureOut">
               <a:rPr lang="en-US" smtClean="0"/>
-              <a:t>4/13/2017</a:t>
+              <a:t>4/17/2017</a:t>
             </a:fld>
             <a:endParaRPr lang="en-US"/>
           </a:p>
@@ -1385,7 +1385,7 @@
           <a:p>
             <a:fld id="{916B8C92-D5E3-4480-8685-D57BEE386DE2}" type="datetimeFigureOut">
               <a:rPr lang="en-US" smtClean="0"/>
-              <a:t>4/13/2017</a:t>
+              <a:t>4/17/2017</a:t>
             </a:fld>
             <a:endParaRPr lang="en-US"/>
           </a:p>
@@ -1555,7 +1555,7 @@
           <a:p>
             <a:fld id="{916B8C92-D5E3-4480-8685-D57BEE386DE2}" type="datetimeFigureOut">
               <a:rPr lang="en-US" smtClean="0"/>
-              <a:t>4/13/2017</a:t>
+              <a:t>4/17/2017</a:t>
             </a:fld>
             <a:endParaRPr lang="en-US"/>
           </a:p>
@@ -1801,7 +1801,7 @@
           <a:p>
             <a:fld id="{916B8C92-D5E3-4480-8685-D57BEE386DE2}" type="datetimeFigureOut">
               <a:rPr lang="en-US" smtClean="0"/>
-              <a:t>4/13/2017</a:t>
+              <a:t>4/17/2017</a:t>
             </a:fld>
             <a:endParaRPr lang="en-US"/>
           </a:p>
@@ -2033,7 +2033,7 @@
           <a:p>
             <a:fld id="{916B8C92-D5E3-4480-8685-D57BEE386DE2}" type="datetimeFigureOut">
               <a:rPr lang="en-US" smtClean="0"/>
-              <a:t>4/13/2017</a:t>
+              <a:t>4/17/2017</a:t>
             </a:fld>
             <a:endParaRPr lang="en-US"/>
           </a:p>
@@ -2400,7 +2400,7 @@
           <a:p>
             <a:fld id="{916B8C92-D5E3-4480-8685-D57BEE386DE2}" type="datetimeFigureOut">
               <a:rPr lang="en-US" smtClean="0"/>
-              <a:t>4/13/2017</a:t>
+              <a:t>4/17/2017</a:t>
             </a:fld>
             <a:endParaRPr lang="en-US"/>
           </a:p>
@@ -2518,7 +2518,7 @@
           <a:p>
             <a:fld id="{916B8C92-D5E3-4480-8685-D57BEE386DE2}" type="datetimeFigureOut">
               <a:rPr lang="en-US" smtClean="0"/>
-              <a:t>4/13/2017</a:t>
+              <a:t>4/17/2017</a:t>
             </a:fld>
             <a:endParaRPr lang="en-US"/>
           </a:p>
@@ -2613,7 +2613,7 @@
           <a:p>
             <a:fld id="{916B8C92-D5E3-4480-8685-D57BEE386DE2}" type="datetimeFigureOut">
               <a:rPr lang="en-US" smtClean="0"/>
-              <a:t>4/13/2017</a:t>
+              <a:t>4/17/2017</a:t>
             </a:fld>
             <a:endParaRPr lang="en-US"/>
           </a:p>
@@ -2890,7 +2890,7 @@
           <a:p>
             <a:fld id="{916B8C92-D5E3-4480-8685-D57BEE386DE2}" type="datetimeFigureOut">
               <a:rPr lang="en-US" smtClean="0"/>
-              <a:t>4/13/2017</a:t>
+              <a:t>4/17/2017</a:t>
             </a:fld>
             <a:endParaRPr lang="en-US"/>
           </a:p>
@@ -3143,7 +3143,7 @@
           <a:p>
             <a:fld id="{916B8C92-D5E3-4480-8685-D57BEE386DE2}" type="datetimeFigureOut">
               <a:rPr lang="en-US" smtClean="0"/>
-              <a:t>4/13/2017</a:t>
+              <a:t>4/17/2017</a:t>
             </a:fld>
             <a:endParaRPr lang="en-US"/>
           </a:p>
@@ -3356,7 +3356,7 @@
           <a:p>
             <a:fld id="{916B8C92-D5E3-4480-8685-D57BEE386DE2}" type="datetimeFigureOut">
               <a:rPr lang="en-US" smtClean="0"/>
-              <a:t>4/13/2017</a:t>
+              <a:t>4/17/2017</a:t>
             </a:fld>
             <a:endParaRPr lang="en-US"/>
           </a:p>
@@ -4718,21 +4718,22 @@
       </p:grpSpPr>
       <p:pic>
         <p:nvPicPr>
-          <p:cNvPr id="4" name="Picture 3"/>
+          <p:cNvPr id="3" name="Picture 2"/>
           <p:cNvPicPr>
             <a:picLocks noChangeAspect="1"/>
           </p:cNvPicPr>
           <p:nvPr/>
         </p:nvPicPr>
-        <p:blipFill rotWithShape="1">
+        <p:blipFill>
           <a:blip r:embed="rId3"/>
-          <a:srcRect l="468"/>
-          <a:stretch/>
+          <a:stretch>
+            <a:fillRect/>
+          </a:stretch>
         </p:blipFill>
         <p:spPr>
           <a:xfrm>
-            <a:off x="1185598" y="0"/>
-            <a:ext cx="8642055" cy="6629400"/>
+            <a:off x="1105432" y="422"/>
+            <a:ext cx="8744459" cy="6585429"/>
           </a:xfrm>
           <a:prstGeom prst="rect">
             <a:avLst/>

</xml_diff>

<commit_message>
reordered fig 3 script
</commit_message>
<xml_diff>
--- a/output/plots/all_figs_with_legends.pptx
+++ b/output/plots/all_figs_with_legends.pptx
@@ -5937,7 +5937,7 @@
         </p:nvSpPr>
         <p:spPr>
           <a:xfrm>
-            <a:off x="228600" y="193318"/>
+            <a:off x="0" y="118263"/>
             <a:ext cx="1060704" cy="369332"/>
           </a:xfrm>
           <a:prstGeom prst="rect">
@@ -5960,21 +5960,21 @@
       </p:sp>
       <p:grpSp>
         <p:nvGrpSpPr>
-          <p:cNvPr id="4" name="Group 3"/>
+          <p:cNvPr id="18" name="Group 17"/>
           <p:cNvGrpSpPr/>
           <p:nvPr/>
         </p:nvGrpSpPr>
         <p:grpSpPr>
           <a:xfrm>
-            <a:off x="1289304" y="70226"/>
-            <a:ext cx="9626664" cy="6427235"/>
-            <a:chOff x="1289304" y="70226"/>
-            <a:chExt cx="9626664" cy="6427235"/>
+            <a:off x="955248" y="302929"/>
+            <a:ext cx="10438604" cy="6637129"/>
+            <a:chOff x="918672" y="-90263"/>
+            <a:chExt cx="10438604" cy="6637129"/>
           </a:xfrm>
         </p:grpSpPr>
         <p:pic>
           <p:nvPicPr>
-            <p:cNvPr id="2" name="Picture 1"/>
+            <p:cNvPr id="6" name="Picture 5"/>
             <p:cNvPicPr>
               <a:picLocks noChangeAspect="1"/>
             </p:cNvPicPr>
@@ -5988,8 +5988,8 @@
           </p:blipFill>
           <p:spPr>
             <a:xfrm>
-              <a:off x="1289304" y="70226"/>
-              <a:ext cx="9626664" cy="6427235"/>
+              <a:off x="918672" y="-90263"/>
+              <a:ext cx="10438604" cy="6637129"/>
             </a:xfrm>
             <a:prstGeom prst="rect">
               <a:avLst/>
@@ -5998,199 +5998,160 @@
         </p:pic>
         <p:grpSp>
           <p:nvGrpSpPr>
-            <p:cNvPr id="3" name="Group 2"/>
+            <p:cNvPr id="7" name="Group 6"/>
             <p:cNvGrpSpPr/>
             <p:nvPr/>
           </p:nvGrpSpPr>
           <p:grpSpPr>
             <a:xfrm>
-              <a:off x="2092569" y="5582091"/>
-              <a:ext cx="8356673" cy="437938"/>
-              <a:chOff x="2092569" y="5582091"/>
-              <a:chExt cx="8356673" cy="437938"/>
+              <a:off x="2092569" y="5642156"/>
+              <a:ext cx="3815862" cy="377873"/>
+              <a:chOff x="4092064" y="5579770"/>
+              <a:chExt cx="3105944" cy="245213"/>
             </a:xfrm>
           </p:grpSpPr>
           <p:grpSp>
             <p:nvGrpSpPr>
-              <p:cNvPr id="7" name="Group 6"/>
+              <p:cNvPr id="8" name="Group 7"/>
               <p:cNvGrpSpPr/>
               <p:nvPr/>
             </p:nvGrpSpPr>
             <p:grpSpPr>
               <a:xfrm>
-                <a:off x="2092569" y="5642156"/>
-                <a:ext cx="3815862" cy="377873"/>
+                <a:off x="4092064" y="5579770"/>
+                <a:ext cx="3105944" cy="245213"/>
                 <a:chOff x="4092064" y="5579770"/>
                 <a:chExt cx="3105944" cy="245213"/>
               </a:xfrm>
             </p:grpSpPr>
             <p:grpSp>
               <p:nvGrpSpPr>
-                <p:cNvPr id="8" name="Group 7"/>
+                <p:cNvPr id="11" name="Group 10"/>
                 <p:cNvGrpSpPr/>
                 <p:nvPr/>
               </p:nvGrpSpPr>
               <p:grpSpPr>
                 <a:xfrm>
                   <a:off x="4092064" y="5579770"/>
-                  <a:ext cx="3105944" cy="245213"/>
-                  <a:chOff x="4092064" y="5579770"/>
-                  <a:chExt cx="3105944" cy="245213"/>
+                  <a:ext cx="2638534" cy="231317"/>
+                  <a:chOff x="4258063" y="5579770"/>
+                  <a:chExt cx="2638534" cy="231317"/>
                 </a:xfrm>
               </p:grpSpPr>
-              <p:grpSp>
-                <p:nvGrpSpPr>
-                  <p:cNvPr id="11" name="Group 10"/>
-                  <p:cNvGrpSpPr/>
-                  <p:nvPr/>
-                </p:nvGrpSpPr>
-                <p:grpSpPr>
-                  <a:xfrm>
-                    <a:off x="4092064" y="5579770"/>
-                    <a:ext cx="2638534" cy="231317"/>
-                    <a:chOff x="4258063" y="5579770"/>
-                    <a:chExt cx="2638534" cy="231317"/>
-                  </a:xfrm>
-                </p:grpSpPr>
-                <p:pic>
-                  <p:nvPicPr>
-                    <p:cNvPr id="13" name="Picture 12"/>
-                    <p:cNvPicPr>
-                      <a:picLocks noChangeAspect="1"/>
-                    </p:cNvPicPr>
-                    <p:nvPr/>
-                  </p:nvPicPr>
-                  <p:blipFill>
-                    <a:blip r:embed="rId4" cstate="print">
-                      <a:extLst>
-                        <a:ext uri="{28A0092B-C50C-407E-A947-70E740481C1C}">
-                          <a14:useLocalDpi xmlns:a14="http://schemas.microsoft.com/office/drawing/2010/main" val="0"/>
-                        </a:ext>
-                      </a:extLst>
-                    </a:blip>
-                    <a:stretch>
-                      <a:fillRect/>
-                    </a:stretch>
-                  </p:blipFill>
-                  <p:spPr>
-                    <a:xfrm>
-                      <a:off x="4690969" y="5623587"/>
-                      <a:ext cx="325640" cy="161565"/>
-                    </a:xfrm>
-                    <a:prstGeom prst="rect">
-                      <a:avLst/>
-                    </a:prstGeom>
-                  </p:spPr>
-                </p:pic>
-                <p:pic>
-                  <p:nvPicPr>
-                    <p:cNvPr id="14" name="Picture 13"/>
-                    <p:cNvPicPr>
-                      <a:picLocks noChangeAspect="1"/>
-                    </p:cNvPicPr>
-                    <p:nvPr/>
-                  </p:nvPicPr>
-                  <p:blipFill>
-                    <a:blip r:embed="rId5" cstate="print">
-                      <a:extLst>
-                        <a:ext uri="{28A0092B-C50C-407E-A947-70E740481C1C}">
-                          <a14:useLocalDpi xmlns:a14="http://schemas.microsoft.com/office/drawing/2010/main" val="0"/>
-                        </a:ext>
-                      </a:extLst>
-                    </a:blip>
-                    <a:stretch>
-                      <a:fillRect/>
-                    </a:stretch>
-                  </p:blipFill>
-                  <p:spPr>
-                    <a:xfrm>
-                      <a:off x="5178545" y="5585491"/>
-                      <a:ext cx="280633" cy="225596"/>
-                    </a:xfrm>
-                    <a:prstGeom prst="rect">
-                      <a:avLst/>
-                    </a:prstGeom>
-                  </p:spPr>
-                </p:pic>
-                <p:pic>
-                  <p:nvPicPr>
-                    <p:cNvPr id="15" name="Picture 14"/>
-                    <p:cNvPicPr>
-                      <a:picLocks noChangeAspect="1"/>
-                    </p:cNvPicPr>
-                    <p:nvPr/>
-                  </p:nvPicPr>
-                  <p:blipFill>
-                    <a:blip r:embed="rId6" cstate="print">
-                      <a:extLst>
-                        <a:ext uri="{28A0092B-C50C-407E-A947-70E740481C1C}">
-                          <a14:useLocalDpi xmlns:a14="http://schemas.microsoft.com/office/drawing/2010/main" val="0"/>
-                        </a:ext>
-                      </a:extLst>
-                    </a:blip>
-                    <a:stretch>
-                      <a:fillRect/>
-                    </a:stretch>
-                  </p:blipFill>
-                  <p:spPr>
-                    <a:xfrm>
-                      <a:off x="4258063" y="5579770"/>
-                      <a:ext cx="274386" cy="225596"/>
-                    </a:xfrm>
-                    <a:prstGeom prst="rect">
-                      <a:avLst/>
-                    </a:prstGeom>
-                  </p:spPr>
-                </p:pic>
-                <p:pic>
-                  <p:nvPicPr>
-                    <p:cNvPr id="16" name="Picture 15"/>
-                    <p:cNvPicPr>
-                      <a:picLocks noChangeAspect="1"/>
-                    </p:cNvPicPr>
-                    <p:nvPr/>
-                  </p:nvPicPr>
-                  <p:blipFill>
-                    <a:blip r:embed="rId7" cstate="print">
-                      <a:extLst>
-                        <a:ext uri="{28A0092B-C50C-407E-A947-70E740481C1C}">
-                          <a14:useLocalDpi xmlns:a14="http://schemas.microsoft.com/office/drawing/2010/main" val="0"/>
-                        </a:ext>
-                      </a:extLst>
-                    </a:blip>
-                    <a:stretch>
-                      <a:fillRect/>
-                    </a:stretch>
-                  </p:blipFill>
-                  <p:spPr>
-                    <a:xfrm flipH="1">
-                      <a:off x="6640808" y="5592592"/>
-                      <a:ext cx="255789" cy="218495"/>
-                    </a:xfrm>
-                    <a:prstGeom prst="rect">
-                      <a:avLst/>
-                    </a:prstGeom>
-                  </p:spPr>
-                </p:pic>
-              </p:grpSp>
               <p:pic>
                 <p:nvPicPr>
-                  <p:cNvPr id="12" name="Picture 11"/>
+                  <p:cNvPr id="13" name="Picture 12"/>
                   <p:cNvPicPr>
                     <a:picLocks noChangeAspect="1"/>
                   </p:cNvPicPr>
                   <p:nvPr/>
                 </p:nvPicPr>
                 <p:blipFill>
-                  <a:blip r:embed="rId8"/>
+                  <a:blip r:embed="rId4" cstate="print">
+                    <a:extLst>
+                      <a:ext uri="{28A0092B-C50C-407E-A947-70E740481C1C}">
+                        <a14:useLocalDpi xmlns:a14="http://schemas.microsoft.com/office/drawing/2010/main" val="0"/>
+                      </a:ext>
+                    </a:extLst>
+                  </a:blip>
                   <a:stretch>
                     <a:fillRect/>
                   </a:stretch>
                 </p:blipFill>
                 <p:spPr>
                   <a:xfrm>
-                    <a:off x="6895947" y="5589042"/>
-                    <a:ext cx="302061" cy="235941"/>
+                    <a:off x="4690969" y="5623587"/>
+                    <a:ext cx="325640" cy="161565"/>
+                  </a:xfrm>
+                  <a:prstGeom prst="rect">
+                    <a:avLst/>
+                  </a:prstGeom>
+                </p:spPr>
+              </p:pic>
+              <p:pic>
+                <p:nvPicPr>
+                  <p:cNvPr id="14" name="Picture 13"/>
+                  <p:cNvPicPr>
+                    <a:picLocks noChangeAspect="1"/>
+                  </p:cNvPicPr>
+                  <p:nvPr/>
+                </p:nvPicPr>
+                <p:blipFill>
+                  <a:blip r:embed="rId5" cstate="print">
+                    <a:extLst>
+                      <a:ext uri="{28A0092B-C50C-407E-A947-70E740481C1C}">
+                        <a14:useLocalDpi xmlns:a14="http://schemas.microsoft.com/office/drawing/2010/main" val="0"/>
+                      </a:ext>
+                    </a:extLst>
+                  </a:blip>
+                  <a:stretch>
+                    <a:fillRect/>
+                  </a:stretch>
+                </p:blipFill>
+                <p:spPr>
+                  <a:xfrm>
+                    <a:off x="5178545" y="5585491"/>
+                    <a:ext cx="280633" cy="225596"/>
+                  </a:xfrm>
+                  <a:prstGeom prst="rect">
+                    <a:avLst/>
+                  </a:prstGeom>
+                </p:spPr>
+              </p:pic>
+              <p:pic>
+                <p:nvPicPr>
+                  <p:cNvPr id="15" name="Picture 14"/>
+                  <p:cNvPicPr>
+                    <a:picLocks noChangeAspect="1"/>
+                  </p:cNvPicPr>
+                  <p:nvPr/>
+                </p:nvPicPr>
+                <p:blipFill>
+                  <a:blip r:embed="rId6" cstate="print">
+                    <a:extLst>
+                      <a:ext uri="{28A0092B-C50C-407E-A947-70E740481C1C}">
+                        <a14:useLocalDpi xmlns:a14="http://schemas.microsoft.com/office/drawing/2010/main" val="0"/>
+                      </a:ext>
+                    </a:extLst>
+                  </a:blip>
+                  <a:stretch>
+                    <a:fillRect/>
+                  </a:stretch>
+                </p:blipFill>
+                <p:spPr>
+                  <a:xfrm>
+                    <a:off x="4258063" y="5579770"/>
+                    <a:ext cx="274386" cy="225596"/>
+                  </a:xfrm>
+                  <a:prstGeom prst="rect">
+                    <a:avLst/>
+                  </a:prstGeom>
+                </p:spPr>
+              </p:pic>
+              <p:pic>
+                <p:nvPicPr>
+                  <p:cNvPr id="16" name="Picture 15"/>
+                  <p:cNvPicPr>
+                    <a:picLocks noChangeAspect="1"/>
+                  </p:cNvPicPr>
+                  <p:nvPr/>
+                </p:nvPicPr>
+                <p:blipFill>
+                  <a:blip r:embed="rId7" cstate="print">
+                    <a:extLst>
+                      <a:ext uri="{28A0092B-C50C-407E-A947-70E740481C1C}">
+                        <a14:useLocalDpi xmlns:a14="http://schemas.microsoft.com/office/drawing/2010/main" val="0"/>
+                      </a:ext>
+                    </a:extLst>
+                  </a:blip>
+                  <a:stretch>
+                    <a:fillRect/>
+                  </a:stretch>
+                </p:blipFill>
+                <p:spPr>
+                  <a:xfrm flipH="1">
+                    <a:off x="6640808" y="5592592"/>
+                    <a:ext cx="255789" cy="218495"/>
                   </a:xfrm>
                   <a:prstGeom prst="rect">
                     <a:avLst/>
@@ -6200,22 +6161,148 @@
             </p:grpSp>
             <p:pic>
               <p:nvPicPr>
-                <p:cNvPr id="9" name="Picture 8"/>
+                <p:cNvPr id="12" name="Picture 11"/>
                 <p:cNvPicPr>
                   <a:picLocks noChangeAspect="1"/>
                 </p:cNvPicPr>
                 <p:nvPr/>
               </p:nvPicPr>
               <p:blipFill>
-                <a:blip r:embed="rId9"/>
+                <a:blip r:embed="rId8"/>
                 <a:stretch>
                   <a:fillRect/>
                 </a:stretch>
               </p:blipFill>
               <p:spPr>
                 <a:xfrm>
-                  <a:off x="5470546" y="5589042"/>
-                  <a:ext cx="334903" cy="198223"/>
+                  <a:off x="6895947" y="5589042"/>
+                  <a:ext cx="302061" cy="235941"/>
+                </a:xfrm>
+                <a:prstGeom prst="rect">
+                  <a:avLst/>
+                </a:prstGeom>
+              </p:spPr>
+            </p:pic>
+          </p:grpSp>
+          <p:pic>
+            <p:nvPicPr>
+              <p:cNvPr id="9" name="Picture 8"/>
+              <p:cNvPicPr>
+                <a:picLocks noChangeAspect="1"/>
+              </p:cNvPicPr>
+              <p:nvPr/>
+            </p:nvPicPr>
+            <p:blipFill>
+              <a:blip r:embed="rId9"/>
+              <a:stretch>
+                <a:fillRect/>
+              </a:stretch>
+            </p:blipFill>
+            <p:spPr>
+              <a:xfrm>
+                <a:off x="5470546" y="5589042"/>
+                <a:ext cx="334903" cy="198223"/>
+              </a:xfrm>
+              <a:prstGeom prst="rect">
+                <a:avLst/>
+              </a:prstGeom>
+            </p:spPr>
+          </p:pic>
+          <p:pic>
+            <p:nvPicPr>
+              <p:cNvPr id="10" name="Picture 9"/>
+              <p:cNvPicPr>
+                <a:picLocks noChangeAspect="1"/>
+              </p:cNvPicPr>
+              <p:nvPr/>
+            </p:nvPicPr>
+            <p:blipFill>
+              <a:blip r:embed="rId10"/>
+              <a:stretch>
+                <a:fillRect/>
+              </a:stretch>
+            </p:blipFill>
+            <p:spPr>
+              <a:xfrm>
+                <a:off x="5942690" y="5606488"/>
+                <a:ext cx="327300" cy="196986"/>
+              </a:xfrm>
+              <a:prstGeom prst="rect">
+                <a:avLst/>
+              </a:prstGeom>
+            </p:spPr>
+          </p:pic>
+        </p:grpSp>
+        <p:grpSp>
+          <p:nvGrpSpPr>
+            <p:cNvPr id="23" name="Group 22"/>
+            <p:cNvGrpSpPr/>
+            <p:nvPr/>
+          </p:nvGrpSpPr>
+          <p:grpSpPr>
+            <a:xfrm>
+              <a:off x="7643151" y="5628981"/>
+              <a:ext cx="3201060" cy="408944"/>
+              <a:chOff x="7643151" y="5628981"/>
+              <a:chExt cx="3201060" cy="408944"/>
+            </a:xfrm>
+          </p:grpSpPr>
+          <p:pic>
+            <p:nvPicPr>
+              <p:cNvPr id="19" name="Picture 18"/>
+              <p:cNvPicPr>
+                <a:picLocks noChangeAspect="1"/>
+              </p:cNvPicPr>
+              <p:nvPr/>
+            </p:nvPicPr>
+            <p:blipFill>
+              <a:blip r:embed="rId11"/>
+              <a:stretch>
+                <a:fillRect/>
+              </a:stretch>
+            </p:blipFill>
+            <p:spPr>
+              <a:xfrm>
+                <a:off x="10188299" y="5635301"/>
+                <a:ext cx="655912" cy="396304"/>
+              </a:xfrm>
+              <a:prstGeom prst="rect">
+                <a:avLst/>
+              </a:prstGeom>
+            </p:spPr>
+          </p:pic>
+          <p:grpSp>
+            <p:nvGrpSpPr>
+              <p:cNvPr id="22" name="Group 21"/>
+              <p:cNvGrpSpPr/>
+              <p:nvPr/>
+            </p:nvGrpSpPr>
+            <p:grpSpPr>
+              <a:xfrm>
+                <a:off x="7643151" y="5628981"/>
+                <a:ext cx="1970903" cy="408944"/>
+                <a:chOff x="7643151" y="5628981"/>
+                <a:chExt cx="1970903" cy="408944"/>
+              </a:xfrm>
+            </p:grpSpPr>
+            <p:pic>
+              <p:nvPicPr>
+                <p:cNvPr id="20" name="Picture 19"/>
+                <p:cNvPicPr>
+                  <a:picLocks noChangeAspect="1"/>
+                </p:cNvPicPr>
+                <p:nvPr/>
+              </p:nvPicPr>
+              <p:blipFill>
+                <a:blip r:embed="rId12"/>
+                <a:stretch>
+                  <a:fillRect/>
+                </a:stretch>
+              </p:blipFill>
+              <p:spPr>
+                <a:xfrm>
+                  <a:off x="8885575" y="5689046"/>
+                  <a:ext cx="728479" cy="293882"/>
                 </a:xfrm>
                 <a:prstGeom prst="rect">
                   <a:avLst/>
@@ -6224,130 +6311,28 @@
             </p:pic>
             <p:pic>
               <p:nvPicPr>
-                <p:cNvPr id="10" name="Picture 9"/>
+                <p:cNvPr id="5" name="Picture 4"/>
                 <p:cNvPicPr>
                   <a:picLocks noChangeAspect="1"/>
                 </p:cNvPicPr>
                 <p:nvPr/>
               </p:nvPicPr>
               <p:blipFill>
-                <a:blip r:embed="rId10"/>
+                <a:blip r:embed="rId13"/>
                 <a:stretch>
                   <a:fillRect/>
                 </a:stretch>
               </p:blipFill>
               <p:spPr>
                 <a:xfrm>
-                  <a:off x="5942690" y="5606488"/>
-                  <a:ext cx="327300" cy="196986"/>
+                  <a:off x="7643151" y="5628981"/>
+                  <a:ext cx="640805" cy="408944"/>
                 </a:xfrm>
                 <a:prstGeom prst="rect">
                   <a:avLst/>
                 </a:prstGeom>
               </p:spPr>
             </p:pic>
-          </p:grpSp>
-          <p:grpSp>
-            <p:nvGrpSpPr>
-              <p:cNvPr id="23" name="Group 22"/>
-              <p:cNvGrpSpPr/>
-              <p:nvPr/>
-            </p:nvGrpSpPr>
-            <p:grpSpPr>
-              <a:xfrm>
-                <a:off x="7248182" y="5582091"/>
-                <a:ext cx="3201060" cy="408944"/>
-                <a:chOff x="7248182" y="5582091"/>
-                <a:chExt cx="3201060" cy="408944"/>
-              </a:xfrm>
-            </p:grpSpPr>
-            <p:pic>
-              <p:nvPicPr>
-                <p:cNvPr id="19" name="Picture 18"/>
-                <p:cNvPicPr>
-                  <a:picLocks noChangeAspect="1"/>
-                </p:cNvPicPr>
-                <p:nvPr/>
-              </p:nvPicPr>
-              <p:blipFill>
-                <a:blip r:embed="rId11"/>
-                <a:stretch>
-                  <a:fillRect/>
-                </a:stretch>
-              </p:blipFill>
-              <p:spPr>
-                <a:xfrm>
-                  <a:off x="9793330" y="5588411"/>
-                  <a:ext cx="655912" cy="396304"/>
-                </a:xfrm>
-                <a:prstGeom prst="rect">
-                  <a:avLst/>
-                </a:prstGeom>
-              </p:spPr>
-            </p:pic>
-            <p:grpSp>
-              <p:nvGrpSpPr>
-                <p:cNvPr id="22" name="Group 21"/>
-                <p:cNvGrpSpPr/>
-                <p:nvPr/>
-              </p:nvGrpSpPr>
-              <p:grpSpPr>
-                <a:xfrm>
-                  <a:off x="7248182" y="5582091"/>
-                  <a:ext cx="1970903" cy="408944"/>
-                  <a:chOff x="7248182" y="5582091"/>
-                  <a:chExt cx="1970903" cy="408944"/>
-                </a:xfrm>
-              </p:grpSpPr>
-              <p:pic>
-                <p:nvPicPr>
-                  <p:cNvPr id="20" name="Picture 19"/>
-                  <p:cNvPicPr>
-                    <a:picLocks noChangeAspect="1"/>
-                  </p:cNvPicPr>
-                  <p:nvPr/>
-                </p:nvPicPr>
-                <p:blipFill>
-                  <a:blip r:embed="rId12"/>
-                  <a:stretch>
-                    <a:fillRect/>
-                  </a:stretch>
-                </p:blipFill>
-                <p:spPr>
-                  <a:xfrm>
-                    <a:off x="8490606" y="5642156"/>
-                    <a:ext cx="728479" cy="293882"/>
-                  </a:xfrm>
-                  <a:prstGeom prst="rect">
-                    <a:avLst/>
-                  </a:prstGeom>
-                </p:spPr>
-              </p:pic>
-              <p:pic>
-                <p:nvPicPr>
-                  <p:cNvPr id="5" name="Picture 4"/>
-                  <p:cNvPicPr>
-                    <a:picLocks noChangeAspect="1"/>
-                  </p:cNvPicPr>
-                  <p:nvPr/>
-                </p:nvPicPr>
-                <p:blipFill>
-                  <a:blip r:embed="rId13"/>
-                  <a:stretch>
-                    <a:fillRect/>
-                  </a:stretch>
-                </p:blipFill>
-                <p:spPr>
-                  <a:xfrm>
-                    <a:off x="7248182" y="5582091"/>
-                    <a:ext cx="640805" cy="408944"/>
-                  </a:xfrm>
-                  <a:prstGeom prst="rect">
-                    <a:avLst/>
-                  </a:prstGeom>
-                </p:spPr>
-              </p:pic>
-            </p:grpSp>
           </p:grpSp>
         </p:grpSp>
       </p:grpSp>

</xml_diff>

<commit_message>
attempting to ID issue with elev
</commit_message>
<xml_diff>
--- a/output/plots/all_figs_with_legends.pptx
+++ b/output/plots/all_figs_with_legends.pptx
@@ -202,7 +202,7 @@
           <a:p>
             <a:fld id="{7FA21820-D199-4D82-91AF-C50B1D3B111A}" type="datetimeFigureOut">
               <a:rPr lang="en-US" smtClean="0"/>
-              <a:t>4/24/2017</a:t>
+              <a:t>4/25/2017</a:t>
             </a:fld>
             <a:endParaRPr lang="en-US"/>
           </a:p>
@@ -1035,7 +1035,7 @@
           <a:p>
             <a:fld id="{916B8C92-D5E3-4480-8685-D57BEE386DE2}" type="datetimeFigureOut">
               <a:rPr lang="en-US" smtClean="0"/>
-              <a:t>4/24/2017</a:t>
+              <a:t>4/25/2017</a:t>
             </a:fld>
             <a:endParaRPr lang="en-US"/>
           </a:p>
@@ -1205,7 +1205,7 @@
           <a:p>
             <a:fld id="{916B8C92-D5E3-4480-8685-D57BEE386DE2}" type="datetimeFigureOut">
               <a:rPr lang="en-US" smtClean="0"/>
-              <a:t>4/24/2017</a:t>
+              <a:t>4/25/2017</a:t>
             </a:fld>
             <a:endParaRPr lang="en-US"/>
           </a:p>
@@ -1385,7 +1385,7 @@
           <a:p>
             <a:fld id="{916B8C92-D5E3-4480-8685-D57BEE386DE2}" type="datetimeFigureOut">
               <a:rPr lang="en-US" smtClean="0"/>
-              <a:t>4/24/2017</a:t>
+              <a:t>4/25/2017</a:t>
             </a:fld>
             <a:endParaRPr lang="en-US"/>
           </a:p>
@@ -1555,7 +1555,7 @@
           <a:p>
             <a:fld id="{916B8C92-D5E3-4480-8685-D57BEE386DE2}" type="datetimeFigureOut">
               <a:rPr lang="en-US" smtClean="0"/>
-              <a:t>4/24/2017</a:t>
+              <a:t>4/25/2017</a:t>
             </a:fld>
             <a:endParaRPr lang="en-US"/>
           </a:p>
@@ -1801,7 +1801,7 @@
           <a:p>
             <a:fld id="{916B8C92-D5E3-4480-8685-D57BEE386DE2}" type="datetimeFigureOut">
               <a:rPr lang="en-US" smtClean="0"/>
-              <a:t>4/24/2017</a:t>
+              <a:t>4/25/2017</a:t>
             </a:fld>
             <a:endParaRPr lang="en-US"/>
           </a:p>
@@ -2033,7 +2033,7 @@
           <a:p>
             <a:fld id="{916B8C92-D5E3-4480-8685-D57BEE386DE2}" type="datetimeFigureOut">
               <a:rPr lang="en-US" smtClean="0"/>
-              <a:t>4/24/2017</a:t>
+              <a:t>4/25/2017</a:t>
             </a:fld>
             <a:endParaRPr lang="en-US"/>
           </a:p>
@@ -2400,7 +2400,7 @@
           <a:p>
             <a:fld id="{916B8C92-D5E3-4480-8685-D57BEE386DE2}" type="datetimeFigureOut">
               <a:rPr lang="en-US" smtClean="0"/>
-              <a:t>4/24/2017</a:t>
+              <a:t>4/25/2017</a:t>
             </a:fld>
             <a:endParaRPr lang="en-US"/>
           </a:p>
@@ -2518,7 +2518,7 @@
           <a:p>
             <a:fld id="{916B8C92-D5E3-4480-8685-D57BEE386DE2}" type="datetimeFigureOut">
               <a:rPr lang="en-US" smtClean="0"/>
-              <a:t>4/24/2017</a:t>
+              <a:t>4/25/2017</a:t>
             </a:fld>
             <a:endParaRPr lang="en-US"/>
           </a:p>
@@ -2613,7 +2613,7 @@
           <a:p>
             <a:fld id="{916B8C92-D5E3-4480-8685-D57BEE386DE2}" type="datetimeFigureOut">
               <a:rPr lang="en-US" smtClean="0"/>
-              <a:t>4/24/2017</a:t>
+              <a:t>4/25/2017</a:t>
             </a:fld>
             <a:endParaRPr lang="en-US"/>
           </a:p>
@@ -2890,7 +2890,7 @@
           <a:p>
             <a:fld id="{916B8C92-D5E3-4480-8685-D57BEE386DE2}" type="datetimeFigureOut">
               <a:rPr lang="en-US" smtClean="0"/>
-              <a:t>4/24/2017</a:t>
+              <a:t>4/25/2017</a:t>
             </a:fld>
             <a:endParaRPr lang="en-US"/>
           </a:p>
@@ -3143,7 +3143,7 @@
           <a:p>
             <a:fld id="{916B8C92-D5E3-4480-8685-D57BEE386DE2}" type="datetimeFigureOut">
               <a:rPr lang="en-US" smtClean="0"/>
-              <a:t>4/24/2017</a:t>
+              <a:t>4/25/2017</a:t>
             </a:fld>
             <a:endParaRPr lang="en-US"/>
           </a:p>
@@ -3356,7 +3356,7 @@
           <a:p>
             <a:fld id="{916B8C92-D5E3-4480-8685-D57BEE386DE2}" type="datetimeFigureOut">
               <a:rPr lang="en-US" smtClean="0"/>
-              <a:t>4/24/2017</a:t>
+              <a:t>4/25/2017</a:t>
             </a:fld>
             <a:endParaRPr lang="en-US"/>
           </a:p>

</xml_diff>

<commit_message>
created supplemental script to calc fig 3 and 4 at alt propOcc thresholds
</commit_message>
<xml_diff>
--- a/output/plots/all_figs_with_legends.pptx
+++ b/output/plots/all_figs_with_legends.pptx
@@ -202,7 +202,7 @@
           <a:p>
             <a:fld id="{7FA21820-D199-4D82-91AF-C50B1D3B111A}" type="datetimeFigureOut">
               <a:rPr lang="en-US" smtClean="0"/>
-              <a:t>4/25/2017</a:t>
+              <a:t>4/28/2017</a:t>
             </a:fld>
             <a:endParaRPr lang="en-US"/>
           </a:p>
@@ -1035,7 +1035,7 @@
           <a:p>
             <a:fld id="{916B8C92-D5E3-4480-8685-D57BEE386DE2}" type="datetimeFigureOut">
               <a:rPr lang="en-US" smtClean="0"/>
-              <a:t>4/25/2017</a:t>
+              <a:t>4/28/2017</a:t>
             </a:fld>
             <a:endParaRPr lang="en-US"/>
           </a:p>
@@ -1205,7 +1205,7 @@
           <a:p>
             <a:fld id="{916B8C92-D5E3-4480-8685-D57BEE386DE2}" type="datetimeFigureOut">
               <a:rPr lang="en-US" smtClean="0"/>
-              <a:t>4/25/2017</a:t>
+              <a:t>4/28/2017</a:t>
             </a:fld>
             <a:endParaRPr lang="en-US"/>
           </a:p>
@@ -1385,7 +1385,7 @@
           <a:p>
             <a:fld id="{916B8C92-D5E3-4480-8685-D57BEE386DE2}" type="datetimeFigureOut">
               <a:rPr lang="en-US" smtClean="0"/>
-              <a:t>4/25/2017</a:t>
+              <a:t>4/28/2017</a:t>
             </a:fld>
             <a:endParaRPr lang="en-US"/>
           </a:p>
@@ -1555,7 +1555,7 @@
           <a:p>
             <a:fld id="{916B8C92-D5E3-4480-8685-D57BEE386DE2}" type="datetimeFigureOut">
               <a:rPr lang="en-US" smtClean="0"/>
-              <a:t>4/25/2017</a:t>
+              <a:t>4/28/2017</a:t>
             </a:fld>
             <a:endParaRPr lang="en-US"/>
           </a:p>
@@ -1801,7 +1801,7 @@
           <a:p>
             <a:fld id="{916B8C92-D5E3-4480-8685-D57BEE386DE2}" type="datetimeFigureOut">
               <a:rPr lang="en-US" smtClean="0"/>
-              <a:t>4/25/2017</a:t>
+              <a:t>4/28/2017</a:t>
             </a:fld>
             <a:endParaRPr lang="en-US"/>
           </a:p>
@@ -2033,7 +2033,7 @@
           <a:p>
             <a:fld id="{916B8C92-D5E3-4480-8685-D57BEE386DE2}" type="datetimeFigureOut">
               <a:rPr lang="en-US" smtClean="0"/>
-              <a:t>4/25/2017</a:t>
+              <a:t>4/28/2017</a:t>
             </a:fld>
             <a:endParaRPr lang="en-US"/>
           </a:p>
@@ -2400,7 +2400,7 @@
           <a:p>
             <a:fld id="{916B8C92-D5E3-4480-8685-D57BEE386DE2}" type="datetimeFigureOut">
               <a:rPr lang="en-US" smtClean="0"/>
-              <a:t>4/25/2017</a:t>
+              <a:t>4/28/2017</a:t>
             </a:fld>
             <a:endParaRPr lang="en-US"/>
           </a:p>
@@ -2518,7 +2518,7 @@
           <a:p>
             <a:fld id="{916B8C92-D5E3-4480-8685-D57BEE386DE2}" type="datetimeFigureOut">
               <a:rPr lang="en-US" smtClean="0"/>
-              <a:t>4/25/2017</a:t>
+              <a:t>4/28/2017</a:t>
             </a:fld>
             <a:endParaRPr lang="en-US"/>
           </a:p>
@@ -2613,7 +2613,7 @@
           <a:p>
             <a:fld id="{916B8C92-D5E3-4480-8685-D57BEE386DE2}" type="datetimeFigureOut">
               <a:rPr lang="en-US" smtClean="0"/>
-              <a:t>4/25/2017</a:t>
+              <a:t>4/28/2017</a:t>
             </a:fld>
             <a:endParaRPr lang="en-US"/>
           </a:p>
@@ -2890,7 +2890,7 @@
           <a:p>
             <a:fld id="{916B8C92-D5E3-4480-8685-D57BEE386DE2}" type="datetimeFigureOut">
               <a:rPr lang="en-US" smtClean="0"/>
-              <a:t>4/25/2017</a:t>
+              <a:t>4/28/2017</a:t>
             </a:fld>
             <a:endParaRPr lang="en-US"/>
           </a:p>
@@ -3143,7 +3143,7 @@
           <a:p>
             <a:fld id="{916B8C92-D5E3-4480-8685-D57BEE386DE2}" type="datetimeFigureOut">
               <a:rPr lang="en-US" smtClean="0"/>
-              <a:t>4/25/2017</a:t>
+              <a:t>4/28/2017</a:t>
             </a:fld>
             <a:endParaRPr lang="en-US"/>
           </a:p>
@@ -3356,7 +3356,7 @@
           <a:p>
             <a:fld id="{916B8C92-D5E3-4480-8685-D57BEE386DE2}" type="datetimeFigureOut">
               <a:rPr lang="en-US" smtClean="0"/>
-              <a:t>4/25/2017</a:t>
+              <a:t>4/28/2017</a:t>
             </a:fld>
             <a:endParaRPr lang="en-US"/>
           </a:p>
@@ -6373,30 +6373,6 @@
           <a:chExt cx="0" cy="0"/>
         </a:xfrm>
       </p:grpSpPr>
-      <p:pic>
-        <p:nvPicPr>
-          <p:cNvPr id="3" name="Picture 2"/>
-          <p:cNvPicPr>
-            <a:picLocks noChangeAspect="1"/>
-          </p:cNvPicPr>
-          <p:nvPr/>
-        </p:nvPicPr>
-        <p:blipFill>
-          <a:blip r:embed="rId2"/>
-          <a:stretch>
-            <a:fillRect/>
-          </a:stretch>
-        </p:blipFill>
-        <p:spPr>
-          <a:xfrm>
-            <a:off x="2431973" y="131617"/>
-            <a:ext cx="6085173" cy="4865881"/>
-          </a:xfrm>
-          <a:prstGeom prst="rect">
-            <a:avLst/>
-          </a:prstGeom>
-        </p:spPr>
-      </p:pic>
       <p:sp>
         <p:nvSpPr>
           <p:cNvPr id="6" name="Rectangle 5"/>
@@ -6578,56 +6554,209 @@
       </p:sp>
       <p:grpSp>
         <p:nvGrpSpPr>
-          <p:cNvPr id="19" name="Group 18"/>
+          <p:cNvPr id="2" name="Group 1"/>
           <p:cNvGrpSpPr/>
           <p:nvPr/>
         </p:nvGrpSpPr>
         <p:grpSpPr>
           <a:xfrm>
-            <a:off x="3012760" y="4831134"/>
-            <a:ext cx="2279540" cy="281753"/>
-            <a:chOff x="2760297" y="6051268"/>
-            <a:chExt cx="2514388" cy="236612"/>
+            <a:off x="2431973" y="131617"/>
+            <a:ext cx="6085173" cy="5042934"/>
+            <a:chOff x="2431973" y="131617"/>
+            <a:chExt cx="6085173" cy="5042934"/>
           </a:xfrm>
         </p:grpSpPr>
+        <p:pic>
+          <p:nvPicPr>
+            <p:cNvPr id="3" name="Picture 2"/>
+            <p:cNvPicPr>
+              <a:picLocks noChangeAspect="1"/>
+            </p:cNvPicPr>
+            <p:nvPr/>
+          </p:nvPicPr>
+          <p:blipFill>
+            <a:blip r:embed="rId2"/>
+            <a:stretch>
+              <a:fillRect/>
+            </a:stretch>
+          </p:blipFill>
+          <p:spPr>
+            <a:xfrm>
+              <a:off x="2431973" y="131617"/>
+              <a:ext cx="6085173" cy="4865881"/>
+            </a:xfrm>
+            <a:prstGeom prst="rect">
+              <a:avLst/>
+            </a:prstGeom>
+          </p:spPr>
+        </p:pic>
         <p:grpSp>
           <p:nvGrpSpPr>
-            <p:cNvPr id="24" name="Group 23"/>
+            <p:cNvPr id="19" name="Group 18"/>
             <p:cNvGrpSpPr/>
             <p:nvPr/>
           </p:nvGrpSpPr>
           <p:grpSpPr>
             <a:xfrm>
-              <a:off x="2760297" y="6051268"/>
-              <a:ext cx="2514388" cy="236612"/>
-              <a:chOff x="2926296" y="6051268"/>
+              <a:off x="3012760" y="4831134"/>
+              <a:ext cx="2279540" cy="281753"/>
+              <a:chOff x="2760297" y="6051268"/>
               <a:chExt cx="2514388" cy="236612"/>
             </a:xfrm>
           </p:grpSpPr>
+          <p:grpSp>
+            <p:nvGrpSpPr>
+              <p:cNvPr id="24" name="Group 23"/>
+              <p:cNvGrpSpPr/>
+              <p:nvPr/>
+            </p:nvGrpSpPr>
+            <p:grpSpPr>
+              <a:xfrm>
+                <a:off x="2760297" y="6051268"/>
+                <a:ext cx="2514388" cy="236612"/>
+                <a:chOff x="2926296" y="6051268"/>
+                <a:chExt cx="2514388" cy="236612"/>
+              </a:xfrm>
+            </p:grpSpPr>
+            <p:pic>
+              <p:nvPicPr>
+                <p:cNvPr id="26" name="Picture 25"/>
+                <p:cNvPicPr>
+                  <a:picLocks noChangeAspect="1"/>
+                </p:cNvPicPr>
+                <p:nvPr/>
+              </p:nvPicPr>
+              <p:blipFill>
+                <a:blip r:embed="rId3" cstate="print">
+                  <a:extLst>
+                    <a:ext uri="{28A0092B-C50C-407E-A947-70E740481C1C}">
+                      <a14:useLocalDpi xmlns:a14="http://schemas.microsoft.com/office/drawing/2010/main" val="0"/>
+                    </a:ext>
+                  </a:extLst>
+                </a:blip>
+                <a:stretch>
+                  <a:fillRect/>
+                </a:stretch>
+              </p:blipFill>
+              <p:spPr>
+                <a:xfrm>
+                  <a:off x="3339990" y="6090606"/>
+                  <a:ext cx="325640" cy="161565"/>
+                </a:xfrm>
+                <a:prstGeom prst="rect">
+                  <a:avLst/>
+                </a:prstGeom>
+              </p:spPr>
+            </p:pic>
+            <p:pic>
+              <p:nvPicPr>
+                <p:cNvPr id="27" name="Picture 26"/>
+                <p:cNvPicPr>
+                  <a:picLocks noChangeAspect="1"/>
+                </p:cNvPicPr>
+                <p:nvPr/>
+              </p:nvPicPr>
+              <p:blipFill>
+                <a:blip r:embed="rId4" cstate="print">
+                  <a:extLst>
+                    <a:ext uri="{28A0092B-C50C-407E-A947-70E740481C1C}">
+                      <a14:useLocalDpi xmlns:a14="http://schemas.microsoft.com/office/drawing/2010/main" val="0"/>
+                    </a:ext>
+                  </a:extLst>
+                </a:blip>
+                <a:stretch>
+                  <a:fillRect/>
+                </a:stretch>
+              </p:blipFill>
+              <p:spPr>
+                <a:xfrm>
+                  <a:off x="3804938" y="6051268"/>
+                  <a:ext cx="280633" cy="225596"/>
+                </a:xfrm>
+                <a:prstGeom prst="rect">
+                  <a:avLst/>
+                </a:prstGeom>
+              </p:spPr>
+            </p:pic>
+            <p:pic>
+              <p:nvPicPr>
+                <p:cNvPr id="28" name="Picture 27"/>
+                <p:cNvPicPr>
+                  <a:picLocks noChangeAspect="1"/>
+                </p:cNvPicPr>
+                <p:nvPr/>
+              </p:nvPicPr>
+              <p:blipFill>
+                <a:blip r:embed="rId5" cstate="print">
+                  <a:extLst>
+                    <a:ext uri="{28A0092B-C50C-407E-A947-70E740481C1C}">
+                      <a14:useLocalDpi xmlns:a14="http://schemas.microsoft.com/office/drawing/2010/main" val="0"/>
+                    </a:ext>
+                  </a:extLst>
+                </a:blip>
+                <a:stretch>
+                  <a:fillRect/>
+                </a:stretch>
+              </p:blipFill>
+              <p:spPr>
+                <a:xfrm>
+                  <a:off x="2926296" y="6062284"/>
+                  <a:ext cx="274386" cy="225596"/>
+                </a:xfrm>
+                <a:prstGeom prst="rect">
+                  <a:avLst/>
+                </a:prstGeom>
+              </p:spPr>
+            </p:pic>
+            <p:pic>
+              <p:nvPicPr>
+                <p:cNvPr id="29" name="Picture 28"/>
+                <p:cNvPicPr>
+                  <a:picLocks noChangeAspect="1"/>
+                </p:cNvPicPr>
+                <p:nvPr/>
+              </p:nvPicPr>
+              <p:blipFill>
+                <a:blip r:embed="rId6" cstate="print">
+                  <a:extLst>
+                    <a:ext uri="{28A0092B-C50C-407E-A947-70E740481C1C}">
+                      <a14:useLocalDpi xmlns:a14="http://schemas.microsoft.com/office/drawing/2010/main" val="0"/>
+                    </a:ext>
+                  </a:extLst>
+                </a:blip>
+                <a:stretch>
+                  <a:fillRect/>
+                </a:stretch>
+              </p:blipFill>
+              <p:spPr>
+                <a:xfrm flipH="1">
+                  <a:off x="5184894" y="6062284"/>
+                  <a:ext cx="255790" cy="218495"/>
+                </a:xfrm>
+                <a:prstGeom prst="rect">
+                  <a:avLst/>
+                </a:prstGeom>
+              </p:spPr>
+            </p:pic>
+          </p:grpSp>
           <p:pic>
             <p:nvPicPr>
-              <p:cNvPr id="26" name="Picture 25"/>
+              <p:cNvPr id="22" name="Picture 21"/>
               <p:cNvPicPr>
                 <a:picLocks noChangeAspect="1"/>
               </p:cNvPicPr>
               <p:nvPr/>
             </p:nvPicPr>
             <p:blipFill>
-              <a:blip r:embed="rId3" cstate="print">
-                <a:extLst>
-                  <a:ext uri="{28A0092B-C50C-407E-A947-70E740481C1C}">
-                    <a14:useLocalDpi xmlns:a14="http://schemas.microsoft.com/office/drawing/2010/main" val="0"/>
-                  </a:ext>
-                </a:extLst>
-              </a:blip>
+              <a:blip r:embed="rId7"/>
               <a:stretch>
                 <a:fillRect/>
               </a:stretch>
             </p:blipFill>
             <p:spPr>
               <a:xfrm>
-                <a:off x="3339990" y="6090606"/>
-                <a:ext cx="325640" cy="161565"/>
+                <a:off x="4048209" y="6067448"/>
+                <a:ext cx="334902" cy="198223"/>
               </a:xfrm>
               <a:prstGeom prst="rect">
                 <a:avLst/>
@@ -6636,28 +6765,61 @@
           </p:pic>
           <p:pic>
             <p:nvPicPr>
-              <p:cNvPr id="27" name="Picture 26"/>
+              <p:cNvPr id="23" name="Picture 22"/>
               <p:cNvPicPr>
                 <a:picLocks noChangeAspect="1"/>
               </p:cNvPicPr>
               <p:nvPr/>
             </p:nvPicPr>
             <p:blipFill>
-              <a:blip r:embed="rId4" cstate="print">
-                <a:extLst>
-                  <a:ext uri="{28A0092B-C50C-407E-A947-70E740481C1C}">
-                    <a14:useLocalDpi xmlns:a14="http://schemas.microsoft.com/office/drawing/2010/main" val="0"/>
-                  </a:ext>
-                </a:extLst>
-              </a:blip>
+              <a:blip r:embed="rId8"/>
               <a:stretch>
                 <a:fillRect/>
               </a:stretch>
             </p:blipFill>
             <p:spPr>
               <a:xfrm>
-                <a:off x="3804938" y="6051268"/>
-                <a:ext cx="280633" cy="225596"/>
+                <a:off x="4490815" y="6064345"/>
+                <a:ext cx="327300" cy="196986"/>
+              </a:xfrm>
+              <a:prstGeom prst="rect">
+                <a:avLst/>
+              </a:prstGeom>
+            </p:spPr>
+          </p:pic>
+        </p:grpSp>
+        <p:grpSp>
+          <p:nvGrpSpPr>
+            <p:cNvPr id="16" name="Group 15"/>
+            <p:cNvGrpSpPr/>
+            <p:nvPr/>
+          </p:nvGrpSpPr>
+          <p:grpSpPr>
+            <a:xfrm>
+              <a:off x="6155681" y="4850311"/>
+              <a:ext cx="2164195" cy="324240"/>
+              <a:chOff x="2148779" y="1657738"/>
+              <a:chExt cx="2931901" cy="414033"/>
+            </a:xfrm>
+          </p:grpSpPr>
+          <p:pic>
+            <p:nvPicPr>
+              <p:cNvPr id="17" name="Picture 16"/>
+              <p:cNvPicPr>
+                <a:picLocks noChangeAspect="1"/>
+              </p:cNvPicPr>
+              <p:nvPr/>
+            </p:nvPicPr>
+            <p:blipFill>
+              <a:blip r:embed="rId9"/>
+              <a:stretch>
+                <a:fillRect/>
+              </a:stretch>
+            </p:blipFill>
+            <p:spPr>
+              <a:xfrm>
+                <a:off x="2148779" y="1657738"/>
+                <a:ext cx="655912" cy="396304"/>
               </a:xfrm>
               <a:prstGeom prst="rect">
                 <a:avLst/>
@@ -6666,28 +6828,22 @@
           </p:pic>
           <p:pic>
             <p:nvPicPr>
-              <p:cNvPr id="28" name="Picture 27"/>
+              <p:cNvPr id="18" name="Picture 17"/>
               <p:cNvPicPr>
                 <a:picLocks noChangeAspect="1"/>
               </p:cNvPicPr>
               <p:nvPr/>
             </p:nvPicPr>
             <p:blipFill>
-              <a:blip r:embed="rId5" cstate="print">
-                <a:extLst>
-                  <a:ext uri="{28A0092B-C50C-407E-A947-70E740481C1C}">
-                    <a14:useLocalDpi xmlns:a14="http://schemas.microsoft.com/office/drawing/2010/main" val="0"/>
-                  </a:ext>
-                </a:extLst>
-              </a:blip>
+              <a:blip r:embed="rId10"/>
               <a:stretch>
                 <a:fillRect/>
               </a:stretch>
             </p:blipFill>
             <p:spPr>
               <a:xfrm>
-                <a:off x="2926296" y="6062284"/>
-                <a:ext cx="274386" cy="225596"/>
+                <a:off x="3258043" y="1708949"/>
+                <a:ext cx="728479" cy="293882"/>
               </a:xfrm>
               <a:prstGeom prst="rect">
                 <a:avLst/>
@@ -6696,28 +6852,22 @@
           </p:pic>
           <p:pic>
             <p:nvPicPr>
-              <p:cNvPr id="29" name="Picture 28"/>
+              <p:cNvPr id="20" name="Picture 19"/>
               <p:cNvPicPr>
                 <a:picLocks noChangeAspect="1"/>
               </p:cNvPicPr>
               <p:nvPr/>
             </p:nvPicPr>
             <p:blipFill>
-              <a:blip r:embed="rId6" cstate="print">
-                <a:extLst>
-                  <a:ext uri="{28A0092B-C50C-407E-A947-70E740481C1C}">
-                    <a14:useLocalDpi xmlns:a14="http://schemas.microsoft.com/office/drawing/2010/main" val="0"/>
-                  </a:ext>
-                </a:extLst>
-              </a:blip>
+              <a:blip r:embed="rId11"/>
               <a:stretch>
                 <a:fillRect/>
               </a:stretch>
             </p:blipFill>
             <p:spPr>
-              <a:xfrm flipH="1">
-                <a:off x="5184894" y="6062284"/>
-                <a:ext cx="255790" cy="218495"/>
+              <a:xfrm>
+                <a:off x="4439875" y="1662829"/>
+                <a:ext cx="640805" cy="408942"/>
               </a:xfrm>
               <a:prstGeom prst="rect">
                 <a:avLst/>
@@ -6725,141 +6875,6 @@
             </p:spPr>
           </p:pic>
         </p:grpSp>
-        <p:pic>
-          <p:nvPicPr>
-            <p:cNvPr id="22" name="Picture 21"/>
-            <p:cNvPicPr>
-              <a:picLocks noChangeAspect="1"/>
-            </p:cNvPicPr>
-            <p:nvPr/>
-          </p:nvPicPr>
-          <p:blipFill>
-            <a:blip r:embed="rId7"/>
-            <a:stretch>
-              <a:fillRect/>
-            </a:stretch>
-          </p:blipFill>
-          <p:spPr>
-            <a:xfrm>
-              <a:off x="4048209" y="6067448"/>
-              <a:ext cx="334902" cy="198223"/>
-            </a:xfrm>
-            <a:prstGeom prst="rect">
-              <a:avLst/>
-            </a:prstGeom>
-          </p:spPr>
-        </p:pic>
-        <p:pic>
-          <p:nvPicPr>
-            <p:cNvPr id="23" name="Picture 22"/>
-            <p:cNvPicPr>
-              <a:picLocks noChangeAspect="1"/>
-            </p:cNvPicPr>
-            <p:nvPr/>
-          </p:nvPicPr>
-          <p:blipFill>
-            <a:blip r:embed="rId8"/>
-            <a:stretch>
-              <a:fillRect/>
-            </a:stretch>
-          </p:blipFill>
-          <p:spPr>
-            <a:xfrm>
-              <a:off x="4490815" y="6064345"/>
-              <a:ext cx="327300" cy="196986"/>
-            </a:xfrm>
-            <a:prstGeom prst="rect">
-              <a:avLst/>
-            </a:prstGeom>
-          </p:spPr>
-        </p:pic>
-      </p:grpSp>
-      <p:grpSp>
-        <p:nvGrpSpPr>
-          <p:cNvPr id="16" name="Group 15"/>
-          <p:cNvGrpSpPr/>
-          <p:nvPr/>
-        </p:nvGrpSpPr>
-        <p:grpSpPr>
-          <a:xfrm>
-            <a:off x="6155681" y="4824124"/>
-            <a:ext cx="2160055" cy="336541"/>
-            <a:chOff x="2148779" y="1624301"/>
-            <a:chExt cx="2926292" cy="429741"/>
-          </a:xfrm>
-        </p:grpSpPr>
-        <p:pic>
-          <p:nvPicPr>
-            <p:cNvPr id="17" name="Picture 16"/>
-            <p:cNvPicPr>
-              <a:picLocks noChangeAspect="1"/>
-            </p:cNvPicPr>
-            <p:nvPr/>
-          </p:nvPicPr>
-          <p:blipFill>
-            <a:blip r:embed="rId9"/>
-            <a:stretch>
-              <a:fillRect/>
-            </a:stretch>
-          </p:blipFill>
-          <p:spPr>
-            <a:xfrm>
-              <a:off x="2148779" y="1657738"/>
-              <a:ext cx="655912" cy="396304"/>
-            </a:xfrm>
-            <a:prstGeom prst="rect">
-              <a:avLst/>
-            </a:prstGeom>
-          </p:spPr>
-        </p:pic>
-        <p:pic>
-          <p:nvPicPr>
-            <p:cNvPr id="18" name="Picture 17"/>
-            <p:cNvPicPr>
-              <a:picLocks noChangeAspect="1"/>
-            </p:cNvPicPr>
-            <p:nvPr/>
-          </p:nvPicPr>
-          <p:blipFill>
-            <a:blip r:embed="rId10"/>
-            <a:stretch>
-              <a:fillRect/>
-            </a:stretch>
-          </p:blipFill>
-          <p:spPr>
-            <a:xfrm>
-              <a:off x="3258043" y="1708949"/>
-              <a:ext cx="728479" cy="293882"/>
-            </a:xfrm>
-            <a:prstGeom prst="rect">
-              <a:avLst/>
-            </a:prstGeom>
-          </p:spPr>
-        </p:pic>
-        <p:pic>
-          <p:nvPicPr>
-            <p:cNvPr id="20" name="Picture 19"/>
-            <p:cNvPicPr>
-              <a:picLocks noChangeAspect="1"/>
-            </p:cNvPicPr>
-            <p:nvPr/>
-          </p:nvPicPr>
-          <p:blipFill>
-            <a:blip r:embed="rId11"/>
-            <a:stretch>
-              <a:fillRect/>
-            </a:stretch>
-          </p:blipFill>
-          <p:spPr>
-            <a:xfrm>
-              <a:off x="4434266" y="1624301"/>
-              <a:ext cx="640805" cy="408942"/>
-            </a:xfrm>
-            <a:prstGeom prst="rect">
-              <a:avLst/>
-            </a:prstGeom>
-          </p:spPr>
-        </p:pic>
       </p:grpSp>
     </p:spTree>
     <p:extLst>

</xml_diff>

<commit_message>
first draft of new fig 1 schematic
</commit_message>
<xml_diff>
--- a/output/plots/all_figs_with_legends.pptx
+++ b/output/plots/all_figs_with_legends.pptx
@@ -5,15 +5,16 @@
     <p:sldMasterId id="2147483648" r:id="rId1"/>
   </p:sldMasterIdLst>
   <p:notesMasterIdLst>
-    <p:notesMasterId r:id="rId8"/>
+    <p:notesMasterId r:id="rId9"/>
   </p:notesMasterIdLst>
   <p:sldIdLst>
     <p:sldId id="258" r:id="rId2"/>
-    <p:sldId id="257" r:id="rId3"/>
-    <p:sldId id="260" r:id="rId4"/>
-    <p:sldId id="262" r:id="rId5"/>
-    <p:sldId id="261" r:id="rId6"/>
-    <p:sldId id="256" r:id="rId7"/>
+    <p:sldId id="263" r:id="rId3"/>
+    <p:sldId id="257" r:id="rId4"/>
+    <p:sldId id="260" r:id="rId5"/>
+    <p:sldId id="262" r:id="rId6"/>
+    <p:sldId id="261" r:id="rId7"/>
+    <p:sldId id="256" r:id="rId8"/>
   </p:sldIdLst>
   <p:sldSz cx="12192000" cy="6858000"/>
   <p:notesSz cx="6858000" cy="9144000"/>
@@ -202,7 +203,7 @@
           <a:p>
             <a:fld id="{7FA21820-D199-4D82-91AF-C50B1D3B111A}" type="datetimeFigureOut">
               <a:rPr lang="en-US" smtClean="0"/>
-              <a:t>4/28/2017</a:t>
+              <a:t>5/1/2017</a:t>
             </a:fld>
             <a:endParaRPr lang="en-US"/>
           </a:p>
@@ -797,7 +798,7 @@
           <a:p>
             <a:fld id="{0160E3DB-BCAB-42BD-8DDD-04198F92E62D}" type="slidenum">
               <a:rPr lang="en-US" smtClean="0"/>
-              <a:t>2</a:t>
+              <a:t>3</a:t>
             </a:fld>
             <a:endParaRPr lang="en-US"/>
           </a:p>
@@ -885,7 +886,7 @@
           <a:p>
             <a:fld id="{0160E3DB-BCAB-42BD-8DDD-04198F92E62D}" type="slidenum">
               <a:rPr lang="en-US" smtClean="0"/>
-              <a:t>3</a:t>
+              <a:t>4</a:t>
             </a:fld>
             <a:endParaRPr lang="en-US"/>
           </a:p>
@@ -1035,7 +1036,7 @@
           <a:p>
             <a:fld id="{916B8C92-D5E3-4480-8685-D57BEE386DE2}" type="datetimeFigureOut">
               <a:rPr lang="en-US" smtClean="0"/>
-              <a:t>4/28/2017</a:t>
+              <a:t>5/1/2017</a:t>
             </a:fld>
             <a:endParaRPr lang="en-US"/>
           </a:p>
@@ -1205,7 +1206,7 @@
           <a:p>
             <a:fld id="{916B8C92-D5E3-4480-8685-D57BEE386DE2}" type="datetimeFigureOut">
               <a:rPr lang="en-US" smtClean="0"/>
-              <a:t>4/28/2017</a:t>
+              <a:t>5/1/2017</a:t>
             </a:fld>
             <a:endParaRPr lang="en-US"/>
           </a:p>
@@ -1385,7 +1386,7 @@
           <a:p>
             <a:fld id="{916B8C92-D5E3-4480-8685-D57BEE386DE2}" type="datetimeFigureOut">
               <a:rPr lang="en-US" smtClean="0"/>
-              <a:t>4/28/2017</a:t>
+              <a:t>5/1/2017</a:t>
             </a:fld>
             <a:endParaRPr lang="en-US"/>
           </a:p>
@@ -1555,7 +1556,7 @@
           <a:p>
             <a:fld id="{916B8C92-D5E3-4480-8685-D57BEE386DE2}" type="datetimeFigureOut">
               <a:rPr lang="en-US" smtClean="0"/>
-              <a:t>4/28/2017</a:t>
+              <a:t>5/1/2017</a:t>
             </a:fld>
             <a:endParaRPr lang="en-US"/>
           </a:p>
@@ -1801,7 +1802,7 @@
           <a:p>
             <a:fld id="{916B8C92-D5E3-4480-8685-D57BEE386DE2}" type="datetimeFigureOut">
               <a:rPr lang="en-US" smtClean="0"/>
-              <a:t>4/28/2017</a:t>
+              <a:t>5/1/2017</a:t>
             </a:fld>
             <a:endParaRPr lang="en-US"/>
           </a:p>
@@ -2033,7 +2034,7 @@
           <a:p>
             <a:fld id="{916B8C92-D5E3-4480-8685-D57BEE386DE2}" type="datetimeFigureOut">
               <a:rPr lang="en-US" smtClean="0"/>
-              <a:t>4/28/2017</a:t>
+              <a:t>5/1/2017</a:t>
             </a:fld>
             <a:endParaRPr lang="en-US"/>
           </a:p>
@@ -2400,7 +2401,7 @@
           <a:p>
             <a:fld id="{916B8C92-D5E3-4480-8685-D57BEE386DE2}" type="datetimeFigureOut">
               <a:rPr lang="en-US" smtClean="0"/>
-              <a:t>4/28/2017</a:t>
+              <a:t>5/1/2017</a:t>
             </a:fld>
             <a:endParaRPr lang="en-US"/>
           </a:p>
@@ -2518,7 +2519,7 @@
           <a:p>
             <a:fld id="{916B8C92-D5E3-4480-8685-D57BEE386DE2}" type="datetimeFigureOut">
               <a:rPr lang="en-US" smtClean="0"/>
-              <a:t>4/28/2017</a:t>
+              <a:t>5/1/2017</a:t>
             </a:fld>
             <a:endParaRPr lang="en-US"/>
           </a:p>
@@ -2613,7 +2614,7 @@
           <a:p>
             <a:fld id="{916B8C92-D5E3-4480-8685-D57BEE386DE2}" type="datetimeFigureOut">
               <a:rPr lang="en-US" smtClean="0"/>
-              <a:t>4/28/2017</a:t>
+              <a:t>5/1/2017</a:t>
             </a:fld>
             <a:endParaRPr lang="en-US"/>
           </a:p>
@@ -2890,7 +2891,7 @@
           <a:p>
             <a:fld id="{916B8C92-D5E3-4480-8685-D57BEE386DE2}" type="datetimeFigureOut">
               <a:rPr lang="en-US" smtClean="0"/>
-              <a:t>4/28/2017</a:t>
+              <a:t>5/1/2017</a:t>
             </a:fld>
             <a:endParaRPr lang="en-US"/>
           </a:p>
@@ -3143,7 +3144,7 @@
           <a:p>
             <a:fld id="{916B8C92-D5E3-4480-8685-D57BEE386DE2}" type="datetimeFigureOut">
               <a:rPr lang="en-US" smtClean="0"/>
-              <a:t>4/28/2017</a:t>
+              <a:t>5/1/2017</a:t>
             </a:fld>
             <a:endParaRPr lang="en-US"/>
           </a:p>
@@ -3356,7 +3357,7 @@
           <a:p>
             <a:fld id="{916B8C92-D5E3-4480-8685-D57BEE386DE2}" type="datetimeFigureOut">
               <a:rPr lang="en-US" smtClean="0"/>
-              <a:t>4/28/2017</a:t>
+              <a:t>5/1/2017</a:t>
             </a:fld>
             <a:endParaRPr lang="en-US"/>
           </a:p>
@@ -4716,6 +4717,3930 @@
           <a:chExt cx="0" cy="0"/>
         </a:xfrm>
       </p:grpSpPr>
+      <p:sp>
+        <p:nvSpPr>
+          <p:cNvPr id="2" name="Title 1"/>
+          <p:cNvSpPr>
+            <a:spLocks noGrp="1"/>
+          </p:cNvSpPr>
+          <p:nvPr>
+            <p:ph type="title"/>
+          </p:nvPr>
+        </p:nvSpPr>
+        <p:spPr>
+          <a:xfrm>
+            <a:off x="7882128" y="125730"/>
+            <a:ext cx="4203192" cy="1042416"/>
+          </a:xfrm>
+        </p:spPr>
+        <p:txBody>
+          <a:bodyPr>
+            <a:normAutofit fontScale="90000"/>
+          </a:bodyPr>
+          <a:lstStyle/>
+          <a:p>
+            <a:r>
+              <a:rPr lang="en-US" dirty="0" smtClean="0"/>
+              <a:t>6 panel conceptual figure</a:t>
+            </a:r>
+            <a:endParaRPr lang="en-US" dirty="0"/>
+          </a:p>
+        </p:txBody>
+      </p:sp>
+      <p:sp>
+        <p:nvSpPr>
+          <p:cNvPr id="4" name="Rectangle 3"/>
+          <p:cNvSpPr/>
+          <p:nvPr/>
+        </p:nvSpPr>
+        <p:spPr>
+          <a:xfrm>
+            <a:off x="182880" y="105918"/>
+            <a:ext cx="3441192" cy="2124456"/>
+          </a:xfrm>
+          <a:prstGeom prst="rect">
+            <a:avLst/>
+          </a:prstGeom>
+          <a:noFill/>
+          <a:ln>
+            <a:solidFill>
+              <a:schemeClr val="tx1"/>
+            </a:solidFill>
+          </a:ln>
+        </p:spPr>
+        <p:style>
+          <a:lnRef idx="2">
+            <a:schemeClr val="accent1">
+              <a:shade val="50000"/>
+            </a:schemeClr>
+          </a:lnRef>
+          <a:fillRef idx="1">
+            <a:schemeClr val="accent1"/>
+          </a:fillRef>
+          <a:effectRef idx="0">
+            <a:schemeClr val="accent1"/>
+          </a:effectRef>
+          <a:fontRef idx="minor">
+            <a:schemeClr val="lt1"/>
+          </a:fontRef>
+        </p:style>
+        <p:txBody>
+          <a:bodyPr rtlCol="0" anchor="ctr"/>
+          <a:lstStyle/>
+          <a:p>
+            <a:pPr algn="ctr"/>
+            <a:endParaRPr lang="en-US"/>
+          </a:p>
+        </p:txBody>
+      </p:sp>
+      <p:sp>
+        <p:nvSpPr>
+          <p:cNvPr id="5" name="Rectangle 4"/>
+          <p:cNvSpPr/>
+          <p:nvPr/>
+        </p:nvSpPr>
+        <p:spPr>
+          <a:xfrm>
+            <a:off x="3709416" y="105918"/>
+            <a:ext cx="3441192" cy="2124456"/>
+          </a:xfrm>
+          <a:prstGeom prst="rect">
+            <a:avLst/>
+          </a:prstGeom>
+          <a:noFill/>
+          <a:ln>
+            <a:solidFill>
+              <a:schemeClr val="tx1"/>
+            </a:solidFill>
+          </a:ln>
+        </p:spPr>
+        <p:style>
+          <a:lnRef idx="2">
+            <a:schemeClr val="accent1">
+              <a:shade val="50000"/>
+            </a:schemeClr>
+          </a:lnRef>
+          <a:fillRef idx="1">
+            <a:schemeClr val="accent1"/>
+          </a:fillRef>
+          <a:effectRef idx="0">
+            <a:schemeClr val="accent1"/>
+          </a:effectRef>
+          <a:fontRef idx="minor">
+            <a:schemeClr val="lt1"/>
+          </a:fontRef>
+        </p:style>
+        <p:txBody>
+          <a:bodyPr rtlCol="0" anchor="ctr"/>
+          <a:lstStyle/>
+          <a:p>
+            <a:pPr algn="ctr"/>
+            <a:endParaRPr lang="en-US"/>
+          </a:p>
+        </p:txBody>
+      </p:sp>
+      <p:sp>
+        <p:nvSpPr>
+          <p:cNvPr id="6" name="Rectangle 5"/>
+          <p:cNvSpPr/>
+          <p:nvPr/>
+        </p:nvSpPr>
+        <p:spPr>
+          <a:xfrm>
+            <a:off x="182880" y="4518659"/>
+            <a:ext cx="3441192" cy="2124456"/>
+          </a:xfrm>
+          <a:prstGeom prst="rect">
+            <a:avLst/>
+          </a:prstGeom>
+          <a:noFill/>
+          <a:ln>
+            <a:solidFill>
+              <a:schemeClr val="tx1"/>
+            </a:solidFill>
+          </a:ln>
+        </p:spPr>
+        <p:style>
+          <a:lnRef idx="2">
+            <a:schemeClr val="accent1">
+              <a:shade val="50000"/>
+            </a:schemeClr>
+          </a:lnRef>
+          <a:fillRef idx="1">
+            <a:schemeClr val="accent1"/>
+          </a:fillRef>
+          <a:effectRef idx="0">
+            <a:schemeClr val="accent1"/>
+          </a:effectRef>
+          <a:fontRef idx="minor">
+            <a:schemeClr val="lt1"/>
+          </a:fontRef>
+        </p:style>
+        <p:txBody>
+          <a:bodyPr rtlCol="0" anchor="ctr"/>
+          <a:lstStyle/>
+          <a:p>
+            <a:pPr algn="ctr"/>
+            <a:endParaRPr lang="en-US"/>
+          </a:p>
+        </p:txBody>
+      </p:sp>
+      <p:sp>
+        <p:nvSpPr>
+          <p:cNvPr id="7" name="Rectangle 6"/>
+          <p:cNvSpPr/>
+          <p:nvPr/>
+        </p:nvSpPr>
+        <p:spPr>
+          <a:xfrm>
+            <a:off x="3709416" y="4518659"/>
+            <a:ext cx="3441192" cy="2124456"/>
+          </a:xfrm>
+          <a:prstGeom prst="rect">
+            <a:avLst/>
+          </a:prstGeom>
+          <a:noFill/>
+          <a:ln>
+            <a:solidFill>
+              <a:schemeClr val="tx1"/>
+            </a:solidFill>
+          </a:ln>
+        </p:spPr>
+        <p:style>
+          <a:lnRef idx="2">
+            <a:schemeClr val="accent1">
+              <a:shade val="50000"/>
+            </a:schemeClr>
+          </a:lnRef>
+          <a:fillRef idx="1">
+            <a:schemeClr val="accent1"/>
+          </a:fillRef>
+          <a:effectRef idx="0">
+            <a:schemeClr val="accent1"/>
+          </a:effectRef>
+          <a:fontRef idx="minor">
+            <a:schemeClr val="lt1"/>
+          </a:fontRef>
+        </p:style>
+        <p:txBody>
+          <a:bodyPr rtlCol="0" anchor="ctr"/>
+          <a:lstStyle/>
+          <a:p>
+            <a:pPr algn="ctr"/>
+            <a:endParaRPr lang="en-US"/>
+          </a:p>
+        </p:txBody>
+      </p:sp>
+      <p:sp>
+        <p:nvSpPr>
+          <p:cNvPr id="8" name="Rectangle 7"/>
+          <p:cNvSpPr/>
+          <p:nvPr/>
+        </p:nvSpPr>
+        <p:spPr>
+          <a:xfrm>
+            <a:off x="182880" y="2304668"/>
+            <a:ext cx="3441192" cy="2124456"/>
+          </a:xfrm>
+          <a:prstGeom prst="rect">
+            <a:avLst/>
+          </a:prstGeom>
+          <a:noFill/>
+          <a:ln>
+            <a:solidFill>
+              <a:schemeClr val="tx1"/>
+            </a:solidFill>
+          </a:ln>
+        </p:spPr>
+        <p:style>
+          <a:lnRef idx="2">
+            <a:schemeClr val="accent1">
+              <a:shade val="50000"/>
+            </a:schemeClr>
+          </a:lnRef>
+          <a:fillRef idx="1">
+            <a:schemeClr val="accent1"/>
+          </a:fillRef>
+          <a:effectRef idx="0">
+            <a:schemeClr val="accent1"/>
+          </a:effectRef>
+          <a:fontRef idx="minor">
+            <a:schemeClr val="lt1"/>
+          </a:fontRef>
+        </p:style>
+        <p:txBody>
+          <a:bodyPr rtlCol="0" anchor="ctr"/>
+          <a:lstStyle/>
+          <a:p>
+            <a:pPr algn="ctr"/>
+            <a:endParaRPr lang="en-US"/>
+          </a:p>
+        </p:txBody>
+      </p:sp>
+      <p:sp>
+        <p:nvSpPr>
+          <p:cNvPr id="9" name="Rectangle 8"/>
+          <p:cNvSpPr/>
+          <p:nvPr/>
+        </p:nvSpPr>
+        <p:spPr>
+          <a:xfrm>
+            <a:off x="3709416" y="2304668"/>
+            <a:ext cx="3441192" cy="2124456"/>
+          </a:xfrm>
+          <a:prstGeom prst="rect">
+            <a:avLst/>
+          </a:prstGeom>
+          <a:noFill/>
+          <a:ln>
+            <a:solidFill>
+              <a:schemeClr val="tx1"/>
+            </a:solidFill>
+          </a:ln>
+        </p:spPr>
+        <p:style>
+          <a:lnRef idx="2">
+            <a:schemeClr val="accent1">
+              <a:shade val="50000"/>
+            </a:schemeClr>
+          </a:lnRef>
+          <a:fillRef idx="1">
+            <a:schemeClr val="accent1"/>
+          </a:fillRef>
+          <a:effectRef idx="0">
+            <a:schemeClr val="accent1"/>
+          </a:effectRef>
+          <a:fontRef idx="minor">
+            <a:schemeClr val="lt1"/>
+          </a:fontRef>
+        </p:style>
+        <p:txBody>
+          <a:bodyPr rtlCol="0" anchor="ctr"/>
+          <a:lstStyle/>
+          <a:p>
+            <a:pPr algn="ctr"/>
+            <a:endParaRPr lang="en-US"/>
+          </a:p>
+        </p:txBody>
+      </p:sp>
+      <p:sp>
+        <p:nvSpPr>
+          <p:cNvPr id="10" name="Freeform 9"/>
+          <p:cNvSpPr/>
+          <p:nvPr/>
+        </p:nvSpPr>
+        <p:spPr>
+          <a:xfrm>
+            <a:off x="408432" y="180544"/>
+            <a:ext cx="2935224" cy="1975203"/>
+          </a:xfrm>
+          <a:custGeom>
+            <a:avLst/>
+            <a:gdLst>
+              <a:gd name="connsiteX0" fmla="*/ 0 w 2770632"/>
+              <a:gd name="connsiteY0" fmla="*/ 0 h 1874619"/>
+              <a:gd name="connsiteX1" fmla="*/ 438912 w 2770632"/>
+              <a:gd name="connsiteY1" fmla="*/ 1627632 h 1874619"/>
+              <a:gd name="connsiteX2" fmla="*/ 2231136 w 2770632"/>
+              <a:gd name="connsiteY2" fmla="*/ 1700784 h 1874619"/>
+              <a:gd name="connsiteX3" fmla="*/ 2770632 w 2770632"/>
+              <a:gd name="connsiteY3" fmla="*/ 9144 h 1874619"/>
+            </a:gdLst>
+            <a:ahLst/>
+            <a:cxnLst>
+              <a:cxn ang="0">
+                <a:pos x="connsiteX0" y="connsiteY0"/>
+              </a:cxn>
+              <a:cxn ang="0">
+                <a:pos x="connsiteX1" y="connsiteY1"/>
+              </a:cxn>
+              <a:cxn ang="0">
+                <a:pos x="connsiteX2" y="connsiteY2"/>
+              </a:cxn>
+              <a:cxn ang="0">
+                <a:pos x="connsiteX3" y="connsiteY3"/>
+              </a:cxn>
+            </a:cxnLst>
+            <a:rect l="l" t="t" r="r" b="b"/>
+            <a:pathLst>
+              <a:path w="2770632" h="1874619">
+                <a:moveTo>
+                  <a:pt x="0" y="0"/>
+                </a:moveTo>
+                <a:cubicBezTo>
+                  <a:pt x="33528" y="672084"/>
+                  <a:pt x="67056" y="1344168"/>
+                  <a:pt x="438912" y="1627632"/>
+                </a:cubicBezTo>
+                <a:cubicBezTo>
+                  <a:pt x="810768" y="1911096"/>
+                  <a:pt x="1842516" y="1970532"/>
+                  <a:pt x="2231136" y="1700784"/>
+                </a:cubicBezTo>
+                <a:cubicBezTo>
+                  <a:pt x="2619756" y="1431036"/>
+                  <a:pt x="2695194" y="720090"/>
+                  <a:pt x="2770632" y="9144"/>
+                </a:cubicBezTo>
+              </a:path>
+            </a:pathLst>
+          </a:custGeom>
+          <a:noFill/>
+          <a:ln w="38100">
+            <a:solidFill>
+              <a:schemeClr val="tx1"/>
+            </a:solidFill>
+          </a:ln>
+        </p:spPr>
+        <p:style>
+          <a:lnRef idx="2">
+            <a:schemeClr val="accent1">
+              <a:shade val="50000"/>
+            </a:schemeClr>
+          </a:lnRef>
+          <a:fillRef idx="1">
+            <a:schemeClr val="accent1"/>
+          </a:fillRef>
+          <a:effectRef idx="0">
+            <a:schemeClr val="accent1"/>
+          </a:effectRef>
+          <a:fontRef idx="minor">
+            <a:schemeClr val="lt1"/>
+          </a:fontRef>
+        </p:style>
+        <p:txBody>
+          <a:bodyPr rtlCol="0" anchor="ctr"/>
+          <a:lstStyle/>
+          <a:p>
+            <a:pPr algn="ctr"/>
+            <a:endParaRPr lang="en-US"/>
+          </a:p>
+        </p:txBody>
+      </p:sp>
+      <p:sp>
+        <p:nvSpPr>
+          <p:cNvPr id="13" name="TextBox 12"/>
+          <p:cNvSpPr txBox="1"/>
+          <p:nvPr/>
+        </p:nvSpPr>
+        <p:spPr>
+          <a:xfrm>
+            <a:off x="2662428" y="1954293"/>
+            <a:ext cx="1101852" cy="246221"/>
+          </a:xfrm>
+          <a:prstGeom prst="rect">
+            <a:avLst/>
+          </a:prstGeom>
+          <a:noFill/>
+        </p:spPr>
+        <p:txBody>
+          <a:bodyPr wrap="square" rtlCol="0">
+            <a:spAutoFit/>
+          </a:bodyPr>
+          <a:lstStyle/>
+          <a:p>
+            <a:r>
+              <a:rPr lang="en-US" sz="1000" dirty="0" smtClean="0"/>
+              <a:t>High occupancy</a:t>
+            </a:r>
+            <a:endParaRPr lang="en-US" sz="1000" dirty="0"/>
+          </a:p>
+        </p:txBody>
+      </p:sp>
+      <p:sp>
+        <p:nvSpPr>
+          <p:cNvPr id="14" name="TextBox 13"/>
+          <p:cNvSpPr txBox="1"/>
+          <p:nvPr/>
+        </p:nvSpPr>
+        <p:spPr>
+          <a:xfrm>
+            <a:off x="128016" y="1949150"/>
+            <a:ext cx="1101852" cy="246221"/>
+          </a:xfrm>
+          <a:prstGeom prst="rect">
+            <a:avLst/>
+          </a:prstGeom>
+          <a:noFill/>
+        </p:spPr>
+        <p:txBody>
+          <a:bodyPr wrap="square" rtlCol="0">
+            <a:spAutoFit/>
+          </a:bodyPr>
+          <a:lstStyle/>
+          <a:p>
+            <a:r>
+              <a:rPr lang="en-US" sz="1000" dirty="0" smtClean="0"/>
+              <a:t>Low occupancy</a:t>
+            </a:r>
+            <a:endParaRPr lang="en-US" sz="1000" dirty="0"/>
+          </a:p>
+        </p:txBody>
+      </p:sp>
+      <p:sp>
+        <p:nvSpPr>
+          <p:cNvPr id="15" name="TextBox 14"/>
+          <p:cNvSpPr txBox="1"/>
+          <p:nvPr/>
+        </p:nvSpPr>
+        <p:spPr>
+          <a:xfrm>
+            <a:off x="4306824" y="512064"/>
+            <a:ext cx="2157984" cy="646331"/>
+          </a:xfrm>
+          <a:prstGeom prst="rect">
+            <a:avLst/>
+          </a:prstGeom>
+          <a:noFill/>
+        </p:spPr>
+        <p:txBody>
+          <a:bodyPr wrap="square" rtlCol="0">
+            <a:spAutoFit/>
+          </a:bodyPr>
+          <a:lstStyle/>
+          <a:p>
+            <a:r>
+              <a:rPr lang="en-US" dirty="0" err="1" smtClean="0"/>
+              <a:t>Magurran</a:t>
+            </a:r>
+            <a:r>
+              <a:rPr lang="en-US" dirty="0" smtClean="0"/>
+              <a:t> and Henderson </a:t>
+            </a:r>
+            <a:r>
+              <a:rPr lang="en-US" dirty="0" err="1" smtClean="0"/>
+              <a:t>hists</a:t>
+            </a:r>
+            <a:endParaRPr lang="en-US" dirty="0"/>
+          </a:p>
+        </p:txBody>
+      </p:sp>
+      <p:sp>
+        <p:nvSpPr>
+          <p:cNvPr id="19" name="Isosceles Triangle 18"/>
+          <p:cNvSpPr/>
+          <p:nvPr/>
+        </p:nvSpPr>
+        <p:spPr>
+          <a:xfrm>
+            <a:off x="5635752" y="5487190"/>
+            <a:ext cx="180746" cy="153690"/>
+          </a:xfrm>
+          <a:prstGeom prst="triangle">
+            <a:avLst/>
+          </a:prstGeom>
+          <a:solidFill>
+            <a:srgbClr val="FF9900"/>
+          </a:solidFill>
+          <a:ln>
+            <a:solidFill>
+              <a:srgbClr val="FF9900"/>
+            </a:solidFill>
+          </a:ln>
+        </p:spPr>
+        <p:style>
+          <a:lnRef idx="2">
+            <a:schemeClr val="accent1">
+              <a:shade val="50000"/>
+            </a:schemeClr>
+          </a:lnRef>
+          <a:fillRef idx="1">
+            <a:schemeClr val="accent1"/>
+          </a:fillRef>
+          <a:effectRef idx="0">
+            <a:schemeClr val="accent1"/>
+          </a:effectRef>
+          <a:fontRef idx="minor">
+            <a:schemeClr val="lt1"/>
+          </a:fontRef>
+        </p:style>
+        <p:txBody>
+          <a:bodyPr rtlCol="0" anchor="ctr"/>
+          <a:lstStyle/>
+          <a:p>
+            <a:pPr algn="ctr"/>
+            <a:endParaRPr lang="en-US"/>
+          </a:p>
+        </p:txBody>
+      </p:sp>
+      <p:sp>
+        <p:nvSpPr>
+          <p:cNvPr id="20" name="Moon 19"/>
+          <p:cNvSpPr/>
+          <p:nvPr/>
+        </p:nvSpPr>
+        <p:spPr>
+          <a:xfrm>
+            <a:off x="4268114" y="4815195"/>
+            <a:ext cx="98450" cy="153690"/>
+          </a:xfrm>
+          <a:prstGeom prst="moon">
+            <a:avLst/>
+          </a:prstGeom>
+          <a:solidFill>
+            <a:srgbClr val="C00000"/>
+          </a:solidFill>
+          <a:ln>
+            <a:solidFill>
+              <a:srgbClr val="C00000"/>
+            </a:solidFill>
+          </a:ln>
+        </p:spPr>
+        <p:style>
+          <a:lnRef idx="2">
+            <a:schemeClr val="accent1">
+              <a:shade val="50000"/>
+            </a:schemeClr>
+          </a:lnRef>
+          <a:fillRef idx="1">
+            <a:schemeClr val="accent1"/>
+          </a:fillRef>
+          <a:effectRef idx="0">
+            <a:schemeClr val="accent1"/>
+          </a:effectRef>
+          <a:fontRef idx="minor">
+            <a:schemeClr val="lt1"/>
+          </a:fontRef>
+        </p:style>
+        <p:txBody>
+          <a:bodyPr rtlCol="0" anchor="ctr"/>
+          <a:lstStyle/>
+          <a:p>
+            <a:pPr algn="ctr"/>
+            <a:endParaRPr lang="en-US"/>
+          </a:p>
+        </p:txBody>
+      </p:sp>
+      <p:sp>
+        <p:nvSpPr>
+          <p:cNvPr id="22" name="Flowchart: Connector 21"/>
+          <p:cNvSpPr/>
+          <p:nvPr/>
+        </p:nvSpPr>
+        <p:spPr>
+          <a:xfrm>
+            <a:off x="5061812" y="5361431"/>
+            <a:ext cx="187452" cy="153690"/>
+          </a:xfrm>
+          <a:prstGeom prst="flowChartConnector">
+            <a:avLst/>
+          </a:prstGeom>
+          <a:solidFill>
+            <a:srgbClr val="7030A0"/>
+          </a:solidFill>
+          <a:ln>
+            <a:solidFill>
+              <a:srgbClr val="7030A0"/>
+            </a:solidFill>
+          </a:ln>
+        </p:spPr>
+        <p:style>
+          <a:lnRef idx="2">
+            <a:schemeClr val="accent1">
+              <a:shade val="50000"/>
+            </a:schemeClr>
+          </a:lnRef>
+          <a:fillRef idx="1">
+            <a:schemeClr val="accent1"/>
+          </a:fillRef>
+          <a:effectRef idx="0">
+            <a:schemeClr val="accent1"/>
+          </a:effectRef>
+          <a:fontRef idx="minor">
+            <a:schemeClr val="lt1"/>
+          </a:fontRef>
+        </p:style>
+        <p:txBody>
+          <a:bodyPr rtlCol="0" anchor="ctr"/>
+          <a:lstStyle/>
+          <a:p>
+            <a:pPr algn="ctr"/>
+            <a:endParaRPr lang="en-US"/>
+          </a:p>
+        </p:txBody>
+      </p:sp>
+      <p:sp>
+        <p:nvSpPr>
+          <p:cNvPr id="27" name="Diamond 26"/>
+          <p:cNvSpPr/>
+          <p:nvPr/>
+        </p:nvSpPr>
+        <p:spPr>
+          <a:xfrm>
+            <a:off x="5861304" y="5023104"/>
+            <a:ext cx="237744" cy="219456"/>
+          </a:xfrm>
+          <a:prstGeom prst="diamond">
+            <a:avLst/>
+          </a:prstGeom>
+          <a:solidFill>
+            <a:schemeClr val="accent6">
+              <a:lumMod val="60000"/>
+              <a:lumOff val="40000"/>
+            </a:schemeClr>
+          </a:solidFill>
+          <a:ln>
+            <a:solidFill>
+              <a:schemeClr val="accent6">
+                <a:lumMod val="60000"/>
+                <a:lumOff val="40000"/>
+              </a:schemeClr>
+            </a:solidFill>
+          </a:ln>
+        </p:spPr>
+        <p:style>
+          <a:lnRef idx="2">
+            <a:schemeClr val="accent1">
+              <a:shade val="50000"/>
+            </a:schemeClr>
+          </a:lnRef>
+          <a:fillRef idx="1">
+            <a:schemeClr val="accent1"/>
+          </a:fillRef>
+          <a:effectRef idx="0">
+            <a:schemeClr val="accent1"/>
+          </a:effectRef>
+          <a:fontRef idx="minor">
+            <a:schemeClr val="lt1"/>
+          </a:fontRef>
+        </p:style>
+        <p:txBody>
+          <a:bodyPr rtlCol="0" anchor="ctr"/>
+          <a:lstStyle/>
+          <a:p>
+            <a:pPr algn="ctr"/>
+            <a:endParaRPr lang="en-US"/>
+          </a:p>
+        </p:txBody>
+      </p:sp>
+      <p:sp>
+        <p:nvSpPr>
+          <p:cNvPr id="28" name="Diamond 27"/>
+          <p:cNvSpPr/>
+          <p:nvPr/>
+        </p:nvSpPr>
+        <p:spPr>
+          <a:xfrm>
+            <a:off x="4709160" y="6025896"/>
+            <a:ext cx="237744" cy="219456"/>
+          </a:xfrm>
+          <a:prstGeom prst="diamond">
+            <a:avLst/>
+          </a:prstGeom>
+          <a:solidFill>
+            <a:schemeClr val="accent6">
+              <a:lumMod val="60000"/>
+              <a:lumOff val="40000"/>
+            </a:schemeClr>
+          </a:solidFill>
+          <a:ln>
+            <a:solidFill>
+              <a:schemeClr val="accent6">
+                <a:lumMod val="60000"/>
+                <a:lumOff val="40000"/>
+              </a:schemeClr>
+            </a:solidFill>
+          </a:ln>
+        </p:spPr>
+        <p:style>
+          <a:lnRef idx="2">
+            <a:schemeClr val="accent1">
+              <a:shade val="50000"/>
+            </a:schemeClr>
+          </a:lnRef>
+          <a:fillRef idx="1">
+            <a:schemeClr val="accent1"/>
+          </a:fillRef>
+          <a:effectRef idx="0">
+            <a:schemeClr val="accent1"/>
+          </a:effectRef>
+          <a:fontRef idx="minor">
+            <a:schemeClr val="lt1"/>
+          </a:fontRef>
+        </p:style>
+        <p:txBody>
+          <a:bodyPr rtlCol="0" anchor="ctr"/>
+          <a:lstStyle/>
+          <a:p>
+            <a:pPr algn="ctr"/>
+            <a:endParaRPr lang="en-US"/>
+          </a:p>
+        </p:txBody>
+      </p:sp>
+      <p:sp>
+        <p:nvSpPr>
+          <p:cNvPr id="30" name="Diamond 29"/>
+          <p:cNvSpPr/>
+          <p:nvPr/>
+        </p:nvSpPr>
+        <p:spPr>
+          <a:xfrm>
+            <a:off x="4303776" y="5242560"/>
+            <a:ext cx="237744" cy="219456"/>
+          </a:xfrm>
+          <a:prstGeom prst="diamond">
+            <a:avLst/>
+          </a:prstGeom>
+          <a:solidFill>
+            <a:schemeClr val="accent6">
+              <a:lumMod val="60000"/>
+              <a:lumOff val="40000"/>
+            </a:schemeClr>
+          </a:solidFill>
+          <a:ln>
+            <a:solidFill>
+              <a:schemeClr val="accent6">
+                <a:lumMod val="60000"/>
+                <a:lumOff val="40000"/>
+              </a:schemeClr>
+            </a:solidFill>
+          </a:ln>
+        </p:spPr>
+        <p:style>
+          <a:lnRef idx="2">
+            <a:schemeClr val="accent1">
+              <a:shade val="50000"/>
+            </a:schemeClr>
+          </a:lnRef>
+          <a:fillRef idx="1">
+            <a:schemeClr val="accent1"/>
+          </a:fillRef>
+          <a:effectRef idx="0">
+            <a:schemeClr val="accent1"/>
+          </a:effectRef>
+          <a:fontRef idx="minor">
+            <a:schemeClr val="lt1"/>
+          </a:fontRef>
+        </p:style>
+        <p:txBody>
+          <a:bodyPr rtlCol="0" anchor="ctr"/>
+          <a:lstStyle/>
+          <a:p>
+            <a:pPr algn="ctr"/>
+            <a:endParaRPr lang="en-US"/>
+          </a:p>
+        </p:txBody>
+      </p:sp>
+      <p:sp>
+        <p:nvSpPr>
+          <p:cNvPr id="33" name="Diamond 32"/>
+          <p:cNvSpPr/>
+          <p:nvPr/>
+        </p:nvSpPr>
+        <p:spPr>
+          <a:xfrm>
+            <a:off x="6464808" y="4639701"/>
+            <a:ext cx="237744" cy="219456"/>
+          </a:xfrm>
+          <a:prstGeom prst="diamond">
+            <a:avLst/>
+          </a:prstGeom>
+          <a:solidFill>
+            <a:schemeClr val="accent6">
+              <a:lumMod val="60000"/>
+              <a:lumOff val="40000"/>
+            </a:schemeClr>
+          </a:solidFill>
+          <a:ln>
+            <a:solidFill>
+              <a:schemeClr val="accent6">
+                <a:lumMod val="60000"/>
+                <a:lumOff val="40000"/>
+              </a:schemeClr>
+            </a:solidFill>
+          </a:ln>
+        </p:spPr>
+        <p:style>
+          <a:lnRef idx="2">
+            <a:schemeClr val="accent1">
+              <a:shade val="50000"/>
+            </a:schemeClr>
+          </a:lnRef>
+          <a:fillRef idx="1">
+            <a:schemeClr val="accent1"/>
+          </a:fillRef>
+          <a:effectRef idx="0">
+            <a:schemeClr val="accent1"/>
+          </a:effectRef>
+          <a:fontRef idx="minor">
+            <a:schemeClr val="lt1"/>
+          </a:fontRef>
+        </p:style>
+        <p:txBody>
+          <a:bodyPr rtlCol="0" anchor="ctr"/>
+          <a:lstStyle/>
+          <a:p>
+            <a:pPr algn="ctr"/>
+            <a:endParaRPr lang="en-US"/>
+          </a:p>
+        </p:txBody>
+      </p:sp>
+      <p:sp>
+        <p:nvSpPr>
+          <p:cNvPr id="35" name="5-Point Star 34"/>
+          <p:cNvSpPr/>
+          <p:nvPr/>
+        </p:nvSpPr>
+        <p:spPr>
+          <a:xfrm>
+            <a:off x="4133392" y="5833109"/>
+            <a:ext cx="229514" cy="219456"/>
+          </a:xfrm>
+          <a:prstGeom prst="star5">
+            <a:avLst/>
+          </a:prstGeom>
+          <a:solidFill>
+            <a:schemeClr val="accent4"/>
+          </a:solidFill>
+          <a:ln>
+            <a:solidFill>
+              <a:schemeClr val="accent4"/>
+            </a:solidFill>
+          </a:ln>
+        </p:spPr>
+        <p:style>
+          <a:lnRef idx="2">
+            <a:schemeClr val="accent1">
+              <a:shade val="50000"/>
+            </a:schemeClr>
+          </a:lnRef>
+          <a:fillRef idx="1">
+            <a:schemeClr val="accent1"/>
+          </a:fillRef>
+          <a:effectRef idx="0">
+            <a:schemeClr val="accent1"/>
+          </a:effectRef>
+          <a:fontRef idx="minor">
+            <a:schemeClr val="lt1"/>
+          </a:fontRef>
+        </p:style>
+        <p:txBody>
+          <a:bodyPr rtlCol="0" anchor="ctr"/>
+          <a:lstStyle/>
+          <a:p>
+            <a:pPr algn="ctr"/>
+            <a:endParaRPr lang="en-US"/>
+          </a:p>
+        </p:txBody>
+      </p:sp>
+      <p:sp>
+        <p:nvSpPr>
+          <p:cNvPr id="36" name="Moon 35"/>
+          <p:cNvSpPr/>
+          <p:nvPr/>
+        </p:nvSpPr>
+        <p:spPr>
+          <a:xfrm>
+            <a:off x="5238900" y="5842487"/>
+            <a:ext cx="98450" cy="153690"/>
+          </a:xfrm>
+          <a:prstGeom prst="moon">
+            <a:avLst/>
+          </a:prstGeom>
+          <a:solidFill>
+            <a:srgbClr val="C00000"/>
+          </a:solidFill>
+          <a:ln>
+            <a:solidFill>
+              <a:srgbClr val="C00000"/>
+            </a:solidFill>
+          </a:ln>
+        </p:spPr>
+        <p:style>
+          <a:lnRef idx="2">
+            <a:schemeClr val="accent1">
+              <a:shade val="50000"/>
+            </a:schemeClr>
+          </a:lnRef>
+          <a:fillRef idx="1">
+            <a:schemeClr val="accent1"/>
+          </a:fillRef>
+          <a:effectRef idx="0">
+            <a:schemeClr val="accent1"/>
+          </a:effectRef>
+          <a:fontRef idx="minor">
+            <a:schemeClr val="lt1"/>
+          </a:fontRef>
+        </p:style>
+        <p:txBody>
+          <a:bodyPr rtlCol="0" anchor="ctr"/>
+          <a:lstStyle/>
+          <a:p>
+            <a:pPr algn="ctr"/>
+            <a:endParaRPr lang="en-US"/>
+          </a:p>
+        </p:txBody>
+      </p:sp>
+      <p:sp>
+        <p:nvSpPr>
+          <p:cNvPr id="37" name="Flowchart: Connector 36"/>
+          <p:cNvSpPr/>
+          <p:nvPr/>
+        </p:nvSpPr>
+        <p:spPr>
+          <a:xfrm>
+            <a:off x="5829300" y="4716545"/>
+            <a:ext cx="187452" cy="153690"/>
+          </a:xfrm>
+          <a:prstGeom prst="flowChartConnector">
+            <a:avLst/>
+          </a:prstGeom>
+          <a:solidFill>
+            <a:srgbClr val="7030A0"/>
+          </a:solidFill>
+          <a:ln>
+            <a:solidFill>
+              <a:srgbClr val="7030A0"/>
+            </a:solidFill>
+          </a:ln>
+        </p:spPr>
+        <p:style>
+          <a:lnRef idx="2">
+            <a:schemeClr val="accent1">
+              <a:shade val="50000"/>
+            </a:schemeClr>
+          </a:lnRef>
+          <a:fillRef idx="1">
+            <a:schemeClr val="accent1"/>
+          </a:fillRef>
+          <a:effectRef idx="0">
+            <a:schemeClr val="accent1"/>
+          </a:effectRef>
+          <a:fontRef idx="minor">
+            <a:schemeClr val="lt1"/>
+          </a:fontRef>
+        </p:style>
+        <p:txBody>
+          <a:bodyPr rtlCol="0" anchor="ctr"/>
+          <a:lstStyle/>
+          <a:p>
+            <a:pPr algn="ctr"/>
+            <a:endParaRPr lang="en-US"/>
+          </a:p>
+        </p:txBody>
+      </p:sp>
+      <p:sp>
+        <p:nvSpPr>
+          <p:cNvPr id="39" name="Flowchart: Connector 38"/>
+          <p:cNvSpPr/>
+          <p:nvPr/>
+        </p:nvSpPr>
+        <p:spPr>
+          <a:xfrm>
+            <a:off x="5673852" y="6192889"/>
+            <a:ext cx="187452" cy="153690"/>
+          </a:xfrm>
+          <a:prstGeom prst="flowChartConnector">
+            <a:avLst/>
+          </a:prstGeom>
+          <a:solidFill>
+            <a:srgbClr val="7030A0"/>
+          </a:solidFill>
+          <a:ln>
+            <a:solidFill>
+              <a:srgbClr val="7030A0"/>
+            </a:solidFill>
+          </a:ln>
+        </p:spPr>
+        <p:style>
+          <a:lnRef idx="2">
+            <a:schemeClr val="accent1">
+              <a:shade val="50000"/>
+            </a:schemeClr>
+          </a:lnRef>
+          <a:fillRef idx="1">
+            <a:schemeClr val="accent1"/>
+          </a:fillRef>
+          <a:effectRef idx="0">
+            <a:schemeClr val="accent1"/>
+          </a:effectRef>
+          <a:fontRef idx="minor">
+            <a:schemeClr val="lt1"/>
+          </a:fontRef>
+        </p:style>
+        <p:txBody>
+          <a:bodyPr rtlCol="0" anchor="ctr"/>
+          <a:lstStyle/>
+          <a:p>
+            <a:pPr algn="ctr"/>
+            <a:endParaRPr lang="en-US"/>
+          </a:p>
+        </p:txBody>
+      </p:sp>
+      <p:sp>
+        <p:nvSpPr>
+          <p:cNvPr id="43" name="Rectangle 42"/>
+          <p:cNvSpPr/>
+          <p:nvPr/>
+        </p:nvSpPr>
+        <p:spPr>
+          <a:xfrm>
+            <a:off x="6461150" y="5765642"/>
+            <a:ext cx="164592" cy="153690"/>
+          </a:xfrm>
+          <a:prstGeom prst="rect">
+            <a:avLst/>
+          </a:prstGeom>
+          <a:solidFill>
+            <a:schemeClr val="accent1">
+              <a:lumMod val="75000"/>
+            </a:schemeClr>
+          </a:solidFill>
+          <a:ln>
+            <a:solidFill>
+              <a:schemeClr val="accent1">
+                <a:lumMod val="75000"/>
+              </a:schemeClr>
+            </a:solidFill>
+          </a:ln>
+        </p:spPr>
+        <p:style>
+          <a:lnRef idx="2">
+            <a:schemeClr val="accent1">
+              <a:shade val="50000"/>
+            </a:schemeClr>
+          </a:lnRef>
+          <a:fillRef idx="1">
+            <a:schemeClr val="accent1"/>
+          </a:fillRef>
+          <a:effectRef idx="0">
+            <a:schemeClr val="accent1"/>
+          </a:effectRef>
+          <a:fontRef idx="minor">
+            <a:schemeClr val="lt1"/>
+          </a:fontRef>
+        </p:style>
+        <p:txBody>
+          <a:bodyPr rtlCol="0" anchor="ctr"/>
+          <a:lstStyle/>
+          <a:p>
+            <a:pPr algn="ctr"/>
+            <a:endParaRPr lang="en-US"/>
+          </a:p>
+        </p:txBody>
+      </p:sp>
+      <p:sp>
+        <p:nvSpPr>
+          <p:cNvPr id="44" name="Rectangle 43"/>
+          <p:cNvSpPr/>
+          <p:nvPr/>
+        </p:nvSpPr>
+        <p:spPr>
+          <a:xfrm>
+            <a:off x="4943246" y="4839431"/>
+            <a:ext cx="164592" cy="153690"/>
+          </a:xfrm>
+          <a:prstGeom prst="rect">
+            <a:avLst/>
+          </a:prstGeom>
+          <a:solidFill>
+            <a:schemeClr val="accent1">
+              <a:lumMod val="75000"/>
+            </a:schemeClr>
+          </a:solidFill>
+          <a:ln>
+            <a:solidFill>
+              <a:schemeClr val="accent1">
+                <a:lumMod val="75000"/>
+              </a:schemeClr>
+            </a:solidFill>
+          </a:ln>
+        </p:spPr>
+        <p:style>
+          <a:lnRef idx="2">
+            <a:schemeClr val="accent1">
+              <a:shade val="50000"/>
+            </a:schemeClr>
+          </a:lnRef>
+          <a:fillRef idx="1">
+            <a:schemeClr val="accent1"/>
+          </a:fillRef>
+          <a:effectRef idx="0">
+            <a:schemeClr val="accent1"/>
+          </a:effectRef>
+          <a:fontRef idx="minor">
+            <a:schemeClr val="lt1"/>
+          </a:fontRef>
+        </p:style>
+        <p:txBody>
+          <a:bodyPr rtlCol="0" anchor="ctr"/>
+          <a:lstStyle/>
+          <a:p>
+            <a:pPr algn="ctr"/>
+            <a:endParaRPr lang="en-US"/>
+          </a:p>
+        </p:txBody>
+      </p:sp>
+      <p:sp>
+        <p:nvSpPr>
+          <p:cNvPr id="46" name="TextBox 45"/>
+          <p:cNvSpPr txBox="1"/>
+          <p:nvPr/>
+        </p:nvSpPr>
+        <p:spPr>
+          <a:xfrm>
+            <a:off x="2932938" y="6296786"/>
+            <a:ext cx="1000201" cy="369332"/>
+          </a:xfrm>
+          <a:prstGeom prst="rect">
+            <a:avLst/>
+          </a:prstGeom>
+          <a:noFill/>
+        </p:spPr>
+        <p:txBody>
+          <a:bodyPr wrap="square" rtlCol="0">
+            <a:spAutoFit/>
+          </a:bodyPr>
+          <a:lstStyle/>
+          <a:p>
+            <a:r>
+              <a:rPr lang="en-US" dirty="0" smtClean="0"/>
+              <a:t>N = 5</a:t>
+            </a:r>
+            <a:endParaRPr lang="en-US" dirty="0"/>
+          </a:p>
+        </p:txBody>
+      </p:sp>
+      <p:sp>
+        <p:nvSpPr>
+          <p:cNvPr id="47" name="TextBox 46"/>
+          <p:cNvSpPr txBox="1"/>
+          <p:nvPr/>
+        </p:nvSpPr>
+        <p:spPr>
+          <a:xfrm>
+            <a:off x="6461150" y="6273783"/>
+            <a:ext cx="1000201" cy="369332"/>
+          </a:xfrm>
+          <a:prstGeom prst="rect">
+            <a:avLst/>
+          </a:prstGeom>
+          <a:noFill/>
+        </p:spPr>
+        <p:txBody>
+          <a:bodyPr wrap="square" rtlCol="0">
+            <a:spAutoFit/>
+          </a:bodyPr>
+          <a:lstStyle/>
+          <a:p>
+            <a:r>
+              <a:rPr lang="en-US" dirty="0" smtClean="0"/>
+              <a:t>N = 6</a:t>
+            </a:r>
+            <a:endParaRPr lang="en-US" dirty="0"/>
+          </a:p>
+        </p:txBody>
+      </p:sp>
+      <p:graphicFrame>
+        <p:nvGraphicFramePr>
+          <p:cNvPr id="50" name="Table 49"/>
+          <p:cNvGraphicFramePr>
+            <a:graphicFrameLocks noGrp="1"/>
+          </p:cNvGraphicFramePr>
+          <p:nvPr>
+            <p:extLst>
+              <p:ext uri="{D42A27DB-BD31-4B8C-83A1-F6EECF244321}">
+                <p14:modId xmlns:p14="http://schemas.microsoft.com/office/powerpoint/2010/main" val="3885029145"/>
+              </p:ext>
+            </p:extLst>
+          </p:nvPr>
+        </p:nvGraphicFramePr>
+        <p:xfrm>
+          <a:off x="7293864" y="4857895"/>
+          <a:ext cx="4822650" cy="1112520"/>
+        </p:xfrm>
+        <a:graphic>
+          <a:graphicData uri="http://schemas.openxmlformats.org/drawingml/2006/table">
+            <a:tbl>
+              <a:tblPr firstRow="1" bandRow="1">
+                <a:tableStyleId>{5C22544A-7EE6-4342-B048-85BDC9FD1C3A}</a:tableStyleId>
+              </a:tblPr>
+              <a:tblGrid>
+                <a:gridCol w="1607550">
+                  <a:extLst>
+                    <a:ext uri="{9D8B030D-6E8A-4147-A177-3AD203B41FA5}">
+                      <a16:colId xmlns:a16="http://schemas.microsoft.com/office/drawing/2014/main" val="2823257951"/>
+                    </a:ext>
+                  </a:extLst>
+                </a:gridCol>
+                <a:gridCol w="1607550">
+                  <a:extLst>
+                    <a:ext uri="{9D8B030D-6E8A-4147-A177-3AD203B41FA5}">
+                      <a16:colId xmlns:a16="http://schemas.microsoft.com/office/drawing/2014/main" val="798530955"/>
+                    </a:ext>
+                  </a:extLst>
+                </a:gridCol>
+                <a:gridCol w="1607550">
+                  <a:extLst>
+                    <a:ext uri="{9D8B030D-6E8A-4147-A177-3AD203B41FA5}">
+                      <a16:colId xmlns:a16="http://schemas.microsoft.com/office/drawing/2014/main" val="3173254901"/>
+                    </a:ext>
+                  </a:extLst>
+                </a:gridCol>
+              </a:tblGrid>
+              <a:tr h="370840">
+                <a:tc>
+                  <a:txBody>
+                    <a:bodyPr/>
+                    <a:lstStyle/>
+                    <a:p>
+                      <a:r>
+                        <a:rPr lang="en-US" sz="1200" dirty="0" smtClean="0">
+                          <a:solidFill>
+                            <a:schemeClr val="tx1"/>
+                          </a:solidFill>
+                        </a:rPr>
+                        <a:t>Turnover</a:t>
+                      </a:r>
+                      <a:endParaRPr lang="en-US" sz="1200" dirty="0">
+                        <a:solidFill>
+                          <a:schemeClr val="tx1"/>
+                        </a:solidFill>
+                      </a:endParaRPr>
+                    </a:p>
+                  </a:txBody>
+                  <a:tcPr>
+                    <a:lnL w="12700" cap="flat" cmpd="sng" algn="ctr">
+                      <a:solidFill>
+                        <a:schemeClr val="tx1"/>
+                      </a:solidFill>
+                      <a:prstDash val="solid"/>
+                      <a:round/>
+                      <a:headEnd type="none" w="med" len="med"/>
+                      <a:tailEnd type="none" w="med" len="med"/>
+                    </a:lnL>
+                    <a:lnR w="12700" cap="flat" cmpd="sng" algn="ctr">
+                      <a:solidFill>
+                        <a:schemeClr val="tx1"/>
+                      </a:solidFill>
+                      <a:prstDash val="solid"/>
+                      <a:round/>
+                      <a:headEnd type="none" w="med" len="med"/>
+                      <a:tailEnd type="none" w="med" len="med"/>
+                    </a:lnR>
+                    <a:lnT w="12700" cap="flat" cmpd="sng" algn="ctr">
+                      <a:solidFill>
+                        <a:schemeClr val="tx1"/>
+                      </a:solidFill>
+                      <a:prstDash val="solid"/>
+                      <a:round/>
+                      <a:headEnd type="none" w="med" len="med"/>
+                      <a:tailEnd type="none" w="med" len="med"/>
+                    </a:lnT>
+                    <a:lnB w="12700" cap="flat" cmpd="sng" algn="ctr">
+                      <a:solidFill>
+                        <a:schemeClr val="tx1"/>
+                      </a:solidFill>
+                      <a:prstDash val="solid"/>
+                      <a:round/>
+                      <a:headEnd type="none" w="med" len="med"/>
+                      <a:tailEnd type="none" w="med" len="med"/>
+                    </a:lnB>
+                    <a:noFill/>
+                  </a:tcPr>
+                </a:tc>
+                <a:tc>
+                  <a:txBody>
+                    <a:bodyPr/>
+                    <a:lstStyle/>
+                    <a:p>
+                      <a:r>
+                        <a:rPr lang="en-US" sz="1200" dirty="0" err="1" smtClean="0">
+                          <a:solidFill>
+                            <a:schemeClr val="tx1"/>
+                          </a:solidFill>
+                        </a:rPr>
+                        <a:t>Jaccard</a:t>
+                      </a:r>
+                      <a:endParaRPr lang="en-US" sz="1200" dirty="0">
+                        <a:solidFill>
+                          <a:schemeClr val="tx1"/>
+                        </a:solidFill>
+                      </a:endParaRPr>
+                    </a:p>
+                  </a:txBody>
+                  <a:tcPr>
+                    <a:lnL w="12700" cap="flat" cmpd="sng" algn="ctr">
+                      <a:solidFill>
+                        <a:schemeClr val="tx1"/>
+                      </a:solidFill>
+                      <a:prstDash val="solid"/>
+                      <a:round/>
+                      <a:headEnd type="none" w="med" len="med"/>
+                      <a:tailEnd type="none" w="med" len="med"/>
+                    </a:lnL>
+                    <a:lnR w="12700" cap="flat" cmpd="sng" algn="ctr">
+                      <a:solidFill>
+                        <a:schemeClr val="tx1"/>
+                      </a:solidFill>
+                      <a:prstDash val="solid"/>
+                      <a:round/>
+                      <a:headEnd type="none" w="med" len="med"/>
+                      <a:tailEnd type="none" w="med" len="med"/>
+                    </a:lnR>
+                    <a:lnT w="12700" cap="flat" cmpd="sng" algn="ctr">
+                      <a:solidFill>
+                        <a:schemeClr val="tx1"/>
+                      </a:solidFill>
+                      <a:prstDash val="solid"/>
+                      <a:round/>
+                      <a:headEnd type="none" w="med" len="med"/>
+                      <a:tailEnd type="none" w="med" len="med"/>
+                    </a:lnT>
+                    <a:lnB w="12700" cap="flat" cmpd="sng" algn="ctr">
+                      <a:solidFill>
+                        <a:schemeClr val="tx1"/>
+                      </a:solidFill>
+                      <a:prstDash val="solid"/>
+                      <a:round/>
+                      <a:headEnd type="none" w="med" len="med"/>
+                      <a:tailEnd type="none" w="med" len="med"/>
+                    </a:lnB>
+                    <a:noFill/>
+                  </a:tcPr>
+                </a:tc>
+                <a:tc>
+                  <a:txBody>
+                    <a:bodyPr/>
+                    <a:lstStyle/>
+                    <a:p>
+                      <a:r>
+                        <a:rPr lang="en-US" sz="1200" dirty="0" smtClean="0">
+                          <a:solidFill>
+                            <a:schemeClr val="tx1"/>
+                          </a:solidFill>
+                        </a:rPr>
+                        <a:t>????</a:t>
+                      </a:r>
+                      <a:endParaRPr lang="en-US" sz="1200" dirty="0">
+                        <a:solidFill>
+                          <a:schemeClr val="tx1"/>
+                        </a:solidFill>
+                      </a:endParaRPr>
+                    </a:p>
+                  </a:txBody>
+                  <a:tcPr>
+                    <a:lnL w="12700" cap="flat" cmpd="sng" algn="ctr">
+                      <a:solidFill>
+                        <a:schemeClr val="tx1"/>
+                      </a:solidFill>
+                      <a:prstDash val="solid"/>
+                      <a:round/>
+                      <a:headEnd type="none" w="med" len="med"/>
+                      <a:tailEnd type="none" w="med" len="med"/>
+                    </a:lnL>
+                    <a:lnR w="12700" cap="flat" cmpd="sng" algn="ctr">
+                      <a:solidFill>
+                        <a:schemeClr val="tx1"/>
+                      </a:solidFill>
+                      <a:prstDash val="solid"/>
+                      <a:round/>
+                      <a:headEnd type="none" w="med" len="med"/>
+                      <a:tailEnd type="none" w="med" len="med"/>
+                    </a:lnR>
+                    <a:lnT w="12700" cap="flat" cmpd="sng" algn="ctr">
+                      <a:solidFill>
+                        <a:schemeClr val="tx1"/>
+                      </a:solidFill>
+                      <a:prstDash val="solid"/>
+                      <a:round/>
+                      <a:headEnd type="none" w="med" len="med"/>
+                      <a:tailEnd type="none" w="med" len="med"/>
+                    </a:lnT>
+                    <a:lnB w="12700" cap="flat" cmpd="sng" algn="ctr">
+                      <a:solidFill>
+                        <a:schemeClr val="tx1"/>
+                      </a:solidFill>
+                      <a:prstDash val="solid"/>
+                      <a:round/>
+                      <a:headEnd type="none" w="med" len="med"/>
+                      <a:tailEnd type="none" w="med" len="med"/>
+                    </a:lnB>
+                    <a:noFill/>
+                  </a:tcPr>
+                </a:tc>
+                <a:extLst>
+                  <a:ext uri="{0D108BD9-81ED-4DB2-BD59-A6C34878D82A}">
+                    <a16:rowId xmlns:a16="http://schemas.microsoft.com/office/drawing/2014/main" val="308749052"/>
+                  </a:ext>
+                </a:extLst>
+              </a:tr>
+              <a:tr h="370840">
+                <a:tc>
+                  <a:txBody>
+                    <a:bodyPr/>
+                    <a:lstStyle/>
+                    <a:p>
+                      <a:r>
+                        <a:rPr lang="en-US" sz="1200" dirty="0" smtClean="0"/>
+                        <a:t>All Species</a:t>
+                      </a:r>
+                      <a:endParaRPr lang="en-US" sz="1200" dirty="0"/>
+                    </a:p>
+                  </a:txBody>
+                  <a:tcPr>
+                    <a:lnL w="12700" cap="flat" cmpd="sng" algn="ctr">
+                      <a:solidFill>
+                        <a:schemeClr val="tx1"/>
+                      </a:solidFill>
+                      <a:prstDash val="solid"/>
+                      <a:round/>
+                      <a:headEnd type="none" w="med" len="med"/>
+                      <a:tailEnd type="none" w="med" len="med"/>
+                    </a:lnL>
+                    <a:lnR w="12700" cap="flat" cmpd="sng" algn="ctr">
+                      <a:solidFill>
+                        <a:schemeClr val="tx1"/>
+                      </a:solidFill>
+                      <a:prstDash val="solid"/>
+                      <a:round/>
+                      <a:headEnd type="none" w="med" len="med"/>
+                      <a:tailEnd type="none" w="med" len="med"/>
+                    </a:lnR>
+                    <a:lnT w="12700" cap="flat" cmpd="sng" algn="ctr">
+                      <a:solidFill>
+                        <a:schemeClr val="tx1"/>
+                      </a:solidFill>
+                      <a:prstDash val="solid"/>
+                      <a:round/>
+                      <a:headEnd type="none" w="med" len="med"/>
+                      <a:tailEnd type="none" w="med" len="med"/>
+                    </a:lnT>
+                    <a:lnB w="12700" cap="flat" cmpd="sng" algn="ctr">
+                      <a:solidFill>
+                        <a:schemeClr val="tx1"/>
+                      </a:solidFill>
+                      <a:prstDash val="solid"/>
+                      <a:round/>
+                      <a:headEnd type="none" w="med" len="med"/>
+                      <a:tailEnd type="none" w="med" len="med"/>
+                    </a:lnB>
+                    <a:noFill/>
+                  </a:tcPr>
+                </a:tc>
+                <a:tc>
+                  <a:txBody>
+                    <a:bodyPr/>
+                    <a:lstStyle/>
+                    <a:p>
+                      <a:r>
+                        <a:rPr lang="en-US" sz="1200" dirty="0" smtClean="0"/>
+                        <a:t>5/7 = 0.714</a:t>
+                      </a:r>
+                      <a:endParaRPr lang="en-US" sz="1200" dirty="0"/>
+                    </a:p>
+                  </a:txBody>
+                  <a:tcPr>
+                    <a:lnL w="12700" cap="flat" cmpd="sng" algn="ctr">
+                      <a:solidFill>
+                        <a:schemeClr val="tx1"/>
+                      </a:solidFill>
+                      <a:prstDash val="solid"/>
+                      <a:round/>
+                      <a:headEnd type="none" w="med" len="med"/>
+                      <a:tailEnd type="none" w="med" len="med"/>
+                    </a:lnL>
+                    <a:lnR w="12700" cap="flat" cmpd="sng" algn="ctr">
+                      <a:solidFill>
+                        <a:schemeClr val="tx1"/>
+                      </a:solidFill>
+                      <a:prstDash val="solid"/>
+                      <a:round/>
+                      <a:headEnd type="none" w="med" len="med"/>
+                      <a:tailEnd type="none" w="med" len="med"/>
+                    </a:lnR>
+                    <a:lnT w="12700" cap="flat" cmpd="sng" algn="ctr">
+                      <a:solidFill>
+                        <a:schemeClr val="tx1"/>
+                      </a:solidFill>
+                      <a:prstDash val="solid"/>
+                      <a:round/>
+                      <a:headEnd type="none" w="med" len="med"/>
+                      <a:tailEnd type="none" w="med" len="med"/>
+                    </a:lnT>
+                    <a:lnB w="12700" cap="flat" cmpd="sng" algn="ctr">
+                      <a:solidFill>
+                        <a:schemeClr val="tx1"/>
+                      </a:solidFill>
+                      <a:prstDash val="solid"/>
+                      <a:round/>
+                      <a:headEnd type="none" w="med" len="med"/>
+                      <a:tailEnd type="none" w="med" len="med"/>
+                    </a:lnB>
+                    <a:noFill/>
+                  </a:tcPr>
+                </a:tc>
+                <a:tc>
+                  <a:txBody>
+                    <a:bodyPr/>
+                    <a:lstStyle/>
+                    <a:p>
+                      <a:endParaRPr lang="en-US" sz="1200"/>
+                    </a:p>
+                  </a:txBody>
+                  <a:tcPr>
+                    <a:lnL w="12700" cap="flat" cmpd="sng" algn="ctr">
+                      <a:solidFill>
+                        <a:schemeClr val="tx1"/>
+                      </a:solidFill>
+                      <a:prstDash val="solid"/>
+                      <a:round/>
+                      <a:headEnd type="none" w="med" len="med"/>
+                      <a:tailEnd type="none" w="med" len="med"/>
+                    </a:lnL>
+                    <a:lnR w="12700" cap="flat" cmpd="sng" algn="ctr">
+                      <a:solidFill>
+                        <a:schemeClr val="tx1"/>
+                      </a:solidFill>
+                      <a:prstDash val="solid"/>
+                      <a:round/>
+                      <a:headEnd type="none" w="med" len="med"/>
+                      <a:tailEnd type="none" w="med" len="med"/>
+                    </a:lnR>
+                    <a:lnT w="12700" cap="flat" cmpd="sng" algn="ctr">
+                      <a:solidFill>
+                        <a:schemeClr val="tx1"/>
+                      </a:solidFill>
+                      <a:prstDash val="solid"/>
+                      <a:round/>
+                      <a:headEnd type="none" w="med" len="med"/>
+                      <a:tailEnd type="none" w="med" len="med"/>
+                    </a:lnT>
+                    <a:lnB w="12700" cap="flat" cmpd="sng" algn="ctr">
+                      <a:solidFill>
+                        <a:schemeClr val="tx1"/>
+                      </a:solidFill>
+                      <a:prstDash val="solid"/>
+                      <a:round/>
+                      <a:headEnd type="none" w="med" len="med"/>
+                      <a:tailEnd type="none" w="med" len="med"/>
+                    </a:lnB>
+                    <a:noFill/>
+                  </a:tcPr>
+                </a:tc>
+                <a:extLst>
+                  <a:ext uri="{0D108BD9-81ED-4DB2-BD59-A6C34878D82A}">
+                    <a16:rowId xmlns:a16="http://schemas.microsoft.com/office/drawing/2014/main" val="1838638201"/>
+                  </a:ext>
+                </a:extLst>
+              </a:tr>
+              <a:tr h="370840">
+                <a:tc>
+                  <a:txBody>
+                    <a:bodyPr/>
+                    <a:lstStyle/>
+                    <a:p>
+                      <a:r>
+                        <a:rPr lang="en-US" sz="1200" dirty="0" smtClean="0"/>
+                        <a:t>Excluding Transients</a:t>
+                      </a:r>
+                      <a:endParaRPr lang="en-US" sz="1200" dirty="0"/>
+                    </a:p>
+                  </a:txBody>
+                  <a:tcPr>
+                    <a:lnL w="12700" cap="flat" cmpd="sng" algn="ctr">
+                      <a:solidFill>
+                        <a:schemeClr val="tx1"/>
+                      </a:solidFill>
+                      <a:prstDash val="solid"/>
+                      <a:round/>
+                      <a:headEnd type="none" w="med" len="med"/>
+                      <a:tailEnd type="none" w="med" len="med"/>
+                    </a:lnL>
+                    <a:lnR w="12700" cap="flat" cmpd="sng" algn="ctr">
+                      <a:solidFill>
+                        <a:schemeClr val="tx1"/>
+                      </a:solidFill>
+                      <a:prstDash val="solid"/>
+                      <a:round/>
+                      <a:headEnd type="none" w="med" len="med"/>
+                      <a:tailEnd type="none" w="med" len="med"/>
+                    </a:lnR>
+                    <a:lnT w="12700" cap="flat" cmpd="sng" algn="ctr">
+                      <a:solidFill>
+                        <a:schemeClr val="tx1"/>
+                      </a:solidFill>
+                      <a:prstDash val="solid"/>
+                      <a:round/>
+                      <a:headEnd type="none" w="med" len="med"/>
+                      <a:tailEnd type="none" w="med" len="med"/>
+                    </a:lnT>
+                    <a:lnB w="12700" cap="flat" cmpd="sng" algn="ctr">
+                      <a:solidFill>
+                        <a:schemeClr val="tx1"/>
+                      </a:solidFill>
+                      <a:prstDash val="solid"/>
+                      <a:round/>
+                      <a:headEnd type="none" w="med" len="med"/>
+                      <a:tailEnd type="none" w="med" len="med"/>
+                    </a:lnB>
+                    <a:noFill/>
+                  </a:tcPr>
+                </a:tc>
+                <a:tc>
+                  <a:txBody>
+                    <a:bodyPr/>
+                    <a:lstStyle/>
+                    <a:p>
+                      <a:r>
+                        <a:rPr lang="en-US" sz="1200" dirty="0" smtClean="0"/>
+                        <a:t>4/4 =1???</a:t>
+                      </a:r>
+                      <a:endParaRPr lang="en-US" sz="1200" dirty="0"/>
+                    </a:p>
+                  </a:txBody>
+                  <a:tcPr>
+                    <a:lnL w="12700" cap="flat" cmpd="sng" algn="ctr">
+                      <a:solidFill>
+                        <a:schemeClr val="tx1"/>
+                      </a:solidFill>
+                      <a:prstDash val="solid"/>
+                      <a:round/>
+                      <a:headEnd type="none" w="med" len="med"/>
+                      <a:tailEnd type="none" w="med" len="med"/>
+                    </a:lnL>
+                    <a:lnR w="12700" cap="flat" cmpd="sng" algn="ctr">
+                      <a:solidFill>
+                        <a:schemeClr val="tx1"/>
+                      </a:solidFill>
+                      <a:prstDash val="solid"/>
+                      <a:round/>
+                      <a:headEnd type="none" w="med" len="med"/>
+                      <a:tailEnd type="none" w="med" len="med"/>
+                    </a:lnR>
+                    <a:lnT w="12700" cap="flat" cmpd="sng" algn="ctr">
+                      <a:solidFill>
+                        <a:schemeClr val="tx1"/>
+                      </a:solidFill>
+                      <a:prstDash val="solid"/>
+                      <a:round/>
+                      <a:headEnd type="none" w="med" len="med"/>
+                      <a:tailEnd type="none" w="med" len="med"/>
+                    </a:lnT>
+                    <a:lnB w="12700" cap="flat" cmpd="sng" algn="ctr">
+                      <a:solidFill>
+                        <a:schemeClr val="tx1"/>
+                      </a:solidFill>
+                      <a:prstDash val="solid"/>
+                      <a:round/>
+                      <a:headEnd type="none" w="med" len="med"/>
+                      <a:tailEnd type="none" w="med" len="med"/>
+                    </a:lnB>
+                    <a:noFill/>
+                  </a:tcPr>
+                </a:tc>
+                <a:tc>
+                  <a:txBody>
+                    <a:bodyPr/>
+                    <a:lstStyle/>
+                    <a:p>
+                      <a:endParaRPr lang="en-US" sz="1200" dirty="0"/>
+                    </a:p>
+                  </a:txBody>
+                  <a:tcPr>
+                    <a:lnL w="12700" cap="flat" cmpd="sng" algn="ctr">
+                      <a:solidFill>
+                        <a:schemeClr val="tx1"/>
+                      </a:solidFill>
+                      <a:prstDash val="solid"/>
+                      <a:round/>
+                      <a:headEnd type="none" w="med" len="med"/>
+                      <a:tailEnd type="none" w="med" len="med"/>
+                    </a:lnL>
+                    <a:lnR w="12700" cap="flat" cmpd="sng" algn="ctr">
+                      <a:solidFill>
+                        <a:schemeClr val="tx1"/>
+                      </a:solidFill>
+                      <a:prstDash val="solid"/>
+                      <a:round/>
+                      <a:headEnd type="none" w="med" len="med"/>
+                      <a:tailEnd type="none" w="med" len="med"/>
+                    </a:lnR>
+                    <a:lnT w="12700" cap="flat" cmpd="sng" algn="ctr">
+                      <a:solidFill>
+                        <a:schemeClr val="tx1"/>
+                      </a:solidFill>
+                      <a:prstDash val="solid"/>
+                      <a:round/>
+                      <a:headEnd type="none" w="med" len="med"/>
+                      <a:tailEnd type="none" w="med" len="med"/>
+                    </a:lnT>
+                    <a:lnB w="12700" cap="flat" cmpd="sng" algn="ctr">
+                      <a:solidFill>
+                        <a:schemeClr val="tx1"/>
+                      </a:solidFill>
+                      <a:prstDash val="solid"/>
+                      <a:round/>
+                      <a:headEnd type="none" w="med" len="med"/>
+                      <a:tailEnd type="none" w="med" len="med"/>
+                    </a:lnB>
+                    <a:noFill/>
+                  </a:tcPr>
+                </a:tc>
+                <a:extLst>
+                  <a:ext uri="{0D108BD9-81ED-4DB2-BD59-A6C34878D82A}">
+                    <a16:rowId xmlns:a16="http://schemas.microsoft.com/office/drawing/2014/main" val="1986560784"/>
+                  </a:ext>
+                </a:extLst>
+              </a:tr>
+            </a:tbl>
+          </a:graphicData>
+        </a:graphic>
+      </p:graphicFrame>
+      <p:sp>
+        <p:nvSpPr>
+          <p:cNvPr id="51" name="Flowchart: Connector 50"/>
+          <p:cNvSpPr/>
+          <p:nvPr/>
+        </p:nvSpPr>
+        <p:spPr>
+          <a:xfrm>
+            <a:off x="408431" y="3051596"/>
+            <a:ext cx="45719" cy="45719"/>
+          </a:xfrm>
+          <a:prstGeom prst="flowChartConnector">
+            <a:avLst/>
+          </a:prstGeom>
+          <a:solidFill>
+            <a:schemeClr val="tx1"/>
+          </a:solidFill>
+          <a:ln>
+            <a:solidFill>
+              <a:schemeClr val="tx1"/>
+            </a:solidFill>
+          </a:ln>
+        </p:spPr>
+        <p:style>
+          <a:lnRef idx="2">
+            <a:schemeClr val="accent1">
+              <a:shade val="50000"/>
+            </a:schemeClr>
+          </a:lnRef>
+          <a:fillRef idx="1">
+            <a:schemeClr val="accent1"/>
+          </a:fillRef>
+          <a:effectRef idx="0">
+            <a:schemeClr val="accent1"/>
+          </a:effectRef>
+          <a:fontRef idx="minor">
+            <a:schemeClr val="lt1"/>
+          </a:fontRef>
+        </p:style>
+        <p:txBody>
+          <a:bodyPr rtlCol="0" anchor="ctr"/>
+          <a:lstStyle/>
+          <a:p>
+            <a:pPr algn="ctr"/>
+            <a:endParaRPr lang="en-US"/>
+          </a:p>
+        </p:txBody>
+      </p:sp>
+      <p:sp>
+        <p:nvSpPr>
+          <p:cNvPr id="52" name="Flowchart: Connector 51"/>
+          <p:cNvSpPr/>
+          <p:nvPr/>
+        </p:nvSpPr>
+        <p:spPr>
+          <a:xfrm>
+            <a:off x="408431" y="3962185"/>
+            <a:ext cx="45719" cy="45719"/>
+          </a:xfrm>
+          <a:prstGeom prst="flowChartConnector">
+            <a:avLst/>
+          </a:prstGeom>
+          <a:solidFill>
+            <a:schemeClr val="tx1"/>
+          </a:solidFill>
+          <a:ln>
+            <a:solidFill>
+              <a:schemeClr val="tx1"/>
+            </a:solidFill>
+          </a:ln>
+        </p:spPr>
+        <p:style>
+          <a:lnRef idx="2">
+            <a:schemeClr val="accent1">
+              <a:shade val="50000"/>
+            </a:schemeClr>
+          </a:lnRef>
+          <a:fillRef idx="1">
+            <a:schemeClr val="accent1"/>
+          </a:fillRef>
+          <a:effectRef idx="0">
+            <a:schemeClr val="accent1"/>
+          </a:effectRef>
+          <a:fontRef idx="minor">
+            <a:schemeClr val="lt1"/>
+          </a:fontRef>
+        </p:style>
+        <p:txBody>
+          <a:bodyPr rtlCol="0" anchor="ctr"/>
+          <a:lstStyle/>
+          <a:p>
+            <a:pPr algn="ctr"/>
+            <a:endParaRPr lang="en-US"/>
+          </a:p>
+        </p:txBody>
+      </p:sp>
+      <p:sp>
+        <p:nvSpPr>
+          <p:cNvPr id="53" name="Flowchart: Connector 52"/>
+          <p:cNvSpPr/>
+          <p:nvPr/>
+        </p:nvSpPr>
+        <p:spPr>
+          <a:xfrm>
+            <a:off x="3200970" y="2529508"/>
+            <a:ext cx="45719" cy="45719"/>
+          </a:xfrm>
+          <a:prstGeom prst="flowChartConnector">
+            <a:avLst/>
+          </a:prstGeom>
+          <a:solidFill>
+            <a:schemeClr val="tx1"/>
+          </a:solidFill>
+          <a:ln>
+            <a:solidFill>
+              <a:schemeClr val="tx1"/>
+            </a:solidFill>
+          </a:ln>
+        </p:spPr>
+        <p:style>
+          <a:lnRef idx="2">
+            <a:schemeClr val="accent1">
+              <a:shade val="50000"/>
+            </a:schemeClr>
+          </a:lnRef>
+          <a:fillRef idx="1">
+            <a:schemeClr val="accent1"/>
+          </a:fillRef>
+          <a:effectRef idx="0">
+            <a:schemeClr val="accent1"/>
+          </a:effectRef>
+          <a:fontRef idx="minor">
+            <a:schemeClr val="lt1"/>
+          </a:fontRef>
+        </p:style>
+        <p:txBody>
+          <a:bodyPr rtlCol="0" anchor="ctr"/>
+          <a:lstStyle/>
+          <a:p>
+            <a:pPr algn="ctr"/>
+            <a:endParaRPr lang="en-US"/>
+          </a:p>
+        </p:txBody>
+      </p:sp>
+      <p:sp>
+        <p:nvSpPr>
+          <p:cNvPr id="54" name="TextBox 53"/>
+          <p:cNvSpPr txBox="1"/>
+          <p:nvPr/>
+        </p:nvSpPr>
+        <p:spPr>
+          <a:xfrm>
+            <a:off x="1527962" y="4192251"/>
+            <a:ext cx="695858" cy="246221"/>
+          </a:xfrm>
+          <a:prstGeom prst="rect">
+            <a:avLst/>
+          </a:prstGeom>
+          <a:noFill/>
+        </p:spPr>
+        <p:txBody>
+          <a:bodyPr wrap="square" rtlCol="0">
+            <a:spAutoFit/>
+          </a:bodyPr>
+          <a:lstStyle/>
+          <a:p>
+            <a:r>
+              <a:rPr lang="en-US" sz="1000" dirty="0" smtClean="0"/>
+              <a:t>Log(area)</a:t>
+            </a:r>
+            <a:endParaRPr lang="en-US" sz="1000" dirty="0"/>
+          </a:p>
+        </p:txBody>
+      </p:sp>
+      <p:sp>
+        <p:nvSpPr>
+          <p:cNvPr id="55" name="TextBox 54"/>
+          <p:cNvSpPr txBox="1"/>
+          <p:nvPr/>
+        </p:nvSpPr>
+        <p:spPr>
+          <a:xfrm rot="16200000">
+            <a:off x="-145818" y="3109816"/>
+            <a:ext cx="848822" cy="246221"/>
+          </a:xfrm>
+          <a:prstGeom prst="rect">
+            <a:avLst/>
+          </a:prstGeom>
+          <a:noFill/>
+        </p:spPr>
+        <p:txBody>
+          <a:bodyPr wrap="square" rtlCol="0">
+            <a:spAutoFit/>
+          </a:bodyPr>
+          <a:lstStyle/>
+          <a:p>
+            <a:r>
+              <a:rPr lang="en-US" sz="1000" dirty="0" smtClean="0"/>
+              <a:t>Log(Species)</a:t>
+            </a:r>
+            <a:endParaRPr lang="en-US" sz="1000" dirty="0"/>
+          </a:p>
+        </p:txBody>
+      </p:sp>
+      <p:sp>
+        <p:nvSpPr>
+          <p:cNvPr id="56" name="TextBox 55"/>
+          <p:cNvSpPr txBox="1"/>
+          <p:nvPr/>
+        </p:nvSpPr>
+        <p:spPr>
+          <a:xfrm>
+            <a:off x="7356348" y="2375942"/>
+            <a:ext cx="2995966" cy="923330"/>
+          </a:xfrm>
+          <a:prstGeom prst="rect">
+            <a:avLst/>
+          </a:prstGeom>
+          <a:noFill/>
+        </p:spPr>
+        <p:txBody>
+          <a:bodyPr wrap="square" rtlCol="0">
+            <a:spAutoFit/>
+          </a:bodyPr>
+          <a:lstStyle/>
+          <a:p>
+            <a:r>
+              <a:rPr lang="en-US" dirty="0" smtClean="0"/>
+              <a:t>Box 1: # </a:t>
+            </a:r>
+            <a:r>
+              <a:rPr lang="en-US" dirty="0" err="1" smtClean="0"/>
+              <a:t>spp</a:t>
+            </a:r>
+            <a:r>
+              <a:rPr lang="en-US" dirty="0" smtClean="0"/>
+              <a:t> =1</a:t>
+            </a:r>
+          </a:p>
+          <a:p>
+            <a:r>
+              <a:rPr lang="en-US" dirty="0" smtClean="0"/>
+              <a:t>Box 2: # </a:t>
+            </a:r>
+            <a:r>
+              <a:rPr lang="en-US" dirty="0" err="1" smtClean="0"/>
+              <a:t>spp</a:t>
+            </a:r>
+            <a:r>
+              <a:rPr lang="en-US" dirty="0" smtClean="0"/>
+              <a:t> = 4</a:t>
+            </a:r>
+          </a:p>
+          <a:p>
+            <a:r>
+              <a:rPr lang="en-US" dirty="0" smtClean="0"/>
+              <a:t>Box 3: # </a:t>
+            </a:r>
+            <a:r>
+              <a:rPr lang="en-US" dirty="0" err="1" smtClean="0"/>
+              <a:t>spp</a:t>
+            </a:r>
+            <a:r>
+              <a:rPr lang="en-US" dirty="0" smtClean="0"/>
+              <a:t> = 5</a:t>
+            </a:r>
+            <a:endParaRPr lang="en-US" dirty="0"/>
+          </a:p>
+        </p:txBody>
+      </p:sp>
+      <p:cxnSp>
+        <p:nvCxnSpPr>
+          <p:cNvPr id="58" name="Straight Connector 57"/>
+          <p:cNvCxnSpPr/>
+          <p:nvPr/>
+        </p:nvCxnSpPr>
+        <p:spPr>
+          <a:xfrm flipV="1">
+            <a:off x="523189" y="2602038"/>
+            <a:ext cx="2645686" cy="1348477"/>
+          </a:xfrm>
+          <a:prstGeom prst="line">
+            <a:avLst/>
+          </a:prstGeom>
+          <a:ln w="19050">
+            <a:solidFill>
+              <a:schemeClr val="tx1"/>
+            </a:solidFill>
+            <a:prstDash val="dash"/>
+          </a:ln>
+        </p:spPr>
+        <p:style>
+          <a:lnRef idx="1">
+            <a:schemeClr val="accent1"/>
+          </a:lnRef>
+          <a:fillRef idx="0">
+            <a:schemeClr val="accent1"/>
+          </a:fillRef>
+          <a:effectRef idx="0">
+            <a:schemeClr val="accent1"/>
+          </a:effectRef>
+          <a:fontRef idx="minor">
+            <a:schemeClr val="tx1"/>
+          </a:fontRef>
+        </p:style>
+      </p:cxnSp>
+      <p:cxnSp>
+        <p:nvCxnSpPr>
+          <p:cNvPr id="60" name="Straight Connector 59"/>
+          <p:cNvCxnSpPr/>
+          <p:nvPr/>
+        </p:nvCxnSpPr>
+        <p:spPr>
+          <a:xfrm flipV="1">
+            <a:off x="491867" y="2584630"/>
+            <a:ext cx="2635642" cy="474268"/>
+          </a:xfrm>
+          <a:prstGeom prst="line">
+            <a:avLst/>
+          </a:prstGeom>
+          <a:ln w="19050">
+            <a:solidFill>
+              <a:schemeClr val="tx1"/>
+            </a:solidFill>
+            <a:prstDash val="dash"/>
+          </a:ln>
+        </p:spPr>
+        <p:style>
+          <a:lnRef idx="1">
+            <a:schemeClr val="accent1"/>
+          </a:lnRef>
+          <a:fillRef idx="0">
+            <a:schemeClr val="accent1"/>
+          </a:fillRef>
+          <a:effectRef idx="0">
+            <a:schemeClr val="accent1"/>
+          </a:effectRef>
+          <a:fontRef idx="minor">
+            <a:schemeClr val="tx1"/>
+          </a:fontRef>
+        </p:style>
+      </p:cxnSp>
+      <p:sp>
+        <p:nvSpPr>
+          <p:cNvPr id="63" name="5-Point Star 62"/>
+          <p:cNvSpPr/>
+          <p:nvPr/>
+        </p:nvSpPr>
+        <p:spPr>
+          <a:xfrm>
+            <a:off x="3847511" y="2463182"/>
+            <a:ext cx="229514" cy="219456"/>
+          </a:xfrm>
+          <a:prstGeom prst="star5">
+            <a:avLst/>
+          </a:prstGeom>
+          <a:solidFill>
+            <a:schemeClr val="accent4"/>
+          </a:solidFill>
+          <a:ln>
+            <a:solidFill>
+              <a:schemeClr val="accent4"/>
+            </a:solidFill>
+          </a:ln>
+        </p:spPr>
+        <p:style>
+          <a:lnRef idx="2">
+            <a:schemeClr val="accent1">
+              <a:shade val="50000"/>
+            </a:schemeClr>
+          </a:lnRef>
+          <a:fillRef idx="1">
+            <a:schemeClr val="accent1"/>
+          </a:fillRef>
+          <a:effectRef idx="0">
+            <a:schemeClr val="accent1"/>
+          </a:effectRef>
+          <a:fontRef idx="minor">
+            <a:schemeClr val="lt1"/>
+          </a:fontRef>
+        </p:style>
+        <p:txBody>
+          <a:bodyPr rtlCol="0" anchor="ctr"/>
+          <a:lstStyle/>
+          <a:p>
+            <a:pPr algn="ctr"/>
+            <a:endParaRPr lang="en-US"/>
+          </a:p>
+        </p:txBody>
+      </p:sp>
+      <p:sp>
+        <p:nvSpPr>
+          <p:cNvPr id="64" name="Rectangle 63"/>
+          <p:cNvSpPr/>
+          <p:nvPr/>
+        </p:nvSpPr>
+        <p:spPr>
+          <a:xfrm>
+            <a:off x="4316903" y="2463182"/>
+            <a:ext cx="164592" cy="153690"/>
+          </a:xfrm>
+          <a:prstGeom prst="rect">
+            <a:avLst/>
+          </a:prstGeom>
+          <a:solidFill>
+            <a:schemeClr val="accent1">
+              <a:lumMod val="75000"/>
+            </a:schemeClr>
+          </a:solidFill>
+          <a:ln>
+            <a:solidFill>
+              <a:schemeClr val="accent1">
+                <a:lumMod val="75000"/>
+              </a:schemeClr>
+            </a:solidFill>
+          </a:ln>
+        </p:spPr>
+        <p:style>
+          <a:lnRef idx="2">
+            <a:schemeClr val="accent1">
+              <a:shade val="50000"/>
+            </a:schemeClr>
+          </a:lnRef>
+          <a:fillRef idx="1">
+            <a:schemeClr val="accent1"/>
+          </a:fillRef>
+          <a:effectRef idx="0">
+            <a:schemeClr val="accent1"/>
+          </a:effectRef>
+          <a:fontRef idx="minor">
+            <a:schemeClr val="lt1"/>
+          </a:fontRef>
+        </p:style>
+        <p:txBody>
+          <a:bodyPr rtlCol="0" anchor="ctr"/>
+          <a:lstStyle/>
+          <a:p>
+            <a:pPr algn="ctr"/>
+            <a:endParaRPr lang="en-US"/>
+          </a:p>
+        </p:txBody>
+      </p:sp>
+      <p:sp>
+        <p:nvSpPr>
+          <p:cNvPr id="65" name="Diamond 64"/>
+          <p:cNvSpPr/>
+          <p:nvPr/>
+        </p:nvSpPr>
+        <p:spPr>
+          <a:xfrm>
+            <a:off x="3993815" y="3814736"/>
+            <a:ext cx="237744" cy="219456"/>
+          </a:xfrm>
+          <a:prstGeom prst="diamond">
+            <a:avLst/>
+          </a:prstGeom>
+          <a:solidFill>
+            <a:schemeClr val="accent6">
+              <a:lumMod val="60000"/>
+              <a:lumOff val="40000"/>
+            </a:schemeClr>
+          </a:solidFill>
+          <a:ln>
+            <a:solidFill>
+              <a:schemeClr val="accent6">
+                <a:lumMod val="60000"/>
+                <a:lumOff val="40000"/>
+              </a:schemeClr>
+            </a:solidFill>
+          </a:ln>
+        </p:spPr>
+        <p:style>
+          <a:lnRef idx="2">
+            <a:schemeClr val="accent1">
+              <a:shade val="50000"/>
+            </a:schemeClr>
+          </a:lnRef>
+          <a:fillRef idx="1">
+            <a:schemeClr val="accent1"/>
+          </a:fillRef>
+          <a:effectRef idx="0">
+            <a:schemeClr val="accent1"/>
+          </a:effectRef>
+          <a:fontRef idx="minor">
+            <a:schemeClr val="lt1"/>
+          </a:fontRef>
+        </p:style>
+        <p:txBody>
+          <a:bodyPr rtlCol="0" anchor="ctr"/>
+          <a:lstStyle/>
+          <a:p>
+            <a:pPr algn="ctr"/>
+            <a:endParaRPr lang="en-US"/>
+          </a:p>
+        </p:txBody>
+      </p:sp>
+      <p:sp>
+        <p:nvSpPr>
+          <p:cNvPr id="66" name="Regular Pentagon 65"/>
+          <p:cNvSpPr/>
+          <p:nvPr/>
+        </p:nvSpPr>
+        <p:spPr>
+          <a:xfrm>
+            <a:off x="5714184" y="3018414"/>
+            <a:ext cx="207872" cy="226053"/>
+          </a:xfrm>
+          <a:prstGeom prst="pentagon">
+            <a:avLst/>
+          </a:prstGeom>
+          <a:solidFill>
+            <a:srgbClr val="FF0066"/>
+          </a:solidFill>
+          <a:ln>
+            <a:solidFill>
+              <a:srgbClr val="FF0066"/>
+            </a:solidFill>
+          </a:ln>
+        </p:spPr>
+        <p:style>
+          <a:lnRef idx="2">
+            <a:schemeClr val="accent1">
+              <a:shade val="50000"/>
+            </a:schemeClr>
+          </a:lnRef>
+          <a:fillRef idx="1">
+            <a:schemeClr val="accent1"/>
+          </a:fillRef>
+          <a:effectRef idx="0">
+            <a:schemeClr val="accent1"/>
+          </a:effectRef>
+          <a:fontRef idx="minor">
+            <a:schemeClr val="lt1"/>
+          </a:fontRef>
+        </p:style>
+        <p:txBody>
+          <a:bodyPr rtlCol="0" anchor="ctr"/>
+          <a:lstStyle/>
+          <a:p>
+            <a:pPr algn="ctr"/>
+            <a:endParaRPr lang="en-US"/>
+          </a:p>
+        </p:txBody>
+      </p:sp>
+      <p:sp>
+        <p:nvSpPr>
+          <p:cNvPr id="67" name="5-Point Star 66"/>
+          <p:cNvSpPr/>
+          <p:nvPr/>
+        </p:nvSpPr>
+        <p:spPr>
+          <a:xfrm>
+            <a:off x="4276843" y="3272100"/>
+            <a:ext cx="229514" cy="219456"/>
+          </a:xfrm>
+          <a:prstGeom prst="star5">
+            <a:avLst/>
+          </a:prstGeom>
+          <a:solidFill>
+            <a:schemeClr val="accent4"/>
+          </a:solidFill>
+          <a:ln>
+            <a:solidFill>
+              <a:schemeClr val="accent4"/>
+            </a:solidFill>
+          </a:ln>
+        </p:spPr>
+        <p:style>
+          <a:lnRef idx="2">
+            <a:schemeClr val="accent1">
+              <a:shade val="50000"/>
+            </a:schemeClr>
+          </a:lnRef>
+          <a:fillRef idx="1">
+            <a:schemeClr val="accent1"/>
+          </a:fillRef>
+          <a:effectRef idx="0">
+            <a:schemeClr val="accent1"/>
+          </a:effectRef>
+          <a:fontRef idx="minor">
+            <a:schemeClr val="lt1"/>
+          </a:fontRef>
+        </p:style>
+        <p:txBody>
+          <a:bodyPr rtlCol="0" anchor="ctr"/>
+          <a:lstStyle/>
+          <a:p>
+            <a:pPr algn="ctr"/>
+            <a:endParaRPr lang="en-US"/>
+          </a:p>
+        </p:txBody>
+      </p:sp>
+      <p:sp>
+        <p:nvSpPr>
+          <p:cNvPr id="68" name="Rectangle 67"/>
+          <p:cNvSpPr/>
+          <p:nvPr/>
+        </p:nvSpPr>
+        <p:spPr>
+          <a:xfrm>
+            <a:off x="3879972" y="3018414"/>
+            <a:ext cx="164592" cy="153690"/>
+          </a:xfrm>
+          <a:prstGeom prst="rect">
+            <a:avLst/>
+          </a:prstGeom>
+          <a:solidFill>
+            <a:schemeClr val="accent1">
+              <a:lumMod val="75000"/>
+            </a:schemeClr>
+          </a:solidFill>
+          <a:ln>
+            <a:solidFill>
+              <a:schemeClr val="accent1">
+                <a:lumMod val="75000"/>
+              </a:schemeClr>
+            </a:solidFill>
+          </a:ln>
+        </p:spPr>
+        <p:style>
+          <a:lnRef idx="2">
+            <a:schemeClr val="accent1">
+              <a:shade val="50000"/>
+            </a:schemeClr>
+          </a:lnRef>
+          <a:fillRef idx="1">
+            <a:schemeClr val="accent1"/>
+          </a:fillRef>
+          <a:effectRef idx="0">
+            <a:schemeClr val="accent1"/>
+          </a:effectRef>
+          <a:fontRef idx="minor">
+            <a:schemeClr val="lt1"/>
+          </a:fontRef>
+        </p:style>
+        <p:txBody>
+          <a:bodyPr rtlCol="0" anchor="ctr"/>
+          <a:lstStyle/>
+          <a:p>
+            <a:pPr algn="ctr"/>
+            <a:endParaRPr lang="en-US"/>
+          </a:p>
+        </p:txBody>
+      </p:sp>
+      <p:sp>
+        <p:nvSpPr>
+          <p:cNvPr id="69" name="Diamond 68"/>
+          <p:cNvSpPr/>
+          <p:nvPr/>
+        </p:nvSpPr>
+        <p:spPr>
+          <a:xfrm>
+            <a:off x="4811593" y="2557996"/>
+            <a:ext cx="237744" cy="219456"/>
+          </a:xfrm>
+          <a:prstGeom prst="diamond">
+            <a:avLst/>
+          </a:prstGeom>
+          <a:solidFill>
+            <a:schemeClr val="accent6">
+              <a:lumMod val="60000"/>
+              <a:lumOff val="40000"/>
+            </a:schemeClr>
+          </a:solidFill>
+          <a:ln>
+            <a:solidFill>
+              <a:schemeClr val="accent6">
+                <a:lumMod val="60000"/>
+                <a:lumOff val="40000"/>
+              </a:schemeClr>
+            </a:solidFill>
+          </a:ln>
+        </p:spPr>
+        <p:style>
+          <a:lnRef idx="2">
+            <a:schemeClr val="accent1">
+              <a:shade val="50000"/>
+            </a:schemeClr>
+          </a:lnRef>
+          <a:fillRef idx="1">
+            <a:schemeClr val="accent1"/>
+          </a:fillRef>
+          <a:effectRef idx="0">
+            <a:schemeClr val="accent1"/>
+          </a:effectRef>
+          <a:fontRef idx="minor">
+            <a:schemeClr val="lt1"/>
+          </a:fontRef>
+        </p:style>
+        <p:txBody>
+          <a:bodyPr rtlCol="0" anchor="ctr"/>
+          <a:lstStyle/>
+          <a:p>
+            <a:pPr algn="ctr"/>
+            <a:endParaRPr lang="en-US"/>
+          </a:p>
+        </p:txBody>
+      </p:sp>
+      <p:sp>
+        <p:nvSpPr>
+          <p:cNvPr id="70" name="Diamond 69"/>
+          <p:cNvSpPr/>
+          <p:nvPr/>
+        </p:nvSpPr>
+        <p:spPr>
+          <a:xfrm>
+            <a:off x="6605516" y="3267146"/>
+            <a:ext cx="237744" cy="219456"/>
+          </a:xfrm>
+          <a:prstGeom prst="diamond">
+            <a:avLst/>
+          </a:prstGeom>
+          <a:solidFill>
+            <a:schemeClr val="accent6">
+              <a:lumMod val="60000"/>
+              <a:lumOff val="40000"/>
+            </a:schemeClr>
+          </a:solidFill>
+          <a:ln>
+            <a:solidFill>
+              <a:schemeClr val="accent6">
+                <a:lumMod val="60000"/>
+                <a:lumOff val="40000"/>
+              </a:schemeClr>
+            </a:solidFill>
+          </a:ln>
+        </p:spPr>
+        <p:style>
+          <a:lnRef idx="2">
+            <a:schemeClr val="accent1">
+              <a:shade val="50000"/>
+            </a:schemeClr>
+          </a:lnRef>
+          <a:fillRef idx="1">
+            <a:schemeClr val="accent1"/>
+          </a:fillRef>
+          <a:effectRef idx="0">
+            <a:schemeClr val="accent1"/>
+          </a:effectRef>
+          <a:fontRef idx="minor">
+            <a:schemeClr val="lt1"/>
+          </a:fontRef>
+        </p:style>
+        <p:txBody>
+          <a:bodyPr rtlCol="0" anchor="ctr"/>
+          <a:lstStyle/>
+          <a:p>
+            <a:pPr algn="ctr"/>
+            <a:endParaRPr lang="en-US"/>
+          </a:p>
+        </p:txBody>
+      </p:sp>
+      <p:sp>
+        <p:nvSpPr>
+          <p:cNvPr id="71" name="Diamond 70"/>
+          <p:cNvSpPr/>
+          <p:nvPr/>
+        </p:nvSpPr>
+        <p:spPr>
+          <a:xfrm>
+            <a:off x="6316391" y="3816494"/>
+            <a:ext cx="237744" cy="219456"/>
+          </a:xfrm>
+          <a:prstGeom prst="diamond">
+            <a:avLst/>
+          </a:prstGeom>
+          <a:solidFill>
+            <a:schemeClr val="accent6">
+              <a:lumMod val="60000"/>
+              <a:lumOff val="40000"/>
+            </a:schemeClr>
+          </a:solidFill>
+          <a:ln>
+            <a:solidFill>
+              <a:schemeClr val="accent6">
+                <a:lumMod val="60000"/>
+                <a:lumOff val="40000"/>
+              </a:schemeClr>
+            </a:solidFill>
+          </a:ln>
+        </p:spPr>
+        <p:style>
+          <a:lnRef idx="2">
+            <a:schemeClr val="accent1">
+              <a:shade val="50000"/>
+            </a:schemeClr>
+          </a:lnRef>
+          <a:fillRef idx="1">
+            <a:schemeClr val="accent1"/>
+          </a:fillRef>
+          <a:effectRef idx="0">
+            <a:schemeClr val="accent1"/>
+          </a:effectRef>
+          <a:fontRef idx="minor">
+            <a:schemeClr val="lt1"/>
+          </a:fontRef>
+        </p:style>
+        <p:txBody>
+          <a:bodyPr rtlCol="0" anchor="ctr"/>
+          <a:lstStyle/>
+          <a:p>
+            <a:pPr algn="ctr"/>
+            <a:endParaRPr lang="en-US"/>
+          </a:p>
+        </p:txBody>
+      </p:sp>
+      <p:sp>
+        <p:nvSpPr>
+          <p:cNvPr id="72" name="Diamond 71"/>
+          <p:cNvSpPr/>
+          <p:nvPr/>
+        </p:nvSpPr>
+        <p:spPr>
+          <a:xfrm>
+            <a:off x="5107838" y="3390665"/>
+            <a:ext cx="237744" cy="219456"/>
+          </a:xfrm>
+          <a:prstGeom prst="diamond">
+            <a:avLst/>
+          </a:prstGeom>
+          <a:solidFill>
+            <a:schemeClr val="accent6">
+              <a:lumMod val="60000"/>
+              <a:lumOff val="40000"/>
+            </a:schemeClr>
+          </a:solidFill>
+          <a:ln>
+            <a:solidFill>
+              <a:schemeClr val="accent6">
+                <a:lumMod val="60000"/>
+                <a:lumOff val="40000"/>
+              </a:schemeClr>
+            </a:solidFill>
+          </a:ln>
+        </p:spPr>
+        <p:style>
+          <a:lnRef idx="2">
+            <a:schemeClr val="accent1">
+              <a:shade val="50000"/>
+            </a:schemeClr>
+          </a:lnRef>
+          <a:fillRef idx="1">
+            <a:schemeClr val="accent1"/>
+          </a:fillRef>
+          <a:effectRef idx="0">
+            <a:schemeClr val="accent1"/>
+          </a:effectRef>
+          <a:fontRef idx="minor">
+            <a:schemeClr val="lt1"/>
+          </a:fontRef>
+        </p:style>
+        <p:txBody>
+          <a:bodyPr rtlCol="0" anchor="ctr"/>
+          <a:lstStyle/>
+          <a:p>
+            <a:pPr algn="ctr"/>
+            <a:endParaRPr lang="en-US"/>
+          </a:p>
+        </p:txBody>
+      </p:sp>
+      <p:sp>
+        <p:nvSpPr>
+          <p:cNvPr id="73" name="5-Point Star 72"/>
+          <p:cNvSpPr/>
+          <p:nvPr/>
+        </p:nvSpPr>
+        <p:spPr>
+          <a:xfrm>
+            <a:off x="5738513" y="3953581"/>
+            <a:ext cx="229514" cy="219456"/>
+          </a:xfrm>
+          <a:prstGeom prst="star5">
+            <a:avLst/>
+          </a:prstGeom>
+          <a:solidFill>
+            <a:schemeClr val="accent4"/>
+          </a:solidFill>
+          <a:ln>
+            <a:solidFill>
+              <a:schemeClr val="accent4"/>
+            </a:solidFill>
+          </a:ln>
+        </p:spPr>
+        <p:style>
+          <a:lnRef idx="2">
+            <a:schemeClr val="accent1">
+              <a:shade val="50000"/>
+            </a:schemeClr>
+          </a:lnRef>
+          <a:fillRef idx="1">
+            <a:schemeClr val="accent1"/>
+          </a:fillRef>
+          <a:effectRef idx="0">
+            <a:schemeClr val="accent1"/>
+          </a:effectRef>
+          <a:fontRef idx="minor">
+            <a:schemeClr val="lt1"/>
+          </a:fontRef>
+        </p:style>
+        <p:txBody>
+          <a:bodyPr rtlCol="0" anchor="ctr"/>
+          <a:lstStyle/>
+          <a:p>
+            <a:pPr algn="ctr"/>
+            <a:endParaRPr lang="en-US"/>
+          </a:p>
+        </p:txBody>
+      </p:sp>
+      <p:sp>
+        <p:nvSpPr>
+          <p:cNvPr id="74" name="Flowchart: Connector 73"/>
+          <p:cNvSpPr/>
+          <p:nvPr/>
+        </p:nvSpPr>
+        <p:spPr>
+          <a:xfrm>
+            <a:off x="4523405" y="3906642"/>
+            <a:ext cx="187452" cy="153690"/>
+          </a:xfrm>
+          <a:prstGeom prst="flowChartConnector">
+            <a:avLst/>
+          </a:prstGeom>
+          <a:solidFill>
+            <a:srgbClr val="7030A0"/>
+          </a:solidFill>
+          <a:ln>
+            <a:solidFill>
+              <a:srgbClr val="7030A0"/>
+            </a:solidFill>
+          </a:ln>
+        </p:spPr>
+        <p:style>
+          <a:lnRef idx="2">
+            <a:schemeClr val="accent1">
+              <a:shade val="50000"/>
+            </a:schemeClr>
+          </a:lnRef>
+          <a:fillRef idx="1">
+            <a:schemeClr val="accent1"/>
+          </a:fillRef>
+          <a:effectRef idx="0">
+            <a:schemeClr val="accent1"/>
+          </a:effectRef>
+          <a:fontRef idx="minor">
+            <a:schemeClr val="lt1"/>
+          </a:fontRef>
+        </p:style>
+        <p:txBody>
+          <a:bodyPr rtlCol="0" anchor="ctr"/>
+          <a:lstStyle/>
+          <a:p>
+            <a:pPr algn="ctr"/>
+            <a:endParaRPr lang="en-US"/>
+          </a:p>
+        </p:txBody>
+      </p:sp>
+      <p:sp>
+        <p:nvSpPr>
+          <p:cNvPr id="75" name="Rectangle 74"/>
+          <p:cNvSpPr/>
+          <p:nvPr/>
+        </p:nvSpPr>
+        <p:spPr>
+          <a:xfrm>
+            <a:off x="4884745" y="2956313"/>
+            <a:ext cx="164592" cy="153690"/>
+          </a:xfrm>
+          <a:prstGeom prst="rect">
+            <a:avLst/>
+          </a:prstGeom>
+          <a:solidFill>
+            <a:schemeClr val="accent1">
+              <a:lumMod val="75000"/>
+            </a:schemeClr>
+          </a:solidFill>
+          <a:ln>
+            <a:solidFill>
+              <a:schemeClr val="accent1">
+                <a:lumMod val="75000"/>
+              </a:schemeClr>
+            </a:solidFill>
+          </a:ln>
+        </p:spPr>
+        <p:style>
+          <a:lnRef idx="2">
+            <a:schemeClr val="accent1">
+              <a:shade val="50000"/>
+            </a:schemeClr>
+          </a:lnRef>
+          <a:fillRef idx="1">
+            <a:schemeClr val="accent1"/>
+          </a:fillRef>
+          <a:effectRef idx="0">
+            <a:schemeClr val="accent1"/>
+          </a:effectRef>
+          <a:fontRef idx="minor">
+            <a:schemeClr val="lt1"/>
+          </a:fontRef>
+        </p:style>
+        <p:txBody>
+          <a:bodyPr rtlCol="0" anchor="ctr"/>
+          <a:lstStyle/>
+          <a:p>
+            <a:pPr algn="ctr"/>
+            <a:endParaRPr lang="en-US"/>
+          </a:p>
+        </p:txBody>
+      </p:sp>
+      <p:sp>
+        <p:nvSpPr>
+          <p:cNvPr id="76" name="Rectangle 75"/>
+          <p:cNvSpPr/>
+          <p:nvPr/>
+        </p:nvSpPr>
+        <p:spPr>
+          <a:xfrm>
+            <a:off x="6440924" y="2644030"/>
+            <a:ext cx="164592" cy="153690"/>
+          </a:xfrm>
+          <a:prstGeom prst="rect">
+            <a:avLst/>
+          </a:prstGeom>
+          <a:solidFill>
+            <a:schemeClr val="accent1">
+              <a:lumMod val="75000"/>
+            </a:schemeClr>
+          </a:solidFill>
+          <a:ln>
+            <a:solidFill>
+              <a:schemeClr val="accent1">
+                <a:lumMod val="75000"/>
+              </a:schemeClr>
+            </a:solidFill>
+          </a:ln>
+        </p:spPr>
+        <p:style>
+          <a:lnRef idx="2">
+            <a:schemeClr val="accent1">
+              <a:shade val="50000"/>
+            </a:schemeClr>
+          </a:lnRef>
+          <a:fillRef idx="1">
+            <a:schemeClr val="accent1"/>
+          </a:fillRef>
+          <a:effectRef idx="0">
+            <a:schemeClr val="accent1"/>
+          </a:effectRef>
+          <a:fontRef idx="minor">
+            <a:schemeClr val="lt1"/>
+          </a:fontRef>
+        </p:style>
+        <p:txBody>
+          <a:bodyPr rtlCol="0" anchor="ctr"/>
+          <a:lstStyle/>
+          <a:p>
+            <a:pPr algn="ctr"/>
+            <a:endParaRPr lang="en-US"/>
+          </a:p>
+        </p:txBody>
+      </p:sp>
+      <p:sp>
+        <p:nvSpPr>
+          <p:cNvPr id="77" name="Rectangle 76"/>
+          <p:cNvSpPr/>
+          <p:nvPr/>
+        </p:nvSpPr>
+        <p:spPr>
+          <a:xfrm>
+            <a:off x="5156604" y="4124441"/>
+            <a:ext cx="164592" cy="153690"/>
+          </a:xfrm>
+          <a:prstGeom prst="rect">
+            <a:avLst/>
+          </a:prstGeom>
+          <a:solidFill>
+            <a:schemeClr val="accent1">
+              <a:lumMod val="75000"/>
+            </a:schemeClr>
+          </a:solidFill>
+          <a:ln>
+            <a:solidFill>
+              <a:schemeClr val="accent1">
+                <a:lumMod val="75000"/>
+              </a:schemeClr>
+            </a:solidFill>
+          </a:ln>
+        </p:spPr>
+        <p:style>
+          <a:lnRef idx="2">
+            <a:schemeClr val="accent1">
+              <a:shade val="50000"/>
+            </a:schemeClr>
+          </a:lnRef>
+          <a:fillRef idx="1">
+            <a:schemeClr val="accent1"/>
+          </a:fillRef>
+          <a:effectRef idx="0">
+            <a:schemeClr val="accent1"/>
+          </a:effectRef>
+          <a:fontRef idx="minor">
+            <a:schemeClr val="lt1"/>
+          </a:fontRef>
+        </p:style>
+        <p:txBody>
+          <a:bodyPr rtlCol="0" anchor="ctr"/>
+          <a:lstStyle/>
+          <a:p>
+            <a:pPr algn="ctr"/>
+            <a:endParaRPr lang="en-US"/>
+          </a:p>
+        </p:txBody>
+      </p:sp>
+      <p:sp>
+        <p:nvSpPr>
+          <p:cNvPr id="78" name="Rectangle 77"/>
+          <p:cNvSpPr/>
+          <p:nvPr/>
+        </p:nvSpPr>
+        <p:spPr>
+          <a:xfrm>
+            <a:off x="5573921" y="2466405"/>
+            <a:ext cx="164592" cy="153690"/>
+          </a:xfrm>
+          <a:prstGeom prst="rect">
+            <a:avLst/>
+          </a:prstGeom>
+          <a:solidFill>
+            <a:schemeClr val="accent1">
+              <a:lumMod val="75000"/>
+            </a:schemeClr>
+          </a:solidFill>
+          <a:ln>
+            <a:solidFill>
+              <a:schemeClr val="accent1">
+                <a:lumMod val="75000"/>
+              </a:schemeClr>
+            </a:solidFill>
+          </a:ln>
+        </p:spPr>
+        <p:style>
+          <a:lnRef idx="2">
+            <a:schemeClr val="accent1">
+              <a:shade val="50000"/>
+            </a:schemeClr>
+          </a:lnRef>
+          <a:fillRef idx="1">
+            <a:schemeClr val="accent1"/>
+          </a:fillRef>
+          <a:effectRef idx="0">
+            <a:schemeClr val="accent1"/>
+          </a:effectRef>
+          <a:fontRef idx="minor">
+            <a:schemeClr val="lt1"/>
+          </a:fontRef>
+        </p:style>
+        <p:txBody>
+          <a:bodyPr rtlCol="0" anchor="ctr"/>
+          <a:lstStyle/>
+          <a:p>
+            <a:pPr algn="ctr"/>
+            <a:endParaRPr lang="en-US"/>
+          </a:p>
+        </p:txBody>
+      </p:sp>
+      <p:sp>
+        <p:nvSpPr>
+          <p:cNvPr id="79" name="Rectangle 78"/>
+          <p:cNvSpPr/>
+          <p:nvPr/>
+        </p:nvSpPr>
+        <p:spPr>
+          <a:xfrm>
+            <a:off x="3709416" y="3716669"/>
+            <a:ext cx="682184" cy="712455"/>
+          </a:xfrm>
+          <a:prstGeom prst="rect">
+            <a:avLst/>
+          </a:prstGeom>
+          <a:noFill/>
+          <a:ln w="19050">
+            <a:solidFill>
+              <a:schemeClr val="tx1"/>
+            </a:solidFill>
+          </a:ln>
+        </p:spPr>
+        <p:style>
+          <a:lnRef idx="2">
+            <a:schemeClr val="accent1">
+              <a:shade val="50000"/>
+            </a:schemeClr>
+          </a:lnRef>
+          <a:fillRef idx="1">
+            <a:schemeClr val="accent1"/>
+          </a:fillRef>
+          <a:effectRef idx="0">
+            <a:schemeClr val="accent1"/>
+          </a:effectRef>
+          <a:fontRef idx="minor">
+            <a:schemeClr val="lt1"/>
+          </a:fontRef>
+        </p:style>
+        <p:txBody>
+          <a:bodyPr rtlCol="0" anchor="ctr"/>
+          <a:lstStyle/>
+          <a:p>
+            <a:pPr algn="ctr"/>
+            <a:endParaRPr lang="en-US"/>
+          </a:p>
+        </p:txBody>
+      </p:sp>
+      <p:sp>
+        <p:nvSpPr>
+          <p:cNvPr id="80" name="Rectangle 79"/>
+          <p:cNvSpPr/>
+          <p:nvPr/>
+        </p:nvSpPr>
+        <p:spPr>
+          <a:xfrm>
+            <a:off x="3709416" y="2913409"/>
+            <a:ext cx="1896486" cy="1515716"/>
+          </a:xfrm>
+          <a:prstGeom prst="rect">
+            <a:avLst/>
+          </a:prstGeom>
+          <a:noFill/>
+          <a:ln w="19050">
+            <a:solidFill>
+              <a:schemeClr val="tx1"/>
+            </a:solidFill>
+          </a:ln>
+        </p:spPr>
+        <p:style>
+          <a:lnRef idx="2">
+            <a:schemeClr val="accent1">
+              <a:shade val="50000"/>
+            </a:schemeClr>
+          </a:lnRef>
+          <a:fillRef idx="1">
+            <a:schemeClr val="accent1"/>
+          </a:fillRef>
+          <a:effectRef idx="0">
+            <a:schemeClr val="accent1"/>
+          </a:effectRef>
+          <a:fontRef idx="minor">
+            <a:schemeClr val="lt1"/>
+          </a:fontRef>
+        </p:style>
+        <p:txBody>
+          <a:bodyPr rtlCol="0" anchor="ctr"/>
+          <a:lstStyle/>
+          <a:p>
+            <a:pPr algn="ctr"/>
+            <a:endParaRPr lang="en-US"/>
+          </a:p>
+        </p:txBody>
+      </p:sp>
+      <p:sp>
+        <p:nvSpPr>
+          <p:cNvPr id="81" name="Rectangle 80"/>
+          <p:cNvSpPr/>
+          <p:nvPr/>
+        </p:nvSpPr>
+        <p:spPr>
+          <a:xfrm>
+            <a:off x="3709415" y="2319910"/>
+            <a:ext cx="3355413" cy="2108286"/>
+          </a:xfrm>
+          <a:prstGeom prst="rect">
+            <a:avLst/>
+          </a:prstGeom>
+          <a:noFill/>
+          <a:ln w="19050">
+            <a:solidFill>
+              <a:schemeClr val="tx1"/>
+            </a:solidFill>
+          </a:ln>
+        </p:spPr>
+        <p:style>
+          <a:lnRef idx="2">
+            <a:schemeClr val="accent1">
+              <a:shade val="50000"/>
+            </a:schemeClr>
+          </a:lnRef>
+          <a:fillRef idx="1">
+            <a:schemeClr val="accent1"/>
+          </a:fillRef>
+          <a:effectRef idx="0">
+            <a:schemeClr val="accent1"/>
+          </a:effectRef>
+          <a:fontRef idx="minor">
+            <a:schemeClr val="lt1"/>
+          </a:fontRef>
+        </p:style>
+        <p:txBody>
+          <a:bodyPr rtlCol="0" anchor="ctr"/>
+          <a:lstStyle/>
+          <a:p>
+            <a:pPr algn="ctr"/>
+            <a:endParaRPr lang="en-US"/>
+          </a:p>
+        </p:txBody>
+      </p:sp>
+      <p:sp>
+        <p:nvSpPr>
+          <p:cNvPr id="82" name="5-Point Star 81"/>
+          <p:cNvSpPr/>
+          <p:nvPr/>
+        </p:nvSpPr>
+        <p:spPr>
+          <a:xfrm>
+            <a:off x="299759" y="4654488"/>
+            <a:ext cx="229514" cy="219456"/>
+          </a:xfrm>
+          <a:prstGeom prst="star5">
+            <a:avLst/>
+          </a:prstGeom>
+          <a:solidFill>
+            <a:schemeClr val="accent4"/>
+          </a:solidFill>
+          <a:ln>
+            <a:solidFill>
+              <a:schemeClr val="accent4"/>
+            </a:solidFill>
+          </a:ln>
+        </p:spPr>
+        <p:style>
+          <a:lnRef idx="2">
+            <a:schemeClr val="accent1">
+              <a:shade val="50000"/>
+            </a:schemeClr>
+          </a:lnRef>
+          <a:fillRef idx="1">
+            <a:schemeClr val="accent1"/>
+          </a:fillRef>
+          <a:effectRef idx="0">
+            <a:schemeClr val="accent1"/>
+          </a:effectRef>
+          <a:fontRef idx="minor">
+            <a:schemeClr val="lt1"/>
+          </a:fontRef>
+        </p:style>
+        <p:txBody>
+          <a:bodyPr rtlCol="0" anchor="ctr"/>
+          <a:lstStyle/>
+          <a:p>
+            <a:pPr algn="ctr"/>
+            <a:endParaRPr lang="en-US"/>
+          </a:p>
+        </p:txBody>
+      </p:sp>
+      <p:sp>
+        <p:nvSpPr>
+          <p:cNvPr id="83" name="Rectangle 82"/>
+          <p:cNvSpPr/>
+          <p:nvPr/>
+        </p:nvSpPr>
+        <p:spPr>
+          <a:xfrm>
+            <a:off x="769151" y="4654488"/>
+            <a:ext cx="164592" cy="153690"/>
+          </a:xfrm>
+          <a:prstGeom prst="rect">
+            <a:avLst/>
+          </a:prstGeom>
+          <a:solidFill>
+            <a:schemeClr val="accent1">
+              <a:lumMod val="75000"/>
+            </a:schemeClr>
+          </a:solidFill>
+          <a:ln>
+            <a:solidFill>
+              <a:schemeClr val="accent1">
+                <a:lumMod val="75000"/>
+              </a:schemeClr>
+            </a:solidFill>
+          </a:ln>
+        </p:spPr>
+        <p:style>
+          <a:lnRef idx="2">
+            <a:schemeClr val="accent1">
+              <a:shade val="50000"/>
+            </a:schemeClr>
+          </a:lnRef>
+          <a:fillRef idx="1">
+            <a:schemeClr val="accent1"/>
+          </a:fillRef>
+          <a:effectRef idx="0">
+            <a:schemeClr val="accent1"/>
+          </a:effectRef>
+          <a:fontRef idx="minor">
+            <a:schemeClr val="lt1"/>
+          </a:fontRef>
+        </p:style>
+        <p:txBody>
+          <a:bodyPr rtlCol="0" anchor="ctr"/>
+          <a:lstStyle/>
+          <a:p>
+            <a:pPr algn="ctr"/>
+            <a:endParaRPr lang="en-US"/>
+          </a:p>
+        </p:txBody>
+      </p:sp>
+      <p:sp>
+        <p:nvSpPr>
+          <p:cNvPr id="84" name="Diamond 83"/>
+          <p:cNvSpPr/>
+          <p:nvPr/>
+        </p:nvSpPr>
+        <p:spPr>
+          <a:xfrm>
+            <a:off x="446063" y="6006042"/>
+            <a:ext cx="237744" cy="219456"/>
+          </a:xfrm>
+          <a:prstGeom prst="diamond">
+            <a:avLst/>
+          </a:prstGeom>
+          <a:solidFill>
+            <a:schemeClr val="accent6">
+              <a:lumMod val="60000"/>
+              <a:lumOff val="40000"/>
+            </a:schemeClr>
+          </a:solidFill>
+          <a:ln>
+            <a:solidFill>
+              <a:schemeClr val="accent6">
+                <a:lumMod val="60000"/>
+                <a:lumOff val="40000"/>
+              </a:schemeClr>
+            </a:solidFill>
+          </a:ln>
+        </p:spPr>
+        <p:style>
+          <a:lnRef idx="2">
+            <a:schemeClr val="accent1">
+              <a:shade val="50000"/>
+            </a:schemeClr>
+          </a:lnRef>
+          <a:fillRef idx="1">
+            <a:schemeClr val="accent1"/>
+          </a:fillRef>
+          <a:effectRef idx="0">
+            <a:schemeClr val="accent1"/>
+          </a:effectRef>
+          <a:fontRef idx="minor">
+            <a:schemeClr val="lt1"/>
+          </a:fontRef>
+        </p:style>
+        <p:txBody>
+          <a:bodyPr rtlCol="0" anchor="ctr"/>
+          <a:lstStyle/>
+          <a:p>
+            <a:pPr algn="ctr"/>
+            <a:endParaRPr lang="en-US"/>
+          </a:p>
+        </p:txBody>
+      </p:sp>
+      <p:sp>
+        <p:nvSpPr>
+          <p:cNvPr id="85" name="Regular Pentagon 84"/>
+          <p:cNvSpPr/>
+          <p:nvPr/>
+        </p:nvSpPr>
+        <p:spPr>
+          <a:xfrm>
+            <a:off x="2166432" y="5209720"/>
+            <a:ext cx="207872" cy="226053"/>
+          </a:xfrm>
+          <a:prstGeom prst="pentagon">
+            <a:avLst/>
+          </a:prstGeom>
+          <a:solidFill>
+            <a:srgbClr val="FF0066"/>
+          </a:solidFill>
+          <a:ln>
+            <a:solidFill>
+              <a:srgbClr val="FF0066"/>
+            </a:solidFill>
+          </a:ln>
+        </p:spPr>
+        <p:style>
+          <a:lnRef idx="2">
+            <a:schemeClr val="accent1">
+              <a:shade val="50000"/>
+            </a:schemeClr>
+          </a:lnRef>
+          <a:fillRef idx="1">
+            <a:schemeClr val="accent1"/>
+          </a:fillRef>
+          <a:effectRef idx="0">
+            <a:schemeClr val="accent1"/>
+          </a:effectRef>
+          <a:fontRef idx="minor">
+            <a:schemeClr val="lt1"/>
+          </a:fontRef>
+        </p:style>
+        <p:txBody>
+          <a:bodyPr rtlCol="0" anchor="ctr"/>
+          <a:lstStyle/>
+          <a:p>
+            <a:pPr algn="ctr"/>
+            <a:endParaRPr lang="en-US"/>
+          </a:p>
+        </p:txBody>
+      </p:sp>
+      <p:sp>
+        <p:nvSpPr>
+          <p:cNvPr id="86" name="5-Point Star 85"/>
+          <p:cNvSpPr/>
+          <p:nvPr/>
+        </p:nvSpPr>
+        <p:spPr>
+          <a:xfrm>
+            <a:off x="729091" y="5463406"/>
+            <a:ext cx="229514" cy="219456"/>
+          </a:xfrm>
+          <a:prstGeom prst="star5">
+            <a:avLst/>
+          </a:prstGeom>
+          <a:solidFill>
+            <a:schemeClr val="accent4"/>
+          </a:solidFill>
+          <a:ln>
+            <a:solidFill>
+              <a:schemeClr val="accent4"/>
+            </a:solidFill>
+          </a:ln>
+        </p:spPr>
+        <p:style>
+          <a:lnRef idx="2">
+            <a:schemeClr val="accent1">
+              <a:shade val="50000"/>
+            </a:schemeClr>
+          </a:lnRef>
+          <a:fillRef idx="1">
+            <a:schemeClr val="accent1"/>
+          </a:fillRef>
+          <a:effectRef idx="0">
+            <a:schemeClr val="accent1"/>
+          </a:effectRef>
+          <a:fontRef idx="minor">
+            <a:schemeClr val="lt1"/>
+          </a:fontRef>
+        </p:style>
+        <p:txBody>
+          <a:bodyPr rtlCol="0" anchor="ctr"/>
+          <a:lstStyle/>
+          <a:p>
+            <a:pPr algn="ctr"/>
+            <a:endParaRPr lang="en-US"/>
+          </a:p>
+        </p:txBody>
+      </p:sp>
+      <p:sp>
+        <p:nvSpPr>
+          <p:cNvPr id="87" name="Rectangle 86"/>
+          <p:cNvSpPr/>
+          <p:nvPr/>
+        </p:nvSpPr>
+        <p:spPr>
+          <a:xfrm>
+            <a:off x="332220" y="5209720"/>
+            <a:ext cx="164592" cy="153690"/>
+          </a:xfrm>
+          <a:prstGeom prst="rect">
+            <a:avLst/>
+          </a:prstGeom>
+          <a:solidFill>
+            <a:schemeClr val="accent1">
+              <a:lumMod val="75000"/>
+            </a:schemeClr>
+          </a:solidFill>
+          <a:ln>
+            <a:solidFill>
+              <a:schemeClr val="accent1">
+                <a:lumMod val="75000"/>
+              </a:schemeClr>
+            </a:solidFill>
+          </a:ln>
+        </p:spPr>
+        <p:style>
+          <a:lnRef idx="2">
+            <a:schemeClr val="accent1">
+              <a:shade val="50000"/>
+            </a:schemeClr>
+          </a:lnRef>
+          <a:fillRef idx="1">
+            <a:schemeClr val="accent1"/>
+          </a:fillRef>
+          <a:effectRef idx="0">
+            <a:schemeClr val="accent1"/>
+          </a:effectRef>
+          <a:fontRef idx="minor">
+            <a:schemeClr val="lt1"/>
+          </a:fontRef>
+        </p:style>
+        <p:txBody>
+          <a:bodyPr rtlCol="0" anchor="ctr"/>
+          <a:lstStyle/>
+          <a:p>
+            <a:pPr algn="ctr"/>
+            <a:endParaRPr lang="en-US"/>
+          </a:p>
+        </p:txBody>
+      </p:sp>
+      <p:sp>
+        <p:nvSpPr>
+          <p:cNvPr id="88" name="Diamond 87"/>
+          <p:cNvSpPr/>
+          <p:nvPr/>
+        </p:nvSpPr>
+        <p:spPr>
+          <a:xfrm>
+            <a:off x="1263841" y="4749302"/>
+            <a:ext cx="237744" cy="219456"/>
+          </a:xfrm>
+          <a:prstGeom prst="diamond">
+            <a:avLst/>
+          </a:prstGeom>
+          <a:solidFill>
+            <a:schemeClr val="accent6">
+              <a:lumMod val="60000"/>
+              <a:lumOff val="40000"/>
+            </a:schemeClr>
+          </a:solidFill>
+          <a:ln>
+            <a:solidFill>
+              <a:schemeClr val="accent6">
+                <a:lumMod val="60000"/>
+                <a:lumOff val="40000"/>
+              </a:schemeClr>
+            </a:solidFill>
+          </a:ln>
+        </p:spPr>
+        <p:style>
+          <a:lnRef idx="2">
+            <a:schemeClr val="accent1">
+              <a:shade val="50000"/>
+            </a:schemeClr>
+          </a:lnRef>
+          <a:fillRef idx="1">
+            <a:schemeClr val="accent1"/>
+          </a:fillRef>
+          <a:effectRef idx="0">
+            <a:schemeClr val="accent1"/>
+          </a:effectRef>
+          <a:fontRef idx="minor">
+            <a:schemeClr val="lt1"/>
+          </a:fontRef>
+        </p:style>
+        <p:txBody>
+          <a:bodyPr rtlCol="0" anchor="ctr"/>
+          <a:lstStyle/>
+          <a:p>
+            <a:pPr algn="ctr"/>
+            <a:endParaRPr lang="en-US"/>
+          </a:p>
+        </p:txBody>
+      </p:sp>
+      <p:sp>
+        <p:nvSpPr>
+          <p:cNvPr id="89" name="Diamond 88"/>
+          <p:cNvSpPr/>
+          <p:nvPr/>
+        </p:nvSpPr>
+        <p:spPr>
+          <a:xfrm>
+            <a:off x="3057764" y="5458452"/>
+            <a:ext cx="237744" cy="219456"/>
+          </a:xfrm>
+          <a:prstGeom prst="diamond">
+            <a:avLst/>
+          </a:prstGeom>
+          <a:solidFill>
+            <a:schemeClr val="accent6">
+              <a:lumMod val="60000"/>
+              <a:lumOff val="40000"/>
+            </a:schemeClr>
+          </a:solidFill>
+          <a:ln>
+            <a:solidFill>
+              <a:schemeClr val="accent6">
+                <a:lumMod val="60000"/>
+                <a:lumOff val="40000"/>
+              </a:schemeClr>
+            </a:solidFill>
+          </a:ln>
+        </p:spPr>
+        <p:style>
+          <a:lnRef idx="2">
+            <a:schemeClr val="accent1">
+              <a:shade val="50000"/>
+            </a:schemeClr>
+          </a:lnRef>
+          <a:fillRef idx="1">
+            <a:schemeClr val="accent1"/>
+          </a:fillRef>
+          <a:effectRef idx="0">
+            <a:schemeClr val="accent1"/>
+          </a:effectRef>
+          <a:fontRef idx="minor">
+            <a:schemeClr val="lt1"/>
+          </a:fontRef>
+        </p:style>
+        <p:txBody>
+          <a:bodyPr rtlCol="0" anchor="ctr"/>
+          <a:lstStyle/>
+          <a:p>
+            <a:pPr algn="ctr"/>
+            <a:endParaRPr lang="en-US"/>
+          </a:p>
+        </p:txBody>
+      </p:sp>
+      <p:sp>
+        <p:nvSpPr>
+          <p:cNvPr id="90" name="Diamond 89"/>
+          <p:cNvSpPr/>
+          <p:nvPr/>
+        </p:nvSpPr>
+        <p:spPr>
+          <a:xfrm>
+            <a:off x="2768639" y="6007800"/>
+            <a:ext cx="237744" cy="219456"/>
+          </a:xfrm>
+          <a:prstGeom prst="diamond">
+            <a:avLst/>
+          </a:prstGeom>
+          <a:solidFill>
+            <a:schemeClr val="accent6">
+              <a:lumMod val="60000"/>
+              <a:lumOff val="40000"/>
+            </a:schemeClr>
+          </a:solidFill>
+          <a:ln>
+            <a:solidFill>
+              <a:schemeClr val="accent6">
+                <a:lumMod val="60000"/>
+                <a:lumOff val="40000"/>
+              </a:schemeClr>
+            </a:solidFill>
+          </a:ln>
+        </p:spPr>
+        <p:style>
+          <a:lnRef idx="2">
+            <a:schemeClr val="accent1">
+              <a:shade val="50000"/>
+            </a:schemeClr>
+          </a:lnRef>
+          <a:fillRef idx="1">
+            <a:schemeClr val="accent1"/>
+          </a:fillRef>
+          <a:effectRef idx="0">
+            <a:schemeClr val="accent1"/>
+          </a:effectRef>
+          <a:fontRef idx="minor">
+            <a:schemeClr val="lt1"/>
+          </a:fontRef>
+        </p:style>
+        <p:txBody>
+          <a:bodyPr rtlCol="0" anchor="ctr"/>
+          <a:lstStyle/>
+          <a:p>
+            <a:pPr algn="ctr"/>
+            <a:endParaRPr lang="en-US"/>
+          </a:p>
+        </p:txBody>
+      </p:sp>
+      <p:sp>
+        <p:nvSpPr>
+          <p:cNvPr id="91" name="Diamond 90"/>
+          <p:cNvSpPr/>
+          <p:nvPr/>
+        </p:nvSpPr>
+        <p:spPr>
+          <a:xfrm>
+            <a:off x="1560086" y="5581971"/>
+            <a:ext cx="237744" cy="219456"/>
+          </a:xfrm>
+          <a:prstGeom prst="diamond">
+            <a:avLst/>
+          </a:prstGeom>
+          <a:solidFill>
+            <a:schemeClr val="accent6">
+              <a:lumMod val="60000"/>
+              <a:lumOff val="40000"/>
+            </a:schemeClr>
+          </a:solidFill>
+          <a:ln>
+            <a:solidFill>
+              <a:schemeClr val="accent6">
+                <a:lumMod val="60000"/>
+                <a:lumOff val="40000"/>
+              </a:schemeClr>
+            </a:solidFill>
+          </a:ln>
+        </p:spPr>
+        <p:style>
+          <a:lnRef idx="2">
+            <a:schemeClr val="accent1">
+              <a:shade val="50000"/>
+            </a:schemeClr>
+          </a:lnRef>
+          <a:fillRef idx="1">
+            <a:schemeClr val="accent1"/>
+          </a:fillRef>
+          <a:effectRef idx="0">
+            <a:schemeClr val="accent1"/>
+          </a:effectRef>
+          <a:fontRef idx="minor">
+            <a:schemeClr val="lt1"/>
+          </a:fontRef>
+        </p:style>
+        <p:txBody>
+          <a:bodyPr rtlCol="0" anchor="ctr"/>
+          <a:lstStyle/>
+          <a:p>
+            <a:pPr algn="ctr"/>
+            <a:endParaRPr lang="en-US"/>
+          </a:p>
+        </p:txBody>
+      </p:sp>
+      <p:sp>
+        <p:nvSpPr>
+          <p:cNvPr id="92" name="5-Point Star 91"/>
+          <p:cNvSpPr/>
+          <p:nvPr/>
+        </p:nvSpPr>
+        <p:spPr>
+          <a:xfrm>
+            <a:off x="2190761" y="6144887"/>
+            <a:ext cx="229514" cy="219456"/>
+          </a:xfrm>
+          <a:prstGeom prst="star5">
+            <a:avLst/>
+          </a:prstGeom>
+          <a:solidFill>
+            <a:schemeClr val="accent4"/>
+          </a:solidFill>
+          <a:ln>
+            <a:solidFill>
+              <a:schemeClr val="accent4"/>
+            </a:solidFill>
+          </a:ln>
+        </p:spPr>
+        <p:style>
+          <a:lnRef idx="2">
+            <a:schemeClr val="accent1">
+              <a:shade val="50000"/>
+            </a:schemeClr>
+          </a:lnRef>
+          <a:fillRef idx="1">
+            <a:schemeClr val="accent1"/>
+          </a:fillRef>
+          <a:effectRef idx="0">
+            <a:schemeClr val="accent1"/>
+          </a:effectRef>
+          <a:fontRef idx="minor">
+            <a:schemeClr val="lt1"/>
+          </a:fontRef>
+        </p:style>
+        <p:txBody>
+          <a:bodyPr rtlCol="0" anchor="ctr"/>
+          <a:lstStyle/>
+          <a:p>
+            <a:pPr algn="ctr"/>
+            <a:endParaRPr lang="en-US"/>
+          </a:p>
+        </p:txBody>
+      </p:sp>
+      <p:sp>
+        <p:nvSpPr>
+          <p:cNvPr id="93" name="Flowchart: Connector 92"/>
+          <p:cNvSpPr/>
+          <p:nvPr/>
+        </p:nvSpPr>
+        <p:spPr>
+          <a:xfrm>
+            <a:off x="975653" y="6097948"/>
+            <a:ext cx="187452" cy="153690"/>
+          </a:xfrm>
+          <a:prstGeom prst="flowChartConnector">
+            <a:avLst/>
+          </a:prstGeom>
+          <a:solidFill>
+            <a:srgbClr val="7030A0"/>
+          </a:solidFill>
+          <a:ln>
+            <a:solidFill>
+              <a:srgbClr val="7030A0"/>
+            </a:solidFill>
+          </a:ln>
+        </p:spPr>
+        <p:style>
+          <a:lnRef idx="2">
+            <a:schemeClr val="accent1">
+              <a:shade val="50000"/>
+            </a:schemeClr>
+          </a:lnRef>
+          <a:fillRef idx="1">
+            <a:schemeClr val="accent1"/>
+          </a:fillRef>
+          <a:effectRef idx="0">
+            <a:schemeClr val="accent1"/>
+          </a:effectRef>
+          <a:fontRef idx="minor">
+            <a:schemeClr val="lt1"/>
+          </a:fontRef>
+        </p:style>
+        <p:txBody>
+          <a:bodyPr rtlCol="0" anchor="ctr"/>
+          <a:lstStyle/>
+          <a:p>
+            <a:pPr algn="ctr"/>
+            <a:endParaRPr lang="en-US"/>
+          </a:p>
+        </p:txBody>
+      </p:sp>
+      <p:sp>
+        <p:nvSpPr>
+          <p:cNvPr id="94" name="Rectangle 93"/>
+          <p:cNvSpPr/>
+          <p:nvPr/>
+        </p:nvSpPr>
+        <p:spPr>
+          <a:xfrm>
+            <a:off x="1336993" y="5147619"/>
+            <a:ext cx="164592" cy="153690"/>
+          </a:xfrm>
+          <a:prstGeom prst="rect">
+            <a:avLst/>
+          </a:prstGeom>
+          <a:solidFill>
+            <a:schemeClr val="accent1">
+              <a:lumMod val="75000"/>
+            </a:schemeClr>
+          </a:solidFill>
+          <a:ln>
+            <a:solidFill>
+              <a:schemeClr val="accent1">
+                <a:lumMod val="75000"/>
+              </a:schemeClr>
+            </a:solidFill>
+          </a:ln>
+        </p:spPr>
+        <p:style>
+          <a:lnRef idx="2">
+            <a:schemeClr val="accent1">
+              <a:shade val="50000"/>
+            </a:schemeClr>
+          </a:lnRef>
+          <a:fillRef idx="1">
+            <a:schemeClr val="accent1"/>
+          </a:fillRef>
+          <a:effectRef idx="0">
+            <a:schemeClr val="accent1"/>
+          </a:effectRef>
+          <a:fontRef idx="minor">
+            <a:schemeClr val="lt1"/>
+          </a:fontRef>
+        </p:style>
+        <p:txBody>
+          <a:bodyPr rtlCol="0" anchor="ctr"/>
+          <a:lstStyle/>
+          <a:p>
+            <a:pPr algn="ctr"/>
+            <a:endParaRPr lang="en-US"/>
+          </a:p>
+        </p:txBody>
+      </p:sp>
+      <p:sp>
+        <p:nvSpPr>
+          <p:cNvPr id="95" name="Rectangle 94"/>
+          <p:cNvSpPr/>
+          <p:nvPr/>
+        </p:nvSpPr>
+        <p:spPr>
+          <a:xfrm>
+            <a:off x="2893172" y="4835336"/>
+            <a:ext cx="164592" cy="153690"/>
+          </a:xfrm>
+          <a:prstGeom prst="rect">
+            <a:avLst/>
+          </a:prstGeom>
+          <a:solidFill>
+            <a:schemeClr val="accent1">
+              <a:lumMod val="75000"/>
+            </a:schemeClr>
+          </a:solidFill>
+          <a:ln>
+            <a:solidFill>
+              <a:schemeClr val="accent1">
+                <a:lumMod val="75000"/>
+              </a:schemeClr>
+            </a:solidFill>
+          </a:ln>
+        </p:spPr>
+        <p:style>
+          <a:lnRef idx="2">
+            <a:schemeClr val="accent1">
+              <a:shade val="50000"/>
+            </a:schemeClr>
+          </a:lnRef>
+          <a:fillRef idx="1">
+            <a:schemeClr val="accent1"/>
+          </a:fillRef>
+          <a:effectRef idx="0">
+            <a:schemeClr val="accent1"/>
+          </a:effectRef>
+          <a:fontRef idx="minor">
+            <a:schemeClr val="lt1"/>
+          </a:fontRef>
+        </p:style>
+        <p:txBody>
+          <a:bodyPr rtlCol="0" anchor="ctr"/>
+          <a:lstStyle/>
+          <a:p>
+            <a:pPr algn="ctr"/>
+            <a:endParaRPr lang="en-US"/>
+          </a:p>
+        </p:txBody>
+      </p:sp>
+      <p:sp>
+        <p:nvSpPr>
+          <p:cNvPr id="96" name="Rectangle 95"/>
+          <p:cNvSpPr/>
+          <p:nvPr/>
+        </p:nvSpPr>
+        <p:spPr>
+          <a:xfrm>
+            <a:off x="1608852" y="6315747"/>
+            <a:ext cx="164592" cy="153690"/>
+          </a:xfrm>
+          <a:prstGeom prst="rect">
+            <a:avLst/>
+          </a:prstGeom>
+          <a:solidFill>
+            <a:schemeClr val="accent1">
+              <a:lumMod val="75000"/>
+            </a:schemeClr>
+          </a:solidFill>
+          <a:ln>
+            <a:solidFill>
+              <a:schemeClr val="accent1">
+                <a:lumMod val="75000"/>
+              </a:schemeClr>
+            </a:solidFill>
+          </a:ln>
+        </p:spPr>
+        <p:style>
+          <a:lnRef idx="2">
+            <a:schemeClr val="accent1">
+              <a:shade val="50000"/>
+            </a:schemeClr>
+          </a:lnRef>
+          <a:fillRef idx="1">
+            <a:schemeClr val="accent1"/>
+          </a:fillRef>
+          <a:effectRef idx="0">
+            <a:schemeClr val="accent1"/>
+          </a:effectRef>
+          <a:fontRef idx="minor">
+            <a:schemeClr val="lt1"/>
+          </a:fontRef>
+        </p:style>
+        <p:txBody>
+          <a:bodyPr rtlCol="0" anchor="ctr"/>
+          <a:lstStyle/>
+          <a:p>
+            <a:pPr algn="ctr"/>
+            <a:endParaRPr lang="en-US"/>
+          </a:p>
+        </p:txBody>
+      </p:sp>
+      <p:sp>
+        <p:nvSpPr>
+          <p:cNvPr id="97" name="Rectangle 96"/>
+          <p:cNvSpPr/>
+          <p:nvPr/>
+        </p:nvSpPr>
+        <p:spPr>
+          <a:xfrm>
+            <a:off x="2026169" y="4657711"/>
+            <a:ext cx="164592" cy="153690"/>
+          </a:xfrm>
+          <a:prstGeom prst="rect">
+            <a:avLst/>
+          </a:prstGeom>
+          <a:solidFill>
+            <a:schemeClr val="accent1">
+              <a:lumMod val="75000"/>
+            </a:schemeClr>
+          </a:solidFill>
+          <a:ln>
+            <a:solidFill>
+              <a:schemeClr val="accent1">
+                <a:lumMod val="75000"/>
+              </a:schemeClr>
+            </a:solidFill>
+          </a:ln>
+        </p:spPr>
+        <p:style>
+          <a:lnRef idx="2">
+            <a:schemeClr val="accent1">
+              <a:shade val="50000"/>
+            </a:schemeClr>
+          </a:lnRef>
+          <a:fillRef idx="1">
+            <a:schemeClr val="accent1"/>
+          </a:fillRef>
+          <a:effectRef idx="0">
+            <a:schemeClr val="accent1"/>
+          </a:effectRef>
+          <a:fontRef idx="minor">
+            <a:schemeClr val="lt1"/>
+          </a:fontRef>
+        </p:style>
+        <p:txBody>
+          <a:bodyPr rtlCol="0" anchor="ctr"/>
+          <a:lstStyle/>
+          <a:p>
+            <a:pPr algn="ctr"/>
+            <a:endParaRPr lang="en-US"/>
+          </a:p>
+        </p:txBody>
+      </p:sp>
+    </p:spTree>
+    <p:extLst>
+      <p:ext uri="{BB962C8B-B14F-4D97-AF65-F5344CB8AC3E}">
+        <p14:creationId xmlns:p14="http://schemas.microsoft.com/office/powerpoint/2010/main" val="2991351660"/>
+      </p:ext>
+    </p:extLst>
+  </p:cSld>
+  <p:clrMapOvr>
+    <a:masterClrMapping/>
+  </p:clrMapOvr>
+</p:sld>
+</file>
+
+<file path=ppt/slides/slide3.xml><?xml version="1.0" encoding="utf-8"?>
+<p:sld xmlns:a="http://schemas.openxmlformats.org/drawingml/2006/main" xmlns:r="http://schemas.openxmlformats.org/officeDocument/2006/relationships" xmlns:p="http://schemas.openxmlformats.org/presentationml/2006/main">
+  <p:cSld>
+    <p:spTree>
+      <p:nvGrpSpPr>
+        <p:cNvPr id="1" name=""/>
+        <p:cNvGrpSpPr/>
+        <p:nvPr/>
+      </p:nvGrpSpPr>
+      <p:grpSpPr>
+        <a:xfrm>
+          <a:off x="0" y="0"/>
+          <a:ext cx="0" cy="0"/>
+          <a:chOff x="0" y="0"/>
+          <a:chExt cx="0" cy="0"/>
+        </a:xfrm>
+      </p:grpSpPr>
       <p:pic>
         <p:nvPicPr>
           <p:cNvPr id="3" name="Picture 2"/>
@@ -5912,7 +9837,7 @@
 </p:sld>
 </file>
 
-<file path=ppt/slides/slide3.xml><?xml version="1.0" encoding="utf-8"?>
+<file path=ppt/slides/slide4.xml><?xml version="1.0" encoding="utf-8"?>
 <p:sld xmlns:a="http://schemas.openxmlformats.org/drawingml/2006/main" xmlns:r="http://schemas.openxmlformats.org/officeDocument/2006/relationships" xmlns:p="http://schemas.openxmlformats.org/presentationml/2006/main">
   <p:cSld>
     <p:spTree>
@@ -6356,7 +10281,7 @@
 </p:sld>
 </file>
 
-<file path=ppt/slides/slide4.xml><?xml version="1.0" encoding="utf-8"?>
+<file path=ppt/slides/slide5.xml><?xml version="1.0" encoding="utf-8"?>
 <p:sld xmlns:a="http://schemas.openxmlformats.org/drawingml/2006/main" xmlns:r="http://schemas.openxmlformats.org/officeDocument/2006/relationships" xmlns:p="http://schemas.openxmlformats.org/presentationml/2006/main">
   <p:cSld>
     <p:spTree>
@@ -6896,7 +10821,7 @@
 </p:sld>
 </file>
 
-<file path=ppt/slides/slide5.xml><?xml version="1.0" encoding="utf-8"?>
+<file path=ppt/slides/slide6.xml><?xml version="1.0" encoding="utf-8"?>
 <p:sld xmlns:a="http://schemas.openxmlformats.org/drawingml/2006/main" xmlns:r="http://schemas.openxmlformats.org/officeDocument/2006/relationships" xmlns:p="http://schemas.openxmlformats.org/presentationml/2006/main">
   <p:cSld>
     <p:spTree>
@@ -6994,7 +10919,7 @@
 </p:sld>
 </file>
 
-<file path=ppt/slides/slide6.xml><?xml version="1.0" encoding="utf-8"?>
+<file path=ppt/slides/slide7.xml><?xml version="1.0" encoding="utf-8"?>
 <p:sld xmlns:a="http://schemas.openxmlformats.org/drawingml/2006/main" xmlns:r="http://schemas.openxmlformats.org/officeDocument/2006/relationships" xmlns:p="http://schemas.openxmlformats.org/presentationml/2006/main">
   <p:cSld>
     <p:spTree>

</xml_diff>

<commit_message>
rerunning analysis after spot chekcing against Coyle env data
</commit_message>
<xml_diff>
--- a/output/plots/all_figs_with_legends.pptx
+++ b/output/plots/all_figs_with_legends.pptx
@@ -203,7 +203,7 @@
           <a:p>
             <a:fld id="{7FA21820-D199-4D82-91AF-C50B1D3B111A}" type="datetimeFigureOut">
               <a:rPr lang="en-US" smtClean="0"/>
-              <a:t>5/1/2017</a:t>
+              <a:t>5/2/2017</a:t>
             </a:fld>
             <a:endParaRPr lang="en-US"/>
           </a:p>
@@ -1036,7 +1036,7 @@
           <a:p>
             <a:fld id="{916B8C92-D5E3-4480-8685-D57BEE386DE2}" type="datetimeFigureOut">
               <a:rPr lang="en-US" smtClean="0"/>
-              <a:t>5/1/2017</a:t>
+              <a:t>5/2/2017</a:t>
             </a:fld>
             <a:endParaRPr lang="en-US"/>
           </a:p>
@@ -1206,7 +1206,7 @@
           <a:p>
             <a:fld id="{916B8C92-D5E3-4480-8685-D57BEE386DE2}" type="datetimeFigureOut">
               <a:rPr lang="en-US" smtClean="0"/>
-              <a:t>5/1/2017</a:t>
+              <a:t>5/2/2017</a:t>
             </a:fld>
             <a:endParaRPr lang="en-US"/>
           </a:p>
@@ -1386,7 +1386,7 @@
           <a:p>
             <a:fld id="{916B8C92-D5E3-4480-8685-D57BEE386DE2}" type="datetimeFigureOut">
               <a:rPr lang="en-US" smtClean="0"/>
-              <a:t>5/1/2017</a:t>
+              <a:t>5/2/2017</a:t>
             </a:fld>
             <a:endParaRPr lang="en-US"/>
           </a:p>
@@ -1556,7 +1556,7 @@
           <a:p>
             <a:fld id="{916B8C92-D5E3-4480-8685-D57BEE386DE2}" type="datetimeFigureOut">
               <a:rPr lang="en-US" smtClean="0"/>
-              <a:t>5/1/2017</a:t>
+              <a:t>5/2/2017</a:t>
             </a:fld>
             <a:endParaRPr lang="en-US"/>
           </a:p>
@@ -1802,7 +1802,7 @@
           <a:p>
             <a:fld id="{916B8C92-D5E3-4480-8685-D57BEE386DE2}" type="datetimeFigureOut">
               <a:rPr lang="en-US" smtClean="0"/>
-              <a:t>5/1/2017</a:t>
+              <a:t>5/2/2017</a:t>
             </a:fld>
             <a:endParaRPr lang="en-US"/>
           </a:p>
@@ -2034,7 +2034,7 @@
           <a:p>
             <a:fld id="{916B8C92-D5E3-4480-8685-D57BEE386DE2}" type="datetimeFigureOut">
               <a:rPr lang="en-US" smtClean="0"/>
-              <a:t>5/1/2017</a:t>
+              <a:t>5/2/2017</a:t>
             </a:fld>
             <a:endParaRPr lang="en-US"/>
           </a:p>
@@ -2401,7 +2401,7 @@
           <a:p>
             <a:fld id="{916B8C92-D5E3-4480-8685-D57BEE386DE2}" type="datetimeFigureOut">
               <a:rPr lang="en-US" smtClean="0"/>
-              <a:t>5/1/2017</a:t>
+              <a:t>5/2/2017</a:t>
             </a:fld>
             <a:endParaRPr lang="en-US"/>
           </a:p>
@@ -2519,7 +2519,7 @@
           <a:p>
             <a:fld id="{916B8C92-D5E3-4480-8685-D57BEE386DE2}" type="datetimeFigureOut">
               <a:rPr lang="en-US" smtClean="0"/>
-              <a:t>5/1/2017</a:t>
+              <a:t>5/2/2017</a:t>
             </a:fld>
             <a:endParaRPr lang="en-US"/>
           </a:p>
@@ -2614,7 +2614,7 @@
           <a:p>
             <a:fld id="{916B8C92-D5E3-4480-8685-D57BEE386DE2}" type="datetimeFigureOut">
               <a:rPr lang="en-US" smtClean="0"/>
-              <a:t>5/1/2017</a:t>
+              <a:t>5/2/2017</a:t>
             </a:fld>
             <a:endParaRPr lang="en-US"/>
           </a:p>
@@ -2891,7 +2891,7 @@
           <a:p>
             <a:fld id="{916B8C92-D5E3-4480-8685-D57BEE386DE2}" type="datetimeFigureOut">
               <a:rPr lang="en-US" smtClean="0"/>
-              <a:t>5/1/2017</a:t>
+              <a:t>5/2/2017</a:t>
             </a:fld>
             <a:endParaRPr lang="en-US"/>
           </a:p>
@@ -3144,7 +3144,7 @@
           <a:p>
             <a:fld id="{916B8C92-D5E3-4480-8685-D57BEE386DE2}" type="datetimeFigureOut">
               <a:rPr lang="en-US" smtClean="0"/>
-              <a:t>5/1/2017</a:t>
+              <a:t>5/2/2017</a:t>
             </a:fld>
             <a:endParaRPr lang="en-US"/>
           </a:p>
@@ -3357,7 +3357,7 @@
           <a:p>
             <a:fld id="{916B8C92-D5E3-4480-8685-D57BEE386DE2}" type="datetimeFigureOut">
               <a:rPr lang="en-US" smtClean="0"/>
-              <a:t>5/1/2017</a:t>
+              <a:t>5/2/2017</a:t>
             </a:fld>
             <a:endParaRPr lang="en-US"/>
           </a:p>
@@ -5940,13 +5940,13 @@
           <p:nvPr>
             <p:extLst>
               <p:ext uri="{D42A27DB-BD31-4B8C-83A1-F6EECF244321}">
-                <p14:modId xmlns:p14="http://schemas.microsoft.com/office/powerpoint/2010/main" val="3885029145"/>
+                <p14:modId xmlns:p14="http://schemas.microsoft.com/office/powerpoint/2010/main" val="1776820716"/>
               </p:ext>
             </p:extLst>
           </p:nvPr>
         </p:nvGraphicFramePr>
         <p:xfrm>
-          <a:off x="7293864" y="4857895"/>
+          <a:off x="7235952" y="5032367"/>
           <a:ext cx="4822650" cy="1112520"/>
         </p:xfrm>
         <a:graphic>
@@ -6495,7 +6495,7 @@
         </p:nvSpPr>
         <p:spPr>
           <a:xfrm>
-            <a:off x="408431" y="3051596"/>
+            <a:off x="474197" y="3049678"/>
             <a:ext cx="45719" cy="45719"/>
           </a:xfrm>
           <a:prstGeom prst="flowChartConnector">
@@ -6543,7 +6543,7 @@
         </p:nvSpPr>
         <p:spPr>
           <a:xfrm>
-            <a:off x="408431" y="3962185"/>
+            <a:off x="474197" y="3960267"/>
             <a:ext cx="45719" cy="45719"/>
           </a:xfrm>
           <a:prstGeom prst="flowChartConnector">
@@ -6591,7 +6591,7 @@
         </p:nvSpPr>
         <p:spPr>
           <a:xfrm>
-            <a:off x="3200970" y="2529508"/>
+            <a:off x="3266736" y="2527590"/>
             <a:ext cx="45719" cy="45719"/>
           </a:xfrm>
           <a:prstGeom prst="flowChartConnector">
@@ -6669,7 +6669,7 @@
         </p:nvSpPr>
         <p:spPr>
           <a:xfrm rot="16200000">
-            <a:off x="-145818" y="3109816"/>
+            <a:off x="-136195" y="3285237"/>
             <a:ext cx="848822" cy="246221"/>
           </a:xfrm>
           <a:prstGeom prst="rect">
@@ -6699,7 +6699,7 @@
         </p:nvSpPr>
         <p:spPr>
           <a:xfrm>
-            <a:off x="7356348" y="2375942"/>
+            <a:off x="7218163" y="2983312"/>
             <a:ext cx="2995966" cy="923330"/>
           </a:xfrm>
           <a:prstGeom prst="rect">
@@ -6765,7 +6765,7 @@
         </p:nvCxnSpPr>
         <p:spPr>
           <a:xfrm flipV="1">
-            <a:off x="523189" y="2602038"/>
+            <a:off x="588955" y="2600120"/>
             <a:ext cx="2645686" cy="1348477"/>
           </a:xfrm>
           <a:prstGeom prst="line">
@@ -6801,7 +6801,7 @@
         </p:nvCxnSpPr>
         <p:spPr>
           <a:xfrm flipV="1">
-            <a:off x="491867" y="2584630"/>
+            <a:off x="557633" y="2582712"/>
             <a:ext cx="2635642" cy="474268"/>
           </a:xfrm>
           <a:prstGeom prst="line">
@@ -7752,7 +7752,7 @@
         <p:spPr>
           <a:xfrm>
             <a:off x="3709415" y="2319910"/>
-            <a:ext cx="3355413" cy="2108286"/>
+            <a:ext cx="3441193" cy="2108286"/>
           </a:xfrm>
           <a:prstGeom prst="rect">
             <a:avLst/>
@@ -8611,6 +8611,76 @@
           </a:p>
         </p:txBody>
       </p:sp>
+      <p:cxnSp>
+        <p:nvCxnSpPr>
+          <p:cNvPr id="11" name="Straight Connector 10"/>
+          <p:cNvCxnSpPr/>
+          <p:nvPr/>
+        </p:nvCxnSpPr>
+        <p:spPr>
+          <a:xfrm>
+            <a:off x="406498" y="2436439"/>
+            <a:ext cx="0" cy="1796087"/>
+          </a:xfrm>
+          <a:prstGeom prst="line">
+            <a:avLst/>
+          </a:prstGeom>
+          <a:ln>
+            <a:solidFill>
+              <a:schemeClr val="tx1"/>
+            </a:solidFill>
+          </a:ln>
+        </p:spPr>
+        <p:style>
+          <a:lnRef idx="1">
+            <a:schemeClr val="accent1"/>
+          </a:lnRef>
+          <a:fillRef idx="0">
+            <a:schemeClr val="accent1"/>
+          </a:fillRef>
+          <a:effectRef idx="0">
+            <a:schemeClr val="accent1"/>
+          </a:effectRef>
+          <a:fontRef idx="minor">
+            <a:schemeClr val="tx1"/>
+          </a:fontRef>
+        </p:style>
+      </p:cxnSp>
+      <p:cxnSp>
+        <p:nvCxnSpPr>
+          <p:cNvPr id="98" name="Straight Connector 97"/>
+          <p:cNvCxnSpPr/>
+          <p:nvPr/>
+        </p:nvCxnSpPr>
+        <p:spPr>
+          <a:xfrm flipH="1">
+            <a:off x="406497" y="4234953"/>
+            <a:ext cx="3011434" cy="4068"/>
+          </a:xfrm>
+          <a:prstGeom prst="line">
+            <a:avLst/>
+          </a:prstGeom>
+          <a:ln>
+            <a:solidFill>
+              <a:schemeClr val="tx1"/>
+            </a:solidFill>
+          </a:ln>
+        </p:spPr>
+        <p:style>
+          <a:lnRef idx="1">
+            <a:schemeClr val="accent1"/>
+          </a:lnRef>
+          <a:fillRef idx="0">
+            <a:schemeClr val="accent1"/>
+          </a:fillRef>
+          <a:effectRef idx="0">
+            <a:schemeClr val="accent1"/>
+          </a:effectRef>
+          <a:fontRef idx="minor">
+            <a:schemeClr val="tx1"/>
+          </a:fontRef>
+        </p:style>
+      </p:cxnSp>
     </p:spTree>
     <p:extLst>
       <p:ext uri="{BB962C8B-B14F-4D97-AF65-F5344CB8AC3E}">

</xml_diff>

<commit_message>
fixed elevatio, working on fig 3 supp
</commit_message>
<xml_diff>
--- a/output/plots/all_figs_with_legends.pptx
+++ b/output/plots/all_figs_with_legends.pptx
@@ -203,7 +203,7 @@
           <a:p>
             <a:fld id="{7FA21820-D199-4D82-91AF-C50B1D3B111A}" type="datetimeFigureOut">
               <a:rPr lang="en-US" smtClean="0"/>
-              <a:t>5/2/2017</a:t>
+              <a:t>5/3/2017</a:t>
             </a:fld>
             <a:endParaRPr lang="en-US"/>
           </a:p>
@@ -1036,7 +1036,7 @@
           <a:p>
             <a:fld id="{916B8C92-D5E3-4480-8685-D57BEE386DE2}" type="datetimeFigureOut">
               <a:rPr lang="en-US" smtClean="0"/>
-              <a:t>5/2/2017</a:t>
+              <a:t>5/3/2017</a:t>
             </a:fld>
             <a:endParaRPr lang="en-US"/>
           </a:p>
@@ -1206,7 +1206,7 @@
           <a:p>
             <a:fld id="{916B8C92-D5E3-4480-8685-D57BEE386DE2}" type="datetimeFigureOut">
               <a:rPr lang="en-US" smtClean="0"/>
-              <a:t>5/2/2017</a:t>
+              <a:t>5/3/2017</a:t>
             </a:fld>
             <a:endParaRPr lang="en-US"/>
           </a:p>
@@ -1386,7 +1386,7 @@
           <a:p>
             <a:fld id="{916B8C92-D5E3-4480-8685-D57BEE386DE2}" type="datetimeFigureOut">
               <a:rPr lang="en-US" smtClean="0"/>
-              <a:t>5/2/2017</a:t>
+              <a:t>5/3/2017</a:t>
             </a:fld>
             <a:endParaRPr lang="en-US"/>
           </a:p>
@@ -1556,7 +1556,7 @@
           <a:p>
             <a:fld id="{916B8C92-D5E3-4480-8685-D57BEE386DE2}" type="datetimeFigureOut">
               <a:rPr lang="en-US" smtClean="0"/>
-              <a:t>5/2/2017</a:t>
+              <a:t>5/3/2017</a:t>
             </a:fld>
             <a:endParaRPr lang="en-US"/>
           </a:p>
@@ -1802,7 +1802,7 @@
           <a:p>
             <a:fld id="{916B8C92-D5E3-4480-8685-D57BEE386DE2}" type="datetimeFigureOut">
               <a:rPr lang="en-US" smtClean="0"/>
-              <a:t>5/2/2017</a:t>
+              <a:t>5/3/2017</a:t>
             </a:fld>
             <a:endParaRPr lang="en-US"/>
           </a:p>
@@ -2034,7 +2034,7 @@
           <a:p>
             <a:fld id="{916B8C92-D5E3-4480-8685-D57BEE386DE2}" type="datetimeFigureOut">
               <a:rPr lang="en-US" smtClean="0"/>
-              <a:t>5/2/2017</a:t>
+              <a:t>5/3/2017</a:t>
             </a:fld>
             <a:endParaRPr lang="en-US"/>
           </a:p>
@@ -2401,7 +2401,7 @@
           <a:p>
             <a:fld id="{916B8C92-D5E3-4480-8685-D57BEE386DE2}" type="datetimeFigureOut">
               <a:rPr lang="en-US" smtClean="0"/>
-              <a:t>5/2/2017</a:t>
+              <a:t>5/3/2017</a:t>
             </a:fld>
             <a:endParaRPr lang="en-US"/>
           </a:p>
@@ -2519,7 +2519,7 @@
           <a:p>
             <a:fld id="{916B8C92-D5E3-4480-8685-D57BEE386DE2}" type="datetimeFigureOut">
               <a:rPr lang="en-US" smtClean="0"/>
-              <a:t>5/2/2017</a:t>
+              <a:t>5/3/2017</a:t>
             </a:fld>
             <a:endParaRPr lang="en-US"/>
           </a:p>
@@ -2614,7 +2614,7 @@
           <a:p>
             <a:fld id="{916B8C92-D5E3-4480-8685-D57BEE386DE2}" type="datetimeFigureOut">
               <a:rPr lang="en-US" smtClean="0"/>
-              <a:t>5/2/2017</a:t>
+              <a:t>5/3/2017</a:t>
             </a:fld>
             <a:endParaRPr lang="en-US"/>
           </a:p>
@@ -2891,7 +2891,7 @@
           <a:p>
             <a:fld id="{916B8C92-D5E3-4480-8685-D57BEE386DE2}" type="datetimeFigureOut">
               <a:rPr lang="en-US" smtClean="0"/>
-              <a:t>5/2/2017</a:t>
+              <a:t>5/3/2017</a:t>
             </a:fld>
             <a:endParaRPr lang="en-US"/>
           </a:p>
@@ -3144,7 +3144,7 @@
           <a:p>
             <a:fld id="{916B8C92-D5E3-4480-8685-D57BEE386DE2}" type="datetimeFigureOut">
               <a:rPr lang="en-US" smtClean="0"/>
-              <a:t>5/2/2017</a:t>
+              <a:t>5/3/2017</a:t>
             </a:fld>
             <a:endParaRPr lang="en-US"/>
           </a:p>
@@ -3357,7 +3357,7 @@
           <a:p>
             <a:fld id="{916B8C92-D5E3-4480-8685-D57BEE386DE2}" type="datetimeFigureOut">
               <a:rPr lang="en-US" smtClean="0"/>
-              <a:t>5/2/2017</a:t>
+              <a:t>5/3/2017</a:t>
             </a:fld>
             <a:endParaRPr lang="en-US"/>
           </a:p>
@@ -10948,7 +10948,7 @@
       </p:sp>
       <p:pic>
         <p:nvPicPr>
-          <p:cNvPr id="3" name="Picture 2"/>
+          <p:cNvPr id="2" name="Picture 1"/>
           <p:cNvPicPr>
             <a:picLocks noChangeAspect="1"/>
           </p:cNvPicPr>
@@ -10956,13 +10956,13 @@
         </p:nvPicPr>
         <p:blipFill rotWithShape="1">
           <a:blip r:embed="rId2"/>
-          <a:srcRect l="302" r="338"/>
+          <a:srcRect l="571"/>
           <a:stretch/>
         </p:blipFill>
         <p:spPr>
           <a:xfrm>
-            <a:off x="1499616" y="134914"/>
-            <a:ext cx="9025128" cy="6723086"/>
+            <a:off x="1306285" y="65314"/>
+            <a:ext cx="9094916" cy="6792686"/>
           </a:xfrm>
           <a:prstGeom prst="rect">
             <a:avLst/>

</xml_diff>

<commit_message>
reassigned axes to fig 1e
</commit_message>
<xml_diff>
--- a/output/plots/all_figs_with_legends.pptx
+++ b/output/plots/all_figs_with_legends.pptx
@@ -8711,30 +8711,6 @@
           <a:chExt cx="0" cy="0"/>
         </a:xfrm>
       </p:grpSpPr>
-      <p:pic>
-        <p:nvPicPr>
-          <p:cNvPr id="3" name="Picture 2"/>
-          <p:cNvPicPr>
-            <a:picLocks noChangeAspect="1"/>
-          </p:cNvPicPr>
-          <p:nvPr/>
-        </p:nvPicPr>
-        <p:blipFill>
-          <a:blip r:embed="rId3"/>
-          <a:stretch>
-            <a:fillRect/>
-          </a:stretch>
-        </p:blipFill>
-        <p:spPr>
-          <a:xfrm>
-            <a:off x="1105432" y="422"/>
-            <a:ext cx="8744459" cy="6585429"/>
-          </a:xfrm>
-          <a:prstGeom prst="rect">
-            <a:avLst/>
-          </a:prstGeom>
-        </p:spPr>
-      </p:pic>
       <p:sp>
         <p:nvSpPr>
           <p:cNvPr id="2" name="TextBox 1"/>
@@ -8767,160 +8743,223 @@
       </p:sp>
       <p:grpSp>
         <p:nvGrpSpPr>
-          <p:cNvPr id="40" name="Group 39"/>
+          <p:cNvPr id="5" name="Group 4"/>
           <p:cNvGrpSpPr/>
           <p:nvPr/>
         </p:nvGrpSpPr>
         <p:grpSpPr>
           <a:xfrm>
-            <a:off x="1955798" y="4009611"/>
-            <a:ext cx="3255436" cy="375380"/>
-            <a:chOff x="2721075" y="6066646"/>
-            <a:chExt cx="2738999" cy="243895"/>
+            <a:off x="1173289" y="0"/>
+            <a:ext cx="8655352" cy="6864325"/>
+            <a:chOff x="1173289" y="0"/>
+            <a:chExt cx="8655352" cy="6864325"/>
           </a:xfrm>
         </p:grpSpPr>
+        <p:pic>
+          <p:nvPicPr>
+            <p:cNvPr id="4" name="Picture 3"/>
+            <p:cNvPicPr>
+              <a:picLocks noChangeAspect="1"/>
+            </p:cNvPicPr>
+            <p:nvPr/>
+          </p:nvPicPr>
+          <p:blipFill>
+            <a:blip r:embed="rId3"/>
+            <a:stretch>
+              <a:fillRect/>
+            </a:stretch>
+          </p:blipFill>
+          <p:spPr>
+            <a:xfrm>
+              <a:off x="1173289" y="0"/>
+              <a:ext cx="8655352" cy="6864325"/>
+            </a:xfrm>
+            <a:prstGeom prst="rect">
+              <a:avLst/>
+            </a:prstGeom>
+          </p:spPr>
+        </p:pic>
         <p:grpSp>
           <p:nvGrpSpPr>
-            <p:cNvPr id="52" name="Group 51"/>
+            <p:cNvPr id="40" name="Group 39"/>
             <p:cNvGrpSpPr/>
             <p:nvPr/>
           </p:nvGrpSpPr>
           <p:grpSpPr>
             <a:xfrm>
-              <a:off x="2721075" y="6066646"/>
-              <a:ext cx="2738999" cy="243895"/>
+              <a:off x="1955798" y="4009611"/>
+              <a:ext cx="3255436" cy="375380"/>
               <a:chOff x="2721075" y="6066646"/>
               <a:chExt cx="2738999" cy="243895"/>
             </a:xfrm>
           </p:grpSpPr>
           <p:grpSp>
             <p:nvGrpSpPr>
-              <p:cNvPr id="55" name="Group 54"/>
+              <p:cNvPr id="52" name="Group 51"/>
               <p:cNvGrpSpPr/>
               <p:nvPr/>
             </p:nvGrpSpPr>
             <p:grpSpPr>
               <a:xfrm>
-                <a:off x="2721075" y="6083191"/>
-                <a:ext cx="2738999" cy="227350"/>
-                <a:chOff x="2887074" y="6083191"/>
-                <a:chExt cx="2738999" cy="227350"/>
+                <a:off x="2721075" y="6066646"/>
+                <a:ext cx="2738999" cy="243895"/>
+                <a:chOff x="2721075" y="6066646"/>
+                <a:chExt cx="2738999" cy="243895"/>
               </a:xfrm>
             </p:grpSpPr>
+            <p:grpSp>
+              <p:nvGrpSpPr>
+                <p:cNvPr id="55" name="Group 54"/>
+                <p:cNvGrpSpPr/>
+                <p:nvPr/>
+              </p:nvGrpSpPr>
+              <p:grpSpPr>
+                <a:xfrm>
+                  <a:off x="2721075" y="6083191"/>
+                  <a:ext cx="2738999" cy="227350"/>
+                  <a:chOff x="2887074" y="6083191"/>
+                  <a:chExt cx="2738999" cy="227350"/>
+                </a:xfrm>
+              </p:grpSpPr>
+              <p:pic>
+                <p:nvPicPr>
+                  <p:cNvPr id="57" name="Picture 56"/>
+                  <p:cNvPicPr>
+                    <a:picLocks noChangeAspect="1"/>
+                  </p:cNvPicPr>
+                  <p:nvPr/>
+                </p:nvPicPr>
+                <p:blipFill>
+                  <a:blip r:embed="rId4" cstate="print">
+                    <a:extLst>
+                      <a:ext uri="{28A0092B-C50C-407E-A947-70E740481C1C}">
+                        <a14:useLocalDpi xmlns:a14="http://schemas.microsoft.com/office/drawing/2010/main" val="0"/>
+                      </a:ext>
+                    </a:extLst>
+                  </a:blip>
+                  <a:stretch>
+                    <a:fillRect/>
+                  </a:stretch>
+                </p:blipFill>
+                <p:spPr>
+                  <a:xfrm>
+                    <a:off x="4079269" y="6103833"/>
+                    <a:ext cx="325640" cy="161565"/>
+                  </a:xfrm>
+                  <a:prstGeom prst="rect">
+                    <a:avLst/>
+                  </a:prstGeom>
+                </p:spPr>
+              </p:pic>
+              <p:pic>
+                <p:nvPicPr>
+                  <p:cNvPr id="58" name="Picture 57"/>
+                  <p:cNvPicPr>
+                    <a:picLocks noChangeAspect="1"/>
+                  </p:cNvPicPr>
+                  <p:nvPr/>
+                </p:nvPicPr>
+                <p:blipFill>
+                  <a:blip r:embed="rId5" cstate="print">
+                    <a:extLst>
+                      <a:ext uri="{28A0092B-C50C-407E-A947-70E740481C1C}">
+                        <a14:useLocalDpi xmlns:a14="http://schemas.microsoft.com/office/drawing/2010/main" val="0"/>
+                      </a:ext>
+                    </a:extLst>
+                  </a:blip>
+                  <a:stretch>
+                    <a:fillRect/>
+                  </a:stretch>
+                </p:blipFill>
+                <p:spPr>
+                  <a:xfrm>
+                    <a:off x="5345440" y="6084945"/>
+                    <a:ext cx="280633" cy="225596"/>
+                  </a:xfrm>
+                  <a:prstGeom prst="rect">
+                    <a:avLst/>
+                  </a:prstGeom>
+                </p:spPr>
+              </p:pic>
+              <p:pic>
+                <p:nvPicPr>
+                  <p:cNvPr id="59" name="Picture 58"/>
+                  <p:cNvPicPr>
+                    <a:picLocks noChangeAspect="1"/>
+                  </p:cNvPicPr>
+                  <p:nvPr/>
+                </p:nvPicPr>
+                <p:blipFill>
+                  <a:blip r:embed="rId6" cstate="print">
+                    <a:extLst>
+                      <a:ext uri="{28A0092B-C50C-407E-A947-70E740481C1C}">
+                        <a14:useLocalDpi xmlns:a14="http://schemas.microsoft.com/office/drawing/2010/main" val="0"/>
+                      </a:ext>
+                    </a:extLst>
+                  </a:blip>
+                  <a:stretch>
+                    <a:fillRect/>
+                  </a:stretch>
+                </p:blipFill>
+                <p:spPr>
+                  <a:xfrm>
+                    <a:off x="4515280" y="6084945"/>
+                    <a:ext cx="274386" cy="225596"/>
+                  </a:xfrm>
+                  <a:prstGeom prst="rect">
+                    <a:avLst/>
+                  </a:prstGeom>
+                </p:spPr>
+              </p:pic>
+              <p:pic>
+                <p:nvPicPr>
+                  <p:cNvPr id="60" name="Picture 59"/>
+                  <p:cNvPicPr>
+                    <a:picLocks noChangeAspect="1"/>
+                  </p:cNvPicPr>
+                  <p:nvPr/>
+                </p:nvPicPr>
+                <p:blipFill>
+                  <a:blip r:embed="rId7" cstate="print">
+                    <a:extLst>
+                      <a:ext uri="{28A0092B-C50C-407E-A947-70E740481C1C}">
+                        <a14:useLocalDpi xmlns:a14="http://schemas.microsoft.com/office/drawing/2010/main" val="0"/>
+                      </a:ext>
+                    </a:extLst>
+                  </a:blip>
+                  <a:stretch>
+                    <a:fillRect/>
+                  </a:stretch>
+                </p:blipFill>
+                <p:spPr>
+                  <a:xfrm flipH="1">
+                    <a:off x="2887074" y="6083191"/>
+                    <a:ext cx="255789" cy="218495"/>
+                  </a:xfrm>
+                  <a:prstGeom prst="rect">
+                    <a:avLst/>
+                  </a:prstGeom>
+                </p:spPr>
+              </p:pic>
+            </p:grpSp>
             <p:pic>
               <p:nvPicPr>
-                <p:cNvPr id="57" name="Picture 56"/>
+                <p:cNvPr id="56" name="Picture 55"/>
                 <p:cNvPicPr>
                   <a:picLocks noChangeAspect="1"/>
                 </p:cNvPicPr>
                 <p:nvPr/>
               </p:nvPicPr>
               <p:blipFill>
-                <a:blip r:embed="rId4" cstate="print">
-                  <a:extLst>
-                    <a:ext uri="{28A0092B-C50C-407E-A947-70E740481C1C}">
-                      <a14:useLocalDpi xmlns:a14="http://schemas.microsoft.com/office/drawing/2010/main" val="0"/>
-                    </a:ext>
-                  </a:extLst>
-                </a:blip>
+                <a:blip r:embed="rId8"/>
                 <a:stretch>
                   <a:fillRect/>
                 </a:stretch>
               </p:blipFill>
               <p:spPr>
                 <a:xfrm>
-                  <a:off x="4079269" y="6103833"/>
-                  <a:ext cx="325640" cy="161565"/>
-                </a:xfrm>
-                <a:prstGeom prst="rect">
-                  <a:avLst/>
-                </a:prstGeom>
-              </p:spPr>
-            </p:pic>
-            <p:pic>
-              <p:nvPicPr>
-                <p:cNvPr id="58" name="Picture 57"/>
-                <p:cNvPicPr>
-                  <a:picLocks noChangeAspect="1"/>
-                </p:cNvPicPr>
-                <p:nvPr/>
-              </p:nvPicPr>
-              <p:blipFill>
-                <a:blip r:embed="rId5" cstate="print">
-                  <a:extLst>
-                    <a:ext uri="{28A0092B-C50C-407E-A947-70E740481C1C}">
-                      <a14:useLocalDpi xmlns:a14="http://schemas.microsoft.com/office/drawing/2010/main" val="0"/>
-                    </a:ext>
-                  </a:extLst>
-                </a:blip>
-                <a:stretch>
-                  <a:fillRect/>
-                </a:stretch>
-              </p:blipFill>
-              <p:spPr>
-                <a:xfrm>
-                  <a:off x="5345440" y="6084945"/>
-                  <a:ext cx="280633" cy="225596"/>
-                </a:xfrm>
-                <a:prstGeom prst="rect">
-                  <a:avLst/>
-                </a:prstGeom>
-              </p:spPr>
-            </p:pic>
-            <p:pic>
-              <p:nvPicPr>
-                <p:cNvPr id="59" name="Picture 58"/>
-                <p:cNvPicPr>
-                  <a:picLocks noChangeAspect="1"/>
-                </p:cNvPicPr>
-                <p:nvPr/>
-              </p:nvPicPr>
-              <p:blipFill>
-                <a:blip r:embed="rId6" cstate="print">
-                  <a:extLst>
-                    <a:ext uri="{28A0092B-C50C-407E-A947-70E740481C1C}">
-                      <a14:useLocalDpi xmlns:a14="http://schemas.microsoft.com/office/drawing/2010/main" val="0"/>
-                    </a:ext>
-                  </a:extLst>
-                </a:blip>
-                <a:stretch>
-                  <a:fillRect/>
-                </a:stretch>
-              </p:blipFill>
-              <p:spPr>
-                <a:xfrm>
-                  <a:off x="4515280" y="6084945"/>
-                  <a:ext cx="274386" cy="225596"/>
-                </a:xfrm>
-                <a:prstGeom prst="rect">
-                  <a:avLst/>
-                </a:prstGeom>
-              </p:spPr>
-            </p:pic>
-            <p:pic>
-              <p:nvPicPr>
-                <p:cNvPr id="60" name="Picture 59"/>
-                <p:cNvPicPr>
-                  <a:picLocks noChangeAspect="1"/>
-                </p:cNvPicPr>
-                <p:nvPr/>
-              </p:nvPicPr>
-              <p:blipFill>
-                <a:blip r:embed="rId7" cstate="print">
-                  <a:extLst>
-                    <a:ext uri="{28A0092B-C50C-407E-A947-70E740481C1C}">
-                      <a14:useLocalDpi xmlns:a14="http://schemas.microsoft.com/office/drawing/2010/main" val="0"/>
-                    </a:ext>
-                  </a:extLst>
-                </a:blip>
-                <a:stretch>
-                  <a:fillRect/>
-                </a:stretch>
-              </p:blipFill>
-              <p:spPr>
-                <a:xfrm flipH="1">
-                  <a:off x="2887074" y="6083191"/>
-                  <a:ext cx="255789" cy="218495"/>
+                  <a:off x="4734039" y="6066646"/>
+                  <a:ext cx="302061" cy="235941"/>
                 </a:xfrm>
                 <a:prstGeom prst="rect">
                   <a:avLst/>
@@ -8930,22 +8969,46 @@
           </p:grpSp>
           <p:pic>
             <p:nvPicPr>
-              <p:cNvPr id="56" name="Picture 55"/>
+              <p:cNvPr id="53" name="Picture 52"/>
               <p:cNvPicPr>
                 <a:picLocks noChangeAspect="1"/>
               </p:cNvPicPr>
               <p:nvPr/>
             </p:nvPicPr>
             <p:blipFill>
-              <a:blip r:embed="rId8"/>
+              <a:blip r:embed="rId9"/>
               <a:stretch>
                 <a:fillRect/>
               </a:stretch>
             </p:blipFill>
             <p:spPr>
               <a:xfrm>
-                <a:off x="4734039" y="6066646"/>
-                <a:ext cx="302061" cy="235941"/>
+                <a:off x="3506696" y="6098817"/>
+                <a:ext cx="334903" cy="198223"/>
+              </a:xfrm>
+              <a:prstGeom prst="rect">
+                <a:avLst/>
+              </a:prstGeom>
+            </p:spPr>
+          </p:pic>
+          <p:pic>
+            <p:nvPicPr>
+              <p:cNvPr id="54" name="Picture 53"/>
+              <p:cNvPicPr>
+                <a:picLocks noChangeAspect="1"/>
+              </p:cNvPicPr>
+              <p:nvPr/>
+            </p:nvPicPr>
+            <p:blipFill>
+              <a:blip r:embed="rId10"/>
+              <a:stretch>
+                <a:fillRect/>
+              </a:stretch>
+            </p:blipFill>
+            <p:spPr>
+              <a:xfrm>
+                <a:off x="3107726" y="6098817"/>
+                <a:ext cx="327300" cy="196986"/>
               </a:xfrm>
               <a:prstGeom prst="rect">
                 <a:avLst/>
@@ -8953,385 +9016,361 @@
             </p:spPr>
           </p:pic>
         </p:grpSp>
-        <p:pic>
-          <p:nvPicPr>
-            <p:cNvPr id="53" name="Picture 52"/>
-            <p:cNvPicPr>
-              <a:picLocks noChangeAspect="1"/>
-            </p:cNvPicPr>
-            <p:nvPr/>
-          </p:nvPicPr>
-          <p:blipFill>
-            <a:blip r:embed="rId9"/>
-            <a:stretch>
-              <a:fillRect/>
-            </a:stretch>
-          </p:blipFill>
-          <p:spPr>
-            <a:xfrm>
-              <a:off x="3506696" y="6098817"/>
-              <a:ext cx="334903" cy="198223"/>
-            </a:xfrm>
-            <a:prstGeom prst="rect">
-              <a:avLst/>
-            </a:prstGeom>
-          </p:spPr>
-        </p:pic>
-        <p:pic>
-          <p:nvPicPr>
-            <p:cNvPr id="54" name="Picture 53"/>
-            <p:cNvPicPr>
-              <a:picLocks noChangeAspect="1"/>
-            </p:cNvPicPr>
-            <p:nvPr/>
-          </p:nvPicPr>
-          <p:blipFill>
-            <a:blip r:embed="rId10"/>
-            <a:stretch>
-              <a:fillRect/>
-            </a:stretch>
-          </p:blipFill>
-          <p:spPr>
-            <a:xfrm>
-              <a:off x="3107726" y="6098817"/>
-              <a:ext cx="327300" cy="196986"/>
-            </a:xfrm>
-            <a:prstGeom prst="rect">
-              <a:avLst/>
-            </a:prstGeom>
-          </p:spPr>
-        </p:pic>
-      </p:grpSp>
-      <p:grpSp>
-        <p:nvGrpSpPr>
-          <p:cNvPr id="8" name="Group 7"/>
-          <p:cNvGrpSpPr/>
-          <p:nvPr/>
-        </p:nvGrpSpPr>
-        <p:grpSpPr>
-          <a:xfrm>
-            <a:off x="2066372" y="1693067"/>
-            <a:ext cx="3063411" cy="422147"/>
-            <a:chOff x="2066372" y="1693067"/>
-            <a:chExt cx="3063411" cy="422147"/>
-          </a:xfrm>
-        </p:grpSpPr>
-        <p:pic>
-          <p:nvPicPr>
-            <p:cNvPr id="64" name="Picture 63"/>
-            <p:cNvPicPr>
-              <a:picLocks noChangeAspect="1"/>
-            </p:cNvPicPr>
-            <p:nvPr/>
-          </p:nvPicPr>
-          <p:blipFill>
-            <a:blip r:embed="rId11"/>
-            <a:stretch>
-              <a:fillRect/>
-            </a:stretch>
-          </p:blipFill>
-          <p:spPr>
-            <a:xfrm>
-              <a:off x="2066372" y="1693067"/>
-              <a:ext cx="655912" cy="396304"/>
-            </a:xfrm>
-            <a:prstGeom prst="rect">
-              <a:avLst/>
-            </a:prstGeom>
-          </p:spPr>
-        </p:pic>
-        <p:pic>
-          <p:nvPicPr>
-            <p:cNvPr id="66" name="Picture 65"/>
-            <p:cNvPicPr>
-              <a:picLocks noChangeAspect="1"/>
-            </p:cNvPicPr>
-            <p:nvPr/>
-          </p:nvPicPr>
-          <p:blipFill>
-            <a:blip r:embed="rId12"/>
-            <a:stretch>
-              <a:fillRect/>
-            </a:stretch>
-          </p:blipFill>
-          <p:spPr>
-            <a:xfrm>
-              <a:off x="4401304" y="1744278"/>
-              <a:ext cx="728479" cy="293882"/>
-            </a:xfrm>
-            <a:prstGeom prst="rect">
-              <a:avLst/>
-            </a:prstGeom>
-          </p:spPr>
-        </p:pic>
-        <p:pic>
-          <p:nvPicPr>
-            <p:cNvPr id="67" name="Picture 66"/>
-            <p:cNvPicPr>
-              <a:picLocks noChangeAspect="1"/>
-            </p:cNvPicPr>
-            <p:nvPr/>
-          </p:nvPicPr>
-          <p:blipFill>
-            <a:blip r:embed="rId13"/>
-            <a:stretch>
-              <a:fillRect/>
-            </a:stretch>
-          </p:blipFill>
-          <p:spPr>
-            <a:xfrm>
-              <a:off x="3263114" y="1706270"/>
-              <a:ext cx="640805" cy="408944"/>
-            </a:xfrm>
-            <a:prstGeom prst="rect">
-              <a:avLst/>
-            </a:prstGeom>
-          </p:spPr>
-        </p:pic>
-      </p:grpSp>
-      <p:grpSp>
-        <p:nvGrpSpPr>
-          <p:cNvPr id="68" name="Group 67"/>
-          <p:cNvGrpSpPr/>
-          <p:nvPr/>
-        </p:nvGrpSpPr>
-        <p:grpSpPr>
-          <a:xfrm>
-            <a:off x="6434156" y="1706270"/>
-            <a:ext cx="3063411" cy="422147"/>
-            <a:chOff x="2066372" y="1693067"/>
-            <a:chExt cx="3063411" cy="422147"/>
-          </a:xfrm>
-        </p:grpSpPr>
-        <p:pic>
-          <p:nvPicPr>
-            <p:cNvPr id="69" name="Picture 68"/>
-            <p:cNvPicPr>
-              <a:picLocks noChangeAspect="1"/>
-            </p:cNvPicPr>
-            <p:nvPr/>
-          </p:nvPicPr>
-          <p:blipFill>
-            <a:blip r:embed="rId11"/>
-            <a:stretch>
-              <a:fillRect/>
-            </a:stretch>
-          </p:blipFill>
-          <p:spPr>
-            <a:xfrm>
-              <a:off x="2066372" y="1693067"/>
-              <a:ext cx="655912" cy="396304"/>
-            </a:xfrm>
-            <a:prstGeom prst="rect">
-              <a:avLst/>
-            </a:prstGeom>
-          </p:spPr>
-        </p:pic>
-        <p:pic>
-          <p:nvPicPr>
-            <p:cNvPr id="70" name="Picture 69"/>
-            <p:cNvPicPr>
-              <a:picLocks noChangeAspect="1"/>
-            </p:cNvPicPr>
-            <p:nvPr/>
-          </p:nvPicPr>
-          <p:blipFill>
-            <a:blip r:embed="rId12"/>
-            <a:stretch>
-              <a:fillRect/>
-            </a:stretch>
-          </p:blipFill>
-          <p:spPr>
-            <a:xfrm>
-              <a:off x="4401304" y="1744278"/>
-              <a:ext cx="728479" cy="293882"/>
-            </a:xfrm>
-            <a:prstGeom prst="rect">
-              <a:avLst/>
-            </a:prstGeom>
-          </p:spPr>
-        </p:pic>
-        <p:pic>
-          <p:nvPicPr>
-            <p:cNvPr id="71" name="Picture 70"/>
-            <p:cNvPicPr>
-              <a:picLocks noChangeAspect="1"/>
-            </p:cNvPicPr>
-            <p:nvPr/>
-          </p:nvPicPr>
-          <p:blipFill>
-            <a:blip r:embed="rId13"/>
-            <a:stretch>
-              <a:fillRect/>
-            </a:stretch>
-          </p:blipFill>
-          <p:spPr>
-            <a:xfrm>
-              <a:off x="3263114" y="1706270"/>
-              <a:ext cx="640805" cy="408944"/>
-            </a:xfrm>
-            <a:prstGeom prst="rect">
-              <a:avLst/>
-            </a:prstGeom>
-          </p:spPr>
-        </p:pic>
-      </p:grpSp>
-      <p:grpSp>
-        <p:nvGrpSpPr>
-          <p:cNvPr id="72" name="Group 71"/>
-          <p:cNvGrpSpPr/>
-          <p:nvPr/>
-        </p:nvGrpSpPr>
-        <p:grpSpPr>
-          <a:xfrm>
-            <a:off x="6323582" y="4059126"/>
-            <a:ext cx="3255436" cy="375380"/>
-            <a:chOff x="2721075" y="6066646"/>
-            <a:chExt cx="2738999" cy="243895"/>
-          </a:xfrm>
-        </p:grpSpPr>
         <p:grpSp>
           <p:nvGrpSpPr>
-            <p:cNvPr id="73" name="Group 72"/>
+            <p:cNvPr id="8" name="Group 7"/>
             <p:cNvGrpSpPr/>
             <p:nvPr/>
           </p:nvGrpSpPr>
           <p:grpSpPr>
             <a:xfrm>
-              <a:off x="2721075" y="6066646"/>
-              <a:ext cx="2738999" cy="243895"/>
+              <a:off x="2066372" y="1693067"/>
+              <a:ext cx="3063411" cy="422147"/>
+              <a:chOff x="2066372" y="1693067"/>
+              <a:chExt cx="3063411" cy="422147"/>
+            </a:xfrm>
+          </p:grpSpPr>
+          <p:pic>
+            <p:nvPicPr>
+              <p:cNvPr id="64" name="Picture 63"/>
+              <p:cNvPicPr>
+                <a:picLocks noChangeAspect="1"/>
+              </p:cNvPicPr>
+              <p:nvPr/>
+            </p:nvPicPr>
+            <p:blipFill>
+              <a:blip r:embed="rId11"/>
+              <a:stretch>
+                <a:fillRect/>
+              </a:stretch>
+            </p:blipFill>
+            <p:spPr>
+              <a:xfrm>
+                <a:off x="2066372" y="1693067"/>
+                <a:ext cx="655912" cy="396304"/>
+              </a:xfrm>
+              <a:prstGeom prst="rect">
+                <a:avLst/>
+              </a:prstGeom>
+            </p:spPr>
+          </p:pic>
+          <p:pic>
+            <p:nvPicPr>
+              <p:cNvPr id="66" name="Picture 65"/>
+              <p:cNvPicPr>
+                <a:picLocks noChangeAspect="1"/>
+              </p:cNvPicPr>
+              <p:nvPr/>
+            </p:nvPicPr>
+            <p:blipFill>
+              <a:blip r:embed="rId12"/>
+              <a:stretch>
+                <a:fillRect/>
+              </a:stretch>
+            </p:blipFill>
+            <p:spPr>
+              <a:xfrm>
+                <a:off x="4401304" y="1744278"/>
+                <a:ext cx="728479" cy="293882"/>
+              </a:xfrm>
+              <a:prstGeom prst="rect">
+                <a:avLst/>
+              </a:prstGeom>
+            </p:spPr>
+          </p:pic>
+          <p:pic>
+            <p:nvPicPr>
+              <p:cNvPr id="67" name="Picture 66"/>
+              <p:cNvPicPr>
+                <a:picLocks noChangeAspect="1"/>
+              </p:cNvPicPr>
+              <p:nvPr/>
+            </p:nvPicPr>
+            <p:blipFill>
+              <a:blip r:embed="rId13"/>
+              <a:stretch>
+                <a:fillRect/>
+              </a:stretch>
+            </p:blipFill>
+            <p:spPr>
+              <a:xfrm>
+                <a:off x="3263114" y="1706270"/>
+                <a:ext cx="640805" cy="408944"/>
+              </a:xfrm>
+              <a:prstGeom prst="rect">
+                <a:avLst/>
+              </a:prstGeom>
+            </p:spPr>
+          </p:pic>
+        </p:grpSp>
+        <p:grpSp>
+          <p:nvGrpSpPr>
+            <p:cNvPr id="68" name="Group 67"/>
+            <p:cNvGrpSpPr/>
+            <p:nvPr/>
+          </p:nvGrpSpPr>
+          <p:grpSpPr>
+            <a:xfrm>
+              <a:off x="6434156" y="1706270"/>
+              <a:ext cx="3063411" cy="422147"/>
+              <a:chOff x="2066372" y="1693067"/>
+              <a:chExt cx="3063411" cy="422147"/>
+            </a:xfrm>
+          </p:grpSpPr>
+          <p:pic>
+            <p:nvPicPr>
+              <p:cNvPr id="69" name="Picture 68"/>
+              <p:cNvPicPr>
+                <a:picLocks noChangeAspect="1"/>
+              </p:cNvPicPr>
+              <p:nvPr/>
+            </p:nvPicPr>
+            <p:blipFill>
+              <a:blip r:embed="rId11"/>
+              <a:stretch>
+                <a:fillRect/>
+              </a:stretch>
+            </p:blipFill>
+            <p:spPr>
+              <a:xfrm>
+                <a:off x="2066372" y="1693067"/>
+                <a:ext cx="655912" cy="396304"/>
+              </a:xfrm>
+              <a:prstGeom prst="rect">
+                <a:avLst/>
+              </a:prstGeom>
+            </p:spPr>
+          </p:pic>
+          <p:pic>
+            <p:nvPicPr>
+              <p:cNvPr id="70" name="Picture 69"/>
+              <p:cNvPicPr>
+                <a:picLocks noChangeAspect="1"/>
+              </p:cNvPicPr>
+              <p:nvPr/>
+            </p:nvPicPr>
+            <p:blipFill>
+              <a:blip r:embed="rId12"/>
+              <a:stretch>
+                <a:fillRect/>
+              </a:stretch>
+            </p:blipFill>
+            <p:spPr>
+              <a:xfrm>
+                <a:off x="4401304" y="1744278"/>
+                <a:ext cx="728479" cy="293882"/>
+              </a:xfrm>
+              <a:prstGeom prst="rect">
+                <a:avLst/>
+              </a:prstGeom>
+            </p:spPr>
+          </p:pic>
+          <p:pic>
+            <p:nvPicPr>
+              <p:cNvPr id="71" name="Picture 70"/>
+              <p:cNvPicPr>
+                <a:picLocks noChangeAspect="1"/>
+              </p:cNvPicPr>
+              <p:nvPr/>
+            </p:nvPicPr>
+            <p:blipFill>
+              <a:blip r:embed="rId13"/>
+              <a:stretch>
+                <a:fillRect/>
+              </a:stretch>
+            </p:blipFill>
+            <p:spPr>
+              <a:xfrm>
+                <a:off x="3263114" y="1706270"/>
+                <a:ext cx="640805" cy="408944"/>
+              </a:xfrm>
+              <a:prstGeom prst="rect">
+                <a:avLst/>
+              </a:prstGeom>
+            </p:spPr>
+          </p:pic>
+        </p:grpSp>
+        <p:grpSp>
+          <p:nvGrpSpPr>
+            <p:cNvPr id="72" name="Group 71"/>
+            <p:cNvGrpSpPr/>
+            <p:nvPr/>
+          </p:nvGrpSpPr>
+          <p:grpSpPr>
+            <a:xfrm>
+              <a:off x="6323582" y="4059126"/>
+              <a:ext cx="3255436" cy="375380"/>
               <a:chOff x="2721075" y="6066646"/>
               <a:chExt cx="2738999" cy="243895"/>
             </a:xfrm>
           </p:grpSpPr>
           <p:grpSp>
             <p:nvGrpSpPr>
-              <p:cNvPr id="76" name="Group 75"/>
+              <p:cNvPr id="73" name="Group 72"/>
               <p:cNvGrpSpPr/>
               <p:nvPr/>
             </p:nvGrpSpPr>
             <p:grpSpPr>
               <a:xfrm>
-                <a:off x="2721075" y="6083191"/>
-                <a:ext cx="2738999" cy="227350"/>
-                <a:chOff x="2887074" y="6083191"/>
-                <a:chExt cx="2738999" cy="227350"/>
+                <a:off x="2721075" y="6066646"/>
+                <a:ext cx="2738999" cy="243895"/>
+                <a:chOff x="2721075" y="6066646"/>
+                <a:chExt cx="2738999" cy="243895"/>
               </a:xfrm>
             </p:grpSpPr>
+            <p:grpSp>
+              <p:nvGrpSpPr>
+                <p:cNvPr id="76" name="Group 75"/>
+                <p:cNvGrpSpPr/>
+                <p:nvPr/>
+              </p:nvGrpSpPr>
+              <p:grpSpPr>
+                <a:xfrm>
+                  <a:off x="2721075" y="6083191"/>
+                  <a:ext cx="2738999" cy="227350"/>
+                  <a:chOff x="2887074" y="6083191"/>
+                  <a:chExt cx="2738999" cy="227350"/>
+                </a:xfrm>
+              </p:grpSpPr>
+              <p:pic>
+                <p:nvPicPr>
+                  <p:cNvPr id="78" name="Picture 77"/>
+                  <p:cNvPicPr>
+                    <a:picLocks noChangeAspect="1"/>
+                  </p:cNvPicPr>
+                  <p:nvPr/>
+                </p:nvPicPr>
+                <p:blipFill>
+                  <a:blip r:embed="rId4" cstate="print">
+                    <a:extLst>
+                      <a:ext uri="{28A0092B-C50C-407E-A947-70E740481C1C}">
+                        <a14:useLocalDpi xmlns:a14="http://schemas.microsoft.com/office/drawing/2010/main" val="0"/>
+                      </a:ext>
+                    </a:extLst>
+                  </a:blip>
+                  <a:stretch>
+                    <a:fillRect/>
+                  </a:stretch>
+                </p:blipFill>
+                <p:spPr>
+                  <a:xfrm>
+                    <a:off x="4079269" y="6103833"/>
+                    <a:ext cx="325640" cy="161565"/>
+                  </a:xfrm>
+                  <a:prstGeom prst="rect">
+                    <a:avLst/>
+                  </a:prstGeom>
+                </p:spPr>
+              </p:pic>
+              <p:pic>
+                <p:nvPicPr>
+                  <p:cNvPr id="79" name="Picture 78"/>
+                  <p:cNvPicPr>
+                    <a:picLocks noChangeAspect="1"/>
+                  </p:cNvPicPr>
+                  <p:nvPr/>
+                </p:nvPicPr>
+                <p:blipFill>
+                  <a:blip r:embed="rId5" cstate="print">
+                    <a:extLst>
+                      <a:ext uri="{28A0092B-C50C-407E-A947-70E740481C1C}">
+                        <a14:useLocalDpi xmlns:a14="http://schemas.microsoft.com/office/drawing/2010/main" val="0"/>
+                      </a:ext>
+                    </a:extLst>
+                  </a:blip>
+                  <a:stretch>
+                    <a:fillRect/>
+                  </a:stretch>
+                </p:blipFill>
+                <p:spPr>
+                  <a:xfrm>
+                    <a:off x="5345440" y="6084945"/>
+                    <a:ext cx="280633" cy="225596"/>
+                  </a:xfrm>
+                  <a:prstGeom prst="rect">
+                    <a:avLst/>
+                  </a:prstGeom>
+                </p:spPr>
+              </p:pic>
+              <p:pic>
+                <p:nvPicPr>
+                  <p:cNvPr id="80" name="Picture 79"/>
+                  <p:cNvPicPr>
+                    <a:picLocks noChangeAspect="1"/>
+                  </p:cNvPicPr>
+                  <p:nvPr/>
+                </p:nvPicPr>
+                <p:blipFill>
+                  <a:blip r:embed="rId6" cstate="print">
+                    <a:extLst>
+                      <a:ext uri="{28A0092B-C50C-407E-A947-70E740481C1C}">
+                        <a14:useLocalDpi xmlns:a14="http://schemas.microsoft.com/office/drawing/2010/main" val="0"/>
+                      </a:ext>
+                    </a:extLst>
+                  </a:blip>
+                  <a:stretch>
+                    <a:fillRect/>
+                  </a:stretch>
+                </p:blipFill>
+                <p:spPr>
+                  <a:xfrm>
+                    <a:off x="4515280" y="6084945"/>
+                    <a:ext cx="274386" cy="225596"/>
+                  </a:xfrm>
+                  <a:prstGeom prst="rect">
+                    <a:avLst/>
+                  </a:prstGeom>
+                </p:spPr>
+              </p:pic>
+              <p:pic>
+                <p:nvPicPr>
+                  <p:cNvPr id="81" name="Picture 80"/>
+                  <p:cNvPicPr>
+                    <a:picLocks noChangeAspect="1"/>
+                  </p:cNvPicPr>
+                  <p:nvPr/>
+                </p:nvPicPr>
+                <p:blipFill>
+                  <a:blip r:embed="rId7" cstate="print">
+                    <a:extLst>
+                      <a:ext uri="{28A0092B-C50C-407E-A947-70E740481C1C}">
+                        <a14:useLocalDpi xmlns:a14="http://schemas.microsoft.com/office/drawing/2010/main" val="0"/>
+                      </a:ext>
+                    </a:extLst>
+                  </a:blip>
+                  <a:stretch>
+                    <a:fillRect/>
+                  </a:stretch>
+                </p:blipFill>
+                <p:spPr>
+                  <a:xfrm flipH="1">
+                    <a:off x="2887074" y="6083191"/>
+                    <a:ext cx="255789" cy="218495"/>
+                  </a:xfrm>
+                  <a:prstGeom prst="rect">
+                    <a:avLst/>
+                  </a:prstGeom>
+                </p:spPr>
+              </p:pic>
+            </p:grpSp>
             <p:pic>
               <p:nvPicPr>
-                <p:cNvPr id="78" name="Picture 77"/>
+                <p:cNvPr id="77" name="Picture 76"/>
                 <p:cNvPicPr>
                   <a:picLocks noChangeAspect="1"/>
                 </p:cNvPicPr>
                 <p:nvPr/>
               </p:nvPicPr>
               <p:blipFill>
-                <a:blip r:embed="rId4" cstate="print">
-                  <a:extLst>
-                    <a:ext uri="{28A0092B-C50C-407E-A947-70E740481C1C}">
-                      <a14:useLocalDpi xmlns:a14="http://schemas.microsoft.com/office/drawing/2010/main" val="0"/>
-                    </a:ext>
-                  </a:extLst>
-                </a:blip>
+                <a:blip r:embed="rId8"/>
                 <a:stretch>
                   <a:fillRect/>
                 </a:stretch>
               </p:blipFill>
               <p:spPr>
                 <a:xfrm>
-                  <a:off x="4079269" y="6103833"/>
-                  <a:ext cx="325640" cy="161565"/>
-                </a:xfrm>
-                <a:prstGeom prst="rect">
-                  <a:avLst/>
-                </a:prstGeom>
-              </p:spPr>
-            </p:pic>
-            <p:pic>
-              <p:nvPicPr>
-                <p:cNvPr id="79" name="Picture 78"/>
-                <p:cNvPicPr>
-                  <a:picLocks noChangeAspect="1"/>
-                </p:cNvPicPr>
-                <p:nvPr/>
-              </p:nvPicPr>
-              <p:blipFill>
-                <a:blip r:embed="rId5" cstate="print">
-                  <a:extLst>
-                    <a:ext uri="{28A0092B-C50C-407E-A947-70E740481C1C}">
-                      <a14:useLocalDpi xmlns:a14="http://schemas.microsoft.com/office/drawing/2010/main" val="0"/>
-                    </a:ext>
-                  </a:extLst>
-                </a:blip>
-                <a:stretch>
-                  <a:fillRect/>
-                </a:stretch>
-              </p:blipFill>
-              <p:spPr>
-                <a:xfrm>
-                  <a:off x="5345440" y="6084945"/>
-                  <a:ext cx="280633" cy="225596"/>
-                </a:xfrm>
-                <a:prstGeom prst="rect">
-                  <a:avLst/>
-                </a:prstGeom>
-              </p:spPr>
-            </p:pic>
-            <p:pic>
-              <p:nvPicPr>
-                <p:cNvPr id="80" name="Picture 79"/>
-                <p:cNvPicPr>
-                  <a:picLocks noChangeAspect="1"/>
-                </p:cNvPicPr>
-                <p:nvPr/>
-              </p:nvPicPr>
-              <p:blipFill>
-                <a:blip r:embed="rId6" cstate="print">
-                  <a:extLst>
-                    <a:ext uri="{28A0092B-C50C-407E-A947-70E740481C1C}">
-                      <a14:useLocalDpi xmlns:a14="http://schemas.microsoft.com/office/drawing/2010/main" val="0"/>
-                    </a:ext>
-                  </a:extLst>
-                </a:blip>
-                <a:stretch>
-                  <a:fillRect/>
-                </a:stretch>
-              </p:blipFill>
-              <p:spPr>
-                <a:xfrm>
-                  <a:off x="4515280" y="6084945"/>
-                  <a:ext cx="274386" cy="225596"/>
-                </a:xfrm>
-                <a:prstGeom prst="rect">
-                  <a:avLst/>
-                </a:prstGeom>
-              </p:spPr>
-            </p:pic>
-            <p:pic>
-              <p:nvPicPr>
-                <p:cNvPr id="81" name="Picture 80"/>
-                <p:cNvPicPr>
-                  <a:picLocks noChangeAspect="1"/>
-                </p:cNvPicPr>
-                <p:nvPr/>
-              </p:nvPicPr>
-              <p:blipFill>
-                <a:blip r:embed="rId7" cstate="print">
-                  <a:extLst>
-                    <a:ext uri="{28A0092B-C50C-407E-A947-70E740481C1C}">
-                      <a14:useLocalDpi xmlns:a14="http://schemas.microsoft.com/office/drawing/2010/main" val="0"/>
-                    </a:ext>
-                  </a:extLst>
-                </a:blip>
-                <a:stretch>
-                  <a:fillRect/>
-                </a:stretch>
-              </p:blipFill>
-              <p:spPr>
-                <a:xfrm flipH="1">
-                  <a:off x="2887074" y="6083191"/>
-                  <a:ext cx="255789" cy="218495"/>
+                  <a:off x="4734039" y="6066646"/>
+                  <a:ext cx="302061" cy="235941"/>
                 </a:xfrm>
                 <a:prstGeom prst="rect">
                   <a:avLst/>
@@ -9341,22 +9380,46 @@
           </p:grpSp>
           <p:pic>
             <p:nvPicPr>
-              <p:cNvPr id="77" name="Picture 76"/>
+              <p:cNvPr id="74" name="Picture 73"/>
               <p:cNvPicPr>
                 <a:picLocks noChangeAspect="1"/>
               </p:cNvPicPr>
               <p:nvPr/>
             </p:nvPicPr>
             <p:blipFill>
-              <a:blip r:embed="rId8"/>
+              <a:blip r:embed="rId9"/>
               <a:stretch>
                 <a:fillRect/>
               </a:stretch>
             </p:blipFill>
             <p:spPr>
               <a:xfrm>
-                <a:off x="4734039" y="6066646"/>
-                <a:ext cx="302061" cy="235941"/>
+                <a:off x="3506696" y="6098817"/>
+                <a:ext cx="334903" cy="198223"/>
+              </a:xfrm>
+              <a:prstGeom prst="rect">
+                <a:avLst/>
+              </a:prstGeom>
+            </p:spPr>
+          </p:pic>
+          <p:pic>
+            <p:nvPicPr>
+              <p:cNvPr id="75" name="Picture 74"/>
+              <p:cNvPicPr>
+                <a:picLocks noChangeAspect="1"/>
+              </p:cNvPicPr>
+              <p:nvPr/>
+            </p:nvPicPr>
+            <p:blipFill>
+              <a:blip r:embed="rId10"/>
+              <a:stretch>
+                <a:fillRect/>
+              </a:stretch>
+            </p:blipFill>
+            <p:spPr>
+              <a:xfrm>
+                <a:off x="3107726" y="6098817"/>
+                <a:ext cx="327300" cy="196986"/>
               </a:xfrm>
               <a:prstGeom prst="rect">
                 <a:avLst/>
@@ -9364,211 +9427,187 @@
             </p:spPr>
           </p:pic>
         </p:grpSp>
-        <p:pic>
-          <p:nvPicPr>
-            <p:cNvPr id="74" name="Picture 73"/>
-            <p:cNvPicPr>
-              <a:picLocks noChangeAspect="1"/>
-            </p:cNvPicPr>
-            <p:nvPr/>
-          </p:nvPicPr>
-          <p:blipFill>
-            <a:blip r:embed="rId9"/>
-            <a:stretch>
-              <a:fillRect/>
-            </a:stretch>
-          </p:blipFill>
-          <p:spPr>
-            <a:xfrm>
-              <a:off x="3506696" y="6098817"/>
-              <a:ext cx="334903" cy="198223"/>
-            </a:xfrm>
-            <a:prstGeom prst="rect">
-              <a:avLst/>
-            </a:prstGeom>
-          </p:spPr>
-        </p:pic>
-        <p:pic>
-          <p:nvPicPr>
-            <p:cNvPr id="75" name="Picture 74"/>
-            <p:cNvPicPr>
-              <a:picLocks noChangeAspect="1"/>
-            </p:cNvPicPr>
-            <p:nvPr/>
-          </p:nvPicPr>
-          <p:blipFill>
-            <a:blip r:embed="rId10"/>
-            <a:stretch>
-              <a:fillRect/>
-            </a:stretch>
-          </p:blipFill>
-          <p:spPr>
-            <a:xfrm>
-              <a:off x="3107726" y="6098817"/>
-              <a:ext cx="327300" cy="196986"/>
-            </a:xfrm>
-            <a:prstGeom prst="rect">
-              <a:avLst/>
-            </a:prstGeom>
-          </p:spPr>
-        </p:pic>
-      </p:grpSp>
-      <p:grpSp>
-        <p:nvGrpSpPr>
-          <p:cNvPr id="82" name="Group 81"/>
-          <p:cNvGrpSpPr/>
-          <p:nvPr/>
-        </p:nvGrpSpPr>
-        <p:grpSpPr>
-          <a:xfrm>
-            <a:off x="1955798" y="6380121"/>
-            <a:ext cx="3255436" cy="375380"/>
-            <a:chOff x="2721075" y="6066646"/>
-            <a:chExt cx="2738999" cy="243895"/>
-          </a:xfrm>
-        </p:grpSpPr>
         <p:grpSp>
           <p:nvGrpSpPr>
-            <p:cNvPr id="83" name="Group 82"/>
+            <p:cNvPr id="82" name="Group 81"/>
             <p:cNvGrpSpPr/>
             <p:nvPr/>
           </p:nvGrpSpPr>
           <p:grpSpPr>
             <a:xfrm>
-              <a:off x="2721075" y="6066646"/>
-              <a:ext cx="2738999" cy="243895"/>
+              <a:off x="1955798" y="6380121"/>
+              <a:ext cx="3255436" cy="375380"/>
               <a:chOff x="2721075" y="6066646"/>
               <a:chExt cx="2738999" cy="243895"/>
             </a:xfrm>
           </p:grpSpPr>
           <p:grpSp>
             <p:nvGrpSpPr>
-              <p:cNvPr id="86" name="Group 85"/>
+              <p:cNvPr id="83" name="Group 82"/>
               <p:cNvGrpSpPr/>
               <p:nvPr/>
             </p:nvGrpSpPr>
             <p:grpSpPr>
               <a:xfrm>
-                <a:off x="2721075" y="6083191"/>
-                <a:ext cx="2738999" cy="227350"/>
-                <a:chOff x="2887074" y="6083191"/>
-                <a:chExt cx="2738999" cy="227350"/>
+                <a:off x="2721075" y="6066646"/>
+                <a:ext cx="2738999" cy="243895"/>
+                <a:chOff x="2721075" y="6066646"/>
+                <a:chExt cx="2738999" cy="243895"/>
               </a:xfrm>
             </p:grpSpPr>
+            <p:grpSp>
+              <p:nvGrpSpPr>
+                <p:cNvPr id="86" name="Group 85"/>
+                <p:cNvGrpSpPr/>
+                <p:nvPr/>
+              </p:nvGrpSpPr>
+              <p:grpSpPr>
+                <a:xfrm>
+                  <a:off x="2721075" y="6083191"/>
+                  <a:ext cx="2738999" cy="227350"/>
+                  <a:chOff x="2887074" y="6083191"/>
+                  <a:chExt cx="2738999" cy="227350"/>
+                </a:xfrm>
+              </p:grpSpPr>
+              <p:pic>
+                <p:nvPicPr>
+                  <p:cNvPr id="88" name="Picture 87"/>
+                  <p:cNvPicPr>
+                    <a:picLocks noChangeAspect="1"/>
+                  </p:cNvPicPr>
+                  <p:nvPr/>
+                </p:nvPicPr>
+                <p:blipFill>
+                  <a:blip r:embed="rId4" cstate="print">
+                    <a:extLst>
+                      <a:ext uri="{28A0092B-C50C-407E-A947-70E740481C1C}">
+                        <a14:useLocalDpi xmlns:a14="http://schemas.microsoft.com/office/drawing/2010/main" val="0"/>
+                      </a:ext>
+                    </a:extLst>
+                  </a:blip>
+                  <a:stretch>
+                    <a:fillRect/>
+                  </a:stretch>
+                </p:blipFill>
+                <p:spPr>
+                  <a:xfrm>
+                    <a:off x="4079269" y="6103833"/>
+                    <a:ext cx="325640" cy="161565"/>
+                  </a:xfrm>
+                  <a:prstGeom prst="rect">
+                    <a:avLst/>
+                  </a:prstGeom>
+                </p:spPr>
+              </p:pic>
+              <p:pic>
+                <p:nvPicPr>
+                  <p:cNvPr id="89" name="Picture 88"/>
+                  <p:cNvPicPr>
+                    <a:picLocks noChangeAspect="1"/>
+                  </p:cNvPicPr>
+                  <p:nvPr/>
+                </p:nvPicPr>
+                <p:blipFill>
+                  <a:blip r:embed="rId5" cstate="print">
+                    <a:extLst>
+                      <a:ext uri="{28A0092B-C50C-407E-A947-70E740481C1C}">
+                        <a14:useLocalDpi xmlns:a14="http://schemas.microsoft.com/office/drawing/2010/main" val="0"/>
+                      </a:ext>
+                    </a:extLst>
+                  </a:blip>
+                  <a:stretch>
+                    <a:fillRect/>
+                  </a:stretch>
+                </p:blipFill>
+                <p:spPr>
+                  <a:xfrm>
+                    <a:off x="5345440" y="6084945"/>
+                    <a:ext cx="280633" cy="225596"/>
+                  </a:xfrm>
+                  <a:prstGeom prst="rect">
+                    <a:avLst/>
+                  </a:prstGeom>
+                </p:spPr>
+              </p:pic>
+              <p:pic>
+                <p:nvPicPr>
+                  <p:cNvPr id="90" name="Picture 89"/>
+                  <p:cNvPicPr>
+                    <a:picLocks noChangeAspect="1"/>
+                  </p:cNvPicPr>
+                  <p:nvPr/>
+                </p:nvPicPr>
+                <p:blipFill>
+                  <a:blip r:embed="rId6" cstate="print">
+                    <a:extLst>
+                      <a:ext uri="{28A0092B-C50C-407E-A947-70E740481C1C}">
+                        <a14:useLocalDpi xmlns:a14="http://schemas.microsoft.com/office/drawing/2010/main" val="0"/>
+                      </a:ext>
+                    </a:extLst>
+                  </a:blip>
+                  <a:stretch>
+                    <a:fillRect/>
+                  </a:stretch>
+                </p:blipFill>
+                <p:spPr>
+                  <a:xfrm>
+                    <a:off x="4515280" y="6084945"/>
+                    <a:ext cx="274386" cy="225596"/>
+                  </a:xfrm>
+                  <a:prstGeom prst="rect">
+                    <a:avLst/>
+                  </a:prstGeom>
+                </p:spPr>
+              </p:pic>
+              <p:pic>
+                <p:nvPicPr>
+                  <p:cNvPr id="91" name="Picture 90"/>
+                  <p:cNvPicPr>
+                    <a:picLocks noChangeAspect="1"/>
+                  </p:cNvPicPr>
+                  <p:nvPr/>
+                </p:nvPicPr>
+                <p:blipFill>
+                  <a:blip r:embed="rId7" cstate="print">
+                    <a:extLst>
+                      <a:ext uri="{28A0092B-C50C-407E-A947-70E740481C1C}">
+                        <a14:useLocalDpi xmlns:a14="http://schemas.microsoft.com/office/drawing/2010/main" val="0"/>
+                      </a:ext>
+                    </a:extLst>
+                  </a:blip>
+                  <a:stretch>
+                    <a:fillRect/>
+                  </a:stretch>
+                </p:blipFill>
+                <p:spPr>
+                  <a:xfrm flipH="1">
+                    <a:off x="2887074" y="6083191"/>
+                    <a:ext cx="255789" cy="218495"/>
+                  </a:xfrm>
+                  <a:prstGeom prst="rect">
+                    <a:avLst/>
+                  </a:prstGeom>
+                </p:spPr>
+              </p:pic>
+            </p:grpSp>
             <p:pic>
               <p:nvPicPr>
-                <p:cNvPr id="88" name="Picture 87"/>
+                <p:cNvPr id="87" name="Picture 86"/>
                 <p:cNvPicPr>
                   <a:picLocks noChangeAspect="1"/>
                 </p:cNvPicPr>
                 <p:nvPr/>
               </p:nvPicPr>
               <p:blipFill>
-                <a:blip r:embed="rId4" cstate="print">
-                  <a:extLst>
-                    <a:ext uri="{28A0092B-C50C-407E-A947-70E740481C1C}">
-                      <a14:useLocalDpi xmlns:a14="http://schemas.microsoft.com/office/drawing/2010/main" val="0"/>
-                    </a:ext>
-                  </a:extLst>
-                </a:blip>
+                <a:blip r:embed="rId8"/>
                 <a:stretch>
                   <a:fillRect/>
                 </a:stretch>
               </p:blipFill>
               <p:spPr>
                 <a:xfrm>
-                  <a:off x="4079269" y="6103833"/>
-                  <a:ext cx="325640" cy="161565"/>
-                </a:xfrm>
-                <a:prstGeom prst="rect">
-                  <a:avLst/>
-                </a:prstGeom>
-              </p:spPr>
-            </p:pic>
-            <p:pic>
-              <p:nvPicPr>
-                <p:cNvPr id="89" name="Picture 88"/>
-                <p:cNvPicPr>
-                  <a:picLocks noChangeAspect="1"/>
-                </p:cNvPicPr>
-                <p:nvPr/>
-              </p:nvPicPr>
-              <p:blipFill>
-                <a:blip r:embed="rId5" cstate="print">
-                  <a:extLst>
-                    <a:ext uri="{28A0092B-C50C-407E-A947-70E740481C1C}">
-                      <a14:useLocalDpi xmlns:a14="http://schemas.microsoft.com/office/drawing/2010/main" val="0"/>
-                    </a:ext>
-                  </a:extLst>
-                </a:blip>
-                <a:stretch>
-                  <a:fillRect/>
-                </a:stretch>
-              </p:blipFill>
-              <p:spPr>
-                <a:xfrm>
-                  <a:off x="5345440" y="6084945"/>
-                  <a:ext cx="280633" cy="225596"/>
-                </a:xfrm>
-                <a:prstGeom prst="rect">
-                  <a:avLst/>
-                </a:prstGeom>
-              </p:spPr>
-            </p:pic>
-            <p:pic>
-              <p:nvPicPr>
-                <p:cNvPr id="90" name="Picture 89"/>
-                <p:cNvPicPr>
-                  <a:picLocks noChangeAspect="1"/>
-                </p:cNvPicPr>
-                <p:nvPr/>
-              </p:nvPicPr>
-              <p:blipFill>
-                <a:blip r:embed="rId6" cstate="print">
-                  <a:extLst>
-                    <a:ext uri="{28A0092B-C50C-407E-A947-70E740481C1C}">
-                      <a14:useLocalDpi xmlns:a14="http://schemas.microsoft.com/office/drawing/2010/main" val="0"/>
-                    </a:ext>
-                  </a:extLst>
-                </a:blip>
-                <a:stretch>
-                  <a:fillRect/>
-                </a:stretch>
-              </p:blipFill>
-              <p:spPr>
-                <a:xfrm>
-                  <a:off x="4515280" y="6084945"/>
-                  <a:ext cx="274386" cy="225596"/>
-                </a:xfrm>
-                <a:prstGeom prst="rect">
-                  <a:avLst/>
-                </a:prstGeom>
-              </p:spPr>
-            </p:pic>
-            <p:pic>
-              <p:nvPicPr>
-                <p:cNvPr id="91" name="Picture 90"/>
-                <p:cNvPicPr>
-                  <a:picLocks noChangeAspect="1"/>
-                </p:cNvPicPr>
-                <p:nvPr/>
-              </p:nvPicPr>
-              <p:blipFill>
-                <a:blip r:embed="rId7" cstate="print">
-                  <a:extLst>
-                    <a:ext uri="{28A0092B-C50C-407E-A947-70E740481C1C}">
-                      <a14:useLocalDpi xmlns:a14="http://schemas.microsoft.com/office/drawing/2010/main" val="0"/>
-                    </a:ext>
-                  </a:extLst>
-                </a:blip>
-                <a:stretch>
-                  <a:fillRect/>
-                </a:stretch>
-              </p:blipFill>
-              <p:spPr>
-                <a:xfrm flipH="1">
-                  <a:off x="2887074" y="6083191"/>
-                  <a:ext cx="255789" cy="218495"/>
+                  <a:off x="4734039" y="6066646"/>
+                  <a:ext cx="302061" cy="235941"/>
                 </a:xfrm>
                 <a:prstGeom prst="rect">
                   <a:avLst/>
@@ -9578,22 +9617,46 @@
           </p:grpSp>
           <p:pic>
             <p:nvPicPr>
-              <p:cNvPr id="87" name="Picture 86"/>
+              <p:cNvPr id="84" name="Picture 83"/>
               <p:cNvPicPr>
                 <a:picLocks noChangeAspect="1"/>
               </p:cNvPicPr>
               <p:nvPr/>
             </p:nvPicPr>
             <p:blipFill>
-              <a:blip r:embed="rId8"/>
+              <a:blip r:embed="rId9"/>
               <a:stretch>
                 <a:fillRect/>
               </a:stretch>
             </p:blipFill>
             <p:spPr>
               <a:xfrm>
-                <a:off x="4734039" y="6066646"/>
-                <a:ext cx="302061" cy="235941"/>
+                <a:off x="3506696" y="6098817"/>
+                <a:ext cx="334903" cy="198223"/>
+              </a:xfrm>
+              <a:prstGeom prst="rect">
+                <a:avLst/>
+              </a:prstGeom>
+            </p:spPr>
+          </p:pic>
+          <p:pic>
+            <p:nvPicPr>
+              <p:cNvPr id="85" name="Picture 84"/>
+              <p:cNvPicPr>
+                <a:picLocks noChangeAspect="1"/>
+              </p:cNvPicPr>
+              <p:nvPr/>
+            </p:nvPicPr>
+            <p:blipFill>
+              <a:blip r:embed="rId10"/>
+              <a:stretch>
+                <a:fillRect/>
+              </a:stretch>
+            </p:blipFill>
+            <p:spPr>
+              <a:xfrm>
+                <a:off x="3107726" y="6098817"/>
+                <a:ext cx="327300" cy="196986"/>
               </a:xfrm>
               <a:prstGeom prst="rect">
                 <a:avLst/>
@@ -9601,211 +9664,187 @@
             </p:spPr>
           </p:pic>
         </p:grpSp>
-        <p:pic>
-          <p:nvPicPr>
-            <p:cNvPr id="84" name="Picture 83"/>
-            <p:cNvPicPr>
-              <a:picLocks noChangeAspect="1"/>
-            </p:cNvPicPr>
-            <p:nvPr/>
-          </p:nvPicPr>
-          <p:blipFill>
-            <a:blip r:embed="rId9"/>
-            <a:stretch>
-              <a:fillRect/>
-            </a:stretch>
-          </p:blipFill>
-          <p:spPr>
-            <a:xfrm>
-              <a:off x="3506696" y="6098817"/>
-              <a:ext cx="334903" cy="198223"/>
-            </a:xfrm>
-            <a:prstGeom prst="rect">
-              <a:avLst/>
-            </a:prstGeom>
-          </p:spPr>
-        </p:pic>
-        <p:pic>
-          <p:nvPicPr>
-            <p:cNvPr id="85" name="Picture 84"/>
-            <p:cNvPicPr>
-              <a:picLocks noChangeAspect="1"/>
-            </p:cNvPicPr>
-            <p:nvPr/>
-          </p:nvPicPr>
-          <p:blipFill>
-            <a:blip r:embed="rId10"/>
-            <a:stretch>
-              <a:fillRect/>
-            </a:stretch>
-          </p:blipFill>
-          <p:spPr>
-            <a:xfrm>
-              <a:off x="3107726" y="6098817"/>
-              <a:ext cx="327300" cy="196986"/>
-            </a:xfrm>
-            <a:prstGeom prst="rect">
-              <a:avLst/>
-            </a:prstGeom>
-          </p:spPr>
-        </p:pic>
-      </p:grpSp>
-      <p:grpSp>
-        <p:nvGrpSpPr>
-          <p:cNvPr id="92" name="Group 91"/>
-          <p:cNvGrpSpPr/>
-          <p:nvPr/>
-        </p:nvGrpSpPr>
-        <p:grpSpPr>
-          <a:xfrm>
-            <a:off x="6345338" y="6357438"/>
-            <a:ext cx="3255436" cy="375380"/>
-            <a:chOff x="2721075" y="6066646"/>
-            <a:chExt cx="2738999" cy="243895"/>
-          </a:xfrm>
-        </p:grpSpPr>
         <p:grpSp>
           <p:nvGrpSpPr>
-            <p:cNvPr id="93" name="Group 92"/>
+            <p:cNvPr id="92" name="Group 91"/>
             <p:cNvGrpSpPr/>
             <p:nvPr/>
           </p:nvGrpSpPr>
           <p:grpSpPr>
             <a:xfrm>
-              <a:off x="2721075" y="6066646"/>
-              <a:ext cx="2738999" cy="243895"/>
+              <a:off x="6345338" y="6357438"/>
+              <a:ext cx="3255436" cy="375380"/>
               <a:chOff x="2721075" y="6066646"/>
               <a:chExt cx="2738999" cy="243895"/>
             </a:xfrm>
           </p:grpSpPr>
           <p:grpSp>
             <p:nvGrpSpPr>
-              <p:cNvPr id="96" name="Group 95"/>
+              <p:cNvPr id="93" name="Group 92"/>
               <p:cNvGrpSpPr/>
               <p:nvPr/>
             </p:nvGrpSpPr>
             <p:grpSpPr>
               <a:xfrm>
-                <a:off x="2721075" y="6083191"/>
-                <a:ext cx="2738999" cy="227350"/>
-                <a:chOff x="2887074" y="6083191"/>
-                <a:chExt cx="2738999" cy="227350"/>
+                <a:off x="2721075" y="6066646"/>
+                <a:ext cx="2738999" cy="243895"/>
+                <a:chOff x="2721075" y="6066646"/>
+                <a:chExt cx="2738999" cy="243895"/>
               </a:xfrm>
             </p:grpSpPr>
+            <p:grpSp>
+              <p:nvGrpSpPr>
+                <p:cNvPr id="96" name="Group 95"/>
+                <p:cNvGrpSpPr/>
+                <p:nvPr/>
+              </p:nvGrpSpPr>
+              <p:grpSpPr>
+                <a:xfrm>
+                  <a:off x="2721075" y="6083191"/>
+                  <a:ext cx="2738999" cy="227350"/>
+                  <a:chOff x="2887074" y="6083191"/>
+                  <a:chExt cx="2738999" cy="227350"/>
+                </a:xfrm>
+              </p:grpSpPr>
+              <p:pic>
+                <p:nvPicPr>
+                  <p:cNvPr id="98" name="Picture 97"/>
+                  <p:cNvPicPr>
+                    <a:picLocks noChangeAspect="1"/>
+                  </p:cNvPicPr>
+                  <p:nvPr/>
+                </p:nvPicPr>
+                <p:blipFill>
+                  <a:blip r:embed="rId4" cstate="print">
+                    <a:extLst>
+                      <a:ext uri="{28A0092B-C50C-407E-A947-70E740481C1C}">
+                        <a14:useLocalDpi xmlns:a14="http://schemas.microsoft.com/office/drawing/2010/main" val="0"/>
+                      </a:ext>
+                    </a:extLst>
+                  </a:blip>
+                  <a:stretch>
+                    <a:fillRect/>
+                  </a:stretch>
+                </p:blipFill>
+                <p:spPr>
+                  <a:xfrm>
+                    <a:off x="4079269" y="6103833"/>
+                    <a:ext cx="325640" cy="161565"/>
+                  </a:xfrm>
+                  <a:prstGeom prst="rect">
+                    <a:avLst/>
+                  </a:prstGeom>
+                </p:spPr>
+              </p:pic>
+              <p:pic>
+                <p:nvPicPr>
+                  <p:cNvPr id="99" name="Picture 98"/>
+                  <p:cNvPicPr>
+                    <a:picLocks noChangeAspect="1"/>
+                  </p:cNvPicPr>
+                  <p:nvPr/>
+                </p:nvPicPr>
+                <p:blipFill>
+                  <a:blip r:embed="rId5" cstate="print">
+                    <a:extLst>
+                      <a:ext uri="{28A0092B-C50C-407E-A947-70E740481C1C}">
+                        <a14:useLocalDpi xmlns:a14="http://schemas.microsoft.com/office/drawing/2010/main" val="0"/>
+                      </a:ext>
+                    </a:extLst>
+                  </a:blip>
+                  <a:stretch>
+                    <a:fillRect/>
+                  </a:stretch>
+                </p:blipFill>
+                <p:spPr>
+                  <a:xfrm>
+                    <a:off x="5345440" y="6084945"/>
+                    <a:ext cx="280633" cy="225596"/>
+                  </a:xfrm>
+                  <a:prstGeom prst="rect">
+                    <a:avLst/>
+                  </a:prstGeom>
+                </p:spPr>
+              </p:pic>
+              <p:pic>
+                <p:nvPicPr>
+                  <p:cNvPr id="100" name="Picture 99"/>
+                  <p:cNvPicPr>
+                    <a:picLocks noChangeAspect="1"/>
+                  </p:cNvPicPr>
+                  <p:nvPr/>
+                </p:nvPicPr>
+                <p:blipFill>
+                  <a:blip r:embed="rId6" cstate="print">
+                    <a:extLst>
+                      <a:ext uri="{28A0092B-C50C-407E-A947-70E740481C1C}">
+                        <a14:useLocalDpi xmlns:a14="http://schemas.microsoft.com/office/drawing/2010/main" val="0"/>
+                      </a:ext>
+                    </a:extLst>
+                  </a:blip>
+                  <a:stretch>
+                    <a:fillRect/>
+                  </a:stretch>
+                </p:blipFill>
+                <p:spPr>
+                  <a:xfrm>
+                    <a:off x="4515280" y="6084945"/>
+                    <a:ext cx="274386" cy="225596"/>
+                  </a:xfrm>
+                  <a:prstGeom prst="rect">
+                    <a:avLst/>
+                  </a:prstGeom>
+                </p:spPr>
+              </p:pic>
+              <p:pic>
+                <p:nvPicPr>
+                  <p:cNvPr id="101" name="Picture 100"/>
+                  <p:cNvPicPr>
+                    <a:picLocks noChangeAspect="1"/>
+                  </p:cNvPicPr>
+                  <p:nvPr/>
+                </p:nvPicPr>
+                <p:blipFill>
+                  <a:blip r:embed="rId7" cstate="print">
+                    <a:extLst>
+                      <a:ext uri="{28A0092B-C50C-407E-A947-70E740481C1C}">
+                        <a14:useLocalDpi xmlns:a14="http://schemas.microsoft.com/office/drawing/2010/main" val="0"/>
+                      </a:ext>
+                    </a:extLst>
+                  </a:blip>
+                  <a:stretch>
+                    <a:fillRect/>
+                  </a:stretch>
+                </p:blipFill>
+                <p:spPr>
+                  <a:xfrm flipH="1">
+                    <a:off x="2887074" y="6083191"/>
+                    <a:ext cx="255789" cy="218495"/>
+                  </a:xfrm>
+                  <a:prstGeom prst="rect">
+                    <a:avLst/>
+                  </a:prstGeom>
+                </p:spPr>
+              </p:pic>
+            </p:grpSp>
             <p:pic>
               <p:nvPicPr>
-                <p:cNvPr id="98" name="Picture 97"/>
+                <p:cNvPr id="97" name="Picture 96"/>
                 <p:cNvPicPr>
                   <a:picLocks noChangeAspect="1"/>
                 </p:cNvPicPr>
                 <p:nvPr/>
               </p:nvPicPr>
               <p:blipFill>
-                <a:blip r:embed="rId4" cstate="print">
-                  <a:extLst>
-                    <a:ext uri="{28A0092B-C50C-407E-A947-70E740481C1C}">
-                      <a14:useLocalDpi xmlns:a14="http://schemas.microsoft.com/office/drawing/2010/main" val="0"/>
-                    </a:ext>
-                  </a:extLst>
-                </a:blip>
+                <a:blip r:embed="rId8"/>
                 <a:stretch>
                   <a:fillRect/>
                 </a:stretch>
               </p:blipFill>
               <p:spPr>
                 <a:xfrm>
-                  <a:off x="4079269" y="6103833"/>
-                  <a:ext cx="325640" cy="161565"/>
-                </a:xfrm>
-                <a:prstGeom prst="rect">
-                  <a:avLst/>
-                </a:prstGeom>
-              </p:spPr>
-            </p:pic>
-            <p:pic>
-              <p:nvPicPr>
-                <p:cNvPr id="99" name="Picture 98"/>
-                <p:cNvPicPr>
-                  <a:picLocks noChangeAspect="1"/>
-                </p:cNvPicPr>
-                <p:nvPr/>
-              </p:nvPicPr>
-              <p:blipFill>
-                <a:blip r:embed="rId5" cstate="print">
-                  <a:extLst>
-                    <a:ext uri="{28A0092B-C50C-407E-A947-70E740481C1C}">
-                      <a14:useLocalDpi xmlns:a14="http://schemas.microsoft.com/office/drawing/2010/main" val="0"/>
-                    </a:ext>
-                  </a:extLst>
-                </a:blip>
-                <a:stretch>
-                  <a:fillRect/>
-                </a:stretch>
-              </p:blipFill>
-              <p:spPr>
-                <a:xfrm>
-                  <a:off x="5345440" y="6084945"/>
-                  <a:ext cx="280633" cy="225596"/>
-                </a:xfrm>
-                <a:prstGeom prst="rect">
-                  <a:avLst/>
-                </a:prstGeom>
-              </p:spPr>
-            </p:pic>
-            <p:pic>
-              <p:nvPicPr>
-                <p:cNvPr id="100" name="Picture 99"/>
-                <p:cNvPicPr>
-                  <a:picLocks noChangeAspect="1"/>
-                </p:cNvPicPr>
-                <p:nvPr/>
-              </p:nvPicPr>
-              <p:blipFill>
-                <a:blip r:embed="rId6" cstate="print">
-                  <a:extLst>
-                    <a:ext uri="{28A0092B-C50C-407E-A947-70E740481C1C}">
-                      <a14:useLocalDpi xmlns:a14="http://schemas.microsoft.com/office/drawing/2010/main" val="0"/>
-                    </a:ext>
-                  </a:extLst>
-                </a:blip>
-                <a:stretch>
-                  <a:fillRect/>
-                </a:stretch>
-              </p:blipFill>
-              <p:spPr>
-                <a:xfrm>
-                  <a:off x="4515280" y="6084945"/>
-                  <a:ext cx="274386" cy="225596"/>
-                </a:xfrm>
-                <a:prstGeom prst="rect">
-                  <a:avLst/>
-                </a:prstGeom>
-              </p:spPr>
-            </p:pic>
-            <p:pic>
-              <p:nvPicPr>
-                <p:cNvPr id="101" name="Picture 100"/>
-                <p:cNvPicPr>
-                  <a:picLocks noChangeAspect="1"/>
-                </p:cNvPicPr>
-                <p:nvPr/>
-              </p:nvPicPr>
-              <p:blipFill>
-                <a:blip r:embed="rId7" cstate="print">
-                  <a:extLst>
-                    <a:ext uri="{28A0092B-C50C-407E-A947-70E740481C1C}">
-                      <a14:useLocalDpi xmlns:a14="http://schemas.microsoft.com/office/drawing/2010/main" val="0"/>
-                    </a:ext>
-                  </a:extLst>
-                </a:blip>
-                <a:stretch>
-                  <a:fillRect/>
-                </a:stretch>
-              </p:blipFill>
-              <p:spPr>
-                <a:xfrm flipH="1">
-                  <a:off x="2887074" y="6083191"/>
-                  <a:ext cx="255789" cy="218495"/>
+                  <a:off x="4734039" y="6066646"/>
+                  <a:ext cx="302061" cy="235941"/>
                 </a:xfrm>
                 <a:prstGeom prst="rect">
                   <a:avLst/>
@@ -9815,22 +9854,46 @@
           </p:grpSp>
           <p:pic>
             <p:nvPicPr>
-              <p:cNvPr id="97" name="Picture 96"/>
+              <p:cNvPr id="94" name="Picture 93"/>
               <p:cNvPicPr>
                 <a:picLocks noChangeAspect="1"/>
               </p:cNvPicPr>
               <p:nvPr/>
             </p:nvPicPr>
             <p:blipFill>
-              <a:blip r:embed="rId8"/>
+              <a:blip r:embed="rId9"/>
               <a:stretch>
                 <a:fillRect/>
               </a:stretch>
             </p:blipFill>
             <p:spPr>
               <a:xfrm>
-                <a:off x="4734039" y="6066646"/>
-                <a:ext cx="302061" cy="235941"/>
+                <a:off x="3506696" y="6098817"/>
+                <a:ext cx="334903" cy="198223"/>
+              </a:xfrm>
+              <a:prstGeom prst="rect">
+                <a:avLst/>
+              </a:prstGeom>
+            </p:spPr>
+          </p:pic>
+          <p:pic>
+            <p:nvPicPr>
+              <p:cNvPr id="95" name="Picture 94"/>
+              <p:cNvPicPr>
+                <a:picLocks noChangeAspect="1"/>
+              </p:cNvPicPr>
+              <p:nvPr/>
+            </p:nvPicPr>
+            <p:blipFill>
+              <a:blip r:embed="rId10"/>
+              <a:stretch>
+                <a:fillRect/>
+              </a:stretch>
+            </p:blipFill>
+            <p:spPr>
+              <a:xfrm>
+                <a:off x="3107726" y="6098817"/>
+                <a:ext cx="327300" cy="196986"/>
               </a:xfrm>
               <a:prstGeom prst="rect">
                 <a:avLst/>
@@ -9838,54 +9901,6 @@
             </p:spPr>
           </p:pic>
         </p:grpSp>
-        <p:pic>
-          <p:nvPicPr>
-            <p:cNvPr id="94" name="Picture 93"/>
-            <p:cNvPicPr>
-              <a:picLocks noChangeAspect="1"/>
-            </p:cNvPicPr>
-            <p:nvPr/>
-          </p:nvPicPr>
-          <p:blipFill>
-            <a:blip r:embed="rId9"/>
-            <a:stretch>
-              <a:fillRect/>
-            </a:stretch>
-          </p:blipFill>
-          <p:spPr>
-            <a:xfrm>
-              <a:off x="3506696" y="6098817"/>
-              <a:ext cx="334903" cy="198223"/>
-            </a:xfrm>
-            <a:prstGeom prst="rect">
-              <a:avLst/>
-            </a:prstGeom>
-          </p:spPr>
-        </p:pic>
-        <p:pic>
-          <p:nvPicPr>
-            <p:cNvPr id="95" name="Picture 94"/>
-            <p:cNvPicPr>
-              <a:picLocks noChangeAspect="1"/>
-            </p:cNvPicPr>
-            <p:nvPr/>
-          </p:nvPicPr>
-          <p:blipFill>
-            <a:blip r:embed="rId10"/>
-            <a:stretch>
-              <a:fillRect/>
-            </a:stretch>
-          </p:blipFill>
-          <p:spPr>
-            <a:xfrm>
-              <a:off x="3107726" y="6098817"/>
-              <a:ext cx="327300" cy="196986"/>
-            </a:xfrm>
-            <a:prstGeom prst="rect">
-              <a:avLst/>
-            </a:prstGeom>
-          </p:spPr>
-        </p:pic>
       </p:grpSp>
     </p:spTree>
     <p:extLst>

</xml_diff>

<commit_message>
made stacked hist for new fig 1 in script 4 for similar color scheme/df
</commit_message>
<xml_diff>
--- a/output/plots/all_figs_with_legends.pptx
+++ b/output/plots/all_figs_with_legends.pptx
@@ -203,7 +203,7 @@
           <a:p>
             <a:fld id="{7FA21820-D199-4D82-91AF-C50B1D3B111A}" type="datetimeFigureOut">
               <a:rPr lang="en-US" smtClean="0"/>
-              <a:t>5/3/2017</a:t>
+              <a:t>5/4/2017</a:t>
             </a:fld>
             <a:endParaRPr lang="en-US"/>
           </a:p>
@@ -1036,7 +1036,7 @@
           <a:p>
             <a:fld id="{916B8C92-D5E3-4480-8685-D57BEE386DE2}" type="datetimeFigureOut">
               <a:rPr lang="en-US" smtClean="0"/>
-              <a:t>5/3/2017</a:t>
+              <a:t>5/4/2017</a:t>
             </a:fld>
             <a:endParaRPr lang="en-US"/>
           </a:p>
@@ -1206,7 +1206,7 @@
           <a:p>
             <a:fld id="{916B8C92-D5E3-4480-8685-D57BEE386DE2}" type="datetimeFigureOut">
               <a:rPr lang="en-US" smtClean="0"/>
-              <a:t>5/3/2017</a:t>
+              <a:t>5/4/2017</a:t>
             </a:fld>
             <a:endParaRPr lang="en-US"/>
           </a:p>
@@ -1386,7 +1386,7 @@
           <a:p>
             <a:fld id="{916B8C92-D5E3-4480-8685-D57BEE386DE2}" type="datetimeFigureOut">
               <a:rPr lang="en-US" smtClean="0"/>
-              <a:t>5/3/2017</a:t>
+              <a:t>5/4/2017</a:t>
             </a:fld>
             <a:endParaRPr lang="en-US"/>
           </a:p>
@@ -1556,7 +1556,7 @@
           <a:p>
             <a:fld id="{916B8C92-D5E3-4480-8685-D57BEE386DE2}" type="datetimeFigureOut">
               <a:rPr lang="en-US" smtClean="0"/>
-              <a:t>5/3/2017</a:t>
+              <a:t>5/4/2017</a:t>
             </a:fld>
             <a:endParaRPr lang="en-US"/>
           </a:p>
@@ -1802,7 +1802,7 @@
           <a:p>
             <a:fld id="{916B8C92-D5E3-4480-8685-D57BEE386DE2}" type="datetimeFigureOut">
               <a:rPr lang="en-US" smtClean="0"/>
-              <a:t>5/3/2017</a:t>
+              <a:t>5/4/2017</a:t>
             </a:fld>
             <a:endParaRPr lang="en-US"/>
           </a:p>
@@ -2034,7 +2034,7 @@
           <a:p>
             <a:fld id="{916B8C92-D5E3-4480-8685-D57BEE386DE2}" type="datetimeFigureOut">
               <a:rPr lang="en-US" smtClean="0"/>
-              <a:t>5/3/2017</a:t>
+              <a:t>5/4/2017</a:t>
             </a:fld>
             <a:endParaRPr lang="en-US"/>
           </a:p>
@@ -2401,7 +2401,7 @@
           <a:p>
             <a:fld id="{916B8C92-D5E3-4480-8685-D57BEE386DE2}" type="datetimeFigureOut">
               <a:rPr lang="en-US" smtClean="0"/>
-              <a:t>5/3/2017</a:t>
+              <a:t>5/4/2017</a:t>
             </a:fld>
             <a:endParaRPr lang="en-US"/>
           </a:p>
@@ -2519,7 +2519,7 @@
           <a:p>
             <a:fld id="{916B8C92-D5E3-4480-8685-D57BEE386DE2}" type="datetimeFigureOut">
               <a:rPr lang="en-US" smtClean="0"/>
-              <a:t>5/3/2017</a:t>
+              <a:t>5/4/2017</a:t>
             </a:fld>
             <a:endParaRPr lang="en-US"/>
           </a:p>
@@ -2614,7 +2614,7 @@
           <a:p>
             <a:fld id="{916B8C92-D5E3-4480-8685-D57BEE386DE2}" type="datetimeFigureOut">
               <a:rPr lang="en-US" smtClean="0"/>
-              <a:t>5/3/2017</a:t>
+              <a:t>5/4/2017</a:t>
             </a:fld>
             <a:endParaRPr lang="en-US"/>
           </a:p>
@@ -2891,7 +2891,7 @@
           <a:p>
             <a:fld id="{916B8C92-D5E3-4480-8685-D57BEE386DE2}" type="datetimeFigureOut">
               <a:rPr lang="en-US" smtClean="0"/>
-              <a:t>5/3/2017</a:t>
+              <a:t>5/4/2017</a:t>
             </a:fld>
             <a:endParaRPr lang="en-US"/>
           </a:p>
@@ -3144,7 +3144,7 @@
           <a:p>
             <a:fld id="{916B8C92-D5E3-4480-8685-D57BEE386DE2}" type="datetimeFigureOut">
               <a:rPr lang="en-US" smtClean="0"/>
-              <a:t>5/3/2017</a:t>
+              <a:t>5/4/2017</a:t>
             </a:fld>
             <a:endParaRPr lang="en-US"/>
           </a:p>
@@ -3357,7 +3357,7 @@
           <a:p>
             <a:fld id="{916B8C92-D5E3-4480-8685-D57BEE386DE2}" type="datetimeFigureOut">
               <a:rPr lang="en-US" smtClean="0"/>
-              <a:t>5/3/2017</a:t>
+              <a:t>5/4/2017</a:t>
             </a:fld>
             <a:endParaRPr lang="en-US"/>
           </a:p>
@@ -5174,44 +5174,6 @@
               <a:t>Low occupancy</a:t>
             </a:r>
             <a:endParaRPr lang="en-US" sz="1000" dirty="0"/>
-          </a:p>
-        </p:txBody>
-      </p:sp>
-      <p:sp>
-        <p:nvSpPr>
-          <p:cNvPr id="15" name="TextBox 14"/>
-          <p:cNvSpPr txBox="1"/>
-          <p:nvPr/>
-        </p:nvSpPr>
-        <p:spPr>
-          <a:xfrm>
-            <a:off x="4306824" y="512064"/>
-            <a:ext cx="2157984" cy="646331"/>
-          </a:xfrm>
-          <a:prstGeom prst="rect">
-            <a:avLst/>
-          </a:prstGeom>
-          <a:noFill/>
-        </p:spPr>
-        <p:txBody>
-          <a:bodyPr wrap="square" rtlCol="0">
-            <a:spAutoFit/>
-          </a:bodyPr>
-          <a:lstStyle/>
-          <a:p>
-            <a:r>
-              <a:rPr lang="en-US" dirty="0" err="1" smtClean="0"/>
-              <a:t>Magurran</a:t>
-            </a:r>
-            <a:r>
-              <a:rPr lang="en-US" dirty="0" smtClean="0"/>
-              <a:t> and Henderson </a:t>
-            </a:r>
-            <a:r>
-              <a:rPr lang="en-US" dirty="0" err="1" smtClean="0"/>
-              <a:t>hists</a:t>
-            </a:r>
-            <a:endParaRPr lang="en-US" dirty="0"/>
           </a:p>
         </p:txBody>
       </p:sp>
@@ -8681,6 +8643,30 @@
           </a:fontRef>
         </p:style>
       </p:cxnSp>
+      <p:pic>
+        <p:nvPicPr>
+          <p:cNvPr id="16" name="Picture 15"/>
+          <p:cNvPicPr>
+            <a:picLocks noChangeAspect="1"/>
+          </p:cNvPicPr>
+          <p:nvPr/>
+        </p:nvPicPr>
+        <p:blipFill>
+          <a:blip r:embed="rId2"/>
+          <a:stretch>
+            <a:fillRect/>
+          </a:stretch>
+        </p:blipFill>
+        <p:spPr>
+          <a:xfrm>
+            <a:off x="3803991" y="125730"/>
+            <a:ext cx="3317355" cy="2087399"/>
+          </a:xfrm>
+          <a:prstGeom prst="rect">
+            <a:avLst/>
+          </a:prstGeom>
+        </p:spPr>
+      </p:pic>
     </p:spTree>
     <p:extLst>
       <p:ext uri="{BB962C8B-B14F-4D97-AF65-F5344CB8AC3E}">

</xml_diff>

<commit_message>
rerunning analyses at the 10/25 thresholds for transients
</commit_message>
<xml_diff>
--- a/output/plots/all_figs_with_legends.pptx
+++ b/output/plots/all_figs_with_legends.pptx
@@ -4755,8 +4755,8 @@
         </p:nvSpPr>
         <p:spPr>
           <a:xfrm>
-            <a:off x="182880" y="105918"/>
-            <a:ext cx="3441192" cy="2124456"/>
+            <a:off x="175991" y="89863"/>
+            <a:ext cx="2567210" cy="2136065"/>
           </a:xfrm>
           <a:prstGeom prst="rect">
             <a:avLst/>
@@ -4801,8 +4801,8 @@
         </p:nvSpPr>
         <p:spPr>
           <a:xfrm>
-            <a:off x="3709416" y="105918"/>
-            <a:ext cx="3441192" cy="2124456"/>
+            <a:off x="3406950" y="105273"/>
+            <a:ext cx="2567210" cy="2136065"/>
           </a:xfrm>
           <a:prstGeom prst="rect">
             <a:avLst/>
@@ -4847,8 +4847,8 @@
         </p:nvSpPr>
         <p:spPr>
           <a:xfrm>
-            <a:off x="182880" y="4518659"/>
-            <a:ext cx="3441192" cy="2124456"/>
+            <a:off x="175991" y="4502604"/>
+            <a:ext cx="2567210" cy="2136065"/>
           </a:xfrm>
           <a:prstGeom prst="rect">
             <a:avLst/>
@@ -4893,8 +4893,8 @@
         </p:nvSpPr>
         <p:spPr>
           <a:xfrm>
-            <a:off x="3709416" y="4518659"/>
-            <a:ext cx="3441192" cy="2124456"/>
+            <a:off x="3406950" y="4518014"/>
+            <a:ext cx="2567210" cy="2136065"/>
           </a:xfrm>
           <a:prstGeom prst="rect">
             <a:avLst/>
@@ -4939,8 +4939,8 @@
         </p:nvSpPr>
         <p:spPr>
           <a:xfrm>
-            <a:off x="182880" y="2304668"/>
-            <a:ext cx="3441192" cy="2124456"/>
+            <a:off x="175991" y="2288613"/>
+            <a:ext cx="2567210" cy="2136065"/>
           </a:xfrm>
           <a:prstGeom prst="rect">
             <a:avLst/>
@@ -4985,8 +4985,8 @@
         </p:nvSpPr>
         <p:spPr>
           <a:xfrm>
-            <a:off x="3709416" y="2304668"/>
-            <a:ext cx="3441192" cy="2124456"/>
+            <a:off x="3406949" y="2304023"/>
+            <a:ext cx="2567209" cy="2136065"/>
           </a:xfrm>
           <a:prstGeom prst="rect">
             <a:avLst/>
@@ -5025,730 +5025,20 @@
       </p:sp>
       <p:sp>
         <p:nvSpPr>
-          <p:cNvPr id="10" name="Freeform 9"/>
+          <p:cNvPr id="44" name="Rectangle 43"/>
           <p:cNvSpPr/>
           <p:nvPr/>
         </p:nvSpPr>
         <p:spPr>
           <a:xfrm>
-            <a:off x="408432" y="180544"/>
-            <a:ext cx="2935224" cy="1975203"/>
-          </a:xfrm>
-          <a:custGeom>
-            <a:avLst/>
-            <a:gdLst>
-              <a:gd name="connsiteX0" fmla="*/ 0 w 2770632"/>
-              <a:gd name="connsiteY0" fmla="*/ 0 h 1874619"/>
-              <a:gd name="connsiteX1" fmla="*/ 438912 w 2770632"/>
-              <a:gd name="connsiteY1" fmla="*/ 1627632 h 1874619"/>
-              <a:gd name="connsiteX2" fmla="*/ 2231136 w 2770632"/>
-              <a:gd name="connsiteY2" fmla="*/ 1700784 h 1874619"/>
-              <a:gd name="connsiteX3" fmla="*/ 2770632 w 2770632"/>
-              <a:gd name="connsiteY3" fmla="*/ 9144 h 1874619"/>
-            </a:gdLst>
-            <a:ahLst/>
-            <a:cxnLst>
-              <a:cxn ang="0">
-                <a:pos x="connsiteX0" y="connsiteY0"/>
-              </a:cxn>
-              <a:cxn ang="0">
-                <a:pos x="connsiteX1" y="connsiteY1"/>
-              </a:cxn>
-              <a:cxn ang="0">
-                <a:pos x="connsiteX2" y="connsiteY2"/>
-              </a:cxn>
-              <a:cxn ang="0">
-                <a:pos x="connsiteX3" y="connsiteY3"/>
-              </a:cxn>
-            </a:cxnLst>
-            <a:rect l="l" t="t" r="r" b="b"/>
-            <a:pathLst>
-              <a:path w="2770632" h="1874619">
-                <a:moveTo>
-                  <a:pt x="0" y="0"/>
-                </a:moveTo>
-                <a:cubicBezTo>
-                  <a:pt x="33528" y="672084"/>
-                  <a:pt x="67056" y="1344168"/>
-                  <a:pt x="438912" y="1627632"/>
-                </a:cubicBezTo>
-                <a:cubicBezTo>
-                  <a:pt x="810768" y="1911096"/>
-                  <a:pt x="1842516" y="1970532"/>
-                  <a:pt x="2231136" y="1700784"/>
-                </a:cubicBezTo>
-                <a:cubicBezTo>
-                  <a:pt x="2619756" y="1431036"/>
-                  <a:pt x="2695194" y="720090"/>
-                  <a:pt x="2770632" y="9144"/>
-                </a:cubicBezTo>
-              </a:path>
-            </a:pathLst>
-          </a:custGeom>
-          <a:noFill/>
-          <a:ln w="38100">
-            <a:solidFill>
-              <a:schemeClr val="tx1"/>
-            </a:solidFill>
-          </a:ln>
-        </p:spPr>
-        <p:style>
-          <a:lnRef idx="2">
-            <a:schemeClr val="accent1">
-              <a:shade val="50000"/>
-            </a:schemeClr>
-          </a:lnRef>
-          <a:fillRef idx="1">
-            <a:schemeClr val="accent1"/>
-          </a:fillRef>
-          <a:effectRef idx="0">
-            <a:schemeClr val="accent1"/>
-          </a:effectRef>
-          <a:fontRef idx="minor">
-            <a:schemeClr val="lt1"/>
-          </a:fontRef>
-        </p:style>
-        <p:txBody>
-          <a:bodyPr rtlCol="0" anchor="ctr"/>
-          <a:lstStyle/>
-          <a:p>
-            <a:pPr algn="ctr"/>
-            <a:endParaRPr lang="en-US"/>
-          </a:p>
-        </p:txBody>
-      </p:sp>
-      <p:sp>
-        <p:nvSpPr>
-          <p:cNvPr id="13" name="TextBox 12"/>
-          <p:cNvSpPr txBox="1"/>
-          <p:nvPr/>
-        </p:nvSpPr>
-        <p:spPr>
-          <a:xfrm>
-            <a:off x="2662428" y="1954293"/>
-            <a:ext cx="1101852" cy="246221"/>
+            <a:off x="2053285" y="4627772"/>
+            <a:ext cx="164592" cy="153690"/>
           </a:xfrm>
           <a:prstGeom prst="rect">
             <a:avLst/>
           </a:prstGeom>
           <a:noFill/>
-        </p:spPr>
-        <p:txBody>
-          <a:bodyPr wrap="square" rtlCol="0">
-            <a:spAutoFit/>
-          </a:bodyPr>
-          <a:lstStyle/>
-          <a:p>
-            <a:r>
-              <a:rPr lang="en-US" sz="1000" dirty="0" smtClean="0"/>
-              <a:t>High occupancy</a:t>
-            </a:r>
-            <a:endParaRPr lang="en-US" sz="1000" dirty="0"/>
-          </a:p>
-        </p:txBody>
-      </p:sp>
-      <p:sp>
-        <p:nvSpPr>
-          <p:cNvPr id="14" name="TextBox 13"/>
-          <p:cNvSpPr txBox="1"/>
-          <p:nvPr/>
-        </p:nvSpPr>
-        <p:spPr>
-          <a:xfrm>
-            <a:off x="128016" y="1949150"/>
-            <a:ext cx="1101852" cy="246221"/>
-          </a:xfrm>
-          <a:prstGeom prst="rect">
-            <a:avLst/>
-          </a:prstGeom>
-          <a:noFill/>
-        </p:spPr>
-        <p:txBody>
-          <a:bodyPr wrap="square" rtlCol="0">
-            <a:spAutoFit/>
-          </a:bodyPr>
-          <a:lstStyle/>
-          <a:p>
-            <a:r>
-              <a:rPr lang="en-US" sz="1000" dirty="0" smtClean="0"/>
-              <a:t>Low occupancy</a:t>
-            </a:r>
-            <a:endParaRPr lang="en-US" sz="1000" dirty="0"/>
-          </a:p>
-        </p:txBody>
-      </p:sp>
-      <p:sp>
-        <p:nvSpPr>
-          <p:cNvPr id="19" name="Isosceles Triangle 18"/>
-          <p:cNvSpPr/>
-          <p:nvPr/>
-        </p:nvSpPr>
-        <p:spPr>
-          <a:xfrm>
-            <a:off x="5635752" y="5487190"/>
-            <a:ext cx="180746" cy="153690"/>
-          </a:xfrm>
-          <a:prstGeom prst="triangle">
-            <a:avLst/>
-          </a:prstGeom>
-          <a:solidFill>
-            <a:srgbClr val="FF9900"/>
-          </a:solidFill>
-          <a:ln>
-            <a:solidFill>
-              <a:srgbClr val="FF9900"/>
-            </a:solidFill>
-          </a:ln>
-        </p:spPr>
-        <p:style>
-          <a:lnRef idx="2">
-            <a:schemeClr val="accent1">
-              <a:shade val="50000"/>
-            </a:schemeClr>
-          </a:lnRef>
-          <a:fillRef idx="1">
-            <a:schemeClr val="accent1"/>
-          </a:fillRef>
-          <a:effectRef idx="0">
-            <a:schemeClr val="accent1"/>
-          </a:effectRef>
-          <a:fontRef idx="minor">
-            <a:schemeClr val="lt1"/>
-          </a:fontRef>
-        </p:style>
-        <p:txBody>
-          <a:bodyPr rtlCol="0" anchor="ctr"/>
-          <a:lstStyle/>
-          <a:p>
-            <a:pPr algn="ctr"/>
-            <a:endParaRPr lang="en-US"/>
-          </a:p>
-        </p:txBody>
-      </p:sp>
-      <p:sp>
-        <p:nvSpPr>
-          <p:cNvPr id="20" name="Moon 19"/>
-          <p:cNvSpPr/>
-          <p:nvPr/>
-        </p:nvSpPr>
-        <p:spPr>
-          <a:xfrm>
-            <a:off x="4268114" y="4815195"/>
-            <a:ext cx="98450" cy="153690"/>
-          </a:xfrm>
-          <a:prstGeom prst="moon">
-            <a:avLst/>
-          </a:prstGeom>
-          <a:solidFill>
-            <a:srgbClr val="C00000"/>
-          </a:solidFill>
-          <a:ln>
-            <a:solidFill>
-              <a:srgbClr val="C00000"/>
-            </a:solidFill>
-          </a:ln>
-        </p:spPr>
-        <p:style>
-          <a:lnRef idx="2">
-            <a:schemeClr val="accent1">
-              <a:shade val="50000"/>
-            </a:schemeClr>
-          </a:lnRef>
-          <a:fillRef idx="1">
-            <a:schemeClr val="accent1"/>
-          </a:fillRef>
-          <a:effectRef idx="0">
-            <a:schemeClr val="accent1"/>
-          </a:effectRef>
-          <a:fontRef idx="minor">
-            <a:schemeClr val="lt1"/>
-          </a:fontRef>
-        </p:style>
-        <p:txBody>
-          <a:bodyPr rtlCol="0" anchor="ctr"/>
-          <a:lstStyle/>
-          <a:p>
-            <a:pPr algn="ctr"/>
-            <a:endParaRPr lang="en-US"/>
-          </a:p>
-        </p:txBody>
-      </p:sp>
-      <p:sp>
-        <p:nvSpPr>
-          <p:cNvPr id="22" name="Flowchart: Connector 21"/>
-          <p:cNvSpPr/>
-          <p:nvPr/>
-        </p:nvSpPr>
-        <p:spPr>
-          <a:xfrm>
-            <a:off x="5061812" y="5361431"/>
-            <a:ext cx="187452" cy="153690"/>
-          </a:xfrm>
-          <a:prstGeom prst="flowChartConnector">
-            <a:avLst/>
-          </a:prstGeom>
-          <a:solidFill>
-            <a:srgbClr val="7030A0"/>
-          </a:solidFill>
-          <a:ln>
-            <a:solidFill>
-              <a:srgbClr val="7030A0"/>
-            </a:solidFill>
-          </a:ln>
-        </p:spPr>
-        <p:style>
-          <a:lnRef idx="2">
-            <a:schemeClr val="accent1">
-              <a:shade val="50000"/>
-            </a:schemeClr>
-          </a:lnRef>
-          <a:fillRef idx="1">
-            <a:schemeClr val="accent1"/>
-          </a:fillRef>
-          <a:effectRef idx="0">
-            <a:schemeClr val="accent1"/>
-          </a:effectRef>
-          <a:fontRef idx="minor">
-            <a:schemeClr val="lt1"/>
-          </a:fontRef>
-        </p:style>
-        <p:txBody>
-          <a:bodyPr rtlCol="0" anchor="ctr"/>
-          <a:lstStyle/>
-          <a:p>
-            <a:pPr algn="ctr"/>
-            <a:endParaRPr lang="en-US"/>
-          </a:p>
-        </p:txBody>
-      </p:sp>
-      <p:sp>
-        <p:nvSpPr>
-          <p:cNvPr id="27" name="Diamond 26"/>
-          <p:cNvSpPr/>
-          <p:nvPr/>
-        </p:nvSpPr>
-        <p:spPr>
-          <a:xfrm>
-            <a:off x="5861304" y="5023104"/>
-            <a:ext cx="237744" cy="219456"/>
-          </a:xfrm>
-          <a:prstGeom prst="diamond">
-            <a:avLst/>
-          </a:prstGeom>
-          <a:solidFill>
-            <a:schemeClr val="accent6">
-              <a:lumMod val="60000"/>
-              <a:lumOff val="40000"/>
-            </a:schemeClr>
-          </a:solidFill>
-          <a:ln>
-            <a:solidFill>
-              <a:schemeClr val="accent6">
-                <a:lumMod val="60000"/>
-                <a:lumOff val="40000"/>
-              </a:schemeClr>
-            </a:solidFill>
-          </a:ln>
-        </p:spPr>
-        <p:style>
-          <a:lnRef idx="2">
-            <a:schemeClr val="accent1">
-              <a:shade val="50000"/>
-            </a:schemeClr>
-          </a:lnRef>
-          <a:fillRef idx="1">
-            <a:schemeClr val="accent1"/>
-          </a:fillRef>
-          <a:effectRef idx="0">
-            <a:schemeClr val="accent1"/>
-          </a:effectRef>
-          <a:fontRef idx="minor">
-            <a:schemeClr val="lt1"/>
-          </a:fontRef>
-        </p:style>
-        <p:txBody>
-          <a:bodyPr rtlCol="0" anchor="ctr"/>
-          <a:lstStyle/>
-          <a:p>
-            <a:pPr algn="ctr"/>
-            <a:endParaRPr lang="en-US"/>
-          </a:p>
-        </p:txBody>
-      </p:sp>
-      <p:sp>
-        <p:nvSpPr>
-          <p:cNvPr id="28" name="Diamond 27"/>
-          <p:cNvSpPr/>
-          <p:nvPr/>
-        </p:nvSpPr>
-        <p:spPr>
-          <a:xfrm>
-            <a:off x="4709160" y="6025896"/>
-            <a:ext cx="237744" cy="219456"/>
-          </a:xfrm>
-          <a:prstGeom prst="diamond">
-            <a:avLst/>
-          </a:prstGeom>
-          <a:solidFill>
-            <a:schemeClr val="accent6">
-              <a:lumMod val="60000"/>
-              <a:lumOff val="40000"/>
-            </a:schemeClr>
-          </a:solidFill>
-          <a:ln>
-            <a:solidFill>
-              <a:schemeClr val="accent6">
-                <a:lumMod val="60000"/>
-                <a:lumOff val="40000"/>
-              </a:schemeClr>
-            </a:solidFill>
-          </a:ln>
-        </p:spPr>
-        <p:style>
-          <a:lnRef idx="2">
-            <a:schemeClr val="accent1">
-              <a:shade val="50000"/>
-            </a:schemeClr>
-          </a:lnRef>
-          <a:fillRef idx="1">
-            <a:schemeClr val="accent1"/>
-          </a:fillRef>
-          <a:effectRef idx="0">
-            <a:schemeClr val="accent1"/>
-          </a:effectRef>
-          <a:fontRef idx="minor">
-            <a:schemeClr val="lt1"/>
-          </a:fontRef>
-        </p:style>
-        <p:txBody>
-          <a:bodyPr rtlCol="0" anchor="ctr"/>
-          <a:lstStyle/>
-          <a:p>
-            <a:pPr algn="ctr"/>
-            <a:endParaRPr lang="en-US"/>
-          </a:p>
-        </p:txBody>
-      </p:sp>
-      <p:sp>
-        <p:nvSpPr>
-          <p:cNvPr id="30" name="Diamond 29"/>
-          <p:cNvSpPr/>
-          <p:nvPr/>
-        </p:nvSpPr>
-        <p:spPr>
-          <a:xfrm>
-            <a:off x="4303776" y="5242560"/>
-            <a:ext cx="237744" cy="219456"/>
-          </a:xfrm>
-          <a:prstGeom prst="diamond">
-            <a:avLst/>
-          </a:prstGeom>
-          <a:solidFill>
-            <a:schemeClr val="accent6">
-              <a:lumMod val="60000"/>
-              <a:lumOff val="40000"/>
-            </a:schemeClr>
-          </a:solidFill>
-          <a:ln>
-            <a:solidFill>
-              <a:schemeClr val="accent6">
-                <a:lumMod val="60000"/>
-                <a:lumOff val="40000"/>
-              </a:schemeClr>
-            </a:solidFill>
-          </a:ln>
-        </p:spPr>
-        <p:style>
-          <a:lnRef idx="2">
-            <a:schemeClr val="accent1">
-              <a:shade val="50000"/>
-            </a:schemeClr>
-          </a:lnRef>
-          <a:fillRef idx="1">
-            <a:schemeClr val="accent1"/>
-          </a:fillRef>
-          <a:effectRef idx="0">
-            <a:schemeClr val="accent1"/>
-          </a:effectRef>
-          <a:fontRef idx="minor">
-            <a:schemeClr val="lt1"/>
-          </a:fontRef>
-        </p:style>
-        <p:txBody>
-          <a:bodyPr rtlCol="0" anchor="ctr"/>
-          <a:lstStyle/>
-          <a:p>
-            <a:pPr algn="ctr"/>
-            <a:endParaRPr lang="en-US"/>
-          </a:p>
-        </p:txBody>
-      </p:sp>
-      <p:sp>
-        <p:nvSpPr>
-          <p:cNvPr id="33" name="Diamond 32"/>
-          <p:cNvSpPr/>
-          <p:nvPr/>
-        </p:nvSpPr>
-        <p:spPr>
-          <a:xfrm>
-            <a:off x="6464808" y="4639701"/>
-            <a:ext cx="237744" cy="219456"/>
-          </a:xfrm>
-          <a:prstGeom prst="diamond">
-            <a:avLst/>
-          </a:prstGeom>
-          <a:solidFill>
-            <a:schemeClr val="accent6">
-              <a:lumMod val="60000"/>
-              <a:lumOff val="40000"/>
-            </a:schemeClr>
-          </a:solidFill>
-          <a:ln>
-            <a:solidFill>
-              <a:schemeClr val="accent6">
-                <a:lumMod val="60000"/>
-                <a:lumOff val="40000"/>
-              </a:schemeClr>
-            </a:solidFill>
-          </a:ln>
-        </p:spPr>
-        <p:style>
-          <a:lnRef idx="2">
-            <a:schemeClr val="accent1">
-              <a:shade val="50000"/>
-            </a:schemeClr>
-          </a:lnRef>
-          <a:fillRef idx="1">
-            <a:schemeClr val="accent1"/>
-          </a:fillRef>
-          <a:effectRef idx="0">
-            <a:schemeClr val="accent1"/>
-          </a:effectRef>
-          <a:fontRef idx="minor">
-            <a:schemeClr val="lt1"/>
-          </a:fontRef>
-        </p:style>
-        <p:txBody>
-          <a:bodyPr rtlCol="0" anchor="ctr"/>
-          <a:lstStyle/>
-          <a:p>
-            <a:pPr algn="ctr"/>
-            <a:endParaRPr lang="en-US"/>
-          </a:p>
-        </p:txBody>
-      </p:sp>
-      <p:sp>
-        <p:nvSpPr>
-          <p:cNvPr id="35" name="5-Point Star 34"/>
-          <p:cNvSpPr/>
-          <p:nvPr/>
-        </p:nvSpPr>
-        <p:spPr>
-          <a:xfrm>
-            <a:off x="4133392" y="5833109"/>
-            <a:ext cx="229514" cy="219456"/>
-          </a:xfrm>
-          <a:prstGeom prst="star5">
-            <a:avLst/>
-          </a:prstGeom>
-          <a:solidFill>
-            <a:schemeClr val="accent4"/>
-          </a:solidFill>
-          <a:ln>
-            <a:solidFill>
-              <a:schemeClr val="accent4"/>
-            </a:solidFill>
-          </a:ln>
-        </p:spPr>
-        <p:style>
-          <a:lnRef idx="2">
-            <a:schemeClr val="accent1">
-              <a:shade val="50000"/>
-            </a:schemeClr>
-          </a:lnRef>
-          <a:fillRef idx="1">
-            <a:schemeClr val="accent1"/>
-          </a:fillRef>
-          <a:effectRef idx="0">
-            <a:schemeClr val="accent1"/>
-          </a:effectRef>
-          <a:fontRef idx="minor">
-            <a:schemeClr val="lt1"/>
-          </a:fontRef>
-        </p:style>
-        <p:txBody>
-          <a:bodyPr rtlCol="0" anchor="ctr"/>
-          <a:lstStyle/>
-          <a:p>
-            <a:pPr algn="ctr"/>
-            <a:endParaRPr lang="en-US"/>
-          </a:p>
-        </p:txBody>
-      </p:sp>
-      <p:sp>
-        <p:nvSpPr>
-          <p:cNvPr id="36" name="Moon 35"/>
-          <p:cNvSpPr/>
-          <p:nvPr/>
-        </p:nvSpPr>
-        <p:spPr>
-          <a:xfrm>
-            <a:off x="5238900" y="5842487"/>
-            <a:ext cx="98450" cy="153690"/>
-          </a:xfrm>
-          <a:prstGeom prst="moon">
-            <a:avLst/>
-          </a:prstGeom>
-          <a:solidFill>
-            <a:srgbClr val="C00000"/>
-          </a:solidFill>
-          <a:ln>
-            <a:solidFill>
-              <a:srgbClr val="C00000"/>
-            </a:solidFill>
-          </a:ln>
-        </p:spPr>
-        <p:style>
-          <a:lnRef idx="2">
-            <a:schemeClr val="accent1">
-              <a:shade val="50000"/>
-            </a:schemeClr>
-          </a:lnRef>
-          <a:fillRef idx="1">
-            <a:schemeClr val="accent1"/>
-          </a:fillRef>
-          <a:effectRef idx="0">
-            <a:schemeClr val="accent1"/>
-          </a:effectRef>
-          <a:fontRef idx="minor">
-            <a:schemeClr val="lt1"/>
-          </a:fontRef>
-        </p:style>
-        <p:txBody>
-          <a:bodyPr rtlCol="0" anchor="ctr"/>
-          <a:lstStyle/>
-          <a:p>
-            <a:pPr algn="ctr"/>
-            <a:endParaRPr lang="en-US"/>
-          </a:p>
-        </p:txBody>
-      </p:sp>
-      <p:sp>
-        <p:nvSpPr>
-          <p:cNvPr id="37" name="Flowchart: Connector 36"/>
-          <p:cNvSpPr/>
-          <p:nvPr/>
-        </p:nvSpPr>
-        <p:spPr>
-          <a:xfrm>
-            <a:off x="5829300" y="4716545"/>
-            <a:ext cx="187452" cy="153690"/>
-          </a:xfrm>
-          <a:prstGeom prst="flowChartConnector">
-            <a:avLst/>
-          </a:prstGeom>
-          <a:solidFill>
-            <a:srgbClr val="7030A0"/>
-          </a:solidFill>
-          <a:ln>
-            <a:solidFill>
-              <a:srgbClr val="7030A0"/>
-            </a:solidFill>
-          </a:ln>
-        </p:spPr>
-        <p:style>
-          <a:lnRef idx="2">
-            <a:schemeClr val="accent1">
-              <a:shade val="50000"/>
-            </a:schemeClr>
-          </a:lnRef>
-          <a:fillRef idx="1">
-            <a:schemeClr val="accent1"/>
-          </a:fillRef>
-          <a:effectRef idx="0">
-            <a:schemeClr val="accent1"/>
-          </a:effectRef>
-          <a:fontRef idx="minor">
-            <a:schemeClr val="lt1"/>
-          </a:fontRef>
-        </p:style>
-        <p:txBody>
-          <a:bodyPr rtlCol="0" anchor="ctr"/>
-          <a:lstStyle/>
-          <a:p>
-            <a:pPr algn="ctr"/>
-            <a:endParaRPr lang="en-US"/>
-          </a:p>
-        </p:txBody>
-      </p:sp>
-      <p:sp>
-        <p:nvSpPr>
-          <p:cNvPr id="39" name="Flowchart: Connector 38"/>
-          <p:cNvSpPr/>
-          <p:nvPr/>
-        </p:nvSpPr>
-        <p:spPr>
-          <a:xfrm>
-            <a:off x="5673852" y="6192889"/>
-            <a:ext cx="187452" cy="153690"/>
-          </a:xfrm>
-          <a:prstGeom prst="flowChartConnector">
-            <a:avLst/>
-          </a:prstGeom>
-          <a:solidFill>
-            <a:srgbClr val="7030A0"/>
-          </a:solidFill>
-          <a:ln>
-            <a:solidFill>
-              <a:srgbClr val="7030A0"/>
-            </a:solidFill>
-          </a:ln>
-        </p:spPr>
-        <p:style>
-          <a:lnRef idx="2">
-            <a:schemeClr val="accent1">
-              <a:shade val="50000"/>
-            </a:schemeClr>
-          </a:lnRef>
-          <a:fillRef idx="1">
-            <a:schemeClr val="accent1"/>
-          </a:fillRef>
-          <a:effectRef idx="0">
-            <a:schemeClr val="accent1"/>
-          </a:effectRef>
-          <a:fontRef idx="minor">
-            <a:schemeClr val="lt1"/>
-          </a:fontRef>
-        </p:style>
-        <p:txBody>
-          <a:bodyPr rtlCol="0" anchor="ctr"/>
-          <a:lstStyle/>
-          <a:p>
-            <a:pPr algn="ctr"/>
-            <a:endParaRPr lang="en-US"/>
-          </a:p>
-        </p:txBody>
-      </p:sp>
-      <p:sp>
-        <p:nvSpPr>
-          <p:cNvPr id="43" name="Rectangle 42"/>
-          <p:cNvSpPr/>
-          <p:nvPr/>
-        </p:nvSpPr>
-        <p:spPr>
-          <a:xfrm>
-            <a:off x="6461150" y="5765642"/>
-            <a:ext cx="164592" cy="153690"/>
-          </a:xfrm>
-          <a:prstGeom prst="rect">
-            <a:avLst/>
-          </a:prstGeom>
-          <a:solidFill>
-            <a:schemeClr val="accent1">
-              <a:lumMod val="75000"/>
-            </a:schemeClr>
-          </a:solidFill>
-          <a:ln>
+          <a:ln w="38100">
             <a:solidFill>
               <a:schemeClr val="accent1">
                 <a:lumMod val="75000"/>
@@ -5783,66 +5073,14 @@
       </p:sp>
       <p:sp>
         <p:nvSpPr>
-          <p:cNvPr id="44" name="Rectangle 43"/>
-          <p:cNvSpPr/>
-          <p:nvPr/>
-        </p:nvSpPr>
-        <p:spPr>
-          <a:xfrm>
-            <a:off x="4943246" y="4839431"/>
-            <a:ext cx="164592" cy="153690"/>
-          </a:xfrm>
-          <a:prstGeom prst="rect">
-            <a:avLst/>
-          </a:prstGeom>
-          <a:solidFill>
-            <a:schemeClr val="accent1">
-              <a:lumMod val="75000"/>
-            </a:schemeClr>
-          </a:solidFill>
-          <a:ln>
-            <a:solidFill>
-              <a:schemeClr val="accent1">
-                <a:lumMod val="75000"/>
-              </a:schemeClr>
-            </a:solidFill>
-          </a:ln>
-        </p:spPr>
-        <p:style>
-          <a:lnRef idx="2">
-            <a:schemeClr val="accent1">
-              <a:shade val="50000"/>
-            </a:schemeClr>
-          </a:lnRef>
-          <a:fillRef idx="1">
-            <a:schemeClr val="accent1"/>
-          </a:fillRef>
-          <a:effectRef idx="0">
-            <a:schemeClr val="accent1"/>
-          </a:effectRef>
-          <a:fontRef idx="minor">
-            <a:schemeClr val="lt1"/>
-          </a:fontRef>
-        </p:style>
-        <p:txBody>
-          <a:bodyPr rtlCol="0" anchor="ctr"/>
-          <a:lstStyle/>
-          <a:p>
-            <a:pPr algn="ctr"/>
-            <a:endParaRPr lang="en-US"/>
-          </a:p>
-        </p:txBody>
-      </p:sp>
-      <p:sp>
-        <p:nvSpPr>
           <p:cNvPr id="46" name="TextBox 45"/>
           <p:cNvSpPr txBox="1"/>
           <p:nvPr/>
         </p:nvSpPr>
         <p:spPr>
           <a:xfrm>
-            <a:off x="2932938" y="6296786"/>
-            <a:ext cx="1000201" cy="369332"/>
+            <a:off x="2127010" y="6338754"/>
+            <a:ext cx="686468" cy="369332"/>
           </a:xfrm>
           <a:prstGeom prst="rect">
             <a:avLst/>
@@ -5857,7 +5095,11 @@
           <a:p>
             <a:r>
               <a:rPr lang="en-US" dirty="0" smtClean="0"/>
-              <a:t>N = 5</a:t>
+              <a:t>N = </a:t>
+            </a:r>
+            <a:r>
+              <a:rPr lang="en-US" dirty="0" smtClean="0"/>
+              <a:t>7</a:t>
             </a:r>
             <a:endParaRPr lang="en-US" dirty="0"/>
           </a:p>
@@ -5871,8 +5113,8 @@
         </p:nvSpPr>
         <p:spPr>
           <a:xfrm>
-            <a:off x="6461150" y="6273783"/>
-            <a:ext cx="1000201" cy="369332"/>
+            <a:off x="5371062" y="6368475"/>
+            <a:ext cx="697636" cy="369332"/>
           </a:xfrm>
           <a:prstGeom prst="rect">
             <a:avLst/>
@@ -5887,7 +5129,11 @@
           <a:p>
             <a:r>
               <a:rPr lang="en-US" dirty="0" smtClean="0"/>
-              <a:t>N = 6</a:t>
+              <a:t>N = </a:t>
+            </a:r>
+            <a:r>
+              <a:rPr lang="en-US" dirty="0" smtClean="0"/>
+              <a:t>7</a:t>
             </a:r>
             <a:endParaRPr lang="en-US" dirty="0"/>
           </a:p>
@@ -5902,13 +5148,13 @@
           <p:nvPr>
             <p:extLst>
               <p:ext uri="{D42A27DB-BD31-4B8C-83A1-F6EECF244321}">
-                <p14:modId xmlns:p14="http://schemas.microsoft.com/office/powerpoint/2010/main" val="1776820716"/>
+                <p14:modId xmlns:p14="http://schemas.microsoft.com/office/powerpoint/2010/main" val="3804910580"/>
               </p:ext>
             </p:extLst>
           </p:nvPr>
         </p:nvGraphicFramePr>
         <p:xfrm>
-          <a:off x="7235952" y="5032367"/>
+          <a:off x="6402076" y="4992341"/>
           <a:ext cx="4822650" cy="1112520"/>
         </p:xfrm>
         <a:graphic>
@@ -6066,14 +5312,6 @@
                     <a:bodyPr/>
                     <a:lstStyle/>
                     <a:p>
-                      <a:r>
-                        <a:rPr lang="en-US" sz="1200" dirty="0" smtClean="0">
-                          <a:solidFill>
-                            <a:schemeClr val="tx1"/>
-                          </a:solidFill>
-                        </a:rPr>
-                        <a:t>????</a:t>
-                      </a:r>
                       <a:endParaRPr lang="en-US" sz="1200" dirty="0">
                         <a:solidFill>
                           <a:schemeClr val="tx1"/>
@@ -6187,7 +5425,11 @@
                     <a:p>
                       <a:r>
                         <a:rPr lang="en-US" sz="1200" dirty="0" smtClean="0"/>
-                        <a:t>5/7 = 0.714</a:t>
+                        <a:t>All</a:t>
+                      </a:r>
+                      <a:r>
+                        <a:rPr lang="en-US" sz="1200" baseline="0" dirty="0" smtClean="0"/>
+                        <a:t> different?</a:t>
                       </a:r>
                       <a:endParaRPr lang="en-US" sz="1200" dirty="0"/>
                     </a:p>
@@ -6345,8 +5587,8 @@
                     <a:lstStyle/>
                     <a:p>
                       <a:r>
-                        <a:rPr lang="en-US" sz="1200" dirty="0" smtClean="0"/>
-                        <a:t>4/4 =1???</a:t>
+                        <a:rPr lang="en-US" sz="1200" baseline="0" dirty="0" smtClean="0"/>
+                        <a:t> confused now.</a:t>
                       </a:r>
                       <a:endParaRPr lang="en-US" sz="1200" dirty="0"/>
                     </a:p>
@@ -6553,7 +5795,7 @@
         </p:nvSpPr>
         <p:spPr>
           <a:xfrm>
-            <a:off x="3266736" y="2527590"/>
+            <a:off x="2280866" y="2568523"/>
             <a:ext cx="45719" cy="45719"/>
           </a:xfrm>
           <a:prstGeom prst="flowChartConnector">
@@ -6601,7 +5843,7 @@
         </p:nvSpPr>
         <p:spPr>
           <a:xfrm>
-            <a:off x="1527962" y="4192251"/>
+            <a:off x="1179596" y="4209058"/>
             <a:ext cx="695858" cy="246221"/>
           </a:xfrm>
           <a:prstGeom prst="rect">
@@ -6631,7 +5873,7 @@
         </p:nvSpPr>
         <p:spPr>
           <a:xfrm rot="16200000">
-            <a:off x="-136195" y="3285237"/>
+            <a:off x="-118993" y="3275895"/>
             <a:ext cx="848822" cy="246221"/>
           </a:xfrm>
           <a:prstGeom prst="rect">
@@ -6661,8 +5903,8 @@
         </p:nvSpPr>
         <p:spPr>
           <a:xfrm>
-            <a:off x="7218163" y="2983312"/>
-            <a:ext cx="2995966" cy="923330"/>
+            <a:off x="5941659" y="4097497"/>
+            <a:ext cx="1024176" cy="400110"/>
           </a:xfrm>
           <a:prstGeom prst="rect">
             <a:avLst/>
@@ -6676,46 +5918,44 @@
           <a:lstStyle/>
           <a:p>
             <a:r>
-              <a:rPr lang="en-US" dirty="0" smtClean="0"/>
+              <a:rPr lang="en-US" sz="1000" dirty="0" smtClean="0"/>
               <a:t>Box 1: # </a:t>
             </a:r>
             <a:r>
-              <a:rPr lang="en-US" dirty="0" err="1" smtClean="0"/>
+              <a:rPr lang="en-US" sz="1000" dirty="0" err="1" smtClean="0"/>
               <a:t>spp</a:t>
             </a:r>
             <a:r>
-              <a:rPr lang="en-US" dirty="0" smtClean="0"/>
-              <a:t> =1</a:t>
-            </a:r>
-          </a:p>
-          <a:p>
-            <a:r>
-              <a:rPr lang="en-US" dirty="0" smtClean="0"/>
-              <a:t>Box 2: # </a:t>
-            </a:r>
-            <a:r>
-              <a:rPr lang="en-US" dirty="0" err="1" smtClean="0"/>
+              <a:rPr lang="en-US" sz="1000" dirty="0" smtClean="0"/>
+              <a:t> </a:t>
+            </a:r>
+            <a:r>
+              <a:rPr lang="en-US" sz="1000" dirty="0" smtClean="0"/>
+              <a:t>=3</a:t>
+            </a:r>
+          </a:p>
+          <a:p>
+            <a:r>
+              <a:rPr lang="en-US" sz="1000" dirty="0" smtClean="0"/>
+              <a:t>Box 4: </a:t>
+            </a:r>
+            <a:r>
+              <a:rPr lang="en-US" sz="1000" dirty="0" smtClean="0"/>
+              <a:t># </a:t>
+            </a:r>
+            <a:r>
+              <a:rPr lang="en-US" sz="1000" dirty="0" err="1" smtClean="0"/>
               <a:t>spp</a:t>
             </a:r>
             <a:r>
-              <a:rPr lang="en-US" dirty="0" smtClean="0"/>
-              <a:t> = 4</a:t>
-            </a:r>
-          </a:p>
-          <a:p>
-            <a:r>
-              <a:rPr lang="en-US" dirty="0" smtClean="0"/>
-              <a:t>Box 3: # </a:t>
-            </a:r>
-            <a:r>
-              <a:rPr lang="en-US" dirty="0" err="1" smtClean="0"/>
-              <a:t>spp</a:t>
-            </a:r>
-            <a:r>
-              <a:rPr lang="en-US" dirty="0" smtClean="0"/>
-              <a:t> = 5</a:t>
-            </a:r>
-            <a:endParaRPr lang="en-US" dirty="0"/>
+              <a:rPr lang="en-US" sz="1000" dirty="0" smtClean="0"/>
+              <a:t> = </a:t>
+            </a:r>
+            <a:r>
+              <a:rPr lang="en-US" sz="1000" dirty="0"/>
+              <a:t>7</a:t>
+            </a:r>
+            <a:endParaRPr lang="en-US" sz="1000" dirty="0" smtClean="0"/>
           </a:p>
         </p:txBody>
       </p:sp>
@@ -6727,8 +5967,8 @@
         </p:nvCxnSpPr>
         <p:spPr>
           <a:xfrm flipV="1">
-            <a:off x="588955" y="2600120"/>
-            <a:ext cx="2645686" cy="1348477"/>
+            <a:off x="588955" y="2620002"/>
+            <a:ext cx="1679579" cy="1328597"/>
           </a:xfrm>
           <a:prstGeom prst="line">
             <a:avLst/>
@@ -6763,8 +6003,8 @@
         </p:nvCxnSpPr>
         <p:spPr>
           <a:xfrm flipV="1">
-            <a:off x="557633" y="2582712"/>
-            <a:ext cx="2635642" cy="474268"/>
+            <a:off x="562646" y="2615284"/>
+            <a:ext cx="1691612" cy="454150"/>
           </a:xfrm>
           <a:prstGeom prst="line">
             <a:avLst/>
@@ -6793,836 +6033,14 @@
       </p:cxnSp>
       <p:sp>
         <p:nvSpPr>
-          <p:cNvPr id="63" name="5-Point Star 62"/>
-          <p:cNvSpPr/>
-          <p:nvPr/>
-        </p:nvSpPr>
-        <p:spPr>
-          <a:xfrm>
-            <a:off x="3847511" y="2463182"/>
-            <a:ext cx="229514" cy="219456"/>
-          </a:xfrm>
-          <a:prstGeom prst="star5">
-            <a:avLst/>
-          </a:prstGeom>
-          <a:solidFill>
-            <a:schemeClr val="accent4"/>
-          </a:solidFill>
-          <a:ln>
-            <a:solidFill>
-              <a:schemeClr val="accent4"/>
-            </a:solidFill>
-          </a:ln>
-        </p:spPr>
-        <p:style>
-          <a:lnRef idx="2">
-            <a:schemeClr val="accent1">
-              <a:shade val="50000"/>
-            </a:schemeClr>
-          </a:lnRef>
-          <a:fillRef idx="1">
-            <a:schemeClr val="accent1"/>
-          </a:fillRef>
-          <a:effectRef idx="0">
-            <a:schemeClr val="accent1"/>
-          </a:effectRef>
-          <a:fontRef idx="minor">
-            <a:schemeClr val="lt1"/>
-          </a:fontRef>
-        </p:style>
-        <p:txBody>
-          <a:bodyPr rtlCol="0" anchor="ctr"/>
-          <a:lstStyle/>
-          <a:p>
-            <a:pPr algn="ctr"/>
-            <a:endParaRPr lang="en-US"/>
-          </a:p>
-        </p:txBody>
-      </p:sp>
-      <p:sp>
-        <p:nvSpPr>
-          <p:cNvPr id="64" name="Rectangle 63"/>
-          <p:cNvSpPr/>
-          <p:nvPr/>
-        </p:nvSpPr>
-        <p:spPr>
-          <a:xfrm>
-            <a:off x="4316903" y="2463182"/>
-            <a:ext cx="164592" cy="153690"/>
-          </a:xfrm>
-          <a:prstGeom prst="rect">
-            <a:avLst/>
-          </a:prstGeom>
-          <a:solidFill>
-            <a:schemeClr val="accent1">
-              <a:lumMod val="75000"/>
-            </a:schemeClr>
-          </a:solidFill>
-          <a:ln>
-            <a:solidFill>
-              <a:schemeClr val="accent1">
-                <a:lumMod val="75000"/>
-              </a:schemeClr>
-            </a:solidFill>
-          </a:ln>
-        </p:spPr>
-        <p:style>
-          <a:lnRef idx="2">
-            <a:schemeClr val="accent1">
-              <a:shade val="50000"/>
-            </a:schemeClr>
-          </a:lnRef>
-          <a:fillRef idx="1">
-            <a:schemeClr val="accent1"/>
-          </a:fillRef>
-          <a:effectRef idx="0">
-            <a:schemeClr val="accent1"/>
-          </a:effectRef>
-          <a:fontRef idx="minor">
-            <a:schemeClr val="lt1"/>
-          </a:fontRef>
-        </p:style>
-        <p:txBody>
-          <a:bodyPr rtlCol="0" anchor="ctr"/>
-          <a:lstStyle/>
-          <a:p>
-            <a:pPr algn="ctr"/>
-            <a:endParaRPr lang="en-US"/>
-          </a:p>
-        </p:txBody>
-      </p:sp>
-      <p:sp>
-        <p:nvSpPr>
-          <p:cNvPr id="65" name="Diamond 64"/>
-          <p:cNvSpPr/>
-          <p:nvPr/>
-        </p:nvSpPr>
-        <p:spPr>
-          <a:xfrm>
-            <a:off x="3993815" y="3814736"/>
-            <a:ext cx="237744" cy="219456"/>
-          </a:xfrm>
-          <a:prstGeom prst="diamond">
-            <a:avLst/>
-          </a:prstGeom>
-          <a:solidFill>
-            <a:schemeClr val="accent6">
-              <a:lumMod val="60000"/>
-              <a:lumOff val="40000"/>
-            </a:schemeClr>
-          </a:solidFill>
-          <a:ln>
-            <a:solidFill>
-              <a:schemeClr val="accent6">
-                <a:lumMod val="60000"/>
-                <a:lumOff val="40000"/>
-              </a:schemeClr>
-            </a:solidFill>
-          </a:ln>
-        </p:spPr>
-        <p:style>
-          <a:lnRef idx="2">
-            <a:schemeClr val="accent1">
-              <a:shade val="50000"/>
-            </a:schemeClr>
-          </a:lnRef>
-          <a:fillRef idx="1">
-            <a:schemeClr val="accent1"/>
-          </a:fillRef>
-          <a:effectRef idx="0">
-            <a:schemeClr val="accent1"/>
-          </a:effectRef>
-          <a:fontRef idx="minor">
-            <a:schemeClr val="lt1"/>
-          </a:fontRef>
-        </p:style>
-        <p:txBody>
-          <a:bodyPr rtlCol="0" anchor="ctr"/>
-          <a:lstStyle/>
-          <a:p>
-            <a:pPr algn="ctr"/>
-            <a:endParaRPr lang="en-US"/>
-          </a:p>
-        </p:txBody>
-      </p:sp>
-      <p:sp>
-        <p:nvSpPr>
-          <p:cNvPr id="66" name="Regular Pentagon 65"/>
-          <p:cNvSpPr/>
-          <p:nvPr/>
-        </p:nvSpPr>
-        <p:spPr>
-          <a:xfrm>
-            <a:off x="5714184" y="3018414"/>
-            <a:ext cx="207872" cy="226053"/>
-          </a:xfrm>
-          <a:prstGeom prst="pentagon">
-            <a:avLst/>
-          </a:prstGeom>
-          <a:solidFill>
-            <a:srgbClr val="FF0066"/>
-          </a:solidFill>
-          <a:ln>
-            <a:solidFill>
-              <a:srgbClr val="FF0066"/>
-            </a:solidFill>
-          </a:ln>
-        </p:spPr>
-        <p:style>
-          <a:lnRef idx="2">
-            <a:schemeClr val="accent1">
-              <a:shade val="50000"/>
-            </a:schemeClr>
-          </a:lnRef>
-          <a:fillRef idx="1">
-            <a:schemeClr val="accent1"/>
-          </a:fillRef>
-          <a:effectRef idx="0">
-            <a:schemeClr val="accent1"/>
-          </a:effectRef>
-          <a:fontRef idx="minor">
-            <a:schemeClr val="lt1"/>
-          </a:fontRef>
-        </p:style>
-        <p:txBody>
-          <a:bodyPr rtlCol="0" anchor="ctr"/>
-          <a:lstStyle/>
-          <a:p>
-            <a:pPr algn="ctr"/>
-            <a:endParaRPr lang="en-US"/>
-          </a:p>
-        </p:txBody>
-      </p:sp>
-      <p:sp>
-        <p:nvSpPr>
-          <p:cNvPr id="67" name="5-Point Star 66"/>
-          <p:cNvSpPr/>
-          <p:nvPr/>
-        </p:nvSpPr>
-        <p:spPr>
-          <a:xfrm>
-            <a:off x="4276843" y="3272100"/>
-            <a:ext cx="229514" cy="219456"/>
-          </a:xfrm>
-          <a:prstGeom prst="star5">
-            <a:avLst/>
-          </a:prstGeom>
-          <a:solidFill>
-            <a:schemeClr val="accent4"/>
-          </a:solidFill>
-          <a:ln>
-            <a:solidFill>
-              <a:schemeClr val="accent4"/>
-            </a:solidFill>
-          </a:ln>
-        </p:spPr>
-        <p:style>
-          <a:lnRef idx="2">
-            <a:schemeClr val="accent1">
-              <a:shade val="50000"/>
-            </a:schemeClr>
-          </a:lnRef>
-          <a:fillRef idx="1">
-            <a:schemeClr val="accent1"/>
-          </a:fillRef>
-          <a:effectRef idx="0">
-            <a:schemeClr val="accent1"/>
-          </a:effectRef>
-          <a:fontRef idx="minor">
-            <a:schemeClr val="lt1"/>
-          </a:fontRef>
-        </p:style>
-        <p:txBody>
-          <a:bodyPr rtlCol="0" anchor="ctr"/>
-          <a:lstStyle/>
-          <a:p>
-            <a:pPr algn="ctr"/>
-            <a:endParaRPr lang="en-US"/>
-          </a:p>
-        </p:txBody>
-      </p:sp>
-      <p:sp>
-        <p:nvSpPr>
-          <p:cNvPr id="68" name="Rectangle 67"/>
-          <p:cNvSpPr/>
-          <p:nvPr/>
-        </p:nvSpPr>
-        <p:spPr>
-          <a:xfrm>
-            <a:off x="3879972" y="3018414"/>
-            <a:ext cx="164592" cy="153690"/>
-          </a:xfrm>
-          <a:prstGeom prst="rect">
-            <a:avLst/>
-          </a:prstGeom>
-          <a:solidFill>
-            <a:schemeClr val="accent1">
-              <a:lumMod val="75000"/>
-            </a:schemeClr>
-          </a:solidFill>
-          <a:ln>
-            <a:solidFill>
-              <a:schemeClr val="accent1">
-                <a:lumMod val="75000"/>
-              </a:schemeClr>
-            </a:solidFill>
-          </a:ln>
-        </p:spPr>
-        <p:style>
-          <a:lnRef idx="2">
-            <a:schemeClr val="accent1">
-              <a:shade val="50000"/>
-            </a:schemeClr>
-          </a:lnRef>
-          <a:fillRef idx="1">
-            <a:schemeClr val="accent1"/>
-          </a:fillRef>
-          <a:effectRef idx="0">
-            <a:schemeClr val="accent1"/>
-          </a:effectRef>
-          <a:fontRef idx="minor">
-            <a:schemeClr val="lt1"/>
-          </a:fontRef>
-        </p:style>
-        <p:txBody>
-          <a:bodyPr rtlCol="0" anchor="ctr"/>
-          <a:lstStyle/>
-          <a:p>
-            <a:pPr algn="ctr"/>
-            <a:endParaRPr lang="en-US"/>
-          </a:p>
-        </p:txBody>
-      </p:sp>
-      <p:sp>
-        <p:nvSpPr>
-          <p:cNvPr id="69" name="Diamond 68"/>
-          <p:cNvSpPr/>
-          <p:nvPr/>
-        </p:nvSpPr>
-        <p:spPr>
-          <a:xfrm>
-            <a:off x="4811593" y="2557996"/>
-            <a:ext cx="237744" cy="219456"/>
-          </a:xfrm>
-          <a:prstGeom prst="diamond">
-            <a:avLst/>
-          </a:prstGeom>
-          <a:solidFill>
-            <a:schemeClr val="accent6">
-              <a:lumMod val="60000"/>
-              <a:lumOff val="40000"/>
-            </a:schemeClr>
-          </a:solidFill>
-          <a:ln>
-            <a:solidFill>
-              <a:schemeClr val="accent6">
-                <a:lumMod val="60000"/>
-                <a:lumOff val="40000"/>
-              </a:schemeClr>
-            </a:solidFill>
-          </a:ln>
-        </p:spPr>
-        <p:style>
-          <a:lnRef idx="2">
-            <a:schemeClr val="accent1">
-              <a:shade val="50000"/>
-            </a:schemeClr>
-          </a:lnRef>
-          <a:fillRef idx="1">
-            <a:schemeClr val="accent1"/>
-          </a:fillRef>
-          <a:effectRef idx="0">
-            <a:schemeClr val="accent1"/>
-          </a:effectRef>
-          <a:fontRef idx="minor">
-            <a:schemeClr val="lt1"/>
-          </a:fontRef>
-        </p:style>
-        <p:txBody>
-          <a:bodyPr rtlCol="0" anchor="ctr"/>
-          <a:lstStyle/>
-          <a:p>
-            <a:pPr algn="ctr"/>
-            <a:endParaRPr lang="en-US"/>
-          </a:p>
-        </p:txBody>
-      </p:sp>
-      <p:sp>
-        <p:nvSpPr>
-          <p:cNvPr id="70" name="Diamond 69"/>
-          <p:cNvSpPr/>
-          <p:nvPr/>
-        </p:nvSpPr>
-        <p:spPr>
-          <a:xfrm>
-            <a:off x="6605516" y="3267146"/>
-            <a:ext cx="237744" cy="219456"/>
-          </a:xfrm>
-          <a:prstGeom prst="diamond">
-            <a:avLst/>
-          </a:prstGeom>
-          <a:solidFill>
-            <a:schemeClr val="accent6">
-              <a:lumMod val="60000"/>
-              <a:lumOff val="40000"/>
-            </a:schemeClr>
-          </a:solidFill>
-          <a:ln>
-            <a:solidFill>
-              <a:schemeClr val="accent6">
-                <a:lumMod val="60000"/>
-                <a:lumOff val="40000"/>
-              </a:schemeClr>
-            </a:solidFill>
-          </a:ln>
-        </p:spPr>
-        <p:style>
-          <a:lnRef idx="2">
-            <a:schemeClr val="accent1">
-              <a:shade val="50000"/>
-            </a:schemeClr>
-          </a:lnRef>
-          <a:fillRef idx="1">
-            <a:schemeClr val="accent1"/>
-          </a:fillRef>
-          <a:effectRef idx="0">
-            <a:schemeClr val="accent1"/>
-          </a:effectRef>
-          <a:fontRef idx="minor">
-            <a:schemeClr val="lt1"/>
-          </a:fontRef>
-        </p:style>
-        <p:txBody>
-          <a:bodyPr rtlCol="0" anchor="ctr"/>
-          <a:lstStyle/>
-          <a:p>
-            <a:pPr algn="ctr"/>
-            <a:endParaRPr lang="en-US"/>
-          </a:p>
-        </p:txBody>
-      </p:sp>
-      <p:sp>
-        <p:nvSpPr>
-          <p:cNvPr id="71" name="Diamond 70"/>
-          <p:cNvSpPr/>
-          <p:nvPr/>
-        </p:nvSpPr>
-        <p:spPr>
-          <a:xfrm>
-            <a:off x="6316391" y="3816494"/>
-            <a:ext cx="237744" cy="219456"/>
-          </a:xfrm>
-          <a:prstGeom prst="diamond">
-            <a:avLst/>
-          </a:prstGeom>
-          <a:solidFill>
-            <a:schemeClr val="accent6">
-              <a:lumMod val="60000"/>
-              <a:lumOff val="40000"/>
-            </a:schemeClr>
-          </a:solidFill>
-          <a:ln>
-            <a:solidFill>
-              <a:schemeClr val="accent6">
-                <a:lumMod val="60000"/>
-                <a:lumOff val="40000"/>
-              </a:schemeClr>
-            </a:solidFill>
-          </a:ln>
-        </p:spPr>
-        <p:style>
-          <a:lnRef idx="2">
-            <a:schemeClr val="accent1">
-              <a:shade val="50000"/>
-            </a:schemeClr>
-          </a:lnRef>
-          <a:fillRef idx="1">
-            <a:schemeClr val="accent1"/>
-          </a:fillRef>
-          <a:effectRef idx="0">
-            <a:schemeClr val="accent1"/>
-          </a:effectRef>
-          <a:fontRef idx="minor">
-            <a:schemeClr val="lt1"/>
-          </a:fontRef>
-        </p:style>
-        <p:txBody>
-          <a:bodyPr rtlCol="0" anchor="ctr"/>
-          <a:lstStyle/>
-          <a:p>
-            <a:pPr algn="ctr"/>
-            <a:endParaRPr lang="en-US"/>
-          </a:p>
-        </p:txBody>
-      </p:sp>
-      <p:sp>
-        <p:nvSpPr>
-          <p:cNvPr id="72" name="Diamond 71"/>
-          <p:cNvSpPr/>
-          <p:nvPr/>
-        </p:nvSpPr>
-        <p:spPr>
-          <a:xfrm>
-            <a:off x="5107838" y="3390665"/>
-            <a:ext cx="237744" cy="219456"/>
-          </a:xfrm>
-          <a:prstGeom prst="diamond">
-            <a:avLst/>
-          </a:prstGeom>
-          <a:solidFill>
-            <a:schemeClr val="accent6">
-              <a:lumMod val="60000"/>
-              <a:lumOff val="40000"/>
-            </a:schemeClr>
-          </a:solidFill>
-          <a:ln>
-            <a:solidFill>
-              <a:schemeClr val="accent6">
-                <a:lumMod val="60000"/>
-                <a:lumOff val="40000"/>
-              </a:schemeClr>
-            </a:solidFill>
-          </a:ln>
-        </p:spPr>
-        <p:style>
-          <a:lnRef idx="2">
-            <a:schemeClr val="accent1">
-              <a:shade val="50000"/>
-            </a:schemeClr>
-          </a:lnRef>
-          <a:fillRef idx="1">
-            <a:schemeClr val="accent1"/>
-          </a:fillRef>
-          <a:effectRef idx="0">
-            <a:schemeClr val="accent1"/>
-          </a:effectRef>
-          <a:fontRef idx="minor">
-            <a:schemeClr val="lt1"/>
-          </a:fontRef>
-        </p:style>
-        <p:txBody>
-          <a:bodyPr rtlCol="0" anchor="ctr"/>
-          <a:lstStyle/>
-          <a:p>
-            <a:pPr algn="ctr"/>
-            <a:endParaRPr lang="en-US"/>
-          </a:p>
-        </p:txBody>
-      </p:sp>
-      <p:sp>
-        <p:nvSpPr>
-          <p:cNvPr id="73" name="5-Point Star 72"/>
-          <p:cNvSpPr/>
-          <p:nvPr/>
-        </p:nvSpPr>
-        <p:spPr>
-          <a:xfrm>
-            <a:off x="5738513" y="3953581"/>
-            <a:ext cx="229514" cy="219456"/>
-          </a:xfrm>
-          <a:prstGeom prst="star5">
-            <a:avLst/>
-          </a:prstGeom>
-          <a:solidFill>
-            <a:schemeClr val="accent4"/>
-          </a:solidFill>
-          <a:ln>
-            <a:solidFill>
-              <a:schemeClr val="accent4"/>
-            </a:solidFill>
-          </a:ln>
-        </p:spPr>
-        <p:style>
-          <a:lnRef idx="2">
-            <a:schemeClr val="accent1">
-              <a:shade val="50000"/>
-            </a:schemeClr>
-          </a:lnRef>
-          <a:fillRef idx="1">
-            <a:schemeClr val="accent1"/>
-          </a:fillRef>
-          <a:effectRef idx="0">
-            <a:schemeClr val="accent1"/>
-          </a:effectRef>
-          <a:fontRef idx="minor">
-            <a:schemeClr val="lt1"/>
-          </a:fontRef>
-        </p:style>
-        <p:txBody>
-          <a:bodyPr rtlCol="0" anchor="ctr"/>
-          <a:lstStyle/>
-          <a:p>
-            <a:pPr algn="ctr"/>
-            <a:endParaRPr lang="en-US"/>
-          </a:p>
-        </p:txBody>
-      </p:sp>
-      <p:sp>
-        <p:nvSpPr>
-          <p:cNvPr id="74" name="Flowchart: Connector 73"/>
-          <p:cNvSpPr/>
-          <p:nvPr/>
-        </p:nvSpPr>
-        <p:spPr>
-          <a:xfrm>
-            <a:off x="4523405" y="3906642"/>
-            <a:ext cx="187452" cy="153690"/>
-          </a:xfrm>
-          <a:prstGeom prst="flowChartConnector">
-            <a:avLst/>
-          </a:prstGeom>
-          <a:solidFill>
-            <a:srgbClr val="7030A0"/>
-          </a:solidFill>
-          <a:ln>
-            <a:solidFill>
-              <a:srgbClr val="7030A0"/>
-            </a:solidFill>
-          </a:ln>
-        </p:spPr>
-        <p:style>
-          <a:lnRef idx="2">
-            <a:schemeClr val="accent1">
-              <a:shade val="50000"/>
-            </a:schemeClr>
-          </a:lnRef>
-          <a:fillRef idx="1">
-            <a:schemeClr val="accent1"/>
-          </a:fillRef>
-          <a:effectRef idx="0">
-            <a:schemeClr val="accent1"/>
-          </a:effectRef>
-          <a:fontRef idx="minor">
-            <a:schemeClr val="lt1"/>
-          </a:fontRef>
-        </p:style>
-        <p:txBody>
-          <a:bodyPr rtlCol="0" anchor="ctr"/>
-          <a:lstStyle/>
-          <a:p>
-            <a:pPr algn="ctr"/>
-            <a:endParaRPr lang="en-US"/>
-          </a:p>
-        </p:txBody>
-      </p:sp>
-      <p:sp>
-        <p:nvSpPr>
-          <p:cNvPr id="75" name="Rectangle 74"/>
-          <p:cNvSpPr/>
-          <p:nvPr/>
-        </p:nvSpPr>
-        <p:spPr>
-          <a:xfrm>
-            <a:off x="4884745" y="2956313"/>
-            <a:ext cx="164592" cy="153690"/>
-          </a:xfrm>
-          <a:prstGeom prst="rect">
-            <a:avLst/>
-          </a:prstGeom>
-          <a:solidFill>
-            <a:schemeClr val="accent1">
-              <a:lumMod val="75000"/>
-            </a:schemeClr>
-          </a:solidFill>
-          <a:ln>
-            <a:solidFill>
-              <a:schemeClr val="accent1">
-                <a:lumMod val="75000"/>
-              </a:schemeClr>
-            </a:solidFill>
-          </a:ln>
-        </p:spPr>
-        <p:style>
-          <a:lnRef idx="2">
-            <a:schemeClr val="accent1">
-              <a:shade val="50000"/>
-            </a:schemeClr>
-          </a:lnRef>
-          <a:fillRef idx="1">
-            <a:schemeClr val="accent1"/>
-          </a:fillRef>
-          <a:effectRef idx="0">
-            <a:schemeClr val="accent1"/>
-          </a:effectRef>
-          <a:fontRef idx="minor">
-            <a:schemeClr val="lt1"/>
-          </a:fontRef>
-        </p:style>
-        <p:txBody>
-          <a:bodyPr rtlCol="0" anchor="ctr"/>
-          <a:lstStyle/>
-          <a:p>
-            <a:pPr algn="ctr"/>
-            <a:endParaRPr lang="en-US"/>
-          </a:p>
-        </p:txBody>
-      </p:sp>
-      <p:sp>
-        <p:nvSpPr>
-          <p:cNvPr id="76" name="Rectangle 75"/>
-          <p:cNvSpPr/>
-          <p:nvPr/>
-        </p:nvSpPr>
-        <p:spPr>
-          <a:xfrm>
-            <a:off x="6440924" y="2644030"/>
-            <a:ext cx="164592" cy="153690"/>
-          </a:xfrm>
-          <a:prstGeom prst="rect">
-            <a:avLst/>
-          </a:prstGeom>
-          <a:solidFill>
-            <a:schemeClr val="accent1">
-              <a:lumMod val="75000"/>
-            </a:schemeClr>
-          </a:solidFill>
-          <a:ln>
-            <a:solidFill>
-              <a:schemeClr val="accent1">
-                <a:lumMod val="75000"/>
-              </a:schemeClr>
-            </a:solidFill>
-          </a:ln>
-        </p:spPr>
-        <p:style>
-          <a:lnRef idx="2">
-            <a:schemeClr val="accent1">
-              <a:shade val="50000"/>
-            </a:schemeClr>
-          </a:lnRef>
-          <a:fillRef idx="1">
-            <a:schemeClr val="accent1"/>
-          </a:fillRef>
-          <a:effectRef idx="0">
-            <a:schemeClr val="accent1"/>
-          </a:effectRef>
-          <a:fontRef idx="minor">
-            <a:schemeClr val="lt1"/>
-          </a:fontRef>
-        </p:style>
-        <p:txBody>
-          <a:bodyPr rtlCol="0" anchor="ctr"/>
-          <a:lstStyle/>
-          <a:p>
-            <a:pPr algn="ctr"/>
-            <a:endParaRPr lang="en-US"/>
-          </a:p>
-        </p:txBody>
-      </p:sp>
-      <p:sp>
-        <p:nvSpPr>
-          <p:cNvPr id="77" name="Rectangle 76"/>
-          <p:cNvSpPr/>
-          <p:nvPr/>
-        </p:nvSpPr>
-        <p:spPr>
-          <a:xfrm>
-            <a:off x="5156604" y="4124441"/>
-            <a:ext cx="164592" cy="153690"/>
-          </a:xfrm>
-          <a:prstGeom prst="rect">
-            <a:avLst/>
-          </a:prstGeom>
-          <a:solidFill>
-            <a:schemeClr val="accent1">
-              <a:lumMod val="75000"/>
-            </a:schemeClr>
-          </a:solidFill>
-          <a:ln>
-            <a:solidFill>
-              <a:schemeClr val="accent1">
-                <a:lumMod val="75000"/>
-              </a:schemeClr>
-            </a:solidFill>
-          </a:ln>
-        </p:spPr>
-        <p:style>
-          <a:lnRef idx="2">
-            <a:schemeClr val="accent1">
-              <a:shade val="50000"/>
-            </a:schemeClr>
-          </a:lnRef>
-          <a:fillRef idx="1">
-            <a:schemeClr val="accent1"/>
-          </a:fillRef>
-          <a:effectRef idx="0">
-            <a:schemeClr val="accent1"/>
-          </a:effectRef>
-          <a:fontRef idx="minor">
-            <a:schemeClr val="lt1"/>
-          </a:fontRef>
-        </p:style>
-        <p:txBody>
-          <a:bodyPr rtlCol="0" anchor="ctr"/>
-          <a:lstStyle/>
-          <a:p>
-            <a:pPr algn="ctr"/>
-            <a:endParaRPr lang="en-US"/>
-          </a:p>
-        </p:txBody>
-      </p:sp>
-      <p:sp>
-        <p:nvSpPr>
-          <p:cNvPr id="78" name="Rectangle 77"/>
-          <p:cNvSpPr/>
-          <p:nvPr/>
-        </p:nvSpPr>
-        <p:spPr>
-          <a:xfrm>
-            <a:off x="5573921" y="2466405"/>
-            <a:ext cx="164592" cy="153690"/>
-          </a:xfrm>
-          <a:prstGeom prst="rect">
-            <a:avLst/>
-          </a:prstGeom>
-          <a:solidFill>
-            <a:schemeClr val="accent1">
-              <a:lumMod val="75000"/>
-            </a:schemeClr>
-          </a:solidFill>
-          <a:ln>
-            <a:solidFill>
-              <a:schemeClr val="accent1">
-                <a:lumMod val="75000"/>
-              </a:schemeClr>
-            </a:solidFill>
-          </a:ln>
-        </p:spPr>
-        <p:style>
-          <a:lnRef idx="2">
-            <a:schemeClr val="accent1">
-              <a:shade val="50000"/>
-            </a:schemeClr>
-          </a:lnRef>
-          <a:fillRef idx="1">
-            <a:schemeClr val="accent1"/>
-          </a:fillRef>
-          <a:effectRef idx="0">
-            <a:schemeClr val="accent1"/>
-          </a:effectRef>
-          <a:fontRef idx="minor">
-            <a:schemeClr val="lt1"/>
-          </a:fontRef>
-        </p:style>
-        <p:txBody>
-          <a:bodyPr rtlCol="0" anchor="ctr"/>
-          <a:lstStyle/>
-          <a:p>
-            <a:pPr algn="ctr"/>
-            <a:endParaRPr lang="en-US"/>
-          </a:p>
-        </p:txBody>
-      </p:sp>
-      <p:sp>
-        <p:nvSpPr>
           <p:cNvPr id="79" name="Rectangle 78"/>
           <p:cNvSpPr/>
           <p:nvPr/>
         </p:nvSpPr>
         <p:spPr>
           <a:xfrm>
-            <a:off x="3709416" y="3716669"/>
-            <a:ext cx="682184" cy="712455"/>
+            <a:off x="3418937" y="2304023"/>
+            <a:ext cx="1283179" cy="1069826"/>
           </a:xfrm>
           <a:prstGeom prst="rect">
             <a:avLst/>
@@ -7661,890 +6079,22 @@
       </p:sp>
       <p:sp>
         <p:nvSpPr>
-          <p:cNvPr id="80" name="Rectangle 79"/>
+          <p:cNvPr id="81" name="Rectangle 80"/>
           <p:cNvSpPr/>
           <p:nvPr/>
         </p:nvSpPr>
         <p:spPr>
           <a:xfrm>
-            <a:off x="3709416" y="2913409"/>
-            <a:ext cx="1896486" cy="1515716"/>
+            <a:off x="3415913" y="3375261"/>
+            <a:ext cx="1272043" cy="1067365"/>
           </a:xfrm>
           <a:prstGeom prst="rect">
             <a:avLst/>
           </a:prstGeom>
           <a:noFill/>
-          <a:ln w="19050">
+          <a:ln w="38100">
             <a:solidFill>
               <a:schemeClr val="tx1"/>
-            </a:solidFill>
-          </a:ln>
-        </p:spPr>
-        <p:style>
-          <a:lnRef idx="2">
-            <a:schemeClr val="accent1">
-              <a:shade val="50000"/>
-            </a:schemeClr>
-          </a:lnRef>
-          <a:fillRef idx="1">
-            <a:schemeClr val="accent1"/>
-          </a:fillRef>
-          <a:effectRef idx="0">
-            <a:schemeClr val="accent1"/>
-          </a:effectRef>
-          <a:fontRef idx="minor">
-            <a:schemeClr val="lt1"/>
-          </a:fontRef>
-        </p:style>
-        <p:txBody>
-          <a:bodyPr rtlCol="0" anchor="ctr"/>
-          <a:lstStyle/>
-          <a:p>
-            <a:pPr algn="ctr"/>
-            <a:endParaRPr lang="en-US"/>
-          </a:p>
-        </p:txBody>
-      </p:sp>
-      <p:sp>
-        <p:nvSpPr>
-          <p:cNvPr id="81" name="Rectangle 80"/>
-          <p:cNvSpPr/>
-          <p:nvPr/>
-        </p:nvSpPr>
-        <p:spPr>
-          <a:xfrm>
-            <a:off x="3709415" y="2319910"/>
-            <a:ext cx="3441193" cy="2108286"/>
-          </a:xfrm>
-          <a:prstGeom prst="rect">
-            <a:avLst/>
-          </a:prstGeom>
-          <a:noFill/>
-          <a:ln w="19050">
-            <a:solidFill>
-              <a:schemeClr val="tx1"/>
-            </a:solidFill>
-          </a:ln>
-        </p:spPr>
-        <p:style>
-          <a:lnRef idx="2">
-            <a:schemeClr val="accent1">
-              <a:shade val="50000"/>
-            </a:schemeClr>
-          </a:lnRef>
-          <a:fillRef idx="1">
-            <a:schemeClr val="accent1"/>
-          </a:fillRef>
-          <a:effectRef idx="0">
-            <a:schemeClr val="accent1"/>
-          </a:effectRef>
-          <a:fontRef idx="minor">
-            <a:schemeClr val="lt1"/>
-          </a:fontRef>
-        </p:style>
-        <p:txBody>
-          <a:bodyPr rtlCol="0" anchor="ctr"/>
-          <a:lstStyle/>
-          <a:p>
-            <a:pPr algn="ctr"/>
-            <a:endParaRPr lang="en-US"/>
-          </a:p>
-        </p:txBody>
-      </p:sp>
-      <p:sp>
-        <p:nvSpPr>
-          <p:cNvPr id="82" name="5-Point Star 81"/>
-          <p:cNvSpPr/>
-          <p:nvPr/>
-        </p:nvSpPr>
-        <p:spPr>
-          <a:xfrm>
-            <a:off x="299759" y="4654488"/>
-            <a:ext cx="229514" cy="219456"/>
-          </a:xfrm>
-          <a:prstGeom prst="star5">
-            <a:avLst/>
-          </a:prstGeom>
-          <a:solidFill>
-            <a:schemeClr val="accent4"/>
-          </a:solidFill>
-          <a:ln>
-            <a:solidFill>
-              <a:schemeClr val="accent4"/>
-            </a:solidFill>
-          </a:ln>
-        </p:spPr>
-        <p:style>
-          <a:lnRef idx="2">
-            <a:schemeClr val="accent1">
-              <a:shade val="50000"/>
-            </a:schemeClr>
-          </a:lnRef>
-          <a:fillRef idx="1">
-            <a:schemeClr val="accent1"/>
-          </a:fillRef>
-          <a:effectRef idx="0">
-            <a:schemeClr val="accent1"/>
-          </a:effectRef>
-          <a:fontRef idx="minor">
-            <a:schemeClr val="lt1"/>
-          </a:fontRef>
-        </p:style>
-        <p:txBody>
-          <a:bodyPr rtlCol="0" anchor="ctr"/>
-          <a:lstStyle/>
-          <a:p>
-            <a:pPr algn="ctr"/>
-            <a:endParaRPr lang="en-US"/>
-          </a:p>
-        </p:txBody>
-      </p:sp>
-      <p:sp>
-        <p:nvSpPr>
-          <p:cNvPr id="83" name="Rectangle 82"/>
-          <p:cNvSpPr/>
-          <p:nvPr/>
-        </p:nvSpPr>
-        <p:spPr>
-          <a:xfrm>
-            <a:off x="769151" y="4654488"/>
-            <a:ext cx="164592" cy="153690"/>
-          </a:xfrm>
-          <a:prstGeom prst="rect">
-            <a:avLst/>
-          </a:prstGeom>
-          <a:solidFill>
-            <a:schemeClr val="accent1">
-              <a:lumMod val="75000"/>
-            </a:schemeClr>
-          </a:solidFill>
-          <a:ln>
-            <a:solidFill>
-              <a:schemeClr val="accent1">
-                <a:lumMod val="75000"/>
-              </a:schemeClr>
-            </a:solidFill>
-          </a:ln>
-        </p:spPr>
-        <p:style>
-          <a:lnRef idx="2">
-            <a:schemeClr val="accent1">
-              <a:shade val="50000"/>
-            </a:schemeClr>
-          </a:lnRef>
-          <a:fillRef idx="1">
-            <a:schemeClr val="accent1"/>
-          </a:fillRef>
-          <a:effectRef idx="0">
-            <a:schemeClr val="accent1"/>
-          </a:effectRef>
-          <a:fontRef idx="minor">
-            <a:schemeClr val="lt1"/>
-          </a:fontRef>
-        </p:style>
-        <p:txBody>
-          <a:bodyPr rtlCol="0" anchor="ctr"/>
-          <a:lstStyle/>
-          <a:p>
-            <a:pPr algn="ctr"/>
-            <a:endParaRPr lang="en-US"/>
-          </a:p>
-        </p:txBody>
-      </p:sp>
-      <p:sp>
-        <p:nvSpPr>
-          <p:cNvPr id="84" name="Diamond 83"/>
-          <p:cNvSpPr/>
-          <p:nvPr/>
-        </p:nvSpPr>
-        <p:spPr>
-          <a:xfrm>
-            <a:off x="446063" y="6006042"/>
-            <a:ext cx="237744" cy="219456"/>
-          </a:xfrm>
-          <a:prstGeom prst="diamond">
-            <a:avLst/>
-          </a:prstGeom>
-          <a:solidFill>
-            <a:schemeClr val="accent6">
-              <a:lumMod val="60000"/>
-              <a:lumOff val="40000"/>
-            </a:schemeClr>
-          </a:solidFill>
-          <a:ln>
-            <a:solidFill>
-              <a:schemeClr val="accent6">
-                <a:lumMod val="60000"/>
-                <a:lumOff val="40000"/>
-              </a:schemeClr>
-            </a:solidFill>
-          </a:ln>
-        </p:spPr>
-        <p:style>
-          <a:lnRef idx="2">
-            <a:schemeClr val="accent1">
-              <a:shade val="50000"/>
-            </a:schemeClr>
-          </a:lnRef>
-          <a:fillRef idx="1">
-            <a:schemeClr val="accent1"/>
-          </a:fillRef>
-          <a:effectRef idx="0">
-            <a:schemeClr val="accent1"/>
-          </a:effectRef>
-          <a:fontRef idx="minor">
-            <a:schemeClr val="lt1"/>
-          </a:fontRef>
-        </p:style>
-        <p:txBody>
-          <a:bodyPr rtlCol="0" anchor="ctr"/>
-          <a:lstStyle/>
-          <a:p>
-            <a:pPr algn="ctr"/>
-            <a:endParaRPr lang="en-US"/>
-          </a:p>
-        </p:txBody>
-      </p:sp>
-      <p:sp>
-        <p:nvSpPr>
-          <p:cNvPr id="85" name="Regular Pentagon 84"/>
-          <p:cNvSpPr/>
-          <p:nvPr/>
-        </p:nvSpPr>
-        <p:spPr>
-          <a:xfrm>
-            <a:off x="2166432" y="5209720"/>
-            <a:ext cx="207872" cy="226053"/>
-          </a:xfrm>
-          <a:prstGeom prst="pentagon">
-            <a:avLst/>
-          </a:prstGeom>
-          <a:solidFill>
-            <a:srgbClr val="FF0066"/>
-          </a:solidFill>
-          <a:ln>
-            <a:solidFill>
-              <a:srgbClr val="FF0066"/>
-            </a:solidFill>
-          </a:ln>
-        </p:spPr>
-        <p:style>
-          <a:lnRef idx="2">
-            <a:schemeClr val="accent1">
-              <a:shade val="50000"/>
-            </a:schemeClr>
-          </a:lnRef>
-          <a:fillRef idx="1">
-            <a:schemeClr val="accent1"/>
-          </a:fillRef>
-          <a:effectRef idx="0">
-            <a:schemeClr val="accent1"/>
-          </a:effectRef>
-          <a:fontRef idx="minor">
-            <a:schemeClr val="lt1"/>
-          </a:fontRef>
-        </p:style>
-        <p:txBody>
-          <a:bodyPr rtlCol="0" anchor="ctr"/>
-          <a:lstStyle/>
-          <a:p>
-            <a:pPr algn="ctr"/>
-            <a:endParaRPr lang="en-US"/>
-          </a:p>
-        </p:txBody>
-      </p:sp>
-      <p:sp>
-        <p:nvSpPr>
-          <p:cNvPr id="86" name="5-Point Star 85"/>
-          <p:cNvSpPr/>
-          <p:nvPr/>
-        </p:nvSpPr>
-        <p:spPr>
-          <a:xfrm>
-            <a:off x="729091" y="5463406"/>
-            <a:ext cx="229514" cy="219456"/>
-          </a:xfrm>
-          <a:prstGeom prst="star5">
-            <a:avLst/>
-          </a:prstGeom>
-          <a:solidFill>
-            <a:schemeClr val="accent4"/>
-          </a:solidFill>
-          <a:ln>
-            <a:solidFill>
-              <a:schemeClr val="accent4"/>
-            </a:solidFill>
-          </a:ln>
-        </p:spPr>
-        <p:style>
-          <a:lnRef idx="2">
-            <a:schemeClr val="accent1">
-              <a:shade val="50000"/>
-            </a:schemeClr>
-          </a:lnRef>
-          <a:fillRef idx="1">
-            <a:schemeClr val="accent1"/>
-          </a:fillRef>
-          <a:effectRef idx="0">
-            <a:schemeClr val="accent1"/>
-          </a:effectRef>
-          <a:fontRef idx="minor">
-            <a:schemeClr val="lt1"/>
-          </a:fontRef>
-        </p:style>
-        <p:txBody>
-          <a:bodyPr rtlCol="0" anchor="ctr"/>
-          <a:lstStyle/>
-          <a:p>
-            <a:pPr algn="ctr"/>
-            <a:endParaRPr lang="en-US"/>
-          </a:p>
-        </p:txBody>
-      </p:sp>
-      <p:sp>
-        <p:nvSpPr>
-          <p:cNvPr id="87" name="Rectangle 86"/>
-          <p:cNvSpPr/>
-          <p:nvPr/>
-        </p:nvSpPr>
-        <p:spPr>
-          <a:xfrm>
-            <a:off x="332220" y="5209720"/>
-            <a:ext cx="164592" cy="153690"/>
-          </a:xfrm>
-          <a:prstGeom prst="rect">
-            <a:avLst/>
-          </a:prstGeom>
-          <a:solidFill>
-            <a:schemeClr val="accent1">
-              <a:lumMod val="75000"/>
-            </a:schemeClr>
-          </a:solidFill>
-          <a:ln>
-            <a:solidFill>
-              <a:schemeClr val="accent1">
-                <a:lumMod val="75000"/>
-              </a:schemeClr>
-            </a:solidFill>
-          </a:ln>
-        </p:spPr>
-        <p:style>
-          <a:lnRef idx="2">
-            <a:schemeClr val="accent1">
-              <a:shade val="50000"/>
-            </a:schemeClr>
-          </a:lnRef>
-          <a:fillRef idx="1">
-            <a:schemeClr val="accent1"/>
-          </a:fillRef>
-          <a:effectRef idx="0">
-            <a:schemeClr val="accent1"/>
-          </a:effectRef>
-          <a:fontRef idx="minor">
-            <a:schemeClr val="lt1"/>
-          </a:fontRef>
-        </p:style>
-        <p:txBody>
-          <a:bodyPr rtlCol="0" anchor="ctr"/>
-          <a:lstStyle/>
-          <a:p>
-            <a:pPr algn="ctr"/>
-            <a:endParaRPr lang="en-US"/>
-          </a:p>
-        </p:txBody>
-      </p:sp>
-      <p:sp>
-        <p:nvSpPr>
-          <p:cNvPr id="88" name="Diamond 87"/>
-          <p:cNvSpPr/>
-          <p:nvPr/>
-        </p:nvSpPr>
-        <p:spPr>
-          <a:xfrm>
-            <a:off x="1263841" y="4749302"/>
-            <a:ext cx="237744" cy="219456"/>
-          </a:xfrm>
-          <a:prstGeom prst="diamond">
-            <a:avLst/>
-          </a:prstGeom>
-          <a:solidFill>
-            <a:schemeClr val="accent6">
-              <a:lumMod val="60000"/>
-              <a:lumOff val="40000"/>
-            </a:schemeClr>
-          </a:solidFill>
-          <a:ln>
-            <a:solidFill>
-              <a:schemeClr val="accent6">
-                <a:lumMod val="60000"/>
-                <a:lumOff val="40000"/>
-              </a:schemeClr>
-            </a:solidFill>
-          </a:ln>
-        </p:spPr>
-        <p:style>
-          <a:lnRef idx="2">
-            <a:schemeClr val="accent1">
-              <a:shade val="50000"/>
-            </a:schemeClr>
-          </a:lnRef>
-          <a:fillRef idx="1">
-            <a:schemeClr val="accent1"/>
-          </a:fillRef>
-          <a:effectRef idx="0">
-            <a:schemeClr val="accent1"/>
-          </a:effectRef>
-          <a:fontRef idx="minor">
-            <a:schemeClr val="lt1"/>
-          </a:fontRef>
-        </p:style>
-        <p:txBody>
-          <a:bodyPr rtlCol="0" anchor="ctr"/>
-          <a:lstStyle/>
-          <a:p>
-            <a:pPr algn="ctr"/>
-            <a:endParaRPr lang="en-US"/>
-          </a:p>
-        </p:txBody>
-      </p:sp>
-      <p:sp>
-        <p:nvSpPr>
-          <p:cNvPr id="89" name="Diamond 88"/>
-          <p:cNvSpPr/>
-          <p:nvPr/>
-        </p:nvSpPr>
-        <p:spPr>
-          <a:xfrm>
-            <a:off x="3057764" y="5458452"/>
-            <a:ext cx="237744" cy="219456"/>
-          </a:xfrm>
-          <a:prstGeom prst="diamond">
-            <a:avLst/>
-          </a:prstGeom>
-          <a:solidFill>
-            <a:schemeClr val="accent6">
-              <a:lumMod val="60000"/>
-              <a:lumOff val="40000"/>
-            </a:schemeClr>
-          </a:solidFill>
-          <a:ln>
-            <a:solidFill>
-              <a:schemeClr val="accent6">
-                <a:lumMod val="60000"/>
-                <a:lumOff val="40000"/>
-              </a:schemeClr>
-            </a:solidFill>
-          </a:ln>
-        </p:spPr>
-        <p:style>
-          <a:lnRef idx="2">
-            <a:schemeClr val="accent1">
-              <a:shade val="50000"/>
-            </a:schemeClr>
-          </a:lnRef>
-          <a:fillRef idx="1">
-            <a:schemeClr val="accent1"/>
-          </a:fillRef>
-          <a:effectRef idx="0">
-            <a:schemeClr val="accent1"/>
-          </a:effectRef>
-          <a:fontRef idx="minor">
-            <a:schemeClr val="lt1"/>
-          </a:fontRef>
-        </p:style>
-        <p:txBody>
-          <a:bodyPr rtlCol="0" anchor="ctr"/>
-          <a:lstStyle/>
-          <a:p>
-            <a:pPr algn="ctr"/>
-            <a:endParaRPr lang="en-US"/>
-          </a:p>
-        </p:txBody>
-      </p:sp>
-      <p:sp>
-        <p:nvSpPr>
-          <p:cNvPr id="90" name="Diamond 89"/>
-          <p:cNvSpPr/>
-          <p:nvPr/>
-        </p:nvSpPr>
-        <p:spPr>
-          <a:xfrm>
-            <a:off x="2768639" y="6007800"/>
-            <a:ext cx="237744" cy="219456"/>
-          </a:xfrm>
-          <a:prstGeom prst="diamond">
-            <a:avLst/>
-          </a:prstGeom>
-          <a:solidFill>
-            <a:schemeClr val="accent6">
-              <a:lumMod val="60000"/>
-              <a:lumOff val="40000"/>
-            </a:schemeClr>
-          </a:solidFill>
-          <a:ln>
-            <a:solidFill>
-              <a:schemeClr val="accent6">
-                <a:lumMod val="60000"/>
-                <a:lumOff val="40000"/>
-              </a:schemeClr>
-            </a:solidFill>
-          </a:ln>
-        </p:spPr>
-        <p:style>
-          <a:lnRef idx="2">
-            <a:schemeClr val="accent1">
-              <a:shade val="50000"/>
-            </a:schemeClr>
-          </a:lnRef>
-          <a:fillRef idx="1">
-            <a:schemeClr val="accent1"/>
-          </a:fillRef>
-          <a:effectRef idx="0">
-            <a:schemeClr val="accent1"/>
-          </a:effectRef>
-          <a:fontRef idx="minor">
-            <a:schemeClr val="lt1"/>
-          </a:fontRef>
-        </p:style>
-        <p:txBody>
-          <a:bodyPr rtlCol="0" anchor="ctr"/>
-          <a:lstStyle/>
-          <a:p>
-            <a:pPr algn="ctr"/>
-            <a:endParaRPr lang="en-US"/>
-          </a:p>
-        </p:txBody>
-      </p:sp>
-      <p:sp>
-        <p:nvSpPr>
-          <p:cNvPr id="91" name="Diamond 90"/>
-          <p:cNvSpPr/>
-          <p:nvPr/>
-        </p:nvSpPr>
-        <p:spPr>
-          <a:xfrm>
-            <a:off x="1560086" y="5581971"/>
-            <a:ext cx="237744" cy="219456"/>
-          </a:xfrm>
-          <a:prstGeom prst="diamond">
-            <a:avLst/>
-          </a:prstGeom>
-          <a:solidFill>
-            <a:schemeClr val="accent6">
-              <a:lumMod val="60000"/>
-              <a:lumOff val="40000"/>
-            </a:schemeClr>
-          </a:solidFill>
-          <a:ln>
-            <a:solidFill>
-              <a:schemeClr val="accent6">
-                <a:lumMod val="60000"/>
-                <a:lumOff val="40000"/>
-              </a:schemeClr>
-            </a:solidFill>
-          </a:ln>
-        </p:spPr>
-        <p:style>
-          <a:lnRef idx="2">
-            <a:schemeClr val="accent1">
-              <a:shade val="50000"/>
-            </a:schemeClr>
-          </a:lnRef>
-          <a:fillRef idx="1">
-            <a:schemeClr val="accent1"/>
-          </a:fillRef>
-          <a:effectRef idx="0">
-            <a:schemeClr val="accent1"/>
-          </a:effectRef>
-          <a:fontRef idx="minor">
-            <a:schemeClr val="lt1"/>
-          </a:fontRef>
-        </p:style>
-        <p:txBody>
-          <a:bodyPr rtlCol="0" anchor="ctr"/>
-          <a:lstStyle/>
-          <a:p>
-            <a:pPr algn="ctr"/>
-            <a:endParaRPr lang="en-US"/>
-          </a:p>
-        </p:txBody>
-      </p:sp>
-      <p:sp>
-        <p:nvSpPr>
-          <p:cNvPr id="92" name="5-Point Star 91"/>
-          <p:cNvSpPr/>
-          <p:nvPr/>
-        </p:nvSpPr>
-        <p:spPr>
-          <a:xfrm>
-            <a:off x="2190761" y="6144887"/>
-            <a:ext cx="229514" cy="219456"/>
-          </a:xfrm>
-          <a:prstGeom prst="star5">
-            <a:avLst/>
-          </a:prstGeom>
-          <a:solidFill>
-            <a:schemeClr val="accent4"/>
-          </a:solidFill>
-          <a:ln>
-            <a:solidFill>
-              <a:schemeClr val="accent4"/>
-            </a:solidFill>
-          </a:ln>
-        </p:spPr>
-        <p:style>
-          <a:lnRef idx="2">
-            <a:schemeClr val="accent1">
-              <a:shade val="50000"/>
-            </a:schemeClr>
-          </a:lnRef>
-          <a:fillRef idx="1">
-            <a:schemeClr val="accent1"/>
-          </a:fillRef>
-          <a:effectRef idx="0">
-            <a:schemeClr val="accent1"/>
-          </a:effectRef>
-          <a:fontRef idx="minor">
-            <a:schemeClr val="lt1"/>
-          </a:fontRef>
-        </p:style>
-        <p:txBody>
-          <a:bodyPr rtlCol="0" anchor="ctr"/>
-          <a:lstStyle/>
-          <a:p>
-            <a:pPr algn="ctr"/>
-            <a:endParaRPr lang="en-US"/>
-          </a:p>
-        </p:txBody>
-      </p:sp>
-      <p:sp>
-        <p:nvSpPr>
-          <p:cNvPr id="93" name="Flowchart: Connector 92"/>
-          <p:cNvSpPr/>
-          <p:nvPr/>
-        </p:nvSpPr>
-        <p:spPr>
-          <a:xfrm>
-            <a:off x="975653" y="6097948"/>
-            <a:ext cx="187452" cy="153690"/>
-          </a:xfrm>
-          <a:prstGeom prst="flowChartConnector">
-            <a:avLst/>
-          </a:prstGeom>
-          <a:solidFill>
-            <a:srgbClr val="7030A0"/>
-          </a:solidFill>
-          <a:ln>
-            <a:solidFill>
-              <a:srgbClr val="7030A0"/>
-            </a:solidFill>
-          </a:ln>
-        </p:spPr>
-        <p:style>
-          <a:lnRef idx="2">
-            <a:schemeClr val="accent1">
-              <a:shade val="50000"/>
-            </a:schemeClr>
-          </a:lnRef>
-          <a:fillRef idx="1">
-            <a:schemeClr val="accent1"/>
-          </a:fillRef>
-          <a:effectRef idx="0">
-            <a:schemeClr val="accent1"/>
-          </a:effectRef>
-          <a:fontRef idx="minor">
-            <a:schemeClr val="lt1"/>
-          </a:fontRef>
-        </p:style>
-        <p:txBody>
-          <a:bodyPr rtlCol="0" anchor="ctr"/>
-          <a:lstStyle/>
-          <a:p>
-            <a:pPr algn="ctr"/>
-            <a:endParaRPr lang="en-US"/>
-          </a:p>
-        </p:txBody>
-      </p:sp>
-      <p:sp>
-        <p:nvSpPr>
-          <p:cNvPr id="94" name="Rectangle 93"/>
-          <p:cNvSpPr/>
-          <p:nvPr/>
-        </p:nvSpPr>
-        <p:spPr>
-          <a:xfrm>
-            <a:off x="1336993" y="5147619"/>
-            <a:ext cx="164592" cy="153690"/>
-          </a:xfrm>
-          <a:prstGeom prst="rect">
-            <a:avLst/>
-          </a:prstGeom>
-          <a:solidFill>
-            <a:schemeClr val="accent1">
-              <a:lumMod val="75000"/>
-            </a:schemeClr>
-          </a:solidFill>
-          <a:ln>
-            <a:solidFill>
-              <a:schemeClr val="accent1">
-                <a:lumMod val="75000"/>
-              </a:schemeClr>
-            </a:solidFill>
-          </a:ln>
-        </p:spPr>
-        <p:style>
-          <a:lnRef idx="2">
-            <a:schemeClr val="accent1">
-              <a:shade val="50000"/>
-            </a:schemeClr>
-          </a:lnRef>
-          <a:fillRef idx="1">
-            <a:schemeClr val="accent1"/>
-          </a:fillRef>
-          <a:effectRef idx="0">
-            <a:schemeClr val="accent1"/>
-          </a:effectRef>
-          <a:fontRef idx="minor">
-            <a:schemeClr val="lt1"/>
-          </a:fontRef>
-        </p:style>
-        <p:txBody>
-          <a:bodyPr rtlCol="0" anchor="ctr"/>
-          <a:lstStyle/>
-          <a:p>
-            <a:pPr algn="ctr"/>
-            <a:endParaRPr lang="en-US"/>
-          </a:p>
-        </p:txBody>
-      </p:sp>
-      <p:sp>
-        <p:nvSpPr>
-          <p:cNvPr id="95" name="Rectangle 94"/>
-          <p:cNvSpPr/>
-          <p:nvPr/>
-        </p:nvSpPr>
-        <p:spPr>
-          <a:xfrm>
-            <a:off x="2893172" y="4835336"/>
-            <a:ext cx="164592" cy="153690"/>
-          </a:xfrm>
-          <a:prstGeom prst="rect">
-            <a:avLst/>
-          </a:prstGeom>
-          <a:solidFill>
-            <a:schemeClr val="accent1">
-              <a:lumMod val="75000"/>
-            </a:schemeClr>
-          </a:solidFill>
-          <a:ln>
-            <a:solidFill>
-              <a:schemeClr val="accent1">
-                <a:lumMod val="75000"/>
-              </a:schemeClr>
-            </a:solidFill>
-          </a:ln>
-        </p:spPr>
-        <p:style>
-          <a:lnRef idx="2">
-            <a:schemeClr val="accent1">
-              <a:shade val="50000"/>
-            </a:schemeClr>
-          </a:lnRef>
-          <a:fillRef idx="1">
-            <a:schemeClr val="accent1"/>
-          </a:fillRef>
-          <a:effectRef idx="0">
-            <a:schemeClr val="accent1"/>
-          </a:effectRef>
-          <a:fontRef idx="minor">
-            <a:schemeClr val="lt1"/>
-          </a:fontRef>
-        </p:style>
-        <p:txBody>
-          <a:bodyPr rtlCol="0" anchor="ctr"/>
-          <a:lstStyle/>
-          <a:p>
-            <a:pPr algn="ctr"/>
-            <a:endParaRPr lang="en-US"/>
-          </a:p>
-        </p:txBody>
-      </p:sp>
-      <p:sp>
-        <p:nvSpPr>
-          <p:cNvPr id="96" name="Rectangle 95"/>
-          <p:cNvSpPr/>
-          <p:nvPr/>
-        </p:nvSpPr>
-        <p:spPr>
-          <a:xfrm>
-            <a:off x="1608852" y="6315747"/>
-            <a:ext cx="164592" cy="153690"/>
-          </a:xfrm>
-          <a:prstGeom prst="rect">
-            <a:avLst/>
-          </a:prstGeom>
-          <a:solidFill>
-            <a:schemeClr val="accent1">
-              <a:lumMod val="75000"/>
-            </a:schemeClr>
-          </a:solidFill>
-          <a:ln>
-            <a:solidFill>
-              <a:schemeClr val="accent1">
-                <a:lumMod val="75000"/>
-              </a:schemeClr>
-            </a:solidFill>
-          </a:ln>
-        </p:spPr>
-        <p:style>
-          <a:lnRef idx="2">
-            <a:schemeClr val="accent1">
-              <a:shade val="50000"/>
-            </a:schemeClr>
-          </a:lnRef>
-          <a:fillRef idx="1">
-            <a:schemeClr val="accent1"/>
-          </a:fillRef>
-          <a:effectRef idx="0">
-            <a:schemeClr val="accent1"/>
-          </a:effectRef>
-          <a:fontRef idx="minor">
-            <a:schemeClr val="lt1"/>
-          </a:fontRef>
-        </p:style>
-        <p:txBody>
-          <a:bodyPr rtlCol="0" anchor="ctr"/>
-          <a:lstStyle/>
-          <a:p>
-            <a:pPr algn="ctr"/>
-            <a:endParaRPr lang="en-US"/>
-          </a:p>
-        </p:txBody>
-      </p:sp>
-      <p:sp>
-        <p:nvSpPr>
-          <p:cNvPr id="97" name="Rectangle 96"/>
-          <p:cNvSpPr/>
-          <p:nvPr/>
-        </p:nvSpPr>
-        <p:spPr>
-          <a:xfrm>
-            <a:off x="2026169" y="4657711"/>
-            <a:ext cx="164592" cy="153690"/>
-          </a:xfrm>
-          <a:prstGeom prst="rect">
-            <a:avLst/>
-          </a:prstGeom>
-          <a:solidFill>
-            <a:schemeClr val="accent1">
-              <a:lumMod val="75000"/>
-            </a:schemeClr>
-          </a:solidFill>
-          <a:ln>
-            <a:solidFill>
-              <a:schemeClr val="accent1">
-                <a:lumMod val="75000"/>
-              </a:schemeClr>
             </a:solidFill>
           </a:ln>
         </p:spPr>
@@ -8616,8 +6166,8 @@
         </p:nvCxnSpPr>
         <p:spPr>
           <a:xfrm flipH="1">
-            <a:off x="406497" y="4234953"/>
-            <a:ext cx="3011434" cy="4068"/>
+            <a:off x="406497" y="4236193"/>
+            <a:ext cx="2170131" cy="2828"/>
           </a:xfrm>
           <a:prstGeom prst="line">
             <a:avLst/>
@@ -8643,24 +6193,1941 @@
           </a:fontRef>
         </p:style>
       </p:cxnSp>
+      <p:sp>
+        <p:nvSpPr>
+          <p:cNvPr id="100" name="Rectangle 99"/>
+          <p:cNvSpPr/>
+          <p:nvPr/>
+        </p:nvSpPr>
+        <p:spPr>
+          <a:xfrm>
+            <a:off x="4702117" y="2304023"/>
+            <a:ext cx="1277474" cy="1069826"/>
+          </a:xfrm>
+          <a:prstGeom prst="rect">
+            <a:avLst/>
+          </a:prstGeom>
+          <a:noFill/>
+          <a:ln w="19050">
+            <a:solidFill>
+              <a:schemeClr val="tx1"/>
+            </a:solidFill>
+          </a:ln>
+        </p:spPr>
+        <p:style>
+          <a:lnRef idx="2">
+            <a:schemeClr val="accent1">
+              <a:shade val="50000"/>
+            </a:schemeClr>
+          </a:lnRef>
+          <a:fillRef idx="1">
+            <a:schemeClr val="accent1"/>
+          </a:fillRef>
+          <a:effectRef idx="0">
+            <a:schemeClr val="accent1"/>
+          </a:effectRef>
+          <a:fontRef idx="minor">
+            <a:schemeClr val="lt1"/>
+          </a:fontRef>
+        </p:style>
+        <p:txBody>
+          <a:bodyPr rtlCol="0" anchor="ctr"/>
+          <a:lstStyle/>
+          <a:p>
+            <a:pPr algn="ctr"/>
+            <a:endParaRPr lang="en-US"/>
+          </a:p>
+        </p:txBody>
+      </p:sp>
+      <p:sp>
+        <p:nvSpPr>
+          <p:cNvPr id="102" name="Rectangle 101"/>
+          <p:cNvSpPr/>
+          <p:nvPr/>
+        </p:nvSpPr>
+        <p:spPr>
+          <a:xfrm>
+            <a:off x="4702117" y="3373675"/>
+            <a:ext cx="1277474" cy="1068919"/>
+          </a:xfrm>
+          <a:prstGeom prst="rect">
+            <a:avLst/>
+          </a:prstGeom>
+          <a:noFill/>
+          <a:ln w="19050">
+            <a:solidFill>
+              <a:schemeClr val="tx1"/>
+            </a:solidFill>
+          </a:ln>
+        </p:spPr>
+        <p:style>
+          <a:lnRef idx="2">
+            <a:schemeClr val="accent1">
+              <a:shade val="50000"/>
+            </a:schemeClr>
+          </a:lnRef>
+          <a:fillRef idx="1">
+            <a:schemeClr val="accent1"/>
+          </a:fillRef>
+          <a:effectRef idx="0">
+            <a:schemeClr val="accent1"/>
+          </a:effectRef>
+          <a:fontRef idx="minor">
+            <a:schemeClr val="lt1"/>
+          </a:fontRef>
+        </p:style>
+        <p:txBody>
+          <a:bodyPr rtlCol="0" anchor="ctr"/>
+          <a:lstStyle/>
+          <a:p>
+            <a:pPr algn="ctr"/>
+            <a:endParaRPr lang="en-US"/>
+          </a:p>
+        </p:txBody>
+      </p:sp>
+      <p:sp>
+        <p:nvSpPr>
+          <p:cNvPr id="49" name="Rectangle 48"/>
+          <p:cNvSpPr/>
+          <p:nvPr/>
+        </p:nvSpPr>
+        <p:spPr>
+          <a:xfrm>
+            <a:off x="2165203" y="6244563"/>
+            <a:ext cx="164592" cy="153690"/>
+          </a:xfrm>
+          <a:prstGeom prst="rect">
+            <a:avLst/>
+          </a:prstGeom>
+          <a:noFill/>
+          <a:ln w="38100">
+            <a:solidFill>
+              <a:schemeClr val="accent1">
+                <a:lumMod val="75000"/>
+              </a:schemeClr>
+            </a:solidFill>
+          </a:ln>
+        </p:spPr>
+        <p:style>
+          <a:lnRef idx="2">
+            <a:schemeClr val="accent1">
+              <a:shade val="50000"/>
+            </a:schemeClr>
+          </a:lnRef>
+          <a:fillRef idx="1">
+            <a:schemeClr val="accent1"/>
+          </a:fillRef>
+          <a:effectRef idx="0">
+            <a:schemeClr val="accent1"/>
+          </a:effectRef>
+          <a:fontRef idx="minor">
+            <a:schemeClr val="lt1"/>
+          </a:fontRef>
+        </p:style>
+        <p:txBody>
+          <a:bodyPr rtlCol="0" anchor="ctr"/>
+          <a:lstStyle/>
+          <a:p>
+            <a:pPr algn="ctr"/>
+            <a:endParaRPr lang="en-US"/>
+          </a:p>
+        </p:txBody>
+      </p:sp>
+      <p:sp>
+        <p:nvSpPr>
+          <p:cNvPr id="63" name="Rectangle 62"/>
+          <p:cNvSpPr/>
+          <p:nvPr/>
+        </p:nvSpPr>
+        <p:spPr>
+          <a:xfrm>
+            <a:off x="754539" y="6277319"/>
+            <a:ext cx="164592" cy="153690"/>
+          </a:xfrm>
+          <a:prstGeom prst="rect">
+            <a:avLst/>
+          </a:prstGeom>
+          <a:noFill/>
+          <a:ln w="38100">
+            <a:solidFill>
+              <a:schemeClr val="accent1">
+                <a:lumMod val="75000"/>
+              </a:schemeClr>
+            </a:solidFill>
+          </a:ln>
+        </p:spPr>
+        <p:style>
+          <a:lnRef idx="2">
+            <a:schemeClr val="accent1">
+              <a:shade val="50000"/>
+            </a:schemeClr>
+          </a:lnRef>
+          <a:fillRef idx="1">
+            <a:schemeClr val="accent1"/>
+          </a:fillRef>
+          <a:effectRef idx="0">
+            <a:schemeClr val="accent1"/>
+          </a:effectRef>
+          <a:fontRef idx="minor">
+            <a:schemeClr val="lt1"/>
+          </a:fontRef>
+        </p:style>
+        <p:txBody>
+          <a:bodyPr rtlCol="0" anchor="ctr"/>
+          <a:lstStyle/>
+          <a:p>
+            <a:pPr algn="ctr"/>
+            <a:endParaRPr lang="en-US"/>
+          </a:p>
+        </p:txBody>
+      </p:sp>
+      <p:sp>
+        <p:nvSpPr>
+          <p:cNvPr id="64" name="Diamond 63"/>
+          <p:cNvSpPr/>
+          <p:nvPr/>
+        </p:nvSpPr>
+        <p:spPr>
+          <a:xfrm>
+            <a:off x="2224924" y="5534290"/>
+            <a:ext cx="237744" cy="219456"/>
+          </a:xfrm>
+          <a:prstGeom prst="diamond">
+            <a:avLst/>
+          </a:prstGeom>
+          <a:solidFill>
+            <a:srgbClr val="FF0000"/>
+          </a:solidFill>
+          <a:ln w="38100">
+            <a:solidFill>
+              <a:srgbClr val="FF0000"/>
+            </a:solidFill>
+          </a:ln>
+        </p:spPr>
+        <p:style>
+          <a:lnRef idx="2">
+            <a:schemeClr val="accent1">
+              <a:shade val="50000"/>
+            </a:schemeClr>
+          </a:lnRef>
+          <a:fillRef idx="1">
+            <a:schemeClr val="accent1"/>
+          </a:fillRef>
+          <a:effectRef idx="0">
+            <a:schemeClr val="accent1"/>
+          </a:effectRef>
+          <a:fontRef idx="minor">
+            <a:schemeClr val="lt1"/>
+          </a:fontRef>
+        </p:style>
+        <p:txBody>
+          <a:bodyPr rtlCol="0" anchor="ctr"/>
+          <a:lstStyle/>
+          <a:p>
+            <a:pPr algn="ctr"/>
+            <a:endParaRPr lang="en-US"/>
+          </a:p>
+        </p:txBody>
+      </p:sp>
+      <p:sp>
+        <p:nvSpPr>
+          <p:cNvPr id="65" name="Rectangle 64"/>
+          <p:cNvSpPr/>
+          <p:nvPr/>
+        </p:nvSpPr>
+        <p:spPr>
+          <a:xfrm>
+            <a:off x="1710862" y="5983036"/>
+            <a:ext cx="164592" cy="153690"/>
+          </a:xfrm>
+          <a:prstGeom prst="rect">
+            <a:avLst/>
+          </a:prstGeom>
+          <a:noFill/>
+          <a:ln w="38100">
+            <a:solidFill>
+              <a:schemeClr val="accent1">
+                <a:lumMod val="75000"/>
+              </a:schemeClr>
+            </a:solidFill>
+          </a:ln>
+        </p:spPr>
+        <p:style>
+          <a:lnRef idx="2">
+            <a:schemeClr val="accent1">
+              <a:shade val="50000"/>
+            </a:schemeClr>
+          </a:lnRef>
+          <a:fillRef idx="1">
+            <a:schemeClr val="accent1"/>
+          </a:fillRef>
+          <a:effectRef idx="0">
+            <a:schemeClr val="accent1"/>
+          </a:effectRef>
+          <a:fontRef idx="minor">
+            <a:schemeClr val="lt1"/>
+          </a:fontRef>
+        </p:style>
+        <p:txBody>
+          <a:bodyPr rtlCol="0" anchor="ctr"/>
+          <a:lstStyle/>
+          <a:p>
+            <a:pPr algn="ctr"/>
+            <a:endParaRPr lang="en-US"/>
+          </a:p>
+        </p:txBody>
+      </p:sp>
+      <p:sp>
+        <p:nvSpPr>
+          <p:cNvPr id="66" name="Diamond 65"/>
+          <p:cNvSpPr/>
+          <p:nvPr/>
+        </p:nvSpPr>
+        <p:spPr>
+          <a:xfrm>
+            <a:off x="1110996" y="6054004"/>
+            <a:ext cx="237744" cy="219456"/>
+          </a:xfrm>
+          <a:prstGeom prst="diamond">
+            <a:avLst/>
+          </a:prstGeom>
+          <a:solidFill>
+            <a:srgbClr val="FFC000"/>
+          </a:solidFill>
+          <a:ln w="38100">
+            <a:solidFill>
+              <a:srgbClr val="FFC000"/>
+            </a:solidFill>
+          </a:ln>
+        </p:spPr>
+        <p:style>
+          <a:lnRef idx="2">
+            <a:schemeClr val="accent1">
+              <a:shade val="50000"/>
+            </a:schemeClr>
+          </a:lnRef>
+          <a:fillRef idx="1">
+            <a:schemeClr val="accent1"/>
+          </a:fillRef>
+          <a:effectRef idx="0">
+            <a:schemeClr val="accent1"/>
+          </a:effectRef>
+          <a:fontRef idx="minor">
+            <a:schemeClr val="lt1"/>
+          </a:fontRef>
+        </p:style>
+        <p:txBody>
+          <a:bodyPr rtlCol="0" anchor="ctr"/>
+          <a:lstStyle/>
+          <a:p>
+            <a:pPr algn="ctr"/>
+            <a:endParaRPr lang="en-US"/>
+          </a:p>
+        </p:txBody>
+      </p:sp>
+      <p:sp>
+        <p:nvSpPr>
+          <p:cNvPr id="68" name="Diamond 67"/>
+          <p:cNvSpPr/>
+          <p:nvPr/>
+        </p:nvSpPr>
+        <p:spPr>
+          <a:xfrm>
+            <a:off x="439416" y="5931233"/>
+            <a:ext cx="237744" cy="219456"/>
+          </a:xfrm>
+          <a:prstGeom prst="diamond">
+            <a:avLst/>
+          </a:prstGeom>
+          <a:solidFill>
+            <a:srgbClr val="92D050"/>
+          </a:solidFill>
+          <a:ln w="38100">
+            <a:solidFill>
+              <a:srgbClr val="92D050"/>
+            </a:solidFill>
+          </a:ln>
+        </p:spPr>
+        <p:style>
+          <a:lnRef idx="2">
+            <a:schemeClr val="accent1">
+              <a:shade val="50000"/>
+            </a:schemeClr>
+          </a:lnRef>
+          <a:fillRef idx="1">
+            <a:schemeClr val="accent1"/>
+          </a:fillRef>
+          <a:effectRef idx="0">
+            <a:schemeClr val="accent1"/>
+          </a:effectRef>
+          <a:fontRef idx="minor">
+            <a:schemeClr val="lt1"/>
+          </a:fontRef>
+        </p:style>
+        <p:txBody>
+          <a:bodyPr rtlCol="0" anchor="ctr"/>
+          <a:lstStyle/>
+          <a:p>
+            <a:pPr algn="ctr"/>
+            <a:endParaRPr lang="en-US"/>
+          </a:p>
+        </p:txBody>
+      </p:sp>
+      <p:sp>
+        <p:nvSpPr>
+          <p:cNvPr id="76" name="Diamond 75"/>
+          <p:cNvSpPr/>
+          <p:nvPr/>
+        </p:nvSpPr>
+        <p:spPr>
+          <a:xfrm>
+            <a:off x="1230515" y="5111659"/>
+            <a:ext cx="237744" cy="219456"/>
+          </a:xfrm>
+          <a:prstGeom prst="diamond">
+            <a:avLst/>
+          </a:prstGeom>
+          <a:solidFill>
+            <a:schemeClr val="accent6">
+              <a:lumMod val="75000"/>
+            </a:schemeClr>
+          </a:solidFill>
+          <a:ln w="38100">
+            <a:solidFill>
+              <a:schemeClr val="accent6">
+                <a:lumMod val="75000"/>
+              </a:schemeClr>
+            </a:solidFill>
+          </a:ln>
+        </p:spPr>
+        <p:style>
+          <a:lnRef idx="2">
+            <a:schemeClr val="accent1">
+              <a:shade val="50000"/>
+            </a:schemeClr>
+          </a:lnRef>
+          <a:fillRef idx="1">
+            <a:schemeClr val="accent1"/>
+          </a:fillRef>
+          <a:effectRef idx="0">
+            <a:schemeClr val="accent1"/>
+          </a:effectRef>
+          <a:fontRef idx="minor">
+            <a:schemeClr val="lt1"/>
+          </a:fontRef>
+        </p:style>
+        <p:txBody>
+          <a:bodyPr rtlCol="0" anchor="ctr"/>
+          <a:lstStyle/>
+          <a:p>
+            <a:pPr algn="ctr"/>
+            <a:endParaRPr lang="en-US"/>
+          </a:p>
+        </p:txBody>
+      </p:sp>
+      <p:sp>
+        <p:nvSpPr>
+          <p:cNvPr id="77" name="Diamond 76"/>
+          <p:cNvSpPr/>
+          <p:nvPr/>
+        </p:nvSpPr>
+        <p:spPr>
+          <a:xfrm>
+            <a:off x="919105" y="4662173"/>
+            <a:ext cx="237744" cy="219456"/>
+          </a:xfrm>
+          <a:prstGeom prst="diamond">
+            <a:avLst/>
+          </a:prstGeom>
+          <a:solidFill>
+            <a:srgbClr val="F5A3E5"/>
+          </a:solidFill>
+          <a:ln w="38100">
+            <a:solidFill>
+              <a:srgbClr val="F5A3E5"/>
+            </a:solidFill>
+          </a:ln>
+        </p:spPr>
+        <p:style>
+          <a:lnRef idx="2">
+            <a:schemeClr val="accent1">
+              <a:shade val="50000"/>
+            </a:schemeClr>
+          </a:lnRef>
+          <a:fillRef idx="1">
+            <a:schemeClr val="accent1"/>
+          </a:fillRef>
+          <a:effectRef idx="0">
+            <a:schemeClr val="accent1"/>
+          </a:effectRef>
+          <a:fontRef idx="minor">
+            <a:schemeClr val="lt1"/>
+          </a:fontRef>
+        </p:style>
+        <p:txBody>
+          <a:bodyPr rtlCol="0" anchor="ctr"/>
+          <a:lstStyle/>
+          <a:p>
+            <a:pPr algn="ctr"/>
+            <a:endParaRPr lang="en-US"/>
+          </a:p>
+        </p:txBody>
+      </p:sp>
+      <p:sp>
+        <p:nvSpPr>
+          <p:cNvPr id="95" name="Rectangle 94"/>
+          <p:cNvSpPr/>
+          <p:nvPr/>
+        </p:nvSpPr>
+        <p:spPr>
+          <a:xfrm>
+            <a:off x="1163320" y="5614696"/>
+            <a:ext cx="164592" cy="153690"/>
+          </a:xfrm>
+          <a:prstGeom prst="rect">
+            <a:avLst/>
+          </a:prstGeom>
+          <a:noFill/>
+          <a:ln w="38100">
+            <a:solidFill>
+              <a:schemeClr val="accent1">
+                <a:lumMod val="75000"/>
+              </a:schemeClr>
+            </a:solidFill>
+          </a:ln>
+        </p:spPr>
+        <p:style>
+          <a:lnRef idx="2">
+            <a:schemeClr val="accent1">
+              <a:shade val="50000"/>
+            </a:schemeClr>
+          </a:lnRef>
+          <a:fillRef idx="1">
+            <a:schemeClr val="accent1"/>
+          </a:fillRef>
+          <a:effectRef idx="0">
+            <a:schemeClr val="accent1"/>
+          </a:effectRef>
+          <a:fontRef idx="minor">
+            <a:schemeClr val="lt1"/>
+          </a:fontRef>
+        </p:style>
+        <p:txBody>
+          <a:bodyPr rtlCol="0" anchor="ctr"/>
+          <a:lstStyle/>
+          <a:p>
+            <a:pPr algn="ctr"/>
+            <a:endParaRPr lang="en-US"/>
+          </a:p>
+        </p:txBody>
+      </p:sp>
+      <p:sp>
+        <p:nvSpPr>
+          <p:cNvPr id="96" name="Rectangle 95"/>
+          <p:cNvSpPr/>
+          <p:nvPr/>
+        </p:nvSpPr>
+        <p:spPr>
+          <a:xfrm>
+            <a:off x="1747206" y="4931947"/>
+            <a:ext cx="164592" cy="153690"/>
+          </a:xfrm>
+          <a:prstGeom prst="rect">
+            <a:avLst/>
+          </a:prstGeom>
+          <a:noFill/>
+          <a:ln w="38100">
+            <a:solidFill>
+              <a:schemeClr val="accent1">
+                <a:lumMod val="75000"/>
+              </a:schemeClr>
+            </a:solidFill>
+          </a:ln>
+        </p:spPr>
+        <p:style>
+          <a:lnRef idx="2">
+            <a:schemeClr val="accent1">
+              <a:shade val="50000"/>
+            </a:schemeClr>
+          </a:lnRef>
+          <a:fillRef idx="1">
+            <a:schemeClr val="accent1"/>
+          </a:fillRef>
+          <a:effectRef idx="0">
+            <a:schemeClr val="accent1"/>
+          </a:effectRef>
+          <a:fontRef idx="minor">
+            <a:schemeClr val="lt1"/>
+          </a:fontRef>
+        </p:style>
+        <p:txBody>
+          <a:bodyPr rtlCol="0" anchor="ctr"/>
+          <a:lstStyle/>
+          <a:p>
+            <a:pPr algn="ctr"/>
+            <a:endParaRPr lang="en-US"/>
+          </a:p>
+        </p:txBody>
+      </p:sp>
+      <p:sp>
+        <p:nvSpPr>
+          <p:cNvPr id="97" name="Diamond 96"/>
+          <p:cNvSpPr/>
+          <p:nvPr/>
+        </p:nvSpPr>
+        <p:spPr>
+          <a:xfrm>
+            <a:off x="377127" y="5152203"/>
+            <a:ext cx="237744" cy="219456"/>
+          </a:xfrm>
+          <a:prstGeom prst="diamond">
+            <a:avLst/>
+          </a:prstGeom>
+          <a:solidFill>
+            <a:srgbClr val="00B0F0"/>
+          </a:solidFill>
+          <a:ln w="38100">
+            <a:solidFill>
+              <a:srgbClr val="00B0F0"/>
+            </a:solidFill>
+          </a:ln>
+        </p:spPr>
+        <p:style>
+          <a:lnRef idx="2">
+            <a:schemeClr val="accent1">
+              <a:shade val="50000"/>
+            </a:schemeClr>
+          </a:lnRef>
+          <a:fillRef idx="1">
+            <a:schemeClr val="accent1"/>
+          </a:fillRef>
+          <a:effectRef idx="0">
+            <a:schemeClr val="accent1"/>
+          </a:effectRef>
+          <a:fontRef idx="minor">
+            <a:schemeClr val="lt1"/>
+          </a:fontRef>
+        </p:style>
+        <p:txBody>
+          <a:bodyPr rtlCol="0" anchor="ctr"/>
+          <a:lstStyle/>
+          <a:p>
+            <a:pPr algn="ctr"/>
+            <a:endParaRPr lang="en-US"/>
+          </a:p>
+        </p:txBody>
+      </p:sp>
+      <p:sp>
+        <p:nvSpPr>
+          <p:cNvPr id="101" name="Rectangle 100"/>
+          <p:cNvSpPr/>
+          <p:nvPr/>
+        </p:nvSpPr>
+        <p:spPr>
+          <a:xfrm>
+            <a:off x="5382440" y="4657493"/>
+            <a:ext cx="164592" cy="153690"/>
+          </a:xfrm>
+          <a:prstGeom prst="rect">
+            <a:avLst/>
+          </a:prstGeom>
+          <a:noFill/>
+          <a:ln w="38100">
+            <a:solidFill>
+              <a:schemeClr val="accent1">
+                <a:lumMod val="75000"/>
+              </a:schemeClr>
+            </a:solidFill>
+          </a:ln>
+        </p:spPr>
+        <p:style>
+          <a:lnRef idx="2">
+            <a:schemeClr val="accent1">
+              <a:shade val="50000"/>
+            </a:schemeClr>
+          </a:lnRef>
+          <a:fillRef idx="1">
+            <a:schemeClr val="accent1"/>
+          </a:fillRef>
+          <a:effectRef idx="0">
+            <a:schemeClr val="accent1"/>
+          </a:effectRef>
+          <a:fontRef idx="minor">
+            <a:schemeClr val="lt1"/>
+          </a:fontRef>
+        </p:style>
+        <p:txBody>
+          <a:bodyPr rtlCol="0" anchor="ctr"/>
+          <a:lstStyle/>
+          <a:p>
+            <a:pPr algn="ctr"/>
+            <a:endParaRPr lang="en-US"/>
+          </a:p>
+        </p:txBody>
+      </p:sp>
+      <p:sp>
+        <p:nvSpPr>
+          <p:cNvPr id="103" name="Rectangle 102"/>
+          <p:cNvSpPr/>
+          <p:nvPr/>
+        </p:nvSpPr>
+        <p:spPr>
+          <a:xfrm>
+            <a:off x="5494358" y="6274284"/>
+            <a:ext cx="164592" cy="153690"/>
+          </a:xfrm>
+          <a:prstGeom prst="rect">
+            <a:avLst/>
+          </a:prstGeom>
+          <a:noFill/>
+          <a:ln w="38100">
+            <a:solidFill>
+              <a:schemeClr val="accent1">
+                <a:lumMod val="75000"/>
+              </a:schemeClr>
+            </a:solidFill>
+          </a:ln>
+        </p:spPr>
+        <p:style>
+          <a:lnRef idx="2">
+            <a:schemeClr val="accent1">
+              <a:shade val="50000"/>
+            </a:schemeClr>
+          </a:lnRef>
+          <a:fillRef idx="1">
+            <a:schemeClr val="accent1"/>
+          </a:fillRef>
+          <a:effectRef idx="0">
+            <a:schemeClr val="accent1"/>
+          </a:effectRef>
+          <a:fontRef idx="minor">
+            <a:schemeClr val="lt1"/>
+          </a:fontRef>
+        </p:style>
+        <p:txBody>
+          <a:bodyPr rtlCol="0" anchor="ctr"/>
+          <a:lstStyle/>
+          <a:p>
+            <a:pPr algn="ctr"/>
+            <a:endParaRPr lang="en-US"/>
+          </a:p>
+        </p:txBody>
+      </p:sp>
+      <p:sp>
+        <p:nvSpPr>
+          <p:cNvPr id="104" name="Rectangle 103"/>
+          <p:cNvSpPr/>
+          <p:nvPr/>
+        </p:nvSpPr>
+        <p:spPr>
+          <a:xfrm>
+            <a:off x="4083694" y="6307040"/>
+            <a:ext cx="164592" cy="153690"/>
+          </a:xfrm>
+          <a:prstGeom prst="rect">
+            <a:avLst/>
+          </a:prstGeom>
+          <a:noFill/>
+          <a:ln w="38100">
+            <a:solidFill>
+              <a:schemeClr val="accent1">
+                <a:lumMod val="75000"/>
+              </a:schemeClr>
+            </a:solidFill>
+          </a:ln>
+        </p:spPr>
+        <p:style>
+          <a:lnRef idx="2">
+            <a:schemeClr val="accent1">
+              <a:shade val="50000"/>
+            </a:schemeClr>
+          </a:lnRef>
+          <a:fillRef idx="1">
+            <a:schemeClr val="accent1"/>
+          </a:fillRef>
+          <a:effectRef idx="0">
+            <a:schemeClr val="accent1"/>
+          </a:effectRef>
+          <a:fontRef idx="minor">
+            <a:schemeClr val="lt1"/>
+          </a:fontRef>
+        </p:style>
+        <p:txBody>
+          <a:bodyPr rtlCol="0" anchor="ctr"/>
+          <a:lstStyle/>
+          <a:p>
+            <a:pPr algn="ctr"/>
+            <a:endParaRPr lang="en-US"/>
+          </a:p>
+        </p:txBody>
+      </p:sp>
+      <p:sp>
+        <p:nvSpPr>
+          <p:cNvPr id="106" name="Rectangle 105"/>
+          <p:cNvSpPr/>
+          <p:nvPr/>
+        </p:nvSpPr>
+        <p:spPr>
+          <a:xfrm>
+            <a:off x="5040017" y="6012757"/>
+            <a:ext cx="164592" cy="153690"/>
+          </a:xfrm>
+          <a:prstGeom prst="rect">
+            <a:avLst/>
+          </a:prstGeom>
+          <a:noFill/>
+          <a:ln w="38100">
+            <a:solidFill>
+              <a:schemeClr val="accent1">
+                <a:lumMod val="75000"/>
+              </a:schemeClr>
+            </a:solidFill>
+          </a:ln>
+        </p:spPr>
+        <p:style>
+          <a:lnRef idx="2">
+            <a:schemeClr val="accent1">
+              <a:shade val="50000"/>
+            </a:schemeClr>
+          </a:lnRef>
+          <a:fillRef idx="1">
+            <a:schemeClr val="accent1"/>
+          </a:fillRef>
+          <a:effectRef idx="0">
+            <a:schemeClr val="accent1"/>
+          </a:effectRef>
+          <a:fontRef idx="minor">
+            <a:schemeClr val="lt1"/>
+          </a:fontRef>
+        </p:style>
+        <p:txBody>
+          <a:bodyPr rtlCol="0" anchor="ctr"/>
+          <a:lstStyle/>
+          <a:p>
+            <a:pPr algn="ctr"/>
+            <a:endParaRPr lang="en-US"/>
+          </a:p>
+        </p:txBody>
+      </p:sp>
+      <p:sp>
+        <p:nvSpPr>
+          <p:cNvPr id="111" name="Rectangle 110"/>
+          <p:cNvSpPr/>
+          <p:nvPr/>
+        </p:nvSpPr>
+        <p:spPr>
+          <a:xfrm>
+            <a:off x="4492475" y="5644417"/>
+            <a:ext cx="164592" cy="153690"/>
+          </a:xfrm>
+          <a:prstGeom prst="rect">
+            <a:avLst/>
+          </a:prstGeom>
+          <a:noFill/>
+          <a:ln w="38100">
+            <a:solidFill>
+              <a:schemeClr val="accent1">
+                <a:lumMod val="75000"/>
+              </a:schemeClr>
+            </a:solidFill>
+          </a:ln>
+        </p:spPr>
+        <p:style>
+          <a:lnRef idx="2">
+            <a:schemeClr val="accent1">
+              <a:shade val="50000"/>
+            </a:schemeClr>
+          </a:lnRef>
+          <a:fillRef idx="1">
+            <a:schemeClr val="accent1"/>
+          </a:fillRef>
+          <a:effectRef idx="0">
+            <a:schemeClr val="accent1"/>
+          </a:effectRef>
+          <a:fontRef idx="minor">
+            <a:schemeClr val="lt1"/>
+          </a:fontRef>
+        </p:style>
+        <p:txBody>
+          <a:bodyPr rtlCol="0" anchor="ctr"/>
+          <a:lstStyle/>
+          <a:p>
+            <a:pPr algn="ctr"/>
+            <a:endParaRPr lang="en-US"/>
+          </a:p>
+        </p:txBody>
+      </p:sp>
+      <p:sp>
+        <p:nvSpPr>
+          <p:cNvPr id="112" name="Rectangle 111"/>
+          <p:cNvSpPr/>
+          <p:nvPr/>
+        </p:nvSpPr>
+        <p:spPr>
+          <a:xfrm>
+            <a:off x="5076361" y="4961668"/>
+            <a:ext cx="164592" cy="153690"/>
+          </a:xfrm>
+          <a:prstGeom prst="rect">
+            <a:avLst/>
+          </a:prstGeom>
+          <a:noFill/>
+          <a:ln w="38100">
+            <a:solidFill>
+              <a:schemeClr val="accent1">
+                <a:lumMod val="75000"/>
+              </a:schemeClr>
+            </a:solidFill>
+          </a:ln>
+        </p:spPr>
+        <p:style>
+          <a:lnRef idx="2">
+            <a:schemeClr val="accent1">
+              <a:shade val="50000"/>
+            </a:schemeClr>
+          </a:lnRef>
+          <a:fillRef idx="1">
+            <a:schemeClr val="accent1"/>
+          </a:fillRef>
+          <a:effectRef idx="0">
+            <a:schemeClr val="accent1"/>
+          </a:effectRef>
+          <a:fontRef idx="minor">
+            <a:schemeClr val="lt1"/>
+          </a:fontRef>
+        </p:style>
+        <p:txBody>
+          <a:bodyPr rtlCol="0" anchor="ctr"/>
+          <a:lstStyle/>
+          <a:p>
+            <a:pPr algn="ctr"/>
+            <a:endParaRPr lang="en-US"/>
+          </a:p>
+        </p:txBody>
+      </p:sp>
+      <p:sp>
+        <p:nvSpPr>
+          <p:cNvPr id="23" name="Flowchart: Connector 22"/>
+          <p:cNvSpPr/>
+          <p:nvPr/>
+        </p:nvSpPr>
+        <p:spPr>
+          <a:xfrm>
+            <a:off x="4248260" y="4691894"/>
+            <a:ext cx="216380" cy="205145"/>
+          </a:xfrm>
+          <a:prstGeom prst="flowChartConnector">
+            <a:avLst/>
+          </a:prstGeom>
+          <a:solidFill>
+            <a:srgbClr val="FF0066"/>
+          </a:solidFill>
+          <a:ln>
+            <a:solidFill>
+              <a:srgbClr val="FF0066"/>
+            </a:solidFill>
+          </a:ln>
+        </p:spPr>
+        <p:style>
+          <a:lnRef idx="2">
+            <a:schemeClr val="accent1">
+              <a:shade val="50000"/>
+            </a:schemeClr>
+          </a:lnRef>
+          <a:fillRef idx="1">
+            <a:schemeClr val="accent1"/>
+          </a:fillRef>
+          <a:effectRef idx="0">
+            <a:schemeClr val="accent1"/>
+          </a:effectRef>
+          <a:fontRef idx="minor">
+            <a:schemeClr val="lt1"/>
+          </a:fontRef>
+        </p:style>
+        <p:txBody>
+          <a:bodyPr rtlCol="0" anchor="ctr"/>
+          <a:lstStyle/>
+          <a:p>
+            <a:pPr algn="ctr"/>
+            <a:endParaRPr lang="en-US"/>
+          </a:p>
+        </p:txBody>
+      </p:sp>
+      <p:sp>
+        <p:nvSpPr>
+          <p:cNvPr id="114" name="Flowchart: Connector 113"/>
+          <p:cNvSpPr/>
+          <p:nvPr/>
+        </p:nvSpPr>
+        <p:spPr>
+          <a:xfrm>
+            <a:off x="4568551" y="5134224"/>
+            <a:ext cx="216380" cy="205145"/>
+          </a:xfrm>
+          <a:prstGeom prst="flowChartConnector">
+            <a:avLst/>
+          </a:prstGeom>
+          <a:solidFill>
+            <a:srgbClr val="31AD34"/>
+          </a:solidFill>
+          <a:ln>
+            <a:solidFill>
+              <a:srgbClr val="31AD34"/>
+            </a:solidFill>
+          </a:ln>
+        </p:spPr>
+        <p:style>
+          <a:lnRef idx="2">
+            <a:schemeClr val="accent1">
+              <a:shade val="50000"/>
+            </a:schemeClr>
+          </a:lnRef>
+          <a:fillRef idx="1">
+            <a:schemeClr val="accent1"/>
+          </a:fillRef>
+          <a:effectRef idx="0">
+            <a:schemeClr val="accent1"/>
+          </a:effectRef>
+          <a:fontRef idx="minor">
+            <a:schemeClr val="lt1"/>
+          </a:fontRef>
+        </p:style>
+        <p:txBody>
+          <a:bodyPr rtlCol="0" anchor="ctr"/>
+          <a:lstStyle/>
+          <a:p>
+            <a:pPr algn="ctr"/>
+            <a:endParaRPr lang="en-US"/>
+          </a:p>
+        </p:txBody>
+      </p:sp>
+      <p:sp>
+        <p:nvSpPr>
+          <p:cNvPr id="115" name="Flowchart: Connector 114"/>
+          <p:cNvSpPr/>
+          <p:nvPr/>
+        </p:nvSpPr>
+        <p:spPr>
+          <a:xfrm>
+            <a:off x="3722768" y="5180146"/>
+            <a:ext cx="216380" cy="205145"/>
+          </a:xfrm>
+          <a:prstGeom prst="flowChartConnector">
+            <a:avLst/>
+          </a:prstGeom>
+          <a:solidFill>
+            <a:schemeClr val="accent1">
+              <a:lumMod val="60000"/>
+              <a:lumOff val="40000"/>
+            </a:schemeClr>
+          </a:solidFill>
+          <a:ln>
+            <a:solidFill>
+              <a:schemeClr val="accent1">
+                <a:lumMod val="60000"/>
+                <a:lumOff val="40000"/>
+              </a:schemeClr>
+            </a:solidFill>
+          </a:ln>
+        </p:spPr>
+        <p:style>
+          <a:lnRef idx="2">
+            <a:schemeClr val="accent1">
+              <a:shade val="50000"/>
+            </a:schemeClr>
+          </a:lnRef>
+          <a:fillRef idx="1">
+            <a:schemeClr val="accent1"/>
+          </a:fillRef>
+          <a:effectRef idx="0">
+            <a:schemeClr val="accent1"/>
+          </a:effectRef>
+          <a:fontRef idx="minor">
+            <a:schemeClr val="lt1"/>
+          </a:fontRef>
+        </p:style>
+        <p:txBody>
+          <a:bodyPr rtlCol="0" anchor="ctr"/>
+          <a:lstStyle/>
+          <a:p>
+            <a:pPr algn="ctr"/>
+            <a:endParaRPr lang="en-US"/>
+          </a:p>
+        </p:txBody>
+      </p:sp>
+      <p:sp>
+        <p:nvSpPr>
+          <p:cNvPr id="116" name="Flowchart: Connector 115"/>
+          <p:cNvSpPr/>
+          <p:nvPr/>
+        </p:nvSpPr>
+        <p:spPr>
+          <a:xfrm>
+            <a:off x="3766907" y="5961167"/>
+            <a:ext cx="216380" cy="205145"/>
+          </a:xfrm>
+          <a:prstGeom prst="flowChartConnector">
+            <a:avLst/>
+          </a:prstGeom>
+          <a:solidFill>
+            <a:schemeClr val="accent6">
+              <a:lumMod val="40000"/>
+              <a:lumOff val="60000"/>
+            </a:schemeClr>
+          </a:solidFill>
+          <a:ln>
+            <a:solidFill>
+              <a:schemeClr val="accent6">
+                <a:lumMod val="40000"/>
+                <a:lumOff val="60000"/>
+              </a:schemeClr>
+            </a:solidFill>
+          </a:ln>
+        </p:spPr>
+        <p:style>
+          <a:lnRef idx="2">
+            <a:schemeClr val="accent1">
+              <a:shade val="50000"/>
+            </a:schemeClr>
+          </a:lnRef>
+          <a:fillRef idx="1">
+            <a:schemeClr val="accent1"/>
+          </a:fillRef>
+          <a:effectRef idx="0">
+            <a:schemeClr val="accent1"/>
+          </a:effectRef>
+          <a:fontRef idx="minor">
+            <a:schemeClr val="lt1"/>
+          </a:fontRef>
+        </p:style>
+        <p:txBody>
+          <a:bodyPr rtlCol="0" anchor="ctr"/>
+          <a:lstStyle/>
+          <a:p>
+            <a:pPr algn="ctr"/>
+            <a:endParaRPr lang="en-US"/>
+          </a:p>
+        </p:txBody>
+      </p:sp>
+      <p:sp>
+        <p:nvSpPr>
+          <p:cNvPr id="117" name="Flowchart: Connector 116"/>
+          <p:cNvSpPr/>
+          <p:nvPr/>
+        </p:nvSpPr>
+        <p:spPr>
+          <a:xfrm>
+            <a:off x="4462122" y="6083725"/>
+            <a:ext cx="216380" cy="205145"/>
+          </a:xfrm>
+          <a:prstGeom prst="flowChartConnector">
+            <a:avLst/>
+          </a:prstGeom>
+          <a:solidFill>
+            <a:schemeClr val="accent4">
+              <a:lumMod val="60000"/>
+              <a:lumOff val="40000"/>
+            </a:schemeClr>
+          </a:solidFill>
+          <a:ln>
+            <a:solidFill>
+              <a:schemeClr val="accent4">
+                <a:lumMod val="40000"/>
+                <a:lumOff val="60000"/>
+              </a:schemeClr>
+            </a:solidFill>
+          </a:ln>
+        </p:spPr>
+        <p:style>
+          <a:lnRef idx="2">
+            <a:schemeClr val="accent1">
+              <a:shade val="50000"/>
+            </a:schemeClr>
+          </a:lnRef>
+          <a:fillRef idx="1">
+            <a:schemeClr val="accent1"/>
+          </a:fillRef>
+          <a:effectRef idx="0">
+            <a:schemeClr val="accent1"/>
+          </a:effectRef>
+          <a:fontRef idx="minor">
+            <a:schemeClr val="lt1"/>
+          </a:fontRef>
+        </p:style>
+        <p:txBody>
+          <a:bodyPr rtlCol="0" anchor="ctr"/>
+          <a:lstStyle/>
+          <a:p>
+            <a:pPr algn="ctr"/>
+            <a:endParaRPr lang="en-US"/>
+          </a:p>
+        </p:txBody>
+      </p:sp>
+      <p:sp>
+        <p:nvSpPr>
+          <p:cNvPr id="118" name="Flowchart: Connector 117"/>
+          <p:cNvSpPr/>
+          <p:nvPr/>
+        </p:nvSpPr>
+        <p:spPr>
+          <a:xfrm>
+            <a:off x="5558957" y="5564011"/>
+            <a:ext cx="216380" cy="205145"/>
+          </a:xfrm>
+          <a:prstGeom prst="flowChartConnector">
+            <a:avLst/>
+          </a:prstGeom>
+          <a:solidFill>
+            <a:srgbClr val="C00000"/>
+          </a:solidFill>
+          <a:ln>
+            <a:solidFill>
+              <a:srgbClr val="C00000"/>
+            </a:solidFill>
+          </a:ln>
+        </p:spPr>
+        <p:style>
+          <a:lnRef idx="2">
+            <a:schemeClr val="accent1">
+              <a:shade val="50000"/>
+            </a:schemeClr>
+          </a:lnRef>
+          <a:fillRef idx="1">
+            <a:schemeClr val="accent1"/>
+          </a:fillRef>
+          <a:effectRef idx="0">
+            <a:schemeClr val="accent1"/>
+          </a:effectRef>
+          <a:fontRef idx="minor">
+            <a:schemeClr val="lt1"/>
+          </a:fontRef>
+        </p:style>
+        <p:txBody>
+          <a:bodyPr rtlCol="0" anchor="ctr"/>
+          <a:lstStyle/>
+          <a:p>
+            <a:pPr algn="ctr"/>
+            <a:endParaRPr lang="en-US"/>
+          </a:p>
+        </p:txBody>
+      </p:sp>
+      <p:sp>
+        <p:nvSpPr>
+          <p:cNvPr id="119" name="Rectangle 118"/>
+          <p:cNvSpPr/>
+          <p:nvPr/>
+        </p:nvSpPr>
+        <p:spPr>
+          <a:xfrm>
+            <a:off x="5216780" y="2553448"/>
+            <a:ext cx="164592" cy="153690"/>
+          </a:xfrm>
+          <a:prstGeom prst="rect">
+            <a:avLst/>
+          </a:prstGeom>
+          <a:noFill/>
+          <a:ln w="38100">
+            <a:solidFill>
+              <a:schemeClr val="accent1">
+                <a:lumMod val="75000"/>
+              </a:schemeClr>
+            </a:solidFill>
+          </a:ln>
+        </p:spPr>
+        <p:style>
+          <a:lnRef idx="2">
+            <a:schemeClr val="accent1">
+              <a:shade val="50000"/>
+            </a:schemeClr>
+          </a:lnRef>
+          <a:fillRef idx="1">
+            <a:schemeClr val="accent1"/>
+          </a:fillRef>
+          <a:effectRef idx="0">
+            <a:schemeClr val="accent1"/>
+          </a:effectRef>
+          <a:fontRef idx="minor">
+            <a:schemeClr val="lt1"/>
+          </a:fontRef>
+        </p:style>
+        <p:txBody>
+          <a:bodyPr rtlCol="0" anchor="ctr"/>
+          <a:lstStyle/>
+          <a:p>
+            <a:pPr algn="ctr"/>
+            <a:endParaRPr lang="en-US"/>
+          </a:p>
+        </p:txBody>
+      </p:sp>
+      <p:sp>
+        <p:nvSpPr>
+          <p:cNvPr id="120" name="Rectangle 119"/>
+          <p:cNvSpPr/>
+          <p:nvPr/>
+        </p:nvSpPr>
+        <p:spPr>
+          <a:xfrm>
+            <a:off x="5328698" y="4170239"/>
+            <a:ext cx="164592" cy="153690"/>
+          </a:xfrm>
+          <a:prstGeom prst="rect">
+            <a:avLst/>
+          </a:prstGeom>
+          <a:noFill/>
+          <a:ln w="38100">
+            <a:solidFill>
+              <a:schemeClr val="accent1">
+                <a:lumMod val="75000"/>
+              </a:schemeClr>
+            </a:solidFill>
+          </a:ln>
+        </p:spPr>
+        <p:style>
+          <a:lnRef idx="2">
+            <a:schemeClr val="accent1">
+              <a:shade val="50000"/>
+            </a:schemeClr>
+          </a:lnRef>
+          <a:fillRef idx="1">
+            <a:schemeClr val="accent1"/>
+          </a:fillRef>
+          <a:effectRef idx="0">
+            <a:schemeClr val="accent1"/>
+          </a:effectRef>
+          <a:fontRef idx="minor">
+            <a:schemeClr val="lt1"/>
+          </a:fontRef>
+        </p:style>
+        <p:txBody>
+          <a:bodyPr rtlCol="0" anchor="ctr"/>
+          <a:lstStyle/>
+          <a:p>
+            <a:pPr algn="ctr"/>
+            <a:endParaRPr lang="en-US"/>
+          </a:p>
+        </p:txBody>
+      </p:sp>
+      <p:sp>
+        <p:nvSpPr>
+          <p:cNvPr id="121" name="Rectangle 120"/>
+          <p:cNvSpPr/>
+          <p:nvPr/>
+        </p:nvSpPr>
+        <p:spPr>
+          <a:xfrm>
+            <a:off x="3918034" y="4202995"/>
+            <a:ext cx="164592" cy="153690"/>
+          </a:xfrm>
+          <a:prstGeom prst="rect">
+            <a:avLst/>
+          </a:prstGeom>
+          <a:noFill/>
+          <a:ln w="38100">
+            <a:solidFill>
+              <a:schemeClr val="accent1">
+                <a:lumMod val="75000"/>
+              </a:schemeClr>
+            </a:solidFill>
+          </a:ln>
+        </p:spPr>
+        <p:style>
+          <a:lnRef idx="2">
+            <a:schemeClr val="accent1">
+              <a:shade val="50000"/>
+            </a:schemeClr>
+          </a:lnRef>
+          <a:fillRef idx="1">
+            <a:schemeClr val="accent1"/>
+          </a:fillRef>
+          <a:effectRef idx="0">
+            <a:schemeClr val="accent1"/>
+          </a:effectRef>
+          <a:fontRef idx="minor">
+            <a:schemeClr val="lt1"/>
+          </a:fontRef>
+        </p:style>
+        <p:txBody>
+          <a:bodyPr rtlCol="0" anchor="ctr"/>
+          <a:lstStyle/>
+          <a:p>
+            <a:pPr algn="ctr"/>
+            <a:endParaRPr lang="en-US"/>
+          </a:p>
+        </p:txBody>
+      </p:sp>
+      <p:sp>
+        <p:nvSpPr>
+          <p:cNvPr id="122" name="Diamond 121"/>
+          <p:cNvSpPr/>
+          <p:nvPr/>
+        </p:nvSpPr>
+        <p:spPr>
+          <a:xfrm>
+            <a:off x="5388419" y="3459966"/>
+            <a:ext cx="237744" cy="219456"/>
+          </a:xfrm>
+          <a:prstGeom prst="diamond">
+            <a:avLst/>
+          </a:prstGeom>
+          <a:solidFill>
+            <a:srgbClr val="FF0000"/>
+          </a:solidFill>
+          <a:ln w="38100">
+            <a:solidFill>
+              <a:srgbClr val="FF0000"/>
+            </a:solidFill>
+          </a:ln>
+        </p:spPr>
+        <p:style>
+          <a:lnRef idx="2">
+            <a:schemeClr val="accent1">
+              <a:shade val="50000"/>
+            </a:schemeClr>
+          </a:lnRef>
+          <a:fillRef idx="1">
+            <a:schemeClr val="accent1"/>
+          </a:fillRef>
+          <a:effectRef idx="0">
+            <a:schemeClr val="accent1"/>
+          </a:effectRef>
+          <a:fontRef idx="minor">
+            <a:schemeClr val="lt1"/>
+          </a:fontRef>
+        </p:style>
+        <p:txBody>
+          <a:bodyPr rtlCol="0" anchor="ctr"/>
+          <a:lstStyle/>
+          <a:p>
+            <a:pPr algn="ctr"/>
+            <a:endParaRPr lang="en-US"/>
+          </a:p>
+        </p:txBody>
+      </p:sp>
+      <p:sp>
+        <p:nvSpPr>
+          <p:cNvPr id="123" name="Rectangle 122"/>
+          <p:cNvSpPr/>
+          <p:nvPr/>
+        </p:nvSpPr>
+        <p:spPr>
+          <a:xfrm>
+            <a:off x="4874357" y="3908712"/>
+            <a:ext cx="164592" cy="153690"/>
+          </a:xfrm>
+          <a:prstGeom prst="rect">
+            <a:avLst/>
+          </a:prstGeom>
+          <a:noFill/>
+          <a:ln w="38100">
+            <a:solidFill>
+              <a:schemeClr val="accent1">
+                <a:lumMod val="75000"/>
+              </a:schemeClr>
+            </a:solidFill>
+          </a:ln>
+        </p:spPr>
+        <p:style>
+          <a:lnRef idx="2">
+            <a:schemeClr val="accent1">
+              <a:shade val="50000"/>
+            </a:schemeClr>
+          </a:lnRef>
+          <a:fillRef idx="1">
+            <a:schemeClr val="accent1"/>
+          </a:fillRef>
+          <a:effectRef idx="0">
+            <a:schemeClr val="accent1"/>
+          </a:effectRef>
+          <a:fontRef idx="minor">
+            <a:schemeClr val="lt1"/>
+          </a:fontRef>
+        </p:style>
+        <p:txBody>
+          <a:bodyPr rtlCol="0" anchor="ctr"/>
+          <a:lstStyle/>
+          <a:p>
+            <a:pPr algn="ctr"/>
+            <a:endParaRPr lang="en-US"/>
+          </a:p>
+        </p:txBody>
+      </p:sp>
+      <p:sp>
+        <p:nvSpPr>
+          <p:cNvPr id="124" name="Diamond 123"/>
+          <p:cNvSpPr/>
+          <p:nvPr/>
+        </p:nvSpPr>
+        <p:spPr>
+          <a:xfrm>
+            <a:off x="4274491" y="3979680"/>
+            <a:ext cx="237744" cy="219456"/>
+          </a:xfrm>
+          <a:prstGeom prst="diamond">
+            <a:avLst/>
+          </a:prstGeom>
+          <a:solidFill>
+            <a:srgbClr val="FFC000"/>
+          </a:solidFill>
+          <a:ln w="38100">
+            <a:solidFill>
+              <a:srgbClr val="FFC000"/>
+            </a:solidFill>
+          </a:ln>
+        </p:spPr>
+        <p:style>
+          <a:lnRef idx="2">
+            <a:schemeClr val="accent1">
+              <a:shade val="50000"/>
+            </a:schemeClr>
+          </a:lnRef>
+          <a:fillRef idx="1">
+            <a:schemeClr val="accent1"/>
+          </a:fillRef>
+          <a:effectRef idx="0">
+            <a:schemeClr val="accent1"/>
+          </a:effectRef>
+          <a:fontRef idx="minor">
+            <a:schemeClr val="lt1"/>
+          </a:fontRef>
+        </p:style>
+        <p:txBody>
+          <a:bodyPr rtlCol="0" anchor="ctr"/>
+          <a:lstStyle/>
+          <a:p>
+            <a:pPr algn="ctr"/>
+            <a:endParaRPr lang="en-US"/>
+          </a:p>
+        </p:txBody>
+      </p:sp>
+      <p:sp>
+        <p:nvSpPr>
+          <p:cNvPr id="125" name="Diamond 124"/>
+          <p:cNvSpPr/>
+          <p:nvPr/>
+        </p:nvSpPr>
+        <p:spPr>
+          <a:xfrm>
+            <a:off x="3602911" y="3856909"/>
+            <a:ext cx="237744" cy="219456"/>
+          </a:xfrm>
+          <a:prstGeom prst="diamond">
+            <a:avLst/>
+          </a:prstGeom>
+          <a:solidFill>
+            <a:srgbClr val="92D050"/>
+          </a:solidFill>
+          <a:ln w="38100">
+            <a:solidFill>
+              <a:srgbClr val="92D050"/>
+            </a:solidFill>
+          </a:ln>
+        </p:spPr>
+        <p:style>
+          <a:lnRef idx="2">
+            <a:schemeClr val="accent1">
+              <a:shade val="50000"/>
+            </a:schemeClr>
+          </a:lnRef>
+          <a:fillRef idx="1">
+            <a:schemeClr val="accent1"/>
+          </a:fillRef>
+          <a:effectRef idx="0">
+            <a:schemeClr val="accent1"/>
+          </a:effectRef>
+          <a:fontRef idx="minor">
+            <a:schemeClr val="lt1"/>
+          </a:fontRef>
+        </p:style>
+        <p:txBody>
+          <a:bodyPr rtlCol="0" anchor="ctr"/>
+          <a:lstStyle/>
+          <a:p>
+            <a:pPr algn="ctr"/>
+            <a:endParaRPr lang="en-US"/>
+          </a:p>
+        </p:txBody>
+      </p:sp>
+      <p:sp>
+        <p:nvSpPr>
+          <p:cNvPr id="126" name="Diamond 125"/>
+          <p:cNvSpPr/>
+          <p:nvPr/>
+        </p:nvSpPr>
+        <p:spPr>
+          <a:xfrm>
+            <a:off x="4394010" y="3037335"/>
+            <a:ext cx="237744" cy="219456"/>
+          </a:xfrm>
+          <a:prstGeom prst="diamond">
+            <a:avLst/>
+          </a:prstGeom>
+          <a:solidFill>
+            <a:schemeClr val="accent6">
+              <a:lumMod val="75000"/>
+            </a:schemeClr>
+          </a:solidFill>
+          <a:ln w="38100">
+            <a:solidFill>
+              <a:schemeClr val="accent6">
+                <a:lumMod val="75000"/>
+              </a:schemeClr>
+            </a:solidFill>
+          </a:ln>
+        </p:spPr>
+        <p:style>
+          <a:lnRef idx="2">
+            <a:schemeClr val="accent1">
+              <a:shade val="50000"/>
+            </a:schemeClr>
+          </a:lnRef>
+          <a:fillRef idx="1">
+            <a:schemeClr val="accent1"/>
+          </a:fillRef>
+          <a:effectRef idx="0">
+            <a:schemeClr val="accent1"/>
+          </a:effectRef>
+          <a:fontRef idx="minor">
+            <a:schemeClr val="lt1"/>
+          </a:fontRef>
+        </p:style>
+        <p:txBody>
+          <a:bodyPr rtlCol="0" anchor="ctr"/>
+          <a:lstStyle/>
+          <a:p>
+            <a:pPr algn="ctr"/>
+            <a:endParaRPr lang="en-US"/>
+          </a:p>
+        </p:txBody>
+      </p:sp>
+      <p:sp>
+        <p:nvSpPr>
+          <p:cNvPr id="127" name="Diamond 126"/>
+          <p:cNvSpPr/>
+          <p:nvPr/>
+        </p:nvSpPr>
+        <p:spPr>
+          <a:xfrm>
+            <a:off x="4082600" y="2587849"/>
+            <a:ext cx="237744" cy="219456"/>
+          </a:xfrm>
+          <a:prstGeom prst="diamond">
+            <a:avLst/>
+          </a:prstGeom>
+          <a:solidFill>
+            <a:srgbClr val="F5A3E5"/>
+          </a:solidFill>
+          <a:ln w="38100">
+            <a:solidFill>
+              <a:srgbClr val="F5A3E5"/>
+            </a:solidFill>
+          </a:ln>
+        </p:spPr>
+        <p:style>
+          <a:lnRef idx="2">
+            <a:schemeClr val="accent1">
+              <a:shade val="50000"/>
+            </a:schemeClr>
+          </a:lnRef>
+          <a:fillRef idx="1">
+            <a:schemeClr val="accent1"/>
+          </a:fillRef>
+          <a:effectRef idx="0">
+            <a:schemeClr val="accent1"/>
+          </a:effectRef>
+          <a:fontRef idx="minor">
+            <a:schemeClr val="lt1"/>
+          </a:fontRef>
+        </p:style>
+        <p:txBody>
+          <a:bodyPr rtlCol="0" anchor="ctr"/>
+          <a:lstStyle/>
+          <a:p>
+            <a:pPr algn="ctr"/>
+            <a:endParaRPr lang="en-US"/>
+          </a:p>
+        </p:txBody>
+      </p:sp>
+      <p:sp>
+        <p:nvSpPr>
+          <p:cNvPr id="128" name="Rectangle 127"/>
+          <p:cNvSpPr/>
+          <p:nvPr/>
+        </p:nvSpPr>
+        <p:spPr>
+          <a:xfrm>
+            <a:off x="4326815" y="3540372"/>
+            <a:ext cx="164592" cy="153690"/>
+          </a:xfrm>
+          <a:prstGeom prst="rect">
+            <a:avLst/>
+          </a:prstGeom>
+          <a:noFill/>
+          <a:ln w="38100">
+            <a:solidFill>
+              <a:schemeClr val="accent1">
+                <a:lumMod val="75000"/>
+              </a:schemeClr>
+            </a:solidFill>
+          </a:ln>
+        </p:spPr>
+        <p:style>
+          <a:lnRef idx="2">
+            <a:schemeClr val="accent1">
+              <a:shade val="50000"/>
+            </a:schemeClr>
+          </a:lnRef>
+          <a:fillRef idx="1">
+            <a:schemeClr val="accent1"/>
+          </a:fillRef>
+          <a:effectRef idx="0">
+            <a:schemeClr val="accent1"/>
+          </a:effectRef>
+          <a:fontRef idx="minor">
+            <a:schemeClr val="lt1"/>
+          </a:fontRef>
+        </p:style>
+        <p:txBody>
+          <a:bodyPr rtlCol="0" anchor="ctr"/>
+          <a:lstStyle/>
+          <a:p>
+            <a:pPr algn="ctr"/>
+            <a:endParaRPr lang="en-US"/>
+          </a:p>
+        </p:txBody>
+      </p:sp>
+      <p:sp>
+        <p:nvSpPr>
+          <p:cNvPr id="129" name="Rectangle 128"/>
+          <p:cNvSpPr/>
+          <p:nvPr/>
+        </p:nvSpPr>
+        <p:spPr>
+          <a:xfrm>
+            <a:off x="4910701" y="2857623"/>
+            <a:ext cx="164592" cy="153690"/>
+          </a:xfrm>
+          <a:prstGeom prst="rect">
+            <a:avLst/>
+          </a:prstGeom>
+          <a:noFill/>
+          <a:ln w="38100">
+            <a:solidFill>
+              <a:schemeClr val="accent1">
+                <a:lumMod val="75000"/>
+              </a:schemeClr>
+            </a:solidFill>
+          </a:ln>
+        </p:spPr>
+        <p:style>
+          <a:lnRef idx="2">
+            <a:schemeClr val="accent1">
+              <a:shade val="50000"/>
+            </a:schemeClr>
+          </a:lnRef>
+          <a:fillRef idx="1">
+            <a:schemeClr val="accent1"/>
+          </a:fillRef>
+          <a:effectRef idx="0">
+            <a:schemeClr val="accent1"/>
+          </a:effectRef>
+          <a:fontRef idx="minor">
+            <a:schemeClr val="lt1"/>
+          </a:fontRef>
+        </p:style>
+        <p:txBody>
+          <a:bodyPr rtlCol="0" anchor="ctr"/>
+          <a:lstStyle/>
+          <a:p>
+            <a:pPr algn="ctr"/>
+            <a:endParaRPr lang="en-US"/>
+          </a:p>
+        </p:txBody>
+      </p:sp>
+      <p:sp>
+        <p:nvSpPr>
+          <p:cNvPr id="130" name="Diamond 129"/>
+          <p:cNvSpPr/>
+          <p:nvPr/>
+        </p:nvSpPr>
+        <p:spPr>
+          <a:xfrm>
+            <a:off x="3540622" y="3077879"/>
+            <a:ext cx="237744" cy="219456"/>
+          </a:xfrm>
+          <a:prstGeom prst="diamond">
+            <a:avLst/>
+          </a:prstGeom>
+          <a:solidFill>
+            <a:srgbClr val="00B0F0"/>
+          </a:solidFill>
+          <a:ln w="38100">
+            <a:solidFill>
+              <a:srgbClr val="00B0F0"/>
+            </a:solidFill>
+          </a:ln>
+        </p:spPr>
+        <p:style>
+          <a:lnRef idx="2">
+            <a:schemeClr val="accent1">
+              <a:shade val="50000"/>
+            </a:schemeClr>
+          </a:lnRef>
+          <a:fillRef idx="1">
+            <a:schemeClr val="accent1"/>
+          </a:fillRef>
+          <a:effectRef idx="0">
+            <a:schemeClr val="accent1"/>
+          </a:effectRef>
+          <a:fontRef idx="minor">
+            <a:schemeClr val="lt1"/>
+          </a:fontRef>
+        </p:style>
+        <p:txBody>
+          <a:bodyPr rtlCol="0" anchor="ctr"/>
+          <a:lstStyle/>
+          <a:p>
+            <a:pPr algn="ctr"/>
+            <a:endParaRPr lang="en-US"/>
+          </a:p>
+        </p:txBody>
+      </p:sp>
+      <p:sp>
+        <p:nvSpPr>
+          <p:cNvPr id="131" name="TextBox 130"/>
+          <p:cNvSpPr txBox="1"/>
+          <p:nvPr/>
+        </p:nvSpPr>
+        <p:spPr>
+          <a:xfrm rot="20741648">
+            <a:off x="632017" y="2671142"/>
+            <a:ext cx="1101852" cy="246221"/>
+          </a:xfrm>
+          <a:prstGeom prst="rect">
+            <a:avLst/>
+          </a:prstGeom>
+          <a:noFill/>
+        </p:spPr>
+        <p:txBody>
+          <a:bodyPr wrap="square" rtlCol="0">
+            <a:spAutoFit/>
+          </a:bodyPr>
+          <a:lstStyle/>
+          <a:p>
+            <a:r>
+              <a:rPr lang="en-US" sz="1000" dirty="0" smtClean="0"/>
+              <a:t>All species</a:t>
+            </a:r>
+            <a:endParaRPr lang="en-US" sz="1000" dirty="0"/>
+          </a:p>
+        </p:txBody>
+      </p:sp>
+      <p:sp>
+        <p:nvSpPr>
+          <p:cNvPr id="132" name="TextBox 131"/>
+          <p:cNvSpPr txBox="1"/>
+          <p:nvPr/>
+        </p:nvSpPr>
+        <p:spPr>
+          <a:xfrm rot="19292141">
+            <a:off x="544268" y="3232228"/>
+            <a:ext cx="1282191" cy="246221"/>
+          </a:xfrm>
+          <a:prstGeom prst="rect">
+            <a:avLst/>
+          </a:prstGeom>
+          <a:noFill/>
+        </p:spPr>
+        <p:txBody>
+          <a:bodyPr wrap="square" rtlCol="0">
+            <a:spAutoFit/>
+          </a:bodyPr>
+          <a:lstStyle/>
+          <a:p>
+            <a:r>
+              <a:rPr lang="en-US" sz="1000" dirty="0" smtClean="0"/>
+              <a:t>Excluding transients</a:t>
+            </a:r>
+            <a:endParaRPr lang="en-US" sz="1000" dirty="0"/>
+          </a:p>
+        </p:txBody>
+      </p:sp>
       <p:pic>
         <p:nvPicPr>
-          <p:cNvPr id="16" name="Picture 15"/>
+          <p:cNvPr id="133" name="Picture 132"/>
+          <p:cNvPicPr>
+            <a:picLocks noChangeAspect="1"/>
+          </p:cNvPicPr>
+          <p:nvPr/>
+        </p:nvPicPr>
+        <p:blipFill rotWithShape="1">
+          <a:blip r:embed="rId2"/>
+          <a:srcRect t="13288" b="5627"/>
+          <a:stretch/>
+        </p:blipFill>
+        <p:spPr>
+          <a:xfrm>
+            <a:off x="225537" y="163710"/>
+            <a:ext cx="2485443" cy="2047887"/>
+          </a:xfrm>
+          <a:prstGeom prst="rect">
+            <a:avLst/>
+          </a:prstGeom>
+        </p:spPr>
+      </p:pic>
+      <p:sp>
+        <p:nvSpPr>
+          <p:cNvPr id="134" name="TextBox 133"/>
+          <p:cNvSpPr txBox="1"/>
+          <p:nvPr/>
+        </p:nvSpPr>
+        <p:spPr>
+          <a:xfrm>
+            <a:off x="6022118" y="4544919"/>
+            <a:ext cx="2257335" cy="400110"/>
+          </a:xfrm>
+          <a:prstGeom prst="rect">
+            <a:avLst/>
+          </a:prstGeom>
+          <a:noFill/>
+        </p:spPr>
+        <p:txBody>
+          <a:bodyPr wrap="square" rtlCol="0">
+            <a:spAutoFit/>
+          </a:bodyPr>
+          <a:lstStyle/>
+          <a:p>
+            <a:r>
+              <a:rPr lang="en-US" sz="1000" dirty="0" smtClean="0"/>
+              <a:t>Open square = core,</a:t>
+            </a:r>
+          </a:p>
+          <a:p>
+            <a:r>
+              <a:rPr lang="en-US" sz="1000" dirty="0" smtClean="0"/>
+              <a:t>filled diamond/circle = transients</a:t>
+            </a:r>
+            <a:endParaRPr lang="en-US" sz="1000" dirty="0" smtClean="0"/>
+          </a:p>
+        </p:txBody>
+      </p:sp>
+      <p:pic>
+        <p:nvPicPr>
+          <p:cNvPr id="136" name="Picture 135"/>
           <p:cNvPicPr>
             <a:picLocks noChangeAspect="1"/>
           </p:cNvPicPr>
           <p:nvPr/>
         </p:nvPicPr>
         <p:blipFill>
-          <a:blip r:embed="rId2"/>
+          <a:blip r:embed="rId3"/>
           <a:stretch>
             <a:fillRect/>
           </a:stretch>
         </p:blipFill>
         <p:spPr>
           <a:xfrm>
-            <a:off x="3803991" y="125730"/>
-            <a:ext cx="3317355" cy="2087399"/>
+            <a:off x="3415913" y="319596"/>
+            <a:ext cx="2554822" cy="1909690"/>
           </a:xfrm>
           <a:prstGeom prst="rect">
             <a:avLst/>

</xml_diff>

<commit_message>
redid figure one in all fi legends ppt
</commit_message>
<xml_diff>
--- a/output/plots/all_figs_with_legends.pptx
+++ b/output/plots/all_figs_with_legends.pptx
@@ -203,7 +203,7 @@
           <a:p>
             <a:fld id="{7FA21820-D199-4D82-91AF-C50B1D3B111A}" type="datetimeFigureOut">
               <a:rPr lang="en-US" smtClean="0"/>
-              <a:t>5/4/2017</a:t>
+              <a:t>5/8/2017</a:t>
             </a:fld>
             <a:endParaRPr lang="en-US"/>
           </a:p>
@@ -1036,7 +1036,7 @@
           <a:p>
             <a:fld id="{916B8C92-D5E3-4480-8685-D57BEE386DE2}" type="datetimeFigureOut">
               <a:rPr lang="en-US" smtClean="0"/>
-              <a:t>5/4/2017</a:t>
+              <a:t>5/8/2017</a:t>
             </a:fld>
             <a:endParaRPr lang="en-US"/>
           </a:p>
@@ -1206,7 +1206,7 @@
           <a:p>
             <a:fld id="{916B8C92-D5E3-4480-8685-D57BEE386DE2}" type="datetimeFigureOut">
               <a:rPr lang="en-US" smtClean="0"/>
-              <a:t>5/4/2017</a:t>
+              <a:t>5/8/2017</a:t>
             </a:fld>
             <a:endParaRPr lang="en-US"/>
           </a:p>
@@ -1386,7 +1386,7 @@
           <a:p>
             <a:fld id="{916B8C92-D5E3-4480-8685-D57BEE386DE2}" type="datetimeFigureOut">
               <a:rPr lang="en-US" smtClean="0"/>
-              <a:t>5/4/2017</a:t>
+              <a:t>5/8/2017</a:t>
             </a:fld>
             <a:endParaRPr lang="en-US"/>
           </a:p>
@@ -1556,7 +1556,7 @@
           <a:p>
             <a:fld id="{916B8C92-D5E3-4480-8685-D57BEE386DE2}" type="datetimeFigureOut">
               <a:rPr lang="en-US" smtClean="0"/>
-              <a:t>5/4/2017</a:t>
+              <a:t>5/8/2017</a:t>
             </a:fld>
             <a:endParaRPr lang="en-US"/>
           </a:p>
@@ -1802,7 +1802,7 @@
           <a:p>
             <a:fld id="{916B8C92-D5E3-4480-8685-D57BEE386DE2}" type="datetimeFigureOut">
               <a:rPr lang="en-US" smtClean="0"/>
-              <a:t>5/4/2017</a:t>
+              <a:t>5/8/2017</a:t>
             </a:fld>
             <a:endParaRPr lang="en-US"/>
           </a:p>
@@ -2034,7 +2034,7 @@
           <a:p>
             <a:fld id="{916B8C92-D5E3-4480-8685-D57BEE386DE2}" type="datetimeFigureOut">
               <a:rPr lang="en-US" smtClean="0"/>
-              <a:t>5/4/2017</a:t>
+              <a:t>5/8/2017</a:t>
             </a:fld>
             <a:endParaRPr lang="en-US"/>
           </a:p>
@@ -2401,7 +2401,7 @@
           <a:p>
             <a:fld id="{916B8C92-D5E3-4480-8685-D57BEE386DE2}" type="datetimeFigureOut">
               <a:rPr lang="en-US" smtClean="0"/>
-              <a:t>5/4/2017</a:t>
+              <a:t>5/8/2017</a:t>
             </a:fld>
             <a:endParaRPr lang="en-US"/>
           </a:p>
@@ -2519,7 +2519,7 @@
           <a:p>
             <a:fld id="{916B8C92-D5E3-4480-8685-D57BEE386DE2}" type="datetimeFigureOut">
               <a:rPr lang="en-US" smtClean="0"/>
-              <a:t>5/4/2017</a:t>
+              <a:t>5/8/2017</a:t>
             </a:fld>
             <a:endParaRPr lang="en-US"/>
           </a:p>
@@ -2614,7 +2614,7 @@
           <a:p>
             <a:fld id="{916B8C92-D5E3-4480-8685-D57BEE386DE2}" type="datetimeFigureOut">
               <a:rPr lang="en-US" smtClean="0"/>
-              <a:t>5/4/2017</a:t>
+              <a:t>5/8/2017</a:t>
             </a:fld>
             <a:endParaRPr lang="en-US"/>
           </a:p>
@@ -2891,7 +2891,7 @@
           <a:p>
             <a:fld id="{916B8C92-D5E3-4480-8685-D57BEE386DE2}" type="datetimeFigureOut">
               <a:rPr lang="en-US" smtClean="0"/>
-              <a:t>5/4/2017</a:t>
+              <a:t>5/8/2017</a:t>
             </a:fld>
             <a:endParaRPr lang="en-US"/>
           </a:p>
@@ -3144,7 +3144,7 @@
           <a:p>
             <a:fld id="{916B8C92-D5E3-4480-8685-D57BEE386DE2}" type="datetimeFigureOut">
               <a:rPr lang="en-US" smtClean="0"/>
-              <a:t>5/4/2017</a:t>
+              <a:t>5/8/2017</a:t>
             </a:fld>
             <a:endParaRPr lang="en-US"/>
           </a:p>
@@ -3357,7 +3357,7 @@
           <a:p>
             <a:fld id="{916B8C92-D5E3-4480-8685-D57BEE386DE2}" type="datetimeFigureOut">
               <a:rPr lang="en-US" smtClean="0"/>
-              <a:t>5/4/2017</a:t>
+              <a:t>5/8/2017</a:t>
             </a:fld>
             <a:endParaRPr lang="en-US"/>
           </a:p>
@@ -5025,54 +5025,6 @@
       </p:sp>
       <p:sp>
         <p:nvSpPr>
-          <p:cNvPr id="44" name="Rectangle 43"/>
-          <p:cNvSpPr/>
-          <p:nvPr/>
-        </p:nvSpPr>
-        <p:spPr>
-          <a:xfrm>
-            <a:off x="2053285" y="4627772"/>
-            <a:ext cx="164592" cy="153690"/>
-          </a:xfrm>
-          <a:prstGeom prst="rect">
-            <a:avLst/>
-          </a:prstGeom>
-          <a:noFill/>
-          <a:ln w="38100">
-            <a:solidFill>
-              <a:schemeClr val="accent1">
-                <a:lumMod val="75000"/>
-              </a:schemeClr>
-            </a:solidFill>
-          </a:ln>
-        </p:spPr>
-        <p:style>
-          <a:lnRef idx="2">
-            <a:schemeClr val="accent1">
-              <a:shade val="50000"/>
-            </a:schemeClr>
-          </a:lnRef>
-          <a:fillRef idx="1">
-            <a:schemeClr val="accent1"/>
-          </a:fillRef>
-          <a:effectRef idx="0">
-            <a:schemeClr val="accent1"/>
-          </a:effectRef>
-          <a:fontRef idx="minor">
-            <a:schemeClr val="lt1"/>
-          </a:fontRef>
-        </p:style>
-        <p:txBody>
-          <a:bodyPr rtlCol="0" anchor="ctr"/>
-          <a:lstStyle/>
-          <a:p>
-            <a:pPr algn="ctr"/>
-            <a:endParaRPr lang="en-US"/>
-          </a:p>
-        </p:txBody>
-      </p:sp>
-      <p:sp>
-        <p:nvSpPr>
           <p:cNvPr id="46" name="TextBox 45"/>
           <p:cNvSpPr txBox="1"/>
           <p:nvPr/>
@@ -5099,7 +5051,7 @@
             </a:r>
             <a:r>
               <a:rPr lang="en-US" dirty="0" smtClean="0"/>
-              <a:t>7</a:t>
+              <a:t>5</a:t>
             </a:r>
             <a:endParaRPr lang="en-US" dirty="0"/>
           </a:p>
@@ -5133,7 +5085,7 @@
             </a:r>
             <a:r>
               <a:rPr lang="en-US" dirty="0" smtClean="0"/>
-              <a:t>7</a:t>
+              <a:t>5</a:t>
             </a:r>
             <a:endParaRPr lang="en-US" dirty="0"/>
           </a:p>
@@ -5927,21 +5879,13 @@
             </a:r>
             <a:r>
               <a:rPr lang="en-US" sz="1000" dirty="0" smtClean="0"/>
-              <a:t> </a:t>
-            </a:r>
+              <a:t> =3</a:t>
+            </a:r>
+          </a:p>
+          <a:p>
             <a:r>
               <a:rPr lang="en-US" sz="1000" dirty="0" smtClean="0"/>
-              <a:t>=3</a:t>
-            </a:r>
-          </a:p>
-          <a:p>
-            <a:r>
-              <a:rPr lang="en-US" sz="1000" dirty="0" smtClean="0"/>
-              <a:t>Box 4: </a:t>
-            </a:r>
-            <a:r>
-              <a:rPr lang="en-US" sz="1000" dirty="0" smtClean="0"/>
-              <a:t># </a:t>
+              <a:t>Box 4: # </a:t>
             </a:r>
             <a:r>
               <a:rPr lang="en-US" sz="1000" dirty="0" err="1" smtClean="0"/>
@@ -6287,16 +6231,782 @@
       </p:sp>
       <p:sp>
         <p:nvSpPr>
-          <p:cNvPr id="49" name="Rectangle 48"/>
+          <p:cNvPr id="131" name="TextBox 130"/>
+          <p:cNvSpPr txBox="1"/>
+          <p:nvPr/>
+        </p:nvSpPr>
+        <p:spPr>
+          <a:xfrm rot="20741648">
+            <a:off x="632017" y="2671142"/>
+            <a:ext cx="1101852" cy="246221"/>
+          </a:xfrm>
+          <a:prstGeom prst="rect">
+            <a:avLst/>
+          </a:prstGeom>
+          <a:noFill/>
+        </p:spPr>
+        <p:txBody>
+          <a:bodyPr wrap="square" rtlCol="0">
+            <a:spAutoFit/>
+          </a:bodyPr>
+          <a:lstStyle/>
+          <a:p>
+            <a:r>
+              <a:rPr lang="en-US" sz="1000" dirty="0" smtClean="0"/>
+              <a:t>All species</a:t>
+            </a:r>
+            <a:endParaRPr lang="en-US" sz="1000" dirty="0"/>
+          </a:p>
+        </p:txBody>
+      </p:sp>
+      <p:sp>
+        <p:nvSpPr>
+          <p:cNvPr id="132" name="TextBox 131"/>
+          <p:cNvSpPr txBox="1"/>
+          <p:nvPr/>
+        </p:nvSpPr>
+        <p:spPr>
+          <a:xfrm rot="19292141">
+            <a:off x="544268" y="3232228"/>
+            <a:ext cx="1282191" cy="246221"/>
+          </a:xfrm>
+          <a:prstGeom prst="rect">
+            <a:avLst/>
+          </a:prstGeom>
+          <a:noFill/>
+        </p:spPr>
+        <p:txBody>
+          <a:bodyPr wrap="square" rtlCol="0">
+            <a:spAutoFit/>
+          </a:bodyPr>
+          <a:lstStyle/>
+          <a:p>
+            <a:r>
+              <a:rPr lang="en-US" sz="1000" dirty="0" smtClean="0"/>
+              <a:t>Excluding transients</a:t>
+            </a:r>
+            <a:endParaRPr lang="en-US" sz="1000" dirty="0"/>
+          </a:p>
+        </p:txBody>
+      </p:sp>
+      <p:pic>
+        <p:nvPicPr>
+          <p:cNvPr id="133" name="Picture 132"/>
+          <p:cNvPicPr>
+            <a:picLocks noChangeAspect="1"/>
+          </p:cNvPicPr>
+          <p:nvPr/>
+        </p:nvPicPr>
+        <p:blipFill rotWithShape="1">
+          <a:blip r:embed="rId2"/>
+          <a:srcRect t="13288" b="5627"/>
+          <a:stretch/>
+        </p:blipFill>
+        <p:spPr>
+          <a:xfrm>
+            <a:off x="225537" y="163710"/>
+            <a:ext cx="2485443" cy="2047887"/>
+          </a:xfrm>
+          <a:prstGeom prst="rect">
+            <a:avLst/>
+          </a:prstGeom>
+        </p:spPr>
+      </p:pic>
+      <p:sp>
+        <p:nvSpPr>
+          <p:cNvPr id="134" name="TextBox 133"/>
+          <p:cNvSpPr txBox="1"/>
+          <p:nvPr/>
+        </p:nvSpPr>
+        <p:spPr>
+          <a:xfrm>
+            <a:off x="6022118" y="4544919"/>
+            <a:ext cx="2257335" cy="400110"/>
+          </a:xfrm>
+          <a:prstGeom prst="rect">
+            <a:avLst/>
+          </a:prstGeom>
+          <a:noFill/>
+        </p:spPr>
+        <p:txBody>
+          <a:bodyPr wrap="square" rtlCol="0">
+            <a:spAutoFit/>
+          </a:bodyPr>
+          <a:lstStyle/>
+          <a:p>
+            <a:r>
+              <a:rPr lang="en-US" sz="1000" dirty="0" smtClean="0"/>
+              <a:t>Open square = core,</a:t>
+            </a:r>
+          </a:p>
+          <a:p>
+            <a:r>
+              <a:rPr lang="en-US" sz="1000" dirty="0" smtClean="0"/>
+              <a:t>filled diamond/circle = transients</a:t>
+            </a:r>
+          </a:p>
+        </p:txBody>
+      </p:sp>
+      <p:pic>
+        <p:nvPicPr>
+          <p:cNvPr id="3" name="Picture 2"/>
+          <p:cNvPicPr>
+            <a:picLocks noChangeAspect="1"/>
+          </p:cNvPicPr>
+          <p:nvPr/>
+        </p:nvPicPr>
+        <p:blipFill>
+          <a:blip r:embed="rId3"/>
+          <a:stretch>
+            <a:fillRect/>
+          </a:stretch>
+        </p:blipFill>
+        <p:spPr>
+          <a:xfrm>
+            <a:off x="3415913" y="327224"/>
+            <a:ext cx="2553783" cy="1689043"/>
+          </a:xfrm>
+          <a:prstGeom prst="rect">
+            <a:avLst/>
+          </a:prstGeom>
+        </p:spPr>
+      </p:pic>
+      <p:sp>
+        <p:nvSpPr>
+          <p:cNvPr id="73" name="Diamond 72"/>
           <p:cNvSpPr/>
           <p:nvPr/>
         </p:nvSpPr>
         <p:spPr>
           <a:xfrm>
-            <a:off x="2165203" y="6244563"/>
+            <a:off x="1093471" y="5410930"/>
+            <a:ext cx="237744" cy="219456"/>
+          </a:xfrm>
+          <a:prstGeom prst="diamond">
+            <a:avLst/>
+          </a:prstGeom>
+          <a:solidFill>
+            <a:schemeClr val="accent1">
+              <a:lumMod val="75000"/>
+            </a:schemeClr>
+          </a:solidFill>
+          <a:ln w="38100">
+            <a:solidFill>
+              <a:schemeClr val="accent1">
+                <a:lumMod val="75000"/>
+              </a:schemeClr>
+            </a:solidFill>
+          </a:ln>
+        </p:spPr>
+        <p:style>
+          <a:lnRef idx="2">
+            <a:schemeClr val="accent1">
+              <a:shade val="50000"/>
+            </a:schemeClr>
+          </a:lnRef>
+          <a:fillRef idx="1">
+            <a:schemeClr val="accent1"/>
+          </a:fillRef>
+          <a:effectRef idx="0">
+            <a:schemeClr val="accent1"/>
+          </a:effectRef>
+          <a:fontRef idx="minor">
+            <a:schemeClr val="lt1"/>
+          </a:fontRef>
+        </p:style>
+        <p:txBody>
+          <a:bodyPr rtlCol="0" anchor="ctr"/>
+          <a:lstStyle/>
+          <a:p>
+            <a:pPr algn="ctr"/>
+            <a:endParaRPr lang="en-US"/>
+          </a:p>
+        </p:txBody>
+      </p:sp>
+      <p:sp>
+        <p:nvSpPr>
+          <p:cNvPr id="74" name="Rectangle 73"/>
+          <p:cNvSpPr/>
+          <p:nvPr/>
+        </p:nvSpPr>
+        <p:spPr>
+          <a:xfrm>
+            <a:off x="1710862" y="5777729"/>
             <a:ext cx="164592" cy="153690"/>
           </a:xfrm>
           <a:prstGeom prst="rect">
+            <a:avLst/>
+          </a:prstGeom>
+          <a:solidFill>
+            <a:schemeClr val="accent1">
+              <a:lumMod val="75000"/>
+            </a:schemeClr>
+          </a:solidFill>
+          <a:ln w="38100">
+            <a:solidFill>
+              <a:schemeClr val="accent1">
+                <a:lumMod val="75000"/>
+              </a:schemeClr>
+            </a:solidFill>
+          </a:ln>
+        </p:spPr>
+        <p:style>
+          <a:lnRef idx="2">
+            <a:schemeClr val="accent1">
+              <a:shade val="50000"/>
+            </a:schemeClr>
+          </a:lnRef>
+          <a:fillRef idx="1">
+            <a:schemeClr val="accent1"/>
+          </a:fillRef>
+          <a:effectRef idx="0">
+            <a:schemeClr val="accent1"/>
+          </a:effectRef>
+          <a:fontRef idx="minor">
+            <a:schemeClr val="lt1"/>
+          </a:fontRef>
+        </p:style>
+        <p:txBody>
+          <a:bodyPr rtlCol="0" anchor="ctr"/>
+          <a:lstStyle/>
+          <a:p>
+            <a:pPr algn="ctr"/>
+            <a:endParaRPr lang="en-US"/>
+          </a:p>
+        </p:txBody>
+      </p:sp>
+      <p:sp>
+        <p:nvSpPr>
+          <p:cNvPr id="75" name="Oval 74"/>
+          <p:cNvSpPr/>
+          <p:nvPr/>
+        </p:nvSpPr>
+        <p:spPr>
+          <a:xfrm>
+            <a:off x="2004561" y="4686983"/>
+            <a:ext cx="174451" cy="183765"/>
+          </a:xfrm>
+          <a:prstGeom prst="ellipse">
+            <a:avLst/>
+          </a:prstGeom>
+          <a:solidFill>
+            <a:schemeClr val="accent1">
+              <a:lumMod val="75000"/>
+            </a:schemeClr>
+          </a:solidFill>
+          <a:ln w="38100">
+            <a:solidFill>
+              <a:schemeClr val="accent1">
+                <a:lumMod val="75000"/>
+              </a:schemeClr>
+            </a:solidFill>
+          </a:ln>
+        </p:spPr>
+        <p:style>
+          <a:lnRef idx="2">
+            <a:schemeClr val="accent1">
+              <a:shade val="50000"/>
+            </a:schemeClr>
+          </a:lnRef>
+          <a:fillRef idx="1">
+            <a:schemeClr val="accent1"/>
+          </a:fillRef>
+          <a:effectRef idx="0">
+            <a:schemeClr val="accent1"/>
+          </a:effectRef>
+          <a:fontRef idx="minor">
+            <a:schemeClr val="lt1"/>
+          </a:fontRef>
+        </p:style>
+        <p:txBody>
+          <a:bodyPr rtlCol="0" anchor="ctr"/>
+          <a:lstStyle/>
+          <a:p>
+            <a:pPr algn="ctr"/>
+            <a:endParaRPr lang="en-US"/>
+          </a:p>
+        </p:txBody>
+      </p:sp>
+      <p:sp>
+        <p:nvSpPr>
+          <p:cNvPr id="78" name="Isosceles Triangle 77"/>
+          <p:cNvSpPr/>
+          <p:nvPr/>
+        </p:nvSpPr>
+        <p:spPr>
+          <a:xfrm>
+            <a:off x="519916" y="4693472"/>
+            <a:ext cx="180669" cy="170788"/>
+          </a:xfrm>
+          <a:prstGeom prst="triangle">
+            <a:avLst/>
+          </a:prstGeom>
+          <a:solidFill>
+            <a:schemeClr val="accent1">
+              <a:lumMod val="75000"/>
+            </a:schemeClr>
+          </a:solidFill>
+          <a:ln w="38100">
+            <a:solidFill>
+              <a:schemeClr val="accent1">
+                <a:lumMod val="75000"/>
+              </a:schemeClr>
+            </a:solidFill>
+          </a:ln>
+        </p:spPr>
+        <p:style>
+          <a:lnRef idx="2">
+            <a:schemeClr val="accent1">
+              <a:shade val="50000"/>
+            </a:schemeClr>
+          </a:lnRef>
+          <a:fillRef idx="1">
+            <a:schemeClr val="accent1"/>
+          </a:fillRef>
+          <a:effectRef idx="0">
+            <a:schemeClr val="accent1"/>
+          </a:effectRef>
+          <a:fontRef idx="minor">
+            <a:schemeClr val="lt1"/>
+          </a:fontRef>
+        </p:style>
+        <p:txBody>
+          <a:bodyPr rtlCol="0" anchor="ctr"/>
+          <a:lstStyle/>
+          <a:p>
+            <a:pPr algn="ctr"/>
+            <a:endParaRPr lang="en-US"/>
+          </a:p>
+        </p:txBody>
+      </p:sp>
+      <p:sp>
+        <p:nvSpPr>
+          <p:cNvPr id="80" name="5-Point Star 79"/>
+          <p:cNvSpPr/>
+          <p:nvPr/>
+        </p:nvSpPr>
+        <p:spPr>
+          <a:xfrm>
+            <a:off x="528915" y="6245119"/>
+            <a:ext cx="222222" cy="187270"/>
+          </a:xfrm>
+          <a:prstGeom prst="star5">
+            <a:avLst/>
+          </a:prstGeom>
+          <a:solidFill>
+            <a:schemeClr val="accent1">
+              <a:lumMod val="75000"/>
+            </a:schemeClr>
+          </a:solidFill>
+          <a:ln w="28575">
+            <a:solidFill>
+              <a:schemeClr val="accent1">
+                <a:lumMod val="75000"/>
+              </a:schemeClr>
+            </a:solidFill>
+          </a:ln>
+        </p:spPr>
+        <p:style>
+          <a:lnRef idx="2">
+            <a:schemeClr val="accent1">
+              <a:shade val="50000"/>
+            </a:schemeClr>
+          </a:lnRef>
+          <a:fillRef idx="1">
+            <a:schemeClr val="accent1"/>
+          </a:fillRef>
+          <a:effectRef idx="0">
+            <a:schemeClr val="accent1"/>
+          </a:effectRef>
+          <a:fontRef idx="minor">
+            <a:schemeClr val="lt1"/>
+          </a:fontRef>
+        </p:style>
+        <p:txBody>
+          <a:bodyPr rtlCol="0" anchor="ctr"/>
+          <a:lstStyle/>
+          <a:p>
+            <a:pPr algn="ctr"/>
+            <a:endParaRPr lang="en-US"/>
+          </a:p>
+        </p:txBody>
+      </p:sp>
+      <p:sp>
+        <p:nvSpPr>
+          <p:cNvPr id="82" name="Regular Pentagon 81"/>
+          <p:cNvSpPr/>
+          <p:nvPr/>
+        </p:nvSpPr>
+        <p:spPr>
+          <a:xfrm>
+            <a:off x="1996963" y="6114671"/>
+            <a:ext cx="227701" cy="214650"/>
+          </a:xfrm>
+          <a:prstGeom prst="pentagon">
+            <a:avLst/>
+          </a:prstGeom>
+          <a:solidFill>
+            <a:schemeClr val="accent1">
+              <a:lumMod val="75000"/>
+            </a:schemeClr>
+          </a:solidFill>
+          <a:ln w="38100">
+            <a:solidFill>
+              <a:schemeClr val="accent1">
+                <a:lumMod val="75000"/>
+              </a:schemeClr>
+            </a:solidFill>
+          </a:ln>
+        </p:spPr>
+        <p:style>
+          <a:lnRef idx="2">
+            <a:schemeClr val="accent1">
+              <a:shade val="50000"/>
+            </a:schemeClr>
+          </a:lnRef>
+          <a:fillRef idx="1">
+            <a:schemeClr val="accent1"/>
+          </a:fillRef>
+          <a:effectRef idx="0">
+            <a:schemeClr val="accent1"/>
+          </a:effectRef>
+          <a:fontRef idx="minor">
+            <a:schemeClr val="lt1"/>
+          </a:fontRef>
+        </p:style>
+        <p:txBody>
+          <a:bodyPr rtlCol="0" anchor="ctr"/>
+          <a:lstStyle/>
+          <a:p>
+            <a:pPr algn="ctr"/>
+            <a:endParaRPr lang="en-US"/>
+          </a:p>
+        </p:txBody>
+      </p:sp>
+      <p:sp>
+        <p:nvSpPr>
+          <p:cNvPr id="86" name="Diamond 85"/>
+          <p:cNvSpPr/>
+          <p:nvPr/>
+        </p:nvSpPr>
+        <p:spPr>
+          <a:xfrm>
+            <a:off x="4335319" y="5382841"/>
+            <a:ext cx="237744" cy="219456"/>
+          </a:xfrm>
+          <a:prstGeom prst="diamond">
+            <a:avLst/>
+          </a:prstGeom>
+          <a:solidFill>
+            <a:schemeClr val="accent1">
+              <a:lumMod val="75000"/>
+            </a:schemeClr>
+          </a:solidFill>
+          <a:ln w="38100">
+            <a:solidFill>
+              <a:schemeClr val="accent1">
+                <a:lumMod val="75000"/>
+              </a:schemeClr>
+            </a:solidFill>
+          </a:ln>
+        </p:spPr>
+        <p:style>
+          <a:lnRef idx="2">
+            <a:schemeClr val="accent1">
+              <a:shade val="50000"/>
+            </a:schemeClr>
+          </a:lnRef>
+          <a:fillRef idx="1">
+            <a:schemeClr val="accent1"/>
+          </a:fillRef>
+          <a:effectRef idx="0">
+            <a:schemeClr val="accent1"/>
+          </a:effectRef>
+          <a:fontRef idx="minor">
+            <a:schemeClr val="lt1"/>
+          </a:fontRef>
+        </p:style>
+        <p:txBody>
+          <a:bodyPr rtlCol="0" anchor="ctr"/>
+          <a:lstStyle/>
+          <a:p>
+            <a:pPr algn="ctr"/>
+            <a:endParaRPr lang="en-US"/>
+          </a:p>
+        </p:txBody>
+      </p:sp>
+      <p:sp>
+        <p:nvSpPr>
+          <p:cNvPr id="87" name="Rectangle 86"/>
+          <p:cNvSpPr/>
+          <p:nvPr/>
+        </p:nvSpPr>
+        <p:spPr>
+          <a:xfrm>
+            <a:off x="4968121" y="5777729"/>
+            <a:ext cx="164592" cy="153690"/>
+          </a:xfrm>
+          <a:prstGeom prst="rect">
+            <a:avLst/>
+          </a:prstGeom>
+          <a:solidFill>
+            <a:schemeClr val="accent1">
+              <a:lumMod val="75000"/>
+            </a:schemeClr>
+          </a:solidFill>
+          <a:ln w="38100">
+            <a:solidFill>
+              <a:schemeClr val="accent1">
+                <a:lumMod val="75000"/>
+              </a:schemeClr>
+            </a:solidFill>
+          </a:ln>
+        </p:spPr>
+        <p:style>
+          <a:lnRef idx="2">
+            <a:schemeClr val="accent1">
+              <a:shade val="50000"/>
+            </a:schemeClr>
+          </a:lnRef>
+          <a:fillRef idx="1">
+            <a:schemeClr val="accent1"/>
+          </a:fillRef>
+          <a:effectRef idx="0">
+            <a:schemeClr val="accent1"/>
+          </a:effectRef>
+          <a:fontRef idx="minor">
+            <a:schemeClr val="lt1"/>
+          </a:fontRef>
+        </p:style>
+        <p:txBody>
+          <a:bodyPr rtlCol="0" anchor="ctr"/>
+          <a:lstStyle/>
+          <a:p>
+            <a:pPr algn="ctr"/>
+            <a:endParaRPr lang="en-US"/>
+          </a:p>
+        </p:txBody>
+      </p:sp>
+      <p:sp>
+        <p:nvSpPr>
+          <p:cNvPr id="88" name="Oval 87"/>
+          <p:cNvSpPr/>
+          <p:nvPr/>
+        </p:nvSpPr>
+        <p:spPr>
+          <a:xfrm>
+            <a:off x="5266491" y="4685590"/>
+            <a:ext cx="174451" cy="183765"/>
+          </a:xfrm>
+          <a:prstGeom prst="ellipse">
+            <a:avLst/>
+          </a:prstGeom>
+          <a:solidFill>
+            <a:schemeClr val="accent1">
+              <a:lumMod val="75000"/>
+            </a:schemeClr>
+          </a:solidFill>
+          <a:ln w="38100">
+            <a:solidFill>
+              <a:schemeClr val="accent1">
+                <a:lumMod val="75000"/>
+              </a:schemeClr>
+            </a:solidFill>
+          </a:ln>
+        </p:spPr>
+        <p:style>
+          <a:lnRef idx="2">
+            <a:schemeClr val="accent1">
+              <a:shade val="50000"/>
+            </a:schemeClr>
+          </a:lnRef>
+          <a:fillRef idx="1">
+            <a:schemeClr val="accent1"/>
+          </a:fillRef>
+          <a:effectRef idx="0">
+            <a:schemeClr val="accent1"/>
+          </a:effectRef>
+          <a:fontRef idx="minor">
+            <a:schemeClr val="lt1"/>
+          </a:fontRef>
+        </p:style>
+        <p:txBody>
+          <a:bodyPr rtlCol="0" anchor="ctr"/>
+          <a:lstStyle/>
+          <a:p>
+            <a:pPr algn="ctr"/>
+            <a:endParaRPr lang="en-US"/>
+          </a:p>
+        </p:txBody>
+      </p:sp>
+      <p:sp>
+        <p:nvSpPr>
+          <p:cNvPr id="89" name="Isosceles Triangle 88"/>
+          <p:cNvSpPr/>
+          <p:nvPr/>
+        </p:nvSpPr>
+        <p:spPr>
+          <a:xfrm>
+            <a:off x="3761764" y="4665383"/>
+            <a:ext cx="180669" cy="170788"/>
+          </a:xfrm>
+          <a:prstGeom prst="triangle">
+            <a:avLst/>
+          </a:prstGeom>
+          <a:solidFill>
+            <a:schemeClr val="accent1">
+              <a:lumMod val="75000"/>
+            </a:schemeClr>
+          </a:solidFill>
+          <a:ln w="38100">
+            <a:solidFill>
+              <a:schemeClr val="accent1">
+                <a:lumMod val="75000"/>
+              </a:schemeClr>
+            </a:solidFill>
+          </a:ln>
+        </p:spPr>
+        <p:style>
+          <a:lnRef idx="2">
+            <a:schemeClr val="accent1">
+              <a:shade val="50000"/>
+            </a:schemeClr>
+          </a:lnRef>
+          <a:fillRef idx="1">
+            <a:schemeClr val="accent1"/>
+          </a:fillRef>
+          <a:effectRef idx="0">
+            <a:schemeClr val="accent1"/>
+          </a:effectRef>
+          <a:fontRef idx="minor">
+            <a:schemeClr val="lt1"/>
+          </a:fontRef>
+        </p:style>
+        <p:txBody>
+          <a:bodyPr rtlCol="0" anchor="ctr"/>
+          <a:lstStyle/>
+          <a:p>
+            <a:pPr algn="ctr"/>
+            <a:endParaRPr lang="en-US"/>
+          </a:p>
+        </p:txBody>
+      </p:sp>
+      <p:sp>
+        <p:nvSpPr>
+          <p:cNvPr id="90" name="5-Point Star 89"/>
+          <p:cNvSpPr/>
+          <p:nvPr/>
+        </p:nvSpPr>
+        <p:spPr>
+          <a:xfrm>
+            <a:off x="3770763" y="6217030"/>
+            <a:ext cx="222222" cy="187270"/>
+          </a:xfrm>
+          <a:prstGeom prst="star5">
+            <a:avLst/>
+          </a:prstGeom>
+          <a:solidFill>
+            <a:schemeClr val="accent1">
+              <a:lumMod val="75000"/>
+            </a:schemeClr>
+          </a:solidFill>
+          <a:ln w="28575">
+            <a:solidFill>
+              <a:schemeClr val="accent1">
+                <a:lumMod val="75000"/>
+              </a:schemeClr>
+            </a:solidFill>
+          </a:ln>
+        </p:spPr>
+        <p:style>
+          <a:lnRef idx="2">
+            <a:schemeClr val="accent1">
+              <a:shade val="50000"/>
+            </a:schemeClr>
+          </a:lnRef>
+          <a:fillRef idx="1">
+            <a:schemeClr val="accent1"/>
+          </a:fillRef>
+          <a:effectRef idx="0">
+            <a:schemeClr val="accent1"/>
+          </a:effectRef>
+          <a:fontRef idx="minor">
+            <a:schemeClr val="lt1"/>
+          </a:fontRef>
+        </p:style>
+        <p:txBody>
+          <a:bodyPr rtlCol="0" anchor="ctr"/>
+          <a:lstStyle/>
+          <a:p>
+            <a:pPr algn="ctr"/>
+            <a:endParaRPr lang="en-US"/>
+          </a:p>
+        </p:txBody>
+      </p:sp>
+      <p:sp>
+        <p:nvSpPr>
+          <p:cNvPr id="91" name="Regular Pentagon 90"/>
+          <p:cNvSpPr/>
+          <p:nvPr/>
+        </p:nvSpPr>
+        <p:spPr>
+          <a:xfrm>
+            <a:off x="5238811" y="6086582"/>
+            <a:ext cx="227701" cy="214650"/>
+          </a:xfrm>
+          <a:prstGeom prst="pentagon">
+            <a:avLst/>
+          </a:prstGeom>
+          <a:solidFill>
+            <a:schemeClr val="accent1">
+              <a:lumMod val="75000"/>
+            </a:schemeClr>
+          </a:solidFill>
+          <a:ln w="38100">
+            <a:solidFill>
+              <a:schemeClr val="accent1">
+                <a:lumMod val="75000"/>
+              </a:schemeClr>
+            </a:solidFill>
+          </a:ln>
+        </p:spPr>
+        <p:style>
+          <a:lnRef idx="2">
+            <a:schemeClr val="accent1">
+              <a:shade val="50000"/>
+            </a:schemeClr>
+          </a:lnRef>
+          <a:fillRef idx="1">
+            <a:schemeClr val="accent1"/>
+          </a:fillRef>
+          <a:effectRef idx="0">
+            <a:schemeClr val="accent1"/>
+          </a:effectRef>
+          <a:fontRef idx="minor">
+            <a:schemeClr val="lt1"/>
+          </a:fontRef>
+        </p:style>
+        <p:txBody>
+          <a:bodyPr rtlCol="0" anchor="ctr"/>
+          <a:lstStyle/>
+          <a:p>
+            <a:pPr algn="ctr"/>
+            <a:endParaRPr lang="en-US"/>
+          </a:p>
+        </p:txBody>
+      </p:sp>
+      <p:sp>
+        <p:nvSpPr>
+          <p:cNvPr id="16" name="Cross 15"/>
+          <p:cNvSpPr/>
+          <p:nvPr/>
+        </p:nvSpPr>
+        <p:spPr>
+          <a:xfrm>
+            <a:off x="2072504" y="5223845"/>
+            <a:ext cx="254081" cy="212255"/>
+          </a:xfrm>
+          <a:prstGeom prst="plus">
             <a:avLst/>
           </a:prstGeom>
           <a:noFill/>
@@ -6335,16 +7045,16 @@
       </p:sp>
       <p:sp>
         <p:nvSpPr>
-          <p:cNvPr id="63" name="Rectangle 62"/>
+          <p:cNvPr id="17" name="Right Triangle 16"/>
           <p:cNvSpPr/>
           <p:nvPr/>
         </p:nvSpPr>
         <p:spPr>
           <a:xfrm>
-            <a:off x="754539" y="6277319"/>
-            <a:ext cx="164592" cy="153690"/>
+            <a:off x="657232" y="5777729"/>
+            <a:ext cx="212183" cy="184569"/>
           </a:xfrm>
-          <a:prstGeom prst="rect">
+          <a:prstGeom prst="rtTriangle">
             <a:avLst/>
           </a:prstGeom>
           <a:noFill/>
@@ -6383,64 +7093,16 @@
       </p:sp>
       <p:sp>
         <p:nvSpPr>
-          <p:cNvPr id="64" name="Diamond 63"/>
+          <p:cNvPr id="18" name="Parallelogram 17"/>
           <p:cNvSpPr/>
           <p:nvPr/>
         </p:nvSpPr>
         <p:spPr>
           <a:xfrm>
-            <a:off x="2224924" y="5534290"/>
-            <a:ext cx="237744" cy="219456"/>
+            <a:off x="1020475" y="4817703"/>
+            <a:ext cx="281363" cy="160133"/>
           </a:xfrm>
-          <a:prstGeom prst="diamond">
-            <a:avLst/>
-          </a:prstGeom>
-          <a:solidFill>
-            <a:srgbClr val="FF0000"/>
-          </a:solidFill>
-          <a:ln w="38100">
-            <a:solidFill>
-              <a:srgbClr val="FF0000"/>
-            </a:solidFill>
-          </a:ln>
-        </p:spPr>
-        <p:style>
-          <a:lnRef idx="2">
-            <a:schemeClr val="accent1">
-              <a:shade val="50000"/>
-            </a:schemeClr>
-          </a:lnRef>
-          <a:fillRef idx="1">
-            <a:schemeClr val="accent1"/>
-          </a:fillRef>
-          <a:effectRef idx="0">
-            <a:schemeClr val="accent1"/>
-          </a:effectRef>
-          <a:fontRef idx="minor">
-            <a:schemeClr val="lt1"/>
-          </a:fontRef>
-        </p:style>
-        <p:txBody>
-          <a:bodyPr rtlCol="0" anchor="ctr"/>
-          <a:lstStyle/>
-          <a:p>
-            <a:pPr algn="ctr"/>
-            <a:endParaRPr lang="en-US"/>
-          </a:p>
-        </p:txBody>
-      </p:sp>
-      <p:sp>
-        <p:nvSpPr>
-          <p:cNvPr id="65" name="Rectangle 64"/>
-          <p:cNvSpPr/>
-          <p:nvPr/>
-        </p:nvSpPr>
-        <p:spPr>
-          <a:xfrm>
-            <a:off x="1710862" y="5983036"/>
-            <a:ext cx="164592" cy="153690"/>
-          </a:xfrm>
-          <a:prstGeom prst="rect">
+          <a:prstGeom prst="parallelogram">
             <a:avLst/>
           </a:prstGeom>
           <a:noFill/>
@@ -6479,212 +7141,16 @@
       </p:sp>
       <p:sp>
         <p:nvSpPr>
-          <p:cNvPr id="66" name="Diamond 65"/>
+          <p:cNvPr id="19" name="Hexagon 18"/>
           <p:cNvSpPr/>
           <p:nvPr/>
         </p:nvSpPr>
         <p:spPr>
           <a:xfrm>
-            <a:off x="1110996" y="6054004"/>
-            <a:ext cx="237744" cy="219456"/>
+            <a:off x="4531033" y="4721915"/>
+            <a:ext cx="237744" cy="216145"/>
           </a:xfrm>
-          <a:prstGeom prst="diamond">
-            <a:avLst/>
-          </a:prstGeom>
-          <a:solidFill>
-            <a:srgbClr val="FFC000"/>
-          </a:solidFill>
-          <a:ln w="38100">
-            <a:solidFill>
-              <a:srgbClr val="FFC000"/>
-            </a:solidFill>
-          </a:ln>
-        </p:spPr>
-        <p:style>
-          <a:lnRef idx="2">
-            <a:schemeClr val="accent1">
-              <a:shade val="50000"/>
-            </a:schemeClr>
-          </a:lnRef>
-          <a:fillRef idx="1">
-            <a:schemeClr val="accent1"/>
-          </a:fillRef>
-          <a:effectRef idx="0">
-            <a:schemeClr val="accent1"/>
-          </a:effectRef>
-          <a:fontRef idx="minor">
-            <a:schemeClr val="lt1"/>
-          </a:fontRef>
-        </p:style>
-        <p:txBody>
-          <a:bodyPr rtlCol="0" anchor="ctr"/>
-          <a:lstStyle/>
-          <a:p>
-            <a:pPr algn="ctr"/>
-            <a:endParaRPr lang="en-US"/>
-          </a:p>
-        </p:txBody>
-      </p:sp>
-      <p:sp>
-        <p:nvSpPr>
-          <p:cNvPr id="68" name="Diamond 67"/>
-          <p:cNvSpPr/>
-          <p:nvPr/>
-        </p:nvSpPr>
-        <p:spPr>
-          <a:xfrm>
-            <a:off x="439416" y="5931233"/>
-            <a:ext cx="237744" cy="219456"/>
-          </a:xfrm>
-          <a:prstGeom prst="diamond">
-            <a:avLst/>
-          </a:prstGeom>
-          <a:solidFill>
-            <a:srgbClr val="92D050"/>
-          </a:solidFill>
-          <a:ln w="38100">
-            <a:solidFill>
-              <a:srgbClr val="92D050"/>
-            </a:solidFill>
-          </a:ln>
-        </p:spPr>
-        <p:style>
-          <a:lnRef idx="2">
-            <a:schemeClr val="accent1">
-              <a:shade val="50000"/>
-            </a:schemeClr>
-          </a:lnRef>
-          <a:fillRef idx="1">
-            <a:schemeClr val="accent1"/>
-          </a:fillRef>
-          <a:effectRef idx="0">
-            <a:schemeClr val="accent1"/>
-          </a:effectRef>
-          <a:fontRef idx="minor">
-            <a:schemeClr val="lt1"/>
-          </a:fontRef>
-        </p:style>
-        <p:txBody>
-          <a:bodyPr rtlCol="0" anchor="ctr"/>
-          <a:lstStyle/>
-          <a:p>
-            <a:pPr algn="ctr"/>
-            <a:endParaRPr lang="en-US"/>
-          </a:p>
-        </p:txBody>
-      </p:sp>
-      <p:sp>
-        <p:nvSpPr>
-          <p:cNvPr id="76" name="Diamond 75"/>
-          <p:cNvSpPr/>
-          <p:nvPr/>
-        </p:nvSpPr>
-        <p:spPr>
-          <a:xfrm>
-            <a:off x="1230515" y="5111659"/>
-            <a:ext cx="237744" cy="219456"/>
-          </a:xfrm>
-          <a:prstGeom prst="diamond">
-            <a:avLst/>
-          </a:prstGeom>
-          <a:solidFill>
-            <a:schemeClr val="accent6">
-              <a:lumMod val="75000"/>
-            </a:schemeClr>
-          </a:solidFill>
-          <a:ln w="38100">
-            <a:solidFill>
-              <a:schemeClr val="accent6">
-                <a:lumMod val="75000"/>
-              </a:schemeClr>
-            </a:solidFill>
-          </a:ln>
-        </p:spPr>
-        <p:style>
-          <a:lnRef idx="2">
-            <a:schemeClr val="accent1">
-              <a:shade val="50000"/>
-            </a:schemeClr>
-          </a:lnRef>
-          <a:fillRef idx="1">
-            <a:schemeClr val="accent1"/>
-          </a:fillRef>
-          <a:effectRef idx="0">
-            <a:schemeClr val="accent1"/>
-          </a:effectRef>
-          <a:fontRef idx="minor">
-            <a:schemeClr val="lt1"/>
-          </a:fontRef>
-        </p:style>
-        <p:txBody>
-          <a:bodyPr rtlCol="0" anchor="ctr"/>
-          <a:lstStyle/>
-          <a:p>
-            <a:pPr algn="ctr"/>
-            <a:endParaRPr lang="en-US"/>
-          </a:p>
-        </p:txBody>
-      </p:sp>
-      <p:sp>
-        <p:nvSpPr>
-          <p:cNvPr id="77" name="Diamond 76"/>
-          <p:cNvSpPr/>
-          <p:nvPr/>
-        </p:nvSpPr>
-        <p:spPr>
-          <a:xfrm>
-            <a:off x="919105" y="4662173"/>
-            <a:ext cx="237744" cy="219456"/>
-          </a:xfrm>
-          <a:prstGeom prst="diamond">
-            <a:avLst/>
-          </a:prstGeom>
-          <a:solidFill>
-            <a:srgbClr val="F5A3E5"/>
-          </a:solidFill>
-          <a:ln w="38100">
-            <a:solidFill>
-              <a:srgbClr val="F5A3E5"/>
-            </a:solidFill>
-          </a:ln>
-        </p:spPr>
-        <p:style>
-          <a:lnRef idx="2">
-            <a:schemeClr val="accent1">
-              <a:shade val="50000"/>
-            </a:schemeClr>
-          </a:lnRef>
-          <a:fillRef idx="1">
-            <a:schemeClr val="accent1"/>
-          </a:fillRef>
-          <a:effectRef idx="0">
-            <a:schemeClr val="accent1"/>
-          </a:effectRef>
-          <a:fontRef idx="minor">
-            <a:schemeClr val="lt1"/>
-          </a:fontRef>
-        </p:style>
-        <p:txBody>
-          <a:bodyPr rtlCol="0" anchor="ctr"/>
-          <a:lstStyle/>
-          <a:p>
-            <a:pPr algn="ctr"/>
-            <a:endParaRPr lang="en-US"/>
-          </a:p>
-        </p:txBody>
-      </p:sp>
-      <p:sp>
-        <p:nvSpPr>
-          <p:cNvPr id="95" name="Rectangle 94"/>
-          <p:cNvSpPr/>
-          <p:nvPr/>
-        </p:nvSpPr>
-        <p:spPr>
-          <a:xfrm>
-            <a:off x="1163320" y="5614696"/>
-            <a:ext cx="164592" cy="153690"/>
-          </a:xfrm>
-          <a:prstGeom prst="rect">
+          <a:prstGeom prst="hexagon">
             <a:avLst/>
           </a:prstGeom>
           <a:noFill/>
@@ -6723,16 +7189,64 @@
       </p:sp>
       <p:sp>
         <p:nvSpPr>
-          <p:cNvPr id="96" name="Rectangle 95"/>
+          <p:cNvPr id="20" name="Moon 19"/>
           <p:cNvSpPr/>
           <p:nvPr/>
         </p:nvSpPr>
         <p:spPr>
           <a:xfrm>
-            <a:off x="1747206" y="4931947"/>
-            <a:ext cx="164592" cy="153690"/>
+            <a:off x="3833513" y="5602297"/>
+            <a:ext cx="118578" cy="175637"/>
           </a:xfrm>
-          <a:prstGeom prst="rect">
+          <a:prstGeom prst="moon">
+            <a:avLst/>
+          </a:prstGeom>
+          <a:noFill/>
+          <a:ln w="28575">
+            <a:solidFill>
+              <a:schemeClr val="accent1">
+                <a:lumMod val="75000"/>
+              </a:schemeClr>
+            </a:solidFill>
+          </a:ln>
+        </p:spPr>
+        <p:style>
+          <a:lnRef idx="2">
+            <a:schemeClr val="accent1">
+              <a:shade val="50000"/>
+            </a:schemeClr>
+          </a:lnRef>
+          <a:fillRef idx="1">
+            <a:schemeClr val="accent1"/>
+          </a:fillRef>
+          <a:effectRef idx="0">
+            <a:schemeClr val="accent1"/>
+          </a:effectRef>
+          <a:fontRef idx="minor">
+            <a:schemeClr val="lt1"/>
+          </a:fontRef>
+        </p:style>
+        <p:txBody>
+          <a:bodyPr rtlCol="0" anchor="ctr"/>
+          <a:lstStyle/>
+          <a:p>
+            <a:pPr algn="ctr"/>
+            <a:endParaRPr lang="en-US"/>
+          </a:p>
+        </p:txBody>
+      </p:sp>
+      <p:sp>
+        <p:nvSpPr>
+          <p:cNvPr id="21" name="Trapezoid 20"/>
+          <p:cNvSpPr/>
+          <p:nvPr/>
+        </p:nvSpPr>
+        <p:spPr>
+          <a:xfrm>
+            <a:off x="5056528" y="5347062"/>
+            <a:ext cx="240145" cy="169368"/>
+          </a:xfrm>
+          <a:prstGeom prst="trapezoid">
             <a:avLst/>
           </a:prstGeom>
           <a:noFill/>
@@ -6771,24 +7285,28 @@
       </p:sp>
       <p:sp>
         <p:nvSpPr>
-          <p:cNvPr id="97" name="Diamond 96"/>
+          <p:cNvPr id="138" name="Diamond 137"/>
           <p:cNvSpPr/>
           <p:nvPr/>
         </p:nvSpPr>
         <p:spPr>
           <a:xfrm>
-            <a:off x="377127" y="5152203"/>
+            <a:off x="4200861" y="3091766"/>
             <a:ext cx="237744" cy="219456"/>
           </a:xfrm>
           <a:prstGeom prst="diamond">
             <a:avLst/>
           </a:prstGeom>
           <a:solidFill>
-            <a:srgbClr val="00B0F0"/>
+            <a:schemeClr val="accent1">
+              <a:lumMod val="75000"/>
+            </a:schemeClr>
           </a:solidFill>
           <a:ln w="38100">
             <a:solidFill>
-              <a:srgbClr val="00B0F0"/>
+              <a:schemeClr val="accent1">
+                <a:lumMod val="75000"/>
+              </a:schemeClr>
             </a:solidFill>
           </a:ln>
         </p:spPr>
@@ -6819,16 +7337,276 @@
       </p:sp>
       <p:sp>
         <p:nvSpPr>
-          <p:cNvPr id="101" name="Rectangle 100"/>
+          <p:cNvPr id="139" name="Rectangle 138"/>
           <p:cNvSpPr/>
           <p:nvPr/>
         </p:nvSpPr>
         <p:spPr>
           <a:xfrm>
-            <a:off x="5382440" y="4657493"/>
+            <a:off x="4818252" y="3458565"/>
             <a:ext cx="164592" cy="153690"/>
           </a:xfrm>
           <a:prstGeom prst="rect">
+            <a:avLst/>
+          </a:prstGeom>
+          <a:solidFill>
+            <a:schemeClr val="accent1">
+              <a:lumMod val="75000"/>
+            </a:schemeClr>
+          </a:solidFill>
+          <a:ln w="38100">
+            <a:solidFill>
+              <a:schemeClr val="accent1">
+                <a:lumMod val="75000"/>
+              </a:schemeClr>
+            </a:solidFill>
+          </a:ln>
+        </p:spPr>
+        <p:style>
+          <a:lnRef idx="2">
+            <a:schemeClr val="accent1">
+              <a:shade val="50000"/>
+            </a:schemeClr>
+          </a:lnRef>
+          <a:fillRef idx="1">
+            <a:schemeClr val="accent1"/>
+          </a:fillRef>
+          <a:effectRef idx="0">
+            <a:schemeClr val="accent1"/>
+          </a:effectRef>
+          <a:fontRef idx="minor">
+            <a:schemeClr val="lt1"/>
+          </a:fontRef>
+        </p:style>
+        <p:txBody>
+          <a:bodyPr rtlCol="0" anchor="ctr"/>
+          <a:lstStyle/>
+          <a:p>
+            <a:pPr algn="ctr"/>
+            <a:endParaRPr lang="en-US"/>
+          </a:p>
+        </p:txBody>
+      </p:sp>
+      <p:sp>
+        <p:nvSpPr>
+          <p:cNvPr id="140" name="Oval 139"/>
+          <p:cNvSpPr/>
+          <p:nvPr/>
+        </p:nvSpPr>
+        <p:spPr>
+          <a:xfrm>
+            <a:off x="5111951" y="2367819"/>
+            <a:ext cx="174451" cy="183765"/>
+          </a:xfrm>
+          <a:prstGeom prst="ellipse">
+            <a:avLst/>
+          </a:prstGeom>
+          <a:solidFill>
+            <a:schemeClr val="accent1">
+              <a:lumMod val="75000"/>
+            </a:schemeClr>
+          </a:solidFill>
+          <a:ln w="38100">
+            <a:solidFill>
+              <a:schemeClr val="accent1">
+                <a:lumMod val="75000"/>
+              </a:schemeClr>
+            </a:solidFill>
+          </a:ln>
+        </p:spPr>
+        <p:style>
+          <a:lnRef idx="2">
+            <a:schemeClr val="accent1">
+              <a:shade val="50000"/>
+            </a:schemeClr>
+          </a:lnRef>
+          <a:fillRef idx="1">
+            <a:schemeClr val="accent1"/>
+          </a:fillRef>
+          <a:effectRef idx="0">
+            <a:schemeClr val="accent1"/>
+          </a:effectRef>
+          <a:fontRef idx="minor">
+            <a:schemeClr val="lt1"/>
+          </a:fontRef>
+        </p:style>
+        <p:txBody>
+          <a:bodyPr rtlCol="0" anchor="ctr"/>
+          <a:lstStyle/>
+          <a:p>
+            <a:pPr algn="ctr"/>
+            <a:endParaRPr lang="en-US"/>
+          </a:p>
+        </p:txBody>
+      </p:sp>
+      <p:sp>
+        <p:nvSpPr>
+          <p:cNvPr id="141" name="Isosceles Triangle 140"/>
+          <p:cNvSpPr/>
+          <p:nvPr/>
+        </p:nvSpPr>
+        <p:spPr>
+          <a:xfrm>
+            <a:off x="3627306" y="2374308"/>
+            <a:ext cx="180669" cy="170788"/>
+          </a:xfrm>
+          <a:prstGeom prst="triangle">
+            <a:avLst/>
+          </a:prstGeom>
+          <a:solidFill>
+            <a:schemeClr val="accent1">
+              <a:lumMod val="75000"/>
+            </a:schemeClr>
+          </a:solidFill>
+          <a:ln w="38100">
+            <a:solidFill>
+              <a:schemeClr val="accent1">
+                <a:lumMod val="75000"/>
+              </a:schemeClr>
+            </a:solidFill>
+          </a:ln>
+        </p:spPr>
+        <p:style>
+          <a:lnRef idx="2">
+            <a:schemeClr val="accent1">
+              <a:shade val="50000"/>
+            </a:schemeClr>
+          </a:lnRef>
+          <a:fillRef idx="1">
+            <a:schemeClr val="accent1"/>
+          </a:fillRef>
+          <a:effectRef idx="0">
+            <a:schemeClr val="accent1"/>
+          </a:effectRef>
+          <a:fontRef idx="minor">
+            <a:schemeClr val="lt1"/>
+          </a:fontRef>
+        </p:style>
+        <p:txBody>
+          <a:bodyPr rtlCol="0" anchor="ctr"/>
+          <a:lstStyle/>
+          <a:p>
+            <a:pPr algn="ctr"/>
+            <a:endParaRPr lang="en-US"/>
+          </a:p>
+        </p:txBody>
+      </p:sp>
+      <p:sp>
+        <p:nvSpPr>
+          <p:cNvPr id="142" name="5-Point Star 141"/>
+          <p:cNvSpPr/>
+          <p:nvPr/>
+        </p:nvSpPr>
+        <p:spPr>
+          <a:xfrm>
+            <a:off x="3636305" y="3925955"/>
+            <a:ext cx="222222" cy="187270"/>
+          </a:xfrm>
+          <a:prstGeom prst="star5">
+            <a:avLst/>
+          </a:prstGeom>
+          <a:solidFill>
+            <a:schemeClr val="accent1">
+              <a:lumMod val="75000"/>
+            </a:schemeClr>
+          </a:solidFill>
+          <a:ln w="28575">
+            <a:solidFill>
+              <a:schemeClr val="accent1">
+                <a:lumMod val="75000"/>
+              </a:schemeClr>
+            </a:solidFill>
+          </a:ln>
+        </p:spPr>
+        <p:style>
+          <a:lnRef idx="2">
+            <a:schemeClr val="accent1">
+              <a:shade val="50000"/>
+            </a:schemeClr>
+          </a:lnRef>
+          <a:fillRef idx="1">
+            <a:schemeClr val="accent1"/>
+          </a:fillRef>
+          <a:effectRef idx="0">
+            <a:schemeClr val="accent1"/>
+          </a:effectRef>
+          <a:fontRef idx="minor">
+            <a:schemeClr val="lt1"/>
+          </a:fontRef>
+        </p:style>
+        <p:txBody>
+          <a:bodyPr rtlCol="0" anchor="ctr"/>
+          <a:lstStyle/>
+          <a:p>
+            <a:pPr algn="ctr"/>
+            <a:endParaRPr lang="en-US"/>
+          </a:p>
+        </p:txBody>
+      </p:sp>
+      <p:sp>
+        <p:nvSpPr>
+          <p:cNvPr id="143" name="Regular Pentagon 142"/>
+          <p:cNvSpPr/>
+          <p:nvPr/>
+        </p:nvSpPr>
+        <p:spPr>
+          <a:xfrm>
+            <a:off x="5104353" y="3795507"/>
+            <a:ext cx="227701" cy="214650"/>
+          </a:xfrm>
+          <a:prstGeom prst="pentagon">
+            <a:avLst/>
+          </a:prstGeom>
+          <a:solidFill>
+            <a:schemeClr val="accent1">
+              <a:lumMod val="75000"/>
+            </a:schemeClr>
+          </a:solidFill>
+          <a:ln w="38100">
+            <a:solidFill>
+              <a:schemeClr val="accent1">
+                <a:lumMod val="75000"/>
+              </a:schemeClr>
+            </a:solidFill>
+          </a:ln>
+        </p:spPr>
+        <p:style>
+          <a:lnRef idx="2">
+            <a:schemeClr val="accent1">
+              <a:shade val="50000"/>
+            </a:schemeClr>
+          </a:lnRef>
+          <a:fillRef idx="1">
+            <a:schemeClr val="accent1"/>
+          </a:fillRef>
+          <a:effectRef idx="0">
+            <a:schemeClr val="accent1"/>
+          </a:effectRef>
+          <a:fontRef idx="minor">
+            <a:schemeClr val="lt1"/>
+          </a:fontRef>
+        </p:style>
+        <p:txBody>
+          <a:bodyPr rtlCol="0" anchor="ctr"/>
+          <a:lstStyle/>
+          <a:p>
+            <a:pPr algn="ctr"/>
+            <a:endParaRPr lang="en-US"/>
+          </a:p>
+        </p:txBody>
+      </p:sp>
+      <p:sp>
+        <p:nvSpPr>
+          <p:cNvPr id="144" name="Cross 143"/>
+          <p:cNvSpPr/>
+          <p:nvPr/>
+        </p:nvSpPr>
+        <p:spPr>
+          <a:xfrm>
+            <a:off x="5179894" y="2904681"/>
+            <a:ext cx="254081" cy="212255"/>
+          </a:xfrm>
+          <a:prstGeom prst="plus">
             <a:avLst/>
           </a:prstGeom>
           <a:noFill/>
@@ -6867,16 +7645,16 @@
       </p:sp>
       <p:sp>
         <p:nvSpPr>
-          <p:cNvPr id="103" name="Rectangle 102"/>
+          <p:cNvPr id="145" name="Right Triangle 144"/>
           <p:cNvSpPr/>
           <p:nvPr/>
         </p:nvSpPr>
         <p:spPr>
           <a:xfrm>
-            <a:off x="5494358" y="6274284"/>
-            <a:ext cx="164592" cy="153690"/>
+            <a:off x="3764622" y="3458565"/>
+            <a:ext cx="212183" cy="184569"/>
           </a:xfrm>
-          <a:prstGeom prst="rect">
+          <a:prstGeom prst="rtTriangle">
             <a:avLst/>
           </a:prstGeom>
           <a:noFill/>
@@ -6915,16 +7693,16 @@
       </p:sp>
       <p:sp>
         <p:nvSpPr>
-          <p:cNvPr id="104" name="Rectangle 103"/>
+          <p:cNvPr id="146" name="Parallelogram 145"/>
           <p:cNvSpPr/>
           <p:nvPr/>
         </p:nvSpPr>
         <p:spPr>
           <a:xfrm>
-            <a:off x="4083694" y="6307040"/>
-            <a:ext cx="164592" cy="153690"/>
+            <a:off x="4127865" y="2498539"/>
+            <a:ext cx="281363" cy="160133"/>
           </a:xfrm>
-          <a:prstGeom prst="rect">
+          <a:prstGeom prst="parallelogram">
             <a:avLst/>
           </a:prstGeom>
           <a:noFill/>
@@ -6961,1179 +7739,6 @@
           </a:p>
         </p:txBody>
       </p:sp>
-      <p:sp>
-        <p:nvSpPr>
-          <p:cNvPr id="106" name="Rectangle 105"/>
-          <p:cNvSpPr/>
-          <p:nvPr/>
-        </p:nvSpPr>
-        <p:spPr>
-          <a:xfrm>
-            <a:off x="5040017" y="6012757"/>
-            <a:ext cx="164592" cy="153690"/>
-          </a:xfrm>
-          <a:prstGeom prst="rect">
-            <a:avLst/>
-          </a:prstGeom>
-          <a:noFill/>
-          <a:ln w="38100">
-            <a:solidFill>
-              <a:schemeClr val="accent1">
-                <a:lumMod val="75000"/>
-              </a:schemeClr>
-            </a:solidFill>
-          </a:ln>
-        </p:spPr>
-        <p:style>
-          <a:lnRef idx="2">
-            <a:schemeClr val="accent1">
-              <a:shade val="50000"/>
-            </a:schemeClr>
-          </a:lnRef>
-          <a:fillRef idx="1">
-            <a:schemeClr val="accent1"/>
-          </a:fillRef>
-          <a:effectRef idx="0">
-            <a:schemeClr val="accent1"/>
-          </a:effectRef>
-          <a:fontRef idx="minor">
-            <a:schemeClr val="lt1"/>
-          </a:fontRef>
-        </p:style>
-        <p:txBody>
-          <a:bodyPr rtlCol="0" anchor="ctr"/>
-          <a:lstStyle/>
-          <a:p>
-            <a:pPr algn="ctr"/>
-            <a:endParaRPr lang="en-US"/>
-          </a:p>
-        </p:txBody>
-      </p:sp>
-      <p:sp>
-        <p:nvSpPr>
-          <p:cNvPr id="111" name="Rectangle 110"/>
-          <p:cNvSpPr/>
-          <p:nvPr/>
-        </p:nvSpPr>
-        <p:spPr>
-          <a:xfrm>
-            <a:off x="4492475" y="5644417"/>
-            <a:ext cx="164592" cy="153690"/>
-          </a:xfrm>
-          <a:prstGeom prst="rect">
-            <a:avLst/>
-          </a:prstGeom>
-          <a:noFill/>
-          <a:ln w="38100">
-            <a:solidFill>
-              <a:schemeClr val="accent1">
-                <a:lumMod val="75000"/>
-              </a:schemeClr>
-            </a:solidFill>
-          </a:ln>
-        </p:spPr>
-        <p:style>
-          <a:lnRef idx="2">
-            <a:schemeClr val="accent1">
-              <a:shade val="50000"/>
-            </a:schemeClr>
-          </a:lnRef>
-          <a:fillRef idx="1">
-            <a:schemeClr val="accent1"/>
-          </a:fillRef>
-          <a:effectRef idx="0">
-            <a:schemeClr val="accent1"/>
-          </a:effectRef>
-          <a:fontRef idx="minor">
-            <a:schemeClr val="lt1"/>
-          </a:fontRef>
-        </p:style>
-        <p:txBody>
-          <a:bodyPr rtlCol="0" anchor="ctr"/>
-          <a:lstStyle/>
-          <a:p>
-            <a:pPr algn="ctr"/>
-            <a:endParaRPr lang="en-US"/>
-          </a:p>
-        </p:txBody>
-      </p:sp>
-      <p:sp>
-        <p:nvSpPr>
-          <p:cNvPr id="112" name="Rectangle 111"/>
-          <p:cNvSpPr/>
-          <p:nvPr/>
-        </p:nvSpPr>
-        <p:spPr>
-          <a:xfrm>
-            <a:off x="5076361" y="4961668"/>
-            <a:ext cx="164592" cy="153690"/>
-          </a:xfrm>
-          <a:prstGeom prst="rect">
-            <a:avLst/>
-          </a:prstGeom>
-          <a:noFill/>
-          <a:ln w="38100">
-            <a:solidFill>
-              <a:schemeClr val="accent1">
-                <a:lumMod val="75000"/>
-              </a:schemeClr>
-            </a:solidFill>
-          </a:ln>
-        </p:spPr>
-        <p:style>
-          <a:lnRef idx="2">
-            <a:schemeClr val="accent1">
-              <a:shade val="50000"/>
-            </a:schemeClr>
-          </a:lnRef>
-          <a:fillRef idx="1">
-            <a:schemeClr val="accent1"/>
-          </a:fillRef>
-          <a:effectRef idx="0">
-            <a:schemeClr val="accent1"/>
-          </a:effectRef>
-          <a:fontRef idx="minor">
-            <a:schemeClr val="lt1"/>
-          </a:fontRef>
-        </p:style>
-        <p:txBody>
-          <a:bodyPr rtlCol="0" anchor="ctr"/>
-          <a:lstStyle/>
-          <a:p>
-            <a:pPr algn="ctr"/>
-            <a:endParaRPr lang="en-US"/>
-          </a:p>
-        </p:txBody>
-      </p:sp>
-      <p:sp>
-        <p:nvSpPr>
-          <p:cNvPr id="23" name="Flowchart: Connector 22"/>
-          <p:cNvSpPr/>
-          <p:nvPr/>
-        </p:nvSpPr>
-        <p:spPr>
-          <a:xfrm>
-            <a:off x="4248260" y="4691894"/>
-            <a:ext cx="216380" cy="205145"/>
-          </a:xfrm>
-          <a:prstGeom prst="flowChartConnector">
-            <a:avLst/>
-          </a:prstGeom>
-          <a:solidFill>
-            <a:srgbClr val="FF0066"/>
-          </a:solidFill>
-          <a:ln>
-            <a:solidFill>
-              <a:srgbClr val="FF0066"/>
-            </a:solidFill>
-          </a:ln>
-        </p:spPr>
-        <p:style>
-          <a:lnRef idx="2">
-            <a:schemeClr val="accent1">
-              <a:shade val="50000"/>
-            </a:schemeClr>
-          </a:lnRef>
-          <a:fillRef idx="1">
-            <a:schemeClr val="accent1"/>
-          </a:fillRef>
-          <a:effectRef idx="0">
-            <a:schemeClr val="accent1"/>
-          </a:effectRef>
-          <a:fontRef idx="minor">
-            <a:schemeClr val="lt1"/>
-          </a:fontRef>
-        </p:style>
-        <p:txBody>
-          <a:bodyPr rtlCol="0" anchor="ctr"/>
-          <a:lstStyle/>
-          <a:p>
-            <a:pPr algn="ctr"/>
-            <a:endParaRPr lang="en-US"/>
-          </a:p>
-        </p:txBody>
-      </p:sp>
-      <p:sp>
-        <p:nvSpPr>
-          <p:cNvPr id="114" name="Flowchart: Connector 113"/>
-          <p:cNvSpPr/>
-          <p:nvPr/>
-        </p:nvSpPr>
-        <p:spPr>
-          <a:xfrm>
-            <a:off x="4568551" y="5134224"/>
-            <a:ext cx="216380" cy="205145"/>
-          </a:xfrm>
-          <a:prstGeom prst="flowChartConnector">
-            <a:avLst/>
-          </a:prstGeom>
-          <a:solidFill>
-            <a:srgbClr val="31AD34"/>
-          </a:solidFill>
-          <a:ln>
-            <a:solidFill>
-              <a:srgbClr val="31AD34"/>
-            </a:solidFill>
-          </a:ln>
-        </p:spPr>
-        <p:style>
-          <a:lnRef idx="2">
-            <a:schemeClr val="accent1">
-              <a:shade val="50000"/>
-            </a:schemeClr>
-          </a:lnRef>
-          <a:fillRef idx="1">
-            <a:schemeClr val="accent1"/>
-          </a:fillRef>
-          <a:effectRef idx="0">
-            <a:schemeClr val="accent1"/>
-          </a:effectRef>
-          <a:fontRef idx="minor">
-            <a:schemeClr val="lt1"/>
-          </a:fontRef>
-        </p:style>
-        <p:txBody>
-          <a:bodyPr rtlCol="0" anchor="ctr"/>
-          <a:lstStyle/>
-          <a:p>
-            <a:pPr algn="ctr"/>
-            <a:endParaRPr lang="en-US"/>
-          </a:p>
-        </p:txBody>
-      </p:sp>
-      <p:sp>
-        <p:nvSpPr>
-          <p:cNvPr id="115" name="Flowchart: Connector 114"/>
-          <p:cNvSpPr/>
-          <p:nvPr/>
-        </p:nvSpPr>
-        <p:spPr>
-          <a:xfrm>
-            <a:off x="3722768" y="5180146"/>
-            <a:ext cx="216380" cy="205145"/>
-          </a:xfrm>
-          <a:prstGeom prst="flowChartConnector">
-            <a:avLst/>
-          </a:prstGeom>
-          <a:solidFill>
-            <a:schemeClr val="accent1">
-              <a:lumMod val="60000"/>
-              <a:lumOff val="40000"/>
-            </a:schemeClr>
-          </a:solidFill>
-          <a:ln>
-            <a:solidFill>
-              <a:schemeClr val="accent1">
-                <a:lumMod val="60000"/>
-                <a:lumOff val="40000"/>
-              </a:schemeClr>
-            </a:solidFill>
-          </a:ln>
-        </p:spPr>
-        <p:style>
-          <a:lnRef idx="2">
-            <a:schemeClr val="accent1">
-              <a:shade val="50000"/>
-            </a:schemeClr>
-          </a:lnRef>
-          <a:fillRef idx="1">
-            <a:schemeClr val="accent1"/>
-          </a:fillRef>
-          <a:effectRef idx="0">
-            <a:schemeClr val="accent1"/>
-          </a:effectRef>
-          <a:fontRef idx="minor">
-            <a:schemeClr val="lt1"/>
-          </a:fontRef>
-        </p:style>
-        <p:txBody>
-          <a:bodyPr rtlCol="0" anchor="ctr"/>
-          <a:lstStyle/>
-          <a:p>
-            <a:pPr algn="ctr"/>
-            <a:endParaRPr lang="en-US"/>
-          </a:p>
-        </p:txBody>
-      </p:sp>
-      <p:sp>
-        <p:nvSpPr>
-          <p:cNvPr id="116" name="Flowchart: Connector 115"/>
-          <p:cNvSpPr/>
-          <p:nvPr/>
-        </p:nvSpPr>
-        <p:spPr>
-          <a:xfrm>
-            <a:off x="3766907" y="5961167"/>
-            <a:ext cx="216380" cy="205145"/>
-          </a:xfrm>
-          <a:prstGeom prst="flowChartConnector">
-            <a:avLst/>
-          </a:prstGeom>
-          <a:solidFill>
-            <a:schemeClr val="accent6">
-              <a:lumMod val="40000"/>
-              <a:lumOff val="60000"/>
-            </a:schemeClr>
-          </a:solidFill>
-          <a:ln>
-            <a:solidFill>
-              <a:schemeClr val="accent6">
-                <a:lumMod val="40000"/>
-                <a:lumOff val="60000"/>
-              </a:schemeClr>
-            </a:solidFill>
-          </a:ln>
-        </p:spPr>
-        <p:style>
-          <a:lnRef idx="2">
-            <a:schemeClr val="accent1">
-              <a:shade val="50000"/>
-            </a:schemeClr>
-          </a:lnRef>
-          <a:fillRef idx="1">
-            <a:schemeClr val="accent1"/>
-          </a:fillRef>
-          <a:effectRef idx="0">
-            <a:schemeClr val="accent1"/>
-          </a:effectRef>
-          <a:fontRef idx="minor">
-            <a:schemeClr val="lt1"/>
-          </a:fontRef>
-        </p:style>
-        <p:txBody>
-          <a:bodyPr rtlCol="0" anchor="ctr"/>
-          <a:lstStyle/>
-          <a:p>
-            <a:pPr algn="ctr"/>
-            <a:endParaRPr lang="en-US"/>
-          </a:p>
-        </p:txBody>
-      </p:sp>
-      <p:sp>
-        <p:nvSpPr>
-          <p:cNvPr id="117" name="Flowchart: Connector 116"/>
-          <p:cNvSpPr/>
-          <p:nvPr/>
-        </p:nvSpPr>
-        <p:spPr>
-          <a:xfrm>
-            <a:off x="4462122" y="6083725"/>
-            <a:ext cx="216380" cy="205145"/>
-          </a:xfrm>
-          <a:prstGeom prst="flowChartConnector">
-            <a:avLst/>
-          </a:prstGeom>
-          <a:solidFill>
-            <a:schemeClr val="accent4">
-              <a:lumMod val="60000"/>
-              <a:lumOff val="40000"/>
-            </a:schemeClr>
-          </a:solidFill>
-          <a:ln>
-            <a:solidFill>
-              <a:schemeClr val="accent4">
-                <a:lumMod val="40000"/>
-                <a:lumOff val="60000"/>
-              </a:schemeClr>
-            </a:solidFill>
-          </a:ln>
-        </p:spPr>
-        <p:style>
-          <a:lnRef idx="2">
-            <a:schemeClr val="accent1">
-              <a:shade val="50000"/>
-            </a:schemeClr>
-          </a:lnRef>
-          <a:fillRef idx="1">
-            <a:schemeClr val="accent1"/>
-          </a:fillRef>
-          <a:effectRef idx="0">
-            <a:schemeClr val="accent1"/>
-          </a:effectRef>
-          <a:fontRef idx="minor">
-            <a:schemeClr val="lt1"/>
-          </a:fontRef>
-        </p:style>
-        <p:txBody>
-          <a:bodyPr rtlCol="0" anchor="ctr"/>
-          <a:lstStyle/>
-          <a:p>
-            <a:pPr algn="ctr"/>
-            <a:endParaRPr lang="en-US"/>
-          </a:p>
-        </p:txBody>
-      </p:sp>
-      <p:sp>
-        <p:nvSpPr>
-          <p:cNvPr id="118" name="Flowchart: Connector 117"/>
-          <p:cNvSpPr/>
-          <p:nvPr/>
-        </p:nvSpPr>
-        <p:spPr>
-          <a:xfrm>
-            <a:off x="5558957" y="5564011"/>
-            <a:ext cx="216380" cy="205145"/>
-          </a:xfrm>
-          <a:prstGeom prst="flowChartConnector">
-            <a:avLst/>
-          </a:prstGeom>
-          <a:solidFill>
-            <a:srgbClr val="C00000"/>
-          </a:solidFill>
-          <a:ln>
-            <a:solidFill>
-              <a:srgbClr val="C00000"/>
-            </a:solidFill>
-          </a:ln>
-        </p:spPr>
-        <p:style>
-          <a:lnRef idx="2">
-            <a:schemeClr val="accent1">
-              <a:shade val="50000"/>
-            </a:schemeClr>
-          </a:lnRef>
-          <a:fillRef idx="1">
-            <a:schemeClr val="accent1"/>
-          </a:fillRef>
-          <a:effectRef idx="0">
-            <a:schemeClr val="accent1"/>
-          </a:effectRef>
-          <a:fontRef idx="minor">
-            <a:schemeClr val="lt1"/>
-          </a:fontRef>
-        </p:style>
-        <p:txBody>
-          <a:bodyPr rtlCol="0" anchor="ctr"/>
-          <a:lstStyle/>
-          <a:p>
-            <a:pPr algn="ctr"/>
-            <a:endParaRPr lang="en-US"/>
-          </a:p>
-        </p:txBody>
-      </p:sp>
-      <p:sp>
-        <p:nvSpPr>
-          <p:cNvPr id="119" name="Rectangle 118"/>
-          <p:cNvSpPr/>
-          <p:nvPr/>
-        </p:nvSpPr>
-        <p:spPr>
-          <a:xfrm>
-            <a:off x="5216780" y="2553448"/>
-            <a:ext cx="164592" cy="153690"/>
-          </a:xfrm>
-          <a:prstGeom prst="rect">
-            <a:avLst/>
-          </a:prstGeom>
-          <a:noFill/>
-          <a:ln w="38100">
-            <a:solidFill>
-              <a:schemeClr val="accent1">
-                <a:lumMod val="75000"/>
-              </a:schemeClr>
-            </a:solidFill>
-          </a:ln>
-        </p:spPr>
-        <p:style>
-          <a:lnRef idx="2">
-            <a:schemeClr val="accent1">
-              <a:shade val="50000"/>
-            </a:schemeClr>
-          </a:lnRef>
-          <a:fillRef idx="1">
-            <a:schemeClr val="accent1"/>
-          </a:fillRef>
-          <a:effectRef idx="0">
-            <a:schemeClr val="accent1"/>
-          </a:effectRef>
-          <a:fontRef idx="minor">
-            <a:schemeClr val="lt1"/>
-          </a:fontRef>
-        </p:style>
-        <p:txBody>
-          <a:bodyPr rtlCol="0" anchor="ctr"/>
-          <a:lstStyle/>
-          <a:p>
-            <a:pPr algn="ctr"/>
-            <a:endParaRPr lang="en-US"/>
-          </a:p>
-        </p:txBody>
-      </p:sp>
-      <p:sp>
-        <p:nvSpPr>
-          <p:cNvPr id="120" name="Rectangle 119"/>
-          <p:cNvSpPr/>
-          <p:nvPr/>
-        </p:nvSpPr>
-        <p:spPr>
-          <a:xfrm>
-            <a:off x="5328698" y="4170239"/>
-            <a:ext cx="164592" cy="153690"/>
-          </a:xfrm>
-          <a:prstGeom prst="rect">
-            <a:avLst/>
-          </a:prstGeom>
-          <a:noFill/>
-          <a:ln w="38100">
-            <a:solidFill>
-              <a:schemeClr val="accent1">
-                <a:lumMod val="75000"/>
-              </a:schemeClr>
-            </a:solidFill>
-          </a:ln>
-        </p:spPr>
-        <p:style>
-          <a:lnRef idx="2">
-            <a:schemeClr val="accent1">
-              <a:shade val="50000"/>
-            </a:schemeClr>
-          </a:lnRef>
-          <a:fillRef idx="1">
-            <a:schemeClr val="accent1"/>
-          </a:fillRef>
-          <a:effectRef idx="0">
-            <a:schemeClr val="accent1"/>
-          </a:effectRef>
-          <a:fontRef idx="minor">
-            <a:schemeClr val="lt1"/>
-          </a:fontRef>
-        </p:style>
-        <p:txBody>
-          <a:bodyPr rtlCol="0" anchor="ctr"/>
-          <a:lstStyle/>
-          <a:p>
-            <a:pPr algn="ctr"/>
-            <a:endParaRPr lang="en-US"/>
-          </a:p>
-        </p:txBody>
-      </p:sp>
-      <p:sp>
-        <p:nvSpPr>
-          <p:cNvPr id="121" name="Rectangle 120"/>
-          <p:cNvSpPr/>
-          <p:nvPr/>
-        </p:nvSpPr>
-        <p:spPr>
-          <a:xfrm>
-            <a:off x="3918034" y="4202995"/>
-            <a:ext cx="164592" cy="153690"/>
-          </a:xfrm>
-          <a:prstGeom prst="rect">
-            <a:avLst/>
-          </a:prstGeom>
-          <a:noFill/>
-          <a:ln w="38100">
-            <a:solidFill>
-              <a:schemeClr val="accent1">
-                <a:lumMod val="75000"/>
-              </a:schemeClr>
-            </a:solidFill>
-          </a:ln>
-        </p:spPr>
-        <p:style>
-          <a:lnRef idx="2">
-            <a:schemeClr val="accent1">
-              <a:shade val="50000"/>
-            </a:schemeClr>
-          </a:lnRef>
-          <a:fillRef idx="1">
-            <a:schemeClr val="accent1"/>
-          </a:fillRef>
-          <a:effectRef idx="0">
-            <a:schemeClr val="accent1"/>
-          </a:effectRef>
-          <a:fontRef idx="minor">
-            <a:schemeClr val="lt1"/>
-          </a:fontRef>
-        </p:style>
-        <p:txBody>
-          <a:bodyPr rtlCol="0" anchor="ctr"/>
-          <a:lstStyle/>
-          <a:p>
-            <a:pPr algn="ctr"/>
-            <a:endParaRPr lang="en-US"/>
-          </a:p>
-        </p:txBody>
-      </p:sp>
-      <p:sp>
-        <p:nvSpPr>
-          <p:cNvPr id="122" name="Diamond 121"/>
-          <p:cNvSpPr/>
-          <p:nvPr/>
-        </p:nvSpPr>
-        <p:spPr>
-          <a:xfrm>
-            <a:off x="5388419" y="3459966"/>
-            <a:ext cx="237744" cy="219456"/>
-          </a:xfrm>
-          <a:prstGeom prst="diamond">
-            <a:avLst/>
-          </a:prstGeom>
-          <a:solidFill>
-            <a:srgbClr val="FF0000"/>
-          </a:solidFill>
-          <a:ln w="38100">
-            <a:solidFill>
-              <a:srgbClr val="FF0000"/>
-            </a:solidFill>
-          </a:ln>
-        </p:spPr>
-        <p:style>
-          <a:lnRef idx="2">
-            <a:schemeClr val="accent1">
-              <a:shade val="50000"/>
-            </a:schemeClr>
-          </a:lnRef>
-          <a:fillRef idx="1">
-            <a:schemeClr val="accent1"/>
-          </a:fillRef>
-          <a:effectRef idx="0">
-            <a:schemeClr val="accent1"/>
-          </a:effectRef>
-          <a:fontRef idx="minor">
-            <a:schemeClr val="lt1"/>
-          </a:fontRef>
-        </p:style>
-        <p:txBody>
-          <a:bodyPr rtlCol="0" anchor="ctr"/>
-          <a:lstStyle/>
-          <a:p>
-            <a:pPr algn="ctr"/>
-            <a:endParaRPr lang="en-US"/>
-          </a:p>
-        </p:txBody>
-      </p:sp>
-      <p:sp>
-        <p:nvSpPr>
-          <p:cNvPr id="123" name="Rectangle 122"/>
-          <p:cNvSpPr/>
-          <p:nvPr/>
-        </p:nvSpPr>
-        <p:spPr>
-          <a:xfrm>
-            <a:off x="4874357" y="3908712"/>
-            <a:ext cx="164592" cy="153690"/>
-          </a:xfrm>
-          <a:prstGeom prst="rect">
-            <a:avLst/>
-          </a:prstGeom>
-          <a:noFill/>
-          <a:ln w="38100">
-            <a:solidFill>
-              <a:schemeClr val="accent1">
-                <a:lumMod val="75000"/>
-              </a:schemeClr>
-            </a:solidFill>
-          </a:ln>
-        </p:spPr>
-        <p:style>
-          <a:lnRef idx="2">
-            <a:schemeClr val="accent1">
-              <a:shade val="50000"/>
-            </a:schemeClr>
-          </a:lnRef>
-          <a:fillRef idx="1">
-            <a:schemeClr val="accent1"/>
-          </a:fillRef>
-          <a:effectRef idx="0">
-            <a:schemeClr val="accent1"/>
-          </a:effectRef>
-          <a:fontRef idx="minor">
-            <a:schemeClr val="lt1"/>
-          </a:fontRef>
-        </p:style>
-        <p:txBody>
-          <a:bodyPr rtlCol="0" anchor="ctr"/>
-          <a:lstStyle/>
-          <a:p>
-            <a:pPr algn="ctr"/>
-            <a:endParaRPr lang="en-US"/>
-          </a:p>
-        </p:txBody>
-      </p:sp>
-      <p:sp>
-        <p:nvSpPr>
-          <p:cNvPr id="124" name="Diamond 123"/>
-          <p:cNvSpPr/>
-          <p:nvPr/>
-        </p:nvSpPr>
-        <p:spPr>
-          <a:xfrm>
-            <a:off x="4274491" y="3979680"/>
-            <a:ext cx="237744" cy="219456"/>
-          </a:xfrm>
-          <a:prstGeom prst="diamond">
-            <a:avLst/>
-          </a:prstGeom>
-          <a:solidFill>
-            <a:srgbClr val="FFC000"/>
-          </a:solidFill>
-          <a:ln w="38100">
-            <a:solidFill>
-              <a:srgbClr val="FFC000"/>
-            </a:solidFill>
-          </a:ln>
-        </p:spPr>
-        <p:style>
-          <a:lnRef idx="2">
-            <a:schemeClr val="accent1">
-              <a:shade val="50000"/>
-            </a:schemeClr>
-          </a:lnRef>
-          <a:fillRef idx="1">
-            <a:schemeClr val="accent1"/>
-          </a:fillRef>
-          <a:effectRef idx="0">
-            <a:schemeClr val="accent1"/>
-          </a:effectRef>
-          <a:fontRef idx="minor">
-            <a:schemeClr val="lt1"/>
-          </a:fontRef>
-        </p:style>
-        <p:txBody>
-          <a:bodyPr rtlCol="0" anchor="ctr"/>
-          <a:lstStyle/>
-          <a:p>
-            <a:pPr algn="ctr"/>
-            <a:endParaRPr lang="en-US"/>
-          </a:p>
-        </p:txBody>
-      </p:sp>
-      <p:sp>
-        <p:nvSpPr>
-          <p:cNvPr id="125" name="Diamond 124"/>
-          <p:cNvSpPr/>
-          <p:nvPr/>
-        </p:nvSpPr>
-        <p:spPr>
-          <a:xfrm>
-            <a:off x="3602911" y="3856909"/>
-            <a:ext cx="237744" cy="219456"/>
-          </a:xfrm>
-          <a:prstGeom prst="diamond">
-            <a:avLst/>
-          </a:prstGeom>
-          <a:solidFill>
-            <a:srgbClr val="92D050"/>
-          </a:solidFill>
-          <a:ln w="38100">
-            <a:solidFill>
-              <a:srgbClr val="92D050"/>
-            </a:solidFill>
-          </a:ln>
-        </p:spPr>
-        <p:style>
-          <a:lnRef idx="2">
-            <a:schemeClr val="accent1">
-              <a:shade val="50000"/>
-            </a:schemeClr>
-          </a:lnRef>
-          <a:fillRef idx="1">
-            <a:schemeClr val="accent1"/>
-          </a:fillRef>
-          <a:effectRef idx="0">
-            <a:schemeClr val="accent1"/>
-          </a:effectRef>
-          <a:fontRef idx="minor">
-            <a:schemeClr val="lt1"/>
-          </a:fontRef>
-        </p:style>
-        <p:txBody>
-          <a:bodyPr rtlCol="0" anchor="ctr"/>
-          <a:lstStyle/>
-          <a:p>
-            <a:pPr algn="ctr"/>
-            <a:endParaRPr lang="en-US"/>
-          </a:p>
-        </p:txBody>
-      </p:sp>
-      <p:sp>
-        <p:nvSpPr>
-          <p:cNvPr id="126" name="Diamond 125"/>
-          <p:cNvSpPr/>
-          <p:nvPr/>
-        </p:nvSpPr>
-        <p:spPr>
-          <a:xfrm>
-            <a:off x="4394010" y="3037335"/>
-            <a:ext cx="237744" cy="219456"/>
-          </a:xfrm>
-          <a:prstGeom prst="diamond">
-            <a:avLst/>
-          </a:prstGeom>
-          <a:solidFill>
-            <a:schemeClr val="accent6">
-              <a:lumMod val="75000"/>
-            </a:schemeClr>
-          </a:solidFill>
-          <a:ln w="38100">
-            <a:solidFill>
-              <a:schemeClr val="accent6">
-                <a:lumMod val="75000"/>
-              </a:schemeClr>
-            </a:solidFill>
-          </a:ln>
-        </p:spPr>
-        <p:style>
-          <a:lnRef idx="2">
-            <a:schemeClr val="accent1">
-              <a:shade val="50000"/>
-            </a:schemeClr>
-          </a:lnRef>
-          <a:fillRef idx="1">
-            <a:schemeClr val="accent1"/>
-          </a:fillRef>
-          <a:effectRef idx="0">
-            <a:schemeClr val="accent1"/>
-          </a:effectRef>
-          <a:fontRef idx="minor">
-            <a:schemeClr val="lt1"/>
-          </a:fontRef>
-        </p:style>
-        <p:txBody>
-          <a:bodyPr rtlCol="0" anchor="ctr"/>
-          <a:lstStyle/>
-          <a:p>
-            <a:pPr algn="ctr"/>
-            <a:endParaRPr lang="en-US"/>
-          </a:p>
-        </p:txBody>
-      </p:sp>
-      <p:sp>
-        <p:nvSpPr>
-          <p:cNvPr id="127" name="Diamond 126"/>
-          <p:cNvSpPr/>
-          <p:nvPr/>
-        </p:nvSpPr>
-        <p:spPr>
-          <a:xfrm>
-            <a:off x="4082600" y="2587849"/>
-            <a:ext cx="237744" cy="219456"/>
-          </a:xfrm>
-          <a:prstGeom prst="diamond">
-            <a:avLst/>
-          </a:prstGeom>
-          <a:solidFill>
-            <a:srgbClr val="F5A3E5"/>
-          </a:solidFill>
-          <a:ln w="38100">
-            <a:solidFill>
-              <a:srgbClr val="F5A3E5"/>
-            </a:solidFill>
-          </a:ln>
-        </p:spPr>
-        <p:style>
-          <a:lnRef idx="2">
-            <a:schemeClr val="accent1">
-              <a:shade val="50000"/>
-            </a:schemeClr>
-          </a:lnRef>
-          <a:fillRef idx="1">
-            <a:schemeClr val="accent1"/>
-          </a:fillRef>
-          <a:effectRef idx="0">
-            <a:schemeClr val="accent1"/>
-          </a:effectRef>
-          <a:fontRef idx="minor">
-            <a:schemeClr val="lt1"/>
-          </a:fontRef>
-        </p:style>
-        <p:txBody>
-          <a:bodyPr rtlCol="0" anchor="ctr"/>
-          <a:lstStyle/>
-          <a:p>
-            <a:pPr algn="ctr"/>
-            <a:endParaRPr lang="en-US"/>
-          </a:p>
-        </p:txBody>
-      </p:sp>
-      <p:sp>
-        <p:nvSpPr>
-          <p:cNvPr id="128" name="Rectangle 127"/>
-          <p:cNvSpPr/>
-          <p:nvPr/>
-        </p:nvSpPr>
-        <p:spPr>
-          <a:xfrm>
-            <a:off x="4326815" y="3540372"/>
-            <a:ext cx="164592" cy="153690"/>
-          </a:xfrm>
-          <a:prstGeom prst="rect">
-            <a:avLst/>
-          </a:prstGeom>
-          <a:noFill/>
-          <a:ln w="38100">
-            <a:solidFill>
-              <a:schemeClr val="accent1">
-                <a:lumMod val="75000"/>
-              </a:schemeClr>
-            </a:solidFill>
-          </a:ln>
-        </p:spPr>
-        <p:style>
-          <a:lnRef idx="2">
-            <a:schemeClr val="accent1">
-              <a:shade val="50000"/>
-            </a:schemeClr>
-          </a:lnRef>
-          <a:fillRef idx="1">
-            <a:schemeClr val="accent1"/>
-          </a:fillRef>
-          <a:effectRef idx="0">
-            <a:schemeClr val="accent1"/>
-          </a:effectRef>
-          <a:fontRef idx="minor">
-            <a:schemeClr val="lt1"/>
-          </a:fontRef>
-        </p:style>
-        <p:txBody>
-          <a:bodyPr rtlCol="0" anchor="ctr"/>
-          <a:lstStyle/>
-          <a:p>
-            <a:pPr algn="ctr"/>
-            <a:endParaRPr lang="en-US"/>
-          </a:p>
-        </p:txBody>
-      </p:sp>
-      <p:sp>
-        <p:nvSpPr>
-          <p:cNvPr id="129" name="Rectangle 128"/>
-          <p:cNvSpPr/>
-          <p:nvPr/>
-        </p:nvSpPr>
-        <p:spPr>
-          <a:xfrm>
-            <a:off x="4910701" y="2857623"/>
-            <a:ext cx="164592" cy="153690"/>
-          </a:xfrm>
-          <a:prstGeom prst="rect">
-            <a:avLst/>
-          </a:prstGeom>
-          <a:noFill/>
-          <a:ln w="38100">
-            <a:solidFill>
-              <a:schemeClr val="accent1">
-                <a:lumMod val="75000"/>
-              </a:schemeClr>
-            </a:solidFill>
-          </a:ln>
-        </p:spPr>
-        <p:style>
-          <a:lnRef idx="2">
-            <a:schemeClr val="accent1">
-              <a:shade val="50000"/>
-            </a:schemeClr>
-          </a:lnRef>
-          <a:fillRef idx="1">
-            <a:schemeClr val="accent1"/>
-          </a:fillRef>
-          <a:effectRef idx="0">
-            <a:schemeClr val="accent1"/>
-          </a:effectRef>
-          <a:fontRef idx="minor">
-            <a:schemeClr val="lt1"/>
-          </a:fontRef>
-        </p:style>
-        <p:txBody>
-          <a:bodyPr rtlCol="0" anchor="ctr"/>
-          <a:lstStyle/>
-          <a:p>
-            <a:pPr algn="ctr"/>
-            <a:endParaRPr lang="en-US"/>
-          </a:p>
-        </p:txBody>
-      </p:sp>
-      <p:sp>
-        <p:nvSpPr>
-          <p:cNvPr id="130" name="Diamond 129"/>
-          <p:cNvSpPr/>
-          <p:nvPr/>
-        </p:nvSpPr>
-        <p:spPr>
-          <a:xfrm>
-            <a:off x="3540622" y="3077879"/>
-            <a:ext cx="237744" cy="219456"/>
-          </a:xfrm>
-          <a:prstGeom prst="diamond">
-            <a:avLst/>
-          </a:prstGeom>
-          <a:solidFill>
-            <a:srgbClr val="00B0F0"/>
-          </a:solidFill>
-          <a:ln w="38100">
-            <a:solidFill>
-              <a:srgbClr val="00B0F0"/>
-            </a:solidFill>
-          </a:ln>
-        </p:spPr>
-        <p:style>
-          <a:lnRef idx="2">
-            <a:schemeClr val="accent1">
-              <a:shade val="50000"/>
-            </a:schemeClr>
-          </a:lnRef>
-          <a:fillRef idx="1">
-            <a:schemeClr val="accent1"/>
-          </a:fillRef>
-          <a:effectRef idx="0">
-            <a:schemeClr val="accent1"/>
-          </a:effectRef>
-          <a:fontRef idx="minor">
-            <a:schemeClr val="lt1"/>
-          </a:fontRef>
-        </p:style>
-        <p:txBody>
-          <a:bodyPr rtlCol="0" anchor="ctr"/>
-          <a:lstStyle/>
-          <a:p>
-            <a:pPr algn="ctr"/>
-            <a:endParaRPr lang="en-US"/>
-          </a:p>
-        </p:txBody>
-      </p:sp>
-      <p:sp>
-        <p:nvSpPr>
-          <p:cNvPr id="131" name="TextBox 130"/>
-          <p:cNvSpPr txBox="1"/>
-          <p:nvPr/>
-        </p:nvSpPr>
-        <p:spPr>
-          <a:xfrm rot="20741648">
-            <a:off x="632017" y="2671142"/>
-            <a:ext cx="1101852" cy="246221"/>
-          </a:xfrm>
-          <a:prstGeom prst="rect">
-            <a:avLst/>
-          </a:prstGeom>
-          <a:noFill/>
-        </p:spPr>
-        <p:txBody>
-          <a:bodyPr wrap="square" rtlCol="0">
-            <a:spAutoFit/>
-          </a:bodyPr>
-          <a:lstStyle/>
-          <a:p>
-            <a:r>
-              <a:rPr lang="en-US" sz="1000" dirty="0" smtClean="0"/>
-              <a:t>All species</a:t>
-            </a:r>
-            <a:endParaRPr lang="en-US" sz="1000" dirty="0"/>
-          </a:p>
-        </p:txBody>
-      </p:sp>
-      <p:sp>
-        <p:nvSpPr>
-          <p:cNvPr id="132" name="TextBox 131"/>
-          <p:cNvSpPr txBox="1"/>
-          <p:nvPr/>
-        </p:nvSpPr>
-        <p:spPr>
-          <a:xfrm rot="19292141">
-            <a:off x="544268" y="3232228"/>
-            <a:ext cx="1282191" cy="246221"/>
-          </a:xfrm>
-          <a:prstGeom prst="rect">
-            <a:avLst/>
-          </a:prstGeom>
-          <a:noFill/>
-        </p:spPr>
-        <p:txBody>
-          <a:bodyPr wrap="square" rtlCol="0">
-            <a:spAutoFit/>
-          </a:bodyPr>
-          <a:lstStyle/>
-          <a:p>
-            <a:r>
-              <a:rPr lang="en-US" sz="1000" dirty="0" smtClean="0"/>
-              <a:t>Excluding transients</a:t>
-            </a:r>
-            <a:endParaRPr lang="en-US" sz="1000" dirty="0"/>
-          </a:p>
-        </p:txBody>
-      </p:sp>
-      <p:pic>
-        <p:nvPicPr>
-          <p:cNvPr id="133" name="Picture 132"/>
-          <p:cNvPicPr>
-            <a:picLocks noChangeAspect="1"/>
-          </p:cNvPicPr>
-          <p:nvPr/>
-        </p:nvPicPr>
-        <p:blipFill rotWithShape="1">
-          <a:blip r:embed="rId2"/>
-          <a:srcRect t="13288" b="5627"/>
-          <a:stretch/>
-        </p:blipFill>
-        <p:spPr>
-          <a:xfrm>
-            <a:off x="225537" y="163710"/>
-            <a:ext cx="2485443" cy="2047887"/>
-          </a:xfrm>
-          <a:prstGeom prst="rect">
-            <a:avLst/>
-          </a:prstGeom>
-        </p:spPr>
-      </p:pic>
-      <p:sp>
-        <p:nvSpPr>
-          <p:cNvPr id="134" name="TextBox 133"/>
-          <p:cNvSpPr txBox="1"/>
-          <p:nvPr/>
-        </p:nvSpPr>
-        <p:spPr>
-          <a:xfrm>
-            <a:off x="6022118" y="4544919"/>
-            <a:ext cx="2257335" cy="400110"/>
-          </a:xfrm>
-          <a:prstGeom prst="rect">
-            <a:avLst/>
-          </a:prstGeom>
-          <a:noFill/>
-        </p:spPr>
-        <p:txBody>
-          <a:bodyPr wrap="square" rtlCol="0">
-            <a:spAutoFit/>
-          </a:bodyPr>
-          <a:lstStyle/>
-          <a:p>
-            <a:r>
-              <a:rPr lang="en-US" sz="1000" dirty="0" smtClean="0"/>
-              <a:t>Open square = core,</a:t>
-            </a:r>
-          </a:p>
-          <a:p>
-            <a:r>
-              <a:rPr lang="en-US" sz="1000" dirty="0" smtClean="0"/>
-              <a:t>filled diamond/circle = transients</a:t>
-            </a:r>
-            <a:endParaRPr lang="en-US" sz="1000" dirty="0" smtClean="0"/>
-          </a:p>
-        </p:txBody>
-      </p:sp>
-      <p:pic>
-        <p:nvPicPr>
-          <p:cNvPr id="136" name="Picture 135"/>
-          <p:cNvPicPr>
-            <a:picLocks noChangeAspect="1"/>
-          </p:cNvPicPr>
-          <p:nvPr/>
-        </p:nvPicPr>
-        <p:blipFill>
-          <a:blip r:embed="rId3"/>
-          <a:stretch>
-            <a:fillRect/>
-          </a:stretch>
-        </p:blipFill>
-        <p:spPr>
-          <a:xfrm>
-            <a:off x="3415913" y="319596"/>
-            <a:ext cx="2554822" cy="1909690"/>
-          </a:xfrm>
-          <a:prstGeom prst="rect">
-            <a:avLst/>
-          </a:prstGeom>
-        </p:spPr>
-      </p:pic>
     </p:spTree>
     <p:extLst>
       <p:ext uri="{BB962C8B-B14F-4D97-AF65-F5344CB8AC3E}">

</xml_diff>

<commit_message>
fig 3 supp 10% done
</commit_message>
<xml_diff>
--- a/output/plots/all_figs_with_legends.pptx
+++ b/output/plots/all_figs_with_legends.pptx
@@ -5,7 +5,7 @@
     <p:sldMasterId id="2147483648" r:id="rId1"/>
   </p:sldMasterIdLst>
   <p:notesMasterIdLst>
-    <p:notesMasterId r:id="rId9"/>
+    <p:notesMasterId r:id="rId11"/>
   </p:notesMasterIdLst>
   <p:sldIdLst>
     <p:sldId id="258" r:id="rId2"/>
@@ -15,6 +15,8 @@
     <p:sldId id="262" r:id="rId6"/>
     <p:sldId id="261" r:id="rId7"/>
     <p:sldId id="256" r:id="rId8"/>
+    <p:sldId id="264" r:id="rId9"/>
+    <p:sldId id="265" r:id="rId10"/>
   </p:sldIdLst>
   <p:sldSz cx="12192000" cy="6858000"/>
   <p:notesSz cx="6858000" cy="9144000"/>
@@ -5047,11 +5049,7 @@
           <a:p>
             <a:r>
               <a:rPr lang="en-US" dirty="0" smtClean="0"/>
-              <a:t>N = </a:t>
-            </a:r>
-            <a:r>
-              <a:rPr lang="en-US" dirty="0" smtClean="0"/>
-              <a:t>5</a:t>
+              <a:t>N = 5</a:t>
             </a:r>
             <a:endParaRPr lang="en-US" dirty="0"/>
           </a:p>
@@ -5081,11 +5079,7 @@
           <a:p>
             <a:r>
               <a:rPr lang="en-US" dirty="0" smtClean="0"/>
-              <a:t>N = </a:t>
-            </a:r>
-            <a:r>
-              <a:rPr lang="en-US" dirty="0" smtClean="0"/>
-              <a:t>5</a:t>
+              <a:t>N = 5</a:t>
             </a:r>
             <a:endParaRPr lang="en-US" dirty="0"/>
           </a:p>
@@ -10576,6 +10570,186 @@
 </p:sld>
 </file>
 
+<file path=ppt/slides/slide8.xml><?xml version="1.0" encoding="utf-8"?>
+<p:sld xmlns:a="http://schemas.openxmlformats.org/drawingml/2006/main" xmlns:r="http://schemas.openxmlformats.org/officeDocument/2006/relationships" xmlns:p="http://schemas.openxmlformats.org/presentationml/2006/main">
+  <p:cSld>
+    <p:spTree>
+      <p:nvGrpSpPr>
+        <p:cNvPr id="1" name=""/>
+        <p:cNvGrpSpPr/>
+        <p:nvPr/>
+      </p:nvGrpSpPr>
+      <p:grpSpPr>
+        <a:xfrm>
+          <a:off x="0" y="0"/>
+          <a:ext cx="0" cy="0"/>
+          <a:chOff x="0" y="0"/>
+          <a:chExt cx="0" cy="0"/>
+        </a:xfrm>
+      </p:grpSpPr>
+      <p:sp>
+        <p:nvSpPr>
+          <p:cNvPr id="2" name="Title 1"/>
+          <p:cNvSpPr>
+            <a:spLocks noGrp="1"/>
+          </p:cNvSpPr>
+          <p:nvPr>
+            <p:ph type="title"/>
+          </p:nvPr>
+        </p:nvSpPr>
+        <p:spPr>
+          <a:xfrm>
+            <a:off x="699516" y="0"/>
+            <a:ext cx="10872216" cy="1325563"/>
+          </a:xfrm>
+        </p:spPr>
+        <p:txBody>
+          <a:bodyPr/>
+          <a:lstStyle/>
+          <a:p>
+            <a:r>
+              <a:rPr lang="en-US" dirty="0" smtClean="0"/>
+              <a:t>FIG 3 SUPP 10					FIG </a:t>
+            </a:r>
+            <a:r>
+              <a:rPr lang="en-US" dirty="0"/>
+              <a:t>3 SUPP </a:t>
+            </a:r>
+            <a:r>
+              <a:rPr lang="en-US" dirty="0" smtClean="0"/>
+              <a:t>25</a:t>
+            </a:r>
+            <a:endParaRPr lang="en-US" dirty="0"/>
+          </a:p>
+        </p:txBody>
+      </p:sp>
+      <p:pic>
+        <p:nvPicPr>
+          <p:cNvPr id="4" name="Picture 3"/>
+          <p:cNvPicPr>
+            <a:picLocks noChangeAspect="1"/>
+          </p:cNvPicPr>
+          <p:nvPr/>
+        </p:nvPicPr>
+        <p:blipFill>
+          <a:blip r:embed="rId2"/>
+          <a:stretch>
+            <a:fillRect/>
+          </a:stretch>
+        </p:blipFill>
+        <p:spPr>
+          <a:xfrm>
+            <a:off x="97345" y="988584"/>
+            <a:ext cx="5628737" cy="4514445"/>
+          </a:xfrm>
+          <a:prstGeom prst="rect">
+            <a:avLst/>
+          </a:prstGeom>
+        </p:spPr>
+      </p:pic>
+      <p:pic>
+        <p:nvPicPr>
+          <p:cNvPr id="5" name="Picture 4"/>
+          <p:cNvPicPr>
+            <a:picLocks noChangeAspect="1"/>
+          </p:cNvPicPr>
+          <p:nvPr/>
+        </p:nvPicPr>
+        <p:blipFill>
+          <a:blip r:embed="rId3"/>
+          <a:stretch>
+            <a:fillRect/>
+          </a:stretch>
+        </p:blipFill>
+        <p:spPr>
+          <a:xfrm>
+            <a:off x="6135624" y="988585"/>
+            <a:ext cx="5699950" cy="4514445"/>
+          </a:xfrm>
+          <a:prstGeom prst="rect">
+            <a:avLst/>
+          </a:prstGeom>
+        </p:spPr>
+      </p:pic>
+    </p:spTree>
+    <p:extLst>
+      <p:ext uri="{BB962C8B-B14F-4D97-AF65-F5344CB8AC3E}">
+        <p14:creationId xmlns:p14="http://schemas.microsoft.com/office/powerpoint/2010/main" val="705413285"/>
+      </p:ext>
+    </p:extLst>
+  </p:cSld>
+  <p:clrMapOvr>
+    <a:masterClrMapping/>
+  </p:clrMapOvr>
+</p:sld>
+</file>
+
+<file path=ppt/slides/slide9.xml><?xml version="1.0" encoding="utf-8"?>
+<p:sld xmlns:a="http://schemas.openxmlformats.org/drawingml/2006/main" xmlns:r="http://schemas.openxmlformats.org/officeDocument/2006/relationships" xmlns:p="http://schemas.openxmlformats.org/presentationml/2006/main">
+  <p:cSld>
+    <p:spTree>
+      <p:nvGrpSpPr>
+        <p:cNvPr id="1" name=""/>
+        <p:cNvGrpSpPr/>
+        <p:nvPr/>
+      </p:nvGrpSpPr>
+      <p:grpSpPr>
+        <a:xfrm>
+          <a:off x="0" y="0"/>
+          <a:ext cx="0" cy="0"/>
+          <a:chOff x="0" y="0"/>
+          <a:chExt cx="0" cy="0"/>
+        </a:xfrm>
+      </p:grpSpPr>
+      <p:sp>
+        <p:nvSpPr>
+          <p:cNvPr id="2" name="Title 1"/>
+          <p:cNvSpPr>
+            <a:spLocks noGrp="1"/>
+          </p:cNvSpPr>
+          <p:nvPr>
+            <p:ph type="title"/>
+          </p:nvPr>
+        </p:nvSpPr>
+        <p:spPr>
+          <a:xfrm>
+            <a:off x="699516" y="0"/>
+            <a:ext cx="10872216" cy="1325563"/>
+          </a:xfrm>
+        </p:spPr>
+        <p:txBody>
+          <a:bodyPr/>
+          <a:lstStyle/>
+          <a:p>
+            <a:r>
+              <a:rPr lang="en-US" dirty="0" smtClean="0"/>
+              <a:t>FIG 4 SUPP 10					FIG 4 </a:t>
+            </a:r>
+            <a:r>
+              <a:rPr lang="en-US" dirty="0"/>
+              <a:t>SUPP </a:t>
+            </a:r>
+            <a:r>
+              <a:rPr lang="en-US" dirty="0" smtClean="0"/>
+              <a:t>25</a:t>
+            </a:r>
+            <a:endParaRPr lang="en-US" dirty="0"/>
+          </a:p>
+        </p:txBody>
+      </p:sp>
+    </p:spTree>
+    <p:extLst>
+      <p:ext uri="{BB962C8B-B14F-4D97-AF65-F5344CB8AC3E}">
+        <p14:creationId xmlns:p14="http://schemas.microsoft.com/office/powerpoint/2010/main" val="1876886906"/>
+      </p:ext>
+    </p:extLst>
+  </p:cSld>
+  <p:clrMapOvr>
+    <a:masterClrMapping/>
+  </p:clrMapOvr>
+</p:sld>
+</file>
+
 <file path=ppt/theme/theme1.xml><?xml version="1.0" encoding="utf-8"?>
 <a:theme xmlns:a="http://schemas.openxmlformats.org/drawingml/2006/main" name="Office Theme">
   <a:themeElements>

</xml_diff>

<commit_message>
M&H fig 1 revision:
</commit_message>
<xml_diff>
--- a/output/plots/all_figs_with_legends.pptx
+++ b/output/plots/all_figs_with_legends.pptx
@@ -205,7 +205,7 @@
           <a:p>
             <a:fld id="{7FA21820-D199-4D82-91AF-C50B1D3B111A}" type="datetimeFigureOut">
               <a:rPr lang="en-US" smtClean="0"/>
-              <a:t>5/8/2017</a:t>
+              <a:t>5/9/2017</a:t>
             </a:fld>
             <a:endParaRPr lang="en-US"/>
           </a:p>
@@ -1038,7 +1038,7 @@
           <a:p>
             <a:fld id="{916B8C92-D5E3-4480-8685-D57BEE386DE2}" type="datetimeFigureOut">
               <a:rPr lang="en-US" smtClean="0"/>
-              <a:t>5/8/2017</a:t>
+              <a:t>5/9/2017</a:t>
             </a:fld>
             <a:endParaRPr lang="en-US"/>
           </a:p>
@@ -1208,7 +1208,7 @@
           <a:p>
             <a:fld id="{916B8C92-D5E3-4480-8685-D57BEE386DE2}" type="datetimeFigureOut">
               <a:rPr lang="en-US" smtClean="0"/>
-              <a:t>5/8/2017</a:t>
+              <a:t>5/9/2017</a:t>
             </a:fld>
             <a:endParaRPr lang="en-US"/>
           </a:p>
@@ -1388,7 +1388,7 @@
           <a:p>
             <a:fld id="{916B8C92-D5E3-4480-8685-D57BEE386DE2}" type="datetimeFigureOut">
               <a:rPr lang="en-US" smtClean="0"/>
-              <a:t>5/8/2017</a:t>
+              <a:t>5/9/2017</a:t>
             </a:fld>
             <a:endParaRPr lang="en-US"/>
           </a:p>
@@ -1558,7 +1558,7 @@
           <a:p>
             <a:fld id="{916B8C92-D5E3-4480-8685-D57BEE386DE2}" type="datetimeFigureOut">
               <a:rPr lang="en-US" smtClean="0"/>
-              <a:t>5/8/2017</a:t>
+              <a:t>5/9/2017</a:t>
             </a:fld>
             <a:endParaRPr lang="en-US"/>
           </a:p>
@@ -1804,7 +1804,7 @@
           <a:p>
             <a:fld id="{916B8C92-D5E3-4480-8685-D57BEE386DE2}" type="datetimeFigureOut">
               <a:rPr lang="en-US" smtClean="0"/>
-              <a:t>5/8/2017</a:t>
+              <a:t>5/9/2017</a:t>
             </a:fld>
             <a:endParaRPr lang="en-US"/>
           </a:p>
@@ -2036,7 +2036,7 @@
           <a:p>
             <a:fld id="{916B8C92-D5E3-4480-8685-D57BEE386DE2}" type="datetimeFigureOut">
               <a:rPr lang="en-US" smtClean="0"/>
-              <a:t>5/8/2017</a:t>
+              <a:t>5/9/2017</a:t>
             </a:fld>
             <a:endParaRPr lang="en-US"/>
           </a:p>
@@ -2403,7 +2403,7 @@
           <a:p>
             <a:fld id="{916B8C92-D5E3-4480-8685-D57BEE386DE2}" type="datetimeFigureOut">
               <a:rPr lang="en-US" smtClean="0"/>
-              <a:t>5/8/2017</a:t>
+              <a:t>5/9/2017</a:t>
             </a:fld>
             <a:endParaRPr lang="en-US"/>
           </a:p>
@@ -2521,7 +2521,7 @@
           <a:p>
             <a:fld id="{916B8C92-D5E3-4480-8685-D57BEE386DE2}" type="datetimeFigureOut">
               <a:rPr lang="en-US" smtClean="0"/>
-              <a:t>5/8/2017</a:t>
+              <a:t>5/9/2017</a:t>
             </a:fld>
             <a:endParaRPr lang="en-US"/>
           </a:p>
@@ -2616,7 +2616,7 @@
           <a:p>
             <a:fld id="{916B8C92-D5E3-4480-8685-D57BEE386DE2}" type="datetimeFigureOut">
               <a:rPr lang="en-US" smtClean="0"/>
-              <a:t>5/8/2017</a:t>
+              <a:t>5/9/2017</a:t>
             </a:fld>
             <a:endParaRPr lang="en-US"/>
           </a:p>
@@ -2893,7 +2893,7 @@
           <a:p>
             <a:fld id="{916B8C92-D5E3-4480-8685-D57BEE386DE2}" type="datetimeFigureOut">
               <a:rPr lang="en-US" smtClean="0"/>
-              <a:t>5/8/2017</a:t>
+              <a:t>5/9/2017</a:t>
             </a:fld>
             <a:endParaRPr lang="en-US"/>
           </a:p>
@@ -3146,7 +3146,7 @@
           <a:p>
             <a:fld id="{916B8C92-D5E3-4480-8685-D57BEE386DE2}" type="datetimeFigureOut">
               <a:rPr lang="en-US" smtClean="0"/>
-              <a:t>5/8/2017</a:t>
+              <a:t>5/9/2017</a:t>
             </a:fld>
             <a:endParaRPr lang="en-US"/>
           </a:p>
@@ -3359,7 +3359,7 @@
           <a:p>
             <a:fld id="{916B8C92-D5E3-4480-8685-D57BEE386DE2}" type="datetimeFigureOut">
               <a:rPr lang="en-US" smtClean="0"/>
-              <a:t>5/8/2017</a:t>
+              <a:t>5/9/2017</a:t>
             </a:fld>
             <a:endParaRPr lang="en-US"/>
           </a:p>
@@ -4858,7 +4858,10 @@
           <a:noFill/>
           <a:ln>
             <a:solidFill>
-              <a:schemeClr val="tx1"/>
+              <a:schemeClr val="tx1">
+                <a:lumMod val="50000"/>
+                <a:lumOff val="50000"/>
+              </a:schemeClr>
             </a:solidFill>
           </a:ln>
         </p:spPr>
@@ -4896,6 +4899,55 @@
         <p:spPr>
           <a:xfrm>
             <a:off x="3406950" y="4518014"/>
+            <a:ext cx="2567210" cy="2136065"/>
+          </a:xfrm>
+          <a:prstGeom prst="rect">
+            <a:avLst/>
+          </a:prstGeom>
+          <a:noFill/>
+          <a:ln>
+            <a:solidFill>
+              <a:schemeClr val="tx1">
+                <a:lumMod val="50000"/>
+                <a:lumOff val="50000"/>
+              </a:schemeClr>
+            </a:solidFill>
+          </a:ln>
+        </p:spPr>
+        <p:style>
+          <a:lnRef idx="2">
+            <a:schemeClr val="accent1">
+              <a:shade val="50000"/>
+            </a:schemeClr>
+          </a:lnRef>
+          <a:fillRef idx="1">
+            <a:schemeClr val="accent1"/>
+          </a:fillRef>
+          <a:effectRef idx="0">
+            <a:schemeClr val="accent1"/>
+          </a:effectRef>
+          <a:fontRef idx="minor">
+            <a:schemeClr val="lt1"/>
+          </a:fontRef>
+        </p:style>
+        <p:txBody>
+          <a:bodyPr rtlCol="0" anchor="ctr"/>
+          <a:lstStyle/>
+          <a:p>
+            <a:pPr algn="ctr"/>
+            <a:endParaRPr lang="en-US"/>
+          </a:p>
+        </p:txBody>
+      </p:sp>
+      <p:sp>
+        <p:nvSpPr>
+          <p:cNvPr id="8" name="Rectangle 7"/>
+          <p:cNvSpPr/>
+          <p:nvPr/>
+        </p:nvSpPr>
+        <p:spPr>
+          <a:xfrm>
+            <a:off x="175991" y="2288613"/>
             <a:ext cx="2567210" cy="2136065"/>
           </a:xfrm>
           <a:prstGeom prst="rect">
@@ -4935,14 +4987,14 @@
       </p:sp>
       <p:sp>
         <p:nvSpPr>
-          <p:cNvPr id="8" name="Rectangle 7"/>
+          <p:cNvPr id="9" name="Rectangle 8"/>
           <p:cNvSpPr/>
           <p:nvPr/>
         </p:nvSpPr>
         <p:spPr>
           <a:xfrm>
-            <a:off x="175991" y="2288613"/>
-            <a:ext cx="2567210" cy="2136065"/>
+            <a:off x="3406949" y="2304023"/>
+            <a:ext cx="2567209" cy="2136065"/>
           </a:xfrm>
           <a:prstGeom prst="rect">
             <a:avLst/>
@@ -4976,112 +5028,6 @@
           <a:p>
             <a:pPr algn="ctr"/>
             <a:endParaRPr lang="en-US"/>
-          </a:p>
-        </p:txBody>
-      </p:sp>
-      <p:sp>
-        <p:nvSpPr>
-          <p:cNvPr id="9" name="Rectangle 8"/>
-          <p:cNvSpPr/>
-          <p:nvPr/>
-        </p:nvSpPr>
-        <p:spPr>
-          <a:xfrm>
-            <a:off x="3406949" y="2304023"/>
-            <a:ext cx="2567209" cy="2136065"/>
-          </a:xfrm>
-          <a:prstGeom prst="rect">
-            <a:avLst/>
-          </a:prstGeom>
-          <a:noFill/>
-          <a:ln>
-            <a:solidFill>
-              <a:schemeClr val="tx1"/>
-            </a:solidFill>
-          </a:ln>
-        </p:spPr>
-        <p:style>
-          <a:lnRef idx="2">
-            <a:schemeClr val="accent1">
-              <a:shade val="50000"/>
-            </a:schemeClr>
-          </a:lnRef>
-          <a:fillRef idx="1">
-            <a:schemeClr val="accent1"/>
-          </a:fillRef>
-          <a:effectRef idx="0">
-            <a:schemeClr val="accent1"/>
-          </a:effectRef>
-          <a:fontRef idx="minor">
-            <a:schemeClr val="lt1"/>
-          </a:fontRef>
-        </p:style>
-        <p:txBody>
-          <a:bodyPr rtlCol="0" anchor="ctr"/>
-          <a:lstStyle/>
-          <a:p>
-            <a:pPr algn="ctr"/>
-            <a:endParaRPr lang="en-US"/>
-          </a:p>
-        </p:txBody>
-      </p:sp>
-      <p:sp>
-        <p:nvSpPr>
-          <p:cNvPr id="46" name="TextBox 45"/>
-          <p:cNvSpPr txBox="1"/>
-          <p:nvPr/>
-        </p:nvSpPr>
-        <p:spPr>
-          <a:xfrm>
-            <a:off x="2127010" y="6338754"/>
-            <a:ext cx="686468" cy="369332"/>
-          </a:xfrm>
-          <a:prstGeom prst="rect">
-            <a:avLst/>
-          </a:prstGeom>
-          <a:noFill/>
-        </p:spPr>
-        <p:txBody>
-          <a:bodyPr wrap="square" rtlCol="0">
-            <a:spAutoFit/>
-          </a:bodyPr>
-          <a:lstStyle/>
-          <a:p>
-            <a:r>
-              <a:rPr lang="en-US" dirty="0" smtClean="0"/>
-              <a:t>N = 5</a:t>
-            </a:r>
-            <a:endParaRPr lang="en-US" dirty="0"/>
-          </a:p>
-        </p:txBody>
-      </p:sp>
-      <p:sp>
-        <p:nvSpPr>
-          <p:cNvPr id="47" name="TextBox 46"/>
-          <p:cNvSpPr txBox="1"/>
-          <p:nvPr/>
-        </p:nvSpPr>
-        <p:spPr>
-          <a:xfrm>
-            <a:off x="5371062" y="6368475"/>
-            <a:ext cx="697636" cy="369332"/>
-          </a:xfrm>
-          <a:prstGeom prst="rect">
-            <a:avLst/>
-          </a:prstGeom>
-          <a:noFill/>
-        </p:spPr>
-        <p:txBody>
-          <a:bodyPr wrap="square" rtlCol="0">
-            <a:spAutoFit/>
-          </a:bodyPr>
-          <a:lstStyle/>
-          <a:p>
-            <a:r>
-              <a:rPr lang="en-US" dirty="0" smtClean="0"/>
-              <a:t>N = 5</a:t>
-            </a:r>
-            <a:endParaRPr lang="en-US" dirty="0"/>
           </a:p>
         </p:txBody>
       </p:sp>
@@ -5841,62 +5787,6 @@
           </a:p>
         </p:txBody>
       </p:sp>
-      <p:sp>
-        <p:nvSpPr>
-          <p:cNvPr id="56" name="TextBox 55"/>
-          <p:cNvSpPr txBox="1"/>
-          <p:nvPr/>
-        </p:nvSpPr>
-        <p:spPr>
-          <a:xfrm>
-            <a:off x="5941659" y="4097497"/>
-            <a:ext cx="1024176" cy="400110"/>
-          </a:xfrm>
-          <a:prstGeom prst="rect">
-            <a:avLst/>
-          </a:prstGeom>
-          <a:noFill/>
-        </p:spPr>
-        <p:txBody>
-          <a:bodyPr wrap="square" rtlCol="0">
-            <a:spAutoFit/>
-          </a:bodyPr>
-          <a:lstStyle/>
-          <a:p>
-            <a:r>
-              <a:rPr lang="en-US" sz="1000" dirty="0" smtClean="0"/>
-              <a:t>Box 1: # </a:t>
-            </a:r>
-            <a:r>
-              <a:rPr lang="en-US" sz="1000" dirty="0" err="1" smtClean="0"/>
-              <a:t>spp</a:t>
-            </a:r>
-            <a:r>
-              <a:rPr lang="en-US" sz="1000" dirty="0" smtClean="0"/>
-              <a:t> =3</a:t>
-            </a:r>
-          </a:p>
-          <a:p>
-            <a:r>
-              <a:rPr lang="en-US" sz="1000" dirty="0" smtClean="0"/>
-              <a:t>Box 4: # </a:t>
-            </a:r>
-            <a:r>
-              <a:rPr lang="en-US" sz="1000" dirty="0" err="1" smtClean="0"/>
-              <a:t>spp</a:t>
-            </a:r>
-            <a:r>
-              <a:rPr lang="en-US" sz="1000" dirty="0" smtClean="0"/>
-              <a:t> = </a:t>
-            </a:r>
-            <a:r>
-              <a:rPr lang="en-US" sz="1000" dirty="0"/>
-              <a:t>7</a:t>
-            </a:r>
-            <a:endParaRPr lang="en-US" sz="1000" dirty="0" smtClean="0"/>
-          </a:p>
-        </p:txBody>
-      </p:sp>
       <p:cxnSp>
         <p:nvCxnSpPr>
           <p:cNvPr id="58" name="Straight Connector 57"/>
@@ -5969,52 +5859,6 @@
           </a:fontRef>
         </p:style>
       </p:cxnSp>
-      <p:sp>
-        <p:nvSpPr>
-          <p:cNvPr id="79" name="Rectangle 78"/>
-          <p:cNvSpPr/>
-          <p:nvPr/>
-        </p:nvSpPr>
-        <p:spPr>
-          <a:xfrm>
-            <a:off x="3418937" y="2304023"/>
-            <a:ext cx="1283179" cy="1069826"/>
-          </a:xfrm>
-          <a:prstGeom prst="rect">
-            <a:avLst/>
-          </a:prstGeom>
-          <a:noFill/>
-          <a:ln w="19050">
-            <a:solidFill>
-              <a:schemeClr val="tx1"/>
-            </a:solidFill>
-          </a:ln>
-        </p:spPr>
-        <p:style>
-          <a:lnRef idx="2">
-            <a:schemeClr val="accent1">
-              <a:shade val="50000"/>
-            </a:schemeClr>
-          </a:lnRef>
-          <a:fillRef idx="1">
-            <a:schemeClr val="accent1"/>
-          </a:fillRef>
-          <a:effectRef idx="0">
-            <a:schemeClr val="accent1"/>
-          </a:effectRef>
-          <a:fontRef idx="minor">
-            <a:schemeClr val="lt1"/>
-          </a:fontRef>
-        </p:style>
-        <p:txBody>
-          <a:bodyPr rtlCol="0" anchor="ctr"/>
-          <a:lstStyle/>
-          <a:p>
-            <a:pPr algn="ctr"/>
-            <a:endParaRPr lang="en-US"/>
-          </a:p>
-        </p:txBody>
-      </p:sp>
       <p:sp>
         <p:nvSpPr>
           <p:cNvPr id="81" name="Rectangle 80"/>
@@ -6308,42 +6152,2509 @@
       </p:pic>
       <p:sp>
         <p:nvSpPr>
-          <p:cNvPr id="134" name="TextBox 133"/>
-          <p:cNvSpPr txBox="1"/>
+          <p:cNvPr id="73" name="Diamond 72"/>
+          <p:cNvSpPr/>
           <p:nvPr/>
         </p:nvSpPr>
         <p:spPr>
           <a:xfrm>
-            <a:off x="6022118" y="4544919"/>
-            <a:ext cx="2257335" cy="400110"/>
+            <a:off x="1199734" y="5537050"/>
+            <a:ext cx="237744" cy="219456"/>
+          </a:xfrm>
+          <a:prstGeom prst="diamond">
+            <a:avLst/>
+          </a:prstGeom>
+          <a:solidFill>
+            <a:schemeClr val="tx1">
+              <a:lumMod val="50000"/>
+              <a:lumOff val="50000"/>
+            </a:schemeClr>
+          </a:solidFill>
+          <a:ln w="38100">
+            <a:solidFill>
+              <a:schemeClr val="tx1">
+                <a:lumMod val="50000"/>
+                <a:lumOff val="50000"/>
+              </a:schemeClr>
+            </a:solidFill>
+          </a:ln>
+        </p:spPr>
+        <p:style>
+          <a:lnRef idx="2">
+            <a:schemeClr val="accent1">
+              <a:shade val="50000"/>
+            </a:schemeClr>
+          </a:lnRef>
+          <a:fillRef idx="1">
+            <a:schemeClr val="accent1"/>
+          </a:fillRef>
+          <a:effectRef idx="0">
+            <a:schemeClr val="accent1"/>
+          </a:effectRef>
+          <a:fontRef idx="minor">
+            <a:schemeClr val="lt1"/>
+          </a:fontRef>
+        </p:style>
+        <p:txBody>
+          <a:bodyPr rtlCol="0" anchor="ctr"/>
+          <a:lstStyle/>
+          <a:p>
+            <a:pPr algn="ctr"/>
+            <a:endParaRPr lang="en-US"/>
+          </a:p>
+        </p:txBody>
+      </p:sp>
+      <p:sp>
+        <p:nvSpPr>
+          <p:cNvPr id="74" name="Rectangle 73"/>
+          <p:cNvSpPr/>
+          <p:nvPr/>
+        </p:nvSpPr>
+        <p:spPr>
+          <a:xfrm>
+            <a:off x="2084103" y="5348100"/>
+            <a:ext cx="164592" cy="153690"/>
+          </a:xfrm>
+          <a:prstGeom prst="rect">
+            <a:avLst/>
+          </a:prstGeom>
+          <a:solidFill>
+            <a:schemeClr val="tx1">
+              <a:lumMod val="50000"/>
+              <a:lumOff val="50000"/>
+            </a:schemeClr>
+          </a:solidFill>
+          <a:ln w="38100">
+            <a:solidFill>
+              <a:schemeClr val="tx1">
+                <a:lumMod val="50000"/>
+                <a:lumOff val="50000"/>
+              </a:schemeClr>
+            </a:solidFill>
+          </a:ln>
+        </p:spPr>
+        <p:style>
+          <a:lnRef idx="2">
+            <a:schemeClr val="accent1">
+              <a:shade val="50000"/>
+            </a:schemeClr>
+          </a:lnRef>
+          <a:fillRef idx="1">
+            <a:schemeClr val="accent1"/>
+          </a:fillRef>
+          <a:effectRef idx="0">
+            <a:schemeClr val="accent1"/>
+          </a:effectRef>
+          <a:fontRef idx="minor">
+            <a:schemeClr val="lt1"/>
+          </a:fontRef>
+        </p:style>
+        <p:txBody>
+          <a:bodyPr rtlCol="0" anchor="ctr"/>
+          <a:lstStyle/>
+          <a:p>
+            <a:pPr algn="ctr"/>
+            <a:endParaRPr lang="en-US"/>
+          </a:p>
+        </p:txBody>
+      </p:sp>
+      <p:sp>
+        <p:nvSpPr>
+          <p:cNvPr id="75" name="Oval 74"/>
+          <p:cNvSpPr/>
+          <p:nvPr/>
+        </p:nvSpPr>
+        <p:spPr>
+          <a:xfrm>
+            <a:off x="2004561" y="4686983"/>
+            <a:ext cx="174451" cy="183765"/>
+          </a:xfrm>
+          <a:prstGeom prst="ellipse">
+            <a:avLst/>
+          </a:prstGeom>
+          <a:solidFill>
+            <a:schemeClr val="tx1">
+              <a:lumMod val="50000"/>
+              <a:lumOff val="50000"/>
+            </a:schemeClr>
+          </a:solidFill>
+          <a:ln w="38100">
+            <a:solidFill>
+              <a:schemeClr val="tx1">
+                <a:lumMod val="50000"/>
+                <a:lumOff val="50000"/>
+              </a:schemeClr>
+            </a:solidFill>
+          </a:ln>
+        </p:spPr>
+        <p:style>
+          <a:lnRef idx="2">
+            <a:schemeClr val="accent1">
+              <a:shade val="50000"/>
+            </a:schemeClr>
+          </a:lnRef>
+          <a:fillRef idx="1">
+            <a:schemeClr val="accent1"/>
+          </a:fillRef>
+          <a:effectRef idx="0">
+            <a:schemeClr val="accent1"/>
+          </a:effectRef>
+          <a:fontRef idx="minor">
+            <a:schemeClr val="lt1"/>
+          </a:fontRef>
+        </p:style>
+        <p:txBody>
+          <a:bodyPr rtlCol="0" anchor="ctr"/>
+          <a:lstStyle/>
+          <a:p>
+            <a:pPr algn="ctr"/>
+            <a:endParaRPr lang="en-US"/>
+          </a:p>
+        </p:txBody>
+      </p:sp>
+      <p:sp>
+        <p:nvSpPr>
+          <p:cNvPr id="78" name="Isosceles Triangle 77"/>
+          <p:cNvSpPr/>
+          <p:nvPr/>
+        </p:nvSpPr>
+        <p:spPr>
+          <a:xfrm>
+            <a:off x="519916" y="4693472"/>
+            <a:ext cx="180669" cy="170788"/>
+          </a:xfrm>
+          <a:prstGeom prst="triangle">
+            <a:avLst/>
+          </a:prstGeom>
+          <a:solidFill>
+            <a:schemeClr val="tx1">
+              <a:lumMod val="50000"/>
+              <a:lumOff val="50000"/>
+            </a:schemeClr>
+          </a:solidFill>
+          <a:ln w="38100">
+            <a:solidFill>
+              <a:schemeClr val="tx1">
+                <a:lumMod val="50000"/>
+                <a:lumOff val="50000"/>
+              </a:schemeClr>
+            </a:solidFill>
+          </a:ln>
+        </p:spPr>
+        <p:style>
+          <a:lnRef idx="2">
+            <a:schemeClr val="accent1">
+              <a:shade val="50000"/>
+            </a:schemeClr>
+          </a:lnRef>
+          <a:fillRef idx="1">
+            <a:schemeClr val="accent1"/>
+          </a:fillRef>
+          <a:effectRef idx="0">
+            <a:schemeClr val="accent1"/>
+          </a:effectRef>
+          <a:fontRef idx="minor">
+            <a:schemeClr val="lt1"/>
+          </a:fontRef>
+        </p:style>
+        <p:txBody>
+          <a:bodyPr rtlCol="0" anchor="ctr"/>
+          <a:lstStyle/>
+          <a:p>
+            <a:pPr algn="ctr"/>
+            <a:endParaRPr lang="en-US"/>
+          </a:p>
+        </p:txBody>
+      </p:sp>
+      <p:sp>
+        <p:nvSpPr>
+          <p:cNvPr id="80" name="5-Point Star 79"/>
+          <p:cNvSpPr/>
+          <p:nvPr/>
+        </p:nvSpPr>
+        <p:spPr>
+          <a:xfrm>
+            <a:off x="528915" y="6245119"/>
+            <a:ext cx="222222" cy="187270"/>
+          </a:xfrm>
+          <a:prstGeom prst="star5">
+            <a:avLst/>
+          </a:prstGeom>
+          <a:solidFill>
+            <a:schemeClr val="tx1">
+              <a:lumMod val="50000"/>
+              <a:lumOff val="50000"/>
+            </a:schemeClr>
+          </a:solidFill>
+          <a:ln w="28575">
+            <a:solidFill>
+              <a:schemeClr val="tx1">
+                <a:lumMod val="50000"/>
+                <a:lumOff val="50000"/>
+              </a:schemeClr>
+            </a:solidFill>
+          </a:ln>
+        </p:spPr>
+        <p:style>
+          <a:lnRef idx="2">
+            <a:schemeClr val="accent1">
+              <a:shade val="50000"/>
+            </a:schemeClr>
+          </a:lnRef>
+          <a:fillRef idx="1">
+            <a:schemeClr val="accent1"/>
+          </a:fillRef>
+          <a:effectRef idx="0">
+            <a:schemeClr val="accent1"/>
+          </a:effectRef>
+          <a:fontRef idx="minor">
+            <a:schemeClr val="lt1"/>
+          </a:fontRef>
+        </p:style>
+        <p:txBody>
+          <a:bodyPr rtlCol="0" anchor="ctr"/>
+          <a:lstStyle/>
+          <a:p>
+            <a:pPr algn="ctr"/>
+            <a:endParaRPr lang="en-US"/>
+          </a:p>
+        </p:txBody>
+      </p:sp>
+      <p:sp>
+        <p:nvSpPr>
+          <p:cNvPr id="86" name="Diamond 85"/>
+          <p:cNvSpPr/>
+          <p:nvPr/>
+        </p:nvSpPr>
+        <p:spPr>
+          <a:xfrm>
+            <a:off x="4441582" y="5508961"/>
+            <a:ext cx="237744" cy="219456"/>
+          </a:xfrm>
+          <a:prstGeom prst="diamond">
+            <a:avLst/>
+          </a:prstGeom>
+          <a:solidFill>
+            <a:schemeClr val="tx1">
+              <a:lumMod val="50000"/>
+              <a:lumOff val="50000"/>
+            </a:schemeClr>
+          </a:solidFill>
+          <a:ln w="38100">
+            <a:solidFill>
+              <a:schemeClr val="tx1">
+                <a:lumMod val="50000"/>
+                <a:lumOff val="50000"/>
+              </a:schemeClr>
+            </a:solidFill>
+          </a:ln>
+        </p:spPr>
+        <p:style>
+          <a:lnRef idx="2">
+            <a:schemeClr val="accent1">
+              <a:shade val="50000"/>
+            </a:schemeClr>
+          </a:lnRef>
+          <a:fillRef idx="1">
+            <a:schemeClr val="accent1"/>
+          </a:fillRef>
+          <a:effectRef idx="0">
+            <a:schemeClr val="accent1"/>
+          </a:effectRef>
+          <a:fontRef idx="minor">
+            <a:schemeClr val="lt1"/>
+          </a:fontRef>
+        </p:style>
+        <p:txBody>
+          <a:bodyPr rtlCol="0" anchor="ctr"/>
+          <a:lstStyle/>
+          <a:p>
+            <a:pPr algn="ctr"/>
+            <a:endParaRPr lang="en-US"/>
+          </a:p>
+        </p:txBody>
+      </p:sp>
+      <p:sp>
+        <p:nvSpPr>
+          <p:cNvPr id="87" name="Rectangle 86"/>
+          <p:cNvSpPr/>
+          <p:nvPr/>
+        </p:nvSpPr>
+        <p:spPr>
+          <a:xfrm>
+            <a:off x="5341362" y="5348100"/>
+            <a:ext cx="164592" cy="153690"/>
+          </a:xfrm>
+          <a:prstGeom prst="rect">
+            <a:avLst/>
+          </a:prstGeom>
+          <a:solidFill>
+            <a:schemeClr val="tx1">
+              <a:lumMod val="50000"/>
+              <a:lumOff val="50000"/>
+            </a:schemeClr>
+          </a:solidFill>
+          <a:ln w="38100">
+            <a:solidFill>
+              <a:schemeClr val="tx1">
+                <a:lumMod val="50000"/>
+                <a:lumOff val="50000"/>
+              </a:schemeClr>
+            </a:solidFill>
+          </a:ln>
+        </p:spPr>
+        <p:style>
+          <a:lnRef idx="2">
+            <a:schemeClr val="accent1">
+              <a:shade val="50000"/>
+            </a:schemeClr>
+          </a:lnRef>
+          <a:fillRef idx="1">
+            <a:schemeClr val="accent1"/>
+          </a:fillRef>
+          <a:effectRef idx="0">
+            <a:schemeClr val="accent1"/>
+          </a:effectRef>
+          <a:fontRef idx="minor">
+            <a:schemeClr val="lt1"/>
+          </a:fontRef>
+        </p:style>
+        <p:txBody>
+          <a:bodyPr rtlCol="0" anchor="ctr"/>
+          <a:lstStyle/>
+          <a:p>
+            <a:pPr algn="ctr"/>
+            <a:endParaRPr lang="en-US"/>
+          </a:p>
+        </p:txBody>
+      </p:sp>
+      <p:sp>
+        <p:nvSpPr>
+          <p:cNvPr id="88" name="Oval 87"/>
+          <p:cNvSpPr/>
+          <p:nvPr/>
+        </p:nvSpPr>
+        <p:spPr>
+          <a:xfrm>
+            <a:off x="5266491" y="4685590"/>
+            <a:ext cx="174451" cy="183765"/>
+          </a:xfrm>
+          <a:prstGeom prst="ellipse">
+            <a:avLst/>
+          </a:prstGeom>
+          <a:solidFill>
+            <a:schemeClr val="tx1">
+              <a:lumMod val="50000"/>
+              <a:lumOff val="50000"/>
+            </a:schemeClr>
+          </a:solidFill>
+          <a:ln w="38100">
+            <a:solidFill>
+              <a:schemeClr val="tx1">
+                <a:lumMod val="50000"/>
+                <a:lumOff val="50000"/>
+              </a:schemeClr>
+            </a:solidFill>
+          </a:ln>
+        </p:spPr>
+        <p:style>
+          <a:lnRef idx="2">
+            <a:schemeClr val="accent1">
+              <a:shade val="50000"/>
+            </a:schemeClr>
+          </a:lnRef>
+          <a:fillRef idx="1">
+            <a:schemeClr val="accent1"/>
+          </a:fillRef>
+          <a:effectRef idx="0">
+            <a:schemeClr val="accent1"/>
+          </a:effectRef>
+          <a:fontRef idx="minor">
+            <a:schemeClr val="lt1"/>
+          </a:fontRef>
+        </p:style>
+        <p:txBody>
+          <a:bodyPr rtlCol="0" anchor="ctr"/>
+          <a:lstStyle/>
+          <a:p>
+            <a:pPr algn="ctr"/>
+            <a:endParaRPr lang="en-US"/>
+          </a:p>
+        </p:txBody>
+      </p:sp>
+      <p:sp>
+        <p:nvSpPr>
+          <p:cNvPr id="89" name="Isosceles Triangle 88"/>
+          <p:cNvSpPr/>
+          <p:nvPr/>
+        </p:nvSpPr>
+        <p:spPr>
+          <a:xfrm>
+            <a:off x="3761764" y="4665383"/>
+            <a:ext cx="180669" cy="170788"/>
+          </a:xfrm>
+          <a:prstGeom prst="triangle">
+            <a:avLst/>
+          </a:prstGeom>
+          <a:solidFill>
+            <a:schemeClr val="tx1">
+              <a:lumMod val="50000"/>
+              <a:lumOff val="50000"/>
+            </a:schemeClr>
+          </a:solidFill>
+          <a:ln w="38100">
+            <a:solidFill>
+              <a:schemeClr val="tx1">
+                <a:lumMod val="50000"/>
+                <a:lumOff val="50000"/>
+              </a:schemeClr>
+            </a:solidFill>
+          </a:ln>
+        </p:spPr>
+        <p:style>
+          <a:lnRef idx="2">
+            <a:schemeClr val="accent1">
+              <a:shade val="50000"/>
+            </a:schemeClr>
+          </a:lnRef>
+          <a:fillRef idx="1">
+            <a:schemeClr val="accent1"/>
+          </a:fillRef>
+          <a:effectRef idx="0">
+            <a:schemeClr val="accent1"/>
+          </a:effectRef>
+          <a:fontRef idx="minor">
+            <a:schemeClr val="lt1"/>
+          </a:fontRef>
+        </p:style>
+        <p:txBody>
+          <a:bodyPr rtlCol="0" anchor="ctr"/>
+          <a:lstStyle/>
+          <a:p>
+            <a:pPr algn="ctr"/>
+            <a:endParaRPr lang="en-US"/>
+          </a:p>
+        </p:txBody>
+      </p:sp>
+      <p:sp>
+        <p:nvSpPr>
+          <p:cNvPr id="90" name="5-Point Star 89"/>
+          <p:cNvSpPr/>
+          <p:nvPr/>
+        </p:nvSpPr>
+        <p:spPr>
+          <a:xfrm>
+            <a:off x="3770763" y="6217030"/>
+            <a:ext cx="222222" cy="187270"/>
+          </a:xfrm>
+          <a:prstGeom prst="star5">
+            <a:avLst/>
+          </a:prstGeom>
+          <a:solidFill>
+            <a:schemeClr val="tx1">
+              <a:lumMod val="50000"/>
+              <a:lumOff val="50000"/>
+            </a:schemeClr>
+          </a:solidFill>
+          <a:ln w="28575">
+            <a:solidFill>
+              <a:schemeClr val="tx1">
+                <a:lumMod val="50000"/>
+                <a:lumOff val="50000"/>
+              </a:schemeClr>
+            </a:solidFill>
+          </a:ln>
+        </p:spPr>
+        <p:style>
+          <a:lnRef idx="2">
+            <a:schemeClr val="accent1">
+              <a:shade val="50000"/>
+            </a:schemeClr>
+          </a:lnRef>
+          <a:fillRef idx="1">
+            <a:schemeClr val="accent1"/>
+          </a:fillRef>
+          <a:effectRef idx="0">
+            <a:schemeClr val="accent1"/>
+          </a:effectRef>
+          <a:fontRef idx="minor">
+            <a:schemeClr val="lt1"/>
+          </a:fontRef>
+        </p:style>
+        <p:txBody>
+          <a:bodyPr rtlCol="0" anchor="ctr"/>
+          <a:lstStyle/>
+          <a:p>
+            <a:pPr algn="ctr"/>
+            <a:endParaRPr lang="en-US"/>
+          </a:p>
+        </p:txBody>
+      </p:sp>
+      <p:sp>
+        <p:nvSpPr>
+          <p:cNvPr id="16" name="Cross 15"/>
+          <p:cNvSpPr/>
+          <p:nvPr/>
+        </p:nvSpPr>
+        <p:spPr>
+          <a:xfrm>
+            <a:off x="1875454" y="6054854"/>
+            <a:ext cx="254081" cy="229821"/>
+          </a:xfrm>
+          <a:prstGeom prst="plus">
+            <a:avLst/>
+          </a:prstGeom>
+          <a:noFill/>
+          <a:ln w="38100">
+            <a:solidFill>
+              <a:schemeClr val="tx1">
+                <a:lumMod val="50000"/>
+                <a:lumOff val="50000"/>
+              </a:schemeClr>
+            </a:solidFill>
+          </a:ln>
+        </p:spPr>
+        <p:style>
+          <a:lnRef idx="2">
+            <a:schemeClr val="accent1">
+              <a:shade val="50000"/>
+            </a:schemeClr>
+          </a:lnRef>
+          <a:fillRef idx="1">
+            <a:schemeClr val="accent1"/>
+          </a:fillRef>
+          <a:effectRef idx="0">
+            <a:schemeClr val="accent1"/>
+          </a:effectRef>
+          <a:fontRef idx="minor">
+            <a:schemeClr val="lt1"/>
+          </a:fontRef>
+        </p:style>
+        <p:txBody>
+          <a:bodyPr rtlCol="0" anchor="ctr"/>
+          <a:lstStyle/>
+          <a:p>
+            <a:pPr algn="ctr"/>
+            <a:endParaRPr lang="en-US"/>
+          </a:p>
+        </p:txBody>
+      </p:sp>
+      <p:sp>
+        <p:nvSpPr>
+          <p:cNvPr id="17" name="Right Triangle 16"/>
+          <p:cNvSpPr/>
+          <p:nvPr/>
+        </p:nvSpPr>
+        <p:spPr>
+          <a:xfrm>
+            <a:off x="657232" y="5777729"/>
+            <a:ext cx="212183" cy="184569"/>
+          </a:xfrm>
+          <a:prstGeom prst="rtTriangle">
+            <a:avLst/>
+          </a:prstGeom>
+          <a:noFill/>
+          <a:ln w="38100">
+            <a:solidFill>
+              <a:schemeClr val="tx1">
+                <a:lumMod val="50000"/>
+                <a:lumOff val="50000"/>
+              </a:schemeClr>
+            </a:solidFill>
+          </a:ln>
+        </p:spPr>
+        <p:style>
+          <a:lnRef idx="2">
+            <a:schemeClr val="accent1">
+              <a:shade val="50000"/>
+            </a:schemeClr>
+          </a:lnRef>
+          <a:fillRef idx="1">
+            <a:schemeClr val="accent1"/>
+          </a:fillRef>
+          <a:effectRef idx="0">
+            <a:schemeClr val="accent1"/>
+          </a:effectRef>
+          <a:fontRef idx="minor">
+            <a:schemeClr val="lt1"/>
+          </a:fontRef>
+        </p:style>
+        <p:txBody>
+          <a:bodyPr rtlCol="0" anchor="ctr"/>
+          <a:lstStyle/>
+          <a:p>
+            <a:pPr algn="ctr"/>
+            <a:endParaRPr lang="en-US"/>
+          </a:p>
+        </p:txBody>
+      </p:sp>
+      <p:sp>
+        <p:nvSpPr>
+          <p:cNvPr id="18" name="Parallelogram 17"/>
+          <p:cNvSpPr/>
+          <p:nvPr/>
+        </p:nvSpPr>
+        <p:spPr>
+          <a:xfrm>
+            <a:off x="1020475" y="4817703"/>
+            <a:ext cx="281363" cy="160133"/>
+          </a:xfrm>
+          <a:prstGeom prst="parallelogram">
+            <a:avLst/>
+          </a:prstGeom>
+          <a:noFill/>
+          <a:ln w="38100">
+            <a:solidFill>
+              <a:schemeClr val="tx1">
+                <a:lumMod val="50000"/>
+                <a:lumOff val="50000"/>
+              </a:schemeClr>
+            </a:solidFill>
+          </a:ln>
+        </p:spPr>
+        <p:style>
+          <a:lnRef idx="2">
+            <a:schemeClr val="accent1">
+              <a:shade val="50000"/>
+            </a:schemeClr>
+          </a:lnRef>
+          <a:fillRef idx="1">
+            <a:schemeClr val="accent1"/>
+          </a:fillRef>
+          <a:effectRef idx="0">
+            <a:schemeClr val="accent1"/>
+          </a:effectRef>
+          <a:fontRef idx="minor">
+            <a:schemeClr val="lt1"/>
+          </a:fontRef>
+        </p:style>
+        <p:txBody>
+          <a:bodyPr rtlCol="0" anchor="ctr"/>
+          <a:lstStyle/>
+          <a:p>
+            <a:pPr algn="ctr"/>
+            <a:endParaRPr lang="en-US"/>
+          </a:p>
+        </p:txBody>
+      </p:sp>
+      <p:sp>
+        <p:nvSpPr>
+          <p:cNvPr id="19" name="Hexagon 18"/>
+          <p:cNvSpPr/>
+          <p:nvPr/>
+        </p:nvSpPr>
+        <p:spPr>
+          <a:xfrm>
+            <a:off x="4531033" y="4721915"/>
+            <a:ext cx="237744" cy="216145"/>
+          </a:xfrm>
+          <a:prstGeom prst="hexagon">
+            <a:avLst/>
+          </a:prstGeom>
+          <a:noFill/>
+          <a:ln w="38100">
+            <a:solidFill>
+              <a:schemeClr val="tx1">
+                <a:lumMod val="50000"/>
+                <a:lumOff val="50000"/>
+              </a:schemeClr>
+            </a:solidFill>
+          </a:ln>
+        </p:spPr>
+        <p:style>
+          <a:lnRef idx="2">
+            <a:schemeClr val="accent1">
+              <a:shade val="50000"/>
+            </a:schemeClr>
+          </a:lnRef>
+          <a:fillRef idx="1">
+            <a:schemeClr val="accent1"/>
+          </a:fillRef>
+          <a:effectRef idx="0">
+            <a:schemeClr val="accent1"/>
+          </a:effectRef>
+          <a:fontRef idx="minor">
+            <a:schemeClr val="lt1"/>
+          </a:fontRef>
+        </p:style>
+        <p:txBody>
+          <a:bodyPr rtlCol="0" anchor="ctr"/>
+          <a:lstStyle/>
+          <a:p>
+            <a:pPr algn="ctr"/>
+            <a:endParaRPr lang="en-US"/>
+          </a:p>
+        </p:txBody>
+      </p:sp>
+      <p:sp>
+        <p:nvSpPr>
+          <p:cNvPr id="20" name="Moon 19"/>
+          <p:cNvSpPr/>
+          <p:nvPr/>
+        </p:nvSpPr>
+        <p:spPr>
+          <a:xfrm>
+            <a:off x="3833513" y="5602297"/>
+            <a:ext cx="118578" cy="175637"/>
+          </a:xfrm>
+          <a:prstGeom prst="moon">
+            <a:avLst/>
+          </a:prstGeom>
+          <a:noFill/>
+          <a:ln w="28575">
+            <a:solidFill>
+              <a:schemeClr val="tx1">
+                <a:lumMod val="50000"/>
+                <a:lumOff val="50000"/>
+              </a:schemeClr>
+            </a:solidFill>
+          </a:ln>
+        </p:spPr>
+        <p:style>
+          <a:lnRef idx="2">
+            <a:schemeClr val="accent1">
+              <a:shade val="50000"/>
+            </a:schemeClr>
+          </a:lnRef>
+          <a:fillRef idx="1">
+            <a:schemeClr val="accent1"/>
+          </a:fillRef>
+          <a:effectRef idx="0">
+            <a:schemeClr val="accent1"/>
+          </a:effectRef>
+          <a:fontRef idx="minor">
+            <a:schemeClr val="lt1"/>
+          </a:fontRef>
+        </p:style>
+        <p:txBody>
+          <a:bodyPr rtlCol="0" anchor="ctr"/>
+          <a:lstStyle/>
+          <a:p>
+            <a:pPr algn="ctr"/>
+            <a:endParaRPr lang="en-US"/>
+          </a:p>
+        </p:txBody>
+      </p:sp>
+      <p:sp>
+        <p:nvSpPr>
+          <p:cNvPr id="21" name="Trapezoid 20"/>
+          <p:cNvSpPr/>
+          <p:nvPr/>
+        </p:nvSpPr>
+        <p:spPr>
+          <a:xfrm>
+            <a:off x="4859478" y="6178070"/>
+            <a:ext cx="240145" cy="183385"/>
+          </a:xfrm>
+          <a:prstGeom prst="trapezoid">
+            <a:avLst/>
+          </a:prstGeom>
+          <a:noFill/>
+          <a:ln w="38100">
+            <a:solidFill>
+              <a:schemeClr val="tx1">
+                <a:lumMod val="50000"/>
+                <a:lumOff val="50000"/>
+              </a:schemeClr>
+            </a:solidFill>
+          </a:ln>
+        </p:spPr>
+        <p:style>
+          <a:lnRef idx="2">
+            <a:schemeClr val="accent1">
+              <a:shade val="50000"/>
+            </a:schemeClr>
+          </a:lnRef>
+          <a:fillRef idx="1">
+            <a:schemeClr val="accent1"/>
+          </a:fillRef>
+          <a:effectRef idx="0">
+            <a:schemeClr val="accent1"/>
+          </a:effectRef>
+          <a:fontRef idx="minor">
+            <a:schemeClr val="lt1"/>
+          </a:fontRef>
+        </p:style>
+        <p:txBody>
+          <a:bodyPr rtlCol="0" anchor="ctr"/>
+          <a:lstStyle/>
+          <a:p>
+            <a:pPr algn="ctr"/>
+            <a:endParaRPr lang="en-US"/>
+          </a:p>
+        </p:txBody>
+      </p:sp>
+      <p:sp>
+        <p:nvSpPr>
+          <p:cNvPr id="59" name="Diamond 58"/>
+          <p:cNvSpPr/>
+          <p:nvPr/>
+        </p:nvSpPr>
+        <p:spPr>
+          <a:xfrm>
+            <a:off x="4387705" y="3613493"/>
+            <a:ext cx="85000" cy="95276"/>
+          </a:xfrm>
+          <a:prstGeom prst="diamond">
+            <a:avLst/>
+          </a:prstGeom>
+          <a:solidFill>
+            <a:schemeClr val="tx1">
+              <a:lumMod val="50000"/>
+              <a:lumOff val="50000"/>
+            </a:schemeClr>
+          </a:solidFill>
+          <a:ln w="38100">
+            <a:solidFill>
+              <a:schemeClr val="tx1">
+                <a:lumMod val="50000"/>
+                <a:lumOff val="50000"/>
+              </a:schemeClr>
+            </a:solidFill>
+          </a:ln>
+        </p:spPr>
+        <p:style>
+          <a:lnRef idx="2">
+            <a:schemeClr val="accent1">
+              <a:shade val="50000"/>
+            </a:schemeClr>
+          </a:lnRef>
+          <a:fillRef idx="1">
+            <a:schemeClr val="accent1"/>
+          </a:fillRef>
+          <a:effectRef idx="0">
+            <a:schemeClr val="accent1"/>
+          </a:effectRef>
+          <a:fontRef idx="minor">
+            <a:schemeClr val="lt1"/>
+          </a:fontRef>
+        </p:style>
+        <p:txBody>
+          <a:bodyPr rtlCol="0" anchor="ctr"/>
+          <a:lstStyle/>
+          <a:p>
+            <a:pPr algn="ctr"/>
+            <a:endParaRPr lang="en-US"/>
+          </a:p>
+        </p:txBody>
+      </p:sp>
+      <p:sp>
+        <p:nvSpPr>
+          <p:cNvPr id="61" name="Rectangle 60"/>
+          <p:cNvSpPr/>
+          <p:nvPr/>
+        </p:nvSpPr>
+        <p:spPr>
+          <a:xfrm>
+            <a:off x="3951921" y="4220307"/>
+            <a:ext cx="86448" cy="85572"/>
+          </a:xfrm>
+          <a:prstGeom prst="rect">
+            <a:avLst/>
+          </a:prstGeom>
+          <a:solidFill>
+            <a:schemeClr val="tx1">
+              <a:lumMod val="50000"/>
+              <a:lumOff val="50000"/>
+            </a:schemeClr>
+          </a:solidFill>
+          <a:ln w="38100">
+            <a:solidFill>
+              <a:schemeClr val="tx1">
+                <a:lumMod val="50000"/>
+                <a:lumOff val="50000"/>
+              </a:schemeClr>
+            </a:solidFill>
+          </a:ln>
+        </p:spPr>
+        <p:style>
+          <a:lnRef idx="2">
+            <a:schemeClr val="accent1">
+              <a:shade val="50000"/>
+            </a:schemeClr>
+          </a:lnRef>
+          <a:fillRef idx="1">
+            <a:schemeClr val="accent1"/>
+          </a:fillRef>
+          <a:effectRef idx="0">
+            <a:schemeClr val="accent1"/>
+          </a:effectRef>
+          <a:fontRef idx="minor">
+            <a:schemeClr val="lt1"/>
+          </a:fontRef>
+        </p:style>
+        <p:txBody>
+          <a:bodyPr rtlCol="0" anchor="ctr"/>
+          <a:lstStyle/>
+          <a:p>
+            <a:pPr algn="ctr"/>
+            <a:endParaRPr lang="en-US"/>
+          </a:p>
+        </p:txBody>
+      </p:sp>
+      <p:sp>
+        <p:nvSpPr>
+          <p:cNvPr id="62" name="Oval 61"/>
+          <p:cNvSpPr/>
+          <p:nvPr/>
+        </p:nvSpPr>
+        <p:spPr>
+          <a:xfrm>
+            <a:off x="3734742" y="3913037"/>
+            <a:ext cx="101737" cy="100606"/>
+          </a:xfrm>
+          <a:prstGeom prst="ellipse">
+            <a:avLst/>
+          </a:prstGeom>
+          <a:solidFill>
+            <a:schemeClr val="tx1">
+              <a:lumMod val="50000"/>
+              <a:lumOff val="50000"/>
+            </a:schemeClr>
+          </a:solidFill>
+          <a:ln w="38100">
+            <a:solidFill>
+              <a:schemeClr val="tx1">
+                <a:lumMod val="50000"/>
+                <a:lumOff val="50000"/>
+              </a:schemeClr>
+            </a:solidFill>
+          </a:ln>
+        </p:spPr>
+        <p:style>
+          <a:lnRef idx="2">
+            <a:schemeClr val="accent1">
+              <a:shade val="50000"/>
+            </a:schemeClr>
+          </a:lnRef>
+          <a:fillRef idx="1">
+            <a:schemeClr val="accent1"/>
+          </a:fillRef>
+          <a:effectRef idx="0">
+            <a:schemeClr val="accent1"/>
+          </a:effectRef>
+          <a:fontRef idx="minor">
+            <a:schemeClr val="lt1"/>
+          </a:fontRef>
+        </p:style>
+        <p:txBody>
+          <a:bodyPr rtlCol="0" anchor="ctr"/>
+          <a:lstStyle/>
+          <a:p>
+            <a:pPr algn="ctr"/>
+            <a:endParaRPr lang="en-US"/>
+          </a:p>
+        </p:txBody>
+      </p:sp>
+      <p:sp>
+        <p:nvSpPr>
+          <p:cNvPr id="63" name="Isosceles Triangle 62"/>
+          <p:cNvSpPr/>
+          <p:nvPr/>
+        </p:nvSpPr>
+        <p:spPr>
+          <a:xfrm>
+            <a:off x="3575036" y="3572375"/>
+            <a:ext cx="68090" cy="65387"/>
+          </a:xfrm>
+          <a:prstGeom prst="triangle">
+            <a:avLst/>
+          </a:prstGeom>
+          <a:solidFill>
+            <a:schemeClr val="tx1">
+              <a:lumMod val="50000"/>
+              <a:lumOff val="50000"/>
+            </a:schemeClr>
+          </a:solidFill>
+          <a:ln w="38100">
+            <a:solidFill>
+              <a:schemeClr val="tx1">
+                <a:lumMod val="50000"/>
+                <a:lumOff val="50000"/>
+              </a:schemeClr>
+            </a:solidFill>
+          </a:ln>
+        </p:spPr>
+        <p:style>
+          <a:lnRef idx="2">
+            <a:schemeClr val="accent1">
+              <a:shade val="50000"/>
+            </a:schemeClr>
+          </a:lnRef>
+          <a:fillRef idx="1">
+            <a:schemeClr val="accent1"/>
+          </a:fillRef>
+          <a:effectRef idx="0">
+            <a:schemeClr val="accent1"/>
+          </a:effectRef>
+          <a:fontRef idx="minor">
+            <a:schemeClr val="lt1"/>
+          </a:fontRef>
+        </p:style>
+        <p:txBody>
+          <a:bodyPr rtlCol="0" anchor="ctr"/>
+          <a:lstStyle/>
+          <a:p>
+            <a:pPr algn="ctr"/>
+            <a:endParaRPr lang="en-US"/>
+          </a:p>
+        </p:txBody>
+      </p:sp>
+      <p:sp>
+        <p:nvSpPr>
+          <p:cNvPr id="64" name="5-Point Star 63"/>
+          <p:cNvSpPr/>
+          <p:nvPr/>
+        </p:nvSpPr>
+        <p:spPr>
+          <a:xfrm>
+            <a:off x="4145124" y="3844675"/>
+            <a:ext cx="90516" cy="95344"/>
+          </a:xfrm>
+          <a:prstGeom prst="star5">
+            <a:avLst/>
+          </a:prstGeom>
+          <a:solidFill>
+            <a:schemeClr val="tx1">
+              <a:lumMod val="50000"/>
+              <a:lumOff val="50000"/>
+            </a:schemeClr>
+          </a:solidFill>
+          <a:ln w="28575">
+            <a:solidFill>
+              <a:schemeClr val="tx1">
+                <a:lumMod val="50000"/>
+                <a:lumOff val="50000"/>
+              </a:schemeClr>
+            </a:solidFill>
+          </a:ln>
+        </p:spPr>
+        <p:style>
+          <a:lnRef idx="2">
+            <a:schemeClr val="accent1">
+              <a:shade val="50000"/>
+            </a:schemeClr>
+          </a:lnRef>
+          <a:fillRef idx="1">
+            <a:schemeClr val="accent1"/>
+          </a:fillRef>
+          <a:effectRef idx="0">
+            <a:schemeClr val="accent1"/>
+          </a:effectRef>
+          <a:fontRef idx="minor">
+            <a:schemeClr val="lt1"/>
+          </a:fontRef>
+        </p:style>
+        <p:txBody>
+          <a:bodyPr rtlCol="0" anchor="ctr"/>
+          <a:lstStyle/>
+          <a:p>
+            <a:pPr algn="ctr"/>
+            <a:endParaRPr lang="en-US"/>
+          </a:p>
+        </p:txBody>
+      </p:sp>
+      <p:sp>
+        <p:nvSpPr>
+          <p:cNvPr id="67" name="Right Triangle 66"/>
+          <p:cNvSpPr/>
+          <p:nvPr/>
+        </p:nvSpPr>
+        <p:spPr>
+          <a:xfrm>
+            <a:off x="4371142" y="4106292"/>
+            <a:ext cx="101562" cy="102765"/>
+          </a:xfrm>
+          <a:prstGeom prst="rtTriangle">
+            <a:avLst/>
+          </a:prstGeom>
+          <a:noFill/>
+          <a:ln w="38100">
+            <a:solidFill>
+              <a:schemeClr val="tx1">
+                <a:lumMod val="50000"/>
+                <a:lumOff val="50000"/>
+              </a:schemeClr>
+            </a:solidFill>
+          </a:ln>
+        </p:spPr>
+        <p:style>
+          <a:lnRef idx="2">
+            <a:schemeClr val="accent1">
+              <a:shade val="50000"/>
+            </a:schemeClr>
+          </a:lnRef>
+          <a:fillRef idx="1">
+            <a:schemeClr val="accent1"/>
+          </a:fillRef>
+          <a:effectRef idx="0">
+            <a:schemeClr val="accent1"/>
+          </a:effectRef>
+          <a:fontRef idx="minor">
+            <a:schemeClr val="lt1"/>
+          </a:fontRef>
+        </p:style>
+        <p:txBody>
+          <a:bodyPr rtlCol="0" anchor="ctr"/>
+          <a:lstStyle/>
+          <a:p>
+            <a:pPr algn="ctr"/>
+            <a:endParaRPr lang="en-US"/>
+          </a:p>
+        </p:txBody>
+      </p:sp>
+      <p:sp>
+        <p:nvSpPr>
+          <p:cNvPr id="68" name="Parallelogram 67"/>
+          <p:cNvSpPr/>
+          <p:nvPr/>
+        </p:nvSpPr>
+        <p:spPr>
+          <a:xfrm>
+            <a:off x="3942433" y="3613493"/>
+            <a:ext cx="128865" cy="79688"/>
+          </a:xfrm>
+          <a:prstGeom prst="parallelogram">
+            <a:avLst/>
+          </a:prstGeom>
+          <a:noFill/>
+          <a:ln w="38100">
+            <a:solidFill>
+              <a:schemeClr val="tx1">
+                <a:lumMod val="50000"/>
+                <a:lumOff val="50000"/>
+              </a:schemeClr>
+            </a:solidFill>
+          </a:ln>
+        </p:spPr>
+        <p:style>
+          <a:lnRef idx="2">
+            <a:schemeClr val="accent1">
+              <a:shade val="50000"/>
+            </a:schemeClr>
+          </a:lnRef>
+          <a:fillRef idx="1">
+            <a:schemeClr val="accent1"/>
+          </a:fillRef>
+          <a:effectRef idx="0">
+            <a:schemeClr val="accent1"/>
+          </a:effectRef>
+          <a:fontRef idx="minor">
+            <a:schemeClr val="lt1"/>
+          </a:fontRef>
+        </p:style>
+        <p:txBody>
+          <a:bodyPr rtlCol="0" anchor="ctr"/>
+          <a:lstStyle/>
+          <a:p>
+            <a:pPr algn="ctr"/>
+            <a:endParaRPr lang="en-US"/>
+          </a:p>
+        </p:txBody>
+      </p:sp>
+      <p:sp>
+        <p:nvSpPr>
+          <p:cNvPr id="69" name="Diamond 68"/>
+          <p:cNvSpPr/>
+          <p:nvPr/>
+        </p:nvSpPr>
+        <p:spPr>
+          <a:xfrm>
+            <a:off x="5667446" y="3572375"/>
+            <a:ext cx="85000" cy="96630"/>
+          </a:xfrm>
+          <a:prstGeom prst="diamond">
+            <a:avLst/>
+          </a:prstGeom>
+          <a:solidFill>
+            <a:schemeClr val="tx1">
+              <a:lumMod val="50000"/>
+              <a:lumOff val="50000"/>
+            </a:schemeClr>
+          </a:solidFill>
+          <a:ln w="38100">
+            <a:solidFill>
+              <a:schemeClr val="tx1">
+                <a:lumMod val="50000"/>
+                <a:lumOff val="50000"/>
+              </a:schemeClr>
+            </a:solidFill>
+          </a:ln>
+        </p:spPr>
+        <p:style>
+          <a:lnRef idx="2">
+            <a:schemeClr val="accent1">
+              <a:shade val="50000"/>
+            </a:schemeClr>
+          </a:lnRef>
+          <a:fillRef idx="1">
+            <a:schemeClr val="accent1"/>
+          </a:fillRef>
+          <a:effectRef idx="0">
+            <a:schemeClr val="accent1"/>
+          </a:effectRef>
+          <a:fontRef idx="minor">
+            <a:schemeClr val="lt1"/>
+          </a:fontRef>
+        </p:style>
+        <p:txBody>
+          <a:bodyPr rtlCol="0" anchor="ctr"/>
+          <a:lstStyle/>
+          <a:p>
+            <a:pPr algn="ctr"/>
+            <a:endParaRPr lang="en-US"/>
+          </a:p>
+        </p:txBody>
+      </p:sp>
+      <p:sp>
+        <p:nvSpPr>
+          <p:cNvPr id="70" name="Rectangle 69"/>
+          <p:cNvSpPr/>
+          <p:nvPr/>
+        </p:nvSpPr>
+        <p:spPr>
+          <a:xfrm>
+            <a:off x="5231662" y="4180543"/>
+            <a:ext cx="86448" cy="85572"/>
           </a:xfrm>
           <a:prstGeom prst="rect">
             <a:avLst/>
           </a:prstGeom>
           <a:noFill/>
-        </p:spPr>
-        <p:txBody>
-          <a:bodyPr wrap="square" rtlCol="0">
-            <a:spAutoFit/>
-          </a:bodyPr>
-          <a:lstStyle/>
-          <a:p>
-            <a:r>
-              <a:rPr lang="en-US" sz="1000" dirty="0" smtClean="0"/>
-              <a:t>Open square = core,</a:t>
-            </a:r>
-          </a:p>
-          <a:p>
-            <a:r>
-              <a:rPr lang="en-US" sz="1000" dirty="0" smtClean="0"/>
-              <a:t>filled diamond/circle = transients</a:t>
-            </a:r>
+          <a:ln w="38100">
+            <a:solidFill>
+              <a:schemeClr val="tx1">
+                <a:lumMod val="50000"/>
+                <a:lumOff val="50000"/>
+              </a:schemeClr>
+            </a:solidFill>
+          </a:ln>
+        </p:spPr>
+        <p:style>
+          <a:lnRef idx="2">
+            <a:schemeClr val="accent1">
+              <a:shade val="50000"/>
+            </a:schemeClr>
+          </a:lnRef>
+          <a:fillRef idx="1">
+            <a:schemeClr val="accent1"/>
+          </a:fillRef>
+          <a:effectRef idx="0">
+            <a:schemeClr val="accent1"/>
+          </a:effectRef>
+          <a:fontRef idx="minor">
+            <a:schemeClr val="lt1"/>
+          </a:fontRef>
+        </p:style>
+        <p:txBody>
+          <a:bodyPr rtlCol="0" anchor="ctr"/>
+          <a:lstStyle/>
+          <a:p>
+            <a:pPr algn="ctr"/>
+            <a:endParaRPr lang="en-US"/>
+          </a:p>
+        </p:txBody>
+      </p:sp>
+      <p:sp>
+        <p:nvSpPr>
+          <p:cNvPr id="71" name="Oval 70"/>
+          <p:cNvSpPr/>
+          <p:nvPr/>
+        </p:nvSpPr>
+        <p:spPr>
+          <a:xfrm>
+            <a:off x="5014483" y="3873273"/>
+            <a:ext cx="101737" cy="100606"/>
+          </a:xfrm>
+          <a:prstGeom prst="ellipse">
+            <a:avLst/>
+          </a:prstGeom>
+          <a:solidFill>
+            <a:schemeClr val="tx1">
+              <a:lumMod val="50000"/>
+              <a:lumOff val="50000"/>
+            </a:schemeClr>
+          </a:solidFill>
+          <a:ln w="38100">
+            <a:solidFill>
+              <a:schemeClr val="tx1">
+                <a:lumMod val="50000"/>
+                <a:lumOff val="50000"/>
+              </a:schemeClr>
+            </a:solidFill>
+          </a:ln>
+        </p:spPr>
+        <p:style>
+          <a:lnRef idx="2">
+            <a:schemeClr val="accent1">
+              <a:shade val="50000"/>
+            </a:schemeClr>
+          </a:lnRef>
+          <a:fillRef idx="1">
+            <a:schemeClr val="accent1"/>
+          </a:fillRef>
+          <a:effectRef idx="0">
+            <a:schemeClr val="accent1"/>
+          </a:effectRef>
+          <a:fontRef idx="minor">
+            <a:schemeClr val="lt1"/>
+          </a:fontRef>
+        </p:style>
+        <p:txBody>
+          <a:bodyPr rtlCol="0" anchor="ctr"/>
+          <a:lstStyle/>
+          <a:p>
+            <a:pPr algn="ctr"/>
+            <a:endParaRPr lang="en-US"/>
+          </a:p>
+        </p:txBody>
+      </p:sp>
+      <p:sp>
+        <p:nvSpPr>
+          <p:cNvPr id="72" name="Isosceles Triangle 71"/>
+          <p:cNvSpPr/>
+          <p:nvPr/>
+        </p:nvSpPr>
+        <p:spPr>
+          <a:xfrm>
+            <a:off x="4854776" y="3532611"/>
+            <a:ext cx="83517" cy="80882"/>
+          </a:xfrm>
+          <a:prstGeom prst="triangle">
+            <a:avLst/>
+          </a:prstGeom>
+          <a:noFill/>
+          <a:ln w="28575">
+            <a:solidFill>
+              <a:schemeClr val="tx1">
+                <a:lumMod val="50000"/>
+                <a:lumOff val="50000"/>
+              </a:schemeClr>
+            </a:solidFill>
+          </a:ln>
+        </p:spPr>
+        <p:style>
+          <a:lnRef idx="2">
+            <a:schemeClr val="accent1">
+              <a:shade val="50000"/>
+            </a:schemeClr>
+          </a:lnRef>
+          <a:fillRef idx="1">
+            <a:schemeClr val="accent1"/>
+          </a:fillRef>
+          <a:effectRef idx="0">
+            <a:schemeClr val="accent1"/>
+          </a:effectRef>
+          <a:fontRef idx="minor">
+            <a:schemeClr val="lt1"/>
+          </a:fontRef>
+        </p:style>
+        <p:txBody>
+          <a:bodyPr rtlCol="0" anchor="ctr"/>
+          <a:lstStyle/>
+          <a:p>
+            <a:pPr algn="ctr"/>
+            <a:endParaRPr lang="en-US"/>
+          </a:p>
+        </p:txBody>
+      </p:sp>
+      <p:sp>
+        <p:nvSpPr>
+          <p:cNvPr id="76" name="5-Point Star 75"/>
+          <p:cNvSpPr/>
+          <p:nvPr/>
+        </p:nvSpPr>
+        <p:spPr>
+          <a:xfrm>
+            <a:off x="5424865" y="3804911"/>
+            <a:ext cx="90516" cy="95344"/>
+          </a:xfrm>
+          <a:prstGeom prst="star5">
+            <a:avLst/>
+          </a:prstGeom>
+          <a:solidFill>
+            <a:schemeClr val="tx1">
+              <a:lumMod val="50000"/>
+              <a:lumOff val="50000"/>
+            </a:schemeClr>
+          </a:solidFill>
+          <a:ln w="28575">
+            <a:solidFill>
+              <a:schemeClr val="tx1">
+                <a:lumMod val="50000"/>
+                <a:lumOff val="50000"/>
+              </a:schemeClr>
+            </a:solidFill>
+          </a:ln>
+        </p:spPr>
+        <p:style>
+          <a:lnRef idx="2">
+            <a:schemeClr val="accent1">
+              <a:shade val="50000"/>
+            </a:schemeClr>
+          </a:lnRef>
+          <a:fillRef idx="1">
+            <a:schemeClr val="accent1"/>
+          </a:fillRef>
+          <a:effectRef idx="0">
+            <a:schemeClr val="accent1"/>
+          </a:effectRef>
+          <a:fontRef idx="minor">
+            <a:schemeClr val="lt1"/>
+          </a:fontRef>
+        </p:style>
+        <p:txBody>
+          <a:bodyPr rtlCol="0" anchor="ctr"/>
+          <a:lstStyle/>
+          <a:p>
+            <a:pPr algn="ctr"/>
+            <a:endParaRPr lang="en-US"/>
+          </a:p>
+        </p:txBody>
+      </p:sp>
+      <p:sp>
+        <p:nvSpPr>
+          <p:cNvPr id="83" name="Right Triangle 82"/>
+          <p:cNvSpPr/>
+          <p:nvPr/>
+        </p:nvSpPr>
+        <p:spPr>
+          <a:xfrm>
+            <a:off x="5650883" y="4066528"/>
+            <a:ext cx="101562" cy="102765"/>
+          </a:xfrm>
+          <a:prstGeom prst="rtTriangle">
+            <a:avLst/>
+          </a:prstGeom>
+          <a:noFill/>
+          <a:ln w="38100">
+            <a:solidFill>
+              <a:schemeClr val="tx1">
+                <a:lumMod val="50000"/>
+                <a:lumOff val="50000"/>
+              </a:schemeClr>
+            </a:solidFill>
+          </a:ln>
+        </p:spPr>
+        <p:style>
+          <a:lnRef idx="2">
+            <a:schemeClr val="accent1">
+              <a:shade val="50000"/>
+            </a:schemeClr>
+          </a:lnRef>
+          <a:fillRef idx="1">
+            <a:schemeClr val="accent1"/>
+          </a:fillRef>
+          <a:effectRef idx="0">
+            <a:schemeClr val="accent1"/>
+          </a:effectRef>
+          <a:fontRef idx="minor">
+            <a:schemeClr val="lt1"/>
+          </a:fontRef>
+        </p:style>
+        <p:txBody>
+          <a:bodyPr rtlCol="0" anchor="ctr"/>
+          <a:lstStyle/>
+          <a:p>
+            <a:pPr algn="ctr"/>
+            <a:endParaRPr lang="en-US"/>
+          </a:p>
+        </p:txBody>
+      </p:sp>
+      <p:sp>
+        <p:nvSpPr>
+          <p:cNvPr id="84" name="Parallelogram 83"/>
+          <p:cNvSpPr/>
+          <p:nvPr/>
+        </p:nvSpPr>
+        <p:spPr>
+          <a:xfrm>
+            <a:off x="5222174" y="3573729"/>
+            <a:ext cx="128865" cy="79688"/>
+          </a:xfrm>
+          <a:prstGeom prst="parallelogram">
+            <a:avLst/>
+          </a:prstGeom>
+          <a:solidFill>
+            <a:schemeClr val="tx1">
+              <a:lumMod val="50000"/>
+              <a:lumOff val="50000"/>
+            </a:schemeClr>
+          </a:solidFill>
+          <a:ln w="38100">
+            <a:solidFill>
+              <a:schemeClr val="tx1">
+                <a:lumMod val="50000"/>
+                <a:lumOff val="50000"/>
+              </a:schemeClr>
+            </a:solidFill>
+          </a:ln>
+        </p:spPr>
+        <p:style>
+          <a:lnRef idx="2">
+            <a:schemeClr val="accent1">
+              <a:shade val="50000"/>
+            </a:schemeClr>
+          </a:lnRef>
+          <a:fillRef idx="1">
+            <a:schemeClr val="accent1"/>
+          </a:fillRef>
+          <a:effectRef idx="0">
+            <a:schemeClr val="accent1"/>
+          </a:effectRef>
+          <a:fontRef idx="minor">
+            <a:schemeClr val="lt1"/>
+          </a:fontRef>
+        </p:style>
+        <p:txBody>
+          <a:bodyPr rtlCol="0" anchor="ctr"/>
+          <a:lstStyle/>
+          <a:p>
+            <a:pPr algn="ctr"/>
+            <a:endParaRPr lang="en-US"/>
+          </a:p>
+        </p:txBody>
+      </p:sp>
+      <p:sp>
+        <p:nvSpPr>
+          <p:cNvPr id="85" name="Diamond 84"/>
+          <p:cNvSpPr/>
+          <p:nvPr/>
+        </p:nvSpPr>
+        <p:spPr>
+          <a:xfrm>
+            <a:off x="4419208" y="2479570"/>
+            <a:ext cx="110396" cy="97728"/>
+          </a:xfrm>
+          <a:prstGeom prst="diamond">
+            <a:avLst/>
+          </a:prstGeom>
+          <a:noFill/>
+          <a:ln w="28575">
+            <a:solidFill>
+              <a:schemeClr val="tx1">
+                <a:lumMod val="50000"/>
+                <a:lumOff val="50000"/>
+              </a:schemeClr>
+            </a:solidFill>
+          </a:ln>
+        </p:spPr>
+        <p:style>
+          <a:lnRef idx="2">
+            <a:schemeClr val="accent1">
+              <a:shade val="50000"/>
+            </a:schemeClr>
+          </a:lnRef>
+          <a:fillRef idx="1">
+            <a:schemeClr val="accent1"/>
+          </a:fillRef>
+          <a:effectRef idx="0">
+            <a:schemeClr val="accent1"/>
+          </a:effectRef>
+          <a:fontRef idx="minor">
+            <a:schemeClr val="lt1"/>
+          </a:fontRef>
+        </p:style>
+        <p:txBody>
+          <a:bodyPr rtlCol="0" anchor="ctr"/>
+          <a:lstStyle/>
+          <a:p>
+            <a:pPr algn="ctr"/>
+            <a:endParaRPr lang="en-US"/>
+          </a:p>
+        </p:txBody>
+      </p:sp>
+      <p:sp>
+        <p:nvSpPr>
+          <p:cNvPr id="92" name="Rectangle 91"/>
+          <p:cNvSpPr/>
+          <p:nvPr/>
+        </p:nvSpPr>
+        <p:spPr>
+          <a:xfrm>
+            <a:off x="3983424" y="3088837"/>
+            <a:ext cx="87874" cy="85572"/>
+          </a:xfrm>
+          <a:prstGeom prst="rect">
+            <a:avLst/>
+          </a:prstGeom>
+          <a:solidFill>
+            <a:schemeClr val="tx1">
+              <a:lumMod val="50000"/>
+              <a:lumOff val="50000"/>
+            </a:schemeClr>
+          </a:solidFill>
+          <a:ln w="38100">
+            <a:solidFill>
+              <a:schemeClr val="tx1">
+                <a:lumMod val="50000"/>
+                <a:lumOff val="50000"/>
+              </a:schemeClr>
+            </a:solidFill>
+          </a:ln>
+        </p:spPr>
+        <p:style>
+          <a:lnRef idx="2">
+            <a:schemeClr val="accent1">
+              <a:shade val="50000"/>
+            </a:schemeClr>
+          </a:lnRef>
+          <a:fillRef idx="1">
+            <a:schemeClr val="accent1"/>
+          </a:fillRef>
+          <a:effectRef idx="0">
+            <a:schemeClr val="accent1"/>
+          </a:effectRef>
+          <a:fontRef idx="minor">
+            <a:schemeClr val="lt1"/>
+          </a:fontRef>
+        </p:style>
+        <p:txBody>
+          <a:bodyPr rtlCol="0" anchor="ctr"/>
+          <a:lstStyle/>
+          <a:p>
+            <a:pPr algn="ctr"/>
+            <a:endParaRPr lang="en-US"/>
+          </a:p>
+        </p:txBody>
+      </p:sp>
+      <p:sp>
+        <p:nvSpPr>
+          <p:cNvPr id="93" name="Oval 92"/>
+          <p:cNvSpPr/>
+          <p:nvPr/>
+        </p:nvSpPr>
+        <p:spPr>
+          <a:xfrm>
+            <a:off x="3766245" y="2781567"/>
+            <a:ext cx="101737" cy="100606"/>
+          </a:xfrm>
+          <a:prstGeom prst="ellipse">
+            <a:avLst/>
+          </a:prstGeom>
+          <a:solidFill>
+            <a:schemeClr val="tx1">
+              <a:lumMod val="50000"/>
+              <a:lumOff val="50000"/>
+            </a:schemeClr>
+          </a:solidFill>
+          <a:ln w="38100">
+            <a:solidFill>
+              <a:schemeClr val="tx1">
+                <a:lumMod val="50000"/>
+                <a:lumOff val="50000"/>
+              </a:schemeClr>
+            </a:solidFill>
+          </a:ln>
+        </p:spPr>
+        <p:style>
+          <a:lnRef idx="2">
+            <a:schemeClr val="accent1">
+              <a:shade val="50000"/>
+            </a:schemeClr>
+          </a:lnRef>
+          <a:fillRef idx="1">
+            <a:schemeClr val="accent1"/>
+          </a:fillRef>
+          <a:effectRef idx="0">
+            <a:schemeClr val="accent1"/>
+          </a:effectRef>
+          <a:fontRef idx="minor">
+            <a:schemeClr val="lt1"/>
+          </a:fontRef>
+        </p:style>
+        <p:txBody>
+          <a:bodyPr rtlCol="0" anchor="ctr"/>
+          <a:lstStyle/>
+          <a:p>
+            <a:pPr algn="ctr"/>
+            <a:endParaRPr lang="en-US"/>
+          </a:p>
+        </p:txBody>
+      </p:sp>
+      <p:sp>
+        <p:nvSpPr>
+          <p:cNvPr id="94" name="Isosceles Triangle 93"/>
+          <p:cNvSpPr/>
+          <p:nvPr/>
+        </p:nvSpPr>
+        <p:spPr>
+          <a:xfrm>
+            <a:off x="3606539" y="2440905"/>
+            <a:ext cx="68090" cy="65387"/>
+          </a:xfrm>
+          <a:prstGeom prst="triangle">
+            <a:avLst/>
+          </a:prstGeom>
+          <a:solidFill>
+            <a:schemeClr val="tx1">
+              <a:lumMod val="50000"/>
+              <a:lumOff val="50000"/>
+            </a:schemeClr>
+          </a:solidFill>
+          <a:ln w="38100">
+            <a:solidFill>
+              <a:schemeClr val="tx1">
+                <a:lumMod val="50000"/>
+                <a:lumOff val="50000"/>
+              </a:schemeClr>
+            </a:solidFill>
+          </a:ln>
+        </p:spPr>
+        <p:style>
+          <a:lnRef idx="2">
+            <a:schemeClr val="accent1">
+              <a:shade val="50000"/>
+            </a:schemeClr>
+          </a:lnRef>
+          <a:fillRef idx="1">
+            <a:schemeClr val="accent1"/>
+          </a:fillRef>
+          <a:effectRef idx="0">
+            <a:schemeClr val="accent1"/>
+          </a:effectRef>
+          <a:fontRef idx="minor">
+            <a:schemeClr val="lt1"/>
+          </a:fontRef>
+        </p:style>
+        <p:txBody>
+          <a:bodyPr rtlCol="0" anchor="ctr"/>
+          <a:lstStyle/>
+          <a:p>
+            <a:pPr algn="ctr"/>
+            <a:endParaRPr lang="en-US"/>
+          </a:p>
+        </p:txBody>
+      </p:sp>
+      <p:sp>
+        <p:nvSpPr>
+          <p:cNvPr id="95" name="5-Point Star 94"/>
+          <p:cNvSpPr/>
+          <p:nvPr/>
+        </p:nvSpPr>
+        <p:spPr>
+          <a:xfrm>
+            <a:off x="4176627" y="2713205"/>
+            <a:ext cx="126084" cy="116612"/>
+          </a:xfrm>
+          <a:prstGeom prst="star5">
+            <a:avLst/>
+          </a:prstGeom>
+          <a:noFill/>
+          <a:ln w="19050">
+            <a:solidFill>
+              <a:schemeClr val="tx1">
+                <a:lumMod val="50000"/>
+                <a:lumOff val="50000"/>
+              </a:schemeClr>
+            </a:solidFill>
+          </a:ln>
+        </p:spPr>
+        <p:style>
+          <a:lnRef idx="2">
+            <a:schemeClr val="accent1">
+              <a:shade val="50000"/>
+            </a:schemeClr>
+          </a:lnRef>
+          <a:fillRef idx="1">
+            <a:schemeClr val="accent1"/>
+          </a:fillRef>
+          <a:effectRef idx="0">
+            <a:schemeClr val="accent1"/>
+          </a:effectRef>
+          <a:fontRef idx="minor">
+            <a:schemeClr val="lt1"/>
+          </a:fontRef>
+        </p:style>
+        <p:txBody>
+          <a:bodyPr rtlCol="0" anchor="ctr"/>
+          <a:lstStyle/>
+          <a:p>
+            <a:pPr algn="ctr"/>
+            <a:endParaRPr lang="en-US"/>
+          </a:p>
+        </p:txBody>
+      </p:sp>
+      <p:sp>
+        <p:nvSpPr>
+          <p:cNvPr id="97" name="Right Triangle 96"/>
+          <p:cNvSpPr/>
+          <p:nvPr/>
+        </p:nvSpPr>
+        <p:spPr>
+          <a:xfrm>
+            <a:off x="4402645" y="2974822"/>
+            <a:ext cx="101562" cy="102765"/>
+          </a:xfrm>
+          <a:prstGeom prst="rtTriangle">
+            <a:avLst/>
+          </a:prstGeom>
+          <a:solidFill>
+            <a:schemeClr val="tx1">
+              <a:lumMod val="50000"/>
+              <a:lumOff val="50000"/>
+            </a:schemeClr>
+          </a:solidFill>
+          <a:ln w="38100">
+            <a:solidFill>
+              <a:schemeClr val="tx1">
+                <a:lumMod val="50000"/>
+                <a:lumOff val="50000"/>
+              </a:schemeClr>
+            </a:solidFill>
+          </a:ln>
+        </p:spPr>
+        <p:style>
+          <a:lnRef idx="2">
+            <a:schemeClr val="accent1">
+              <a:shade val="50000"/>
+            </a:schemeClr>
+          </a:lnRef>
+          <a:fillRef idx="1">
+            <a:schemeClr val="accent1"/>
+          </a:fillRef>
+          <a:effectRef idx="0">
+            <a:schemeClr val="accent1"/>
+          </a:effectRef>
+          <a:fontRef idx="minor">
+            <a:schemeClr val="lt1"/>
+          </a:fontRef>
+        </p:style>
+        <p:txBody>
+          <a:bodyPr rtlCol="0" anchor="ctr"/>
+          <a:lstStyle/>
+          <a:p>
+            <a:pPr algn="ctr"/>
+            <a:endParaRPr lang="en-US"/>
+          </a:p>
+        </p:txBody>
+      </p:sp>
+      <p:sp>
+        <p:nvSpPr>
+          <p:cNvPr id="99" name="Parallelogram 98"/>
+          <p:cNvSpPr/>
+          <p:nvPr/>
+        </p:nvSpPr>
+        <p:spPr>
+          <a:xfrm>
+            <a:off x="3973936" y="2482023"/>
+            <a:ext cx="128865" cy="79688"/>
+          </a:xfrm>
+          <a:prstGeom prst="parallelogram">
+            <a:avLst/>
+          </a:prstGeom>
+          <a:solidFill>
+            <a:schemeClr val="tx1">
+              <a:lumMod val="50000"/>
+              <a:lumOff val="50000"/>
+            </a:schemeClr>
+          </a:solidFill>
+          <a:ln w="38100">
+            <a:solidFill>
+              <a:schemeClr val="tx1">
+                <a:lumMod val="50000"/>
+                <a:lumOff val="50000"/>
+              </a:schemeClr>
+            </a:solidFill>
+          </a:ln>
+        </p:spPr>
+        <p:style>
+          <a:lnRef idx="2">
+            <a:schemeClr val="accent1">
+              <a:shade val="50000"/>
+            </a:schemeClr>
+          </a:lnRef>
+          <a:fillRef idx="1">
+            <a:schemeClr val="accent1"/>
+          </a:fillRef>
+          <a:effectRef idx="0">
+            <a:schemeClr val="accent1"/>
+          </a:effectRef>
+          <a:fontRef idx="minor">
+            <a:schemeClr val="lt1"/>
+          </a:fontRef>
+        </p:style>
+        <p:txBody>
+          <a:bodyPr rtlCol="0" anchor="ctr"/>
+          <a:lstStyle/>
+          <a:p>
+            <a:pPr algn="ctr"/>
+            <a:endParaRPr lang="en-US"/>
+          </a:p>
+        </p:txBody>
+      </p:sp>
+      <p:sp>
+        <p:nvSpPr>
+          <p:cNvPr id="103" name="Rectangle 102"/>
+          <p:cNvSpPr/>
+          <p:nvPr/>
+        </p:nvSpPr>
+        <p:spPr>
+          <a:xfrm>
+            <a:off x="5210822" y="3082661"/>
+            <a:ext cx="86448" cy="85572"/>
+          </a:xfrm>
+          <a:prstGeom prst="rect">
+            <a:avLst/>
+          </a:prstGeom>
+          <a:solidFill>
+            <a:schemeClr val="tx1">
+              <a:lumMod val="50000"/>
+              <a:lumOff val="50000"/>
+            </a:schemeClr>
+          </a:solidFill>
+          <a:ln w="38100">
+            <a:solidFill>
+              <a:schemeClr val="tx1">
+                <a:lumMod val="50000"/>
+                <a:lumOff val="50000"/>
+              </a:schemeClr>
+            </a:solidFill>
+          </a:ln>
+        </p:spPr>
+        <p:style>
+          <a:lnRef idx="2">
+            <a:schemeClr val="accent1">
+              <a:shade val="50000"/>
+            </a:schemeClr>
+          </a:lnRef>
+          <a:fillRef idx="1">
+            <a:schemeClr val="accent1"/>
+          </a:fillRef>
+          <a:effectRef idx="0">
+            <a:schemeClr val="accent1"/>
+          </a:effectRef>
+          <a:fontRef idx="minor">
+            <a:schemeClr val="lt1"/>
+          </a:fontRef>
+        </p:style>
+        <p:txBody>
+          <a:bodyPr rtlCol="0" anchor="ctr"/>
+          <a:lstStyle/>
+          <a:p>
+            <a:pPr algn="ctr"/>
+            <a:endParaRPr lang="en-US"/>
+          </a:p>
+        </p:txBody>
+      </p:sp>
+      <p:sp>
+        <p:nvSpPr>
+          <p:cNvPr id="104" name="Oval 103"/>
+          <p:cNvSpPr/>
+          <p:nvPr/>
+        </p:nvSpPr>
+        <p:spPr>
+          <a:xfrm>
+            <a:off x="4993643" y="2775391"/>
+            <a:ext cx="101737" cy="100606"/>
+          </a:xfrm>
+          <a:prstGeom prst="ellipse">
+            <a:avLst/>
+          </a:prstGeom>
+          <a:noFill/>
+          <a:ln w="38100">
+            <a:solidFill>
+              <a:schemeClr val="tx1">
+                <a:lumMod val="50000"/>
+                <a:lumOff val="50000"/>
+              </a:schemeClr>
+            </a:solidFill>
+          </a:ln>
+        </p:spPr>
+        <p:style>
+          <a:lnRef idx="2">
+            <a:schemeClr val="accent1">
+              <a:shade val="50000"/>
+            </a:schemeClr>
+          </a:lnRef>
+          <a:fillRef idx="1">
+            <a:schemeClr val="accent1"/>
+          </a:fillRef>
+          <a:effectRef idx="0">
+            <a:schemeClr val="accent1"/>
+          </a:effectRef>
+          <a:fontRef idx="minor">
+            <a:schemeClr val="lt1"/>
+          </a:fontRef>
+        </p:style>
+        <p:txBody>
+          <a:bodyPr rtlCol="0" anchor="ctr"/>
+          <a:lstStyle/>
+          <a:p>
+            <a:pPr algn="ctr"/>
+            <a:endParaRPr lang="en-US"/>
+          </a:p>
+        </p:txBody>
+      </p:sp>
+      <p:sp>
+        <p:nvSpPr>
+          <p:cNvPr id="106" name="5-Point Star 105"/>
+          <p:cNvSpPr/>
+          <p:nvPr/>
+        </p:nvSpPr>
+        <p:spPr>
+          <a:xfrm>
+            <a:off x="5404025" y="2707029"/>
+            <a:ext cx="90516" cy="95344"/>
+          </a:xfrm>
+          <a:prstGeom prst="star5">
+            <a:avLst/>
+          </a:prstGeom>
+          <a:solidFill>
+            <a:schemeClr val="tx1">
+              <a:lumMod val="50000"/>
+              <a:lumOff val="50000"/>
+            </a:schemeClr>
+          </a:solidFill>
+          <a:ln w="28575">
+            <a:solidFill>
+              <a:schemeClr val="tx1">
+                <a:lumMod val="50000"/>
+                <a:lumOff val="50000"/>
+              </a:schemeClr>
+            </a:solidFill>
+          </a:ln>
+        </p:spPr>
+        <p:style>
+          <a:lnRef idx="2">
+            <a:schemeClr val="accent1">
+              <a:shade val="50000"/>
+            </a:schemeClr>
+          </a:lnRef>
+          <a:fillRef idx="1">
+            <a:schemeClr val="accent1"/>
+          </a:fillRef>
+          <a:effectRef idx="0">
+            <a:schemeClr val="accent1"/>
+          </a:effectRef>
+          <a:fontRef idx="minor">
+            <a:schemeClr val="lt1"/>
+          </a:fontRef>
+        </p:style>
+        <p:txBody>
+          <a:bodyPr rtlCol="0" anchor="ctr"/>
+          <a:lstStyle/>
+          <a:p>
+            <a:pPr algn="ctr"/>
+            <a:endParaRPr lang="en-US"/>
+          </a:p>
+        </p:txBody>
+      </p:sp>
+      <p:sp>
+        <p:nvSpPr>
+          <p:cNvPr id="108" name="Right Triangle 107"/>
+          <p:cNvSpPr/>
+          <p:nvPr/>
+        </p:nvSpPr>
+        <p:spPr>
+          <a:xfrm>
+            <a:off x="5630043" y="2968646"/>
+            <a:ext cx="101562" cy="102765"/>
+          </a:xfrm>
+          <a:prstGeom prst="rtTriangle">
+            <a:avLst/>
+          </a:prstGeom>
+          <a:solidFill>
+            <a:schemeClr val="tx1">
+              <a:lumMod val="50000"/>
+              <a:lumOff val="50000"/>
+            </a:schemeClr>
+          </a:solidFill>
+          <a:ln w="38100">
+            <a:solidFill>
+              <a:schemeClr val="tx1">
+                <a:lumMod val="50000"/>
+                <a:lumOff val="50000"/>
+              </a:schemeClr>
+            </a:solidFill>
+          </a:ln>
+        </p:spPr>
+        <p:style>
+          <a:lnRef idx="2">
+            <a:schemeClr val="accent1">
+              <a:shade val="50000"/>
+            </a:schemeClr>
+          </a:lnRef>
+          <a:fillRef idx="1">
+            <a:schemeClr val="accent1"/>
+          </a:fillRef>
+          <a:effectRef idx="0">
+            <a:schemeClr val="accent1"/>
+          </a:effectRef>
+          <a:fontRef idx="minor">
+            <a:schemeClr val="lt1"/>
+          </a:fontRef>
+        </p:style>
+        <p:txBody>
+          <a:bodyPr rtlCol="0" anchor="ctr"/>
+          <a:lstStyle/>
+          <a:p>
+            <a:pPr algn="ctr"/>
+            <a:endParaRPr lang="en-US"/>
+          </a:p>
+        </p:txBody>
+      </p:sp>
+      <p:sp>
+        <p:nvSpPr>
+          <p:cNvPr id="109" name="Parallelogram 108"/>
+          <p:cNvSpPr/>
+          <p:nvPr/>
+        </p:nvSpPr>
+        <p:spPr>
+          <a:xfrm>
+            <a:off x="5201334" y="2475847"/>
+            <a:ext cx="128865" cy="79688"/>
+          </a:xfrm>
+          <a:prstGeom prst="parallelogram">
+            <a:avLst/>
+          </a:prstGeom>
+          <a:solidFill>
+            <a:schemeClr val="tx1">
+              <a:lumMod val="50000"/>
+              <a:lumOff val="50000"/>
+            </a:schemeClr>
+          </a:solidFill>
+          <a:ln w="38100">
+            <a:solidFill>
+              <a:schemeClr val="tx1">
+                <a:lumMod val="50000"/>
+                <a:lumOff val="50000"/>
+              </a:schemeClr>
+            </a:solidFill>
+          </a:ln>
+        </p:spPr>
+        <p:style>
+          <a:lnRef idx="2">
+            <a:schemeClr val="accent1">
+              <a:shade val="50000"/>
+            </a:schemeClr>
+          </a:lnRef>
+          <a:fillRef idx="1">
+            <a:schemeClr val="accent1"/>
+          </a:fillRef>
+          <a:effectRef idx="0">
+            <a:schemeClr val="accent1"/>
+          </a:effectRef>
+          <a:fontRef idx="minor">
+            <a:schemeClr val="lt1"/>
+          </a:fontRef>
+        </p:style>
+        <p:txBody>
+          <a:bodyPr rtlCol="0" anchor="ctr"/>
+          <a:lstStyle/>
+          <a:p>
+            <a:pPr algn="ctr"/>
+            <a:endParaRPr lang="en-US"/>
+          </a:p>
+        </p:txBody>
+      </p:sp>
+      <p:sp>
+        <p:nvSpPr>
+          <p:cNvPr id="110" name="Isosceles Triangle 109"/>
+          <p:cNvSpPr/>
+          <p:nvPr/>
+        </p:nvSpPr>
+        <p:spPr>
+          <a:xfrm>
+            <a:off x="4811730" y="2430568"/>
+            <a:ext cx="83517" cy="80882"/>
+          </a:xfrm>
+          <a:prstGeom prst="triangle">
+            <a:avLst/>
+          </a:prstGeom>
+          <a:noFill/>
+          <a:ln w="28575">
+            <a:solidFill>
+              <a:schemeClr val="tx1">
+                <a:lumMod val="50000"/>
+                <a:lumOff val="50000"/>
+              </a:schemeClr>
+            </a:solidFill>
+          </a:ln>
+        </p:spPr>
+        <p:style>
+          <a:lnRef idx="2">
+            <a:schemeClr val="accent1">
+              <a:shade val="50000"/>
+            </a:schemeClr>
+          </a:lnRef>
+          <a:fillRef idx="1">
+            <a:schemeClr val="accent1"/>
+          </a:fillRef>
+          <a:effectRef idx="0">
+            <a:schemeClr val="accent1"/>
+          </a:effectRef>
+          <a:fontRef idx="minor">
+            <a:schemeClr val="lt1"/>
+          </a:fontRef>
+        </p:style>
+        <p:txBody>
+          <a:bodyPr rtlCol="0" anchor="ctr"/>
+          <a:lstStyle/>
+          <a:p>
+            <a:pPr algn="ctr"/>
+            <a:endParaRPr lang="en-US"/>
+          </a:p>
+        </p:txBody>
+      </p:sp>
+      <p:sp>
+        <p:nvSpPr>
+          <p:cNvPr id="111" name="Diamond 110"/>
+          <p:cNvSpPr/>
+          <p:nvPr/>
+        </p:nvSpPr>
+        <p:spPr>
+          <a:xfrm>
+            <a:off x="5667446" y="2475858"/>
+            <a:ext cx="110396" cy="97728"/>
+          </a:xfrm>
+          <a:prstGeom prst="diamond">
+            <a:avLst/>
+          </a:prstGeom>
+          <a:noFill/>
+          <a:ln w="28575">
+            <a:solidFill>
+              <a:schemeClr val="tx1">
+                <a:lumMod val="50000"/>
+                <a:lumOff val="50000"/>
+              </a:schemeClr>
+            </a:solidFill>
+          </a:ln>
+        </p:spPr>
+        <p:style>
+          <a:lnRef idx="2">
+            <a:schemeClr val="accent1">
+              <a:shade val="50000"/>
+            </a:schemeClr>
+          </a:lnRef>
+          <a:fillRef idx="1">
+            <a:schemeClr val="accent1"/>
+          </a:fillRef>
+          <a:effectRef idx="0">
+            <a:schemeClr val="accent1"/>
+          </a:effectRef>
+          <a:fontRef idx="minor">
+            <a:schemeClr val="lt1"/>
+          </a:fontRef>
+        </p:style>
+        <p:txBody>
+          <a:bodyPr rtlCol="0" anchor="ctr"/>
+          <a:lstStyle/>
+          <a:p>
+            <a:pPr algn="ctr"/>
+            <a:endParaRPr lang="en-US"/>
+          </a:p>
+        </p:txBody>
+      </p:sp>
+      <p:sp>
+        <p:nvSpPr>
+          <p:cNvPr id="112" name="Hexagon 111"/>
+          <p:cNvSpPr/>
+          <p:nvPr/>
+        </p:nvSpPr>
+        <p:spPr>
+          <a:xfrm>
+            <a:off x="4827787" y="3132161"/>
+            <a:ext cx="110506" cy="87657"/>
+          </a:xfrm>
+          <a:prstGeom prst="hexagon">
+            <a:avLst/>
+          </a:prstGeom>
+          <a:solidFill>
+            <a:schemeClr val="tx1">
+              <a:lumMod val="50000"/>
+              <a:lumOff val="50000"/>
+            </a:schemeClr>
+          </a:solidFill>
+          <a:ln w="38100">
+            <a:solidFill>
+              <a:schemeClr val="tx1">
+                <a:lumMod val="50000"/>
+                <a:lumOff val="50000"/>
+              </a:schemeClr>
+            </a:solidFill>
+          </a:ln>
+        </p:spPr>
+        <p:style>
+          <a:lnRef idx="2">
+            <a:schemeClr val="accent1">
+              <a:shade val="50000"/>
+            </a:schemeClr>
+          </a:lnRef>
+          <a:fillRef idx="1">
+            <a:schemeClr val="accent1"/>
+          </a:fillRef>
+          <a:effectRef idx="0">
+            <a:schemeClr val="accent1"/>
+          </a:effectRef>
+          <a:fontRef idx="minor">
+            <a:schemeClr val="lt1"/>
+          </a:fontRef>
+        </p:style>
+        <p:txBody>
+          <a:bodyPr rtlCol="0" anchor="ctr"/>
+          <a:lstStyle/>
+          <a:p>
+            <a:pPr algn="ctr"/>
+            <a:endParaRPr lang="en-US"/>
+          </a:p>
+        </p:txBody>
+      </p:sp>
+      <p:sp>
+        <p:nvSpPr>
+          <p:cNvPr id="113" name="Hexagon 112"/>
+          <p:cNvSpPr/>
+          <p:nvPr/>
+        </p:nvSpPr>
+        <p:spPr>
+          <a:xfrm>
+            <a:off x="4827787" y="4221989"/>
+            <a:ext cx="110506" cy="87657"/>
+          </a:xfrm>
+          <a:prstGeom prst="hexagon">
+            <a:avLst/>
+          </a:prstGeom>
+          <a:solidFill>
+            <a:schemeClr val="tx1">
+              <a:lumMod val="50000"/>
+              <a:lumOff val="50000"/>
+            </a:schemeClr>
+          </a:solidFill>
+          <a:ln w="38100">
+            <a:solidFill>
+              <a:schemeClr val="tx1">
+                <a:lumMod val="50000"/>
+                <a:lumOff val="50000"/>
+              </a:schemeClr>
+            </a:solidFill>
+          </a:ln>
+        </p:spPr>
+        <p:style>
+          <a:lnRef idx="2">
+            <a:schemeClr val="accent1">
+              <a:shade val="50000"/>
+            </a:schemeClr>
+          </a:lnRef>
+          <a:fillRef idx="1">
+            <a:schemeClr val="accent1"/>
+          </a:fillRef>
+          <a:effectRef idx="0">
+            <a:schemeClr val="accent1"/>
+          </a:effectRef>
+          <a:fontRef idx="minor">
+            <a:schemeClr val="lt1"/>
+          </a:fontRef>
+        </p:style>
+        <p:txBody>
+          <a:bodyPr rtlCol="0" anchor="ctr"/>
+          <a:lstStyle/>
+          <a:p>
+            <a:pPr algn="ctr"/>
+            <a:endParaRPr lang="en-US"/>
+          </a:p>
+        </p:txBody>
+      </p:sp>
+      <p:sp>
+        <p:nvSpPr>
+          <p:cNvPr id="114" name="Hexagon 113"/>
+          <p:cNvSpPr/>
+          <p:nvPr/>
+        </p:nvSpPr>
+        <p:spPr>
+          <a:xfrm>
+            <a:off x="3526619" y="3111932"/>
+            <a:ext cx="110506" cy="87657"/>
+          </a:xfrm>
+          <a:prstGeom prst="hexagon">
+            <a:avLst/>
+          </a:prstGeom>
+          <a:noFill/>
+          <a:ln w="28575">
+            <a:solidFill>
+              <a:schemeClr val="tx1">
+                <a:lumMod val="50000"/>
+                <a:lumOff val="50000"/>
+              </a:schemeClr>
+            </a:solidFill>
+          </a:ln>
+        </p:spPr>
+        <p:style>
+          <a:lnRef idx="2">
+            <a:schemeClr val="accent1">
+              <a:shade val="50000"/>
+            </a:schemeClr>
+          </a:lnRef>
+          <a:fillRef idx="1">
+            <a:schemeClr val="accent1"/>
+          </a:fillRef>
+          <a:effectRef idx="0">
+            <a:schemeClr val="accent1"/>
+          </a:effectRef>
+          <a:fontRef idx="minor">
+            <a:schemeClr val="lt1"/>
+          </a:fontRef>
+        </p:style>
+        <p:txBody>
+          <a:bodyPr rtlCol="0" anchor="ctr"/>
+          <a:lstStyle/>
+          <a:p>
+            <a:pPr algn="ctr"/>
+            <a:endParaRPr lang="en-US"/>
+          </a:p>
+        </p:txBody>
+      </p:sp>
+      <p:sp>
+        <p:nvSpPr>
+          <p:cNvPr id="115" name="Hexagon 114"/>
+          <p:cNvSpPr/>
+          <p:nvPr/>
+        </p:nvSpPr>
+        <p:spPr>
+          <a:xfrm>
+            <a:off x="3526619" y="4201760"/>
+            <a:ext cx="110506" cy="87657"/>
+          </a:xfrm>
+          <a:prstGeom prst="hexagon">
+            <a:avLst/>
+          </a:prstGeom>
+          <a:noFill/>
+          <a:ln w="28575">
+            <a:solidFill>
+              <a:schemeClr val="tx1">
+                <a:lumMod val="50000"/>
+                <a:lumOff val="50000"/>
+              </a:schemeClr>
+            </a:solidFill>
+          </a:ln>
+        </p:spPr>
+        <p:style>
+          <a:lnRef idx="2">
+            <a:schemeClr val="accent1">
+              <a:shade val="50000"/>
+            </a:schemeClr>
+          </a:lnRef>
+          <a:fillRef idx="1">
+            <a:schemeClr val="accent1"/>
+          </a:fillRef>
+          <a:effectRef idx="0">
+            <a:schemeClr val="accent1"/>
+          </a:effectRef>
+          <a:fontRef idx="minor">
+            <a:schemeClr val="lt1"/>
+          </a:fontRef>
+        </p:style>
+        <p:txBody>
+          <a:bodyPr rtlCol="0" anchor="ctr"/>
+          <a:lstStyle/>
+          <a:p>
+            <a:pPr algn="ctr"/>
+            <a:endParaRPr lang="en-US"/>
           </a:p>
         </p:txBody>
       </p:sp>
       <p:pic>
         <p:nvPicPr>
-          <p:cNvPr id="3" name="Picture 2"/>
+          <p:cNvPr id="10" name="Picture 9"/>
           <p:cNvPicPr>
             <a:picLocks noChangeAspect="1"/>
           </p:cNvPicPr>
@@ -6357,1382 +8668,14 @@
         </p:blipFill>
         <p:spPr>
           <a:xfrm>
-            <a:off x="3415913" y="327224"/>
-            <a:ext cx="2553783" cy="1689043"/>
+            <a:off x="3437875" y="349628"/>
+            <a:ext cx="2536284" cy="1677469"/>
           </a:xfrm>
           <a:prstGeom prst="rect">
             <a:avLst/>
           </a:prstGeom>
         </p:spPr>
       </p:pic>
-      <p:sp>
-        <p:nvSpPr>
-          <p:cNvPr id="73" name="Diamond 72"/>
-          <p:cNvSpPr/>
-          <p:nvPr/>
-        </p:nvSpPr>
-        <p:spPr>
-          <a:xfrm>
-            <a:off x="1093471" y="5410930"/>
-            <a:ext cx="237744" cy="219456"/>
-          </a:xfrm>
-          <a:prstGeom prst="diamond">
-            <a:avLst/>
-          </a:prstGeom>
-          <a:solidFill>
-            <a:schemeClr val="accent1">
-              <a:lumMod val="75000"/>
-            </a:schemeClr>
-          </a:solidFill>
-          <a:ln w="38100">
-            <a:solidFill>
-              <a:schemeClr val="accent1">
-                <a:lumMod val="75000"/>
-              </a:schemeClr>
-            </a:solidFill>
-          </a:ln>
-        </p:spPr>
-        <p:style>
-          <a:lnRef idx="2">
-            <a:schemeClr val="accent1">
-              <a:shade val="50000"/>
-            </a:schemeClr>
-          </a:lnRef>
-          <a:fillRef idx="1">
-            <a:schemeClr val="accent1"/>
-          </a:fillRef>
-          <a:effectRef idx="0">
-            <a:schemeClr val="accent1"/>
-          </a:effectRef>
-          <a:fontRef idx="minor">
-            <a:schemeClr val="lt1"/>
-          </a:fontRef>
-        </p:style>
-        <p:txBody>
-          <a:bodyPr rtlCol="0" anchor="ctr"/>
-          <a:lstStyle/>
-          <a:p>
-            <a:pPr algn="ctr"/>
-            <a:endParaRPr lang="en-US"/>
-          </a:p>
-        </p:txBody>
-      </p:sp>
-      <p:sp>
-        <p:nvSpPr>
-          <p:cNvPr id="74" name="Rectangle 73"/>
-          <p:cNvSpPr/>
-          <p:nvPr/>
-        </p:nvSpPr>
-        <p:spPr>
-          <a:xfrm>
-            <a:off x="1710862" y="5777729"/>
-            <a:ext cx="164592" cy="153690"/>
-          </a:xfrm>
-          <a:prstGeom prst="rect">
-            <a:avLst/>
-          </a:prstGeom>
-          <a:solidFill>
-            <a:schemeClr val="accent1">
-              <a:lumMod val="75000"/>
-            </a:schemeClr>
-          </a:solidFill>
-          <a:ln w="38100">
-            <a:solidFill>
-              <a:schemeClr val="accent1">
-                <a:lumMod val="75000"/>
-              </a:schemeClr>
-            </a:solidFill>
-          </a:ln>
-        </p:spPr>
-        <p:style>
-          <a:lnRef idx="2">
-            <a:schemeClr val="accent1">
-              <a:shade val="50000"/>
-            </a:schemeClr>
-          </a:lnRef>
-          <a:fillRef idx="1">
-            <a:schemeClr val="accent1"/>
-          </a:fillRef>
-          <a:effectRef idx="0">
-            <a:schemeClr val="accent1"/>
-          </a:effectRef>
-          <a:fontRef idx="minor">
-            <a:schemeClr val="lt1"/>
-          </a:fontRef>
-        </p:style>
-        <p:txBody>
-          <a:bodyPr rtlCol="0" anchor="ctr"/>
-          <a:lstStyle/>
-          <a:p>
-            <a:pPr algn="ctr"/>
-            <a:endParaRPr lang="en-US"/>
-          </a:p>
-        </p:txBody>
-      </p:sp>
-      <p:sp>
-        <p:nvSpPr>
-          <p:cNvPr id="75" name="Oval 74"/>
-          <p:cNvSpPr/>
-          <p:nvPr/>
-        </p:nvSpPr>
-        <p:spPr>
-          <a:xfrm>
-            <a:off x="2004561" y="4686983"/>
-            <a:ext cx="174451" cy="183765"/>
-          </a:xfrm>
-          <a:prstGeom prst="ellipse">
-            <a:avLst/>
-          </a:prstGeom>
-          <a:solidFill>
-            <a:schemeClr val="accent1">
-              <a:lumMod val="75000"/>
-            </a:schemeClr>
-          </a:solidFill>
-          <a:ln w="38100">
-            <a:solidFill>
-              <a:schemeClr val="accent1">
-                <a:lumMod val="75000"/>
-              </a:schemeClr>
-            </a:solidFill>
-          </a:ln>
-        </p:spPr>
-        <p:style>
-          <a:lnRef idx="2">
-            <a:schemeClr val="accent1">
-              <a:shade val="50000"/>
-            </a:schemeClr>
-          </a:lnRef>
-          <a:fillRef idx="1">
-            <a:schemeClr val="accent1"/>
-          </a:fillRef>
-          <a:effectRef idx="0">
-            <a:schemeClr val="accent1"/>
-          </a:effectRef>
-          <a:fontRef idx="minor">
-            <a:schemeClr val="lt1"/>
-          </a:fontRef>
-        </p:style>
-        <p:txBody>
-          <a:bodyPr rtlCol="0" anchor="ctr"/>
-          <a:lstStyle/>
-          <a:p>
-            <a:pPr algn="ctr"/>
-            <a:endParaRPr lang="en-US"/>
-          </a:p>
-        </p:txBody>
-      </p:sp>
-      <p:sp>
-        <p:nvSpPr>
-          <p:cNvPr id="78" name="Isosceles Triangle 77"/>
-          <p:cNvSpPr/>
-          <p:nvPr/>
-        </p:nvSpPr>
-        <p:spPr>
-          <a:xfrm>
-            <a:off x="519916" y="4693472"/>
-            <a:ext cx="180669" cy="170788"/>
-          </a:xfrm>
-          <a:prstGeom prst="triangle">
-            <a:avLst/>
-          </a:prstGeom>
-          <a:solidFill>
-            <a:schemeClr val="accent1">
-              <a:lumMod val="75000"/>
-            </a:schemeClr>
-          </a:solidFill>
-          <a:ln w="38100">
-            <a:solidFill>
-              <a:schemeClr val="accent1">
-                <a:lumMod val="75000"/>
-              </a:schemeClr>
-            </a:solidFill>
-          </a:ln>
-        </p:spPr>
-        <p:style>
-          <a:lnRef idx="2">
-            <a:schemeClr val="accent1">
-              <a:shade val="50000"/>
-            </a:schemeClr>
-          </a:lnRef>
-          <a:fillRef idx="1">
-            <a:schemeClr val="accent1"/>
-          </a:fillRef>
-          <a:effectRef idx="0">
-            <a:schemeClr val="accent1"/>
-          </a:effectRef>
-          <a:fontRef idx="minor">
-            <a:schemeClr val="lt1"/>
-          </a:fontRef>
-        </p:style>
-        <p:txBody>
-          <a:bodyPr rtlCol="0" anchor="ctr"/>
-          <a:lstStyle/>
-          <a:p>
-            <a:pPr algn="ctr"/>
-            <a:endParaRPr lang="en-US"/>
-          </a:p>
-        </p:txBody>
-      </p:sp>
-      <p:sp>
-        <p:nvSpPr>
-          <p:cNvPr id="80" name="5-Point Star 79"/>
-          <p:cNvSpPr/>
-          <p:nvPr/>
-        </p:nvSpPr>
-        <p:spPr>
-          <a:xfrm>
-            <a:off x="528915" y="6245119"/>
-            <a:ext cx="222222" cy="187270"/>
-          </a:xfrm>
-          <a:prstGeom prst="star5">
-            <a:avLst/>
-          </a:prstGeom>
-          <a:solidFill>
-            <a:schemeClr val="accent1">
-              <a:lumMod val="75000"/>
-            </a:schemeClr>
-          </a:solidFill>
-          <a:ln w="28575">
-            <a:solidFill>
-              <a:schemeClr val="accent1">
-                <a:lumMod val="75000"/>
-              </a:schemeClr>
-            </a:solidFill>
-          </a:ln>
-        </p:spPr>
-        <p:style>
-          <a:lnRef idx="2">
-            <a:schemeClr val="accent1">
-              <a:shade val="50000"/>
-            </a:schemeClr>
-          </a:lnRef>
-          <a:fillRef idx="1">
-            <a:schemeClr val="accent1"/>
-          </a:fillRef>
-          <a:effectRef idx="0">
-            <a:schemeClr val="accent1"/>
-          </a:effectRef>
-          <a:fontRef idx="minor">
-            <a:schemeClr val="lt1"/>
-          </a:fontRef>
-        </p:style>
-        <p:txBody>
-          <a:bodyPr rtlCol="0" anchor="ctr"/>
-          <a:lstStyle/>
-          <a:p>
-            <a:pPr algn="ctr"/>
-            <a:endParaRPr lang="en-US"/>
-          </a:p>
-        </p:txBody>
-      </p:sp>
-      <p:sp>
-        <p:nvSpPr>
-          <p:cNvPr id="82" name="Regular Pentagon 81"/>
-          <p:cNvSpPr/>
-          <p:nvPr/>
-        </p:nvSpPr>
-        <p:spPr>
-          <a:xfrm>
-            <a:off x="1996963" y="6114671"/>
-            <a:ext cx="227701" cy="214650"/>
-          </a:xfrm>
-          <a:prstGeom prst="pentagon">
-            <a:avLst/>
-          </a:prstGeom>
-          <a:solidFill>
-            <a:schemeClr val="accent1">
-              <a:lumMod val="75000"/>
-            </a:schemeClr>
-          </a:solidFill>
-          <a:ln w="38100">
-            <a:solidFill>
-              <a:schemeClr val="accent1">
-                <a:lumMod val="75000"/>
-              </a:schemeClr>
-            </a:solidFill>
-          </a:ln>
-        </p:spPr>
-        <p:style>
-          <a:lnRef idx="2">
-            <a:schemeClr val="accent1">
-              <a:shade val="50000"/>
-            </a:schemeClr>
-          </a:lnRef>
-          <a:fillRef idx="1">
-            <a:schemeClr val="accent1"/>
-          </a:fillRef>
-          <a:effectRef idx="0">
-            <a:schemeClr val="accent1"/>
-          </a:effectRef>
-          <a:fontRef idx="minor">
-            <a:schemeClr val="lt1"/>
-          </a:fontRef>
-        </p:style>
-        <p:txBody>
-          <a:bodyPr rtlCol="0" anchor="ctr"/>
-          <a:lstStyle/>
-          <a:p>
-            <a:pPr algn="ctr"/>
-            <a:endParaRPr lang="en-US"/>
-          </a:p>
-        </p:txBody>
-      </p:sp>
-      <p:sp>
-        <p:nvSpPr>
-          <p:cNvPr id="86" name="Diamond 85"/>
-          <p:cNvSpPr/>
-          <p:nvPr/>
-        </p:nvSpPr>
-        <p:spPr>
-          <a:xfrm>
-            <a:off x="4335319" y="5382841"/>
-            <a:ext cx="237744" cy="219456"/>
-          </a:xfrm>
-          <a:prstGeom prst="diamond">
-            <a:avLst/>
-          </a:prstGeom>
-          <a:solidFill>
-            <a:schemeClr val="accent1">
-              <a:lumMod val="75000"/>
-            </a:schemeClr>
-          </a:solidFill>
-          <a:ln w="38100">
-            <a:solidFill>
-              <a:schemeClr val="accent1">
-                <a:lumMod val="75000"/>
-              </a:schemeClr>
-            </a:solidFill>
-          </a:ln>
-        </p:spPr>
-        <p:style>
-          <a:lnRef idx="2">
-            <a:schemeClr val="accent1">
-              <a:shade val="50000"/>
-            </a:schemeClr>
-          </a:lnRef>
-          <a:fillRef idx="1">
-            <a:schemeClr val="accent1"/>
-          </a:fillRef>
-          <a:effectRef idx="0">
-            <a:schemeClr val="accent1"/>
-          </a:effectRef>
-          <a:fontRef idx="minor">
-            <a:schemeClr val="lt1"/>
-          </a:fontRef>
-        </p:style>
-        <p:txBody>
-          <a:bodyPr rtlCol="0" anchor="ctr"/>
-          <a:lstStyle/>
-          <a:p>
-            <a:pPr algn="ctr"/>
-            <a:endParaRPr lang="en-US"/>
-          </a:p>
-        </p:txBody>
-      </p:sp>
-      <p:sp>
-        <p:nvSpPr>
-          <p:cNvPr id="87" name="Rectangle 86"/>
-          <p:cNvSpPr/>
-          <p:nvPr/>
-        </p:nvSpPr>
-        <p:spPr>
-          <a:xfrm>
-            <a:off x="4968121" y="5777729"/>
-            <a:ext cx="164592" cy="153690"/>
-          </a:xfrm>
-          <a:prstGeom prst="rect">
-            <a:avLst/>
-          </a:prstGeom>
-          <a:solidFill>
-            <a:schemeClr val="accent1">
-              <a:lumMod val="75000"/>
-            </a:schemeClr>
-          </a:solidFill>
-          <a:ln w="38100">
-            <a:solidFill>
-              <a:schemeClr val="accent1">
-                <a:lumMod val="75000"/>
-              </a:schemeClr>
-            </a:solidFill>
-          </a:ln>
-        </p:spPr>
-        <p:style>
-          <a:lnRef idx="2">
-            <a:schemeClr val="accent1">
-              <a:shade val="50000"/>
-            </a:schemeClr>
-          </a:lnRef>
-          <a:fillRef idx="1">
-            <a:schemeClr val="accent1"/>
-          </a:fillRef>
-          <a:effectRef idx="0">
-            <a:schemeClr val="accent1"/>
-          </a:effectRef>
-          <a:fontRef idx="minor">
-            <a:schemeClr val="lt1"/>
-          </a:fontRef>
-        </p:style>
-        <p:txBody>
-          <a:bodyPr rtlCol="0" anchor="ctr"/>
-          <a:lstStyle/>
-          <a:p>
-            <a:pPr algn="ctr"/>
-            <a:endParaRPr lang="en-US"/>
-          </a:p>
-        </p:txBody>
-      </p:sp>
-      <p:sp>
-        <p:nvSpPr>
-          <p:cNvPr id="88" name="Oval 87"/>
-          <p:cNvSpPr/>
-          <p:nvPr/>
-        </p:nvSpPr>
-        <p:spPr>
-          <a:xfrm>
-            <a:off x="5266491" y="4685590"/>
-            <a:ext cx="174451" cy="183765"/>
-          </a:xfrm>
-          <a:prstGeom prst="ellipse">
-            <a:avLst/>
-          </a:prstGeom>
-          <a:solidFill>
-            <a:schemeClr val="accent1">
-              <a:lumMod val="75000"/>
-            </a:schemeClr>
-          </a:solidFill>
-          <a:ln w="38100">
-            <a:solidFill>
-              <a:schemeClr val="accent1">
-                <a:lumMod val="75000"/>
-              </a:schemeClr>
-            </a:solidFill>
-          </a:ln>
-        </p:spPr>
-        <p:style>
-          <a:lnRef idx="2">
-            <a:schemeClr val="accent1">
-              <a:shade val="50000"/>
-            </a:schemeClr>
-          </a:lnRef>
-          <a:fillRef idx="1">
-            <a:schemeClr val="accent1"/>
-          </a:fillRef>
-          <a:effectRef idx="0">
-            <a:schemeClr val="accent1"/>
-          </a:effectRef>
-          <a:fontRef idx="minor">
-            <a:schemeClr val="lt1"/>
-          </a:fontRef>
-        </p:style>
-        <p:txBody>
-          <a:bodyPr rtlCol="0" anchor="ctr"/>
-          <a:lstStyle/>
-          <a:p>
-            <a:pPr algn="ctr"/>
-            <a:endParaRPr lang="en-US"/>
-          </a:p>
-        </p:txBody>
-      </p:sp>
-      <p:sp>
-        <p:nvSpPr>
-          <p:cNvPr id="89" name="Isosceles Triangle 88"/>
-          <p:cNvSpPr/>
-          <p:nvPr/>
-        </p:nvSpPr>
-        <p:spPr>
-          <a:xfrm>
-            <a:off x="3761764" y="4665383"/>
-            <a:ext cx="180669" cy="170788"/>
-          </a:xfrm>
-          <a:prstGeom prst="triangle">
-            <a:avLst/>
-          </a:prstGeom>
-          <a:solidFill>
-            <a:schemeClr val="accent1">
-              <a:lumMod val="75000"/>
-            </a:schemeClr>
-          </a:solidFill>
-          <a:ln w="38100">
-            <a:solidFill>
-              <a:schemeClr val="accent1">
-                <a:lumMod val="75000"/>
-              </a:schemeClr>
-            </a:solidFill>
-          </a:ln>
-        </p:spPr>
-        <p:style>
-          <a:lnRef idx="2">
-            <a:schemeClr val="accent1">
-              <a:shade val="50000"/>
-            </a:schemeClr>
-          </a:lnRef>
-          <a:fillRef idx="1">
-            <a:schemeClr val="accent1"/>
-          </a:fillRef>
-          <a:effectRef idx="0">
-            <a:schemeClr val="accent1"/>
-          </a:effectRef>
-          <a:fontRef idx="minor">
-            <a:schemeClr val="lt1"/>
-          </a:fontRef>
-        </p:style>
-        <p:txBody>
-          <a:bodyPr rtlCol="0" anchor="ctr"/>
-          <a:lstStyle/>
-          <a:p>
-            <a:pPr algn="ctr"/>
-            <a:endParaRPr lang="en-US"/>
-          </a:p>
-        </p:txBody>
-      </p:sp>
-      <p:sp>
-        <p:nvSpPr>
-          <p:cNvPr id="90" name="5-Point Star 89"/>
-          <p:cNvSpPr/>
-          <p:nvPr/>
-        </p:nvSpPr>
-        <p:spPr>
-          <a:xfrm>
-            <a:off x="3770763" y="6217030"/>
-            <a:ext cx="222222" cy="187270"/>
-          </a:xfrm>
-          <a:prstGeom prst="star5">
-            <a:avLst/>
-          </a:prstGeom>
-          <a:solidFill>
-            <a:schemeClr val="accent1">
-              <a:lumMod val="75000"/>
-            </a:schemeClr>
-          </a:solidFill>
-          <a:ln w="28575">
-            <a:solidFill>
-              <a:schemeClr val="accent1">
-                <a:lumMod val="75000"/>
-              </a:schemeClr>
-            </a:solidFill>
-          </a:ln>
-        </p:spPr>
-        <p:style>
-          <a:lnRef idx="2">
-            <a:schemeClr val="accent1">
-              <a:shade val="50000"/>
-            </a:schemeClr>
-          </a:lnRef>
-          <a:fillRef idx="1">
-            <a:schemeClr val="accent1"/>
-          </a:fillRef>
-          <a:effectRef idx="0">
-            <a:schemeClr val="accent1"/>
-          </a:effectRef>
-          <a:fontRef idx="minor">
-            <a:schemeClr val="lt1"/>
-          </a:fontRef>
-        </p:style>
-        <p:txBody>
-          <a:bodyPr rtlCol="0" anchor="ctr"/>
-          <a:lstStyle/>
-          <a:p>
-            <a:pPr algn="ctr"/>
-            <a:endParaRPr lang="en-US"/>
-          </a:p>
-        </p:txBody>
-      </p:sp>
-      <p:sp>
-        <p:nvSpPr>
-          <p:cNvPr id="91" name="Regular Pentagon 90"/>
-          <p:cNvSpPr/>
-          <p:nvPr/>
-        </p:nvSpPr>
-        <p:spPr>
-          <a:xfrm>
-            <a:off x="5238811" y="6086582"/>
-            <a:ext cx="227701" cy="214650"/>
-          </a:xfrm>
-          <a:prstGeom prst="pentagon">
-            <a:avLst/>
-          </a:prstGeom>
-          <a:solidFill>
-            <a:schemeClr val="accent1">
-              <a:lumMod val="75000"/>
-            </a:schemeClr>
-          </a:solidFill>
-          <a:ln w="38100">
-            <a:solidFill>
-              <a:schemeClr val="accent1">
-                <a:lumMod val="75000"/>
-              </a:schemeClr>
-            </a:solidFill>
-          </a:ln>
-        </p:spPr>
-        <p:style>
-          <a:lnRef idx="2">
-            <a:schemeClr val="accent1">
-              <a:shade val="50000"/>
-            </a:schemeClr>
-          </a:lnRef>
-          <a:fillRef idx="1">
-            <a:schemeClr val="accent1"/>
-          </a:fillRef>
-          <a:effectRef idx="0">
-            <a:schemeClr val="accent1"/>
-          </a:effectRef>
-          <a:fontRef idx="minor">
-            <a:schemeClr val="lt1"/>
-          </a:fontRef>
-        </p:style>
-        <p:txBody>
-          <a:bodyPr rtlCol="0" anchor="ctr"/>
-          <a:lstStyle/>
-          <a:p>
-            <a:pPr algn="ctr"/>
-            <a:endParaRPr lang="en-US"/>
-          </a:p>
-        </p:txBody>
-      </p:sp>
-      <p:sp>
-        <p:nvSpPr>
-          <p:cNvPr id="16" name="Cross 15"/>
-          <p:cNvSpPr/>
-          <p:nvPr/>
-        </p:nvSpPr>
-        <p:spPr>
-          <a:xfrm>
-            <a:off x="2072504" y="5223845"/>
-            <a:ext cx="254081" cy="212255"/>
-          </a:xfrm>
-          <a:prstGeom prst="plus">
-            <a:avLst/>
-          </a:prstGeom>
-          <a:noFill/>
-          <a:ln w="38100">
-            <a:solidFill>
-              <a:schemeClr val="accent1">
-                <a:lumMod val="75000"/>
-              </a:schemeClr>
-            </a:solidFill>
-          </a:ln>
-        </p:spPr>
-        <p:style>
-          <a:lnRef idx="2">
-            <a:schemeClr val="accent1">
-              <a:shade val="50000"/>
-            </a:schemeClr>
-          </a:lnRef>
-          <a:fillRef idx="1">
-            <a:schemeClr val="accent1"/>
-          </a:fillRef>
-          <a:effectRef idx="0">
-            <a:schemeClr val="accent1"/>
-          </a:effectRef>
-          <a:fontRef idx="minor">
-            <a:schemeClr val="lt1"/>
-          </a:fontRef>
-        </p:style>
-        <p:txBody>
-          <a:bodyPr rtlCol="0" anchor="ctr"/>
-          <a:lstStyle/>
-          <a:p>
-            <a:pPr algn="ctr"/>
-            <a:endParaRPr lang="en-US"/>
-          </a:p>
-        </p:txBody>
-      </p:sp>
-      <p:sp>
-        <p:nvSpPr>
-          <p:cNvPr id="17" name="Right Triangle 16"/>
-          <p:cNvSpPr/>
-          <p:nvPr/>
-        </p:nvSpPr>
-        <p:spPr>
-          <a:xfrm>
-            <a:off x="657232" y="5777729"/>
-            <a:ext cx="212183" cy="184569"/>
-          </a:xfrm>
-          <a:prstGeom prst="rtTriangle">
-            <a:avLst/>
-          </a:prstGeom>
-          <a:noFill/>
-          <a:ln w="38100">
-            <a:solidFill>
-              <a:schemeClr val="accent1">
-                <a:lumMod val="75000"/>
-              </a:schemeClr>
-            </a:solidFill>
-          </a:ln>
-        </p:spPr>
-        <p:style>
-          <a:lnRef idx="2">
-            <a:schemeClr val="accent1">
-              <a:shade val="50000"/>
-            </a:schemeClr>
-          </a:lnRef>
-          <a:fillRef idx="1">
-            <a:schemeClr val="accent1"/>
-          </a:fillRef>
-          <a:effectRef idx="0">
-            <a:schemeClr val="accent1"/>
-          </a:effectRef>
-          <a:fontRef idx="minor">
-            <a:schemeClr val="lt1"/>
-          </a:fontRef>
-        </p:style>
-        <p:txBody>
-          <a:bodyPr rtlCol="0" anchor="ctr"/>
-          <a:lstStyle/>
-          <a:p>
-            <a:pPr algn="ctr"/>
-            <a:endParaRPr lang="en-US"/>
-          </a:p>
-        </p:txBody>
-      </p:sp>
-      <p:sp>
-        <p:nvSpPr>
-          <p:cNvPr id="18" name="Parallelogram 17"/>
-          <p:cNvSpPr/>
-          <p:nvPr/>
-        </p:nvSpPr>
-        <p:spPr>
-          <a:xfrm>
-            <a:off x="1020475" y="4817703"/>
-            <a:ext cx="281363" cy="160133"/>
-          </a:xfrm>
-          <a:prstGeom prst="parallelogram">
-            <a:avLst/>
-          </a:prstGeom>
-          <a:noFill/>
-          <a:ln w="38100">
-            <a:solidFill>
-              <a:schemeClr val="accent1">
-                <a:lumMod val="75000"/>
-              </a:schemeClr>
-            </a:solidFill>
-          </a:ln>
-        </p:spPr>
-        <p:style>
-          <a:lnRef idx="2">
-            <a:schemeClr val="accent1">
-              <a:shade val="50000"/>
-            </a:schemeClr>
-          </a:lnRef>
-          <a:fillRef idx="1">
-            <a:schemeClr val="accent1"/>
-          </a:fillRef>
-          <a:effectRef idx="0">
-            <a:schemeClr val="accent1"/>
-          </a:effectRef>
-          <a:fontRef idx="minor">
-            <a:schemeClr val="lt1"/>
-          </a:fontRef>
-        </p:style>
-        <p:txBody>
-          <a:bodyPr rtlCol="0" anchor="ctr"/>
-          <a:lstStyle/>
-          <a:p>
-            <a:pPr algn="ctr"/>
-            <a:endParaRPr lang="en-US"/>
-          </a:p>
-        </p:txBody>
-      </p:sp>
-      <p:sp>
-        <p:nvSpPr>
-          <p:cNvPr id="19" name="Hexagon 18"/>
-          <p:cNvSpPr/>
-          <p:nvPr/>
-        </p:nvSpPr>
-        <p:spPr>
-          <a:xfrm>
-            <a:off x="4531033" y="4721915"/>
-            <a:ext cx="237744" cy="216145"/>
-          </a:xfrm>
-          <a:prstGeom prst="hexagon">
-            <a:avLst/>
-          </a:prstGeom>
-          <a:noFill/>
-          <a:ln w="38100">
-            <a:solidFill>
-              <a:schemeClr val="accent1">
-                <a:lumMod val="75000"/>
-              </a:schemeClr>
-            </a:solidFill>
-          </a:ln>
-        </p:spPr>
-        <p:style>
-          <a:lnRef idx="2">
-            <a:schemeClr val="accent1">
-              <a:shade val="50000"/>
-            </a:schemeClr>
-          </a:lnRef>
-          <a:fillRef idx="1">
-            <a:schemeClr val="accent1"/>
-          </a:fillRef>
-          <a:effectRef idx="0">
-            <a:schemeClr val="accent1"/>
-          </a:effectRef>
-          <a:fontRef idx="minor">
-            <a:schemeClr val="lt1"/>
-          </a:fontRef>
-        </p:style>
-        <p:txBody>
-          <a:bodyPr rtlCol="0" anchor="ctr"/>
-          <a:lstStyle/>
-          <a:p>
-            <a:pPr algn="ctr"/>
-            <a:endParaRPr lang="en-US"/>
-          </a:p>
-        </p:txBody>
-      </p:sp>
-      <p:sp>
-        <p:nvSpPr>
-          <p:cNvPr id="20" name="Moon 19"/>
-          <p:cNvSpPr/>
-          <p:nvPr/>
-        </p:nvSpPr>
-        <p:spPr>
-          <a:xfrm>
-            <a:off x="3833513" y="5602297"/>
-            <a:ext cx="118578" cy="175637"/>
-          </a:xfrm>
-          <a:prstGeom prst="moon">
-            <a:avLst/>
-          </a:prstGeom>
-          <a:noFill/>
-          <a:ln w="28575">
-            <a:solidFill>
-              <a:schemeClr val="accent1">
-                <a:lumMod val="75000"/>
-              </a:schemeClr>
-            </a:solidFill>
-          </a:ln>
-        </p:spPr>
-        <p:style>
-          <a:lnRef idx="2">
-            <a:schemeClr val="accent1">
-              <a:shade val="50000"/>
-            </a:schemeClr>
-          </a:lnRef>
-          <a:fillRef idx="1">
-            <a:schemeClr val="accent1"/>
-          </a:fillRef>
-          <a:effectRef idx="0">
-            <a:schemeClr val="accent1"/>
-          </a:effectRef>
-          <a:fontRef idx="minor">
-            <a:schemeClr val="lt1"/>
-          </a:fontRef>
-        </p:style>
-        <p:txBody>
-          <a:bodyPr rtlCol="0" anchor="ctr"/>
-          <a:lstStyle/>
-          <a:p>
-            <a:pPr algn="ctr"/>
-            <a:endParaRPr lang="en-US"/>
-          </a:p>
-        </p:txBody>
-      </p:sp>
-      <p:sp>
-        <p:nvSpPr>
-          <p:cNvPr id="21" name="Trapezoid 20"/>
-          <p:cNvSpPr/>
-          <p:nvPr/>
-        </p:nvSpPr>
-        <p:spPr>
-          <a:xfrm>
-            <a:off x="5056528" y="5347062"/>
-            <a:ext cx="240145" cy="169368"/>
-          </a:xfrm>
-          <a:prstGeom prst="trapezoid">
-            <a:avLst/>
-          </a:prstGeom>
-          <a:noFill/>
-          <a:ln w="38100">
-            <a:solidFill>
-              <a:schemeClr val="accent1">
-                <a:lumMod val="75000"/>
-              </a:schemeClr>
-            </a:solidFill>
-          </a:ln>
-        </p:spPr>
-        <p:style>
-          <a:lnRef idx="2">
-            <a:schemeClr val="accent1">
-              <a:shade val="50000"/>
-            </a:schemeClr>
-          </a:lnRef>
-          <a:fillRef idx="1">
-            <a:schemeClr val="accent1"/>
-          </a:fillRef>
-          <a:effectRef idx="0">
-            <a:schemeClr val="accent1"/>
-          </a:effectRef>
-          <a:fontRef idx="minor">
-            <a:schemeClr val="lt1"/>
-          </a:fontRef>
-        </p:style>
-        <p:txBody>
-          <a:bodyPr rtlCol="0" anchor="ctr"/>
-          <a:lstStyle/>
-          <a:p>
-            <a:pPr algn="ctr"/>
-            <a:endParaRPr lang="en-US"/>
-          </a:p>
-        </p:txBody>
-      </p:sp>
-      <p:sp>
-        <p:nvSpPr>
-          <p:cNvPr id="138" name="Diamond 137"/>
-          <p:cNvSpPr/>
-          <p:nvPr/>
-        </p:nvSpPr>
-        <p:spPr>
-          <a:xfrm>
-            <a:off x="4200861" y="3091766"/>
-            <a:ext cx="237744" cy="219456"/>
-          </a:xfrm>
-          <a:prstGeom prst="diamond">
-            <a:avLst/>
-          </a:prstGeom>
-          <a:solidFill>
-            <a:schemeClr val="accent1">
-              <a:lumMod val="75000"/>
-            </a:schemeClr>
-          </a:solidFill>
-          <a:ln w="38100">
-            <a:solidFill>
-              <a:schemeClr val="accent1">
-                <a:lumMod val="75000"/>
-              </a:schemeClr>
-            </a:solidFill>
-          </a:ln>
-        </p:spPr>
-        <p:style>
-          <a:lnRef idx="2">
-            <a:schemeClr val="accent1">
-              <a:shade val="50000"/>
-            </a:schemeClr>
-          </a:lnRef>
-          <a:fillRef idx="1">
-            <a:schemeClr val="accent1"/>
-          </a:fillRef>
-          <a:effectRef idx="0">
-            <a:schemeClr val="accent1"/>
-          </a:effectRef>
-          <a:fontRef idx="minor">
-            <a:schemeClr val="lt1"/>
-          </a:fontRef>
-        </p:style>
-        <p:txBody>
-          <a:bodyPr rtlCol="0" anchor="ctr"/>
-          <a:lstStyle/>
-          <a:p>
-            <a:pPr algn="ctr"/>
-            <a:endParaRPr lang="en-US"/>
-          </a:p>
-        </p:txBody>
-      </p:sp>
-      <p:sp>
-        <p:nvSpPr>
-          <p:cNvPr id="139" name="Rectangle 138"/>
-          <p:cNvSpPr/>
-          <p:nvPr/>
-        </p:nvSpPr>
-        <p:spPr>
-          <a:xfrm>
-            <a:off x="4818252" y="3458565"/>
-            <a:ext cx="164592" cy="153690"/>
-          </a:xfrm>
-          <a:prstGeom prst="rect">
-            <a:avLst/>
-          </a:prstGeom>
-          <a:solidFill>
-            <a:schemeClr val="accent1">
-              <a:lumMod val="75000"/>
-            </a:schemeClr>
-          </a:solidFill>
-          <a:ln w="38100">
-            <a:solidFill>
-              <a:schemeClr val="accent1">
-                <a:lumMod val="75000"/>
-              </a:schemeClr>
-            </a:solidFill>
-          </a:ln>
-        </p:spPr>
-        <p:style>
-          <a:lnRef idx="2">
-            <a:schemeClr val="accent1">
-              <a:shade val="50000"/>
-            </a:schemeClr>
-          </a:lnRef>
-          <a:fillRef idx="1">
-            <a:schemeClr val="accent1"/>
-          </a:fillRef>
-          <a:effectRef idx="0">
-            <a:schemeClr val="accent1"/>
-          </a:effectRef>
-          <a:fontRef idx="minor">
-            <a:schemeClr val="lt1"/>
-          </a:fontRef>
-        </p:style>
-        <p:txBody>
-          <a:bodyPr rtlCol="0" anchor="ctr"/>
-          <a:lstStyle/>
-          <a:p>
-            <a:pPr algn="ctr"/>
-            <a:endParaRPr lang="en-US"/>
-          </a:p>
-        </p:txBody>
-      </p:sp>
-      <p:sp>
-        <p:nvSpPr>
-          <p:cNvPr id="140" name="Oval 139"/>
-          <p:cNvSpPr/>
-          <p:nvPr/>
-        </p:nvSpPr>
-        <p:spPr>
-          <a:xfrm>
-            <a:off x="5111951" y="2367819"/>
-            <a:ext cx="174451" cy="183765"/>
-          </a:xfrm>
-          <a:prstGeom prst="ellipse">
-            <a:avLst/>
-          </a:prstGeom>
-          <a:solidFill>
-            <a:schemeClr val="accent1">
-              <a:lumMod val="75000"/>
-            </a:schemeClr>
-          </a:solidFill>
-          <a:ln w="38100">
-            <a:solidFill>
-              <a:schemeClr val="accent1">
-                <a:lumMod val="75000"/>
-              </a:schemeClr>
-            </a:solidFill>
-          </a:ln>
-        </p:spPr>
-        <p:style>
-          <a:lnRef idx="2">
-            <a:schemeClr val="accent1">
-              <a:shade val="50000"/>
-            </a:schemeClr>
-          </a:lnRef>
-          <a:fillRef idx="1">
-            <a:schemeClr val="accent1"/>
-          </a:fillRef>
-          <a:effectRef idx="0">
-            <a:schemeClr val="accent1"/>
-          </a:effectRef>
-          <a:fontRef idx="minor">
-            <a:schemeClr val="lt1"/>
-          </a:fontRef>
-        </p:style>
-        <p:txBody>
-          <a:bodyPr rtlCol="0" anchor="ctr"/>
-          <a:lstStyle/>
-          <a:p>
-            <a:pPr algn="ctr"/>
-            <a:endParaRPr lang="en-US"/>
-          </a:p>
-        </p:txBody>
-      </p:sp>
-      <p:sp>
-        <p:nvSpPr>
-          <p:cNvPr id="141" name="Isosceles Triangle 140"/>
-          <p:cNvSpPr/>
-          <p:nvPr/>
-        </p:nvSpPr>
-        <p:spPr>
-          <a:xfrm>
-            <a:off x="3627306" y="2374308"/>
-            <a:ext cx="180669" cy="170788"/>
-          </a:xfrm>
-          <a:prstGeom prst="triangle">
-            <a:avLst/>
-          </a:prstGeom>
-          <a:solidFill>
-            <a:schemeClr val="accent1">
-              <a:lumMod val="75000"/>
-            </a:schemeClr>
-          </a:solidFill>
-          <a:ln w="38100">
-            <a:solidFill>
-              <a:schemeClr val="accent1">
-                <a:lumMod val="75000"/>
-              </a:schemeClr>
-            </a:solidFill>
-          </a:ln>
-        </p:spPr>
-        <p:style>
-          <a:lnRef idx="2">
-            <a:schemeClr val="accent1">
-              <a:shade val="50000"/>
-            </a:schemeClr>
-          </a:lnRef>
-          <a:fillRef idx="1">
-            <a:schemeClr val="accent1"/>
-          </a:fillRef>
-          <a:effectRef idx="0">
-            <a:schemeClr val="accent1"/>
-          </a:effectRef>
-          <a:fontRef idx="minor">
-            <a:schemeClr val="lt1"/>
-          </a:fontRef>
-        </p:style>
-        <p:txBody>
-          <a:bodyPr rtlCol="0" anchor="ctr"/>
-          <a:lstStyle/>
-          <a:p>
-            <a:pPr algn="ctr"/>
-            <a:endParaRPr lang="en-US"/>
-          </a:p>
-        </p:txBody>
-      </p:sp>
-      <p:sp>
-        <p:nvSpPr>
-          <p:cNvPr id="142" name="5-Point Star 141"/>
-          <p:cNvSpPr/>
-          <p:nvPr/>
-        </p:nvSpPr>
-        <p:spPr>
-          <a:xfrm>
-            <a:off x="3636305" y="3925955"/>
-            <a:ext cx="222222" cy="187270"/>
-          </a:xfrm>
-          <a:prstGeom prst="star5">
-            <a:avLst/>
-          </a:prstGeom>
-          <a:solidFill>
-            <a:schemeClr val="accent1">
-              <a:lumMod val="75000"/>
-            </a:schemeClr>
-          </a:solidFill>
-          <a:ln w="28575">
-            <a:solidFill>
-              <a:schemeClr val="accent1">
-                <a:lumMod val="75000"/>
-              </a:schemeClr>
-            </a:solidFill>
-          </a:ln>
-        </p:spPr>
-        <p:style>
-          <a:lnRef idx="2">
-            <a:schemeClr val="accent1">
-              <a:shade val="50000"/>
-            </a:schemeClr>
-          </a:lnRef>
-          <a:fillRef idx="1">
-            <a:schemeClr val="accent1"/>
-          </a:fillRef>
-          <a:effectRef idx="0">
-            <a:schemeClr val="accent1"/>
-          </a:effectRef>
-          <a:fontRef idx="minor">
-            <a:schemeClr val="lt1"/>
-          </a:fontRef>
-        </p:style>
-        <p:txBody>
-          <a:bodyPr rtlCol="0" anchor="ctr"/>
-          <a:lstStyle/>
-          <a:p>
-            <a:pPr algn="ctr"/>
-            <a:endParaRPr lang="en-US"/>
-          </a:p>
-        </p:txBody>
-      </p:sp>
-      <p:sp>
-        <p:nvSpPr>
-          <p:cNvPr id="143" name="Regular Pentagon 142"/>
-          <p:cNvSpPr/>
-          <p:nvPr/>
-        </p:nvSpPr>
-        <p:spPr>
-          <a:xfrm>
-            <a:off x="5104353" y="3795507"/>
-            <a:ext cx="227701" cy="214650"/>
-          </a:xfrm>
-          <a:prstGeom prst="pentagon">
-            <a:avLst/>
-          </a:prstGeom>
-          <a:solidFill>
-            <a:schemeClr val="accent1">
-              <a:lumMod val="75000"/>
-            </a:schemeClr>
-          </a:solidFill>
-          <a:ln w="38100">
-            <a:solidFill>
-              <a:schemeClr val="accent1">
-                <a:lumMod val="75000"/>
-              </a:schemeClr>
-            </a:solidFill>
-          </a:ln>
-        </p:spPr>
-        <p:style>
-          <a:lnRef idx="2">
-            <a:schemeClr val="accent1">
-              <a:shade val="50000"/>
-            </a:schemeClr>
-          </a:lnRef>
-          <a:fillRef idx="1">
-            <a:schemeClr val="accent1"/>
-          </a:fillRef>
-          <a:effectRef idx="0">
-            <a:schemeClr val="accent1"/>
-          </a:effectRef>
-          <a:fontRef idx="minor">
-            <a:schemeClr val="lt1"/>
-          </a:fontRef>
-        </p:style>
-        <p:txBody>
-          <a:bodyPr rtlCol="0" anchor="ctr"/>
-          <a:lstStyle/>
-          <a:p>
-            <a:pPr algn="ctr"/>
-            <a:endParaRPr lang="en-US"/>
-          </a:p>
-        </p:txBody>
-      </p:sp>
-      <p:sp>
-        <p:nvSpPr>
-          <p:cNvPr id="144" name="Cross 143"/>
-          <p:cNvSpPr/>
-          <p:nvPr/>
-        </p:nvSpPr>
-        <p:spPr>
-          <a:xfrm>
-            <a:off x="5179894" y="2904681"/>
-            <a:ext cx="254081" cy="212255"/>
-          </a:xfrm>
-          <a:prstGeom prst="plus">
-            <a:avLst/>
-          </a:prstGeom>
-          <a:noFill/>
-          <a:ln w="38100">
-            <a:solidFill>
-              <a:schemeClr val="accent1">
-                <a:lumMod val="75000"/>
-              </a:schemeClr>
-            </a:solidFill>
-          </a:ln>
-        </p:spPr>
-        <p:style>
-          <a:lnRef idx="2">
-            <a:schemeClr val="accent1">
-              <a:shade val="50000"/>
-            </a:schemeClr>
-          </a:lnRef>
-          <a:fillRef idx="1">
-            <a:schemeClr val="accent1"/>
-          </a:fillRef>
-          <a:effectRef idx="0">
-            <a:schemeClr val="accent1"/>
-          </a:effectRef>
-          <a:fontRef idx="minor">
-            <a:schemeClr val="lt1"/>
-          </a:fontRef>
-        </p:style>
-        <p:txBody>
-          <a:bodyPr rtlCol="0" anchor="ctr"/>
-          <a:lstStyle/>
-          <a:p>
-            <a:pPr algn="ctr"/>
-            <a:endParaRPr lang="en-US"/>
-          </a:p>
-        </p:txBody>
-      </p:sp>
-      <p:sp>
-        <p:nvSpPr>
-          <p:cNvPr id="145" name="Right Triangle 144"/>
-          <p:cNvSpPr/>
-          <p:nvPr/>
-        </p:nvSpPr>
-        <p:spPr>
-          <a:xfrm>
-            <a:off x="3764622" y="3458565"/>
-            <a:ext cx="212183" cy="184569"/>
-          </a:xfrm>
-          <a:prstGeom prst="rtTriangle">
-            <a:avLst/>
-          </a:prstGeom>
-          <a:noFill/>
-          <a:ln w="38100">
-            <a:solidFill>
-              <a:schemeClr val="accent1">
-                <a:lumMod val="75000"/>
-              </a:schemeClr>
-            </a:solidFill>
-          </a:ln>
-        </p:spPr>
-        <p:style>
-          <a:lnRef idx="2">
-            <a:schemeClr val="accent1">
-              <a:shade val="50000"/>
-            </a:schemeClr>
-          </a:lnRef>
-          <a:fillRef idx="1">
-            <a:schemeClr val="accent1"/>
-          </a:fillRef>
-          <a:effectRef idx="0">
-            <a:schemeClr val="accent1"/>
-          </a:effectRef>
-          <a:fontRef idx="minor">
-            <a:schemeClr val="lt1"/>
-          </a:fontRef>
-        </p:style>
-        <p:txBody>
-          <a:bodyPr rtlCol="0" anchor="ctr"/>
-          <a:lstStyle/>
-          <a:p>
-            <a:pPr algn="ctr"/>
-            <a:endParaRPr lang="en-US"/>
-          </a:p>
-        </p:txBody>
-      </p:sp>
-      <p:sp>
-        <p:nvSpPr>
-          <p:cNvPr id="146" name="Parallelogram 145"/>
-          <p:cNvSpPr/>
-          <p:nvPr/>
-        </p:nvSpPr>
-        <p:spPr>
-          <a:xfrm>
-            <a:off x="4127865" y="2498539"/>
-            <a:ext cx="281363" cy="160133"/>
-          </a:xfrm>
-          <a:prstGeom prst="parallelogram">
-            <a:avLst/>
-          </a:prstGeom>
-          <a:noFill/>
-          <a:ln w="38100">
-            <a:solidFill>
-              <a:schemeClr val="accent1">
-                <a:lumMod val="75000"/>
-              </a:schemeClr>
-            </a:solidFill>
-          </a:ln>
-        </p:spPr>
-        <p:style>
-          <a:lnRef idx="2">
-            <a:schemeClr val="accent1">
-              <a:shade val="50000"/>
-            </a:schemeClr>
-          </a:lnRef>
-          <a:fillRef idx="1">
-            <a:schemeClr val="accent1"/>
-          </a:fillRef>
-          <a:effectRef idx="0">
-            <a:schemeClr val="accent1"/>
-          </a:effectRef>
-          <a:fontRef idx="minor">
-            <a:schemeClr val="lt1"/>
-          </a:fontRef>
-        </p:style>
-        <p:txBody>
-          <a:bodyPr rtlCol="0" anchor="ctr"/>
-          <a:lstStyle/>
-          <a:p>
-            <a:pPr algn="ctr"/>
-            <a:endParaRPr lang="en-US"/>
-          </a:p>
-        </p:txBody>
-      </p:sp>
     </p:spTree>
     <p:extLst>
       <p:ext uri="{BB962C8B-B14F-4D97-AF65-F5344CB8AC3E}">

</xml_diff>

<commit_message>
tweaks to update manuscript
</commit_message>
<xml_diff>
--- a/output/plots/all_figs_with_legends.pptx
+++ b/output/plots/all_figs_with_legends.pptx
@@ -205,7 +205,7 @@
           <a:p>
             <a:fld id="{7FA21820-D199-4D82-91AF-C50B1D3B111A}" type="datetimeFigureOut">
               <a:rPr lang="en-US" smtClean="0"/>
-              <a:t>5/9/2017</a:t>
+              <a:t>5/16/2017</a:t>
             </a:fld>
             <a:endParaRPr lang="en-US"/>
           </a:p>
@@ -1038,7 +1038,7 @@
           <a:p>
             <a:fld id="{916B8C92-D5E3-4480-8685-D57BEE386DE2}" type="datetimeFigureOut">
               <a:rPr lang="en-US" smtClean="0"/>
-              <a:t>5/9/2017</a:t>
+              <a:t>5/16/2017</a:t>
             </a:fld>
             <a:endParaRPr lang="en-US"/>
           </a:p>
@@ -1208,7 +1208,7 @@
           <a:p>
             <a:fld id="{916B8C92-D5E3-4480-8685-D57BEE386DE2}" type="datetimeFigureOut">
               <a:rPr lang="en-US" smtClean="0"/>
-              <a:t>5/9/2017</a:t>
+              <a:t>5/16/2017</a:t>
             </a:fld>
             <a:endParaRPr lang="en-US"/>
           </a:p>
@@ -1388,7 +1388,7 @@
           <a:p>
             <a:fld id="{916B8C92-D5E3-4480-8685-D57BEE386DE2}" type="datetimeFigureOut">
               <a:rPr lang="en-US" smtClean="0"/>
-              <a:t>5/9/2017</a:t>
+              <a:t>5/16/2017</a:t>
             </a:fld>
             <a:endParaRPr lang="en-US"/>
           </a:p>
@@ -1558,7 +1558,7 @@
           <a:p>
             <a:fld id="{916B8C92-D5E3-4480-8685-D57BEE386DE2}" type="datetimeFigureOut">
               <a:rPr lang="en-US" smtClean="0"/>
-              <a:t>5/9/2017</a:t>
+              <a:t>5/16/2017</a:t>
             </a:fld>
             <a:endParaRPr lang="en-US"/>
           </a:p>
@@ -1804,7 +1804,7 @@
           <a:p>
             <a:fld id="{916B8C92-D5E3-4480-8685-D57BEE386DE2}" type="datetimeFigureOut">
               <a:rPr lang="en-US" smtClean="0"/>
-              <a:t>5/9/2017</a:t>
+              <a:t>5/16/2017</a:t>
             </a:fld>
             <a:endParaRPr lang="en-US"/>
           </a:p>
@@ -2036,7 +2036,7 @@
           <a:p>
             <a:fld id="{916B8C92-D5E3-4480-8685-D57BEE386DE2}" type="datetimeFigureOut">
               <a:rPr lang="en-US" smtClean="0"/>
-              <a:t>5/9/2017</a:t>
+              <a:t>5/16/2017</a:t>
             </a:fld>
             <a:endParaRPr lang="en-US"/>
           </a:p>
@@ -2403,7 +2403,7 @@
           <a:p>
             <a:fld id="{916B8C92-D5E3-4480-8685-D57BEE386DE2}" type="datetimeFigureOut">
               <a:rPr lang="en-US" smtClean="0"/>
-              <a:t>5/9/2017</a:t>
+              <a:t>5/16/2017</a:t>
             </a:fld>
             <a:endParaRPr lang="en-US"/>
           </a:p>
@@ -2521,7 +2521,7 @@
           <a:p>
             <a:fld id="{916B8C92-D5E3-4480-8685-D57BEE386DE2}" type="datetimeFigureOut">
               <a:rPr lang="en-US" smtClean="0"/>
-              <a:t>5/9/2017</a:t>
+              <a:t>5/16/2017</a:t>
             </a:fld>
             <a:endParaRPr lang="en-US"/>
           </a:p>
@@ -2616,7 +2616,7 @@
           <a:p>
             <a:fld id="{916B8C92-D5E3-4480-8685-D57BEE386DE2}" type="datetimeFigureOut">
               <a:rPr lang="en-US" smtClean="0"/>
-              <a:t>5/9/2017</a:t>
+              <a:t>5/16/2017</a:t>
             </a:fld>
             <a:endParaRPr lang="en-US"/>
           </a:p>
@@ -2893,7 +2893,7 @@
           <a:p>
             <a:fld id="{916B8C92-D5E3-4480-8685-D57BEE386DE2}" type="datetimeFigureOut">
               <a:rPr lang="en-US" smtClean="0"/>
-              <a:t>5/9/2017</a:t>
+              <a:t>5/16/2017</a:t>
             </a:fld>
             <a:endParaRPr lang="en-US"/>
           </a:p>
@@ -3146,7 +3146,7 @@
           <a:p>
             <a:fld id="{916B8C92-D5E3-4480-8685-D57BEE386DE2}" type="datetimeFigureOut">
               <a:rPr lang="en-US" smtClean="0"/>
-              <a:t>5/9/2017</a:t>
+              <a:t>5/16/2017</a:t>
             </a:fld>
             <a:endParaRPr lang="en-US"/>
           </a:p>
@@ -3359,7 +3359,7 @@
           <a:p>
             <a:fld id="{916B8C92-D5E3-4480-8685-D57BEE386DE2}" type="datetimeFigureOut">
               <a:rPr lang="en-US" smtClean="0"/>
-              <a:t>5/9/2017</a:t>
+              <a:t>5/16/2017</a:t>
             </a:fld>
             <a:endParaRPr lang="en-US"/>
           </a:p>
@@ -4985,52 +4985,6 @@
           </a:p>
         </p:txBody>
       </p:sp>
-      <p:sp>
-        <p:nvSpPr>
-          <p:cNvPr id="9" name="Rectangle 8"/>
-          <p:cNvSpPr/>
-          <p:nvPr/>
-        </p:nvSpPr>
-        <p:spPr>
-          <a:xfrm>
-            <a:off x="2831774" y="2288613"/>
-            <a:ext cx="2567209" cy="2136065"/>
-          </a:xfrm>
-          <a:prstGeom prst="rect">
-            <a:avLst/>
-          </a:prstGeom>
-          <a:noFill/>
-          <a:ln>
-            <a:solidFill>
-              <a:schemeClr val="tx1"/>
-            </a:solidFill>
-          </a:ln>
-        </p:spPr>
-        <p:style>
-          <a:lnRef idx="2">
-            <a:schemeClr val="accent1">
-              <a:shade val="50000"/>
-            </a:schemeClr>
-          </a:lnRef>
-          <a:fillRef idx="1">
-            <a:schemeClr val="accent1"/>
-          </a:fillRef>
-          <a:effectRef idx="0">
-            <a:schemeClr val="accent1"/>
-          </a:effectRef>
-          <a:fontRef idx="minor">
-            <a:schemeClr val="lt1"/>
-          </a:fontRef>
-        </p:style>
-        <p:txBody>
-          <a:bodyPr rtlCol="0" anchor="ctr"/>
-          <a:lstStyle/>
-          <a:p>
-            <a:pPr algn="ctr"/>
-            <a:endParaRPr lang="en-US"/>
-          </a:p>
-        </p:txBody>
-      </p:sp>
       <p:graphicFrame>
         <p:nvGraphicFramePr>
           <p:cNvPr id="50" name="Table 49"/>
@@ -5990,7 +5944,7 @@
             <a:avLst/>
           </a:prstGeom>
           <a:noFill/>
-          <a:ln w="19050">
+          <a:ln w="6350">
             <a:solidFill>
               <a:schemeClr val="tx1"/>
             </a:solidFill>
@@ -6036,7 +5990,7 @@
             <a:avLst/>
           </a:prstGeom>
           <a:noFill/>
-          <a:ln w="19050">
+          <a:ln w="6350">
             <a:solidFill>
               <a:schemeClr val="tx1"/>
             </a:solidFill>
@@ -6142,8 +6096,8 @@
         </p:blipFill>
         <p:spPr>
           <a:xfrm>
-            <a:off x="225537" y="163710"/>
-            <a:ext cx="2485443" cy="2047887"/>
+            <a:off x="268764" y="163711"/>
+            <a:ext cx="2442216" cy="2012270"/>
           </a:xfrm>
           <a:prstGeom prst="rect">
             <a:avLst/>
@@ -8048,6 +8002,52 @@
           </a:prstGeom>
         </p:spPr>
       </p:pic>
+      <p:sp>
+        <p:nvSpPr>
+          <p:cNvPr id="64" name="Rectangle 63"/>
+          <p:cNvSpPr/>
+          <p:nvPr/>
+        </p:nvSpPr>
+        <p:spPr>
+          <a:xfrm>
+            <a:off x="2849468" y="2288526"/>
+            <a:ext cx="1277474" cy="1069826"/>
+          </a:xfrm>
+          <a:prstGeom prst="rect">
+            <a:avLst/>
+          </a:prstGeom>
+          <a:noFill/>
+          <a:ln w="6350">
+            <a:solidFill>
+              <a:schemeClr val="tx1"/>
+            </a:solidFill>
+          </a:ln>
+        </p:spPr>
+        <p:style>
+          <a:lnRef idx="2">
+            <a:schemeClr val="accent1">
+              <a:shade val="50000"/>
+            </a:schemeClr>
+          </a:lnRef>
+          <a:fillRef idx="1">
+            <a:schemeClr val="accent1"/>
+          </a:fillRef>
+          <a:effectRef idx="0">
+            <a:schemeClr val="accent1"/>
+          </a:effectRef>
+          <a:fontRef idx="minor">
+            <a:schemeClr val="lt1"/>
+          </a:fontRef>
+        </p:style>
+        <p:txBody>
+          <a:bodyPr rtlCol="0" anchor="ctr"/>
+          <a:lstStyle/>
+          <a:p>
+            <a:pPr algn="ctr"/>
+            <a:endParaRPr lang="en-US"/>
+          </a:p>
+        </p:txBody>
+      </p:sp>
     </p:spTree>
     <p:extLst>
       <p:ext uri="{BB962C8B-B14F-4D97-AF65-F5344CB8AC3E}">

</xml_diff>

<commit_message>
supp figs 1-3 complete
</commit_message>
<xml_diff>
--- a/output/plots/all_figs_with_legends.pptx
+++ b/output/plots/all_figs_with_legends.pptx
@@ -205,7 +205,7 @@
           <a:p>
             <a:fld id="{7FA21820-D199-4D82-91AF-C50B1D3B111A}" type="datetimeFigureOut">
               <a:rPr lang="en-US" smtClean="0"/>
-              <a:t>5/16/2017</a:t>
+              <a:t>5/17/2017</a:t>
             </a:fld>
             <a:endParaRPr lang="en-US"/>
           </a:p>
@@ -1038,7 +1038,7 @@
           <a:p>
             <a:fld id="{916B8C92-D5E3-4480-8685-D57BEE386DE2}" type="datetimeFigureOut">
               <a:rPr lang="en-US" smtClean="0"/>
-              <a:t>5/16/2017</a:t>
+              <a:t>5/17/2017</a:t>
             </a:fld>
             <a:endParaRPr lang="en-US"/>
           </a:p>
@@ -1208,7 +1208,7 @@
           <a:p>
             <a:fld id="{916B8C92-D5E3-4480-8685-D57BEE386DE2}" type="datetimeFigureOut">
               <a:rPr lang="en-US" smtClean="0"/>
-              <a:t>5/16/2017</a:t>
+              <a:t>5/17/2017</a:t>
             </a:fld>
             <a:endParaRPr lang="en-US"/>
           </a:p>
@@ -1388,7 +1388,7 @@
           <a:p>
             <a:fld id="{916B8C92-D5E3-4480-8685-D57BEE386DE2}" type="datetimeFigureOut">
               <a:rPr lang="en-US" smtClean="0"/>
-              <a:t>5/16/2017</a:t>
+              <a:t>5/17/2017</a:t>
             </a:fld>
             <a:endParaRPr lang="en-US"/>
           </a:p>
@@ -1558,7 +1558,7 @@
           <a:p>
             <a:fld id="{916B8C92-D5E3-4480-8685-D57BEE386DE2}" type="datetimeFigureOut">
               <a:rPr lang="en-US" smtClean="0"/>
-              <a:t>5/16/2017</a:t>
+              <a:t>5/17/2017</a:t>
             </a:fld>
             <a:endParaRPr lang="en-US"/>
           </a:p>
@@ -1804,7 +1804,7 @@
           <a:p>
             <a:fld id="{916B8C92-D5E3-4480-8685-D57BEE386DE2}" type="datetimeFigureOut">
               <a:rPr lang="en-US" smtClean="0"/>
-              <a:t>5/16/2017</a:t>
+              <a:t>5/17/2017</a:t>
             </a:fld>
             <a:endParaRPr lang="en-US"/>
           </a:p>
@@ -2036,7 +2036,7 @@
           <a:p>
             <a:fld id="{916B8C92-D5E3-4480-8685-D57BEE386DE2}" type="datetimeFigureOut">
               <a:rPr lang="en-US" smtClean="0"/>
-              <a:t>5/16/2017</a:t>
+              <a:t>5/17/2017</a:t>
             </a:fld>
             <a:endParaRPr lang="en-US"/>
           </a:p>
@@ -2403,7 +2403,7 @@
           <a:p>
             <a:fld id="{916B8C92-D5E3-4480-8685-D57BEE386DE2}" type="datetimeFigureOut">
               <a:rPr lang="en-US" smtClean="0"/>
-              <a:t>5/16/2017</a:t>
+              <a:t>5/17/2017</a:t>
             </a:fld>
             <a:endParaRPr lang="en-US"/>
           </a:p>
@@ -2521,7 +2521,7 @@
           <a:p>
             <a:fld id="{916B8C92-D5E3-4480-8685-D57BEE386DE2}" type="datetimeFigureOut">
               <a:rPr lang="en-US" smtClean="0"/>
-              <a:t>5/16/2017</a:t>
+              <a:t>5/17/2017</a:t>
             </a:fld>
             <a:endParaRPr lang="en-US"/>
           </a:p>
@@ -2616,7 +2616,7 @@
           <a:p>
             <a:fld id="{916B8C92-D5E3-4480-8685-D57BEE386DE2}" type="datetimeFigureOut">
               <a:rPr lang="en-US" smtClean="0"/>
-              <a:t>5/16/2017</a:t>
+              <a:t>5/17/2017</a:t>
             </a:fld>
             <a:endParaRPr lang="en-US"/>
           </a:p>
@@ -2893,7 +2893,7 @@
           <a:p>
             <a:fld id="{916B8C92-D5E3-4480-8685-D57BEE386DE2}" type="datetimeFigureOut">
               <a:rPr lang="en-US" smtClean="0"/>
-              <a:t>5/16/2017</a:t>
+              <a:t>5/17/2017</a:t>
             </a:fld>
             <a:endParaRPr lang="en-US"/>
           </a:p>
@@ -3146,7 +3146,7 @@
           <a:p>
             <a:fld id="{916B8C92-D5E3-4480-8685-D57BEE386DE2}" type="datetimeFigureOut">
               <a:rPr lang="en-US" smtClean="0"/>
-              <a:t>5/16/2017</a:t>
+              <a:t>5/17/2017</a:t>
             </a:fld>
             <a:endParaRPr lang="en-US"/>
           </a:p>
@@ -3359,7 +3359,7 @@
           <a:p>
             <a:fld id="{916B8C92-D5E3-4480-8685-D57BEE386DE2}" type="datetimeFigureOut">
               <a:rPr lang="en-US" smtClean="0"/>
-              <a:t>5/16/2017</a:t>
+              <a:t>5/17/2017</a:t>
             </a:fld>
             <a:endParaRPr lang="en-US"/>
           </a:p>
@@ -10388,482 +10388,235 @@
           <a:chExt cx="0" cy="0"/>
         </a:xfrm>
       </p:grpSpPr>
+      <p:pic>
+        <p:nvPicPr>
+          <p:cNvPr id="5" name="Picture 4"/>
+          <p:cNvPicPr>
+            <a:picLocks noChangeAspect="1"/>
+          </p:cNvPicPr>
+          <p:nvPr/>
+        </p:nvPicPr>
+        <p:blipFill rotWithShape="1">
+          <a:blip r:embed="rId2"/>
+          <a:srcRect b="7630"/>
+          <a:stretch/>
+        </p:blipFill>
+        <p:spPr>
+          <a:xfrm>
+            <a:off x="926371" y="146304"/>
+            <a:ext cx="10336164" cy="6199632"/>
+          </a:xfrm>
+          <a:prstGeom prst="rect">
+            <a:avLst/>
+          </a:prstGeom>
+        </p:spPr>
+      </p:pic>
       <p:grpSp>
         <p:nvGrpSpPr>
-          <p:cNvPr id="8" name="Group 7"/>
+          <p:cNvPr id="7" name="Group 6"/>
           <p:cNvGrpSpPr/>
           <p:nvPr/>
         </p:nvGrpSpPr>
         <p:grpSpPr>
           <a:xfrm>
-            <a:off x="0" y="1201890"/>
-            <a:ext cx="12006617" cy="4320831"/>
-            <a:chOff x="97985" y="1201890"/>
-            <a:chExt cx="11908632" cy="4320831"/>
+            <a:off x="2330313" y="6345936"/>
+            <a:ext cx="8304158" cy="487093"/>
+            <a:chOff x="2376033" y="6324830"/>
+            <a:chExt cx="8304158" cy="487093"/>
           </a:xfrm>
         </p:grpSpPr>
         <p:pic>
           <p:nvPicPr>
-            <p:cNvPr id="4" name="Picture 3"/>
+            <p:cNvPr id="21" name="Picture 20"/>
             <p:cNvPicPr>
               <a:picLocks noChangeAspect="1"/>
             </p:cNvPicPr>
             <p:nvPr/>
           </p:nvPicPr>
           <p:blipFill>
-            <a:blip r:embed="rId2"/>
+            <a:blip r:embed="rId3" cstate="print">
+              <a:extLst>
+                <a:ext uri="{28A0092B-C50C-407E-A947-70E740481C1C}">
+                  <a14:useLocalDpi xmlns:a14="http://schemas.microsoft.com/office/drawing/2010/main" val="0"/>
+                </a:ext>
+              </a:extLst>
+            </a:blip>
             <a:stretch>
               <a:fillRect/>
             </a:stretch>
           </p:blipFill>
           <p:spPr>
             <a:xfrm>
-              <a:off x="97985" y="1201890"/>
-              <a:ext cx="11908632" cy="4320831"/>
+              <a:off x="3575399" y="6383536"/>
+              <a:ext cx="512410" cy="318881"/>
             </a:xfrm>
             <a:prstGeom prst="rect">
               <a:avLst/>
             </a:prstGeom>
           </p:spPr>
         </p:pic>
-        <p:grpSp>
-          <p:nvGrpSpPr>
-            <p:cNvPr id="2" name="Group 1"/>
-            <p:cNvGrpSpPr/>
+        <p:pic>
+          <p:nvPicPr>
+            <p:cNvPr id="22" name="Picture 21"/>
+            <p:cNvPicPr>
+              <a:picLocks noChangeAspect="1"/>
+            </p:cNvPicPr>
             <p:nvPr/>
-          </p:nvGrpSpPr>
-          <p:grpSpPr>
+          </p:nvPicPr>
+          <p:blipFill>
+            <a:blip r:embed="rId4" cstate="print">
+              <a:extLst>
+                <a:ext uri="{28A0092B-C50C-407E-A947-70E740481C1C}">
+                  <a14:useLocalDpi xmlns:a14="http://schemas.microsoft.com/office/drawing/2010/main" val="0"/>
+                </a:ext>
+              </a:extLst>
+            </a:blip>
+            <a:stretch>
+              <a:fillRect/>
+            </a:stretch>
+          </p:blipFill>
+          <p:spPr>
             <a:xfrm>
-              <a:off x="1032989" y="4782853"/>
-              <a:ext cx="4738636" cy="471890"/>
-              <a:chOff x="1032989" y="4782853"/>
-              <a:chExt cx="4738636" cy="471890"/>
+              <a:off x="4905939" y="6324830"/>
+              <a:ext cx="441590" cy="445261"/>
             </a:xfrm>
-          </p:grpSpPr>
-          <p:pic>
-            <p:nvPicPr>
-              <p:cNvPr id="6" name="Picture 5"/>
-              <p:cNvPicPr>
-                <a:picLocks noChangeAspect="1"/>
-              </p:cNvPicPr>
-              <p:nvPr/>
-            </p:nvPicPr>
-            <p:blipFill>
-              <a:blip r:embed="rId3" cstate="print">
-                <a:extLst>
-                  <a:ext uri="{28A0092B-C50C-407E-A947-70E740481C1C}">
-                    <a14:useLocalDpi xmlns:a14="http://schemas.microsoft.com/office/drawing/2010/main" val="0"/>
-                  </a:ext>
-                </a:extLst>
-              </a:blip>
-              <a:stretch>
-                <a:fillRect/>
-              </a:stretch>
-            </p:blipFill>
-            <p:spPr>
-              <a:xfrm>
-                <a:off x="1761029" y="4932898"/>
-                <a:ext cx="541407" cy="268617"/>
-              </a:xfrm>
-              <a:prstGeom prst="rect">
-                <a:avLst/>
-              </a:prstGeom>
-            </p:spPr>
-          </p:pic>
-          <p:pic>
-            <p:nvPicPr>
-              <p:cNvPr id="9" name="Picture 8"/>
-              <p:cNvPicPr>
-                <a:picLocks noChangeAspect="1"/>
-              </p:cNvPicPr>
-              <p:nvPr/>
-            </p:nvPicPr>
-            <p:blipFill>
-              <a:blip r:embed="rId4" cstate="print">
-                <a:extLst>
-                  <a:ext uri="{28A0092B-C50C-407E-A947-70E740481C1C}">
-                    <a14:useLocalDpi xmlns:a14="http://schemas.microsoft.com/office/drawing/2010/main" val="0"/>
-                  </a:ext>
-                </a:extLst>
-              </a:blip>
-              <a:stretch>
-                <a:fillRect/>
-              </a:stretch>
-            </p:blipFill>
-            <p:spPr>
-              <a:xfrm>
-                <a:off x="3244448" y="4782853"/>
-                <a:ext cx="371522" cy="375075"/>
-              </a:xfrm>
-              <a:prstGeom prst="rect">
-                <a:avLst/>
-              </a:prstGeom>
-            </p:spPr>
-          </p:pic>
-          <p:pic>
-            <p:nvPicPr>
-              <p:cNvPr id="10" name="Picture 9"/>
-              <p:cNvPicPr>
-                <a:picLocks noChangeAspect="1"/>
-              </p:cNvPicPr>
-              <p:nvPr/>
-            </p:nvPicPr>
-            <p:blipFill>
-              <a:blip r:embed="rId5" cstate="print">
-                <a:extLst>
-                  <a:ext uri="{28A0092B-C50C-407E-A947-70E740481C1C}">
-                    <a14:useLocalDpi xmlns:a14="http://schemas.microsoft.com/office/drawing/2010/main" val="0"/>
-                  </a:ext>
-                </a:extLst>
-              </a:blip>
-              <a:stretch>
-                <a:fillRect/>
-              </a:stretch>
-            </p:blipFill>
-            <p:spPr>
-              <a:xfrm>
-                <a:off x="2523564" y="4879668"/>
-                <a:ext cx="466579" cy="375075"/>
-              </a:xfrm>
-              <a:prstGeom prst="rect">
-                <a:avLst/>
-              </a:prstGeom>
-            </p:spPr>
-          </p:pic>
-          <p:pic>
-            <p:nvPicPr>
-              <p:cNvPr id="11" name="Picture 10"/>
-              <p:cNvPicPr>
-                <a:picLocks noChangeAspect="1"/>
-              </p:cNvPicPr>
-              <p:nvPr/>
-            </p:nvPicPr>
-            <p:blipFill>
-              <a:blip r:embed="rId6" cstate="print">
-                <a:extLst>
-                  <a:ext uri="{28A0092B-C50C-407E-A947-70E740481C1C}">
-                    <a14:useLocalDpi xmlns:a14="http://schemas.microsoft.com/office/drawing/2010/main" val="0"/>
-                  </a:ext>
-                </a:extLst>
-              </a:blip>
-              <a:stretch>
-                <a:fillRect/>
-              </a:stretch>
-            </p:blipFill>
-            <p:spPr>
-              <a:xfrm>
-                <a:off x="3935548" y="4810694"/>
-                <a:ext cx="422871" cy="372587"/>
-              </a:xfrm>
-              <a:prstGeom prst="rect">
-                <a:avLst/>
-              </a:prstGeom>
-            </p:spPr>
-          </p:pic>
-          <p:pic>
-            <p:nvPicPr>
-              <p:cNvPr id="3" name="Picture 2"/>
-              <p:cNvPicPr>
-                <a:picLocks noChangeAspect="1"/>
-              </p:cNvPicPr>
-              <p:nvPr/>
-            </p:nvPicPr>
-            <p:blipFill>
-              <a:blip r:embed="rId7" cstate="print">
-                <a:extLst>
-                  <a:ext uri="{28A0092B-C50C-407E-A947-70E740481C1C}">
-                    <a14:useLocalDpi xmlns:a14="http://schemas.microsoft.com/office/drawing/2010/main" val="0"/>
-                  </a:ext>
-                </a:extLst>
-              </a:blip>
-              <a:stretch>
-                <a:fillRect/>
-              </a:stretch>
-            </p:blipFill>
-            <p:spPr>
-              <a:xfrm>
-                <a:off x="1032989" y="4855194"/>
-                <a:ext cx="456193" cy="375075"/>
-              </a:xfrm>
-              <a:prstGeom prst="rect">
-                <a:avLst/>
-              </a:prstGeom>
-            </p:spPr>
-          </p:pic>
-          <p:pic>
-            <p:nvPicPr>
-              <p:cNvPr id="39" name="Picture 38"/>
-              <p:cNvPicPr>
-                <a:picLocks noChangeAspect="1"/>
-              </p:cNvPicPr>
-              <p:nvPr/>
-            </p:nvPicPr>
-            <p:blipFill>
-              <a:blip r:embed="rId8" cstate="print">
-                <a:extLst>
-                  <a:ext uri="{28A0092B-C50C-407E-A947-70E740481C1C}">
-                    <a14:useLocalDpi xmlns:a14="http://schemas.microsoft.com/office/drawing/2010/main" val="0"/>
-                  </a:ext>
-                </a:extLst>
-              </a:blip>
-              <a:stretch>
-                <a:fillRect/>
-              </a:stretch>
-            </p:blipFill>
-            <p:spPr>
-              <a:xfrm flipH="1">
-                <a:off x="4682639" y="4815353"/>
-                <a:ext cx="425272" cy="363268"/>
-              </a:xfrm>
-              <a:prstGeom prst="rect">
-                <a:avLst/>
-              </a:prstGeom>
-            </p:spPr>
-          </p:pic>
-          <p:pic>
-            <p:nvPicPr>
-              <p:cNvPr id="20" name="Picture 19"/>
-              <p:cNvPicPr>
-                <a:picLocks noChangeAspect="1"/>
-              </p:cNvPicPr>
-              <p:nvPr/>
-            </p:nvPicPr>
-            <p:blipFill>
-              <a:blip r:embed="rId9"/>
-              <a:stretch>
-                <a:fillRect/>
-              </a:stretch>
-            </p:blipFill>
-            <p:spPr>
-              <a:xfrm>
-                <a:off x="5374751" y="4868621"/>
-                <a:ext cx="396874" cy="310000"/>
-              </a:xfrm>
-              <a:prstGeom prst="rect">
-                <a:avLst/>
-              </a:prstGeom>
-            </p:spPr>
-          </p:pic>
-        </p:grpSp>
-        <p:grpSp>
-          <p:nvGrpSpPr>
-            <p:cNvPr id="25" name="Group 24"/>
-            <p:cNvGrpSpPr/>
+            <a:prstGeom prst="rect">
+              <a:avLst/>
+            </a:prstGeom>
+          </p:spPr>
+        </p:pic>
+        <p:pic>
+          <p:nvPicPr>
+            <p:cNvPr id="23" name="Picture 22"/>
+            <p:cNvPicPr>
+              <a:picLocks noChangeAspect="1"/>
+            </p:cNvPicPr>
             <p:nvPr/>
-          </p:nvGrpSpPr>
-          <p:grpSpPr>
+          </p:nvPicPr>
+          <p:blipFill>
+            <a:blip r:embed="rId5" cstate="print">
+              <a:extLst>
+                <a:ext uri="{28A0092B-C50C-407E-A947-70E740481C1C}">
+                  <a14:useLocalDpi xmlns:a14="http://schemas.microsoft.com/office/drawing/2010/main" val="0"/>
+                </a:ext>
+              </a:extLst>
+            </a:blip>
+            <a:stretch>
+              <a:fillRect/>
+            </a:stretch>
+          </p:blipFill>
+          <p:spPr>
             <a:xfrm>
-              <a:off x="7074125" y="4706731"/>
-              <a:ext cx="4738636" cy="471890"/>
-              <a:chOff x="1032989" y="4782853"/>
-              <a:chExt cx="4738636" cy="471890"/>
+              <a:off x="2376033" y="6346244"/>
+              <a:ext cx="431760" cy="445261"/>
             </a:xfrm>
-          </p:grpSpPr>
-          <p:pic>
-            <p:nvPicPr>
-              <p:cNvPr id="27" name="Picture 26"/>
-              <p:cNvPicPr>
-                <a:picLocks noChangeAspect="1"/>
-              </p:cNvPicPr>
-              <p:nvPr/>
-            </p:nvPicPr>
-            <p:blipFill>
-              <a:blip r:embed="rId3" cstate="print">
-                <a:extLst>
-                  <a:ext uri="{28A0092B-C50C-407E-A947-70E740481C1C}">
-                    <a14:useLocalDpi xmlns:a14="http://schemas.microsoft.com/office/drawing/2010/main" val="0"/>
-                  </a:ext>
-                </a:extLst>
-              </a:blip>
-              <a:stretch>
-                <a:fillRect/>
-              </a:stretch>
-            </p:blipFill>
-            <p:spPr>
-              <a:xfrm>
-                <a:off x="1761029" y="4932898"/>
-                <a:ext cx="541407" cy="268617"/>
-              </a:xfrm>
-              <a:prstGeom prst="rect">
-                <a:avLst/>
-              </a:prstGeom>
-            </p:spPr>
-          </p:pic>
-          <p:pic>
-            <p:nvPicPr>
-              <p:cNvPr id="33" name="Picture 32"/>
-              <p:cNvPicPr>
-                <a:picLocks noChangeAspect="1"/>
-              </p:cNvPicPr>
-              <p:nvPr/>
-            </p:nvPicPr>
-            <p:blipFill>
-              <a:blip r:embed="rId4" cstate="print">
-                <a:extLst>
-                  <a:ext uri="{28A0092B-C50C-407E-A947-70E740481C1C}">
-                    <a14:useLocalDpi xmlns:a14="http://schemas.microsoft.com/office/drawing/2010/main" val="0"/>
-                  </a:ext>
-                </a:extLst>
-              </a:blip>
-              <a:stretch>
-                <a:fillRect/>
-              </a:stretch>
-            </p:blipFill>
-            <p:spPr>
-              <a:xfrm>
-                <a:off x="3244448" y="4782853"/>
-                <a:ext cx="371522" cy="375075"/>
-              </a:xfrm>
-              <a:prstGeom prst="rect">
-                <a:avLst/>
-              </a:prstGeom>
-            </p:spPr>
-          </p:pic>
-          <p:pic>
-            <p:nvPicPr>
-              <p:cNvPr id="34" name="Picture 33"/>
-              <p:cNvPicPr>
-                <a:picLocks noChangeAspect="1"/>
-              </p:cNvPicPr>
-              <p:nvPr/>
-            </p:nvPicPr>
-            <p:blipFill>
-              <a:blip r:embed="rId5" cstate="print">
-                <a:extLst>
-                  <a:ext uri="{28A0092B-C50C-407E-A947-70E740481C1C}">
-                    <a14:useLocalDpi xmlns:a14="http://schemas.microsoft.com/office/drawing/2010/main" val="0"/>
-                  </a:ext>
-                </a:extLst>
-              </a:blip>
-              <a:stretch>
-                <a:fillRect/>
-              </a:stretch>
-            </p:blipFill>
-            <p:spPr>
-              <a:xfrm>
-                <a:off x="2523564" y="4879668"/>
-                <a:ext cx="466579" cy="375075"/>
-              </a:xfrm>
-              <a:prstGeom prst="rect">
-                <a:avLst/>
-              </a:prstGeom>
-            </p:spPr>
-          </p:pic>
-          <p:pic>
-            <p:nvPicPr>
-              <p:cNvPr id="35" name="Picture 34"/>
-              <p:cNvPicPr>
-                <a:picLocks noChangeAspect="1"/>
-              </p:cNvPicPr>
-              <p:nvPr/>
-            </p:nvPicPr>
-            <p:blipFill>
-              <a:blip r:embed="rId6" cstate="print">
-                <a:extLst>
-                  <a:ext uri="{28A0092B-C50C-407E-A947-70E740481C1C}">
-                    <a14:useLocalDpi xmlns:a14="http://schemas.microsoft.com/office/drawing/2010/main" val="0"/>
-                  </a:ext>
-                </a:extLst>
-              </a:blip>
-              <a:stretch>
-                <a:fillRect/>
-              </a:stretch>
-            </p:blipFill>
-            <p:spPr>
-              <a:xfrm>
-                <a:off x="3935548" y="4810694"/>
-                <a:ext cx="422871" cy="372587"/>
-              </a:xfrm>
-              <a:prstGeom prst="rect">
-                <a:avLst/>
-              </a:prstGeom>
-            </p:spPr>
-          </p:pic>
-          <p:pic>
-            <p:nvPicPr>
-              <p:cNvPr id="36" name="Picture 35"/>
-              <p:cNvPicPr>
-                <a:picLocks noChangeAspect="1"/>
-              </p:cNvPicPr>
-              <p:nvPr/>
-            </p:nvPicPr>
-            <p:blipFill>
-              <a:blip r:embed="rId7" cstate="print">
-                <a:extLst>
-                  <a:ext uri="{28A0092B-C50C-407E-A947-70E740481C1C}">
-                    <a14:useLocalDpi xmlns:a14="http://schemas.microsoft.com/office/drawing/2010/main" val="0"/>
-                  </a:ext>
-                </a:extLst>
-              </a:blip>
-              <a:stretch>
-                <a:fillRect/>
-              </a:stretch>
-            </p:blipFill>
-            <p:spPr>
-              <a:xfrm>
-                <a:off x="1032989" y="4855194"/>
-                <a:ext cx="456193" cy="375075"/>
-              </a:xfrm>
-              <a:prstGeom prst="rect">
-                <a:avLst/>
-              </a:prstGeom>
-            </p:spPr>
-          </p:pic>
-          <p:pic>
-            <p:nvPicPr>
-              <p:cNvPr id="37" name="Picture 36"/>
-              <p:cNvPicPr>
-                <a:picLocks noChangeAspect="1"/>
-              </p:cNvPicPr>
-              <p:nvPr/>
-            </p:nvPicPr>
-            <p:blipFill>
-              <a:blip r:embed="rId8" cstate="print">
-                <a:extLst>
-                  <a:ext uri="{28A0092B-C50C-407E-A947-70E740481C1C}">
-                    <a14:useLocalDpi xmlns:a14="http://schemas.microsoft.com/office/drawing/2010/main" val="0"/>
-                  </a:ext>
-                </a:extLst>
-              </a:blip>
-              <a:stretch>
-                <a:fillRect/>
-              </a:stretch>
-            </p:blipFill>
-            <p:spPr>
-              <a:xfrm flipH="1">
-                <a:off x="4682639" y="4815353"/>
-                <a:ext cx="425272" cy="363268"/>
-              </a:xfrm>
-              <a:prstGeom prst="rect">
-                <a:avLst/>
-              </a:prstGeom>
-            </p:spPr>
-          </p:pic>
-          <p:pic>
-            <p:nvPicPr>
-              <p:cNvPr id="38" name="Picture 37"/>
-              <p:cNvPicPr>
-                <a:picLocks noChangeAspect="1"/>
-              </p:cNvPicPr>
-              <p:nvPr/>
-            </p:nvPicPr>
-            <p:blipFill>
-              <a:blip r:embed="rId9"/>
-              <a:stretch>
-                <a:fillRect/>
-              </a:stretch>
-            </p:blipFill>
-            <p:spPr>
-              <a:xfrm>
-                <a:off x="5374751" y="4868621"/>
-                <a:ext cx="396874" cy="310000"/>
-              </a:xfrm>
-              <a:prstGeom prst="rect">
-                <a:avLst/>
-              </a:prstGeom>
-            </p:spPr>
-          </p:pic>
-        </p:grpSp>
+            <a:prstGeom prst="rect">
+              <a:avLst/>
+            </a:prstGeom>
+          </p:spPr>
+        </p:pic>
+        <p:pic>
+          <p:nvPicPr>
+            <p:cNvPr id="24" name="Picture 23"/>
+            <p:cNvPicPr>
+              <a:picLocks noChangeAspect="1"/>
+            </p:cNvPicPr>
+            <p:nvPr/>
+          </p:nvPicPr>
+          <p:blipFill>
+            <a:blip r:embed="rId6" cstate="print">
+              <a:extLst>
+                <a:ext uri="{28A0092B-C50C-407E-A947-70E740481C1C}">
+                  <a14:useLocalDpi xmlns:a14="http://schemas.microsoft.com/office/drawing/2010/main" val="0"/>
+                </a:ext>
+              </a:extLst>
+            </a:blip>
+            <a:stretch>
+              <a:fillRect/>
+            </a:stretch>
+          </p:blipFill>
+          <p:spPr>
+            <a:xfrm flipH="1">
+              <a:off x="9029020" y="6351714"/>
+              <a:ext cx="402496" cy="431245"/>
+            </a:xfrm>
+            <a:prstGeom prst="rect">
+              <a:avLst/>
+            </a:prstGeom>
+          </p:spPr>
+        </p:pic>
+        <p:pic>
+          <p:nvPicPr>
+            <p:cNvPr id="26" name="Picture 25"/>
+            <p:cNvPicPr>
+              <a:picLocks noChangeAspect="1"/>
+            </p:cNvPicPr>
+            <p:nvPr/>
+          </p:nvPicPr>
+          <p:blipFill>
+            <a:blip r:embed="rId7"/>
+            <a:stretch>
+              <a:fillRect/>
+            </a:stretch>
+          </p:blipFill>
+          <p:spPr>
+            <a:xfrm>
+              <a:off x="10204884" y="6346244"/>
+              <a:ext cx="475307" cy="465679"/>
+            </a:xfrm>
+            <a:prstGeom prst="rect">
+              <a:avLst/>
+            </a:prstGeom>
+          </p:spPr>
+        </p:pic>
+        <p:pic>
+          <p:nvPicPr>
+            <p:cNvPr id="28" name="Picture 27"/>
+            <p:cNvPicPr>
+              <a:picLocks noChangeAspect="1"/>
+            </p:cNvPicPr>
+            <p:nvPr/>
+          </p:nvPicPr>
+          <p:blipFill>
+            <a:blip r:embed="rId8"/>
+            <a:stretch>
+              <a:fillRect/>
+            </a:stretch>
+          </p:blipFill>
+          <p:spPr>
+            <a:xfrm>
+              <a:off x="6203836" y="6330302"/>
+              <a:ext cx="526986" cy="391234"/>
+            </a:xfrm>
+            <a:prstGeom prst="rect">
+              <a:avLst/>
+            </a:prstGeom>
+          </p:spPr>
+        </p:pic>
+        <p:pic>
+          <p:nvPicPr>
+            <p:cNvPr id="29" name="Picture 28"/>
+            <p:cNvPicPr>
+              <a:picLocks noChangeAspect="1"/>
+            </p:cNvPicPr>
+            <p:nvPr/>
+          </p:nvPicPr>
+          <p:blipFill>
+            <a:blip r:embed="rId9"/>
+            <a:stretch>
+              <a:fillRect/>
+            </a:stretch>
+          </p:blipFill>
+          <p:spPr>
+            <a:xfrm>
+              <a:off x="7579748" y="6357186"/>
+              <a:ext cx="515022" cy="388793"/>
+            </a:xfrm>
+            <a:prstGeom prst="rect">
+              <a:avLst/>
+            </a:prstGeom>
+          </p:spPr>
+        </p:pic>
       </p:grpSp>
     </p:spTree>
     <p:extLst>
@@ -11052,6 +10805,53 @@
           </a:p>
         </p:txBody>
       </p:sp>
+      <p:pic>
+        <p:nvPicPr>
+          <p:cNvPr id="3" name="Picture 2"/>
+          <p:cNvPicPr>
+            <a:picLocks noChangeAspect="1"/>
+          </p:cNvPicPr>
+          <p:nvPr/>
+        </p:nvPicPr>
+        <p:blipFill rotWithShape="1">
+          <a:blip r:embed="rId2"/>
+          <a:srcRect l="666"/>
+          <a:stretch/>
+        </p:blipFill>
+        <p:spPr>
+          <a:xfrm>
+            <a:off x="6096118" y="1079929"/>
+            <a:ext cx="5956753" cy="4483977"/>
+          </a:xfrm>
+          <a:prstGeom prst="rect">
+            <a:avLst/>
+          </a:prstGeom>
+        </p:spPr>
+      </p:pic>
+      <p:pic>
+        <p:nvPicPr>
+          <p:cNvPr id="4" name="Picture 3"/>
+          <p:cNvPicPr>
+            <a:picLocks noChangeAspect="1"/>
+          </p:cNvPicPr>
+          <p:nvPr/>
+        </p:nvPicPr>
+        <p:blipFill>
+          <a:blip r:embed="rId3"/>
+          <a:stretch>
+            <a:fillRect/>
+          </a:stretch>
+        </p:blipFill>
+        <p:spPr>
+          <a:xfrm>
+            <a:off x="0" y="1079929"/>
+            <a:ext cx="5991820" cy="4483977"/>
+          </a:xfrm>
+          <a:prstGeom prst="rect">
+            <a:avLst/>
+          </a:prstGeom>
+        </p:spPr>
+      </p:pic>
     </p:spTree>
     <p:extLst>
       <p:ext uri="{BB962C8B-B14F-4D97-AF65-F5344CB8AC3E}">

</xml_diff>

<commit_message>
tweaks to figures 2-5
</commit_message>
<xml_diff>
--- a/output/plots/all_figs_with_legends.pptx
+++ b/output/plots/all_figs_with_legends.pptx
@@ -205,7 +205,7 @@
           <a:p>
             <a:fld id="{7FA21820-D199-4D82-91AF-C50B1D3B111A}" type="datetimeFigureOut">
               <a:rPr lang="en-US" smtClean="0"/>
-              <a:t>5/17/2017</a:t>
+              <a:t>5/18/2017</a:t>
             </a:fld>
             <a:endParaRPr lang="en-US"/>
           </a:p>
@@ -1038,7 +1038,7 @@
           <a:p>
             <a:fld id="{916B8C92-D5E3-4480-8685-D57BEE386DE2}" type="datetimeFigureOut">
               <a:rPr lang="en-US" smtClean="0"/>
-              <a:t>5/17/2017</a:t>
+              <a:t>5/18/2017</a:t>
             </a:fld>
             <a:endParaRPr lang="en-US"/>
           </a:p>
@@ -1208,7 +1208,7 @@
           <a:p>
             <a:fld id="{916B8C92-D5E3-4480-8685-D57BEE386DE2}" type="datetimeFigureOut">
               <a:rPr lang="en-US" smtClean="0"/>
-              <a:t>5/17/2017</a:t>
+              <a:t>5/18/2017</a:t>
             </a:fld>
             <a:endParaRPr lang="en-US"/>
           </a:p>
@@ -1388,7 +1388,7 @@
           <a:p>
             <a:fld id="{916B8C92-D5E3-4480-8685-D57BEE386DE2}" type="datetimeFigureOut">
               <a:rPr lang="en-US" smtClean="0"/>
-              <a:t>5/17/2017</a:t>
+              <a:t>5/18/2017</a:t>
             </a:fld>
             <a:endParaRPr lang="en-US"/>
           </a:p>
@@ -1558,7 +1558,7 @@
           <a:p>
             <a:fld id="{916B8C92-D5E3-4480-8685-D57BEE386DE2}" type="datetimeFigureOut">
               <a:rPr lang="en-US" smtClean="0"/>
-              <a:t>5/17/2017</a:t>
+              <a:t>5/18/2017</a:t>
             </a:fld>
             <a:endParaRPr lang="en-US"/>
           </a:p>
@@ -1804,7 +1804,7 @@
           <a:p>
             <a:fld id="{916B8C92-D5E3-4480-8685-D57BEE386DE2}" type="datetimeFigureOut">
               <a:rPr lang="en-US" smtClean="0"/>
-              <a:t>5/17/2017</a:t>
+              <a:t>5/18/2017</a:t>
             </a:fld>
             <a:endParaRPr lang="en-US"/>
           </a:p>
@@ -2036,7 +2036,7 @@
           <a:p>
             <a:fld id="{916B8C92-D5E3-4480-8685-D57BEE386DE2}" type="datetimeFigureOut">
               <a:rPr lang="en-US" smtClean="0"/>
-              <a:t>5/17/2017</a:t>
+              <a:t>5/18/2017</a:t>
             </a:fld>
             <a:endParaRPr lang="en-US"/>
           </a:p>
@@ -2403,7 +2403,7 @@
           <a:p>
             <a:fld id="{916B8C92-D5E3-4480-8685-D57BEE386DE2}" type="datetimeFigureOut">
               <a:rPr lang="en-US" smtClean="0"/>
-              <a:t>5/17/2017</a:t>
+              <a:t>5/18/2017</a:t>
             </a:fld>
             <a:endParaRPr lang="en-US"/>
           </a:p>
@@ -2521,7 +2521,7 @@
           <a:p>
             <a:fld id="{916B8C92-D5E3-4480-8685-D57BEE386DE2}" type="datetimeFigureOut">
               <a:rPr lang="en-US" smtClean="0"/>
-              <a:t>5/17/2017</a:t>
+              <a:t>5/18/2017</a:t>
             </a:fld>
             <a:endParaRPr lang="en-US"/>
           </a:p>
@@ -2616,7 +2616,7 @@
           <a:p>
             <a:fld id="{916B8C92-D5E3-4480-8685-D57BEE386DE2}" type="datetimeFigureOut">
               <a:rPr lang="en-US" smtClean="0"/>
-              <a:t>5/17/2017</a:t>
+              <a:t>5/18/2017</a:t>
             </a:fld>
             <a:endParaRPr lang="en-US"/>
           </a:p>
@@ -2893,7 +2893,7 @@
           <a:p>
             <a:fld id="{916B8C92-D5E3-4480-8685-D57BEE386DE2}" type="datetimeFigureOut">
               <a:rPr lang="en-US" smtClean="0"/>
-              <a:t>5/17/2017</a:t>
+              <a:t>5/18/2017</a:t>
             </a:fld>
             <a:endParaRPr lang="en-US"/>
           </a:p>
@@ -3146,7 +3146,7 @@
           <a:p>
             <a:fld id="{916B8C92-D5E3-4480-8685-D57BEE386DE2}" type="datetimeFigureOut">
               <a:rPr lang="en-US" smtClean="0"/>
-              <a:t>5/17/2017</a:t>
+              <a:t>5/18/2017</a:t>
             </a:fld>
             <a:endParaRPr lang="en-US"/>
           </a:p>
@@ -3359,7 +3359,7 @@
           <a:p>
             <a:fld id="{916B8C92-D5E3-4480-8685-D57BEE386DE2}" type="datetimeFigureOut">
               <a:rPr lang="en-US" smtClean="0"/>
-              <a:t>5/17/2017</a:t>
+              <a:t>5/18/2017</a:t>
             </a:fld>
             <a:endParaRPr lang="en-US"/>
           </a:p>
@@ -6992,7 +6992,7 @@
         </p:nvSpPr>
         <p:spPr>
           <a:xfrm>
-            <a:off x="507561" y="4784539"/>
+            <a:off x="339760" y="5013883"/>
             <a:ext cx="180669" cy="170788"/>
           </a:xfrm>
           <a:prstGeom prst="triangle">
@@ -7262,7 +7262,7 @@
         </p:nvSpPr>
         <p:spPr>
           <a:xfrm>
-            <a:off x="3174234" y="4741040"/>
+            <a:off x="3006433" y="4970384"/>
             <a:ext cx="180669" cy="170788"/>
           </a:xfrm>
           <a:prstGeom prst="triangle">
@@ -7615,7 +7615,7 @@
         </p:nvSpPr>
         <p:spPr>
           <a:xfrm>
-            <a:off x="4254205" y="5868816"/>
+            <a:off x="4324154" y="5784227"/>
             <a:ext cx="240145" cy="183385"/>
           </a:xfrm>
           <a:prstGeom prst="trapezoid">
@@ -7780,7 +7780,7 @@
         </p:nvSpPr>
         <p:spPr>
           <a:xfrm>
-            <a:off x="3356632" y="2968970"/>
+            <a:off x="3386362" y="2974800"/>
             <a:ext cx="45719" cy="45719"/>
           </a:xfrm>
           <a:prstGeom prst="flowChartConnector">
@@ -7828,7 +7828,7 @@
         </p:nvSpPr>
         <p:spPr>
           <a:xfrm>
-            <a:off x="3356632" y="3879559"/>
+            <a:off x="3416308" y="3880706"/>
             <a:ext cx="45719" cy="45719"/>
           </a:xfrm>
           <a:prstGeom prst="flowChartConnector">
@@ -8186,7 +8186,7 @@
         </p:nvSpPr>
         <p:spPr>
           <a:xfrm>
-            <a:off x="3271908" y="3940698"/>
+            <a:off x="3336894" y="3916387"/>
             <a:ext cx="45719" cy="45719"/>
           </a:xfrm>
           <a:prstGeom prst="diamond">
@@ -8240,7 +8240,7 @@
         </p:nvSpPr>
         <p:spPr>
           <a:xfrm>
-            <a:off x="3416308" y="3964946"/>
+            <a:off x="3481294" y="3940635"/>
             <a:ext cx="45719" cy="45719"/>
           </a:xfrm>
           <a:prstGeom prst="ellipse">
@@ -8294,7 +8294,7 @@
         </p:nvSpPr>
         <p:spPr>
           <a:xfrm>
-            <a:off x="3335320" y="4026928"/>
+            <a:off x="3400306" y="4002617"/>
             <a:ext cx="45719" cy="45719"/>
           </a:xfrm>
           <a:prstGeom prst="triangle">
@@ -8348,7 +8348,7 @@
         </p:nvSpPr>
         <p:spPr>
           <a:xfrm>
-            <a:off x="3292527" y="2911045"/>
+            <a:off x="3322257" y="2916875"/>
             <a:ext cx="70648" cy="57645"/>
           </a:xfrm>
           <a:prstGeom prst="hexagon">
@@ -8397,7 +8397,7 @@
         </p:nvSpPr>
         <p:spPr>
           <a:xfrm>
-            <a:off x="3397654" y="2894764"/>
+            <a:off x="3427384" y="2900594"/>
             <a:ext cx="57025" cy="52352"/>
           </a:xfrm>
           <a:prstGeom prst="rect">
@@ -8446,7 +8446,7 @@
         </p:nvSpPr>
         <p:spPr>
           <a:xfrm>
-            <a:off x="3276904" y="3013552"/>
+            <a:off x="3306634" y="3019382"/>
             <a:ext cx="45719" cy="45719"/>
           </a:xfrm>
           <a:prstGeom prst="diamond">
@@ -8500,7 +8500,7 @@
         </p:nvSpPr>
         <p:spPr>
           <a:xfrm>
-            <a:off x="3421304" y="3037800"/>
+            <a:off x="3451034" y="3043630"/>
             <a:ext cx="45719" cy="45719"/>
           </a:xfrm>
           <a:prstGeom prst="ellipse">
@@ -8554,7 +8554,7 @@
         </p:nvSpPr>
         <p:spPr>
           <a:xfrm>
-            <a:off x="3340316" y="3099782"/>
+            <a:off x="3370046" y="3105612"/>
             <a:ext cx="45719" cy="45719"/>
           </a:xfrm>
           <a:prstGeom prst="triangle">
@@ -8768,7 +8768,7 @@
         </p:nvSpPr>
         <p:spPr>
           <a:xfrm>
-            <a:off x="5231461" y="2545494"/>
+            <a:off x="5232702" y="2541134"/>
             <a:ext cx="45719" cy="45719"/>
           </a:xfrm>
           <a:prstGeom prst="ellipse">
@@ -8930,7 +8930,7 @@
         </p:nvSpPr>
         <p:spPr>
           <a:xfrm>
-            <a:off x="5318912" y="2605174"/>
+            <a:off x="5308515" y="2600023"/>
             <a:ext cx="45719" cy="45719"/>
           </a:xfrm>
           <a:prstGeom prst="parallelogram">
@@ -8983,7 +8983,7 @@
         </p:nvSpPr>
         <p:spPr>
           <a:xfrm>
-            <a:off x="5318912" y="2346985"/>
+            <a:off x="5304824" y="2349511"/>
             <a:ext cx="45719" cy="45719"/>
           </a:xfrm>
           <a:prstGeom prst="trapezoid">
@@ -9289,13 +9289,474 @@
       </p:sp>
       <p:sp>
         <p:nvSpPr>
-          <p:cNvPr id="139" name="Diamond 138"/>
+          <p:cNvPr id="140" name="Hexagon 139"/>
           <p:cNvSpPr/>
           <p:nvPr/>
         </p:nvSpPr>
         <p:spPr>
           <a:xfrm>
-            <a:off x="2449900" y="2360391"/>
+            <a:off x="1556207" y="4194864"/>
+            <a:ext cx="170932" cy="151439"/>
+          </a:xfrm>
+          <a:prstGeom prst="hexagon">
+            <a:avLst/>
+          </a:prstGeom>
+          <a:solidFill>
+            <a:schemeClr val="bg1">
+              <a:lumMod val="50000"/>
+            </a:schemeClr>
+          </a:solidFill>
+          <a:ln w="6350">
+            <a:solidFill>
+              <a:schemeClr val="tx1">
+                <a:lumMod val="50000"/>
+                <a:lumOff val="50000"/>
+              </a:schemeClr>
+            </a:solidFill>
+          </a:ln>
+        </p:spPr>
+        <p:style>
+          <a:lnRef idx="2">
+            <a:schemeClr val="accent1">
+              <a:shade val="50000"/>
+            </a:schemeClr>
+          </a:lnRef>
+          <a:fillRef idx="1">
+            <a:schemeClr val="accent1"/>
+          </a:fillRef>
+          <a:effectRef idx="0">
+            <a:schemeClr val="accent1"/>
+          </a:effectRef>
+          <a:fontRef idx="minor">
+            <a:schemeClr val="lt1"/>
+          </a:fontRef>
+        </p:style>
+        <p:txBody>
+          <a:bodyPr rtlCol="0" anchor="ctr"/>
+          <a:lstStyle/>
+          <a:p>
+            <a:pPr algn="ctr"/>
+            <a:endParaRPr lang="en-US"/>
+          </a:p>
+        </p:txBody>
+      </p:sp>
+      <p:sp>
+        <p:nvSpPr>
+          <p:cNvPr id="141" name="Rectangle 140"/>
+          <p:cNvSpPr/>
+          <p:nvPr/>
+        </p:nvSpPr>
+        <p:spPr>
+          <a:xfrm>
+            <a:off x="1996180" y="3997372"/>
+            <a:ext cx="142869" cy="135226"/>
+          </a:xfrm>
+          <a:prstGeom prst="rect">
+            <a:avLst/>
+          </a:prstGeom>
+          <a:solidFill>
+            <a:schemeClr val="bg1">
+              <a:lumMod val="50000"/>
+            </a:schemeClr>
+          </a:solidFill>
+          <a:ln w="6350">
+            <a:solidFill>
+              <a:schemeClr val="tx1">
+                <a:lumMod val="50000"/>
+                <a:lumOff val="50000"/>
+              </a:schemeClr>
+            </a:solidFill>
+          </a:ln>
+        </p:spPr>
+        <p:style>
+          <a:lnRef idx="2">
+            <a:schemeClr val="accent1">
+              <a:shade val="50000"/>
+            </a:schemeClr>
+          </a:lnRef>
+          <a:fillRef idx="1">
+            <a:schemeClr val="accent1"/>
+          </a:fillRef>
+          <a:effectRef idx="0">
+            <a:schemeClr val="accent1"/>
+          </a:effectRef>
+          <a:fontRef idx="minor">
+            <a:schemeClr val="lt1"/>
+          </a:fontRef>
+        </p:style>
+        <p:txBody>
+          <a:bodyPr rtlCol="0" anchor="ctr"/>
+          <a:lstStyle/>
+          <a:p>
+            <a:pPr algn="ctr"/>
+            <a:endParaRPr lang="en-US"/>
+          </a:p>
+        </p:txBody>
+      </p:sp>
+      <p:sp>
+        <p:nvSpPr>
+          <p:cNvPr id="142" name="Oval 141"/>
+          <p:cNvSpPr/>
+          <p:nvPr/>
+        </p:nvSpPr>
+        <p:spPr>
+          <a:xfrm>
+            <a:off x="2484729" y="4145824"/>
+            <a:ext cx="119733" cy="108597"/>
+          </a:xfrm>
+          <a:prstGeom prst="ellipse">
+            <a:avLst/>
+          </a:prstGeom>
+          <a:noFill/>
+          <a:ln w="19050">
+            <a:solidFill>
+              <a:schemeClr val="tx1">
+                <a:lumMod val="50000"/>
+                <a:lumOff val="50000"/>
+              </a:schemeClr>
+            </a:solidFill>
+          </a:ln>
+        </p:spPr>
+        <p:style>
+          <a:lnRef idx="2">
+            <a:schemeClr val="accent1">
+              <a:shade val="50000"/>
+            </a:schemeClr>
+          </a:lnRef>
+          <a:fillRef idx="1">
+            <a:schemeClr val="accent1"/>
+          </a:fillRef>
+          <a:effectRef idx="0">
+            <a:schemeClr val="accent1"/>
+          </a:effectRef>
+          <a:fontRef idx="minor">
+            <a:schemeClr val="lt1"/>
+          </a:fontRef>
+        </p:style>
+        <p:txBody>
+          <a:bodyPr rtlCol="0" anchor="ctr"/>
+          <a:lstStyle/>
+          <a:p>
+            <a:pPr algn="ctr"/>
+            <a:endParaRPr lang="en-US"/>
+          </a:p>
+        </p:txBody>
+      </p:sp>
+      <p:sp>
+        <p:nvSpPr>
+          <p:cNvPr id="146" name="Trapezoid 145"/>
+          <p:cNvSpPr/>
+          <p:nvPr/>
+        </p:nvSpPr>
+        <p:spPr>
+          <a:xfrm>
+            <a:off x="1684553" y="3800564"/>
+            <a:ext cx="145405" cy="119699"/>
+          </a:xfrm>
+          <a:prstGeom prst="trapezoid">
+            <a:avLst/>
+          </a:prstGeom>
+          <a:solidFill>
+            <a:schemeClr val="bg1">
+              <a:lumMod val="50000"/>
+            </a:schemeClr>
+          </a:solidFill>
+          <a:ln w="38100">
+            <a:solidFill>
+              <a:schemeClr val="tx1">
+                <a:lumMod val="50000"/>
+                <a:lumOff val="50000"/>
+              </a:schemeClr>
+            </a:solidFill>
+          </a:ln>
+        </p:spPr>
+        <p:style>
+          <a:lnRef idx="2">
+            <a:schemeClr val="accent1">
+              <a:shade val="50000"/>
+            </a:schemeClr>
+          </a:lnRef>
+          <a:fillRef idx="1">
+            <a:schemeClr val="accent1"/>
+          </a:fillRef>
+          <a:effectRef idx="0">
+            <a:schemeClr val="accent1"/>
+          </a:effectRef>
+          <a:fontRef idx="minor">
+            <a:schemeClr val="lt1"/>
+          </a:fontRef>
+        </p:style>
+        <p:txBody>
+          <a:bodyPr rtlCol="0" anchor="ctr"/>
+          <a:lstStyle/>
+          <a:p>
+            <a:pPr algn="ctr"/>
+            <a:endParaRPr lang="en-US"/>
+          </a:p>
+        </p:txBody>
+      </p:sp>
+      <p:sp>
+        <p:nvSpPr>
+          <p:cNvPr id="147" name="Diamond 146"/>
+          <p:cNvSpPr/>
+          <p:nvPr/>
+        </p:nvSpPr>
+        <p:spPr>
+          <a:xfrm>
+            <a:off x="2484337" y="3418148"/>
+            <a:ext cx="143736" cy="139320"/>
+          </a:xfrm>
+          <a:prstGeom prst="diamond">
+            <a:avLst/>
+          </a:prstGeom>
+          <a:noFill/>
+          <a:ln w="19050">
+            <a:solidFill>
+              <a:schemeClr val="tx1">
+                <a:lumMod val="50000"/>
+                <a:lumOff val="50000"/>
+              </a:schemeClr>
+            </a:solidFill>
+          </a:ln>
+        </p:spPr>
+        <p:style>
+          <a:lnRef idx="2">
+            <a:schemeClr val="accent1">
+              <a:shade val="50000"/>
+            </a:schemeClr>
+          </a:lnRef>
+          <a:fillRef idx="1">
+            <a:schemeClr val="accent1"/>
+          </a:fillRef>
+          <a:effectRef idx="0">
+            <a:schemeClr val="accent1"/>
+          </a:effectRef>
+          <a:fontRef idx="minor">
+            <a:schemeClr val="lt1"/>
+          </a:fontRef>
+        </p:style>
+        <p:txBody>
+          <a:bodyPr rtlCol="0" anchor="ctr"/>
+          <a:lstStyle/>
+          <a:p>
+            <a:pPr algn="ctr"/>
+            <a:endParaRPr lang="en-US"/>
+          </a:p>
+        </p:txBody>
+      </p:sp>
+      <p:sp>
+        <p:nvSpPr>
+          <p:cNvPr id="149" name="Rectangle 148"/>
+          <p:cNvSpPr/>
+          <p:nvPr/>
+        </p:nvSpPr>
+        <p:spPr>
+          <a:xfrm>
+            <a:off x="712745" y="2927927"/>
+            <a:ext cx="142869" cy="135226"/>
+          </a:xfrm>
+          <a:prstGeom prst="rect">
+            <a:avLst/>
+          </a:prstGeom>
+          <a:solidFill>
+            <a:schemeClr val="bg1">
+              <a:lumMod val="50000"/>
+            </a:schemeClr>
+          </a:solidFill>
+          <a:ln w="6350">
+            <a:solidFill>
+              <a:schemeClr val="tx1">
+                <a:lumMod val="50000"/>
+                <a:lumOff val="50000"/>
+              </a:schemeClr>
+            </a:solidFill>
+          </a:ln>
+        </p:spPr>
+        <p:style>
+          <a:lnRef idx="2">
+            <a:schemeClr val="accent1">
+              <a:shade val="50000"/>
+            </a:schemeClr>
+          </a:lnRef>
+          <a:fillRef idx="1">
+            <a:schemeClr val="accent1"/>
+          </a:fillRef>
+          <a:effectRef idx="0">
+            <a:schemeClr val="accent1"/>
+          </a:effectRef>
+          <a:fontRef idx="minor">
+            <a:schemeClr val="lt1"/>
+          </a:fontRef>
+        </p:style>
+        <p:txBody>
+          <a:bodyPr rtlCol="0" anchor="ctr"/>
+          <a:lstStyle/>
+          <a:p>
+            <a:pPr algn="ctr"/>
+            <a:endParaRPr lang="en-US"/>
+          </a:p>
+        </p:txBody>
+      </p:sp>
+      <p:sp>
+        <p:nvSpPr>
+          <p:cNvPr id="151" name="Isosceles Triangle 150"/>
+          <p:cNvSpPr/>
+          <p:nvPr/>
+        </p:nvSpPr>
+        <p:spPr>
+          <a:xfrm>
+            <a:off x="381374" y="2480848"/>
+            <a:ext cx="103106" cy="98071"/>
+          </a:xfrm>
+          <a:prstGeom prst="triangle">
+            <a:avLst/>
+          </a:prstGeom>
+          <a:noFill/>
+          <a:ln w="19050">
+            <a:solidFill>
+              <a:schemeClr val="tx1">
+                <a:lumMod val="50000"/>
+                <a:lumOff val="50000"/>
+              </a:schemeClr>
+            </a:solidFill>
+          </a:ln>
+        </p:spPr>
+        <p:style>
+          <a:lnRef idx="2">
+            <a:schemeClr val="accent1">
+              <a:shade val="50000"/>
+            </a:schemeClr>
+          </a:lnRef>
+          <a:fillRef idx="1">
+            <a:schemeClr val="accent1"/>
+          </a:fillRef>
+          <a:effectRef idx="0">
+            <a:schemeClr val="accent1"/>
+          </a:effectRef>
+          <a:fontRef idx="minor">
+            <a:schemeClr val="lt1"/>
+          </a:fontRef>
+        </p:style>
+        <p:txBody>
+          <a:bodyPr rtlCol="0" anchor="ctr"/>
+          <a:lstStyle/>
+          <a:p>
+            <a:pPr algn="ctr"/>
+            <a:endParaRPr lang="en-US"/>
+          </a:p>
+        </p:txBody>
+      </p:sp>
+      <p:sp>
+        <p:nvSpPr>
+          <p:cNvPr id="152" name="5-Point Star 151"/>
+          <p:cNvSpPr/>
+          <p:nvPr/>
+        </p:nvSpPr>
+        <p:spPr>
+          <a:xfrm>
+            <a:off x="1036864" y="2675896"/>
+            <a:ext cx="168605" cy="165114"/>
+          </a:xfrm>
+          <a:prstGeom prst="star5">
+            <a:avLst/>
+          </a:prstGeom>
+          <a:noFill/>
+          <a:ln w="19050">
+            <a:solidFill>
+              <a:schemeClr val="tx1">
+                <a:lumMod val="50000"/>
+                <a:lumOff val="50000"/>
+              </a:schemeClr>
+            </a:solidFill>
+          </a:ln>
+        </p:spPr>
+        <p:style>
+          <a:lnRef idx="2">
+            <a:schemeClr val="accent1">
+              <a:shade val="50000"/>
+            </a:schemeClr>
+          </a:lnRef>
+          <a:fillRef idx="1">
+            <a:schemeClr val="accent1"/>
+          </a:fillRef>
+          <a:effectRef idx="0">
+            <a:schemeClr val="accent1"/>
+          </a:effectRef>
+          <a:fontRef idx="minor">
+            <a:schemeClr val="lt1"/>
+          </a:fontRef>
+        </p:style>
+        <p:txBody>
+          <a:bodyPr rtlCol="0" anchor="ctr"/>
+          <a:lstStyle/>
+          <a:p>
+            <a:pPr algn="ctr"/>
+            <a:endParaRPr lang="en-US"/>
+          </a:p>
+        </p:txBody>
+      </p:sp>
+      <p:sp>
+        <p:nvSpPr>
+          <p:cNvPr id="153" name="Parallelogram 152"/>
+          <p:cNvSpPr/>
+          <p:nvPr/>
+        </p:nvSpPr>
+        <p:spPr>
+          <a:xfrm>
+            <a:off x="695735" y="2498986"/>
+            <a:ext cx="186647" cy="106640"/>
+          </a:xfrm>
+          <a:prstGeom prst="parallelogram">
+            <a:avLst/>
+          </a:prstGeom>
+          <a:solidFill>
+            <a:schemeClr val="bg1">
+              <a:lumMod val="50000"/>
+            </a:schemeClr>
+          </a:solidFill>
+          <a:ln w="38100">
+            <a:solidFill>
+              <a:schemeClr val="tx1">
+                <a:lumMod val="50000"/>
+                <a:lumOff val="50000"/>
+              </a:schemeClr>
+            </a:solidFill>
+          </a:ln>
+        </p:spPr>
+        <p:style>
+          <a:lnRef idx="2">
+            <a:schemeClr val="accent1">
+              <a:shade val="50000"/>
+            </a:schemeClr>
+          </a:lnRef>
+          <a:fillRef idx="1">
+            <a:schemeClr val="accent1"/>
+          </a:fillRef>
+          <a:effectRef idx="0">
+            <a:schemeClr val="accent1"/>
+          </a:effectRef>
+          <a:fontRef idx="minor">
+            <a:schemeClr val="lt1"/>
+          </a:fontRef>
+        </p:style>
+        <p:txBody>
+          <a:bodyPr rtlCol="0" anchor="ctr"/>
+          <a:lstStyle/>
+          <a:p>
+            <a:pPr algn="ctr"/>
+            <a:endParaRPr lang="en-US"/>
+          </a:p>
+        </p:txBody>
+      </p:sp>
+      <p:sp>
+        <p:nvSpPr>
+          <p:cNvPr id="155" name="Diamond 154"/>
+          <p:cNvSpPr/>
+          <p:nvPr/>
+        </p:nvSpPr>
+        <p:spPr>
+          <a:xfrm>
+            <a:off x="1200902" y="2348703"/>
             <a:ext cx="143736" cy="139320"/>
           </a:xfrm>
           <a:prstGeom prst="diamond">
@@ -9343,24 +9804,20 @@
       </p:sp>
       <p:sp>
         <p:nvSpPr>
-          <p:cNvPr id="140" name="Hexagon 139"/>
+          <p:cNvPr id="156" name="Hexagon 155"/>
           <p:cNvSpPr/>
           <p:nvPr/>
         </p:nvSpPr>
         <p:spPr>
           <a:xfrm>
-            <a:off x="1556207" y="4194864"/>
+            <a:off x="253999" y="4203038"/>
             <a:ext cx="170932" cy="151439"/>
           </a:xfrm>
           <a:prstGeom prst="hexagon">
             <a:avLst/>
           </a:prstGeom>
-          <a:solidFill>
-            <a:schemeClr val="bg1">
-              <a:lumMod val="50000"/>
-            </a:schemeClr>
-          </a:solidFill>
-          <a:ln w="6350">
+          <a:noFill/>
+          <a:ln w="19050">
             <a:solidFill>
               <a:schemeClr val="tx1">
                 <a:lumMod val="50000"/>
@@ -9396,24 +9853,20 @@
       </p:sp>
       <p:sp>
         <p:nvSpPr>
-          <p:cNvPr id="141" name="Rectangle 140"/>
+          <p:cNvPr id="157" name="Rectangle 156"/>
           <p:cNvSpPr/>
           <p:nvPr/>
         </p:nvSpPr>
         <p:spPr>
           <a:xfrm>
-            <a:off x="1996180" y="3997372"/>
+            <a:off x="693972" y="4005546"/>
             <a:ext cx="142869" cy="135226"/>
           </a:xfrm>
           <a:prstGeom prst="rect">
             <a:avLst/>
           </a:prstGeom>
-          <a:solidFill>
-            <a:schemeClr val="bg1">
-              <a:lumMod val="50000"/>
-            </a:schemeClr>
-          </a:solidFill>
-          <a:ln w="6350">
+          <a:noFill/>
+          <a:ln w="19050">
             <a:solidFill>
               <a:schemeClr val="tx1">
                 <a:lumMod val="50000"/>
@@ -9449,20 +9902,25 @@
       </p:sp>
       <p:sp>
         <p:nvSpPr>
-          <p:cNvPr id="142" name="Oval 141"/>
+          <p:cNvPr id="158" name="Oval 157"/>
           <p:cNvSpPr/>
           <p:nvPr/>
         </p:nvSpPr>
         <p:spPr>
           <a:xfrm>
-            <a:off x="2484729" y="4145824"/>
+            <a:off x="1182521" y="4153998"/>
             <a:ext cx="119733" cy="108597"/>
           </a:xfrm>
           <a:prstGeom prst="ellipse">
             <a:avLst/>
           </a:prstGeom>
-          <a:noFill/>
-          <a:ln w="19050">
+          <a:solidFill>
+            <a:schemeClr val="tx1">
+              <a:lumMod val="50000"/>
+              <a:lumOff val="50000"/>
+            </a:schemeClr>
+          </a:solidFill>
+          <a:ln w="38100">
             <a:solidFill>
               <a:schemeClr val="tx1">
                 <a:lumMod val="50000"/>
@@ -9498,21 +9956,22 @@
       </p:sp>
       <p:sp>
         <p:nvSpPr>
-          <p:cNvPr id="146" name="Trapezoid 145"/>
+          <p:cNvPr id="159" name="Isosceles Triangle 158"/>
           <p:cNvSpPr/>
           <p:nvPr/>
         </p:nvSpPr>
         <p:spPr>
           <a:xfrm>
-            <a:off x="1684553" y="3800564"/>
-            <a:ext cx="145405" cy="119699"/>
-          </a:xfrm>
-          <a:prstGeom prst="trapezoid">
+            <a:off x="362601" y="3558467"/>
+            <a:ext cx="103106" cy="98071"/>
+          </a:xfrm>
+          <a:prstGeom prst="triangle">
             <a:avLst/>
           </a:prstGeom>
           <a:solidFill>
-            <a:schemeClr val="bg1">
+            <a:schemeClr val="tx1">
               <a:lumMod val="50000"/>
+              <a:lumOff val="50000"/>
             </a:schemeClr>
           </a:solidFill>
           <a:ln w="38100">
@@ -9551,266 +10010,13 @@
       </p:sp>
       <p:sp>
         <p:nvSpPr>
-          <p:cNvPr id="147" name="Diamond 146"/>
+          <p:cNvPr id="163" name="Diamond 162"/>
           <p:cNvSpPr/>
           <p:nvPr/>
         </p:nvSpPr>
         <p:spPr>
           <a:xfrm>
-            <a:off x="2484337" y="3418148"/>
-            <a:ext cx="143736" cy="139320"/>
-          </a:xfrm>
-          <a:prstGeom prst="diamond">
-            <a:avLst/>
-          </a:prstGeom>
-          <a:noFill/>
-          <a:ln w="19050">
-            <a:solidFill>
-              <a:schemeClr val="tx1">
-                <a:lumMod val="50000"/>
-                <a:lumOff val="50000"/>
-              </a:schemeClr>
-            </a:solidFill>
-          </a:ln>
-        </p:spPr>
-        <p:style>
-          <a:lnRef idx="2">
-            <a:schemeClr val="accent1">
-              <a:shade val="50000"/>
-            </a:schemeClr>
-          </a:lnRef>
-          <a:fillRef idx="1">
-            <a:schemeClr val="accent1"/>
-          </a:fillRef>
-          <a:effectRef idx="0">
-            <a:schemeClr val="accent1"/>
-          </a:effectRef>
-          <a:fontRef idx="minor">
-            <a:schemeClr val="lt1"/>
-          </a:fontRef>
-        </p:style>
-        <p:txBody>
-          <a:bodyPr rtlCol="0" anchor="ctr"/>
-          <a:lstStyle/>
-          <a:p>
-            <a:pPr algn="ctr"/>
-            <a:endParaRPr lang="en-US"/>
-          </a:p>
-        </p:txBody>
-      </p:sp>
-      <p:sp>
-        <p:nvSpPr>
-          <p:cNvPr id="149" name="Rectangle 148"/>
-          <p:cNvSpPr/>
-          <p:nvPr/>
-        </p:nvSpPr>
-        <p:spPr>
-          <a:xfrm>
-            <a:off x="712745" y="2927927"/>
-            <a:ext cx="142869" cy="135226"/>
-          </a:xfrm>
-          <a:prstGeom prst="rect">
-            <a:avLst/>
-          </a:prstGeom>
-          <a:solidFill>
-            <a:schemeClr val="bg1">
-              <a:lumMod val="50000"/>
-            </a:schemeClr>
-          </a:solidFill>
-          <a:ln w="6350">
-            <a:solidFill>
-              <a:schemeClr val="tx1">
-                <a:lumMod val="50000"/>
-                <a:lumOff val="50000"/>
-              </a:schemeClr>
-            </a:solidFill>
-          </a:ln>
-        </p:spPr>
-        <p:style>
-          <a:lnRef idx="2">
-            <a:schemeClr val="accent1">
-              <a:shade val="50000"/>
-            </a:schemeClr>
-          </a:lnRef>
-          <a:fillRef idx="1">
-            <a:schemeClr val="accent1"/>
-          </a:fillRef>
-          <a:effectRef idx="0">
-            <a:schemeClr val="accent1"/>
-          </a:effectRef>
-          <a:fontRef idx="minor">
-            <a:schemeClr val="lt1"/>
-          </a:fontRef>
-        </p:style>
-        <p:txBody>
-          <a:bodyPr rtlCol="0" anchor="ctr"/>
-          <a:lstStyle/>
-          <a:p>
-            <a:pPr algn="ctr"/>
-            <a:endParaRPr lang="en-US"/>
-          </a:p>
-        </p:txBody>
-      </p:sp>
-      <p:sp>
-        <p:nvSpPr>
-          <p:cNvPr id="151" name="Isosceles Triangle 150"/>
-          <p:cNvSpPr/>
-          <p:nvPr/>
-        </p:nvSpPr>
-        <p:spPr>
-          <a:xfrm>
-            <a:off x="381374" y="2480848"/>
-            <a:ext cx="103106" cy="98071"/>
-          </a:xfrm>
-          <a:prstGeom prst="triangle">
-            <a:avLst/>
-          </a:prstGeom>
-          <a:noFill/>
-          <a:ln w="19050">
-            <a:solidFill>
-              <a:schemeClr val="tx1">
-                <a:lumMod val="50000"/>
-                <a:lumOff val="50000"/>
-              </a:schemeClr>
-            </a:solidFill>
-          </a:ln>
-        </p:spPr>
-        <p:style>
-          <a:lnRef idx="2">
-            <a:schemeClr val="accent1">
-              <a:shade val="50000"/>
-            </a:schemeClr>
-          </a:lnRef>
-          <a:fillRef idx="1">
-            <a:schemeClr val="accent1"/>
-          </a:fillRef>
-          <a:effectRef idx="0">
-            <a:schemeClr val="accent1"/>
-          </a:effectRef>
-          <a:fontRef idx="minor">
-            <a:schemeClr val="lt1"/>
-          </a:fontRef>
-        </p:style>
-        <p:txBody>
-          <a:bodyPr rtlCol="0" anchor="ctr"/>
-          <a:lstStyle/>
-          <a:p>
-            <a:pPr algn="ctr"/>
-            <a:endParaRPr lang="en-US"/>
-          </a:p>
-        </p:txBody>
-      </p:sp>
-      <p:sp>
-        <p:nvSpPr>
-          <p:cNvPr id="152" name="5-Point Star 151"/>
-          <p:cNvSpPr/>
-          <p:nvPr/>
-        </p:nvSpPr>
-        <p:spPr>
-          <a:xfrm>
-            <a:off x="1036864" y="2675896"/>
-            <a:ext cx="168605" cy="165114"/>
-          </a:xfrm>
-          <a:prstGeom prst="star5">
-            <a:avLst/>
-          </a:prstGeom>
-          <a:noFill/>
-          <a:ln w="19050">
-            <a:solidFill>
-              <a:schemeClr val="tx1">
-                <a:lumMod val="50000"/>
-                <a:lumOff val="50000"/>
-              </a:schemeClr>
-            </a:solidFill>
-          </a:ln>
-        </p:spPr>
-        <p:style>
-          <a:lnRef idx="2">
-            <a:schemeClr val="accent1">
-              <a:shade val="50000"/>
-            </a:schemeClr>
-          </a:lnRef>
-          <a:fillRef idx="1">
-            <a:schemeClr val="accent1"/>
-          </a:fillRef>
-          <a:effectRef idx="0">
-            <a:schemeClr val="accent1"/>
-          </a:effectRef>
-          <a:fontRef idx="minor">
-            <a:schemeClr val="lt1"/>
-          </a:fontRef>
-        </p:style>
-        <p:txBody>
-          <a:bodyPr rtlCol="0" anchor="ctr"/>
-          <a:lstStyle/>
-          <a:p>
-            <a:pPr algn="ctr"/>
-            <a:endParaRPr lang="en-US"/>
-          </a:p>
-        </p:txBody>
-      </p:sp>
-      <p:sp>
-        <p:nvSpPr>
-          <p:cNvPr id="153" name="Parallelogram 152"/>
-          <p:cNvSpPr/>
-          <p:nvPr/>
-        </p:nvSpPr>
-        <p:spPr>
-          <a:xfrm>
-            <a:off x="695735" y="2498986"/>
-            <a:ext cx="186647" cy="106640"/>
-          </a:xfrm>
-          <a:prstGeom prst="parallelogram">
-            <a:avLst/>
-          </a:prstGeom>
-          <a:solidFill>
-            <a:schemeClr val="bg1">
-              <a:lumMod val="50000"/>
-            </a:schemeClr>
-          </a:solidFill>
-          <a:ln w="38100">
-            <a:solidFill>
-              <a:schemeClr val="tx1">
-                <a:lumMod val="50000"/>
-                <a:lumOff val="50000"/>
-              </a:schemeClr>
-            </a:solidFill>
-          </a:ln>
-        </p:spPr>
-        <p:style>
-          <a:lnRef idx="2">
-            <a:schemeClr val="accent1">
-              <a:shade val="50000"/>
-            </a:schemeClr>
-          </a:lnRef>
-          <a:fillRef idx="1">
-            <a:schemeClr val="accent1"/>
-          </a:fillRef>
-          <a:effectRef idx="0">
-            <a:schemeClr val="accent1"/>
-          </a:effectRef>
-          <a:fontRef idx="minor">
-            <a:schemeClr val="lt1"/>
-          </a:fontRef>
-        </p:style>
-        <p:txBody>
-          <a:bodyPr rtlCol="0" anchor="ctr"/>
-          <a:lstStyle/>
-          <a:p>
-            <a:pPr algn="ctr"/>
-            <a:endParaRPr lang="en-US"/>
-          </a:p>
-        </p:txBody>
-      </p:sp>
-      <p:sp>
-        <p:nvSpPr>
-          <p:cNvPr id="155" name="Diamond 154"/>
-          <p:cNvSpPr/>
-          <p:nvPr/>
-        </p:nvSpPr>
-        <p:spPr>
-          <a:xfrm>
-            <a:off x="1200902" y="2348703"/>
+            <a:off x="1182129" y="3426322"/>
             <a:ext cx="143736" cy="139320"/>
           </a:xfrm>
           <a:prstGeom prst="diamond">
@@ -9858,25 +10064,24 @@
       </p:sp>
       <p:sp>
         <p:nvSpPr>
-          <p:cNvPr id="156" name="Hexagon 155"/>
+          <p:cNvPr id="9" name="Right Arrow 8"/>
           <p:cNvSpPr/>
           <p:nvPr/>
         </p:nvSpPr>
         <p:spPr>
           <a:xfrm>
-            <a:off x="253999" y="4203038"/>
-            <a:ext cx="170932" cy="151439"/>
-          </a:xfrm>
-          <a:prstGeom prst="hexagon">
+            <a:off x="2514367" y="5270686"/>
+            <a:ext cx="578873" cy="323041"/>
+          </a:xfrm>
+          <a:prstGeom prst="rightArrow">
             <a:avLst/>
           </a:prstGeom>
-          <a:noFill/>
-          <a:ln w="19050">
+          <a:solidFill>
+            <a:schemeClr val="tx1"/>
+          </a:solidFill>
+          <a:ln>
             <a:solidFill>
-              <a:schemeClr val="tx1">
-                <a:lumMod val="50000"/>
-                <a:lumOff val="50000"/>
-              </a:schemeClr>
+              <a:schemeClr val="tx1"/>
             </a:solidFill>
           </a:ln>
         </p:spPr>
@@ -9907,278 +10112,19 @@
       </p:sp>
       <p:sp>
         <p:nvSpPr>
-          <p:cNvPr id="157" name="Rectangle 156"/>
-          <p:cNvSpPr/>
+          <p:cNvPr id="13" name="TextBox 12"/>
+          <p:cNvSpPr txBox="1"/>
           <p:nvPr/>
         </p:nvSpPr>
         <p:spPr>
           <a:xfrm>
-            <a:off x="693972" y="4005546"/>
-            <a:ext cx="142869" cy="135226"/>
+            <a:off x="2796616" y="26730"/>
+            <a:ext cx="329184" cy="369332"/>
           </a:xfrm>
           <a:prstGeom prst="rect">
             <a:avLst/>
           </a:prstGeom>
           <a:noFill/>
-          <a:ln w="19050">
-            <a:solidFill>
-              <a:schemeClr val="tx1">
-                <a:lumMod val="50000"/>
-                <a:lumOff val="50000"/>
-              </a:schemeClr>
-            </a:solidFill>
-          </a:ln>
-        </p:spPr>
-        <p:style>
-          <a:lnRef idx="2">
-            <a:schemeClr val="accent1">
-              <a:shade val="50000"/>
-            </a:schemeClr>
-          </a:lnRef>
-          <a:fillRef idx="1">
-            <a:schemeClr val="accent1"/>
-          </a:fillRef>
-          <a:effectRef idx="0">
-            <a:schemeClr val="accent1"/>
-          </a:effectRef>
-          <a:fontRef idx="minor">
-            <a:schemeClr val="lt1"/>
-          </a:fontRef>
-        </p:style>
-        <p:txBody>
-          <a:bodyPr rtlCol="0" anchor="ctr"/>
-          <a:lstStyle/>
-          <a:p>
-            <a:pPr algn="ctr"/>
-            <a:endParaRPr lang="en-US"/>
-          </a:p>
-        </p:txBody>
-      </p:sp>
-      <p:sp>
-        <p:nvSpPr>
-          <p:cNvPr id="158" name="Oval 157"/>
-          <p:cNvSpPr/>
-          <p:nvPr/>
-        </p:nvSpPr>
-        <p:spPr>
-          <a:xfrm>
-            <a:off x="1182521" y="4153998"/>
-            <a:ext cx="119733" cy="108597"/>
-          </a:xfrm>
-          <a:prstGeom prst="ellipse">
-            <a:avLst/>
-          </a:prstGeom>
-          <a:solidFill>
-            <a:schemeClr val="tx1">
-              <a:lumMod val="50000"/>
-              <a:lumOff val="50000"/>
-            </a:schemeClr>
-          </a:solidFill>
-          <a:ln w="38100">
-            <a:solidFill>
-              <a:schemeClr val="tx1">
-                <a:lumMod val="50000"/>
-                <a:lumOff val="50000"/>
-              </a:schemeClr>
-            </a:solidFill>
-          </a:ln>
-        </p:spPr>
-        <p:style>
-          <a:lnRef idx="2">
-            <a:schemeClr val="accent1">
-              <a:shade val="50000"/>
-            </a:schemeClr>
-          </a:lnRef>
-          <a:fillRef idx="1">
-            <a:schemeClr val="accent1"/>
-          </a:fillRef>
-          <a:effectRef idx="0">
-            <a:schemeClr val="accent1"/>
-          </a:effectRef>
-          <a:fontRef idx="minor">
-            <a:schemeClr val="lt1"/>
-          </a:fontRef>
-        </p:style>
-        <p:txBody>
-          <a:bodyPr rtlCol="0" anchor="ctr"/>
-          <a:lstStyle/>
-          <a:p>
-            <a:pPr algn="ctr"/>
-            <a:endParaRPr lang="en-US"/>
-          </a:p>
-        </p:txBody>
-      </p:sp>
-      <p:sp>
-        <p:nvSpPr>
-          <p:cNvPr id="159" name="Isosceles Triangle 158"/>
-          <p:cNvSpPr/>
-          <p:nvPr/>
-        </p:nvSpPr>
-        <p:spPr>
-          <a:xfrm>
-            <a:off x="362601" y="3558467"/>
-            <a:ext cx="103106" cy="98071"/>
-          </a:xfrm>
-          <a:prstGeom prst="triangle">
-            <a:avLst/>
-          </a:prstGeom>
-          <a:solidFill>
-            <a:schemeClr val="tx1">
-              <a:lumMod val="50000"/>
-              <a:lumOff val="50000"/>
-            </a:schemeClr>
-          </a:solidFill>
-          <a:ln w="38100">
-            <a:solidFill>
-              <a:schemeClr val="tx1">
-                <a:lumMod val="50000"/>
-                <a:lumOff val="50000"/>
-              </a:schemeClr>
-            </a:solidFill>
-          </a:ln>
-        </p:spPr>
-        <p:style>
-          <a:lnRef idx="2">
-            <a:schemeClr val="accent1">
-              <a:shade val="50000"/>
-            </a:schemeClr>
-          </a:lnRef>
-          <a:fillRef idx="1">
-            <a:schemeClr val="accent1"/>
-          </a:fillRef>
-          <a:effectRef idx="0">
-            <a:schemeClr val="accent1"/>
-          </a:effectRef>
-          <a:fontRef idx="minor">
-            <a:schemeClr val="lt1"/>
-          </a:fontRef>
-        </p:style>
-        <p:txBody>
-          <a:bodyPr rtlCol="0" anchor="ctr"/>
-          <a:lstStyle/>
-          <a:p>
-            <a:pPr algn="ctr"/>
-            <a:endParaRPr lang="en-US"/>
-          </a:p>
-        </p:txBody>
-      </p:sp>
-      <p:sp>
-        <p:nvSpPr>
-          <p:cNvPr id="163" name="Diamond 162"/>
-          <p:cNvSpPr/>
-          <p:nvPr/>
-        </p:nvSpPr>
-        <p:spPr>
-          <a:xfrm>
-            <a:off x="1182129" y="3426322"/>
-            <a:ext cx="143736" cy="139320"/>
-          </a:xfrm>
-          <a:prstGeom prst="diamond">
-            <a:avLst/>
-          </a:prstGeom>
-          <a:solidFill>
-            <a:schemeClr val="tx1">
-              <a:lumMod val="50000"/>
-              <a:lumOff val="50000"/>
-            </a:schemeClr>
-          </a:solidFill>
-          <a:ln w="38100">
-            <a:solidFill>
-              <a:schemeClr val="tx1">
-                <a:lumMod val="50000"/>
-                <a:lumOff val="50000"/>
-              </a:schemeClr>
-            </a:solidFill>
-          </a:ln>
-        </p:spPr>
-        <p:style>
-          <a:lnRef idx="2">
-            <a:schemeClr val="accent1">
-              <a:shade val="50000"/>
-            </a:schemeClr>
-          </a:lnRef>
-          <a:fillRef idx="1">
-            <a:schemeClr val="accent1"/>
-          </a:fillRef>
-          <a:effectRef idx="0">
-            <a:schemeClr val="accent1"/>
-          </a:effectRef>
-          <a:fontRef idx="minor">
-            <a:schemeClr val="lt1"/>
-          </a:fontRef>
-        </p:style>
-        <p:txBody>
-          <a:bodyPr rtlCol="0" anchor="ctr"/>
-          <a:lstStyle/>
-          <a:p>
-            <a:pPr algn="ctr"/>
-            <a:endParaRPr lang="en-US"/>
-          </a:p>
-        </p:txBody>
-      </p:sp>
-      <p:sp>
-        <p:nvSpPr>
-          <p:cNvPr id="9" name="Right Arrow 8"/>
-          <p:cNvSpPr/>
-          <p:nvPr/>
-        </p:nvSpPr>
-        <p:spPr>
-          <a:xfrm>
-            <a:off x="2484337" y="5415032"/>
-            <a:ext cx="578873" cy="171855"/>
-          </a:xfrm>
-          <a:prstGeom prst="rightArrow">
-            <a:avLst/>
-          </a:prstGeom>
-          <a:solidFill>
-            <a:schemeClr val="tx1"/>
-          </a:solidFill>
-          <a:ln>
-            <a:solidFill>
-              <a:schemeClr val="tx1"/>
-            </a:solidFill>
-          </a:ln>
-        </p:spPr>
-        <p:style>
-          <a:lnRef idx="2">
-            <a:schemeClr val="accent1">
-              <a:shade val="50000"/>
-            </a:schemeClr>
-          </a:lnRef>
-          <a:fillRef idx="1">
-            <a:schemeClr val="accent1"/>
-          </a:fillRef>
-          <a:effectRef idx="0">
-            <a:schemeClr val="accent1"/>
-          </a:effectRef>
-          <a:fontRef idx="minor">
-            <a:schemeClr val="lt1"/>
-          </a:fontRef>
-        </p:style>
-        <p:txBody>
-          <a:bodyPr rtlCol="0" anchor="ctr"/>
-          <a:lstStyle/>
-          <a:p>
-            <a:pPr algn="ctr"/>
-            <a:endParaRPr lang="en-US"/>
-          </a:p>
-        </p:txBody>
-      </p:sp>
-      <p:sp>
-        <p:nvSpPr>
-          <p:cNvPr id="13" name="TextBox 12"/>
-          <p:cNvSpPr txBox="1"/>
-          <p:nvPr/>
-        </p:nvSpPr>
-        <p:spPr>
-          <a:xfrm>
-            <a:off x="2796616" y="26730"/>
-            <a:ext cx="329184" cy="369332"/>
-          </a:xfrm>
-          <a:prstGeom prst="rect">
-            <a:avLst/>
-          </a:prstGeom>
-          <a:noFill/>
         </p:spPr>
         <p:txBody>
           <a:bodyPr wrap="square" rtlCol="0">
@@ -10190,7 +10136,6 @@
               <a:rPr lang="en-US" b="1" dirty="0"/>
               <a:t>B</a:t>
             </a:r>
-            <a:endParaRPr lang="en-US" b="1" dirty="0"/>
           </a:p>
         </p:txBody>
       </p:sp>
@@ -10250,7 +10195,6 @@
               <a:rPr lang="en-US" b="1" dirty="0"/>
               <a:t>C</a:t>
             </a:r>
-            <a:endParaRPr lang="en-US" b="1" dirty="0"/>
           </a:p>
         </p:txBody>
       </p:sp>
@@ -13181,13 +13125,8 @@
           <a:p>
             <a:r>
               <a:rPr lang="en-US" dirty="0" smtClean="0"/>
-              <a:t>Fig </a:t>
+              <a:t>Fig 3a-3b</a:t>
             </a:r>
-            <a:r>
-              <a:rPr lang="en-US" dirty="0" smtClean="0"/>
-              <a:t>3a-3b</a:t>
-            </a:r>
-            <a:endParaRPr lang="en-US" dirty="0" smtClean="0"/>
           </a:p>
         </p:txBody>
       </p:sp>
@@ -13613,8 +13552,8 @@
         </p:nvSpPr>
         <p:spPr>
           <a:xfrm>
-            <a:off x="1433279" y="5092181"/>
-            <a:ext cx="8805672" cy="646331"/>
+            <a:off x="1405847" y="6019661"/>
+            <a:ext cx="8805672" cy="707886"/>
           </a:xfrm>
           <a:prstGeom prst="rect">
             <a:avLst/>
@@ -13627,130 +13566,60 @@
           <a:lstStyle/>
           <a:p>
             <a:r>
-              <a:rPr lang="en-US" dirty="0" smtClean="0"/>
+              <a:rPr lang="en-US" sz="1000" dirty="0" smtClean="0"/>
               <a:t>Figure3a. </a:t>
             </a:r>
             <a:r>
-              <a:rPr lang="en-US" dirty="0"/>
+              <a:rPr lang="en-US" sz="1000" dirty="0"/>
               <a:t>Proportion of transient </a:t>
             </a:r>
             <a:r>
-              <a:rPr lang="en-US" dirty="0" smtClean="0"/>
+              <a:rPr lang="en-US" sz="1000" dirty="0" smtClean="0"/>
               <a:t>species </a:t>
             </a:r>
             <a:r>
-              <a:rPr lang="en-US" dirty="0"/>
+              <a:rPr lang="en-US" sz="1000" dirty="0"/>
               <a:t>by </a:t>
             </a:r>
             <a:r>
-              <a:rPr lang="en-US" dirty="0" smtClean="0"/>
+              <a:rPr lang="en-US" sz="1000" dirty="0" smtClean="0"/>
               <a:t>log of area, colored </a:t>
             </a:r>
             <a:r>
-              <a:rPr lang="en-US" dirty="0"/>
+              <a:rPr lang="en-US" sz="1000" dirty="0"/>
               <a:t>by taxa, using the hierarchically </a:t>
             </a:r>
             <a:r>
-              <a:rPr lang="en-US" dirty="0" smtClean="0"/>
+              <a:rPr lang="en-US" sz="1000" dirty="0" smtClean="0"/>
               <a:t>scaled count </a:t>
             </a:r>
             <a:r>
-              <a:rPr lang="en-US" dirty="0"/>
-              <a:t>datasets.</a:t>
-            </a:r>
-          </a:p>
-        </p:txBody>
-      </p:sp>
-      <p:sp>
-        <p:nvSpPr>
-          <p:cNvPr id="7" name="Rectangle 6"/>
-          <p:cNvSpPr/>
-          <p:nvPr/>
-        </p:nvSpPr>
-        <p:spPr>
-          <a:xfrm>
-            <a:off x="1433279" y="5633820"/>
-            <a:ext cx="8805672" cy="646331"/>
-          </a:xfrm>
-          <a:prstGeom prst="rect">
-            <a:avLst/>
-          </a:prstGeom>
-        </p:spPr>
-        <p:txBody>
-          <a:bodyPr wrap="square">
-            <a:spAutoFit/>
-          </a:bodyPr>
-          <a:lstStyle/>
-          <a:p>
-            <a:r>
-              <a:rPr lang="en-US" dirty="0" smtClean="0"/>
-              <a:t>Figure3b</a:t>
+              <a:rPr lang="en-US" sz="1000" dirty="0"/>
+              <a:t>datasets</a:t>
             </a:r>
             <a:r>
-              <a:rPr lang="en-US" dirty="0"/>
-              <a:t>. Proportion of transient </a:t>
+              <a:rPr lang="en-US" sz="1000" dirty="0" smtClean="0"/>
+              <a:t>.</a:t>
+            </a:r>
+          </a:p>
+          <a:p>
+            <a:r>
+              <a:rPr lang="en-US" sz="1000" dirty="0"/>
+              <a:t>Figure3b. Proportion of transient species by log of community size (number of individuals), colored by taxa, using the hierarchically scaled count datasets</a:t>
             </a:r>
             <a:r>
-              <a:rPr lang="en-US" dirty="0" smtClean="0"/>
-              <a:t>species </a:t>
-            </a:r>
-            <a:r>
-              <a:rPr lang="en-US" dirty="0"/>
-              <a:t>by </a:t>
-            </a:r>
-            <a:r>
-              <a:rPr lang="en-US" dirty="0" smtClean="0"/>
-              <a:t>log of community </a:t>
-            </a:r>
-            <a:r>
-              <a:rPr lang="en-US" dirty="0"/>
-              <a:t>size </a:t>
-            </a:r>
-            <a:r>
-              <a:rPr lang="en-US" dirty="0" smtClean="0"/>
-              <a:t>(number of individuals), </a:t>
-            </a:r>
-            <a:r>
-              <a:rPr lang="en-US" dirty="0"/>
-              <a:t>colored by taxa, using the hierarchically scaled </a:t>
-            </a:r>
-            <a:r>
-              <a:rPr lang="en-US" dirty="0" smtClean="0"/>
-              <a:t>count datasets</a:t>
-            </a:r>
-            <a:r>
-              <a:rPr lang="en-US" dirty="0"/>
+              <a:rPr lang="en-US" sz="1000" dirty="0" smtClean="0"/>
               <a:t>.</a:t>
             </a:r>
           </a:p>
-        </p:txBody>
-      </p:sp>
-      <p:sp>
-        <p:nvSpPr>
-          <p:cNvPr id="10" name="Rectangle 9"/>
-          <p:cNvSpPr/>
-          <p:nvPr/>
-        </p:nvSpPr>
-        <p:spPr>
-          <a:xfrm>
-            <a:off x="1433279" y="6211669"/>
-            <a:ext cx="8805672" cy="646331"/>
-          </a:xfrm>
-          <a:prstGeom prst="rect">
-            <a:avLst/>
-          </a:prstGeom>
-        </p:spPr>
-        <p:txBody>
-          <a:bodyPr wrap="square">
-            <a:spAutoFit/>
-          </a:bodyPr>
-          <a:lstStyle/>
           <a:p>
             <a:r>
-              <a:rPr lang="en-US" dirty="0" smtClean="0"/>
+              <a:rPr lang="en-US" sz="1000" dirty="0"/>
               <a:t>Figure3c. Predicted values of hierarchically scaled count datasets by taxa using average community size XXX. </a:t>
             </a:r>
-            <a:endParaRPr lang="en-US" dirty="0"/>
+          </a:p>
+          <a:p>
+            <a:endParaRPr lang="en-US" sz="1000" dirty="0"/>
           </a:p>
         </p:txBody>
       </p:sp>
@@ -13786,21 +13655,21 @@
       </p:sp>
       <p:grpSp>
         <p:nvGrpSpPr>
-          <p:cNvPr id="2" name="Group 1"/>
+          <p:cNvPr id="8" name="Group 7"/>
           <p:cNvGrpSpPr/>
           <p:nvPr/>
         </p:nvGrpSpPr>
         <p:grpSpPr>
           <a:xfrm>
-            <a:off x="2431973" y="131617"/>
-            <a:ext cx="6085173" cy="5042934"/>
-            <a:chOff x="2431973" y="131617"/>
-            <a:chExt cx="6085173" cy="5042934"/>
+            <a:off x="1818898" y="134914"/>
+            <a:ext cx="6973681" cy="5803521"/>
+            <a:chOff x="1882906" y="0"/>
+            <a:chExt cx="6973681" cy="5803521"/>
           </a:xfrm>
         </p:grpSpPr>
         <p:pic>
           <p:nvPicPr>
-            <p:cNvPr id="3" name="Picture 2"/>
+            <p:cNvPr id="4" name="Picture 3"/>
             <p:cNvPicPr>
               <a:picLocks noChangeAspect="1"/>
             </p:cNvPicPr>
@@ -13814,8 +13683,8 @@
           </p:blipFill>
           <p:spPr>
             <a:xfrm>
-              <a:off x="2431973" y="131617"/>
-              <a:ext cx="6085173" cy="4865881"/>
+              <a:off x="1882906" y="0"/>
+              <a:ext cx="6973681" cy="5474242"/>
             </a:xfrm>
             <a:prstGeom prst="rect">
               <a:avLst/>
@@ -13830,10 +13699,10 @@
           </p:nvGrpSpPr>
           <p:grpSpPr>
             <a:xfrm>
-              <a:off x="3012760" y="4831134"/>
-              <a:ext cx="2279540" cy="281753"/>
-              <a:chOff x="2760297" y="6051268"/>
-              <a:chExt cx="2514388" cy="236612"/>
+              <a:off x="2573781" y="5458065"/>
+              <a:ext cx="2577809" cy="336933"/>
+              <a:chOff x="2725734" y="6040009"/>
+              <a:chExt cx="2431519" cy="233554"/>
             </a:xfrm>
           </p:grpSpPr>
           <p:grpSp>
@@ -13844,10 +13713,10 @@
             </p:nvGrpSpPr>
             <p:grpSpPr>
               <a:xfrm>
-                <a:off x="2760297" y="6051268"/>
-                <a:ext cx="2514388" cy="236612"/>
-                <a:chOff x="2926296" y="6051268"/>
-                <a:chExt cx="2514388" cy="236612"/>
+                <a:off x="2725734" y="6040009"/>
+                <a:ext cx="2431519" cy="233554"/>
+                <a:chOff x="2891733" y="6040009"/>
+                <a:chExt cx="2431519" cy="233554"/>
               </a:xfrm>
             </p:grpSpPr>
             <p:pic>
@@ -13872,7 +13741,7 @@
               </p:blipFill>
               <p:spPr>
                 <a:xfrm>
-                  <a:off x="3339990" y="6090606"/>
+                  <a:off x="3290816" y="6072439"/>
                   <a:ext cx="325640" cy="161565"/>
                 </a:xfrm>
                 <a:prstGeom prst="rect">
@@ -13902,7 +13771,7 @@
               </p:blipFill>
               <p:spPr>
                 <a:xfrm>
-                  <a:off x="3804938" y="6051268"/>
+                  <a:off x="3741153" y="6047967"/>
                   <a:ext cx="280633" cy="225596"/>
                 </a:xfrm>
                 <a:prstGeom prst="rect">
@@ -13932,7 +13801,7 @@
               </p:blipFill>
               <p:spPr>
                 <a:xfrm>
-                  <a:off x="2926296" y="6062284"/>
+                  <a:off x="2891733" y="6043973"/>
                   <a:ext cx="274386" cy="225596"/>
                 </a:xfrm>
                 <a:prstGeom prst="rect">
@@ -13962,7 +13831,7 @@
               </p:blipFill>
               <p:spPr>
                 <a:xfrm flipH="1">
-                  <a:off x="5184894" y="6062284"/>
+                  <a:off x="5067462" y="6040009"/>
                   <a:ext cx="255790" cy="218495"/>
                 </a:xfrm>
                 <a:prstGeom prst="rect">
@@ -13987,7 +13856,7 @@
             </p:blipFill>
             <p:spPr>
               <a:xfrm>
-                <a:off x="4048209" y="6067448"/>
+                <a:off x="3985391" y="6056054"/>
                 <a:ext cx="334902" cy="198223"/>
               </a:xfrm>
               <a:prstGeom prst="rect">
@@ -14011,7 +13880,7 @@
             </p:blipFill>
             <p:spPr>
               <a:xfrm>
-                <a:off x="4490815" y="6064345"/>
+                <a:off x="4396641" y="6042431"/>
                 <a:ext cx="327300" cy="196986"/>
               </a:xfrm>
               <a:prstGeom prst="rect">
@@ -14028,9 +13897,9 @@
           </p:nvGrpSpPr>
           <p:grpSpPr>
             <a:xfrm>
-              <a:off x="6155681" y="4850311"/>
-              <a:ext cx="2164195" cy="324240"/>
-              <a:chOff x="2148779" y="1657738"/>
+              <a:off x="6172751" y="5427766"/>
+              <a:ext cx="2448054" cy="375755"/>
+              <a:chOff x="2148779" y="1628632"/>
               <a:chExt cx="2931901" cy="414033"/>
             </a:xfrm>
           </p:grpSpPr>
@@ -14050,7 +13919,7 @@
             </p:blipFill>
             <p:spPr>
               <a:xfrm>
-                <a:off x="2148779" y="1657738"/>
+                <a:off x="2148779" y="1628632"/>
                 <a:ext cx="655912" cy="396304"/>
               </a:xfrm>
               <a:prstGeom prst="rect">
@@ -14074,7 +13943,7 @@
             </p:blipFill>
             <p:spPr>
               <a:xfrm>
-                <a:off x="3258043" y="1708949"/>
+                <a:off x="3258043" y="1679844"/>
                 <a:ext cx="728479" cy="293882"/>
               </a:xfrm>
               <a:prstGeom prst="rect">
@@ -14098,7 +13967,7 @@
             </p:blipFill>
             <p:spPr>
               <a:xfrm>
-                <a:off x="4439875" y="1662829"/>
+                <a:off x="4439875" y="1633723"/>
                 <a:ext cx="640805" cy="408942"/>
               </a:xfrm>
               <a:prstGeom prst="rect">

</xml_diff>

<commit_message>
increased font size fig 5
</commit_message>
<xml_diff>
--- a/output/plots/all_figs_with_legends.pptx
+++ b/output/plots/all_figs_with_legends.pptx
@@ -14054,21 +14054,22 @@
       </p:sp>
       <p:pic>
         <p:nvPicPr>
-          <p:cNvPr id="2" name="Picture 1"/>
+          <p:cNvPr id="3" name="Picture 2"/>
           <p:cNvPicPr>
             <a:picLocks noChangeAspect="1"/>
           </p:cNvPicPr>
           <p:nvPr/>
         </p:nvPicPr>
-        <p:blipFill rotWithShape="1">
+        <p:blipFill>
           <a:blip r:embed="rId2"/>
-          <a:srcRect l="571"/>
-          <a:stretch/>
+          <a:stretch>
+            <a:fillRect/>
+          </a:stretch>
         </p:blipFill>
         <p:spPr>
           <a:xfrm>
-            <a:off x="1306285" y="65314"/>
-            <a:ext cx="9094916" cy="6792686"/>
+            <a:off x="1581911" y="0"/>
+            <a:ext cx="8771405" cy="6793992"/>
           </a:xfrm>
           <a:prstGeom prst="rect">
             <a:avLst/>

</xml_diff>

<commit_message>
increased font size fig 4
</commit_message>
<xml_diff>
--- a/output/plots/all_figs_with_legends.pptx
+++ b/output/plots/all_figs_with_legends.pptx
@@ -13,7 +13,7 @@
     <p:sldId id="257" r:id="rId4"/>
     <p:sldId id="260" r:id="rId5"/>
     <p:sldId id="262" r:id="rId6"/>
-    <p:sldId id="261" r:id="rId7"/>
+    <p:sldId id="266" r:id="rId7"/>
     <p:sldId id="256" r:id="rId8"/>
     <p:sldId id="264" r:id="rId9"/>
     <p:sldId id="265" r:id="rId10"/>
@@ -205,7 +205,7 @@
           <a:p>
             <a:fld id="{7FA21820-D199-4D82-91AF-C50B1D3B111A}" type="datetimeFigureOut">
               <a:rPr lang="en-US" smtClean="0"/>
-              <a:t>5/18/2017</a:t>
+              <a:t>5/23/2017</a:t>
             </a:fld>
             <a:endParaRPr lang="en-US"/>
           </a:p>
@@ -1038,7 +1038,7 @@
           <a:p>
             <a:fld id="{916B8C92-D5E3-4480-8685-D57BEE386DE2}" type="datetimeFigureOut">
               <a:rPr lang="en-US" smtClean="0"/>
-              <a:t>5/18/2017</a:t>
+              <a:t>5/23/2017</a:t>
             </a:fld>
             <a:endParaRPr lang="en-US"/>
           </a:p>
@@ -1208,7 +1208,7 @@
           <a:p>
             <a:fld id="{916B8C92-D5E3-4480-8685-D57BEE386DE2}" type="datetimeFigureOut">
               <a:rPr lang="en-US" smtClean="0"/>
-              <a:t>5/18/2017</a:t>
+              <a:t>5/23/2017</a:t>
             </a:fld>
             <a:endParaRPr lang="en-US"/>
           </a:p>
@@ -1388,7 +1388,7 @@
           <a:p>
             <a:fld id="{916B8C92-D5E3-4480-8685-D57BEE386DE2}" type="datetimeFigureOut">
               <a:rPr lang="en-US" smtClean="0"/>
-              <a:t>5/18/2017</a:t>
+              <a:t>5/23/2017</a:t>
             </a:fld>
             <a:endParaRPr lang="en-US"/>
           </a:p>
@@ -1558,7 +1558,7 @@
           <a:p>
             <a:fld id="{916B8C92-D5E3-4480-8685-D57BEE386DE2}" type="datetimeFigureOut">
               <a:rPr lang="en-US" smtClean="0"/>
-              <a:t>5/18/2017</a:t>
+              <a:t>5/23/2017</a:t>
             </a:fld>
             <a:endParaRPr lang="en-US"/>
           </a:p>
@@ -1804,7 +1804,7 @@
           <a:p>
             <a:fld id="{916B8C92-D5E3-4480-8685-D57BEE386DE2}" type="datetimeFigureOut">
               <a:rPr lang="en-US" smtClean="0"/>
-              <a:t>5/18/2017</a:t>
+              <a:t>5/23/2017</a:t>
             </a:fld>
             <a:endParaRPr lang="en-US"/>
           </a:p>
@@ -2036,7 +2036,7 @@
           <a:p>
             <a:fld id="{916B8C92-D5E3-4480-8685-D57BEE386DE2}" type="datetimeFigureOut">
               <a:rPr lang="en-US" smtClean="0"/>
-              <a:t>5/18/2017</a:t>
+              <a:t>5/23/2017</a:t>
             </a:fld>
             <a:endParaRPr lang="en-US"/>
           </a:p>
@@ -2403,7 +2403,7 @@
           <a:p>
             <a:fld id="{916B8C92-D5E3-4480-8685-D57BEE386DE2}" type="datetimeFigureOut">
               <a:rPr lang="en-US" smtClean="0"/>
-              <a:t>5/18/2017</a:t>
+              <a:t>5/23/2017</a:t>
             </a:fld>
             <a:endParaRPr lang="en-US"/>
           </a:p>
@@ -2521,7 +2521,7 @@
           <a:p>
             <a:fld id="{916B8C92-D5E3-4480-8685-D57BEE386DE2}" type="datetimeFigureOut">
               <a:rPr lang="en-US" smtClean="0"/>
-              <a:t>5/18/2017</a:t>
+              <a:t>5/23/2017</a:t>
             </a:fld>
             <a:endParaRPr lang="en-US"/>
           </a:p>
@@ -2616,7 +2616,7 @@
           <a:p>
             <a:fld id="{916B8C92-D5E3-4480-8685-D57BEE386DE2}" type="datetimeFigureOut">
               <a:rPr lang="en-US" smtClean="0"/>
-              <a:t>5/18/2017</a:t>
+              <a:t>5/23/2017</a:t>
             </a:fld>
             <a:endParaRPr lang="en-US"/>
           </a:p>
@@ -2893,7 +2893,7 @@
           <a:p>
             <a:fld id="{916B8C92-D5E3-4480-8685-D57BEE386DE2}" type="datetimeFigureOut">
               <a:rPr lang="en-US" smtClean="0"/>
-              <a:t>5/18/2017</a:t>
+              <a:t>5/23/2017</a:t>
             </a:fld>
             <a:endParaRPr lang="en-US"/>
           </a:p>
@@ -3146,7 +3146,7 @@
           <a:p>
             <a:fld id="{916B8C92-D5E3-4480-8685-D57BEE386DE2}" type="datetimeFigureOut">
               <a:rPr lang="en-US" smtClean="0"/>
-              <a:t>5/18/2017</a:t>
+              <a:t>5/23/2017</a:t>
             </a:fld>
             <a:endParaRPr lang="en-US"/>
           </a:p>
@@ -3359,7 +3359,7 @@
           <a:p>
             <a:fld id="{916B8C92-D5E3-4480-8685-D57BEE386DE2}" type="datetimeFigureOut">
               <a:rPr lang="en-US" smtClean="0"/>
-              <a:t>5/18/2017</a:t>
+              <a:t>5/23/2017</a:t>
             </a:fld>
             <a:endParaRPr lang="en-US"/>
           </a:p>
@@ -7780,7 +7780,7 @@
         </p:nvSpPr>
         <p:spPr>
           <a:xfrm>
-            <a:off x="3386362" y="2974800"/>
+            <a:off x="3234716" y="2981951"/>
             <a:ext cx="45719" cy="45719"/>
           </a:xfrm>
           <a:prstGeom prst="flowChartConnector">
@@ -7828,7 +7828,7 @@
         </p:nvSpPr>
         <p:spPr>
           <a:xfrm>
-            <a:off x="3416308" y="3880706"/>
+            <a:off x="3264662" y="3887857"/>
             <a:ext cx="45719" cy="45719"/>
           </a:xfrm>
           <a:prstGeom prst="flowChartConnector">
@@ -7876,7 +7876,7 @@
         </p:nvSpPr>
         <p:spPr>
           <a:xfrm>
-            <a:off x="5163301" y="2487815"/>
+            <a:off x="5011655" y="2494966"/>
             <a:ext cx="45719" cy="45719"/>
           </a:xfrm>
           <a:prstGeom prst="flowChartConnector">
@@ -7984,7 +7984,7 @@
         </p:nvCxnSpPr>
         <p:spPr>
           <a:xfrm flipV="1">
-            <a:off x="3471390" y="2539294"/>
+            <a:off x="3319744" y="2546445"/>
             <a:ext cx="1679579" cy="1328597"/>
           </a:xfrm>
           <a:prstGeom prst="line">
@@ -8020,7 +8020,7 @@
         </p:nvCxnSpPr>
         <p:spPr>
           <a:xfrm flipV="1">
-            <a:off x="3445081" y="2534576"/>
+            <a:off x="3293435" y="2541727"/>
             <a:ext cx="1691612" cy="454150"/>
           </a:xfrm>
           <a:prstGeom prst="line">
@@ -8126,7 +8126,7 @@
         </p:nvSpPr>
         <p:spPr>
           <a:xfrm rot="20741648">
-            <a:off x="3514452" y="2590434"/>
+            <a:off x="3362806" y="2597585"/>
             <a:ext cx="1101852" cy="246221"/>
           </a:xfrm>
           <a:prstGeom prst="rect">
@@ -8156,7 +8156,7 @@
         </p:nvSpPr>
         <p:spPr>
           <a:xfrm rot="19292141">
-            <a:off x="3426703" y="3151520"/>
+            <a:off x="3275057" y="3158671"/>
             <a:ext cx="1282191" cy="246221"/>
           </a:xfrm>
           <a:prstGeom prst="rect">
@@ -8186,7 +8186,7 @@
         </p:nvSpPr>
         <p:spPr>
           <a:xfrm>
-            <a:off x="3336894" y="3916387"/>
+            <a:off x="3185248" y="3923538"/>
             <a:ext cx="45719" cy="45719"/>
           </a:xfrm>
           <a:prstGeom prst="diamond">
@@ -8240,7 +8240,7 @@
         </p:nvSpPr>
         <p:spPr>
           <a:xfrm>
-            <a:off x="3481294" y="3940635"/>
+            <a:off x="3329648" y="3947786"/>
             <a:ext cx="45719" cy="45719"/>
           </a:xfrm>
           <a:prstGeom prst="ellipse">
@@ -8294,7 +8294,7 @@
         </p:nvSpPr>
         <p:spPr>
           <a:xfrm>
-            <a:off x="3400306" y="4002617"/>
+            <a:off x="3248660" y="4009768"/>
             <a:ext cx="45719" cy="45719"/>
           </a:xfrm>
           <a:prstGeom prst="triangle">
@@ -8348,7 +8348,7 @@
         </p:nvSpPr>
         <p:spPr>
           <a:xfrm>
-            <a:off x="3322257" y="2916875"/>
+            <a:off x="3170611" y="2924026"/>
             <a:ext cx="70648" cy="57645"/>
           </a:xfrm>
           <a:prstGeom prst="hexagon">
@@ -8397,7 +8397,7 @@
         </p:nvSpPr>
         <p:spPr>
           <a:xfrm>
-            <a:off x="3427384" y="2900594"/>
+            <a:off x="3275738" y="2907745"/>
             <a:ext cx="57025" cy="52352"/>
           </a:xfrm>
           <a:prstGeom prst="rect">
@@ -8446,7 +8446,7 @@
         </p:nvSpPr>
         <p:spPr>
           <a:xfrm>
-            <a:off x="3306634" y="3019382"/>
+            <a:off x="3154988" y="3026533"/>
             <a:ext cx="45719" cy="45719"/>
           </a:xfrm>
           <a:prstGeom prst="diamond">
@@ -8500,7 +8500,7 @@
         </p:nvSpPr>
         <p:spPr>
           <a:xfrm>
-            <a:off x="3451034" y="3043630"/>
+            <a:off x="3299388" y="3050781"/>
             <a:ext cx="45719" cy="45719"/>
           </a:xfrm>
           <a:prstGeom prst="ellipse">
@@ -8554,7 +8554,7 @@
         </p:nvSpPr>
         <p:spPr>
           <a:xfrm>
-            <a:off x="3370046" y="3105612"/>
+            <a:off x="3218400" y="3112763"/>
             <a:ext cx="45719" cy="45719"/>
           </a:xfrm>
           <a:prstGeom prst="triangle">
@@ -8608,7 +8608,7 @@
         </p:nvSpPr>
         <p:spPr>
           <a:xfrm>
-            <a:off x="5127977" y="2334912"/>
+            <a:off x="4976331" y="2342063"/>
             <a:ext cx="70648" cy="57645"/>
           </a:xfrm>
           <a:prstGeom prst="hexagon">
@@ -8661,7 +8661,7 @@
         </p:nvSpPr>
         <p:spPr>
           <a:xfrm>
-            <a:off x="5207811" y="2402458"/>
+            <a:off x="5056165" y="2409609"/>
             <a:ext cx="57025" cy="52352"/>
           </a:xfrm>
           <a:prstGeom prst="rect">
@@ -8714,7 +8714,7 @@
         </p:nvSpPr>
         <p:spPr>
           <a:xfrm>
-            <a:off x="5299315" y="2454810"/>
+            <a:off x="5147669" y="2461961"/>
             <a:ext cx="45719" cy="45719"/>
           </a:xfrm>
           <a:prstGeom prst="diamond">
@@ -8768,7 +8768,7 @@
         </p:nvSpPr>
         <p:spPr>
           <a:xfrm>
-            <a:off x="5232702" y="2541134"/>
+            <a:off x="5081056" y="2548285"/>
             <a:ext cx="45719" cy="45719"/>
           </a:xfrm>
           <a:prstGeom prst="ellipse">
@@ -8822,7 +8822,7 @@
         </p:nvSpPr>
         <p:spPr>
           <a:xfrm>
-            <a:off x="5150473" y="2607476"/>
+            <a:off x="4998827" y="2614627"/>
             <a:ext cx="45719" cy="45719"/>
           </a:xfrm>
           <a:prstGeom prst="triangle">
@@ -8876,7 +8876,7 @@
         </p:nvSpPr>
         <p:spPr>
           <a:xfrm>
-            <a:off x="5076384" y="2427735"/>
+            <a:off x="4924738" y="2434886"/>
             <a:ext cx="45720" cy="45719"/>
           </a:xfrm>
           <a:prstGeom prst="star5">
@@ -8930,7 +8930,7 @@
         </p:nvSpPr>
         <p:spPr>
           <a:xfrm>
-            <a:off x="5308515" y="2600023"/>
+            <a:off x="5156869" y="2607174"/>
             <a:ext cx="45719" cy="45719"/>
           </a:xfrm>
           <a:prstGeom prst="parallelogram">
@@ -8983,7 +8983,7 @@
         </p:nvSpPr>
         <p:spPr>
           <a:xfrm>
-            <a:off x="5304824" y="2349511"/>
+            <a:off x="5153178" y="2356662"/>
             <a:ext cx="45719" cy="45719"/>
           </a:xfrm>
           <a:prstGeom prst="trapezoid">
@@ -14014,85 +14014,248 @@
           <a:chExt cx="0" cy="0"/>
         </a:xfrm>
       </p:grpSpPr>
-      <p:sp>
-        <p:nvSpPr>
-          <p:cNvPr id="8" name="TextBox 7"/>
-          <p:cNvSpPr txBox="1"/>
+      <p:grpSp>
+        <p:nvGrpSpPr>
+          <p:cNvPr id="19" name="Group 18"/>
+          <p:cNvGrpSpPr/>
           <p:nvPr/>
-        </p:nvSpPr>
-        <p:spPr>
+        </p:nvGrpSpPr>
+        <p:grpSpPr>
           <a:xfrm>
-            <a:off x="117817" y="134914"/>
-            <a:ext cx="1060704" cy="369332"/>
-          </a:xfrm>
-          <a:prstGeom prst="rect">
-            <a:avLst/>
-          </a:prstGeom>
-          <a:noFill/>
-        </p:spPr>
-        <p:txBody>
-          <a:bodyPr wrap="square" rtlCol="0">
-            <a:spAutoFit/>
-          </a:bodyPr>
-          <a:lstStyle/>
-          <a:p>
-            <a:r>
-              <a:rPr lang="en-US" dirty="0" smtClean="0"/>
-              <a:t>Fig </a:t>
-            </a:r>
-            <a:r>
-              <a:rPr lang="en-US" dirty="0"/>
-              <a:t>4</a:t>
-            </a:r>
-            <a:r>
-              <a:rPr lang="en-US" dirty="0" smtClean="0"/>
-              <a:t>a-4d</a:t>
-            </a:r>
-            <a:endParaRPr lang="en-US" dirty="0"/>
-          </a:p>
-        </p:txBody>
-      </p:sp>
-      <p:pic>
-        <p:nvPicPr>
-          <p:cNvPr id="3" name="Picture 2"/>
-          <p:cNvPicPr>
-            <a:picLocks noChangeAspect="1"/>
-          </p:cNvPicPr>
-          <p:nvPr/>
-        </p:nvPicPr>
-        <p:blipFill>
-          <a:blip r:embed="rId2"/>
-          <a:stretch>
-            <a:fillRect/>
-          </a:stretch>
-        </p:blipFill>
-        <p:spPr>
-          <a:xfrm>
-            <a:off x="1581911" y="0"/>
-            <a:ext cx="8771405" cy="6793992"/>
-          </a:xfrm>
-          <a:prstGeom prst="rect">
-            <a:avLst/>
-          </a:prstGeom>
-        </p:spPr>
-      </p:pic>
+            <a:off x="994298" y="-1"/>
+            <a:ext cx="9321554" cy="6866083"/>
+            <a:chOff x="994298" y="-1"/>
+            <a:chExt cx="9321554" cy="6866083"/>
+          </a:xfrm>
+        </p:grpSpPr>
+        <p:pic>
+          <p:nvPicPr>
+            <p:cNvPr id="17" name="Picture 16"/>
+            <p:cNvPicPr>
+              <a:picLocks noChangeAspect="1"/>
+            </p:cNvPicPr>
+            <p:nvPr/>
+          </p:nvPicPr>
+          <p:blipFill>
+            <a:blip r:embed="rId2"/>
+            <a:stretch>
+              <a:fillRect/>
+            </a:stretch>
+          </p:blipFill>
+          <p:spPr>
+            <a:xfrm>
+              <a:off x="994298" y="-1"/>
+              <a:ext cx="9321554" cy="6866083"/>
+            </a:xfrm>
+            <a:prstGeom prst="rect">
+              <a:avLst/>
+            </a:prstGeom>
+          </p:spPr>
+        </p:pic>
+        <p:grpSp>
+          <p:nvGrpSpPr>
+            <p:cNvPr id="9" name="Group 8"/>
+            <p:cNvGrpSpPr/>
+            <p:nvPr/>
+          </p:nvGrpSpPr>
+          <p:grpSpPr>
+            <a:xfrm>
+              <a:off x="3133104" y="-1"/>
+              <a:ext cx="535771" cy="1990083"/>
+              <a:chOff x="3359573" y="-81232"/>
+              <a:chExt cx="535771" cy="1990083"/>
+            </a:xfrm>
+          </p:grpSpPr>
+          <p:sp>
+            <p:nvSpPr>
+              <p:cNvPr id="10" name="Rectangle 9"/>
+              <p:cNvSpPr/>
+              <p:nvPr/>
+            </p:nvSpPr>
+            <p:spPr>
+              <a:xfrm>
+                <a:off x="3438144" y="134914"/>
+                <a:ext cx="457200" cy="1639022"/>
+              </a:xfrm>
+              <a:prstGeom prst="rect">
+                <a:avLst/>
+              </a:prstGeom>
+              <a:solidFill>
+                <a:schemeClr val="bg1"/>
+              </a:solidFill>
+              <a:ln>
+                <a:noFill/>
+              </a:ln>
+            </p:spPr>
+            <p:style>
+              <a:lnRef idx="2">
+                <a:schemeClr val="accent1">
+                  <a:shade val="50000"/>
+                </a:schemeClr>
+              </a:lnRef>
+              <a:fillRef idx="1">
+                <a:schemeClr val="accent1"/>
+              </a:fillRef>
+              <a:effectRef idx="0">
+                <a:schemeClr val="accent1"/>
+              </a:effectRef>
+              <a:fontRef idx="minor">
+                <a:schemeClr val="lt1"/>
+              </a:fontRef>
+            </p:style>
+            <p:txBody>
+              <a:bodyPr rtlCol="0" anchor="ctr"/>
+              <a:lstStyle/>
+              <a:p>
+                <a:pPr algn="ctr"/>
+                <a:endParaRPr lang="en-US"/>
+              </a:p>
+            </p:txBody>
+          </p:sp>
+          <p:cxnSp>
+            <p:nvCxnSpPr>
+              <p:cNvPr id="11" name="Straight Arrow Connector 10"/>
+              <p:cNvCxnSpPr/>
+              <p:nvPr/>
+            </p:nvCxnSpPr>
+            <p:spPr>
+              <a:xfrm flipV="1">
+                <a:off x="3647429" y="224987"/>
+                <a:ext cx="0" cy="608132"/>
+              </a:xfrm>
+              <a:prstGeom prst="straightConnector1">
+                <a:avLst/>
+              </a:prstGeom>
+              <a:ln>
+                <a:solidFill>
+                  <a:schemeClr val="tx1"/>
+                </a:solidFill>
+                <a:tailEnd type="triangle"/>
+              </a:ln>
+            </p:spPr>
+            <p:style>
+              <a:lnRef idx="1">
+                <a:schemeClr val="accent1"/>
+              </a:lnRef>
+              <a:fillRef idx="0">
+                <a:schemeClr val="accent1"/>
+              </a:fillRef>
+              <a:effectRef idx="0">
+                <a:schemeClr val="accent1"/>
+              </a:effectRef>
+              <a:fontRef idx="minor">
+                <a:schemeClr val="tx1"/>
+              </a:fontRef>
+            </p:style>
+          </p:cxnSp>
+          <p:sp>
+            <p:nvSpPr>
+              <p:cNvPr id="12" name="TextBox 11"/>
+              <p:cNvSpPr txBox="1"/>
+              <p:nvPr/>
+            </p:nvSpPr>
+            <p:spPr>
+              <a:xfrm rot="16200000">
+                <a:off x="3001131" y="277210"/>
+                <a:ext cx="1024662" cy="307777"/>
+              </a:xfrm>
+              <a:prstGeom prst="rect">
+                <a:avLst/>
+              </a:prstGeom>
+              <a:noFill/>
+            </p:spPr>
+            <p:txBody>
+              <a:bodyPr wrap="square" rtlCol="0">
+                <a:spAutoFit/>
+              </a:bodyPr>
+              <a:lstStyle/>
+              <a:p>
+                <a:r>
+                  <a:rPr lang="en-US" sz="1400" dirty="0" smtClean="0"/>
+                  <a:t>Log-series</a:t>
+                </a:r>
+                <a:endParaRPr lang="en-US" sz="1400" dirty="0"/>
+              </a:p>
+            </p:txBody>
+          </p:sp>
+          <p:cxnSp>
+            <p:nvCxnSpPr>
+              <p:cNvPr id="13" name="Straight Arrow Connector 12"/>
+              <p:cNvCxnSpPr/>
+              <p:nvPr/>
+            </p:nvCxnSpPr>
+            <p:spPr>
+              <a:xfrm>
+                <a:off x="3643466" y="1150782"/>
+                <a:ext cx="1" cy="604518"/>
+              </a:xfrm>
+              <a:prstGeom prst="straightConnector1">
+                <a:avLst/>
+              </a:prstGeom>
+              <a:ln>
+                <a:solidFill>
+                  <a:schemeClr val="tx1"/>
+                </a:solidFill>
+                <a:tailEnd type="triangle"/>
+              </a:ln>
+            </p:spPr>
+            <p:style>
+              <a:lnRef idx="1">
+                <a:schemeClr val="accent1"/>
+              </a:lnRef>
+              <a:fillRef idx="0">
+                <a:schemeClr val="accent1"/>
+              </a:fillRef>
+              <a:effectRef idx="0">
+                <a:schemeClr val="accent1"/>
+              </a:effectRef>
+              <a:fontRef idx="minor">
+                <a:schemeClr val="tx1"/>
+              </a:fontRef>
+            </p:style>
+          </p:cxnSp>
+          <p:sp>
+            <p:nvSpPr>
+              <p:cNvPr id="14" name="TextBox 13"/>
+              <p:cNvSpPr txBox="1"/>
+              <p:nvPr/>
+            </p:nvSpPr>
+            <p:spPr>
+              <a:xfrm rot="16200000">
+                <a:off x="2975596" y="1217096"/>
+                <a:ext cx="1075732" cy="307777"/>
+              </a:xfrm>
+              <a:prstGeom prst="rect">
+                <a:avLst/>
+              </a:prstGeom>
+              <a:noFill/>
+            </p:spPr>
+            <p:txBody>
+              <a:bodyPr wrap="square" rtlCol="0">
+                <a:spAutoFit/>
+              </a:bodyPr>
+              <a:lstStyle/>
+              <a:p>
+                <a:r>
+                  <a:rPr lang="en-US" sz="1400" dirty="0" smtClean="0"/>
+                  <a:t>Log-normal</a:t>
+                </a:r>
+                <a:endParaRPr lang="en-US" sz="1400" dirty="0"/>
+              </a:p>
+            </p:txBody>
+          </p:sp>
+        </p:grpSp>
+      </p:grpSp>
     </p:spTree>
     <p:extLst>
       <p:ext uri="{BB962C8B-B14F-4D97-AF65-F5344CB8AC3E}">
-        <p14:creationId xmlns:p14="http://schemas.microsoft.com/office/powerpoint/2010/main" val="3384467380"/>
+        <p14:creationId xmlns:p14="http://schemas.microsoft.com/office/powerpoint/2010/main" val="2102410935"/>
       </p:ext>
     </p:extLst>
   </p:cSld>
   <p:clrMapOvr>
     <a:masterClrMapping/>
   </p:clrMapOvr>
-  <p:timing>
-    <p:tnLst>
-      <p:par>
-        <p:cTn id="1" dur="indefinite" restart="never" nodeType="tmRoot"/>
-      </p:par>
-    </p:tnLst>
-  </p:timing>
 </p:sld>
 </file>
 
@@ -14113,235 +14276,250 @@
           <a:chExt cx="0" cy="0"/>
         </a:xfrm>
       </p:grpSpPr>
-      <p:pic>
-        <p:nvPicPr>
-          <p:cNvPr id="5" name="Picture 4"/>
-          <p:cNvPicPr>
-            <a:picLocks noChangeAspect="1"/>
-          </p:cNvPicPr>
-          <p:nvPr/>
-        </p:nvPicPr>
-        <p:blipFill rotWithShape="1">
-          <a:blip r:embed="rId2"/>
-          <a:srcRect b="7630"/>
-          <a:stretch/>
-        </p:blipFill>
-        <p:spPr>
-          <a:xfrm>
-            <a:off x="926371" y="146304"/>
-            <a:ext cx="10336164" cy="6199632"/>
-          </a:xfrm>
-          <a:prstGeom prst="rect">
-            <a:avLst/>
-          </a:prstGeom>
-        </p:spPr>
-      </p:pic>
       <p:grpSp>
         <p:nvGrpSpPr>
-          <p:cNvPr id="7" name="Group 6"/>
+          <p:cNvPr id="2" name="Group 1"/>
           <p:cNvGrpSpPr/>
           <p:nvPr/>
         </p:nvGrpSpPr>
         <p:grpSpPr>
           <a:xfrm>
-            <a:off x="2330313" y="6345936"/>
-            <a:ext cx="8304158" cy="487093"/>
-            <a:chOff x="2376033" y="6324830"/>
-            <a:chExt cx="8304158" cy="487093"/>
+            <a:off x="926371" y="146304"/>
+            <a:ext cx="10336164" cy="6686725"/>
+            <a:chOff x="926371" y="146304"/>
+            <a:chExt cx="10336164" cy="6686725"/>
           </a:xfrm>
         </p:grpSpPr>
         <p:pic>
           <p:nvPicPr>
-            <p:cNvPr id="21" name="Picture 20"/>
+            <p:cNvPr id="5" name="Picture 4"/>
             <p:cNvPicPr>
               <a:picLocks noChangeAspect="1"/>
             </p:cNvPicPr>
             <p:nvPr/>
           </p:nvPicPr>
-          <p:blipFill>
-            <a:blip r:embed="rId3" cstate="print">
-              <a:extLst>
-                <a:ext uri="{28A0092B-C50C-407E-A947-70E740481C1C}">
-                  <a14:useLocalDpi xmlns:a14="http://schemas.microsoft.com/office/drawing/2010/main" val="0"/>
-                </a:ext>
-              </a:extLst>
-            </a:blip>
-            <a:stretch>
-              <a:fillRect/>
-            </a:stretch>
+          <p:blipFill rotWithShape="1">
+            <a:blip r:embed="rId2"/>
+            <a:srcRect b="7630"/>
+            <a:stretch/>
           </p:blipFill>
           <p:spPr>
             <a:xfrm>
-              <a:off x="3575399" y="6383536"/>
-              <a:ext cx="512410" cy="318881"/>
+              <a:off x="926371" y="146304"/>
+              <a:ext cx="10336164" cy="6199632"/>
             </a:xfrm>
             <a:prstGeom prst="rect">
               <a:avLst/>
             </a:prstGeom>
           </p:spPr>
         </p:pic>
-        <p:pic>
-          <p:nvPicPr>
-            <p:cNvPr id="22" name="Picture 21"/>
-            <p:cNvPicPr>
-              <a:picLocks noChangeAspect="1"/>
-            </p:cNvPicPr>
+        <p:grpSp>
+          <p:nvGrpSpPr>
+            <p:cNvPr id="7" name="Group 6"/>
+            <p:cNvGrpSpPr/>
             <p:nvPr/>
-          </p:nvPicPr>
-          <p:blipFill>
-            <a:blip r:embed="rId4" cstate="print">
-              <a:extLst>
-                <a:ext uri="{28A0092B-C50C-407E-A947-70E740481C1C}">
-                  <a14:useLocalDpi xmlns:a14="http://schemas.microsoft.com/office/drawing/2010/main" val="0"/>
-                </a:ext>
-              </a:extLst>
-            </a:blip>
-            <a:stretch>
-              <a:fillRect/>
-            </a:stretch>
-          </p:blipFill>
-          <p:spPr>
+          </p:nvGrpSpPr>
+          <p:grpSpPr>
             <a:xfrm>
-              <a:off x="4905939" y="6324830"/>
-              <a:ext cx="441590" cy="445261"/>
+              <a:off x="2330313" y="6345936"/>
+              <a:ext cx="8304158" cy="487093"/>
+              <a:chOff x="2376033" y="6324830"/>
+              <a:chExt cx="8304158" cy="487093"/>
             </a:xfrm>
-            <a:prstGeom prst="rect">
-              <a:avLst/>
-            </a:prstGeom>
-          </p:spPr>
-        </p:pic>
-        <p:pic>
-          <p:nvPicPr>
-            <p:cNvPr id="23" name="Picture 22"/>
-            <p:cNvPicPr>
-              <a:picLocks noChangeAspect="1"/>
-            </p:cNvPicPr>
-            <p:nvPr/>
-          </p:nvPicPr>
-          <p:blipFill>
-            <a:blip r:embed="rId5" cstate="print">
-              <a:extLst>
-                <a:ext uri="{28A0092B-C50C-407E-A947-70E740481C1C}">
-                  <a14:useLocalDpi xmlns:a14="http://schemas.microsoft.com/office/drawing/2010/main" val="0"/>
-                </a:ext>
-              </a:extLst>
-            </a:blip>
-            <a:stretch>
-              <a:fillRect/>
-            </a:stretch>
-          </p:blipFill>
-          <p:spPr>
-            <a:xfrm>
-              <a:off x="2376033" y="6346244"/>
-              <a:ext cx="431760" cy="445261"/>
-            </a:xfrm>
-            <a:prstGeom prst="rect">
-              <a:avLst/>
-            </a:prstGeom>
-          </p:spPr>
-        </p:pic>
-        <p:pic>
-          <p:nvPicPr>
-            <p:cNvPr id="24" name="Picture 23"/>
-            <p:cNvPicPr>
-              <a:picLocks noChangeAspect="1"/>
-            </p:cNvPicPr>
-            <p:nvPr/>
-          </p:nvPicPr>
-          <p:blipFill>
-            <a:blip r:embed="rId6" cstate="print">
-              <a:extLst>
-                <a:ext uri="{28A0092B-C50C-407E-A947-70E740481C1C}">
-                  <a14:useLocalDpi xmlns:a14="http://schemas.microsoft.com/office/drawing/2010/main" val="0"/>
-                </a:ext>
-              </a:extLst>
-            </a:blip>
-            <a:stretch>
-              <a:fillRect/>
-            </a:stretch>
-          </p:blipFill>
-          <p:spPr>
-            <a:xfrm flipH="1">
-              <a:off x="9029020" y="6351714"/>
-              <a:ext cx="402496" cy="431245"/>
-            </a:xfrm>
-            <a:prstGeom prst="rect">
-              <a:avLst/>
-            </a:prstGeom>
-          </p:spPr>
-        </p:pic>
-        <p:pic>
-          <p:nvPicPr>
-            <p:cNvPr id="26" name="Picture 25"/>
-            <p:cNvPicPr>
-              <a:picLocks noChangeAspect="1"/>
-            </p:cNvPicPr>
-            <p:nvPr/>
-          </p:nvPicPr>
-          <p:blipFill>
-            <a:blip r:embed="rId7"/>
-            <a:stretch>
-              <a:fillRect/>
-            </a:stretch>
-          </p:blipFill>
-          <p:spPr>
-            <a:xfrm>
-              <a:off x="10204884" y="6346244"/>
-              <a:ext cx="475307" cy="465679"/>
-            </a:xfrm>
-            <a:prstGeom prst="rect">
-              <a:avLst/>
-            </a:prstGeom>
-          </p:spPr>
-        </p:pic>
-        <p:pic>
-          <p:nvPicPr>
-            <p:cNvPr id="28" name="Picture 27"/>
-            <p:cNvPicPr>
-              <a:picLocks noChangeAspect="1"/>
-            </p:cNvPicPr>
-            <p:nvPr/>
-          </p:nvPicPr>
-          <p:blipFill>
-            <a:blip r:embed="rId8"/>
-            <a:stretch>
-              <a:fillRect/>
-            </a:stretch>
-          </p:blipFill>
-          <p:spPr>
-            <a:xfrm>
-              <a:off x="6203836" y="6330302"/>
-              <a:ext cx="526986" cy="391234"/>
-            </a:xfrm>
-            <a:prstGeom prst="rect">
-              <a:avLst/>
-            </a:prstGeom>
-          </p:spPr>
-        </p:pic>
-        <p:pic>
-          <p:nvPicPr>
-            <p:cNvPr id="29" name="Picture 28"/>
-            <p:cNvPicPr>
-              <a:picLocks noChangeAspect="1"/>
-            </p:cNvPicPr>
-            <p:nvPr/>
-          </p:nvPicPr>
-          <p:blipFill>
-            <a:blip r:embed="rId9"/>
-            <a:stretch>
-              <a:fillRect/>
-            </a:stretch>
-          </p:blipFill>
-          <p:spPr>
-            <a:xfrm>
-              <a:off x="7579748" y="6357186"/>
-              <a:ext cx="515022" cy="388793"/>
-            </a:xfrm>
-            <a:prstGeom prst="rect">
-              <a:avLst/>
-            </a:prstGeom>
-          </p:spPr>
-        </p:pic>
+          </p:grpSpPr>
+          <p:pic>
+            <p:nvPicPr>
+              <p:cNvPr id="21" name="Picture 20"/>
+              <p:cNvPicPr>
+                <a:picLocks noChangeAspect="1"/>
+              </p:cNvPicPr>
+              <p:nvPr/>
+            </p:nvPicPr>
+            <p:blipFill>
+              <a:blip r:embed="rId3" cstate="print">
+                <a:extLst>
+                  <a:ext uri="{28A0092B-C50C-407E-A947-70E740481C1C}">
+                    <a14:useLocalDpi xmlns:a14="http://schemas.microsoft.com/office/drawing/2010/main" val="0"/>
+                  </a:ext>
+                </a:extLst>
+              </a:blip>
+              <a:stretch>
+                <a:fillRect/>
+              </a:stretch>
+            </p:blipFill>
+            <p:spPr>
+              <a:xfrm>
+                <a:off x="3575399" y="6383536"/>
+                <a:ext cx="512410" cy="318881"/>
+              </a:xfrm>
+              <a:prstGeom prst="rect">
+                <a:avLst/>
+              </a:prstGeom>
+            </p:spPr>
+          </p:pic>
+          <p:pic>
+            <p:nvPicPr>
+              <p:cNvPr id="22" name="Picture 21"/>
+              <p:cNvPicPr>
+                <a:picLocks noChangeAspect="1"/>
+              </p:cNvPicPr>
+              <p:nvPr/>
+            </p:nvPicPr>
+            <p:blipFill>
+              <a:blip r:embed="rId4" cstate="print">
+                <a:extLst>
+                  <a:ext uri="{28A0092B-C50C-407E-A947-70E740481C1C}">
+                    <a14:useLocalDpi xmlns:a14="http://schemas.microsoft.com/office/drawing/2010/main" val="0"/>
+                  </a:ext>
+                </a:extLst>
+              </a:blip>
+              <a:stretch>
+                <a:fillRect/>
+              </a:stretch>
+            </p:blipFill>
+            <p:spPr>
+              <a:xfrm>
+                <a:off x="4905939" y="6324830"/>
+                <a:ext cx="441590" cy="445261"/>
+              </a:xfrm>
+              <a:prstGeom prst="rect">
+                <a:avLst/>
+              </a:prstGeom>
+            </p:spPr>
+          </p:pic>
+          <p:pic>
+            <p:nvPicPr>
+              <p:cNvPr id="23" name="Picture 22"/>
+              <p:cNvPicPr>
+                <a:picLocks noChangeAspect="1"/>
+              </p:cNvPicPr>
+              <p:nvPr/>
+            </p:nvPicPr>
+            <p:blipFill>
+              <a:blip r:embed="rId5" cstate="print">
+                <a:extLst>
+                  <a:ext uri="{28A0092B-C50C-407E-A947-70E740481C1C}">
+                    <a14:useLocalDpi xmlns:a14="http://schemas.microsoft.com/office/drawing/2010/main" val="0"/>
+                  </a:ext>
+                </a:extLst>
+              </a:blip>
+              <a:stretch>
+                <a:fillRect/>
+              </a:stretch>
+            </p:blipFill>
+            <p:spPr>
+              <a:xfrm>
+                <a:off x="2376033" y="6346244"/>
+                <a:ext cx="431760" cy="445261"/>
+              </a:xfrm>
+              <a:prstGeom prst="rect">
+                <a:avLst/>
+              </a:prstGeom>
+            </p:spPr>
+          </p:pic>
+          <p:pic>
+            <p:nvPicPr>
+              <p:cNvPr id="24" name="Picture 23"/>
+              <p:cNvPicPr>
+                <a:picLocks noChangeAspect="1"/>
+              </p:cNvPicPr>
+              <p:nvPr/>
+            </p:nvPicPr>
+            <p:blipFill>
+              <a:blip r:embed="rId6" cstate="print">
+                <a:extLst>
+                  <a:ext uri="{28A0092B-C50C-407E-A947-70E740481C1C}">
+                    <a14:useLocalDpi xmlns:a14="http://schemas.microsoft.com/office/drawing/2010/main" val="0"/>
+                  </a:ext>
+                </a:extLst>
+              </a:blip>
+              <a:stretch>
+                <a:fillRect/>
+              </a:stretch>
+            </p:blipFill>
+            <p:spPr>
+              <a:xfrm flipH="1">
+                <a:off x="9029020" y="6351714"/>
+                <a:ext cx="402496" cy="431245"/>
+              </a:xfrm>
+              <a:prstGeom prst="rect">
+                <a:avLst/>
+              </a:prstGeom>
+            </p:spPr>
+          </p:pic>
+          <p:pic>
+            <p:nvPicPr>
+              <p:cNvPr id="26" name="Picture 25"/>
+              <p:cNvPicPr>
+                <a:picLocks noChangeAspect="1"/>
+              </p:cNvPicPr>
+              <p:nvPr/>
+            </p:nvPicPr>
+            <p:blipFill>
+              <a:blip r:embed="rId7"/>
+              <a:stretch>
+                <a:fillRect/>
+              </a:stretch>
+            </p:blipFill>
+            <p:spPr>
+              <a:xfrm>
+                <a:off x="10204884" y="6346244"/>
+                <a:ext cx="475307" cy="465679"/>
+              </a:xfrm>
+              <a:prstGeom prst="rect">
+                <a:avLst/>
+              </a:prstGeom>
+            </p:spPr>
+          </p:pic>
+          <p:pic>
+            <p:nvPicPr>
+              <p:cNvPr id="28" name="Picture 27"/>
+              <p:cNvPicPr>
+                <a:picLocks noChangeAspect="1"/>
+              </p:cNvPicPr>
+              <p:nvPr/>
+            </p:nvPicPr>
+            <p:blipFill>
+              <a:blip r:embed="rId8"/>
+              <a:stretch>
+                <a:fillRect/>
+              </a:stretch>
+            </p:blipFill>
+            <p:spPr>
+              <a:xfrm>
+                <a:off x="6203836" y="6330302"/>
+                <a:ext cx="526986" cy="391234"/>
+              </a:xfrm>
+              <a:prstGeom prst="rect">
+                <a:avLst/>
+              </a:prstGeom>
+            </p:spPr>
+          </p:pic>
+          <p:pic>
+            <p:nvPicPr>
+              <p:cNvPr id="29" name="Picture 28"/>
+              <p:cNvPicPr>
+                <a:picLocks noChangeAspect="1"/>
+              </p:cNvPicPr>
+              <p:nvPr/>
+            </p:nvPicPr>
+            <p:blipFill>
+              <a:blip r:embed="rId9"/>
+              <a:stretch>
+                <a:fillRect/>
+              </a:stretch>
+            </p:blipFill>
+            <p:spPr>
+              <a:xfrm>
+                <a:off x="7579748" y="6357186"/>
+                <a:ext cx="515022" cy="388793"/>
+              </a:xfrm>
+              <a:prstGeom prst="rect">
+                <a:avLst/>
+              </a:prstGeom>
+            </p:spPr>
+          </p:pic>
+        </p:grpSp>
       </p:grpSp>
     </p:spTree>
     <p:extLst>

</xml_diff>

<commit_message>
used inv of jaccard for fig 1
</commit_message>
<xml_diff>
--- a/output/plots/all_figs_with_legends.pptx
+++ b/output/plots/all_figs_with_legends.pptx
@@ -205,7 +205,7 @@
           <a:p>
             <a:fld id="{7FA21820-D199-4D82-91AF-C50B1D3B111A}" type="datetimeFigureOut">
               <a:rPr lang="en-US" smtClean="0"/>
-              <a:t>5/26/2017</a:t>
+              <a:t>6/1/2017</a:t>
             </a:fld>
             <a:endParaRPr lang="en-US"/>
           </a:p>
@@ -1038,7 +1038,7 @@
           <a:p>
             <a:fld id="{916B8C92-D5E3-4480-8685-D57BEE386DE2}" type="datetimeFigureOut">
               <a:rPr lang="en-US" smtClean="0"/>
-              <a:t>5/26/2017</a:t>
+              <a:t>6/1/2017</a:t>
             </a:fld>
             <a:endParaRPr lang="en-US"/>
           </a:p>
@@ -1208,7 +1208,7 @@
           <a:p>
             <a:fld id="{916B8C92-D5E3-4480-8685-D57BEE386DE2}" type="datetimeFigureOut">
               <a:rPr lang="en-US" smtClean="0"/>
-              <a:t>5/26/2017</a:t>
+              <a:t>6/1/2017</a:t>
             </a:fld>
             <a:endParaRPr lang="en-US"/>
           </a:p>
@@ -1388,7 +1388,7 @@
           <a:p>
             <a:fld id="{916B8C92-D5E3-4480-8685-D57BEE386DE2}" type="datetimeFigureOut">
               <a:rPr lang="en-US" smtClean="0"/>
-              <a:t>5/26/2017</a:t>
+              <a:t>6/1/2017</a:t>
             </a:fld>
             <a:endParaRPr lang="en-US"/>
           </a:p>
@@ -1558,7 +1558,7 @@
           <a:p>
             <a:fld id="{916B8C92-D5E3-4480-8685-D57BEE386DE2}" type="datetimeFigureOut">
               <a:rPr lang="en-US" smtClean="0"/>
-              <a:t>5/26/2017</a:t>
+              <a:t>6/1/2017</a:t>
             </a:fld>
             <a:endParaRPr lang="en-US"/>
           </a:p>
@@ -1804,7 +1804,7 @@
           <a:p>
             <a:fld id="{916B8C92-D5E3-4480-8685-D57BEE386DE2}" type="datetimeFigureOut">
               <a:rPr lang="en-US" smtClean="0"/>
-              <a:t>5/26/2017</a:t>
+              <a:t>6/1/2017</a:t>
             </a:fld>
             <a:endParaRPr lang="en-US"/>
           </a:p>
@@ -2036,7 +2036,7 @@
           <a:p>
             <a:fld id="{916B8C92-D5E3-4480-8685-D57BEE386DE2}" type="datetimeFigureOut">
               <a:rPr lang="en-US" smtClean="0"/>
-              <a:t>5/26/2017</a:t>
+              <a:t>6/1/2017</a:t>
             </a:fld>
             <a:endParaRPr lang="en-US"/>
           </a:p>
@@ -2403,7 +2403,7 @@
           <a:p>
             <a:fld id="{916B8C92-D5E3-4480-8685-D57BEE386DE2}" type="datetimeFigureOut">
               <a:rPr lang="en-US" smtClean="0"/>
-              <a:t>5/26/2017</a:t>
+              <a:t>6/1/2017</a:t>
             </a:fld>
             <a:endParaRPr lang="en-US"/>
           </a:p>
@@ -2521,7 +2521,7 @@
           <a:p>
             <a:fld id="{916B8C92-D5E3-4480-8685-D57BEE386DE2}" type="datetimeFigureOut">
               <a:rPr lang="en-US" smtClean="0"/>
-              <a:t>5/26/2017</a:t>
+              <a:t>6/1/2017</a:t>
             </a:fld>
             <a:endParaRPr lang="en-US"/>
           </a:p>
@@ -2616,7 +2616,7 @@
           <a:p>
             <a:fld id="{916B8C92-D5E3-4480-8685-D57BEE386DE2}" type="datetimeFigureOut">
               <a:rPr lang="en-US" smtClean="0"/>
-              <a:t>5/26/2017</a:t>
+              <a:t>6/1/2017</a:t>
             </a:fld>
             <a:endParaRPr lang="en-US"/>
           </a:p>
@@ -2893,7 +2893,7 @@
           <a:p>
             <a:fld id="{916B8C92-D5E3-4480-8685-D57BEE386DE2}" type="datetimeFigureOut">
               <a:rPr lang="en-US" smtClean="0"/>
-              <a:t>5/26/2017</a:t>
+              <a:t>6/1/2017</a:t>
             </a:fld>
             <a:endParaRPr lang="en-US"/>
           </a:p>
@@ -3146,7 +3146,7 @@
           <a:p>
             <a:fld id="{916B8C92-D5E3-4480-8685-D57BEE386DE2}" type="datetimeFigureOut">
               <a:rPr lang="en-US" smtClean="0"/>
-              <a:t>5/26/2017</a:t>
+              <a:t>6/1/2017</a:t>
             </a:fld>
             <a:endParaRPr lang="en-US"/>
           </a:p>
@@ -3359,7 +3359,7 @@
           <a:p>
             <a:fld id="{916B8C92-D5E3-4480-8685-D57BEE386DE2}" type="datetimeFigureOut">
               <a:rPr lang="en-US" smtClean="0"/>
-              <a:t>5/26/2017</a:t>
+              <a:t>6/1/2017</a:t>
             </a:fld>
             <a:endParaRPr lang="en-US"/>
           </a:p>
@@ -9463,8 +9463,8 @@
         </p:nvSpPr>
         <p:spPr>
           <a:xfrm>
-            <a:off x="171619" y="4468418"/>
-            <a:ext cx="5227364" cy="1778106"/>
+            <a:off x="171619" y="4468417"/>
+            <a:ext cx="5227364" cy="2188495"/>
           </a:xfrm>
           <a:prstGeom prst="rect">
             <a:avLst/>
@@ -9599,102 +9599,228 @@
           </a:p>
         </p:txBody>
       </p:sp>
-      <p:sp>
-        <p:nvSpPr>
-          <p:cNvPr id="96" name="TextBox 95"/>
-          <p:cNvSpPr txBox="1"/>
-          <p:nvPr/>
-        </p:nvSpPr>
-        <p:spPr>
-          <a:xfrm>
-            <a:off x="108573" y="4398162"/>
-            <a:ext cx="2044550" cy="369332"/>
-          </a:xfrm>
-          <a:prstGeom prst="rect">
-            <a:avLst/>
-          </a:prstGeom>
-          <a:noFill/>
-        </p:spPr>
-        <p:txBody>
-          <a:bodyPr wrap="square" rtlCol="0">
-            <a:spAutoFit/>
-          </a:bodyPr>
-          <a:lstStyle/>
-          <a:p>
-            <a:r>
-              <a:rPr lang="en-US" b="1" dirty="0" smtClean="0"/>
-              <a:t>E – </a:t>
-            </a:r>
-            <a:r>
-              <a:rPr lang="en-US" b="1" dirty="0"/>
-              <a:t>t</a:t>
-            </a:r>
-            <a:r>
-              <a:rPr lang="en-US" b="1" dirty="0" smtClean="0"/>
-              <a:t>ime </a:t>
-            </a:r>
-            <a:r>
-              <a:rPr lang="en-US" b="1" i="1" dirty="0" smtClean="0"/>
-              <a:t>t</a:t>
-            </a:r>
-            <a:r>
-              <a:rPr lang="en-US" sz="1400" b="1" i="1" dirty="0" smtClean="0"/>
-              <a:t>1</a:t>
-            </a:r>
-            <a:endParaRPr lang="en-US" sz="1600" b="1" dirty="0"/>
-          </a:p>
-        </p:txBody>
-      </p:sp>
-      <p:sp>
-        <p:nvSpPr>
-          <p:cNvPr id="98" name="TextBox 97"/>
-          <p:cNvSpPr txBox="1"/>
-          <p:nvPr/>
-        </p:nvSpPr>
-        <p:spPr>
-          <a:xfrm>
-            <a:off x="2783696" y="4400082"/>
-            <a:ext cx="2044550" cy="369332"/>
-          </a:xfrm>
-          <a:prstGeom prst="rect">
-            <a:avLst/>
-          </a:prstGeom>
-          <a:noFill/>
-        </p:spPr>
-        <p:txBody>
-          <a:bodyPr wrap="square" rtlCol="0">
-            <a:spAutoFit/>
-          </a:bodyPr>
-          <a:lstStyle/>
-          <a:p>
-            <a:r>
-              <a:rPr lang="en-US" b="1" dirty="0"/>
-              <a:t>F</a:t>
-            </a:r>
-            <a:r>
-              <a:rPr lang="en-US" b="1" dirty="0" smtClean="0"/>
-              <a:t> – </a:t>
-            </a:r>
-            <a:r>
-              <a:rPr lang="en-US" b="1" dirty="0"/>
-              <a:t>t</a:t>
-            </a:r>
-            <a:r>
-              <a:rPr lang="en-US" b="1" dirty="0" smtClean="0"/>
-              <a:t>ime </a:t>
-            </a:r>
-            <a:r>
-              <a:rPr lang="en-US" b="1" i="1" dirty="0" smtClean="0"/>
-              <a:t>t</a:t>
-            </a:r>
-            <a:r>
-              <a:rPr lang="en-US" sz="1400" b="1" i="1" dirty="0"/>
-              <a:t>2</a:t>
-            </a:r>
-            <a:endParaRPr lang="en-US" sz="1600" b="1" dirty="0"/>
-          </a:p>
-        </p:txBody>
-      </p:sp>
+      <mc:AlternateContent xmlns:mc="http://schemas.openxmlformats.org/markup-compatibility/2006">
+        <mc:Choice xmlns:a14="http://schemas.microsoft.com/office/drawing/2010/main" Requires="a14">
+          <p:sp>
+            <p:nvSpPr>
+              <p:cNvPr id="96" name="TextBox 95"/>
+              <p:cNvSpPr txBox="1"/>
+              <p:nvPr/>
+            </p:nvSpPr>
+            <p:spPr>
+              <a:xfrm>
+                <a:off x="120580" y="4379753"/>
+                <a:ext cx="2044550" cy="369332"/>
+              </a:xfrm>
+              <a:prstGeom prst="rect">
+                <a:avLst/>
+              </a:prstGeom>
+              <a:noFill/>
+            </p:spPr>
+            <p:txBody>
+              <a:bodyPr wrap="square" rtlCol="0">
+                <a:spAutoFit/>
+              </a:bodyPr>
+              <a:lstStyle/>
+              <a:p>
+                <a:r>
+                  <a:rPr lang="en-US" b="1" dirty="0" smtClean="0"/>
+                  <a:t>E – </a:t>
+                </a:r>
+                <a:r>
+                  <a:rPr lang="en-US" sz="1400" b="1" dirty="0"/>
+                  <a:t>t</a:t>
+                </a:r>
+                <a:r>
+                  <a:rPr lang="en-US" sz="1400" b="1" dirty="0" smtClean="0"/>
+                  <a:t>ime </a:t>
+                </a:r>
+                <a14:m>
+                  <m:oMath xmlns:m="http://schemas.openxmlformats.org/officeDocument/2006/math">
+                    <m:sSub>
+                      <m:sSubPr>
+                        <m:ctrlPr>
+                          <a:rPr lang="en-US" sz="1400" b="1" i="1" smtClean="0">
+                            <a:latin typeface="Cambria Math" panose="02040503050406030204" pitchFamily="18" charset="0"/>
+                          </a:rPr>
+                        </m:ctrlPr>
+                      </m:sSubPr>
+                      <m:e>
+                        <m:r>
+                          <a:rPr lang="en-US" sz="1400" b="1" i="1" smtClean="0">
+                            <a:latin typeface="Cambria Math" panose="02040503050406030204" pitchFamily="18" charset="0"/>
+                          </a:rPr>
+                          <m:t>𝒕</m:t>
+                        </m:r>
+                      </m:e>
+                      <m:sub>
+                        <m:r>
+                          <a:rPr lang="en-US" sz="1400" b="1" i="1" smtClean="0">
+                            <a:latin typeface="Cambria Math" panose="02040503050406030204" pitchFamily="18" charset="0"/>
+                          </a:rPr>
+                          <m:t>𝟏</m:t>
+                        </m:r>
+                      </m:sub>
+                    </m:sSub>
+                  </m:oMath>
+                </a14:m>
+                <a:endParaRPr lang="en-US" sz="1400" b="1" dirty="0"/>
+              </a:p>
+            </p:txBody>
+          </p:sp>
+        </mc:Choice>
+        <mc:Fallback>
+          <p:sp>
+            <p:nvSpPr>
+              <p:cNvPr id="96" name="TextBox 95"/>
+              <p:cNvSpPr txBox="1">
+                <a:spLocks noRot="1" noChangeAspect="1" noMove="1" noResize="1" noEditPoints="1" noAdjustHandles="1" noChangeArrowheads="1" noChangeShapeType="1" noTextEdit="1"/>
+              </p:cNvSpPr>
+              <p:nvPr/>
+            </p:nvSpPr>
+            <p:spPr>
+              <a:xfrm>
+                <a:off x="120580" y="4379753"/>
+                <a:ext cx="2044550" cy="369332"/>
+              </a:xfrm>
+              <a:prstGeom prst="rect">
+                <a:avLst/>
+              </a:prstGeom>
+              <a:blipFill>
+                <a:blip r:embed="rId3"/>
+                <a:stretch>
+                  <a:fillRect l="-2687" t="-8197" b="-24590"/>
+                </a:stretch>
+              </a:blipFill>
+            </p:spPr>
+            <p:txBody>
+              <a:bodyPr/>
+              <a:lstStyle/>
+              <a:p>
+                <a:r>
+                  <a:rPr lang="en-US">
+                    <a:noFill/>
+                  </a:rPr>
+                  <a:t> </a:t>
+                </a:r>
+              </a:p>
+            </p:txBody>
+          </p:sp>
+        </mc:Fallback>
+      </mc:AlternateContent>
+      <mc:AlternateContent xmlns:mc="http://schemas.openxmlformats.org/markup-compatibility/2006">
+        <mc:Choice xmlns:a14="http://schemas.microsoft.com/office/drawing/2010/main" Requires="a14">
+          <p:sp>
+            <p:nvSpPr>
+              <p:cNvPr id="98" name="TextBox 97"/>
+              <p:cNvSpPr txBox="1"/>
+              <p:nvPr/>
+            </p:nvSpPr>
+            <p:spPr>
+              <a:xfrm>
+                <a:off x="2795703" y="4381673"/>
+                <a:ext cx="2044550" cy="369332"/>
+              </a:xfrm>
+              <a:prstGeom prst="rect">
+                <a:avLst/>
+              </a:prstGeom>
+              <a:noFill/>
+            </p:spPr>
+            <p:txBody>
+              <a:bodyPr wrap="square" rtlCol="0">
+                <a:spAutoFit/>
+              </a:bodyPr>
+              <a:lstStyle/>
+              <a:p>
+                <a:r>
+                  <a:rPr lang="en-US" b="1" dirty="0" smtClean="0"/>
+                  <a:t>F</a:t>
+                </a:r>
+                <a:r>
+                  <a:rPr lang="en-US" b="1" dirty="0" smtClean="0"/>
+                  <a:t> – </a:t>
+                </a:r>
+                <a:r>
+                  <a:rPr lang="en-US" sz="1400" b="1" dirty="0"/>
+                  <a:t>t</a:t>
+                </a:r>
+                <a:r>
+                  <a:rPr lang="en-US" sz="1400" b="1" dirty="0" smtClean="0"/>
+                  <a:t>ime </a:t>
+                </a:r>
+                <a14:m>
+                  <m:oMath xmlns:m="http://schemas.openxmlformats.org/officeDocument/2006/math">
+                    <m:sSub>
+                      <m:sSubPr>
+                        <m:ctrlPr>
+                          <a:rPr lang="en-US" sz="1400" b="1" i="1" smtClean="0">
+                            <a:latin typeface="Cambria Math" panose="02040503050406030204" pitchFamily="18" charset="0"/>
+                          </a:rPr>
+                        </m:ctrlPr>
+                      </m:sSubPr>
+                      <m:e>
+                        <m:r>
+                          <a:rPr lang="en-US" sz="1400" b="1" i="1">
+                            <a:latin typeface="Cambria Math" panose="02040503050406030204" pitchFamily="18" charset="0"/>
+                          </a:rPr>
+                          <m:t>𝒕</m:t>
+                        </m:r>
+                      </m:e>
+                      <m:sub>
+                        <m:r>
+                          <a:rPr lang="en-US" sz="1400" b="1" i="1" smtClean="0">
+                            <a:latin typeface="Cambria Math" panose="02040503050406030204" pitchFamily="18" charset="0"/>
+                          </a:rPr>
+                          <m:t>𝟐</m:t>
+                        </m:r>
+                      </m:sub>
+                    </m:sSub>
+                  </m:oMath>
+                </a14:m>
+                <a:endParaRPr lang="en-US" sz="1400" b="1" dirty="0"/>
+              </a:p>
+            </p:txBody>
+          </p:sp>
+        </mc:Choice>
+        <mc:Fallback>
+          <p:sp>
+            <p:nvSpPr>
+              <p:cNvPr id="98" name="TextBox 97"/>
+              <p:cNvSpPr txBox="1">
+                <a:spLocks noRot="1" noChangeAspect="1" noMove="1" noResize="1" noEditPoints="1" noAdjustHandles="1" noChangeArrowheads="1" noChangeShapeType="1" noTextEdit="1"/>
+              </p:cNvSpPr>
+              <p:nvPr/>
+            </p:nvSpPr>
+            <p:spPr>
+              <a:xfrm>
+                <a:off x="2795703" y="4381673"/>
+                <a:ext cx="2044550" cy="369332"/>
+              </a:xfrm>
+              <a:prstGeom prst="rect">
+                <a:avLst/>
+              </a:prstGeom>
+              <a:blipFill>
+                <a:blip r:embed="rId4"/>
+                <a:stretch>
+                  <a:fillRect l="-2687" t="-10000" b="-26667"/>
+                </a:stretch>
+              </a:blipFill>
+            </p:spPr>
+            <p:txBody>
+              <a:bodyPr/>
+              <a:lstStyle/>
+              <a:p>
+                <a:r>
+                  <a:rPr lang="en-US">
+                    <a:noFill/>
+                  </a:rPr>
+                  <a:t> </a:t>
+                </a:r>
+              </a:p>
+            </p:txBody>
+          </p:sp>
+        </mc:Fallback>
+      </mc:AlternateContent>
       <p:sp>
         <p:nvSpPr>
           <p:cNvPr id="103" name="Right Arrow 102"/>
@@ -9751,8 +9877,8 @@
         </p:nvSpPr>
         <p:spPr>
           <a:xfrm>
-            <a:off x="171619" y="6206853"/>
-            <a:ext cx="5227364" cy="553998"/>
+            <a:off x="344908" y="6100126"/>
+            <a:ext cx="4654415" cy="600164"/>
           </a:xfrm>
           <a:prstGeom prst="rect">
             <a:avLst/>
@@ -9766,22 +9892,34 @@
           <a:lstStyle/>
           <a:p>
             <a:r>
-              <a:rPr lang="en-US" sz="1000" b="1" dirty="0" smtClean="0"/>
+              <a:rPr lang="en-US" sz="1100" b="1" dirty="0" smtClean="0"/>
               <a:t>Turnover</a:t>
             </a:r>
           </a:p>
           <a:p>
             <a:r>
-              <a:rPr lang="en-US" sz="1000" dirty="0" smtClean="0"/>
-              <a:t>All species = 5/11</a:t>
-            </a:r>
-          </a:p>
-          <a:p>
-            <a:r>
-              <a:rPr lang="en-US" sz="1000" dirty="0" smtClean="0"/>
-              <a:t>Excluding transients = 5/5</a:t>
-            </a:r>
-            <a:endParaRPr lang="en-US" sz="1000" dirty="0"/>
+              <a:rPr lang="en-US" sz="1100" dirty="0" smtClean="0"/>
+              <a:t>All species = </a:t>
+            </a:r>
+            <a:r>
+              <a:rPr lang="en-US" sz="1100" dirty="0" smtClean="0"/>
+              <a:t>6/11, number of unique species/total number of species</a:t>
+            </a:r>
+          </a:p>
+          <a:p>
+            <a:r>
+              <a:rPr lang="en-US" sz="1100" dirty="0" smtClean="0"/>
+              <a:t>Excluding transients </a:t>
+            </a:r>
+            <a:r>
+              <a:rPr lang="en-US" sz="1100" dirty="0"/>
+              <a:t>= 0/5, number of unique species/total number of </a:t>
+            </a:r>
+            <a:r>
+              <a:rPr lang="en-US" sz="1100" dirty="0" smtClean="0"/>
+              <a:t>species</a:t>
+            </a:r>
+            <a:endParaRPr lang="en-US" sz="1100" dirty="0"/>
           </a:p>
         </p:txBody>
       </p:sp>
@@ -9794,7 +9932,7 @@
           <p:nvPr/>
         </p:nvPicPr>
         <p:blipFill>
-          <a:blip r:embed="rId3"/>
+          <a:blip r:embed="rId5"/>
           <a:stretch>
             <a:fillRect/>
           </a:stretch>
@@ -9864,7 +10002,7 @@
           <p:nvPr/>
         </p:nvPicPr>
         <p:blipFill>
-          <a:blip r:embed="rId4"/>
+          <a:blip r:embed="rId6"/>
           <a:stretch>
             <a:fillRect/>
           </a:stretch>

</xml_diff>

<commit_message>
working on figure dimensions for figure 1a/1b and figure 5
</commit_message>
<xml_diff>
--- a/output/plots/all_figs_with_legends.pptx
+++ b/output/plots/all_figs_with_legends.pptx
@@ -5837,6 +5837,30 @@
           <a:chExt cx="0" cy="0"/>
         </a:xfrm>
       </p:grpSpPr>
+      <p:pic>
+        <p:nvPicPr>
+          <p:cNvPr id="25" name="Picture 24"/>
+          <p:cNvPicPr>
+            <a:picLocks noChangeAspect="1"/>
+          </p:cNvPicPr>
+          <p:nvPr/>
+        </p:nvPicPr>
+        <p:blipFill>
+          <a:blip r:embed="rId2"/>
+          <a:stretch>
+            <a:fillRect/>
+          </a:stretch>
+        </p:blipFill>
+        <p:spPr>
+          <a:xfrm>
+            <a:off x="45288" y="465042"/>
+            <a:ext cx="2842720" cy="1714371"/>
+          </a:xfrm>
+          <a:prstGeom prst="rect">
+            <a:avLst/>
+          </a:prstGeom>
+        </p:spPr>
+      </p:pic>
       <p:graphicFrame>
         <p:nvGraphicFramePr>
           <p:cNvPr id="6" name="Table 5"/>
@@ -7529,76 +7553,6 @@
           </a:p>
         </p:txBody>
       </p:sp>
-      <p:sp>
-        <p:nvSpPr>
-          <p:cNvPr id="14" name="Rectangle 13"/>
-          <p:cNvSpPr/>
-          <p:nvPr/>
-        </p:nvSpPr>
-        <p:spPr>
-          <a:xfrm>
-            <a:off x="5102734" y="975398"/>
-            <a:ext cx="123610" cy="207984"/>
-          </a:xfrm>
-          <a:prstGeom prst="rect">
-            <a:avLst/>
-          </a:prstGeom>
-          <a:solidFill>
-            <a:schemeClr val="bg1"/>
-          </a:solidFill>
-          <a:ln>
-            <a:noFill/>
-          </a:ln>
-        </p:spPr>
-        <p:style>
-          <a:lnRef idx="2">
-            <a:schemeClr val="accent1">
-              <a:shade val="50000"/>
-            </a:schemeClr>
-          </a:lnRef>
-          <a:fillRef idx="1">
-            <a:schemeClr val="accent1"/>
-          </a:fillRef>
-          <a:effectRef idx="0">
-            <a:schemeClr val="accent1"/>
-          </a:effectRef>
-          <a:fontRef idx="minor">
-            <a:schemeClr val="lt1"/>
-          </a:fontRef>
-        </p:style>
-        <p:txBody>
-          <a:bodyPr rtlCol="0" anchor="ctr"/>
-          <a:lstStyle/>
-          <a:p>
-            <a:pPr algn="ctr"/>
-            <a:endParaRPr lang="en-US"/>
-          </a:p>
-        </p:txBody>
-      </p:sp>
-      <p:pic>
-        <p:nvPicPr>
-          <p:cNvPr id="22" name="Picture 21"/>
-          <p:cNvPicPr>
-            <a:picLocks noChangeAspect="1"/>
-          </p:cNvPicPr>
-          <p:nvPr/>
-        </p:nvPicPr>
-        <p:blipFill>
-          <a:blip r:embed="rId2"/>
-          <a:stretch>
-            <a:fillRect/>
-          </a:stretch>
-        </p:blipFill>
-        <p:spPr>
-          <a:xfrm>
-            <a:off x="261126" y="284418"/>
-            <a:ext cx="2463354" cy="1895539"/>
-          </a:xfrm>
-          <a:prstGeom prst="rect">
-            <a:avLst/>
-          </a:prstGeom>
-        </p:spPr>
-      </p:pic>
       <mc:AlternateContent xmlns:mc="http://schemas.openxmlformats.org/markup-compatibility/2006" xmlns:a14="http://schemas.microsoft.com/office/drawing/2010/main">
         <mc:Choice Requires="a14">
           <p:sp>
@@ -11366,105 +11320,13 @@
       </p:sp>
       <p:sp>
         <p:nvSpPr>
-          <p:cNvPr id="5" name="Rectangle 4"/>
-          <p:cNvSpPr/>
-          <p:nvPr/>
-        </p:nvSpPr>
-        <p:spPr>
-          <a:xfrm>
-            <a:off x="619182" y="1774556"/>
-            <a:ext cx="576257" cy="131735"/>
-          </a:xfrm>
-          <a:prstGeom prst="rect">
-            <a:avLst/>
-          </a:prstGeom>
-          <a:solidFill>
-            <a:schemeClr val="bg1"/>
-          </a:solidFill>
-          <a:ln>
-            <a:noFill/>
-          </a:ln>
-        </p:spPr>
-        <p:style>
-          <a:lnRef idx="2">
-            <a:schemeClr val="accent1">
-              <a:shade val="50000"/>
-            </a:schemeClr>
-          </a:lnRef>
-          <a:fillRef idx="1">
-            <a:schemeClr val="accent1"/>
-          </a:fillRef>
-          <a:effectRef idx="0">
-            <a:schemeClr val="accent1"/>
-          </a:effectRef>
-          <a:fontRef idx="minor">
-            <a:schemeClr val="lt1"/>
-          </a:fontRef>
-        </p:style>
-        <p:txBody>
-          <a:bodyPr rtlCol="0" anchor="ctr"/>
-          <a:lstStyle/>
-          <a:p>
-            <a:pPr algn="ctr"/>
-            <a:endParaRPr lang="en-US"/>
-          </a:p>
-        </p:txBody>
-      </p:sp>
-      <p:sp>
-        <p:nvSpPr>
-          <p:cNvPr id="127" name="Rectangle 126"/>
-          <p:cNvSpPr/>
-          <p:nvPr/>
-        </p:nvSpPr>
-        <p:spPr>
-          <a:xfrm>
-            <a:off x="1988910" y="1778180"/>
-            <a:ext cx="576257" cy="131735"/>
-          </a:xfrm>
-          <a:prstGeom prst="rect">
-            <a:avLst/>
-          </a:prstGeom>
-          <a:solidFill>
-            <a:schemeClr val="bg1"/>
-          </a:solidFill>
-          <a:ln>
-            <a:noFill/>
-          </a:ln>
-        </p:spPr>
-        <p:style>
-          <a:lnRef idx="2">
-            <a:schemeClr val="accent1">
-              <a:shade val="50000"/>
-            </a:schemeClr>
-          </a:lnRef>
-          <a:fillRef idx="1">
-            <a:schemeClr val="accent1"/>
-          </a:fillRef>
-          <a:effectRef idx="0">
-            <a:schemeClr val="accent1"/>
-          </a:effectRef>
-          <a:fontRef idx="minor">
-            <a:schemeClr val="lt1"/>
-          </a:fontRef>
-        </p:style>
-        <p:txBody>
-          <a:bodyPr rtlCol="0" anchor="ctr"/>
-          <a:lstStyle/>
-          <a:p>
-            <a:pPr algn="ctr"/>
-            <a:endParaRPr lang="en-US"/>
-          </a:p>
-        </p:txBody>
-      </p:sp>
-      <p:sp>
-        <p:nvSpPr>
           <p:cNvPr id="124" name="Isosceles Triangle 123"/>
           <p:cNvSpPr/>
           <p:nvPr/>
         </p:nvSpPr>
         <p:spPr>
           <a:xfrm>
-            <a:off x="814100" y="1718465"/>
+            <a:off x="697873" y="1563202"/>
             <a:ext cx="200634" cy="169490"/>
           </a:xfrm>
           <a:prstGeom prst="triangle">
@@ -11515,7 +11377,7 @@
         </p:nvSpPr>
         <p:spPr>
           <a:xfrm>
-            <a:off x="2184821" y="1718465"/>
+            <a:off x="2186387" y="1570480"/>
             <a:ext cx="200634" cy="169490"/>
           </a:xfrm>
           <a:prstGeom prst="triangle">
@@ -11615,115 +11477,161 @@
           </a:p>
         </p:txBody>
       </p:sp>
-      <p:grpSp>
-        <p:nvGrpSpPr>
-          <p:cNvPr id="12" name="Group 11"/>
-          <p:cNvGrpSpPr/>
+      <p:sp>
+        <p:nvSpPr>
+          <p:cNvPr id="10" name="Rectangle 9"/>
+          <p:cNvSpPr/>
           <p:nvPr/>
-        </p:nvGrpSpPr>
-        <p:grpSpPr>
+        </p:nvSpPr>
+        <p:spPr>
           <a:xfrm>
-            <a:off x="3205113" y="155331"/>
-            <a:ext cx="2202802" cy="1821974"/>
-            <a:chOff x="3205113" y="155331"/>
-            <a:chExt cx="2202802" cy="1821974"/>
-          </a:xfrm>
-        </p:grpSpPr>
-        <p:pic>
-          <p:nvPicPr>
-            <p:cNvPr id="4" name="Picture 3"/>
-            <p:cNvPicPr>
-              <a:picLocks noChangeAspect="1"/>
-            </p:cNvPicPr>
-            <p:nvPr/>
-          </p:nvPicPr>
-          <p:blipFill rotWithShape="1">
-            <a:blip r:embed="rId7"/>
-            <a:srcRect l="377"/>
-            <a:stretch/>
-          </p:blipFill>
-          <p:spPr>
-            <a:xfrm>
-              <a:off x="3205113" y="158842"/>
-              <a:ext cx="2165581" cy="1818463"/>
-            </a:xfrm>
-            <a:prstGeom prst="rect">
-              <a:avLst/>
-            </a:prstGeom>
-          </p:spPr>
-        </p:pic>
-        <p:pic>
-          <p:nvPicPr>
-            <p:cNvPr id="123" name="Picture 122"/>
-            <p:cNvPicPr>
-              <a:picLocks noChangeAspect="1"/>
-            </p:cNvPicPr>
-            <p:nvPr/>
-          </p:nvPicPr>
-          <p:blipFill rotWithShape="1">
-            <a:blip r:embed="rId7"/>
-            <a:srcRect l="79231" t="38352" r="-1348" b="48169"/>
-            <a:stretch/>
-          </p:blipFill>
-          <p:spPr>
-            <a:xfrm>
-              <a:off x="3807826" y="155331"/>
-              <a:ext cx="1001071" cy="510350"/>
-            </a:xfrm>
-            <a:prstGeom prst="rect">
-              <a:avLst/>
-            </a:prstGeom>
-          </p:spPr>
-        </p:pic>
-        <p:sp>
-          <p:nvSpPr>
-            <p:cNvPr id="10" name="Rectangle 9"/>
-            <p:cNvSpPr/>
-            <p:nvPr/>
-          </p:nvSpPr>
-          <p:spPr>
-            <a:xfrm>
-              <a:off x="4934022" y="900629"/>
-              <a:ext cx="473893" cy="197393"/>
-            </a:xfrm>
-            <a:prstGeom prst="rect">
-              <a:avLst/>
-            </a:prstGeom>
+            <a:off x="4885154" y="1039231"/>
+            <a:ext cx="473893" cy="197393"/>
+          </a:xfrm>
+          <a:prstGeom prst="rect">
+            <a:avLst/>
+          </a:prstGeom>
+          <a:solidFill>
+            <a:schemeClr val="bg1"/>
+          </a:solidFill>
+          <a:ln>
             <a:solidFill>
               <a:schemeClr val="bg1"/>
             </a:solidFill>
-            <a:ln>
-              <a:solidFill>
-                <a:schemeClr val="bg1"/>
-              </a:solidFill>
-            </a:ln>
-          </p:spPr>
-          <p:style>
-            <a:lnRef idx="2">
-              <a:schemeClr val="accent1">
-                <a:shade val="50000"/>
-              </a:schemeClr>
-            </a:lnRef>
-            <a:fillRef idx="1">
-              <a:schemeClr val="accent1"/>
-            </a:fillRef>
-            <a:effectRef idx="0">
-              <a:schemeClr val="accent1"/>
-            </a:effectRef>
-            <a:fontRef idx="minor">
-              <a:schemeClr val="lt1"/>
-            </a:fontRef>
-          </p:style>
-          <p:txBody>
-            <a:bodyPr rtlCol="0" anchor="ctr"/>
-            <a:lstStyle/>
-            <a:p>
-              <a:pPr algn="ctr"/>
-              <a:endParaRPr lang="en-US"/>
-            </a:p>
-          </p:txBody>
-        </p:sp>
-      </p:grpSp>
+          </a:ln>
+        </p:spPr>
+        <p:style>
+          <a:lnRef idx="2">
+            <a:schemeClr val="accent1">
+              <a:shade val="50000"/>
+            </a:schemeClr>
+          </a:lnRef>
+          <a:fillRef idx="1">
+            <a:schemeClr val="accent1"/>
+          </a:fillRef>
+          <a:effectRef idx="0">
+            <a:schemeClr val="accent1"/>
+          </a:effectRef>
+          <a:fontRef idx="minor">
+            <a:schemeClr val="lt1"/>
+          </a:fontRef>
+        </p:style>
+        <p:txBody>
+          <a:bodyPr rtlCol="0" anchor="ctr"/>
+          <a:lstStyle/>
+          <a:p>
+            <a:pPr algn="ctr"/>
+            <a:endParaRPr lang="en-US"/>
+          </a:p>
+        </p:txBody>
+      </p:sp>
+      <p:sp>
+        <p:nvSpPr>
+          <p:cNvPr id="18" name="TextBox 17"/>
+          <p:cNvSpPr txBox="1"/>
+          <p:nvPr/>
+        </p:nvSpPr>
+        <p:spPr>
+          <a:xfrm>
+            <a:off x="428072" y="1683729"/>
+            <a:ext cx="785257" cy="261610"/>
+          </a:xfrm>
+          <a:prstGeom prst="rect">
+            <a:avLst/>
+          </a:prstGeom>
+          <a:noFill/>
+        </p:spPr>
+        <p:txBody>
+          <a:bodyPr wrap="square" rtlCol="0">
+            <a:spAutoFit/>
+          </a:bodyPr>
+          <a:lstStyle/>
+          <a:p>
+            <a:r>
+              <a:rPr lang="en-US" sz="1100" dirty="0" smtClean="0"/>
+              <a:t>Transient</a:t>
+            </a:r>
+            <a:endParaRPr lang="en-US" sz="1100" dirty="0"/>
+          </a:p>
+        </p:txBody>
+      </p:sp>
+      <p:sp>
+        <p:nvSpPr>
+          <p:cNvPr id="129" name="TextBox 128"/>
+          <p:cNvSpPr txBox="1"/>
+          <p:nvPr/>
+        </p:nvSpPr>
+        <p:spPr>
+          <a:xfrm>
+            <a:off x="1910269" y="1684771"/>
+            <a:ext cx="785257" cy="261610"/>
+          </a:xfrm>
+          <a:prstGeom prst="rect">
+            <a:avLst/>
+          </a:prstGeom>
+          <a:noFill/>
+        </p:spPr>
+        <p:txBody>
+          <a:bodyPr wrap="square" rtlCol="0">
+            <a:spAutoFit/>
+          </a:bodyPr>
+          <a:lstStyle/>
+          <a:p>
+            <a:pPr algn="ctr"/>
+            <a:r>
+              <a:rPr lang="en-US" sz="1100" dirty="0" smtClean="0"/>
+              <a:t>Core</a:t>
+            </a:r>
+            <a:endParaRPr lang="en-US" sz="1100" dirty="0"/>
+          </a:p>
+        </p:txBody>
+      </p:sp>
+      <p:pic>
+        <p:nvPicPr>
+          <p:cNvPr id="26" name="Picture 25"/>
+          <p:cNvPicPr>
+            <a:picLocks noChangeAspect="1"/>
+          </p:cNvPicPr>
+          <p:nvPr/>
+        </p:nvPicPr>
+        <p:blipFill rotWithShape="1">
+          <a:blip r:embed="rId7"/>
+          <a:srcRect b="361"/>
+          <a:stretch/>
+        </p:blipFill>
+        <p:spPr>
+          <a:xfrm>
+            <a:off x="2888850" y="304464"/>
+            <a:ext cx="2870345" cy="1840162"/>
+          </a:xfrm>
+          <a:prstGeom prst="rect">
+            <a:avLst/>
+          </a:prstGeom>
+        </p:spPr>
+      </p:pic>
+      <p:pic>
+        <p:nvPicPr>
+          <p:cNvPr id="123" name="Picture 122"/>
+          <p:cNvPicPr>
+            <a:picLocks noChangeAspect="1"/>
+          </p:cNvPicPr>
+          <p:nvPr/>
+        </p:nvPicPr>
+        <p:blipFill rotWithShape="1">
+          <a:blip r:embed="rId8"/>
+          <a:srcRect l="79231" t="38352" r="-1348" b="48169"/>
+          <a:stretch/>
+        </p:blipFill>
+        <p:spPr>
+          <a:xfrm>
+            <a:off x="4838699" y="892893"/>
+            <a:ext cx="1001071" cy="510350"/>
+          </a:xfrm>
+          <a:prstGeom prst="rect">
+            <a:avLst/>
+          </a:prstGeom>
+        </p:spPr>
+      </p:pic>
     </p:spTree>
     <p:extLst>
       <p:ext uri="{BB962C8B-B14F-4D97-AF65-F5344CB8AC3E}">
@@ -14536,21 +14444,21 @@
       </p:grpSpPr>
       <p:grpSp>
         <p:nvGrpSpPr>
-          <p:cNvPr id="16" name="Group 15"/>
+          <p:cNvPr id="3" name="Group 2"/>
           <p:cNvGrpSpPr/>
           <p:nvPr/>
         </p:nvGrpSpPr>
         <p:grpSpPr>
           <a:xfrm>
-            <a:off x="465681" y="0"/>
-            <a:ext cx="9279802" cy="6858000"/>
-            <a:chOff x="465681" y="0"/>
-            <a:chExt cx="9279802" cy="6858000"/>
+            <a:off x="348886" y="0"/>
+            <a:ext cx="9396597" cy="6858000"/>
+            <a:chOff x="348886" y="0"/>
+            <a:chExt cx="9396597" cy="6858000"/>
           </a:xfrm>
         </p:grpSpPr>
         <p:pic>
           <p:nvPicPr>
-            <p:cNvPr id="18" name="Picture 17"/>
+            <p:cNvPr id="2" name="Picture 1"/>
             <p:cNvPicPr>
               <a:picLocks noChangeAspect="1"/>
             </p:cNvPicPr>
@@ -14564,8 +14472,8 @@
           </p:blipFill>
           <p:spPr>
             <a:xfrm>
-              <a:off x="465681" y="0"/>
-              <a:ext cx="9279802" cy="6858000"/>
+              <a:off x="348886" y="0"/>
+              <a:ext cx="9396597" cy="6858000"/>
             </a:xfrm>
             <a:prstGeom prst="rect">
               <a:avLst/>
@@ -14626,10 +14534,10 @@
           </p:nvGrpSpPr>
           <p:grpSpPr>
             <a:xfrm>
-              <a:off x="2856775" y="251249"/>
-              <a:ext cx="375311" cy="2444436"/>
-              <a:chOff x="2856775" y="251249"/>
-              <a:chExt cx="375311" cy="2444436"/>
+              <a:off x="2830341" y="251249"/>
+              <a:ext cx="300947" cy="2400712"/>
+              <a:chOff x="2862091" y="251249"/>
+              <a:chExt cx="300947" cy="2400712"/>
             </a:xfrm>
           </p:grpSpPr>
           <p:sp>
@@ -14640,8 +14548,8 @@
             </p:nvSpPr>
             <p:spPr>
               <a:xfrm>
-                <a:off x="2856775" y="251249"/>
-                <a:ext cx="375311" cy="2444436"/>
+                <a:off x="2862091" y="304986"/>
+                <a:ext cx="300947" cy="2346975"/>
               </a:xfrm>
               <a:prstGeom prst="rect">
                 <a:avLst/>
@@ -14789,7 +14697,7 @@
           </p:nvSpPr>
           <p:spPr>
             <a:xfrm rot="16200000">
-              <a:off x="2295717" y="582738"/>
+              <a:off x="2297451" y="606191"/>
               <a:ext cx="1180320" cy="369332"/>
             </a:xfrm>
             <a:prstGeom prst="rect">

</xml_diff>

<commit_message>
finished updating figures and tables with 324/329 reassignments
</commit_message>
<xml_diff>
--- a/output/plots/all_figs_with_legends.pptx
+++ b/output/plots/all_figs_with_legends.pptx
@@ -5975,44 +5975,131 @@
           <a:chExt cx="0" cy="0"/>
         </a:xfrm>
       </p:grpSpPr>
-      <p:sp>
-        <p:nvSpPr>
-          <p:cNvPr id="2" name="Title 1"/>
-          <p:cNvSpPr>
-            <a:spLocks noGrp="1"/>
-          </p:cNvSpPr>
-          <p:nvPr>
-            <p:ph type="title"/>
-          </p:nvPr>
-        </p:nvSpPr>
-        <p:spPr/>
-        <p:txBody>
-          <a:bodyPr/>
-          <a:lstStyle/>
-          <a:p>
-            <a:endParaRPr lang="en-US"/>
-          </a:p>
-        </p:txBody>
-      </p:sp>
-      <p:sp>
-        <p:nvSpPr>
-          <p:cNvPr id="3" name="Content Placeholder 2"/>
-          <p:cNvSpPr>
-            <a:spLocks noGrp="1"/>
-          </p:cNvSpPr>
-          <p:nvPr>
-            <p:ph idx="1"/>
-          </p:nvPr>
-        </p:nvSpPr>
-        <p:spPr/>
-        <p:txBody>
-          <a:bodyPr/>
-          <a:lstStyle/>
-          <a:p>
-            <a:endParaRPr lang="en-US"/>
-          </a:p>
-        </p:txBody>
-      </p:sp>
+      <p:pic>
+        <p:nvPicPr>
+          <p:cNvPr id="6" name="Picture 5"/>
+          <p:cNvPicPr>
+            <a:picLocks noChangeAspect="1"/>
+          </p:cNvPicPr>
+          <p:nvPr/>
+        </p:nvPicPr>
+        <p:blipFill>
+          <a:blip r:embed="rId2"/>
+          <a:stretch>
+            <a:fillRect/>
+          </a:stretch>
+        </p:blipFill>
+        <p:spPr>
+          <a:xfrm>
+            <a:off x="11018338" y="0"/>
+            <a:ext cx="1173662" cy="564711"/>
+          </a:xfrm>
+          <a:prstGeom prst="rect">
+            <a:avLst/>
+          </a:prstGeom>
+        </p:spPr>
+      </p:pic>
+      <p:grpSp>
+        <p:nvGrpSpPr>
+          <p:cNvPr id="10" name="Group 9"/>
+          <p:cNvGrpSpPr/>
+          <p:nvPr/>
+        </p:nvGrpSpPr>
+        <p:grpSpPr>
+          <a:xfrm>
+            <a:off x="1135411" y="0"/>
+            <a:ext cx="9336985" cy="6858000"/>
+            <a:chOff x="1135411" y="0"/>
+            <a:chExt cx="9336985" cy="6858000"/>
+          </a:xfrm>
+        </p:grpSpPr>
+        <p:grpSp>
+          <p:nvGrpSpPr>
+            <p:cNvPr id="9" name="Group 8"/>
+            <p:cNvGrpSpPr/>
+            <p:nvPr/>
+          </p:nvGrpSpPr>
+          <p:grpSpPr>
+            <a:xfrm>
+              <a:off x="1135411" y="0"/>
+              <a:ext cx="9215269" cy="6858000"/>
+              <a:chOff x="1135411" y="0"/>
+              <a:chExt cx="9215269" cy="6858000"/>
+            </a:xfrm>
+          </p:grpSpPr>
+          <p:pic>
+            <p:nvPicPr>
+              <p:cNvPr id="4" name="Picture 3"/>
+              <p:cNvPicPr>
+                <a:picLocks noChangeAspect="1"/>
+              </p:cNvPicPr>
+              <p:nvPr/>
+            </p:nvPicPr>
+            <p:blipFill>
+              <a:blip r:embed="rId3"/>
+              <a:stretch>
+                <a:fillRect/>
+              </a:stretch>
+            </p:blipFill>
+            <p:spPr>
+              <a:xfrm>
+                <a:off x="1135411" y="0"/>
+                <a:ext cx="8922205" cy="6858000"/>
+              </a:xfrm>
+              <a:prstGeom prst="rect">
+                <a:avLst/>
+              </a:prstGeom>
+            </p:spPr>
+          </p:pic>
+          <p:pic>
+            <p:nvPicPr>
+              <p:cNvPr id="7" name="Picture 6"/>
+              <p:cNvPicPr>
+                <a:picLocks noChangeAspect="1"/>
+              </p:cNvPicPr>
+              <p:nvPr/>
+            </p:nvPicPr>
+            <p:blipFill rotWithShape="1">
+              <a:blip r:embed="rId4"/>
+              <a:srcRect b="55459"/>
+              <a:stretch/>
+            </p:blipFill>
+            <p:spPr>
+              <a:xfrm>
+                <a:off x="3425024" y="0"/>
+                <a:ext cx="6925656" cy="2818614"/>
+              </a:xfrm>
+              <a:prstGeom prst="rect">
+                <a:avLst/>
+              </a:prstGeom>
+            </p:spPr>
+          </p:pic>
+        </p:grpSp>
+        <p:pic>
+          <p:nvPicPr>
+            <p:cNvPr id="8" name="Picture 7"/>
+            <p:cNvPicPr>
+              <a:picLocks noChangeAspect="1"/>
+            </p:cNvPicPr>
+            <p:nvPr/>
+          </p:nvPicPr>
+          <p:blipFill>
+            <a:blip r:embed="rId5"/>
+            <a:stretch>
+              <a:fillRect/>
+            </a:stretch>
+          </p:blipFill>
+          <p:spPr>
+            <a:xfrm>
+              <a:off x="8862913" y="4299181"/>
+              <a:ext cx="1609483" cy="1615580"/>
+            </a:xfrm>
+            <a:prstGeom prst="rect">
+              <a:avLst/>
+            </a:prstGeom>
+          </p:spPr>
+        </p:pic>
+      </p:grpSp>
     </p:spTree>
     <p:extLst>
       <p:ext uri="{BB962C8B-B14F-4D97-AF65-F5344CB8AC3E}">
@@ -6043,102 +6130,117 @@
           <a:chExt cx="0" cy="0"/>
         </a:xfrm>
       </p:grpSpPr>
-      <p:pic>
-        <p:nvPicPr>
-          <p:cNvPr id="4" name="Picture 3"/>
-          <p:cNvPicPr>
-            <a:picLocks noChangeAspect="1"/>
-          </p:cNvPicPr>
+      <p:grpSp>
+        <p:nvGrpSpPr>
+          <p:cNvPr id="3" name="Group 2"/>
+          <p:cNvGrpSpPr/>
           <p:nvPr/>
-        </p:nvPicPr>
-        <p:blipFill>
-          <a:blip r:embed="rId2"/>
-          <a:stretch>
-            <a:fillRect/>
-          </a:stretch>
-        </p:blipFill>
-        <p:spPr>
+        </p:nvGrpSpPr>
+        <p:grpSpPr>
           <a:xfrm>
-            <a:off x="6893261" y="4713401"/>
-            <a:ext cx="2705923" cy="2055045"/>
+            <a:off x="1165360" y="18854"/>
+            <a:ext cx="9351728" cy="6835724"/>
+            <a:chOff x="1165360" y="18854"/>
+            <a:chExt cx="9351728" cy="6835724"/>
           </a:xfrm>
-          <a:prstGeom prst="rect">
-            <a:avLst/>
-          </a:prstGeom>
-        </p:spPr>
-      </p:pic>
-      <p:pic>
-        <p:nvPicPr>
-          <p:cNvPr id="5" name="Picture 4"/>
-          <p:cNvPicPr>
-            <a:picLocks noChangeAspect="1"/>
-          </p:cNvPicPr>
-          <p:nvPr/>
-        </p:nvPicPr>
-        <p:blipFill>
-          <a:blip r:embed="rId3"/>
-          <a:stretch>
-            <a:fillRect/>
-          </a:stretch>
-        </p:blipFill>
-        <p:spPr>
-          <a:xfrm>
-            <a:off x="8144034" y="4638546"/>
-            <a:ext cx="1609483" cy="1615580"/>
-          </a:xfrm>
-          <a:prstGeom prst="rect">
-            <a:avLst/>
-          </a:prstGeom>
-        </p:spPr>
-      </p:pic>
-      <p:pic>
-        <p:nvPicPr>
-          <p:cNvPr id="6" name="Picture 5"/>
-          <p:cNvPicPr>
-            <a:picLocks noChangeAspect="1"/>
-          </p:cNvPicPr>
-          <p:nvPr/>
-        </p:nvPicPr>
-        <p:blipFill>
-          <a:blip r:embed="rId4"/>
-          <a:stretch>
-            <a:fillRect/>
-          </a:stretch>
-        </p:blipFill>
-        <p:spPr>
-          <a:xfrm>
-            <a:off x="7302713" y="202369"/>
-            <a:ext cx="2450804" cy="823031"/>
-          </a:xfrm>
-          <a:prstGeom prst="rect">
-            <a:avLst/>
-          </a:prstGeom>
-        </p:spPr>
-      </p:pic>
-      <p:pic>
-        <p:nvPicPr>
-          <p:cNvPr id="8" name="Picture 7"/>
-          <p:cNvPicPr>
-            <a:picLocks noChangeAspect="1"/>
-          </p:cNvPicPr>
-          <p:nvPr/>
-        </p:nvPicPr>
-        <p:blipFill>
-          <a:blip r:embed="rId5"/>
-          <a:stretch>
-            <a:fillRect/>
-          </a:stretch>
-        </p:blipFill>
-        <p:spPr>
-          <a:xfrm>
-            <a:off x="2964488" y="391170"/>
-            <a:ext cx="532856" cy="2782692"/>
-          </a:xfrm>
-          <a:prstGeom prst="rect">
-            <a:avLst/>
-          </a:prstGeom>
-        </p:spPr>
-      </p:pic>
+        </p:grpSpPr>
+        <p:pic>
+          <p:nvPicPr>
+            <p:cNvPr id="2" name="Picture 1"/>
+            <p:cNvPicPr>
+              <a:picLocks noChangeAspect="1"/>
+            </p:cNvPicPr>
+            <p:nvPr/>
+          </p:nvPicPr>
+          <p:blipFill>
+            <a:blip r:embed="rId2"/>
+            <a:stretch>
+              <a:fillRect/>
+            </a:stretch>
+          </p:blipFill>
+          <p:spPr>
+            <a:xfrm>
+              <a:off x="1165360" y="18854"/>
+              <a:ext cx="8836057" cy="6835724"/>
+            </a:xfrm>
+            <a:prstGeom prst="rect">
+              <a:avLst/>
+            </a:prstGeom>
+          </p:spPr>
+        </p:pic>
+        <p:pic>
+          <p:nvPicPr>
+            <p:cNvPr id="5" name="Picture 4"/>
+            <p:cNvPicPr>
+              <a:picLocks noChangeAspect="1"/>
+            </p:cNvPicPr>
+            <p:nvPr/>
+          </p:nvPicPr>
+          <p:blipFill>
+            <a:blip r:embed="rId3"/>
+            <a:stretch>
+              <a:fillRect/>
+            </a:stretch>
+          </p:blipFill>
+          <p:spPr>
+            <a:xfrm>
+              <a:off x="8907605" y="4242621"/>
+              <a:ext cx="1609483" cy="1615580"/>
+            </a:xfrm>
+            <a:prstGeom prst="rect">
+              <a:avLst/>
+            </a:prstGeom>
+          </p:spPr>
+        </p:pic>
+        <p:pic>
+          <p:nvPicPr>
+            <p:cNvPr id="6" name="Picture 5"/>
+            <p:cNvPicPr>
+              <a:picLocks noChangeAspect="1"/>
+            </p:cNvPicPr>
+            <p:nvPr/>
+          </p:nvPicPr>
+          <p:blipFill>
+            <a:blip r:embed="rId4"/>
+            <a:stretch>
+              <a:fillRect/>
+            </a:stretch>
+          </p:blipFill>
+          <p:spPr>
+            <a:xfrm>
+              <a:off x="8066284" y="18854"/>
+              <a:ext cx="2450804" cy="823031"/>
+            </a:xfrm>
+            <a:prstGeom prst="rect">
+              <a:avLst/>
+            </a:prstGeom>
+          </p:spPr>
+        </p:pic>
+        <p:pic>
+          <p:nvPicPr>
+            <p:cNvPr id="8" name="Picture 7"/>
+            <p:cNvPicPr>
+              <a:picLocks noChangeAspect="1"/>
+            </p:cNvPicPr>
+            <p:nvPr/>
+          </p:nvPicPr>
+          <p:blipFill>
+            <a:blip r:embed="rId5"/>
+            <a:stretch>
+              <a:fillRect/>
+            </a:stretch>
+          </p:blipFill>
+          <p:spPr>
+            <a:xfrm>
+              <a:off x="3699780" y="101252"/>
+              <a:ext cx="457441" cy="2388859"/>
+            </a:xfrm>
+            <a:prstGeom prst="rect">
+              <a:avLst/>
+            </a:prstGeom>
+          </p:spPr>
+        </p:pic>
+      </p:grpSp>
       <p:pic>
         <p:nvPicPr>
           <p:cNvPr id="9" name="Picture 8"/>
@@ -14945,283 +15047,268 @@
           <a:chExt cx="0" cy="0"/>
         </a:xfrm>
       </p:grpSpPr>
+      <p:pic>
+        <p:nvPicPr>
+          <p:cNvPr id="3" name="Picture 2"/>
+          <p:cNvPicPr>
+            <a:picLocks noChangeAspect="1"/>
+          </p:cNvPicPr>
+          <p:nvPr/>
+        </p:nvPicPr>
+        <p:blipFill rotWithShape="1">
+          <a:blip r:embed="rId2"/>
+          <a:srcRect t="315" b="-1"/>
+          <a:stretch/>
+        </p:blipFill>
+        <p:spPr>
+          <a:xfrm>
+            <a:off x="625227" y="0"/>
+            <a:ext cx="9120020" cy="6858000"/>
+          </a:xfrm>
+          <a:prstGeom prst="rect">
+            <a:avLst/>
+          </a:prstGeom>
+        </p:spPr>
+      </p:pic>
+      <p:pic>
+        <p:nvPicPr>
+          <p:cNvPr id="19" name="Picture 18"/>
+          <p:cNvPicPr>
+            <a:picLocks noChangeAspect="1"/>
+          </p:cNvPicPr>
+          <p:nvPr/>
+        </p:nvPicPr>
+        <p:blipFill rotWithShape="1">
+          <a:blip r:embed="rId3"/>
+          <a:srcRect l="86534" t="65980" r="-1" b="15601"/>
+          <a:stretch/>
+        </p:blipFill>
+        <p:spPr>
+          <a:xfrm>
+            <a:off x="8139862" y="4713402"/>
+            <a:ext cx="1605621" cy="1611985"/>
+          </a:xfrm>
+          <a:prstGeom prst="rect">
+            <a:avLst/>
+          </a:prstGeom>
+        </p:spPr>
+      </p:pic>
+      <p:pic>
+        <p:nvPicPr>
+          <p:cNvPr id="20" name="Picture 19"/>
+          <p:cNvPicPr>
+            <a:picLocks noChangeAspect="1"/>
+          </p:cNvPicPr>
+          <p:nvPr/>
+        </p:nvPicPr>
+        <p:blipFill rotWithShape="1">
+          <a:blip r:embed="rId3"/>
+          <a:srcRect l="79149" t="20380" r="80" b="70126"/>
+          <a:stretch/>
+        </p:blipFill>
+        <p:spPr>
+          <a:xfrm>
+            <a:off x="7425357" y="0"/>
+            <a:ext cx="2447286" cy="821115"/>
+          </a:xfrm>
+          <a:prstGeom prst="rect">
+            <a:avLst/>
+          </a:prstGeom>
+        </p:spPr>
+      </p:pic>
       <p:grpSp>
         <p:nvGrpSpPr>
-          <p:cNvPr id="4" name="Group 3"/>
+          <p:cNvPr id="21" name="Group 20"/>
           <p:cNvGrpSpPr/>
           <p:nvPr/>
         </p:nvGrpSpPr>
         <p:grpSpPr>
           <a:xfrm>
-            <a:off x="625227" y="0"/>
-            <a:ext cx="9247416" cy="6858000"/>
-            <a:chOff x="625227" y="0"/>
-            <a:chExt cx="9247416" cy="6858000"/>
+            <a:off x="3113145" y="222969"/>
+            <a:ext cx="300947" cy="2400712"/>
+            <a:chOff x="2862091" y="251249"/>
+            <a:chExt cx="300947" cy="2400712"/>
           </a:xfrm>
         </p:grpSpPr>
-        <p:pic>
-          <p:nvPicPr>
-            <p:cNvPr id="3" name="Picture 2"/>
-            <p:cNvPicPr>
-              <a:picLocks noChangeAspect="1"/>
-            </p:cNvPicPr>
+        <p:sp>
+          <p:nvSpPr>
+            <p:cNvPr id="24" name="Rectangle 23"/>
+            <p:cNvSpPr/>
             <p:nvPr/>
-          </p:nvPicPr>
-          <p:blipFill rotWithShape="1">
-            <a:blip r:embed="rId2"/>
-            <a:srcRect t="315" b="-1"/>
-            <a:stretch/>
-          </p:blipFill>
+          </p:nvSpPr>
           <p:spPr>
             <a:xfrm>
-              <a:off x="625227" y="0"/>
-              <a:ext cx="9120020" cy="6858000"/>
+              <a:off x="2862091" y="304986"/>
+              <a:ext cx="300947" cy="2346975"/>
             </a:xfrm>
             <a:prstGeom prst="rect">
               <a:avLst/>
             </a:prstGeom>
+            <a:solidFill>
+              <a:schemeClr val="bg1"/>
+            </a:solidFill>
+            <a:ln>
+              <a:noFill/>
+            </a:ln>
           </p:spPr>
-        </p:pic>
-        <p:pic>
-          <p:nvPicPr>
-            <p:cNvPr id="19" name="Picture 18"/>
-            <p:cNvPicPr>
-              <a:picLocks noChangeAspect="1"/>
-            </p:cNvPicPr>
-            <p:nvPr/>
-          </p:nvPicPr>
-          <p:blipFill rotWithShape="1">
-            <a:blip r:embed="rId3"/>
-            <a:srcRect l="86534" t="65980" r="-1" b="15601"/>
-            <a:stretch/>
-          </p:blipFill>
-          <p:spPr>
-            <a:xfrm>
-              <a:off x="8139862" y="4713402"/>
-              <a:ext cx="1605621" cy="1611985"/>
-            </a:xfrm>
-            <a:prstGeom prst="rect">
-              <a:avLst/>
-            </a:prstGeom>
-          </p:spPr>
-        </p:pic>
-        <p:pic>
-          <p:nvPicPr>
-            <p:cNvPr id="20" name="Picture 19"/>
-            <p:cNvPicPr>
-              <a:picLocks noChangeAspect="1"/>
-            </p:cNvPicPr>
-            <p:nvPr/>
-          </p:nvPicPr>
-          <p:blipFill rotWithShape="1">
-            <a:blip r:embed="rId3"/>
-            <a:srcRect l="79149" t="20380" r="80" b="70126"/>
-            <a:stretch/>
-          </p:blipFill>
-          <p:spPr>
-            <a:xfrm>
-              <a:off x="7425357" y="0"/>
-              <a:ext cx="2447286" cy="821115"/>
-            </a:xfrm>
-            <a:prstGeom prst="rect">
-              <a:avLst/>
-            </a:prstGeom>
-          </p:spPr>
-        </p:pic>
-        <p:grpSp>
-          <p:nvGrpSpPr>
-            <p:cNvPr id="21" name="Group 20"/>
-            <p:cNvGrpSpPr/>
-            <p:nvPr/>
-          </p:nvGrpSpPr>
-          <p:grpSpPr>
-            <a:xfrm>
-              <a:off x="3113145" y="222969"/>
-              <a:ext cx="300947" cy="2400712"/>
-              <a:chOff x="2862091" y="251249"/>
-              <a:chExt cx="300947" cy="2400712"/>
-            </a:xfrm>
-          </p:grpSpPr>
-          <p:sp>
-            <p:nvSpPr>
-              <p:cNvPr id="24" name="Rectangle 23"/>
-              <p:cNvSpPr/>
-              <p:nvPr/>
-            </p:nvSpPr>
-            <p:spPr>
-              <a:xfrm>
-                <a:off x="2862091" y="304986"/>
-                <a:ext cx="300947" cy="2346975"/>
-              </a:xfrm>
-              <a:prstGeom prst="rect">
-                <a:avLst/>
-              </a:prstGeom>
-              <a:solidFill>
-                <a:schemeClr val="bg1"/>
-              </a:solidFill>
-              <a:ln>
-                <a:noFill/>
-              </a:ln>
-            </p:spPr>
-            <p:style>
-              <a:lnRef idx="2">
-                <a:schemeClr val="accent1">
-                  <a:shade val="50000"/>
-                </a:schemeClr>
-              </a:lnRef>
-              <a:fillRef idx="1">
-                <a:schemeClr val="accent1"/>
-              </a:fillRef>
-              <a:effectRef idx="0">
-                <a:schemeClr val="accent1"/>
-              </a:effectRef>
-              <a:fontRef idx="minor">
-                <a:schemeClr val="lt1"/>
-              </a:fontRef>
-            </p:style>
-            <p:txBody>
-              <a:bodyPr rtlCol="0" anchor="ctr"/>
-              <a:lstStyle/>
-              <a:p>
-                <a:pPr algn="ctr"/>
-                <a:endParaRPr lang="en-US"/>
-              </a:p>
-            </p:txBody>
-          </p:sp>
-          <p:cxnSp>
-            <p:nvCxnSpPr>
-              <p:cNvPr id="25" name="Straight Arrow Connector 24"/>
-              <p:cNvCxnSpPr/>
-              <p:nvPr/>
-            </p:nvCxnSpPr>
-            <p:spPr>
-              <a:xfrm flipV="1">
-                <a:off x="3080426" y="251249"/>
-                <a:ext cx="0" cy="1032311"/>
-              </a:xfrm>
-              <a:prstGeom prst="straightConnector1">
-                <a:avLst/>
-              </a:prstGeom>
-              <a:ln>
-                <a:solidFill>
-                  <a:schemeClr val="tx1"/>
-                </a:solidFill>
-                <a:tailEnd type="triangle"/>
-              </a:ln>
-            </p:spPr>
-            <p:style>
-              <a:lnRef idx="1">
-                <a:schemeClr val="accent1"/>
-              </a:lnRef>
-              <a:fillRef idx="0">
-                <a:schemeClr val="accent1"/>
-              </a:fillRef>
-              <a:effectRef idx="0">
-                <a:schemeClr val="accent1"/>
-              </a:effectRef>
-              <a:fontRef idx="minor">
-                <a:schemeClr val="tx1"/>
-              </a:fontRef>
-            </p:style>
-          </p:cxnSp>
-          <p:cxnSp>
-            <p:nvCxnSpPr>
-              <p:cNvPr id="26" name="Straight Arrow Connector 25"/>
-              <p:cNvCxnSpPr/>
-              <p:nvPr/>
-            </p:nvCxnSpPr>
-            <p:spPr>
-              <a:xfrm>
-                <a:off x="3080425" y="1572048"/>
-                <a:ext cx="1" cy="1026176"/>
-              </a:xfrm>
-              <a:prstGeom prst="straightConnector1">
-                <a:avLst/>
-              </a:prstGeom>
-              <a:ln>
-                <a:solidFill>
-                  <a:schemeClr val="tx1"/>
-                </a:solidFill>
-                <a:tailEnd type="triangle"/>
-              </a:ln>
-            </p:spPr>
-            <p:style>
-              <a:lnRef idx="1">
-                <a:schemeClr val="accent1"/>
-              </a:lnRef>
-              <a:fillRef idx="0">
-                <a:schemeClr val="accent1"/>
-              </a:fillRef>
-              <a:effectRef idx="0">
-                <a:schemeClr val="accent1"/>
-              </a:effectRef>
-              <a:fontRef idx="minor">
-                <a:schemeClr val="tx1"/>
-              </a:fontRef>
-            </p:style>
-          </p:cxnSp>
-        </p:grpSp>
-        <p:sp>
-          <p:nvSpPr>
-            <p:cNvPr id="22" name="TextBox 21"/>
-            <p:cNvSpPr txBox="1"/>
-            <p:nvPr/>
-          </p:nvSpPr>
-          <p:spPr>
-            <a:xfrm rot="16200000">
-              <a:off x="2513082" y="1825405"/>
-              <a:ext cx="1314667" cy="369332"/>
-            </a:xfrm>
-            <a:prstGeom prst="rect">
-              <a:avLst/>
-            </a:prstGeom>
-            <a:noFill/>
-          </p:spPr>
+          <p:style>
+            <a:lnRef idx="2">
+              <a:schemeClr val="accent1">
+                <a:shade val="50000"/>
+              </a:schemeClr>
+            </a:lnRef>
+            <a:fillRef idx="1">
+              <a:schemeClr val="accent1"/>
+            </a:fillRef>
+            <a:effectRef idx="0">
+              <a:schemeClr val="accent1"/>
+            </a:effectRef>
+            <a:fontRef idx="minor">
+              <a:schemeClr val="lt1"/>
+            </a:fontRef>
+          </p:style>
           <p:txBody>
-            <a:bodyPr wrap="square" rtlCol="0">
-              <a:spAutoFit/>
-            </a:bodyPr>
+            <a:bodyPr rtlCol="0" anchor="ctr"/>
             <a:lstStyle/>
             <a:p>
-              <a:r>
-                <a:rPr lang="en-US" dirty="0" smtClean="0"/>
-                <a:t>Log-normal</a:t>
-              </a:r>
-              <a:endParaRPr lang="en-US" dirty="0"/>
+              <a:pPr algn="ctr"/>
+              <a:endParaRPr lang="en-US"/>
             </a:p>
           </p:txBody>
         </p:sp>
-        <p:sp>
-          <p:nvSpPr>
-            <p:cNvPr id="23" name="TextBox 22"/>
-            <p:cNvSpPr txBox="1"/>
+        <p:cxnSp>
+          <p:nvCxnSpPr>
+            <p:cNvPr id="25" name="Straight Arrow Connector 24"/>
+            <p:cNvCxnSpPr/>
             <p:nvPr/>
-          </p:nvSpPr>
+          </p:nvCxnSpPr>
           <p:spPr>
-            <a:xfrm rot="16200000">
-              <a:off x="2580255" y="577911"/>
-              <a:ext cx="1180320" cy="369332"/>
+            <a:xfrm flipV="1">
+              <a:off x="3080426" y="251249"/>
+              <a:ext cx="0" cy="1032311"/>
             </a:xfrm>
-            <a:prstGeom prst="rect">
+            <a:prstGeom prst="straightConnector1">
               <a:avLst/>
             </a:prstGeom>
-            <a:noFill/>
+            <a:ln>
+              <a:solidFill>
+                <a:schemeClr val="tx1"/>
+              </a:solidFill>
+              <a:tailEnd type="triangle"/>
+            </a:ln>
           </p:spPr>
-          <p:txBody>
-            <a:bodyPr wrap="square" rtlCol="0">
-              <a:spAutoFit/>
-            </a:bodyPr>
-            <a:lstStyle/>
-            <a:p>
-              <a:r>
-                <a:rPr lang="en-US" dirty="0" smtClean="0"/>
-                <a:t>Log-series</a:t>
-              </a:r>
-              <a:endParaRPr lang="en-US" dirty="0"/>
-            </a:p>
-          </p:txBody>
-        </p:sp>
+          <p:style>
+            <a:lnRef idx="1">
+              <a:schemeClr val="accent1"/>
+            </a:lnRef>
+            <a:fillRef idx="0">
+              <a:schemeClr val="accent1"/>
+            </a:fillRef>
+            <a:effectRef idx="0">
+              <a:schemeClr val="accent1"/>
+            </a:effectRef>
+            <a:fontRef idx="minor">
+              <a:schemeClr val="tx1"/>
+            </a:fontRef>
+          </p:style>
+        </p:cxnSp>
+        <p:cxnSp>
+          <p:nvCxnSpPr>
+            <p:cNvPr id="26" name="Straight Arrow Connector 25"/>
+            <p:cNvCxnSpPr/>
+            <p:nvPr/>
+          </p:nvCxnSpPr>
+          <p:spPr>
+            <a:xfrm>
+              <a:off x="3080425" y="1572048"/>
+              <a:ext cx="1" cy="1026176"/>
+            </a:xfrm>
+            <a:prstGeom prst="straightConnector1">
+              <a:avLst/>
+            </a:prstGeom>
+            <a:ln>
+              <a:solidFill>
+                <a:schemeClr val="tx1"/>
+              </a:solidFill>
+              <a:tailEnd type="triangle"/>
+            </a:ln>
+          </p:spPr>
+          <p:style>
+            <a:lnRef idx="1">
+              <a:schemeClr val="accent1"/>
+            </a:lnRef>
+            <a:fillRef idx="0">
+              <a:schemeClr val="accent1"/>
+            </a:fillRef>
+            <a:effectRef idx="0">
+              <a:schemeClr val="accent1"/>
+            </a:effectRef>
+            <a:fontRef idx="minor">
+              <a:schemeClr val="tx1"/>
+            </a:fontRef>
+          </p:style>
+        </p:cxnSp>
       </p:grpSp>
+      <p:sp>
+        <p:nvSpPr>
+          <p:cNvPr id="22" name="TextBox 21"/>
+          <p:cNvSpPr txBox="1"/>
+          <p:nvPr/>
+        </p:nvSpPr>
+        <p:spPr>
+          <a:xfrm rot="16200000">
+            <a:off x="2513082" y="1825405"/>
+            <a:ext cx="1314667" cy="369332"/>
+          </a:xfrm>
+          <a:prstGeom prst="rect">
+            <a:avLst/>
+          </a:prstGeom>
+          <a:noFill/>
+        </p:spPr>
+        <p:txBody>
+          <a:bodyPr wrap="square" rtlCol="0">
+            <a:spAutoFit/>
+          </a:bodyPr>
+          <a:lstStyle/>
+          <a:p>
+            <a:r>
+              <a:rPr lang="en-US" dirty="0" smtClean="0"/>
+              <a:t>Log-normal</a:t>
+            </a:r>
+            <a:endParaRPr lang="en-US" dirty="0"/>
+          </a:p>
+        </p:txBody>
+      </p:sp>
+      <p:sp>
+        <p:nvSpPr>
+          <p:cNvPr id="23" name="TextBox 22"/>
+          <p:cNvSpPr txBox="1"/>
+          <p:nvPr/>
+        </p:nvSpPr>
+        <p:spPr>
+          <a:xfrm rot="16200000">
+            <a:off x="2580255" y="577911"/>
+            <a:ext cx="1180320" cy="369332"/>
+          </a:xfrm>
+          <a:prstGeom prst="rect">
+            <a:avLst/>
+          </a:prstGeom>
+          <a:noFill/>
+        </p:spPr>
+        <p:txBody>
+          <a:bodyPr wrap="square" rtlCol="0">
+            <a:spAutoFit/>
+          </a:bodyPr>
+          <a:lstStyle/>
+          <a:p>
+            <a:r>
+              <a:rPr lang="en-US" dirty="0" smtClean="0"/>
+              <a:t>Log-series</a:t>
+            </a:r>
+            <a:endParaRPr lang="en-US" dirty="0"/>
+          </a:p>
+        </p:txBody>
+      </p:sp>
     </p:spTree>
     <p:extLst>
       <p:ext uri="{BB962C8B-B14F-4D97-AF65-F5344CB8AC3E}">

</xml_diff>

<commit_message>
fixed sizing of legend fig 1
</commit_message>
<xml_diff>
--- a/output/plots/all_figs_with_legends.pptx
+++ b/output/plots/all_figs_with_legends.pptx
@@ -6408,6 +6408,90 @@
           <a:chExt cx="0" cy="0"/>
         </a:xfrm>
       </p:grpSpPr>
+      <p:grpSp>
+        <p:nvGrpSpPr>
+          <p:cNvPr id="14" name="Group 13"/>
+          <p:cNvGrpSpPr/>
+          <p:nvPr/>
+        </p:nvGrpSpPr>
+        <p:grpSpPr>
+          <a:xfrm>
+            <a:off x="2888850" y="304464"/>
+            <a:ext cx="2910828" cy="1840162"/>
+            <a:chOff x="2888850" y="304464"/>
+            <a:chExt cx="2910828" cy="1840162"/>
+          </a:xfrm>
+        </p:grpSpPr>
+        <p:pic>
+          <p:nvPicPr>
+            <p:cNvPr id="26" name="Picture 25"/>
+            <p:cNvPicPr>
+              <a:picLocks noChangeAspect="1"/>
+            </p:cNvPicPr>
+            <p:nvPr/>
+          </p:nvPicPr>
+          <p:blipFill rotWithShape="1">
+            <a:blip r:embed="rId2"/>
+            <a:srcRect b="361"/>
+            <a:stretch/>
+          </p:blipFill>
+          <p:spPr>
+            <a:xfrm>
+              <a:off x="2888850" y="304464"/>
+              <a:ext cx="2870345" cy="1840162"/>
+            </a:xfrm>
+            <a:prstGeom prst="rect">
+              <a:avLst/>
+            </a:prstGeom>
+          </p:spPr>
+        </p:pic>
+        <p:sp>
+          <p:nvSpPr>
+            <p:cNvPr id="12" name="Rectangle 11"/>
+            <p:cNvSpPr/>
+            <p:nvPr/>
+          </p:nvSpPr>
+          <p:spPr>
+            <a:xfrm>
+              <a:off x="5593742" y="1013745"/>
+              <a:ext cx="205936" cy="216641"/>
+            </a:xfrm>
+            <a:prstGeom prst="rect">
+              <a:avLst/>
+            </a:prstGeom>
+            <a:solidFill>
+              <a:schemeClr val="bg1"/>
+            </a:solidFill>
+            <a:ln>
+              <a:noFill/>
+            </a:ln>
+          </p:spPr>
+          <p:style>
+            <a:lnRef idx="2">
+              <a:schemeClr val="accent1">
+                <a:shade val="50000"/>
+              </a:schemeClr>
+            </a:lnRef>
+            <a:fillRef idx="1">
+              <a:schemeClr val="accent1"/>
+            </a:fillRef>
+            <a:effectRef idx="0">
+              <a:schemeClr val="accent1"/>
+            </a:effectRef>
+            <a:fontRef idx="minor">
+              <a:schemeClr val="lt1"/>
+            </a:fontRef>
+          </p:style>
+          <p:txBody>
+            <a:bodyPr rtlCol="0" anchor="ctr"/>
+            <a:lstStyle/>
+            <a:p>
+              <a:pPr algn="ctr"/>
+              <a:endParaRPr lang="en-US"/>
+            </a:p>
+          </p:txBody>
+        </p:sp>
+      </p:grpSp>
       <p:pic>
         <p:nvPicPr>
           <p:cNvPr id="25" name="Picture 24"/>
@@ -6417,7 +6501,7 @@
           <p:nvPr/>
         </p:nvPicPr>
         <p:blipFill>
-          <a:blip r:embed="rId2"/>
+          <a:blip r:embed="rId3"/>
           <a:stretch>
             <a:fillRect/>
           </a:stretch>
@@ -12167,44 +12251,22 @@
       </p:sp>
       <p:pic>
         <p:nvPicPr>
-          <p:cNvPr id="26" name="Picture 25"/>
+          <p:cNvPr id="11" name="Picture 10"/>
           <p:cNvPicPr>
             <a:picLocks noChangeAspect="1"/>
           </p:cNvPicPr>
           <p:nvPr/>
         </p:nvPicPr>
-        <p:blipFill rotWithShape="1">
+        <p:blipFill>
           <a:blip r:embed="rId7"/>
-          <a:srcRect b="361"/>
-          <a:stretch/>
+          <a:stretch>
+            <a:fillRect/>
+          </a:stretch>
         </p:blipFill>
         <p:spPr>
           <a:xfrm>
-            <a:off x="2888850" y="304464"/>
-            <a:ext cx="2870345" cy="1840162"/>
-          </a:xfrm>
-          <a:prstGeom prst="rect">
-            <a:avLst/>
-          </a:prstGeom>
-        </p:spPr>
-      </p:pic>
-      <p:pic>
-        <p:nvPicPr>
-          <p:cNvPr id="123" name="Picture 122"/>
-          <p:cNvPicPr>
-            <a:picLocks noChangeAspect="1"/>
-          </p:cNvPicPr>
-          <p:nvPr/>
-        </p:nvPicPr>
-        <p:blipFill rotWithShape="1">
-          <a:blip r:embed="rId8"/>
-          <a:srcRect l="79231" t="38352" r="-1348" b="48169"/>
-          <a:stretch/>
-        </p:blipFill>
-        <p:spPr>
-          <a:xfrm>
-            <a:off x="4838699" y="892893"/>
-            <a:ext cx="1001071" cy="510350"/>
+            <a:off x="4031038" y="472910"/>
+            <a:ext cx="939420" cy="520174"/>
           </a:xfrm>
           <a:prstGeom prst="rect">
             <a:avLst/>

</xml_diff>

<commit_message>
tweaked Figure 1 in pptx
</commit_message>
<xml_diff>
--- a/output/plots/all_figs_with_legends.pptx
+++ b/output/plots/all_figs_with_legends.pptx
@@ -3796,28 +3796,28 @@
                 <a:gridCol w="802944">
                   <a:extLst>
                     <a:ext uri="{9D8B030D-6E8A-4147-A177-3AD203B41FA5}">
-                      <a16:colId xmlns:a16="http://schemas.microsoft.com/office/drawing/2014/main" val="3777247511"/>
+                      <a16:colId xmlns:a16="http://schemas.microsoft.com/office/drawing/2014/main" xmlns="" val="3777247511"/>
                     </a:ext>
                   </a:extLst>
                 </a:gridCol>
                 <a:gridCol w="1200230">
                   <a:extLst>
                     <a:ext uri="{9D8B030D-6E8A-4147-A177-3AD203B41FA5}">
-                      <a16:colId xmlns:a16="http://schemas.microsoft.com/office/drawing/2014/main" val="3565287180"/>
+                      <a16:colId xmlns:a16="http://schemas.microsoft.com/office/drawing/2014/main" xmlns="" val="3565287180"/>
                     </a:ext>
                   </a:extLst>
                 </a:gridCol>
                 <a:gridCol w="710503">
                   <a:extLst>
                     <a:ext uri="{9D8B030D-6E8A-4147-A177-3AD203B41FA5}">
-                      <a16:colId xmlns:a16="http://schemas.microsoft.com/office/drawing/2014/main" val="310175345"/>
+                      <a16:colId xmlns:a16="http://schemas.microsoft.com/office/drawing/2014/main" xmlns="" val="310175345"/>
                     </a:ext>
                   </a:extLst>
                 </a:gridCol>
                 <a:gridCol w="1488412">
                   <a:extLst>
                     <a:ext uri="{9D8B030D-6E8A-4147-A177-3AD203B41FA5}">
-                      <a16:colId xmlns:a16="http://schemas.microsoft.com/office/drawing/2014/main" val="2991616883"/>
+                      <a16:colId xmlns:a16="http://schemas.microsoft.com/office/drawing/2014/main" xmlns="" val="2991616883"/>
                     </a:ext>
                   </a:extLst>
                 </a:gridCol>
@@ -4045,7 +4045,7 @@
                 </a:tc>
                 <a:extLst>
                   <a:ext uri="{0D108BD9-81ED-4DB2-BD59-A6C34878D82A}">
-                    <a16:rowId xmlns:a16="http://schemas.microsoft.com/office/drawing/2014/main" val="3689353912"/>
+                    <a16:rowId xmlns:a16="http://schemas.microsoft.com/office/drawing/2014/main" xmlns="" val="3689353912"/>
                   </a:ext>
                 </a:extLst>
               </a:tr>
@@ -4260,7 +4260,7 @@
                 </a:tc>
                 <a:extLst>
                   <a:ext uri="{0D108BD9-81ED-4DB2-BD59-A6C34878D82A}">
-                    <a16:rowId xmlns:a16="http://schemas.microsoft.com/office/drawing/2014/main" val="3236650058"/>
+                    <a16:rowId xmlns:a16="http://schemas.microsoft.com/office/drawing/2014/main" xmlns="" val="3236650058"/>
                   </a:ext>
                 </a:extLst>
               </a:tr>
@@ -4475,7 +4475,7 @@
                 </a:tc>
                 <a:extLst>
                   <a:ext uri="{0D108BD9-81ED-4DB2-BD59-A6C34878D82A}">
-                    <a16:rowId xmlns:a16="http://schemas.microsoft.com/office/drawing/2014/main" val="848586666"/>
+                    <a16:rowId xmlns:a16="http://schemas.microsoft.com/office/drawing/2014/main" xmlns="" val="848586666"/>
                   </a:ext>
                 </a:extLst>
               </a:tr>
@@ -4686,7 +4686,7 @@
                 </a:tc>
                 <a:extLst>
                   <a:ext uri="{0D108BD9-81ED-4DB2-BD59-A6C34878D82A}">
-                    <a16:rowId xmlns:a16="http://schemas.microsoft.com/office/drawing/2014/main" val="366495031"/>
+                    <a16:rowId xmlns:a16="http://schemas.microsoft.com/office/drawing/2014/main" xmlns="" val="366495031"/>
                   </a:ext>
                 </a:extLst>
               </a:tr>
@@ -4770,14 +4770,14 @@
                 <a:gridCol w="487265">
                   <a:extLst>
                     <a:ext uri="{9D8B030D-6E8A-4147-A177-3AD203B41FA5}">
-                      <a16:colId xmlns:a16="http://schemas.microsoft.com/office/drawing/2014/main" val="1812283001"/>
+                      <a16:colId xmlns:a16="http://schemas.microsoft.com/office/drawing/2014/main" xmlns="" val="1812283001"/>
                     </a:ext>
                   </a:extLst>
                 </a:gridCol>
                 <a:gridCol w="1427585">
                   <a:extLst>
                     <a:ext uri="{9D8B030D-6E8A-4147-A177-3AD203B41FA5}">
-                      <a16:colId xmlns:a16="http://schemas.microsoft.com/office/drawing/2014/main" val="3574134326"/>
+                      <a16:colId xmlns:a16="http://schemas.microsoft.com/office/drawing/2014/main" xmlns="" val="3574134326"/>
                     </a:ext>
                   </a:extLst>
                 </a:gridCol>
@@ -4809,7 +4809,7 @@
                 </a:tc>
                 <a:extLst>
                   <a:ext uri="{0D108BD9-81ED-4DB2-BD59-A6C34878D82A}">
-                    <a16:rowId xmlns:a16="http://schemas.microsoft.com/office/drawing/2014/main" val="34741539"/>
+                    <a16:rowId xmlns:a16="http://schemas.microsoft.com/office/drawing/2014/main" xmlns="" val="34741539"/>
                   </a:ext>
                 </a:extLst>
               </a:tr>
@@ -4840,7 +4840,7 @@
                 </a:tc>
                 <a:extLst>
                   <a:ext uri="{0D108BD9-81ED-4DB2-BD59-A6C34878D82A}">
-                    <a16:rowId xmlns:a16="http://schemas.microsoft.com/office/drawing/2014/main" val="1816204491"/>
+                    <a16:rowId xmlns:a16="http://schemas.microsoft.com/office/drawing/2014/main" xmlns="" val="1816204491"/>
                   </a:ext>
                 </a:extLst>
               </a:tr>
@@ -4871,7 +4871,7 @@
                 </a:tc>
                 <a:extLst>
                   <a:ext uri="{0D108BD9-81ED-4DB2-BD59-A6C34878D82A}">
-                    <a16:rowId xmlns:a16="http://schemas.microsoft.com/office/drawing/2014/main" val="3053943592"/>
+                    <a16:rowId xmlns:a16="http://schemas.microsoft.com/office/drawing/2014/main" xmlns="" val="3053943592"/>
                   </a:ext>
                 </a:extLst>
               </a:tr>
@@ -4902,7 +4902,7 @@
                 </a:tc>
                 <a:extLst>
                   <a:ext uri="{0D108BD9-81ED-4DB2-BD59-A6C34878D82A}">
-                    <a16:rowId xmlns:a16="http://schemas.microsoft.com/office/drawing/2014/main" val="1425409090"/>
+                    <a16:rowId xmlns:a16="http://schemas.microsoft.com/office/drawing/2014/main" xmlns="" val="1425409090"/>
                   </a:ext>
                 </a:extLst>
               </a:tr>
@@ -4933,7 +4933,7 @@
                 </a:tc>
                 <a:extLst>
                   <a:ext uri="{0D108BD9-81ED-4DB2-BD59-A6C34878D82A}">
-                    <a16:rowId xmlns:a16="http://schemas.microsoft.com/office/drawing/2014/main" val="3097088923"/>
+                    <a16:rowId xmlns:a16="http://schemas.microsoft.com/office/drawing/2014/main" xmlns="" val="3097088923"/>
                   </a:ext>
                 </a:extLst>
               </a:tr>
@@ -4964,7 +4964,7 @@
                 </a:tc>
                 <a:extLst>
                   <a:ext uri="{0D108BD9-81ED-4DB2-BD59-A6C34878D82A}">
-                    <a16:rowId xmlns:a16="http://schemas.microsoft.com/office/drawing/2014/main" val="1149511687"/>
+                    <a16:rowId xmlns:a16="http://schemas.microsoft.com/office/drawing/2014/main" xmlns="" val="1149511687"/>
                   </a:ext>
                 </a:extLst>
               </a:tr>
@@ -4995,7 +4995,7 @@
                 </a:tc>
                 <a:extLst>
                   <a:ext uri="{0D108BD9-81ED-4DB2-BD59-A6C34878D82A}">
-                    <a16:rowId xmlns:a16="http://schemas.microsoft.com/office/drawing/2014/main" val="785655806"/>
+                    <a16:rowId xmlns:a16="http://schemas.microsoft.com/office/drawing/2014/main" xmlns="" val="785655806"/>
                   </a:ext>
                 </a:extLst>
               </a:tr>
@@ -5251,14 +5251,14 @@
                 <a:gridCol w="1261110">
                   <a:extLst>
                     <a:ext uri="{9D8B030D-6E8A-4147-A177-3AD203B41FA5}">
-                      <a16:colId xmlns:a16="http://schemas.microsoft.com/office/drawing/2014/main" val="1963467705"/>
+                      <a16:colId xmlns:a16="http://schemas.microsoft.com/office/drawing/2014/main" xmlns="" val="1963467705"/>
                     </a:ext>
                   </a:extLst>
                 </a:gridCol>
                 <a:gridCol w="928174">
                   <a:extLst>
                     <a:ext uri="{9D8B030D-6E8A-4147-A177-3AD203B41FA5}">
-                      <a16:colId xmlns:a16="http://schemas.microsoft.com/office/drawing/2014/main" val="464586843"/>
+                      <a16:colId xmlns:a16="http://schemas.microsoft.com/office/drawing/2014/main" xmlns="" val="464586843"/>
                     </a:ext>
                   </a:extLst>
                 </a:gridCol>
@@ -5366,7 +5366,7 @@
                 </a:tc>
                 <a:extLst>
                   <a:ext uri="{0D108BD9-81ED-4DB2-BD59-A6C34878D82A}">
-                    <a16:rowId xmlns:a16="http://schemas.microsoft.com/office/drawing/2014/main" val="1216226580"/>
+                    <a16:rowId xmlns:a16="http://schemas.microsoft.com/office/drawing/2014/main" xmlns="" val="1216226580"/>
                   </a:ext>
                 </a:extLst>
               </a:tr>
@@ -5473,7 +5473,7 @@
                 </a:tc>
                 <a:extLst>
                   <a:ext uri="{0D108BD9-81ED-4DB2-BD59-A6C34878D82A}">
-                    <a16:rowId xmlns:a16="http://schemas.microsoft.com/office/drawing/2014/main" val="512741848"/>
+                    <a16:rowId xmlns:a16="http://schemas.microsoft.com/office/drawing/2014/main" xmlns="" val="512741848"/>
                   </a:ext>
                 </a:extLst>
               </a:tr>
@@ -5580,7 +5580,7 @@
                 </a:tc>
                 <a:extLst>
                   <a:ext uri="{0D108BD9-81ED-4DB2-BD59-A6C34878D82A}">
-                    <a16:rowId xmlns:a16="http://schemas.microsoft.com/office/drawing/2014/main" val="2231260421"/>
+                    <a16:rowId xmlns:a16="http://schemas.microsoft.com/office/drawing/2014/main" xmlns="" val="2231260421"/>
                   </a:ext>
                 </a:extLst>
               </a:tr>
@@ -6544,14 +6544,14 @@
                 <a:gridCol w="872346">
                   <a:extLst>
                     <a:ext uri="{9D8B030D-6E8A-4147-A177-3AD203B41FA5}">
-                      <a16:colId xmlns:a16="http://schemas.microsoft.com/office/drawing/2014/main" val="20000"/>
+                      <a16:colId xmlns:a16="http://schemas.microsoft.com/office/drawing/2014/main" xmlns="" val="20000"/>
                     </a:ext>
                   </a:extLst>
                 </a:gridCol>
                 <a:gridCol w="872346">
                   <a:extLst>
                     <a:ext uri="{9D8B030D-6E8A-4147-A177-3AD203B41FA5}">
-                      <a16:colId xmlns:a16="http://schemas.microsoft.com/office/drawing/2014/main" val="20001"/>
+                      <a16:colId xmlns:a16="http://schemas.microsoft.com/office/drawing/2014/main" xmlns="" val="20001"/>
                     </a:ext>
                   </a:extLst>
                 </a:gridCol>
@@ -6671,7 +6671,7 @@
                 </a:tc>
                 <a:extLst>
                   <a:ext uri="{0D108BD9-81ED-4DB2-BD59-A6C34878D82A}">
-                    <a16:rowId xmlns:a16="http://schemas.microsoft.com/office/drawing/2014/main" val="10000"/>
+                    <a16:rowId xmlns:a16="http://schemas.microsoft.com/office/drawing/2014/main" xmlns="" val="10000"/>
                   </a:ext>
                 </a:extLst>
               </a:tr>
@@ -6790,7 +6790,7 @@
                 </a:tc>
                 <a:extLst>
                   <a:ext uri="{0D108BD9-81ED-4DB2-BD59-A6C34878D82A}">
-                    <a16:rowId xmlns:a16="http://schemas.microsoft.com/office/drawing/2014/main" val="10001"/>
+                    <a16:rowId xmlns:a16="http://schemas.microsoft.com/office/drawing/2014/main" xmlns="" val="10001"/>
                   </a:ext>
                 </a:extLst>
               </a:tr>
@@ -9965,7 +9965,7 @@
           </p:nvSpPr>
           <p:spPr>
             <a:xfrm>
-              <a:off x="768606" y="5003966"/>
+              <a:off x="799602" y="5003966"/>
               <a:ext cx="215132" cy="146017"/>
             </a:xfrm>
             <a:prstGeom prst="parallelogram">
@@ -10640,7 +10640,7 @@
         </p:nvSpPr>
         <p:spPr>
           <a:xfrm>
-            <a:off x="4022887" y="5000825"/>
+            <a:off x="4139122" y="5000825"/>
             <a:ext cx="109728" cy="109728"/>
           </a:xfrm>
           <a:prstGeom prst="rtTriangle">
@@ -10689,7 +10689,7 @@
         </p:nvSpPr>
         <p:spPr>
           <a:xfrm>
-            <a:off x="4324023" y="5006460"/>
+            <a:off x="4440258" y="5006460"/>
             <a:ext cx="109728" cy="109728"/>
           </a:xfrm>
           <a:prstGeom prst="plus">
@@ -10738,7 +10738,7 @@
         </p:nvSpPr>
         <p:spPr>
           <a:xfrm>
-            <a:off x="4168274" y="5000825"/>
+            <a:off x="4284509" y="5000825"/>
             <a:ext cx="128016" cy="109728"/>
           </a:xfrm>
           <a:prstGeom prst="parallelogram">
@@ -10787,7 +10787,7 @@
         </p:nvSpPr>
         <p:spPr>
           <a:xfrm>
-            <a:off x="4022132" y="4860611"/>
+            <a:off x="4138367" y="4860611"/>
             <a:ext cx="109728" cy="109728"/>
           </a:xfrm>
           <a:prstGeom prst="hexagon">
@@ -10836,7 +10836,7 @@
         </p:nvSpPr>
         <p:spPr>
           <a:xfrm>
-            <a:off x="4317430" y="4854532"/>
+            <a:off x="4433665" y="4854532"/>
             <a:ext cx="82296" cy="109728"/>
           </a:xfrm>
           <a:prstGeom prst="moon">
@@ -10885,7 +10885,7 @@
         </p:nvSpPr>
         <p:spPr>
           <a:xfrm>
-            <a:off x="4168902" y="4854532"/>
+            <a:off x="4285137" y="4854532"/>
             <a:ext cx="109728" cy="109728"/>
           </a:xfrm>
           <a:prstGeom prst="trapezoid">
@@ -11532,9 +11532,9 @@
           <p:nvPr/>
         </p:nvCxnSpPr>
         <p:spPr>
-          <a:xfrm>
-            <a:off x="3903434" y="5783101"/>
-            <a:ext cx="777240" cy="0"/>
+          <a:xfrm flipV="1">
+            <a:off x="3918932" y="5765319"/>
+            <a:ext cx="885397" cy="0"/>
           </a:xfrm>
           <a:prstGeom prst="line">
             <a:avLst/>
@@ -11873,7 +11873,7 @@
         </p:nvSpPr>
         <p:spPr>
           <a:xfrm>
-            <a:off x="4130125" y="5522058"/>
+            <a:off x="4199866" y="5522058"/>
             <a:ext cx="263214" cy="276999"/>
           </a:xfrm>
           <a:prstGeom prst="rect">
@@ -11947,8 +11947,13 @@
           <a:p>
             <a:r>
               <a:rPr lang="en-US" sz="1200" dirty="0" smtClean="0"/>
-              <a:t>= 55%</a:t>
+              <a:t>= </a:t>
             </a:r>
+            <a:r>
+              <a:rPr lang="en-US" sz="1200" dirty="0" smtClean="0"/>
+              <a:t>50%</a:t>
+            </a:r>
+            <a:endParaRPr lang="en-US" sz="1200" dirty="0" smtClean="0"/>
           </a:p>
         </p:txBody>
       </p:sp>
@@ -12265,7 +12270,7 @@
         </p:blipFill>
         <p:spPr>
           <a:xfrm>
-            <a:off x="4031038" y="472910"/>
+            <a:off x="4526981" y="472910"/>
             <a:ext cx="939420" cy="520174"/>
           </a:xfrm>
           <a:prstGeom prst="rect">
@@ -12273,6 +12278,222 @@
           </a:prstGeom>
         </p:spPr>
       </p:pic>
+      <p:sp>
+        <p:nvSpPr>
+          <p:cNvPr id="123" name="Isosceles Triangle 122"/>
+          <p:cNvSpPr/>
+          <p:nvPr/>
+        </p:nvSpPr>
+        <p:spPr>
+          <a:xfrm flipV="1">
+            <a:off x="4681266" y="5360585"/>
+            <a:ext cx="109728" cy="109728"/>
+          </a:xfrm>
+          <a:prstGeom prst="triangle">
+            <a:avLst/>
+          </a:prstGeom>
+          <a:solidFill>
+            <a:schemeClr val="tx1">
+              <a:lumMod val="50000"/>
+              <a:lumOff val="50000"/>
+            </a:schemeClr>
+          </a:solidFill>
+          <a:ln w="19050">
+            <a:solidFill>
+              <a:schemeClr val="tx1">
+                <a:lumMod val="50000"/>
+                <a:lumOff val="50000"/>
+              </a:schemeClr>
+            </a:solidFill>
+          </a:ln>
+        </p:spPr>
+        <p:style>
+          <a:lnRef idx="2">
+            <a:schemeClr val="accent1">
+              <a:shade val="50000"/>
+            </a:schemeClr>
+          </a:lnRef>
+          <a:fillRef idx="1">
+            <a:schemeClr val="accent1"/>
+          </a:fillRef>
+          <a:effectRef idx="0">
+            <a:schemeClr val="accent1"/>
+          </a:effectRef>
+          <a:fontRef idx="minor">
+            <a:schemeClr val="lt1"/>
+          </a:fontRef>
+        </p:style>
+        <p:txBody>
+          <a:bodyPr rtlCol="0" anchor="ctr"/>
+          <a:lstStyle/>
+          <a:p>
+            <a:pPr algn="ctr"/>
+            <a:endParaRPr lang="en-US"/>
+          </a:p>
+        </p:txBody>
+      </p:sp>
+      <p:sp>
+        <p:nvSpPr>
+          <p:cNvPr id="127" name="Isosceles Triangle 126"/>
+          <p:cNvSpPr/>
+          <p:nvPr/>
+        </p:nvSpPr>
+        <p:spPr>
+          <a:xfrm flipV="1">
+            <a:off x="4688656" y="5829408"/>
+            <a:ext cx="109728" cy="109728"/>
+          </a:xfrm>
+          <a:prstGeom prst="triangle">
+            <a:avLst/>
+          </a:prstGeom>
+          <a:solidFill>
+            <a:schemeClr val="tx1">
+              <a:lumMod val="50000"/>
+              <a:lumOff val="50000"/>
+            </a:schemeClr>
+          </a:solidFill>
+          <a:ln w="19050">
+            <a:solidFill>
+              <a:schemeClr val="tx1">
+                <a:lumMod val="50000"/>
+                <a:lumOff val="50000"/>
+              </a:schemeClr>
+            </a:solidFill>
+          </a:ln>
+        </p:spPr>
+        <p:style>
+          <a:lnRef idx="2">
+            <a:schemeClr val="accent1">
+              <a:shade val="50000"/>
+            </a:schemeClr>
+          </a:lnRef>
+          <a:fillRef idx="1">
+            <a:schemeClr val="accent1"/>
+          </a:fillRef>
+          <a:effectRef idx="0">
+            <a:schemeClr val="accent1"/>
+          </a:effectRef>
+          <a:fontRef idx="minor">
+            <a:schemeClr val="lt1"/>
+          </a:fontRef>
+        </p:style>
+        <p:txBody>
+          <a:bodyPr rtlCol="0" anchor="ctr"/>
+          <a:lstStyle/>
+          <a:p>
+            <a:pPr algn="ctr"/>
+            <a:endParaRPr lang="en-US"/>
+          </a:p>
+        </p:txBody>
+      </p:sp>
+      <p:sp>
+        <p:nvSpPr>
+          <p:cNvPr id="133" name="Isosceles Triangle 132"/>
+          <p:cNvSpPr/>
+          <p:nvPr/>
+        </p:nvSpPr>
+        <p:spPr>
+          <a:xfrm flipV="1">
+            <a:off x="838830" y="5364345"/>
+            <a:ext cx="164592" cy="164592"/>
+          </a:xfrm>
+          <a:prstGeom prst="triangle">
+            <a:avLst/>
+          </a:prstGeom>
+          <a:solidFill>
+            <a:schemeClr val="tx1">
+              <a:lumMod val="50000"/>
+              <a:lumOff val="50000"/>
+            </a:schemeClr>
+          </a:solidFill>
+          <a:ln w="19050">
+            <a:solidFill>
+              <a:schemeClr val="tx1">
+                <a:lumMod val="50000"/>
+                <a:lumOff val="50000"/>
+              </a:schemeClr>
+            </a:solidFill>
+          </a:ln>
+        </p:spPr>
+        <p:style>
+          <a:lnRef idx="2">
+            <a:schemeClr val="accent1">
+              <a:shade val="50000"/>
+            </a:schemeClr>
+          </a:lnRef>
+          <a:fillRef idx="1">
+            <a:schemeClr val="accent1"/>
+          </a:fillRef>
+          <a:effectRef idx="0">
+            <a:schemeClr val="accent1"/>
+          </a:effectRef>
+          <a:fontRef idx="minor">
+            <a:schemeClr val="lt1"/>
+          </a:fontRef>
+        </p:style>
+        <p:txBody>
+          <a:bodyPr rtlCol="0" anchor="ctr"/>
+          <a:lstStyle/>
+          <a:p>
+            <a:pPr algn="ctr"/>
+            <a:endParaRPr lang="en-US"/>
+          </a:p>
+        </p:txBody>
+      </p:sp>
+      <p:sp>
+        <p:nvSpPr>
+          <p:cNvPr id="134" name="Isosceles Triangle 133"/>
+          <p:cNvSpPr/>
+          <p:nvPr/>
+        </p:nvSpPr>
+        <p:spPr>
+          <a:xfrm flipV="1">
+            <a:off x="2401704" y="5347212"/>
+            <a:ext cx="164592" cy="164592"/>
+          </a:xfrm>
+          <a:prstGeom prst="triangle">
+            <a:avLst/>
+          </a:prstGeom>
+          <a:solidFill>
+            <a:schemeClr val="tx1">
+              <a:lumMod val="50000"/>
+              <a:lumOff val="50000"/>
+            </a:schemeClr>
+          </a:solidFill>
+          <a:ln w="19050">
+            <a:solidFill>
+              <a:schemeClr val="tx1">
+                <a:lumMod val="50000"/>
+                <a:lumOff val="50000"/>
+              </a:schemeClr>
+            </a:solidFill>
+          </a:ln>
+        </p:spPr>
+        <p:style>
+          <a:lnRef idx="2">
+            <a:schemeClr val="accent1">
+              <a:shade val="50000"/>
+            </a:schemeClr>
+          </a:lnRef>
+          <a:fillRef idx="1">
+            <a:schemeClr val="accent1"/>
+          </a:fillRef>
+          <a:effectRef idx="0">
+            <a:schemeClr val="accent1"/>
+          </a:effectRef>
+          <a:fontRef idx="minor">
+            <a:schemeClr val="lt1"/>
+          </a:fontRef>
+        </p:style>
+        <p:txBody>
+          <a:bodyPr rtlCol="0" anchor="ctr"/>
+          <a:lstStyle/>
+          <a:p>
+            <a:pPr algn="ctr"/>
+            <a:endParaRPr lang="en-US"/>
+          </a:p>
+        </p:txBody>
+      </p:sp>
     </p:spTree>
     <p:extLst>
       <p:ext uri="{BB962C8B-B14F-4D97-AF65-F5344CB8AC3E}">

</xml_diff>

<commit_message>
tweaks to fig 4
</commit_message>
<xml_diff>
--- a/output/plots/all_figs_with_legends.pptx
+++ b/output/plots/all_figs_with_legends.pptx
@@ -5980,7 +5980,7 @@
       </p:grpSpPr>
       <p:pic>
         <p:nvPicPr>
-          <p:cNvPr id="4" name="Picture 3"/>
+          <p:cNvPr id="3" name="Picture 2"/>
           <p:cNvPicPr>
             <a:picLocks noChangeAspect="1"/>
           </p:cNvPicPr>
@@ -5994,8 +5994,8 @@
         </p:blipFill>
         <p:spPr>
           <a:xfrm>
-            <a:off x="1240901" y="0"/>
-            <a:ext cx="9237461" cy="6858000"/>
+            <a:off x="1268374" y="0"/>
+            <a:ext cx="9209988" cy="6787491"/>
           </a:xfrm>
           <a:prstGeom prst="rect">
             <a:avLst/>
@@ -6042,7 +6042,7 @@
         </p:blipFill>
         <p:spPr>
           <a:xfrm>
-            <a:off x="8971626" y="4779389"/>
+            <a:off x="8971626" y="4619134"/>
             <a:ext cx="1506736" cy="1512444"/>
           </a:xfrm>
           <a:prstGeom prst="rect">
@@ -6159,12 +6159,30 @@
             <p:ph type="title"/>
           </p:nvPr>
         </p:nvSpPr>
-        <p:spPr/>
+        <p:spPr>
+          <a:xfrm>
+            <a:off x="10859678" y="365125"/>
+            <a:ext cx="1332322" cy="1325563"/>
+          </a:xfrm>
+        </p:spPr>
         <p:txBody>
-          <a:bodyPr/>
+          <a:bodyPr>
+            <a:normAutofit fontScale="90000"/>
+          </a:bodyPr>
           <a:lstStyle/>
           <a:p>
-            <a:endParaRPr lang="en-US"/>
+            <a:r>
+              <a:rPr lang="en-US" dirty="0" err="1" smtClean="0"/>
+              <a:t>Supp</a:t>
+            </a:r>
+            <a:r>
+              <a:rPr lang="en-US" dirty="0" smtClean="0"/>
+              <a:t> 25</a:t>
+            </a:r>
+            <a:br>
+              <a:rPr lang="en-US" dirty="0" smtClean="0"/>
+            </a:br>
+            <a:endParaRPr lang="en-US" dirty="0"/>
           </a:p>
         </p:txBody>
       </p:sp>
@@ -6343,7 +6361,7 @@
       </p:grpSpPr>
       <p:pic>
         <p:nvPicPr>
-          <p:cNvPr id="4" name="Picture 3"/>
+          <p:cNvPr id="2" name="Picture 1"/>
           <p:cNvPicPr>
             <a:picLocks noChangeAspect="1"/>
           </p:cNvPicPr>
@@ -6357,8 +6375,8 @@
         </p:blipFill>
         <p:spPr>
           <a:xfrm>
-            <a:off x="1365561" y="0"/>
-            <a:ext cx="9136455" cy="6858000"/>
+            <a:off x="1358196" y="0"/>
+            <a:ext cx="8950144" cy="6858000"/>
           </a:xfrm>
           <a:prstGeom prst="rect">
             <a:avLst/>

</xml_diff>

<commit_message>
upped font size of logseries/normal labels, added arrow
</commit_message>
<xml_diff>
--- a/output/plots/all_figs_with_legends.pptx
+++ b/output/plots/all_figs_with_legends.pptx
@@ -3799,28 +3799,28 @@
                 <a:gridCol w="802944">
                   <a:extLst>
                     <a:ext uri="{9D8B030D-6E8A-4147-A177-3AD203B41FA5}">
-                      <a16:colId xmlns:a16="http://schemas.microsoft.com/office/drawing/2014/main" val="3777247511"/>
+                      <a16:colId xmlns:a16="http://schemas.microsoft.com/office/drawing/2014/main" xmlns="" val="3777247511"/>
                     </a:ext>
                   </a:extLst>
                 </a:gridCol>
                 <a:gridCol w="1200230">
                   <a:extLst>
                     <a:ext uri="{9D8B030D-6E8A-4147-A177-3AD203B41FA5}">
-                      <a16:colId xmlns:a16="http://schemas.microsoft.com/office/drawing/2014/main" val="3565287180"/>
+                      <a16:colId xmlns:a16="http://schemas.microsoft.com/office/drawing/2014/main" xmlns="" val="3565287180"/>
                     </a:ext>
                   </a:extLst>
                 </a:gridCol>
                 <a:gridCol w="710503">
                   <a:extLst>
                     <a:ext uri="{9D8B030D-6E8A-4147-A177-3AD203B41FA5}">
-                      <a16:colId xmlns:a16="http://schemas.microsoft.com/office/drawing/2014/main" val="310175345"/>
+                      <a16:colId xmlns:a16="http://schemas.microsoft.com/office/drawing/2014/main" xmlns="" val="310175345"/>
                     </a:ext>
                   </a:extLst>
                 </a:gridCol>
                 <a:gridCol w="1488412">
                   <a:extLst>
                     <a:ext uri="{9D8B030D-6E8A-4147-A177-3AD203B41FA5}">
-                      <a16:colId xmlns:a16="http://schemas.microsoft.com/office/drawing/2014/main" val="2991616883"/>
+                      <a16:colId xmlns:a16="http://schemas.microsoft.com/office/drawing/2014/main" xmlns="" val="2991616883"/>
                     </a:ext>
                   </a:extLst>
                 </a:gridCol>
@@ -4048,7 +4048,7 @@
                 </a:tc>
                 <a:extLst>
                   <a:ext uri="{0D108BD9-81ED-4DB2-BD59-A6C34878D82A}">
-                    <a16:rowId xmlns:a16="http://schemas.microsoft.com/office/drawing/2014/main" val="3689353912"/>
+                    <a16:rowId xmlns:a16="http://schemas.microsoft.com/office/drawing/2014/main" xmlns="" val="3689353912"/>
                   </a:ext>
                 </a:extLst>
               </a:tr>
@@ -4263,7 +4263,7 @@
                 </a:tc>
                 <a:extLst>
                   <a:ext uri="{0D108BD9-81ED-4DB2-BD59-A6C34878D82A}">
-                    <a16:rowId xmlns:a16="http://schemas.microsoft.com/office/drawing/2014/main" val="3236650058"/>
+                    <a16:rowId xmlns:a16="http://schemas.microsoft.com/office/drawing/2014/main" xmlns="" val="3236650058"/>
                   </a:ext>
                 </a:extLst>
               </a:tr>
@@ -4478,7 +4478,7 @@
                 </a:tc>
                 <a:extLst>
                   <a:ext uri="{0D108BD9-81ED-4DB2-BD59-A6C34878D82A}">
-                    <a16:rowId xmlns:a16="http://schemas.microsoft.com/office/drawing/2014/main" val="848586666"/>
+                    <a16:rowId xmlns:a16="http://schemas.microsoft.com/office/drawing/2014/main" xmlns="" val="848586666"/>
                   </a:ext>
                 </a:extLst>
               </a:tr>
@@ -4689,7 +4689,7 @@
                 </a:tc>
                 <a:extLst>
                   <a:ext uri="{0D108BD9-81ED-4DB2-BD59-A6C34878D82A}">
-                    <a16:rowId xmlns:a16="http://schemas.microsoft.com/office/drawing/2014/main" val="366495031"/>
+                    <a16:rowId xmlns:a16="http://schemas.microsoft.com/office/drawing/2014/main" xmlns="" val="366495031"/>
                   </a:ext>
                 </a:extLst>
               </a:tr>
@@ -4773,14 +4773,14 @@
                 <a:gridCol w="487265">
                   <a:extLst>
                     <a:ext uri="{9D8B030D-6E8A-4147-A177-3AD203B41FA5}">
-                      <a16:colId xmlns:a16="http://schemas.microsoft.com/office/drawing/2014/main" val="1812283001"/>
+                      <a16:colId xmlns:a16="http://schemas.microsoft.com/office/drawing/2014/main" xmlns="" val="1812283001"/>
                     </a:ext>
                   </a:extLst>
                 </a:gridCol>
                 <a:gridCol w="1427585">
                   <a:extLst>
                     <a:ext uri="{9D8B030D-6E8A-4147-A177-3AD203B41FA5}">
-                      <a16:colId xmlns:a16="http://schemas.microsoft.com/office/drawing/2014/main" val="3574134326"/>
+                      <a16:colId xmlns:a16="http://schemas.microsoft.com/office/drawing/2014/main" xmlns="" val="3574134326"/>
                     </a:ext>
                   </a:extLst>
                 </a:gridCol>
@@ -4812,7 +4812,7 @@
                 </a:tc>
                 <a:extLst>
                   <a:ext uri="{0D108BD9-81ED-4DB2-BD59-A6C34878D82A}">
-                    <a16:rowId xmlns:a16="http://schemas.microsoft.com/office/drawing/2014/main" val="34741539"/>
+                    <a16:rowId xmlns:a16="http://schemas.microsoft.com/office/drawing/2014/main" xmlns="" val="34741539"/>
                   </a:ext>
                 </a:extLst>
               </a:tr>
@@ -4843,7 +4843,7 @@
                 </a:tc>
                 <a:extLst>
                   <a:ext uri="{0D108BD9-81ED-4DB2-BD59-A6C34878D82A}">
-                    <a16:rowId xmlns:a16="http://schemas.microsoft.com/office/drawing/2014/main" val="1816204491"/>
+                    <a16:rowId xmlns:a16="http://schemas.microsoft.com/office/drawing/2014/main" xmlns="" val="1816204491"/>
                   </a:ext>
                 </a:extLst>
               </a:tr>
@@ -4874,7 +4874,7 @@
                 </a:tc>
                 <a:extLst>
                   <a:ext uri="{0D108BD9-81ED-4DB2-BD59-A6C34878D82A}">
-                    <a16:rowId xmlns:a16="http://schemas.microsoft.com/office/drawing/2014/main" val="3053943592"/>
+                    <a16:rowId xmlns:a16="http://schemas.microsoft.com/office/drawing/2014/main" xmlns="" val="3053943592"/>
                   </a:ext>
                 </a:extLst>
               </a:tr>
@@ -4905,7 +4905,7 @@
                 </a:tc>
                 <a:extLst>
                   <a:ext uri="{0D108BD9-81ED-4DB2-BD59-A6C34878D82A}">
-                    <a16:rowId xmlns:a16="http://schemas.microsoft.com/office/drawing/2014/main" val="1425409090"/>
+                    <a16:rowId xmlns:a16="http://schemas.microsoft.com/office/drawing/2014/main" xmlns="" val="1425409090"/>
                   </a:ext>
                 </a:extLst>
               </a:tr>
@@ -4936,7 +4936,7 @@
                 </a:tc>
                 <a:extLst>
                   <a:ext uri="{0D108BD9-81ED-4DB2-BD59-A6C34878D82A}">
-                    <a16:rowId xmlns:a16="http://schemas.microsoft.com/office/drawing/2014/main" val="3097088923"/>
+                    <a16:rowId xmlns:a16="http://schemas.microsoft.com/office/drawing/2014/main" xmlns="" val="3097088923"/>
                   </a:ext>
                 </a:extLst>
               </a:tr>
@@ -4967,7 +4967,7 @@
                 </a:tc>
                 <a:extLst>
                   <a:ext uri="{0D108BD9-81ED-4DB2-BD59-A6C34878D82A}">
-                    <a16:rowId xmlns:a16="http://schemas.microsoft.com/office/drawing/2014/main" val="1149511687"/>
+                    <a16:rowId xmlns:a16="http://schemas.microsoft.com/office/drawing/2014/main" xmlns="" val="1149511687"/>
                   </a:ext>
                 </a:extLst>
               </a:tr>
@@ -4998,7 +4998,7 @@
                 </a:tc>
                 <a:extLst>
                   <a:ext uri="{0D108BD9-81ED-4DB2-BD59-A6C34878D82A}">
-                    <a16:rowId xmlns:a16="http://schemas.microsoft.com/office/drawing/2014/main" val="785655806"/>
+                    <a16:rowId xmlns:a16="http://schemas.microsoft.com/office/drawing/2014/main" xmlns="" val="785655806"/>
                   </a:ext>
                 </a:extLst>
               </a:tr>
@@ -5254,14 +5254,14 @@
                 <a:gridCol w="1261110">
                   <a:extLst>
                     <a:ext uri="{9D8B030D-6E8A-4147-A177-3AD203B41FA5}">
-                      <a16:colId xmlns:a16="http://schemas.microsoft.com/office/drawing/2014/main" val="1963467705"/>
+                      <a16:colId xmlns:a16="http://schemas.microsoft.com/office/drawing/2014/main" xmlns="" val="1963467705"/>
                     </a:ext>
                   </a:extLst>
                 </a:gridCol>
                 <a:gridCol w="928174">
                   <a:extLst>
                     <a:ext uri="{9D8B030D-6E8A-4147-A177-3AD203B41FA5}">
-                      <a16:colId xmlns:a16="http://schemas.microsoft.com/office/drawing/2014/main" val="464586843"/>
+                      <a16:colId xmlns:a16="http://schemas.microsoft.com/office/drawing/2014/main" xmlns="" val="464586843"/>
                     </a:ext>
                   </a:extLst>
                 </a:gridCol>
@@ -5369,7 +5369,7 @@
                 </a:tc>
                 <a:extLst>
                   <a:ext uri="{0D108BD9-81ED-4DB2-BD59-A6C34878D82A}">
-                    <a16:rowId xmlns:a16="http://schemas.microsoft.com/office/drawing/2014/main" val="1216226580"/>
+                    <a16:rowId xmlns:a16="http://schemas.microsoft.com/office/drawing/2014/main" xmlns="" val="1216226580"/>
                   </a:ext>
                 </a:extLst>
               </a:tr>
@@ -5476,7 +5476,7 @@
                 </a:tc>
                 <a:extLst>
                   <a:ext uri="{0D108BD9-81ED-4DB2-BD59-A6C34878D82A}">
-                    <a16:rowId xmlns:a16="http://schemas.microsoft.com/office/drawing/2014/main" val="512741848"/>
+                    <a16:rowId xmlns:a16="http://schemas.microsoft.com/office/drawing/2014/main" xmlns="" val="512741848"/>
                   </a:ext>
                 </a:extLst>
               </a:tr>
@@ -5583,7 +5583,7 @@
                 </a:tc>
                 <a:extLst>
                   <a:ext uri="{0D108BD9-81ED-4DB2-BD59-A6C34878D82A}">
-                    <a16:rowId xmlns:a16="http://schemas.microsoft.com/office/drawing/2014/main" val="2231260421"/>
+                    <a16:rowId xmlns:a16="http://schemas.microsoft.com/office/drawing/2014/main" xmlns="" val="2231260421"/>
                   </a:ext>
                 </a:extLst>
               </a:tr>
@@ -6059,7 +6059,7 @@
         <p:spPr>
           <a:xfrm>
             <a:off x="2193215" y="2537382"/>
-            <a:ext cx="1190920" cy="646331"/>
+            <a:ext cx="1324900" cy="707886"/>
           </a:xfrm>
           <a:prstGeom prst="rect">
             <a:avLst/>
@@ -6073,16 +6073,16 @@
           <a:lstStyle/>
           <a:p>
             <a:r>
-              <a:rPr lang="en-US" dirty="0"/>
+              <a:rPr lang="en-US" sz="2000" dirty="0"/>
               <a:t>l</a:t>
             </a:r>
             <a:r>
-              <a:rPr lang="en-US" dirty="0" smtClean="0"/>
+              <a:rPr lang="en-US" sz="2000" dirty="0" smtClean="0"/>
               <a:t>ognormal</a:t>
             </a:r>
           </a:p>
           <a:p>
-            <a:endParaRPr lang="en-US" dirty="0"/>
+            <a:endParaRPr lang="en-US" sz="2000" dirty="0"/>
           </a:p>
         </p:txBody>
       </p:sp>
@@ -6094,8 +6094,8 @@
         </p:nvSpPr>
         <p:spPr>
           <a:xfrm>
-            <a:off x="4540490" y="2537382"/>
-            <a:ext cx="1190920" cy="646331"/>
+            <a:off x="4478498" y="2537382"/>
+            <a:ext cx="1324900" cy="707886"/>
           </a:xfrm>
           <a:prstGeom prst="rect">
             <a:avLst/>
@@ -6109,16 +6109,53 @@
           <a:lstStyle/>
           <a:p>
             <a:r>
-              <a:rPr lang="en-US" dirty="0" err="1" smtClean="0"/>
+              <a:rPr lang="en-US" sz="2000" dirty="0" err="1" smtClean="0"/>
               <a:t>logseries</a:t>
             </a:r>
-            <a:endParaRPr lang="en-US" dirty="0" smtClean="0"/>
-          </a:p>
-          <a:p>
-            <a:endParaRPr lang="en-US" dirty="0"/>
+            <a:endParaRPr lang="en-US" sz="2000" dirty="0" smtClean="0"/>
+          </a:p>
+          <a:p>
+            <a:endParaRPr lang="en-US" sz="2000" dirty="0"/>
           </a:p>
         </p:txBody>
       </p:sp>
+      <p:cxnSp>
+        <p:nvCxnSpPr>
+          <p:cNvPr id="4" name="Straight Arrow Connector 3"/>
+          <p:cNvCxnSpPr/>
+          <p:nvPr/>
+        </p:nvCxnSpPr>
+        <p:spPr>
+          <a:xfrm>
+            <a:off x="3471620" y="2735451"/>
+            <a:ext cx="906650" cy="0"/>
+          </a:xfrm>
+          <a:prstGeom prst="straightConnector1">
+            <a:avLst/>
+          </a:prstGeom>
+          <a:ln w="28575">
+            <a:solidFill>
+              <a:schemeClr val="tx1"/>
+            </a:solidFill>
+            <a:headEnd type="arrow" w="med" len="med"/>
+            <a:tailEnd type="arrow" w="med" len="med"/>
+          </a:ln>
+        </p:spPr>
+        <p:style>
+          <a:lnRef idx="1">
+            <a:schemeClr val="accent1"/>
+          </a:lnRef>
+          <a:fillRef idx="0">
+            <a:schemeClr val="accent1"/>
+          </a:fillRef>
+          <a:effectRef idx="0">
+            <a:schemeClr val="accent1"/>
+          </a:effectRef>
+          <a:fontRef idx="minor">
+            <a:schemeClr val="tx1"/>
+          </a:fontRef>
+        </p:style>
+      </p:cxnSp>
     </p:spTree>
     <p:extLst>
       <p:ext uri="{BB962C8B-B14F-4D97-AF65-F5344CB8AC3E}">
@@ -7090,14 +7127,14 @@
                 <a:gridCol w="872346">
                   <a:extLst>
                     <a:ext uri="{9D8B030D-6E8A-4147-A177-3AD203B41FA5}">
-                      <a16:colId xmlns:a16="http://schemas.microsoft.com/office/drawing/2014/main" val="20000"/>
+                      <a16:colId xmlns:a16="http://schemas.microsoft.com/office/drawing/2014/main" xmlns="" val="20000"/>
                     </a:ext>
                   </a:extLst>
                 </a:gridCol>
                 <a:gridCol w="872346">
                   <a:extLst>
                     <a:ext uri="{9D8B030D-6E8A-4147-A177-3AD203B41FA5}">
-                      <a16:colId xmlns:a16="http://schemas.microsoft.com/office/drawing/2014/main" val="20001"/>
+                      <a16:colId xmlns:a16="http://schemas.microsoft.com/office/drawing/2014/main" xmlns="" val="20001"/>
                     </a:ext>
                   </a:extLst>
                 </a:gridCol>
@@ -7217,7 +7254,7 @@
                 </a:tc>
                 <a:extLst>
                   <a:ext uri="{0D108BD9-81ED-4DB2-BD59-A6C34878D82A}">
-                    <a16:rowId xmlns:a16="http://schemas.microsoft.com/office/drawing/2014/main" val="10000"/>
+                    <a16:rowId xmlns:a16="http://schemas.microsoft.com/office/drawing/2014/main" xmlns="" val="10000"/>
                   </a:ext>
                 </a:extLst>
               </a:tr>
@@ -7336,7 +7373,7 @@
                 </a:tc>
                 <a:extLst>
                   <a:ext uri="{0D108BD9-81ED-4DB2-BD59-A6C34878D82A}">
-                    <a16:rowId xmlns:a16="http://schemas.microsoft.com/office/drawing/2014/main" val="10001"/>
+                    <a16:rowId xmlns:a16="http://schemas.microsoft.com/office/drawing/2014/main" xmlns="" val="10001"/>
                   </a:ext>
                 </a:extLst>
               </a:tr>

</xml_diff>

<commit_message>
adding back in AH edits to Fig 1e from Jun 27 that got overwritten
</commit_message>
<xml_diff>
--- a/output/plots/all_figs_with_legends.pptx
+++ b/output/plots/all_figs_with_legends.pptx
@@ -212,7 +212,7 @@
           <a:p>
             <a:fld id="{7FA21820-D199-4D82-91AF-C50B1D3B111A}" type="datetimeFigureOut">
               <a:rPr lang="en-US" smtClean="0"/>
-              <a:t>7/14/2017</a:t>
+              <a:t>7/28/2017</a:t>
             </a:fld>
             <a:endParaRPr lang="en-US"/>
           </a:p>
@@ -1045,7 +1045,7 @@
           <a:p>
             <a:fld id="{916B8C92-D5E3-4480-8685-D57BEE386DE2}" type="datetimeFigureOut">
               <a:rPr lang="en-US" smtClean="0"/>
-              <a:t>7/14/2017</a:t>
+              <a:t>7/28/2017</a:t>
             </a:fld>
             <a:endParaRPr lang="en-US"/>
           </a:p>
@@ -1215,7 +1215,7 @@
           <a:p>
             <a:fld id="{916B8C92-D5E3-4480-8685-D57BEE386DE2}" type="datetimeFigureOut">
               <a:rPr lang="en-US" smtClean="0"/>
-              <a:t>7/14/2017</a:t>
+              <a:t>7/28/2017</a:t>
             </a:fld>
             <a:endParaRPr lang="en-US"/>
           </a:p>
@@ -1395,7 +1395,7 @@
           <a:p>
             <a:fld id="{916B8C92-D5E3-4480-8685-D57BEE386DE2}" type="datetimeFigureOut">
               <a:rPr lang="en-US" smtClean="0"/>
-              <a:t>7/14/2017</a:t>
+              <a:t>7/28/2017</a:t>
             </a:fld>
             <a:endParaRPr lang="en-US"/>
           </a:p>
@@ -1565,7 +1565,7 @@
           <a:p>
             <a:fld id="{916B8C92-D5E3-4480-8685-D57BEE386DE2}" type="datetimeFigureOut">
               <a:rPr lang="en-US" smtClean="0"/>
-              <a:t>7/14/2017</a:t>
+              <a:t>7/28/2017</a:t>
             </a:fld>
             <a:endParaRPr lang="en-US"/>
           </a:p>
@@ -1811,7 +1811,7 @@
           <a:p>
             <a:fld id="{916B8C92-D5E3-4480-8685-D57BEE386DE2}" type="datetimeFigureOut">
               <a:rPr lang="en-US" smtClean="0"/>
-              <a:t>7/14/2017</a:t>
+              <a:t>7/28/2017</a:t>
             </a:fld>
             <a:endParaRPr lang="en-US"/>
           </a:p>
@@ -2043,7 +2043,7 @@
           <a:p>
             <a:fld id="{916B8C92-D5E3-4480-8685-D57BEE386DE2}" type="datetimeFigureOut">
               <a:rPr lang="en-US" smtClean="0"/>
-              <a:t>7/14/2017</a:t>
+              <a:t>7/28/2017</a:t>
             </a:fld>
             <a:endParaRPr lang="en-US"/>
           </a:p>
@@ -2410,7 +2410,7 @@
           <a:p>
             <a:fld id="{916B8C92-D5E3-4480-8685-D57BEE386DE2}" type="datetimeFigureOut">
               <a:rPr lang="en-US" smtClean="0"/>
-              <a:t>7/14/2017</a:t>
+              <a:t>7/28/2017</a:t>
             </a:fld>
             <a:endParaRPr lang="en-US"/>
           </a:p>
@@ -2528,7 +2528,7 @@
           <a:p>
             <a:fld id="{916B8C92-D5E3-4480-8685-D57BEE386DE2}" type="datetimeFigureOut">
               <a:rPr lang="en-US" smtClean="0"/>
-              <a:t>7/14/2017</a:t>
+              <a:t>7/28/2017</a:t>
             </a:fld>
             <a:endParaRPr lang="en-US"/>
           </a:p>
@@ -2623,7 +2623,7 @@
           <a:p>
             <a:fld id="{916B8C92-D5E3-4480-8685-D57BEE386DE2}" type="datetimeFigureOut">
               <a:rPr lang="en-US" smtClean="0"/>
-              <a:t>7/14/2017</a:t>
+              <a:t>7/28/2017</a:t>
             </a:fld>
             <a:endParaRPr lang="en-US"/>
           </a:p>
@@ -2900,7 +2900,7 @@
           <a:p>
             <a:fld id="{916B8C92-D5E3-4480-8685-D57BEE386DE2}" type="datetimeFigureOut">
               <a:rPr lang="en-US" smtClean="0"/>
-              <a:t>7/14/2017</a:t>
+              <a:t>7/28/2017</a:t>
             </a:fld>
             <a:endParaRPr lang="en-US"/>
           </a:p>
@@ -3153,7 +3153,7 @@
           <a:p>
             <a:fld id="{916B8C92-D5E3-4480-8685-D57BEE386DE2}" type="datetimeFigureOut">
               <a:rPr lang="en-US" smtClean="0"/>
-              <a:t>7/14/2017</a:t>
+              <a:t>7/28/2017</a:t>
             </a:fld>
             <a:endParaRPr lang="en-US"/>
           </a:p>
@@ -3366,7 +3366,7 @@
           <a:p>
             <a:fld id="{916B8C92-D5E3-4480-8685-D57BEE386DE2}" type="datetimeFigureOut">
               <a:rPr lang="en-US" smtClean="0"/>
-              <a:t>7/14/2017</a:t>
+              <a:t>7/28/2017</a:t>
             </a:fld>
             <a:endParaRPr lang="en-US"/>
           </a:p>
@@ -3799,28 +3799,28 @@
                 <a:gridCol w="802944">
                   <a:extLst>
                     <a:ext uri="{9D8B030D-6E8A-4147-A177-3AD203B41FA5}">
-                      <a16:colId xmlns:a16="http://schemas.microsoft.com/office/drawing/2014/main" val="3777247511"/>
+                      <a16:colId xmlns:a16="http://schemas.microsoft.com/office/drawing/2014/main" xmlns="" val="3777247511"/>
                     </a:ext>
                   </a:extLst>
                 </a:gridCol>
                 <a:gridCol w="1200230">
                   <a:extLst>
                     <a:ext uri="{9D8B030D-6E8A-4147-A177-3AD203B41FA5}">
-                      <a16:colId xmlns:a16="http://schemas.microsoft.com/office/drawing/2014/main" val="3565287180"/>
+                      <a16:colId xmlns:a16="http://schemas.microsoft.com/office/drawing/2014/main" xmlns="" val="3565287180"/>
                     </a:ext>
                   </a:extLst>
                 </a:gridCol>
                 <a:gridCol w="710503">
                   <a:extLst>
                     <a:ext uri="{9D8B030D-6E8A-4147-A177-3AD203B41FA5}">
-                      <a16:colId xmlns:a16="http://schemas.microsoft.com/office/drawing/2014/main" val="310175345"/>
+                      <a16:colId xmlns:a16="http://schemas.microsoft.com/office/drawing/2014/main" xmlns="" val="310175345"/>
                     </a:ext>
                   </a:extLst>
                 </a:gridCol>
                 <a:gridCol w="1488412">
                   <a:extLst>
                     <a:ext uri="{9D8B030D-6E8A-4147-A177-3AD203B41FA5}">
-                      <a16:colId xmlns:a16="http://schemas.microsoft.com/office/drawing/2014/main" val="2991616883"/>
+                      <a16:colId xmlns:a16="http://schemas.microsoft.com/office/drawing/2014/main" xmlns="" val="2991616883"/>
                     </a:ext>
                   </a:extLst>
                 </a:gridCol>
@@ -4048,7 +4048,7 @@
                 </a:tc>
                 <a:extLst>
                   <a:ext uri="{0D108BD9-81ED-4DB2-BD59-A6C34878D82A}">
-                    <a16:rowId xmlns:a16="http://schemas.microsoft.com/office/drawing/2014/main" val="3689353912"/>
+                    <a16:rowId xmlns:a16="http://schemas.microsoft.com/office/drawing/2014/main" xmlns="" val="3689353912"/>
                   </a:ext>
                 </a:extLst>
               </a:tr>
@@ -4263,7 +4263,7 @@
                 </a:tc>
                 <a:extLst>
                   <a:ext uri="{0D108BD9-81ED-4DB2-BD59-A6C34878D82A}">
-                    <a16:rowId xmlns:a16="http://schemas.microsoft.com/office/drawing/2014/main" val="3236650058"/>
+                    <a16:rowId xmlns:a16="http://schemas.microsoft.com/office/drawing/2014/main" xmlns="" val="3236650058"/>
                   </a:ext>
                 </a:extLst>
               </a:tr>
@@ -4478,7 +4478,7 @@
                 </a:tc>
                 <a:extLst>
                   <a:ext uri="{0D108BD9-81ED-4DB2-BD59-A6C34878D82A}">
-                    <a16:rowId xmlns:a16="http://schemas.microsoft.com/office/drawing/2014/main" val="848586666"/>
+                    <a16:rowId xmlns:a16="http://schemas.microsoft.com/office/drawing/2014/main" xmlns="" val="848586666"/>
                   </a:ext>
                 </a:extLst>
               </a:tr>
@@ -4689,7 +4689,7 @@
                 </a:tc>
                 <a:extLst>
                   <a:ext uri="{0D108BD9-81ED-4DB2-BD59-A6C34878D82A}">
-                    <a16:rowId xmlns:a16="http://schemas.microsoft.com/office/drawing/2014/main" val="366495031"/>
+                    <a16:rowId xmlns:a16="http://schemas.microsoft.com/office/drawing/2014/main" xmlns="" val="366495031"/>
                   </a:ext>
                 </a:extLst>
               </a:tr>
@@ -4773,14 +4773,14 @@
                 <a:gridCol w="487265">
                   <a:extLst>
                     <a:ext uri="{9D8B030D-6E8A-4147-A177-3AD203B41FA5}">
-                      <a16:colId xmlns:a16="http://schemas.microsoft.com/office/drawing/2014/main" val="1812283001"/>
+                      <a16:colId xmlns:a16="http://schemas.microsoft.com/office/drawing/2014/main" xmlns="" val="1812283001"/>
                     </a:ext>
                   </a:extLst>
                 </a:gridCol>
                 <a:gridCol w="1427585">
                   <a:extLst>
                     <a:ext uri="{9D8B030D-6E8A-4147-A177-3AD203B41FA5}">
-                      <a16:colId xmlns:a16="http://schemas.microsoft.com/office/drawing/2014/main" val="3574134326"/>
+                      <a16:colId xmlns:a16="http://schemas.microsoft.com/office/drawing/2014/main" xmlns="" val="3574134326"/>
                     </a:ext>
                   </a:extLst>
                 </a:gridCol>
@@ -4812,7 +4812,7 @@
                 </a:tc>
                 <a:extLst>
                   <a:ext uri="{0D108BD9-81ED-4DB2-BD59-A6C34878D82A}">
-                    <a16:rowId xmlns:a16="http://schemas.microsoft.com/office/drawing/2014/main" val="34741539"/>
+                    <a16:rowId xmlns:a16="http://schemas.microsoft.com/office/drawing/2014/main" xmlns="" val="34741539"/>
                   </a:ext>
                 </a:extLst>
               </a:tr>
@@ -4843,7 +4843,7 @@
                 </a:tc>
                 <a:extLst>
                   <a:ext uri="{0D108BD9-81ED-4DB2-BD59-A6C34878D82A}">
-                    <a16:rowId xmlns:a16="http://schemas.microsoft.com/office/drawing/2014/main" val="1816204491"/>
+                    <a16:rowId xmlns:a16="http://schemas.microsoft.com/office/drawing/2014/main" xmlns="" val="1816204491"/>
                   </a:ext>
                 </a:extLst>
               </a:tr>
@@ -4874,7 +4874,7 @@
                 </a:tc>
                 <a:extLst>
                   <a:ext uri="{0D108BD9-81ED-4DB2-BD59-A6C34878D82A}">
-                    <a16:rowId xmlns:a16="http://schemas.microsoft.com/office/drawing/2014/main" val="3053943592"/>
+                    <a16:rowId xmlns:a16="http://schemas.microsoft.com/office/drawing/2014/main" xmlns="" val="3053943592"/>
                   </a:ext>
                 </a:extLst>
               </a:tr>
@@ -4905,7 +4905,7 @@
                 </a:tc>
                 <a:extLst>
                   <a:ext uri="{0D108BD9-81ED-4DB2-BD59-A6C34878D82A}">
-                    <a16:rowId xmlns:a16="http://schemas.microsoft.com/office/drawing/2014/main" val="1425409090"/>
+                    <a16:rowId xmlns:a16="http://schemas.microsoft.com/office/drawing/2014/main" xmlns="" val="1425409090"/>
                   </a:ext>
                 </a:extLst>
               </a:tr>
@@ -4936,7 +4936,7 @@
                 </a:tc>
                 <a:extLst>
                   <a:ext uri="{0D108BD9-81ED-4DB2-BD59-A6C34878D82A}">
-                    <a16:rowId xmlns:a16="http://schemas.microsoft.com/office/drawing/2014/main" val="3097088923"/>
+                    <a16:rowId xmlns:a16="http://schemas.microsoft.com/office/drawing/2014/main" xmlns="" val="3097088923"/>
                   </a:ext>
                 </a:extLst>
               </a:tr>
@@ -4967,7 +4967,7 @@
                 </a:tc>
                 <a:extLst>
                   <a:ext uri="{0D108BD9-81ED-4DB2-BD59-A6C34878D82A}">
-                    <a16:rowId xmlns:a16="http://schemas.microsoft.com/office/drawing/2014/main" val="1149511687"/>
+                    <a16:rowId xmlns:a16="http://schemas.microsoft.com/office/drawing/2014/main" xmlns="" val="1149511687"/>
                   </a:ext>
                 </a:extLst>
               </a:tr>
@@ -4998,7 +4998,7 @@
                 </a:tc>
                 <a:extLst>
                   <a:ext uri="{0D108BD9-81ED-4DB2-BD59-A6C34878D82A}">
-                    <a16:rowId xmlns:a16="http://schemas.microsoft.com/office/drawing/2014/main" val="785655806"/>
+                    <a16:rowId xmlns:a16="http://schemas.microsoft.com/office/drawing/2014/main" xmlns="" val="785655806"/>
                   </a:ext>
                 </a:extLst>
               </a:tr>
@@ -5254,14 +5254,14 @@
                 <a:gridCol w="1261110">
                   <a:extLst>
                     <a:ext uri="{9D8B030D-6E8A-4147-A177-3AD203B41FA5}">
-                      <a16:colId xmlns:a16="http://schemas.microsoft.com/office/drawing/2014/main" val="1963467705"/>
+                      <a16:colId xmlns:a16="http://schemas.microsoft.com/office/drawing/2014/main" xmlns="" val="1963467705"/>
                     </a:ext>
                   </a:extLst>
                 </a:gridCol>
                 <a:gridCol w="928174">
                   <a:extLst>
                     <a:ext uri="{9D8B030D-6E8A-4147-A177-3AD203B41FA5}">
-                      <a16:colId xmlns:a16="http://schemas.microsoft.com/office/drawing/2014/main" val="464586843"/>
+                      <a16:colId xmlns:a16="http://schemas.microsoft.com/office/drawing/2014/main" xmlns="" val="464586843"/>
                     </a:ext>
                   </a:extLst>
                 </a:gridCol>
@@ -5369,7 +5369,7 @@
                 </a:tc>
                 <a:extLst>
                   <a:ext uri="{0D108BD9-81ED-4DB2-BD59-A6C34878D82A}">
-                    <a16:rowId xmlns:a16="http://schemas.microsoft.com/office/drawing/2014/main" val="1216226580"/>
+                    <a16:rowId xmlns:a16="http://schemas.microsoft.com/office/drawing/2014/main" xmlns="" val="1216226580"/>
                   </a:ext>
                 </a:extLst>
               </a:tr>
@@ -5476,7 +5476,7 @@
                 </a:tc>
                 <a:extLst>
                   <a:ext uri="{0D108BD9-81ED-4DB2-BD59-A6C34878D82A}">
-                    <a16:rowId xmlns:a16="http://schemas.microsoft.com/office/drawing/2014/main" val="512741848"/>
+                    <a16:rowId xmlns:a16="http://schemas.microsoft.com/office/drawing/2014/main" xmlns="" val="512741848"/>
                   </a:ext>
                 </a:extLst>
               </a:tr>
@@ -5583,7 +5583,7 @@
                 </a:tc>
                 <a:extLst>
                   <a:ext uri="{0D108BD9-81ED-4DB2-BD59-A6C34878D82A}">
-                    <a16:rowId xmlns:a16="http://schemas.microsoft.com/office/drawing/2014/main" val="2231260421"/>
+                    <a16:rowId xmlns:a16="http://schemas.microsoft.com/office/drawing/2014/main" xmlns="" val="2231260421"/>
                   </a:ext>
                 </a:extLst>
               </a:tr>
@@ -7235,14 +7235,14 @@
                 <a:gridCol w="872346">
                   <a:extLst>
                     <a:ext uri="{9D8B030D-6E8A-4147-A177-3AD203B41FA5}">
-                      <a16:colId xmlns:a16="http://schemas.microsoft.com/office/drawing/2014/main" val="20000"/>
+                      <a16:colId xmlns:a16="http://schemas.microsoft.com/office/drawing/2014/main" xmlns="" val="20000"/>
                     </a:ext>
                   </a:extLst>
                 </a:gridCol>
                 <a:gridCol w="872346">
                   <a:extLst>
                     <a:ext uri="{9D8B030D-6E8A-4147-A177-3AD203B41FA5}">
-                      <a16:colId xmlns:a16="http://schemas.microsoft.com/office/drawing/2014/main" val="20001"/>
+                      <a16:colId xmlns:a16="http://schemas.microsoft.com/office/drawing/2014/main" xmlns="" val="20001"/>
                     </a:ext>
                   </a:extLst>
                 </a:gridCol>
@@ -7362,7 +7362,7 @@
                 </a:tc>
                 <a:extLst>
                   <a:ext uri="{0D108BD9-81ED-4DB2-BD59-A6C34878D82A}">
-                    <a16:rowId xmlns:a16="http://schemas.microsoft.com/office/drawing/2014/main" val="10000"/>
+                    <a16:rowId xmlns:a16="http://schemas.microsoft.com/office/drawing/2014/main" xmlns="" val="10000"/>
                   </a:ext>
                 </a:extLst>
               </a:tr>
@@ -7481,7 +7481,7 @@
                 </a:tc>
                 <a:extLst>
                   <a:ext uri="{0D108BD9-81ED-4DB2-BD59-A6C34878D82A}">
-                    <a16:rowId xmlns:a16="http://schemas.microsoft.com/office/drawing/2014/main" val="10001"/>
+                    <a16:rowId xmlns:a16="http://schemas.microsoft.com/office/drawing/2014/main" xmlns="" val="10001"/>
                   </a:ext>
                 </a:extLst>
               </a:tr>
@@ -8904,214 +8904,6 @@
               <a:t>D</a:t>
             </a:r>
             <a:endParaRPr lang="en-US" dirty="0"/>
-          </a:p>
-        </p:txBody>
-      </p:sp>
-      <mc:AlternateContent xmlns:mc="http://schemas.openxmlformats.org/markup-compatibility/2006" xmlns:a14="http://schemas.microsoft.com/office/drawing/2010/main">
-        <mc:Choice Requires="a14">
-          <p:sp>
-            <p:nvSpPr>
-              <p:cNvPr id="143" name="TextBox 142"/>
-              <p:cNvSpPr txBox="1"/>
-              <p:nvPr/>
-            </p:nvSpPr>
-            <p:spPr>
-              <a:xfrm>
-                <a:off x="2216777" y="5923755"/>
-                <a:ext cx="845729" cy="307777"/>
-              </a:xfrm>
-              <a:prstGeom prst="rect">
-                <a:avLst/>
-              </a:prstGeom>
-              <a:noFill/>
-            </p:spPr>
-            <p:txBody>
-              <a:bodyPr wrap="square" rtlCol="0">
-                <a:spAutoFit/>
-              </a:bodyPr>
-              <a:lstStyle/>
-              <a:p>
-                <a:r>
-                  <a:rPr lang="en-US" sz="1400" dirty="0" smtClean="0"/>
-                  <a:t>time </a:t>
-                </a:r>
-                <a14:m>
-                  <m:oMath xmlns:m="http://schemas.openxmlformats.org/officeDocument/2006/math">
-                    <m:sSub>
-                      <m:sSubPr>
-                        <m:ctrlPr>
-                          <a:rPr lang="en-US" sz="1400" i="1" smtClean="0">
-                            <a:latin typeface="Cambria Math" panose="02040503050406030204" pitchFamily="18" charset="0"/>
-                          </a:rPr>
-                        </m:ctrlPr>
-                      </m:sSubPr>
-                      <m:e>
-                        <m:r>
-                          <a:rPr lang="en-US" sz="1400" b="0" i="1">
-                            <a:latin typeface="Cambria Math" panose="02040503050406030204" pitchFamily="18" charset="0"/>
-                          </a:rPr>
-                          <m:t>𝑡</m:t>
-                        </m:r>
-                      </m:e>
-                      <m:sub>
-                        <m:r>
-                          <a:rPr lang="en-US" sz="1400" b="0" i="1" smtClean="0">
-                            <a:latin typeface="Cambria Math" panose="02040503050406030204" pitchFamily="18" charset="0"/>
-                          </a:rPr>
-                          <m:t>2</m:t>
-                        </m:r>
-                      </m:sub>
-                    </m:sSub>
-                  </m:oMath>
-                </a14:m>
-                <a:endParaRPr lang="en-US" sz="1400" dirty="0"/>
-              </a:p>
-            </p:txBody>
-          </p:sp>
-        </mc:Choice>
-        <mc:Fallback xmlns="">
-          <p:sp>
-            <p:nvSpPr>
-              <p:cNvPr id="143" name="TextBox 142"/>
-              <p:cNvSpPr txBox="1">
-                <a:spLocks noRot="1" noChangeAspect="1" noMove="1" noResize="1" noEditPoints="1" noAdjustHandles="1" noChangeArrowheads="1" noChangeShapeType="1" noTextEdit="1"/>
-              </p:cNvSpPr>
-              <p:nvPr/>
-            </p:nvSpPr>
-            <p:spPr>
-              <a:xfrm>
-                <a:off x="2216777" y="5923755"/>
-                <a:ext cx="845729" cy="307777"/>
-              </a:xfrm>
-              <a:prstGeom prst="rect">
-                <a:avLst/>
-              </a:prstGeom>
-              <a:blipFill rotWithShape="0">
-                <a:blip r:embed="rId5"/>
-                <a:stretch>
-                  <a:fillRect l="-2174" t="-4000" b="-20000"/>
-                </a:stretch>
-              </a:blipFill>
-            </p:spPr>
-            <p:txBody>
-              <a:bodyPr/>
-              <a:lstStyle/>
-              <a:p>
-                <a:r>
-                  <a:rPr lang="en-US">
-                    <a:noFill/>
-                  </a:rPr>
-                  <a:t> </a:t>
-                </a:r>
-              </a:p>
-            </p:txBody>
-          </p:sp>
-        </mc:Fallback>
-      </mc:AlternateContent>
-      <p:sp>
-        <p:nvSpPr>
-          <p:cNvPr id="144" name="Right Arrow 143"/>
-          <p:cNvSpPr/>
-          <p:nvPr/>
-        </p:nvSpPr>
-        <p:spPr>
-          <a:xfrm>
-            <a:off x="1528829" y="5263503"/>
-            <a:ext cx="357252" cy="323041"/>
-          </a:xfrm>
-          <a:prstGeom prst="rightArrow">
-            <a:avLst/>
-          </a:prstGeom>
-          <a:solidFill>
-            <a:schemeClr val="tx1"/>
-          </a:solidFill>
-          <a:ln>
-            <a:solidFill>
-              <a:schemeClr val="tx1"/>
-            </a:solidFill>
-          </a:ln>
-        </p:spPr>
-        <p:style>
-          <a:lnRef idx="2">
-            <a:schemeClr val="accent1">
-              <a:shade val="50000"/>
-            </a:schemeClr>
-          </a:lnRef>
-          <a:fillRef idx="1">
-            <a:schemeClr val="accent1"/>
-          </a:fillRef>
-          <a:effectRef idx="0">
-            <a:schemeClr val="accent1"/>
-          </a:effectRef>
-          <a:fontRef idx="minor">
-            <a:schemeClr val="lt1"/>
-          </a:fontRef>
-        </p:style>
-        <p:txBody>
-          <a:bodyPr rtlCol="0" anchor="ctr"/>
-          <a:lstStyle/>
-          <a:p>
-            <a:pPr algn="ctr"/>
-            <a:endParaRPr lang="en-US"/>
-          </a:p>
-        </p:txBody>
-      </p:sp>
-      <p:sp>
-        <p:nvSpPr>
-          <p:cNvPr id="148" name="TextBox 147"/>
-          <p:cNvSpPr txBox="1"/>
-          <p:nvPr/>
-        </p:nvSpPr>
-        <p:spPr>
-          <a:xfrm>
-            <a:off x="3069774" y="5007478"/>
-            <a:ext cx="1425390" cy="276999"/>
-          </a:xfrm>
-          <a:prstGeom prst="rect">
-            <a:avLst/>
-          </a:prstGeom>
-          <a:noFill/>
-        </p:spPr>
-        <p:txBody>
-          <a:bodyPr wrap="none" rtlCol="0">
-            <a:spAutoFit/>
-          </a:bodyPr>
-          <a:lstStyle/>
-          <a:p>
-            <a:r>
-              <a:rPr lang="en-US" sz="1200" dirty="0" smtClean="0"/>
-              <a:t>All species:   	         </a:t>
-            </a:r>
-          </a:p>
-        </p:txBody>
-      </p:sp>
-      <p:sp>
-        <p:nvSpPr>
-          <p:cNvPr id="150" name="TextBox 149"/>
-          <p:cNvSpPr txBox="1"/>
-          <p:nvPr/>
-        </p:nvSpPr>
-        <p:spPr>
-          <a:xfrm>
-            <a:off x="120580" y="4480490"/>
-            <a:ext cx="283271" cy="369332"/>
-          </a:xfrm>
-          <a:prstGeom prst="rect">
-            <a:avLst/>
-          </a:prstGeom>
-          <a:noFill/>
-        </p:spPr>
-        <p:txBody>
-          <a:bodyPr wrap="square" rtlCol="0">
-            <a:spAutoFit/>
-          </a:bodyPr>
-          <a:lstStyle/>
-          <a:p>
-            <a:r>
-              <a:rPr lang="en-US" dirty="0" smtClean="0"/>
-              <a:t>E</a:t>
-            </a:r>
-            <a:endParaRPr lang="en-US" sz="1400" dirty="0"/>
           </a:p>
         </p:txBody>
       </p:sp>
@@ -10266,9 +10058,509 @@
           </a:p>
         </p:txBody>
       </p:sp>
+      <p:sp>
+        <p:nvSpPr>
+          <p:cNvPr id="124" name="Isosceles Triangle 123"/>
+          <p:cNvSpPr/>
+          <p:nvPr/>
+        </p:nvSpPr>
+        <p:spPr>
+          <a:xfrm>
+            <a:off x="697873" y="1563202"/>
+            <a:ext cx="200634" cy="169490"/>
+          </a:xfrm>
+          <a:prstGeom prst="triangle">
+            <a:avLst/>
+          </a:prstGeom>
+          <a:solidFill>
+            <a:schemeClr val="bg1"/>
+          </a:solidFill>
+          <a:ln w="19050">
+            <a:solidFill>
+              <a:schemeClr val="tx1">
+                <a:lumMod val="50000"/>
+                <a:lumOff val="50000"/>
+              </a:schemeClr>
+            </a:solidFill>
+          </a:ln>
+        </p:spPr>
+        <p:style>
+          <a:lnRef idx="2">
+            <a:schemeClr val="accent1">
+              <a:shade val="50000"/>
+            </a:schemeClr>
+          </a:lnRef>
+          <a:fillRef idx="1">
+            <a:schemeClr val="accent1"/>
+          </a:fillRef>
+          <a:effectRef idx="0">
+            <a:schemeClr val="accent1"/>
+          </a:effectRef>
+          <a:fontRef idx="minor">
+            <a:schemeClr val="lt1"/>
+          </a:fontRef>
+        </p:style>
+        <p:txBody>
+          <a:bodyPr rtlCol="0" anchor="ctr"/>
+          <a:lstStyle/>
+          <a:p>
+            <a:pPr algn="ctr"/>
+            <a:endParaRPr lang="en-US"/>
+          </a:p>
+        </p:txBody>
+      </p:sp>
+      <p:sp>
+        <p:nvSpPr>
+          <p:cNvPr id="128" name="Isosceles Triangle 127"/>
+          <p:cNvSpPr/>
+          <p:nvPr/>
+        </p:nvSpPr>
+        <p:spPr>
+          <a:xfrm>
+            <a:off x="2186387" y="1570480"/>
+            <a:ext cx="200634" cy="169490"/>
+          </a:xfrm>
+          <a:prstGeom prst="triangle">
+            <a:avLst/>
+          </a:prstGeom>
+          <a:solidFill>
+            <a:schemeClr val="tx1">
+              <a:lumMod val="50000"/>
+              <a:lumOff val="50000"/>
+            </a:schemeClr>
+          </a:solidFill>
+          <a:ln w="19050">
+            <a:solidFill>
+              <a:schemeClr val="tx1">
+                <a:lumMod val="50000"/>
+                <a:lumOff val="50000"/>
+              </a:schemeClr>
+            </a:solidFill>
+          </a:ln>
+        </p:spPr>
+        <p:style>
+          <a:lnRef idx="2">
+            <a:schemeClr val="accent1">
+              <a:shade val="50000"/>
+            </a:schemeClr>
+          </a:lnRef>
+          <a:fillRef idx="1">
+            <a:schemeClr val="accent1"/>
+          </a:fillRef>
+          <a:effectRef idx="0">
+            <a:schemeClr val="accent1"/>
+          </a:effectRef>
+          <a:fontRef idx="minor">
+            <a:schemeClr val="lt1"/>
+          </a:fontRef>
+        </p:style>
+        <p:txBody>
+          <a:bodyPr rtlCol="0" anchor="ctr"/>
+          <a:lstStyle/>
+          <a:p>
+            <a:pPr algn="ctr"/>
+            <a:endParaRPr lang="en-US"/>
+          </a:p>
+        </p:txBody>
+      </p:sp>
+      <p:sp>
+        <p:nvSpPr>
+          <p:cNvPr id="7" name="TextBox 6"/>
+          <p:cNvSpPr txBox="1"/>
+          <p:nvPr/>
+        </p:nvSpPr>
+        <p:spPr>
+          <a:xfrm>
+            <a:off x="5897105" y="1718465"/>
+            <a:ext cx="4339526" cy="2123658"/>
+          </a:xfrm>
+          <a:prstGeom prst="rect">
+            <a:avLst/>
+          </a:prstGeom>
+          <a:noFill/>
+        </p:spPr>
+        <p:txBody>
+          <a:bodyPr wrap="square" rtlCol="0">
+            <a:spAutoFit/>
+          </a:bodyPr>
+          <a:lstStyle/>
+          <a:p>
+            <a:r>
+              <a:rPr lang="en-US" sz="1100" dirty="0" smtClean="0"/>
+              <a:t>Figure 1. (A) Bimodal distribution of temporal occupancy for North American birds from Coyle et al. (2013). (B) Core and transient species exhibit different species abundance distributions for the </a:t>
+            </a:r>
+            <a:r>
+              <a:rPr lang="en-US" sz="1100" dirty="0" err="1" smtClean="0"/>
+              <a:t>Hinkley</a:t>
+            </a:r>
+            <a:r>
+              <a:rPr lang="en-US" sz="1100" dirty="0" smtClean="0"/>
+              <a:t> Point fish assemblage (</a:t>
+            </a:r>
+            <a:r>
+              <a:rPr lang="en-US" sz="1100" dirty="0" err="1" smtClean="0"/>
+              <a:t>Magurran</a:t>
+            </a:r>
+            <a:r>
+              <a:rPr lang="en-US" sz="1100" dirty="0" smtClean="0"/>
+              <a:t> and Henderson 2003). (C) Four contiguous quadrats in which species (different shapes) may be core (shaded) or transient (open). (D) The species-area relationships for (C) depending on whether transient species are excluded or not, using the lower right panel to represent the smallest area. Because every species is core in at least one quadrat, species richness at the largest scale is the same for the two relationships. (E) Temporal turnover (using one minus the </a:t>
+            </a:r>
+            <a:r>
+              <a:rPr lang="en-US" sz="1100" dirty="0" err="1" smtClean="0"/>
+              <a:t>Jaccard</a:t>
+            </a:r>
+            <a:r>
+              <a:rPr lang="en-US" sz="1100" dirty="0" smtClean="0"/>
+              <a:t> index of similarity) is much lower when transient species are excluded from the calculation, since they are the species most driving turnover.</a:t>
+            </a:r>
+            <a:endParaRPr lang="en-US" sz="1100" dirty="0"/>
+          </a:p>
+        </p:txBody>
+      </p:sp>
+      <p:sp>
+        <p:nvSpPr>
+          <p:cNvPr id="10" name="Rectangle 9"/>
+          <p:cNvSpPr/>
+          <p:nvPr/>
+        </p:nvSpPr>
+        <p:spPr>
+          <a:xfrm>
+            <a:off x="4885154" y="1039231"/>
+            <a:ext cx="473893" cy="197393"/>
+          </a:xfrm>
+          <a:prstGeom prst="rect">
+            <a:avLst/>
+          </a:prstGeom>
+          <a:solidFill>
+            <a:schemeClr val="bg1"/>
+          </a:solidFill>
+          <a:ln>
+            <a:solidFill>
+              <a:schemeClr val="bg1"/>
+            </a:solidFill>
+          </a:ln>
+        </p:spPr>
+        <p:style>
+          <a:lnRef idx="2">
+            <a:schemeClr val="accent1">
+              <a:shade val="50000"/>
+            </a:schemeClr>
+          </a:lnRef>
+          <a:fillRef idx="1">
+            <a:schemeClr val="accent1"/>
+          </a:fillRef>
+          <a:effectRef idx="0">
+            <a:schemeClr val="accent1"/>
+          </a:effectRef>
+          <a:fontRef idx="minor">
+            <a:schemeClr val="lt1"/>
+          </a:fontRef>
+        </p:style>
+        <p:txBody>
+          <a:bodyPr rtlCol="0" anchor="ctr"/>
+          <a:lstStyle/>
+          <a:p>
+            <a:pPr algn="ctr"/>
+            <a:endParaRPr lang="en-US"/>
+          </a:p>
+        </p:txBody>
+      </p:sp>
+      <p:sp>
+        <p:nvSpPr>
+          <p:cNvPr id="18" name="TextBox 17"/>
+          <p:cNvSpPr txBox="1"/>
+          <p:nvPr/>
+        </p:nvSpPr>
+        <p:spPr>
+          <a:xfrm>
+            <a:off x="428072" y="1683729"/>
+            <a:ext cx="785257" cy="261610"/>
+          </a:xfrm>
+          <a:prstGeom prst="rect">
+            <a:avLst/>
+          </a:prstGeom>
+          <a:noFill/>
+        </p:spPr>
+        <p:txBody>
+          <a:bodyPr wrap="square" rtlCol="0">
+            <a:spAutoFit/>
+          </a:bodyPr>
+          <a:lstStyle/>
+          <a:p>
+            <a:r>
+              <a:rPr lang="en-US" sz="1100" dirty="0" smtClean="0"/>
+              <a:t>Transient</a:t>
+            </a:r>
+            <a:endParaRPr lang="en-US" sz="1100" dirty="0"/>
+          </a:p>
+        </p:txBody>
+      </p:sp>
+      <p:sp>
+        <p:nvSpPr>
+          <p:cNvPr id="129" name="TextBox 128"/>
+          <p:cNvSpPr txBox="1"/>
+          <p:nvPr/>
+        </p:nvSpPr>
+        <p:spPr>
+          <a:xfrm>
+            <a:off x="1910269" y="1684771"/>
+            <a:ext cx="785257" cy="261610"/>
+          </a:xfrm>
+          <a:prstGeom prst="rect">
+            <a:avLst/>
+          </a:prstGeom>
+          <a:noFill/>
+        </p:spPr>
+        <p:txBody>
+          <a:bodyPr wrap="square" rtlCol="0">
+            <a:spAutoFit/>
+          </a:bodyPr>
+          <a:lstStyle/>
+          <a:p>
+            <a:pPr algn="ctr"/>
+            <a:r>
+              <a:rPr lang="en-US" sz="1100" dirty="0" smtClean="0"/>
+              <a:t>Core</a:t>
+            </a:r>
+            <a:endParaRPr lang="en-US" sz="1100" dirty="0"/>
+          </a:p>
+        </p:txBody>
+      </p:sp>
+      <p:pic>
+        <p:nvPicPr>
+          <p:cNvPr id="11" name="Picture 10"/>
+          <p:cNvPicPr>
+            <a:picLocks noChangeAspect="1"/>
+          </p:cNvPicPr>
+          <p:nvPr/>
+        </p:nvPicPr>
+        <p:blipFill>
+          <a:blip r:embed="rId4"/>
+          <a:stretch>
+            <a:fillRect/>
+          </a:stretch>
+        </p:blipFill>
+        <p:spPr>
+          <a:xfrm>
+            <a:off x="4031038" y="472910"/>
+            <a:ext cx="939420" cy="520174"/>
+          </a:xfrm>
+          <a:prstGeom prst="rect">
+            <a:avLst/>
+          </a:prstGeom>
+        </p:spPr>
+      </p:pic>
+      <mc:AlternateContent xmlns:mc="http://schemas.openxmlformats.org/markup-compatibility/2006">
+        <mc:Choice xmlns:a14="http://schemas.microsoft.com/office/drawing/2010/main" Requires="a14">
+          <p:sp>
+            <p:nvSpPr>
+              <p:cNvPr id="123" name="TextBox 122"/>
+              <p:cNvSpPr txBox="1"/>
+              <p:nvPr/>
+            </p:nvSpPr>
+            <p:spPr>
+              <a:xfrm>
+                <a:off x="2216777" y="5923755"/>
+                <a:ext cx="845729" cy="307777"/>
+              </a:xfrm>
+              <a:prstGeom prst="rect">
+                <a:avLst/>
+              </a:prstGeom>
+              <a:noFill/>
+            </p:spPr>
+            <p:txBody>
+              <a:bodyPr wrap="square" rtlCol="0">
+                <a:spAutoFit/>
+              </a:bodyPr>
+              <a:lstStyle/>
+              <a:p>
+                <a:r>
+                  <a:rPr lang="en-US" sz="1400" dirty="0" smtClean="0"/>
+                  <a:t>time </a:t>
+                </a:r>
+                <a14:m>
+                  <m:oMath xmlns:m="http://schemas.openxmlformats.org/officeDocument/2006/math">
+                    <m:sSub>
+                      <m:sSubPr>
+                        <m:ctrlPr>
+                          <a:rPr lang="en-US" sz="1400" i="1" smtClean="0">
+                            <a:latin typeface="Cambria Math" panose="02040503050406030204" pitchFamily="18" charset="0"/>
+                          </a:rPr>
+                        </m:ctrlPr>
+                      </m:sSubPr>
+                      <m:e>
+                        <m:r>
+                          <a:rPr lang="en-US" sz="1400" b="0" i="1">
+                            <a:latin typeface="Cambria Math" panose="02040503050406030204" pitchFamily="18" charset="0"/>
+                          </a:rPr>
+                          <m:t>𝑡</m:t>
+                        </m:r>
+                      </m:e>
+                      <m:sub>
+                        <m:r>
+                          <a:rPr lang="en-US" sz="1400" b="0" i="1" smtClean="0">
+                            <a:latin typeface="Cambria Math" panose="02040503050406030204" pitchFamily="18" charset="0"/>
+                          </a:rPr>
+                          <m:t>2</m:t>
+                        </m:r>
+                      </m:sub>
+                    </m:sSub>
+                  </m:oMath>
+                </a14:m>
+                <a:endParaRPr lang="en-US" sz="1400" dirty="0"/>
+              </a:p>
+            </p:txBody>
+          </p:sp>
+        </mc:Choice>
+        <mc:Fallback>
+          <p:sp>
+            <p:nvSpPr>
+              <p:cNvPr id="123" name="TextBox 122"/>
+              <p:cNvSpPr txBox="1">
+                <a:spLocks noRot="1" noChangeAspect="1" noMove="1" noResize="1" noEditPoints="1" noAdjustHandles="1" noChangeArrowheads="1" noChangeShapeType="1" noTextEdit="1"/>
+              </p:cNvSpPr>
+              <p:nvPr/>
+            </p:nvSpPr>
+            <p:spPr>
+              <a:xfrm>
+                <a:off x="2216777" y="5923755"/>
+                <a:ext cx="845729" cy="307777"/>
+              </a:xfrm>
+              <a:prstGeom prst="rect">
+                <a:avLst/>
+              </a:prstGeom>
+              <a:blipFill rotWithShape="0">
+                <a:blip r:embed="rId5"/>
+                <a:stretch>
+                  <a:fillRect l="-2174" t="-4000" b="-20000"/>
+                </a:stretch>
+              </a:blipFill>
+            </p:spPr>
+            <p:txBody>
+              <a:bodyPr/>
+              <a:lstStyle/>
+              <a:p>
+                <a:r>
+                  <a:rPr lang="en-US">
+                    <a:noFill/>
+                  </a:rPr>
+                  <a:t> </a:t>
+                </a:r>
+              </a:p>
+            </p:txBody>
+          </p:sp>
+        </mc:Fallback>
+      </mc:AlternateContent>
+      <p:sp>
+        <p:nvSpPr>
+          <p:cNvPr id="127" name="Right Arrow 126"/>
+          <p:cNvSpPr/>
+          <p:nvPr/>
+        </p:nvSpPr>
+        <p:spPr>
+          <a:xfrm>
+            <a:off x="1528829" y="5263503"/>
+            <a:ext cx="357252" cy="323041"/>
+          </a:xfrm>
+          <a:prstGeom prst="rightArrow">
+            <a:avLst/>
+          </a:prstGeom>
+          <a:solidFill>
+            <a:schemeClr val="tx1"/>
+          </a:solidFill>
+          <a:ln>
+            <a:solidFill>
+              <a:schemeClr val="tx1"/>
+            </a:solidFill>
+          </a:ln>
+        </p:spPr>
+        <p:style>
+          <a:lnRef idx="2">
+            <a:schemeClr val="accent1">
+              <a:shade val="50000"/>
+            </a:schemeClr>
+          </a:lnRef>
+          <a:fillRef idx="1">
+            <a:schemeClr val="accent1"/>
+          </a:fillRef>
+          <a:effectRef idx="0">
+            <a:schemeClr val="accent1"/>
+          </a:effectRef>
+          <a:fontRef idx="minor">
+            <a:schemeClr val="lt1"/>
+          </a:fontRef>
+        </p:style>
+        <p:txBody>
+          <a:bodyPr rtlCol="0" anchor="ctr"/>
+          <a:lstStyle/>
+          <a:p>
+            <a:pPr algn="ctr"/>
+            <a:endParaRPr lang="en-US"/>
+          </a:p>
+        </p:txBody>
+      </p:sp>
+      <p:sp>
+        <p:nvSpPr>
+          <p:cNvPr id="133" name="TextBox 132"/>
+          <p:cNvSpPr txBox="1"/>
+          <p:nvPr/>
+        </p:nvSpPr>
+        <p:spPr>
+          <a:xfrm>
+            <a:off x="3069774" y="5007478"/>
+            <a:ext cx="1425390" cy="276999"/>
+          </a:xfrm>
+          <a:prstGeom prst="rect">
+            <a:avLst/>
+          </a:prstGeom>
+          <a:noFill/>
+        </p:spPr>
+        <p:txBody>
+          <a:bodyPr wrap="none" rtlCol="0">
+            <a:spAutoFit/>
+          </a:bodyPr>
+          <a:lstStyle/>
+          <a:p>
+            <a:r>
+              <a:rPr lang="en-US" sz="1200" dirty="0" smtClean="0"/>
+              <a:t>All species:   	         </a:t>
+            </a:r>
+          </a:p>
+        </p:txBody>
+      </p:sp>
+      <p:sp>
+        <p:nvSpPr>
+          <p:cNvPr id="134" name="TextBox 133"/>
+          <p:cNvSpPr txBox="1"/>
+          <p:nvPr/>
+        </p:nvSpPr>
+        <p:spPr>
+          <a:xfrm>
+            <a:off x="120580" y="4480490"/>
+            <a:ext cx="283271" cy="369332"/>
+          </a:xfrm>
+          <a:prstGeom prst="rect">
+            <a:avLst/>
+          </a:prstGeom>
+          <a:noFill/>
+        </p:spPr>
+        <p:txBody>
+          <a:bodyPr wrap="square" rtlCol="0">
+            <a:spAutoFit/>
+          </a:bodyPr>
+          <a:lstStyle/>
+          <a:p>
+            <a:r>
+              <a:rPr lang="en-US" dirty="0" smtClean="0"/>
+              <a:t>E</a:t>
+            </a:r>
+            <a:endParaRPr lang="en-US" sz="1400" dirty="0"/>
+          </a:p>
+        </p:txBody>
+      </p:sp>
       <p:grpSp>
         <p:nvGrpSpPr>
-          <p:cNvPr id="4" name="Group 3"/>
+          <p:cNvPr id="135" name="Group 134"/>
           <p:cNvGrpSpPr/>
           <p:nvPr/>
         </p:nvGrpSpPr>
@@ -10282,7 +10574,7 @@
         </p:grpSpPr>
         <p:sp>
           <p:nvSpPr>
-            <p:cNvPr id="182" name="Diamond 181"/>
+            <p:cNvPr id="136" name="Diamond 135"/>
             <p:cNvSpPr/>
             <p:nvPr/>
           </p:nvSpPr>
@@ -10336,7 +10628,7 @@
         </p:sp>
         <p:sp>
           <p:nvSpPr>
-            <p:cNvPr id="183" name="Rectangle 182"/>
+            <p:cNvPr id="137" name="Rectangle 136"/>
             <p:cNvSpPr/>
             <p:nvPr/>
           </p:nvSpPr>
@@ -10390,7 +10682,7 @@
         </p:sp>
         <p:sp>
           <p:nvSpPr>
-            <p:cNvPr id="184" name="Oval 183"/>
+            <p:cNvPr id="138" name="Oval 137"/>
             <p:cNvSpPr/>
             <p:nvPr/>
           </p:nvSpPr>
@@ -10444,7 +10736,7 @@
         </p:sp>
         <p:sp>
           <p:nvSpPr>
-            <p:cNvPr id="185" name="Isosceles Triangle 184"/>
+            <p:cNvPr id="139" name="Isosceles Triangle 138"/>
             <p:cNvSpPr/>
             <p:nvPr/>
           </p:nvSpPr>
@@ -10498,7 +10790,7 @@
         </p:sp>
         <p:sp>
           <p:nvSpPr>
-            <p:cNvPr id="186" name="5-Point Star 185"/>
+            <p:cNvPr id="140" name="5-Point Star 139"/>
             <p:cNvSpPr/>
             <p:nvPr/>
           </p:nvSpPr>
@@ -10552,7 +10844,7 @@
         </p:sp>
         <p:sp>
           <p:nvSpPr>
-            <p:cNvPr id="187" name="Cross 186"/>
+            <p:cNvPr id="141" name="Cross 140"/>
             <p:cNvSpPr/>
             <p:nvPr/>
           </p:nvSpPr>
@@ -10601,7 +10893,7 @@
         </p:sp>
         <p:sp>
           <p:nvSpPr>
-            <p:cNvPr id="188" name="Right Triangle 187"/>
+            <p:cNvPr id="142" name="Right Triangle 141"/>
             <p:cNvSpPr/>
             <p:nvPr/>
           </p:nvSpPr>
@@ -10650,13 +10942,13 @@
         </p:sp>
         <p:sp>
           <p:nvSpPr>
-            <p:cNvPr id="189" name="Parallelogram 188"/>
+            <p:cNvPr id="145" name="Parallelogram 144"/>
             <p:cNvSpPr/>
             <p:nvPr/>
           </p:nvSpPr>
           <p:spPr>
             <a:xfrm>
-              <a:off x="768606" y="5003966"/>
+              <a:off x="799602" y="5003966"/>
               <a:ext cx="215132" cy="146017"/>
             </a:xfrm>
             <a:prstGeom prst="parallelogram">
@@ -10699,7 +10991,7 @@
         </p:sp>
         <p:sp>
           <p:nvSpPr>
-            <p:cNvPr id="190" name="Rectangle 189"/>
+            <p:cNvPr id="146" name="Rectangle 145"/>
             <p:cNvSpPr/>
             <p:nvPr/>
           </p:nvSpPr>
@@ -10746,7 +11038,7 @@
       </p:grpSp>
       <p:grpSp>
         <p:nvGrpSpPr>
-          <p:cNvPr id="3" name="Group 2"/>
+          <p:cNvPr id="147" name="Group 146"/>
           <p:cNvGrpSpPr/>
           <p:nvPr/>
         </p:nvGrpSpPr>
@@ -10760,7 +11052,7 @@
         </p:grpSpPr>
         <p:sp>
           <p:nvSpPr>
-            <p:cNvPr id="130" name="Hexagon 129"/>
+            <p:cNvPr id="149" name="Hexagon 148"/>
             <p:cNvSpPr/>
             <p:nvPr/>
           </p:nvSpPr>
@@ -10809,7 +11101,7 @@
         </p:sp>
         <p:sp>
           <p:nvSpPr>
-            <p:cNvPr id="131" name="Moon 130"/>
+            <p:cNvPr id="151" name="Moon 150"/>
             <p:cNvSpPr/>
             <p:nvPr/>
           </p:nvSpPr>
@@ -10858,7 +11150,7 @@
         </p:sp>
         <p:sp>
           <p:nvSpPr>
-            <p:cNvPr id="132" name="Trapezoid 131"/>
+            <p:cNvPr id="152" name="Trapezoid 151"/>
             <p:cNvSpPr/>
             <p:nvPr/>
           </p:nvSpPr>
@@ -10907,7 +11199,7 @@
         </p:sp>
         <p:sp>
           <p:nvSpPr>
-            <p:cNvPr id="191" name="Diamond 190"/>
+            <p:cNvPr id="153" name="Diamond 152"/>
             <p:cNvSpPr/>
             <p:nvPr/>
           </p:nvSpPr>
@@ -10961,7 +11253,7 @@
         </p:sp>
         <p:sp>
           <p:nvSpPr>
-            <p:cNvPr id="192" name="Rectangle 191"/>
+            <p:cNvPr id="155" name="Rectangle 154"/>
             <p:cNvSpPr/>
             <p:nvPr/>
           </p:nvSpPr>
@@ -11015,7 +11307,7 @@
         </p:sp>
         <p:sp>
           <p:nvSpPr>
-            <p:cNvPr id="193" name="Oval 192"/>
+            <p:cNvPr id="156" name="Oval 155"/>
             <p:cNvSpPr/>
             <p:nvPr/>
           </p:nvSpPr>
@@ -11069,7 +11361,7 @@
         </p:sp>
         <p:sp>
           <p:nvSpPr>
-            <p:cNvPr id="194" name="Isosceles Triangle 193"/>
+            <p:cNvPr id="157" name="Isosceles Triangle 156"/>
             <p:cNvSpPr/>
             <p:nvPr/>
           </p:nvSpPr>
@@ -11123,7 +11415,7 @@
         </p:sp>
         <p:sp>
           <p:nvSpPr>
-            <p:cNvPr id="195" name="5-Point Star 194"/>
+            <p:cNvPr id="158" name="5-Point Star 157"/>
             <p:cNvSpPr/>
             <p:nvPr/>
           </p:nvSpPr>
@@ -11177,7 +11469,7 @@
         </p:sp>
         <p:sp>
           <p:nvSpPr>
-            <p:cNvPr id="196" name="Rectangle 195"/>
+            <p:cNvPr id="159" name="Rectangle 158"/>
             <p:cNvSpPr/>
             <p:nvPr/>
           </p:nvSpPr>
@@ -11222,11 +11514,11 @@
           </p:txBody>
         </p:sp>
       </p:grpSp>
-      <mc:AlternateContent xmlns:mc="http://schemas.openxmlformats.org/markup-compatibility/2006" xmlns:a14="http://schemas.microsoft.com/office/drawing/2010/main">
-        <mc:Choice Requires="a14">
+      <mc:AlternateContent xmlns:mc="http://schemas.openxmlformats.org/markup-compatibility/2006">
+        <mc:Choice xmlns:a14="http://schemas.microsoft.com/office/drawing/2010/main" Requires="a14">
           <p:sp>
             <p:nvSpPr>
-              <p:cNvPr id="197" name="TextBox 196"/>
+              <p:cNvPr id="163" name="TextBox 162"/>
               <p:cNvSpPr txBox="1"/>
               <p:nvPr/>
             </p:nvSpPr>
@@ -11284,10 +11576,10 @@
             </p:txBody>
           </p:sp>
         </mc:Choice>
-        <mc:Fallback xmlns="">
+        <mc:Fallback>
           <p:sp>
             <p:nvSpPr>
-              <p:cNvPr id="197" name="TextBox 196"/>
+              <p:cNvPr id="163" name="TextBox 162"/>
               <p:cNvSpPr txBox="1">
                 <a:spLocks noRot="1" noChangeAspect="1" noMove="1" noResize="1" noEditPoints="1" noAdjustHandles="1" noChangeArrowheads="1" noChangeShapeType="1" noTextEdit="1"/>
               </p:cNvSpPr>
@@ -11325,13 +11617,13 @@
       </mc:AlternateContent>
       <p:sp>
         <p:nvSpPr>
-          <p:cNvPr id="198" name="Right Triangle 197"/>
+          <p:cNvPr id="172" name="Right Triangle 171"/>
           <p:cNvSpPr/>
           <p:nvPr/>
         </p:nvSpPr>
         <p:spPr>
           <a:xfrm>
-            <a:off x="4022887" y="5000825"/>
+            <a:off x="4139122" y="5000825"/>
             <a:ext cx="109728" cy="109728"/>
           </a:xfrm>
           <a:prstGeom prst="rtTriangle">
@@ -11374,13 +11666,13 @@
       </p:sp>
       <p:sp>
         <p:nvSpPr>
-          <p:cNvPr id="199" name="Cross 198"/>
+          <p:cNvPr id="226" name="Cross 225"/>
           <p:cNvSpPr/>
           <p:nvPr/>
         </p:nvSpPr>
         <p:spPr>
           <a:xfrm>
-            <a:off x="4324023" y="5006460"/>
+            <a:off x="4440258" y="5006460"/>
             <a:ext cx="109728" cy="109728"/>
           </a:xfrm>
           <a:prstGeom prst="plus">
@@ -11423,13 +11715,13 @@
       </p:sp>
       <p:sp>
         <p:nvSpPr>
-          <p:cNvPr id="200" name="Parallelogram 199"/>
+          <p:cNvPr id="227" name="Parallelogram 226"/>
           <p:cNvSpPr/>
           <p:nvPr/>
         </p:nvSpPr>
         <p:spPr>
           <a:xfrm>
-            <a:off x="4168274" y="5000825"/>
+            <a:off x="4284509" y="5000825"/>
             <a:ext cx="128016" cy="109728"/>
           </a:xfrm>
           <a:prstGeom prst="parallelogram">
@@ -11472,13 +11764,13 @@
       </p:sp>
       <p:sp>
         <p:nvSpPr>
-          <p:cNvPr id="201" name="Hexagon 200"/>
+          <p:cNvPr id="228" name="Hexagon 227"/>
           <p:cNvSpPr/>
           <p:nvPr/>
         </p:nvSpPr>
         <p:spPr>
           <a:xfrm>
-            <a:off x="4022132" y="4860611"/>
+            <a:off x="4138367" y="4860611"/>
             <a:ext cx="109728" cy="109728"/>
           </a:xfrm>
           <a:prstGeom prst="hexagon">
@@ -11521,13 +11813,13 @@
       </p:sp>
       <p:sp>
         <p:nvSpPr>
-          <p:cNvPr id="202" name="Moon 201"/>
+          <p:cNvPr id="229" name="Moon 228"/>
           <p:cNvSpPr/>
           <p:nvPr/>
         </p:nvSpPr>
         <p:spPr>
           <a:xfrm>
-            <a:off x="4317430" y="4854532"/>
+            <a:off x="4433665" y="4854532"/>
             <a:ext cx="82296" cy="109728"/>
           </a:xfrm>
           <a:prstGeom prst="moon">
@@ -11570,13 +11862,13 @@
       </p:sp>
       <p:sp>
         <p:nvSpPr>
-          <p:cNvPr id="203" name="Trapezoid 202"/>
+          <p:cNvPr id="230" name="Trapezoid 229"/>
           <p:cNvSpPr/>
           <p:nvPr/>
         </p:nvSpPr>
         <p:spPr>
           <a:xfrm>
-            <a:off x="4168902" y="4854532"/>
+            <a:off x="4285137" y="4854532"/>
             <a:ext cx="109728" cy="109728"/>
           </a:xfrm>
           <a:prstGeom prst="trapezoid">
@@ -11619,7 +11911,7 @@
       </p:sp>
       <p:sp>
         <p:nvSpPr>
-          <p:cNvPr id="204" name="Right Triangle 203"/>
+          <p:cNvPr id="231" name="Right Triangle 230"/>
           <p:cNvSpPr/>
           <p:nvPr/>
         </p:nvSpPr>
@@ -11668,7 +11960,7 @@
       </p:sp>
       <p:sp>
         <p:nvSpPr>
-          <p:cNvPr id="205" name="Cross 204"/>
+          <p:cNvPr id="232" name="Cross 231"/>
           <p:cNvSpPr/>
           <p:nvPr/>
         </p:nvSpPr>
@@ -11717,7 +12009,7 @@
       </p:sp>
       <p:sp>
         <p:nvSpPr>
-          <p:cNvPr id="206" name="Parallelogram 205"/>
+          <p:cNvPr id="233" name="Parallelogram 232"/>
           <p:cNvSpPr/>
           <p:nvPr/>
         </p:nvSpPr>
@@ -11766,7 +12058,7 @@
       </p:sp>
       <p:sp>
         <p:nvSpPr>
-          <p:cNvPr id="207" name="Hexagon 206"/>
+          <p:cNvPr id="234" name="Hexagon 233"/>
           <p:cNvSpPr/>
           <p:nvPr/>
         </p:nvSpPr>
@@ -11815,7 +12107,7 @@
       </p:sp>
       <p:sp>
         <p:nvSpPr>
-          <p:cNvPr id="208" name="Moon 207"/>
+          <p:cNvPr id="235" name="Moon 234"/>
           <p:cNvSpPr/>
           <p:nvPr/>
         </p:nvSpPr>
@@ -11864,7 +12156,7 @@
       </p:sp>
       <p:sp>
         <p:nvSpPr>
-          <p:cNvPr id="209" name="Trapezoid 208"/>
+          <p:cNvPr id="236" name="Trapezoid 235"/>
           <p:cNvSpPr/>
           <p:nvPr/>
         </p:nvSpPr>
@@ -11913,7 +12205,7 @@
       </p:sp>
       <p:cxnSp>
         <p:nvCxnSpPr>
-          <p:cNvPr id="20" name="Straight Connector 19"/>
+          <p:cNvPr id="237" name="Straight Connector 236"/>
           <p:cNvCxnSpPr/>
           <p:nvPr/>
         </p:nvCxnSpPr>
@@ -11948,7 +12240,7 @@
       </p:cxnSp>
       <p:sp>
         <p:nvSpPr>
-          <p:cNvPr id="210" name="Diamond 209"/>
+          <p:cNvPr id="238" name="Diamond 237"/>
           <p:cNvSpPr/>
           <p:nvPr/>
         </p:nvSpPr>
@@ -12002,7 +12294,7 @@
       </p:sp>
       <p:sp>
         <p:nvSpPr>
-          <p:cNvPr id="211" name="Rectangle 210"/>
+          <p:cNvPr id="239" name="Rectangle 238"/>
           <p:cNvSpPr/>
           <p:nvPr/>
         </p:nvSpPr>
@@ -12056,7 +12348,7 @@
       </p:sp>
       <p:sp>
         <p:nvSpPr>
-          <p:cNvPr id="212" name="Oval 211"/>
+          <p:cNvPr id="240" name="Oval 239"/>
           <p:cNvSpPr/>
           <p:nvPr/>
         </p:nvSpPr>
@@ -12110,7 +12402,7 @@
       </p:sp>
       <p:sp>
         <p:nvSpPr>
-          <p:cNvPr id="213" name="Isosceles Triangle 212"/>
+          <p:cNvPr id="241" name="Isosceles Triangle 240"/>
           <p:cNvSpPr/>
           <p:nvPr/>
         </p:nvSpPr>
@@ -12164,7 +12456,7 @@
       </p:sp>
       <p:sp>
         <p:nvSpPr>
-          <p:cNvPr id="214" name="5-Point Star 213"/>
+          <p:cNvPr id="242" name="5-Point Star 241"/>
           <p:cNvSpPr/>
           <p:nvPr/>
         </p:nvSpPr>
@@ -12218,14 +12510,14 @@
       </p:sp>
       <p:cxnSp>
         <p:nvCxnSpPr>
-          <p:cNvPr id="215" name="Straight Connector 214"/>
+          <p:cNvPr id="243" name="Straight Connector 242"/>
           <p:cNvCxnSpPr/>
           <p:nvPr/>
         </p:nvCxnSpPr>
         <p:spPr>
-          <a:xfrm>
-            <a:off x="3903434" y="5783101"/>
-            <a:ext cx="777240" cy="0"/>
+          <a:xfrm flipV="1">
+            <a:off x="3918932" y="5765319"/>
+            <a:ext cx="885397" cy="0"/>
           </a:xfrm>
           <a:prstGeom prst="line">
             <a:avLst/>
@@ -12253,7 +12545,7 @@
       </p:cxnSp>
       <p:sp>
         <p:nvSpPr>
-          <p:cNvPr id="216" name="Diamond 215"/>
+          <p:cNvPr id="244" name="Diamond 243"/>
           <p:cNvSpPr/>
           <p:nvPr/>
         </p:nvSpPr>
@@ -12307,7 +12599,7 @@
       </p:sp>
       <p:sp>
         <p:nvSpPr>
-          <p:cNvPr id="217" name="Rectangle 216"/>
+          <p:cNvPr id="245" name="Rectangle 244"/>
           <p:cNvSpPr/>
           <p:nvPr/>
         </p:nvSpPr>
@@ -12361,7 +12653,7 @@
       </p:sp>
       <p:sp>
         <p:nvSpPr>
-          <p:cNvPr id="218" name="Oval 217"/>
+          <p:cNvPr id="246" name="Oval 245"/>
           <p:cNvSpPr/>
           <p:nvPr/>
         </p:nvSpPr>
@@ -12415,7 +12707,7 @@
       </p:sp>
       <p:sp>
         <p:nvSpPr>
-          <p:cNvPr id="219" name="Isosceles Triangle 218"/>
+          <p:cNvPr id="247" name="Isosceles Triangle 246"/>
           <p:cNvSpPr/>
           <p:nvPr/>
         </p:nvSpPr>
@@ -12469,7 +12761,7 @@
       </p:sp>
       <p:sp>
         <p:nvSpPr>
-          <p:cNvPr id="220" name="5-Point Star 219"/>
+          <p:cNvPr id="248" name="5-Point Star 247"/>
           <p:cNvSpPr/>
           <p:nvPr/>
         </p:nvSpPr>
@@ -12523,7 +12815,7 @@
       </p:sp>
       <p:sp>
         <p:nvSpPr>
-          <p:cNvPr id="221" name="TextBox 220"/>
+          <p:cNvPr id="249" name="TextBox 248"/>
           <p:cNvSpPr txBox="1"/>
           <p:nvPr/>
         </p:nvSpPr>
@@ -12558,13 +12850,13 @@
       </p:sp>
       <p:sp>
         <p:nvSpPr>
-          <p:cNvPr id="222" name="TextBox 221"/>
+          <p:cNvPr id="250" name="TextBox 249"/>
           <p:cNvSpPr txBox="1"/>
           <p:nvPr/>
         </p:nvSpPr>
         <p:spPr>
           <a:xfrm>
-            <a:off x="4130125" y="5522058"/>
+            <a:off x="4199866" y="5522058"/>
             <a:ext cx="263214" cy="276999"/>
           </a:xfrm>
           <a:prstGeom prst="rect">
@@ -12587,7 +12879,7 @@
       </p:sp>
       <p:sp>
         <p:nvSpPr>
-          <p:cNvPr id="223" name="TextBox 222"/>
+          <p:cNvPr id="251" name="TextBox 250"/>
           <p:cNvSpPr txBox="1"/>
           <p:nvPr/>
         </p:nvSpPr>
@@ -12616,7 +12908,7 @@
       </p:sp>
       <p:sp>
         <p:nvSpPr>
-          <p:cNvPr id="224" name="TextBox 223"/>
+          <p:cNvPr id="252" name="TextBox 251"/>
           <p:cNvSpPr txBox="1"/>
           <p:nvPr/>
         </p:nvSpPr>
@@ -12638,14 +12930,14 @@
           <a:p>
             <a:r>
               <a:rPr lang="en-US" sz="1200" dirty="0" smtClean="0"/>
-              <a:t>= 55%</a:t>
+              <a:t>= 50%</a:t>
             </a:r>
           </a:p>
         </p:txBody>
       </p:sp>
       <p:sp>
         <p:nvSpPr>
-          <p:cNvPr id="225" name="TextBox 224"/>
+          <p:cNvPr id="253" name="TextBox 252"/>
           <p:cNvSpPr txBox="1"/>
           <p:nvPr/>
         </p:nvSpPr>
@@ -12674,65 +12966,14 @@
       </p:sp>
       <p:sp>
         <p:nvSpPr>
-          <p:cNvPr id="124" name="Isosceles Triangle 123"/>
+          <p:cNvPr id="254" name="Isosceles Triangle 253"/>
           <p:cNvSpPr/>
           <p:nvPr/>
         </p:nvSpPr>
         <p:spPr>
-          <a:xfrm>
-            <a:off x="697873" y="1563202"/>
-            <a:ext cx="200634" cy="169490"/>
-          </a:xfrm>
-          <a:prstGeom prst="triangle">
-            <a:avLst/>
-          </a:prstGeom>
-          <a:solidFill>
-            <a:schemeClr val="bg1"/>
-          </a:solidFill>
-          <a:ln w="19050">
-            <a:solidFill>
-              <a:schemeClr val="tx1">
-                <a:lumMod val="50000"/>
-                <a:lumOff val="50000"/>
-              </a:schemeClr>
-            </a:solidFill>
-          </a:ln>
-        </p:spPr>
-        <p:style>
-          <a:lnRef idx="2">
-            <a:schemeClr val="accent1">
-              <a:shade val="50000"/>
-            </a:schemeClr>
-          </a:lnRef>
-          <a:fillRef idx="1">
-            <a:schemeClr val="accent1"/>
-          </a:fillRef>
-          <a:effectRef idx="0">
-            <a:schemeClr val="accent1"/>
-          </a:effectRef>
-          <a:fontRef idx="minor">
-            <a:schemeClr val="lt1"/>
-          </a:fontRef>
-        </p:style>
-        <p:txBody>
-          <a:bodyPr rtlCol="0" anchor="ctr"/>
-          <a:lstStyle/>
-          <a:p>
-            <a:pPr algn="ctr"/>
-            <a:endParaRPr lang="en-US"/>
-          </a:p>
-        </p:txBody>
-      </p:sp>
-      <p:sp>
-        <p:nvSpPr>
-          <p:cNvPr id="128" name="Isosceles Triangle 127"/>
-          <p:cNvSpPr/>
-          <p:nvPr/>
-        </p:nvSpPr>
-        <p:spPr>
-          <a:xfrm>
-            <a:off x="2186387" y="1570480"/>
-            <a:ext cx="200634" cy="169490"/>
+          <a:xfrm flipV="1">
+            <a:off x="4681266" y="5360585"/>
+            <a:ext cx="109728" cy="109728"/>
           </a:xfrm>
           <a:prstGeom prst="triangle">
             <a:avLst/>
@@ -12779,78 +13020,30 @@
       </p:sp>
       <p:sp>
         <p:nvSpPr>
-          <p:cNvPr id="7" name="TextBox 6"/>
-          <p:cNvSpPr txBox="1"/>
-          <p:nvPr/>
-        </p:nvSpPr>
-        <p:spPr>
-          <a:xfrm>
-            <a:off x="5897105" y="1718465"/>
-            <a:ext cx="4339526" cy="2123658"/>
-          </a:xfrm>
-          <a:prstGeom prst="rect">
-            <a:avLst/>
-          </a:prstGeom>
-          <a:noFill/>
-        </p:spPr>
-        <p:txBody>
-          <a:bodyPr wrap="square" rtlCol="0">
-            <a:spAutoFit/>
-          </a:bodyPr>
-          <a:lstStyle/>
-          <a:p>
-            <a:r>
-              <a:rPr lang="en-US" sz="1100" dirty="0" smtClean="0"/>
-              <a:t>Figure 1. (A) Bimodal distribution of temporal occupancy for North American birds from Coyle et al. (2013). (B) Core and transient species exhibit different species abundance distributions for the </a:t>
-            </a:r>
-            <a:r>
-              <a:rPr lang="en-US" sz="1100" dirty="0" err="1" smtClean="0"/>
-              <a:t>Hinkley</a:t>
-            </a:r>
-            <a:r>
-              <a:rPr lang="en-US" sz="1100" dirty="0" smtClean="0"/>
-              <a:t> Point fish assemblage (</a:t>
-            </a:r>
-            <a:r>
-              <a:rPr lang="en-US" sz="1100" dirty="0" err="1" smtClean="0"/>
-              <a:t>Magurran</a:t>
-            </a:r>
-            <a:r>
-              <a:rPr lang="en-US" sz="1100" dirty="0" smtClean="0"/>
-              <a:t> and Henderson 2003). (C) Four contiguous quadrats in which species (different shapes) may be core (shaded) or transient (open). (D) The species-area relationships for (C) depending on whether transient species are excluded or not, using the lower right panel to represent the smallest area. Because every species is core in at least one quadrat, species richness at the largest scale is the same for the two relationships. (E) Temporal turnover (using one minus the </a:t>
-            </a:r>
-            <a:r>
-              <a:rPr lang="en-US" sz="1100" dirty="0" err="1" smtClean="0"/>
-              <a:t>Jaccard</a:t>
-            </a:r>
-            <a:r>
-              <a:rPr lang="en-US" sz="1100" dirty="0" smtClean="0"/>
-              <a:t> index of similarity) is much lower when transient species are excluded from the calculation, since they are the species most driving turnover.</a:t>
-            </a:r>
-            <a:endParaRPr lang="en-US" sz="1100" dirty="0"/>
-          </a:p>
-        </p:txBody>
-      </p:sp>
-      <p:sp>
-        <p:nvSpPr>
-          <p:cNvPr id="10" name="Rectangle 9"/>
+          <p:cNvPr id="255" name="Isosceles Triangle 254"/>
           <p:cNvSpPr/>
           <p:nvPr/>
         </p:nvSpPr>
         <p:spPr>
-          <a:xfrm>
-            <a:off x="4885154" y="1039231"/>
-            <a:ext cx="473893" cy="197393"/>
+          <a:xfrm flipV="1">
+            <a:off x="4688656" y="5829408"/>
+            <a:ext cx="109728" cy="109728"/>
           </a:xfrm>
-          <a:prstGeom prst="rect">
+          <a:prstGeom prst="triangle">
             <a:avLst/>
           </a:prstGeom>
           <a:solidFill>
-            <a:schemeClr val="bg1"/>
+            <a:schemeClr val="tx1">
+              <a:lumMod val="50000"/>
+              <a:lumOff val="50000"/>
+            </a:schemeClr>
           </a:solidFill>
-          <a:ln>
+          <a:ln w="19050">
             <a:solidFill>
-              <a:schemeClr val="bg1"/>
+              <a:schemeClr val="tx1">
+                <a:lumMod val="50000"/>
+                <a:lumOff val="50000"/>
+              </a:schemeClr>
             </a:solidFill>
           </a:ln>
         </p:spPr>
@@ -12881,89 +13074,112 @@
       </p:sp>
       <p:sp>
         <p:nvSpPr>
-          <p:cNvPr id="18" name="TextBox 17"/>
-          <p:cNvSpPr txBox="1"/>
+          <p:cNvPr id="256" name="Isosceles Triangle 255"/>
+          <p:cNvSpPr/>
           <p:nvPr/>
         </p:nvSpPr>
         <p:spPr>
-          <a:xfrm>
-            <a:off x="428072" y="1683729"/>
-            <a:ext cx="785257" cy="261610"/>
+          <a:xfrm flipV="1">
+            <a:off x="838830" y="5364345"/>
+            <a:ext cx="164592" cy="164592"/>
           </a:xfrm>
-          <a:prstGeom prst="rect">
+          <a:prstGeom prst="triangle">
             <a:avLst/>
           </a:prstGeom>
-          <a:noFill/>
+          <a:solidFill>
+            <a:schemeClr val="tx1">
+              <a:lumMod val="50000"/>
+              <a:lumOff val="50000"/>
+            </a:schemeClr>
+          </a:solidFill>
+          <a:ln w="19050">
+            <a:solidFill>
+              <a:schemeClr val="tx1">
+                <a:lumMod val="50000"/>
+                <a:lumOff val="50000"/>
+              </a:schemeClr>
+            </a:solidFill>
+          </a:ln>
         </p:spPr>
+        <p:style>
+          <a:lnRef idx="2">
+            <a:schemeClr val="accent1">
+              <a:shade val="50000"/>
+            </a:schemeClr>
+          </a:lnRef>
+          <a:fillRef idx="1">
+            <a:schemeClr val="accent1"/>
+          </a:fillRef>
+          <a:effectRef idx="0">
+            <a:schemeClr val="accent1"/>
+          </a:effectRef>
+          <a:fontRef idx="minor">
+            <a:schemeClr val="lt1"/>
+          </a:fontRef>
+        </p:style>
         <p:txBody>
-          <a:bodyPr wrap="square" rtlCol="0">
-            <a:spAutoFit/>
-          </a:bodyPr>
+          <a:bodyPr rtlCol="0" anchor="ctr"/>
           <a:lstStyle/>
           <a:p>
-            <a:r>
-              <a:rPr lang="en-US" sz="1100" dirty="0" smtClean="0"/>
-              <a:t>Transient</a:t>
-            </a:r>
-            <a:endParaRPr lang="en-US" sz="1100" dirty="0"/>
+            <a:pPr algn="ctr"/>
+            <a:endParaRPr lang="en-US"/>
           </a:p>
         </p:txBody>
       </p:sp>
       <p:sp>
         <p:nvSpPr>
-          <p:cNvPr id="129" name="TextBox 128"/>
-          <p:cNvSpPr txBox="1"/>
+          <p:cNvPr id="257" name="Isosceles Triangle 256"/>
+          <p:cNvSpPr/>
           <p:nvPr/>
         </p:nvSpPr>
         <p:spPr>
-          <a:xfrm>
-            <a:off x="1910269" y="1684771"/>
-            <a:ext cx="785257" cy="261610"/>
+          <a:xfrm flipV="1">
+            <a:off x="2401704" y="5347212"/>
+            <a:ext cx="164592" cy="164592"/>
           </a:xfrm>
-          <a:prstGeom prst="rect">
+          <a:prstGeom prst="triangle">
             <a:avLst/>
           </a:prstGeom>
-          <a:noFill/>
+          <a:solidFill>
+            <a:schemeClr val="tx1">
+              <a:lumMod val="50000"/>
+              <a:lumOff val="50000"/>
+            </a:schemeClr>
+          </a:solidFill>
+          <a:ln w="19050">
+            <a:solidFill>
+              <a:schemeClr val="tx1">
+                <a:lumMod val="50000"/>
+                <a:lumOff val="50000"/>
+              </a:schemeClr>
+            </a:solidFill>
+          </a:ln>
         </p:spPr>
+        <p:style>
+          <a:lnRef idx="2">
+            <a:schemeClr val="accent1">
+              <a:shade val="50000"/>
+            </a:schemeClr>
+          </a:lnRef>
+          <a:fillRef idx="1">
+            <a:schemeClr val="accent1"/>
+          </a:fillRef>
+          <a:effectRef idx="0">
+            <a:schemeClr val="accent1"/>
+          </a:effectRef>
+          <a:fontRef idx="minor">
+            <a:schemeClr val="lt1"/>
+          </a:fontRef>
+        </p:style>
         <p:txBody>
-          <a:bodyPr wrap="square" rtlCol="0">
-            <a:spAutoFit/>
-          </a:bodyPr>
+          <a:bodyPr rtlCol="0" anchor="ctr"/>
           <a:lstStyle/>
           <a:p>
             <a:pPr algn="ctr"/>
-            <a:r>
-              <a:rPr lang="en-US" sz="1100" dirty="0" smtClean="0"/>
-              <a:t>Core</a:t>
-            </a:r>
-            <a:endParaRPr lang="en-US" sz="1100" dirty="0"/>
+            <a:endParaRPr lang="en-US"/>
           </a:p>
         </p:txBody>
       </p:sp>
-      <p:pic>
-        <p:nvPicPr>
-          <p:cNvPr id="11" name="Picture 10"/>
-          <p:cNvPicPr>
-            <a:picLocks noChangeAspect="1"/>
-          </p:cNvPicPr>
-          <p:nvPr/>
-        </p:nvPicPr>
-        <p:blipFill>
-          <a:blip r:embed="rId7"/>
-          <a:stretch>
-            <a:fillRect/>
-          </a:stretch>
-        </p:blipFill>
-        <p:spPr>
-          <a:xfrm>
-            <a:off x="4031038" y="472910"/>
-            <a:ext cx="939420" cy="520174"/>
-          </a:xfrm>
-          <a:prstGeom prst="rect">
-            <a:avLst/>
-          </a:prstGeom>
-        </p:spPr>
-      </p:pic>
     </p:spTree>
     <p:extLst>
       <p:ext uri="{BB962C8B-B14F-4D97-AF65-F5344CB8AC3E}">

</xml_diff>

<commit_message>
modified fig 2d to include only route level bbs
</commit_message>
<xml_diff>
--- a/output/plots/all_figs_with_legends.pptx
+++ b/output/plots/all_figs_with_legends.pptx
@@ -13210,6 +13210,30 @@
           <a:chExt cx="0" cy="0"/>
         </a:xfrm>
       </p:grpSpPr>
+      <p:pic>
+        <p:nvPicPr>
+          <p:cNvPr id="4" name="Picture 3"/>
+          <p:cNvPicPr>
+            <a:picLocks noChangeAspect="1"/>
+          </p:cNvPicPr>
+          <p:nvPr/>
+        </p:nvPicPr>
+        <p:blipFill>
+          <a:blip r:embed="rId3"/>
+          <a:stretch>
+            <a:fillRect/>
+          </a:stretch>
+        </p:blipFill>
+        <p:spPr>
+          <a:xfrm>
+            <a:off x="2372007" y="1325922"/>
+            <a:ext cx="7036180" cy="5300885"/>
+          </a:xfrm>
+          <a:prstGeom prst="rect">
+            <a:avLst/>
+          </a:prstGeom>
+        </p:spPr>
+      </p:pic>
       <p:sp>
         <p:nvSpPr>
           <p:cNvPr id="2" name="TextBox 1"/>
@@ -13242,88 +13266,812 @@
       </p:sp>
       <p:grpSp>
         <p:nvGrpSpPr>
-          <p:cNvPr id="10" name="Group 9"/>
+          <p:cNvPr id="15" name="Group 14"/>
           <p:cNvGrpSpPr/>
           <p:nvPr/>
         </p:nvGrpSpPr>
         <p:grpSpPr>
           <a:xfrm>
-            <a:off x="2439631" y="29029"/>
-            <a:ext cx="7031287" cy="6606096"/>
-            <a:chOff x="2439631" y="29029"/>
-            <a:chExt cx="7031287" cy="6606096"/>
+            <a:off x="3393215" y="29029"/>
+            <a:ext cx="4875431" cy="1300710"/>
+            <a:chOff x="3455272" y="318618"/>
+            <a:chExt cx="4875431" cy="1300710"/>
+          </a:xfrm>
+        </p:grpSpPr>
+        <p:grpSp>
+          <p:nvGrpSpPr>
+            <p:cNvPr id="6" name="Group 5"/>
+            <p:cNvGrpSpPr/>
+            <p:nvPr/>
+          </p:nvGrpSpPr>
+          <p:grpSpPr>
+            <a:xfrm>
+              <a:off x="5561297" y="392532"/>
+              <a:ext cx="2769406" cy="1177791"/>
+              <a:chOff x="3570725" y="253106"/>
+              <a:chExt cx="2769406" cy="1177791"/>
+            </a:xfrm>
+          </p:grpSpPr>
+          <p:pic>
+            <p:nvPicPr>
+              <p:cNvPr id="62" name="Picture 61"/>
+              <p:cNvPicPr>
+                <a:picLocks noChangeAspect="1"/>
+              </p:cNvPicPr>
+              <p:nvPr/>
+            </p:nvPicPr>
+            <p:blipFill>
+              <a:blip r:embed="rId4"/>
+              <a:stretch>
+                <a:fillRect/>
+              </a:stretch>
+            </p:blipFill>
+            <p:spPr>
+              <a:xfrm>
+                <a:off x="3582567" y="564020"/>
+                <a:ext cx="477444" cy="250454"/>
+              </a:xfrm>
+              <a:prstGeom prst="rect">
+                <a:avLst/>
+              </a:prstGeom>
+            </p:spPr>
+          </p:pic>
+          <p:pic>
+            <p:nvPicPr>
+              <p:cNvPr id="104" name="Picture 103"/>
+              <p:cNvPicPr>
+                <a:picLocks noChangeAspect="1"/>
+              </p:cNvPicPr>
+              <p:nvPr/>
+            </p:nvPicPr>
+            <p:blipFill>
+              <a:blip r:embed="rId5" cstate="print">
+                <a:extLst>
+                  <a:ext uri="{28A0092B-C50C-407E-A947-70E740481C1C}">
+                    <a14:useLocalDpi xmlns:a14="http://schemas.microsoft.com/office/drawing/2010/main" val="0"/>
+                  </a:ext>
+                </a:extLst>
+              </a:blip>
+              <a:stretch>
+                <a:fillRect/>
+              </a:stretch>
+            </p:blipFill>
+            <p:spPr>
+              <a:xfrm flipH="1">
+                <a:off x="3652152" y="253354"/>
+                <a:ext cx="374608" cy="278904"/>
+              </a:xfrm>
+              <a:prstGeom prst="rect">
+                <a:avLst/>
+              </a:prstGeom>
+            </p:spPr>
+          </p:pic>
+          <p:pic>
+            <p:nvPicPr>
+              <p:cNvPr id="105" name="Picture 104"/>
+              <p:cNvPicPr>
+                <a:picLocks noChangeAspect="1"/>
+              </p:cNvPicPr>
+              <p:nvPr/>
+            </p:nvPicPr>
+            <p:blipFill>
+              <a:blip r:embed="rId6"/>
+              <a:stretch>
+                <a:fillRect/>
+              </a:stretch>
+            </p:blipFill>
+            <p:spPr>
+              <a:xfrm>
+                <a:off x="3570725" y="1174766"/>
+                <a:ext cx="496489" cy="256131"/>
+              </a:xfrm>
+              <a:prstGeom prst="rect">
+                <a:avLst/>
+              </a:prstGeom>
+            </p:spPr>
+          </p:pic>
+          <p:pic>
+            <p:nvPicPr>
+              <p:cNvPr id="106" name="Picture 105"/>
+              <p:cNvPicPr>
+                <a:picLocks noChangeAspect="1"/>
+              </p:cNvPicPr>
+              <p:nvPr/>
+            </p:nvPicPr>
+            <p:blipFill>
+              <a:blip r:embed="rId7" cstate="print">
+                <a:extLst>
+                  <a:ext uri="{28A0092B-C50C-407E-A947-70E740481C1C}">
+                    <a14:useLocalDpi xmlns:a14="http://schemas.microsoft.com/office/drawing/2010/main" val="0"/>
+                  </a:ext>
+                </a:extLst>
+              </a:blip>
+              <a:stretch>
+                <a:fillRect/>
+              </a:stretch>
+            </p:blipFill>
+            <p:spPr>
+              <a:xfrm>
+                <a:off x="3582567" y="929976"/>
+                <a:ext cx="477445" cy="206467"/>
+              </a:xfrm>
+              <a:prstGeom prst="rect">
+                <a:avLst/>
+              </a:prstGeom>
+            </p:spPr>
+          </p:pic>
+          <p:pic>
+            <p:nvPicPr>
+              <p:cNvPr id="107" name="Picture 106"/>
+              <p:cNvPicPr>
+                <a:picLocks noChangeAspect="1"/>
+              </p:cNvPicPr>
+              <p:nvPr/>
+            </p:nvPicPr>
+            <p:blipFill>
+              <a:blip r:embed="rId8" cstate="print">
+                <a:extLst>
+                  <a:ext uri="{28A0092B-C50C-407E-A947-70E740481C1C}">
+                    <a14:useLocalDpi xmlns:a14="http://schemas.microsoft.com/office/drawing/2010/main" val="0"/>
+                  </a:ext>
+                </a:extLst>
+              </a:blip>
+              <a:stretch>
+                <a:fillRect/>
+              </a:stretch>
+            </p:blipFill>
+            <p:spPr>
+              <a:xfrm>
+                <a:off x="4873128" y="253106"/>
+                <a:ext cx="415769" cy="297946"/>
+              </a:xfrm>
+              <a:prstGeom prst="rect">
+                <a:avLst/>
+              </a:prstGeom>
+            </p:spPr>
+          </p:pic>
+          <p:pic>
+            <p:nvPicPr>
+              <p:cNvPr id="108" name="Picture 107"/>
+              <p:cNvPicPr>
+                <a:picLocks noChangeAspect="1"/>
+              </p:cNvPicPr>
+              <p:nvPr/>
+            </p:nvPicPr>
+            <p:blipFill>
+              <a:blip r:embed="rId9"/>
+              <a:stretch>
+                <a:fillRect/>
+              </a:stretch>
+            </p:blipFill>
+            <p:spPr>
+              <a:xfrm>
+                <a:off x="4873128" y="532105"/>
+                <a:ext cx="394437" cy="268537"/>
+              </a:xfrm>
+              <a:prstGeom prst="rect">
+                <a:avLst/>
+              </a:prstGeom>
+            </p:spPr>
+          </p:pic>
+          <p:pic>
+            <p:nvPicPr>
+              <p:cNvPr id="109" name="Picture 108"/>
+              <p:cNvPicPr>
+                <a:picLocks noChangeAspect="1"/>
+              </p:cNvPicPr>
+              <p:nvPr/>
+            </p:nvPicPr>
+            <p:blipFill>
+              <a:blip r:embed="rId10" cstate="print">
+                <a:extLst>
+                  <a:ext uri="{28A0092B-C50C-407E-A947-70E740481C1C}">
+                    <a14:useLocalDpi xmlns:a14="http://schemas.microsoft.com/office/drawing/2010/main" val="0"/>
+                  </a:ext>
+                </a:extLst>
+              </a:blip>
+              <a:stretch>
+                <a:fillRect/>
+              </a:stretch>
+            </p:blipFill>
+            <p:spPr>
+              <a:xfrm>
+                <a:off x="4873128" y="814255"/>
+                <a:ext cx="394437" cy="276368"/>
+              </a:xfrm>
+              <a:prstGeom prst="rect">
+                <a:avLst/>
+              </a:prstGeom>
+            </p:spPr>
+          </p:pic>
+          <p:sp>
+            <p:nvSpPr>
+              <p:cNvPr id="9" name="TextBox 8"/>
+              <p:cNvSpPr txBox="1"/>
+              <p:nvPr/>
+            </p:nvSpPr>
+            <p:spPr>
+              <a:xfrm>
+                <a:off x="4117710" y="253562"/>
+                <a:ext cx="718472" cy="276999"/>
+              </a:xfrm>
+              <a:prstGeom prst="rect">
+                <a:avLst/>
+              </a:prstGeom>
+              <a:noFill/>
+            </p:spPr>
+            <p:txBody>
+              <a:bodyPr wrap="square" rtlCol="0">
+                <a:spAutoFit/>
+              </a:bodyPr>
+              <a:lstStyle/>
+              <a:p>
+                <a:r>
+                  <a:rPr lang="en-US" sz="1200" dirty="0" smtClean="0"/>
+                  <a:t>Birds</a:t>
+                </a:r>
+                <a:endParaRPr lang="en-US" sz="1200" dirty="0"/>
+              </a:p>
+            </p:txBody>
+          </p:sp>
+          <p:sp>
+            <p:nvSpPr>
+              <p:cNvPr id="110" name="TextBox 109"/>
+              <p:cNvSpPr txBox="1"/>
+              <p:nvPr/>
+            </p:nvSpPr>
+            <p:spPr>
+              <a:xfrm>
+                <a:off x="4114289" y="583817"/>
+                <a:ext cx="859893" cy="276999"/>
+              </a:xfrm>
+              <a:prstGeom prst="rect">
+                <a:avLst/>
+              </a:prstGeom>
+              <a:noFill/>
+            </p:spPr>
+            <p:txBody>
+              <a:bodyPr wrap="square" rtlCol="0">
+                <a:spAutoFit/>
+              </a:bodyPr>
+              <a:lstStyle/>
+              <a:p>
+                <a:r>
+                  <a:rPr lang="en-US" sz="1200" dirty="0" smtClean="0"/>
+                  <a:t>Plants</a:t>
+                </a:r>
+                <a:endParaRPr lang="en-US" sz="1200" dirty="0"/>
+              </a:p>
+            </p:txBody>
+          </p:sp>
+          <p:sp>
+            <p:nvSpPr>
+              <p:cNvPr id="111" name="TextBox 110"/>
+              <p:cNvSpPr txBox="1"/>
+              <p:nvPr/>
+            </p:nvSpPr>
+            <p:spPr>
+              <a:xfrm>
+                <a:off x="4097831" y="1139377"/>
+                <a:ext cx="1176734" cy="276999"/>
+              </a:xfrm>
+              <a:prstGeom prst="rect">
+                <a:avLst/>
+              </a:prstGeom>
+              <a:noFill/>
+            </p:spPr>
+            <p:txBody>
+              <a:bodyPr wrap="square" rtlCol="0">
+                <a:spAutoFit/>
+              </a:bodyPr>
+              <a:lstStyle/>
+              <a:p>
+                <a:r>
+                  <a:rPr lang="en-US" sz="1200" dirty="0" smtClean="0"/>
+                  <a:t>Mammals</a:t>
+                </a:r>
+                <a:endParaRPr lang="en-US" sz="1200" dirty="0"/>
+              </a:p>
+            </p:txBody>
+          </p:sp>
+          <p:sp>
+            <p:nvSpPr>
+              <p:cNvPr id="112" name="TextBox 111"/>
+              <p:cNvSpPr txBox="1"/>
+              <p:nvPr/>
+            </p:nvSpPr>
+            <p:spPr>
+              <a:xfrm>
+                <a:off x="4117710" y="856029"/>
+                <a:ext cx="718472" cy="276999"/>
+              </a:xfrm>
+              <a:prstGeom prst="rect">
+                <a:avLst/>
+              </a:prstGeom>
+              <a:noFill/>
+            </p:spPr>
+            <p:txBody>
+              <a:bodyPr wrap="square" rtlCol="0">
+                <a:spAutoFit/>
+              </a:bodyPr>
+              <a:lstStyle/>
+              <a:p>
+                <a:r>
+                  <a:rPr lang="en-US" sz="1200" dirty="0" smtClean="0"/>
+                  <a:t>Fish</a:t>
+                </a:r>
+                <a:endParaRPr lang="en-US" sz="1200" dirty="0"/>
+              </a:p>
+            </p:txBody>
+          </p:sp>
+          <p:sp>
+            <p:nvSpPr>
+              <p:cNvPr id="113" name="TextBox 112"/>
+              <p:cNvSpPr txBox="1"/>
+              <p:nvPr/>
+            </p:nvSpPr>
+            <p:spPr>
+              <a:xfrm>
+                <a:off x="5288897" y="259168"/>
+                <a:ext cx="1042648" cy="276999"/>
+              </a:xfrm>
+              <a:prstGeom prst="rect">
+                <a:avLst/>
+              </a:prstGeom>
+              <a:noFill/>
+            </p:spPr>
+            <p:txBody>
+              <a:bodyPr wrap="square" rtlCol="0">
+                <a:spAutoFit/>
+              </a:bodyPr>
+              <a:lstStyle/>
+              <a:p>
+                <a:r>
+                  <a:rPr lang="en-US" sz="1200" dirty="0" smtClean="0"/>
+                  <a:t>Invertebrates</a:t>
+                </a:r>
+                <a:endParaRPr lang="en-US" sz="1200" dirty="0"/>
+              </a:p>
+            </p:txBody>
+          </p:sp>
+          <p:sp>
+            <p:nvSpPr>
+              <p:cNvPr id="114" name="TextBox 113"/>
+              <p:cNvSpPr txBox="1"/>
+              <p:nvPr/>
+            </p:nvSpPr>
+            <p:spPr>
+              <a:xfrm>
+                <a:off x="5274565" y="530561"/>
+                <a:ext cx="1019843" cy="276999"/>
+              </a:xfrm>
+              <a:prstGeom prst="rect">
+                <a:avLst/>
+              </a:prstGeom>
+              <a:noFill/>
+            </p:spPr>
+            <p:txBody>
+              <a:bodyPr wrap="square" rtlCol="0">
+                <a:spAutoFit/>
+              </a:bodyPr>
+              <a:lstStyle/>
+              <a:p>
+                <a:r>
+                  <a:rPr lang="en-US" sz="1200" dirty="0" smtClean="0"/>
+                  <a:t>Benthos</a:t>
+                </a:r>
+                <a:endParaRPr lang="en-US" sz="1200" dirty="0"/>
+              </a:p>
+            </p:txBody>
+          </p:sp>
+          <p:sp>
+            <p:nvSpPr>
+              <p:cNvPr id="115" name="TextBox 114"/>
+              <p:cNvSpPr txBox="1"/>
+              <p:nvPr/>
+            </p:nvSpPr>
+            <p:spPr>
+              <a:xfrm>
+                <a:off x="5276654" y="820963"/>
+                <a:ext cx="1063477" cy="276999"/>
+              </a:xfrm>
+              <a:prstGeom prst="rect">
+                <a:avLst/>
+              </a:prstGeom>
+              <a:noFill/>
+            </p:spPr>
+            <p:txBody>
+              <a:bodyPr wrap="square" rtlCol="0">
+                <a:spAutoFit/>
+              </a:bodyPr>
+              <a:lstStyle/>
+              <a:p>
+                <a:r>
+                  <a:rPr lang="en-US" sz="1200" dirty="0" smtClean="0"/>
+                  <a:t>Plankton</a:t>
+                </a:r>
+                <a:endParaRPr lang="en-US" sz="1200" dirty="0"/>
+              </a:p>
+            </p:txBody>
+          </p:sp>
+        </p:grpSp>
+        <p:grpSp>
+          <p:nvGrpSpPr>
+            <p:cNvPr id="3" name="Group 2"/>
+            <p:cNvGrpSpPr/>
+            <p:nvPr/>
+          </p:nvGrpSpPr>
+          <p:grpSpPr>
+            <a:xfrm>
+              <a:off x="3695148" y="569615"/>
+              <a:ext cx="1787041" cy="799610"/>
+              <a:chOff x="6244382" y="256050"/>
+              <a:chExt cx="1787041" cy="799610"/>
+            </a:xfrm>
+          </p:grpSpPr>
+          <p:pic>
+            <p:nvPicPr>
+              <p:cNvPr id="63" name="Picture 62"/>
+              <p:cNvPicPr>
+                <a:picLocks noChangeAspect="1"/>
+              </p:cNvPicPr>
+              <p:nvPr/>
+            </p:nvPicPr>
+            <p:blipFill>
+              <a:blip r:embed="rId11"/>
+              <a:stretch>
+                <a:fillRect/>
+              </a:stretch>
+            </p:blipFill>
+            <p:spPr>
+              <a:xfrm>
+                <a:off x="6286051" y="778857"/>
+                <a:ext cx="478886" cy="266371"/>
+              </a:xfrm>
+              <a:prstGeom prst="rect">
+                <a:avLst/>
+              </a:prstGeom>
+            </p:spPr>
+          </p:pic>
+          <p:pic>
+            <p:nvPicPr>
+              <p:cNvPr id="102" name="Picture 101"/>
+              <p:cNvPicPr>
+                <a:picLocks noChangeAspect="1"/>
+              </p:cNvPicPr>
+              <p:nvPr/>
+            </p:nvPicPr>
+            <p:blipFill>
+              <a:blip r:embed="rId12"/>
+              <a:stretch>
+                <a:fillRect/>
+              </a:stretch>
+            </p:blipFill>
+            <p:spPr>
+              <a:xfrm>
+                <a:off x="6271499" y="256050"/>
+                <a:ext cx="490175" cy="258138"/>
+              </a:xfrm>
+              <a:prstGeom prst="rect">
+                <a:avLst/>
+              </a:prstGeom>
+            </p:spPr>
+          </p:pic>
+          <p:pic>
+            <p:nvPicPr>
+              <p:cNvPr id="103" name="Picture 102"/>
+              <p:cNvPicPr>
+                <a:picLocks noChangeAspect="1"/>
+              </p:cNvPicPr>
+              <p:nvPr/>
+            </p:nvPicPr>
+            <p:blipFill>
+              <a:blip r:embed="rId13"/>
+              <a:stretch>
+                <a:fillRect/>
+              </a:stretch>
+            </p:blipFill>
+            <p:spPr>
+              <a:xfrm>
+                <a:off x="6244382" y="559572"/>
+                <a:ext cx="544407" cy="191424"/>
+              </a:xfrm>
+              <a:prstGeom prst="rect">
+                <a:avLst/>
+              </a:prstGeom>
+            </p:spPr>
+          </p:pic>
+          <p:sp>
+            <p:nvSpPr>
+              <p:cNvPr id="116" name="TextBox 115"/>
+              <p:cNvSpPr txBox="1"/>
+              <p:nvPr/>
+            </p:nvSpPr>
+            <p:spPr>
+              <a:xfrm>
+                <a:off x="6803566" y="268007"/>
+                <a:ext cx="1136084" cy="276999"/>
+              </a:xfrm>
+              <a:prstGeom prst="rect">
+                <a:avLst/>
+              </a:prstGeom>
+              <a:noFill/>
+            </p:spPr>
+            <p:txBody>
+              <a:bodyPr wrap="square" rtlCol="0">
+                <a:spAutoFit/>
+              </a:bodyPr>
+              <a:lstStyle/>
+              <a:p>
+                <a:r>
+                  <a:rPr lang="en-US" sz="1200" dirty="0" smtClean="0"/>
+                  <a:t>Terrestrial</a:t>
+                </a:r>
+                <a:endParaRPr lang="en-US" sz="1200" dirty="0"/>
+              </a:p>
+            </p:txBody>
+          </p:sp>
+          <p:sp>
+            <p:nvSpPr>
+              <p:cNvPr id="117" name="TextBox 116"/>
+              <p:cNvSpPr txBox="1"/>
+              <p:nvPr/>
+            </p:nvSpPr>
+            <p:spPr>
+              <a:xfrm>
+                <a:off x="6793268" y="527873"/>
+                <a:ext cx="908370" cy="276999"/>
+              </a:xfrm>
+              <a:prstGeom prst="rect">
+                <a:avLst/>
+              </a:prstGeom>
+              <a:noFill/>
+            </p:spPr>
+            <p:txBody>
+              <a:bodyPr wrap="square" rtlCol="0">
+                <a:spAutoFit/>
+              </a:bodyPr>
+              <a:lstStyle/>
+              <a:p>
+                <a:r>
+                  <a:rPr lang="en-US" sz="1200" dirty="0" smtClean="0"/>
+                  <a:t>Marine</a:t>
+                </a:r>
+                <a:endParaRPr lang="en-US" sz="1200" dirty="0"/>
+              </a:p>
+            </p:txBody>
+          </p:sp>
+          <p:sp>
+            <p:nvSpPr>
+              <p:cNvPr id="118" name="TextBox 117"/>
+              <p:cNvSpPr txBox="1"/>
+              <p:nvPr/>
+            </p:nvSpPr>
+            <p:spPr>
+              <a:xfrm>
+                <a:off x="6795164" y="778661"/>
+                <a:ext cx="1236259" cy="276999"/>
+              </a:xfrm>
+              <a:prstGeom prst="rect">
+                <a:avLst/>
+              </a:prstGeom>
+              <a:noFill/>
+            </p:spPr>
+            <p:txBody>
+              <a:bodyPr wrap="square" rtlCol="0">
+                <a:spAutoFit/>
+              </a:bodyPr>
+              <a:lstStyle/>
+              <a:p>
+                <a:r>
+                  <a:rPr lang="en-US" sz="1200" dirty="0" smtClean="0"/>
+                  <a:t>Freshwater</a:t>
+                </a:r>
+                <a:endParaRPr lang="en-US" sz="1200" dirty="0"/>
+              </a:p>
+            </p:txBody>
+          </p:sp>
+        </p:grpSp>
+        <p:sp>
+          <p:nvSpPr>
+            <p:cNvPr id="7" name="Rectangle 6"/>
+            <p:cNvSpPr/>
+            <p:nvPr/>
+          </p:nvSpPr>
+          <p:spPr>
+            <a:xfrm>
+              <a:off x="3455272" y="318618"/>
+              <a:ext cx="4817550" cy="1300710"/>
+            </a:xfrm>
+            <a:prstGeom prst="rect">
+              <a:avLst/>
+            </a:prstGeom>
+            <a:noFill/>
+            <a:ln>
+              <a:solidFill>
+                <a:schemeClr val="tx1"/>
+              </a:solidFill>
+            </a:ln>
+          </p:spPr>
+          <p:style>
+            <a:lnRef idx="2">
+              <a:schemeClr val="accent1">
+                <a:shade val="50000"/>
+              </a:schemeClr>
+            </a:lnRef>
+            <a:fillRef idx="1">
+              <a:schemeClr val="accent1"/>
+            </a:fillRef>
+            <a:effectRef idx="0">
+              <a:schemeClr val="accent1"/>
+            </a:effectRef>
+            <a:fontRef idx="minor">
+              <a:schemeClr val="lt1"/>
+            </a:fontRef>
+          </p:style>
+          <p:txBody>
+            <a:bodyPr rtlCol="0" anchor="ctr"/>
+            <a:lstStyle/>
+            <a:p>
+              <a:pPr algn="ctr"/>
+              <a:endParaRPr lang="en-US"/>
+            </a:p>
+          </p:txBody>
+        </p:sp>
+      </p:grpSp>
+      <p:grpSp>
+        <p:nvGrpSpPr>
+          <p:cNvPr id="82" name="Group 81"/>
+          <p:cNvGrpSpPr/>
+          <p:nvPr/>
+        </p:nvGrpSpPr>
+        <p:grpSpPr>
+          <a:xfrm>
+            <a:off x="3313491" y="2550800"/>
+            <a:ext cx="2250695" cy="321957"/>
+            <a:chOff x="2066372" y="1693067"/>
+            <a:chExt cx="3156177" cy="418733"/>
           </a:xfrm>
         </p:grpSpPr>
         <p:pic>
           <p:nvPicPr>
-            <p:cNvPr id="8" name="Picture 7"/>
+            <p:cNvPr id="83" name="Picture 82"/>
             <p:cNvPicPr>
               <a:picLocks noChangeAspect="1"/>
             </p:cNvPicPr>
             <p:nvPr/>
           </p:nvPicPr>
           <p:blipFill>
-            <a:blip r:embed="rId3"/>
+            <a:blip r:embed="rId12"/>
             <a:stretch>
               <a:fillRect/>
             </a:stretch>
           </p:blipFill>
           <p:spPr>
             <a:xfrm>
-              <a:off x="2439631" y="1374411"/>
-              <a:ext cx="7031287" cy="5169694"/>
+              <a:off x="2066372" y="1693067"/>
+              <a:ext cx="655912" cy="396304"/>
             </a:xfrm>
             <a:prstGeom prst="rect">
               <a:avLst/>
             </a:prstGeom>
           </p:spPr>
         </p:pic>
+        <p:pic>
+          <p:nvPicPr>
+            <p:cNvPr id="84" name="Picture 83"/>
+            <p:cNvPicPr>
+              <a:picLocks noChangeAspect="1"/>
+            </p:cNvPicPr>
+            <p:nvPr/>
+          </p:nvPicPr>
+          <p:blipFill>
+            <a:blip r:embed="rId13"/>
+            <a:stretch>
+              <a:fillRect/>
+            </a:stretch>
+          </p:blipFill>
+          <p:spPr>
+            <a:xfrm>
+              <a:off x="4494070" y="1746386"/>
+              <a:ext cx="728479" cy="293882"/>
+            </a:xfrm>
+            <a:prstGeom prst="rect">
+              <a:avLst/>
+            </a:prstGeom>
+          </p:spPr>
+        </p:pic>
+        <p:pic>
+          <p:nvPicPr>
+            <p:cNvPr id="85" name="Picture 84"/>
+            <p:cNvPicPr>
+              <a:picLocks noChangeAspect="1"/>
+            </p:cNvPicPr>
+            <p:nvPr/>
+          </p:nvPicPr>
+          <p:blipFill>
+            <a:blip r:embed="rId11"/>
+            <a:stretch>
+              <a:fillRect/>
+            </a:stretch>
+          </p:blipFill>
+          <p:spPr>
+            <a:xfrm>
+              <a:off x="3345216" y="1702857"/>
+              <a:ext cx="640805" cy="408943"/>
+            </a:xfrm>
+            <a:prstGeom prst="rect">
+              <a:avLst/>
+            </a:prstGeom>
+          </p:spPr>
+        </p:pic>
+      </p:grpSp>
+      <p:grpSp>
+        <p:nvGrpSpPr>
+          <p:cNvPr id="86" name="Group 85"/>
+          <p:cNvGrpSpPr/>
+          <p:nvPr/>
+        </p:nvGrpSpPr>
+        <p:grpSpPr>
+          <a:xfrm>
+            <a:off x="3207563" y="4519742"/>
+            <a:ext cx="2433913" cy="314496"/>
+            <a:chOff x="2721075" y="6071986"/>
+            <a:chExt cx="2446874" cy="235941"/>
+          </a:xfrm>
+        </p:grpSpPr>
         <p:grpSp>
           <p:nvGrpSpPr>
-            <p:cNvPr id="15" name="Group 14"/>
+            <p:cNvPr id="87" name="Group 86"/>
             <p:cNvGrpSpPr/>
             <p:nvPr/>
           </p:nvGrpSpPr>
           <p:grpSpPr>
             <a:xfrm>
-              <a:off x="3393215" y="29029"/>
-              <a:ext cx="4875431" cy="1300710"/>
-              <a:chOff x="3455272" y="318618"/>
-              <a:chExt cx="4875431" cy="1300710"/>
+              <a:off x="2721075" y="6071986"/>
+              <a:ext cx="2446874" cy="235941"/>
+              <a:chOff x="2721075" y="6071986"/>
+              <a:chExt cx="2446874" cy="235941"/>
             </a:xfrm>
           </p:grpSpPr>
           <p:grpSp>
             <p:nvGrpSpPr>
-              <p:cNvPr id="6" name="Group 5"/>
+              <p:cNvPr id="90" name="Group 89"/>
               <p:cNvGrpSpPr/>
               <p:nvPr/>
             </p:nvGrpSpPr>
             <p:grpSpPr>
               <a:xfrm>
-                <a:off x="5561297" y="392532"/>
-                <a:ext cx="2769406" cy="1177791"/>
-                <a:chOff x="3570725" y="253106"/>
-                <a:chExt cx="2769406" cy="1177791"/>
+                <a:off x="2721075" y="6071986"/>
+                <a:ext cx="2446874" cy="232634"/>
+                <a:chOff x="2887074" y="6071986"/>
+                <a:chExt cx="2446874" cy="232634"/>
               </a:xfrm>
             </p:grpSpPr>
             <p:pic>
               <p:nvPicPr>
-                <p:cNvPr id="62" name="Picture 61"/>
+                <p:cNvPr id="130" name="Picture 129"/>
                 <p:cNvPicPr>
                   <a:picLocks noChangeAspect="1"/>
                 </p:cNvPicPr>
                 <p:nvPr/>
               </p:nvPicPr>
               <p:blipFill>
-                <a:blip r:embed="rId4"/>
+                <a:blip r:embed="rId7" cstate="print">
+                  <a:extLst>
+                    <a:ext uri="{28A0092B-C50C-407E-A947-70E740481C1C}">
+                      <a14:useLocalDpi xmlns:a14="http://schemas.microsoft.com/office/drawing/2010/main" val="0"/>
+                    </a:ext>
+                  </a:extLst>
+                </a:blip>
                 <a:stretch>
                   <a:fillRect/>
                 </a:stretch>
               </p:blipFill>
               <p:spPr>
                 <a:xfrm>
-                  <a:off x="3582567" y="564020"/>
-                  <a:ext cx="477444" cy="250454"/>
+                  <a:off x="3969972" y="6108116"/>
+                  <a:ext cx="325640" cy="161565"/>
                 </a:xfrm>
                 <a:prstGeom prst="rect">
                   <a:avLst/>
@@ -13332,7 +14080,67 @@
             </p:pic>
             <p:pic>
               <p:nvPicPr>
-                <p:cNvPr id="104" name="Picture 103"/>
+                <p:cNvPr id="131" name="Picture 130"/>
+                <p:cNvPicPr>
+                  <a:picLocks noChangeAspect="1"/>
+                </p:cNvPicPr>
+                <p:nvPr/>
+              </p:nvPicPr>
+              <p:blipFill>
+                <a:blip r:embed="rId10" cstate="print">
+                  <a:extLst>
+                    <a:ext uri="{28A0092B-C50C-407E-A947-70E740481C1C}">
+                      <a14:useLocalDpi xmlns:a14="http://schemas.microsoft.com/office/drawing/2010/main" val="0"/>
+                    </a:ext>
+                  </a:extLst>
+                </a:blip>
+                <a:stretch>
+                  <a:fillRect/>
+                </a:stretch>
+              </p:blipFill>
+              <p:spPr>
+                <a:xfrm>
+                  <a:off x="5053316" y="6079024"/>
+                  <a:ext cx="280632" cy="225596"/>
+                </a:xfrm>
+                <a:prstGeom prst="rect">
+                  <a:avLst/>
+                </a:prstGeom>
+              </p:spPr>
+            </p:pic>
+            <p:pic>
+              <p:nvPicPr>
+                <p:cNvPr id="132" name="Picture 131"/>
+                <p:cNvPicPr>
+                  <a:picLocks noChangeAspect="1"/>
+                </p:cNvPicPr>
+                <p:nvPr/>
+              </p:nvPicPr>
+              <p:blipFill>
+                <a:blip r:embed="rId8" cstate="print">
+                  <a:extLst>
+                    <a:ext uri="{28A0092B-C50C-407E-A947-70E740481C1C}">
+                      <a14:useLocalDpi xmlns:a14="http://schemas.microsoft.com/office/drawing/2010/main" val="0"/>
+                    </a:ext>
+                  </a:extLst>
+                </a:blip>
+                <a:stretch>
+                  <a:fillRect/>
+                </a:stretch>
+              </p:blipFill>
+              <p:spPr>
+                <a:xfrm>
+                  <a:off x="4345983" y="6071986"/>
+                  <a:ext cx="274386" cy="225596"/>
+                </a:xfrm>
+                <a:prstGeom prst="rect">
+                  <a:avLst/>
+                </a:prstGeom>
+              </p:spPr>
+            </p:pic>
+            <p:pic>
+              <p:nvPicPr>
+                <p:cNvPr id="133" name="Picture 132"/>
                 <p:cNvPicPr>
                   <a:picLocks noChangeAspect="1"/>
                 </p:cNvPicPr>
@@ -13352,41 +14160,134 @@
               </p:blipFill>
               <p:spPr>
                 <a:xfrm flipH="1">
-                  <a:off x="3652152" y="253354"/>
-                  <a:ext cx="374608" cy="278904"/>
+                  <a:off x="2887074" y="6083191"/>
+                  <a:ext cx="255789" cy="218495"/>
                 </a:xfrm>
                 <a:prstGeom prst="rect">
                   <a:avLst/>
                 </a:prstGeom>
               </p:spPr>
             </p:pic>
+          </p:grpSp>
+          <p:pic>
+            <p:nvPicPr>
+              <p:cNvPr id="91" name="Picture 90"/>
+              <p:cNvPicPr>
+                <a:picLocks noChangeAspect="1"/>
+              </p:cNvPicPr>
+              <p:nvPr/>
+            </p:nvPicPr>
+            <p:blipFill>
+              <a:blip r:embed="rId9"/>
+              <a:stretch>
+                <a:fillRect/>
+              </a:stretch>
+            </p:blipFill>
+            <p:spPr>
+              <a:xfrm>
+                <a:off x="4496014" y="6071986"/>
+                <a:ext cx="302061" cy="235941"/>
+              </a:xfrm>
+              <a:prstGeom prst="rect">
+                <a:avLst/>
+              </a:prstGeom>
+            </p:spPr>
+          </p:pic>
+        </p:grpSp>
+        <p:pic>
+          <p:nvPicPr>
+            <p:cNvPr id="88" name="Picture 87"/>
+            <p:cNvPicPr>
+              <a:picLocks noChangeAspect="1"/>
+            </p:cNvPicPr>
+            <p:nvPr/>
+          </p:nvPicPr>
+          <p:blipFill>
+            <a:blip r:embed="rId6"/>
+            <a:stretch>
+              <a:fillRect/>
+            </a:stretch>
+          </p:blipFill>
+          <p:spPr>
+            <a:xfrm>
+              <a:off x="3431585" y="6089590"/>
+              <a:ext cx="334903" cy="198223"/>
+            </a:xfrm>
+            <a:prstGeom prst="rect">
+              <a:avLst/>
+            </a:prstGeom>
+          </p:spPr>
+        </p:pic>
+        <p:pic>
+          <p:nvPicPr>
+            <p:cNvPr id="89" name="Picture 88"/>
+            <p:cNvPicPr>
+              <a:picLocks noChangeAspect="1"/>
+            </p:cNvPicPr>
+            <p:nvPr/>
+          </p:nvPicPr>
+          <p:blipFill>
+            <a:blip r:embed="rId4"/>
+            <a:stretch>
+              <a:fillRect/>
+            </a:stretch>
+          </p:blipFill>
+          <p:spPr>
+            <a:xfrm>
+              <a:off x="3070198" y="6097678"/>
+              <a:ext cx="327300" cy="196986"/>
+            </a:xfrm>
+            <a:prstGeom prst="rect">
+              <a:avLst/>
+            </a:prstGeom>
+          </p:spPr>
+        </p:pic>
+      </p:grpSp>
+      <p:grpSp>
+        <p:nvGrpSpPr>
+          <p:cNvPr id="184" name="Group 183"/>
+          <p:cNvGrpSpPr/>
+          <p:nvPr/>
+        </p:nvGrpSpPr>
+        <p:grpSpPr>
+          <a:xfrm>
+            <a:off x="3229725" y="6320629"/>
+            <a:ext cx="2433913" cy="314496"/>
+            <a:chOff x="2721075" y="6071986"/>
+            <a:chExt cx="2446874" cy="235941"/>
+          </a:xfrm>
+        </p:grpSpPr>
+        <p:grpSp>
+          <p:nvGrpSpPr>
+            <p:cNvPr id="185" name="Group 184"/>
+            <p:cNvGrpSpPr/>
+            <p:nvPr/>
+          </p:nvGrpSpPr>
+          <p:grpSpPr>
+            <a:xfrm>
+              <a:off x="2721075" y="6071986"/>
+              <a:ext cx="2446874" cy="235941"/>
+              <a:chOff x="2721075" y="6071986"/>
+              <a:chExt cx="2446874" cy="235941"/>
+            </a:xfrm>
+          </p:grpSpPr>
+          <p:grpSp>
+            <p:nvGrpSpPr>
+              <p:cNvPr id="188" name="Group 187"/>
+              <p:cNvGrpSpPr/>
+              <p:nvPr/>
+            </p:nvGrpSpPr>
+            <p:grpSpPr>
+              <a:xfrm>
+                <a:off x="2721075" y="6071986"/>
+                <a:ext cx="2446874" cy="232634"/>
+                <a:chOff x="2887074" y="6071986"/>
+                <a:chExt cx="2446874" cy="232634"/>
+              </a:xfrm>
+            </p:grpSpPr>
             <p:pic>
               <p:nvPicPr>
-                <p:cNvPr id="105" name="Picture 104"/>
-                <p:cNvPicPr>
-                  <a:picLocks noChangeAspect="1"/>
-                </p:cNvPicPr>
-                <p:nvPr/>
-              </p:nvPicPr>
-              <p:blipFill>
-                <a:blip r:embed="rId6"/>
-                <a:stretch>
-                  <a:fillRect/>
-                </a:stretch>
-              </p:blipFill>
-              <p:spPr>
-                <a:xfrm>
-                  <a:off x="3570725" y="1174766"/>
-                  <a:ext cx="496489" cy="256131"/>
-                </a:xfrm>
-                <a:prstGeom prst="rect">
-                  <a:avLst/>
-                </a:prstGeom>
-              </p:spPr>
-            </p:pic>
-            <p:pic>
-              <p:nvPicPr>
-                <p:cNvPr id="106" name="Picture 105"/>
+                <p:cNvPr id="190" name="Picture 189"/>
                 <p:cNvPicPr>
                   <a:picLocks noChangeAspect="1"/>
                 </p:cNvPicPr>
@@ -13406,8 +14307,8 @@
               </p:blipFill>
               <p:spPr>
                 <a:xfrm>
-                  <a:off x="3582567" y="929976"/>
-                  <a:ext cx="477445" cy="206467"/>
+                  <a:off x="3969972" y="6108116"/>
+                  <a:ext cx="325640" cy="161565"/>
                 </a:xfrm>
                 <a:prstGeom prst="rect">
                   <a:avLst/>
@@ -13416,7 +14317,37 @@
             </p:pic>
             <p:pic>
               <p:nvPicPr>
-                <p:cNvPr id="107" name="Picture 106"/>
+                <p:cNvPr id="191" name="Picture 190"/>
+                <p:cNvPicPr>
+                  <a:picLocks noChangeAspect="1"/>
+                </p:cNvPicPr>
+                <p:nvPr/>
+              </p:nvPicPr>
+              <p:blipFill>
+                <a:blip r:embed="rId10" cstate="print">
+                  <a:extLst>
+                    <a:ext uri="{28A0092B-C50C-407E-A947-70E740481C1C}">
+                      <a14:useLocalDpi xmlns:a14="http://schemas.microsoft.com/office/drawing/2010/main" val="0"/>
+                    </a:ext>
+                  </a:extLst>
+                </a:blip>
+                <a:stretch>
+                  <a:fillRect/>
+                </a:stretch>
+              </p:blipFill>
+              <p:spPr>
+                <a:xfrm>
+                  <a:off x="5053316" y="6079024"/>
+                  <a:ext cx="280632" cy="225596"/>
+                </a:xfrm>
+                <a:prstGeom prst="rect">
+                  <a:avLst/>
+                </a:prstGeom>
+              </p:spPr>
+            </p:pic>
+            <p:pic>
+              <p:nvPicPr>
+                <p:cNvPr id="192" name="Picture 191"/>
                 <p:cNvPicPr>
                   <a:picLocks noChangeAspect="1"/>
                 </p:cNvPicPr>
@@ -13436,8 +14367,8 @@
               </p:blipFill>
               <p:spPr>
                 <a:xfrm>
-                  <a:off x="4873128" y="253106"/>
-                  <a:ext cx="415769" cy="297946"/>
+                  <a:off x="4345983" y="6071986"/>
+                  <a:ext cx="274386" cy="225596"/>
                 </a:xfrm>
                 <a:prstGeom prst="rect">
                   <a:avLst/>
@@ -13446,22 +14377,175 @@
             </p:pic>
             <p:pic>
               <p:nvPicPr>
-                <p:cNvPr id="108" name="Picture 107"/>
+                <p:cNvPr id="193" name="Picture 192"/>
                 <p:cNvPicPr>
                   <a:picLocks noChangeAspect="1"/>
                 </p:cNvPicPr>
                 <p:nvPr/>
               </p:nvPicPr>
               <p:blipFill>
-                <a:blip r:embed="rId9"/>
+                <a:blip r:embed="rId5" cstate="print">
+                  <a:extLst>
+                    <a:ext uri="{28A0092B-C50C-407E-A947-70E740481C1C}">
+                      <a14:useLocalDpi xmlns:a14="http://schemas.microsoft.com/office/drawing/2010/main" val="0"/>
+                    </a:ext>
+                  </a:extLst>
+                </a:blip>
+                <a:stretch>
+                  <a:fillRect/>
+                </a:stretch>
+              </p:blipFill>
+              <p:spPr>
+                <a:xfrm flipH="1">
+                  <a:off x="2887074" y="6083191"/>
+                  <a:ext cx="255789" cy="218495"/>
+                </a:xfrm>
+                <a:prstGeom prst="rect">
+                  <a:avLst/>
+                </a:prstGeom>
+              </p:spPr>
+            </p:pic>
+          </p:grpSp>
+          <p:pic>
+            <p:nvPicPr>
+              <p:cNvPr id="189" name="Picture 188"/>
+              <p:cNvPicPr>
+                <a:picLocks noChangeAspect="1"/>
+              </p:cNvPicPr>
+              <p:nvPr/>
+            </p:nvPicPr>
+            <p:blipFill>
+              <a:blip r:embed="rId9"/>
+              <a:stretch>
+                <a:fillRect/>
+              </a:stretch>
+            </p:blipFill>
+            <p:spPr>
+              <a:xfrm>
+                <a:off x="4496014" y="6071986"/>
+                <a:ext cx="302061" cy="235941"/>
+              </a:xfrm>
+              <a:prstGeom prst="rect">
+                <a:avLst/>
+              </a:prstGeom>
+            </p:spPr>
+          </p:pic>
+        </p:grpSp>
+        <p:pic>
+          <p:nvPicPr>
+            <p:cNvPr id="186" name="Picture 185"/>
+            <p:cNvPicPr>
+              <a:picLocks noChangeAspect="1"/>
+            </p:cNvPicPr>
+            <p:nvPr/>
+          </p:nvPicPr>
+          <p:blipFill>
+            <a:blip r:embed="rId6"/>
+            <a:stretch>
+              <a:fillRect/>
+            </a:stretch>
+          </p:blipFill>
+          <p:spPr>
+            <a:xfrm>
+              <a:off x="3431585" y="6089590"/>
+              <a:ext cx="334903" cy="198223"/>
+            </a:xfrm>
+            <a:prstGeom prst="rect">
+              <a:avLst/>
+            </a:prstGeom>
+          </p:spPr>
+        </p:pic>
+        <p:pic>
+          <p:nvPicPr>
+            <p:cNvPr id="187" name="Picture 186"/>
+            <p:cNvPicPr>
+              <a:picLocks noChangeAspect="1"/>
+            </p:cNvPicPr>
+            <p:nvPr/>
+          </p:nvPicPr>
+          <p:blipFill>
+            <a:blip r:embed="rId4"/>
+            <a:stretch>
+              <a:fillRect/>
+            </a:stretch>
+          </p:blipFill>
+          <p:spPr>
+            <a:xfrm>
+              <a:off x="3070198" y="6097678"/>
+              <a:ext cx="327300" cy="196986"/>
+            </a:xfrm>
+            <a:prstGeom prst="rect">
+              <a:avLst/>
+            </a:prstGeom>
+          </p:spPr>
+        </p:pic>
+      </p:grpSp>
+      <p:grpSp>
+        <p:nvGrpSpPr>
+          <p:cNvPr id="194" name="Group 193"/>
+          <p:cNvGrpSpPr/>
+          <p:nvPr/>
+        </p:nvGrpSpPr>
+        <p:grpSpPr>
+          <a:xfrm>
+            <a:off x="6803043" y="4510207"/>
+            <a:ext cx="2433913" cy="314496"/>
+            <a:chOff x="2721075" y="6071986"/>
+            <a:chExt cx="2446874" cy="235941"/>
+          </a:xfrm>
+        </p:grpSpPr>
+        <p:grpSp>
+          <p:nvGrpSpPr>
+            <p:cNvPr id="195" name="Group 194"/>
+            <p:cNvGrpSpPr/>
+            <p:nvPr/>
+          </p:nvGrpSpPr>
+          <p:grpSpPr>
+            <a:xfrm>
+              <a:off x="2721075" y="6071986"/>
+              <a:ext cx="2446874" cy="235941"/>
+              <a:chOff x="2721075" y="6071986"/>
+              <a:chExt cx="2446874" cy="235941"/>
+            </a:xfrm>
+          </p:grpSpPr>
+          <p:grpSp>
+            <p:nvGrpSpPr>
+              <p:cNvPr id="198" name="Group 197"/>
+              <p:cNvGrpSpPr/>
+              <p:nvPr/>
+            </p:nvGrpSpPr>
+            <p:grpSpPr>
+              <a:xfrm>
+                <a:off x="2721075" y="6071986"/>
+                <a:ext cx="2446874" cy="232634"/>
+                <a:chOff x="2887074" y="6071986"/>
+                <a:chExt cx="2446874" cy="232634"/>
+              </a:xfrm>
+            </p:grpSpPr>
+            <p:pic>
+              <p:nvPicPr>
+                <p:cNvPr id="200" name="Picture 199"/>
+                <p:cNvPicPr>
+                  <a:picLocks noChangeAspect="1"/>
+                </p:cNvPicPr>
+                <p:nvPr/>
+              </p:nvPicPr>
+              <p:blipFill>
+                <a:blip r:embed="rId7" cstate="print">
+                  <a:extLst>
+                    <a:ext uri="{28A0092B-C50C-407E-A947-70E740481C1C}">
+                      <a14:useLocalDpi xmlns:a14="http://schemas.microsoft.com/office/drawing/2010/main" val="0"/>
+                    </a:ext>
+                  </a:extLst>
+                </a:blip>
                 <a:stretch>
                   <a:fillRect/>
                 </a:stretch>
               </p:blipFill>
               <p:spPr>
                 <a:xfrm>
-                  <a:off x="4873128" y="532105"/>
-                  <a:ext cx="394437" cy="268537"/>
+                  <a:off x="3969972" y="6108116"/>
+                  <a:ext cx="325640" cy="161565"/>
                 </a:xfrm>
                 <a:prstGeom prst="rect">
                   <a:avLst/>
@@ -13470,7 +14554,7 @@
             </p:pic>
             <p:pic>
               <p:nvPicPr>
-                <p:cNvPr id="109" name="Picture 108"/>
+                <p:cNvPr id="201" name="Picture 200"/>
                 <p:cNvPicPr>
                   <a:picLocks noChangeAspect="1"/>
                 </p:cNvPicPr>
@@ -13490,257 +14574,8 @@
               </p:blipFill>
               <p:spPr>
                 <a:xfrm>
-                  <a:off x="4873128" y="814255"/>
-                  <a:ext cx="394437" cy="276368"/>
-                </a:xfrm>
-                <a:prstGeom prst="rect">
-                  <a:avLst/>
-                </a:prstGeom>
-              </p:spPr>
-            </p:pic>
-            <p:sp>
-              <p:nvSpPr>
-                <p:cNvPr id="9" name="TextBox 8"/>
-                <p:cNvSpPr txBox="1"/>
-                <p:nvPr/>
-              </p:nvSpPr>
-              <p:spPr>
-                <a:xfrm>
-                  <a:off x="4117710" y="253562"/>
-                  <a:ext cx="718472" cy="276999"/>
-                </a:xfrm>
-                <a:prstGeom prst="rect">
-                  <a:avLst/>
-                </a:prstGeom>
-                <a:noFill/>
-              </p:spPr>
-              <p:txBody>
-                <a:bodyPr wrap="square" rtlCol="0">
-                  <a:spAutoFit/>
-                </a:bodyPr>
-                <a:lstStyle/>
-                <a:p>
-                  <a:r>
-                    <a:rPr lang="en-US" sz="1200" dirty="0" smtClean="0"/>
-                    <a:t>Birds</a:t>
-                  </a:r>
-                  <a:endParaRPr lang="en-US" sz="1200" dirty="0"/>
-                </a:p>
-              </p:txBody>
-            </p:sp>
-            <p:sp>
-              <p:nvSpPr>
-                <p:cNvPr id="110" name="TextBox 109"/>
-                <p:cNvSpPr txBox="1"/>
-                <p:nvPr/>
-              </p:nvSpPr>
-              <p:spPr>
-                <a:xfrm>
-                  <a:off x="4114289" y="583817"/>
-                  <a:ext cx="859893" cy="276999"/>
-                </a:xfrm>
-                <a:prstGeom prst="rect">
-                  <a:avLst/>
-                </a:prstGeom>
-                <a:noFill/>
-              </p:spPr>
-              <p:txBody>
-                <a:bodyPr wrap="square" rtlCol="0">
-                  <a:spAutoFit/>
-                </a:bodyPr>
-                <a:lstStyle/>
-                <a:p>
-                  <a:r>
-                    <a:rPr lang="en-US" sz="1200" dirty="0" smtClean="0"/>
-                    <a:t>Plants</a:t>
-                  </a:r>
-                  <a:endParaRPr lang="en-US" sz="1200" dirty="0"/>
-                </a:p>
-              </p:txBody>
-            </p:sp>
-            <p:sp>
-              <p:nvSpPr>
-                <p:cNvPr id="111" name="TextBox 110"/>
-                <p:cNvSpPr txBox="1"/>
-                <p:nvPr/>
-              </p:nvSpPr>
-              <p:spPr>
-                <a:xfrm>
-                  <a:off x="4097831" y="1139377"/>
-                  <a:ext cx="1176734" cy="276999"/>
-                </a:xfrm>
-                <a:prstGeom prst="rect">
-                  <a:avLst/>
-                </a:prstGeom>
-                <a:noFill/>
-              </p:spPr>
-              <p:txBody>
-                <a:bodyPr wrap="square" rtlCol="0">
-                  <a:spAutoFit/>
-                </a:bodyPr>
-                <a:lstStyle/>
-                <a:p>
-                  <a:r>
-                    <a:rPr lang="en-US" sz="1200" dirty="0" smtClean="0"/>
-                    <a:t>Mammals</a:t>
-                  </a:r>
-                  <a:endParaRPr lang="en-US" sz="1200" dirty="0"/>
-                </a:p>
-              </p:txBody>
-            </p:sp>
-            <p:sp>
-              <p:nvSpPr>
-                <p:cNvPr id="112" name="TextBox 111"/>
-                <p:cNvSpPr txBox="1"/>
-                <p:nvPr/>
-              </p:nvSpPr>
-              <p:spPr>
-                <a:xfrm>
-                  <a:off x="4117710" y="856029"/>
-                  <a:ext cx="718472" cy="276999"/>
-                </a:xfrm>
-                <a:prstGeom prst="rect">
-                  <a:avLst/>
-                </a:prstGeom>
-                <a:noFill/>
-              </p:spPr>
-              <p:txBody>
-                <a:bodyPr wrap="square" rtlCol="0">
-                  <a:spAutoFit/>
-                </a:bodyPr>
-                <a:lstStyle/>
-                <a:p>
-                  <a:r>
-                    <a:rPr lang="en-US" sz="1200" dirty="0" smtClean="0"/>
-                    <a:t>Fish</a:t>
-                  </a:r>
-                  <a:endParaRPr lang="en-US" sz="1200" dirty="0"/>
-                </a:p>
-              </p:txBody>
-            </p:sp>
-            <p:sp>
-              <p:nvSpPr>
-                <p:cNvPr id="113" name="TextBox 112"/>
-                <p:cNvSpPr txBox="1"/>
-                <p:nvPr/>
-              </p:nvSpPr>
-              <p:spPr>
-                <a:xfrm>
-                  <a:off x="5288897" y="259168"/>
-                  <a:ext cx="1042648" cy="276999"/>
-                </a:xfrm>
-                <a:prstGeom prst="rect">
-                  <a:avLst/>
-                </a:prstGeom>
-                <a:noFill/>
-              </p:spPr>
-              <p:txBody>
-                <a:bodyPr wrap="square" rtlCol="0">
-                  <a:spAutoFit/>
-                </a:bodyPr>
-                <a:lstStyle/>
-                <a:p>
-                  <a:r>
-                    <a:rPr lang="en-US" sz="1200" dirty="0" smtClean="0"/>
-                    <a:t>Invertebrates</a:t>
-                  </a:r>
-                  <a:endParaRPr lang="en-US" sz="1200" dirty="0"/>
-                </a:p>
-              </p:txBody>
-            </p:sp>
-            <p:sp>
-              <p:nvSpPr>
-                <p:cNvPr id="114" name="TextBox 113"/>
-                <p:cNvSpPr txBox="1"/>
-                <p:nvPr/>
-              </p:nvSpPr>
-              <p:spPr>
-                <a:xfrm>
-                  <a:off x="5274565" y="530561"/>
-                  <a:ext cx="1019843" cy="276999"/>
-                </a:xfrm>
-                <a:prstGeom prst="rect">
-                  <a:avLst/>
-                </a:prstGeom>
-                <a:noFill/>
-              </p:spPr>
-              <p:txBody>
-                <a:bodyPr wrap="square" rtlCol="0">
-                  <a:spAutoFit/>
-                </a:bodyPr>
-                <a:lstStyle/>
-                <a:p>
-                  <a:r>
-                    <a:rPr lang="en-US" sz="1200" dirty="0" smtClean="0"/>
-                    <a:t>Benthos</a:t>
-                  </a:r>
-                  <a:endParaRPr lang="en-US" sz="1200" dirty="0"/>
-                </a:p>
-              </p:txBody>
-            </p:sp>
-            <p:sp>
-              <p:nvSpPr>
-                <p:cNvPr id="115" name="TextBox 114"/>
-                <p:cNvSpPr txBox="1"/>
-                <p:nvPr/>
-              </p:nvSpPr>
-              <p:spPr>
-                <a:xfrm>
-                  <a:off x="5276654" y="820963"/>
-                  <a:ext cx="1063477" cy="276999"/>
-                </a:xfrm>
-                <a:prstGeom prst="rect">
-                  <a:avLst/>
-                </a:prstGeom>
-                <a:noFill/>
-              </p:spPr>
-              <p:txBody>
-                <a:bodyPr wrap="square" rtlCol="0">
-                  <a:spAutoFit/>
-                </a:bodyPr>
-                <a:lstStyle/>
-                <a:p>
-                  <a:r>
-                    <a:rPr lang="en-US" sz="1200" dirty="0" smtClean="0"/>
-                    <a:t>Plankton</a:t>
-                  </a:r>
-                  <a:endParaRPr lang="en-US" sz="1200" dirty="0"/>
-                </a:p>
-              </p:txBody>
-            </p:sp>
-          </p:grpSp>
-          <p:grpSp>
-            <p:nvGrpSpPr>
-              <p:cNvPr id="3" name="Group 2"/>
-              <p:cNvGrpSpPr/>
-              <p:nvPr/>
-            </p:nvGrpSpPr>
-            <p:grpSpPr>
-              <a:xfrm>
-                <a:off x="3695148" y="569615"/>
-                <a:ext cx="1787041" cy="799610"/>
-                <a:chOff x="6244382" y="256050"/>
-                <a:chExt cx="1787041" cy="799610"/>
-              </a:xfrm>
-            </p:grpSpPr>
-            <p:pic>
-              <p:nvPicPr>
-                <p:cNvPr id="63" name="Picture 62"/>
-                <p:cNvPicPr>
-                  <a:picLocks noChangeAspect="1"/>
-                </p:cNvPicPr>
-                <p:nvPr/>
-              </p:nvPicPr>
-              <p:blipFill>
-                <a:blip r:embed="rId11"/>
-                <a:stretch>
-                  <a:fillRect/>
-                </a:stretch>
-              </p:blipFill>
-              <p:spPr>
-                <a:xfrm>
-                  <a:off x="6286051" y="778857"/>
-                  <a:ext cx="478886" cy="266371"/>
+                  <a:off x="5053316" y="6079024"/>
+                  <a:ext cx="280632" cy="225596"/>
                 </a:xfrm>
                 <a:prstGeom prst="rect">
                   <a:avLst/>
@@ -13749,22 +14584,28 @@
             </p:pic>
             <p:pic>
               <p:nvPicPr>
-                <p:cNvPr id="102" name="Picture 101"/>
+                <p:cNvPr id="202" name="Picture 201"/>
                 <p:cNvPicPr>
                   <a:picLocks noChangeAspect="1"/>
                 </p:cNvPicPr>
                 <p:nvPr/>
               </p:nvPicPr>
               <p:blipFill>
-                <a:blip r:embed="rId12"/>
+                <a:blip r:embed="rId8" cstate="print">
+                  <a:extLst>
+                    <a:ext uri="{28A0092B-C50C-407E-A947-70E740481C1C}">
+                      <a14:useLocalDpi xmlns:a14="http://schemas.microsoft.com/office/drawing/2010/main" val="0"/>
+                    </a:ext>
+                  </a:extLst>
+                </a:blip>
                 <a:stretch>
                   <a:fillRect/>
                 </a:stretch>
               </p:blipFill>
               <p:spPr>
                 <a:xfrm>
-                  <a:off x="6271499" y="256050"/>
-                  <a:ext cx="490175" cy="258138"/>
+                  <a:off x="4345983" y="6071986"/>
+                  <a:ext cx="274386" cy="225596"/>
                 </a:xfrm>
                 <a:prstGeom prst="rect">
                   <a:avLst/>
@@ -13773,434 +14614,28 @@
             </p:pic>
             <p:pic>
               <p:nvPicPr>
-                <p:cNvPr id="103" name="Picture 102"/>
+                <p:cNvPr id="203" name="Picture 202"/>
                 <p:cNvPicPr>
                   <a:picLocks noChangeAspect="1"/>
                 </p:cNvPicPr>
                 <p:nvPr/>
               </p:nvPicPr>
               <p:blipFill>
-                <a:blip r:embed="rId13"/>
+                <a:blip r:embed="rId5" cstate="print">
+                  <a:extLst>
+                    <a:ext uri="{28A0092B-C50C-407E-A947-70E740481C1C}">
+                      <a14:useLocalDpi xmlns:a14="http://schemas.microsoft.com/office/drawing/2010/main" val="0"/>
+                    </a:ext>
+                  </a:extLst>
+                </a:blip>
                 <a:stretch>
                   <a:fillRect/>
                 </a:stretch>
               </p:blipFill>
               <p:spPr>
-                <a:xfrm>
-                  <a:off x="6244382" y="559572"/>
-                  <a:ext cx="544407" cy="191424"/>
-                </a:xfrm>
-                <a:prstGeom prst="rect">
-                  <a:avLst/>
-                </a:prstGeom>
-              </p:spPr>
-            </p:pic>
-            <p:sp>
-              <p:nvSpPr>
-                <p:cNvPr id="116" name="TextBox 115"/>
-                <p:cNvSpPr txBox="1"/>
-                <p:nvPr/>
-              </p:nvSpPr>
-              <p:spPr>
-                <a:xfrm>
-                  <a:off x="6803566" y="268007"/>
-                  <a:ext cx="1136084" cy="276999"/>
-                </a:xfrm>
-                <a:prstGeom prst="rect">
-                  <a:avLst/>
-                </a:prstGeom>
-                <a:noFill/>
-              </p:spPr>
-              <p:txBody>
-                <a:bodyPr wrap="square" rtlCol="0">
-                  <a:spAutoFit/>
-                </a:bodyPr>
-                <a:lstStyle/>
-                <a:p>
-                  <a:r>
-                    <a:rPr lang="en-US" sz="1200" dirty="0" smtClean="0"/>
-                    <a:t>Terrestrial</a:t>
-                  </a:r>
-                  <a:endParaRPr lang="en-US" sz="1200" dirty="0"/>
-                </a:p>
-              </p:txBody>
-            </p:sp>
-            <p:sp>
-              <p:nvSpPr>
-                <p:cNvPr id="117" name="TextBox 116"/>
-                <p:cNvSpPr txBox="1"/>
-                <p:nvPr/>
-              </p:nvSpPr>
-              <p:spPr>
-                <a:xfrm>
-                  <a:off x="6793268" y="527873"/>
-                  <a:ext cx="908370" cy="276999"/>
-                </a:xfrm>
-                <a:prstGeom prst="rect">
-                  <a:avLst/>
-                </a:prstGeom>
-                <a:noFill/>
-              </p:spPr>
-              <p:txBody>
-                <a:bodyPr wrap="square" rtlCol="0">
-                  <a:spAutoFit/>
-                </a:bodyPr>
-                <a:lstStyle/>
-                <a:p>
-                  <a:r>
-                    <a:rPr lang="en-US" sz="1200" dirty="0" smtClean="0"/>
-                    <a:t>Marine</a:t>
-                  </a:r>
-                  <a:endParaRPr lang="en-US" sz="1200" dirty="0"/>
-                </a:p>
-              </p:txBody>
-            </p:sp>
-            <p:sp>
-              <p:nvSpPr>
-                <p:cNvPr id="118" name="TextBox 117"/>
-                <p:cNvSpPr txBox="1"/>
-                <p:nvPr/>
-              </p:nvSpPr>
-              <p:spPr>
-                <a:xfrm>
-                  <a:off x="6795164" y="778661"/>
-                  <a:ext cx="1236259" cy="276999"/>
-                </a:xfrm>
-                <a:prstGeom prst="rect">
-                  <a:avLst/>
-                </a:prstGeom>
-                <a:noFill/>
-              </p:spPr>
-              <p:txBody>
-                <a:bodyPr wrap="square" rtlCol="0">
-                  <a:spAutoFit/>
-                </a:bodyPr>
-                <a:lstStyle/>
-                <a:p>
-                  <a:r>
-                    <a:rPr lang="en-US" sz="1200" dirty="0" smtClean="0"/>
-                    <a:t>Freshwater</a:t>
-                  </a:r>
-                  <a:endParaRPr lang="en-US" sz="1200" dirty="0"/>
-                </a:p>
-              </p:txBody>
-            </p:sp>
-          </p:grpSp>
-          <p:sp>
-            <p:nvSpPr>
-              <p:cNvPr id="7" name="Rectangle 6"/>
-              <p:cNvSpPr/>
-              <p:nvPr/>
-            </p:nvSpPr>
-            <p:spPr>
-              <a:xfrm>
-                <a:off x="3455272" y="318618"/>
-                <a:ext cx="4817550" cy="1300710"/>
-              </a:xfrm>
-              <a:prstGeom prst="rect">
-                <a:avLst/>
-              </a:prstGeom>
-              <a:noFill/>
-              <a:ln>
-                <a:solidFill>
-                  <a:schemeClr val="tx1"/>
-                </a:solidFill>
-              </a:ln>
-            </p:spPr>
-            <p:style>
-              <a:lnRef idx="2">
-                <a:schemeClr val="accent1">
-                  <a:shade val="50000"/>
-                </a:schemeClr>
-              </a:lnRef>
-              <a:fillRef idx="1">
-                <a:schemeClr val="accent1"/>
-              </a:fillRef>
-              <a:effectRef idx="0">
-                <a:schemeClr val="accent1"/>
-              </a:effectRef>
-              <a:fontRef idx="minor">
-                <a:schemeClr val="lt1"/>
-              </a:fontRef>
-            </p:style>
-            <p:txBody>
-              <a:bodyPr rtlCol="0" anchor="ctr"/>
-              <a:lstStyle/>
-              <a:p>
-                <a:pPr algn="ctr"/>
-                <a:endParaRPr lang="en-US"/>
-              </a:p>
-            </p:txBody>
-          </p:sp>
-        </p:grpSp>
-        <p:grpSp>
-          <p:nvGrpSpPr>
-            <p:cNvPr id="82" name="Group 81"/>
-            <p:cNvGrpSpPr/>
-            <p:nvPr/>
-          </p:nvGrpSpPr>
-          <p:grpSpPr>
-            <a:xfrm>
-              <a:off x="3313491" y="2550800"/>
-              <a:ext cx="2250695" cy="321957"/>
-              <a:chOff x="2066372" y="1693067"/>
-              <a:chExt cx="3156177" cy="418733"/>
-            </a:xfrm>
-          </p:grpSpPr>
-          <p:pic>
-            <p:nvPicPr>
-              <p:cNvPr id="83" name="Picture 82"/>
-              <p:cNvPicPr>
-                <a:picLocks noChangeAspect="1"/>
-              </p:cNvPicPr>
-              <p:nvPr/>
-            </p:nvPicPr>
-            <p:blipFill>
-              <a:blip r:embed="rId12"/>
-              <a:stretch>
-                <a:fillRect/>
-              </a:stretch>
-            </p:blipFill>
-            <p:spPr>
-              <a:xfrm>
-                <a:off x="2066372" y="1693067"/>
-                <a:ext cx="655912" cy="396304"/>
-              </a:xfrm>
-              <a:prstGeom prst="rect">
-                <a:avLst/>
-              </a:prstGeom>
-            </p:spPr>
-          </p:pic>
-          <p:pic>
-            <p:nvPicPr>
-              <p:cNvPr id="84" name="Picture 83"/>
-              <p:cNvPicPr>
-                <a:picLocks noChangeAspect="1"/>
-              </p:cNvPicPr>
-              <p:nvPr/>
-            </p:nvPicPr>
-            <p:blipFill>
-              <a:blip r:embed="rId13"/>
-              <a:stretch>
-                <a:fillRect/>
-              </a:stretch>
-            </p:blipFill>
-            <p:spPr>
-              <a:xfrm>
-                <a:off x="4494070" y="1746386"/>
-                <a:ext cx="728479" cy="293882"/>
-              </a:xfrm>
-              <a:prstGeom prst="rect">
-                <a:avLst/>
-              </a:prstGeom>
-            </p:spPr>
-          </p:pic>
-          <p:pic>
-            <p:nvPicPr>
-              <p:cNvPr id="85" name="Picture 84"/>
-              <p:cNvPicPr>
-                <a:picLocks noChangeAspect="1"/>
-              </p:cNvPicPr>
-              <p:nvPr/>
-            </p:nvPicPr>
-            <p:blipFill>
-              <a:blip r:embed="rId11"/>
-              <a:stretch>
-                <a:fillRect/>
-              </a:stretch>
-            </p:blipFill>
-            <p:spPr>
-              <a:xfrm>
-                <a:off x="3345216" y="1702857"/>
-                <a:ext cx="640805" cy="408943"/>
-              </a:xfrm>
-              <a:prstGeom prst="rect">
-                <a:avLst/>
-              </a:prstGeom>
-            </p:spPr>
-          </p:pic>
-        </p:grpSp>
-        <p:grpSp>
-          <p:nvGrpSpPr>
-            <p:cNvPr id="86" name="Group 85"/>
-            <p:cNvGrpSpPr/>
-            <p:nvPr/>
-          </p:nvGrpSpPr>
-          <p:grpSpPr>
-            <a:xfrm>
-              <a:off x="3207563" y="4519742"/>
-              <a:ext cx="2433913" cy="314496"/>
-              <a:chOff x="2721075" y="6071986"/>
-              <a:chExt cx="2446874" cy="235941"/>
-            </a:xfrm>
-          </p:grpSpPr>
-          <p:grpSp>
-            <p:nvGrpSpPr>
-              <p:cNvPr id="87" name="Group 86"/>
-              <p:cNvGrpSpPr/>
-              <p:nvPr/>
-            </p:nvGrpSpPr>
-            <p:grpSpPr>
-              <a:xfrm>
-                <a:off x="2721075" y="6071986"/>
-                <a:ext cx="2446874" cy="235941"/>
-                <a:chOff x="2721075" y="6071986"/>
-                <a:chExt cx="2446874" cy="235941"/>
-              </a:xfrm>
-            </p:grpSpPr>
-            <p:grpSp>
-              <p:nvGrpSpPr>
-                <p:cNvPr id="90" name="Group 89"/>
-                <p:cNvGrpSpPr/>
-                <p:nvPr/>
-              </p:nvGrpSpPr>
-              <p:grpSpPr>
-                <a:xfrm>
-                  <a:off x="2721075" y="6071986"/>
-                  <a:ext cx="2446874" cy="232634"/>
-                  <a:chOff x="2887074" y="6071986"/>
-                  <a:chExt cx="2446874" cy="232634"/>
-                </a:xfrm>
-              </p:grpSpPr>
-              <p:pic>
-                <p:nvPicPr>
-                  <p:cNvPr id="130" name="Picture 129"/>
-                  <p:cNvPicPr>
-                    <a:picLocks noChangeAspect="1"/>
-                  </p:cNvPicPr>
-                  <p:nvPr/>
-                </p:nvPicPr>
-                <p:blipFill>
-                  <a:blip r:embed="rId7" cstate="print">
-                    <a:extLst>
-                      <a:ext uri="{28A0092B-C50C-407E-A947-70E740481C1C}">
-                        <a14:useLocalDpi xmlns:a14="http://schemas.microsoft.com/office/drawing/2010/main" val="0"/>
-                      </a:ext>
-                    </a:extLst>
-                  </a:blip>
-                  <a:stretch>
-                    <a:fillRect/>
-                  </a:stretch>
-                </p:blipFill>
-                <p:spPr>
-                  <a:xfrm>
-                    <a:off x="3969972" y="6108116"/>
-                    <a:ext cx="325640" cy="161565"/>
-                  </a:xfrm>
-                  <a:prstGeom prst="rect">
-                    <a:avLst/>
-                  </a:prstGeom>
-                </p:spPr>
-              </p:pic>
-              <p:pic>
-                <p:nvPicPr>
-                  <p:cNvPr id="131" name="Picture 130"/>
-                  <p:cNvPicPr>
-                    <a:picLocks noChangeAspect="1"/>
-                  </p:cNvPicPr>
-                  <p:nvPr/>
-                </p:nvPicPr>
-                <p:blipFill>
-                  <a:blip r:embed="rId10" cstate="print">
-                    <a:extLst>
-                      <a:ext uri="{28A0092B-C50C-407E-A947-70E740481C1C}">
-                        <a14:useLocalDpi xmlns:a14="http://schemas.microsoft.com/office/drawing/2010/main" val="0"/>
-                      </a:ext>
-                    </a:extLst>
-                  </a:blip>
-                  <a:stretch>
-                    <a:fillRect/>
-                  </a:stretch>
-                </p:blipFill>
-                <p:spPr>
-                  <a:xfrm>
-                    <a:off x="5053316" y="6079024"/>
-                    <a:ext cx="280632" cy="225596"/>
-                  </a:xfrm>
-                  <a:prstGeom prst="rect">
-                    <a:avLst/>
-                  </a:prstGeom>
-                </p:spPr>
-              </p:pic>
-              <p:pic>
-                <p:nvPicPr>
-                  <p:cNvPr id="132" name="Picture 131"/>
-                  <p:cNvPicPr>
-                    <a:picLocks noChangeAspect="1"/>
-                  </p:cNvPicPr>
-                  <p:nvPr/>
-                </p:nvPicPr>
-                <p:blipFill>
-                  <a:blip r:embed="rId8" cstate="print">
-                    <a:extLst>
-                      <a:ext uri="{28A0092B-C50C-407E-A947-70E740481C1C}">
-                        <a14:useLocalDpi xmlns:a14="http://schemas.microsoft.com/office/drawing/2010/main" val="0"/>
-                      </a:ext>
-                    </a:extLst>
-                  </a:blip>
-                  <a:stretch>
-                    <a:fillRect/>
-                  </a:stretch>
-                </p:blipFill>
-                <p:spPr>
-                  <a:xfrm>
-                    <a:off x="4345983" y="6071986"/>
-                    <a:ext cx="274386" cy="225596"/>
-                  </a:xfrm>
-                  <a:prstGeom prst="rect">
-                    <a:avLst/>
-                  </a:prstGeom>
-                </p:spPr>
-              </p:pic>
-              <p:pic>
-                <p:nvPicPr>
-                  <p:cNvPr id="133" name="Picture 132"/>
-                  <p:cNvPicPr>
-                    <a:picLocks noChangeAspect="1"/>
-                  </p:cNvPicPr>
-                  <p:nvPr/>
-                </p:nvPicPr>
-                <p:blipFill>
-                  <a:blip r:embed="rId5" cstate="print">
-                    <a:extLst>
-                      <a:ext uri="{28A0092B-C50C-407E-A947-70E740481C1C}">
-                        <a14:useLocalDpi xmlns:a14="http://schemas.microsoft.com/office/drawing/2010/main" val="0"/>
-                      </a:ext>
-                    </a:extLst>
-                  </a:blip>
-                  <a:stretch>
-                    <a:fillRect/>
-                  </a:stretch>
-                </p:blipFill>
-                <p:spPr>
-                  <a:xfrm flipH="1">
-                    <a:off x="2887074" y="6083191"/>
-                    <a:ext cx="255789" cy="218495"/>
-                  </a:xfrm>
-                  <a:prstGeom prst="rect">
-                    <a:avLst/>
-                  </a:prstGeom>
-                </p:spPr>
-              </p:pic>
-            </p:grpSp>
-            <p:pic>
-              <p:nvPicPr>
-                <p:cNvPr id="91" name="Picture 90"/>
-                <p:cNvPicPr>
-                  <a:picLocks noChangeAspect="1"/>
-                </p:cNvPicPr>
-                <p:nvPr/>
-              </p:nvPicPr>
-              <p:blipFill>
-                <a:blip r:embed="rId9"/>
-                <a:stretch>
-                  <a:fillRect/>
-                </a:stretch>
-              </p:blipFill>
-              <p:spPr>
-                <a:xfrm>
-                  <a:off x="4496014" y="6071986"/>
-                  <a:ext cx="302061" cy="235941"/>
+                <a:xfrm flipH="1">
+                  <a:off x="2887074" y="6083191"/>
+                  <a:ext cx="255789" cy="218495"/>
                 </a:xfrm>
                 <a:prstGeom prst="rect">
                   <a:avLst/>
@@ -14210,46 +14645,22 @@
           </p:grpSp>
           <p:pic>
             <p:nvPicPr>
-              <p:cNvPr id="88" name="Picture 87"/>
+              <p:cNvPr id="199" name="Picture 198"/>
               <p:cNvPicPr>
                 <a:picLocks noChangeAspect="1"/>
               </p:cNvPicPr>
               <p:nvPr/>
             </p:nvPicPr>
             <p:blipFill>
-              <a:blip r:embed="rId6"/>
+              <a:blip r:embed="rId9"/>
               <a:stretch>
                 <a:fillRect/>
               </a:stretch>
             </p:blipFill>
             <p:spPr>
               <a:xfrm>
-                <a:off x="3431585" y="6089590"/>
-                <a:ext cx="334903" cy="198223"/>
-              </a:xfrm>
-              <a:prstGeom prst="rect">
-                <a:avLst/>
-              </a:prstGeom>
-            </p:spPr>
-          </p:pic>
-          <p:pic>
-            <p:nvPicPr>
-              <p:cNvPr id="89" name="Picture 88"/>
-              <p:cNvPicPr>
-                <a:picLocks noChangeAspect="1"/>
-              </p:cNvPicPr>
-              <p:nvPr/>
-            </p:nvPicPr>
-            <p:blipFill>
-              <a:blip r:embed="rId4"/>
-              <a:stretch>
-                <a:fillRect/>
-              </a:stretch>
-            </p:blipFill>
-            <p:spPr>
-              <a:xfrm>
-                <a:off x="3070198" y="6097678"/>
-                <a:ext cx="327300" cy="196986"/>
+                <a:off x="4496014" y="6071986"/>
+                <a:ext cx="302061" cy="235941"/>
               </a:xfrm>
               <a:prstGeom prst="rect">
                 <a:avLst/>
@@ -14257,187 +14668,211 @@
             </p:spPr>
           </p:pic>
         </p:grpSp>
+        <p:pic>
+          <p:nvPicPr>
+            <p:cNvPr id="196" name="Picture 195"/>
+            <p:cNvPicPr>
+              <a:picLocks noChangeAspect="1"/>
+            </p:cNvPicPr>
+            <p:nvPr/>
+          </p:nvPicPr>
+          <p:blipFill>
+            <a:blip r:embed="rId6"/>
+            <a:stretch>
+              <a:fillRect/>
+            </a:stretch>
+          </p:blipFill>
+          <p:spPr>
+            <a:xfrm>
+              <a:off x="3431585" y="6089590"/>
+              <a:ext cx="334903" cy="198223"/>
+            </a:xfrm>
+            <a:prstGeom prst="rect">
+              <a:avLst/>
+            </a:prstGeom>
+          </p:spPr>
+        </p:pic>
+        <p:pic>
+          <p:nvPicPr>
+            <p:cNvPr id="197" name="Picture 196"/>
+            <p:cNvPicPr>
+              <a:picLocks noChangeAspect="1"/>
+            </p:cNvPicPr>
+            <p:nvPr/>
+          </p:nvPicPr>
+          <p:blipFill>
+            <a:blip r:embed="rId4"/>
+            <a:stretch>
+              <a:fillRect/>
+            </a:stretch>
+          </p:blipFill>
+          <p:spPr>
+            <a:xfrm>
+              <a:off x="3070198" y="6097678"/>
+              <a:ext cx="327300" cy="196986"/>
+            </a:xfrm>
+            <a:prstGeom prst="rect">
+              <a:avLst/>
+            </a:prstGeom>
+          </p:spPr>
+        </p:pic>
+      </p:grpSp>
+      <p:grpSp>
+        <p:nvGrpSpPr>
+          <p:cNvPr id="204" name="Group 203"/>
+          <p:cNvGrpSpPr/>
+          <p:nvPr/>
+        </p:nvGrpSpPr>
+        <p:grpSpPr>
+          <a:xfrm>
+            <a:off x="6803043" y="6320629"/>
+            <a:ext cx="2433913" cy="314496"/>
+            <a:chOff x="2721075" y="6071986"/>
+            <a:chExt cx="2446874" cy="235941"/>
+          </a:xfrm>
+        </p:grpSpPr>
         <p:grpSp>
           <p:nvGrpSpPr>
-            <p:cNvPr id="184" name="Group 183"/>
+            <p:cNvPr id="205" name="Group 204"/>
             <p:cNvGrpSpPr/>
             <p:nvPr/>
           </p:nvGrpSpPr>
           <p:grpSpPr>
             <a:xfrm>
-              <a:off x="3229725" y="6320629"/>
-              <a:ext cx="2433913" cy="314496"/>
+              <a:off x="2721075" y="6071986"/>
+              <a:ext cx="2446874" cy="235941"/>
               <a:chOff x="2721075" y="6071986"/>
               <a:chExt cx="2446874" cy="235941"/>
             </a:xfrm>
           </p:grpSpPr>
           <p:grpSp>
             <p:nvGrpSpPr>
-              <p:cNvPr id="185" name="Group 184"/>
+              <p:cNvPr id="208" name="Group 207"/>
               <p:cNvGrpSpPr/>
               <p:nvPr/>
             </p:nvGrpSpPr>
             <p:grpSpPr>
               <a:xfrm>
                 <a:off x="2721075" y="6071986"/>
-                <a:ext cx="2446874" cy="235941"/>
-                <a:chOff x="2721075" y="6071986"/>
-                <a:chExt cx="2446874" cy="235941"/>
+                <a:ext cx="2446874" cy="232634"/>
+                <a:chOff x="2887074" y="6071986"/>
+                <a:chExt cx="2446874" cy="232634"/>
               </a:xfrm>
             </p:grpSpPr>
-            <p:grpSp>
-              <p:nvGrpSpPr>
-                <p:cNvPr id="188" name="Group 187"/>
-                <p:cNvGrpSpPr/>
-                <p:nvPr/>
-              </p:nvGrpSpPr>
-              <p:grpSpPr>
-                <a:xfrm>
-                  <a:off x="2721075" y="6071986"/>
-                  <a:ext cx="2446874" cy="232634"/>
-                  <a:chOff x="2887074" y="6071986"/>
-                  <a:chExt cx="2446874" cy="232634"/>
-                </a:xfrm>
-              </p:grpSpPr>
-              <p:pic>
-                <p:nvPicPr>
-                  <p:cNvPr id="190" name="Picture 189"/>
-                  <p:cNvPicPr>
-                    <a:picLocks noChangeAspect="1"/>
-                  </p:cNvPicPr>
-                  <p:nvPr/>
-                </p:nvPicPr>
-                <p:blipFill>
-                  <a:blip r:embed="rId7" cstate="print">
-                    <a:extLst>
-                      <a:ext uri="{28A0092B-C50C-407E-A947-70E740481C1C}">
-                        <a14:useLocalDpi xmlns:a14="http://schemas.microsoft.com/office/drawing/2010/main" val="0"/>
-                      </a:ext>
-                    </a:extLst>
-                  </a:blip>
-                  <a:stretch>
-                    <a:fillRect/>
-                  </a:stretch>
-                </p:blipFill>
-                <p:spPr>
-                  <a:xfrm>
-                    <a:off x="3969972" y="6108116"/>
-                    <a:ext cx="325640" cy="161565"/>
-                  </a:xfrm>
-                  <a:prstGeom prst="rect">
-                    <a:avLst/>
-                  </a:prstGeom>
-                </p:spPr>
-              </p:pic>
-              <p:pic>
-                <p:nvPicPr>
-                  <p:cNvPr id="191" name="Picture 190"/>
-                  <p:cNvPicPr>
-                    <a:picLocks noChangeAspect="1"/>
-                  </p:cNvPicPr>
-                  <p:nvPr/>
-                </p:nvPicPr>
-                <p:blipFill>
-                  <a:blip r:embed="rId10" cstate="print">
-                    <a:extLst>
-                      <a:ext uri="{28A0092B-C50C-407E-A947-70E740481C1C}">
-                        <a14:useLocalDpi xmlns:a14="http://schemas.microsoft.com/office/drawing/2010/main" val="0"/>
-                      </a:ext>
-                    </a:extLst>
-                  </a:blip>
-                  <a:stretch>
-                    <a:fillRect/>
-                  </a:stretch>
-                </p:blipFill>
-                <p:spPr>
-                  <a:xfrm>
-                    <a:off x="5053316" y="6079024"/>
-                    <a:ext cx="280632" cy="225596"/>
-                  </a:xfrm>
-                  <a:prstGeom prst="rect">
-                    <a:avLst/>
-                  </a:prstGeom>
-                </p:spPr>
-              </p:pic>
-              <p:pic>
-                <p:nvPicPr>
-                  <p:cNvPr id="192" name="Picture 191"/>
-                  <p:cNvPicPr>
-                    <a:picLocks noChangeAspect="1"/>
-                  </p:cNvPicPr>
-                  <p:nvPr/>
-                </p:nvPicPr>
-                <p:blipFill>
-                  <a:blip r:embed="rId8" cstate="print">
-                    <a:extLst>
-                      <a:ext uri="{28A0092B-C50C-407E-A947-70E740481C1C}">
-                        <a14:useLocalDpi xmlns:a14="http://schemas.microsoft.com/office/drawing/2010/main" val="0"/>
-                      </a:ext>
-                    </a:extLst>
-                  </a:blip>
-                  <a:stretch>
-                    <a:fillRect/>
-                  </a:stretch>
-                </p:blipFill>
-                <p:spPr>
-                  <a:xfrm>
-                    <a:off x="4345983" y="6071986"/>
-                    <a:ext cx="274386" cy="225596"/>
-                  </a:xfrm>
-                  <a:prstGeom prst="rect">
-                    <a:avLst/>
-                  </a:prstGeom>
-                </p:spPr>
-              </p:pic>
-              <p:pic>
-                <p:nvPicPr>
-                  <p:cNvPr id="193" name="Picture 192"/>
-                  <p:cNvPicPr>
-                    <a:picLocks noChangeAspect="1"/>
-                  </p:cNvPicPr>
-                  <p:nvPr/>
-                </p:nvPicPr>
-                <p:blipFill>
-                  <a:blip r:embed="rId5" cstate="print">
-                    <a:extLst>
-                      <a:ext uri="{28A0092B-C50C-407E-A947-70E740481C1C}">
-                        <a14:useLocalDpi xmlns:a14="http://schemas.microsoft.com/office/drawing/2010/main" val="0"/>
-                      </a:ext>
-                    </a:extLst>
-                  </a:blip>
-                  <a:stretch>
-                    <a:fillRect/>
-                  </a:stretch>
-                </p:blipFill>
-                <p:spPr>
-                  <a:xfrm flipH="1">
-                    <a:off x="2887074" y="6083191"/>
-                    <a:ext cx="255789" cy="218495"/>
-                  </a:xfrm>
-                  <a:prstGeom prst="rect">
-                    <a:avLst/>
-                  </a:prstGeom>
-                </p:spPr>
-              </p:pic>
-            </p:grpSp>
             <p:pic>
               <p:nvPicPr>
-                <p:cNvPr id="189" name="Picture 188"/>
+                <p:cNvPr id="210" name="Picture 209"/>
                 <p:cNvPicPr>
                   <a:picLocks noChangeAspect="1"/>
                 </p:cNvPicPr>
                 <p:nvPr/>
               </p:nvPicPr>
               <p:blipFill>
-                <a:blip r:embed="rId9"/>
+                <a:blip r:embed="rId7" cstate="print">
+                  <a:extLst>
+                    <a:ext uri="{28A0092B-C50C-407E-A947-70E740481C1C}">
+                      <a14:useLocalDpi xmlns:a14="http://schemas.microsoft.com/office/drawing/2010/main" val="0"/>
+                    </a:ext>
+                  </a:extLst>
+                </a:blip>
                 <a:stretch>
                   <a:fillRect/>
                 </a:stretch>
               </p:blipFill>
               <p:spPr>
                 <a:xfrm>
-                  <a:off x="4496014" y="6071986"/>
-                  <a:ext cx="302061" cy="235941"/>
+                  <a:off x="3969972" y="6108116"/>
+                  <a:ext cx="325640" cy="161565"/>
+                </a:xfrm>
+                <a:prstGeom prst="rect">
+                  <a:avLst/>
+                </a:prstGeom>
+              </p:spPr>
+            </p:pic>
+            <p:pic>
+              <p:nvPicPr>
+                <p:cNvPr id="211" name="Picture 210"/>
+                <p:cNvPicPr>
+                  <a:picLocks noChangeAspect="1"/>
+                </p:cNvPicPr>
+                <p:nvPr/>
+              </p:nvPicPr>
+              <p:blipFill>
+                <a:blip r:embed="rId10" cstate="print">
+                  <a:extLst>
+                    <a:ext uri="{28A0092B-C50C-407E-A947-70E740481C1C}">
+                      <a14:useLocalDpi xmlns:a14="http://schemas.microsoft.com/office/drawing/2010/main" val="0"/>
+                    </a:ext>
+                  </a:extLst>
+                </a:blip>
+                <a:stretch>
+                  <a:fillRect/>
+                </a:stretch>
+              </p:blipFill>
+              <p:spPr>
+                <a:xfrm>
+                  <a:off x="5053316" y="6079024"/>
+                  <a:ext cx="280632" cy="225596"/>
+                </a:xfrm>
+                <a:prstGeom prst="rect">
+                  <a:avLst/>
+                </a:prstGeom>
+              </p:spPr>
+            </p:pic>
+            <p:pic>
+              <p:nvPicPr>
+                <p:cNvPr id="212" name="Picture 211"/>
+                <p:cNvPicPr>
+                  <a:picLocks noChangeAspect="1"/>
+                </p:cNvPicPr>
+                <p:nvPr/>
+              </p:nvPicPr>
+              <p:blipFill>
+                <a:blip r:embed="rId8" cstate="print">
+                  <a:extLst>
+                    <a:ext uri="{28A0092B-C50C-407E-A947-70E740481C1C}">
+                      <a14:useLocalDpi xmlns:a14="http://schemas.microsoft.com/office/drawing/2010/main" val="0"/>
+                    </a:ext>
+                  </a:extLst>
+                </a:blip>
+                <a:stretch>
+                  <a:fillRect/>
+                </a:stretch>
+              </p:blipFill>
+              <p:spPr>
+                <a:xfrm>
+                  <a:off x="4345983" y="6071986"/>
+                  <a:ext cx="274386" cy="225596"/>
+                </a:xfrm>
+                <a:prstGeom prst="rect">
+                  <a:avLst/>
+                </a:prstGeom>
+              </p:spPr>
+            </p:pic>
+            <p:pic>
+              <p:nvPicPr>
+                <p:cNvPr id="213" name="Picture 212"/>
+                <p:cNvPicPr>
+                  <a:picLocks noChangeAspect="1"/>
+                </p:cNvPicPr>
+                <p:nvPr/>
+              </p:nvPicPr>
+              <p:blipFill>
+                <a:blip r:embed="rId5" cstate="print">
+                  <a:extLst>
+                    <a:ext uri="{28A0092B-C50C-407E-A947-70E740481C1C}">
+                      <a14:useLocalDpi xmlns:a14="http://schemas.microsoft.com/office/drawing/2010/main" val="0"/>
+                    </a:ext>
+                  </a:extLst>
+                </a:blip>
+                <a:stretch>
+                  <a:fillRect/>
+                </a:stretch>
+              </p:blipFill>
+              <p:spPr>
+                <a:xfrm flipH="1">
+                  <a:off x="2887074" y="6083191"/>
+                  <a:ext cx="255789" cy="218495"/>
                 </a:xfrm>
                 <a:prstGeom prst="rect">
                   <a:avLst/>
@@ -14447,46 +14882,22 @@
           </p:grpSp>
           <p:pic>
             <p:nvPicPr>
-              <p:cNvPr id="186" name="Picture 185"/>
+              <p:cNvPr id="209" name="Picture 208"/>
               <p:cNvPicPr>
                 <a:picLocks noChangeAspect="1"/>
               </p:cNvPicPr>
               <p:nvPr/>
             </p:nvPicPr>
             <p:blipFill>
-              <a:blip r:embed="rId6"/>
+              <a:blip r:embed="rId9"/>
               <a:stretch>
                 <a:fillRect/>
               </a:stretch>
             </p:blipFill>
             <p:spPr>
               <a:xfrm>
-                <a:off x="3431585" y="6089590"/>
-                <a:ext cx="334903" cy="198223"/>
-              </a:xfrm>
-              <a:prstGeom prst="rect">
-                <a:avLst/>
-              </a:prstGeom>
-            </p:spPr>
-          </p:pic>
-          <p:pic>
-            <p:nvPicPr>
-              <p:cNvPr id="187" name="Picture 186"/>
-              <p:cNvPicPr>
-                <a:picLocks noChangeAspect="1"/>
-              </p:cNvPicPr>
-              <p:nvPr/>
-            </p:nvPicPr>
-            <p:blipFill>
-              <a:blip r:embed="rId4"/>
-              <a:stretch>
-                <a:fillRect/>
-              </a:stretch>
-            </p:blipFill>
-            <p:spPr>
-              <a:xfrm>
-                <a:off x="3070198" y="6097678"/>
-                <a:ext cx="327300" cy="196986"/>
+                <a:off x="4496014" y="6071986"/>
+                <a:ext cx="302061" cy="235941"/>
               </a:xfrm>
               <a:prstGeom prst="rect">
                 <a:avLst/>
@@ -14494,567 +14905,141 @@
             </p:spPr>
           </p:pic>
         </p:grpSp>
-        <p:grpSp>
-          <p:nvGrpSpPr>
-            <p:cNvPr id="194" name="Group 193"/>
-            <p:cNvGrpSpPr/>
+        <p:pic>
+          <p:nvPicPr>
+            <p:cNvPr id="206" name="Picture 205"/>
+            <p:cNvPicPr>
+              <a:picLocks noChangeAspect="1"/>
+            </p:cNvPicPr>
             <p:nvPr/>
-          </p:nvGrpSpPr>
-          <p:grpSpPr>
+          </p:nvPicPr>
+          <p:blipFill>
+            <a:blip r:embed="rId6"/>
+            <a:stretch>
+              <a:fillRect/>
+            </a:stretch>
+          </p:blipFill>
+          <p:spPr>
             <a:xfrm>
-              <a:off x="6803043" y="4510207"/>
-              <a:ext cx="2433913" cy="314496"/>
-              <a:chOff x="2721075" y="6071986"/>
-              <a:chExt cx="2446874" cy="235941"/>
+              <a:off x="3431585" y="6089590"/>
+              <a:ext cx="334903" cy="198223"/>
             </a:xfrm>
-          </p:grpSpPr>
-          <p:grpSp>
-            <p:nvGrpSpPr>
-              <p:cNvPr id="195" name="Group 194"/>
-              <p:cNvGrpSpPr/>
-              <p:nvPr/>
-            </p:nvGrpSpPr>
-            <p:grpSpPr>
-              <a:xfrm>
-                <a:off x="2721075" y="6071986"/>
-                <a:ext cx="2446874" cy="235941"/>
-                <a:chOff x="2721075" y="6071986"/>
-                <a:chExt cx="2446874" cy="235941"/>
-              </a:xfrm>
-            </p:grpSpPr>
-            <p:grpSp>
-              <p:nvGrpSpPr>
-                <p:cNvPr id="198" name="Group 197"/>
-                <p:cNvGrpSpPr/>
-                <p:nvPr/>
-              </p:nvGrpSpPr>
-              <p:grpSpPr>
-                <a:xfrm>
-                  <a:off x="2721075" y="6071986"/>
-                  <a:ext cx="2446874" cy="232634"/>
-                  <a:chOff x="2887074" y="6071986"/>
-                  <a:chExt cx="2446874" cy="232634"/>
-                </a:xfrm>
-              </p:grpSpPr>
-              <p:pic>
-                <p:nvPicPr>
-                  <p:cNvPr id="200" name="Picture 199"/>
-                  <p:cNvPicPr>
-                    <a:picLocks noChangeAspect="1"/>
-                  </p:cNvPicPr>
-                  <p:nvPr/>
-                </p:nvPicPr>
-                <p:blipFill>
-                  <a:blip r:embed="rId7" cstate="print">
-                    <a:extLst>
-                      <a:ext uri="{28A0092B-C50C-407E-A947-70E740481C1C}">
-                        <a14:useLocalDpi xmlns:a14="http://schemas.microsoft.com/office/drawing/2010/main" val="0"/>
-                      </a:ext>
-                    </a:extLst>
-                  </a:blip>
-                  <a:stretch>
-                    <a:fillRect/>
-                  </a:stretch>
-                </p:blipFill>
-                <p:spPr>
-                  <a:xfrm>
-                    <a:off x="3969972" y="6108116"/>
-                    <a:ext cx="325640" cy="161565"/>
-                  </a:xfrm>
-                  <a:prstGeom prst="rect">
-                    <a:avLst/>
-                  </a:prstGeom>
-                </p:spPr>
-              </p:pic>
-              <p:pic>
-                <p:nvPicPr>
-                  <p:cNvPr id="201" name="Picture 200"/>
-                  <p:cNvPicPr>
-                    <a:picLocks noChangeAspect="1"/>
-                  </p:cNvPicPr>
-                  <p:nvPr/>
-                </p:nvPicPr>
-                <p:blipFill>
-                  <a:blip r:embed="rId10" cstate="print">
-                    <a:extLst>
-                      <a:ext uri="{28A0092B-C50C-407E-A947-70E740481C1C}">
-                        <a14:useLocalDpi xmlns:a14="http://schemas.microsoft.com/office/drawing/2010/main" val="0"/>
-                      </a:ext>
-                    </a:extLst>
-                  </a:blip>
-                  <a:stretch>
-                    <a:fillRect/>
-                  </a:stretch>
-                </p:blipFill>
-                <p:spPr>
-                  <a:xfrm>
-                    <a:off x="5053316" y="6079024"/>
-                    <a:ext cx="280632" cy="225596"/>
-                  </a:xfrm>
-                  <a:prstGeom prst="rect">
-                    <a:avLst/>
-                  </a:prstGeom>
-                </p:spPr>
-              </p:pic>
-              <p:pic>
-                <p:nvPicPr>
-                  <p:cNvPr id="202" name="Picture 201"/>
-                  <p:cNvPicPr>
-                    <a:picLocks noChangeAspect="1"/>
-                  </p:cNvPicPr>
-                  <p:nvPr/>
-                </p:nvPicPr>
-                <p:blipFill>
-                  <a:blip r:embed="rId8" cstate="print">
-                    <a:extLst>
-                      <a:ext uri="{28A0092B-C50C-407E-A947-70E740481C1C}">
-                        <a14:useLocalDpi xmlns:a14="http://schemas.microsoft.com/office/drawing/2010/main" val="0"/>
-                      </a:ext>
-                    </a:extLst>
-                  </a:blip>
-                  <a:stretch>
-                    <a:fillRect/>
-                  </a:stretch>
-                </p:blipFill>
-                <p:spPr>
-                  <a:xfrm>
-                    <a:off x="4345983" y="6071986"/>
-                    <a:ext cx="274386" cy="225596"/>
-                  </a:xfrm>
-                  <a:prstGeom prst="rect">
-                    <a:avLst/>
-                  </a:prstGeom>
-                </p:spPr>
-              </p:pic>
-              <p:pic>
-                <p:nvPicPr>
-                  <p:cNvPr id="203" name="Picture 202"/>
-                  <p:cNvPicPr>
-                    <a:picLocks noChangeAspect="1"/>
-                  </p:cNvPicPr>
-                  <p:nvPr/>
-                </p:nvPicPr>
-                <p:blipFill>
-                  <a:blip r:embed="rId5" cstate="print">
-                    <a:extLst>
-                      <a:ext uri="{28A0092B-C50C-407E-A947-70E740481C1C}">
-                        <a14:useLocalDpi xmlns:a14="http://schemas.microsoft.com/office/drawing/2010/main" val="0"/>
-                      </a:ext>
-                    </a:extLst>
-                  </a:blip>
-                  <a:stretch>
-                    <a:fillRect/>
-                  </a:stretch>
-                </p:blipFill>
-                <p:spPr>
-                  <a:xfrm flipH="1">
-                    <a:off x="2887074" y="6083191"/>
-                    <a:ext cx="255789" cy="218495"/>
-                  </a:xfrm>
-                  <a:prstGeom prst="rect">
-                    <a:avLst/>
-                  </a:prstGeom>
-                </p:spPr>
-              </p:pic>
-            </p:grpSp>
-            <p:pic>
-              <p:nvPicPr>
-                <p:cNvPr id="199" name="Picture 198"/>
-                <p:cNvPicPr>
-                  <a:picLocks noChangeAspect="1"/>
-                </p:cNvPicPr>
-                <p:nvPr/>
-              </p:nvPicPr>
-              <p:blipFill>
-                <a:blip r:embed="rId9"/>
-                <a:stretch>
-                  <a:fillRect/>
-                </a:stretch>
-              </p:blipFill>
-              <p:spPr>
-                <a:xfrm>
-                  <a:off x="4496014" y="6071986"/>
-                  <a:ext cx="302061" cy="235941"/>
-                </a:xfrm>
-                <a:prstGeom prst="rect">
-                  <a:avLst/>
-                </a:prstGeom>
-              </p:spPr>
-            </p:pic>
-          </p:grpSp>
-          <p:pic>
-            <p:nvPicPr>
-              <p:cNvPr id="196" name="Picture 195"/>
-              <p:cNvPicPr>
-                <a:picLocks noChangeAspect="1"/>
-              </p:cNvPicPr>
-              <p:nvPr/>
-            </p:nvPicPr>
-            <p:blipFill>
-              <a:blip r:embed="rId6"/>
-              <a:stretch>
-                <a:fillRect/>
-              </a:stretch>
-            </p:blipFill>
-            <p:spPr>
-              <a:xfrm>
-                <a:off x="3431585" y="6089590"/>
-                <a:ext cx="334903" cy="198223"/>
-              </a:xfrm>
-              <a:prstGeom prst="rect">
-                <a:avLst/>
-              </a:prstGeom>
-            </p:spPr>
-          </p:pic>
-          <p:pic>
-            <p:nvPicPr>
-              <p:cNvPr id="197" name="Picture 196"/>
-              <p:cNvPicPr>
-                <a:picLocks noChangeAspect="1"/>
-              </p:cNvPicPr>
-              <p:nvPr/>
-            </p:nvPicPr>
-            <p:blipFill>
-              <a:blip r:embed="rId4"/>
-              <a:stretch>
-                <a:fillRect/>
-              </a:stretch>
-            </p:blipFill>
-            <p:spPr>
-              <a:xfrm>
-                <a:off x="3070198" y="6097678"/>
-                <a:ext cx="327300" cy="196986"/>
-              </a:xfrm>
-              <a:prstGeom prst="rect">
-                <a:avLst/>
-              </a:prstGeom>
-            </p:spPr>
-          </p:pic>
-        </p:grpSp>
-        <p:grpSp>
-          <p:nvGrpSpPr>
-            <p:cNvPr id="204" name="Group 203"/>
-            <p:cNvGrpSpPr/>
+            <a:prstGeom prst="rect">
+              <a:avLst/>
+            </a:prstGeom>
+          </p:spPr>
+        </p:pic>
+        <p:pic>
+          <p:nvPicPr>
+            <p:cNvPr id="207" name="Picture 206"/>
+            <p:cNvPicPr>
+              <a:picLocks noChangeAspect="1"/>
+            </p:cNvPicPr>
             <p:nvPr/>
-          </p:nvGrpSpPr>
-          <p:grpSpPr>
+          </p:nvPicPr>
+          <p:blipFill>
+            <a:blip r:embed="rId4"/>
+            <a:stretch>
+              <a:fillRect/>
+            </a:stretch>
+          </p:blipFill>
+          <p:spPr>
             <a:xfrm>
-              <a:off x="6803043" y="6320629"/>
-              <a:ext cx="2433913" cy="314496"/>
-              <a:chOff x="2721075" y="6071986"/>
-              <a:chExt cx="2446874" cy="235941"/>
+              <a:off x="3070198" y="6097678"/>
+              <a:ext cx="327300" cy="196986"/>
             </a:xfrm>
-          </p:grpSpPr>
-          <p:grpSp>
-            <p:nvGrpSpPr>
-              <p:cNvPr id="205" name="Group 204"/>
-              <p:cNvGrpSpPr/>
-              <p:nvPr/>
-            </p:nvGrpSpPr>
-            <p:grpSpPr>
-              <a:xfrm>
-                <a:off x="2721075" y="6071986"/>
-                <a:ext cx="2446874" cy="235941"/>
-                <a:chOff x="2721075" y="6071986"/>
-                <a:chExt cx="2446874" cy="235941"/>
-              </a:xfrm>
-            </p:grpSpPr>
-            <p:grpSp>
-              <p:nvGrpSpPr>
-                <p:cNvPr id="208" name="Group 207"/>
-                <p:cNvGrpSpPr/>
-                <p:nvPr/>
-              </p:nvGrpSpPr>
-              <p:grpSpPr>
-                <a:xfrm>
-                  <a:off x="2721075" y="6071986"/>
-                  <a:ext cx="2446874" cy="232634"/>
-                  <a:chOff x="2887074" y="6071986"/>
-                  <a:chExt cx="2446874" cy="232634"/>
-                </a:xfrm>
-              </p:grpSpPr>
-              <p:pic>
-                <p:nvPicPr>
-                  <p:cNvPr id="210" name="Picture 209"/>
-                  <p:cNvPicPr>
-                    <a:picLocks noChangeAspect="1"/>
-                  </p:cNvPicPr>
-                  <p:nvPr/>
-                </p:nvPicPr>
-                <p:blipFill>
-                  <a:blip r:embed="rId7" cstate="print">
-                    <a:extLst>
-                      <a:ext uri="{28A0092B-C50C-407E-A947-70E740481C1C}">
-                        <a14:useLocalDpi xmlns:a14="http://schemas.microsoft.com/office/drawing/2010/main" val="0"/>
-                      </a:ext>
-                    </a:extLst>
-                  </a:blip>
-                  <a:stretch>
-                    <a:fillRect/>
-                  </a:stretch>
-                </p:blipFill>
-                <p:spPr>
-                  <a:xfrm>
-                    <a:off x="3969972" y="6108116"/>
-                    <a:ext cx="325640" cy="161565"/>
-                  </a:xfrm>
-                  <a:prstGeom prst="rect">
-                    <a:avLst/>
-                  </a:prstGeom>
-                </p:spPr>
-              </p:pic>
-              <p:pic>
-                <p:nvPicPr>
-                  <p:cNvPr id="211" name="Picture 210"/>
-                  <p:cNvPicPr>
-                    <a:picLocks noChangeAspect="1"/>
-                  </p:cNvPicPr>
-                  <p:nvPr/>
-                </p:nvPicPr>
-                <p:blipFill>
-                  <a:blip r:embed="rId10" cstate="print">
-                    <a:extLst>
-                      <a:ext uri="{28A0092B-C50C-407E-A947-70E740481C1C}">
-                        <a14:useLocalDpi xmlns:a14="http://schemas.microsoft.com/office/drawing/2010/main" val="0"/>
-                      </a:ext>
-                    </a:extLst>
-                  </a:blip>
-                  <a:stretch>
-                    <a:fillRect/>
-                  </a:stretch>
-                </p:blipFill>
-                <p:spPr>
-                  <a:xfrm>
-                    <a:off x="5053316" y="6079024"/>
-                    <a:ext cx="280632" cy="225596"/>
-                  </a:xfrm>
-                  <a:prstGeom prst="rect">
-                    <a:avLst/>
-                  </a:prstGeom>
-                </p:spPr>
-              </p:pic>
-              <p:pic>
-                <p:nvPicPr>
-                  <p:cNvPr id="212" name="Picture 211"/>
-                  <p:cNvPicPr>
-                    <a:picLocks noChangeAspect="1"/>
-                  </p:cNvPicPr>
-                  <p:nvPr/>
-                </p:nvPicPr>
-                <p:blipFill>
-                  <a:blip r:embed="rId8" cstate="print">
-                    <a:extLst>
-                      <a:ext uri="{28A0092B-C50C-407E-A947-70E740481C1C}">
-                        <a14:useLocalDpi xmlns:a14="http://schemas.microsoft.com/office/drawing/2010/main" val="0"/>
-                      </a:ext>
-                    </a:extLst>
-                  </a:blip>
-                  <a:stretch>
-                    <a:fillRect/>
-                  </a:stretch>
-                </p:blipFill>
-                <p:spPr>
-                  <a:xfrm>
-                    <a:off x="4345983" y="6071986"/>
-                    <a:ext cx="274386" cy="225596"/>
-                  </a:xfrm>
-                  <a:prstGeom prst="rect">
-                    <a:avLst/>
-                  </a:prstGeom>
-                </p:spPr>
-              </p:pic>
-              <p:pic>
-                <p:nvPicPr>
-                  <p:cNvPr id="213" name="Picture 212"/>
-                  <p:cNvPicPr>
-                    <a:picLocks noChangeAspect="1"/>
-                  </p:cNvPicPr>
-                  <p:nvPr/>
-                </p:nvPicPr>
-                <p:blipFill>
-                  <a:blip r:embed="rId5" cstate="print">
-                    <a:extLst>
-                      <a:ext uri="{28A0092B-C50C-407E-A947-70E740481C1C}">
-                        <a14:useLocalDpi xmlns:a14="http://schemas.microsoft.com/office/drawing/2010/main" val="0"/>
-                      </a:ext>
-                    </a:extLst>
-                  </a:blip>
-                  <a:stretch>
-                    <a:fillRect/>
-                  </a:stretch>
-                </p:blipFill>
-                <p:spPr>
-                  <a:xfrm flipH="1">
-                    <a:off x="2887074" y="6083191"/>
-                    <a:ext cx="255789" cy="218495"/>
-                  </a:xfrm>
-                  <a:prstGeom prst="rect">
-                    <a:avLst/>
-                  </a:prstGeom>
-                </p:spPr>
-              </p:pic>
-            </p:grpSp>
-            <p:pic>
-              <p:nvPicPr>
-                <p:cNvPr id="209" name="Picture 208"/>
-                <p:cNvPicPr>
-                  <a:picLocks noChangeAspect="1"/>
-                </p:cNvPicPr>
-                <p:nvPr/>
-              </p:nvPicPr>
-              <p:blipFill>
-                <a:blip r:embed="rId9"/>
-                <a:stretch>
-                  <a:fillRect/>
-                </a:stretch>
-              </p:blipFill>
-              <p:spPr>
-                <a:xfrm>
-                  <a:off x="4496014" y="6071986"/>
-                  <a:ext cx="302061" cy="235941"/>
-                </a:xfrm>
-                <a:prstGeom prst="rect">
-                  <a:avLst/>
-                </a:prstGeom>
-              </p:spPr>
-            </p:pic>
-          </p:grpSp>
-          <p:pic>
-            <p:nvPicPr>
-              <p:cNvPr id="206" name="Picture 205"/>
-              <p:cNvPicPr>
-                <a:picLocks noChangeAspect="1"/>
-              </p:cNvPicPr>
-              <p:nvPr/>
-            </p:nvPicPr>
-            <p:blipFill>
-              <a:blip r:embed="rId6"/>
-              <a:stretch>
-                <a:fillRect/>
-              </a:stretch>
-            </p:blipFill>
-            <p:spPr>
-              <a:xfrm>
-                <a:off x="3431585" y="6089590"/>
-                <a:ext cx="334903" cy="198223"/>
-              </a:xfrm>
-              <a:prstGeom prst="rect">
-                <a:avLst/>
-              </a:prstGeom>
-            </p:spPr>
-          </p:pic>
-          <p:pic>
-            <p:nvPicPr>
-              <p:cNvPr id="207" name="Picture 206"/>
-              <p:cNvPicPr>
-                <a:picLocks noChangeAspect="1"/>
-              </p:cNvPicPr>
-              <p:nvPr/>
-            </p:nvPicPr>
-            <p:blipFill>
-              <a:blip r:embed="rId4"/>
-              <a:stretch>
-                <a:fillRect/>
-              </a:stretch>
-            </p:blipFill>
-            <p:spPr>
-              <a:xfrm>
-                <a:off x="3070198" y="6097678"/>
-                <a:ext cx="327300" cy="196986"/>
-              </a:xfrm>
-              <a:prstGeom prst="rect">
-                <a:avLst/>
-              </a:prstGeom>
-            </p:spPr>
-          </p:pic>
-        </p:grpSp>
-        <p:grpSp>
-          <p:nvGrpSpPr>
-            <p:cNvPr id="214" name="Group 213"/>
-            <p:cNvGrpSpPr/>
+            <a:prstGeom prst="rect">
+              <a:avLst/>
+            </a:prstGeom>
+          </p:spPr>
+        </p:pic>
+      </p:grpSp>
+      <p:grpSp>
+        <p:nvGrpSpPr>
+          <p:cNvPr id="214" name="Group 213"/>
+          <p:cNvGrpSpPr/>
+          <p:nvPr/>
+        </p:nvGrpSpPr>
+        <p:grpSpPr>
+          <a:xfrm>
+            <a:off x="6902697" y="2571330"/>
+            <a:ext cx="2250695" cy="321957"/>
+            <a:chOff x="2066372" y="1693067"/>
+            <a:chExt cx="3156177" cy="418733"/>
+          </a:xfrm>
+        </p:grpSpPr>
+        <p:pic>
+          <p:nvPicPr>
+            <p:cNvPr id="215" name="Picture 214"/>
+            <p:cNvPicPr>
+              <a:picLocks noChangeAspect="1"/>
+            </p:cNvPicPr>
             <p:nvPr/>
-          </p:nvGrpSpPr>
-          <p:grpSpPr>
+          </p:nvPicPr>
+          <p:blipFill>
+            <a:blip r:embed="rId12"/>
+            <a:stretch>
+              <a:fillRect/>
+            </a:stretch>
+          </p:blipFill>
+          <p:spPr>
             <a:xfrm>
-              <a:off x="6902697" y="2571330"/>
-              <a:ext cx="2250695" cy="321957"/>
-              <a:chOff x="2066372" y="1693067"/>
-              <a:chExt cx="3156177" cy="418733"/>
+              <a:off x="2066372" y="1693067"/>
+              <a:ext cx="655912" cy="396304"/>
             </a:xfrm>
-          </p:grpSpPr>
-          <p:pic>
-            <p:nvPicPr>
-              <p:cNvPr id="215" name="Picture 214"/>
-              <p:cNvPicPr>
-                <a:picLocks noChangeAspect="1"/>
-              </p:cNvPicPr>
-              <p:nvPr/>
-            </p:nvPicPr>
-            <p:blipFill>
-              <a:blip r:embed="rId12"/>
-              <a:stretch>
-                <a:fillRect/>
-              </a:stretch>
-            </p:blipFill>
-            <p:spPr>
-              <a:xfrm>
-                <a:off x="2066372" y="1693067"/>
-                <a:ext cx="655912" cy="396304"/>
-              </a:xfrm>
-              <a:prstGeom prst="rect">
-                <a:avLst/>
-              </a:prstGeom>
-            </p:spPr>
-          </p:pic>
-          <p:pic>
-            <p:nvPicPr>
-              <p:cNvPr id="216" name="Picture 215"/>
-              <p:cNvPicPr>
-                <a:picLocks noChangeAspect="1"/>
-              </p:cNvPicPr>
-              <p:nvPr/>
-            </p:nvPicPr>
-            <p:blipFill>
-              <a:blip r:embed="rId13"/>
-              <a:stretch>
-                <a:fillRect/>
-              </a:stretch>
-            </p:blipFill>
-            <p:spPr>
-              <a:xfrm>
-                <a:off x="4494070" y="1746386"/>
-                <a:ext cx="728479" cy="293882"/>
-              </a:xfrm>
-              <a:prstGeom prst="rect">
-                <a:avLst/>
-              </a:prstGeom>
-            </p:spPr>
-          </p:pic>
-          <p:pic>
-            <p:nvPicPr>
-              <p:cNvPr id="217" name="Picture 216"/>
-              <p:cNvPicPr>
-                <a:picLocks noChangeAspect="1"/>
-              </p:cNvPicPr>
-              <p:nvPr/>
-            </p:nvPicPr>
-            <p:blipFill>
-              <a:blip r:embed="rId11"/>
-              <a:stretch>
-                <a:fillRect/>
-              </a:stretch>
-            </p:blipFill>
-            <p:spPr>
-              <a:xfrm>
-                <a:off x="3345216" y="1702857"/>
-                <a:ext cx="640805" cy="408943"/>
-              </a:xfrm>
-              <a:prstGeom prst="rect">
-                <a:avLst/>
-              </a:prstGeom>
-            </p:spPr>
-          </p:pic>
-        </p:grpSp>
+            <a:prstGeom prst="rect">
+              <a:avLst/>
+            </a:prstGeom>
+          </p:spPr>
+        </p:pic>
+        <p:pic>
+          <p:nvPicPr>
+            <p:cNvPr id="216" name="Picture 215"/>
+            <p:cNvPicPr>
+              <a:picLocks noChangeAspect="1"/>
+            </p:cNvPicPr>
+            <p:nvPr/>
+          </p:nvPicPr>
+          <p:blipFill>
+            <a:blip r:embed="rId13"/>
+            <a:stretch>
+              <a:fillRect/>
+            </a:stretch>
+          </p:blipFill>
+          <p:spPr>
+            <a:xfrm>
+              <a:off x="4494070" y="1746386"/>
+              <a:ext cx="728479" cy="293882"/>
+            </a:xfrm>
+            <a:prstGeom prst="rect">
+              <a:avLst/>
+            </a:prstGeom>
+          </p:spPr>
+        </p:pic>
+        <p:pic>
+          <p:nvPicPr>
+            <p:cNvPr id="217" name="Picture 216"/>
+            <p:cNvPicPr>
+              <a:picLocks noChangeAspect="1"/>
+            </p:cNvPicPr>
+            <p:nvPr/>
+          </p:nvPicPr>
+          <p:blipFill>
+            <a:blip r:embed="rId11"/>
+            <a:stretch>
+              <a:fillRect/>
+            </a:stretch>
+          </p:blipFill>
+          <p:spPr>
+            <a:xfrm>
+              <a:off x="3345216" y="1702857"/>
+              <a:ext cx="640805" cy="408943"/>
+            </a:xfrm>
+            <a:prstGeom prst="rect">
+              <a:avLst/>
+            </a:prstGeom>
+          </p:spPr>
+        </p:pic>
       </p:grpSp>
     </p:spTree>
     <p:extLst>

</xml_diff>

<commit_message>
added units to plot
</commit_message>
<xml_diff>
--- a/output/plots/all_figs_with_legends.pptx
+++ b/output/plots/all_figs_with_legends.pptx
@@ -212,7 +212,7 @@
           <a:p>
             <a:fld id="{7FA21820-D199-4D82-91AF-C50B1D3B111A}" type="datetimeFigureOut">
               <a:rPr lang="en-US" smtClean="0"/>
-              <a:t>8/15/2017</a:t>
+              <a:t>10/16/2017</a:t>
             </a:fld>
             <a:endParaRPr lang="en-US"/>
           </a:p>
@@ -1045,7 +1045,7 @@
           <a:p>
             <a:fld id="{916B8C92-D5E3-4480-8685-D57BEE386DE2}" type="datetimeFigureOut">
               <a:rPr lang="en-US" smtClean="0"/>
-              <a:t>8/15/2017</a:t>
+              <a:t>10/16/2017</a:t>
             </a:fld>
             <a:endParaRPr lang="en-US"/>
           </a:p>
@@ -1215,7 +1215,7 @@
           <a:p>
             <a:fld id="{916B8C92-D5E3-4480-8685-D57BEE386DE2}" type="datetimeFigureOut">
               <a:rPr lang="en-US" smtClean="0"/>
-              <a:t>8/15/2017</a:t>
+              <a:t>10/16/2017</a:t>
             </a:fld>
             <a:endParaRPr lang="en-US"/>
           </a:p>
@@ -1395,7 +1395,7 @@
           <a:p>
             <a:fld id="{916B8C92-D5E3-4480-8685-D57BEE386DE2}" type="datetimeFigureOut">
               <a:rPr lang="en-US" smtClean="0"/>
-              <a:t>8/15/2017</a:t>
+              <a:t>10/16/2017</a:t>
             </a:fld>
             <a:endParaRPr lang="en-US"/>
           </a:p>
@@ -1565,7 +1565,7 @@
           <a:p>
             <a:fld id="{916B8C92-D5E3-4480-8685-D57BEE386DE2}" type="datetimeFigureOut">
               <a:rPr lang="en-US" smtClean="0"/>
-              <a:t>8/15/2017</a:t>
+              <a:t>10/16/2017</a:t>
             </a:fld>
             <a:endParaRPr lang="en-US"/>
           </a:p>
@@ -1811,7 +1811,7 @@
           <a:p>
             <a:fld id="{916B8C92-D5E3-4480-8685-D57BEE386DE2}" type="datetimeFigureOut">
               <a:rPr lang="en-US" smtClean="0"/>
-              <a:t>8/15/2017</a:t>
+              <a:t>10/16/2017</a:t>
             </a:fld>
             <a:endParaRPr lang="en-US"/>
           </a:p>
@@ -2043,7 +2043,7 @@
           <a:p>
             <a:fld id="{916B8C92-D5E3-4480-8685-D57BEE386DE2}" type="datetimeFigureOut">
               <a:rPr lang="en-US" smtClean="0"/>
-              <a:t>8/15/2017</a:t>
+              <a:t>10/16/2017</a:t>
             </a:fld>
             <a:endParaRPr lang="en-US"/>
           </a:p>
@@ -2410,7 +2410,7 @@
           <a:p>
             <a:fld id="{916B8C92-D5E3-4480-8685-D57BEE386DE2}" type="datetimeFigureOut">
               <a:rPr lang="en-US" smtClean="0"/>
-              <a:t>8/15/2017</a:t>
+              <a:t>10/16/2017</a:t>
             </a:fld>
             <a:endParaRPr lang="en-US"/>
           </a:p>
@@ -2528,7 +2528,7 @@
           <a:p>
             <a:fld id="{916B8C92-D5E3-4480-8685-D57BEE386DE2}" type="datetimeFigureOut">
               <a:rPr lang="en-US" smtClean="0"/>
-              <a:t>8/15/2017</a:t>
+              <a:t>10/16/2017</a:t>
             </a:fld>
             <a:endParaRPr lang="en-US"/>
           </a:p>
@@ -2623,7 +2623,7 @@
           <a:p>
             <a:fld id="{916B8C92-D5E3-4480-8685-D57BEE386DE2}" type="datetimeFigureOut">
               <a:rPr lang="en-US" smtClean="0"/>
-              <a:t>8/15/2017</a:t>
+              <a:t>10/16/2017</a:t>
             </a:fld>
             <a:endParaRPr lang="en-US"/>
           </a:p>
@@ -2900,7 +2900,7 @@
           <a:p>
             <a:fld id="{916B8C92-D5E3-4480-8685-D57BEE386DE2}" type="datetimeFigureOut">
               <a:rPr lang="en-US" smtClean="0"/>
-              <a:t>8/15/2017</a:t>
+              <a:t>10/16/2017</a:t>
             </a:fld>
             <a:endParaRPr lang="en-US"/>
           </a:p>
@@ -3153,7 +3153,7 @@
           <a:p>
             <a:fld id="{916B8C92-D5E3-4480-8685-D57BEE386DE2}" type="datetimeFigureOut">
               <a:rPr lang="en-US" smtClean="0"/>
-              <a:t>8/15/2017</a:t>
+              <a:t>10/16/2017</a:t>
             </a:fld>
             <a:endParaRPr lang="en-US"/>
           </a:p>
@@ -3366,7 +3366,7 @@
           <a:p>
             <a:fld id="{916B8C92-D5E3-4480-8685-D57BEE386DE2}" type="datetimeFigureOut">
               <a:rPr lang="en-US" smtClean="0"/>
-              <a:t>8/15/2017</a:t>
+              <a:t>10/16/2017</a:t>
             </a:fld>
             <a:endParaRPr lang="en-US"/>
           </a:p>
@@ -15522,30 +15522,6 @@
           <a:chExt cx="0" cy="0"/>
         </a:xfrm>
       </p:grpSpPr>
-      <p:pic>
-        <p:nvPicPr>
-          <p:cNvPr id="2" name="Picture 1"/>
-          <p:cNvPicPr>
-            <a:picLocks noChangeAspect="1"/>
-          </p:cNvPicPr>
-          <p:nvPr/>
-        </p:nvPicPr>
-        <p:blipFill>
-          <a:blip r:embed="rId2"/>
-          <a:stretch>
-            <a:fillRect/>
-          </a:stretch>
-        </p:blipFill>
-        <p:spPr>
-          <a:xfrm>
-            <a:off x="1112533" y="66339"/>
-            <a:ext cx="8757501" cy="5893674"/>
-          </a:xfrm>
-          <a:prstGeom prst="rect">
-            <a:avLst/>
-          </a:prstGeom>
-        </p:spPr>
-      </p:pic>
       <p:sp>
         <p:nvSpPr>
           <p:cNvPr id="6" name="Rectangle 5"/>
@@ -15657,171 +15633,324 @@
       </p:sp>
       <p:grpSp>
         <p:nvGrpSpPr>
-          <p:cNvPr id="3" name="Group 2"/>
+          <p:cNvPr id="9" name="Group 8"/>
           <p:cNvGrpSpPr/>
           <p:nvPr/>
         </p:nvGrpSpPr>
         <p:grpSpPr>
           <a:xfrm>
-            <a:off x="1889150" y="5746600"/>
-            <a:ext cx="7543552" cy="389327"/>
-            <a:chOff x="1889150" y="5746600"/>
-            <a:chExt cx="7543552" cy="389327"/>
+            <a:off x="1178521" y="108321"/>
+            <a:ext cx="8617190" cy="6037140"/>
+            <a:chOff x="1178521" y="108321"/>
+            <a:chExt cx="8617190" cy="6037140"/>
           </a:xfrm>
         </p:grpSpPr>
+        <p:pic>
+          <p:nvPicPr>
+            <p:cNvPr id="8" name="Picture 7"/>
+            <p:cNvPicPr>
+              <a:picLocks noChangeAspect="1"/>
+            </p:cNvPicPr>
+            <p:nvPr/>
+          </p:nvPicPr>
+          <p:blipFill>
+            <a:blip r:embed="rId2"/>
+            <a:stretch>
+              <a:fillRect/>
+            </a:stretch>
+          </p:blipFill>
+          <p:spPr>
+            <a:xfrm>
+              <a:off x="1178521" y="108321"/>
+              <a:ext cx="8617190" cy="5722032"/>
+            </a:xfrm>
+            <a:prstGeom prst="rect">
+              <a:avLst/>
+            </a:prstGeom>
+          </p:spPr>
+        </p:pic>
         <p:grpSp>
           <p:nvGrpSpPr>
-            <p:cNvPr id="16" name="Group 15"/>
+            <p:cNvPr id="3" name="Group 2"/>
             <p:cNvGrpSpPr/>
             <p:nvPr/>
           </p:nvGrpSpPr>
           <p:grpSpPr>
             <a:xfrm>
-              <a:off x="6544247" y="5746600"/>
-              <a:ext cx="2888455" cy="389327"/>
-              <a:chOff x="2148779" y="1628632"/>
-              <a:chExt cx="3459345" cy="428988"/>
-            </a:xfrm>
-          </p:grpSpPr>
-          <p:pic>
-            <p:nvPicPr>
-              <p:cNvPr id="17" name="Picture 16"/>
-              <p:cNvPicPr>
-                <a:picLocks noChangeAspect="1"/>
-              </p:cNvPicPr>
-              <p:nvPr/>
-            </p:nvPicPr>
-            <p:blipFill>
-              <a:blip r:embed="rId3"/>
-              <a:stretch>
-                <a:fillRect/>
-              </a:stretch>
-            </p:blipFill>
-            <p:spPr>
-              <a:xfrm>
-                <a:off x="2148779" y="1628632"/>
-                <a:ext cx="655912" cy="396304"/>
-              </a:xfrm>
-              <a:prstGeom prst="rect">
-                <a:avLst/>
-              </a:prstGeom>
-            </p:spPr>
-          </p:pic>
-          <p:pic>
-            <p:nvPicPr>
-              <p:cNvPr id="18" name="Picture 17"/>
-              <p:cNvPicPr>
-                <a:picLocks noChangeAspect="1"/>
-              </p:cNvPicPr>
-              <p:nvPr/>
-            </p:nvPicPr>
-            <p:blipFill>
-              <a:blip r:embed="rId4"/>
-              <a:stretch>
-                <a:fillRect/>
-              </a:stretch>
-            </p:blipFill>
-            <p:spPr>
-              <a:xfrm>
-                <a:off x="4879645" y="1660191"/>
-                <a:ext cx="728479" cy="293882"/>
-              </a:xfrm>
-              <a:prstGeom prst="rect">
-                <a:avLst/>
-              </a:prstGeom>
-            </p:spPr>
-          </p:pic>
-          <p:pic>
-            <p:nvPicPr>
-              <p:cNvPr id="20" name="Picture 19"/>
-              <p:cNvPicPr>
-                <a:picLocks noChangeAspect="1"/>
-              </p:cNvPicPr>
-              <p:nvPr/>
-            </p:nvPicPr>
-            <p:blipFill>
-              <a:blip r:embed="rId5"/>
-              <a:stretch>
-                <a:fillRect/>
-              </a:stretch>
-            </p:blipFill>
-            <p:spPr>
-              <a:xfrm>
-                <a:off x="3525166" y="1648678"/>
-                <a:ext cx="640805" cy="408942"/>
-              </a:xfrm>
-              <a:prstGeom prst="rect">
-                <a:avLst/>
-              </a:prstGeom>
-            </p:spPr>
-          </p:pic>
-        </p:grpSp>
-        <p:grpSp>
-          <p:nvGrpSpPr>
-            <p:cNvPr id="7" name="Group 6"/>
-            <p:cNvGrpSpPr/>
-            <p:nvPr/>
-          </p:nvGrpSpPr>
-          <p:grpSpPr>
-            <a:xfrm>
-              <a:off x="1889150" y="5779295"/>
-              <a:ext cx="3287191" cy="343444"/>
-              <a:chOff x="1415503" y="5589412"/>
-              <a:chExt cx="3287191" cy="343444"/>
+              <a:off x="1943471" y="5756134"/>
+              <a:ext cx="7543552" cy="389327"/>
+              <a:chOff x="1889150" y="5746600"/>
+              <a:chExt cx="7543552" cy="389327"/>
             </a:xfrm>
           </p:grpSpPr>
           <p:grpSp>
             <p:nvGrpSpPr>
-              <p:cNvPr id="19" name="Group 18"/>
+              <p:cNvPr id="16" name="Group 15"/>
               <p:cNvGrpSpPr/>
               <p:nvPr/>
             </p:nvGrpSpPr>
             <p:grpSpPr>
               <a:xfrm>
-                <a:off x="1943830" y="5589412"/>
-                <a:ext cx="2758864" cy="343444"/>
-                <a:chOff x="2721670" y="6031647"/>
-                <a:chExt cx="2187867" cy="238068"/>
+                <a:off x="6544247" y="5746600"/>
+                <a:ext cx="2888455" cy="389327"/>
+                <a:chOff x="2148779" y="1628632"/>
+                <a:chExt cx="3459345" cy="428988"/>
+              </a:xfrm>
+            </p:grpSpPr>
+            <p:pic>
+              <p:nvPicPr>
+                <p:cNvPr id="17" name="Picture 16"/>
+                <p:cNvPicPr>
+                  <a:picLocks noChangeAspect="1"/>
+                </p:cNvPicPr>
+                <p:nvPr/>
+              </p:nvPicPr>
+              <p:blipFill>
+                <a:blip r:embed="rId3"/>
+                <a:stretch>
+                  <a:fillRect/>
+                </a:stretch>
+              </p:blipFill>
+              <p:spPr>
+                <a:xfrm>
+                  <a:off x="2148779" y="1628632"/>
+                  <a:ext cx="655912" cy="396304"/>
+                </a:xfrm>
+                <a:prstGeom prst="rect">
+                  <a:avLst/>
+                </a:prstGeom>
+              </p:spPr>
+            </p:pic>
+            <p:pic>
+              <p:nvPicPr>
+                <p:cNvPr id="18" name="Picture 17"/>
+                <p:cNvPicPr>
+                  <a:picLocks noChangeAspect="1"/>
+                </p:cNvPicPr>
+                <p:nvPr/>
+              </p:nvPicPr>
+              <p:blipFill>
+                <a:blip r:embed="rId4"/>
+                <a:stretch>
+                  <a:fillRect/>
+                </a:stretch>
+              </p:blipFill>
+              <p:spPr>
+                <a:xfrm>
+                  <a:off x="4879645" y="1660191"/>
+                  <a:ext cx="728479" cy="293882"/>
+                </a:xfrm>
+                <a:prstGeom prst="rect">
+                  <a:avLst/>
+                </a:prstGeom>
+              </p:spPr>
+            </p:pic>
+            <p:pic>
+              <p:nvPicPr>
+                <p:cNvPr id="20" name="Picture 19"/>
+                <p:cNvPicPr>
+                  <a:picLocks noChangeAspect="1"/>
+                </p:cNvPicPr>
+                <p:nvPr/>
+              </p:nvPicPr>
+              <p:blipFill>
+                <a:blip r:embed="rId5"/>
+                <a:stretch>
+                  <a:fillRect/>
+                </a:stretch>
+              </p:blipFill>
+              <p:spPr>
+                <a:xfrm>
+                  <a:off x="3525166" y="1648678"/>
+                  <a:ext cx="640805" cy="408942"/>
+                </a:xfrm>
+                <a:prstGeom prst="rect">
+                  <a:avLst/>
+                </a:prstGeom>
+              </p:spPr>
+            </p:pic>
+          </p:grpSp>
+          <p:grpSp>
+            <p:nvGrpSpPr>
+              <p:cNvPr id="7" name="Group 6"/>
+              <p:cNvGrpSpPr/>
+              <p:nvPr/>
+            </p:nvGrpSpPr>
+            <p:grpSpPr>
+              <a:xfrm>
+                <a:off x="1889150" y="5779295"/>
+                <a:ext cx="3287191" cy="343444"/>
+                <a:chOff x="1415503" y="5589412"/>
+                <a:chExt cx="3287191" cy="343444"/>
               </a:xfrm>
             </p:grpSpPr>
             <p:grpSp>
               <p:nvGrpSpPr>
-                <p:cNvPr id="24" name="Group 23"/>
+                <p:cNvPr id="19" name="Group 18"/>
                 <p:cNvGrpSpPr/>
                 <p:nvPr/>
               </p:nvGrpSpPr>
               <p:grpSpPr>
                 <a:xfrm>
-                  <a:off x="2721670" y="6031647"/>
-                  <a:ext cx="2187867" cy="238068"/>
-                  <a:chOff x="2887669" y="6031647"/>
+                  <a:off x="1943830" y="5589412"/>
+                  <a:ext cx="2758864" cy="343444"/>
+                  <a:chOff x="2721670" y="6031647"/>
                   <a:chExt cx="2187867" cy="238068"/>
                 </a:xfrm>
               </p:grpSpPr>
+              <p:grpSp>
+                <p:nvGrpSpPr>
+                  <p:cNvPr id="24" name="Group 23"/>
+                  <p:cNvGrpSpPr/>
+                  <p:nvPr/>
+                </p:nvGrpSpPr>
+                <p:grpSpPr>
+                  <a:xfrm>
+                    <a:off x="2721670" y="6031647"/>
+                    <a:ext cx="2187867" cy="238068"/>
+                    <a:chOff x="2887669" y="6031647"/>
+                    <a:chExt cx="2187867" cy="238068"/>
+                  </a:xfrm>
+                </p:grpSpPr>
+                <p:pic>
+                  <p:nvPicPr>
+                    <p:cNvPr id="26" name="Picture 25"/>
+                    <p:cNvPicPr>
+                      <a:picLocks noChangeAspect="1"/>
+                    </p:cNvPicPr>
+                    <p:nvPr/>
+                  </p:nvPicPr>
+                  <p:blipFill>
+                    <a:blip r:embed="rId6" cstate="print">
+                      <a:extLst>
+                        <a:ext uri="{28A0092B-C50C-407E-A947-70E740481C1C}">
+                          <a14:useLocalDpi xmlns:a14="http://schemas.microsoft.com/office/drawing/2010/main" val="0"/>
+                        </a:ext>
+                      </a:extLst>
+                    </a:blip>
+                    <a:stretch>
+                      <a:fillRect/>
+                    </a:stretch>
+                  </p:blipFill>
+                  <p:spPr>
+                    <a:xfrm>
+                      <a:off x="3232233" y="6067039"/>
+                      <a:ext cx="325640" cy="161565"/>
+                    </a:xfrm>
+                    <a:prstGeom prst="rect">
+                      <a:avLst/>
+                    </a:prstGeom>
+                  </p:spPr>
+                </p:pic>
+                <p:pic>
+                  <p:nvPicPr>
+                    <p:cNvPr id="27" name="Picture 26"/>
+                    <p:cNvPicPr>
+                      <a:picLocks noChangeAspect="1"/>
+                    </p:cNvPicPr>
+                    <p:nvPr/>
+                  </p:nvPicPr>
+                  <p:blipFill>
+                    <a:blip r:embed="rId7" cstate="print">
+                      <a:extLst>
+                        <a:ext uri="{28A0092B-C50C-407E-A947-70E740481C1C}">
+                          <a14:useLocalDpi xmlns:a14="http://schemas.microsoft.com/office/drawing/2010/main" val="0"/>
+                        </a:ext>
+                      </a:extLst>
+                    </a:blip>
+                    <a:stretch>
+                      <a:fillRect/>
+                    </a:stretch>
+                  </p:blipFill>
+                  <p:spPr>
+                    <a:xfrm>
+                      <a:off x="3637828" y="6044119"/>
+                      <a:ext cx="280633" cy="225596"/>
+                    </a:xfrm>
+                    <a:prstGeom prst="rect">
+                      <a:avLst/>
+                    </a:prstGeom>
+                  </p:spPr>
+                </p:pic>
+                <p:pic>
+                  <p:nvPicPr>
+                    <p:cNvPr id="28" name="Picture 27"/>
+                    <p:cNvPicPr>
+                      <a:picLocks noChangeAspect="1"/>
+                    </p:cNvPicPr>
+                    <p:nvPr/>
+                  </p:nvPicPr>
+                  <p:blipFill>
+                    <a:blip r:embed="rId8" cstate="print">
+                      <a:extLst>
+                        <a:ext uri="{28A0092B-C50C-407E-A947-70E740481C1C}">
+                          <a14:useLocalDpi xmlns:a14="http://schemas.microsoft.com/office/drawing/2010/main" val="0"/>
+                        </a:ext>
+                      </a:extLst>
+                    </a:blip>
+                    <a:stretch>
+                      <a:fillRect/>
+                    </a:stretch>
+                  </p:blipFill>
+                  <p:spPr>
+                    <a:xfrm>
+                      <a:off x="2887669" y="6044119"/>
+                      <a:ext cx="274386" cy="225596"/>
+                    </a:xfrm>
+                    <a:prstGeom prst="rect">
+                      <a:avLst/>
+                    </a:prstGeom>
+                  </p:spPr>
+                </p:pic>
+                <p:pic>
+                  <p:nvPicPr>
+                    <p:cNvPr id="29" name="Picture 28"/>
+                    <p:cNvPicPr>
+                      <a:picLocks noChangeAspect="1"/>
+                    </p:cNvPicPr>
+                    <p:nvPr/>
+                  </p:nvPicPr>
+                  <p:blipFill>
+                    <a:blip r:embed="rId9" cstate="print">
+                      <a:extLst>
+                        <a:ext uri="{28A0092B-C50C-407E-A947-70E740481C1C}">
+                          <a14:useLocalDpi xmlns:a14="http://schemas.microsoft.com/office/drawing/2010/main" val="0"/>
+                        </a:ext>
+                      </a:extLst>
+                    </a:blip>
+                    <a:stretch>
+                      <a:fillRect/>
+                    </a:stretch>
+                  </p:blipFill>
+                  <p:spPr>
+                    <a:xfrm flipH="1">
+                      <a:off x="4819746" y="6031647"/>
+                      <a:ext cx="255790" cy="218495"/>
+                    </a:xfrm>
+                    <a:prstGeom prst="rect">
+                      <a:avLst/>
+                    </a:prstGeom>
+                  </p:spPr>
+                </p:pic>
+              </p:grpSp>
               <p:pic>
                 <p:nvPicPr>
-                  <p:cNvPr id="26" name="Picture 25"/>
+                  <p:cNvPr id="22" name="Picture 21"/>
                   <p:cNvPicPr>
                     <a:picLocks noChangeAspect="1"/>
                   </p:cNvPicPr>
                   <p:nvPr/>
                 </p:nvPicPr>
                 <p:blipFill>
-                  <a:blip r:embed="rId6" cstate="print">
-                    <a:extLst>
-                      <a:ext uri="{28A0092B-C50C-407E-A947-70E740481C1C}">
-                        <a14:useLocalDpi xmlns:a14="http://schemas.microsoft.com/office/drawing/2010/main" val="0"/>
-                      </a:ext>
-                    </a:extLst>
-                  </a:blip>
+                  <a:blip r:embed="rId10"/>
                   <a:stretch>
                     <a:fillRect/>
                   </a:stretch>
                 </p:blipFill>
                 <p:spPr>
                   <a:xfrm>
-                    <a:off x="3232233" y="6067039"/>
-                    <a:ext cx="325640" cy="161565"/>
+                    <a:off x="4237781" y="6048554"/>
+                    <a:ext cx="334902" cy="198223"/>
                   </a:xfrm>
                   <a:prstGeom prst="rect">
                     <a:avLst/>
@@ -15830,88 +15959,22 @@
               </p:pic>
               <p:pic>
                 <p:nvPicPr>
-                  <p:cNvPr id="27" name="Picture 26"/>
+                  <p:cNvPr id="23" name="Picture 22"/>
                   <p:cNvPicPr>
                     <a:picLocks noChangeAspect="1"/>
                   </p:cNvPicPr>
                   <p:nvPr/>
                 </p:nvPicPr>
                 <p:blipFill>
-                  <a:blip r:embed="rId7" cstate="print">
-                    <a:extLst>
-                      <a:ext uri="{28A0092B-C50C-407E-A947-70E740481C1C}">
-                        <a14:useLocalDpi xmlns:a14="http://schemas.microsoft.com/office/drawing/2010/main" val="0"/>
-                      </a:ext>
-                    </a:extLst>
-                  </a:blip>
+                  <a:blip r:embed="rId11"/>
                   <a:stretch>
                     <a:fillRect/>
                   </a:stretch>
                 </p:blipFill>
                 <p:spPr>
                   <a:xfrm>
-                    <a:off x="3637828" y="6044119"/>
-                    <a:ext cx="280633" cy="225596"/>
-                  </a:xfrm>
-                  <a:prstGeom prst="rect">
-                    <a:avLst/>
-                  </a:prstGeom>
-                </p:spPr>
-              </p:pic>
-              <p:pic>
-                <p:nvPicPr>
-                  <p:cNvPr id="28" name="Picture 27"/>
-                  <p:cNvPicPr>
-                    <a:picLocks noChangeAspect="1"/>
-                  </p:cNvPicPr>
-                  <p:nvPr/>
-                </p:nvPicPr>
-                <p:blipFill>
-                  <a:blip r:embed="rId8" cstate="print">
-                    <a:extLst>
-                      <a:ext uri="{28A0092B-C50C-407E-A947-70E740481C1C}">
-                        <a14:useLocalDpi xmlns:a14="http://schemas.microsoft.com/office/drawing/2010/main" val="0"/>
-                      </a:ext>
-                    </a:extLst>
-                  </a:blip>
-                  <a:stretch>
-                    <a:fillRect/>
-                  </a:stretch>
-                </p:blipFill>
-                <p:spPr>
-                  <a:xfrm>
-                    <a:off x="2887669" y="6044119"/>
-                    <a:ext cx="274386" cy="225596"/>
-                  </a:xfrm>
-                  <a:prstGeom prst="rect">
-                    <a:avLst/>
-                  </a:prstGeom>
-                </p:spPr>
-              </p:pic>
-              <p:pic>
-                <p:nvPicPr>
-                  <p:cNvPr id="29" name="Picture 28"/>
-                  <p:cNvPicPr>
-                    <a:picLocks noChangeAspect="1"/>
-                  </p:cNvPicPr>
-                  <p:nvPr/>
-                </p:nvPicPr>
-                <p:blipFill>
-                  <a:blip r:embed="rId9" cstate="print">
-                    <a:extLst>
-                      <a:ext uri="{28A0092B-C50C-407E-A947-70E740481C1C}">
-                        <a14:useLocalDpi xmlns:a14="http://schemas.microsoft.com/office/drawing/2010/main" val="0"/>
-                      </a:ext>
-                    </a:extLst>
-                  </a:blip>
-                  <a:stretch>
-                    <a:fillRect/>
-                  </a:stretch>
-                </p:blipFill>
-                <p:spPr>
-                  <a:xfrm flipH="1">
-                    <a:off x="4819746" y="6031647"/>
-                    <a:ext cx="255790" cy="218495"/>
+                    <a:off x="3825095" y="6051367"/>
+                    <a:ext cx="327300" cy="196986"/>
                   </a:xfrm>
                   <a:prstGeom prst="rect">
                     <a:avLst/>
@@ -15921,46 +15984,22 @@
             </p:grpSp>
             <p:pic>
               <p:nvPicPr>
-                <p:cNvPr id="22" name="Picture 21"/>
+                <p:cNvPr id="4" name="Picture 3"/>
                 <p:cNvPicPr>
                   <a:picLocks noChangeAspect="1"/>
                 </p:cNvPicPr>
                 <p:nvPr/>
               </p:nvPicPr>
               <p:blipFill>
-                <a:blip r:embed="rId10"/>
+                <a:blip r:embed="rId12"/>
                 <a:stretch>
                   <a:fillRect/>
                 </a:stretch>
               </p:blipFill>
               <p:spPr>
                 <a:xfrm>
-                  <a:off x="4237781" y="6048554"/>
-                  <a:ext cx="334902" cy="198223"/>
-                </a:xfrm>
-                <a:prstGeom prst="rect">
-                  <a:avLst/>
-                </a:prstGeom>
-              </p:spPr>
-            </p:pic>
-            <p:pic>
-              <p:nvPicPr>
-                <p:cNvPr id="23" name="Picture 22"/>
-                <p:cNvPicPr>
-                  <a:picLocks noChangeAspect="1"/>
-                </p:cNvPicPr>
-                <p:nvPr/>
-              </p:nvPicPr>
-              <p:blipFill>
-                <a:blip r:embed="rId11"/>
-                <a:stretch>
-                  <a:fillRect/>
-                </a:stretch>
-              </p:blipFill>
-              <p:spPr>
-                <a:xfrm>
-                  <a:off x="3825095" y="6051367"/>
-                  <a:ext cx="327300" cy="196986"/>
+                  <a:off x="1415503" y="5607909"/>
+                  <a:ext cx="373972" cy="294778"/>
                 </a:xfrm>
                 <a:prstGeom prst="rect">
                   <a:avLst/>
@@ -15968,30 +16007,6 @@
               </p:spPr>
             </p:pic>
           </p:grpSp>
-          <p:pic>
-            <p:nvPicPr>
-              <p:cNvPr id="4" name="Picture 3"/>
-              <p:cNvPicPr>
-                <a:picLocks noChangeAspect="1"/>
-              </p:cNvPicPr>
-              <p:nvPr/>
-            </p:nvPicPr>
-            <p:blipFill>
-              <a:blip r:embed="rId12"/>
-              <a:stretch>
-                <a:fillRect/>
-              </a:stretch>
-            </p:blipFill>
-            <p:spPr>
-              <a:xfrm>
-                <a:off x="1415503" y="5607909"/>
-                <a:ext cx="373972" cy="294778"/>
-              </a:xfrm>
-              <a:prstGeom prst="rect">
-                <a:avLst/>
-              </a:prstGeom>
-            </p:spPr>
-          </p:pic>
         </p:grpSp>
       </p:grpSp>
     </p:spTree>

</xml_diff>

<commit_message>
removed 274 and 279 from fig 4a, reran turnover in 5x
</commit_message>
<xml_diff>
--- a/output/plots/all_figs_with_legends.pptx
+++ b/output/plots/all_figs_with_legends.pptx
@@ -212,7 +212,7 @@
           <a:p>
             <a:fld id="{7FA21820-D199-4D82-91AF-C50B1D3B111A}" type="datetimeFigureOut">
               <a:rPr lang="en-US" smtClean="0"/>
-              <a:t>10/16/2017</a:t>
+              <a:t>10/25/2017</a:t>
             </a:fld>
             <a:endParaRPr lang="en-US"/>
           </a:p>
@@ -1045,7 +1045,7 @@
           <a:p>
             <a:fld id="{916B8C92-D5E3-4480-8685-D57BEE386DE2}" type="datetimeFigureOut">
               <a:rPr lang="en-US" smtClean="0"/>
-              <a:t>10/16/2017</a:t>
+              <a:t>10/25/2017</a:t>
             </a:fld>
             <a:endParaRPr lang="en-US"/>
           </a:p>
@@ -1215,7 +1215,7 @@
           <a:p>
             <a:fld id="{916B8C92-D5E3-4480-8685-D57BEE386DE2}" type="datetimeFigureOut">
               <a:rPr lang="en-US" smtClean="0"/>
-              <a:t>10/16/2017</a:t>
+              <a:t>10/25/2017</a:t>
             </a:fld>
             <a:endParaRPr lang="en-US"/>
           </a:p>
@@ -1395,7 +1395,7 @@
           <a:p>
             <a:fld id="{916B8C92-D5E3-4480-8685-D57BEE386DE2}" type="datetimeFigureOut">
               <a:rPr lang="en-US" smtClean="0"/>
-              <a:t>10/16/2017</a:t>
+              <a:t>10/25/2017</a:t>
             </a:fld>
             <a:endParaRPr lang="en-US"/>
           </a:p>
@@ -1565,7 +1565,7 @@
           <a:p>
             <a:fld id="{916B8C92-D5E3-4480-8685-D57BEE386DE2}" type="datetimeFigureOut">
               <a:rPr lang="en-US" smtClean="0"/>
-              <a:t>10/16/2017</a:t>
+              <a:t>10/25/2017</a:t>
             </a:fld>
             <a:endParaRPr lang="en-US"/>
           </a:p>
@@ -1811,7 +1811,7 @@
           <a:p>
             <a:fld id="{916B8C92-D5E3-4480-8685-D57BEE386DE2}" type="datetimeFigureOut">
               <a:rPr lang="en-US" smtClean="0"/>
-              <a:t>10/16/2017</a:t>
+              <a:t>10/25/2017</a:t>
             </a:fld>
             <a:endParaRPr lang="en-US"/>
           </a:p>
@@ -2043,7 +2043,7 @@
           <a:p>
             <a:fld id="{916B8C92-D5E3-4480-8685-D57BEE386DE2}" type="datetimeFigureOut">
               <a:rPr lang="en-US" smtClean="0"/>
-              <a:t>10/16/2017</a:t>
+              <a:t>10/25/2017</a:t>
             </a:fld>
             <a:endParaRPr lang="en-US"/>
           </a:p>
@@ -2410,7 +2410,7 @@
           <a:p>
             <a:fld id="{916B8C92-D5E3-4480-8685-D57BEE386DE2}" type="datetimeFigureOut">
               <a:rPr lang="en-US" smtClean="0"/>
-              <a:t>10/16/2017</a:t>
+              <a:t>10/25/2017</a:t>
             </a:fld>
             <a:endParaRPr lang="en-US"/>
           </a:p>
@@ -2528,7 +2528,7 @@
           <a:p>
             <a:fld id="{916B8C92-D5E3-4480-8685-D57BEE386DE2}" type="datetimeFigureOut">
               <a:rPr lang="en-US" smtClean="0"/>
-              <a:t>10/16/2017</a:t>
+              <a:t>10/25/2017</a:t>
             </a:fld>
             <a:endParaRPr lang="en-US"/>
           </a:p>
@@ -2623,7 +2623,7 @@
           <a:p>
             <a:fld id="{916B8C92-D5E3-4480-8685-D57BEE386DE2}" type="datetimeFigureOut">
               <a:rPr lang="en-US" smtClean="0"/>
-              <a:t>10/16/2017</a:t>
+              <a:t>10/25/2017</a:t>
             </a:fld>
             <a:endParaRPr lang="en-US"/>
           </a:p>
@@ -2900,7 +2900,7 @@
           <a:p>
             <a:fld id="{916B8C92-D5E3-4480-8685-D57BEE386DE2}" type="datetimeFigureOut">
               <a:rPr lang="en-US" smtClean="0"/>
-              <a:t>10/16/2017</a:t>
+              <a:t>10/25/2017</a:t>
             </a:fld>
             <a:endParaRPr lang="en-US"/>
           </a:p>
@@ -3153,7 +3153,7 @@
           <a:p>
             <a:fld id="{916B8C92-D5E3-4480-8685-D57BEE386DE2}" type="datetimeFigureOut">
               <a:rPr lang="en-US" smtClean="0"/>
-              <a:t>10/16/2017</a:t>
+              <a:t>10/25/2017</a:t>
             </a:fld>
             <a:endParaRPr lang="en-US"/>
           </a:p>
@@ -3366,7 +3366,7 @@
           <a:p>
             <a:fld id="{916B8C92-D5E3-4480-8685-D57BEE386DE2}" type="datetimeFigureOut">
               <a:rPr lang="en-US" smtClean="0"/>
-              <a:t>10/16/2017</a:t>
+              <a:t>10/25/2017</a:t>
             </a:fld>
             <a:endParaRPr lang="en-US"/>
           </a:p>
@@ -5980,21 +5980,21 @@
       </p:grpSpPr>
       <p:grpSp>
         <p:nvGrpSpPr>
-          <p:cNvPr id="5" name="Group 4"/>
+          <p:cNvPr id="11" name="Group 10"/>
           <p:cNvGrpSpPr/>
           <p:nvPr/>
         </p:nvGrpSpPr>
         <p:grpSpPr>
           <a:xfrm>
-            <a:off x="1268374" y="0"/>
-            <a:ext cx="9209988" cy="6787491"/>
-            <a:chOff x="1268374" y="0"/>
-            <a:chExt cx="9209988" cy="6787491"/>
+            <a:off x="1253441" y="0"/>
+            <a:ext cx="9224921" cy="6858000"/>
+            <a:chOff x="1253441" y="0"/>
+            <a:chExt cx="9224921" cy="6858000"/>
           </a:xfrm>
         </p:grpSpPr>
         <p:pic>
           <p:nvPicPr>
-            <p:cNvPr id="3" name="Picture 2"/>
+            <p:cNvPr id="10" name="Picture 9"/>
             <p:cNvPicPr>
               <a:picLocks noChangeAspect="1"/>
             </p:cNvPicPr>
@@ -6008,8 +6008,8 @@
           </p:blipFill>
           <p:spPr>
             <a:xfrm>
-              <a:off x="1268374" y="0"/>
-              <a:ext cx="9209988" cy="6787491"/>
+              <a:off x="1253441" y="0"/>
+              <a:ext cx="9224921" cy="6858000"/>
             </a:xfrm>
             <a:prstGeom prst="rect">
               <a:avLst/>
@@ -15633,42 +15633,18 @@
       </p:sp>
       <p:grpSp>
         <p:nvGrpSpPr>
-          <p:cNvPr id="9" name="Group 8"/>
+          <p:cNvPr id="12" name="Group 11"/>
           <p:cNvGrpSpPr/>
           <p:nvPr/>
         </p:nvGrpSpPr>
         <p:grpSpPr>
           <a:xfrm>
-            <a:off x="1178521" y="108321"/>
-            <a:ext cx="8617190" cy="6037140"/>
-            <a:chOff x="1178521" y="108321"/>
-            <a:chExt cx="8617190" cy="6037140"/>
+            <a:off x="1243378" y="150545"/>
+            <a:ext cx="8425407" cy="5942938"/>
+            <a:chOff x="1243378" y="150545"/>
+            <a:chExt cx="8425407" cy="5942938"/>
           </a:xfrm>
         </p:grpSpPr>
-        <p:pic>
-          <p:nvPicPr>
-            <p:cNvPr id="8" name="Picture 7"/>
-            <p:cNvPicPr>
-              <a:picLocks noChangeAspect="1"/>
-            </p:cNvPicPr>
-            <p:nvPr/>
-          </p:nvPicPr>
-          <p:blipFill>
-            <a:blip r:embed="rId2"/>
-            <a:stretch>
-              <a:fillRect/>
-            </a:stretch>
-          </p:blipFill>
-          <p:spPr>
-            <a:xfrm>
-              <a:off x="1178521" y="108321"/>
-              <a:ext cx="8617190" cy="5722032"/>
-            </a:xfrm>
-            <a:prstGeom prst="rect">
-              <a:avLst/>
-            </a:prstGeom>
-          </p:spPr>
-        </p:pic>
         <p:grpSp>
           <p:nvGrpSpPr>
             <p:cNvPr id="3" name="Group 2"/>
@@ -15677,10 +15653,10 @@
           </p:nvGrpSpPr>
           <p:grpSpPr>
             <a:xfrm>
-              <a:off x="1943471" y="5756134"/>
-              <a:ext cx="7543552" cy="389327"/>
-              <a:chOff x="1889150" y="5746600"/>
-              <a:chExt cx="7543552" cy="389327"/>
+              <a:off x="1943471" y="5704156"/>
+              <a:ext cx="7427176" cy="389327"/>
+              <a:chOff x="1889150" y="5764794"/>
+              <a:chExt cx="7427176" cy="389327"/>
             </a:xfrm>
           </p:grpSpPr>
           <p:grpSp>
@@ -15691,10 +15667,10 @@
             </p:nvGrpSpPr>
             <p:grpSpPr>
               <a:xfrm>
-                <a:off x="6544247" y="5746600"/>
-                <a:ext cx="2888455" cy="389327"/>
-                <a:chOff x="2148779" y="1628632"/>
-                <a:chExt cx="3459345" cy="428988"/>
+                <a:off x="6491309" y="5764794"/>
+                <a:ext cx="2825017" cy="389327"/>
+                <a:chOff x="2085378" y="1648679"/>
+                <a:chExt cx="3383368" cy="428988"/>
               </a:xfrm>
             </p:grpSpPr>
             <p:pic>
@@ -15706,14 +15682,14 @@
                 <p:nvPr/>
               </p:nvPicPr>
               <p:blipFill>
-                <a:blip r:embed="rId3"/>
+                <a:blip r:embed="rId2"/>
                 <a:stretch>
                   <a:fillRect/>
                 </a:stretch>
               </p:blipFill>
               <p:spPr>
                 <a:xfrm>
-                  <a:off x="2148779" y="1628632"/>
+                  <a:off x="2085378" y="1648679"/>
                   <a:ext cx="655912" cy="396304"/>
                 </a:xfrm>
                 <a:prstGeom prst="rect">
@@ -15730,14 +15706,14 @@
                 <p:nvPr/>
               </p:nvPicPr>
               <p:blipFill>
-                <a:blip r:embed="rId4"/>
+                <a:blip r:embed="rId3"/>
                 <a:stretch>
                   <a:fillRect/>
                 </a:stretch>
               </p:blipFill>
               <p:spPr>
                 <a:xfrm>
-                  <a:off x="4879645" y="1660191"/>
+                  <a:off x="4740267" y="1716831"/>
                   <a:ext cx="728479" cy="293882"/>
                 </a:xfrm>
                 <a:prstGeom prst="rect">
@@ -15754,14 +15730,14 @@
                 <p:nvPr/>
               </p:nvPicPr>
               <p:blipFill>
-                <a:blip r:embed="rId5"/>
+                <a:blip r:embed="rId4"/>
                 <a:stretch>
                   <a:fillRect/>
                 </a:stretch>
               </p:blipFill>
               <p:spPr>
                 <a:xfrm>
-                  <a:off x="3525166" y="1648678"/>
+                  <a:off x="3461764" y="1668725"/>
                   <a:ext cx="640805" cy="408942"/>
                 </a:xfrm>
                 <a:prstGeom prst="rect">
@@ -15821,7 +15797,7 @@
                     <p:nvPr/>
                   </p:nvPicPr>
                   <p:blipFill>
-                    <a:blip r:embed="rId6" cstate="print">
+                    <a:blip r:embed="rId5" cstate="print">
                       <a:extLst>
                         <a:ext uri="{28A0092B-C50C-407E-A947-70E740481C1C}">
                           <a14:useLocalDpi xmlns:a14="http://schemas.microsoft.com/office/drawing/2010/main" val="0"/>
@@ -15851,7 +15827,7 @@
                     <p:nvPr/>
                   </p:nvPicPr>
                   <p:blipFill>
-                    <a:blip r:embed="rId7" cstate="print">
+                    <a:blip r:embed="rId6" cstate="print">
                       <a:extLst>
                         <a:ext uri="{28A0092B-C50C-407E-A947-70E740481C1C}">
                           <a14:useLocalDpi xmlns:a14="http://schemas.microsoft.com/office/drawing/2010/main" val="0"/>
@@ -15881,7 +15857,7 @@
                     <p:nvPr/>
                   </p:nvPicPr>
                   <p:blipFill>
-                    <a:blip r:embed="rId8" cstate="print">
+                    <a:blip r:embed="rId7" cstate="print">
                       <a:extLst>
                         <a:ext uri="{28A0092B-C50C-407E-A947-70E740481C1C}">
                           <a14:useLocalDpi xmlns:a14="http://schemas.microsoft.com/office/drawing/2010/main" val="0"/>
@@ -15911,7 +15887,7 @@
                     <p:nvPr/>
                   </p:nvPicPr>
                   <p:blipFill>
-                    <a:blip r:embed="rId9" cstate="print">
+                    <a:blip r:embed="rId8" cstate="print">
                       <a:extLst>
                         <a:ext uri="{28A0092B-C50C-407E-A947-70E740481C1C}">
                           <a14:useLocalDpi xmlns:a14="http://schemas.microsoft.com/office/drawing/2010/main" val="0"/>
@@ -15942,7 +15918,7 @@
                   <p:nvPr/>
                 </p:nvPicPr>
                 <p:blipFill>
-                  <a:blip r:embed="rId10"/>
+                  <a:blip r:embed="rId9"/>
                   <a:stretch>
                     <a:fillRect/>
                   </a:stretch>
@@ -15966,7 +15942,7 @@
                   <p:nvPr/>
                 </p:nvPicPr>
                 <p:blipFill>
-                  <a:blip r:embed="rId11"/>
+                  <a:blip r:embed="rId10"/>
                   <a:stretch>
                     <a:fillRect/>
                   </a:stretch>
@@ -15991,7 +15967,7 @@
                 <p:nvPr/>
               </p:nvPicPr>
               <p:blipFill>
-                <a:blip r:embed="rId12"/>
+                <a:blip r:embed="rId11"/>
                 <a:stretch>
                   <a:fillRect/>
                 </a:stretch>
@@ -16008,6 +15984,30 @@
             </p:pic>
           </p:grpSp>
         </p:grpSp>
+        <p:pic>
+          <p:nvPicPr>
+            <p:cNvPr id="11" name="Picture 10"/>
+            <p:cNvPicPr>
+              <a:picLocks noChangeAspect="1"/>
+            </p:cNvPicPr>
+            <p:nvPr/>
+          </p:nvPicPr>
+          <p:blipFill>
+            <a:blip r:embed="rId12"/>
+            <a:stretch>
+              <a:fillRect/>
+            </a:stretch>
+          </p:blipFill>
+          <p:spPr>
+            <a:xfrm>
+              <a:off x="1243378" y="150545"/>
+              <a:ext cx="8425407" cy="5619170"/>
+            </a:xfrm>
+            <a:prstGeom prst="rect">
+              <a:avLst/>
+            </a:prstGeom>
+          </p:spPr>
+        </p:pic>
       </p:grpSp>
     </p:spTree>
     <p:extLst>
@@ -16338,67 +16338,52 @@
           <a:chExt cx="0" cy="0"/>
         </a:xfrm>
       </p:grpSpPr>
-      <p:grpSp>
-        <p:nvGrpSpPr>
-          <p:cNvPr id="5" name="Group 4"/>
-          <p:cNvGrpSpPr/>
+      <p:pic>
+        <p:nvPicPr>
+          <p:cNvPr id="3" name="Picture 2"/>
+          <p:cNvPicPr>
+            <a:picLocks noChangeAspect="1"/>
+          </p:cNvPicPr>
           <p:nvPr/>
-        </p:nvGrpSpPr>
-        <p:grpSpPr>
+        </p:nvPicPr>
+        <p:blipFill rotWithShape="1">
+          <a:blip r:embed="rId2"/>
+          <a:srcRect t="49893"/>
+          <a:stretch/>
+        </p:blipFill>
+        <p:spPr>
+          <a:xfrm>
+            <a:off x="1368088" y="3520140"/>
+            <a:ext cx="8982543" cy="3337860"/>
+          </a:xfrm>
+          <a:prstGeom prst="rect">
+            <a:avLst/>
+          </a:prstGeom>
+        </p:spPr>
+      </p:pic>
+      <p:pic>
+        <p:nvPicPr>
+          <p:cNvPr id="4" name="Picture 3"/>
+          <p:cNvPicPr>
+            <a:picLocks noChangeAspect="1"/>
+          </p:cNvPicPr>
+          <p:nvPr/>
+        </p:nvPicPr>
+        <p:blipFill rotWithShape="1">
+          <a:blip r:embed="rId2"/>
+          <a:srcRect b="49832"/>
+          <a:stretch/>
+        </p:blipFill>
+        <p:spPr>
           <a:xfrm>
             <a:off x="1368088" y="0"/>
-            <a:ext cx="8982543" cy="6858000"/>
-            <a:chOff x="1368088" y="0"/>
-            <a:chExt cx="8982543" cy="6858000"/>
-          </a:xfrm>
-        </p:grpSpPr>
-        <p:pic>
-          <p:nvPicPr>
-            <p:cNvPr id="3" name="Picture 2"/>
-            <p:cNvPicPr>
-              <a:picLocks noChangeAspect="1"/>
-            </p:cNvPicPr>
-            <p:nvPr/>
-          </p:nvPicPr>
-          <p:blipFill rotWithShape="1">
-            <a:blip r:embed="rId2"/>
-            <a:srcRect t="49893"/>
-            <a:stretch/>
-          </p:blipFill>
-          <p:spPr>
-            <a:xfrm>
-              <a:off x="1368088" y="3520140"/>
-              <a:ext cx="8982543" cy="3337860"/>
-            </a:xfrm>
-            <a:prstGeom prst="rect">
-              <a:avLst/>
-            </a:prstGeom>
-          </p:spPr>
-        </p:pic>
-        <p:pic>
-          <p:nvPicPr>
-            <p:cNvPr id="4" name="Picture 3"/>
-            <p:cNvPicPr>
-              <a:picLocks noChangeAspect="1"/>
-            </p:cNvPicPr>
-            <p:nvPr/>
-          </p:nvPicPr>
-          <p:blipFill rotWithShape="1">
-            <a:blip r:embed="rId2"/>
-            <a:srcRect b="49832"/>
-            <a:stretch/>
-          </p:blipFill>
-          <p:spPr>
-            <a:xfrm>
-              <a:off x="1368088" y="0"/>
-              <a:ext cx="8982543" cy="3341862"/>
-            </a:xfrm>
-            <a:prstGeom prst="rect">
-              <a:avLst/>
-            </a:prstGeom>
-          </p:spPr>
-        </p:pic>
-      </p:grpSp>
+            <a:ext cx="8982543" cy="3341862"/>
+          </a:xfrm>
+          <a:prstGeom prst="rect">
+            <a:avLst/>
+          </a:prstGeom>
+        </p:spPr>
+      </p:pic>
     </p:spTree>
     <p:extLst>
       <p:ext uri="{BB962C8B-B14F-4D97-AF65-F5344CB8AC3E}">

</xml_diff>

<commit_message>
revisions for resubmission - mostly tweaks to figures, added back in vol data in fig 4
</commit_message>
<xml_diff>
--- a/output/plots/all_figs_with_legends.pptx
+++ b/output/plots/all_figs_with_legends.pptx
@@ -212,7 +212,7 @@
           <a:p>
             <a:fld id="{7FA21820-D199-4D82-91AF-C50B1D3B111A}" type="datetimeFigureOut">
               <a:rPr lang="en-US" smtClean="0"/>
-              <a:t>10/25/2017</a:t>
+              <a:t>10/27/2017</a:t>
             </a:fld>
             <a:endParaRPr lang="en-US"/>
           </a:p>
@@ -1045,7 +1045,7 @@
           <a:p>
             <a:fld id="{916B8C92-D5E3-4480-8685-D57BEE386DE2}" type="datetimeFigureOut">
               <a:rPr lang="en-US" smtClean="0"/>
-              <a:t>10/25/2017</a:t>
+              <a:t>10/27/2017</a:t>
             </a:fld>
             <a:endParaRPr lang="en-US"/>
           </a:p>
@@ -1215,7 +1215,7 @@
           <a:p>
             <a:fld id="{916B8C92-D5E3-4480-8685-D57BEE386DE2}" type="datetimeFigureOut">
               <a:rPr lang="en-US" smtClean="0"/>
-              <a:t>10/25/2017</a:t>
+              <a:t>10/27/2017</a:t>
             </a:fld>
             <a:endParaRPr lang="en-US"/>
           </a:p>
@@ -1395,7 +1395,7 @@
           <a:p>
             <a:fld id="{916B8C92-D5E3-4480-8685-D57BEE386DE2}" type="datetimeFigureOut">
               <a:rPr lang="en-US" smtClean="0"/>
-              <a:t>10/25/2017</a:t>
+              <a:t>10/27/2017</a:t>
             </a:fld>
             <a:endParaRPr lang="en-US"/>
           </a:p>
@@ -1565,7 +1565,7 @@
           <a:p>
             <a:fld id="{916B8C92-D5E3-4480-8685-D57BEE386DE2}" type="datetimeFigureOut">
               <a:rPr lang="en-US" smtClean="0"/>
-              <a:t>10/25/2017</a:t>
+              <a:t>10/27/2017</a:t>
             </a:fld>
             <a:endParaRPr lang="en-US"/>
           </a:p>
@@ -1811,7 +1811,7 @@
           <a:p>
             <a:fld id="{916B8C92-D5E3-4480-8685-D57BEE386DE2}" type="datetimeFigureOut">
               <a:rPr lang="en-US" smtClean="0"/>
-              <a:t>10/25/2017</a:t>
+              <a:t>10/27/2017</a:t>
             </a:fld>
             <a:endParaRPr lang="en-US"/>
           </a:p>
@@ -2043,7 +2043,7 @@
           <a:p>
             <a:fld id="{916B8C92-D5E3-4480-8685-D57BEE386DE2}" type="datetimeFigureOut">
               <a:rPr lang="en-US" smtClean="0"/>
-              <a:t>10/25/2017</a:t>
+              <a:t>10/27/2017</a:t>
             </a:fld>
             <a:endParaRPr lang="en-US"/>
           </a:p>
@@ -2410,7 +2410,7 @@
           <a:p>
             <a:fld id="{916B8C92-D5E3-4480-8685-D57BEE386DE2}" type="datetimeFigureOut">
               <a:rPr lang="en-US" smtClean="0"/>
-              <a:t>10/25/2017</a:t>
+              <a:t>10/27/2017</a:t>
             </a:fld>
             <a:endParaRPr lang="en-US"/>
           </a:p>
@@ -2528,7 +2528,7 @@
           <a:p>
             <a:fld id="{916B8C92-D5E3-4480-8685-D57BEE386DE2}" type="datetimeFigureOut">
               <a:rPr lang="en-US" smtClean="0"/>
-              <a:t>10/25/2017</a:t>
+              <a:t>10/27/2017</a:t>
             </a:fld>
             <a:endParaRPr lang="en-US"/>
           </a:p>
@@ -2623,7 +2623,7 @@
           <a:p>
             <a:fld id="{916B8C92-D5E3-4480-8685-D57BEE386DE2}" type="datetimeFigureOut">
               <a:rPr lang="en-US" smtClean="0"/>
-              <a:t>10/25/2017</a:t>
+              <a:t>10/27/2017</a:t>
             </a:fld>
             <a:endParaRPr lang="en-US"/>
           </a:p>
@@ -2900,7 +2900,7 @@
           <a:p>
             <a:fld id="{916B8C92-D5E3-4480-8685-D57BEE386DE2}" type="datetimeFigureOut">
               <a:rPr lang="en-US" smtClean="0"/>
-              <a:t>10/25/2017</a:t>
+              <a:t>10/27/2017</a:t>
             </a:fld>
             <a:endParaRPr lang="en-US"/>
           </a:p>
@@ -3153,7 +3153,7 @@
           <a:p>
             <a:fld id="{916B8C92-D5E3-4480-8685-D57BEE386DE2}" type="datetimeFigureOut">
               <a:rPr lang="en-US" smtClean="0"/>
-              <a:t>10/25/2017</a:t>
+              <a:t>10/27/2017</a:t>
             </a:fld>
             <a:endParaRPr lang="en-US"/>
           </a:p>
@@ -3366,7 +3366,7 @@
           <a:p>
             <a:fld id="{916B8C92-D5E3-4480-8685-D57BEE386DE2}" type="datetimeFigureOut">
               <a:rPr lang="en-US" smtClean="0"/>
-              <a:t>10/25/2017</a:t>
+              <a:t>10/27/2017</a:t>
             </a:fld>
             <a:endParaRPr lang="en-US"/>
           </a:p>
@@ -15633,18 +15633,42 @@
       </p:sp>
       <p:grpSp>
         <p:nvGrpSpPr>
-          <p:cNvPr id="12" name="Group 11"/>
+          <p:cNvPr id="8" name="Group 7"/>
           <p:cNvGrpSpPr/>
           <p:nvPr/>
         </p:nvGrpSpPr>
         <p:grpSpPr>
           <a:xfrm>
-            <a:off x="1243378" y="150545"/>
-            <a:ext cx="8425407" cy="5942938"/>
-            <a:chOff x="1243378" y="150545"/>
-            <a:chExt cx="8425407" cy="5942938"/>
+            <a:off x="1258430" y="267286"/>
+            <a:ext cx="8355569" cy="5845051"/>
+            <a:chOff x="1258430" y="267286"/>
+            <a:chExt cx="8355569" cy="5845051"/>
           </a:xfrm>
         </p:grpSpPr>
+        <p:pic>
+          <p:nvPicPr>
+            <p:cNvPr id="2" name="Picture 1"/>
+            <p:cNvPicPr>
+              <a:picLocks noChangeAspect="1"/>
+            </p:cNvPicPr>
+            <p:nvPr/>
+          </p:nvPicPr>
+          <p:blipFill>
+            <a:blip r:embed="rId2"/>
+            <a:stretch>
+              <a:fillRect/>
+            </a:stretch>
+          </p:blipFill>
+          <p:spPr>
+            <a:xfrm>
+              <a:off x="1258430" y="267286"/>
+              <a:ext cx="8355569" cy="5632077"/>
+            </a:xfrm>
+            <a:prstGeom prst="rect">
+              <a:avLst/>
+            </a:prstGeom>
+          </p:spPr>
+        </p:pic>
         <p:grpSp>
           <p:nvGrpSpPr>
             <p:cNvPr id="3" name="Group 2"/>
@@ -15653,10 +15677,10 @@
           </p:nvGrpSpPr>
           <p:grpSpPr>
             <a:xfrm>
-              <a:off x="1943471" y="5704156"/>
-              <a:ext cx="7427176" cy="389327"/>
-              <a:chOff x="1889150" y="5764794"/>
-              <a:chExt cx="7427176" cy="389327"/>
+              <a:off x="1943471" y="5704158"/>
+              <a:ext cx="7356971" cy="408179"/>
+              <a:chOff x="1889150" y="5764796"/>
+              <a:chExt cx="7356971" cy="408179"/>
             </a:xfrm>
           </p:grpSpPr>
           <p:grpSp>
@@ -15667,10 +15691,10 @@
             </p:nvGrpSpPr>
             <p:grpSpPr>
               <a:xfrm>
-                <a:off x="6491309" y="5764794"/>
-                <a:ext cx="2825017" cy="389327"/>
-                <a:chOff x="2085378" y="1648679"/>
-                <a:chExt cx="3383368" cy="428988"/>
+                <a:off x="6307961" y="5764796"/>
+                <a:ext cx="2938160" cy="408179"/>
+                <a:chOff x="1865792" y="1648679"/>
+                <a:chExt cx="3518872" cy="449760"/>
               </a:xfrm>
             </p:grpSpPr>
             <p:pic>
@@ -15682,14 +15706,14 @@
                 <p:nvPr/>
               </p:nvPicPr>
               <p:blipFill>
-                <a:blip r:embed="rId2"/>
+                <a:blip r:embed="rId3"/>
                 <a:stretch>
                   <a:fillRect/>
                 </a:stretch>
               </p:blipFill>
               <p:spPr>
                 <a:xfrm>
-                  <a:off x="2085378" y="1648679"/>
+                  <a:off x="1865792" y="1648679"/>
                   <a:ext cx="655912" cy="396304"/>
                 </a:xfrm>
                 <a:prstGeom prst="rect">
@@ -15706,15 +15730,15 @@
                 <p:nvPr/>
               </p:nvPicPr>
               <p:blipFill>
-                <a:blip r:embed="rId3"/>
+                <a:blip r:embed="rId4"/>
                 <a:stretch>
                   <a:fillRect/>
                 </a:stretch>
               </p:blipFill>
               <p:spPr>
                 <a:xfrm>
-                  <a:off x="4740267" y="1716831"/>
-                  <a:ext cx="728479" cy="293882"/>
+                  <a:off x="4656186" y="1749204"/>
+                  <a:ext cx="728478" cy="293882"/>
                 </a:xfrm>
                 <a:prstGeom prst="rect">
                   <a:avLst/>
@@ -15730,14 +15754,14 @@
                 <p:nvPr/>
               </p:nvPicPr>
               <p:blipFill>
-                <a:blip r:embed="rId4"/>
+                <a:blip r:embed="rId5"/>
                 <a:stretch>
                   <a:fillRect/>
                 </a:stretch>
               </p:blipFill>
               <p:spPr>
                 <a:xfrm>
-                  <a:off x="3461764" y="1668725"/>
+                  <a:off x="3232947" y="1689497"/>
                   <a:ext cx="640805" cy="408942"/>
                 </a:xfrm>
                 <a:prstGeom prst="rect">
@@ -15797,7 +15821,7 @@
                     <p:nvPr/>
                   </p:nvPicPr>
                   <p:blipFill>
-                    <a:blip r:embed="rId5" cstate="print">
+                    <a:blip r:embed="rId6" cstate="print">
                       <a:extLst>
                         <a:ext uri="{28A0092B-C50C-407E-A947-70E740481C1C}">
                           <a14:useLocalDpi xmlns:a14="http://schemas.microsoft.com/office/drawing/2010/main" val="0"/>
@@ -15827,7 +15851,7 @@
                     <p:nvPr/>
                   </p:nvPicPr>
                   <p:blipFill>
-                    <a:blip r:embed="rId6" cstate="print">
+                    <a:blip r:embed="rId7" cstate="print">
                       <a:extLst>
                         <a:ext uri="{28A0092B-C50C-407E-A947-70E740481C1C}">
                           <a14:useLocalDpi xmlns:a14="http://schemas.microsoft.com/office/drawing/2010/main" val="0"/>
@@ -15857,7 +15881,7 @@
                     <p:nvPr/>
                   </p:nvPicPr>
                   <p:blipFill>
-                    <a:blip r:embed="rId7" cstate="print">
+                    <a:blip r:embed="rId8" cstate="print">
                       <a:extLst>
                         <a:ext uri="{28A0092B-C50C-407E-A947-70E740481C1C}">
                           <a14:useLocalDpi xmlns:a14="http://schemas.microsoft.com/office/drawing/2010/main" val="0"/>
@@ -15887,7 +15911,7 @@
                     <p:nvPr/>
                   </p:nvPicPr>
                   <p:blipFill>
-                    <a:blip r:embed="rId8" cstate="print">
+                    <a:blip r:embed="rId9" cstate="print">
                       <a:extLst>
                         <a:ext uri="{28A0092B-C50C-407E-A947-70E740481C1C}">
                           <a14:useLocalDpi xmlns:a14="http://schemas.microsoft.com/office/drawing/2010/main" val="0"/>
@@ -15918,7 +15942,7 @@
                   <p:nvPr/>
                 </p:nvPicPr>
                 <p:blipFill>
-                  <a:blip r:embed="rId9"/>
+                  <a:blip r:embed="rId10"/>
                   <a:stretch>
                     <a:fillRect/>
                   </a:stretch>
@@ -15942,7 +15966,7 @@
                   <p:nvPr/>
                 </p:nvPicPr>
                 <p:blipFill>
-                  <a:blip r:embed="rId10"/>
+                  <a:blip r:embed="rId11"/>
                   <a:stretch>
                     <a:fillRect/>
                   </a:stretch>
@@ -15967,7 +15991,7 @@
                 <p:nvPr/>
               </p:nvPicPr>
               <p:blipFill>
-                <a:blip r:embed="rId11"/>
+                <a:blip r:embed="rId12"/>
                 <a:stretch>
                   <a:fillRect/>
                 </a:stretch>
@@ -15984,30 +16008,6 @@
             </p:pic>
           </p:grpSp>
         </p:grpSp>
-        <p:pic>
-          <p:nvPicPr>
-            <p:cNvPr id="11" name="Picture 10"/>
-            <p:cNvPicPr>
-              <a:picLocks noChangeAspect="1"/>
-            </p:cNvPicPr>
-            <p:nvPr/>
-          </p:nvPicPr>
-          <p:blipFill>
-            <a:blip r:embed="rId12"/>
-            <a:stretch>
-              <a:fillRect/>
-            </a:stretch>
-          </p:blipFill>
-          <p:spPr>
-            <a:xfrm>
-              <a:off x="1243378" y="150545"/>
-              <a:ext cx="8425407" cy="5619170"/>
-            </a:xfrm>
-            <a:prstGeom prst="rect">
-              <a:avLst/>
-            </a:prstGeom>
-          </p:spPr>
-        </p:pic>
       </p:grpSp>
     </p:spTree>
     <p:extLst>

</xml_diff>

<commit_message>
reformatted bray figure to fit text in frame
</commit_message>
<xml_diff>
--- a/output/plots/all_figs_with_legends.pptx
+++ b/output/plots/all_figs_with_legends.pptx
@@ -5,7 +5,7 @@
     <p:sldMasterId id="2147483648" r:id="rId1"/>
   </p:sldMasterIdLst>
   <p:notesMasterIdLst>
-    <p:notesMasterId r:id="rId18"/>
+    <p:notesMasterId r:id="rId19"/>
   </p:notesMasterIdLst>
   <p:sldIdLst>
     <p:sldId id="258" r:id="rId2"/>
@@ -21,9 +21,10 @@
     <p:sldId id="271" r:id="rId12"/>
     <p:sldId id="272" r:id="rId13"/>
     <p:sldId id="273" r:id="rId14"/>
-    <p:sldId id="270" r:id="rId15"/>
-    <p:sldId id="269" r:id="rId16"/>
-    <p:sldId id="265" r:id="rId17"/>
+    <p:sldId id="274" r:id="rId15"/>
+    <p:sldId id="270" r:id="rId16"/>
+    <p:sldId id="269" r:id="rId17"/>
+    <p:sldId id="265" r:id="rId18"/>
   </p:sldIdLst>
   <p:sldSz cx="12192000" cy="6858000"/>
   <p:notesSz cx="6858000" cy="9144000"/>
@@ -212,7 +213,7 @@
           <a:p>
             <a:fld id="{7FA21820-D199-4D82-91AF-C50B1D3B111A}" type="datetimeFigureOut">
               <a:rPr lang="en-US" smtClean="0"/>
-              <a:t>10/27/2017</a:t>
+              <a:t>10/30/2017</a:t>
             </a:fld>
             <a:endParaRPr lang="en-US"/>
           </a:p>
@@ -1045,7 +1046,7 @@
           <a:p>
             <a:fld id="{916B8C92-D5E3-4480-8685-D57BEE386DE2}" type="datetimeFigureOut">
               <a:rPr lang="en-US" smtClean="0"/>
-              <a:t>10/27/2017</a:t>
+              <a:t>10/30/2017</a:t>
             </a:fld>
             <a:endParaRPr lang="en-US"/>
           </a:p>
@@ -1215,7 +1216,7 @@
           <a:p>
             <a:fld id="{916B8C92-D5E3-4480-8685-D57BEE386DE2}" type="datetimeFigureOut">
               <a:rPr lang="en-US" smtClean="0"/>
-              <a:t>10/27/2017</a:t>
+              <a:t>10/30/2017</a:t>
             </a:fld>
             <a:endParaRPr lang="en-US"/>
           </a:p>
@@ -1395,7 +1396,7 @@
           <a:p>
             <a:fld id="{916B8C92-D5E3-4480-8685-D57BEE386DE2}" type="datetimeFigureOut">
               <a:rPr lang="en-US" smtClean="0"/>
-              <a:t>10/27/2017</a:t>
+              <a:t>10/30/2017</a:t>
             </a:fld>
             <a:endParaRPr lang="en-US"/>
           </a:p>
@@ -1565,7 +1566,7 @@
           <a:p>
             <a:fld id="{916B8C92-D5E3-4480-8685-D57BEE386DE2}" type="datetimeFigureOut">
               <a:rPr lang="en-US" smtClean="0"/>
-              <a:t>10/27/2017</a:t>
+              <a:t>10/30/2017</a:t>
             </a:fld>
             <a:endParaRPr lang="en-US"/>
           </a:p>
@@ -1811,7 +1812,7 @@
           <a:p>
             <a:fld id="{916B8C92-D5E3-4480-8685-D57BEE386DE2}" type="datetimeFigureOut">
               <a:rPr lang="en-US" smtClean="0"/>
-              <a:t>10/27/2017</a:t>
+              <a:t>10/30/2017</a:t>
             </a:fld>
             <a:endParaRPr lang="en-US"/>
           </a:p>
@@ -2043,7 +2044,7 @@
           <a:p>
             <a:fld id="{916B8C92-D5E3-4480-8685-D57BEE386DE2}" type="datetimeFigureOut">
               <a:rPr lang="en-US" smtClean="0"/>
-              <a:t>10/27/2017</a:t>
+              <a:t>10/30/2017</a:t>
             </a:fld>
             <a:endParaRPr lang="en-US"/>
           </a:p>
@@ -2410,7 +2411,7 @@
           <a:p>
             <a:fld id="{916B8C92-D5E3-4480-8685-D57BEE386DE2}" type="datetimeFigureOut">
               <a:rPr lang="en-US" smtClean="0"/>
-              <a:t>10/27/2017</a:t>
+              <a:t>10/30/2017</a:t>
             </a:fld>
             <a:endParaRPr lang="en-US"/>
           </a:p>
@@ -2528,7 +2529,7 @@
           <a:p>
             <a:fld id="{916B8C92-D5E3-4480-8685-D57BEE386DE2}" type="datetimeFigureOut">
               <a:rPr lang="en-US" smtClean="0"/>
-              <a:t>10/27/2017</a:t>
+              <a:t>10/30/2017</a:t>
             </a:fld>
             <a:endParaRPr lang="en-US"/>
           </a:p>
@@ -2623,7 +2624,7 @@
           <a:p>
             <a:fld id="{916B8C92-D5E3-4480-8685-D57BEE386DE2}" type="datetimeFigureOut">
               <a:rPr lang="en-US" smtClean="0"/>
-              <a:t>10/27/2017</a:t>
+              <a:t>10/30/2017</a:t>
             </a:fld>
             <a:endParaRPr lang="en-US"/>
           </a:p>
@@ -2900,7 +2901,7 @@
           <a:p>
             <a:fld id="{916B8C92-D5E3-4480-8685-D57BEE386DE2}" type="datetimeFigureOut">
               <a:rPr lang="en-US" smtClean="0"/>
-              <a:t>10/27/2017</a:t>
+              <a:t>10/30/2017</a:t>
             </a:fld>
             <a:endParaRPr lang="en-US"/>
           </a:p>
@@ -3153,7 +3154,7 @@
           <a:p>
             <a:fld id="{916B8C92-D5E3-4480-8685-D57BEE386DE2}" type="datetimeFigureOut">
               <a:rPr lang="en-US" smtClean="0"/>
-              <a:t>10/27/2017</a:t>
+              <a:t>10/30/2017</a:t>
             </a:fld>
             <a:endParaRPr lang="en-US"/>
           </a:p>
@@ -3366,7 +3367,7 @@
           <a:p>
             <a:fld id="{916B8C92-D5E3-4480-8685-D57BEE386DE2}" type="datetimeFigureOut">
               <a:rPr lang="en-US" smtClean="0"/>
-              <a:t>10/27/2017</a:t>
+              <a:t>10/30/2017</a:t>
             </a:fld>
             <a:endParaRPr lang="en-US"/>
           </a:p>
@@ -6711,6 +6712,98 @@
           <a:chExt cx="0" cy="0"/>
         </a:xfrm>
       </p:grpSpPr>
+      <p:grpSp>
+        <p:nvGrpSpPr>
+          <p:cNvPr id="8" name="Group 7"/>
+          <p:cNvGrpSpPr/>
+          <p:nvPr/>
+        </p:nvGrpSpPr>
+        <p:grpSpPr>
+          <a:xfrm>
+            <a:off x="1516777" y="255016"/>
+            <a:ext cx="8390683" cy="5611394"/>
+            <a:chOff x="1516777" y="255016"/>
+            <a:chExt cx="8390683" cy="5611394"/>
+          </a:xfrm>
+        </p:grpSpPr>
+        <p:pic>
+          <p:nvPicPr>
+            <p:cNvPr id="4" name="Picture 3"/>
+            <p:cNvPicPr>
+              <a:picLocks noChangeAspect="1"/>
+            </p:cNvPicPr>
+            <p:nvPr/>
+          </p:nvPicPr>
+          <p:blipFill rotWithShape="1">
+            <a:blip r:embed="rId2"/>
+            <a:srcRect l="58"/>
+            <a:stretch/>
+          </p:blipFill>
+          <p:spPr>
+            <a:xfrm>
+              <a:off x="1516777" y="255016"/>
+              <a:ext cx="8390683" cy="5611394"/>
+            </a:xfrm>
+            <a:prstGeom prst="rect">
+              <a:avLst/>
+            </a:prstGeom>
+          </p:spPr>
+        </p:pic>
+        <p:pic>
+          <p:nvPicPr>
+            <p:cNvPr id="7" name="Picture 6"/>
+            <p:cNvPicPr>
+              <a:picLocks noChangeAspect="1"/>
+            </p:cNvPicPr>
+            <p:nvPr/>
+          </p:nvPicPr>
+          <p:blipFill>
+            <a:blip r:embed="rId3"/>
+            <a:stretch>
+              <a:fillRect/>
+            </a:stretch>
+          </p:blipFill>
+          <p:spPr>
+            <a:xfrm>
+              <a:off x="8400724" y="2120377"/>
+              <a:ext cx="1506736" cy="1512444"/>
+            </a:xfrm>
+            <a:prstGeom prst="rect">
+              <a:avLst/>
+            </a:prstGeom>
+          </p:spPr>
+        </p:pic>
+      </p:grpSp>
+    </p:spTree>
+    <p:extLst>
+      <p:ext uri="{BB962C8B-B14F-4D97-AF65-F5344CB8AC3E}">
+        <p14:creationId xmlns:p14="http://schemas.microsoft.com/office/powerpoint/2010/main" val="2247023243"/>
+      </p:ext>
+    </p:extLst>
+  </p:cSld>
+  <p:clrMapOvr>
+    <a:masterClrMapping/>
+  </p:clrMapOvr>
+</p:sld>
+</file>
+
+<file path=ppt/slides/slide15.xml><?xml version="1.0" encoding="utf-8"?>
+<p:sld xmlns:a="http://schemas.openxmlformats.org/drawingml/2006/main" xmlns:r="http://schemas.openxmlformats.org/officeDocument/2006/relationships" xmlns:p="http://schemas.openxmlformats.org/presentationml/2006/main">
+  <p:cSld>
+    <p:spTree>
+      <p:nvGrpSpPr>
+        <p:cNvPr id="1" name=""/>
+        <p:cNvGrpSpPr/>
+        <p:nvPr/>
+      </p:nvGrpSpPr>
+      <p:grpSpPr>
+        <a:xfrm>
+          <a:off x="0" y="0"/>
+          <a:ext cx="0" cy="0"/>
+          <a:chOff x="0" y="0"/>
+          <a:chExt cx="0" cy="0"/>
+        </a:xfrm>
+      </p:grpSpPr>
       <p:pic>
         <p:nvPicPr>
           <p:cNvPr id="6" name="Picture 5"/>
@@ -6819,7 +6912,7 @@
 </p:sld>
 </file>
 
-<file path=ppt/slides/slide15.xml><?xml version="1.0" encoding="utf-8"?>
+<file path=ppt/slides/slide16.xml><?xml version="1.0" encoding="utf-8"?>
 <p:sld xmlns:a="http://schemas.openxmlformats.org/drawingml/2006/main" xmlns:r="http://schemas.openxmlformats.org/officeDocument/2006/relationships" xmlns:p="http://schemas.openxmlformats.org/presentationml/2006/main">
   <p:cSld>
     <p:spTree>
@@ -6969,7 +7062,7 @@
 </p:sld>
 </file>
 
-<file path=ppt/slides/slide16.xml><?xml version="1.0" encoding="utf-8"?>
+<file path=ppt/slides/slide17.xml><?xml version="1.0" encoding="utf-8"?>
 <p:sld xmlns:a="http://schemas.openxmlformats.org/drawingml/2006/main" xmlns:r="http://schemas.openxmlformats.org/officeDocument/2006/relationships" xmlns:p="http://schemas.openxmlformats.org/presentationml/2006/main">
   <p:cSld>
     <p:spTree>

</xml_diff>

<commit_message>
fixed typo in fig 2 label
</commit_message>
<xml_diff>
--- a/output/plots/all_figs_with_legends.pptx
+++ b/output/plots/all_figs_with_legends.pptx
@@ -213,7 +213,7 @@
           <a:p>
             <a:fld id="{7FA21820-D199-4D82-91AF-C50B1D3B111A}" type="datetimeFigureOut">
               <a:rPr lang="en-US" smtClean="0"/>
-              <a:t>10/30/2017</a:t>
+              <a:t>11/1/2017</a:t>
             </a:fld>
             <a:endParaRPr lang="en-US"/>
           </a:p>
@@ -1046,7 +1046,7 @@
           <a:p>
             <a:fld id="{916B8C92-D5E3-4480-8685-D57BEE386DE2}" type="datetimeFigureOut">
               <a:rPr lang="en-US" smtClean="0"/>
-              <a:t>10/30/2017</a:t>
+              <a:t>11/1/2017</a:t>
             </a:fld>
             <a:endParaRPr lang="en-US"/>
           </a:p>
@@ -1216,7 +1216,7 @@
           <a:p>
             <a:fld id="{916B8C92-D5E3-4480-8685-D57BEE386DE2}" type="datetimeFigureOut">
               <a:rPr lang="en-US" smtClean="0"/>
-              <a:t>10/30/2017</a:t>
+              <a:t>11/1/2017</a:t>
             </a:fld>
             <a:endParaRPr lang="en-US"/>
           </a:p>
@@ -1396,7 +1396,7 @@
           <a:p>
             <a:fld id="{916B8C92-D5E3-4480-8685-D57BEE386DE2}" type="datetimeFigureOut">
               <a:rPr lang="en-US" smtClean="0"/>
-              <a:t>10/30/2017</a:t>
+              <a:t>11/1/2017</a:t>
             </a:fld>
             <a:endParaRPr lang="en-US"/>
           </a:p>
@@ -1566,7 +1566,7 @@
           <a:p>
             <a:fld id="{916B8C92-D5E3-4480-8685-D57BEE386DE2}" type="datetimeFigureOut">
               <a:rPr lang="en-US" smtClean="0"/>
-              <a:t>10/30/2017</a:t>
+              <a:t>11/1/2017</a:t>
             </a:fld>
             <a:endParaRPr lang="en-US"/>
           </a:p>
@@ -1812,7 +1812,7 @@
           <a:p>
             <a:fld id="{916B8C92-D5E3-4480-8685-D57BEE386DE2}" type="datetimeFigureOut">
               <a:rPr lang="en-US" smtClean="0"/>
-              <a:t>10/30/2017</a:t>
+              <a:t>11/1/2017</a:t>
             </a:fld>
             <a:endParaRPr lang="en-US"/>
           </a:p>
@@ -2044,7 +2044,7 @@
           <a:p>
             <a:fld id="{916B8C92-D5E3-4480-8685-D57BEE386DE2}" type="datetimeFigureOut">
               <a:rPr lang="en-US" smtClean="0"/>
-              <a:t>10/30/2017</a:t>
+              <a:t>11/1/2017</a:t>
             </a:fld>
             <a:endParaRPr lang="en-US"/>
           </a:p>
@@ -2411,7 +2411,7 @@
           <a:p>
             <a:fld id="{916B8C92-D5E3-4480-8685-D57BEE386DE2}" type="datetimeFigureOut">
               <a:rPr lang="en-US" smtClean="0"/>
-              <a:t>10/30/2017</a:t>
+              <a:t>11/1/2017</a:t>
             </a:fld>
             <a:endParaRPr lang="en-US"/>
           </a:p>
@@ -2529,7 +2529,7 @@
           <a:p>
             <a:fld id="{916B8C92-D5E3-4480-8685-D57BEE386DE2}" type="datetimeFigureOut">
               <a:rPr lang="en-US" smtClean="0"/>
-              <a:t>10/30/2017</a:t>
+              <a:t>11/1/2017</a:t>
             </a:fld>
             <a:endParaRPr lang="en-US"/>
           </a:p>
@@ -2624,7 +2624,7 @@
           <a:p>
             <a:fld id="{916B8C92-D5E3-4480-8685-D57BEE386DE2}" type="datetimeFigureOut">
               <a:rPr lang="en-US" smtClean="0"/>
-              <a:t>10/30/2017</a:t>
+              <a:t>11/1/2017</a:t>
             </a:fld>
             <a:endParaRPr lang="en-US"/>
           </a:p>
@@ -2901,7 +2901,7 @@
           <a:p>
             <a:fld id="{916B8C92-D5E3-4480-8685-D57BEE386DE2}" type="datetimeFigureOut">
               <a:rPr lang="en-US" smtClean="0"/>
-              <a:t>10/30/2017</a:t>
+              <a:t>11/1/2017</a:t>
             </a:fld>
             <a:endParaRPr lang="en-US"/>
           </a:p>
@@ -3154,7 +3154,7 @@
           <a:p>
             <a:fld id="{916B8C92-D5E3-4480-8685-D57BEE386DE2}" type="datetimeFigureOut">
               <a:rPr lang="en-US" smtClean="0"/>
-              <a:t>10/30/2017</a:t>
+              <a:t>11/1/2017</a:t>
             </a:fld>
             <a:endParaRPr lang="en-US"/>
           </a:p>
@@ -3367,7 +3367,7 @@
           <a:p>
             <a:fld id="{916B8C92-D5E3-4480-8685-D57BEE386DE2}" type="datetimeFigureOut">
               <a:rPr lang="en-US" smtClean="0"/>
-              <a:t>10/30/2017</a:t>
+              <a:t>11/1/2017</a:t>
             </a:fld>
             <a:endParaRPr lang="en-US"/>
           </a:p>
@@ -13305,7 +13305,7 @@
       </p:grpSpPr>
       <p:pic>
         <p:nvPicPr>
-          <p:cNvPr id="4" name="Picture 3"/>
+          <p:cNvPr id="5" name="Picture 4"/>
           <p:cNvPicPr>
             <a:picLocks noChangeAspect="1"/>
           </p:cNvPicPr>
@@ -13319,8 +13319,8 @@
         </p:blipFill>
         <p:spPr>
           <a:xfrm>
-            <a:off x="2372007" y="1325922"/>
-            <a:ext cx="7036180" cy="5300885"/>
+            <a:off x="2245197" y="1328571"/>
+            <a:ext cx="7251270" cy="5381962"/>
           </a:xfrm>
           <a:prstGeom prst="rect">
             <a:avLst/>
@@ -14020,10 +14020,10 @@
         </p:nvGrpSpPr>
         <p:grpSpPr>
           <a:xfrm>
-            <a:off x="3313491" y="2550800"/>
-            <a:ext cx="2250695" cy="321957"/>
+            <a:off x="3229725" y="2586434"/>
+            <a:ext cx="2319031" cy="321957"/>
             <a:chOff x="2066372" y="1693067"/>
-            <a:chExt cx="3156177" cy="418733"/>
+            <a:chExt cx="3252006" cy="418733"/>
           </a:xfrm>
         </p:grpSpPr>
         <p:pic>
@@ -14066,7 +14066,7 @@
           </p:blipFill>
           <p:spPr>
             <a:xfrm>
-              <a:off x="4494070" y="1746386"/>
+              <a:off x="4589899" y="1744278"/>
               <a:ext cx="728479" cy="293882"/>
             </a:xfrm>
             <a:prstGeom prst="rect">
@@ -14107,7 +14107,7 @@
         </p:nvGrpSpPr>
         <p:grpSpPr>
           <a:xfrm>
-            <a:off x="3207563" y="4519742"/>
+            <a:off x="3142221" y="4576215"/>
             <a:ext cx="2433913" cy="314496"/>
             <a:chOff x="2721075" y="6071986"/>
             <a:chExt cx="2446874" cy="235941"/>
@@ -14344,7 +14344,7 @@
         </p:nvGrpSpPr>
         <p:grpSpPr>
           <a:xfrm>
-            <a:off x="3229725" y="6320629"/>
+            <a:off x="3153203" y="6448515"/>
             <a:ext cx="2433913" cy="314496"/>
             <a:chOff x="2721075" y="6071986"/>
             <a:chExt cx="2446874" cy="235941"/>
@@ -14581,7 +14581,7 @@
         </p:nvGrpSpPr>
         <p:grpSpPr>
           <a:xfrm>
-            <a:off x="6803043" y="4510207"/>
+            <a:off x="6844657" y="4593414"/>
             <a:ext cx="2433913" cy="314496"/>
             <a:chOff x="2721075" y="6071986"/>
             <a:chExt cx="2446874" cy="235941"/>
@@ -14818,7 +14818,7 @@
         </p:nvGrpSpPr>
         <p:grpSpPr>
           <a:xfrm>
-            <a:off x="6803043" y="6320629"/>
+            <a:off x="6817962" y="6448515"/>
             <a:ext cx="2433913" cy="314496"/>
             <a:chOff x="2721075" y="6071986"/>
             <a:chExt cx="2446874" cy="235941"/>
@@ -15055,10 +15055,10 @@
         </p:nvGrpSpPr>
         <p:grpSpPr>
           <a:xfrm>
-            <a:off x="6902697" y="2571330"/>
-            <a:ext cx="2250695" cy="321957"/>
+            <a:off x="7009527" y="2588196"/>
+            <a:ext cx="2365658" cy="323381"/>
             <a:chOff x="2066372" y="1693067"/>
-            <a:chExt cx="3156177" cy="418733"/>
+            <a:chExt cx="3317392" cy="420585"/>
           </a:xfrm>
         </p:grpSpPr>
         <p:pic>
@@ -15101,7 +15101,7 @@
           </p:blipFill>
           <p:spPr>
             <a:xfrm>
-              <a:off x="4494070" y="1746386"/>
+              <a:off x="4655285" y="1741986"/>
               <a:ext cx="728479" cy="293882"/>
             </a:xfrm>
             <a:prstGeom prst="rect">
@@ -15125,7 +15125,7 @@
           </p:blipFill>
           <p:spPr>
             <a:xfrm>
-              <a:off x="3345216" y="1702857"/>
+              <a:off x="3389207" y="1704709"/>
               <a:ext cx="640805" cy="408943"/>
             </a:xfrm>
             <a:prstGeom prst="rect">

</xml_diff>

<commit_message>
fixed species lost in a3 and a4
</commit_message>
<xml_diff>
--- a/output/plots/all_figs_with_legends.pptx
+++ b/output/plots/all_figs_with_legends.pptx
@@ -5,7 +5,7 @@
     <p:sldMasterId id="2147483648" r:id="rId1"/>
   </p:sldMasterIdLst>
   <p:notesMasterIdLst>
-    <p:notesMasterId r:id="rId19"/>
+    <p:notesMasterId r:id="rId16"/>
   </p:notesMasterIdLst>
   <p:sldIdLst>
     <p:sldId id="258" r:id="rId2"/>
@@ -13,18 +13,15 @@
     <p:sldId id="257" r:id="rId4"/>
     <p:sldId id="260" r:id="rId5"/>
     <p:sldId id="262" r:id="rId6"/>
-    <p:sldId id="266" r:id="rId7"/>
-    <p:sldId id="268" r:id="rId8"/>
-    <p:sldId id="256" r:id="rId9"/>
-    <p:sldId id="264" r:id="rId10"/>
-    <p:sldId id="267" r:id="rId11"/>
-    <p:sldId id="271" r:id="rId12"/>
-    <p:sldId id="272" r:id="rId13"/>
-    <p:sldId id="273" r:id="rId14"/>
-    <p:sldId id="274" r:id="rId15"/>
-    <p:sldId id="270" r:id="rId16"/>
-    <p:sldId id="269" r:id="rId17"/>
-    <p:sldId id="265" r:id="rId18"/>
+    <p:sldId id="256" r:id="rId7"/>
+    <p:sldId id="264" r:id="rId8"/>
+    <p:sldId id="267" r:id="rId9"/>
+    <p:sldId id="271" r:id="rId10"/>
+    <p:sldId id="272" r:id="rId11"/>
+    <p:sldId id="273" r:id="rId12"/>
+    <p:sldId id="274" r:id="rId13"/>
+    <p:sldId id="270" r:id="rId14"/>
+    <p:sldId id="269" r:id="rId15"/>
   </p:sldIdLst>
   <p:sldSz cx="12192000" cy="6858000"/>
   <p:notesSz cx="6858000" cy="9144000"/>
@@ -213,7 +210,7 @@
           <a:p>
             <a:fld id="{7FA21820-D199-4D82-91AF-C50B1D3B111A}" type="datetimeFigureOut">
               <a:rPr lang="en-US" smtClean="0"/>
-              <a:t>11/1/2017</a:t>
+              <a:t>11/2/2017</a:t>
             </a:fld>
             <a:endParaRPr lang="en-US"/>
           </a:p>
@@ -1046,7 +1043,7 @@
           <a:p>
             <a:fld id="{916B8C92-D5E3-4480-8685-D57BEE386DE2}" type="datetimeFigureOut">
               <a:rPr lang="en-US" smtClean="0"/>
-              <a:t>11/1/2017</a:t>
+              <a:t>11/2/2017</a:t>
             </a:fld>
             <a:endParaRPr lang="en-US"/>
           </a:p>
@@ -1216,7 +1213,7 @@
           <a:p>
             <a:fld id="{916B8C92-D5E3-4480-8685-D57BEE386DE2}" type="datetimeFigureOut">
               <a:rPr lang="en-US" smtClean="0"/>
-              <a:t>11/1/2017</a:t>
+              <a:t>11/2/2017</a:t>
             </a:fld>
             <a:endParaRPr lang="en-US"/>
           </a:p>
@@ -1396,7 +1393,7 @@
           <a:p>
             <a:fld id="{916B8C92-D5E3-4480-8685-D57BEE386DE2}" type="datetimeFigureOut">
               <a:rPr lang="en-US" smtClean="0"/>
-              <a:t>11/1/2017</a:t>
+              <a:t>11/2/2017</a:t>
             </a:fld>
             <a:endParaRPr lang="en-US"/>
           </a:p>
@@ -1566,7 +1563,7 @@
           <a:p>
             <a:fld id="{916B8C92-D5E3-4480-8685-D57BEE386DE2}" type="datetimeFigureOut">
               <a:rPr lang="en-US" smtClean="0"/>
-              <a:t>11/1/2017</a:t>
+              <a:t>11/2/2017</a:t>
             </a:fld>
             <a:endParaRPr lang="en-US"/>
           </a:p>
@@ -1812,7 +1809,7 @@
           <a:p>
             <a:fld id="{916B8C92-D5E3-4480-8685-D57BEE386DE2}" type="datetimeFigureOut">
               <a:rPr lang="en-US" smtClean="0"/>
-              <a:t>11/1/2017</a:t>
+              <a:t>11/2/2017</a:t>
             </a:fld>
             <a:endParaRPr lang="en-US"/>
           </a:p>
@@ -2044,7 +2041,7 @@
           <a:p>
             <a:fld id="{916B8C92-D5E3-4480-8685-D57BEE386DE2}" type="datetimeFigureOut">
               <a:rPr lang="en-US" smtClean="0"/>
-              <a:t>11/1/2017</a:t>
+              <a:t>11/2/2017</a:t>
             </a:fld>
             <a:endParaRPr lang="en-US"/>
           </a:p>
@@ -2411,7 +2408,7 @@
           <a:p>
             <a:fld id="{916B8C92-D5E3-4480-8685-D57BEE386DE2}" type="datetimeFigureOut">
               <a:rPr lang="en-US" smtClean="0"/>
-              <a:t>11/1/2017</a:t>
+              <a:t>11/2/2017</a:t>
             </a:fld>
             <a:endParaRPr lang="en-US"/>
           </a:p>
@@ -2529,7 +2526,7 @@
           <a:p>
             <a:fld id="{916B8C92-D5E3-4480-8685-D57BEE386DE2}" type="datetimeFigureOut">
               <a:rPr lang="en-US" smtClean="0"/>
-              <a:t>11/1/2017</a:t>
+              <a:t>11/2/2017</a:t>
             </a:fld>
             <a:endParaRPr lang="en-US"/>
           </a:p>
@@ -2624,7 +2621,7 @@
           <a:p>
             <a:fld id="{916B8C92-D5E3-4480-8685-D57BEE386DE2}" type="datetimeFigureOut">
               <a:rPr lang="en-US" smtClean="0"/>
-              <a:t>11/1/2017</a:t>
+              <a:t>11/2/2017</a:t>
             </a:fld>
             <a:endParaRPr lang="en-US"/>
           </a:p>
@@ -2901,7 +2898,7 @@
           <a:p>
             <a:fld id="{916B8C92-D5E3-4480-8685-D57BEE386DE2}" type="datetimeFigureOut">
               <a:rPr lang="en-US" smtClean="0"/>
-              <a:t>11/1/2017</a:t>
+              <a:t>11/2/2017</a:t>
             </a:fld>
             <a:endParaRPr lang="en-US"/>
           </a:p>
@@ -3154,7 +3151,7 @@
           <a:p>
             <a:fld id="{916B8C92-D5E3-4480-8685-D57BEE386DE2}" type="datetimeFigureOut">
               <a:rPr lang="en-US" smtClean="0"/>
-              <a:t>11/1/2017</a:t>
+              <a:t>11/2/2017</a:t>
             </a:fld>
             <a:endParaRPr lang="en-US"/>
           </a:p>
@@ -3367,7 +3364,7 @@
           <a:p>
             <a:fld id="{916B8C92-D5E3-4480-8685-D57BEE386DE2}" type="datetimeFigureOut">
               <a:rPr lang="en-US" smtClean="0"/>
-              <a:t>11/1/2017</a:t>
+              <a:t>11/2/2017</a:t>
             </a:fld>
             <a:endParaRPr lang="en-US"/>
           </a:p>
@@ -5857,378 +5854,6 @@
         </p:nvSpPr>
         <p:spPr>
           <a:xfrm>
-            <a:off x="0" y="0"/>
-            <a:ext cx="2502529" cy="1325563"/>
-          </a:xfrm>
-        </p:spPr>
-        <p:txBody>
-          <a:bodyPr/>
-          <a:lstStyle/>
-          <a:p>
-            <a:r>
-              <a:rPr lang="en-US" dirty="0" err="1" smtClean="0"/>
-              <a:t>Supp</a:t>
-            </a:r>
-            <a:r>
-              <a:rPr lang="en-US" dirty="0" smtClean="0"/>
-              <a:t> 25</a:t>
-            </a:r>
-            <a:endParaRPr lang="en-US" dirty="0"/>
-          </a:p>
-        </p:txBody>
-      </p:sp>
-      <p:pic>
-        <p:nvPicPr>
-          <p:cNvPr id="10" name="Picture 9"/>
-          <p:cNvPicPr>
-            <a:picLocks noChangeAspect="1"/>
-          </p:cNvPicPr>
-          <p:nvPr/>
-        </p:nvPicPr>
-        <p:blipFill>
-          <a:blip r:embed="rId2"/>
-          <a:stretch>
-            <a:fillRect/>
-          </a:stretch>
-        </p:blipFill>
-        <p:spPr>
-          <a:xfrm>
-            <a:off x="2073896" y="0"/>
-            <a:ext cx="8563094" cy="6721311"/>
-          </a:xfrm>
-          <a:prstGeom prst="rect">
-            <a:avLst/>
-          </a:prstGeom>
-        </p:spPr>
-      </p:pic>
-      <p:pic>
-        <p:nvPicPr>
-          <p:cNvPr id="11" name="Picture 10"/>
-          <p:cNvPicPr>
-            <a:picLocks noChangeAspect="1"/>
-          </p:cNvPicPr>
-          <p:nvPr/>
-        </p:nvPicPr>
-        <p:blipFill>
-          <a:blip r:embed="rId3"/>
-          <a:stretch>
-            <a:fillRect/>
-          </a:stretch>
-        </p:blipFill>
-        <p:spPr>
-          <a:xfrm>
-            <a:off x="2831575" y="6516594"/>
-            <a:ext cx="3286029" cy="341406"/>
-          </a:xfrm>
-          <a:prstGeom prst="rect">
-            <a:avLst/>
-          </a:prstGeom>
-        </p:spPr>
-      </p:pic>
-      <p:pic>
-        <p:nvPicPr>
-          <p:cNvPr id="12" name="Picture 11"/>
-          <p:cNvPicPr>
-            <a:picLocks noChangeAspect="1"/>
-          </p:cNvPicPr>
-          <p:nvPr/>
-        </p:nvPicPr>
-        <p:blipFill>
-          <a:blip r:embed="rId4"/>
-          <a:stretch>
-            <a:fillRect/>
-          </a:stretch>
-        </p:blipFill>
-        <p:spPr>
-          <a:xfrm>
-            <a:off x="7435079" y="6492208"/>
-            <a:ext cx="2883658" cy="390178"/>
-          </a:xfrm>
-          <a:prstGeom prst="rect">
-            <a:avLst/>
-          </a:prstGeom>
-        </p:spPr>
-      </p:pic>
-    </p:spTree>
-    <p:extLst>
-      <p:ext uri="{BB962C8B-B14F-4D97-AF65-F5344CB8AC3E}">
-        <p14:creationId xmlns:p14="http://schemas.microsoft.com/office/powerpoint/2010/main" val="3312420801"/>
-      </p:ext>
-    </p:extLst>
-  </p:cSld>
-  <p:clrMapOvr>
-    <a:masterClrMapping/>
-  </p:clrMapOvr>
-</p:sld>
-</file>
-
-<file path=ppt/slides/slide11.xml><?xml version="1.0" encoding="utf-8"?>
-<p:sld xmlns:a="http://schemas.openxmlformats.org/drawingml/2006/main" xmlns:r="http://schemas.openxmlformats.org/officeDocument/2006/relationships" xmlns:p="http://schemas.openxmlformats.org/presentationml/2006/main">
-  <p:cSld>
-    <p:spTree>
-      <p:nvGrpSpPr>
-        <p:cNvPr id="1" name=""/>
-        <p:cNvGrpSpPr/>
-        <p:nvPr/>
-      </p:nvGrpSpPr>
-      <p:grpSpPr>
-        <a:xfrm>
-          <a:off x="0" y="0"/>
-          <a:ext cx="0" cy="0"/>
-          <a:chOff x="0" y="0"/>
-          <a:chExt cx="0" cy="0"/>
-        </a:xfrm>
-      </p:grpSpPr>
-      <p:grpSp>
-        <p:nvGrpSpPr>
-          <p:cNvPr id="11" name="Group 10"/>
-          <p:cNvGrpSpPr/>
-          <p:nvPr/>
-        </p:nvGrpSpPr>
-        <p:grpSpPr>
-          <a:xfrm>
-            <a:off x="1253441" y="0"/>
-            <a:ext cx="9224921" cy="6858000"/>
-            <a:chOff x="1253441" y="0"/>
-            <a:chExt cx="9224921" cy="6858000"/>
-          </a:xfrm>
-        </p:grpSpPr>
-        <p:pic>
-          <p:nvPicPr>
-            <p:cNvPr id="10" name="Picture 9"/>
-            <p:cNvPicPr>
-              <a:picLocks noChangeAspect="1"/>
-            </p:cNvPicPr>
-            <p:nvPr/>
-          </p:nvPicPr>
-          <p:blipFill>
-            <a:blip r:embed="rId2"/>
-            <a:stretch>
-              <a:fillRect/>
-            </a:stretch>
-          </p:blipFill>
-          <p:spPr>
-            <a:xfrm>
-              <a:off x="1253441" y="0"/>
-              <a:ext cx="9224921" cy="6858000"/>
-            </a:xfrm>
-            <a:prstGeom prst="rect">
-              <a:avLst/>
-            </a:prstGeom>
-          </p:spPr>
-        </p:pic>
-        <p:grpSp>
-          <p:nvGrpSpPr>
-            <p:cNvPr id="2" name="Group 1"/>
-            <p:cNvGrpSpPr/>
-            <p:nvPr/>
-          </p:nvGrpSpPr>
-          <p:grpSpPr>
-            <a:xfrm>
-              <a:off x="2193215" y="0"/>
-              <a:ext cx="8285147" cy="6131578"/>
-              <a:chOff x="2193215" y="0"/>
-              <a:chExt cx="8285147" cy="6131578"/>
-            </a:xfrm>
-          </p:grpSpPr>
-          <p:pic>
-            <p:nvPicPr>
-              <p:cNvPr id="6" name="Picture 5"/>
-              <p:cNvPicPr>
-                <a:picLocks noChangeAspect="1"/>
-              </p:cNvPicPr>
-              <p:nvPr/>
-            </p:nvPicPr>
-            <p:blipFill>
-              <a:blip r:embed="rId3"/>
-              <a:stretch>
-                <a:fillRect/>
-              </a:stretch>
-            </p:blipFill>
-            <p:spPr>
-              <a:xfrm>
-                <a:off x="8027558" y="0"/>
-                <a:ext cx="2450804" cy="823031"/>
-              </a:xfrm>
-              <a:prstGeom prst="rect">
-                <a:avLst/>
-              </a:prstGeom>
-            </p:spPr>
-          </p:pic>
-          <p:pic>
-            <p:nvPicPr>
-              <p:cNvPr id="7" name="Picture 6"/>
-              <p:cNvPicPr>
-                <a:picLocks noChangeAspect="1"/>
-              </p:cNvPicPr>
-              <p:nvPr/>
-            </p:nvPicPr>
-            <p:blipFill>
-              <a:blip r:embed="rId4"/>
-              <a:stretch>
-                <a:fillRect/>
-              </a:stretch>
-            </p:blipFill>
-            <p:spPr>
-              <a:xfrm>
-                <a:off x="8971626" y="4619134"/>
-                <a:ext cx="1506736" cy="1512444"/>
-              </a:xfrm>
-              <a:prstGeom prst="rect">
-                <a:avLst/>
-              </a:prstGeom>
-            </p:spPr>
-          </p:pic>
-          <p:sp>
-            <p:nvSpPr>
-              <p:cNvPr id="8" name="TextBox 7"/>
-              <p:cNvSpPr txBox="1"/>
-              <p:nvPr/>
-            </p:nvSpPr>
-            <p:spPr>
-              <a:xfrm>
-                <a:off x="2193215" y="2537382"/>
-                <a:ext cx="1324900" cy="707886"/>
-              </a:xfrm>
-              <a:prstGeom prst="rect">
-                <a:avLst/>
-              </a:prstGeom>
-              <a:noFill/>
-            </p:spPr>
-            <p:txBody>
-              <a:bodyPr wrap="square" rtlCol="0">
-                <a:spAutoFit/>
-              </a:bodyPr>
-              <a:lstStyle/>
-              <a:p>
-                <a:r>
-                  <a:rPr lang="en-US" sz="2000" dirty="0"/>
-                  <a:t>l</a:t>
-                </a:r>
-                <a:r>
-                  <a:rPr lang="en-US" sz="2000" dirty="0" smtClean="0"/>
-                  <a:t>ognormal</a:t>
-                </a:r>
-              </a:p>
-              <a:p>
-                <a:endParaRPr lang="en-US" sz="2000" dirty="0"/>
-              </a:p>
-            </p:txBody>
-          </p:sp>
-          <p:sp>
-            <p:nvSpPr>
-              <p:cNvPr id="9" name="TextBox 8"/>
-              <p:cNvSpPr txBox="1"/>
-              <p:nvPr/>
-            </p:nvSpPr>
-            <p:spPr>
-              <a:xfrm>
-                <a:off x="4478498" y="2537382"/>
-                <a:ext cx="1324900" cy="707886"/>
-              </a:xfrm>
-              <a:prstGeom prst="rect">
-                <a:avLst/>
-              </a:prstGeom>
-              <a:noFill/>
-            </p:spPr>
-            <p:txBody>
-              <a:bodyPr wrap="square" rtlCol="0">
-                <a:spAutoFit/>
-              </a:bodyPr>
-              <a:lstStyle/>
-              <a:p>
-                <a:r>
-                  <a:rPr lang="en-US" sz="2000" dirty="0" err="1" smtClean="0"/>
-                  <a:t>logseries</a:t>
-                </a:r>
-                <a:endParaRPr lang="en-US" sz="2000" dirty="0" smtClean="0"/>
-              </a:p>
-              <a:p>
-                <a:endParaRPr lang="en-US" sz="2000" dirty="0"/>
-              </a:p>
-            </p:txBody>
-          </p:sp>
-          <p:cxnSp>
-            <p:nvCxnSpPr>
-              <p:cNvPr id="4" name="Straight Arrow Connector 3"/>
-              <p:cNvCxnSpPr/>
-              <p:nvPr/>
-            </p:nvCxnSpPr>
-            <p:spPr>
-              <a:xfrm>
-                <a:off x="3471620" y="2735451"/>
-                <a:ext cx="906650" cy="0"/>
-              </a:xfrm>
-              <a:prstGeom prst="straightConnector1">
-                <a:avLst/>
-              </a:prstGeom>
-              <a:ln w="28575">
-                <a:solidFill>
-                  <a:schemeClr val="tx1"/>
-                </a:solidFill>
-                <a:headEnd type="arrow" w="med" len="med"/>
-                <a:tailEnd type="arrow" w="med" len="med"/>
-              </a:ln>
-            </p:spPr>
-            <p:style>
-              <a:lnRef idx="1">
-                <a:schemeClr val="accent1"/>
-              </a:lnRef>
-              <a:fillRef idx="0">
-                <a:schemeClr val="accent1"/>
-              </a:fillRef>
-              <a:effectRef idx="0">
-                <a:schemeClr val="accent1"/>
-              </a:effectRef>
-              <a:fontRef idx="minor">
-                <a:schemeClr val="tx1"/>
-              </a:fontRef>
-            </p:style>
-          </p:cxnSp>
-        </p:grpSp>
-      </p:grpSp>
-    </p:spTree>
-    <p:extLst>
-      <p:ext uri="{BB962C8B-B14F-4D97-AF65-F5344CB8AC3E}">
-        <p14:creationId xmlns:p14="http://schemas.microsoft.com/office/powerpoint/2010/main" val="3378026183"/>
-      </p:ext>
-    </p:extLst>
-  </p:cSld>
-  <p:clrMapOvr>
-    <a:masterClrMapping/>
-  </p:clrMapOvr>
-</p:sld>
-</file>
-
-<file path=ppt/slides/slide12.xml><?xml version="1.0" encoding="utf-8"?>
-<p:sld xmlns:a="http://schemas.openxmlformats.org/drawingml/2006/main" xmlns:r="http://schemas.openxmlformats.org/officeDocument/2006/relationships" xmlns:p="http://schemas.openxmlformats.org/presentationml/2006/main">
-  <p:cSld>
-    <p:spTree>
-      <p:nvGrpSpPr>
-        <p:cNvPr id="1" name=""/>
-        <p:cNvGrpSpPr/>
-        <p:nvPr/>
-      </p:nvGrpSpPr>
-      <p:grpSpPr>
-        <a:xfrm>
-          <a:off x="0" y="0"/>
-          <a:ext cx="0" cy="0"/>
-          <a:chOff x="0" y="0"/>
-          <a:chExt cx="0" cy="0"/>
-        </a:xfrm>
-      </p:grpSpPr>
-      <p:sp>
-        <p:nvSpPr>
-          <p:cNvPr id="2" name="Title 1"/>
-          <p:cNvSpPr>
-            <a:spLocks noGrp="1"/>
-          </p:cNvSpPr>
-          <p:nvPr>
-            <p:ph type="title"/>
-          </p:nvPr>
-        </p:nvSpPr>
-        <p:spPr>
-          <a:xfrm>
             <a:off x="10859678" y="365125"/>
             <a:ext cx="1332322" cy="1325563"/>
           </a:xfrm>
@@ -6434,7 +6059,7 @@
 </p:sld>
 </file>
 
-<file path=ppt/slides/slide13.xml><?xml version="1.0" encoding="utf-8"?>
+<file path=ppt/slides/slide11.xml><?xml version="1.0" encoding="utf-8"?>
 <p:sld xmlns:a="http://schemas.openxmlformats.org/drawingml/2006/main" xmlns:r="http://schemas.openxmlformats.org/officeDocument/2006/relationships" xmlns:p="http://schemas.openxmlformats.org/presentationml/2006/main">
   <p:cSld>
     <p:spTree>
@@ -6695,7 +6320,7 @@
 </p:sld>
 </file>
 
-<file path=ppt/slides/slide14.xml><?xml version="1.0" encoding="utf-8"?>
+<file path=ppt/slides/slide12.xml><?xml version="1.0" encoding="utf-8"?>
 <p:sld xmlns:a="http://schemas.openxmlformats.org/drawingml/2006/main" xmlns:r="http://schemas.openxmlformats.org/officeDocument/2006/relationships" xmlns:p="http://schemas.openxmlformats.org/presentationml/2006/main">
   <p:cSld>
     <p:spTree>
@@ -6787,7 +6412,7 @@
 </p:sld>
 </file>
 
-<file path=ppt/slides/slide15.xml><?xml version="1.0" encoding="utf-8"?>
+<file path=ppt/slides/slide13.xml><?xml version="1.0" encoding="utf-8"?>
 <p:sld xmlns:a="http://schemas.openxmlformats.org/drawingml/2006/main" xmlns:r="http://schemas.openxmlformats.org/officeDocument/2006/relationships" xmlns:p="http://schemas.openxmlformats.org/presentationml/2006/main">
   <p:cSld>
     <p:spTree>
@@ -6912,7 +6537,7 @@
 </p:sld>
 </file>
 
-<file path=ppt/slides/slide16.xml><?xml version="1.0" encoding="utf-8"?>
+<file path=ppt/slides/slide14.xml><?xml version="1.0" encoding="utf-8"?>
 <p:sld xmlns:a="http://schemas.openxmlformats.org/drawingml/2006/main" xmlns:r="http://schemas.openxmlformats.org/officeDocument/2006/relationships" xmlns:p="http://schemas.openxmlformats.org/presentationml/2006/main">
   <p:cSld>
     <p:spTree>
@@ -7053,119 +6678,6 @@
     <p:extLst>
       <p:ext uri="{BB962C8B-B14F-4D97-AF65-F5344CB8AC3E}">
         <p14:creationId xmlns:p14="http://schemas.microsoft.com/office/powerpoint/2010/main" val="3951314879"/>
-      </p:ext>
-    </p:extLst>
-  </p:cSld>
-  <p:clrMapOvr>
-    <a:masterClrMapping/>
-  </p:clrMapOvr>
-</p:sld>
-</file>
-
-<file path=ppt/slides/slide17.xml><?xml version="1.0" encoding="utf-8"?>
-<p:sld xmlns:a="http://schemas.openxmlformats.org/drawingml/2006/main" xmlns:r="http://schemas.openxmlformats.org/officeDocument/2006/relationships" xmlns:p="http://schemas.openxmlformats.org/presentationml/2006/main">
-  <p:cSld>
-    <p:spTree>
-      <p:nvGrpSpPr>
-        <p:cNvPr id="1" name=""/>
-        <p:cNvGrpSpPr/>
-        <p:nvPr/>
-      </p:nvGrpSpPr>
-      <p:grpSpPr>
-        <a:xfrm>
-          <a:off x="0" y="0"/>
-          <a:ext cx="0" cy="0"/>
-          <a:chOff x="0" y="0"/>
-          <a:chExt cx="0" cy="0"/>
-        </a:xfrm>
-      </p:grpSpPr>
-      <p:sp>
-        <p:nvSpPr>
-          <p:cNvPr id="2" name="Title 1"/>
-          <p:cNvSpPr>
-            <a:spLocks noGrp="1"/>
-          </p:cNvSpPr>
-          <p:nvPr>
-            <p:ph type="title"/>
-          </p:nvPr>
-        </p:nvSpPr>
-        <p:spPr>
-          <a:xfrm>
-            <a:off x="699516" y="0"/>
-            <a:ext cx="10872216" cy="1325563"/>
-          </a:xfrm>
-        </p:spPr>
-        <p:txBody>
-          <a:bodyPr/>
-          <a:lstStyle/>
-          <a:p>
-            <a:r>
-              <a:rPr lang="en-US" dirty="0" smtClean="0"/>
-              <a:t>FIG 4 SUPP 10					FIG 4 </a:t>
-            </a:r>
-            <a:r>
-              <a:rPr lang="en-US" dirty="0"/>
-              <a:t>SUPP </a:t>
-            </a:r>
-            <a:r>
-              <a:rPr lang="en-US" dirty="0" smtClean="0"/>
-              <a:t>25</a:t>
-            </a:r>
-            <a:endParaRPr lang="en-US" dirty="0"/>
-          </a:p>
-        </p:txBody>
-      </p:sp>
-      <p:pic>
-        <p:nvPicPr>
-          <p:cNvPr id="3" name="Picture 2"/>
-          <p:cNvPicPr>
-            <a:picLocks noChangeAspect="1"/>
-          </p:cNvPicPr>
-          <p:nvPr/>
-        </p:nvPicPr>
-        <p:blipFill rotWithShape="1">
-          <a:blip r:embed="rId2"/>
-          <a:srcRect l="666"/>
-          <a:stretch/>
-        </p:blipFill>
-        <p:spPr>
-          <a:xfrm>
-            <a:off x="6096118" y="1079929"/>
-            <a:ext cx="5956753" cy="4483977"/>
-          </a:xfrm>
-          <a:prstGeom prst="rect">
-            <a:avLst/>
-          </a:prstGeom>
-        </p:spPr>
-      </p:pic>
-      <p:pic>
-        <p:nvPicPr>
-          <p:cNvPr id="4" name="Picture 3"/>
-          <p:cNvPicPr>
-            <a:picLocks noChangeAspect="1"/>
-          </p:cNvPicPr>
-          <p:nvPr/>
-        </p:nvPicPr>
-        <p:blipFill>
-          <a:blip r:embed="rId3"/>
-          <a:stretch>
-            <a:fillRect/>
-          </a:stretch>
-        </p:blipFill>
-        <p:spPr>
-          <a:xfrm>
-            <a:off x="0" y="1079929"/>
-            <a:ext cx="5991820" cy="4483977"/>
-          </a:xfrm>
-          <a:prstGeom prst="rect">
-            <a:avLst/>
-          </a:prstGeom>
-        </p:spPr>
-      </p:pic>
-    </p:spTree>
-    <p:extLst>
-      <p:ext uri="{BB962C8B-B14F-4D97-AF65-F5344CB8AC3E}">
-        <p14:creationId xmlns:p14="http://schemas.microsoft.com/office/powerpoint/2010/main" val="1876886906"/>
       </p:ext>
     </p:extLst>
   </p:cSld>
@@ -16139,374 +15651,6 @@
           <a:chExt cx="0" cy="0"/>
         </a:xfrm>
       </p:grpSpPr>
-      <p:pic>
-        <p:nvPicPr>
-          <p:cNvPr id="3" name="Picture 2"/>
-          <p:cNvPicPr>
-            <a:picLocks noChangeAspect="1"/>
-          </p:cNvPicPr>
-          <p:nvPr/>
-        </p:nvPicPr>
-        <p:blipFill rotWithShape="1">
-          <a:blip r:embed="rId2"/>
-          <a:srcRect t="315" b="-1"/>
-          <a:stretch/>
-        </p:blipFill>
-        <p:spPr>
-          <a:xfrm>
-            <a:off x="625227" y="0"/>
-            <a:ext cx="9120020" cy="6858000"/>
-          </a:xfrm>
-          <a:prstGeom prst="rect">
-            <a:avLst/>
-          </a:prstGeom>
-        </p:spPr>
-      </p:pic>
-      <p:pic>
-        <p:nvPicPr>
-          <p:cNvPr id="19" name="Picture 18"/>
-          <p:cNvPicPr>
-            <a:picLocks noChangeAspect="1"/>
-          </p:cNvPicPr>
-          <p:nvPr/>
-        </p:nvPicPr>
-        <p:blipFill rotWithShape="1">
-          <a:blip r:embed="rId3"/>
-          <a:srcRect l="86534" t="65980" r="-1" b="15601"/>
-          <a:stretch/>
-        </p:blipFill>
-        <p:spPr>
-          <a:xfrm>
-            <a:off x="8139862" y="4713402"/>
-            <a:ext cx="1605621" cy="1611985"/>
-          </a:xfrm>
-          <a:prstGeom prst="rect">
-            <a:avLst/>
-          </a:prstGeom>
-        </p:spPr>
-      </p:pic>
-      <p:pic>
-        <p:nvPicPr>
-          <p:cNvPr id="20" name="Picture 19"/>
-          <p:cNvPicPr>
-            <a:picLocks noChangeAspect="1"/>
-          </p:cNvPicPr>
-          <p:nvPr/>
-        </p:nvPicPr>
-        <p:blipFill rotWithShape="1">
-          <a:blip r:embed="rId3"/>
-          <a:srcRect l="79149" t="20380" r="80" b="70126"/>
-          <a:stretch/>
-        </p:blipFill>
-        <p:spPr>
-          <a:xfrm>
-            <a:off x="7425357" y="0"/>
-            <a:ext cx="2447286" cy="821115"/>
-          </a:xfrm>
-          <a:prstGeom prst="rect">
-            <a:avLst/>
-          </a:prstGeom>
-        </p:spPr>
-      </p:pic>
-      <p:grpSp>
-        <p:nvGrpSpPr>
-          <p:cNvPr id="21" name="Group 20"/>
-          <p:cNvGrpSpPr/>
-          <p:nvPr/>
-        </p:nvGrpSpPr>
-        <p:grpSpPr>
-          <a:xfrm>
-            <a:off x="3113145" y="222969"/>
-            <a:ext cx="300947" cy="2400712"/>
-            <a:chOff x="2862091" y="251249"/>
-            <a:chExt cx="300947" cy="2400712"/>
-          </a:xfrm>
-        </p:grpSpPr>
-        <p:sp>
-          <p:nvSpPr>
-            <p:cNvPr id="24" name="Rectangle 23"/>
-            <p:cNvSpPr/>
-            <p:nvPr/>
-          </p:nvSpPr>
-          <p:spPr>
-            <a:xfrm>
-              <a:off x="2862091" y="304986"/>
-              <a:ext cx="300947" cy="2346975"/>
-            </a:xfrm>
-            <a:prstGeom prst="rect">
-              <a:avLst/>
-            </a:prstGeom>
-            <a:solidFill>
-              <a:schemeClr val="bg1"/>
-            </a:solidFill>
-            <a:ln>
-              <a:noFill/>
-            </a:ln>
-          </p:spPr>
-          <p:style>
-            <a:lnRef idx="2">
-              <a:schemeClr val="accent1">
-                <a:shade val="50000"/>
-              </a:schemeClr>
-            </a:lnRef>
-            <a:fillRef idx="1">
-              <a:schemeClr val="accent1"/>
-            </a:fillRef>
-            <a:effectRef idx="0">
-              <a:schemeClr val="accent1"/>
-            </a:effectRef>
-            <a:fontRef idx="minor">
-              <a:schemeClr val="lt1"/>
-            </a:fontRef>
-          </p:style>
-          <p:txBody>
-            <a:bodyPr rtlCol="0" anchor="ctr"/>
-            <a:lstStyle/>
-            <a:p>
-              <a:pPr algn="ctr"/>
-              <a:endParaRPr lang="en-US"/>
-            </a:p>
-          </p:txBody>
-        </p:sp>
-        <p:cxnSp>
-          <p:nvCxnSpPr>
-            <p:cNvPr id="25" name="Straight Arrow Connector 24"/>
-            <p:cNvCxnSpPr/>
-            <p:nvPr/>
-          </p:nvCxnSpPr>
-          <p:spPr>
-            <a:xfrm flipV="1">
-              <a:off x="3080426" y="251249"/>
-              <a:ext cx="0" cy="1032311"/>
-            </a:xfrm>
-            <a:prstGeom prst="straightConnector1">
-              <a:avLst/>
-            </a:prstGeom>
-            <a:ln>
-              <a:solidFill>
-                <a:schemeClr val="tx1"/>
-              </a:solidFill>
-              <a:tailEnd type="triangle"/>
-            </a:ln>
-          </p:spPr>
-          <p:style>
-            <a:lnRef idx="1">
-              <a:schemeClr val="accent1"/>
-            </a:lnRef>
-            <a:fillRef idx="0">
-              <a:schemeClr val="accent1"/>
-            </a:fillRef>
-            <a:effectRef idx="0">
-              <a:schemeClr val="accent1"/>
-            </a:effectRef>
-            <a:fontRef idx="minor">
-              <a:schemeClr val="tx1"/>
-            </a:fontRef>
-          </p:style>
-        </p:cxnSp>
-        <p:cxnSp>
-          <p:nvCxnSpPr>
-            <p:cNvPr id="26" name="Straight Arrow Connector 25"/>
-            <p:cNvCxnSpPr/>
-            <p:nvPr/>
-          </p:nvCxnSpPr>
-          <p:spPr>
-            <a:xfrm>
-              <a:off x="3080425" y="1572048"/>
-              <a:ext cx="1" cy="1026176"/>
-            </a:xfrm>
-            <a:prstGeom prst="straightConnector1">
-              <a:avLst/>
-            </a:prstGeom>
-            <a:ln>
-              <a:solidFill>
-                <a:schemeClr val="tx1"/>
-              </a:solidFill>
-              <a:tailEnd type="triangle"/>
-            </a:ln>
-          </p:spPr>
-          <p:style>
-            <a:lnRef idx="1">
-              <a:schemeClr val="accent1"/>
-            </a:lnRef>
-            <a:fillRef idx="0">
-              <a:schemeClr val="accent1"/>
-            </a:fillRef>
-            <a:effectRef idx="0">
-              <a:schemeClr val="accent1"/>
-            </a:effectRef>
-            <a:fontRef idx="minor">
-              <a:schemeClr val="tx1"/>
-            </a:fontRef>
-          </p:style>
-        </p:cxnSp>
-      </p:grpSp>
-      <p:sp>
-        <p:nvSpPr>
-          <p:cNvPr id="22" name="TextBox 21"/>
-          <p:cNvSpPr txBox="1"/>
-          <p:nvPr/>
-        </p:nvSpPr>
-        <p:spPr>
-          <a:xfrm rot="16200000">
-            <a:off x="2513082" y="1825405"/>
-            <a:ext cx="1314667" cy="369332"/>
-          </a:xfrm>
-          <a:prstGeom prst="rect">
-            <a:avLst/>
-          </a:prstGeom>
-          <a:noFill/>
-        </p:spPr>
-        <p:txBody>
-          <a:bodyPr wrap="square" rtlCol="0">
-            <a:spAutoFit/>
-          </a:bodyPr>
-          <a:lstStyle/>
-          <a:p>
-            <a:r>
-              <a:rPr lang="en-US" dirty="0" smtClean="0"/>
-              <a:t>Log-normal</a:t>
-            </a:r>
-            <a:endParaRPr lang="en-US" dirty="0"/>
-          </a:p>
-        </p:txBody>
-      </p:sp>
-      <p:sp>
-        <p:nvSpPr>
-          <p:cNvPr id="23" name="TextBox 22"/>
-          <p:cNvSpPr txBox="1"/>
-          <p:nvPr/>
-        </p:nvSpPr>
-        <p:spPr>
-          <a:xfrm rot="16200000">
-            <a:off x="2580255" y="577911"/>
-            <a:ext cx="1180320" cy="369332"/>
-          </a:xfrm>
-          <a:prstGeom prst="rect">
-            <a:avLst/>
-          </a:prstGeom>
-          <a:noFill/>
-        </p:spPr>
-        <p:txBody>
-          <a:bodyPr wrap="square" rtlCol="0">
-            <a:spAutoFit/>
-          </a:bodyPr>
-          <a:lstStyle/>
-          <a:p>
-            <a:r>
-              <a:rPr lang="en-US" dirty="0" smtClean="0"/>
-              <a:t>Log-series</a:t>
-            </a:r>
-            <a:endParaRPr lang="en-US" dirty="0"/>
-          </a:p>
-        </p:txBody>
-      </p:sp>
-    </p:spTree>
-    <p:extLst>
-      <p:ext uri="{BB962C8B-B14F-4D97-AF65-F5344CB8AC3E}">
-        <p14:creationId xmlns:p14="http://schemas.microsoft.com/office/powerpoint/2010/main" val="2102410935"/>
-      </p:ext>
-    </p:extLst>
-  </p:cSld>
-  <p:clrMapOvr>
-    <a:masterClrMapping/>
-  </p:clrMapOvr>
-</p:sld>
-</file>
-
-<file path=ppt/slides/slide7.xml><?xml version="1.0" encoding="utf-8"?>
-<p:sld xmlns:a="http://schemas.openxmlformats.org/drawingml/2006/main" xmlns:r="http://schemas.openxmlformats.org/officeDocument/2006/relationships" xmlns:p="http://schemas.openxmlformats.org/presentationml/2006/main">
-  <p:cSld>
-    <p:spTree>
-      <p:nvGrpSpPr>
-        <p:cNvPr id="1" name=""/>
-        <p:cNvGrpSpPr/>
-        <p:nvPr/>
-      </p:nvGrpSpPr>
-      <p:grpSpPr>
-        <a:xfrm>
-          <a:off x="0" y="0"/>
-          <a:ext cx="0" cy="0"/>
-          <a:chOff x="0" y="0"/>
-          <a:chExt cx="0" cy="0"/>
-        </a:xfrm>
-      </p:grpSpPr>
-      <p:pic>
-        <p:nvPicPr>
-          <p:cNvPr id="3" name="Picture 2"/>
-          <p:cNvPicPr>
-            <a:picLocks noChangeAspect="1"/>
-          </p:cNvPicPr>
-          <p:nvPr/>
-        </p:nvPicPr>
-        <p:blipFill rotWithShape="1">
-          <a:blip r:embed="rId2"/>
-          <a:srcRect t="49893"/>
-          <a:stretch/>
-        </p:blipFill>
-        <p:spPr>
-          <a:xfrm>
-            <a:off x="1368088" y="3520140"/>
-            <a:ext cx="8982543" cy="3337860"/>
-          </a:xfrm>
-          <a:prstGeom prst="rect">
-            <a:avLst/>
-          </a:prstGeom>
-        </p:spPr>
-      </p:pic>
-      <p:pic>
-        <p:nvPicPr>
-          <p:cNvPr id="4" name="Picture 3"/>
-          <p:cNvPicPr>
-            <a:picLocks noChangeAspect="1"/>
-          </p:cNvPicPr>
-          <p:nvPr/>
-        </p:nvPicPr>
-        <p:blipFill rotWithShape="1">
-          <a:blip r:embed="rId2"/>
-          <a:srcRect b="49832"/>
-          <a:stretch/>
-        </p:blipFill>
-        <p:spPr>
-          <a:xfrm>
-            <a:off x="1368088" y="0"/>
-            <a:ext cx="8982543" cy="3341862"/>
-          </a:xfrm>
-          <a:prstGeom prst="rect">
-            <a:avLst/>
-          </a:prstGeom>
-        </p:spPr>
-      </p:pic>
-    </p:spTree>
-    <p:extLst>
-      <p:ext uri="{BB962C8B-B14F-4D97-AF65-F5344CB8AC3E}">
-        <p14:creationId xmlns:p14="http://schemas.microsoft.com/office/powerpoint/2010/main" val="2794112897"/>
-      </p:ext>
-    </p:extLst>
-  </p:cSld>
-  <p:clrMapOvr>
-    <a:masterClrMapping/>
-  </p:clrMapOvr>
-</p:sld>
-</file>
-
-<file path=ppt/slides/slide8.xml><?xml version="1.0" encoding="utf-8"?>
-<p:sld xmlns:a="http://schemas.openxmlformats.org/drawingml/2006/main" xmlns:r="http://schemas.openxmlformats.org/officeDocument/2006/relationships" xmlns:p="http://schemas.openxmlformats.org/presentationml/2006/main">
-  <p:cSld>
-    <p:spTree>
-      <p:nvGrpSpPr>
-        <p:cNvPr id="1" name=""/>
-        <p:cNvGrpSpPr/>
-        <p:nvPr/>
-      </p:nvGrpSpPr>
-      <p:grpSpPr>
-        <a:xfrm>
-          <a:off x="0" y="0"/>
-          <a:ext cx="0" cy="0"/>
-          <a:chOff x="0" y="0"/>
-          <a:chExt cx="0" cy="0"/>
-        </a:xfrm>
-      </p:grpSpPr>
       <p:grpSp>
         <p:nvGrpSpPr>
           <p:cNvPr id="5" name="Group 4"/>
@@ -16773,7 +15917,7 @@
 </p:sld>
 </file>
 
-<file path=ppt/slides/slide9.xml><?xml version="1.0" encoding="utf-8"?>
+<file path=ppt/slides/slide7.xml><?xml version="1.0" encoding="utf-8"?>
 <p:sld xmlns:a="http://schemas.openxmlformats.org/drawingml/2006/main" xmlns:r="http://schemas.openxmlformats.org/officeDocument/2006/relationships" xmlns:p="http://schemas.openxmlformats.org/presentationml/2006/main">
   <p:cSld>
     <p:spTree>
@@ -16824,21 +15968,21 @@
       </p:sp>
       <p:grpSp>
         <p:nvGrpSpPr>
-          <p:cNvPr id="5" name="Group 4"/>
+          <p:cNvPr id="8" name="Group 7"/>
           <p:cNvGrpSpPr/>
           <p:nvPr/>
         </p:nvGrpSpPr>
         <p:grpSpPr>
           <a:xfrm>
-            <a:off x="1420700" y="-1"/>
-            <a:ext cx="8505725" cy="6882387"/>
-            <a:chOff x="1420700" y="-1"/>
-            <a:chExt cx="8505725" cy="6882387"/>
+            <a:off x="1439636" y="0"/>
+            <a:ext cx="8439620" cy="6882386"/>
+            <a:chOff x="1439636" y="0"/>
+            <a:chExt cx="8439620" cy="6882386"/>
           </a:xfrm>
         </p:grpSpPr>
         <p:pic>
           <p:nvPicPr>
-            <p:cNvPr id="2" name="Picture 1"/>
+            <p:cNvPr id="7" name="Picture 6"/>
             <p:cNvPicPr>
               <a:picLocks noChangeAspect="1"/>
             </p:cNvPicPr>
@@ -16852,8 +15996,8 @@
           </p:blipFill>
           <p:spPr>
             <a:xfrm>
-              <a:off x="1420700" y="-1"/>
-              <a:ext cx="8505725" cy="6654247"/>
+              <a:off x="1439636" y="0"/>
+              <a:ext cx="8439620" cy="6657046"/>
             </a:xfrm>
             <a:prstGeom prst="rect">
               <a:avLst/>
@@ -16913,6 +16057,393 @@
     <p:extLst>
       <p:ext uri="{BB962C8B-B14F-4D97-AF65-F5344CB8AC3E}">
         <p14:creationId xmlns:p14="http://schemas.microsoft.com/office/powerpoint/2010/main" val="705413285"/>
+      </p:ext>
+    </p:extLst>
+  </p:cSld>
+  <p:clrMapOvr>
+    <a:masterClrMapping/>
+  </p:clrMapOvr>
+</p:sld>
+</file>
+
+<file path=ppt/slides/slide8.xml><?xml version="1.0" encoding="utf-8"?>
+<p:sld xmlns:a="http://schemas.openxmlformats.org/drawingml/2006/main" xmlns:r="http://schemas.openxmlformats.org/officeDocument/2006/relationships" xmlns:p="http://schemas.openxmlformats.org/presentationml/2006/main">
+  <p:cSld>
+    <p:spTree>
+      <p:nvGrpSpPr>
+        <p:cNvPr id="1" name=""/>
+        <p:cNvGrpSpPr/>
+        <p:nvPr/>
+      </p:nvGrpSpPr>
+      <p:grpSpPr>
+        <a:xfrm>
+          <a:off x="0" y="0"/>
+          <a:ext cx="0" cy="0"/>
+          <a:chOff x="0" y="0"/>
+          <a:chExt cx="0" cy="0"/>
+        </a:xfrm>
+      </p:grpSpPr>
+      <p:sp>
+        <p:nvSpPr>
+          <p:cNvPr id="2" name="Title 1"/>
+          <p:cNvSpPr>
+            <a:spLocks noGrp="1"/>
+          </p:cNvSpPr>
+          <p:nvPr>
+            <p:ph type="title"/>
+          </p:nvPr>
+        </p:nvSpPr>
+        <p:spPr>
+          <a:xfrm>
+            <a:off x="0" y="0"/>
+            <a:ext cx="2502529" cy="1325563"/>
+          </a:xfrm>
+        </p:spPr>
+        <p:txBody>
+          <a:bodyPr/>
+          <a:lstStyle/>
+          <a:p>
+            <a:r>
+              <a:rPr lang="en-US" dirty="0" err="1" smtClean="0"/>
+              <a:t>Supp</a:t>
+            </a:r>
+            <a:r>
+              <a:rPr lang="en-US" dirty="0" smtClean="0"/>
+              <a:t> 25</a:t>
+            </a:r>
+            <a:endParaRPr lang="en-US" dirty="0"/>
+          </a:p>
+        </p:txBody>
+      </p:sp>
+      <p:grpSp>
+        <p:nvGrpSpPr>
+          <p:cNvPr id="4" name="Group 3"/>
+          <p:cNvGrpSpPr/>
+          <p:nvPr/>
+        </p:nvGrpSpPr>
+        <p:grpSpPr>
+          <a:xfrm>
+            <a:off x="2018922" y="-63374"/>
+            <a:ext cx="8637007" cy="6970146"/>
+            <a:chOff x="2018922" y="-63374"/>
+            <a:chExt cx="8637007" cy="6970146"/>
+          </a:xfrm>
+        </p:grpSpPr>
+        <p:pic>
+          <p:nvPicPr>
+            <p:cNvPr id="3" name="Picture 2"/>
+            <p:cNvPicPr>
+              <a:picLocks noChangeAspect="1"/>
+            </p:cNvPicPr>
+            <p:nvPr/>
+          </p:nvPicPr>
+          <p:blipFill>
+            <a:blip r:embed="rId2"/>
+            <a:stretch>
+              <a:fillRect/>
+            </a:stretch>
+          </p:blipFill>
+          <p:spPr>
+            <a:xfrm>
+              <a:off x="2018922" y="-63374"/>
+              <a:ext cx="8637007" cy="6809028"/>
+            </a:xfrm>
+            <a:prstGeom prst="rect">
+              <a:avLst/>
+            </a:prstGeom>
+          </p:spPr>
+        </p:pic>
+        <p:pic>
+          <p:nvPicPr>
+            <p:cNvPr id="11" name="Picture 10"/>
+            <p:cNvPicPr>
+              <a:picLocks noChangeAspect="1"/>
+            </p:cNvPicPr>
+            <p:nvPr/>
+          </p:nvPicPr>
+          <p:blipFill>
+            <a:blip r:embed="rId3"/>
+            <a:stretch>
+              <a:fillRect/>
+            </a:stretch>
+          </p:blipFill>
+          <p:spPr>
+            <a:xfrm>
+              <a:off x="2831575" y="6516594"/>
+              <a:ext cx="3286029" cy="341406"/>
+            </a:xfrm>
+            <a:prstGeom prst="rect">
+              <a:avLst/>
+            </a:prstGeom>
+          </p:spPr>
+        </p:pic>
+        <p:pic>
+          <p:nvPicPr>
+            <p:cNvPr id="12" name="Picture 11"/>
+            <p:cNvPicPr>
+              <a:picLocks noChangeAspect="1"/>
+            </p:cNvPicPr>
+            <p:nvPr/>
+          </p:nvPicPr>
+          <p:blipFill>
+            <a:blip r:embed="rId4"/>
+            <a:stretch>
+              <a:fillRect/>
+            </a:stretch>
+          </p:blipFill>
+          <p:spPr>
+            <a:xfrm>
+              <a:off x="7444132" y="6516594"/>
+              <a:ext cx="2883658" cy="390178"/>
+            </a:xfrm>
+            <a:prstGeom prst="rect">
+              <a:avLst/>
+            </a:prstGeom>
+          </p:spPr>
+        </p:pic>
+      </p:grpSp>
+    </p:spTree>
+    <p:extLst>
+      <p:ext uri="{BB962C8B-B14F-4D97-AF65-F5344CB8AC3E}">
+        <p14:creationId xmlns:p14="http://schemas.microsoft.com/office/powerpoint/2010/main" val="3312420801"/>
+      </p:ext>
+    </p:extLst>
+  </p:cSld>
+  <p:clrMapOvr>
+    <a:masterClrMapping/>
+  </p:clrMapOvr>
+</p:sld>
+</file>
+
+<file path=ppt/slides/slide9.xml><?xml version="1.0" encoding="utf-8"?>
+<p:sld xmlns:a="http://schemas.openxmlformats.org/drawingml/2006/main" xmlns:r="http://schemas.openxmlformats.org/officeDocument/2006/relationships" xmlns:p="http://schemas.openxmlformats.org/presentationml/2006/main">
+  <p:cSld>
+    <p:spTree>
+      <p:nvGrpSpPr>
+        <p:cNvPr id="1" name=""/>
+        <p:cNvGrpSpPr/>
+        <p:nvPr/>
+      </p:nvGrpSpPr>
+      <p:grpSpPr>
+        <a:xfrm>
+          <a:off x="0" y="0"/>
+          <a:ext cx="0" cy="0"/>
+          <a:chOff x="0" y="0"/>
+          <a:chExt cx="0" cy="0"/>
+        </a:xfrm>
+      </p:grpSpPr>
+      <p:grpSp>
+        <p:nvGrpSpPr>
+          <p:cNvPr id="11" name="Group 10"/>
+          <p:cNvGrpSpPr/>
+          <p:nvPr/>
+        </p:nvGrpSpPr>
+        <p:grpSpPr>
+          <a:xfrm>
+            <a:off x="1253441" y="0"/>
+            <a:ext cx="9224921" cy="6858000"/>
+            <a:chOff x="1253441" y="0"/>
+            <a:chExt cx="9224921" cy="6858000"/>
+          </a:xfrm>
+        </p:grpSpPr>
+        <p:pic>
+          <p:nvPicPr>
+            <p:cNvPr id="10" name="Picture 9"/>
+            <p:cNvPicPr>
+              <a:picLocks noChangeAspect="1"/>
+            </p:cNvPicPr>
+            <p:nvPr/>
+          </p:nvPicPr>
+          <p:blipFill>
+            <a:blip r:embed="rId2"/>
+            <a:stretch>
+              <a:fillRect/>
+            </a:stretch>
+          </p:blipFill>
+          <p:spPr>
+            <a:xfrm>
+              <a:off x="1253441" y="0"/>
+              <a:ext cx="9224921" cy="6858000"/>
+            </a:xfrm>
+            <a:prstGeom prst="rect">
+              <a:avLst/>
+            </a:prstGeom>
+          </p:spPr>
+        </p:pic>
+        <p:grpSp>
+          <p:nvGrpSpPr>
+            <p:cNvPr id="2" name="Group 1"/>
+            <p:cNvGrpSpPr/>
+            <p:nvPr/>
+          </p:nvGrpSpPr>
+          <p:grpSpPr>
+            <a:xfrm>
+              <a:off x="2193215" y="0"/>
+              <a:ext cx="8285147" cy="6131578"/>
+              <a:chOff x="2193215" y="0"/>
+              <a:chExt cx="8285147" cy="6131578"/>
+            </a:xfrm>
+          </p:grpSpPr>
+          <p:pic>
+            <p:nvPicPr>
+              <p:cNvPr id="6" name="Picture 5"/>
+              <p:cNvPicPr>
+                <a:picLocks noChangeAspect="1"/>
+              </p:cNvPicPr>
+              <p:nvPr/>
+            </p:nvPicPr>
+            <p:blipFill>
+              <a:blip r:embed="rId3"/>
+              <a:stretch>
+                <a:fillRect/>
+              </a:stretch>
+            </p:blipFill>
+            <p:spPr>
+              <a:xfrm>
+                <a:off x="8027558" y="0"/>
+                <a:ext cx="2450804" cy="823031"/>
+              </a:xfrm>
+              <a:prstGeom prst="rect">
+                <a:avLst/>
+              </a:prstGeom>
+            </p:spPr>
+          </p:pic>
+          <p:pic>
+            <p:nvPicPr>
+              <p:cNvPr id="7" name="Picture 6"/>
+              <p:cNvPicPr>
+                <a:picLocks noChangeAspect="1"/>
+              </p:cNvPicPr>
+              <p:nvPr/>
+            </p:nvPicPr>
+            <p:blipFill>
+              <a:blip r:embed="rId4"/>
+              <a:stretch>
+                <a:fillRect/>
+              </a:stretch>
+            </p:blipFill>
+            <p:spPr>
+              <a:xfrm>
+                <a:off x="8971626" y="4619134"/>
+                <a:ext cx="1506736" cy="1512444"/>
+              </a:xfrm>
+              <a:prstGeom prst="rect">
+                <a:avLst/>
+              </a:prstGeom>
+            </p:spPr>
+          </p:pic>
+          <p:sp>
+            <p:nvSpPr>
+              <p:cNvPr id="8" name="TextBox 7"/>
+              <p:cNvSpPr txBox="1"/>
+              <p:nvPr/>
+            </p:nvSpPr>
+            <p:spPr>
+              <a:xfrm>
+                <a:off x="2193215" y="2537382"/>
+                <a:ext cx="1324900" cy="707886"/>
+              </a:xfrm>
+              <a:prstGeom prst="rect">
+                <a:avLst/>
+              </a:prstGeom>
+              <a:noFill/>
+            </p:spPr>
+            <p:txBody>
+              <a:bodyPr wrap="square" rtlCol="0">
+                <a:spAutoFit/>
+              </a:bodyPr>
+              <a:lstStyle/>
+              <a:p>
+                <a:r>
+                  <a:rPr lang="en-US" sz="2000" dirty="0"/>
+                  <a:t>l</a:t>
+                </a:r>
+                <a:r>
+                  <a:rPr lang="en-US" sz="2000" dirty="0" smtClean="0"/>
+                  <a:t>ognormal</a:t>
+                </a:r>
+              </a:p>
+              <a:p>
+                <a:endParaRPr lang="en-US" sz="2000" dirty="0"/>
+              </a:p>
+            </p:txBody>
+          </p:sp>
+          <p:sp>
+            <p:nvSpPr>
+              <p:cNvPr id="9" name="TextBox 8"/>
+              <p:cNvSpPr txBox="1"/>
+              <p:nvPr/>
+            </p:nvSpPr>
+            <p:spPr>
+              <a:xfrm>
+                <a:off x="4478498" y="2537382"/>
+                <a:ext cx="1324900" cy="707886"/>
+              </a:xfrm>
+              <a:prstGeom prst="rect">
+                <a:avLst/>
+              </a:prstGeom>
+              <a:noFill/>
+            </p:spPr>
+            <p:txBody>
+              <a:bodyPr wrap="square" rtlCol="0">
+                <a:spAutoFit/>
+              </a:bodyPr>
+              <a:lstStyle/>
+              <a:p>
+                <a:r>
+                  <a:rPr lang="en-US" sz="2000" dirty="0" err="1" smtClean="0"/>
+                  <a:t>logseries</a:t>
+                </a:r>
+                <a:endParaRPr lang="en-US" sz="2000" dirty="0" smtClean="0"/>
+              </a:p>
+              <a:p>
+                <a:endParaRPr lang="en-US" sz="2000" dirty="0"/>
+              </a:p>
+            </p:txBody>
+          </p:sp>
+          <p:cxnSp>
+            <p:nvCxnSpPr>
+              <p:cNvPr id="4" name="Straight Arrow Connector 3"/>
+              <p:cNvCxnSpPr/>
+              <p:nvPr/>
+            </p:nvCxnSpPr>
+            <p:spPr>
+              <a:xfrm>
+                <a:off x="3471620" y="2735451"/>
+                <a:ext cx="906650" cy="0"/>
+              </a:xfrm>
+              <a:prstGeom prst="straightConnector1">
+                <a:avLst/>
+              </a:prstGeom>
+              <a:ln w="28575">
+                <a:solidFill>
+                  <a:schemeClr val="tx1"/>
+                </a:solidFill>
+                <a:headEnd type="arrow" w="med" len="med"/>
+                <a:tailEnd type="arrow" w="med" len="med"/>
+              </a:ln>
+            </p:spPr>
+            <p:style>
+              <a:lnRef idx="1">
+                <a:schemeClr val="accent1"/>
+              </a:lnRef>
+              <a:fillRef idx="0">
+                <a:schemeClr val="accent1"/>
+              </a:fillRef>
+              <a:effectRef idx="0">
+                <a:schemeClr val="accent1"/>
+              </a:effectRef>
+              <a:fontRef idx="minor">
+                <a:schemeClr val="tx1"/>
+              </a:fontRef>
+            </p:style>
+          </p:cxnSp>
+        </p:grpSp>
+      </p:grpSp>
+    </p:spTree>
+    <p:extLst>
+      <p:ext uri="{BB962C8B-B14F-4D97-AF65-F5344CB8AC3E}">
+        <p14:creationId xmlns:p14="http://schemas.microsoft.com/office/powerpoint/2010/main" val="3378026183"/>
       </p:ext>
     </p:extLst>
   </p:cSld>

</xml_diff>

<commit_message>
fixed bray curtis calcs
</commit_message>
<xml_diff>
--- a/output/plots/all_figs_with_legends.pptx
+++ b/output/plots/all_figs_with_legends.pptx
@@ -6339,21 +6339,21 @@
       </p:grpSpPr>
       <p:grpSp>
         <p:nvGrpSpPr>
-          <p:cNvPr id="8" name="Group 7"/>
+          <p:cNvPr id="3" name="Group 2"/>
           <p:cNvGrpSpPr/>
           <p:nvPr/>
         </p:nvGrpSpPr>
         <p:grpSpPr>
           <a:xfrm>
-            <a:off x="1516777" y="255016"/>
-            <a:ext cx="8390683" cy="5611394"/>
-            <a:chOff x="1516777" y="255016"/>
-            <a:chExt cx="8390683" cy="5611394"/>
+            <a:off x="941559" y="0"/>
+            <a:ext cx="10141982" cy="6826313"/>
+            <a:chOff x="941559" y="0"/>
+            <a:chExt cx="10141982" cy="6826313"/>
           </a:xfrm>
         </p:grpSpPr>
         <p:pic>
           <p:nvPicPr>
-            <p:cNvPr id="4" name="Picture 3"/>
+            <p:cNvPr id="2" name="Picture 1"/>
             <p:cNvPicPr>
               <a:picLocks noChangeAspect="1"/>
             </p:cNvPicPr>
@@ -6361,13 +6361,13 @@
           </p:nvPicPr>
           <p:blipFill rotWithShape="1">
             <a:blip r:embed="rId2"/>
-            <a:srcRect l="58"/>
+            <a:srcRect b="462"/>
             <a:stretch/>
           </p:blipFill>
           <p:spPr>
             <a:xfrm>
-              <a:off x="1516777" y="255016"/>
-              <a:ext cx="8390683" cy="5611394"/>
+              <a:off x="941559" y="0"/>
+              <a:ext cx="10141982" cy="6826313"/>
             </a:xfrm>
             <a:prstGeom prst="rect">
               <a:avLst/>
@@ -6390,7 +6390,7 @@
           </p:blipFill>
           <p:spPr>
             <a:xfrm>
-              <a:off x="8400724" y="2120377"/>
+              <a:off x="9576805" y="2473462"/>
               <a:ext cx="1506736" cy="1512444"/>
             </a:xfrm>
             <a:prstGeom prst="rect">

</xml_diff>

<commit_message>
removed percent cover dataset
</commit_message>
<xml_diff>
--- a/output/plots/all_figs_with_legends.pptx
+++ b/output/plots/all_figs_with_legends.pptx
@@ -6339,35 +6339,36 @@
       </p:grpSpPr>
       <p:grpSp>
         <p:nvGrpSpPr>
-          <p:cNvPr id="3" name="Group 2"/>
+          <p:cNvPr id="5" name="Group 4"/>
           <p:cNvGrpSpPr/>
           <p:nvPr/>
         </p:nvGrpSpPr>
         <p:grpSpPr>
           <a:xfrm>
-            <a:off x="941559" y="0"/>
-            <a:ext cx="10141982" cy="6826313"/>
-            <a:chOff x="941559" y="0"/>
-            <a:chExt cx="10141982" cy="6826313"/>
+            <a:off x="1014419" y="0"/>
+            <a:ext cx="10069122" cy="6742450"/>
+            <a:chOff x="1014419" y="0"/>
+            <a:chExt cx="10069122" cy="6742450"/>
           </a:xfrm>
         </p:grpSpPr>
         <p:pic>
           <p:nvPicPr>
-            <p:cNvPr id="2" name="Picture 1"/>
+            <p:cNvPr id="4" name="Picture 3"/>
             <p:cNvPicPr>
               <a:picLocks noChangeAspect="1"/>
             </p:cNvPicPr>
             <p:nvPr/>
           </p:nvPicPr>
-          <p:blipFill rotWithShape="1">
+          <p:blipFill>
             <a:blip r:embed="rId2"/>
-            <a:srcRect b="462"/>
-            <a:stretch/>
+            <a:stretch>
+              <a:fillRect/>
+            </a:stretch>
           </p:blipFill>
           <p:spPr>
             <a:xfrm>
-              <a:off x="941559" y="0"/>
-              <a:ext cx="10141982" cy="6826313"/>
+              <a:off x="1014419" y="0"/>
+              <a:ext cx="10069122" cy="6742450"/>
             </a:xfrm>
             <a:prstGeom prst="rect">
               <a:avLst/>
@@ -6390,7 +6391,7 @@
           </p:blipFill>
           <p:spPr>
             <a:xfrm>
-              <a:off x="9576805" y="2473462"/>
+              <a:off x="9576805" y="2310500"/>
               <a:ext cx="1506736" cy="1512444"/>
             </a:xfrm>
             <a:prstGeom prst="rect">
@@ -15968,21 +15969,21 @@
       </p:sp>
       <p:grpSp>
         <p:nvGrpSpPr>
-          <p:cNvPr id="8" name="Group 7"/>
+          <p:cNvPr id="5" name="Group 4"/>
           <p:cNvGrpSpPr/>
           <p:nvPr/>
         </p:nvGrpSpPr>
         <p:grpSpPr>
           <a:xfrm>
-            <a:off x="1439636" y="0"/>
-            <a:ext cx="8439620" cy="6882386"/>
-            <a:chOff x="1439636" y="0"/>
-            <a:chExt cx="8439620" cy="6882386"/>
+            <a:off x="1403286" y="0"/>
+            <a:ext cx="8537418" cy="6882386"/>
+            <a:chOff x="1403286" y="0"/>
+            <a:chExt cx="8537418" cy="6882386"/>
           </a:xfrm>
         </p:grpSpPr>
         <p:pic>
           <p:nvPicPr>
-            <p:cNvPr id="7" name="Picture 6"/>
+            <p:cNvPr id="2" name="Picture 1"/>
             <p:cNvPicPr>
               <a:picLocks noChangeAspect="1"/>
             </p:cNvPicPr>
@@ -15996,8 +15997,8 @@
           </p:blipFill>
           <p:spPr>
             <a:xfrm>
-              <a:off x="1439636" y="0"/>
-              <a:ext cx="8439620" cy="6657046"/>
+              <a:off x="1403286" y="0"/>
+              <a:ext cx="8537418" cy="6690419"/>
             </a:xfrm>
             <a:prstGeom prst="rect">
               <a:avLst/>
@@ -16117,21 +16118,21 @@
       </p:sp>
       <p:grpSp>
         <p:nvGrpSpPr>
-          <p:cNvPr id="4" name="Group 3"/>
+          <p:cNvPr id="7" name="Group 6"/>
           <p:cNvGrpSpPr/>
           <p:nvPr/>
         </p:nvGrpSpPr>
         <p:grpSpPr>
           <a:xfrm>
-            <a:off x="2018922" y="-63374"/>
-            <a:ext cx="8637007" cy="6970146"/>
-            <a:chOff x="2018922" y="-63374"/>
-            <a:chExt cx="8637007" cy="6970146"/>
+            <a:off x="2018923" y="14893"/>
+            <a:ext cx="8577676" cy="6891879"/>
+            <a:chOff x="2018923" y="14893"/>
+            <a:chExt cx="8577676" cy="6891879"/>
           </a:xfrm>
         </p:grpSpPr>
         <p:pic>
           <p:nvPicPr>
-            <p:cNvPr id="3" name="Picture 2"/>
+            <p:cNvPr id="5" name="Picture 4"/>
             <p:cNvPicPr>
               <a:picLocks noChangeAspect="1"/>
             </p:cNvPicPr>
@@ -16145,62 +16146,77 @@
           </p:blipFill>
           <p:spPr>
             <a:xfrm>
-              <a:off x="2018922" y="-63374"/>
-              <a:ext cx="8637007" cy="6809028"/>
+              <a:off x="2018923" y="14893"/>
+              <a:ext cx="8577676" cy="6672404"/>
             </a:xfrm>
             <a:prstGeom prst="rect">
               <a:avLst/>
             </a:prstGeom>
           </p:spPr>
         </p:pic>
-        <p:pic>
-          <p:nvPicPr>
-            <p:cNvPr id="11" name="Picture 10"/>
-            <p:cNvPicPr>
-              <a:picLocks noChangeAspect="1"/>
-            </p:cNvPicPr>
+        <p:grpSp>
+          <p:nvGrpSpPr>
+            <p:cNvPr id="6" name="Group 5"/>
+            <p:cNvGrpSpPr/>
             <p:nvPr/>
-          </p:nvPicPr>
-          <p:blipFill>
-            <a:blip r:embed="rId3"/>
-            <a:stretch>
-              <a:fillRect/>
-            </a:stretch>
-          </p:blipFill>
-          <p:spPr>
+          </p:nvGrpSpPr>
+          <p:grpSpPr>
             <a:xfrm>
               <a:off x="2831575" y="6516594"/>
-              <a:ext cx="3286029" cy="341406"/>
+              <a:ext cx="7496215" cy="390178"/>
+              <a:chOff x="2831575" y="6516594"/>
+              <a:chExt cx="7496215" cy="390178"/>
             </a:xfrm>
-            <a:prstGeom prst="rect">
-              <a:avLst/>
-            </a:prstGeom>
-          </p:spPr>
-        </p:pic>
-        <p:pic>
-          <p:nvPicPr>
-            <p:cNvPr id="12" name="Picture 11"/>
-            <p:cNvPicPr>
-              <a:picLocks noChangeAspect="1"/>
-            </p:cNvPicPr>
-            <p:nvPr/>
-          </p:nvPicPr>
-          <p:blipFill>
-            <a:blip r:embed="rId4"/>
-            <a:stretch>
-              <a:fillRect/>
-            </a:stretch>
-          </p:blipFill>
-          <p:spPr>
-            <a:xfrm>
-              <a:off x="7444132" y="6516594"/>
-              <a:ext cx="2883658" cy="390178"/>
-            </a:xfrm>
-            <a:prstGeom prst="rect">
-              <a:avLst/>
-            </a:prstGeom>
-          </p:spPr>
-        </p:pic>
+          </p:grpSpPr>
+          <p:pic>
+            <p:nvPicPr>
+              <p:cNvPr id="11" name="Picture 10"/>
+              <p:cNvPicPr>
+                <a:picLocks noChangeAspect="1"/>
+              </p:cNvPicPr>
+              <p:nvPr/>
+            </p:nvPicPr>
+            <p:blipFill>
+              <a:blip r:embed="rId3"/>
+              <a:stretch>
+                <a:fillRect/>
+              </a:stretch>
+            </p:blipFill>
+            <p:spPr>
+              <a:xfrm>
+                <a:off x="2831575" y="6516594"/>
+                <a:ext cx="3286029" cy="341406"/>
+              </a:xfrm>
+              <a:prstGeom prst="rect">
+                <a:avLst/>
+              </a:prstGeom>
+            </p:spPr>
+          </p:pic>
+          <p:pic>
+            <p:nvPicPr>
+              <p:cNvPr id="12" name="Picture 11"/>
+              <p:cNvPicPr>
+                <a:picLocks noChangeAspect="1"/>
+              </p:cNvPicPr>
+              <p:nvPr/>
+            </p:nvPicPr>
+            <p:blipFill>
+              <a:blip r:embed="rId4"/>
+              <a:stretch>
+                <a:fillRect/>
+              </a:stretch>
+            </p:blipFill>
+            <p:spPr>
+              <a:xfrm>
+                <a:off x="7444132" y="6516594"/>
+                <a:ext cx="2883658" cy="390178"/>
+              </a:xfrm>
+              <a:prstGeom prst="rect">
+                <a:avLst/>
+              </a:prstGeom>
+            </p:spPr>
+          </p:pic>
+        </p:grpSp>
       </p:grpSp>
     </p:spTree>
     <p:extLst>

</xml_diff>

<commit_message>
fixed pseudo r2 calcs
</commit_message>
<xml_diff>
--- a/output/plots/all_figs_with_legends.pptx
+++ b/output/plots/all_figs_with_legends.pptx
@@ -15239,209 +15239,338 @@
       </p:sp>
       <p:grpSp>
         <p:nvGrpSpPr>
-          <p:cNvPr id="8" name="Group 7"/>
+          <p:cNvPr id="10" name="Group 9"/>
           <p:cNvGrpSpPr/>
           <p:nvPr/>
         </p:nvGrpSpPr>
         <p:grpSpPr>
           <a:xfrm>
             <a:off x="1258430" y="267286"/>
-            <a:ext cx="8355569" cy="5845051"/>
+            <a:ext cx="8824210" cy="5845051"/>
             <a:chOff x="1258430" y="267286"/>
-            <a:chExt cx="8355569" cy="5845051"/>
+            <a:chExt cx="8824210" cy="5845051"/>
           </a:xfrm>
         </p:grpSpPr>
-        <p:pic>
-          <p:nvPicPr>
-            <p:cNvPr id="2" name="Picture 1"/>
-            <p:cNvPicPr>
-              <a:picLocks noChangeAspect="1"/>
-            </p:cNvPicPr>
-            <p:nvPr/>
-          </p:nvPicPr>
-          <p:blipFill>
-            <a:blip r:embed="rId2"/>
-            <a:stretch>
-              <a:fillRect/>
-            </a:stretch>
-          </p:blipFill>
-          <p:spPr>
-            <a:xfrm>
-              <a:off x="1258430" y="267286"/>
-              <a:ext cx="8355569" cy="5632077"/>
-            </a:xfrm>
-            <a:prstGeom prst="rect">
-              <a:avLst/>
-            </a:prstGeom>
-          </p:spPr>
-        </p:pic>
         <p:grpSp>
           <p:nvGrpSpPr>
-            <p:cNvPr id="3" name="Group 2"/>
+            <p:cNvPr id="8" name="Group 7"/>
             <p:cNvGrpSpPr/>
             <p:nvPr/>
           </p:nvGrpSpPr>
           <p:grpSpPr>
             <a:xfrm>
-              <a:off x="1943471" y="5704158"/>
-              <a:ext cx="7356971" cy="408179"/>
-              <a:chOff x="1889150" y="5764796"/>
-              <a:chExt cx="7356971" cy="408179"/>
+              <a:off x="1258430" y="267286"/>
+              <a:ext cx="8355569" cy="5845051"/>
+              <a:chOff x="1258430" y="267286"/>
+              <a:chExt cx="8355569" cy="5845051"/>
             </a:xfrm>
           </p:grpSpPr>
+          <p:pic>
+            <p:nvPicPr>
+              <p:cNvPr id="2" name="Picture 1"/>
+              <p:cNvPicPr>
+                <a:picLocks noChangeAspect="1"/>
+              </p:cNvPicPr>
+              <p:nvPr/>
+            </p:nvPicPr>
+            <p:blipFill>
+              <a:blip r:embed="rId2"/>
+              <a:stretch>
+                <a:fillRect/>
+              </a:stretch>
+            </p:blipFill>
+            <p:spPr>
+              <a:xfrm>
+                <a:off x="1258430" y="267286"/>
+                <a:ext cx="8355569" cy="5632077"/>
+              </a:xfrm>
+              <a:prstGeom prst="rect">
+                <a:avLst/>
+              </a:prstGeom>
+            </p:spPr>
+          </p:pic>
           <p:grpSp>
             <p:nvGrpSpPr>
-              <p:cNvPr id="16" name="Group 15"/>
+              <p:cNvPr id="3" name="Group 2"/>
               <p:cNvGrpSpPr/>
               <p:nvPr/>
             </p:nvGrpSpPr>
             <p:grpSpPr>
               <a:xfrm>
-                <a:off x="6307961" y="5764796"/>
-                <a:ext cx="2938160" cy="408179"/>
-                <a:chOff x="1865792" y="1648679"/>
-                <a:chExt cx="3518872" cy="449760"/>
-              </a:xfrm>
-            </p:grpSpPr>
-            <p:pic>
-              <p:nvPicPr>
-                <p:cNvPr id="17" name="Picture 16"/>
-                <p:cNvPicPr>
-                  <a:picLocks noChangeAspect="1"/>
-                </p:cNvPicPr>
-                <p:nvPr/>
-              </p:nvPicPr>
-              <p:blipFill>
-                <a:blip r:embed="rId3"/>
-                <a:stretch>
-                  <a:fillRect/>
-                </a:stretch>
-              </p:blipFill>
-              <p:spPr>
-                <a:xfrm>
-                  <a:off x="1865792" y="1648679"/>
-                  <a:ext cx="655912" cy="396304"/>
-                </a:xfrm>
-                <a:prstGeom prst="rect">
-                  <a:avLst/>
-                </a:prstGeom>
-              </p:spPr>
-            </p:pic>
-            <p:pic>
-              <p:nvPicPr>
-                <p:cNvPr id="18" name="Picture 17"/>
-                <p:cNvPicPr>
-                  <a:picLocks noChangeAspect="1"/>
-                </p:cNvPicPr>
-                <p:nvPr/>
-              </p:nvPicPr>
-              <p:blipFill>
-                <a:blip r:embed="rId4"/>
-                <a:stretch>
-                  <a:fillRect/>
-                </a:stretch>
-              </p:blipFill>
-              <p:spPr>
-                <a:xfrm>
-                  <a:off x="4656186" y="1749204"/>
-                  <a:ext cx="728478" cy="293882"/>
-                </a:xfrm>
-                <a:prstGeom prst="rect">
-                  <a:avLst/>
-                </a:prstGeom>
-              </p:spPr>
-            </p:pic>
-            <p:pic>
-              <p:nvPicPr>
-                <p:cNvPr id="20" name="Picture 19"/>
-                <p:cNvPicPr>
-                  <a:picLocks noChangeAspect="1"/>
-                </p:cNvPicPr>
-                <p:nvPr/>
-              </p:nvPicPr>
-              <p:blipFill>
-                <a:blip r:embed="rId5"/>
-                <a:stretch>
-                  <a:fillRect/>
-                </a:stretch>
-              </p:blipFill>
-              <p:spPr>
-                <a:xfrm>
-                  <a:off x="3232947" y="1689497"/>
-                  <a:ext cx="640805" cy="408942"/>
-                </a:xfrm>
-                <a:prstGeom prst="rect">
-                  <a:avLst/>
-                </a:prstGeom>
-              </p:spPr>
-            </p:pic>
-          </p:grpSp>
-          <p:grpSp>
-            <p:nvGrpSpPr>
-              <p:cNvPr id="7" name="Group 6"/>
-              <p:cNvGrpSpPr/>
-              <p:nvPr/>
-            </p:nvGrpSpPr>
-            <p:grpSpPr>
-              <a:xfrm>
-                <a:off x="1889150" y="5779295"/>
-                <a:ext cx="3287191" cy="343444"/>
-                <a:chOff x="1415503" y="5589412"/>
-                <a:chExt cx="3287191" cy="343444"/>
+                <a:off x="1943471" y="5704158"/>
+                <a:ext cx="7356971" cy="408179"/>
+                <a:chOff x="1889150" y="5764796"/>
+                <a:chExt cx="7356971" cy="408179"/>
               </a:xfrm>
             </p:grpSpPr>
             <p:grpSp>
               <p:nvGrpSpPr>
-                <p:cNvPr id="19" name="Group 18"/>
+                <p:cNvPr id="16" name="Group 15"/>
                 <p:cNvGrpSpPr/>
                 <p:nvPr/>
               </p:nvGrpSpPr>
               <p:grpSpPr>
                 <a:xfrm>
-                  <a:off x="1943830" y="5589412"/>
-                  <a:ext cx="2758864" cy="343444"/>
-                  <a:chOff x="2721670" y="6031647"/>
-                  <a:chExt cx="2187867" cy="238068"/>
+                  <a:off x="6307961" y="5764796"/>
+                  <a:ext cx="2938160" cy="408179"/>
+                  <a:chOff x="1865792" y="1648679"/>
+                  <a:chExt cx="3518872" cy="449760"/>
+                </a:xfrm>
+              </p:grpSpPr>
+              <p:pic>
+                <p:nvPicPr>
+                  <p:cNvPr id="17" name="Picture 16"/>
+                  <p:cNvPicPr>
+                    <a:picLocks noChangeAspect="1"/>
+                  </p:cNvPicPr>
+                  <p:nvPr/>
+                </p:nvPicPr>
+                <p:blipFill>
+                  <a:blip r:embed="rId3"/>
+                  <a:stretch>
+                    <a:fillRect/>
+                  </a:stretch>
+                </p:blipFill>
+                <p:spPr>
+                  <a:xfrm>
+                    <a:off x="1865792" y="1648679"/>
+                    <a:ext cx="655912" cy="396304"/>
+                  </a:xfrm>
+                  <a:prstGeom prst="rect">
+                    <a:avLst/>
+                  </a:prstGeom>
+                </p:spPr>
+              </p:pic>
+              <p:pic>
+                <p:nvPicPr>
+                  <p:cNvPr id="18" name="Picture 17"/>
+                  <p:cNvPicPr>
+                    <a:picLocks noChangeAspect="1"/>
+                  </p:cNvPicPr>
+                  <p:nvPr/>
+                </p:nvPicPr>
+                <p:blipFill>
+                  <a:blip r:embed="rId4"/>
+                  <a:stretch>
+                    <a:fillRect/>
+                  </a:stretch>
+                </p:blipFill>
+                <p:spPr>
+                  <a:xfrm>
+                    <a:off x="4656186" y="1749204"/>
+                    <a:ext cx="728478" cy="293882"/>
+                  </a:xfrm>
+                  <a:prstGeom prst="rect">
+                    <a:avLst/>
+                  </a:prstGeom>
+                </p:spPr>
+              </p:pic>
+              <p:pic>
+                <p:nvPicPr>
+                  <p:cNvPr id="20" name="Picture 19"/>
+                  <p:cNvPicPr>
+                    <a:picLocks noChangeAspect="1"/>
+                  </p:cNvPicPr>
+                  <p:nvPr/>
+                </p:nvPicPr>
+                <p:blipFill>
+                  <a:blip r:embed="rId5"/>
+                  <a:stretch>
+                    <a:fillRect/>
+                  </a:stretch>
+                </p:blipFill>
+                <p:spPr>
+                  <a:xfrm>
+                    <a:off x="3232947" y="1689497"/>
+                    <a:ext cx="640805" cy="408942"/>
+                  </a:xfrm>
+                  <a:prstGeom prst="rect">
+                    <a:avLst/>
+                  </a:prstGeom>
+                </p:spPr>
+              </p:pic>
+            </p:grpSp>
+            <p:grpSp>
+              <p:nvGrpSpPr>
+                <p:cNvPr id="7" name="Group 6"/>
+                <p:cNvGrpSpPr/>
+                <p:nvPr/>
+              </p:nvGrpSpPr>
+              <p:grpSpPr>
+                <a:xfrm>
+                  <a:off x="1889150" y="5779295"/>
+                  <a:ext cx="3287191" cy="343444"/>
+                  <a:chOff x="1415503" y="5589412"/>
+                  <a:chExt cx="3287191" cy="343444"/>
                 </a:xfrm>
               </p:grpSpPr>
               <p:grpSp>
                 <p:nvGrpSpPr>
-                  <p:cNvPr id="24" name="Group 23"/>
+                  <p:cNvPr id="19" name="Group 18"/>
                   <p:cNvGrpSpPr/>
                   <p:nvPr/>
                 </p:nvGrpSpPr>
                 <p:grpSpPr>
                   <a:xfrm>
-                    <a:off x="2721670" y="6031647"/>
-                    <a:ext cx="2187867" cy="238068"/>
-                    <a:chOff x="2887669" y="6031647"/>
+                    <a:off x="1943830" y="5589412"/>
+                    <a:ext cx="2758864" cy="343444"/>
+                    <a:chOff x="2721670" y="6031647"/>
                     <a:chExt cx="2187867" cy="238068"/>
                   </a:xfrm>
                 </p:grpSpPr>
+                <p:grpSp>
+                  <p:nvGrpSpPr>
+                    <p:cNvPr id="24" name="Group 23"/>
+                    <p:cNvGrpSpPr/>
+                    <p:nvPr/>
+                  </p:nvGrpSpPr>
+                  <p:grpSpPr>
+                    <a:xfrm>
+                      <a:off x="2721670" y="6031647"/>
+                      <a:ext cx="2187867" cy="238068"/>
+                      <a:chOff x="2887669" y="6031647"/>
+                      <a:chExt cx="2187867" cy="238068"/>
+                    </a:xfrm>
+                  </p:grpSpPr>
+                  <p:pic>
+                    <p:nvPicPr>
+                      <p:cNvPr id="26" name="Picture 25"/>
+                      <p:cNvPicPr>
+                        <a:picLocks noChangeAspect="1"/>
+                      </p:cNvPicPr>
+                      <p:nvPr/>
+                    </p:nvPicPr>
+                    <p:blipFill>
+                      <a:blip r:embed="rId6" cstate="print">
+                        <a:extLst>
+                          <a:ext uri="{28A0092B-C50C-407E-A947-70E740481C1C}">
+                            <a14:useLocalDpi xmlns:a14="http://schemas.microsoft.com/office/drawing/2010/main" val="0"/>
+                          </a:ext>
+                        </a:extLst>
+                      </a:blip>
+                      <a:stretch>
+                        <a:fillRect/>
+                      </a:stretch>
+                    </p:blipFill>
+                    <p:spPr>
+                      <a:xfrm>
+                        <a:off x="3232233" y="6067039"/>
+                        <a:ext cx="325640" cy="161565"/>
+                      </a:xfrm>
+                      <a:prstGeom prst="rect">
+                        <a:avLst/>
+                      </a:prstGeom>
+                    </p:spPr>
+                  </p:pic>
+                  <p:pic>
+                    <p:nvPicPr>
+                      <p:cNvPr id="27" name="Picture 26"/>
+                      <p:cNvPicPr>
+                        <a:picLocks noChangeAspect="1"/>
+                      </p:cNvPicPr>
+                      <p:nvPr/>
+                    </p:nvPicPr>
+                    <p:blipFill>
+                      <a:blip r:embed="rId7" cstate="print">
+                        <a:extLst>
+                          <a:ext uri="{28A0092B-C50C-407E-A947-70E740481C1C}">
+                            <a14:useLocalDpi xmlns:a14="http://schemas.microsoft.com/office/drawing/2010/main" val="0"/>
+                          </a:ext>
+                        </a:extLst>
+                      </a:blip>
+                      <a:stretch>
+                        <a:fillRect/>
+                      </a:stretch>
+                    </p:blipFill>
+                    <p:spPr>
+                      <a:xfrm>
+                        <a:off x="3637828" y="6044119"/>
+                        <a:ext cx="280633" cy="225596"/>
+                      </a:xfrm>
+                      <a:prstGeom prst="rect">
+                        <a:avLst/>
+                      </a:prstGeom>
+                    </p:spPr>
+                  </p:pic>
+                  <p:pic>
+                    <p:nvPicPr>
+                      <p:cNvPr id="28" name="Picture 27"/>
+                      <p:cNvPicPr>
+                        <a:picLocks noChangeAspect="1"/>
+                      </p:cNvPicPr>
+                      <p:nvPr/>
+                    </p:nvPicPr>
+                    <p:blipFill>
+                      <a:blip r:embed="rId8" cstate="print">
+                        <a:extLst>
+                          <a:ext uri="{28A0092B-C50C-407E-A947-70E740481C1C}">
+                            <a14:useLocalDpi xmlns:a14="http://schemas.microsoft.com/office/drawing/2010/main" val="0"/>
+                          </a:ext>
+                        </a:extLst>
+                      </a:blip>
+                      <a:stretch>
+                        <a:fillRect/>
+                      </a:stretch>
+                    </p:blipFill>
+                    <p:spPr>
+                      <a:xfrm>
+                        <a:off x="2887669" y="6044119"/>
+                        <a:ext cx="274386" cy="225596"/>
+                      </a:xfrm>
+                      <a:prstGeom prst="rect">
+                        <a:avLst/>
+                      </a:prstGeom>
+                    </p:spPr>
+                  </p:pic>
+                  <p:pic>
+                    <p:nvPicPr>
+                      <p:cNvPr id="29" name="Picture 28"/>
+                      <p:cNvPicPr>
+                        <a:picLocks noChangeAspect="1"/>
+                      </p:cNvPicPr>
+                      <p:nvPr/>
+                    </p:nvPicPr>
+                    <p:blipFill>
+                      <a:blip r:embed="rId9" cstate="print">
+                        <a:extLst>
+                          <a:ext uri="{28A0092B-C50C-407E-A947-70E740481C1C}">
+                            <a14:useLocalDpi xmlns:a14="http://schemas.microsoft.com/office/drawing/2010/main" val="0"/>
+                          </a:ext>
+                        </a:extLst>
+                      </a:blip>
+                      <a:stretch>
+                        <a:fillRect/>
+                      </a:stretch>
+                    </p:blipFill>
+                    <p:spPr>
+                      <a:xfrm flipH="1">
+                        <a:off x="4819746" y="6031647"/>
+                        <a:ext cx="255790" cy="218495"/>
+                      </a:xfrm>
+                      <a:prstGeom prst="rect">
+                        <a:avLst/>
+                      </a:prstGeom>
+                    </p:spPr>
+                  </p:pic>
+                </p:grpSp>
                 <p:pic>
                   <p:nvPicPr>
-                    <p:cNvPr id="26" name="Picture 25"/>
+                    <p:cNvPr id="22" name="Picture 21"/>
                     <p:cNvPicPr>
                       <a:picLocks noChangeAspect="1"/>
                     </p:cNvPicPr>
                     <p:nvPr/>
                   </p:nvPicPr>
                   <p:blipFill>
-                    <a:blip r:embed="rId6" cstate="print">
-                      <a:extLst>
-                        <a:ext uri="{28A0092B-C50C-407E-A947-70E740481C1C}">
-                          <a14:useLocalDpi xmlns:a14="http://schemas.microsoft.com/office/drawing/2010/main" val="0"/>
-                        </a:ext>
-                      </a:extLst>
-                    </a:blip>
+                    <a:blip r:embed="rId10"/>
                     <a:stretch>
                       <a:fillRect/>
                     </a:stretch>
                   </p:blipFill>
                   <p:spPr>
                     <a:xfrm>
-                      <a:off x="3232233" y="6067039"/>
-                      <a:ext cx="325640" cy="161565"/>
+                      <a:off x="4237781" y="6048554"/>
+                      <a:ext cx="334902" cy="198223"/>
                     </a:xfrm>
                     <a:prstGeom prst="rect">
                       <a:avLst/>
@@ -15450,88 +15579,22 @@
                 </p:pic>
                 <p:pic>
                   <p:nvPicPr>
-                    <p:cNvPr id="27" name="Picture 26"/>
+                    <p:cNvPr id="23" name="Picture 22"/>
                     <p:cNvPicPr>
                       <a:picLocks noChangeAspect="1"/>
                     </p:cNvPicPr>
                     <p:nvPr/>
                   </p:nvPicPr>
                   <p:blipFill>
-                    <a:blip r:embed="rId7" cstate="print">
-                      <a:extLst>
-                        <a:ext uri="{28A0092B-C50C-407E-A947-70E740481C1C}">
-                          <a14:useLocalDpi xmlns:a14="http://schemas.microsoft.com/office/drawing/2010/main" val="0"/>
-                        </a:ext>
-                      </a:extLst>
-                    </a:blip>
+                    <a:blip r:embed="rId11"/>
                     <a:stretch>
                       <a:fillRect/>
                     </a:stretch>
                   </p:blipFill>
                   <p:spPr>
                     <a:xfrm>
-                      <a:off x="3637828" y="6044119"/>
-                      <a:ext cx="280633" cy="225596"/>
-                    </a:xfrm>
-                    <a:prstGeom prst="rect">
-                      <a:avLst/>
-                    </a:prstGeom>
-                  </p:spPr>
-                </p:pic>
-                <p:pic>
-                  <p:nvPicPr>
-                    <p:cNvPr id="28" name="Picture 27"/>
-                    <p:cNvPicPr>
-                      <a:picLocks noChangeAspect="1"/>
-                    </p:cNvPicPr>
-                    <p:nvPr/>
-                  </p:nvPicPr>
-                  <p:blipFill>
-                    <a:blip r:embed="rId8" cstate="print">
-                      <a:extLst>
-                        <a:ext uri="{28A0092B-C50C-407E-A947-70E740481C1C}">
-                          <a14:useLocalDpi xmlns:a14="http://schemas.microsoft.com/office/drawing/2010/main" val="0"/>
-                        </a:ext>
-                      </a:extLst>
-                    </a:blip>
-                    <a:stretch>
-                      <a:fillRect/>
-                    </a:stretch>
-                  </p:blipFill>
-                  <p:spPr>
-                    <a:xfrm>
-                      <a:off x="2887669" y="6044119"/>
-                      <a:ext cx="274386" cy="225596"/>
-                    </a:xfrm>
-                    <a:prstGeom prst="rect">
-                      <a:avLst/>
-                    </a:prstGeom>
-                  </p:spPr>
-                </p:pic>
-                <p:pic>
-                  <p:nvPicPr>
-                    <p:cNvPr id="29" name="Picture 28"/>
-                    <p:cNvPicPr>
-                      <a:picLocks noChangeAspect="1"/>
-                    </p:cNvPicPr>
-                    <p:nvPr/>
-                  </p:nvPicPr>
-                  <p:blipFill>
-                    <a:blip r:embed="rId9" cstate="print">
-                      <a:extLst>
-                        <a:ext uri="{28A0092B-C50C-407E-A947-70E740481C1C}">
-                          <a14:useLocalDpi xmlns:a14="http://schemas.microsoft.com/office/drawing/2010/main" val="0"/>
-                        </a:ext>
-                      </a:extLst>
-                    </a:blip>
-                    <a:stretch>
-                      <a:fillRect/>
-                    </a:stretch>
-                  </p:blipFill>
-                  <p:spPr>
-                    <a:xfrm flipH="1">
-                      <a:off x="4819746" y="6031647"/>
-                      <a:ext cx="255790" cy="218495"/>
+                      <a:off x="3825095" y="6051367"/>
+                      <a:ext cx="327300" cy="196986"/>
                     </a:xfrm>
                     <a:prstGeom prst="rect">
                       <a:avLst/>
@@ -15541,46 +15604,22 @@
               </p:grpSp>
               <p:pic>
                 <p:nvPicPr>
-                  <p:cNvPr id="22" name="Picture 21"/>
+                  <p:cNvPr id="4" name="Picture 3"/>
                   <p:cNvPicPr>
                     <a:picLocks noChangeAspect="1"/>
                   </p:cNvPicPr>
                   <p:nvPr/>
                 </p:nvPicPr>
                 <p:blipFill>
-                  <a:blip r:embed="rId10"/>
+                  <a:blip r:embed="rId12"/>
                   <a:stretch>
                     <a:fillRect/>
                   </a:stretch>
                 </p:blipFill>
                 <p:spPr>
                   <a:xfrm>
-                    <a:off x="4237781" y="6048554"/>
-                    <a:ext cx="334902" cy="198223"/>
-                  </a:xfrm>
-                  <a:prstGeom prst="rect">
-                    <a:avLst/>
-                  </a:prstGeom>
-                </p:spPr>
-              </p:pic>
-              <p:pic>
-                <p:nvPicPr>
-                  <p:cNvPr id="23" name="Picture 22"/>
-                  <p:cNvPicPr>
-                    <a:picLocks noChangeAspect="1"/>
-                  </p:cNvPicPr>
-                  <p:nvPr/>
-                </p:nvPicPr>
-                <p:blipFill>
-                  <a:blip r:embed="rId11"/>
-                  <a:stretch>
-                    <a:fillRect/>
-                  </a:stretch>
-                </p:blipFill>
-                <p:spPr>
-                  <a:xfrm>
-                    <a:off x="3825095" y="6051367"/>
-                    <a:ext cx="327300" cy="196986"/>
+                    <a:off x="1415503" y="5607909"/>
+                    <a:ext cx="373972" cy="294778"/>
                   </a:xfrm>
                   <a:prstGeom prst="rect">
                     <a:avLst/>
@@ -15588,32 +15627,84 @@
                 </p:spPr>
               </p:pic>
             </p:grpSp>
-            <p:pic>
-              <p:nvPicPr>
-                <p:cNvPr id="4" name="Picture 3"/>
-                <p:cNvPicPr>
-                  <a:picLocks noChangeAspect="1"/>
-                </p:cNvPicPr>
-                <p:nvPr/>
-              </p:nvPicPr>
-              <p:blipFill>
-                <a:blip r:embed="rId12"/>
-                <a:stretch>
-                  <a:fillRect/>
-                </a:stretch>
-              </p:blipFill>
-              <p:spPr>
-                <a:xfrm>
-                  <a:off x="1415503" y="5607909"/>
-                  <a:ext cx="373972" cy="294778"/>
-                </a:xfrm>
-                <a:prstGeom prst="rect">
-                  <a:avLst/>
-                </a:prstGeom>
-              </p:spPr>
-            </p:pic>
           </p:grpSp>
         </p:grpSp>
+        <p:sp>
+          <p:nvSpPr>
+            <p:cNvPr id="9" name="TextBox 8"/>
+            <p:cNvSpPr txBox="1"/>
+            <p:nvPr/>
+          </p:nvSpPr>
+          <p:spPr>
+            <a:xfrm>
+              <a:off x="3515600" y="2389023"/>
+              <a:ext cx="1998575" cy="307777"/>
+            </a:xfrm>
+            <a:prstGeom prst="rect">
+              <a:avLst/>
+            </a:prstGeom>
+            <a:noFill/>
+          </p:spPr>
+          <p:txBody>
+            <a:bodyPr wrap="square" rtlCol="0">
+              <a:spAutoFit/>
+            </a:bodyPr>
+            <a:lstStyle/>
+            <a:p>
+              <a:r>
+                <a:rPr lang="en-US" sz="1400" dirty="0" smtClean="0"/>
+                <a:t>Pseudo R</a:t>
+              </a:r>
+              <a:r>
+                <a:rPr lang="en-US" sz="1400" baseline="30000" dirty="0" smtClean="0"/>
+                <a:t>2 </a:t>
+              </a:r>
+              <a:r>
+                <a:rPr lang="en-US" sz="1400" dirty="0" smtClean="0"/>
+                <a:t>= 0.01</a:t>
+              </a:r>
+              <a:endParaRPr lang="en-US" sz="1400" dirty="0"/>
+            </a:p>
+          </p:txBody>
+        </p:sp>
+        <p:sp>
+          <p:nvSpPr>
+            <p:cNvPr id="25" name="TextBox 24"/>
+            <p:cNvSpPr txBox="1"/>
+            <p:nvPr/>
+          </p:nvSpPr>
+          <p:spPr>
+            <a:xfrm>
+              <a:off x="8084065" y="2389023"/>
+              <a:ext cx="1998575" cy="307777"/>
+            </a:xfrm>
+            <a:prstGeom prst="rect">
+              <a:avLst/>
+            </a:prstGeom>
+            <a:noFill/>
+          </p:spPr>
+          <p:txBody>
+            <a:bodyPr wrap="square" rtlCol="0">
+              <a:spAutoFit/>
+            </a:bodyPr>
+            <a:lstStyle/>
+            <a:p>
+              <a:r>
+                <a:rPr lang="en-US" sz="1400" dirty="0" smtClean="0"/>
+                <a:t>Pseudo R</a:t>
+              </a:r>
+              <a:r>
+                <a:rPr lang="en-US" sz="1400" baseline="30000" dirty="0" smtClean="0"/>
+                <a:t>2 </a:t>
+              </a:r>
+              <a:r>
+                <a:rPr lang="en-US" sz="1400" dirty="0" smtClean="0"/>
+                <a:t>= 0.32</a:t>
+              </a:r>
+              <a:endParaRPr lang="en-US" sz="1400" dirty="0"/>
+            </a:p>
+          </p:txBody>
+        </p:sp>
       </p:grpSp>
     </p:spTree>
     <p:extLst>
@@ -15969,7 +16060,7 @@
       </p:sp>
       <p:grpSp>
         <p:nvGrpSpPr>
-          <p:cNvPr id="5" name="Group 4"/>
+          <p:cNvPr id="12" name="Group 11"/>
           <p:cNvGrpSpPr/>
           <p:nvPr/>
         </p:nvGrpSpPr>
@@ -15981,78 +16072,175 @@
             <a:chExt cx="8537418" cy="6882386"/>
           </a:xfrm>
         </p:grpSpPr>
-        <p:pic>
-          <p:nvPicPr>
-            <p:cNvPr id="2" name="Picture 1"/>
-            <p:cNvPicPr>
-              <a:picLocks noChangeAspect="1"/>
-            </p:cNvPicPr>
+        <p:grpSp>
+          <p:nvGrpSpPr>
+            <p:cNvPr id="5" name="Group 4"/>
+            <p:cNvGrpSpPr/>
             <p:nvPr/>
-          </p:nvPicPr>
-          <p:blipFill>
-            <a:blip r:embed="rId2"/>
-            <a:stretch>
-              <a:fillRect/>
-            </a:stretch>
-          </p:blipFill>
+          </p:nvGrpSpPr>
+          <p:grpSpPr>
+            <a:xfrm>
+              <a:off x="1403286" y="0"/>
+              <a:ext cx="8537418" cy="6882386"/>
+              <a:chOff x="1403286" y="0"/>
+              <a:chExt cx="8537418" cy="6882386"/>
+            </a:xfrm>
+          </p:grpSpPr>
+          <p:pic>
+            <p:nvPicPr>
+              <p:cNvPr id="2" name="Picture 1"/>
+              <p:cNvPicPr>
+                <a:picLocks noChangeAspect="1"/>
+              </p:cNvPicPr>
+              <p:nvPr/>
+            </p:nvPicPr>
+            <p:blipFill>
+              <a:blip r:embed="rId2"/>
+              <a:stretch>
+                <a:fillRect/>
+              </a:stretch>
+            </p:blipFill>
+            <p:spPr>
+              <a:xfrm>
+                <a:off x="1403286" y="0"/>
+                <a:ext cx="8537418" cy="6690419"/>
+              </a:xfrm>
+              <a:prstGeom prst="rect">
+                <a:avLst/>
+              </a:prstGeom>
+            </p:spPr>
+          </p:pic>
+          <p:pic>
+            <p:nvPicPr>
+              <p:cNvPr id="3" name="Picture 2"/>
+              <p:cNvPicPr>
+                <a:picLocks noChangeAspect="1"/>
+              </p:cNvPicPr>
+              <p:nvPr/>
+            </p:nvPicPr>
+            <p:blipFill>
+              <a:blip r:embed="rId3"/>
+              <a:stretch>
+                <a:fillRect/>
+              </a:stretch>
+            </p:blipFill>
+            <p:spPr>
+              <a:xfrm>
+                <a:off x="2211754" y="6516594"/>
+                <a:ext cx="3292125" cy="341406"/>
+              </a:xfrm>
+              <a:prstGeom prst="rect">
+                <a:avLst/>
+              </a:prstGeom>
+            </p:spPr>
+          </p:pic>
+          <p:pic>
+            <p:nvPicPr>
+              <p:cNvPr id="4" name="Picture 3"/>
+              <p:cNvPicPr>
+                <a:picLocks noChangeAspect="1"/>
+              </p:cNvPicPr>
+              <p:nvPr/>
+            </p:nvPicPr>
+            <p:blipFill>
+              <a:blip r:embed="rId4"/>
+              <a:stretch>
+                <a:fillRect/>
+              </a:stretch>
+            </p:blipFill>
+            <p:spPr>
+              <a:xfrm>
+                <a:off x="6784629" y="6492208"/>
+                <a:ext cx="2883658" cy="390178"/>
+              </a:xfrm>
+              <a:prstGeom prst="rect">
+                <a:avLst/>
+              </a:prstGeom>
+            </p:spPr>
+          </p:pic>
+        </p:grpSp>
+        <p:sp>
+          <p:nvSpPr>
+            <p:cNvPr id="10" name="TextBox 9"/>
+            <p:cNvSpPr txBox="1"/>
+            <p:nvPr/>
+          </p:nvSpPr>
           <p:spPr>
             <a:xfrm>
-              <a:off x="1403286" y="0"/>
-              <a:ext cx="8537418" cy="6690419"/>
+              <a:off x="6476084" y="241704"/>
+              <a:ext cx="1998575" cy="523220"/>
             </a:xfrm>
             <a:prstGeom prst="rect">
               <a:avLst/>
             </a:prstGeom>
+            <a:noFill/>
           </p:spPr>
-        </p:pic>
-        <p:pic>
-          <p:nvPicPr>
-            <p:cNvPr id="3" name="Picture 2"/>
-            <p:cNvPicPr>
-              <a:picLocks noChangeAspect="1"/>
-            </p:cNvPicPr>
+          <p:txBody>
+            <a:bodyPr wrap="square" rtlCol="0">
+              <a:spAutoFit/>
+            </a:bodyPr>
+            <a:lstStyle/>
+            <a:p>
+              <a:r>
+                <a:rPr lang="en-US" sz="1400" dirty="0" smtClean="0"/>
+                <a:t>Pseudo R</a:t>
+              </a:r>
+              <a:r>
+                <a:rPr lang="en-US" sz="1400" baseline="30000" dirty="0" smtClean="0"/>
+                <a:t>2 </a:t>
+              </a:r>
+              <a:r>
+                <a:rPr lang="en-US" sz="1400" dirty="0" smtClean="0"/>
+                <a:t>= </a:t>
+              </a:r>
+            </a:p>
+            <a:p>
+              <a:r>
+                <a:rPr lang="en-US" sz="1400" dirty="0" smtClean="0"/>
+                <a:t>0.02</a:t>
+              </a:r>
+              <a:endParaRPr lang="en-US" sz="1400" dirty="0"/>
+            </a:p>
+          </p:txBody>
+        </p:sp>
+        <p:sp>
+          <p:nvSpPr>
+            <p:cNvPr id="11" name="TextBox 10"/>
+            <p:cNvSpPr txBox="1"/>
             <p:nvPr/>
-          </p:nvPicPr>
-          <p:blipFill>
-            <a:blip r:embed="rId3"/>
-            <a:stretch>
-              <a:fillRect/>
-            </a:stretch>
-          </p:blipFill>
+          </p:nvSpPr>
           <p:spPr>
             <a:xfrm>
-              <a:off x="2211754" y="6516594"/>
-              <a:ext cx="3292125" cy="341406"/>
+              <a:off x="2211754" y="241704"/>
+              <a:ext cx="1998575" cy="307777"/>
             </a:xfrm>
             <a:prstGeom prst="rect">
               <a:avLst/>
             </a:prstGeom>
+            <a:noFill/>
           </p:spPr>
-        </p:pic>
-        <p:pic>
-          <p:nvPicPr>
-            <p:cNvPr id="4" name="Picture 3"/>
-            <p:cNvPicPr>
-              <a:picLocks noChangeAspect="1"/>
-            </p:cNvPicPr>
-            <p:nvPr/>
-          </p:nvPicPr>
-          <p:blipFill>
-            <a:blip r:embed="rId4"/>
-            <a:stretch>
-              <a:fillRect/>
-            </a:stretch>
-          </p:blipFill>
-          <p:spPr>
-            <a:xfrm>
-              <a:off x="6784629" y="6492208"/>
-              <a:ext cx="2883658" cy="390178"/>
-            </a:xfrm>
-            <a:prstGeom prst="rect">
-              <a:avLst/>
-            </a:prstGeom>
-          </p:spPr>
-        </p:pic>
+          <p:txBody>
+            <a:bodyPr wrap="square" rtlCol="0">
+              <a:spAutoFit/>
+            </a:bodyPr>
+            <a:lstStyle/>
+            <a:p>
+              <a:r>
+                <a:rPr lang="en-US" sz="1400" dirty="0" smtClean="0"/>
+                <a:t>Pseudo R</a:t>
+              </a:r>
+              <a:r>
+                <a:rPr lang="en-US" sz="1400" baseline="30000" dirty="0" smtClean="0"/>
+                <a:t>2 </a:t>
+              </a:r>
+              <a:r>
+                <a:rPr lang="en-US" sz="1400" dirty="0" smtClean="0"/>
+                <a:t>= 0.03</a:t>
+              </a:r>
+              <a:endParaRPr lang="en-US" sz="1400" dirty="0"/>
+            </a:p>
+          </p:txBody>
+        </p:sp>
       </p:grpSp>
     </p:spTree>
     <p:extLst>
@@ -16064,6 +16252,13 @@
   <p:clrMapOvr>
     <a:masterClrMapping/>
   </p:clrMapOvr>
+  <p:timing>
+    <p:tnLst>
+      <p:par>
+        <p:cTn id="1" dur="indefinite" restart="never" nodeType="tmRoot"/>
+      </p:par>
+    </p:tnLst>
+  </p:timing>
 </p:sld>
 </file>
 
@@ -16118,7 +16313,7 @@
       </p:sp>
       <p:grpSp>
         <p:nvGrpSpPr>
-          <p:cNvPr id="7" name="Group 6"/>
+          <p:cNvPr id="8" name="Group 7"/>
           <p:cNvGrpSpPr/>
           <p:nvPr/>
         </p:nvGrpSpPr>
@@ -16130,93 +16325,190 @@
             <a:chExt cx="8577676" cy="6891879"/>
           </a:xfrm>
         </p:grpSpPr>
-        <p:pic>
-          <p:nvPicPr>
-            <p:cNvPr id="5" name="Picture 4"/>
-            <p:cNvPicPr>
-              <a:picLocks noChangeAspect="1"/>
-            </p:cNvPicPr>
-            <p:nvPr/>
-          </p:nvPicPr>
-          <p:blipFill>
-            <a:blip r:embed="rId2"/>
-            <a:stretch>
-              <a:fillRect/>
-            </a:stretch>
-          </p:blipFill>
-          <p:spPr>
-            <a:xfrm>
-              <a:off x="2018923" y="14893"/>
-              <a:ext cx="8577676" cy="6672404"/>
-            </a:xfrm>
-            <a:prstGeom prst="rect">
-              <a:avLst/>
-            </a:prstGeom>
-          </p:spPr>
-        </p:pic>
         <p:grpSp>
           <p:nvGrpSpPr>
-            <p:cNvPr id="6" name="Group 5"/>
+            <p:cNvPr id="7" name="Group 6"/>
             <p:cNvGrpSpPr/>
             <p:nvPr/>
           </p:nvGrpSpPr>
           <p:grpSpPr>
             <a:xfrm>
-              <a:off x="2831575" y="6516594"/>
-              <a:ext cx="7496215" cy="390178"/>
-              <a:chOff x="2831575" y="6516594"/>
-              <a:chExt cx="7496215" cy="390178"/>
+              <a:off x="2018923" y="14893"/>
+              <a:ext cx="8577676" cy="6891879"/>
+              <a:chOff x="2018923" y="14893"/>
+              <a:chExt cx="8577676" cy="6891879"/>
             </a:xfrm>
           </p:grpSpPr>
           <p:pic>
             <p:nvPicPr>
-              <p:cNvPr id="11" name="Picture 10"/>
+              <p:cNvPr id="5" name="Picture 4"/>
               <p:cNvPicPr>
                 <a:picLocks noChangeAspect="1"/>
               </p:cNvPicPr>
               <p:nvPr/>
             </p:nvPicPr>
             <p:blipFill>
-              <a:blip r:embed="rId3"/>
+              <a:blip r:embed="rId2"/>
               <a:stretch>
                 <a:fillRect/>
               </a:stretch>
             </p:blipFill>
             <p:spPr>
               <a:xfrm>
-                <a:off x="2831575" y="6516594"/>
-                <a:ext cx="3286029" cy="341406"/>
+                <a:off x="2018923" y="14893"/>
+                <a:ext cx="8577676" cy="6672404"/>
               </a:xfrm>
               <a:prstGeom prst="rect">
                 <a:avLst/>
               </a:prstGeom>
             </p:spPr>
           </p:pic>
-          <p:pic>
-            <p:nvPicPr>
-              <p:cNvPr id="12" name="Picture 11"/>
-              <p:cNvPicPr>
-                <a:picLocks noChangeAspect="1"/>
-              </p:cNvPicPr>
+          <p:grpSp>
+            <p:nvGrpSpPr>
+              <p:cNvPr id="6" name="Group 5"/>
+              <p:cNvGrpSpPr/>
               <p:nvPr/>
-            </p:nvPicPr>
-            <p:blipFill>
-              <a:blip r:embed="rId4"/>
-              <a:stretch>
-                <a:fillRect/>
-              </a:stretch>
-            </p:blipFill>
-            <p:spPr>
+            </p:nvGrpSpPr>
+            <p:grpSpPr>
               <a:xfrm>
-                <a:off x="7444132" y="6516594"/>
-                <a:ext cx="2883658" cy="390178"/>
+                <a:off x="2831575" y="6516594"/>
+                <a:ext cx="7496215" cy="390178"/>
+                <a:chOff x="2831575" y="6516594"/>
+                <a:chExt cx="7496215" cy="390178"/>
               </a:xfrm>
-              <a:prstGeom prst="rect">
-                <a:avLst/>
-              </a:prstGeom>
-            </p:spPr>
-          </p:pic>
+            </p:grpSpPr>
+            <p:pic>
+              <p:nvPicPr>
+                <p:cNvPr id="11" name="Picture 10"/>
+                <p:cNvPicPr>
+                  <a:picLocks noChangeAspect="1"/>
+                </p:cNvPicPr>
+                <p:nvPr/>
+              </p:nvPicPr>
+              <p:blipFill>
+                <a:blip r:embed="rId3"/>
+                <a:stretch>
+                  <a:fillRect/>
+                </a:stretch>
+              </p:blipFill>
+              <p:spPr>
+                <a:xfrm>
+                  <a:off x="2831575" y="6516594"/>
+                  <a:ext cx="3286029" cy="341406"/>
+                </a:xfrm>
+                <a:prstGeom prst="rect">
+                  <a:avLst/>
+                </a:prstGeom>
+              </p:spPr>
+            </p:pic>
+            <p:pic>
+              <p:nvPicPr>
+                <p:cNvPr id="12" name="Picture 11"/>
+                <p:cNvPicPr>
+                  <a:picLocks noChangeAspect="1"/>
+                </p:cNvPicPr>
+                <p:nvPr/>
+              </p:nvPicPr>
+              <p:blipFill>
+                <a:blip r:embed="rId4"/>
+                <a:stretch>
+                  <a:fillRect/>
+                </a:stretch>
+              </p:blipFill>
+              <p:spPr>
+                <a:xfrm>
+                  <a:off x="7444132" y="6516594"/>
+                  <a:ext cx="2883658" cy="390178"/>
+                </a:xfrm>
+                <a:prstGeom prst="rect">
+                  <a:avLst/>
+                </a:prstGeom>
+              </p:spPr>
+            </p:pic>
+          </p:grpSp>
         </p:grpSp>
+        <p:sp>
+          <p:nvSpPr>
+            <p:cNvPr id="10" name="TextBox 9"/>
+            <p:cNvSpPr txBox="1"/>
+            <p:nvPr/>
+          </p:nvSpPr>
+          <p:spPr>
+            <a:xfrm>
+              <a:off x="7088827" y="2334454"/>
+              <a:ext cx="1998575" cy="523220"/>
+            </a:xfrm>
+            <a:prstGeom prst="rect">
+              <a:avLst/>
+            </a:prstGeom>
+            <a:noFill/>
+          </p:spPr>
+          <p:txBody>
+            <a:bodyPr wrap="square" rtlCol="0">
+              <a:spAutoFit/>
+            </a:bodyPr>
+            <a:lstStyle/>
+            <a:p>
+              <a:r>
+                <a:rPr lang="en-US" sz="1400" dirty="0" smtClean="0"/>
+                <a:t>Pseudo R</a:t>
+              </a:r>
+              <a:r>
+                <a:rPr lang="en-US" sz="1400" baseline="30000" dirty="0" smtClean="0"/>
+                <a:t>2 </a:t>
+              </a:r>
+              <a:r>
+                <a:rPr lang="en-US" sz="1400" dirty="0" smtClean="0"/>
+                <a:t>= </a:t>
+              </a:r>
+            </a:p>
+            <a:p>
+              <a:r>
+                <a:rPr lang="en-US" sz="1400" dirty="0" smtClean="0"/>
+                <a:t>0.12</a:t>
+              </a:r>
+              <a:endParaRPr lang="en-US" sz="1400" dirty="0"/>
+            </a:p>
+          </p:txBody>
+        </p:sp>
+        <p:sp>
+          <p:nvSpPr>
+            <p:cNvPr id="13" name="TextBox 12"/>
+            <p:cNvSpPr txBox="1"/>
+            <p:nvPr/>
+          </p:nvSpPr>
+          <p:spPr>
+            <a:xfrm>
+              <a:off x="2758509" y="2549897"/>
+              <a:ext cx="1998575" cy="307777"/>
+            </a:xfrm>
+            <a:prstGeom prst="rect">
+              <a:avLst/>
+            </a:prstGeom>
+            <a:noFill/>
+          </p:spPr>
+          <p:txBody>
+            <a:bodyPr wrap="square" rtlCol="0">
+              <a:spAutoFit/>
+            </a:bodyPr>
+            <a:lstStyle/>
+            <a:p>
+              <a:r>
+                <a:rPr lang="en-US" sz="1400" dirty="0" smtClean="0"/>
+                <a:t>Pseudo R</a:t>
+              </a:r>
+              <a:r>
+                <a:rPr lang="en-US" sz="1400" baseline="30000" dirty="0" smtClean="0"/>
+                <a:t>2 </a:t>
+              </a:r>
+              <a:r>
+                <a:rPr lang="en-US" sz="1400" dirty="0" smtClean="0"/>
+                <a:t>= 0.25</a:t>
+              </a:r>
+              <a:endParaRPr lang="en-US" sz="1400" dirty="0"/>
+            </a:p>
+          </p:txBody>
+        </p:sp>
       </p:grpSp>
     </p:spTree>
     <p:extLst>
@@ -16228,6 +16520,13 @@
   <p:clrMapOvr>
     <a:masterClrMapping/>
   </p:clrMapOvr>
+  <p:timing>
+    <p:tnLst>
+      <p:par>
+        <p:cTn id="1" dur="indefinite" restart="never" nodeType="tmRoot"/>
+      </p:par>
+    </p:tnLst>
+  </p:timing>
 </p:sld>
 </file>
 

</xml_diff>

<commit_message>
bbs proptrans added into suppl figure 4 and psuedo r2 recalc
</commit_message>
<xml_diff>
--- a/output/plots/all_figs_with_legends.pptx
+++ b/output/plots/all_figs_with_legends.pptx
@@ -210,7 +210,7 @@
           <a:p>
             <a:fld id="{7FA21820-D199-4D82-91AF-C50B1D3B111A}" type="datetimeFigureOut">
               <a:rPr lang="en-US" smtClean="0"/>
-              <a:t>11/2/2017</a:t>
+              <a:t>11/3/2017</a:t>
             </a:fld>
             <a:endParaRPr lang="en-US"/>
           </a:p>
@@ -1043,7 +1043,7 @@
           <a:p>
             <a:fld id="{916B8C92-D5E3-4480-8685-D57BEE386DE2}" type="datetimeFigureOut">
               <a:rPr lang="en-US" smtClean="0"/>
-              <a:t>11/2/2017</a:t>
+              <a:t>11/3/2017</a:t>
             </a:fld>
             <a:endParaRPr lang="en-US"/>
           </a:p>
@@ -1213,7 +1213,7 @@
           <a:p>
             <a:fld id="{916B8C92-D5E3-4480-8685-D57BEE386DE2}" type="datetimeFigureOut">
               <a:rPr lang="en-US" smtClean="0"/>
-              <a:t>11/2/2017</a:t>
+              <a:t>11/3/2017</a:t>
             </a:fld>
             <a:endParaRPr lang="en-US"/>
           </a:p>
@@ -1393,7 +1393,7 @@
           <a:p>
             <a:fld id="{916B8C92-D5E3-4480-8685-D57BEE386DE2}" type="datetimeFigureOut">
               <a:rPr lang="en-US" smtClean="0"/>
-              <a:t>11/2/2017</a:t>
+              <a:t>11/3/2017</a:t>
             </a:fld>
             <a:endParaRPr lang="en-US"/>
           </a:p>
@@ -1563,7 +1563,7 @@
           <a:p>
             <a:fld id="{916B8C92-D5E3-4480-8685-D57BEE386DE2}" type="datetimeFigureOut">
               <a:rPr lang="en-US" smtClean="0"/>
-              <a:t>11/2/2017</a:t>
+              <a:t>11/3/2017</a:t>
             </a:fld>
             <a:endParaRPr lang="en-US"/>
           </a:p>
@@ -1809,7 +1809,7 @@
           <a:p>
             <a:fld id="{916B8C92-D5E3-4480-8685-D57BEE386DE2}" type="datetimeFigureOut">
               <a:rPr lang="en-US" smtClean="0"/>
-              <a:t>11/2/2017</a:t>
+              <a:t>11/3/2017</a:t>
             </a:fld>
             <a:endParaRPr lang="en-US"/>
           </a:p>
@@ -2041,7 +2041,7 @@
           <a:p>
             <a:fld id="{916B8C92-D5E3-4480-8685-D57BEE386DE2}" type="datetimeFigureOut">
               <a:rPr lang="en-US" smtClean="0"/>
-              <a:t>11/2/2017</a:t>
+              <a:t>11/3/2017</a:t>
             </a:fld>
             <a:endParaRPr lang="en-US"/>
           </a:p>
@@ -2408,7 +2408,7 @@
           <a:p>
             <a:fld id="{916B8C92-D5E3-4480-8685-D57BEE386DE2}" type="datetimeFigureOut">
               <a:rPr lang="en-US" smtClean="0"/>
-              <a:t>11/2/2017</a:t>
+              <a:t>11/3/2017</a:t>
             </a:fld>
             <a:endParaRPr lang="en-US"/>
           </a:p>
@@ -2526,7 +2526,7 @@
           <a:p>
             <a:fld id="{916B8C92-D5E3-4480-8685-D57BEE386DE2}" type="datetimeFigureOut">
               <a:rPr lang="en-US" smtClean="0"/>
-              <a:t>11/2/2017</a:t>
+              <a:t>11/3/2017</a:t>
             </a:fld>
             <a:endParaRPr lang="en-US"/>
           </a:p>
@@ -2621,7 +2621,7 @@
           <a:p>
             <a:fld id="{916B8C92-D5E3-4480-8685-D57BEE386DE2}" type="datetimeFigureOut">
               <a:rPr lang="en-US" smtClean="0"/>
-              <a:t>11/2/2017</a:t>
+              <a:t>11/3/2017</a:t>
             </a:fld>
             <a:endParaRPr lang="en-US"/>
           </a:p>
@@ -2898,7 +2898,7 @@
           <a:p>
             <a:fld id="{916B8C92-D5E3-4480-8685-D57BEE386DE2}" type="datetimeFigureOut">
               <a:rPr lang="en-US" smtClean="0"/>
-              <a:t>11/2/2017</a:t>
+              <a:t>11/3/2017</a:t>
             </a:fld>
             <a:endParaRPr lang="en-US"/>
           </a:p>
@@ -3151,7 +3151,7 @@
           <a:p>
             <a:fld id="{916B8C92-D5E3-4480-8685-D57BEE386DE2}" type="datetimeFigureOut">
               <a:rPr lang="en-US" smtClean="0"/>
-              <a:t>11/2/2017</a:t>
+              <a:t>11/3/2017</a:t>
             </a:fld>
             <a:endParaRPr lang="en-US"/>
           </a:p>
@@ -3364,7 +3364,7 @@
           <a:p>
             <a:fld id="{916B8C92-D5E3-4480-8685-D57BEE386DE2}" type="datetimeFigureOut">
               <a:rPr lang="en-US" smtClean="0"/>
-              <a:t>11/2/2017</a:t>
+              <a:t>11/3/2017</a:t>
             </a:fld>
             <a:endParaRPr lang="en-US"/>
           </a:p>
@@ -15130,85 +15130,6 @@
       </p:grpSpPr>
       <p:sp>
         <p:nvSpPr>
-          <p:cNvPr id="6" name="Rectangle 5"/>
-          <p:cNvSpPr/>
-          <p:nvPr/>
-        </p:nvSpPr>
-        <p:spPr>
-          <a:xfrm>
-            <a:off x="1405847" y="6145461"/>
-            <a:ext cx="8805672" cy="707886"/>
-          </a:xfrm>
-          <a:prstGeom prst="rect">
-            <a:avLst/>
-          </a:prstGeom>
-        </p:spPr>
-        <p:txBody>
-          <a:bodyPr wrap="square">
-            <a:spAutoFit/>
-          </a:bodyPr>
-          <a:lstStyle/>
-          <a:p>
-            <a:r>
-              <a:rPr lang="en-US" sz="1000" dirty="0" smtClean="0"/>
-              <a:t>Figure3a. </a:t>
-            </a:r>
-            <a:r>
-              <a:rPr lang="en-US" sz="1000" dirty="0"/>
-              <a:t>Proportion of transient </a:t>
-            </a:r>
-            <a:r>
-              <a:rPr lang="en-US" sz="1000" dirty="0" smtClean="0"/>
-              <a:t>species </a:t>
-            </a:r>
-            <a:r>
-              <a:rPr lang="en-US" sz="1000" dirty="0"/>
-              <a:t>by </a:t>
-            </a:r>
-            <a:r>
-              <a:rPr lang="en-US" sz="1000" dirty="0" smtClean="0"/>
-              <a:t>log of area, colored </a:t>
-            </a:r>
-            <a:r>
-              <a:rPr lang="en-US" sz="1000" dirty="0"/>
-              <a:t>by taxa, using the hierarchically </a:t>
-            </a:r>
-            <a:r>
-              <a:rPr lang="en-US" sz="1000" dirty="0" smtClean="0"/>
-              <a:t>scaled count </a:t>
-            </a:r>
-            <a:r>
-              <a:rPr lang="en-US" sz="1000" dirty="0"/>
-              <a:t>datasets</a:t>
-            </a:r>
-            <a:r>
-              <a:rPr lang="en-US" sz="1000" dirty="0" smtClean="0"/>
-              <a:t>.</a:t>
-            </a:r>
-          </a:p>
-          <a:p>
-            <a:r>
-              <a:rPr lang="en-US" sz="1000" dirty="0"/>
-              <a:t>Figure3b. Proportion of transient species by log of community size (number of individuals), colored by taxa, using the hierarchically scaled count datasets</a:t>
-            </a:r>
-            <a:r>
-              <a:rPr lang="en-US" sz="1000" dirty="0" smtClean="0"/>
-              <a:t>.</a:t>
-            </a:r>
-          </a:p>
-          <a:p>
-            <a:r>
-              <a:rPr lang="en-US" sz="1000" dirty="0"/>
-              <a:t>Figure3c. Predicted values of hierarchically scaled count datasets by taxa using average community size XXX. </a:t>
-            </a:r>
-          </a:p>
-          <a:p>
-            <a:endParaRPr lang="en-US" sz="1000" dirty="0"/>
-          </a:p>
-        </p:txBody>
-      </p:sp>
-      <p:sp>
-        <p:nvSpPr>
           <p:cNvPr id="5" name="TextBox 4"/>
           <p:cNvSpPr txBox="1"/>
           <p:nvPr/>
@@ -15661,7 +15582,11 @@
               </a:r>
               <a:r>
                 <a:rPr lang="en-US" sz="1400" dirty="0" smtClean="0"/>
-                <a:t>= 0.01</a:t>
+                <a:t>= </a:t>
+              </a:r>
+              <a:r>
+                <a:rPr lang="en-US" sz="1400" dirty="0" smtClean="0"/>
+                <a:t>0.65</a:t>
               </a:r>
               <a:endParaRPr lang="en-US" sz="1400" dirty="0"/>
             </a:p>
@@ -15699,7 +15624,11 @@
               </a:r>
               <a:r>
                 <a:rPr lang="en-US" sz="1400" dirty="0" smtClean="0"/>
-                <a:t>= 0.32</a:t>
+                <a:t>= </a:t>
+              </a:r>
+              <a:r>
+                <a:rPr lang="en-US" sz="1400" dirty="0" smtClean="0"/>
+                <a:t>0.84</a:t>
               </a:r>
               <a:endParaRPr lang="en-US" sz="1400" dirty="0"/>
             </a:p>
@@ -16197,7 +16126,7 @@
             <a:p>
               <a:r>
                 <a:rPr lang="en-US" sz="1400" dirty="0" smtClean="0"/>
-                <a:t>0.02</a:t>
+                <a:t>0.92</a:t>
               </a:r>
               <a:endParaRPr lang="en-US" sz="1400" dirty="0"/>
             </a:p>
@@ -16235,7 +16164,11 @@
               </a:r>
               <a:r>
                 <a:rPr lang="en-US" sz="1400" dirty="0" smtClean="0"/>
-                <a:t>= 0.03</a:t>
+                <a:t>= </a:t>
+              </a:r>
+              <a:r>
+                <a:rPr lang="en-US" sz="1400" dirty="0" smtClean="0"/>
+                <a:t>0.07</a:t>
               </a:r>
               <a:endParaRPr lang="en-US" sz="1400" dirty="0"/>
             </a:p>
@@ -16465,7 +16398,7 @@
             <a:p>
               <a:r>
                 <a:rPr lang="en-US" sz="1400" dirty="0" smtClean="0"/>
-                <a:t>0.12</a:t>
+                <a:t>0.91</a:t>
               </a:r>
               <a:endParaRPr lang="en-US" sz="1400" dirty="0"/>
             </a:p>
@@ -16503,7 +16436,11 @@
               </a:r>
               <a:r>
                 <a:rPr lang="en-US" sz="1400" dirty="0" smtClean="0"/>
-                <a:t>= 0.25</a:t>
+                <a:t>= </a:t>
+              </a:r>
+              <a:r>
+                <a:rPr lang="en-US" sz="1400" dirty="0" smtClean="0"/>
+                <a:t>0.06</a:t>
               </a:r>
               <a:endParaRPr lang="en-US" sz="1400" dirty="0"/>
             </a:p>

</xml_diff>

<commit_message>
added new rtes to fig 4, working on suppl
</commit_message>
<xml_diff>
--- a/output/plots/all_figs_with_legends.pptx
+++ b/output/plots/all_figs_with_legends.pptx
@@ -210,7 +210,7 @@
           <a:p>
             <a:fld id="{7FA21820-D199-4D82-91AF-C50B1D3B111A}" type="datetimeFigureOut">
               <a:rPr lang="en-US" smtClean="0"/>
-              <a:t>11/7/2017</a:t>
+              <a:t>11/10/2017</a:t>
             </a:fld>
             <a:endParaRPr lang="en-US"/>
           </a:p>
@@ -1043,7 +1043,7 @@
           <a:p>
             <a:fld id="{916B8C92-D5E3-4480-8685-D57BEE386DE2}" type="datetimeFigureOut">
               <a:rPr lang="en-US" smtClean="0"/>
-              <a:t>11/7/2017</a:t>
+              <a:t>11/10/2017</a:t>
             </a:fld>
             <a:endParaRPr lang="en-US"/>
           </a:p>
@@ -1213,7 +1213,7 @@
           <a:p>
             <a:fld id="{916B8C92-D5E3-4480-8685-D57BEE386DE2}" type="datetimeFigureOut">
               <a:rPr lang="en-US" smtClean="0"/>
-              <a:t>11/7/2017</a:t>
+              <a:t>11/10/2017</a:t>
             </a:fld>
             <a:endParaRPr lang="en-US"/>
           </a:p>
@@ -1393,7 +1393,7 @@
           <a:p>
             <a:fld id="{916B8C92-D5E3-4480-8685-D57BEE386DE2}" type="datetimeFigureOut">
               <a:rPr lang="en-US" smtClean="0"/>
-              <a:t>11/7/2017</a:t>
+              <a:t>11/10/2017</a:t>
             </a:fld>
             <a:endParaRPr lang="en-US"/>
           </a:p>
@@ -1563,7 +1563,7 @@
           <a:p>
             <a:fld id="{916B8C92-D5E3-4480-8685-D57BEE386DE2}" type="datetimeFigureOut">
               <a:rPr lang="en-US" smtClean="0"/>
-              <a:t>11/7/2017</a:t>
+              <a:t>11/10/2017</a:t>
             </a:fld>
             <a:endParaRPr lang="en-US"/>
           </a:p>
@@ -1809,7 +1809,7 @@
           <a:p>
             <a:fld id="{916B8C92-D5E3-4480-8685-D57BEE386DE2}" type="datetimeFigureOut">
               <a:rPr lang="en-US" smtClean="0"/>
-              <a:t>11/7/2017</a:t>
+              <a:t>11/10/2017</a:t>
             </a:fld>
             <a:endParaRPr lang="en-US"/>
           </a:p>
@@ -2041,7 +2041,7 @@
           <a:p>
             <a:fld id="{916B8C92-D5E3-4480-8685-D57BEE386DE2}" type="datetimeFigureOut">
               <a:rPr lang="en-US" smtClean="0"/>
-              <a:t>11/7/2017</a:t>
+              <a:t>11/10/2017</a:t>
             </a:fld>
             <a:endParaRPr lang="en-US"/>
           </a:p>
@@ -2408,7 +2408,7 @@
           <a:p>
             <a:fld id="{916B8C92-D5E3-4480-8685-D57BEE386DE2}" type="datetimeFigureOut">
               <a:rPr lang="en-US" smtClean="0"/>
-              <a:t>11/7/2017</a:t>
+              <a:t>11/10/2017</a:t>
             </a:fld>
             <a:endParaRPr lang="en-US"/>
           </a:p>
@@ -2526,7 +2526,7 @@
           <a:p>
             <a:fld id="{916B8C92-D5E3-4480-8685-D57BEE386DE2}" type="datetimeFigureOut">
               <a:rPr lang="en-US" smtClean="0"/>
-              <a:t>11/7/2017</a:t>
+              <a:t>11/10/2017</a:t>
             </a:fld>
             <a:endParaRPr lang="en-US"/>
           </a:p>
@@ -2621,7 +2621,7 @@
           <a:p>
             <a:fld id="{916B8C92-D5E3-4480-8685-D57BEE386DE2}" type="datetimeFigureOut">
               <a:rPr lang="en-US" smtClean="0"/>
-              <a:t>11/7/2017</a:t>
+              <a:t>11/10/2017</a:t>
             </a:fld>
             <a:endParaRPr lang="en-US"/>
           </a:p>
@@ -2898,7 +2898,7 @@
           <a:p>
             <a:fld id="{916B8C92-D5E3-4480-8685-D57BEE386DE2}" type="datetimeFigureOut">
               <a:rPr lang="en-US" smtClean="0"/>
-              <a:t>11/7/2017</a:t>
+              <a:t>11/10/2017</a:t>
             </a:fld>
             <a:endParaRPr lang="en-US"/>
           </a:p>
@@ -3151,7 +3151,7 @@
           <a:p>
             <a:fld id="{916B8C92-D5E3-4480-8685-D57BEE386DE2}" type="datetimeFigureOut">
               <a:rPr lang="en-US" smtClean="0"/>
-              <a:t>11/7/2017</a:t>
+              <a:t>11/10/2017</a:t>
             </a:fld>
             <a:endParaRPr lang="en-US"/>
           </a:p>
@@ -3364,7 +3364,7 @@
           <a:p>
             <a:fld id="{916B8C92-D5E3-4480-8685-D57BEE386DE2}" type="datetimeFigureOut">
               <a:rPr lang="en-US" smtClean="0"/>
-              <a:t>11/7/2017</a:t>
+              <a:t>11/10/2017</a:t>
             </a:fld>
             <a:endParaRPr lang="en-US"/>
           </a:p>
@@ -15160,338 +15160,209 @@
       </p:sp>
       <p:grpSp>
         <p:nvGrpSpPr>
-          <p:cNvPr id="6" name="Group 5"/>
+          <p:cNvPr id="11" name="Group 10"/>
           <p:cNvGrpSpPr/>
           <p:nvPr/>
         </p:nvGrpSpPr>
         <p:grpSpPr>
           <a:xfrm>
-            <a:off x="1258430" y="267286"/>
-            <a:ext cx="8355569" cy="5845051"/>
-            <a:chOff x="1258430" y="267286"/>
-            <a:chExt cx="8355569" cy="5845051"/>
+            <a:off x="1178521" y="85526"/>
+            <a:ext cx="8825796" cy="6089246"/>
+            <a:chOff x="1178521" y="85526"/>
+            <a:chExt cx="8825796" cy="6089246"/>
           </a:xfrm>
         </p:grpSpPr>
+        <p:pic>
+          <p:nvPicPr>
+            <p:cNvPr id="10" name="Picture 9"/>
+            <p:cNvPicPr>
+              <a:picLocks noChangeAspect="1"/>
+            </p:cNvPicPr>
+            <p:nvPr/>
+          </p:nvPicPr>
+          <p:blipFill>
+            <a:blip r:embed="rId2"/>
+            <a:stretch>
+              <a:fillRect/>
+            </a:stretch>
+          </p:blipFill>
+          <p:spPr>
+            <a:xfrm>
+              <a:off x="1178521" y="85526"/>
+              <a:ext cx="8825796" cy="5867623"/>
+            </a:xfrm>
+            <a:prstGeom prst="rect">
+              <a:avLst/>
+            </a:prstGeom>
+          </p:spPr>
+        </p:pic>
         <p:grpSp>
           <p:nvGrpSpPr>
-            <p:cNvPr id="8" name="Group 7"/>
+            <p:cNvPr id="3" name="Group 2"/>
             <p:cNvGrpSpPr/>
             <p:nvPr/>
           </p:nvGrpSpPr>
           <p:grpSpPr>
             <a:xfrm>
-              <a:off x="1258430" y="267286"/>
-              <a:ext cx="8355569" cy="5845051"/>
-              <a:chOff x="1258430" y="267286"/>
-              <a:chExt cx="8355569" cy="5845051"/>
+              <a:off x="1912933" y="5769926"/>
+              <a:ext cx="7701066" cy="404846"/>
+              <a:chOff x="1889150" y="5734044"/>
+              <a:chExt cx="7701066" cy="404846"/>
             </a:xfrm>
           </p:grpSpPr>
-          <p:pic>
-            <p:nvPicPr>
-              <p:cNvPr id="2" name="Picture 1"/>
-              <p:cNvPicPr>
-                <a:picLocks noChangeAspect="1"/>
-              </p:cNvPicPr>
-              <p:nvPr/>
-            </p:nvPicPr>
-            <p:blipFill>
-              <a:blip r:embed="rId2"/>
-              <a:stretch>
-                <a:fillRect/>
-              </a:stretch>
-            </p:blipFill>
-            <p:spPr>
-              <a:xfrm>
-                <a:off x="1258430" y="267286"/>
-                <a:ext cx="8355569" cy="5632077"/>
-              </a:xfrm>
-              <a:prstGeom prst="rect">
-                <a:avLst/>
-              </a:prstGeom>
-            </p:spPr>
-          </p:pic>
           <p:grpSp>
             <p:nvGrpSpPr>
-              <p:cNvPr id="3" name="Group 2"/>
+              <p:cNvPr id="16" name="Group 15"/>
               <p:cNvGrpSpPr/>
               <p:nvPr/>
             </p:nvGrpSpPr>
             <p:grpSpPr>
               <a:xfrm>
-                <a:off x="1943471" y="5704158"/>
-                <a:ext cx="7356971" cy="408179"/>
-                <a:chOff x="1889150" y="5764796"/>
-                <a:chExt cx="7356971" cy="408179"/>
+                <a:off x="6569571" y="5734044"/>
+                <a:ext cx="3020645" cy="404846"/>
+                <a:chOff x="2179108" y="1614793"/>
+                <a:chExt cx="3617660" cy="446087"/>
+              </a:xfrm>
+            </p:grpSpPr>
+            <p:pic>
+              <p:nvPicPr>
+                <p:cNvPr id="17" name="Picture 16"/>
+                <p:cNvPicPr>
+                  <a:picLocks noChangeAspect="1"/>
+                </p:cNvPicPr>
+                <p:nvPr/>
+              </p:nvPicPr>
+              <p:blipFill>
+                <a:blip r:embed="rId3"/>
+                <a:stretch>
+                  <a:fillRect/>
+                </a:stretch>
+              </p:blipFill>
+              <p:spPr>
+                <a:xfrm>
+                  <a:off x="2179108" y="1614793"/>
+                  <a:ext cx="655912" cy="396304"/>
+                </a:xfrm>
+                <a:prstGeom prst="rect">
+                  <a:avLst/>
+                </a:prstGeom>
+              </p:spPr>
+            </p:pic>
+            <p:pic>
+              <p:nvPicPr>
+                <p:cNvPr id="18" name="Picture 17"/>
+                <p:cNvPicPr>
+                  <a:picLocks noChangeAspect="1"/>
+                </p:cNvPicPr>
+                <p:nvPr/>
+              </p:nvPicPr>
+              <p:blipFill>
+                <a:blip r:embed="rId4"/>
+                <a:stretch>
+                  <a:fillRect/>
+                </a:stretch>
+              </p:blipFill>
+              <p:spPr>
+                <a:xfrm>
+                  <a:off x="5068290" y="1711645"/>
+                  <a:ext cx="728478" cy="293882"/>
+                </a:xfrm>
+                <a:prstGeom prst="rect">
+                  <a:avLst/>
+                </a:prstGeom>
+              </p:spPr>
+            </p:pic>
+            <p:pic>
+              <p:nvPicPr>
+                <p:cNvPr id="20" name="Picture 19"/>
+                <p:cNvPicPr>
+                  <a:picLocks noChangeAspect="1"/>
+                </p:cNvPicPr>
+                <p:nvPr/>
+              </p:nvPicPr>
+              <p:blipFill>
+                <a:blip r:embed="rId5"/>
+                <a:stretch>
+                  <a:fillRect/>
+                </a:stretch>
+              </p:blipFill>
+              <p:spPr>
+                <a:xfrm>
+                  <a:off x="3645050" y="1651937"/>
+                  <a:ext cx="640805" cy="408943"/>
+                </a:xfrm>
+                <a:prstGeom prst="rect">
+                  <a:avLst/>
+                </a:prstGeom>
+              </p:spPr>
+            </p:pic>
+          </p:grpSp>
+          <p:grpSp>
+            <p:nvGrpSpPr>
+              <p:cNvPr id="7" name="Group 6"/>
+              <p:cNvGrpSpPr/>
+              <p:nvPr/>
+            </p:nvGrpSpPr>
+            <p:grpSpPr>
+              <a:xfrm>
+                <a:off x="1889150" y="5778666"/>
+                <a:ext cx="3379915" cy="344085"/>
+                <a:chOff x="1415503" y="5588783"/>
+                <a:chExt cx="3379915" cy="344085"/>
               </a:xfrm>
             </p:grpSpPr>
             <p:grpSp>
               <p:nvGrpSpPr>
-                <p:cNvPr id="16" name="Group 15"/>
+                <p:cNvPr id="19" name="Group 18"/>
                 <p:cNvGrpSpPr/>
                 <p:nvPr/>
               </p:nvGrpSpPr>
               <p:grpSpPr>
                 <a:xfrm>
-                  <a:off x="6307961" y="5764796"/>
-                  <a:ext cx="2938160" cy="408179"/>
-                  <a:chOff x="1865792" y="1648679"/>
-                  <a:chExt cx="3518872" cy="449760"/>
-                </a:xfrm>
-              </p:grpSpPr>
-              <p:pic>
-                <p:nvPicPr>
-                  <p:cNvPr id="17" name="Picture 16"/>
-                  <p:cNvPicPr>
-                    <a:picLocks noChangeAspect="1"/>
-                  </p:cNvPicPr>
-                  <p:nvPr/>
-                </p:nvPicPr>
-                <p:blipFill>
-                  <a:blip r:embed="rId3"/>
-                  <a:stretch>
-                    <a:fillRect/>
-                  </a:stretch>
-                </p:blipFill>
-                <p:spPr>
-                  <a:xfrm>
-                    <a:off x="1865792" y="1648679"/>
-                    <a:ext cx="655912" cy="396304"/>
-                  </a:xfrm>
-                  <a:prstGeom prst="rect">
-                    <a:avLst/>
-                  </a:prstGeom>
-                </p:spPr>
-              </p:pic>
-              <p:pic>
-                <p:nvPicPr>
-                  <p:cNvPr id="18" name="Picture 17"/>
-                  <p:cNvPicPr>
-                    <a:picLocks noChangeAspect="1"/>
-                  </p:cNvPicPr>
-                  <p:nvPr/>
-                </p:nvPicPr>
-                <p:blipFill>
-                  <a:blip r:embed="rId4"/>
-                  <a:stretch>
-                    <a:fillRect/>
-                  </a:stretch>
-                </p:blipFill>
-                <p:spPr>
-                  <a:xfrm>
-                    <a:off x="4656186" y="1749204"/>
-                    <a:ext cx="728478" cy="293882"/>
-                  </a:xfrm>
-                  <a:prstGeom prst="rect">
-                    <a:avLst/>
-                  </a:prstGeom>
-                </p:spPr>
-              </p:pic>
-              <p:pic>
-                <p:nvPicPr>
-                  <p:cNvPr id="20" name="Picture 19"/>
-                  <p:cNvPicPr>
-                    <a:picLocks noChangeAspect="1"/>
-                  </p:cNvPicPr>
-                  <p:nvPr/>
-                </p:nvPicPr>
-                <p:blipFill>
-                  <a:blip r:embed="rId5"/>
-                  <a:stretch>
-                    <a:fillRect/>
-                  </a:stretch>
-                </p:blipFill>
-                <p:spPr>
-                  <a:xfrm>
-                    <a:off x="3232947" y="1689497"/>
-                    <a:ext cx="640805" cy="408942"/>
-                  </a:xfrm>
-                  <a:prstGeom prst="rect">
-                    <a:avLst/>
-                  </a:prstGeom>
-                </p:spPr>
-              </p:pic>
-            </p:grpSp>
-            <p:grpSp>
-              <p:nvGrpSpPr>
-                <p:cNvPr id="7" name="Group 6"/>
-                <p:cNvGrpSpPr/>
-                <p:nvPr/>
-              </p:nvGrpSpPr>
-              <p:grpSpPr>
-                <a:xfrm>
-                  <a:off x="1889150" y="5779295"/>
-                  <a:ext cx="3287191" cy="343444"/>
-                  <a:chOff x="1415503" y="5589412"/>
-                  <a:chExt cx="3287191" cy="343444"/>
+                  <a:off x="1943831" y="5588783"/>
+                  <a:ext cx="2851587" cy="344085"/>
+                  <a:chOff x="2721670" y="6031203"/>
+                  <a:chExt cx="2261399" cy="238512"/>
                 </a:xfrm>
               </p:grpSpPr>
               <p:grpSp>
                 <p:nvGrpSpPr>
-                  <p:cNvPr id="19" name="Group 18"/>
+                  <p:cNvPr id="24" name="Group 23"/>
                   <p:cNvGrpSpPr/>
                   <p:nvPr/>
                 </p:nvGrpSpPr>
                 <p:grpSpPr>
                   <a:xfrm>
-                    <a:off x="1943830" y="5589412"/>
-                    <a:ext cx="2758864" cy="343444"/>
-                    <a:chOff x="2721670" y="6031647"/>
-                    <a:chExt cx="2187867" cy="238068"/>
+                    <a:off x="2721670" y="6031203"/>
+                    <a:ext cx="2261399" cy="238512"/>
+                    <a:chOff x="2887669" y="6031203"/>
+                    <a:chExt cx="2261399" cy="238512"/>
                   </a:xfrm>
                 </p:grpSpPr>
-                <p:grpSp>
-                  <p:nvGrpSpPr>
-                    <p:cNvPr id="24" name="Group 23"/>
-                    <p:cNvGrpSpPr/>
-                    <p:nvPr/>
-                  </p:nvGrpSpPr>
-                  <p:grpSpPr>
-                    <a:xfrm>
-                      <a:off x="2721670" y="6031647"/>
-                      <a:ext cx="2187867" cy="238068"/>
-                      <a:chOff x="2887669" y="6031647"/>
-                      <a:chExt cx="2187867" cy="238068"/>
-                    </a:xfrm>
-                  </p:grpSpPr>
-                  <p:pic>
-                    <p:nvPicPr>
-                      <p:cNvPr id="26" name="Picture 25"/>
-                      <p:cNvPicPr>
-                        <a:picLocks noChangeAspect="1"/>
-                      </p:cNvPicPr>
-                      <p:nvPr/>
-                    </p:nvPicPr>
-                    <p:blipFill>
-                      <a:blip r:embed="rId6" cstate="print">
-                        <a:extLst>
-                          <a:ext uri="{28A0092B-C50C-407E-A947-70E740481C1C}">
-                            <a14:useLocalDpi xmlns:a14="http://schemas.microsoft.com/office/drawing/2010/main" val="0"/>
-                          </a:ext>
-                        </a:extLst>
-                      </a:blip>
-                      <a:stretch>
-                        <a:fillRect/>
-                      </a:stretch>
-                    </p:blipFill>
-                    <p:spPr>
-                      <a:xfrm>
-                        <a:off x="3232233" y="6067039"/>
-                        <a:ext cx="325640" cy="161565"/>
-                      </a:xfrm>
-                      <a:prstGeom prst="rect">
-                        <a:avLst/>
-                      </a:prstGeom>
-                    </p:spPr>
-                  </p:pic>
-                  <p:pic>
-                    <p:nvPicPr>
-                      <p:cNvPr id="27" name="Picture 26"/>
-                      <p:cNvPicPr>
-                        <a:picLocks noChangeAspect="1"/>
-                      </p:cNvPicPr>
-                      <p:nvPr/>
-                    </p:nvPicPr>
-                    <p:blipFill>
-                      <a:blip r:embed="rId7" cstate="print">
-                        <a:extLst>
-                          <a:ext uri="{28A0092B-C50C-407E-A947-70E740481C1C}">
-                            <a14:useLocalDpi xmlns:a14="http://schemas.microsoft.com/office/drawing/2010/main" val="0"/>
-                          </a:ext>
-                        </a:extLst>
-                      </a:blip>
-                      <a:stretch>
-                        <a:fillRect/>
-                      </a:stretch>
-                    </p:blipFill>
-                    <p:spPr>
-                      <a:xfrm>
-                        <a:off x="3637828" y="6044119"/>
-                        <a:ext cx="280633" cy="225596"/>
-                      </a:xfrm>
-                      <a:prstGeom prst="rect">
-                        <a:avLst/>
-                      </a:prstGeom>
-                    </p:spPr>
-                  </p:pic>
-                  <p:pic>
-                    <p:nvPicPr>
-                      <p:cNvPr id="28" name="Picture 27"/>
-                      <p:cNvPicPr>
-                        <a:picLocks noChangeAspect="1"/>
-                      </p:cNvPicPr>
-                      <p:nvPr/>
-                    </p:nvPicPr>
-                    <p:blipFill>
-                      <a:blip r:embed="rId8" cstate="print">
-                        <a:extLst>
-                          <a:ext uri="{28A0092B-C50C-407E-A947-70E740481C1C}">
-                            <a14:useLocalDpi xmlns:a14="http://schemas.microsoft.com/office/drawing/2010/main" val="0"/>
-                          </a:ext>
-                        </a:extLst>
-                      </a:blip>
-                      <a:stretch>
-                        <a:fillRect/>
-                      </a:stretch>
-                    </p:blipFill>
-                    <p:spPr>
-                      <a:xfrm>
-                        <a:off x="2887669" y="6044119"/>
-                        <a:ext cx="274386" cy="225596"/>
-                      </a:xfrm>
-                      <a:prstGeom prst="rect">
-                        <a:avLst/>
-                      </a:prstGeom>
-                    </p:spPr>
-                  </p:pic>
-                  <p:pic>
-                    <p:nvPicPr>
-                      <p:cNvPr id="29" name="Picture 28"/>
-                      <p:cNvPicPr>
-                        <a:picLocks noChangeAspect="1"/>
-                      </p:cNvPicPr>
-                      <p:nvPr/>
-                    </p:nvPicPr>
-                    <p:blipFill>
-                      <a:blip r:embed="rId9" cstate="print">
-                        <a:extLst>
-                          <a:ext uri="{28A0092B-C50C-407E-A947-70E740481C1C}">
-                            <a14:useLocalDpi xmlns:a14="http://schemas.microsoft.com/office/drawing/2010/main" val="0"/>
-                          </a:ext>
-                        </a:extLst>
-                      </a:blip>
-                      <a:stretch>
-                        <a:fillRect/>
-                      </a:stretch>
-                    </p:blipFill>
-                    <p:spPr>
-                      <a:xfrm flipH="1">
-                        <a:off x="4819746" y="6031647"/>
-                        <a:ext cx="255790" cy="218495"/>
-                      </a:xfrm>
-                      <a:prstGeom prst="rect">
-                        <a:avLst/>
-                      </a:prstGeom>
-                    </p:spPr>
-                  </p:pic>
-                </p:grpSp>
                 <p:pic>
                   <p:nvPicPr>
-                    <p:cNvPr id="22" name="Picture 21"/>
+                    <p:cNvPr id="26" name="Picture 25"/>
                     <p:cNvPicPr>
                       <a:picLocks noChangeAspect="1"/>
                     </p:cNvPicPr>
                     <p:nvPr/>
                   </p:nvPicPr>
                   <p:blipFill>
-                    <a:blip r:embed="rId10"/>
+                    <a:blip r:embed="rId6" cstate="print">
+                      <a:extLst>
+                        <a:ext uri="{28A0092B-C50C-407E-A947-70E740481C1C}">
+                          <a14:useLocalDpi xmlns:a14="http://schemas.microsoft.com/office/drawing/2010/main" val="0"/>
+                        </a:ext>
+                      </a:extLst>
+                    </a:blip>
                     <a:stretch>
                       <a:fillRect/>
                     </a:stretch>
                   </p:blipFill>
                   <p:spPr>
                     <a:xfrm>
-                      <a:off x="4237781" y="6048554"/>
-                      <a:ext cx="334902" cy="198223"/>
+                      <a:off x="3283357" y="6066072"/>
+                      <a:ext cx="325640" cy="161565"/>
                     </a:xfrm>
                     <a:prstGeom prst="rect">
                       <a:avLst/>
@@ -15500,22 +15371,88 @@
                 </p:pic>
                 <p:pic>
                   <p:nvPicPr>
-                    <p:cNvPr id="23" name="Picture 22"/>
+                    <p:cNvPr id="27" name="Picture 26"/>
                     <p:cNvPicPr>
                       <a:picLocks noChangeAspect="1"/>
                     </p:cNvPicPr>
                     <p:nvPr/>
                   </p:nvPicPr>
                   <p:blipFill>
-                    <a:blip r:embed="rId11"/>
+                    <a:blip r:embed="rId7" cstate="print">
+                      <a:extLst>
+                        <a:ext uri="{28A0092B-C50C-407E-A947-70E740481C1C}">
+                          <a14:useLocalDpi xmlns:a14="http://schemas.microsoft.com/office/drawing/2010/main" val="0"/>
+                        </a:ext>
+                      </a:extLst>
+                    </a:blip>
                     <a:stretch>
                       <a:fillRect/>
                     </a:stretch>
                   </p:blipFill>
                   <p:spPr>
                     <a:xfrm>
-                      <a:off x="3825095" y="6051367"/>
-                      <a:ext cx="327300" cy="196986"/>
+                      <a:off x="3688952" y="6043152"/>
+                      <a:ext cx="280633" cy="225596"/>
+                    </a:xfrm>
+                    <a:prstGeom prst="rect">
+                      <a:avLst/>
+                    </a:prstGeom>
+                  </p:spPr>
+                </p:pic>
+                <p:pic>
+                  <p:nvPicPr>
+                    <p:cNvPr id="28" name="Picture 27"/>
+                    <p:cNvPicPr>
+                      <a:picLocks noChangeAspect="1"/>
+                    </p:cNvPicPr>
+                    <p:nvPr/>
+                  </p:nvPicPr>
+                  <p:blipFill>
+                    <a:blip r:embed="rId8" cstate="print">
+                      <a:extLst>
+                        <a:ext uri="{28A0092B-C50C-407E-A947-70E740481C1C}">
+                          <a14:useLocalDpi xmlns:a14="http://schemas.microsoft.com/office/drawing/2010/main" val="0"/>
+                        </a:ext>
+                      </a:extLst>
+                    </a:blip>
+                    <a:stretch>
+                      <a:fillRect/>
+                    </a:stretch>
+                  </p:blipFill>
+                  <p:spPr>
+                    <a:xfrm>
+                      <a:off x="2887669" y="6044119"/>
+                      <a:ext cx="274386" cy="225596"/>
+                    </a:xfrm>
+                    <a:prstGeom prst="rect">
+                      <a:avLst/>
+                    </a:prstGeom>
+                  </p:spPr>
+                </p:pic>
+                <p:pic>
+                  <p:nvPicPr>
+                    <p:cNvPr id="29" name="Picture 28"/>
+                    <p:cNvPicPr>
+                      <a:picLocks noChangeAspect="1"/>
+                    </p:cNvPicPr>
+                    <p:nvPr/>
+                  </p:nvPicPr>
+                  <p:blipFill>
+                    <a:blip r:embed="rId9" cstate="print">
+                      <a:extLst>
+                        <a:ext uri="{28A0092B-C50C-407E-A947-70E740481C1C}">
+                          <a14:useLocalDpi xmlns:a14="http://schemas.microsoft.com/office/drawing/2010/main" val="0"/>
+                        </a:ext>
+                      </a:extLst>
+                    </a:blip>
+                    <a:stretch>
+                      <a:fillRect/>
+                    </a:stretch>
+                  </p:blipFill>
+                  <p:spPr>
+                    <a:xfrm flipH="1">
+                      <a:off x="4893278" y="6031203"/>
+                      <a:ext cx="255790" cy="218495"/>
                     </a:xfrm>
                     <a:prstGeom prst="rect">
                       <a:avLst/>
@@ -15525,22 +15462,46 @@
               </p:grpSp>
               <p:pic>
                 <p:nvPicPr>
-                  <p:cNvPr id="4" name="Picture 3"/>
+                  <p:cNvPr id="22" name="Picture 21"/>
                   <p:cNvPicPr>
                     <a:picLocks noChangeAspect="1"/>
                   </p:cNvPicPr>
                   <p:nvPr/>
                 </p:nvPicPr>
                 <p:blipFill>
-                  <a:blip r:embed="rId12"/>
+                  <a:blip r:embed="rId10"/>
                   <a:stretch>
                     <a:fillRect/>
                   </a:stretch>
                 </p:blipFill>
                 <p:spPr>
                   <a:xfrm>
-                    <a:off x="1415503" y="5607909"/>
-                    <a:ext cx="373972" cy="294778"/>
+                    <a:off x="4288906" y="6047587"/>
+                    <a:ext cx="334902" cy="198223"/>
+                  </a:xfrm>
+                  <a:prstGeom prst="rect">
+                    <a:avLst/>
+                  </a:prstGeom>
+                </p:spPr>
+              </p:pic>
+              <p:pic>
+                <p:nvPicPr>
+                  <p:cNvPr id="23" name="Picture 22"/>
+                  <p:cNvPicPr>
+                    <a:picLocks noChangeAspect="1"/>
+                  </p:cNvPicPr>
+                  <p:nvPr/>
+                </p:nvPicPr>
+                <p:blipFill>
+                  <a:blip r:embed="rId11"/>
+                  <a:stretch>
+                    <a:fillRect/>
+                  </a:stretch>
+                </p:blipFill>
+                <p:spPr>
+                  <a:xfrm>
+                    <a:off x="3876220" y="6050400"/>
+                    <a:ext cx="327300" cy="196986"/>
                   </a:xfrm>
                   <a:prstGeom prst="rect">
                     <a:avLst/>
@@ -15548,93 +15509,109 @@
                 </p:spPr>
               </p:pic>
             </p:grpSp>
+            <p:pic>
+              <p:nvPicPr>
+                <p:cNvPr id="4" name="Picture 3"/>
+                <p:cNvPicPr>
+                  <a:picLocks noChangeAspect="1"/>
+                </p:cNvPicPr>
+                <p:nvPr/>
+              </p:nvPicPr>
+              <p:blipFill>
+                <a:blip r:embed="rId12"/>
+                <a:stretch>
+                  <a:fillRect/>
+                </a:stretch>
+              </p:blipFill>
+              <p:spPr>
+                <a:xfrm>
+                  <a:off x="1415503" y="5607909"/>
+                  <a:ext cx="373972" cy="294778"/>
+                </a:xfrm>
+                <a:prstGeom prst="rect">
+                  <a:avLst/>
+                </a:prstGeom>
+              </p:spPr>
+            </p:pic>
           </p:grpSp>
         </p:grpSp>
-        <p:sp>
-          <p:nvSpPr>
-            <p:cNvPr id="9" name="TextBox 8"/>
-            <p:cNvSpPr txBox="1"/>
-            <p:nvPr/>
-          </p:nvSpPr>
-          <p:spPr>
-            <a:xfrm>
-              <a:off x="4083113" y="2389023"/>
-              <a:ext cx="825002" cy="307777"/>
-            </a:xfrm>
-            <a:prstGeom prst="rect">
-              <a:avLst/>
-            </a:prstGeom>
-            <a:noFill/>
-          </p:spPr>
-          <p:txBody>
-            <a:bodyPr wrap="square" rtlCol="0">
-              <a:spAutoFit/>
-            </a:bodyPr>
-            <a:lstStyle/>
-            <a:p>
-              <a:r>
-                <a:rPr lang="en-US" sz="1400" dirty="0" smtClean="0"/>
-                <a:t>R</a:t>
-              </a:r>
-              <a:r>
-                <a:rPr lang="en-US" sz="1400" baseline="30000" dirty="0" smtClean="0"/>
-                <a:t>2 </a:t>
-              </a:r>
-              <a:r>
-                <a:rPr lang="en-US" sz="1400" dirty="0" smtClean="0"/>
-                <a:t>= </a:t>
-              </a:r>
-              <a:r>
-                <a:rPr lang="en-US" sz="1400" dirty="0" smtClean="0"/>
-                <a:t>0.24</a:t>
-              </a:r>
-              <a:endParaRPr lang="en-US" sz="1400" dirty="0"/>
-            </a:p>
-          </p:txBody>
-        </p:sp>
-        <p:sp>
-          <p:nvSpPr>
-            <p:cNvPr id="25" name="TextBox 24"/>
-            <p:cNvSpPr txBox="1"/>
-            <p:nvPr/>
-          </p:nvSpPr>
-          <p:spPr>
-            <a:xfrm>
-              <a:off x="8692182" y="2389023"/>
-              <a:ext cx="921817" cy="307777"/>
-            </a:xfrm>
-            <a:prstGeom prst="rect">
-              <a:avLst/>
-            </a:prstGeom>
-            <a:noFill/>
-          </p:spPr>
-          <p:txBody>
-            <a:bodyPr wrap="square" rtlCol="0">
-              <a:spAutoFit/>
-            </a:bodyPr>
-            <a:lstStyle/>
-            <a:p>
-              <a:r>
-                <a:rPr lang="en-US" sz="1400" dirty="0" smtClean="0"/>
-                <a:t>R</a:t>
-              </a:r>
-              <a:r>
-                <a:rPr lang="en-US" sz="1400" baseline="30000" dirty="0" smtClean="0"/>
-                <a:t>2 </a:t>
-              </a:r>
-              <a:r>
-                <a:rPr lang="en-US" sz="1400" dirty="0" smtClean="0"/>
-                <a:t>= </a:t>
-              </a:r>
-              <a:r>
-                <a:rPr lang="en-US" sz="1400" dirty="0" smtClean="0"/>
-                <a:t>0.41</a:t>
-              </a:r>
-              <a:endParaRPr lang="en-US" sz="1400" dirty="0"/>
-            </a:p>
-          </p:txBody>
-        </p:sp>
       </p:grpSp>
+      <p:sp>
+        <p:nvSpPr>
+          <p:cNvPr id="9" name="TextBox 8"/>
+          <p:cNvSpPr txBox="1"/>
+          <p:nvPr/>
+        </p:nvSpPr>
+        <p:spPr>
+          <a:xfrm>
+            <a:off x="4467846" y="2239176"/>
+            <a:ext cx="825002" cy="307777"/>
+          </a:xfrm>
+          <a:prstGeom prst="rect">
+            <a:avLst/>
+          </a:prstGeom>
+          <a:noFill/>
+        </p:spPr>
+        <p:txBody>
+          <a:bodyPr wrap="square" rtlCol="0">
+            <a:spAutoFit/>
+          </a:bodyPr>
+          <a:lstStyle/>
+          <a:p>
+            <a:r>
+              <a:rPr lang="en-US" sz="1400" dirty="0" smtClean="0"/>
+              <a:t>R</a:t>
+            </a:r>
+            <a:r>
+              <a:rPr lang="en-US" sz="1400" baseline="30000" dirty="0" smtClean="0"/>
+              <a:t>2 </a:t>
+            </a:r>
+            <a:r>
+              <a:rPr lang="en-US" sz="1400" dirty="0" smtClean="0"/>
+              <a:t>= 0.24</a:t>
+            </a:r>
+            <a:endParaRPr lang="en-US" sz="1400" dirty="0"/>
+          </a:p>
+        </p:txBody>
+      </p:sp>
+      <p:sp>
+        <p:nvSpPr>
+          <p:cNvPr id="25" name="TextBox 24"/>
+          <p:cNvSpPr txBox="1"/>
+          <p:nvPr/>
+        </p:nvSpPr>
+        <p:spPr>
+          <a:xfrm>
+            <a:off x="8999455" y="2266112"/>
+            <a:ext cx="921817" cy="307777"/>
+          </a:xfrm>
+          <a:prstGeom prst="rect">
+            <a:avLst/>
+          </a:prstGeom>
+          <a:noFill/>
+        </p:spPr>
+        <p:txBody>
+          <a:bodyPr wrap="square" rtlCol="0">
+            <a:spAutoFit/>
+          </a:bodyPr>
+          <a:lstStyle/>
+          <a:p>
+            <a:r>
+              <a:rPr lang="en-US" sz="1400" dirty="0" smtClean="0"/>
+              <a:t>R</a:t>
+            </a:r>
+            <a:r>
+              <a:rPr lang="en-US" sz="1400" baseline="30000" dirty="0" smtClean="0"/>
+              <a:t>2 </a:t>
+            </a:r>
+            <a:r>
+              <a:rPr lang="en-US" sz="1400" dirty="0" smtClean="0"/>
+              <a:t>= 0.41</a:t>
+            </a:r>
+            <a:endParaRPr lang="en-US" sz="1400" dirty="0"/>
+          </a:p>
+        </p:txBody>
+      </p:sp>
     </p:spTree>
     <p:extLst>
       <p:ext uri="{BB962C8B-B14F-4D97-AF65-F5344CB8AC3E}">
@@ -16120,11 +16097,7 @@
               </a:r>
               <a:r>
                 <a:rPr lang="en-US" sz="1400" dirty="0" smtClean="0"/>
-                <a:t>= </a:t>
-              </a:r>
-              <a:r>
-                <a:rPr lang="en-US" sz="1400" dirty="0" smtClean="0"/>
-                <a:t>0.17</a:t>
+                <a:t>= 0.17</a:t>
               </a:r>
               <a:endParaRPr lang="en-US" sz="1400" dirty="0"/>
             </a:p>
@@ -16162,11 +16135,7 @@
               </a:r>
               <a:r>
                 <a:rPr lang="en-US" sz="1400" dirty="0" smtClean="0"/>
-                <a:t>= </a:t>
-              </a:r>
-              <a:r>
-                <a:rPr lang="en-US" sz="1400" dirty="0" smtClean="0"/>
-                <a:t>0.24</a:t>
+                <a:t>= 0.24</a:t>
               </a:r>
               <a:endParaRPr lang="en-US" sz="1400" dirty="0"/>
             </a:p>
@@ -16390,13 +16359,8 @@
               </a:r>
               <a:r>
                 <a:rPr lang="en-US" sz="1400" dirty="0" smtClean="0"/>
-                <a:t>= </a:t>
+                <a:t>= 0.33</a:t>
               </a:r>
-              <a:r>
-                <a:rPr lang="en-US" sz="1400" dirty="0" smtClean="0"/>
-                <a:t>0.33</a:t>
-              </a:r>
-              <a:endParaRPr lang="en-US" sz="1400" dirty="0" smtClean="0"/>
             </a:p>
           </p:txBody>
         </p:sp>
@@ -16432,11 +16396,7 @@
               </a:r>
               <a:r>
                 <a:rPr lang="en-US" sz="1400" dirty="0" smtClean="0"/>
-                <a:t>= </a:t>
-              </a:r>
-              <a:r>
-                <a:rPr lang="en-US" sz="1400" dirty="0" smtClean="0"/>
-                <a:t>0.20</a:t>
+                <a:t>= 0.20</a:t>
               </a:r>
               <a:endParaRPr lang="en-US" sz="1400" dirty="0"/>
             </a:p>

</xml_diff>

<commit_message>
fixed bbs issues in suppls fig 4
</commit_message>
<xml_diff>
--- a/output/plots/all_figs_with_legends.pptx
+++ b/output/plots/all_figs_with_legends.pptx
@@ -15966,182 +15966,167 @@
       </p:sp>
       <p:grpSp>
         <p:nvGrpSpPr>
-          <p:cNvPr id="7" name="Group 6"/>
+          <p:cNvPr id="9" name="Group 8"/>
           <p:cNvGrpSpPr/>
           <p:nvPr/>
         </p:nvGrpSpPr>
         <p:grpSpPr>
           <a:xfrm>
-            <a:off x="1403286" y="0"/>
-            <a:ext cx="8537418" cy="6882386"/>
-            <a:chOff x="1403286" y="0"/>
-            <a:chExt cx="8537418" cy="6882386"/>
+            <a:off x="1412340" y="0"/>
+            <a:ext cx="8546472" cy="6896940"/>
+            <a:chOff x="1412340" y="0"/>
+            <a:chExt cx="8546472" cy="6896940"/>
           </a:xfrm>
         </p:grpSpPr>
-        <p:grpSp>
-          <p:nvGrpSpPr>
-            <p:cNvPr id="5" name="Group 4"/>
-            <p:cNvGrpSpPr/>
+        <p:pic>
+          <p:nvPicPr>
+            <p:cNvPr id="8" name="Picture 7"/>
+            <p:cNvPicPr>
+              <a:picLocks noChangeAspect="1"/>
+            </p:cNvPicPr>
             <p:nvPr/>
-          </p:nvGrpSpPr>
-          <p:grpSpPr>
-            <a:xfrm>
-              <a:off x="1403286" y="0"/>
-              <a:ext cx="8537418" cy="6882386"/>
-              <a:chOff x="1403286" y="0"/>
-              <a:chExt cx="8537418" cy="6882386"/>
-            </a:xfrm>
-          </p:grpSpPr>
-          <p:pic>
-            <p:nvPicPr>
-              <p:cNvPr id="2" name="Picture 1"/>
-              <p:cNvPicPr>
-                <a:picLocks noChangeAspect="1"/>
-              </p:cNvPicPr>
-              <p:nvPr/>
-            </p:nvPicPr>
-            <p:blipFill>
-              <a:blip r:embed="rId2"/>
-              <a:stretch>
-                <a:fillRect/>
-              </a:stretch>
-            </p:blipFill>
-            <p:spPr>
-              <a:xfrm>
-                <a:off x="1403286" y="0"/>
-                <a:ext cx="8537418" cy="6690419"/>
-              </a:xfrm>
-              <a:prstGeom prst="rect">
-                <a:avLst/>
-              </a:prstGeom>
-            </p:spPr>
-          </p:pic>
-          <p:pic>
-            <p:nvPicPr>
-              <p:cNvPr id="3" name="Picture 2"/>
-              <p:cNvPicPr>
-                <a:picLocks noChangeAspect="1"/>
-              </p:cNvPicPr>
-              <p:nvPr/>
-            </p:nvPicPr>
-            <p:blipFill>
-              <a:blip r:embed="rId3"/>
-              <a:stretch>
-                <a:fillRect/>
-              </a:stretch>
-            </p:blipFill>
-            <p:spPr>
-              <a:xfrm>
-                <a:off x="2211754" y="6516594"/>
-                <a:ext cx="3292125" cy="341406"/>
-              </a:xfrm>
-              <a:prstGeom prst="rect">
-                <a:avLst/>
-              </a:prstGeom>
-            </p:spPr>
-          </p:pic>
-          <p:pic>
-            <p:nvPicPr>
-              <p:cNvPr id="4" name="Picture 3"/>
-              <p:cNvPicPr>
-                <a:picLocks noChangeAspect="1"/>
-              </p:cNvPicPr>
-              <p:nvPr/>
-            </p:nvPicPr>
-            <p:blipFill>
-              <a:blip r:embed="rId4"/>
-              <a:stretch>
-                <a:fillRect/>
-              </a:stretch>
-            </p:blipFill>
-            <p:spPr>
-              <a:xfrm>
-                <a:off x="6784629" y="6492208"/>
-                <a:ext cx="2883658" cy="390178"/>
-              </a:xfrm>
-              <a:prstGeom prst="rect">
-                <a:avLst/>
-              </a:prstGeom>
-            </p:spPr>
-          </p:pic>
-        </p:grpSp>
-        <p:sp>
-          <p:nvSpPr>
-            <p:cNvPr id="10" name="TextBox 9"/>
-            <p:cNvSpPr txBox="1"/>
-            <p:nvPr/>
-          </p:nvSpPr>
+          </p:nvPicPr>
+          <p:blipFill>
+            <a:blip r:embed="rId2"/>
+            <a:stretch>
+              <a:fillRect/>
+            </a:stretch>
+          </p:blipFill>
           <p:spPr>
             <a:xfrm>
-              <a:off x="6476084" y="241704"/>
-              <a:ext cx="1998575" cy="307777"/>
+              <a:off x="1412340" y="0"/>
+              <a:ext cx="8546472" cy="6655236"/>
             </a:xfrm>
             <a:prstGeom prst="rect">
               <a:avLst/>
             </a:prstGeom>
-            <a:noFill/>
           </p:spPr>
-          <p:txBody>
-            <a:bodyPr wrap="square" rtlCol="0">
-              <a:spAutoFit/>
-            </a:bodyPr>
-            <a:lstStyle/>
-            <a:p>
-              <a:r>
-                <a:rPr lang="en-US" sz="1400" dirty="0" smtClean="0"/>
-                <a:t>R</a:t>
-              </a:r>
-              <a:r>
-                <a:rPr lang="en-US" sz="1400" baseline="30000" dirty="0" smtClean="0"/>
-                <a:t>2 </a:t>
-              </a:r>
-              <a:r>
-                <a:rPr lang="en-US" sz="1400" dirty="0" smtClean="0"/>
-                <a:t>= 0.17</a:t>
-              </a:r>
-              <a:endParaRPr lang="en-US" sz="1400" dirty="0"/>
-            </a:p>
-          </p:txBody>
-        </p:sp>
-        <p:sp>
-          <p:nvSpPr>
-            <p:cNvPr id="11" name="TextBox 10"/>
-            <p:cNvSpPr txBox="1"/>
+        </p:pic>
+        <p:pic>
+          <p:nvPicPr>
+            <p:cNvPr id="3" name="Picture 2"/>
+            <p:cNvPicPr>
+              <a:picLocks noChangeAspect="1"/>
+            </p:cNvPicPr>
             <p:nvPr/>
-          </p:nvSpPr>
+          </p:nvPicPr>
+          <p:blipFill>
+            <a:blip r:embed="rId3"/>
+            <a:stretch>
+              <a:fillRect/>
+            </a:stretch>
+          </p:blipFill>
           <p:spPr>
             <a:xfrm>
-              <a:off x="2211754" y="241704"/>
-              <a:ext cx="1998575" cy="307777"/>
+              <a:off x="2211754" y="6516594"/>
+              <a:ext cx="3292125" cy="341406"/>
             </a:xfrm>
             <a:prstGeom prst="rect">
               <a:avLst/>
             </a:prstGeom>
-            <a:noFill/>
           </p:spPr>
-          <p:txBody>
-            <a:bodyPr wrap="square" rtlCol="0">
-              <a:spAutoFit/>
-            </a:bodyPr>
-            <a:lstStyle/>
-            <a:p>
-              <a:r>
-                <a:rPr lang="en-US" sz="1400" dirty="0" smtClean="0"/>
-                <a:t>R</a:t>
-              </a:r>
-              <a:r>
-                <a:rPr lang="en-US" sz="1400" baseline="30000" dirty="0" smtClean="0"/>
-                <a:t>2 </a:t>
-              </a:r>
-              <a:r>
-                <a:rPr lang="en-US" sz="1400" dirty="0" smtClean="0"/>
-                <a:t>= 0.24</a:t>
-              </a:r>
-              <a:endParaRPr lang="en-US" sz="1400" dirty="0"/>
-            </a:p>
-          </p:txBody>
-        </p:sp>
+        </p:pic>
+        <p:pic>
+          <p:nvPicPr>
+            <p:cNvPr id="4" name="Picture 3"/>
+            <p:cNvPicPr>
+              <a:picLocks noChangeAspect="1"/>
+            </p:cNvPicPr>
+            <p:nvPr/>
+          </p:nvPicPr>
+          <p:blipFill>
+            <a:blip r:embed="rId4"/>
+            <a:stretch>
+              <a:fillRect/>
+            </a:stretch>
+          </p:blipFill>
+          <p:spPr>
+            <a:xfrm>
+              <a:off x="6757469" y="6506762"/>
+              <a:ext cx="2883658" cy="390178"/>
+            </a:xfrm>
+            <a:prstGeom prst="rect">
+              <a:avLst/>
+            </a:prstGeom>
+          </p:spPr>
+        </p:pic>
       </p:grpSp>
+      <p:sp>
+        <p:nvSpPr>
+          <p:cNvPr id="10" name="TextBox 9"/>
+          <p:cNvSpPr txBox="1"/>
+          <p:nvPr/>
+        </p:nvSpPr>
+        <p:spPr>
+          <a:xfrm>
+            <a:off x="6476084" y="241704"/>
+            <a:ext cx="1998575" cy="307777"/>
+          </a:xfrm>
+          <a:prstGeom prst="rect">
+            <a:avLst/>
+          </a:prstGeom>
+          <a:noFill/>
+        </p:spPr>
+        <p:txBody>
+          <a:bodyPr wrap="square" rtlCol="0">
+            <a:spAutoFit/>
+          </a:bodyPr>
+          <a:lstStyle/>
+          <a:p>
+            <a:r>
+              <a:rPr lang="en-US" sz="1400" dirty="0" smtClean="0"/>
+              <a:t>R</a:t>
+            </a:r>
+            <a:r>
+              <a:rPr lang="en-US" sz="1400" baseline="30000" dirty="0" smtClean="0"/>
+              <a:t>2 </a:t>
+            </a:r>
+            <a:r>
+              <a:rPr lang="en-US" sz="1400" dirty="0" smtClean="0"/>
+              <a:t>= 0.17</a:t>
+            </a:r>
+            <a:endParaRPr lang="en-US" sz="1400" dirty="0"/>
+          </a:p>
+        </p:txBody>
+      </p:sp>
+      <p:sp>
+        <p:nvSpPr>
+          <p:cNvPr id="11" name="TextBox 10"/>
+          <p:cNvSpPr txBox="1"/>
+          <p:nvPr/>
+        </p:nvSpPr>
+        <p:spPr>
+          <a:xfrm>
+            <a:off x="2211754" y="241704"/>
+            <a:ext cx="1998575" cy="307777"/>
+          </a:xfrm>
+          <a:prstGeom prst="rect">
+            <a:avLst/>
+          </a:prstGeom>
+          <a:noFill/>
+        </p:spPr>
+        <p:txBody>
+          <a:bodyPr wrap="square" rtlCol="0">
+            <a:spAutoFit/>
+          </a:bodyPr>
+          <a:lstStyle/>
+          <a:p>
+            <a:r>
+              <a:rPr lang="en-US" sz="1400" dirty="0" smtClean="0"/>
+              <a:t>R</a:t>
+            </a:r>
+            <a:r>
+              <a:rPr lang="en-US" sz="1400" baseline="30000" dirty="0" smtClean="0"/>
+              <a:t>2 </a:t>
+            </a:r>
+            <a:r>
+              <a:rPr lang="en-US" sz="1400" dirty="0" smtClean="0"/>
+              <a:t>= 0.24</a:t>
+            </a:r>
+            <a:endParaRPr lang="en-US" sz="1400" dirty="0"/>
+          </a:p>
+        </p:txBody>
+      </p:sp>
     </p:spTree>
     <p:extLst>
       <p:ext uri="{BB962C8B-B14F-4D97-AF65-F5344CB8AC3E}">
@@ -16213,196 +16198,181 @@
       </p:sp>
       <p:grpSp>
         <p:nvGrpSpPr>
-          <p:cNvPr id="8" name="Group 7"/>
+          <p:cNvPr id="4" name="Group 3"/>
           <p:cNvGrpSpPr/>
           <p:nvPr/>
         </p:nvGrpSpPr>
         <p:grpSpPr>
           <a:xfrm>
-            <a:off x="2018923" y="14893"/>
-            <a:ext cx="8577676" cy="6891879"/>
-            <a:chOff x="2018923" y="14893"/>
-            <a:chExt cx="8577676" cy="6891879"/>
+            <a:off x="2049214" y="0"/>
+            <a:ext cx="8560117" cy="6882386"/>
+            <a:chOff x="2049214" y="0"/>
+            <a:chExt cx="8560117" cy="6882386"/>
           </a:xfrm>
         </p:grpSpPr>
+        <p:pic>
+          <p:nvPicPr>
+            <p:cNvPr id="3" name="Picture 2"/>
+            <p:cNvPicPr>
+              <a:picLocks noChangeAspect="1"/>
+            </p:cNvPicPr>
+            <p:nvPr/>
+          </p:nvPicPr>
+          <p:blipFill>
+            <a:blip r:embed="rId2"/>
+            <a:stretch>
+              <a:fillRect/>
+            </a:stretch>
+          </p:blipFill>
+          <p:spPr>
+            <a:xfrm>
+              <a:off x="2049214" y="0"/>
+              <a:ext cx="8560117" cy="6693031"/>
+            </a:xfrm>
+            <a:prstGeom prst="rect">
+              <a:avLst/>
+            </a:prstGeom>
+          </p:spPr>
+        </p:pic>
         <p:grpSp>
           <p:nvGrpSpPr>
-            <p:cNvPr id="7" name="Group 6"/>
+            <p:cNvPr id="6" name="Group 5"/>
             <p:cNvGrpSpPr/>
             <p:nvPr/>
           </p:nvGrpSpPr>
           <p:grpSpPr>
             <a:xfrm>
-              <a:off x="2018923" y="14893"/>
-              <a:ext cx="8577676" cy="6891879"/>
-              <a:chOff x="2018923" y="14893"/>
-              <a:chExt cx="8577676" cy="6891879"/>
+              <a:off x="2831575" y="6492208"/>
+              <a:ext cx="7477361" cy="390178"/>
+              <a:chOff x="2831575" y="6492208"/>
+              <a:chExt cx="7477361" cy="390178"/>
             </a:xfrm>
           </p:grpSpPr>
           <p:pic>
             <p:nvPicPr>
-              <p:cNvPr id="5" name="Picture 4"/>
+              <p:cNvPr id="11" name="Picture 10"/>
               <p:cNvPicPr>
                 <a:picLocks noChangeAspect="1"/>
               </p:cNvPicPr>
               <p:nvPr/>
             </p:nvPicPr>
             <p:blipFill>
-              <a:blip r:embed="rId2"/>
+              <a:blip r:embed="rId3"/>
               <a:stretch>
                 <a:fillRect/>
               </a:stretch>
             </p:blipFill>
             <p:spPr>
               <a:xfrm>
-                <a:off x="2018923" y="14893"/>
-                <a:ext cx="8577676" cy="6672404"/>
+                <a:off x="2831575" y="6516594"/>
+                <a:ext cx="3286029" cy="341406"/>
               </a:xfrm>
               <a:prstGeom prst="rect">
                 <a:avLst/>
               </a:prstGeom>
             </p:spPr>
           </p:pic>
-          <p:grpSp>
-            <p:nvGrpSpPr>
-              <p:cNvPr id="6" name="Group 5"/>
-              <p:cNvGrpSpPr/>
+          <p:pic>
+            <p:nvPicPr>
+              <p:cNvPr id="12" name="Picture 11"/>
+              <p:cNvPicPr>
+                <a:picLocks noChangeAspect="1"/>
+              </p:cNvPicPr>
               <p:nvPr/>
-            </p:nvGrpSpPr>
-            <p:grpSpPr>
+            </p:nvPicPr>
+            <p:blipFill>
+              <a:blip r:embed="rId4"/>
+              <a:stretch>
+                <a:fillRect/>
+              </a:stretch>
+            </p:blipFill>
+            <p:spPr>
               <a:xfrm>
-                <a:off x="2831575" y="6516594"/>
-                <a:ext cx="7496215" cy="390178"/>
-                <a:chOff x="2831575" y="6516594"/>
-                <a:chExt cx="7496215" cy="390178"/>
+                <a:off x="7425278" y="6492208"/>
+                <a:ext cx="2883658" cy="390178"/>
               </a:xfrm>
-            </p:grpSpPr>
-            <p:pic>
-              <p:nvPicPr>
-                <p:cNvPr id="11" name="Picture 10"/>
-                <p:cNvPicPr>
-                  <a:picLocks noChangeAspect="1"/>
-                </p:cNvPicPr>
-                <p:nvPr/>
-              </p:nvPicPr>
-              <p:blipFill>
-                <a:blip r:embed="rId3"/>
-                <a:stretch>
-                  <a:fillRect/>
-                </a:stretch>
-              </p:blipFill>
-              <p:spPr>
-                <a:xfrm>
-                  <a:off x="2831575" y="6516594"/>
-                  <a:ext cx="3286029" cy="341406"/>
-                </a:xfrm>
-                <a:prstGeom prst="rect">
-                  <a:avLst/>
-                </a:prstGeom>
-              </p:spPr>
-            </p:pic>
-            <p:pic>
-              <p:nvPicPr>
-                <p:cNvPr id="12" name="Picture 11"/>
-                <p:cNvPicPr>
-                  <a:picLocks noChangeAspect="1"/>
-                </p:cNvPicPr>
-                <p:nvPr/>
-              </p:nvPicPr>
-              <p:blipFill>
-                <a:blip r:embed="rId4"/>
-                <a:stretch>
-                  <a:fillRect/>
-                </a:stretch>
-              </p:blipFill>
-              <p:spPr>
-                <a:xfrm>
-                  <a:off x="7444132" y="6516594"/>
-                  <a:ext cx="2883658" cy="390178"/>
-                </a:xfrm>
-                <a:prstGeom prst="rect">
-                  <a:avLst/>
-                </a:prstGeom>
-              </p:spPr>
-            </p:pic>
-          </p:grpSp>
+              <a:prstGeom prst="rect">
+                <a:avLst/>
+              </a:prstGeom>
+            </p:spPr>
+          </p:pic>
         </p:grpSp>
-        <p:sp>
-          <p:nvSpPr>
-            <p:cNvPr id="10" name="TextBox 9"/>
-            <p:cNvSpPr txBox="1"/>
-            <p:nvPr/>
-          </p:nvSpPr>
-          <p:spPr>
-            <a:xfrm>
-              <a:off x="7088826" y="2549897"/>
-              <a:ext cx="1998575" cy="307777"/>
-            </a:xfrm>
-            <a:prstGeom prst="rect">
-              <a:avLst/>
-            </a:prstGeom>
-            <a:noFill/>
-          </p:spPr>
-          <p:txBody>
-            <a:bodyPr wrap="square" rtlCol="0">
-              <a:spAutoFit/>
-            </a:bodyPr>
-            <a:lstStyle/>
-            <a:p>
-              <a:r>
-                <a:rPr lang="en-US" sz="1400" dirty="0" smtClean="0"/>
-                <a:t>R</a:t>
-              </a:r>
-              <a:r>
-                <a:rPr lang="en-US" sz="1400" baseline="30000" dirty="0" smtClean="0"/>
-                <a:t>2 </a:t>
-              </a:r>
-              <a:r>
-                <a:rPr lang="en-US" sz="1400" dirty="0" smtClean="0"/>
-                <a:t>= 0.33</a:t>
-              </a:r>
-            </a:p>
-          </p:txBody>
-        </p:sp>
-        <p:sp>
-          <p:nvSpPr>
-            <p:cNvPr id="13" name="TextBox 12"/>
-            <p:cNvSpPr txBox="1"/>
-            <p:nvPr/>
-          </p:nvSpPr>
-          <p:spPr>
-            <a:xfrm>
-              <a:off x="2758509" y="2549897"/>
-              <a:ext cx="1998575" cy="307777"/>
-            </a:xfrm>
-            <a:prstGeom prst="rect">
-              <a:avLst/>
-            </a:prstGeom>
-            <a:noFill/>
-          </p:spPr>
-          <p:txBody>
-            <a:bodyPr wrap="square" rtlCol="0">
-              <a:spAutoFit/>
-            </a:bodyPr>
-            <a:lstStyle/>
-            <a:p>
-              <a:r>
-                <a:rPr lang="en-US" sz="1400" dirty="0" smtClean="0"/>
-                <a:t>R</a:t>
-              </a:r>
-              <a:r>
-                <a:rPr lang="en-US" sz="1400" baseline="30000" dirty="0" smtClean="0"/>
-                <a:t>2 </a:t>
-              </a:r>
-              <a:r>
-                <a:rPr lang="en-US" sz="1400" dirty="0" smtClean="0"/>
-                <a:t>= 0.20</a:t>
-              </a:r>
-              <a:endParaRPr lang="en-US" sz="1400" dirty="0"/>
-            </a:p>
-          </p:txBody>
-        </p:sp>
       </p:grpSp>
+      <p:sp>
+        <p:nvSpPr>
+          <p:cNvPr id="10" name="TextBox 9"/>
+          <p:cNvSpPr txBox="1"/>
+          <p:nvPr/>
+        </p:nvSpPr>
+        <p:spPr>
+          <a:xfrm>
+            <a:off x="7088826" y="2549897"/>
+            <a:ext cx="1998575" cy="307777"/>
+          </a:xfrm>
+          <a:prstGeom prst="rect">
+            <a:avLst/>
+          </a:prstGeom>
+          <a:noFill/>
+        </p:spPr>
+        <p:txBody>
+          <a:bodyPr wrap="square" rtlCol="0">
+            <a:spAutoFit/>
+          </a:bodyPr>
+          <a:lstStyle/>
+          <a:p>
+            <a:r>
+              <a:rPr lang="en-US" sz="1400" dirty="0" smtClean="0"/>
+              <a:t>R</a:t>
+            </a:r>
+            <a:r>
+              <a:rPr lang="en-US" sz="1400" baseline="30000" dirty="0" smtClean="0"/>
+              <a:t>2 </a:t>
+            </a:r>
+            <a:r>
+              <a:rPr lang="en-US" sz="1400" dirty="0" smtClean="0"/>
+              <a:t>= 0.33</a:t>
+            </a:r>
+          </a:p>
+        </p:txBody>
+      </p:sp>
+      <p:sp>
+        <p:nvSpPr>
+          <p:cNvPr id="13" name="TextBox 12"/>
+          <p:cNvSpPr txBox="1"/>
+          <p:nvPr/>
+        </p:nvSpPr>
+        <p:spPr>
+          <a:xfrm>
+            <a:off x="2758509" y="2549897"/>
+            <a:ext cx="1998575" cy="307777"/>
+          </a:xfrm>
+          <a:prstGeom prst="rect">
+            <a:avLst/>
+          </a:prstGeom>
+          <a:noFill/>
+        </p:spPr>
+        <p:txBody>
+          <a:bodyPr wrap="square" rtlCol="0">
+            <a:spAutoFit/>
+          </a:bodyPr>
+          <a:lstStyle/>
+          <a:p>
+            <a:r>
+              <a:rPr lang="en-US" sz="1400" dirty="0" smtClean="0"/>
+              <a:t>R</a:t>
+            </a:r>
+            <a:r>
+              <a:rPr lang="en-US" sz="1400" baseline="30000" dirty="0" smtClean="0"/>
+              <a:t>2 </a:t>
+            </a:r>
+            <a:r>
+              <a:rPr lang="en-US" sz="1400" dirty="0" smtClean="0"/>
+              <a:t>= 0.20</a:t>
+            </a:r>
+            <a:endParaRPr lang="en-US" sz="1400" dirty="0"/>
+          </a:p>
+        </p:txBody>
+      </p:sp>
     </p:spTree>
     <p:extLst>
       <p:ext uri="{BB962C8B-B14F-4D97-AF65-F5344CB8AC3E}">

</xml_diff>

<commit_message>
updated R2s in powerpoint figs
</commit_message>
<xml_diff>
--- a/output/plots/all_figs_with_legends.pptx
+++ b/output/plots/all_figs_with_legends.pptx
@@ -3797,28 +3797,28 @@
                 <a:gridCol w="802944">
                   <a:extLst>
                     <a:ext uri="{9D8B030D-6E8A-4147-A177-3AD203B41FA5}">
-                      <a16:colId xmlns:a16="http://schemas.microsoft.com/office/drawing/2014/main" val="3777247511"/>
+                      <a16:colId xmlns:a16="http://schemas.microsoft.com/office/drawing/2014/main" xmlns="" val="3777247511"/>
                     </a:ext>
                   </a:extLst>
                 </a:gridCol>
                 <a:gridCol w="1200230">
                   <a:extLst>
                     <a:ext uri="{9D8B030D-6E8A-4147-A177-3AD203B41FA5}">
-                      <a16:colId xmlns:a16="http://schemas.microsoft.com/office/drawing/2014/main" val="3565287180"/>
+                      <a16:colId xmlns:a16="http://schemas.microsoft.com/office/drawing/2014/main" xmlns="" val="3565287180"/>
                     </a:ext>
                   </a:extLst>
                 </a:gridCol>
                 <a:gridCol w="710503">
                   <a:extLst>
                     <a:ext uri="{9D8B030D-6E8A-4147-A177-3AD203B41FA5}">
-                      <a16:colId xmlns:a16="http://schemas.microsoft.com/office/drawing/2014/main" val="310175345"/>
+                      <a16:colId xmlns:a16="http://schemas.microsoft.com/office/drawing/2014/main" xmlns="" val="310175345"/>
                     </a:ext>
                   </a:extLst>
                 </a:gridCol>
                 <a:gridCol w="1488412">
                   <a:extLst>
                     <a:ext uri="{9D8B030D-6E8A-4147-A177-3AD203B41FA5}">
-                      <a16:colId xmlns:a16="http://schemas.microsoft.com/office/drawing/2014/main" val="2991616883"/>
+                      <a16:colId xmlns:a16="http://schemas.microsoft.com/office/drawing/2014/main" xmlns="" val="2991616883"/>
                     </a:ext>
                   </a:extLst>
                 </a:gridCol>
@@ -4046,7 +4046,7 @@
                 </a:tc>
                 <a:extLst>
                   <a:ext uri="{0D108BD9-81ED-4DB2-BD59-A6C34878D82A}">
-                    <a16:rowId xmlns:a16="http://schemas.microsoft.com/office/drawing/2014/main" val="3689353912"/>
+                    <a16:rowId xmlns:a16="http://schemas.microsoft.com/office/drawing/2014/main" xmlns="" val="3689353912"/>
                   </a:ext>
                 </a:extLst>
               </a:tr>
@@ -4261,7 +4261,7 @@
                 </a:tc>
                 <a:extLst>
                   <a:ext uri="{0D108BD9-81ED-4DB2-BD59-A6C34878D82A}">
-                    <a16:rowId xmlns:a16="http://schemas.microsoft.com/office/drawing/2014/main" val="3236650058"/>
+                    <a16:rowId xmlns:a16="http://schemas.microsoft.com/office/drawing/2014/main" xmlns="" val="3236650058"/>
                   </a:ext>
                 </a:extLst>
               </a:tr>
@@ -4476,7 +4476,7 @@
                 </a:tc>
                 <a:extLst>
                   <a:ext uri="{0D108BD9-81ED-4DB2-BD59-A6C34878D82A}">
-                    <a16:rowId xmlns:a16="http://schemas.microsoft.com/office/drawing/2014/main" val="848586666"/>
+                    <a16:rowId xmlns:a16="http://schemas.microsoft.com/office/drawing/2014/main" xmlns="" val="848586666"/>
                   </a:ext>
                 </a:extLst>
               </a:tr>
@@ -4687,7 +4687,7 @@
                 </a:tc>
                 <a:extLst>
                   <a:ext uri="{0D108BD9-81ED-4DB2-BD59-A6C34878D82A}">
-                    <a16:rowId xmlns:a16="http://schemas.microsoft.com/office/drawing/2014/main" val="366495031"/>
+                    <a16:rowId xmlns:a16="http://schemas.microsoft.com/office/drawing/2014/main" xmlns="" val="366495031"/>
                   </a:ext>
                 </a:extLst>
               </a:tr>
@@ -4771,14 +4771,14 @@
                 <a:gridCol w="487265">
                   <a:extLst>
                     <a:ext uri="{9D8B030D-6E8A-4147-A177-3AD203B41FA5}">
-                      <a16:colId xmlns:a16="http://schemas.microsoft.com/office/drawing/2014/main" val="1812283001"/>
+                      <a16:colId xmlns:a16="http://schemas.microsoft.com/office/drawing/2014/main" xmlns="" val="1812283001"/>
                     </a:ext>
                   </a:extLst>
                 </a:gridCol>
                 <a:gridCol w="1427585">
                   <a:extLst>
                     <a:ext uri="{9D8B030D-6E8A-4147-A177-3AD203B41FA5}">
-                      <a16:colId xmlns:a16="http://schemas.microsoft.com/office/drawing/2014/main" val="3574134326"/>
+                      <a16:colId xmlns:a16="http://schemas.microsoft.com/office/drawing/2014/main" xmlns="" val="3574134326"/>
                     </a:ext>
                   </a:extLst>
                 </a:gridCol>
@@ -4810,7 +4810,7 @@
                 </a:tc>
                 <a:extLst>
                   <a:ext uri="{0D108BD9-81ED-4DB2-BD59-A6C34878D82A}">
-                    <a16:rowId xmlns:a16="http://schemas.microsoft.com/office/drawing/2014/main" val="34741539"/>
+                    <a16:rowId xmlns:a16="http://schemas.microsoft.com/office/drawing/2014/main" xmlns="" val="34741539"/>
                   </a:ext>
                 </a:extLst>
               </a:tr>
@@ -4841,7 +4841,7 @@
                 </a:tc>
                 <a:extLst>
                   <a:ext uri="{0D108BD9-81ED-4DB2-BD59-A6C34878D82A}">
-                    <a16:rowId xmlns:a16="http://schemas.microsoft.com/office/drawing/2014/main" val="1816204491"/>
+                    <a16:rowId xmlns:a16="http://schemas.microsoft.com/office/drawing/2014/main" xmlns="" val="1816204491"/>
                   </a:ext>
                 </a:extLst>
               </a:tr>
@@ -4872,7 +4872,7 @@
                 </a:tc>
                 <a:extLst>
                   <a:ext uri="{0D108BD9-81ED-4DB2-BD59-A6C34878D82A}">
-                    <a16:rowId xmlns:a16="http://schemas.microsoft.com/office/drawing/2014/main" val="3053943592"/>
+                    <a16:rowId xmlns:a16="http://schemas.microsoft.com/office/drawing/2014/main" xmlns="" val="3053943592"/>
                   </a:ext>
                 </a:extLst>
               </a:tr>
@@ -4903,7 +4903,7 @@
                 </a:tc>
                 <a:extLst>
                   <a:ext uri="{0D108BD9-81ED-4DB2-BD59-A6C34878D82A}">
-                    <a16:rowId xmlns:a16="http://schemas.microsoft.com/office/drawing/2014/main" val="1425409090"/>
+                    <a16:rowId xmlns:a16="http://schemas.microsoft.com/office/drawing/2014/main" xmlns="" val="1425409090"/>
                   </a:ext>
                 </a:extLst>
               </a:tr>
@@ -4934,7 +4934,7 @@
                 </a:tc>
                 <a:extLst>
                   <a:ext uri="{0D108BD9-81ED-4DB2-BD59-A6C34878D82A}">
-                    <a16:rowId xmlns:a16="http://schemas.microsoft.com/office/drawing/2014/main" val="3097088923"/>
+                    <a16:rowId xmlns:a16="http://schemas.microsoft.com/office/drawing/2014/main" xmlns="" val="3097088923"/>
                   </a:ext>
                 </a:extLst>
               </a:tr>
@@ -4965,7 +4965,7 @@
                 </a:tc>
                 <a:extLst>
                   <a:ext uri="{0D108BD9-81ED-4DB2-BD59-A6C34878D82A}">
-                    <a16:rowId xmlns:a16="http://schemas.microsoft.com/office/drawing/2014/main" val="1149511687"/>
+                    <a16:rowId xmlns:a16="http://schemas.microsoft.com/office/drawing/2014/main" xmlns="" val="1149511687"/>
                   </a:ext>
                 </a:extLst>
               </a:tr>
@@ -4996,7 +4996,7 @@
                 </a:tc>
                 <a:extLst>
                   <a:ext uri="{0D108BD9-81ED-4DB2-BD59-A6C34878D82A}">
-                    <a16:rowId xmlns:a16="http://schemas.microsoft.com/office/drawing/2014/main" val="785655806"/>
+                    <a16:rowId xmlns:a16="http://schemas.microsoft.com/office/drawing/2014/main" xmlns="" val="785655806"/>
                   </a:ext>
                 </a:extLst>
               </a:tr>
@@ -5252,14 +5252,14 @@
                 <a:gridCol w="1261110">
                   <a:extLst>
                     <a:ext uri="{9D8B030D-6E8A-4147-A177-3AD203B41FA5}">
-                      <a16:colId xmlns:a16="http://schemas.microsoft.com/office/drawing/2014/main" val="1963467705"/>
+                      <a16:colId xmlns:a16="http://schemas.microsoft.com/office/drawing/2014/main" xmlns="" val="1963467705"/>
                     </a:ext>
                   </a:extLst>
                 </a:gridCol>
                 <a:gridCol w="928174">
                   <a:extLst>
                     <a:ext uri="{9D8B030D-6E8A-4147-A177-3AD203B41FA5}">
-                      <a16:colId xmlns:a16="http://schemas.microsoft.com/office/drawing/2014/main" val="464586843"/>
+                      <a16:colId xmlns:a16="http://schemas.microsoft.com/office/drawing/2014/main" xmlns="" val="464586843"/>
                     </a:ext>
                   </a:extLst>
                 </a:gridCol>
@@ -5367,7 +5367,7 @@
                 </a:tc>
                 <a:extLst>
                   <a:ext uri="{0D108BD9-81ED-4DB2-BD59-A6C34878D82A}">
-                    <a16:rowId xmlns:a16="http://schemas.microsoft.com/office/drawing/2014/main" val="1216226580"/>
+                    <a16:rowId xmlns:a16="http://schemas.microsoft.com/office/drawing/2014/main" xmlns="" val="1216226580"/>
                   </a:ext>
                 </a:extLst>
               </a:tr>
@@ -5474,7 +5474,7 @@
                 </a:tc>
                 <a:extLst>
                   <a:ext uri="{0D108BD9-81ED-4DB2-BD59-A6C34878D82A}">
-                    <a16:rowId xmlns:a16="http://schemas.microsoft.com/office/drawing/2014/main" val="512741848"/>
+                    <a16:rowId xmlns:a16="http://schemas.microsoft.com/office/drawing/2014/main" xmlns="" val="512741848"/>
                   </a:ext>
                 </a:extLst>
               </a:tr>
@@ -5581,7 +5581,7 @@
                 </a:tc>
                 <a:extLst>
                   <a:ext uri="{0D108BD9-81ED-4DB2-BD59-A6C34878D82A}">
-                    <a16:rowId xmlns:a16="http://schemas.microsoft.com/office/drawing/2014/main" val="2231260421"/>
+                    <a16:rowId xmlns:a16="http://schemas.microsoft.com/office/drawing/2014/main" xmlns="" val="2231260421"/>
                   </a:ext>
                 </a:extLst>
               </a:tr>
@@ -6841,14 +6841,14 @@
                 <a:gridCol w="872346">
                   <a:extLst>
                     <a:ext uri="{9D8B030D-6E8A-4147-A177-3AD203B41FA5}">
-                      <a16:colId xmlns:a16="http://schemas.microsoft.com/office/drawing/2014/main" val="20000"/>
+                      <a16:colId xmlns:a16="http://schemas.microsoft.com/office/drawing/2014/main" xmlns="" val="20000"/>
                     </a:ext>
                   </a:extLst>
                 </a:gridCol>
                 <a:gridCol w="872346">
                   <a:extLst>
                     <a:ext uri="{9D8B030D-6E8A-4147-A177-3AD203B41FA5}">
-                      <a16:colId xmlns:a16="http://schemas.microsoft.com/office/drawing/2014/main" val="20001"/>
+                      <a16:colId xmlns:a16="http://schemas.microsoft.com/office/drawing/2014/main" xmlns="" val="20001"/>
                     </a:ext>
                   </a:extLst>
                 </a:gridCol>
@@ -6968,7 +6968,7 @@
                 </a:tc>
                 <a:extLst>
                   <a:ext uri="{0D108BD9-81ED-4DB2-BD59-A6C34878D82A}">
-                    <a16:rowId xmlns:a16="http://schemas.microsoft.com/office/drawing/2014/main" val="10000"/>
+                    <a16:rowId xmlns:a16="http://schemas.microsoft.com/office/drawing/2014/main" xmlns="" val="10000"/>
                   </a:ext>
                 </a:extLst>
               </a:tr>
@@ -7087,7 +7087,7 @@
                 </a:tc>
                 <a:extLst>
                   <a:ext uri="{0D108BD9-81ED-4DB2-BD59-A6C34878D82A}">
-                    <a16:rowId xmlns:a16="http://schemas.microsoft.com/office/drawing/2014/main" val="10001"/>
+                    <a16:rowId xmlns:a16="http://schemas.microsoft.com/office/drawing/2014/main" xmlns="" val="10001"/>
                   </a:ext>
                 </a:extLst>
               </a:tr>
@@ -15568,7 +15568,11 @@
             </a:r>
             <a:r>
               <a:rPr lang="en-US" sz="1400" dirty="0" smtClean="0"/>
-              <a:t>= 0.24</a:t>
+              <a:t>= </a:t>
+            </a:r>
+            <a:r>
+              <a:rPr lang="en-US" sz="1400" dirty="0" smtClean="0"/>
+              <a:t>0.21</a:t>
             </a:r>
             <a:endParaRPr lang="en-US" sz="1400" dirty="0"/>
           </a:p>
@@ -15606,7 +15610,11 @@
             </a:r>
             <a:r>
               <a:rPr lang="en-US" sz="1400" dirty="0" smtClean="0"/>
-              <a:t>= 0.41</a:t>
+              <a:t>= </a:t>
+            </a:r>
+            <a:r>
+              <a:rPr lang="en-US" sz="1400" dirty="0" smtClean="0"/>
+              <a:t>0.43</a:t>
             </a:r>
             <a:endParaRPr lang="en-US" sz="1400" dirty="0"/>
           </a:p>
@@ -16083,7 +16091,11 @@
             </a:r>
             <a:r>
               <a:rPr lang="en-US" sz="1400" dirty="0" smtClean="0"/>
-              <a:t>= 0.17</a:t>
+              <a:t>= </a:t>
+            </a:r>
+            <a:r>
+              <a:rPr lang="en-US" sz="1400" dirty="0" smtClean="0"/>
+              <a:t>0.21</a:t>
             </a:r>
             <a:endParaRPr lang="en-US" sz="1400" dirty="0"/>
           </a:p>
@@ -16121,7 +16133,11 @@
             </a:r>
             <a:r>
               <a:rPr lang="en-US" sz="1400" dirty="0" smtClean="0"/>
-              <a:t>= 0.24</a:t>
+              <a:t>= </a:t>
+            </a:r>
+            <a:r>
+              <a:rPr lang="en-US" sz="1400" dirty="0" smtClean="0"/>
+              <a:t>0.17</a:t>
             </a:r>
             <a:endParaRPr lang="en-US" sz="1400" dirty="0"/>
           </a:p>
@@ -16330,8 +16346,13 @@
             </a:r>
             <a:r>
               <a:rPr lang="en-US" sz="1400" dirty="0" smtClean="0"/>
-              <a:t>= 0.33</a:t>
+              <a:t>= </a:t>
             </a:r>
+            <a:r>
+              <a:rPr lang="en-US" sz="1400" dirty="0" smtClean="0"/>
+              <a:t>0.32</a:t>
+            </a:r>
+            <a:endParaRPr lang="en-US" sz="1400" dirty="0" smtClean="0"/>
           </a:p>
         </p:txBody>
       </p:sp>
@@ -16367,7 +16388,11 @@
             </a:r>
             <a:r>
               <a:rPr lang="en-US" sz="1400" dirty="0" smtClean="0"/>
-              <a:t>= 0.20</a:t>
+              <a:t>= </a:t>
+            </a:r>
+            <a:r>
+              <a:rPr lang="en-US" sz="1400" dirty="0" smtClean="0"/>
+              <a:t>0.17</a:t>
             </a:r>
             <a:endParaRPr lang="en-US" sz="1400" dirty="0"/>
           </a:p>

</xml_diff>

<commit_message>
fixed figure 2b axis
</commit_message>
<xml_diff>
--- a/output/plots/all_figs_with_legends.pptx
+++ b/output/plots/all_figs_with_legends.pptx
@@ -210,7 +210,7 @@
           <a:p>
             <a:fld id="{7FA21820-D199-4D82-91AF-C50B1D3B111A}" type="datetimeFigureOut">
               <a:rPr lang="en-US" smtClean="0"/>
-              <a:t>11/10/2017</a:t>
+              <a:t>1/5/2018</a:t>
             </a:fld>
             <a:endParaRPr lang="en-US"/>
           </a:p>
@@ -1043,7 +1043,7 @@
           <a:p>
             <a:fld id="{916B8C92-D5E3-4480-8685-D57BEE386DE2}" type="datetimeFigureOut">
               <a:rPr lang="en-US" smtClean="0"/>
-              <a:t>11/10/2017</a:t>
+              <a:t>1/5/2018</a:t>
             </a:fld>
             <a:endParaRPr lang="en-US"/>
           </a:p>
@@ -1213,7 +1213,7 @@
           <a:p>
             <a:fld id="{916B8C92-D5E3-4480-8685-D57BEE386DE2}" type="datetimeFigureOut">
               <a:rPr lang="en-US" smtClean="0"/>
-              <a:t>11/10/2017</a:t>
+              <a:t>1/5/2018</a:t>
             </a:fld>
             <a:endParaRPr lang="en-US"/>
           </a:p>
@@ -1393,7 +1393,7 @@
           <a:p>
             <a:fld id="{916B8C92-D5E3-4480-8685-D57BEE386DE2}" type="datetimeFigureOut">
               <a:rPr lang="en-US" smtClean="0"/>
-              <a:t>11/10/2017</a:t>
+              <a:t>1/5/2018</a:t>
             </a:fld>
             <a:endParaRPr lang="en-US"/>
           </a:p>
@@ -1563,7 +1563,7 @@
           <a:p>
             <a:fld id="{916B8C92-D5E3-4480-8685-D57BEE386DE2}" type="datetimeFigureOut">
               <a:rPr lang="en-US" smtClean="0"/>
-              <a:t>11/10/2017</a:t>
+              <a:t>1/5/2018</a:t>
             </a:fld>
             <a:endParaRPr lang="en-US"/>
           </a:p>
@@ -1809,7 +1809,7 @@
           <a:p>
             <a:fld id="{916B8C92-D5E3-4480-8685-D57BEE386DE2}" type="datetimeFigureOut">
               <a:rPr lang="en-US" smtClean="0"/>
-              <a:t>11/10/2017</a:t>
+              <a:t>1/5/2018</a:t>
             </a:fld>
             <a:endParaRPr lang="en-US"/>
           </a:p>
@@ -2041,7 +2041,7 @@
           <a:p>
             <a:fld id="{916B8C92-D5E3-4480-8685-D57BEE386DE2}" type="datetimeFigureOut">
               <a:rPr lang="en-US" smtClean="0"/>
-              <a:t>11/10/2017</a:t>
+              <a:t>1/5/2018</a:t>
             </a:fld>
             <a:endParaRPr lang="en-US"/>
           </a:p>
@@ -2408,7 +2408,7 @@
           <a:p>
             <a:fld id="{916B8C92-D5E3-4480-8685-D57BEE386DE2}" type="datetimeFigureOut">
               <a:rPr lang="en-US" smtClean="0"/>
-              <a:t>11/10/2017</a:t>
+              <a:t>1/5/2018</a:t>
             </a:fld>
             <a:endParaRPr lang="en-US"/>
           </a:p>
@@ -2526,7 +2526,7 @@
           <a:p>
             <a:fld id="{916B8C92-D5E3-4480-8685-D57BEE386DE2}" type="datetimeFigureOut">
               <a:rPr lang="en-US" smtClean="0"/>
-              <a:t>11/10/2017</a:t>
+              <a:t>1/5/2018</a:t>
             </a:fld>
             <a:endParaRPr lang="en-US"/>
           </a:p>
@@ -2621,7 +2621,7 @@
           <a:p>
             <a:fld id="{916B8C92-D5E3-4480-8685-D57BEE386DE2}" type="datetimeFigureOut">
               <a:rPr lang="en-US" smtClean="0"/>
-              <a:t>11/10/2017</a:t>
+              <a:t>1/5/2018</a:t>
             </a:fld>
             <a:endParaRPr lang="en-US"/>
           </a:p>
@@ -2898,7 +2898,7 @@
           <a:p>
             <a:fld id="{916B8C92-D5E3-4480-8685-D57BEE386DE2}" type="datetimeFigureOut">
               <a:rPr lang="en-US" smtClean="0"/>
-              <a:t>11/10/2017</a:t>
+              <a:t>1/5/2018</a:t>
             </a:fld>
             <a:endParaRPr lang="en-US"/>
           </a:p>
@@ -3151,7 +3151,7 @@
           <a:p>
             <a:fld id="{916B8C92-D5E3-4480-8685-D57BEE386DE2}" type="datetimeFigureOut">
               <a:rPr lang="en-US" smtClean="0"/>
-              <a:t>11/10/2017</a:t>
+              <a:t>1/5/2018</a:t>
             </a:fld>
             <a:endParaRPr lang="en-US"/>
           </a:p>
@@ -3364,7 +3364,7 @@
           <a:p>
             <a:fld id="{916B8C92-D5E3-4480-8685-D57BEE386DE2}" type="datetimeFigureOut">
               <a:rPr lang="en-US" smtClean="0"/>
-              <a:t>11/10/2017</a:t>
+              <a:t>1/5/2018</a:t>
             </a:fld>
             <a:endParaRPr lang="en-US"/>
           </a:p>
@@ -12816,30 +12816,6 @@
           <a:chExt cx="0" cy="0"/>
         </a:xfrm>
       </p:grpSpPr>
-      <p:pic>
-        <p:nvPicPr>
-          <p:cNvPr id="5" name="Picture 4"/>
-          <p:cNvPicPr>
-            <a:picLocks noChangeAspect="1"/>
-          </p:cNvPicPr>
-          <p:nvPr/>
-        </p:nvPicPr>
-        <p:blipFill>
-          <a:blip r:embed="rId3"/>
-          <a:stretch>
-            <a:fillRect/>
-          </a:stretch>
-        </p:blipFill>
-        <p:spPr>
-          <a:xfrm>
-            <a:off x="2245197" y="1328571"/>
-            <a:ext cx="7251270" cy="5381962"/>
-          </a:xfrm>
-          <a:prstGeom prst="rect">
-            <a:avLst/>
-          </a:prstGeom>
-        </p:spPr>
-      </p:pic>
       <p:sp>
         <p:nvSpPr>
           <p:cNvPr id="2" name="TextBox 1"/>
@@ -12872,791 +12848,151 @@
       </p:sp>
       <p:grpSp>
         <p:nvGrpSpPr>
-          <p:cNvPr id="15" name="Group 14"/>
+          <p:cNvPr id="8" name="Group 7"/>
           <p:cNvGrpSpPr/>
           <p:nvPr/>
         </p:nvGrpSpPr>
         <p:grpSpPr>
           <a:xfrm>
-            <a:off x="3393215" y="29029"/>
-            <a:ext cx="4875431" cy="1300710"/>
-            <a:chOff x="3455272" y="318618"/>
-            <a:chExt cx="4875431" cy="1300710"/>
-          </a:xfrm>
-        </p:grpSpPr>
-        <p:grpSp>
-          <p:nvGrpSpPr>
-            <p:cNvPr id="6" name="Group 5"/>
-            <p:cNvGrpSpPr/>
-            <p:nvPr/>
-          </p:nvGrpSpPr>
-          <p:grpSpPr>
-            <a:xfrm>
-              <a:off x="5561297" y="392532"/>
-              <a:ext cx="2769406" cy="1177791"/>
-              <a:chOff x="3570725" y="253106"/>
-              <a:chExt cx="2769406" cy="1177791"/>
-            </a:xfrm>
-          </p:grpSpPr>
-          <p:pic>
-            <p:nvPicPr>
-              <p:cNvPr id="62" name="Picture 61"/>
-              <p:cNvPicPr>
-                <a:picLocks noChangeAspect="1"/>
-              </p:cNvPicPr>
-              <p:nvPr/>
-            </p:nvPicPr>
-            <p:blipFill>
-              <a:blip r:embed="rId4"/>
-              <a:stretch>
-                <a:fillRect/>
-              </a:stretch>
-            </p:blipFill>
-            <p:spPr>
-              <a:xfrm>
-                <a:off x="3582567" y="564020"/>
-                <a:ext cx="477444" cy="250454"/>
-              </a:xfrm>
-              <a:prstGeom prst="rect">
-                <a:avLst/>
-              </a:prstGeom>
-            </p:spPr>
-          </p:pic>
-          <p:pic>
-            <p:nvPicPr>
-              <p:cNvPr id="104" name="Picture 103"/>
-              <p:cNvPicPr>
-                <a:picLocks noChangeAspect="1"/>
-              </p:cNvPicPr>
-              <p:nvPr/>
-            </p:nvPicPr>
-            <p:blipFill>
-              <a:blip r:embed="rId5" cstate="print">
-                <a:extLst>
-                  <a:ext uri="{28A0092B-C50C-407E-A947-70E740481C1C}">
-                    <a14:useLocalDpi xmlns:a14="http://schemas.microsoft.com/office/drawing/2010/main" val="0"/>
-                  </a:ext>
-                </a:extLst>
-              </a:blip>
-              <a:stretch>
-                <a:fillRect/>
-              </a:stretch>
-            </p:blipFill>
-            <p:spPr>
-              <a:xfrm flipH="1">
-                <a:off x="3652152" y="253354"/>
-                <a:ext cx="374608" cy="278904"/>
-              </a:xfrm>
-              <a:prstGeom prst="rect">
-                <a:avLst/>
-              </a:prstGeom>
-            </p:spPr>
-          </p:pic>
-          <p:pic>
-            <p:nvPicPr>
-              <p:cNvPr id="105" name="Picture 104"/>
-              <p:cNvPicPr>
-                <a:picLocks noChangeAspect="1"/>
-              </p:cNvPicPr>
-              <p:nvPr/>
-            </p:nvPicPr>
-            <p:blipFill>
-              <a:blip r:embed="rId6"/>
-              <a:stretch>
-                <a:fillRect/>
-              </a:stretch>
-            </p:blipFill>
-            <p:spPr>
-              <a:xfrm>
-                <a:off x="3570725" y="1174766"/>
-                <a:ext cx="496489" cy="256131"/>
-              </a:xfrm>
-              <a:prstGeom prst="rect">
-                <a:avLst/>
-              </a:prstGeom>
-            </p:spPr>
-          </p:pic>
-          <p:pic>
-            <p:nvPicPr>
-              <p:cNvPr id="106" name="Picture 105"/>
-              <p:cNvPicPr>
-                <a:picLocks noChangeAspect="1"/>
-              </p:cNvPicPr>
-              <p:nvPr/>
-            </p:nvPicPr>
-            <p:blipFill>
-              <a:blip r:embed="rId7" cstate="print">
-                <a:extLst>
-                  <a:ext uri="{28A0092B-C50C-407E-A947-70E740481C1C}">
-                    <a14:useLocalDpi xmlns:a14="http://schemas.microsoft.com/office/drawing/2010/main" val="0"/>
-                  </a:ext>
-                </a:extLst>
-              </a:blip>
-              <a:stretch>
-                <a:fillRect/>
-              </a:stretch>
-            </p:blipFill>
-            <p:spPr>
-              <a:xfrm>
-                <a:off x="3582567" y="929976"/>
-                <a:ext cx="477445" cy="206467"/>
-              </a:xfrm>
-              <a:prstGeom prst="rect">
-                <a:avLst/>
-              </a:prstGeom>
-            </p:spPr>
-          </p:pic>
-          <p:pic>
-            <p:nvPicPr>
-              <p:cNvPr id="107" name="Picture 106"/>
-              <p:cNvPicPr>
-                <a:picLocks noChangeAspect="1"/>
-              </p:cNvPicPr>
-              <p:nvPr/>
-            </p:nvPicPr>
-            <p:blipFill>
-              <a:blip r:embed="rId8" cstate="print">
-                <a:extLst>
-                  <a:ext uri="{28A0092B-C50C-407E-A947-70E740481C1C}">
-                    <a14:useLocalDpi xmlns:a14="http://schemas.microsoft.com/office/drawing/2010/main" val="0"/>
-                  </a:ext>
-                </a:extLst>
-              </a:blip>
-              <a:stretch>
-                <a:fillRect/>
-              </a:stretch>
-            </p:blipFill>
-            <p:spPr>
-              <a:xfrm>
-                <a:off x="4873128" y="253106"/>
-                <a:ext cx="415769" cy="297946"/>
-              </a:xfrm>
-              <a:prstGeom prst="rect">
-                <a:avLst/>
-              </a:prstGeom>
-            </p:spPr>
-          </p:pic>
-          <p:pic>
-            <p:nvPicPr>
-              <p:cNvPr id="108" name="Picture 107"/>
-              <p:cNvPicPr>
-                <a:picLocks noChangeAspect="1"/>
-              </p:cNvPicPr>
-              <p:nvPr/>
-            </p:nvPicPr>
-            <p:blipFill>
-              <a:blip r:embed="rId9"/>
-              <a:stretch>
-                <a:fillRect/>
-              </a:stretch>
-            </p:blipFill>
-            <p:spPr>
-              <a:xfrm>
-                <a:off x="4873128" y="532105"/>
-                <a:ext cx="394437" cy="268537"/>
-              </a:xfrm>
-              <a:prstGeom prst="rect">
-                <a:avLst/>
-              </a:prstGeom>
-            </p:spPr>
-          </p:pic>
-          <p:pic>
-            <p:nvPicPr>
-              <p:cNvPr id="109" name="Picture 108"/>
-              <p:cNvPicPr>
-                <a:picLocks noChangeAspect="1"/>
-              </p:cNvPicPr>
-              <p:nvPr/>
-            </p:nvPicPr>
-            <p:blipFill>
-              <a:blip r:embed="rId10" cstate="print">
-                <a:extLst>
-                  <a:ext uri="{28A0092B-C50C-407E-A947-70E740481C1C}">
-                    <a14:useLocalDpi xmlns:a14="http://schemas.microsoft.com/office/drawing/2010/main" val="0"/>
-                  </a:ext>
-                </a:extLst>
-              </a:blip>
-              <a:stretch>
-                <a:fillRect/>
-              </a:stretch>
-            </p:blipFill>
-            <p:spPr>
-              <a:xfrm>
-                <a:off x="4873128" y="814255"/>
-                <a:ext cx="394437" cy="276368"/>
-              </a:xfrm>
-              <a:prstGeom prst="rect">
-                <a:avLst/>
-              </a:prstGeom>
-            </p:spPr>
-          </p:pic>
-          <p:sp>
-            <p:nvSpPr>
-              <p:cNvPr id="9" name="TextBox 8"/>
-              <p:cNvSpPr txBox="1"/>
-              <p:nvPr/>
-            </p:nvSpPr>
-            <p:spPr>
-              <a:xfrm>
-                <a:off x="4117710" y="253562"/>
-                <a:ext cx="718472" cy="276999"/>
-              </a:xfrm>
-              <a:prstGeom prst="rect">
-                <a:avLst/>
-              </a:prstGeom>
-              <a:noFill/>
-            </p:spPr>
-            <p:txBody>
-              <a:bodyPr wrap="square" rtlCol="0">
-                <a:spAutoFit/>
-              </a:bodyPr>
-              <a:lstStyle/>
-              <a:p>
-                <a:r>
-                  <a:rPr lang="en-US" sz="1200" dirty="0" smtClean="0"/>
-                  <a:t>Birds</a:t>
-                </a:r>
-                <a:endParaRPr lang="en-US" sz="1200" dirty="0"/>
-              </a:p>
-            </p:txBody>
-          </p:sp>
-          <p:sp>
-            <p:nvSpPr>
-              <p:cNvPr id="110" name="TextBox 109"/>
-              <p:cNvSpPr txBox="1"/>
-              <p:nvPr/>
-            </p:nvSpPr>
-            <p:spPr>
-              <a:xfrm>
-                <a:off x="4114289" y="583817"/>
-                <a:ext cx="859893" cy="276999"/>
-              </a:xfrm>
-              <a:prstGeom prst="rect">
-                <a:avLst/>
-              </a:prstGeom>
-              <a:noFill/>
-            </p:spPr>
-            <p:txBody>
-              <a:bodyPr wrap="square" rtlCol="0">
-                <a:spAutoFit/>
-              </a:bodyPr>
-              <a:lstStyle/>
-              <a:p>
-                <a:r>
-                  <a:rPr lang="en-US" sz="1200" dirty="0" smtClean="0"/>
-                  <a:t>Plants</a:t>
-                </a:r>
-                <a:endParaRPr lang="en-US" sz="1200" dirty="0"/>
-              </a:p>
-            </p:txBody>
-          </p:sp>
-          <p:sp>
-            <p:nvSpPr>
-              <p:cNvPr id="111" name="TextBox 110"/>
-              <p:cNvSpPr txBox="1"/>
-              <p:nvPr/>
-            </p:nvSpPr>
-            <p:spPr>
-              <a:xfrm>
-                <a:off x="4097831" y="1139377"/>
-                <a:ext cx="1176734" cy="276999"/>
-              </a:xfrm>
-              <a:prstGeom prst="rect">
-                <a:avLst/>
-              </a:prstGeom>
-              <a:noFill/>
-            </p:spPr>
-            <p:txBody>
-              <a:bodyPr wrap="square" rtlCol="0">
-                <a:spAutoFit/>
-              </a:bodyPr>
-              <a:lstStyle/>
-              <a:p>
-                <a:r>
-                  <a:rPr lang="en-US" sz="1200" dirty="0" smtClean="0"/>
-                  <a:t>Mammals</a:t>
-                </a:r>
-                <a:endParaRPr lang="en-US" sz="1200" dirty="0"/>
-              </a:p>
-            </p:txBody>
-          </p:sp>
-          <p:sp>
-            <p:nvSpPr>
-              <p:cNvPr id="112" name="TextBox 111"/>
-              <p:cNvSpPr txBox="1"/>
-              <p:nvPr/>
-            </p:nvSpPr>
-            <p:spPr>
-              <a:xfrm>
-                <a:off x="4117710" y="856029"/>
-                <a:ext cx="718472" cy="276999"/>
-              </a:xfrm>
-              <a:prstGeom prst="rect">
-                <a:avLst/>
-              </a:prstGeom>
-              <a:noFill/>
-            </p:spPr>
-            <p:txBody>
-              <a:bodyPr wrap="square" rtlCol="0">
-                <a:spAutoFit/>
-              </a:bodyPr>
-              <a:lstStyle/>
-              <a:p>
-                <a:r>
-                  <a:rPr lang="en-US" sz="1200" dirty="0" smtClean="0"/>
-                  <a:t>Fish</a:t>
-                </a:r>
-                <a:endParaRPr lang="en-US" sz="1200" dirty="0"/>
-              </a:p>
-            </p:txBody>
-          </p:sp>
-          <p:sp>
-            <p:nvSpPr>
-              <p:cNvPr id="113" name="TextBox 112"/>
-              <p:cNvSpPr txBox="1"/>
-              <p:nvPr/>
-            </p:nvSpPr>
-            <p:spPr>
-              <a:xfrm>
-                <a:off x="5288897" y="259168"/>
-                <a:ext cx="1042648" cy="276999"/>
-              </a:xfrm>
-              <a:prstGeom prst="rect">
-                <a:avLst/>
-              </a:prstGeom>
-              <a:noFill/>
-            </p:spPr>
-            <p:txBody>
-              <a:bodyPr wrap="square" rtlCol="0">
-                <a:spAutoFit/>
-              </a:bodyPr>
-              <a:lstStyle/>
-              <a:p>
-                <a:r>
-                  <a:rPr lang="en-US" sz="1200" dirty="0" smtClean="0"/>
-                  <a:t>Invertebrates</a:t>
-                </a:r>
-                <a:endParaRPr lang="en-US" sz="1200" dirty="0"/>
-              </a:p>
-            </p:txBody>
-          </p:sp>
-          <p:sp>
-            <p:nvSpPr>
-              <p:cNvPr id="114" name="TextBox 113"/>
-              <p:cNvSpPr txBox="1"/>
-              <p:nvPr/>
-            </p:nvSpPr>
-            <p:spPr>
-              <a:xfrm>
-                <a:off x="5274565" y="530561"/>
-                <a:ext cx="1019843" cy="276999"/>
-              </a:xfrm>
-              <a:prstGeom prst="rect">
-                <a:avLst/>
-              </a:prstGeom>
-              <a:noFill/>
-            </p:spPr>
-            <p:txBody>
-              <a:bodyPr wrap="square" rtlCol="0">
-                <a:spAutoFit/>
-              </a:bodyPr>
-              <a:lstStyle/>
-              <a:p>
-                <a:r>
-                  <a:rPr lang="en-US" sz="1200" dirty="0" smtClean="0"/>
-                  <a:t>Benthos</a:t>
-                </a:r>
-                <a:endParaRPr lang="en-US" sz="1200" dirty="0"/>
-              </a:p>
-            </p:txBody>
-          </p:sp>
-          <p:sp>
-            <p:nvSpPr>
-              <p:cNvPr id="115" name="TextBox 114"/>
-              <p:cNvSpPr txBox="1"/>
-              <p:nvPr/>
-            </p:nvSpPr>
-            <p:spPr>
-              <a:xfrm>
-                <a:off x="5276654" y="820963"/>
-                <a:ext cx="1063477" cy="276999"/>
-              </a:xfrm>
-              <a:prstGeom prst="rect">
-                <a:avLst/>
-              </a:prstGeom>
-              <a:noFill/>
-            </p:spPr>
-            <p:txBody>
-              <a:bodyPr wrap="square" rtlCol="0">
-                <a:spAutoFit/>
-              </a:bodyPr>
-              <a:lstStyle/>
-              <a:p>
-                <a:r>
-                  <a:rPr lang="en-US" sz="1200" dirty="0" smtClean="0"/>
-                  <a:t>Plankton</a:t>
-                </a:r>
-                <a:endParaRPr lang="en-US" sz="1200" dirty="0"/>
-              </a:p>
-            </p:txBody>
-          </p:sp>
-        </p:grpSp>
-        <p:grpSp>
-          <p:nvGrpSpPr>
-            <p:cNvPr id="3" name="Group 2"/>
-            <p:cNvGrpSpPr/>
-            <p:nvPr/>
-          </p:nvGrpSpPr>
-          <p:grpSpPr>
-            <a:xfrm>
-              <a:off x="3695148" y="569615"/>
-              <a:ext cx="1787041" cy="799610"/>
-              <a:chOff x="6244382" y="256050"/>
-              <a:chExt cx="1787041" cy="799610"/>
-            </a:xfrm>
-          </p:grpSpPr>
-          <p:pic>
-            <p:nvPicPr>
-              <p:cNvPr id="63" name="Picture 62"/>
-              <p:cNvPicPr>
-                <a:picLocks noChangeAspect="1"/>
-              </p:cNvPicPr>
-              <p:nvPr/>
-            </p:nvPicPr>
-            <p:blipFill>
-              <a:blip r:embed="rId11"/>
-              <a:stretch>
-                <a:fillRect/>
-              </a:stretch>
-            </p:blipFill>
-            <p:spPr>
-              <a:xfrm>
-                <a:off x="6286051" y="778857"/>
-                <a:ext cx="478886" cy="266371"/>
-              </a:xfrm>
-              <a:prstGeom prst="rect">
-                <a:avLst/>
-              </a:prstGeom>
-            </p:spPr>
-          </p:pic>
-          <p:pic>
-            <p:nvPicPr>
-              <p:cNvPr id="102" name="Picture 101"/>
-              <p:cNvPicPr>
-                <a:picLocks noChangeAspect="1"/>
-              </p:cNvPicPr>
-              <p:nvPr/>
-            </p:nvPicPr>
-            <p:blipFill>
-              <a:blip r:embed="rId12"/>
-              <a:stretch>
-                <a:fillRect/>
-              </a:stretch>
-            </p:blipFill>
-            <p:spPr>
-              <a:xfrm>
-                <a:off x="6271499" y="256050"/>
-                <a:ext cx="490175" cy="258138"/>
-              </a:xfrm>
-              <a:prstGeom prst="rect">
-                <a:avLst/>
-              </a:prstGeom>
-            </p:spPr>
-          </p:pic>
-          <p:pic>
-            <p:nvPicPr>
-              <p:cNvPr id="103" name="Picture 102"/>
-              <p:cNvPicPr>
-                <a:picLocks noChangeAspect="1"/>
-              </p:cNvPicPr>
-              <p:nvPr/>
-            </p:nvPicPr>
-            <p:blipFill>
-              <a:blip r:embed="rId13"/>
-              <a:stretch>
-                <a:fillRect/>
-              </a:stretch>
-            </p:blipFill>
-            <p:spPr>
-              <a:xfrm>
-                <a:off x="6244382" y="559572"/>
-                <a:ext cx="544407" cy="191424"/>
-              </a:xfrm>
-              <a:prstGeom prst="rect">
-                <a:avLst/>
-              </a:prstGeom>
-            </p:spPr>
-          </p:pic>
-          <p:sp>
-            <p:nvSpPr>
-              <p:cNvPr id="116" name="TextBox 115"/>
-              <p:cNvSpPr txBox="1"/>
-              <p:nvPr/>
-            </p:nvSpPr>
-            <p:spPr>
-              <a:xfrm>
-                <a:off x="6803566" y="268007"/>
-                <a:ext cx="1136084" cy="276999"/>
-              </a:xfrm>
-              <a:prstGeom prst="rect">
-                <a:avLst/>
-              </a:prstGeom>
-              <a:noFill/>
-            </p:spPr>
-            <p:txBody>
-              <a:bodyPr wrap="square" rtlCol="0">
-                <a:spAutoFit/>
-              </a:bodyPr>
-              <a:lstStyle/>
-              <a:p>
-                <a:r>
-                  <a:rPr lang="en-US" sz="1200" dirty="0" smtClean="0"/>
-                  <a:t>Terrestrial</a:t>
-                </a:r>
-                <a:endParaRPr lang="en-US" sz="1200" dirty="0"/>
-              </a:p>
-            </p:txBody>
-          </p:sp>
-          <p:sp>
-            <p:nvSpPr>
-              <p:cNvPr id="117" name="TextBox 116"/>
-              <p:cNvSpPr txBox="1"/>
-              <p:nvPr/>
-            </p:nvSpPr>
-            <p:spPr>
-              <a:xfrm>
-                <a:off x="6793268" y="527873"/>
-                <a:ext cx="908370" cy="276999"/>
-              </a:xfrm>
-              <a:prstGeom prst="rect">
-                <a:avLst/>
-              </a:prstGeom>
-              <a:noFill/>
-            </p:spPr>
-            <p:txBody>
-              <a:bodyPr wrap="square" rtlCol="0">
-                <a:spAutoFit/>
-              </a:bodyPr>
-              <a:lstStyle/>
-              <a:p>
-                <a:r>
-                  <a:rPr lang="en-US" sz="1200" dirty="0" smtClean="0"/>
-                  <a:t>Marine</a:t>
-                </a:r>
-                <a:endParaRPr lang="en-US" sz="1200" dirty="0"/>
-              </a:p>
-            </p:txBody>
-          </p:sp>
-          <p:sp>
-            <p:nvSpPr>
-              <p:cNvPr id="118" name="TextBox 117"/>
-              <p:cNvSpPr txBox="1"/>
-              <p:nvPr/>
-            </p:nvSpPr>
-            <p:spPr>
-              <a:xfrm>
-                <a:off x="6795164" y="778661"/>
-                <a:ext cx="1236259" cy="276999"/>
-              </a:xfrm>
-              <a:prstGeom prst="rect">
-                <a:avLst/>
-              </a:prstGeom>
-              <a:noFill/>
-            </p:spPr>
-            <p:txBody>
-              <a:bodyPr wrap="square" rtlCol="0">
-                <a:spAutoFit/>
-              </a:bodyPr>
-              <a:lstStyle/>
-              <a:p>
-                <a:r>
-                  <a:rPr lang="en-US" sz="1200" dirty="0" smtClean="0"/>
-                  <a:t>Freshwater</a:t>
-                </a:r>
-                <a:endParaRPr lang="en-US" sz="1200" dirty="0"/>
-              </a:p>
-            </p:txBody>
-          </p:sp>
-        </p:grpSp>
-        <p:sp>
-          <p:nvSpPr>
-            <p:cNvPr id="7" name="Rectangle 6"/>
-            <p:cNvSpPr/>
-            <p:nvPr/>
-          </p:nvSpPr>
-          <p:spPr>
-            <a:xfrm>
-              <a:off x="3455272" y="318618"/>
-              <a:ext cx="4817550" cy="1300710"/>
-            </a:xfrm>
-            <a:prstGeom prst="rect">
-              <a:avLst/>
-            </a:prstGeom>
-            <a:noFill/>
-            <a:ln>
-              <a:solidFill>
-                <a:schemeClr val="tx1"/>
-              </a:solidFill>
-            </a:ln>
-          </p:spPr>
-          <p:style>
-            <a:lnRef idx="2">
-              <a:schemeClr val="accent1">
-                <a:shade val="50000"/>
-              </a:schemeClr>
-            </a:lnRef>
-            <a:fillRef idx="1">
-              <a:schemeClr val="accent1"/>
-            </a:fillRef>
-            <a:effectRef idx="0">
-              <a:schemeClr val="accent1"/>
-            </a:effectRef>
-            <a:fontRef idx="minor">
-              <a:schemeClr val="lt1"/>
-            </a:fontRef>
-          </p:style>
-          <p:txBody>
-            <a:bodyPr rtlCol="0" anchor="ctr"/>
-            <a:lstStyle/>
-            <a:p>
-              <a:pPr algn="ctr"/>
-              <a:endParaRPr lang="en-US"/>
-            </a:p>
-          </p:txBody>
-        </p:sp>
-      </p:grpSp>
-      <p:grpSp>
-        <p:nvGrpSpPr>
-          <p:cNvPr id="82" name="Group 81"/>
-          <p:cNvGrpSpPr/>
-          <p:nvPr/>
-        </p:nvGrpSpPr>
-        <p:grpSpPr>
-          <a:xfrm>
-            <a:off x="3229725" y="2586434"/>
-            <a:ext cx="2319031" cy="321957"/>
-            <a:chOff x="2066372" y="1693067"/>
-            <a:chExt cx="3252006" cy="418733"/>
+            <a:off x="2131582" y="29029"/>
+            <a:ext cx="7340816" cy="6733982"/>
+            <a:chOff x="2131582" y="29029"/>
+            <a:chExt cx="7340816" cy="6733982"/>
           </a:xfrm>
         </p:grpSpPr>
         <p:pic>
           <p:nvPicPr>
-            <p:cNvPr id="83" name="Picture 82"/>
+            <p:cNvPr id="4" name="Picture 3"/>
             <p:cNvPicPr>
               <a:picLocks noChangeAspect="1"/>
             </p:cNvPicPr>
             <p:nvPr/>
           </p:nvPicPr>
           <p:blipFill>
-            <a:blip r:embed="rId12"/>
+            <a:blip r:embed="rId3"/>
             <a:stretch>
               <a:fillRect/>
             </a:stretch>
           </p:blipFill>
           <p:spPr>
             <a:xfrm>
-              <a:off x="2066372" y="1693067"/>
-              <a:ext cx="655912" cy="396304"/>
+              <a:off x="2131582" y="1342590"/>
+              <a:ext cx="7340816" cy="5348869"/>
             </a:xfrm>
             <a:prstGeom prst="rect">
               <a:avLst/>
             </a:prstGeom>
           </p:spPr>
         </p:pic>
-        <p:pic>
-          <p:nvPicPr>
-            <p:cNvPr id="84" name="Picture 83"/>
-            <p:cNvPicPr>
-              <a:picLocks noChangeAspect="1"/>
-            </p:cNvPicPr>
-            <p:nvPr/>
-          </p:nvPicPr>
-          <p:blipFill>
-            <a:blip r:embed="rId13"/>
-            <a:stretch>
-              <a:fillRect/>
-            </a:stretch>
-          </p:blipFill>
-          <p:spPr>
-            <a:xfrm>
-              <a:off x="4589899" y="1744278"/>
-              <a:ext cx="728479" cy="293882"/>
-            </a:xfrm>
-            <a:prstGeom prst="rect">
-              <a:avLst/>
-            </a:prstGeom>
-          </p:spPr>
-        </p:pic>
-        <p:pic>
-          <p:nvPicPr>
-            <p:cNvPr id="85" name="Picture 84"/>
-            <p:cNvPicPr>
-              <a:picLocks noChangeAspect="1"/>
-            </p:cNvPicPr>
-            <p:nvPr/>
-          </p:nvPicPr>
-          <p:blipFill>
-            <a:blip r:embed="rId11"/>
-            <a:stretch>
-              <a:fillRect/>
-            </a:stretch>
-          </p:blipFill>
-          <p:spPr>
-            <a:xfrm>
-              <a:off x="3345216" y="1702857"/>
-              <a:ext cx="640805" cy="408943"/>
-            </a:xfrm>
-            <a:prstGeom prst="rect">
-              <a:avLst/>
-            </a:prstGeom>
-          </p:spPr>
-        </p:pic>
-      </p:grpSp>
-      <p:grpSp>
-        <p:nvGrpSpPr>
-          <p:cNvPr id="86" name="Group 85"/>
-          <p:cNvGrpSpPr/>
-          <p:nvPr/>
-        </p:nvGrpSpPr>
-        <p:grpSpPr>
-          <a:xfrm>
-            <a:off x="3142221" y="4576215"/>
-            <a:ext cx="2433913" cy="314496"/>
-            <a:chOff x="2721075" y="6071986"/>
-            <a:chExt cx="2446874" cy="235941"/>
-          </a:xfrm>
-        </p:grpSpPr>
         <p:grpSp>
           <p:nvGrpSpPr>
-            <p:cNvPr id="87" name="Group 86"/>
+            <p:cNvPr id="15" name="Group 14"/>
             <p:cNvGrpSpPr/>
             <p:nvPr/>
           </p:nvGrpSpPr>
           <p:grpSpPr>
             <a:xfrm>
-              <a:off x="2721075" y="6071986"/>
-              <a:ext cx="2446874" cy="235941"/>
-              <a:chOff x="2721075" y="6071986"/>
-              <a:chExt cx="2446874" cy="235941"/>
+              <a:off x="3393215" y="29029"/>
+              <a:ext cx="4875431" cy="1300710"/>
+              <a:chOff x="3455272" y="318618"/>
+              <a:chExt cx="4875431" cy="1300710"/>
             </a:xfrm>
           </p:grpSpPr>
           <p:grpSp>
             <p:nvGrpSpPr>
-              <p:cNvPr id="90" name="Group 89"/>
+              <p:cNvPr id="6" name="Group 5"/>
               <p:cNvGrpSpPr/>
               <p:nvPr/>
             </p:nvGrpSpPr>
             <p:grpSpPr>
               <a:xfrm>
-                <a:off x="2721075" y="6071986"/>
-                <a:ext cx="2446874" cy="232634"/>
-                <a:chOff x="2887074" y="6071986"/>
-                <a:chExt cx="2446874" cy="232634"/>
+                <a:off x="5561297" y="392532"/>
+                <a:ext cx="2769406" cy="1177791"/>
+                <a:chOff x="3570725" y="253106"/>
+                <a:chExt cx="2769406" cy="1177791"/>
               </a:xfrm>
             </p:grpSpPr>
             <p:pic>
               <p:nvPicPr>
-                <p:cNvPr id="130" name="Picture 129"/>
+                <p:cNvPr id="62" name="Picture 61"/>
+                <p:cNvPicPr>
+                  <a:picLocks noChangeAspect="1"/>
+                </p:cNvPicPr>
+                <p:nvPr/>
+              </p:nvPicPr>
+              <p:blipFill>
+                <a:blip r:embed="rId4"/>
+                <a:stretch>
+                  <a:fillRect/>
+                </a:stretch>
+              </p:blipFill>
+              <p:spPr>
+                <a:xfrm>
+                  <a:off x="3582567" y="564020"/>
+                  <a:ext cx="477444" cy="250454"/>
+                </a:xfrm>
+                <a:prstGeom prst="rect">
+                  <a:avLst/>
+                </a:prstGeom>
+              </p:spPr>
+            </p:pic>
+            <p:pic>
+              <p:nvPicPr>
+                <p:cNvPr id="104" name="Picture 103"/>
+                <p:cNvPicPr>
+                  <a:picLocks noChangeAspect="1"/>
+                </p:cNvPicPr>
+                <p:nvPr/>
+              </p:nvPicPr>
+              <p:blipFill>
+                <a:blip r:embed="rId5" cstate="print">
+                  <a:extLst>
+                    <a:ext uri="{28A0092B-C50C-407E-A947-70E740481C1C}">
+                      <a14:useLocalDpi xmlns:a14="http://schemas.microsoft.com/office/drawing/2010/main" val="0"/>
+                    </a:ext>
+                  </a:extLst>
+                </a:blip>
+                <a:stretch>
+                  <a:fillRect/>
+                </a:stretch>
+              </p:blipFill>
+              <p:spPr>
+                <a:xfrm flipH="1">
+                  <a:off x="3652152" y="253354"/>
+                  <a:ext cx="374608" cy="278904"/>
+                </a:xfrm>
+                <a:prstGeom prst="rect">
+                  <a:avLst/>
+                </a:prstGeom>
+              </p:spPr>
+            </p:pic>
+            <p:pic>
+              <p:nvPicPr>
+                <p:cNvPr id="105" name="Picture 104"/>
+                <p:cNvPicPr>
+                  <a:picLocks noChangeAspect="1"/>
+                </p:cNvPicPr>
+                <p:nvPr/>
+              </p:nvPicPr>
+              <p:blipFill>
+                <a:blip r:embed="rId6"/>
+                <a:stretch>
+                  <a:fillRect/>
+                </a:stretch>
+              </p:blipFill>
+              <p:spPr>
+                <a:xfrm>
+                  <a:off x="3570725" y="1174766"/>
+                  <a:ext cx="496489" cy="256131"/>
+                </a:xfrm>
+                <a:prstGeom prst="rect">
+                  <a:avLst/>
+                </a:prstGeom>
+              </p:spPr>
+            </p:pic>
+            <p:pic>
+              <p:nvPicPr>
+                <p:cNvPr id="106" name="Picture 105"/>
                 <p:cNvPicPr>
                   <a:picLocks noChangeAspect="1"/>
                 </p:cNvPicPr>
@@ -13676,8 +13012,8 @@
               </p:blipFill>
               <p:spPr>
                 <a:xfrm>
-                  <a:off x="3969972" y="6108116"/>
-                  <a:ext cx="325640" cy="161565"/>
+                  <a:off x="3582567" y="929976"/>
+                  <a:ext cx="477445" cy="206467"/>
                 </a:xfrm>
                 <a:prstGeom prst="rect">
                   <a:avLst/>
@@ -13686,7 +13022,61 @@
             </p:pic>
             <p:pic>
               <p:nvPicPr>
-                <p:cNvPr id="131" name="Picture 130"/>
+                <p:cNvPr id="107" name="Picture 106"/>
+                <p:cNvPicPr>
+                  <a:picLocks noChangeAspect="1"/>
+                </p:cNvPicPr>
+                <p:nvPr/>
+              </p:nvPicPr>
+              <p:blipFill>
+                <a:blip r:embed="rId8" cstate="print">
+                  <a:extLst>
+                    <a:ext uri="{28A0092B-C50C-407E-A947-70E740481C1C}">
+                      <a14:useLocalDpi xmlns:a14="http://schemas.microsoft.com/office/drawing/2010/main" val="0"/>
+                    </a:ext>
+                  </a:extLst>
+                </a:blip>
+                <a:stretch>
+                  <a:fillRect/>
+                </a:stretch>
+              </p:blipFill>
+              <p:spPr>
+                <a:xfrm>
+                  <a:off x="4873128" y="253106"/>
+                  <a:ext cx="415769" cy="297946"/>
+                </a:xfrm>
+                <a:prstGeom prst="rect">
+                  <a:avLst/>
+                </a:prstGeom>
+              </p:spPr>
+            </p:pic>
+            <p:pic>
+              <p:nvPicPr>
+                <p:cNvPr id="108" name="Picture 107"/>
+                <p:cNvPicPr>
+                  <a:picLocks noChangeAspect="1"/>
+                </p:cNvPicPr>
+                <p:nvPr/>
+              </p:nvPicPr>
+              <p:blipFill>
+                <a:blip r:embed="rId9"/>
+                <a:stretch>
+                  <a:fillRect/>
+                </a:stretch>
+              </p:blipFill>
+              <p:spPr>
+                <a:xfrm>
+                  <a:off x="4873128" y="532105"/>
+                  <a:ext cx="394437" cy="268537"/>
+                </a:xfrm>
+                <a:prstGeom prst="rect">
+                  <a:avLst/>
+                </a:prstGeom>
+              </p:spPr>
+            </p:pic>
+            <p:pic>
+              <p:nvPicPr>
+                <p:cNvPr id="109" name="Picture 108"/>
                 <p:cNvPicPr>
                   <a:picLocks noChangeAspect="1"/>
                 </p:cNvPicPr>
@@ -13706,8 +13096,257 @@
               </p:blipFill>
               <p:spPr>
                 <a:xfrm>
-                  <a:off x="5053316" y="6079024"/>
-                  <a:ext cx="280632" cy="225596"/>
+                  <a:off x="4873128" y="814255"/>
+                  <a:ext cx="394437" cy="276368"/>
+                </a:xfrm>
+                <a:prstGeom prst="rect">
+                  <a:avLst/>
+                </a:prstGeom>
+              </p:spPr>
+            </p:pic>
+            <p:sp>
+              <p:nvSpPr>
+                <p:cNvPr id="9" name="TextBox 8"/>
+                <p:cNvSpPr txBox="1"/>
+                <p:nvPr/>
+              </p:nvSpPr>
+              <p:spPr>
+                <a:xfrm>
+                  <a:off x="4117710" y="253562"/>
+                  <a:ext cx="718472" cy="276999"/>
+                </a:xfrm>
+                <a:prstGeom prst="rect">
+                  <a:avLst/>
+                </a:prstGeom>
+                <a:noFill/>
+              </p:spPr>
+              <p:txBody>
+                <a:bodyPr wrap="square" rtlCol="0">
+                  <a:spAutoFit/>
+                </a:bodyPr>
+                <a:lstStyle/>
+                <a:p>
+                  <a:r>
+                    <a:rPr lang="en-US" sz="1200" dirty="0" smtClean="0"/>
+                    <a:t>Birds</a:t>
+                  </a:r>
+                  <a:endParaRPr lang="en-US" sz="1200" dirty="0"/>
+                </a:p>
+              </p:txBody>
+            </p:sp>
+            <p:sp>
+              <p:nvSpPr>
+                <p:cNvPr id="110" name="TextBox 109"/>
+                <p:cNvSpPr txBox="1"/>
+                <p:nvPr/>
+              </p:nvSpPr>
+              <p:spPr>
+                <a:xfrm>
+                  <a:off x="4114289" y="583817"/>
+                  <a:ext cx="859893" cy="276999"/>
+                </a:xfrm>
+                <a:prstGeom prst="rect">
+                  <a:avLst/>
+                </a:prstGeom>
+                <a:noFill/>
+              </p:spPr>
+              <p:txBody>
+                <a:bodyPr wrap="square" rtlCol="0">
+                  <a:spAutoFit/>
+                </a:bodyPr>
+                <a:lstStyle/>
+                <a:p>
+                  <a:r>
+                    <a:rPr lang="en-US" sz="1200" dirty="0" smtClean="0"/>
+                    <a:t>Plants</a:t>
+                  </a:r>
+                  <a:endParaRPr lang="en-US" sz="1200" dirty="0"/>
+                </a:p>
+              </p:txBody>
+            </p:sp>
+            <p:sp>
+              <p:nvSpPr>
+                <p:cNvPr id="111" name="TextBox 110"/>
+                <p:cNvSpPr txBox="1"/>
+                <p:nvPr/>
+              </p:nvSpPr>
+              <p:spPr>
+                <a:xfrm>
+                  <a:off x="4097831" y="1139377"/>
+                  <a:ext cx="1176734" cy="276999"/>
+                </a:xfrm>
+                <a:prstGeom prst="rect">
+                  <a:avLst/>
+                </a:prstGeom>
+                <a:noFill/>
+              </p:spPr>
+              <p:txBody>
+                <a:bodyPr wrap="square" rtlCol="0">
+                  <a:spAutoFit/>
+                </a:bodyPr>
+                <a:lstStyle/>
+                <a:p>
+                  <a:r>
+                    <a:rPr lang="en-US" sz="1200" dirty="0" smtClean="0"/>
+                    <a:t>Mammals</a:t>
+                  </a:r>
+                  <a:endParaRPr lang="en-US" sz="1200" dirty="0"/>
+                </a:p>
+              </p:txBody>
+            </p:sp>
+            <p:sp>
+              <p:nvSpPr>
+                <p:cNvPr id="112" name="TextBox 111"/>
+                <p:cNvSpPr txBox="1"/>
+                <p:nvPr/>
+              </p:nvSpPr>
+              <p:spPr>
+                <a:xfrm>
+                  <a:off x="4117710" y="856029"/>
+                  <a:ext cx="718472" cy="276999"/>
+                </a:xfrm>
+                <a:prstGeom prst="rect">
+                  <a:avLst/>
+                </a:prstGeom>
+                <a:noFill/>
+              </p:spPr>
+              <p:txBody>
+                <a:bodyPr wrap="square" rtlCol="0">
+                  <a:spAutoFit/>
+                </a:bodyPr>
+                <a:lstStyle/>
+                <a:p>
+                  <a:r>
+                    <a:rPr lang="en-US" sz="1200" dirty="0" smtClean="0"/>
+                    <a:t>Fish</a:t>
+                  </a:r>
+                  <a:endParaRPr lang="en-US" sz="1200" dirty="0"/>
+                </a:p>
+              </p:txBody>
+            </p:sp>
+            <p:sp>
+              <p:nvSpPr>
+                <p:cNvPr id="113" name="TextBox 112"/>
+                <p:cNvSpPr txBox="1"/>
+                <p:nvPr/>
+              </p:nvSpPr>
+              <p:spPr>
+                <a:xfrm>
+                  <a:off x="5288897" y="259168"/>
+                  <a:ext cx="1042648" cy="276999"/>
+                </a:xfrm>
+                <a:prstGeom prst="rect">
+                  <a:avLst/>
+                </a:prstGeom>
+                <a:noFill/>
+              </p:spPr>
+              <p:txBody>
+                <a:bodyPr wrap="square" rtlCol="0">
+                  <a:spAutoFit/>
+                </a:bodyPr>
+                <a:lstStyle/>
+                <a:p>
+                  <a:r>
+                    <a:rPr lang="en-US" sz="1200" dirty="0" smtClean="0"/>
+                    <a:t>Invertebrates</a:t>
+                  </a:r>
+                  <a:endParaRPr lang="en-US" sz="1200" dirty="0"/>
+                </a:p>
+              </p:txBody>
+            </p:sp>
+            <p:sp>
+              <p:nvSpPr>
+                <p:cNvPr id="114" name="TextBox 113"/>
+                <p:cNvSpPr txBox="1"/>
+                <p:nvPr/>
+              </p:nvSpPr>
+              <p:spPr>
+                <a:xfrm>
+                  <a:off x="5274565" y="530561"/>
+                  <a:ext cx="1019843" cy="276999"/>
+                </a:xfrm>
+                <a:prstGeom prst="rect">
+                  <a:avLst/>
+                </a:prstGeom>
+                <a:noFill/>
+              </p:spPr>
+              <p:txBody>
+                <a:bodyPr wrap="square" rtlCol="0">
+                  <a:spAutoFit/>
+                </a:bodyPr>
+                <a:lstStyle/>
+                <a:p>
+                  <a:r>
+                    <a:rPr lang="en-US" sz="1200" dirty="0" smtClean="0"/>
+                    <a:t>Benthos</a:t>
+                  </a:r>
+                  <a:endParaRPr lang="en-US" sz="1200" dirty="0"/>
+                </a:p>
+              </p:txBody>
+            </p:sp>
+            <p:sp>
+              <p:nvSpPr>
+                <p:cNvPr id="115" name="TextBox 114"/>
+                <p:cNvSpPr txBox="1"/>
+                <p:nvPr/>
+              </p:nvSpPr>
+              <p:spPr>
+                <a:xfrm>
+                  <a:off x="5276654" y="820963"/>
+                  <a:ext cx="1063477" cy="276999"/>
+                </a:xfrm>
+                <a:prstGeom prst="rect">
+                  <a:avLst/>
+                </a:prstGeom>
+                <a:noFill/>
+              </p:spPr>
+              <p:txBody>
+                <a:bodyPr wrap="square" rtlCol="0">
+                  <a:spAutoFit/>
+                </a:bodyPr>
+                <a:lstStyle/>
+                <a:p>
+                  <a:r>
+                    <a:rPr lang="en-US" sz="1200" dirty="0" smtClean="0"/>
+                    <a:t>Plankton</a:t>
+                  </a:r>
+                  <a:endParaRPr lang="en-US" sz="1200" dirty="0"/>
+                </a:p>
+              </p:txBody>
+            </p:sp>
+          </p:grpSp>
+          <p:grpSp>
+            <p:nvGrpSpPr>
+              <p:cNvPr id="3" name="Group 2"/>
+              <p:cNvGrpSpPr/>
+              <p:nvPr/>
+            </p:nvGrpSpPr>
+            <p:grpSpPr>
+              <a:xfrm>
+                <a:off x="3695148" y="569615"/>
+                <a:ext cx="1787041" cy="799610"/>
+                <a:chOff x="6244382" y="256050"/>
+                <a:chExt cx="1787041" cy="799610"/>
+              </a:xfrm>
+            </p:grpSpPr>
+            <p:pic>
+              <p:nvPicPr>
+                <p:cNvPr id="63" name="Picture 62"/>
+                <p:cNvPicPr>
+                  <a:picLocks noChangeAspect="1"/>
+                </p:cNvPicPr>
+                <p:nvPr/>
+              </p:nvPicPr>
+              <p:blipFill>
+                <a:blip r:embed="rId11"/>
+                <a:stretch>
+                  <a:fillRect/>
+                </a:stretch>
+              </p:blipFill>
+              <p:spPr>
+                <a:xfrm>
+                  <a:off x="6286051" y="778857"/>
+                  <a:ext cx="478886" cy="266371"/>
                 </a:xfrm>
                 <a:prstGeom prst="rect">
                   <a:avLst/>
@@ -13716,28 +13355,22 @@
             </p:pic>
             <p:pic>
               <p:nvPicPr>
-                <p:cNvPr id="132" name="Picture 131"/>
+                <p:cNvPr id="102" name="Picture 101"/>
                 <p:cNvPicPr>
                   <a:picLocks noChangeAspect="1"/>
                 </p:cNvPicPr>
                 <p:nvPr/>
               </p:nvPicPr>
               <p:blipFill>
-                <a:blip r:embed="rId8" cstate="print">
-                  <a:extLst>
-                    <a:ext uri="{28A0092B-C50C-407E-A947-70E740481C1C}">
-                      <a14:useLocalDpi xmlns:a14="http://schemas.microsoft.com/office/drawing/2010/main" val="0"/>
-                    </a:ext>
-                  </a:extLst>
-                </a:blip>
+                <a:blip r:embed="rId12"/>
                 <a:stretch>
                   <a:fillRect/>
                 </a:stretch>
               </p:blipFill>
               <p:spPr>
                 <a:xfrm>
-                  <a:off x="4345983" y="6071986"/>
-                  <a:ext cx="274386" cy="225596"/>
+                  <a:off x="6271499" y="256050"/>
+                  <a:ext cx="490175" cy="258138"/>
                 </a:xfrm>
                 <a:prstGeom prst="rect">
                   <a:avLst/>
@@ -13746,28 +13379,434 @@
             </p:pic>
             <p:pic>
               <p:nvPicPr>
-                <p:cNvPr id="133" name="Picture 132"/>
+                <p:cNvPr id="103" name="Picture 102"/>
                 <p:cNvPicPr>
                   <a:picLocks noChangeAspect="1"/>
                 </p:cNvPicPr>
                 <p:nvPr/>
               </p:nvPicPr>
               <p:blipFill>
-                <a:blip r:embed="rId5" cstate="print">
-                  <a:extLst>
-                    <a:ext uri="{28A0092B-C50C-407E-A947-70E740481C1C}">
-                      <a14:useLocalDpi xmlns:a14="http://schemas.microsoft.com/office/drawing/2010/main" val="0"/>
-                    </a:ext>
-                  </a:extLst>
-                </a:blip>
+                <a:blip r:embed="rId13"/>
                 <a:stretch>
                   <a:fillRect/>
                 </a:stretch>
               </p:blipFill>
               <p:spPr>
-                <a:xfrm flipH="1">
-                  <a:off x="2887074" y="6083191"/>
-                  <a:ext cx="255789" cy="218495"/>
+                <a:xfrm>
+                  <a:off x="6244382" y="559572"/>
+                  <a:ext cx="544407" cy="191424"/>
+                </a:xfrm>
+                <a:prstGeom prst="rect">
+                  <a:avLst/>
+                </a:prstGeom>
+              </p:spPr>
+            </p:pic>
+            <p:sp>
+              <p:nvSpPr>
+                <p:cNvPr id="116" name="TextBox 115"/>
+                <p:cNvSpPr txBox="1"/>
+                <p:nvPr/>
+              </p:nvSpPr>
+              <p:spPr>
+                <a:xfrm>
+                  <a:off x="6803566" y="268007"/>
+                  <a:ext cx="1136084" cy="276999"/>
+                </a:xfrm>
+                <a:prstGeom prst="rect">
+                  <a:avLst/>
+                </a:prstGeom>
+                <a:noFill/>
+              </p:spPr>
+              <p:txBody>
+                <a:bodyPr wrap="square" rtlCol="0">
+                  <a:spAutoFit/>
+                </a:bodyPr>
+                <a:lstStyle/>
+                <a:p>
+                  <a:r>
+                    <a:rPr lang="en-US" sz="1200" dirty="0" smtClean="0"/>
+                    <a:t>Terrestrial</a:t>
+                  </a:r>
+                  <a:endParaRPr lang="en-US" sz="1200" dirty="0"/>
+                </a:p>
+              </p:txBody>
+            </p:sp>
+            <p:sp>
+              <p:nvSpPr>
+                <p:cNvPr id="117" name="TextBox 116"/>
+                <p:cNvSpPr txBox="1"/>
+                <p:nvPr/>
+              </p:nvSpPr>
+              <p:spPr>
+                <a:xfrm>
+                  <a:off x="6793268" y="527873"/>
+                  <a:ext cx="908370" cy="276999"/>
+                </a:xfrm>
+                <a:prstGeom prst="rect">
+                  <a:avLst/>
+                </a:prstGeom>
+                <a:noFill/>
+              </p:spPr>
+              <p:txBody>
+                <a:bodyPr wrap="square" rtlCol="0">
+                  <a:spAutoFit/>
+                </a:bodyPr>
+                <a:lstStyle/>
+                <a:p>
+                  <a:r>
+                    <a:rPr lang="en-US" sz="1200" dirty="0" smtClean="0"/>
+                    <a:t>Marine</a:t>
+                  </a:r>
+                  <a:endParaRPr lang="en-US" sz="1200" dirty="0"/>
+                </a:p>
+              </p:txBody>
+            </p:sp>
+            <p:sp>
+              <p:nvSpPr>
+                <p:cNvPr id="118" name="TextBox 117"/>
+                <p:cNvSpPr txBox="1"/>
+                <p:nvPr/>
+              </p:nvSpPr>
+              <p:spPr>
+                <a:xfrm>
+                  <a:off x="6795164" y="778661"/>
+                  <a:ext cx="1236259" cy="276999"/>
+                </a:xfrm>
+                <a:prstGeom prst="rect">
+                  <a:avLst/>
+                </a:prstGeom>
+                <a:noFill/>
+              </p:spPr>
+              <p:txBody>
+                <a:bodyPr wrap="square" rtlCol="0">
+                  <a:spAutoFit/>
+                </a:bodyPr>
+                <a:lstStyle/>
+                <a:p>
+                  <a:r>
+                    <a:rPr lang="en-US" sz="1200" dirty="0" smtClean="0"/>
+                    <a:t>Freshwater</a:t>
+                  </a:r>
+                  <a:endParaRPr lang="en-US" sz="1200" dirty="0"/>
+                </a:p>
+              </p:txBody>
+            </p:sp>
+          </p:grpSp>
+          <p:sp>
+            <p:nvSpPr>
+              <p:cNvPr id="7" name="Rectangle 6"/>
+              <p:cNvSpPr/>
+              <p:nvPr/>
+            </p:nvSpPr>
+            <p:spPr>
+              <a:xfrm>
+                <a:off x="3455272" y="318618"/>
+                <a:ext cx="4817550" cy="1300710"/>
+              </a:xfrm>
+              <a:prstGeom prst="rect">
+                <a:avLst/>
+              </a:prstGeom>
+              <a:noFill/>
+              <a:ln>
+                <a:solidFill>
+                  <a:schemeClr val="tx1"/>
+                </a:solidFill>
+              </a:ln>
+            </p:spPr>
+            <p:style>
+              <a:lnRef idx="2">
+                <a:schemeClr val="accent1">
+                  <a:shade val="50000"/>
+                </a:schemeClr>
+              </a:lnRef>
+              <a:fillRef idx="1">
+                <a:schemeClr val="accent1"/>
+              </a:fillRef>
+              <a:effectRef idx="0">
+                <a:schemeClr val="accent1"/>
+              </a:effectRef>
+              <a:fontRef idx="minor">
+                <a:schemeClr val="lt1"/>
+              </a:fontRef>
+            </p:style>
+            <p:txBody>
+              <a:bodyPr rtlCol="0" anchor="ctr"/>
+              <a:lstStyle/>
+              <a:p>
+                <a:pPr algn="ctr"/>
+                <a:endParaRPr lang="en-US"/>
+              </a:p>
+            </p:txBody>
+          </p:sp>
+        </p:grpSp>
+        <p:grpSp>
+          <p:nvGrpSpPr>
+            <p:cNvPr id="82" name="Group 81"/>
+            <p:cNvGrpSpPr/>
+            <p:nvPr/>
+          </p:nvGrpSpPr>
+          <p:grpSpPr>
+            <a:xfrm>
+              <a:off x="2990867" y="2558401"/>
+              <a:ext cx="2413866" cy="321957"/>
+              <a:chOff x="2066372" y="1693067"/>
+              <a:chExt cx="3384994" cy="418733"/>
+            </a:xfrm>
+          </p:grpSpPr>
+          <p:pic>
+            <p:nvPicPr>
+              <p:cNvPr id="83" name="Picture 82"/>
+              <p:cNvPicPr>
+                <a:picLocks noChangeAspect="1"/>
+              </p:cNvPicPr>
+              <p:nvPr/>
+            </p:nvPicPr>
+            <p:blipFill>
+              <a:blip r:embed="rId12"/>
+              <a:stretch>
+                <a:fillRect/>
+              </a:stretch>
+            </p:blipFill>
+            <p:spPr>
+              <a:xfrm>
+                <a:off x="2066372" y="1693067"/>
+                <a:ext cx="655912" cy="396304"/>
+              </a:xfrm>
+              <a:prstGeom prst="rect">
+                <a:avLst/>
+              </a:prstGeom>
+            </p:spPr>
+          </p:pic>
+          <p:pic>
+            <p:nvPicPr>
+              <p:cNvPr id="84" name="Picture 83"/>
+              <p:cNvPicPr>
+                <a:picLocks noChangeAspect="1"/>
+              </p:cNvPicPr>
+              <p:nvPr/>
+            </p:nvPicPr>
+            <p:blipFill>
+              <a:blip r:embed="rId13"/>
+              <a:stretch>
+                <a:fillRect/>
+              </a:stretch>
+            </p:blipFill>
+            <p:spPr>
+              <a:xfrm>
+                <a:off x="4722887" y="1744278"/>
+                <a:ext cx="728479" cy="293882"/>
+              </a:xfrm>
+              <a:prstGeom prst="rect">
+                <a:avLst/>
+              </a:prstGeom>
+            </p:spPr>
+          </p:pic>
+          <p:pic>
+            <p:nvPicPr>
+              <p:cNvPr id="85" name="Picture 84"/>
+              <p:cNvPicPr>
+                <a:picLocks noChangeAspect="1"/>
+              </p:cNvPicPr>
+              <p:nvPr/>
+            </p:nvPicPr>
+            <p:blipFill>
+              <a:blip r:embed="rId11"/>
+              <a:stretch>
+                <a:fillRect/>
+              </a:stretch>
+            </p:blipFill>
+            <p:spPr>
+              <a:xfrm>
+                <a:off x="3478205" y="1702857"/>
+                <a:ext cx="640805" cy="408943"/>
+              </a:xfrm>
+              <a:prstGeom prst="rect">
+                <a:avLst/>
+              </a:prstGeom>
+            </p:spPr>
+          </p:pic>
+        </p:grpSp>
+        <p:grpSp>
+          <p:nvGrpSpPr>
+            <p:cNvPr id="86" name="Group 85"/>
+            <p:cNvGrpSpPr/>
+            <p:nvPr/>
+          </p:nvGrpSpPr>
+          <p:grpSpPr>
+            <a:xfrm>
+              <a:off x="2960541" y="4554059"/>
+              <a:ext cx="2529984" cy="314496"/>
+              <a:chOff x="2721075" y="6076312"/>
+              <a:chExt cx="2543457" cy="235941"/>
+            </a:xfrm>
+          </p:grpSpPr>
+          <p:grpSp>
+            <p:nvGrpSpPr>
+              <p:cNvPr id="87" name="Group 86"/>
+              <p:cNvGrpSpPr/>
+              <p:nvPr/>
+            </p:nvGrpSpPr>
+            <p:grpSpPr>
+              <a:xfrm>
+                <a:off x="2721075" y="6076312"/>
+                <a:ext cx="2543457" cy="235941"/>
+                <a:chOff x="2721075" y="6076312"/>
+                <a:chExt cx="2543457" cy="235941"/>
+              </a:xfrm>
+            </p:grpSpPr>
+            <p:grpSp>
+              <p:nvGrpSpPr>
+                <p:cNvPr id="90" name="Group 89"/>
+                <p:cNvGrpSpPr/>
+                <p:nvPr/>
+              </p:nvGrpSpPr>
+              <p:grpSpPr>
+                <a:xfrm>
+                  <a:off x="2721075" y="6083191"/>
+                  <a:ext cx="2543457" cy="225757"/>
+                  <a:chOff x="2887074" y="6083191"/>
+                  <a:chExt cx="2543457" cy="225757"/>
+                </a:xfrm>
+              </p:grpSpPr>
+              <p:pic>
+                <p:nvPicPr>
+                  <p:cNvPr id="130" name="Picture 129"/>
+                  <p:cNvPicPr>
+                    <a:picLocks noChangeAspect="1"/>
+                  </p:cNvPicPr>
+                  <p:nvPr/>
+                </p:nvPicPr>
+                <p:blipFill>
+                  <a:blip r:embed="rId7" cstate="print">
+                    <a:extLst>
+                      <a:ext uri="{28A0092B-C50C-407E-A947-70E740481C1C}">
+                        <a14:useLocalDpi xmlns:a14="http://schemas.microsoft.com/office/drawing/2010/main" val="0"/>
+                      </a:ext>
+                    </a:extLst>
+                  </a:blip>
+                  <a:stretch>
+                    <a:fillRect/>
+                  </a:stretch>
+                </p:blipFill>
+                <p:spPr>
+                  <a:xfrm>
+                    <a:off x="3981936" y="6113501"/>
+                    <a:ext cx="325640" cy="161565"/>
+                  </a:xfrm>
+                  <a:prstGeom prst="rect">
+                    <a:avLst/>
+                  </a:prstGeom>
+                </p:spPr>
+              </p:pic>
+              <p:pic>
+                <p:nvPicPr>
+                  <p:cNvPr id="131" name="Picture 130"/>
+                  <p:cNvPicPr>
+                    <a:picLocks noChangeAspect="1"/>
+                  </p:cNvPicPr>
+                  <p:nvPr/>
+                </p:nvPicPr>
+                <p:blipFill>
+                  <a:blip r:embed="rId10" cstate="print">
+                    <a:extLst>
+                      <a:ext uri="{28A0092B-C50C-407E-A947-70E740481C1C}">
+                        <a14:useLocalDpi xmlns:a14="http://schemas.microsoft.com/office/drawing/2010/main" val="0"/>
+                      </a:ext>
+                    </a:extLst>
+                  </a:blip>
+                  <a:stretch>
+                    <a:fillRect/>
+                  </a:stretch>
+                </p:blipFill>
+                <p:spPr>
+                  <a:xfrm>
+                    <a:off x="5149899" y="6083352"/>
+                    <a:ext cx="280632" cy="225596"/>
+                  </a:xfrm>
+                  <a:prstGeom prst="rect">
+                    <a:avLst/>
+                  </a:prstGeom>
+                </p:spPr>
+              </p:pic>
+              <p:pic>
+                <p:nvPicPr>
+                  <p:cNvPr id="132" name="Picture 131"/>
+                  <p:cNvPicPr>
+                    <a:picLocks noChangeAspect="1"/>
+                  </p:cNvPicPr>
+                  <p:nvPr/>
+                </p:nvPicPr>
+                <p:blipFill>
+                  <a:blip r:embed="rId8" cstate="print">
+                    <a:extLst>
+                      <a:ext uri="{28A0092B-C50C-407E-A947-70E740481C1C}">
+                        <a14:useLocalDpi xmlns:a14="http://schemas.microsoft.com/office/drawing/2010/main" val="0"/>
+                      </a:ext>
+                    </a:extLst>
+                  </a:blip>
+                  <a:stretch>
+                    <a:fillRect/>
+                  </a:stretch>
+                </p:blipFill>
+                <p:spPr>
+                  <a:xfrm>
+                    <a:off x="4390875" y="6083191"/>
+                    <a:ext cx="274386" cy="225596"/>
+                  </a:xfrm>
+                  <a:prstGeom prst="rect">
+                    <a:avLst/>
+                  </a:prstGeom>
+                </p:spPr>
+              </p:pic>
+              <p:pic>
+                <p:nvPicPr>
+                  <p:cNvPr id="133" name="Picture 132"/>
+                  <p:cNvPicPr>
+                    <a:picLocks noChangeAspect="1"/>
+                  </p:cNvPicPr>
+                  <p:nvPr/>
+                </p:nvPicPr>
+                <p:blipFill>
+                  <a:blip r:embed="rId5" cstate="print">
+                    <a:extLst>
+                      <a:ext uri="{28A0092B-C50C-407E-A947-70E740481C1C}">
+                        <a14:useLocalDpi xmlns:a14="http://schemas.microsoft.com/office/drawing/2010/main" val="0"/>
+                      </a:ext>
+                    </a:extLst>
+                  </a:blip>
+                  <a:stretch>
+                    <a:fillRect/>
+                  </a:stretch>
+                </p:blipFill>
+                <p:spPr>
+                  <a:xfrm flipH="1">
+                    <a:off x="2887074" y="6083191"/>
+                    <a:ext cx="255789" cy="218495"/>
+                  </a:xfrm>
+                  <a:prstGeom prst="rect">
+                    <a:avLst/>
+                  </a:prstGeom>
+                </p:spPr>
+              </p:pic>
+            </p:grpSp>
+            <p:pic>
+              <p:nvPicPr>
+                <p:cNvPr id="91" name="Picture 90"/>
+                <p:cNvPicPr>
+                  <a:picLocks noChangeAspect="1"/>
+                </p:cNvPicPr>
+                <p:nvPr/>
+              </p:nvPicPr>
+              <p:blipFill>
+                <a:blip r:embed="rId9"/>
+                <a:stretch>
+                  <a:fillRect/>
+                </a:stretch>
+              </p:blipFill>
+              <p:spPr>
+                <a:xfrm>
+                  <a:off x="4579893" y="6076312"/>
+                  <a:ext cx="302061" cy="235941"/>
                 </a:xfrm>
                 <a:prstGeom prst="rect">
                   <a:avLst/>
@@ -13777,22 +13816,46 @@
           </p:grpSp>
           <p:pic>
             <p:nvPicPr>
-              <p:cNvPr id="91" name="Picture 90"/>
+              <p:cNvPr id="88" name="Picture 87"/>
               <p:cNvPicPr>
                 <a:picLocks noChangeAspect="1"/>
               </p:cNvPicPr>
               <p:nvPr/>
             </p:nvPicPr>
             <p:blipFill>
-              <a:blip r:embed="rId9"/>
+              <a:blip r:embed="rId6"/>
               <a:stretch>
                 <a:fillRect/>
               </a:stretch>
             </p:blipFill>
             <p:spPr>
               <a:xfrm>
-                <a:off x="4496014" y="6071986"/>
-                <a:ext cx="302061" cy="235941"/>
+                <a:off x="3445877" y="6092744"/>
+                <a:ext cx="334903" cy="198223"/>
+              </a:xfrm>
+              <a:prstGeom prst="rect">
+                <a:avLst/>
+              </a:prstGeom>
+            </p:spPr>
+          </p:pic>
+          <p:pic>
+            <p:nvPicPr>
+              <p:cNvPr id="89" name="Picture 88"/>
+              <p:cNvPicPr>
+                <a:picLocks noChangeAspect="1"/>
+              </p:cNvPicPr>
+              <p:nvPr/>
+            </p:nvPicPr>
+            <p:blipFill>
+              <a:blip r:embed="rId4"/>
+              <a:stretch>
+                <a:fillRect/>
+              </a:stretch>
+            </p:blipFill>
+            <p:spPr>
+              <a:xfrm>
+                <a:off x="3066106" y="6102493"/>
+                <a:ext cx="327300" cy="196986"/>
               </a:xfrm>
               <a:prstGeom prst="rect">
                 <a:avLst/>
@@ -13800,211 +13863,187 @@
             </p:spPr>
           </p:pic>
         </p:grpSp>
-        <p:pic>
-          <p:nvPicPr>
-            <p:cNvPr id="88" name="Picture 87"/>
-            <p:cNvPicPr>
-              <a:picLocks noChangeAspect="1"/>
-            </p:cNvPicPr>
-            <p:nvPr/>
-          </p:nvPicPr>
-          <p:blipFill>
-            <a:blip r:embed="rId6"/>
-            <a:stretch>
-              <a:fillRect/>
-            </a:stretch>
-          </p:blipFill>
-          <p:spPr>
-            <a:xfrm>
-              <a:off x="3431585" y="6089590"/>
-              <a:ext cx="334903" cy="198223"/>
-            </a:xfrm>
-            <a:prstGeom prst="rect">
-              <a:avLst/>
-            </a:prstGeom>
-          </p:spPr>
-        </p:pic>
-        <p:pic>
-          <p:nvPicPr>
-            <p:cNvPr id="89" name="Picture 88"/>
-            <p:cNvPicPr>
-              <a:picLocks noChangeAspect="1"/>
-            </p:cNvPicPr>
-            <p:nvPr/>
-          </p:nvPicPr>
-          <p:blipFill>
-            <a:blip r:embed="rId4"/>
-            <a:stretch>
-              <a:fillRect/>
-            </a:stretch>
-          </p:blipFill>
-          <p:spPr>
-            <a:xfrm>
-              <a:off x="3070198" y="6097678"/>
-              <a:ext cx="327300" cy="196986"/>
-            </a:xfrm>
-            <a:prstGeom prst="rect">
-              <a:avLst/>
-            </a:prstGeom>
-          </p:spPr>
-        </p:pic>
-      </p:grpSp>
-      <p:grpSp>
-        <p:nvGrpSpPr>
-          <p:cNvPr id="184" name="Group 183"/>
-          <p:cNvGrpSpPr/>
-          <p:nvPr/>
-        </p:nvGrpSpPr>
-        <p:grpSpPr>
-          <a:xfrm>
-            <a:off x="3153203" y="6448515"/>
-            <a:ext cx="2433913" cy="314496"/>
-            <a:chOff x="2721075" y="6071986"/>
-            <a:chExt cx="2446874" cy="235941"/>
-          </a:xfrm>
-        </p:grpSpPr>
         <p:grpSp>
           <p:nvGrpSpPr>
-            <p:cNvPr id="185" name="Group 184"/>
+            <p:cNvPr id="184" name="Group 183"/>
             <p:cNvGrpSpPr/>
             <p:nvPr/>
           </p:nvGrpSpPr>
           <p:grpSpPr>
             <a:xfrm>
-              <a:off x="2721075" y="6071986"/>
-              <a:ext cx="2446874" cy="235941"/>
+              <a:off x="3009180" y="6448515"/>
+              <a:ext cx="2433913" cy="314496"/>
               <a:chOff x="2721075" y="6071986"/>
               <a:chExt cx="2446874" cy="235941"/>
             </a:xfrm>
           </p:grpSpPr>
           <p:grpSp>
             <p:nvGrpSpPr>
-              <p:cNvPr id="188" name="Group 187"/>
+              <p:cNvPr id="185" name="Group 184"/>
               <p:cNvGrpSpPr/>
               <p:nvPr/>
             </p:nvGrpSpPr>
             <p:grpSpPr>
               <a:xfrm>
                 <a:off x="2721075" y="6071986"/>
-                <a:ext cx="2446874" cy="232634"/>
-                <a:chOff x="2887074" y="6071986"/>
-                <a:chExt cx="2446874" cy="232634"/>
+                <a:ext cx="2446874" cy="235941"/>
+                <a:chOff x="2721075" y="6071986"/>
+                <a:chExt cx="2446874" cy="235941"/>
               </a:xfrm>
             </p:grpSpPr>
+            <p:grpSp>
+              <p:nvGrpSpPr>
+                <p:cNvPr id="188" name="Group 187"/>
+                <p:cNvGrpSpPr/>
+                <p:nvPr/>
+              </p:nvGrpSpPr>
+              <p:grpSpPr>
+                <a:xfrm>
+                  <a:off x="2721075" y="6071986"/>
+                  <a:ext cx="2446874" cy="232634"/>
+                  <a:chOff x="2887074" y="6071986"/>
+                  <a:chExt cx="2446874" cy="232634"/>
+                </a:xfrm>
+              </p:grpSpPr>
+              <p:pic>
+                <p:nvPicPr>
+                  <p:cNvPr id="190" name="Picture 189"/>
+                  <p:cNvPicPr>
+                    <a:picLocks noChangeAspect="1"/>
+                  </p:cNvPicPr>
+                  <p:nvPr/>
+                </p:nvPicPr>
+                <p:blipFill>
+                  <a:blip r:embed="rId7" cstate="print">
+                    <a:extLst>
+                      <a:ext uri="{28A0092B-C50C-407E-A947-70E740481C1C}">
+                        <a14:useLocalDpi xmlns:a14="http://schemas.microsoft.com/office/drawing/2010/main" val="0"/>
+                      </a:ext>
+                    </a:extLst>
+                  </a:blip>
+                  <a:stretch>
+                    <a:fillRect/>
+                  </a:stretch>
+                </p:blipFill>
+                <p:spPr>
+                  <a:xfrm>
+                    <a:off x="3969972" y="6108116"/>
+                    <a:ext cx="325640" cy="161565"/>
+                  </a:xfrm>
+                  <a:prstGeom prst="rect">
+                    <a:avLst/>
+                  </a:prstGeom>
+                </p:spPr>
+              </p:pic>
+              <p:pic>
+                <p:nvPicPr>
+                  <p:cNvPr id="191" name="Picture 190"/>
+                  <p:cNvPicPr>
+                    <a:picLocks noChangeAspect="1"/>
+                  </p:cNvPicPr>
+                  <p:nvPr/>
+                </p:nvPicPr>
+                <p:blipFill>
+                  <a:blip r:embed="rId10" cstate="print">
+                    <a:extLst>
+                      <a:ext uri="{28A0092B-C50C-407E-A947-70E740481C1C}">
+                        <a14:useLocalDpi xmlns:a14="http://schemas.microsoft.com/office/drawing/2010/main" val="0"/>
+                      </a:ext>
+                    </a:extLst>
+                  </a:blip>
+                  <a:stretch>
+                    <a:fillRect/>
+                  </a:stretch>
+                </p:blipFill>
+                <p:spPr>
+                  <a:xfrm>
+                    <a:off x="5053316" y="6079024"/>
+                    <a:ext cx="280632" cy="225596"/>
+                  </a:xfrm>
+                  <a:prstGeom prst="rect">
+                    <a:avLst/>
+                  </a:prstGeom>
+                </p:spPr>
+              </p:pic>
+              <p:pic>
+                <p:nvPicPr>
+                  <p:cNvPr id="192" name="Picture 191"/>
+                  <p:cNvPicPr>
+                    <a:picLocks noChangeAspect="1"/>
+                  </p:cNvPicPr>
+                  <p:nvPr/>
+                </p:nvPicPr>
+                <p:blipFill>
+                  <a:blip r:embed="rId8" cstate="print">
+                    <a:extLst>
+                      <a:ext uri="{28A0092B-C50C-407E-A947-70E740481C1C}">
+                        <a14:useLocalDpi xmlns:a14="http://schemas.microsoft.com/office/drawing/2010/main" val="0"/>
+                      </a:ext>
+                    </a:extLst>
+                  </a:blip>
+                  <a:stretch>
+                    <a:fillRect/>
+                  </a:stretch>
+                </p:blipFill>
+                <p:spPr>
+                  <a:xfrm>
+                    <a:off x="4345983" y="6071986"/>
+                    <a:ext cx="274386" cy="225596"/>
+                  </a:xfrm>
+                  <a:prstGeom prst="rect">
+                    <a:avLst/>
+                  </a:prstGeom>
+                </p:spPr>
+              </p:pic>
+              <p:pic>
+                <p:nvPicPr>
+                  <p:cNvPr id="193" name="Picture 192"/>
+                  <p:cNvPicPr>
+                    <a:picLocks noChangeAspect="1"/>
+                  </p:cNvPicPr>
+                  <p:nvPr/>
+                </p:nvPicPr>
+                <p:blipFill>
+                  <a:blip r:embed="rId5" cstate="print">
+                    <a:extLst>
+                      <a:ext uri="{28A0092B-C50C-407E-A947-70E740481C1C}">
+                        <a14:useLocalDpi xmlns:a14="http://schemas.microsoft.com/office/drawing/2010/main" val="0"/>
+                      </a:ext>
+                    </a:extLst>
+                  </a:blip>
+                  <a:stretch>
+                    <a:fillRect/>
+                  </a:stretch>
+                </p:blipFill>
+                <p:spPr>
+                  <a:xfrm flipH="1">
+                    <a:off x="2887074" y="6083191"/>
+                    <a:ext cx="255789" cy="218495"/>
+                  </a:xfrm>
+                  <a:prstGeom prst="rect">
+                    <a:avLst/>
+                  </a:prstGeom>
+                </p:spPr>
+              </p:pic>
+            </p:grpSp>
             <p:pic>
               <p:nvPicPr>
-                <p:cNvPr id="190" name="Picture 189"/>
+                <p:cNvPr id="189" name="Picture 188"/>
                 <p:cNvPicPr>
                   <a:picLocks noChangeAspect="1"/>
                 </p:cNvPicPr>
                 <p:nvPr/>
               </p:nvPicPr>
               <p:blipFill>
-                <a:blip r:embed="rId7" cstate="print">
-                  <a:extLst>
-                    <a:ext uri="{28A0092B-C50C-407E-A947-70E740481C1C}">
-                      <a14:useLocalDpi xmlns:a14="http://schemas.microsoft.com/office/drawing/2010/main" val="0"/>
-                    </a:ext>
-                  </a:extLst>
-                </a:blip>
+                <a:blip r:embed="rId9"/>
                 <a:stretch>
                   <a:fillRect/>
                 </a:stretch>
               </p:blipFill>
               <p:spPr>
                 <a:xfrm>
-                  <a:off x="3969972" y="6108116"/>
-                  <a:ext cx="325640" cy="161565"/>
-                </a:xfrm>
-                <a:prstGeom prst="rect">
-                  <a:avLst/>
-                </a:prstGeom>
-              </p:spPr>
-            </p:pic>
-            <p:pic>
-              <p:nvPicPr>
-                <p:cNvPr id="191" name="Picture 190"/>
-                <p:cNvPicPr>
-                  <a:picLocks noChangeAspect="1"/>
-                </p:cNvPicPr>
-                <p:nvPr/>
-              </p:nvPicPr>
-              <p:blipFill>
-                <a:blip r:embed="rId10" cstate="print">
-                  <a:extLst>
-                    <a:ext uri="{28A0092B-C50C-407E-A947-70E740481C1C}">
-                      <a14:useLocalDpi xmlns:a14="http://schemas.microsoft.com/office/drawing/2010/main" val="0"/>
-                    </a:ext>
-                  </a:extLst>
-                </a:blip>
-                <a:stretch>
-                  <a:fillRect/>
-                </a:stretch>
-              </p:blipFill>
-              <p:spPr>
-                <a:xfrm>
-                  <a:off x="5053316" y="6079024"/>
-                  <a:ext cx="280632" cy="225596"/>
-                </a:xfrm>
-                <a:prstGeom prst="rect">
-                  <a:avLst/>
-                </a:prstGeom>
-              </p:spPr>
-            </p:pic>
-            <p:pic>
-              <p:nvPicPr>
-                <p:cNvPr id="192" name="Picture 191"/>
-                <p:cNvPicPr>
-                  <a:picLocks noChangeAspect="1"/>
-                </p:cNvPicPr>
-                <p:nvPr/>
-              </p:nvPicPr>
-              <p:blipFill>
-                <a:blip r:embed="rId8" cstate="print">
-                  <a:extLst>
-                    <a:ext uri="{28A0092B-C50C-407E-A947-70E740481C1C}">
-                      <a14:useLocalDpi xmlns:a14="http://schemas.microsoft.com/office/drawing/2010/main" val="0"/>
-                    </a:ext>
-                  </a:extLst>
-                </a:blip>
-                <a:stretch>
-                  <a:fillRect/>
-                </a:stretch>
-              </p:blipFill>
-              <p:spPr>
-                <a:xfrm>
-                  <a:off x="4345983" y="6071986"/>
-                  <a:ext cx="274386" cy="225596"/>
-                </a:xfrm>
-                <a:prstGeom prst="rect">
-                  <a:avLst/>
-                </a:prstGeom>
-              </p:spPr>
-            </p:pic>
-            <p:pic>
-              <p:nvPicPr>
-                <p:cNvPr id="193" name="Picture 192"/>
-                <p:cNvPicPr>
-                  <a:picLocks noChangeAspect="1"/>
-                </p:cNvPicPr>
-                <p:nvPr/>
-              </p:nvPicPr>
-              <p:blipFill>
-                <a:blip r:embed="rId5" cstate="print">
-                  <a:extLst>
-                    <a:ext uri="{28A0092B-C50C-407E-A947-70E740481C1C}">
-                      <a14:useLocalDpi xmlns:a14="http://schemas.microsoft.com/office/drawing/2010/main" val="0"/>
-                    </a:ext>
-                  </a:extLst>
-                </a:blip>
-                <a:stretch>
-                  <a:fillRect/>
-                </a:stretch>
-              </p:blipFill>
-              <p:spPr>
-                <a:xfrm flipH="1">
-                  <a:off x="2887074" y="6083191"/>
-                  <a:ext cx="255789" cy="218495"/>
+                  <a:off x="4496014" y="6071986"/>
+                  <a:ext cx="302061" cy="235941"/>
                 </a:xfrm>
                 <a:prstGeom prst="rect">
                   <a:avLst/>
@@ -14014,22 +14053,46 @@
           </p:grpSp>
           <p:pic>
             <p:nvPicPr>
-              <p:cNvPr id="189" name="Picture 188"/>
+              <p:cNvPr id="186" name="Picture 185"/>
               <p:cNvPicPr>
                 <a:picLocks noChangeAspect="1"/>
               </p:cNvPicPr>
               <p:nvPr/>
             </p:nvPicPr>
             <p:blipFill>
-              <a:blip r:embed="rId9"/>
+              <a:blip r:embed="rId6"/>
               <a:stretch>
                 <a:fillRect/>
               </a:stretch>
             </p:blipFill>
             <p:spPr>
               <a:xfrm>
-                <a:off x="4496014" y="6071986"/>
-                <a:ext cx="302061" cy="235941"/>
+                <a:off x="3431585" y="6089590"/>
+                <a:ext cx="334903" cy="198223"/>
+              </a:xfrm>
+              <a:prstGeom prst="rect">
+                <a:avLst/>
+              </a:prstGeom>
+            </p:spPr>
+          </p:pic>
+          <p:pic>
+            <p:nvPicPr>
+              <p:cNvPr id="187" name="Picture 186"/>
+              <p:cNvPicPr>
+                <a:picLocks noChangeAspect="1"/>
+              </p:cNvPicPr>
+              <p:nvPr/>
+            </p:nvPicPr>
+            <p:blipFill>
+              <a:blip r:embed="rId4"/>
+              <a:stretch>
+                <a:fillRect/>
+              </a:stretch>
+            </p:blipFill>
+            <p:spPr>
+              <a:xfrm>
+                <a:off x="3070198" y="6097678"/>
+                <a:ext cx="327300" cy="196986"/>
               </a:xfrm>
               <a:prstGeom prst="rect">
                 <a:avLst/>
@@ -14037,211 +14100,187 @@
             </p:spPr>
           </p:pic>
         </p:grpSp>
-        <p:pic>
-          <p:nvPicPr>
-            <p:cNvPr id="186" name="Picture 185"/>
-            <p:cNvPicPr>
-              <a:picLocks noChangeAspect="1"/>
-            </p:cNvPicPr>
-            <p:nvPr/>
-          </p:nvPicPr>
-          <p:blipFill>
-            <a:blip r:embed="rId6"/>
-            <a:stretch>
-              <a:fillRect/>
-            </a:stretch>
-          </p:blipFill>
-          <p:spPr>
-            <a:xfrm>
-              <a:off x="3431585" y="6089590"/>
-              <a:ext cx="334903" cy="198223"/>
-            </a:xfrm>
-            <a:prstGeom prst="rect">
-              <a:avLst/>
-            </a:prstGeom>
-          </p:spPr>
-        </p:pic>
-        <p:pic>
-          <p:nvPicPr>
-            <p:cNvPr id="187" name="Picture 186"/>
-            <p:cNvPicPr>
-              <a:picLocks noChangeAspect="1"/>
-            </p:cNvPicPr>
-            <p:nvPr/>
-          </p:nvPicPr>
-          <p:blipFill>
-            <a:blip r:embed="rId4"/>
-            <a:stretch>
-              <a:fillRect/>
-            </a:stretch>
-          </p:blipFill>
-          <p:spPr>
-            <a:xfrm>
-              <a:off x="3070198" y="6097678"/>
-              <a:ext cx="327300" cy="196986"/>
-            </a:xfrm>
-            <a:prstGeom prst="rect">
-              <a:avLst/>
-            </a:prstGeom>
-          </p:spPr>
-        </p:pic>
-      </p:grpSp>
-      <p:grpSp>
-        <p:nvGrpSpPr>
-          <p:cNvPr id="194" name="Group 193"/>
-          <p:cNvGrpSpPr/>
-          <p:nvPr/>
-        </p:nvGrpSpPr>
-        <p:grpSpPr>
-          <a:xfrm>
-            <a:off x="6844657" y="4593414"/>
-            <a:ext cx="2433913" cy="314496"/>
-            <a:chOff x="2721075" y="6071986"/>
-            <a:chExt cx="2446874" cy="235941"/>
-          </a:xfrm>
-        </p:grpSpPr>
         <p:grpSp>
           <p:nvGrpSpPr>
-            <p:cNvPr id="195" name="Group 194"/>
+            <p:cNvPr id="194" name="Group 193"/>
             <p:cNvGrpSpPr/>
             <p:nvPr/>
           </p:nvGrpSpPr>
           <p:grpSpPr>
             <a:xfrm>
-              <a:off x="2721075" y="6071986"/>
-              <a:ext cx="2446874" cy="235941"/>
-              <a:chOff x="2721075" y="6071986"/>
-              <a:chExt cx="2446874" cy="235941"/>
+              <a:off x="6662977" y="4565087"/>
+              <a:ext cx="2521082" cy="314496"/>
+              <a:chOff x="2721075" y="6071683"/>
+              <a:chExt cx="2534507" cy="235941"/>
             </a:xfrm>
           </p:grpSpPr>
           <p:grpSp>
             <p:nvGrpSpPr>
-              <p:cNvPr id="198" name="Group 197"/>
+              <p:cNvPr id="195" name="Group 194"/>
               <p:cNvGrpSpPr/>
               <p:nvPr/>
             </p:nvGrpSpPr>
             <p:grpSpPr>
               <a:xfrm>
-                <a:off x="2721075" y="6071986"/>
-                <a:ext cx="2446874" cy="232634"/>
-                <a:chOff x="2887074" y="6071986"/>
-                <a:chExt cx="2446874" cy="232634"/>
+                <a:off x="2721075" y="6071683"/>
+                <a:ext cx="2534507" cy="235941"/>
+                <a:chOff x="2721075" y="6071683"/>
+                <a:chExt cx="2534507" cy="235941"/>
               </a:xfrm>
             </p:grpSpPr>
+            <p:grpSp>
+              <p:nvGrpSpPr>
+                <p:cNvPr id="198" name="Group 197"/>
+                <p:cNvGrpSpPr/>
+                <p:nvPr/>
+              </p:nvGrpSpPr>
+              <p:grpSpPr>
+                <a:xfrm>
+                  <a:off x="2721075" y="6078721"/>
+                  <a:ext cx="2534507" cy="225596"/>
+                  <a:chOff x="2887074" y="6078721"/>
+                  <a:chExt cx="2534507" cy="225596"/>
+                </a:xfrm>
+              </p:grpSpPr>
+              <p:pic>
+                <p:nvPicPr>
+                  <p:cNvPr id="200" name="Picture 199"/>
+                  <p:cNvPicPr>
+                    <a:picLocks noChangeAspect="1"/>
+                  </p:cNvPicPr>
+                  <p:nvPr/>
+                </p:nvPicPr>
+                <p:blipFill>
+                  <a:blip r:embed="rId7" cstate="print">
+                    <a:extLst>
+                      <a:ext uri="{28A0092B-C50C-407E-A947-70E740481C1C}">
+                        <a14:useLocalDpi xmlns:a14="http://schemas.microsoft.com/office/drawing/2010/main" val="0"/>
+                      </a:ext>
+                    </a:extLst>
+                  </a:blip>
+                  <a:stretch>
+                    <a:fillRect/>
+                  </a:stretch>
+                </p:blipFill>
+                <p:spPr>
+                  <a:xfrm>
+                    <a:off x="4030658" y="6108871"/>
+                    <a:ext cx="325640" cy="161565"/>
+                  </a:xfrm>
+                  <a:prstGeom prst="rect">
+                    <a:avLst/>
+                  </a:prstGeom>
+                </p:spPr>
+              </p:pic>
+              <p:pic>
+                <p:nvPicPr>
+                  <p:cNvPr id="201" name="Picture 200"/>
+                  <p:cNvPicPr>
+                    <a:picLocks noChangeAspect="1"/>
+                  </p:cNvPicPr>
+                  <p:nvPr/>
+                </p:nvPicPr>
+                <p:blipFill>
+                  <a:blip r:embed="rId10" cstate="print">
+                    <a:extLst>
+                      <a:ext uri="{28A0092B-C50C-407E-A947-70E740481C1C}">
+                        <a14:useLocalDpi xmlns:a14="http://schemas.microsoft.com/office/drawing/2010/main" val="0"/>
+                      </a:ext>
+                    </a:extLst>
+                  </a:blip>
+                  <a:stretch>
+                    <a:fillRect/>
+                  </a:stretch>
+                </p:blipFill>
+                <p:spPr>
+                  <a:xfrm>
+                    <a:off x="5140949" y="6078721"/>
+                    <a:ext cx="280632" cy="225596"/>
+                  </a:xfrm>
+                  <a:prstGeom prst="rect">
+                    <a:avLst/>
+                  </a:prstGeom>
+                </p:spPr>
+              </p:pic>
+              <p:pic>
+                <p:nvPicPr>
+                  <p:cNvPr id="202" name="Picture 201"/>
+                  <p:cNvPicPr>
+                    <a:picLocks noChangeAspect="1"/>
+                  </p:cNvPicPr>
+                  <p:nvPr/>
+                </p:nvPicPr>
+                <p:blipFill>
+                  <a:blip r:embed="rId8" cstate="print">
+                    <a:extLst>
+                      <a:ext uri="{28A0092B-C50C-407E-A947-70E740481C1C}">
+                        <a14:useLocalDpi xmlns:a14="http://schemas.microsoft.com/office/drawing/2010/main" val="0"/>
+                      </a:ext>
+                    </a:extLst>
+                  </a:blip>
+                  <a:stretch>
+                    <a:fillRect/>
+                  </a:stretch>
+                </p:blipFill>
+                <p:spPr>
+                  <a:xfrm>
+                    <a:off x="4420689" y="6078721"/>
+                    <a:ext cx="274386" cy="225596"/>
+                  </a:xfrm>
+                  <a:prstGeom prst="rect">
+                    <a:avLst/>
+                  </a:prstGeom>
+                </p:spPr>
+              </p:pic>
+              <p:pic>
+                <p:nvPicPr>
+                  <p:cNvPr id="203" name="Picture 202"/>
+                  <p:cNvPicPr>
+                    <a:picLocks noChangeAspect="1"/>
+                  </p:cNvPicPr>
+                  <p:nvPr/>
+                </p:nvPicPr>
+                <p:blipFill>
+                  <a:blip r:embed="rId5" cstate="print">
+                    <a:extLst>
+                      <a:ext uri="{28A0092B-C50C-407E-A947-70E740481C1C}">
+                        <a14:useLocalDpi xmlns:a14="http://schemas.microsoft.com/office/drawing/2010/main" val="0"/>
+                      </a:ext>
+                    </a:extLst>
+                  </a:blip>
+                  <a:stretch>
+                    <a:fillRect/>
+                  </a:stretch>
+                </p:blipFill>
+                <p:spPr>
+                  <a:xfrm flipH="1">
+                    <a:off x="2887074" y="6083191"/>
+                    <a:ext cx="255789" cy="218495"/>
+                  </a:xfrm>
+                  <a:prstGeom prst="rect">
+                    <a:avLst/>
+                  </a:prstGeom>
+                </p:spPr>
+              </p:pic>
+            </p:grpSp>
             <p:pic>
               <p:nvPicPr>
-                <p:cNvPr id="200" name="Picture 199"/>
+                <p:cNvPr id="199" name="Picture 198"/>
                 <p:cNvPicPr>
                   <a:picLocks noChangeAspect="1"/>
                 </p:cNvPicPr>
                 <p:nvPr/>
               </p:nvPicPr>
               <p:blipFill>
-                <a:blip r:embed="rId7" cstate="print">
-                  <a:extLst>
-                    <a:ext uri="{28A0092B-C50C-407E-A947-70E740481C1C}">
-                      <a14:useLocalDpi xmlns:a14="http://schemas.microsoft.com/office/drawing/2010/main" val="0"/>
-                    </a:ext>
-                  </a:extLst>
-                </a:blip>
+                <a:blip r:embed="rId9"/>
                 <a:stretch>
                   <a:fillRect/>
                 </a:stretch>
               </p:blipFill>
               <p:spPr>
                 <a:xfrm>
-                  <a:off x="3969972" y="6108116"/>
-                  <a:ext cx="325640" cy="161565"/>
-                </a:xfrm>
-                <a:prstGeom prst="rect">
-                  <a:avLst/>
-                </a:prstGeom>
-              </p:spPr>
-            </p:pic>
-            <p:pic>
-              <p:nvPicPr>
-                <p:cNvPr id="201" name="Picture 200"/>
-                <p:cNvPicPr>
-                  <a:picLocks noChangeAspect="1"/>
-                </p:cNvPicPr>
-                <p:nvPr/>
-              </p:nvPicPr>
-              <p:blipFill>
-                <a:blip r:embed="rId10" cstate="print">
-                  <a:extLst>
-                    <a:ext uri="{28A0092B-C50C-407E-A947-70E740481C1C}">
-                      <a14:useLocalDpi xmlns:a14="http://schemas.microsoft.com/office/drawing/2010/main" val="0"/>
-                    </a:ext>
-                  </a:extLst>
-                </a:blip>
-                <a:stretch>
-                  <a:fillRect/>
-                </a:stretch>
-              </p:blipFill>
-              <p:spPr>
-                <a:xfrm>
-                  <a:off x="5053316" y="6079024"/>
-                  <a:ext cx="280632" cy="225596"/>
-                </a:xfrm>
-                <a:prstGeom prst="rect">
-                  <a:avLst/>
-                </a:prstGeom>
-              </p:spPr>
-            </p:pic>
-            <p:pic>
-              <p:nvPicPr>
-                <p:cNvPr id="202" name="Picture 201"/>
-                <p:cNvPicPr>
-                  <a:picLocks noChangeAspect="1"/>
-                </p:cNvPicPr>
-                <p:nvPr/>
-              </p:nvPicPr>
-              <p:blipFill>
-                <a:blip r:embed="rId8" cstate="print">
-                  <a:extLst>
-                    <a:ext uri="{28A0092B-C50C-407E-A947-70E740481C1C}">
-                      <a14:useLocalDpi xmlns:a14="http://schemas.microsoft.com/office/drawing/2010/main" val="0"/>
-                    </a:ext>
-                  </a:extLst>
-                </a:blip>
-                <a:stretch>
-                  <a:fillRect/>
-                </a:stretch>
-              </p:blipFill>
-              <p:spPr>
-                <a:xfrm>
-                  <a:off x="4345983" y="6071986"/>
-                  <a:ext cx="274386" cy="225596"/>
-                </a:xfrm>
-                <a:prstGeom prst="rect">
-                  <a:avLst/>
-                </a:prstGeom>
-              </p:spPr>
-            </p:pic>
-            <p:pic>
-              <p:nvPicPr>
-                <p:cNvPr id="203" name="Picture 202"/>
-                <p:cNvPicPr>
-                  <a:picLocks noChangeAspect="1"/>
-                </p:cNvPicPr>
-                <p:nvPr/>
-              </p:nvPicPr>
-              <p:blipFill>
-                <a:blip r:embed="rId5" cstate="print">
-                  <a:extLst>
-                    <a:ext uri="{28A0092B-C50C-407E-A947-70E740481C1C}">
-                      <a14:useLocalDpi xmlns:a14="http://schemas.microsoft.com/office/drawing/2010/main" val="0"/>
-                    </a:ext>
-                  </a:extLst>
-                </a:blip>
-                <a:stretch>
-                  <a:fillRect/>
-                </a:stretch>
-              </p:blipFill>
-              <p:spPr>
-                <a:xfrm flipH="1">
-                  <a:off x="2887074" y="6083191"/>
-                  <a:ext cx="255789" cy="218495"/>
+                  <a:off x="4583647" y="6071683"/>
+                  <a:ext cx="302061" cy="235941"/>
                 </a:xfrm>
                 <a:prstGeom prst="rect">
                   <a:avLst/>
@@ -14251,22 +14290,46 @@
           </p:grpSp>
           <p:pic>
             <p:nvPicPr>
-              <p:cNvPr id="199" name="Picture 198"/>
+              <p:cNvPr id="196" name="Picture 195"/>
               <p:cNvPicPr>
                 <a:picLocks noChangeAspect="1"/>
               </p:cNvPicPr>
               <p:nvPr/>
             </p:nvPicPr>
             <p:blipFill>
-              <a:blip r:embed="rId9"/>
+              <a:blip r:embed="rId6"/>
               <a:stretch>
                 <a:fillRect/>
               </a:stretch>
             </p:blipFill>
             <p:spPr>
               <a:xfrm>
-                <a:off x="4496014" y="6071986"/>
-                <a:ext cx="302061" cy="235941"/>
+                <a:off x="3484493" y="6089591"/>
+                <a:ext cx="334903" cy="198223"/>
+              </a:xfrm>
+              <a:prstGeom prst="rect">
+                <a:avLst/>
+              </a:prstGeom>
+            </p:spPr>
+          </p:pic>
+          <p:pic>
+            <p:nvPicPr>
+              <p:cNvPr id="197" name="Picture 196"/>
+              <p:cNvPicPr>
+                <a:picLocks noChangeAspect="1"/>
+              </p:cNvPicPr>
+              <p:nvPr/>
+            </p:nvPicPr>
+            <p:blipFill>
+              <a:blip r:embed="rId4"/>
+              <a:stretch>
+                <a:fillRect/>
+              </a:stretch>
+            </p:blipFill>
+            <p:spPr>
+              <a:xfrm>
+                <a:off x="3074007" y="6098898"/>
+                <a:ext cx="327300" cy="196986"/>
               </a:xfrm>
               <a:prstGeom prst="rect">
                 <a:avLst/>
@@ -14274,211 +14337,187 @@
             </p:spPr>
           </p:pic>
         </p:grpSp>
-        <p:pic>
-          <p:nvPicPr>
-            <p:cNvPr id="196" name="Picture 195"/>
-            <p:cNvPicPr>
-              <a:picLocks noChangeAspect="1"/>
-            </p:cNvPicPr>
-            <p:nvPr/>
-          </p:nvPicPr>
-          <p:blipFill>
-            <a:blip r:embed="rId6"/>
-            <a:stretch>
-              <a:fillRect/>
-            </a:stretch>
-          </p:blipFill>
-          <p:spPr>
-            <a:xfrm>
-              <a:off x="3431585" y="6089590"/>
-              <a:ext cx="334903" cy="198223"/>
-            </a:xfrm>
-            <a:prstGeom prst="rect">
-              <a:avLst/>
-            </a:prstGeom>
-          </p:spPr>
-        </p:pic>
-        <p:pic>
-          <p:nvPicPr>
-            <p:cNvPr id="197" name="Picture 196"/>
-            <p:cNvPicPr>
-              <a:picLocks noChangeAspect="1"/>
-            </p:cNvPicPr>
-            <p:nvPr/>
-          </p:nvPicPr>
-          <p:blipFill>
-            <a:blip r:embed="rId4"/>
-            <a:stretch>
-              <a:fillRect/>
-            </a:stretch>
-          </p:blipFill>
-          <p:spPr>
-            <a:xfrm>
-              <a:off x="3070198" y="6097678"/>
-              <a:ext cx="327300" cy="196986"/>
-            </a:xfrm>
-            <a:prstGeom prst="rect">
-              <a:avLst/>
-            </a:prstGeom>
-          </p:spPr>
-        </p:pic>
-      </p:grpSp>
-      <p:grpSp>
-        <p:nvGrpSpPr>
-          <p:cNvPr id="204" name="Group 203"/>
-          <p:cNvGrpSpPr/>
-          <p:nvPr/>
-        </p:nvGrpSpPr>
-        <p:grpSpPr>
-          <a:xfrm>
-            <a:off x="6817962" y="6448515"/>
-            <a:ext cx="2433913" cy="314496"/>
-            <a:chOff x="2721075" y="6071986"/>
-            <a:chExt cx="2446874" cy="235941"/>
-          </a:xfrm>
-        </p:grpSpPr>
         <p:grpSp>
           <p:nvGrpSpPr>
-            <p:cNvPr id="205" name="Group 204"/>
+            <p:cNvPr id="204" name="Group 203"/>
             <p:cNvGrpSpPr/>
             <p:nvPr/>
           </p:nvGrpSpPr>
           <p:grpSpPr>
             <a:xfrm>
-              <a:off x="2721075" y="6071986"/>
-              <a:ext cx="2446874" cy="235941"/>
+              <a:off x="6774283" y="6448515"/>
+              <a:ext cx="2433913" cy="314496"/>
               <a:chOff x="2721075" y="6071986"/>
               <a:chExt cx="2446874" cy="235941"/>
             </a:xfrm>
           </p:grpSpPr>
           <p:grpSp>
             <p:nvGrpSpPr>
-              <p:cNvPr id="208" name="Group 207"/>
+              <p:cNvPr id="205" name="Group 204"/>
               <p:cNvGrpSpPr/>
               <p:nvPr/>
             </p:nvGrpSpPr>
             <p:grpSpPr>
               <a:xfrm>
                 <a:off x="2721075" y="6071986"/>
-                <a:ext cx="2446874" cy="232634"/>
-                <a:chOff x="2887074" y="6071986"/>
-                <a:chExt cx="2446874" cy="232634"/>
+                <a:ext cx="2446874" cy="235941"/>
+                <a:chOff x="2721075" y="6071986"/>
+                <a:chExt cx="2446874" cy="235941"/>
               </a:xfrm>
             </p:grpSpPr>
+            <p:grpSp>
+              <p:nvGrpSpPr>
+                <p:cNvPr id="208" name="Group 207"/>
+                <p:cNvGrpSpPr/>
+                <p:nvPr/>
+              </p:nvGrpSpPr>
+              <p:grpSpPr>
+                <a:xfrm>
+                  <a:off x="2721075" y="6071986"/>
+                  <a:ext cx="2446874" cy="232634"/>
+                  <a:chOff x="2887074" y="6071986"/>
+                  <a:chExt cx="2446874" cy="232634"/>
+                </a:xfrm>
+              </p:grpSpPr>
+              <p:pic>
+                <p:nvPicPr>
+                  <p:cNvPr id="210" name="Picture 209"/>
+                  <p:cNvPicPr>
+                    <a:picLocks noChangeAspect="1"/>
+                  </p:cNvPicPr>
+                  <p:nvPr/>
+                </p:nvPicPr>
+                <p:blipFill>
+                  <a:blip r:embed="rId7" cstate="print">
+                    <a:extLst>
+                      <a:ext uri="{28A0092B-C50C-407E-A947-70E740481C1C}">
+                        <a14:useLocalDpi xmlns:a14="http://schemas.microsoft.com/office/drawing/2010/main" val="0"/>
+                      </a:ext>
+                    </a:extLst>
+                  </a:blip>
+                  <a:stretch>
+                    <a:fillRect/>
+                  </a:stretch>
+                </p:blipFill>
+                <p:spPr>
+                  <a:xfrm>
+                    <a:off x="3969972" y="6108116"/>
+                    <a:ext cx="325640" cy="161565"/>
+                  </a:xfrm>
+                  <a:prstGeom prst="rect">
+                    <a:avLst/>
+                  </a:prstGeom>
+                </p:spPr>
+              </p:pic>
+              <p:pic>
+                <p:nvPicPr>
+                  <p:cNvPr id="211" name="Picture 210"/>
+                  <p:cNvPicPr>
+                    <a:picLocks noChangeAspect="1"/>
+                  </p:cNvPicPr>
+                  <p:nvPr/>
+                </p:nvPicPr>
+                <p:blipFill>
+                  <a:blip r:embed="rId10" cstate="print">
+                    <a:extLst>
+                      <a:ext uri="{28A0092B-C50C-407E-A947-70E740481C1C}">
+                        <a14:useLocalDpi xmlns:a14="http://schemas.microsoft.com/office/drawing/2010/main" val="0"/>
+                      </a:ext>
+                    </a:extLst>
+                  </a:blip>
+                  <a:stretch>
+                    <a:fillRect/>
+                  </a:stretch>
+                </p:blipFill>
+                <p:spPr>
+                  <a:xfrm>
+                    <a:off x="5053316" y="6079024"/>
+                    <a:ext cx="280632" cy="225596"/>
+                  </a:xfrm>
+                  <a:prstGeom prst="rect">
+                    <a:avLst/>
+                  </a:prstGeom>
+                </p:spPr>
+              </p:pic>
+              <p:pic>
+                <p:nvPicPr>
+                  <p:cNvPr id="212" name="Picture 211"/>
+                  <p:cNvPicPr>
+                    <a:picLocks noChangeAspect="1"/>
+                  </p:cNvPicPr>
+                  <p:nvPr/>
+                </p:nvPicPr>
+                <p:blipFill>
+                  <a:blip r:embed="rId8" cstate="print">
+                    <a:extLst>
+                      <a:ext uri="{28A0092B-C50C-407E-A947-70E740481C1C}">
+                        <a14:useLocalDpi xmlns:a14="http://schemas.microsoft.com/office/drawing/2010/main" val="0"/>
+                      </a:ext>
+                    </a:extLst>
+                  </a:blip>
+                  <a:stretch>
+                    <a:fillRect/>
+                  </a:stretch>
+                </p:blipFill>
+                <p:spPr>
+                  <a:xfrm>
+                    <a:off x="4345983" y="6071986"/>
+                    <a:ext cx="274386" cy="225596"/>
+                  </a:xfrm>
+                  <a:prstGeom prst="rect">
+                    <a:avLst/>
+                  </a:prstGeom>
+                </p:spPr>
+              </p:pic>
+              <p:pic>
+                <p:nvPicPr>
+                  <p:cNvPr id="213" name="Picture 212"/>
+                  <p:cNvPicPr>
+                    <a:picLocks noChangeAspect="1"/>
+                  </p:cNvPicPr>
+                  <p:nvPr/>
+                </p:nvPicPr>
+                <p:blipFill>
+                  <a:blip r:embed="rId5" cstate="print">
+                    <a:extLst>
+                      <a:ext uri="{28A0092B-C50C-407E-A947-70E740481C1C}">
+                        <a14:useLocalDpi xmlns:a14="http://schemas.microsoft.com/office/drawing/2010/main" val="0"/>
+                      </a:ext>
+                    </a:extLst>
+                  </a:blip>
+                  <a:stretch>
+                    <a:fillRect/>
+                  </a:stretch>
+                </p:blipFill>
+                <p:spPr>
+                  <a:xfrm flipH="1">
+                    <a:off x="2887074" y="6083191"/>
+                    <a:ext cx="255789" cy="218495"/>
+                  </a:xfrm>
+                  <a:prstGeom prst="rect">
+                    <a:avLst/>
+                  </a:prstGeom>
+                </p:spPr>
+              </p:pic>
+            </p:grpSp>
             <p:pic>
               <p:nvPicPr>
-                <p:cNvPr id="210" name="Picture 209"/>
+                <p:cNvPr id="209" name="Picture 208"/>
                 <p:cNvPicPr>
                   <a:picLocks noChangeAspect="1"/>
                 </p:cNvPicPr>
                 <p:nvPr/>
               </p:nvPicPr>
               <p:blipFill>
-                <a:blip r:embed="rId7" cstate="print">
-                  <a:extLst>
-                    <a:ext uri="{28A0092B-C50C-407E-A947-70E740481C1C}">
-                      <a14:useLocalDpi xmlns:a14="http://schemas.microsoft.com/office/drawing/2010/main" val="0"/>
-                    </a:ext>
-                  </a:extLst>
-                </a:blip>
+                <a:blip r:embed="rId9"/>
                 <a:stretch>
                   <a:fillRect/>
                 </a:stretch>
               </p:blipFill>
               <p:spPr>
                 <a:xfrm>
-                  <a:off x="3969972" y="6108116"/>
-                  <a:ext cx="325640" cy="161565"/>
-                </a:xfrm>
-                <a:prstGeom prst="rect">
-                  <a:avLst/>
-                </a:prstGeom>
-              </p:spPr>
-            </p:pic>
-            <p:pic>
-              <p:nvPicPr>
-                <p:cNvPr id="211" name="Picture 210"/>
-                <p:cNvPicPr>
-                  <a:picLocks noChangeAspect="1"/>
-                </p:cNvPicPr>
-                <p:nvPr/>
-              </p:nvPicPr>
-              <p:blipFill>
-                <a:blip r:embed="rId10" cstate="print">
-                  <a:extLst>
-                    <a:ext uri="{28A0092B-C50C-407E-A947-70E740481C1C}">
-                      <a14:useLocalDpi xmlns:a14="http://schemas.microsoft.com/office/drawing/2010/main" val="0"/>
-                    </a:ext>
-                  </a:extLst>
-                </a:blip>
-                <a:stretch>
-                  <a:fillRect/>
-                </a:stretch>
-              </p:blipFill>
-              <p:spPr>
-                <a:xfrm>
-                  <a:off x="5053316" y="6079024"/>
-                  <a:ext cx="280632" cy="225596"/>
-                </a:xfrm>
-                <a:prstGeom prst="rect">
-                  <a:avLst/>
-                </a:prstGeom>
-              </p:spPr>
-            </p:pic>
-            <p:pic>
-              <p:nvPicPr>
-                <p:cNvPr id="212" name="Picture 211"/>
-                <p:cNvPicPr>
-                  <a:picLocks noChangeAspect="1"/>
-                </p:cNvPicPr>
-                <p:nvPr/>
-              </p:nvPicPr>
-              <p:blipFill>
-                <a:blip r:embed="rId8" cstate="print">
-                  <a:extLst>
-                    <a:ext uri="{28A0092B-C50C-407E-A947-70E740481C1C}">
-                      <a14:useLocalDpi xmlns:a14="http://schemas.microsoft.com/office/drawing/2010/main" val="0"/>
-                    </a:ext>
-                  </a:extLst>
-                </a:blip>
-                <a:stretch>
-                  <a:fillRect/>
-                </a:stretch>
-              </p:blipFill>
-              <p:spPr>
-                <a:xfrm>
-                  <a:off x="4345983" y="6071986"/>
-                  <a:ext cx="274386" cy="225596"/>
-                </a:xfrm>
-                <a:prstGeom prst="rect">
-                  <a:avLst/>
-                </a:prstGeom>
-              </p:spPr>
-            </p:pic>
-            <p:pic>
-              <p:nvPicPr>
-                <p:cNvPr id="213" name="Picture 212"/>
-                <p:cNvPicPr>
-                  <a:picLocks noChangeAspect="1"/>
-                </p:cNvPicPr>
-                <p:nvPr/>
-              </p:nvPicPr>
-              <p:blipFill>
-                <a:blip r:embed="rId5" cstate="print">
-                  <a:extLst>
-                    <a:ext uri="{28A0092B-C50C-407E-A947-70E740481C1C}">
-                      <a14:useLocalDpi xmlns:a14="http://schemas.microsoft.com/office/drawing/2010/main" val="0"/>
-                    </a:ext>
-                  </a:extLst>
-                </a:blip>
-                <a:stretch>
-                  <a:fillRect/>
-                </a:stretch>
-              </p:blipFill>
-              <p:spPr>
-                <a:xfrm flipH="1">
-                  <a:off x="2887074" y="6083191"/>
-                  <a:ext cx="255789" cy="218495"/>
+                  <a:off x="4496014" y="6071986"/>
+                  <a:ext cx="302061" cy="235941"/>
                 </a:xfrm>
                 <a:prstGeom prst="rect">
                   <a:avLst/>
@@ -14488,22 +14527,46 @@
           </p:grpSp>
           <p:pic>
             <p:nvPicPr>
-              <p:cNvPr id="209" name="Picture 208"/>
+              <p:cNvPr id="206" name="Picture 205"/>
               <p:cNvPicPr>
                 <a:picLocks noChangeAspect="1"/>
               </p:cNvPicPr>
               <p:nvPr/>
             </p:nvPicPr>
             <p:blipFill>
-              <a:blip r:embed="rId9"/>
+              <a:blip r:embed="rId6"/>
               <a:stretch>
                 <a:fillRect/>
               </a:stretch>
             </p:blipFill>
             <p:spPr>
               <a:xfrm>
-                <a:off x="4496014" y="6071986"/>
-                <a:ext cx="302061" cy="235941"/>
+                <a:off x="3431585" y="6089590"/>
+                <a:ext cx="334903" cy="198223"/>
+              </a:xfrm>
+              <a:prstGeom prst="rect">
+                <a:avLst/>
+              </a:prstGeom>
+            </p:spPr>
+          </p:pic>
+          <p:pic>
+            <p:nvPicPr>
+              <p:cNvPr id="207" name="Picture 206"/>
+              <p:cNvPicPr>
+                <a:picLocks noChangeAspect="1"/>
+              </p:cNvPicPr>
+              <p:nvPr/>
+            </p:nvPicPr>
+            <p:blipFill>
+              <a:blip r:embed="rId4"/>
+              <a:stretch>
+                <a:fillRect/>
+              </a:stretch>
+            </p:blipFill>
+            <p:spPr>
+              <a:xfrm>
+                <a:off x="3070198" y="6097678"/>
+                <a:ext cx="327300" cy="196986"/>
               </a:xfrm>
               <a:prstGeom prst="rect">
                 <a:avLst/>
@@ -14511,141 +14574,93 @@
             </p:spPr>
           </p:pic>
         </p:grpSp>
-        <p:pic>
-          <p:nvPicPr>
-            <p:cNvPr id="206" name="Picture 205"/>
-            <p:cNvPicPr>
-              <a:picLocks noChangeAspect="1"/>
-            </p:cNvPicPr>
+        <p:grpSp>
+          <p:nvGrpSpPr>
+            <p:cNvPr id="214" name="Group 213"/>
+            <p:cNvGrpSpPr/>
             <p:nvPr/>
-          </p:nvPicPr>
-          <p:blipFill>
-            <a:blip r:embed="rId6"/>
-            <a:stretch>
-              <a:fillRect/>
-            </a:stretch>
-          </p:blipFill>
-          <p:spPr>
+          </p:nvGrpSpPr>
+          <p:grpSpPr>
             <a:xfrm>
-              <a:off x="3431585" y="6089590"/>
-              <a:ext cx="334903" cy="198223"/>
+              <a:off x="6770669" y="2560163"/>
+              <a:ext cx="2365658" cy="323381"/>
+              <a:chOff x="2066372" y="1693067"/>
+              <a:chExt cx="3317392" cy="420585"/>
             </a:xfrm>
-            <a:prstGeom prst="rect">
-              <a:avLst/>
-            </a:prstGeom>
-          </p:spPr>
-        </p:pic>
-        <p:pic>
-          <p:nvPicPr>
-            <p:cNvPr id="207" name="Picture 206"/>
-            <p:cNvPicPr>
-              <a:picLocks noChangeAspect="1"/>
-            </p:cNvPicPr>
-            <p:nvPr/>
-          </p:nvPicPr>
-          <p:blipFill>
-            <a:blip r:embed="rId4"/>
-            <a:stretch>
-              <a:fillRect/>
-            </a:stretch>
-          </p:blipFill>
-          <p:spPr>
-            <a:xfrm>
-              <a:off x="3070198" y="6097678"/>
-              <a:ext cx="327300" cy="196986"/>
-            </a:xfrm>
-            <a:prstGeom prst="rect">
-              <a:avLst/>
-            </a:prstGeom>
-          </p:spPr>
-        </p:pic>
-      </p:grpSp>
-      <p:grpSp>
-        <p:nvGrpSpPr>
-          <p:cNvPr id="214" name="Group 213"/>
-          <p:cNvGrpSpPr/>
-          <p:nvPr/>
-        </p:nvGrpSpPr>
-        <p:grpSpPr>
-          <a:xfrm>
-            <a:off x="7009527" y="2588196"/>
-            <a:ext cx="2365658" cy="323381"/>
-            <a:chOff x="2066372" y="1693067"/>
-            <a:chExt cx="3317392" cy="420585"/>
-          </a:xfrm>
-        </p:grpSpPr>
-        <p:pic>
-          <p:nvPicPr>
-            <p:cNvPr id="215" name="Picture 214"/>
-            <p:cNvPicPr>
-              <a:picLocks noChangeAspect="1"/>
-            </p:cNvPicPr>
-            <p:nvPr/>
-          </p:nvPicPr>
-          <p:blipFill>
-            <a:blip r:embed="rId12"/>
-            <a:stretch>
-              <a:fillRect/>
-            </a:stretch>
-          </p:blipFill>
-          <p:spPr>
-            <a:xfrm>
-              <a:off x="2066372" y="1693067"/>
-              <a:ext cx="655912" cy="396304"/>
-            </a:xfrm>
-            <a:prstGeom prst="rect">
-              <a:avLst/>
-            </a:prstGeom>
-          </p:spPr>
-        </p:pic>
-        <p:pic>
-          <p:nvPicPr>
-            <p:cNvPr id="216" name="Picture 215"/>
-            <p:cNvPicPr>
-              <a:picLocks noChangeAspect="1"/>
-            </p:cNvPicPr>
-            <p:nvPr/>
-          </p:nvPicPr>
-          <p:blipFill>
-            <a:blip r:embed="rId13"/>
-            <a:stretch>
-              <a:fillRect/>
-            </a:stretch>
-          </p:blipFill>
-          <p:spPr>
-            <a:xfrm>
-              <a:off x="4655285" y="1741986"/>
-              <a:ext cx="728479" cy="293882"/>
-            </a:xfrm>
-            <a:prstGeom prst="rect">
-              <a:avLst/>
-            </a:prstGeom>
-          </p:spPr>
-        </p:pic>
-        <p:pic>
-          <p:nvPicPr>
-            <p:cNvPr id="217" name="Picture 216"/>
-            <p:cNvPicPr>
-              <a:picLocks noChangeAspect="1"/>
-            </p:cNvPicPr>
-            <p:nvPr/>
-          </p:nvPicPr>
-          <p:blipFill>
-            <a:blip r:embed="rId11"/>
-            <a:stretch>
-              <a:fillRect/>
-            </a:stretch>
-          </p:blipFill>
-          <p:spPr>
-            <a:xfrm>
-              <a:off x="3389207" y="1704709"/>
-              <a:ext cx="640805" cy="408943"/>
-            </a:xfrm>
-            <a:prstGeom prst="rect">
-              <a:avLst/>
-            </a:prstGeom>
-          </p:spPr>
-        </p:pic>
+          </p:grpSpPr>
+          <p:pic>
+            <p:nvPicPr>
+              <p:cNvPr id="215" name="Picture 214"/>
+              <p:cNvPicPr>
+                <a:picLocks noChangeAspect="1"/>
+              </p:cNvPicPr>
+              <p:nvPr/>
+            </p:nvPicPr>
+            <p:blipFill>
+              <a:blip r:embed="rId12"/>
+              <a:stretch>
+                <a:fillRect/>
+              </a:stretch>
+            </p:blipFill>
+            <p:spPr>
+              <a:xfrm>
+                <a:off x="2066372" y="1693067"/>
+                <a:ext cx="655912" cy="396304"/>
+              </a:xfrm>
+              <a:prstGeom prst="rect">
+                <a:avLst/>
+              </a:prstGeom>
+            </p:spPr>
+          </p:pic>
+          <p:pic>
+            <p:nvPicPr>
+              <p:cNvPr id="216" name="Picture 215"/>
+              <p:cNvPicPr>
+                <a:picLocks noChangeAspect="1"/>
+              </p:cNvPicPr>
+              <p:nvPr/>
+            </p:nvPicPr>
+            <p:blipFill>
+              <a:blip r:embed="rId13"/>
+              <a:stretch>
+                <a:fillRect/>
+              </a:stretch>
+            </p:blipFill>
+            <p:spPr>
+              <a:xfrm>
+                <a:off x="4655285" y="1741986"/>
+                <a:ext cx="728479" cy="293882"/>
+              </a:xfrm>
+              <a:prstGeom prst="rect">
+                <a:avLst/>
+              </a:prstGeom>
+            </p:spPr>
+          </p:pic>
+          <p:pic>
+            <p:nvPicPr>
+              <p:cNvPr id="217" name="Picture 216"/>
+              <p:cNvPicPr>
+                <a:picLocks noChangeAspect="1"/>
+              </p:cNvPicPr>
+              <p:nvPr/>
+            </p:nvPicPr>
+            <p:blipFill>
+              <a:blip r:embed="rId11"/>
+              <a:stretch>
+                <a:fillRect/>
+              </a:stretch>
+            </p:blipFill>
+            <p:spPr>
+              <a:xfrm>
+                <a:off x="3389207" y="1704709"/>
+                <a:ext cx="640805" cy="408943"/>
+              </a:xfrm>
+              <a:prstGeom prst="rect">
+                <a:avLst/>
+              </a:prstGeom>
+            </p:spPr>
+          </p:pic>
+        </p:grpSp>
       </p:grpSp>
     </p:spTree>
     <p:extLst>
@@ -14684,23 +14699,52 @@
           <a:chExt cx="0" cy="0"/>
         </a:xfrm>
       </p:grpSpPr>
+      <p:sp>
+        <p:nvSpPr>
+          <p:cNvPr id="17" name="TextBox 16"/>
+          <p:cNvSpPr txBox="1"/>
+          <p:nvPr/>
+        </p:nvSpPr>
+        <p:spPr>
+          <a:xfrm>
+            <a:off x="11080036" y="-16321"/>
+            <a:ext cx="1060704" cy="369332"/>
+          </a:xfrm>
+          <a:prstGeom prst="rect">
+            <a:avLst/>
+          </a:prstGeom>
+          <a:noFill/>
+        </p:spPr>
+        <p:txBody>
+          <a:bodyPr wrap="square" rtlCol="0">
+            <a:spAutoFit/>
+          </a:bodyPr>
+          <a:lstStyle/>
+          <a:p>
+            <a:r>
+              <a:rPr lang="en-US" dirty="0" smtClean="0"/>
+              <a:t>Fig 3a-3b</a:t>
+            </a:r>
+          </a:p>
+        </p:txBody>
+      </p:sp>
       <p:grpSp>
         <p:nvGrpSpPr>
-          <p:cNvPr id="18" name="Group 17"/>
+          <p:cNvPr id="3" name="Group 2"/>
           <p:cNvGrpSpPr/>
           <p:nvPr/>
         </p:nvGrpSpPr>
         <p:grpSpPr>
           <a:xfrm>
-            <a:off x="310245" y="1219880"/>
-            <a:ext cx="10853055" cy="5373087"/>
-            <a:chOff x="310245" y="1219880"/>
-            <a:chExt cx="10853055" cy="5373087"/>
+            <a:off x="277384" y="937549"/>
+            <a:ext cx="11137962" cy="5648509"/>
+            <a:chOff x="277384" y="937549"/>
+            <a:chExt cx="11137962" cy="5648509"/>
           </a:xfrm>
         </p:grpSpPr>
         <p:pic>
           <p:nvPicPr>
-            <p:cNvPr id="6" name="Picture 5"/>
+            <p:cNvPr id="2" name="Picture 1"/>
             <p:cNvPicPr>
               <a:picLocks noChangeAspect="1"/>
             </p:cNvPicPr>
@@ -14714,8 +14758,8 @@
           </p:blipFill>
           <p:spPr>
             <a:xfrm>
-              <a:off x="310245" y="1219880"/>
-              <a:ext cx="10853055" cy="5034923"/>
+              <a:off x="277384" y="937549"/>
+              <a:ext cx="11137962" cy="5628771"/>
             </a:xfrm>
             <a:prstGeom prst="rect">
               <a:avLst/>
@@ -14730,10 +14774,10 @@
           </p:nvGrpSpPr>
           <p:grpSpPr>
             <a:xfrm>
-              <a:off x="1295068" y="6162010"/>
-              <a:ext cx="3300413" cy="379037"/>
-              <a:chOff x="3683264" y="5565484"/>
-              <a:chExt cx="2686391" cy="245968"/>
+              <a:off x="1243909" y="6194232"/>
+              <a:ext cx="3414736" cy="370662"/>
+              <a:chOff x="3590210" y="5564832"/>
+              <a:chExt cx="2779445" cy="240533"/>
             </a:xfrm>
           </p:grpSpPr>
           <p:grpSp>
@@ -14744,10 +14788,10 @@
             </p:nvGrpSpPr>
             <p:grpSpPr>
               <a:xfrm>
-                <a:off x="3683264" y="5565484"/>
-                <a:ext cx="2686391" cy="245968"/>
-                <a:chOff x="3683264" y="5565484"/>
-                <a:chExt cx="2686391" cy="245968"/>
+                <a:off x="3590210" y="5564832"/>
+                <a:ext cx="2779445" cy="240533"/>
+                <a:chOff x="3590210" y="5564832"/>
+                <a:chExt cx="2779445" cy="240533"/>
               </a:xfrm>
             </p:grpSpPr>
             <p:grpSp>
@@ -14758,10 +14802,10 @@
               </p:nvGrpSpPr>
               <p:grpSpPr>
                 <a:xfrm>
-                  <a:off x="4074813" y="5565484"/>
-                  <a:ext cx="2294842" cy="239881"/>
-                  <a:chOff x="4240812" y="5565484"/>
-                  <a:chExt cx="2294842" cy="239881"/>
+                  <a:off x="4000941" y="5564832"/>
+                  <a:ext cx="2368714" cy="226329"/>
+                  <a:chOff x="4166940" y="5564832"/>
+                  <a:chExt cx="2368714" cy="226329"/>
                 </a:xfrm>
               </p:grpSpPr>
               <p:pic>
@@ -14786,7 +14830,7 @@
                 </p:blipFill>
                 <p:spPr>
                   <a:xfrm>
-                    <a:off x="4601334" y="5624057"/>
+                    <a:off x="4542997" y="5620204"/>
                     <a:ext cx="325640" cy="161565"/>
                   </a:xfrm>
                   <a:prstGeom prst="rect">
@@ -14816,7 +14860,7 @@
                 </p:blipFill>
                 <p:spPr>
                   <a:xfrm>
-                    <a:off x="5019533" y="5575511"/>
+                    <a:off x="4998712" y="5564832"/>
                     <a:ext cx="280633" cy="225596"/>
                   </a:xfrm>
                   <a:prstGeom prst="rect">
@@ -14846,7 +14890,7 @@
                 </p:blipFill>
                 <p:spPr>
                   <a:xfrm>
-                    <a:off x="4240812" y="5579769"/>
+                    <a:off x="4166940" y="5565565"/>
                     <a:ext cx="274386" cy="225596"/>
                   </a:xfrm>
                   <a:prstGeom prst="rect">
@@ -14901,7 +14945,7 @@
               </p:blipFill>
               <p:spPr>
                 <a:xfrm>
-                  <a:off x="3683264" y="5575511"/>
+                  <a:off x="3590210" y="5569424"/>
                   <a:ext cx="302061" cy="235941"/>
                 </a:xfrm>
                 <a:prstGeom prst="rect">
@@ -14950,7 +14994,7 @@
             </p:blipFill>
             <p:spPr>
               <a:xfrm>
-                <a:off x="5240380" y="5586993"/>
+                <a:off x="5239808" y="5580526"/>
                 <a:ext cx="327300" cy="196986"/>
               </a:xfrm>
               <a:prstGeom prst="rect">
@@ -14967,7 +15011,7 @@
           </p:nvGrpSpPr>
           <p:grpSpPr>
             <a:xfrm>
-              <a:off x="5882579" y="6184023"/>
+              <a:off x="6044629" y="6177114"/>
               <a:ext cx="3002202" cy="408944"/>
               <a:chOff x="7842009" y="5628981"/>
               <a:chExt cx="3002202" cy="408944"/>
@@ -15062,35 +15106,6 @@
           </p:grpSp>
         </p:grpSp>
       </p:grpSp>
-      <p:sp>
-        <p:nvSpPr>
-          <p:cNvPr id="17" name="TextBox 16"/>
-          <p:cNvSpPr txBox="1"/>
-          <p:nvPr/>
-        </p:nvSpPr>
-        <p:spPr>
-          <a:xfrm>
-            <a:off x="11080036" y="-16321"/>
-            <a:ext cx="1060704" cy="369332"/>
-          </a:xfrm>
-          <a:prstGeom prst="rect">
-            <a:avLst/>
-          </a:prstGeom>
-          <a:noFill/>
-        </p:spPr>
-        <p:txBody>
-          <a:bodyPr wrap="square" rtlCol="0">
-            <a:spAutoFit/>
-          </a:bodyPr>
-          <a:lstStyle/>
-          <a:p>
-            <a:r>
-              <a:rPr lang="en-US" dirty="0" smtClean="0"/>
-              <a:t>Fig 3a-3b</a:t>
-            </a:r>
-          </a:p>
-        </p:txBody>
-      </p:sp>
     </p:spTree>
     <p:extLst>
       <p:ext uri="{BB962C8B-B14F-4D97-AF65-F5344CB8AC3E}">
@@ -15582,11 +15597,7 @@
               </a:r>
               <a:r>
                 <a:rPr lang="en-US" sz="1400" dirty="0" smtClean="0"/>
-                <a:t>= </a:t>
-              </a:r>
-              <a:r>
-                <a:rPr lang="en-US" sz="1400" dirty="0" smtClean="0"/>
-                <a:t>0.21</a:t>
+                <a:t>= 0.21</a:t>
               </a:r>
               <a:endParaRPr lang="en-US" sz="1400" dirty="0"/>
             </a:p>
@@ -15624,11 +15635,7 @@
               </a:r>
               <a:r>
                 <a:rPr lang="en-US" sz="1400" dirty="0" smtClean="0"/>
-                <a:t>= </a:t>
-              </a:r>
-              <a:r>
-                <a:rPr lang="en-US" sz="1400" dirty="0" smtClean="0"/>
-                <a:t>0.43</a:t>
+                <a:t>= 0.43</a:t>
               </a:r>
               <a:endParaRPr lang="en-US" sz="1400" dirty="0"/>
             </a:p>
@@ -16120,11 +16127,7 @@
               </a:r>
               <a:r>
                 <a:rPr lang="en-US" sz="1400" dirty="0" smtClean="0"/>
-                <a:t>= </a:t>
-              </a:r>
-              <a:r>
-                <a:rPr lang="en-US" sz="1400" dirty="0" smtClean="0"/>
-                <a:t>0.21</a:t>
+                <a:t>= 0.21</a:t>
               </a:r>
               <a:endParaRPr lang="en-US" sz="1400" dirty="0"/>
             </a:p>
@@ -16162,11 +16165,7 @@
               </a:r>
               <a:r>
                 <a:rPr lang="en-US" sz="1400" dirty="0" smtClean="0"/>
-                <a:t>= </a:t>
-              </a:r>
-              <a:r>
-                <a:rPr lang="en-US" sz="1400" dirty="0" smtClean="0"/>
-                <a:t>0.17</a:t>
+                <a:t>= 0.17</a:t>
               </a:r>
               <a:endParaRPr lang="en-US" sz="1400" dirty="0"/>
             </a:p>
@@ -16390,13 +16389,8 @@
               </a:r>
               <a:r>
                 <a:rPr lang="en-US" sz="1400" dirty="0" smtClean="0"/>
-                <a:t>= </a:t>
+                <a:t>= 0.32</a:t>
               </a:r>
-              <a:r>
-                <a:rPr lang="en-US" sz="1400" dirty="0" smtClean="0"/>
-                <a:t>0.32</a:t>
-              </a:r>
-              <a:endParaRPr lang="en-US" sz="1400" dirty="0" smtClean="0"/>
             </a:p>
           </p:txBody>
         </p:sp>
@@ -16432,11 +16426,7 @@
               </a:r>
               <a:r>
                 <a:rPr lang="en-US" sz="1400" dirty="0" smtClean="0"/>
-                <a:t>= </a:t>
-              </a:r>
-              <a:r>
-                <a:rPr lang="en-US" sz="1400" dirty="0" smtClean="0"/>
-                <a:t>0.17</a:t>
+                <a:t>= 0.17</a:t>
               </a:r>
               <a:endParaRPr lang="en-US" sz="1400" dirty="0"/>
             </a:p>

</xml_diff>

<commit_message>
working on null models, created new script and focusing on SADs (5A)
</commit_message>
<xml_diff>
--- a/output/plots/all_figs_with_legends.pptx
+++ b/output/plots/all_figs_with_legends.pptx
@@ -15642,6 +15642,30 @@
           </p:txBody>
         </p:sp>
       </p:grpSp>
+      <p:pic>
+        <p:nvPicPr>
+          <p:cNvPr id="6" name="Picture 5"/>
+          <p:cNvPicPr>
+            <a:picLocks noChangeAspect="1"/>
+          </p:cNvPicPr>
+          <p:nvPr/>
+        </p:nvPicPr>
+        <p:blipFill>
+          <a:blip r:embed="rId13"/>
+          <a:stretch>
+            <a:fillRect/>
+          </a:stretch>
+        </p:blipFill>
+        <p:spPr>
+          <a:xfrm>
+            <a:off x="2614259" y="120227"/>
+            <a:ext cx="8841190" cy="5771139"/>
+          </a:xfrm>
+          <a:prstGeom prst="rect">
+            <a:avLst/>
+          </a:prstGeom>
+        </p:spPr>
+      </p:pic>
     </p:spTree>
     <p:extLst>
       <p:ext uri="{BB962C8B-B14F-4D97-AF65-F5344CB8AC3E}">

</xml_diff>

<commit_message>
ran KS tests on null models
</commit_message>
<xml_diff>
--- a/output/plots/all_figs_with_legends.pptx
+++ b/output/plots/all_figs_with_legends.pptx
@@ -5,23 +5,24 @@
     <p:sldMasterId id="2147483648" r:id="rId1"/>
   </p:sldMasterIdLst>
   <p:notesMasterIdLst>
-    <p:notesMasterId r:id="rId16"/>
+    <p:notesMasterId r:id="rId17"/>
   </p:notesMasterIdLst>
   <p:sldIdLst>
     <p:sldId id="258" r:id="rId2"/>
     <p:sldId id="263" r:id="rId3"/>
-    <p:sldId id="257" r:id="rId4"/>
-    <p:sldId id="260" r:id="rId5"/>
-    <p:sldId id="262" r:id="rId6"/>
-    <p:sldId id="256" r:id="rId7"/>
-    <p:sldId id="264" r:id="rId8"/>
-    <p:sldId id="267" r:id="rId9"/>
-    <p:sldId id="271" r:id="rId10"/>
-    <p:sldId id="272" r:id="rId11"/>
-    <p:sldId id="273" r:id="rId12"/>
-    <p:sldId id="274" r:id="rId13"/>
-    <p:sldId id="270" r:id="rId14"/>
-    <p:sldId id="269" r:id="rId15"/>
+    <p:sldId id="275" r:id="rId4"/>
+    <p:sldId id="257" r:id="rId5"/>
+    <p:sldId id="260" r:id="rId6"/>
+    <p:sldId id="262" r:id="rId7"/>
+    <p:sldId id="256" r:id="rId8"/>
+    <p:sldId id="264" r:id="rId9"/>
+    <p:sldId id="267" r:id="rId10"/>
+    <p:sldId id="271" r:id="rId11"/>
+    <p:sldId id="272" r:id="rId12"/>
+    <p:sldId id="273" r:id="rId13"/>
+    <p:sldId id="274" r:id="rId14"/>
+    <p:sldId id="270" r:id="rId15"/>
+    <p:sldId id="269" r:id="rId16"/>
   </p:sldIdLst>
   <p:sldSz cx="12192000" cy="6858000"/>
   <p:notesSz cx="6858000" cy="9144000"/>
@@ -210,7 +211,7 @@
           <a:p>
             <a:fld id="{7FA21820-D199-4D82-91AF-C50B1D3B111A}" type="datetimeFigureOut">
               <a:rPr lang="en-US" smtClean="0"/>
-              <a:t>1/5/2018</a:t>
+              <a:t>1/25/2018</a:t>
             </a:fld>
             <a:endParaRPr lang="en-US"/>
           </a:p>
@@ -805,7 +806,7 @@
           <a:p>
             <a:fld id="{0160E3DB-BCAB-42BD-8DDD-04198F92E62D}" type="slidenum">
               <a:rPr lang="en-US" smtClean="0"/>
-              <a:t>3</a:t>
+              <a:t>4</a:t>
             </a:fld>
             <a:endParaRPr lang="en-US"/>
           </a:p>
@@ -893,7 +894,7 @@
           <a:p>
             <a:fld id="{0160E3DB-BCAB-42BD-8DDD-04198F92E62D}" type="slidenum">
               <a:rPr lang="en-US" smtClean="0"/>
-              <a:t>4</a:t>
+              <a:t>5</a:t>
             </a:fld>
             <a:endParaRPr lang="en-US"/>
           </a:p>
@@ -1043,7 +1044,7 @@
           <a:p>
             <a:fld id="{916B8C92-D5E3-4480-8685-D57BEE386DE2}" type="datetimeFigureOut">
               <a:rPr lang="en-US" smtClean="0"/>
-              <a:t>1/5/2018</a:t>
+              <a:t>1/25/2018</a:t>
             </a:fld>
             <a:endParaRPr lang="en-US"/>
           </a:p>
@@ -1213,7 +1214,7 @@
           <a:p>
             <a:fld id="{916B8C92-D5E3-4480-8685-D57BEE386DE2}" type="datetimeFigureOut">
               <a:rPr lang="en-US" smtClean="0"/>
-              <a:t>1/5/2018</a:t>
+              <a:t>1/25/2018</a:t>
             </a:fld>
             <a:endParaRPr lang="en-US"/>
           </a:p>
@@ -1393,7 +1394,7 @@
           <a:p>
             <a:fld id="{916B8C92-D5E3-4480-8685-D57BEE386DE2}" type="datetimeFigureOut">
               <a:rPr lang="en-US" smtClean="0"/>
-              <a:t>1/5/2018</a:t>
+              <a:t>1/25/2018</a:t>
             </a:fld>
             <a:endParaRPr lang="en-US"/>
           </a:p>
@@ -1563,7 +1564,7 @@
           <a:p>
             <a:fld id="{916B8C92-D5E3-4480-8685-D57BEE386DE2}" type="datetimeFigureOut">
               <a:rPr lang="en-US" smtClean="0"/>
-              <a:t>1/5/2018</a:t>
+              <a:t>1/25/2018</a:t>
             </a:fld>
             <a:endParaRPr lang="en-US"/>
           </a:p>
@@ -1809,7 +1810,7 @@
           <a:p>
             <a:fld id="{916B8C92-D5E3-4480-8685-D57BEE386DE2}" type="datetimeFigureOut">
               <a:rPr lang="en-US" smtClean="0"/>
-              <a:t>1/5/2018</a:t>
+              <a:t>1/25/2018</a:t>
             </a:fld>
             <a:endParaRPr lang="en-US"/>
           </a:p>
@@ -2041,7 +2042,7 @@
           <a:p>
             <a:fld id="{916B8C92-D5E3-4480-8685-D57BEE386DE2}" type="datetimeFigureOut">
               <a:rPr lang="en-US" smtClean="0"/>
-              <a:t>1/5/2018</a:t>
+              <a:t>1/25/2018</a:t>
             </a:fld>
             <a:endParaRPr lang="en-US"/>
           </a:p>
@@ -2408,7 +2409,7 @@
           <a:p>
             <a:fld id="{916B8C92-D5E3-4480-8685-D57BEE386DE2}" type="datetimeFigureOut">
               <a:rPr lang="en-US" smtClean="0"/>
-              <a:t>1/5/2018</a:t>
+              <a:t>1/25/2018</a:t>
             </a:fld>
             <a:endParaRPr lang="en-US"/>
           </a:p>
@@ -2526,7 +2527,7 @@
           <a:p>
             <a:fld id="{916B8C92-D5E3-4480-8685-D57BEE386DE2}" type="datetimeFigureOut">
               <a:rPr lang="en-US" smtClean="0"/>
-              <a:t>1/5/2018</a:t>
+              <a:t>1/25/2018</a:t>
             </a:fld>
             <a:endParaRPr lang="en-US"/>
           </a:p>
@@ -2621,7 +2622,7 @@
           <a:p>
             <a:fld id="{916B8C92-D5E3-4480-8685-D57BEE386DE2}" type="datetimeFigureOut">
               <a:rPr lang="en-US" smtClean="0"/>
-              <a:t>1/5/2018</a:t>
+              <a:t>1/25/2018</a:t>
             </a:fld>
             <a:endParaRPr lang="en-US"/>
           </a:p>
@@ -2898,7 +2899,7 @@
           <a:p>
             <a:fld id="{916B8C92-D5E3-4480-8685-D57BEE386DE2}" type="datetimeFigureOut">
               <a:rPr lang="en-US" smtClean="0"/>
-              <a:t>1/5/2018</a:t>
+              <a:t>1/25/2018</a:t>
             </a:fld>
             <a:endParaRPr lang="en-US"/>
           </a:p>
@@ -3151,7 +3152,7 @@
           <a:p>
             <a:fld id="{916B8C92-D5E3-4480-8685-D57BEE386DE2}" type="datetimeFigureOut">
               <a:rPr lang="en-US" smtClean="0"/>
-              <a:t>1/5/2018</a:t>
+              <a:t>1/25/2018</a:t>
             </a:fld>
             <a:endParaRPr lang="en-US"/>
           </a:p>
@@ -3364,7 +3365,7 @@
           <a:p>
             <a:fld id="{916B8C92-D5E3-4480-8685-D57BEE386DE2}" type="datetimeFigureOut">
               <a:rPr lang="en-US" smtClean="0"/>
-              <a:t>1/5/2018</a:t>
+              <a:t>1/25/2018</a:t>
             </a:fld>
             <a:endParaRPr lang="en-US"/>
           </a:p>
@@ -5842,6 +5843,244 @@
           <a:chExt cx="0" cy="0"/>
         </a:xfrm>
       </p:grpSpPr>
+      <p:grpSp>
+        <p:nvGrpSpPr>
+          <p:cNvPr id="11" name="Group 10"/>
+          <p:cNvGrpSpPr/>
+          <p:nvPr/>
+        </p:nvGrpSpPr>
+        <p:grpSpPr>
+          <a:xfrm>
+            <a:off x="1253441" y="0"/>
+            <a:ext cx="9224921" cy="6858000"/>
+            <a:chOff x="1253441" y="0"/>
+            <a:chExt cx="9224921" cy="6858000"/>
+          </a:xfrm>
+        </p:grpSpPr>
+        <p:pic>
+          <p:nvPicPr>
+            <p:cNvPr id="10" name="Picture 9"/>
+            <p:cNvPicPr>
+              <a:picLocks noChangeAspect="1"/>
+            </p:cNvPicPr>
+            <p:nvPr/>
+          </p:nvPicPr>
+          <p:blipFill>
+            <a:blip r:embed="rId2"/>
+            <a:stretch>
+              <a:fillRect/>
+            </a:stretch>
+          </p:blipFill>
+          <p:spPr>
+            <a:xfrm>
+              <a:off x="1253441" y="0"/>
+              <a:ext cx="9224921" cy="6858000"/>
+            </a:xfrm>
+            <a:prstGeom prst="rect">
+              <a:avLst/>
+            </a:prstGeom>
+          </p:spPr>
+        </p:pic>
+        <p:grpSp>
+          <p:nvGrpSpPr>
+            <p:cNvPr id="2" name="Group 1"/>
+            <p:cNvGrpSpPr/>
+            <p:nvPr/>
+          </p:nvGrpSpPr>
+          <p:grpSpPr>
+            <a:xfrm>
+              <a:off x="2193215" y="0"/>
+              <a:ext cx="8285147" cy="6131578"/>
+              <a:chOff x="2193215" y="0"/>
+              <a:chExt cx="8285147" cy="6131578"/>
+            </a:xfrm>
+          </p:grpSpPr>
+          <p:pic>
+            <p:nvPicPr>
+              <p:cNvPr id="6" name="Picture 5"/>
+              <p:cNvPicPr>
+                <a:picLocks noChangeAspect="1"/>
+              </p:cNvPicPr>
+              <p:nvPr/>
+            </p:nvPicPr>
+            <p:blipFill>
+              <a:blip r:embed="rId3"/>
+              <a:stretch>
+                <a:fillRect/>
+              </a:stretch>
+            </p:blipFill>
+            <p:spPr>
+              <a:xfrm>
+                <a:off x="8027558" y="0"/>
+                <a:ext cx="2450804" cy="823031"/>
+              </a:xfrm>
+              <a:prstGeom prst="rect">
+                <a:avLst/>
+              </a:prstGeom>
+            </p:spPr>
+          </p:pic>
+          <p:pic>
+            <p:nvPicPr>
+              <p:cNvPr id="7" name="Picture 6"/>
+              <p:cNvPicPr>
+                <a:picLocks noChangeAspect="1"/>
+              </p:cNvPicPr>
+              <p:nvPr/>
+            </p:nvPicPr>
+            <p:blipFill>
+              <a:blip r:embed="rId4"/>
+              <a:stretch>
+                <a:fillRect/>
+              </a:stretch>
+            </p:blipFill>
+            <p:spPr>
+              <a:xfrm>
+                <a:off x="8971626" y="4619134"/>
+                <a:ext cx="1506736" cy="1512444"/>
+              </a:xfrm>
+              <a:prstGeom prst="rect">
+                <a:avLst/>
+              </a:prstGeom>
+            </p:spPr>
+          </p:pic>
+          <p:sp>
+            <p:nvSpPr>
+              <p:cNvPr id="8" name="TextBox 7"/>
+              <p:cNvSpPr txBox="1"/>
+              <p:nvPr/>
+            </p:nvSpPr>
+            <p:spPr>
+              <a:xfrm>
+                <a:off x="2193215" y="2537382"/>
+                <a:ext cx="1324900" cy="707886"/>
+              </a:xfrm>
+              <a:prstGeom prst="rect">
+                <a:avLst/>
+              </a:prstGeom>
+              <a:noFill/>
+            </p:spPr>
+            <p:txBody>
+              <a:bodyPr wrap="square" rtlCol="0">
+                <a:spAutoFit/>
+              </a:bodyPr>
+              <a:lstStyle/>
+              <a:p>
+                <a:r>
+                  <a:rPr lang="en-US" sz="2000" dirty="0"/>
+                  <a:t>l</a:t>
+                </a:r>
+                <a:r>
+                  <a:rPr lang="en-US" sz="2000" dirty="0" smtClean="0"/>
+                  <a:t>ognormal</a:t>
+                </a:r>
+              </a:p>
+              <a:p>
+                <a:endParaRPr lang="en-US" sz="2000" dirty="0"/>
+              </a:p>
+            </p:txBody>
+          </p:sp>
+          <p:sp>
+            <p:nvSpPr>
+              <p:cNvPr id="9" name="TextBox 8"/>
+              <p:cNvSpPr txBox="1"/>
+              <p:nvPr/>
+            </p:nvSpPr>
+            <p:spPr>
+              <a:xfrm>
+                <a:off x="4478498" y="2537382"/>
+                <a:ext cx="1324900" cy="707886"/>
+              </a:xfrm>
+              <a:prstGeom prst="rect">
+                <a:avLst/>
+              </a:prstGeom>
+              <a:noFill/>
+            </p:spPr>
+            <p:txBody>
+              <a:bodyPr wrap="square" rtlCol="0">
+                <a:spAutoFit/>
+              </a:bodyPr>
+              <a:lstStyle/>
+              <a:p>
+                <a:r>
+                  <a:rPr lang="en-US" sz="2000" dirty="0" err="1" smtClean="0"/>
+                  <a:t>logseries</a:t>
+                </a:r>
+                <a:endParaRPr lang="en-US" sz="2000" dirty="0" smtClean="0"/>
+              </a:p>
+              <a:p>
+                <a:endParaRPr lang="en-US" sz="2000" dirty="0"/>
+              </a:p>
+            </p:txBody>
+          </p:sp>
+          <p:cxnSp>
+            <p:nvCxnSpPr>
+              <p:cNvPr id="4" name="Straight Arrow Connector 3"/>
+              <p:cNvCxnSpPr/>
+              <p:nvPr/>
+            </p:nvCxnSpPr>
+            <p:spPr>
+              <a:xfrm>
+                <a:off x="3471620" y="2735451"/>
+                <a:ext cx="906650" cy="0"/>
+              </a:xfrm>
+              <a:prstGeom prst="straightConnector1">
+                <a:avLst/>
+              </a:prstGeom>
+              <a:ln w="28575">
+                <a:solidFill>
+                  <a:schemeClr val="tx1"/>
+                </a:solidFill>
+                <a:headEnd type="arrow" w="med" len="med"/>
+                <a:tailEnd type="arrow" w="med" len="med"/>
+              </a:ln>
+            </p:spPr>
+            <p:style>
+              <a:lnRef idx="1">
+                <a:schemeClr val="accent1"/>
+              </a:lnRef>
+              <a:fillRef idx="0">
+                <a:schemeClr val="accent1"/>
+              </a:fillRef>
+              <a:effectRef idx="0">
+                <a:schemeClr val="accent1"/>
+              </a:effectRef>
+              <a:fontRef idx="minor">
+                <a:schemeClr val="tx1"/>
+              </a:fontRef>
+            </p:style>
+          </p:cxnSp>
+        </p:grpSp>
+      </p:grpSp>
+    </p:spTree>
+    <p:extLst>
+      <p:ext uri="{BB962C8B-B14F-4D97-AF65-F5344CB8AC3E}">
+        <p14:creationId xmlns:p14="http://schemas.microsoft.com/office/powerpoint/2010/main" val="3378026183"/>
+      </p:ext>
+    </p:extLst>
+  </p:cSld>
+  <p:clrMapOvr>
+    <a:masterClrMapping/>
+  </p:clrMapOvr>
+</p:sld>
+</file>
+
+<file path=ppt/slides/slide11.xml><?xml version="1.0" encoding="utf-8"?>
+<p:sld xmlns:a="http://schemas.openxmlformats.org/drawingml/2006/main" xmlns:r="http://schemas.openxmlformats.org/officeDocument/2006/relationships" xmlns:p="http://schemas.openxmlformats.org/presentationml/2006/main">
+  <p:cSld>
+    <p:spTree>
+      <p:nvGrpSpPr>
+        <p:cNvPr id="1" name=""/>
+        <p:cNvGrpSpPr/>
+        <p:nvPr/>
+      </p:nvGrpSpPr>
+      <p:grpSpPr>
+        <a:xfrm>
+          <a:off x="0" y="0"/>
+          <a:ext cx="0" cy="0"/>
+          <a:chOff x="0" y="0"/>
+          <a:chExt cx="0" cy="0"/>
+        </a:xfrm>
+      </p:grpSpPr>
       <p:sp>
         <p:nvSpPr>
           <p:cNvPr id="2" name="Title 1"/>
@@ -6059,7 +6298,7 @@
 </p:sld>
 </file>
 
-<file path=ppt/slides/slide11.xml><?xml version="1.0" encoding="utf-8"?>
+<file path=ppt/slides/slide12.xml><?xml version="1.0" encoding="utf-8"?>
 <p:sld xmlns:a="http://schemas.openxmlformats.org/drawingml/2006/main" xmlns:r="http://schemas.openxmlformats.org/officeDocument/2006/relationships" xmlns:p="http://schemas.openxmlformats.org/presentationml/2006/main">
   <p:cSld>
     <p:spTree>
@@ -6320,7 +6559,7 @@
 </p:sld>
 </file>
 
-<file path=ppt/slides/slide12.xml><?xml version="1.0" encoding="utf-8"?>
+<file path=ppt/slides/slide13.xml><?xml version="1.0" encoding="utf-8"?>
 <p:sld xmlns:a="http://schemas.openxmlformats.org/drawingml/2006/main" xmlns:r="http://schemas.openxmlformats.org/officeDocument/2006/relationships" xmlns:p="http://schemas.openxmlformats.org/presentationml/2006/main">
   <p:cSld>
     <p:spTree>
@@ -6413,7 +6652,7 @@
 </p:sld>
 </file>
 
-<file path=ppt/slides/slide13.xml><?xml version="1.0" encoding="utf-8"?>
+<file path=ppt/slides/slide14.xml><?xml version="1.0" encoding="utf-8"?>
 <p:sld xmlns:a="http://schemas.openxmlformats.org/drawingml/2006/main" xmlns:r="http://schemas.openxmlformats.org/officeDocument/2006/relationships" xmlns:p="http://schemas.openxmlformats.org/presentationml/2006/main">
   <p:cSld>
     <p:spTree>
@@ -6538,7 +6777,7 @@
 </p:sld>
 </file>
 
-<file path=ppt/slides/slide14.xml><?xml version="1.0" encoding="utf-8"?>
+<file path=ppt/slides/slide15.xml><?xml version="1.0" encoding="utf-8"?>
 <p:sld xmlns:a="http://schemas.openxmlformats.org/drawingml/2006/main" xmlns:r="http://schemas.openxmlformats.org/officeDocument/2006/relationships" xmlns:p="http://schemas.openxmlformats.org/presentationml/2006/main">
   <p:cSld>
     <p:spTree>
@@ -12800,6 +13039,803 @@
 </file>
 
 <file path=ppt/slides/slide3.xml><?xml version="1.0" encoding="utf-8"?>
+<p:sld xmlns:a="http://schemas.openxmlformats.org/drawingml/2006/main" xmlns:r="http://schemas.openxmlformats.org/officeDocument/2006/relationships" xmlns:p="http://schemas.openxmlformats.org/presentationml/2006/main" show="0">
+  <p:cSld>
+    <p:spTree>
+      <p:nvGrpSpPr>
+        <p:cNvPr id="1" name=""/>
+        <p:cNvGrpSpPr/>
+        <p:nvPr/>
+      </p:nvGrpSpPr>
+      <p:grpSpPr>
+        <a:xfrm>
+          <a:off x="0" y="0"/>
+          <a:ext cx="0" cy="0"/>
+          <a:chOff x="0" y="0"/>
+          <a:chExt cx="0" cy="0"/>
+        </a:xfrm>
+      </p:grpSpPr>
+      <p:sp>
+        <p:nvSpPr>
+          <p:cNvPr id="123" name="TextBox 122"/>
+          <p:cNvSpPr txBox="1"/>
+          <p:nvPr/>
+        </p:nvSpPr>
+        <p:spPr>
+          <a:xfrm>
+            <a:off x="6354399" y="4840363"/>
+            <a:ext cx="5402404" cy="307777"/>
+          </a:xfrm>
+          <a:prstGeom prst="rect">
+            <a:avLst/>
+          </a:prstGeom>
+          <a:noFill/>
+        </p:spPr>
+        <p:txBody>
+          <a:bodyPr wrap="square" rtlCol="0">
+            <a:spAutoFit/>
+          </a:bodyPr>
+          <a:lstStyle/>
+          <a:p>
+            <a:r>
+              <a:rPr lang="en-US" sz="1400" dirty="0" smtClean="0"/>
+              <a:t>Species temporal occupancy strongly determined by competition</a:t>
+            </a:r>
+            <a:endParaRPr lang="en-US" sz="1400" dirty="0"/>
+          </a:p>
+        </p:txBody>
+      </p:sp>
+      <p:grpSp>
+        <p:nvGrpSpPr>
+          <p:cNvPr id="135" name="Group 134"/>
+          <p:cNvGrpSpPr/>
+          <p:nvPr/>
+        </p:nvGrpSpPr>
+        <p:grpSpPr>
+          <a:xfrm>
+            <a:off x="619585" y="916281"/>
+            <a:ext cx="5402404" cy="3877583"/>
+            <a:chOff x="345569" y="4881769"/>
+            <a:chExt cx="1131512" cy="1096218"/>
+          </a:xfrm>
+        </p:grpSpPr>
+        <p:sp>
+          <p:nvSpPr>
+            <p:cNvPr id="138" name="Oval 137"/>
+            <p:cNvSpPr/>
+            <p:nvPr/>
+          </p:nvSpPr>
+          <p:spPr>
+            <a:xfrm>
+              <a:off x="1225840" y="4987194"/>
+              <a:ext cx="164592" cy="164592"/>
+            </a:xfrm>
+            <a:prstGeom prst="ellipse">
+              <a:avLst/>
+            </a:prstGeom>
+            <a:solidFill>
+              <a:schemeClr val="tx1">
+                <a:lumMod val="50000"/>
+                <a:lumOff val="50000"/>
+              </a:schemeClr>
+            </a:solidFill>
+            <a:ln w="19050">
+              <a:solidFill>
+                <a:schemeClr val="tx1">
+                  <a:lumMod val="50000"/>
+                  <a:lumOff val="50000"/>
+                </a:schemeClr>
+              </a:solidFill>
+            </a:ln>
+          </p:spPr>
+          <p:style>
+            <a:lnRef idx="2">
+              <a:schemeClr val="accent1">
+                <a:shade val="50000"/>
+              </a:schemeClr>
+            </a:lnRef>
+            <a:fillRef idx="1">
+              <a:schemeClr val="accent1"/>
+            </a:fillRef>
+            <a:effectRef idx="0">
+              <a:schemeClr val="accent1"/>
+            </a:effectRef>
+            <a:fontRef idx="minor">
+              <a:schemeClr val="lt1"/>
+            </a:fontRef>
+          </p:style>
+          <p:txBody>
+            <a:bodyPr rtlCol="0" anchor="ctr"/>
+            <a:lstStyle/>
+            <a:p>
+              <a:pPr algn="ctr"/>
+              <a:endParaRPr lang="en-US"/>
+            </a:p>
+          </p:txBody>
+        </p:sp>
+        <p:sp>
+          <p:nvSpPr>
+            <p:cNvPr id="139" name="Isosceles Triangle 138"/>
+            <p:cNvSpPr/>
+            <p:nvPr/>
+          </p:nvSpPr>
+          <p:spPr>
+            <a:xfrm>
+              <a:off x="447161" y="4973235"/>
+              <a:ext cx="164592" cy="164592"/>
+            </a:xfrm>
+            <a:prstGeom prst="triangle">
+              <a:avLst/>
+            </a:prstGeom>
+            <a:solidFill>
+              <a:schemeClr val="tx1">
+                <a:lumMod val="50000"/>
+                <a:lumOff val="50000"/>
+              </a:schemeClr>
+            </a:solidFill>
+            <a:ln w="19050">
+              <a:solidFill>
+                <a:schemeClr val="tx1">
+                  <a:lumMod val="50000"/>
+                  <a:lumOff val="50000"/>
+                </a:schemeClr>
+              </a:solidFill>
+            </a:ln>
+          </p:spPr>
+          <p:style>
+            <a:lnRef idx="2">
+              <a:schemeClr val="accent1">
+                <a:shade val="50000"/>
+              </a:schemeClr>
+            </a:lnRef>
+            <a:fillRef idx="1">
+              <a:schemeClr val="accent1"/>
+            </a:fillRef>
+            <a:effectRef idx="0">
+              <a:schemeClr val="accent1"/>
+            </a:effectRef>
+            <a:fontRef idx="minor">
+              <a:schemeClr val="lt1"/>
+            </a:fontRef>
+          </p:style>
+          <p:txBody>
+            <a:bodyPr rtlCol="0" anchor="ctr"/>
+            <a:lstStyle/>
+            <a:p>
+              <a:pPr algn="ctr"/>
+              <a:endParaRPr lang="en-US"/>
+            </a:p>
+          </p:txBody>
+        </p:sp>
+        <p:sp>
+          <p:nvSpPr>
+            <p:cNvPr id="145" name="Parallelogram 144"/>
+            <p:cNvSpPr/>
+            <p:nvPr/>
+          </p:nvSpPr>
+          <p:spPr>
+            <a:xfrm>
+              <a:off x="799602" y="5003966"/>
+              <a:ext cx="215132" cy="146017"/>
+            </a:xfrm>
+            <a:prstGeom prst="parallelogram">
+              <a:avLst/>
+            </a:prstGeom>
+            <a:noFill/>
+            <a:ln w="19050">
+              <a:solidFill>
+                <a:schemeClr val="tx1">
+                  <a:lumMod val="50000"/>
+                  <a:lumOff val="50000"/>
+                </a:schemeClr>
+              </a:solidFill>
+            </a:ln>
+          </p:spPr>
+          <p:style>
+            <a:lnRef idx="2">
+              <a:schemeClr val="accent1">
+                <a:shade val="50000"/>
+              </a:schemeClr>
+            </a:lnRef>
+            <a:fillRef idx="1">
+              <a:schemeClr val="accent1"/>
+            </a:fillRef>
+            <a:effectRef idx="0">
+              <a:schemeClr val="accent1"/>
+            </a:effectRef>
+            <a:fontRef idx="minor">
+              <a:schemeClr val="lt1"/>
+            </a:fontRef>
+          </p:style>
+          <p:txBody>
+            <a:bodyPr rtlCol="0" anchor="ctr"/>
+            <a:lstStyle/>
+            <a:p>
+              <a:pPr algn="ctr"/>
+              <a:endParaRPr lang="en-US"/>
+            </a:p>
+          </p:txBody>
+        </p:sp>
+        <p:sp>
+          <p:nvSpPr>
+            <p:cNvPr id="146" name="Rectangle 145"/>
+            <p:cNvSpPr/>
+            <p:nvPr/>
+          </p:nvSpPr>
+          <p:spPr>
+            <a:xfrm>
+              <a:off x="345569" y="4881769"/>
+              <a:ext cx="1131512" cy="1096218"/>
+            </a:xfrm>
+            <a:prstGeom prst="rect">
+              <a:avLst/>
+            </a:prstGeom>
+            <a:noFill/>
+            <a:ln>
+              <a:solidFill>
+                <a:schemeClr val="tx1"/>
+              </a:solidFill>
+            </a:ln>
+          </p:spPr>
+          <p:style>
+            <a:lnRef idx="2">
+              <a:schemeClr val="accent1">
+                <a:shade val="50000"/>
+              </a:schemeClr>
+            </a:lnRef>
+            <a:fillRef idx="1">
+              <a:schemeClr val="accent1"/>
+            </a:fillRef>
+            <a:effectRef idx="0">
+              <a:schemeClr val="accent1"/>
+            </a:effectRef>
+            <a:fontRef idx="minor">
+              <a:schemeClr val="lt1"/>
+            </a:fontRef>
+          </p:style>
+          <p:txBody>
+            <a:bodyPr rtlCol="0" anchor="ctr"/>
+            <a:lstStyle/>
+            <a:p>
+              <a:pPr algn="ctr"/>
+              <a:endParaRPr lang="en-US"/>
+            </a:p>
+          </p:txBody>
+        </p:sp>
+      </p:grpSp>
+      <p:grpSp>
+        <p:nvGrpSpPr>
+          <p:cNvPr id="147" name="Group 146"/>
+          <p:cNvGrpSpPr/>
+          <p:nvPr/>
+        </p:nvGrpSpPr>
+        <p:grpSpPr>
+          <a:xfrm>
+            <a:off x="6354399" y="851025"/>
+            <a:ext cx="5402404" cy="3877583"/>
+            <a:chOff x="1921849" y="4881769"/>
+            <a:chExt cx="1131512" cy="1096218"/>
+          </a:xfrm>
+        </p:grpSpPr>
+        <p:sp>
+          <p:nvSpPr>
+            <p:cNvPr id="156" name="Oval 155"/>
+            <p:cNvSpPr/>
+            <p:nvPr/>
+          </p:nvSpPr>
+          <p:spPr>
+            <a:xfrm>
+              <a:off x="2802120" y="4987194"/>
+              <a:ext cx="164592" cy="164592"/>
+            </a:xfrm>
+            <a:prstGeom prst="ellipse">
+              <a:avLst/>
+            </a:prstGeom>
+            <a:solidFill>
+              <a:schemeClr val="tx1">
+                <a:lumMod val="50000"/>
+                <a:lumOff val="50000"/>
+              </a:schemeClr>
+            </a:solidFill>
+            <a:ln w="19050">
+              <a:solidFill>
+                <a:schemeClr val="tx1">
+                  <a:lumMod val="50000"/>
+                  <a:lumOff val="50000"/>
+                </a:schemeClr>
+              </a:solidFill>
+            </a:ln>
+          </p:spPr>
+          <p:style>
+            <a:lnRef idx="2">
+              <a:schemeClr val="accent1">
+                <a:shade val="50000"/>
+              </a:schemeClr>
+            </a:lnRef>
+            <a:fillRef idx="1">
+              <a:schemeClr val="accent1"/>
+            </a:fillRef>
+            <a:effectRef idx="0">
+              <a:schemeClr val="accent1"/>
+            </a:effectRef>
+            <a:fontRef idx="minor">
+              <a:schemeClr val="lt1"/>
+            </a:fontRef>
+          </p:style>
+          <p:txBody>
+            <a:bodyPr rtlCol="0" anchor="ctr"/>
+            <a:lstStyle/>
+            <a:p>
+              <a:pPr algn="ctr"/>
+              <a:endParaRPr lang="en-US"/>
+            </a:p>
+          </p:txBody>
+        </p:sp>
+        <p:sp>
+          <p:nvSpPr>
+            <p:cNvPr id="157" name="Isosceles Triangle 156"/>
+            <p:cNvSpPr/>
+            <p:nvPr/>
+          </p:nvSpPr>
+          <p:spPr>
+            <a:xfrm>
+              <a:off x="1991471" y="4980539"/>
+              <a:ext cx="164592" cy="164592"/>
+            </a:xfrm>
+            <a:prstGeom prst="triangle">
+              <a:avLst/>
+            </a:prstGeom>
+            <a:solidFill>
+              <a:schemeClr val="tx1">
+                <a:lumMod val="50000"/>
+                <a:lumOff val="50000"/>
+              </a:schemeClr>
+            </a:solidFill>
+            <a:ln w="19050">
+              <a:solidFill>
+                <a:schemeClr val="tx1">
+                  <a:lumMod val="50000"/>
+                  <a:lumOff val="50000"/>
+                </a:schemeClr>
+              </a:solidFill>
+            </a:ln>
+          </p:spPr>
+          <p:style>
+            <a:lnRef idx="2">
+              <a:schemeClr val="accent1">
+                <a:shade val="50000"/>
+              </a:schemeClr>
+            </a:lnRef>
+            <a:fillRef idx="1">
+              <a:schemeClr val="accent1"/>
+            </a:fillRef>
+            <a:effectRef idx="0">
+              <a:schemeClr val="accent1"/>
+            </a:effectRef>
+            <a:fontRef idx="minor">
+              <a:schemeClr val="lt1"/>
+            </a:fontRef>
+          </p:style>
+          <p:txBody>
+            <a:bodyPr rtlCol="0" anchor="ctr"/>
+            <a:lstStyle/>
+            <a:p>
+              <a:pPr algn="ctr"/>
+              <a:endParaRPr lang="en-US"/>
+            </a:p>
+          </p:txBody>
+        </p:sp>
+        <p:sp>
+          <p:nvSpPr>
+            <p:cNvPr id="159" name="Rectangle 158"/>
+            <p:cNvSpPr/>
+            <p:nvPr/>
+          </p:nvSpPr>
+          <p:spPr>
+            <a:xfrm>
+              <a:off x="1921849" y="4881769"/>
+              <a:ext cx="1131512" cy="1096218"/>
+            </a:xfrm>
+            <a:prstGeom prst="rect">
+              <a:avLst/>
+            </a:prstGeom>
+            <a:noFill/>
+            <a:ln>
+              <a:solidFill>
+                <a:schemeClr val="tx1"/>
+              </a:solidFill>
+            </a:ln>
+          </p:spPr>
+          <p:style>
+            <a:lnRef idx="2">
+              <a:schemeClr val="accent1">
+                <a:shade val="50000"/>
+              </a:schemeClr>
+            </a:lnRef>
+            <a:fillRef idx="1">
+              <a:schemeClr val="accent1"/>
+            </a:fillRef>
+            <a:effectRef idx="0">
+              <a:schemeClr val="accent1"/>
+            </a:effectRef>
+            <a:fontRef idx="minor">
+              <a:schemeClr val="lt1"/>
+            </a:fontRef>
+          </p:style>
+          <p:txBody>
+            <a:bodyPr rtlCol="0" anchor="ctr"/>
+            <a:lstStyle/>
+            <a:p>
+              <a:pPr algn="ctr"/>
+              <a:endParaRPr lang="en-US"/>
+            </a:p>
+          </p:txBody>
+        </p:sp>
+      </p:grpSp>
+      <p:sp>
+        <p:nvSpPr>
+          <p:cNvPr id="163" name="TextBox 162"/>
+          <p:cNvSpPr txBox="1"/>
+          <p:nvPr/>
+        </p:nvSpPr>
+        <p:spPr>
+          <a:xfrm>
+            <a:off x="619585" y="4881726"/>
+            <a:ext cx="5337595" cy="307777"/>
+          </a:xfrm>
+          <a:prstGeom prst="rect">
+            <a:avLst/>
+          </a:prstGeom>
+          <a:noFill/>
+        </p:spPr>
+        <p:txBody>
+          <a:bodyPr wrap="square" rtlCol="0">
+            <a:spAutoFit/>
+          </a:bodyPr>
+          <a:lstStyle/>
+          <a:p>
+            <a:r>
+              <a:rPr lang="en-US" sz="1400" dirty="0" smtClean="0"/>
+              <a:t>Species temporal occupancy strongly determined by environment</a:t>
+            </a:r>
+            <a:endParaRPr lang="en-US" sz="1400" dirty="0"/>
+          </a:p>
+        </p:txBody>
+      </p:sp>
+      <p:pic>
+        <p:nvPicPr>
+          <p:cNvPr id="15" name="Picture 14"/>
+          <p:cNvPicPr>
+            <a:picLocks noChangeAspect="1"/>
+          </p:cNvPicPr>
+          <p:nvPr/>
+        </p:nvPicPr>
+        <p:blipFill>
+          <a:blip r:embed="rId2"/>
+          <a:stretch>
+            <a:fillRect/>
+          </a:stretch>
+        </p:blipFill>
+        <p:spPr>
+          <a:xfrm>
+            <a:off x="2906223" y="2472069"/>
+            <a:ext cx="829128" cy="615749"/>
+          </a:xfrm>
+          <a:prstGeom prst="rect">
+            <a:avLst/>
+          </a:prstGeom>
+        </p:spPr>
+      </p:pic>
+      <p:pic>
+        <p:nvPicPr>
+          <p:cNvPr id="16" name="Picture 15"/>
+          <p:cNvPicPr>
+            <a:picLocks noChangeAspect="1"/>
+          </p:cNvPicPr>
+          <p:nvPr/>
+        </p:nvPicPr>
+        <p:blipFill>
+          <a:blip r:embed="rId3"/>
+          <a:stretch>
+            <a:fillRect/>
+          </a:stretch>
+        </p:blipFill>
+        <p:spPr>
+          <a:xfrm>
+            <a:off x="1085738" y="2505617"/>
+            <a:ext cx="804742" cy="603556"/>
+          </a:xfrm>
+          <a:prstGeom prst="rect">
+            <a:avLst/>
+          </a:prstGeom>
+        </p:spPr>
+      </p:pic>
+      <p:pic>
+        <p:nvPicPr>
+          <p:cNvPr id="17" name="Picture 16"/>
+          <p:cNvPicPr>
+            <a:picLocks noChangeAspect="1"/>
+          </p:cNvPicPr>
+          <p:nvPr/>
+        </p:nvPicPr>
+        <p:blipFill>
+          <a:blip r:embed="rId4"/>
+          <a:stretch>
+            <a:fillRect/>
+          </a:stretch>
+        </p:blipFill>
+        <p:spPr>
+          <a:xfrm>
+            <a:off x="4575656" y="2551324"/>
+            <a:ext cx="1060796" cy="536494"/>
+          </a:xfrm>
+          <a:prstGeom prst="rect">
+            <a:avLst/>
+          </a:prstGeom>
+        </p:spPr>
+      </p:pic>
+      <p:pic>
+        <p:nvPicPr>
+          <p:cNvPr id="19" name="Picture 18"/>
+          <p:cNvPicPr>
+            <a:picLocks noChangeAspect="1"/>
+          </p:cNvPicPr>
+          <p:nvPr/>
+        </p:nvPicPr>
+        <p:blipFill>
+          <a:blip r:embed="rId2"/>
+          <a:stretch>
+            <a:fillRect/>
+          </a:stretch>
+        </p:blipFill>
+        <p:spPr>
+          <a:xfrm>
+            <a:off x="1017519" y="3792771"/>
+            <a:ext cx="829128" cy="615749"/>
+          </a:xfrm>
+          <a:prstGeom prst="rect">
+            <a:avLst/>
+          </a:prstGeom>
+        </p:spPr>
+      </p:pic>
+      <p:pic>
+        <p:nvPicPr>
+          <p:cNvPr id="20" name="Picture 19"/>
+          <p:cNvPicPr>
+            <a:picLocks noChangeAspect="1"/>
+          </p:cNvPicPr>
+          <p:nvPr/>
+        </p:nvPicPr>
+        <p:blipFill>
+          <a:blip r:embed="rId5"/>
+          <a:stretch>
+            <a:fillRect/>
+          </a:stretch>
+        </p:blipFill>
+        <p:spPr>
+          <a:xfrm>
+            <a:off x="4703683" y="3804964"/>
+            <a:ext cx="804742" cy="603556"/>
+          </a:xfrm>
+          <a:prstGeom prst="rect">
+            <a:avLst/>
+          </a:prstGeom>
+        </p:spPr>
+      </p:pic>
+      <p:pic>
+        <p:nvPicPr>
+          <p:cNvPr id="21" name="Picture 20"/>
+          <p:cNvPicPr>
+            <a:picLocks noChangeAspect="1"/>
+          </p:cNvPicPr>
+          <p:nvPr/>
+        </p:nvPicPr>
+        <p:blipFill>
+          <a:blip r:embed="rId6"/>
+          <a:stretch>
+            <a:fillRect/>
+          </a:stretch>
+        </p:blipFill>
+        <p:spPr>
+          <a:xfrm>
+            <a:off x="2770542" y="3872026"/>
+            <a:ext cx="1060796" cy="536494"/>
+          </a:xfrm>
+          <a:prstGeom prst="rect">
+            <a:avLst/>
+          </a:prstGeom>
+        </p:spPr>
+      </p:pic>
+      <p:pic>
+        <p:nvPicPr>
+          <p:cNvPr id="22" name="Picture 21"/>
+          <p:cNvPicPr>
+            <a:picLocks noChangeAspect="1"/>
+          </p:cNvPicPr>
+          <p:nvPr/>
+        </p:nvPicPr>
+        <p:blipFill>
+          <a:blip r:embed="rId6"/>
+          <a:stretch>
+            <a:fillRect/>
+          </a:stretch>
+        </p:blipFill>
+        <p:spPr>
+          <a:xfrm>
+            <a:off x="6686809" y="3979745"/>
+            <a:ext cx="1060796" cy="536494"/>
+          </a:xfrm>
+          <a:prstGeom prst="rect">
+            <a:avLst/>
+          </a:prstGeom>
+        </p:spPr>
+      </p:pic>
+      <p:pic>
+        <p:nvPicPr>
+          <p:cNvPr id="23" name="Picture 22"/>
+          <p:cNvPicPr>
+            <a:picLocks noChangeAspect="1"/>
+          </p:cNvPicPr>
+          <p:nvPr/>
+        </p:nvPicPr>
+        <p:blipFill>
+          <a:blip r:embed="rId6"/>
+          <a:stretch>
+            <a:fillRect/>
+          </a:stretch>
+        </p:blipFill>
+        <p:spPr>
+          <a:xfrm>
+            <a:off x="8495065" y="3965472"/>
+            <a:ext cx="1060796" cy="536494"/>
+          </a:xfrm>
+          <a:prstGeom prst="rect">
+            <a:avLst/>
+          </a:prstGeom>
+        </p:spPr>
+      </p:pic>
+      <p:pic>
+        <p:nvPicPr>
+          <p:cNvPr id="24" name="Picture 23"/>
+          <p:cNvPicPr>
+            <a:picLocks noChangeAspect="1"/>
+          </p:cNvPicPr>
+          <p:nvPr/>
+        </p:nvPicPr>
+        <p:blipFill>
+          <a:blip r:embed="rId6"/>
+          <a:stretch>
+            <a:fillRect/>
+          </a:stretch>
+        </p:blipFill>
+        <p:spPr>
+          <a:xfrm>
+            <a:off x="10419777" y="2719108"/>
+            <a:ext cx="1060796" cy="536494"/>
+          </a:xfrm>
+          <a:prstGeom prst="rect">
+            <a:avLst/>
+          </a:prstGeom>
+        </p:spPr>
+      </p:pic>
+      <p:pic>
+        <p:nvPicPr>
+          <p:cNvPr id="27" name="Picture 26"/>
+          <p:cNvPicPr>
+            <a:picLocks noChangeAspect="1"/>
+          </p:cNvPicPr>
+          <p:nvPr/>
+        </p:nvPicPr>
+        <p:blipFill>
+          <a:blip r:embed="rId6"/>
+          <a:stretch>
+            <a:fillRect/>
+          </a:stretch>
+        </p:blipFill>
+        <p:spPr>
+          <a:xfrm>
+            <a:off x="10326435" y="3965472"/>
+            <a:ext cx="1060796" cy="536494"/>
+          </a:xfrm>
+          <a:prstGeom prst="rect">
+            <a:avLst/>
+          </a:prstGeom>
+        </p:spPr>
+      </p:pic>
+      <p:pic>
+        <p:nvPicPr>
+          <p:cNvPr id="28" name="Picture 27"/>
+          <p:cNvPicPr>
+            <a:picLocks noChangeAspect="1"/>
+          </p:cNvPicPr>
+          <p:nvPr/>
+        </p:nvPicPr>
+        <p:blipFill>
+          <a:blip r:embed="rId7"/>
+          <a:stretch>
+            <a:fillRect/>
+          </a:stretch>
+        </p:blipFill>
+        <p:spPr>
+          <a:xfrm>
+            <a:off x="8570753" y="2679481"/>
+            <a:ext cx="829128" cy="615749"/>
+          </a:xfrm>
+          <a:prstGeom prst="rect">
+            <a:avLst/>
+          </a:prstGeom>
+        </p:spPr>
+      </p:pic>
+      <p:pic>
+        <p:nvPicPr>
+          <p:cNvPr id="29" name="Picture 28"/>
+          <p:cNvPicPr>
+            <a:picLocks noChangeAspect="1"/>
+          </p:cNvPicPr>
+          <p:nvPr/>
+        </p:nvPicPr>
+        <p:blipFill>
+          <a:blip r:embed="rId7"/>
+          <a:stretch>
+            <a:fillRect/>
+          </a:stretch>
+        </p:blipFill>
+        <p:spPr>
+          <a:xfrm>
+            <a:off x="8539384" y="1190390"/>
+            <a:ext cx="829128" cy="615749"/>
+          </a:xfrm>
+          <a:prstGeom prst="rect">
+            <a:avLst/>
+          </a:prstGeom>
+        </p:spPr>
+      </p:pic>
+      <p:pic>
+        <p:nvPicPr>
+          <p:cNvPr id="30" name="Picture 29"/>
+          <p:cNvPicPr>
+            <a:picLocks noChangeAspect="1"/>
+          </p:cNvPicPr>
+          <p:nvPr/>
+        </p:nvPicPr>
+        <p:blipFill>
+          <a:blip r:embed="rId8"/>
+          <a:stretch>
+            <a:fillRect/>
+          </a:stretch>
+        </p:blipFill>
+        <p:spPr>
+          <a:xfrm>
+            <a:off x="6798079" y="2679481"/>
+            <a:ext cx="804742" cy="597460"/>
+          </a:xfrm>
+          <a:prstGeom prst="rect">
+            <a:avLst/>
+          </a:prstGeom>
+        </p:spPr>
+      </p:pic>
+    </p:spTree>
+    <p:extLst>
+      <p:ext uri="{BB962C8B-B14F-4D97-AF65-F5344CB8AC3E}">
+        <p14:creationId xmlns:p14="http://schemas.microsoft.com/office/powerpoint/2010/main" val="3056452331"/>
+      </p:ext>
+    </p:extLst>
+  </p:cSld>
+  <p:clrMapOvr>
+    <a:masterClrMapping/>
+  </p:clrMapOvr>
+  <mc:AlternateContent xmlns:mc="http://schemas.openxmlformats.org/markup-compatibility/2006">
+    <mc:Choice xmlns:p14="http://schemas.microsoft.com/office/powerpoint/2010/main" Requires="p14">
+      <p:transition spd="slow" p14:dur="2000"/>
+    </mc:Choice>
+    <mc:Fallback>
+      <p:transition spd="slow"/>
+    </mc:Fallback>
+  </mc:AlternateContent>
+</p:sld>
+</file>
+
+<file path=ppt/slides/slide4.xml><?xml version="1.0" encoding="utf-8"?>
 <p:sld xmlns:a="http://schemas.openxmlformats.org/drawingml/2006/main" xmlns:r="http://schemas.openxmlformats.org/officeDocument/2006/relationships" xmlns:p="http://schemas.openxmlformats.org/presentationml/2006/main">
   <p:cSld>
     <p:spTree>
@@ -14682,7 +15718,7 @@
 </p:sld>
 </file>
 
-<file path=ppt/slides/slide4.xml><?xml version="1.0" encoding="utf-8"?>
+<file path=ppt/slides/slide5.xml><?xml version="1.0" encoding="utf-8"?>
 <p:sld xmlns:a="http://schemas.openxmlformats.org/drawingml/2006/main" xmlns:r="http://schemas.openxmlformats.org/officeDocument/2006/relationships" xmlns:p="http://schemas.openxmlformats.org/presentationml/2006/main">
   <p:cSld>
     <p:spTree>
@@ -15126,7 +16162,7 @@
 </p:sld>
 </file>
 
-<file path=ppt/slides/slide5.xml><?xml version="1.0" encoding="utf-8"?>
+<file path=ppt/slides/slide6.xml><?xml version="1.0" encoding="utf-8"?>
 <p:sld xmlns:a="http://schemas.openxmlformats.org/drawingml/2006/main" xmlns:r="http://schemas.openxmlformats.org/officeDocument/2006/relationships" xmlns:p="http://schemas.openxmlformats.org/presentationml/2006/main">
   <p:cSld>
     <p:spTree>
@@ -15686,7 +16722,7 @@
 </p:sld>
 </file>
 
-<file path=ppt/slides/slide6.xml><?xml version="1.0" encoding="utf-8"?>
+<file path=ppt/slides/slide7.xml><?xml version="1.0" encoding="utf-8"?>
 <p:sld xmlns:a="http://schemas.openxmlformats.org/drawingml/2006/main" xmlns:r="http://schemas.openxmlformats.org/officeDocument/2006/relationships" xmlns:p="http://schemas.openxmlformats.org/presentationml/2006/main">
   <p:cSld>
     <p:spTree>
@@ -15969,7 +17005,7 @@
 </p:sld>
 </file>
 
-<file path=ppt/slides/slide7.xml><?xml version="1.0" encoding="utf-8"?>
+<file path=ppt/slides/slide8.xml><?xml version="1.0" encoding="utf-8"?>
 <p:sld xmlns:a="http://schemas.openxmlformats.org/drawingml/2006/main" xmlns:r="http://schemas.openxmlformats.org/officeDocument/2006/relationships" xmlns:p="http://schemas.openxmlformats.org/presentationml/2006/main">
   <p:cSld>
     <p:spTree>
@@ -16216,7 +17252,7 @@
 </p:sld>
 </file>
 
-<file path=ppt/slides/slide8.xml><?xml version="1.0" encoding="utf-8"?>
+<file path=ppt/slides/slide9.xml><?xml version="1.0" encoding="utf-8"?>
 <p:sld xmlns:a="http://schemas.openxmlformats.org/drawingml/2006/main" xmlns:r="http://schemas.openxmlformats.org/officeDocument/2006/relationships" xmlns:p="http://schemas.openxmlformats.org/presentationml/2006/main">
   <p:cSld>
     <p:spTree>
@@ -16474,244 +17510,6 @@
       </p:par>
     </p:tnLst>
   </p:timing>
-</p:sld>
-</file>
-
-<file path=ppt/slides/slide9.xml><?xml version="1.0" encoding="utf-8"?>
-<p:sld xmlns:a="http://schemas.openxmlformats.org/drawingml/2006/main" xmlns:r="http://schemas.openxmlformats.org/officeDocument/2006/relationships" xmlns:p="http://schemas.openxmlformats.org/presentationml/2006/main">
-  <p:cSld>
-    <p:spTree>
-      <p:nvGrpSpPr>
-        <p:cNvPr id="1" name=""/>
-        <p:cNvGrpSpPr/>
-        <p:nvPr/>
-      </p:nvGrpSpPr>
-      <p:grpSpPr>
-        <a:xfrm>
-          <a:off x="0" y="0"/>
-          <a:ext cx="0" cy="0"/>
-          <a:chOff x="0" y="0"/>
-          <a:chExt cx="0" cy="0"/>
-        </a:xfrm>
-      </p:grpSpPr>
-      <p:grpSp>
-        <p:nvGrpSpPr>
-          <p:cNvPr id="11" name="Group 10"/>
-          <p:cNvGrpSpPr/>
-          <p:nvPr/>
-        </p:nvGrpSpPr>
-        <p:grpSpPr>
-          <a:xfrm>
-            <a:off x="1253441" y="0"/>
-            <a:ext cx="9224921" cy="6858000"/>
-            <a:chOff x="1253441" y="0"/>
-            <a:chExt cx="9224921" cy="6858000"/>
-          </a:xfrm>
-        </p:grpSpPr>
-        <p:pic>
-          <p:nvPicPr>
-            <p:cNvPr id="10" name="Picture 9"/>
-            <p:cNvPicPr>
-              <a:picLocks noChangeAspect="1"/>
-            </p:cNvPicPr>
-            <p:nvPr/>
-          </p:nvPicPr>
-          <p:blipFill>
-            <a:blip r:embed="rId2"/>
-            <a:stretch>
-              <a:fillRect/>
-            </a:stretch>
-          </p:blipFill>
-          <p:spPr>
-            <a:xfrm>
-              <a:off x="1253441" y="0"/>
-              <a:ext cx="9224921" cy="6858000"/>
-            </a:xfrm>
-            <a:prstGeom prst="rect">
-              <a:avLst/>
-            </a:prstGeom>
-          </p:spPr>
-        </p:pic>
-        <p:grpSp>
-          <p:nvGrpSpPr>
-            <p:cNvPr id="2" name="Group 1"/>
-            <p:cNvGrpSpPr/>
-            <p:nvPr/>
-          </p:nvGrpSpPr>
-          <p:grpSpPr>
-            <a:xfrm>
-              <a:off x="2193215" y="0"/>
-              <a:ext cx="8285147" cy="6131578"/>
-              <a:chOff x="2193215" y="0"/>
-              <a:chExt cx="8285147" cy="6131578"/>
-            </a:xfrm>
-          </p:grpSpPr>
-          <p:pic>
-            <p:nvPicPr>
-              <p:cNvPr id="6" name="Picture 5"/>
-              <p:cNvPicPr>
-                <a:picLocks noChangeAspect="1"/>
-              </p:cNvPicPr>
-              <p:nvPr/>
-            </p:nvPicPr>
-            <p:blipFill>
-              <a:blip r:embed="rId3"/>
-              <a:stretch>
-                <a:fillRect/>
-              </a:stretch>
-            </p:blipFill>
-            <p:spPr>
-              <a:xfrm>
-                <a:off x="8027558" y="0"/>
-                <a:ext cx="2450804" cy="823031"/>
-              </a:xfrm>
-              <a:prstGeom prst="rect">
-                <a:avLst/>
-              </a:prstGeom>
-            </p:spPr>
-          </p:pic>
-          <p:pic>
-            <p:nvPicPr>
-              <p:cNvPr id="7" name="Picture 6"/>
-              <p:cNvPicPr>
-                <a:picLocks noChangeAspect="1"/>
-              </p:cNvPicPr>
-              <p:nvPr/>
-            </p:nvPicPr>
-            <p:blipFill>
-              <a:blip r:embed="rId4"/>
-              <a:stretch>
-                <a:fillRect/>
-              </a:stretch>
-            </p:blipFill>
-            <p:spPr>
-              <a:xfrm>
-                <a:off x="8971626" y="4619134"/>
-                <a:ext cx="1506736" cy="1512444"/>
-              </a:xfrm>
-              <a:prstGeom prst="rect">
-                <a:avLst/>
-              </a:prstGeom>
-            </p:spPr>
-          </p:pic>
-          <p:sp>
-            <p:nvSpPr>
-              <p:cNvPr id="8" name="TextBox 7"/>
-              <p:cNvSpPr txBox="1"/>
-              <p:nvPr/>
-            </p:nvSpPr>
-            <p:spPr>
-              <a:xfrm>
-                <a:off x="2193215" y="2537382"/>
-                <a:ext cx="1324900" cy="707886"/>
-              </a:xfrm>
-              <a:prstGeom prst="rect">
-                <a:avLst/>
-              </a:prstGeom>
-              <a:noFill/>
-            </p:spPr>
-            <p:txBody>
-              <a:bodyPr wrap="square" rtlCol="0">
-                <a:spAutoFit/>
-              </a:bodyPr>
-              <a:lstStyle/>
-              <a:p>
-                <a:r>
-                  <a:rPr lang="en-US" sz="2000" dirty="0"/>
-                  <a:t>l</a:t>
-                </a:r>
-                <a:r>
-                  <a:rPr lang="en-US" sz="2000" dirty="0" smtClean="0"/>
-                  <a:t>ognormal</a:t>
-                </a:r>
-              </a:p>
-              <a:p>
-                <a:endParaRPr lang="en-US" sz="2000" dirty="0"/>
-              </a:p>
-            </p:txBody>
-          </p:sp>
-          <p:sp>
-            <p:nvSpPr>
-              <p:cNvPr id="9" name="TextBox 8"/>
-              <p:cNvSpPr txBox="1"/>
-              <p:nvPr/>
-            </p:nvSpPr>
-            <p:spPr>
-              <a:xfrm>
-                <a:off x="4478498" y="2537382"/>
-                <a:ext cx="1324900" cy="707886"/>
-              </a:xfrm>
-              <a:prstGeom prst="rect">
-                <a:avLst/>
-              </a:prstGeom>
-              <a:noFill/>
-            </p:spPr>
-            <p:txBody>
-              <a:bodyPr wrap="square" rtlCol="0">
-                <a:spAutoFit/>
-              </a:bodyPr>
-              <a:lstStyle/>
-              <a:p>
-                <a:r>
-                  <a:rPr lang="en-US" sz="2000" dirty="0" err="1" smtClean="0"/>
-                  <a:t>logseries</a:t>
-                </a:r>
-                <a:endParaRPr lang="en-US" sz="2000" dirty="0" smtClean="0"/>
-              </a:p>
-              <a:p>
-                <a:endParaRPr lang="en-US" sz="2000" dirty="0"/>
-              </a:p>
-            </p:txBody>
-          </p:sp>
-          <p:cxnSp>
-            <p:nvCxnSpPr>
-              <p:cNvPr id="4" name="Straight Arrow Connector 3"/>
-              <p:cNvCxnSpPr/>
-              <p:nvPr/>
-            </p:nvCxnSpPr>
-            <p:spPr>
-              <a:xfrm>
-                <a:off x="3471620" y="2735451"/>
-                <a:ext cx="906650" cy="0"/>
-              </a:xfrm>
-              <a:prstGeom prst="straightConnector1">
-                <a:avLst/>
-              </a:prstGeom>
-              <a:ln w="28575">
-                <a:solidFill>
-                  <a:schemeClr val="tx1"/>
-                </a:solidFill>
-                <a:headEnd type="arrow" w="med" len="med"/>
-                <a:tailEnd type="arrow" w="med" len="med"/>
-              </a:ln>
-            </p:spPr>
-            <p:style>
-              <a:lnRef idx="1">
-                <a:schemeClr val="accent1"/>
-              </a:lnRef>
-              <a:fillRef idx="0">
-                <a:schemeClr val="accent1"/>
-              </a:fillRef>
-              <a:effectRef idx="0">
-                <a:schemeClr val="accent1"/>
-              </a:effectRef>
-              <a:fontRef idx="minor">
-                <a:schemeClr val="tx1"/>
-              </a:fontRef>
-            </p:style>
-          </p:cxnSp>
-        </p:grpSp>
-      </p:grpSp>
-    </p:spTree>
-    <p:extLst>
-      <p:ext uri="{BB962C8B-B14F-4D97-AF65-F5344CB8AC3E}">
-        <p14:creationId xmlns:p14="http://schemas.microsoft.com/office/powerpoint/2010/main" val="3378026183"/>
-      </p:ext>
-    </p:extLst>
-  </p:cSld>
-  <p:clrMapOvr>
-    <a:masterClrMapping/>
-  </p:clrMapOvr>
 </p:sld>
 </file>
 

</xml_diff>

<commit_message>
reran temporal turnover to include bbs
</commit_message>
<xml_diff>
--- a/output/plots/all_figs_with_legends.pptx
+++ b/output/plots/all_figs_with_legends.pptx
@@ -5,7 +5,7 @@
     <p:sldMasterId id="2147483648" r:id="rId1"/>
   </p:sldMasterIdLst>
   <p:notesMasterIdLst>
-    <p:notesMasterId r:id="rId17"/>
+    <p:notesMasterId r:id="rId18"/>
   </p:notesMasterIdLst>
   <p:sldIdLst>
     <p:sldId id="258" r:id="rId2"/>
@@ -21,8 +21,9 @@
     <p:sldId id="272" r:id="rId12"/>
     <p:sldId id="273" r:id="rId13"/>
     <p:sldId id="274" r:id="rId14"/>
-    <p:sldId id="270" r:id="rId15"/>
-    <p:sldId id="269" r:id="rId16"/>
+    <p:sldId id="276" r:id="rId15"/>
+    <p:sldId id="270" r:id="rId16"/>
+    <p:sldId id="269" r:id="rId17"/>
   </p:sldIdLst>
   <p:sldSz cx="12192000" cy="6858000"/>
   <p:notesSz cx="6858000" cy="9144000"/>
@@ -211,7 +212,7 @@
           <a:p>
             <a:fld id="{7FA21820-D199-4D82-91AF-C50B1D3B111A}" type="datetimeFigureOut">
               <a:rPr lang="en-US" smtClean="0"/>
-              <a:t>1/25/2018</a:t>
+              <a:t>2/5/2018</a:t>
             </a:fld>
             <a:endParaRPr lang="en-US"/>
           </a:p>
@@ -1044,7 +1045,7 @@
           <a:p>
             <a:fld id="{916B8C92-D5E3-4480-8685-D57BEE386DE2}" type="datetimeFigureOut">
               <a:rPr lang="en-US" smtClean="0"/>
-              <a:t>1/25/2018</a:t>
+              <a:t>2/5/2018</a:t>
             </a:fld>
             <a:endParaRPr lang="en-US"/>
           </a:p>
@@ -1214,7 +1215,7 @@
           <a:p>
             <a:fld id="{916B8C92-D5E3-4480-8685-D57BEE386DE2}" type="datetimeFigureOut">
               <a:rPr lang="en-US" smtClean="0"/>
-              <a:t>1/25/2018</a:t>
+              <a:t>2/5/2018</a:t>
             </a:fld>
             <a:endParaRPr lang="en-US"/>
           </a:p>
@@ -1394,7 +1395,7 @@
           <a:p>
             <a:fld id="{916B8C92-D5E3-4480-8685-D57BEE386DE2}" type="datetimeFigureOut">
               <a:rPr lang="en-US" smtClean="0"/>
-              <a:t>1/25/2018</a:t>
+              <a:t>2/5/2018</a:t>
             </a:fld>
             <a:endParaRPr lang="en-US"/>
           </a:p>
@@ -1564,7 +1565,7 @@
           <a:p>
             <a:fld id="{916B8C92-D5E3-4480-8685-D57BEE386DE2}" type="datetimeFigureOut">
               <a:rPr lang="en-US" smtClean="0"/>
-              <a:t>1/25/2018</a:t>
+              <a:t>2/5/2018</a:t>
             </a:fld>
             <a:endParaRPr lang="en-US"/>
           </a:p>
@@ -1810,7 +1811,7 @@
           <a:p>
             <a:fld id="{916B8C92-D5E3-4480-8685-D57BEE386DE2}" type="datetimeFigureOut">
               <a:rPr lang="en-US" smtClean="0"/>
-              <a:t>1/25/2018</a:t>
+              <a:t>2/5/2018</a:t>
             </a:fld>
             <a:endParaRPr lang="en-US"/>
           </a:p>
@@ -2042,7 +2043,7 @@
           <a:p>
             <a:fld id="{916B8C92-D5E3-4480-8685-D57BEE386DE2}" type="datetimeFigureOut">
               <a:rPr lang="en-US" smtClean="0"/>
-              <a:t>1/25/2018</a:t>
+              <a:t>2/5/2018</a:t>
             </a:fld>
             <a:endParaRPr lang="en-US"/>
           </a:p>
@@ -2409,7 +2410,7 @@
           <a:p>
             <a:fld id="{916B8C92-D5E3-4480-8685-D57BEE386DE2}" type="datetimeFigureOut">
               <a:rPr lang="en-US" smtClean="0"/>
-              <a:t>1/25/2018</a:t>
+              <a:t>2/5/2018</a:t>
             </a:fld>
             <a:endParaRPr lang="en-US"/>
           </a:p>
@@ -2527,7 +2528,7 @@
           <a:p>
             <a:fld id="{916B8C92-D5E3-4480-8685-D57BEE386DE2}" type="datetimeFigureOut">
               <a:rPr lang="en-US" smtClean="0"/>
-              <a:t>1/25/2018</a:t>
+              <a:t>2/5/2018</a:t>
             </a:fld>
             <a:endParaRPr lang="en-US"/>
           </a:p>
@@ -2622,7 +2623,7 @@
           <a:p>
             <a:fld id="{916B8C92-D5E3-4480-8685-D57BEE386DE2}" type="datetimeFigureOut">
               <a:rPr lang="en-US" smtClean="0"/>
-              <a:t>1/25/2018</a:t>
+              <a:t>2/5/2018</a:t>
             </a:fld>
             <a:endParaRPr lang="en-US"/>
           </a:p>
@@ -2899,7 +2900,7 @@
           <a:p>
             <a:fld id="{916B8C92-D5E3-4480-8685-D57BEE386DE2}" type="datetimeFigureOut">
               <a:rPr lang="en-US" smtClean="0"/>
-              <a:t>1/25/2018</a:t>
+              <a:t>2/5/2018</a:t>
             </a:fld>
             <a:endParaRPr lang="en-US"/>
           </a:p>
@@ -3152,7 +3153,7 @@
           <a:p>
             <a:fld id="{916B8C92-D5E3-4480-8685-D57BEE386DE2}" type="datetimeFigureOut">
               <a:rPr lang="en-US" smtClean="0"/>
-              <a:t>1/25/2018</a:t>
+              <a:t>2/5/2018</a:t>
             </a:fld>
             <a:endParaRPr lang="en-US"/>
           </a:p>
@@ -3365,7 +3366,7 @@
           <a:p>
             <a:fld id="{916B8C92-D5E3-4480-8685-D57BEE386DE2}" type="datetimeFigureOut">
               <a:rPr lang="en-US" smtClean="0"/>
-              <a:t>1/25/2018</a:t>
+              <a:t>2/5/2018</a:t>
             </a:fld>
             <a:endParaRPr lang="en-US"/>
           </a:p>
@@ -6669,6 +6670,125 @@
           <a:chExt cx="0" cy="0"/>
         </a:xfrm>
       </p:grpSpPr>
+      <p:sp>
+        <p:nvSpPr>
+          <p:cNvPr id="2" name="Title 1"/>
+          <p:cNvSpPr>
+            <a:spLocks noGrp="1"/>
+          </p:cNvSpPr>
+          <p:nvPr>
+            <p:ph type="title"/>
+          </p:nvPr>
+        </p:nvSpPr>
+        <p:spPr>
+          <a:xfrm>
+            <a:off x="0" y="-69441"/>
+            <a:ext cx="10515600" cy="1325563"/>
+          </a:xfrm>
+        </p:spPr>
+        <p:txBody>
+          <a:bodyPr/>
+          <a:lstStyle/>
+          <a:p>
+            <a:r>
+              <a:rPr lang="en-US" dirty="0" smtClean="0"/>
+              <a:t>Null turnover</a:t>
+            </a:r>
+            <a:endParaRPr lang="en-US" dirty="0"/>
+          </a:p>
+        </p:txBody>
+      </p:sp>
+      <p:grpSp>
+        <p:nvGrpSpPr>
+          <p:cNvPr id="7" name="Group 6"/>
+          <p:cNvGrpSpPr/>
+          <p:nvPr/>
+        </p:nvGrpSpPr>
+        <p:grpSpPr>
+          <a:xfrm>
+            <a:off x="1803098" y="208230"/>
+            <a:ext cx="10218345" cy="6649770"/>
+            <a:chOff x="1803098" y="208230"/>
+            <a:chExt cx="10218345" cy="6649770"/>
+          </a:xfrm>
+        </p:grpSpPr>
+        <p:pic>
+          <p:nvPicPr>
+            <p:cNvPr id="4" name="Picture 3"/>
+            <p:cNvPicPr>
+              <a:picLocks noChangeAspect="1"/>
+            </p:cNvPicPr>
+            <p:nvPr/>
+          </p:nvPicPr>
+          <p:blipFill rotWithShape="1">
+            <a:blip r:embed="rId2"/>
+            <a:srcRect t="1930" b="331"/>
+            <a:stretch/>
+          </p:blipFill>
+          <p:spPr>
+            <a:xfrm>
+              <a:off x="1803098" y="208230"/>
+              <a:ext cx="10101404" cy="6649770"/>
+            </a:xfrm>
+            <a:prstGeom prst="rect">
+              <a:avLst/>
+            </a:prstGeom>
+          </p:spPr>
+        </p:pic>
+        <p:pic>
+          <p:nvPicPr>
+            <p:cNvPr id="5" name="Picture 4"/>
+            <p:cNvPicPr>
+              <a:picLocks noChangeAspect="1"/>
+            </p:cNvPicPr>
+            <p:nvPr/>
+          </p:nvPicPr>
+          <p:blipFill rotWithShape="1">
+            <a:blip r:embed="rId3"/>
+            <a:srcRect t="16617"/>
+            <a:stretch/>
+          </p:blipFill>
+          <p:spPr>
+            <a:xfrm>
+              <a:off x="10515600" y="2507811"/>
+              <a:ext cx="1505843" cy="1260699"/>
+            </a:xfrm>
+            <a:prstGeom prst="rect">
+              <a:avLst/>
+            </a:prstGeom>
+          </p:spPr>
+        </p:pic>
+      </p:grpSp>
+    </p:spTree>
+    <p:extLst>
+      <p:ext uri="{BB962C8B-B14F-4D97-AF65-F5344CB8AC3E}">
+        <p14:creationId xmlns:p14="http://schemas.microsoft.com/office/powerpoint/2010/main" val="1628078764"/>
+      </p:ext>
+    </p:extLst>
+  </p:cSld>
+  <p:clrMapOvr>
+    <a:masterClrMapping/>
+  </p:clrMapOvr>
+</p:sld>
+</file>
+
+<file path=ppt/slides/slide15.xml><?xml version="1.0" encoding="utf-8"?>
+<p:sld xmlns:a="http://schemas.openxmlformats.org/drawingml/2006/main" xmlns:r="http://schemas.openxmlformats.org/officeDocument/2006/relationships" xmlns:p="http://schemas.openxmlformats.org/presentationml/2006/main">
+  <p:cSld>
+    <p:spTree>
+      <p:nvGrpSpPr>
+        <p:cNvPr id="1" name=""/>
+        <p:cNvGrpSpPr/>
+        <p:nvPr/>
+      </p:nvGrpSpPr>
+      <p:grpSpPr>
+        <a:xfrm>
+          <a:off x="0" y="0"/>
+          <a:ext cx="0" cy="0"/>
+          <a:chOff x="0" y="0"/>
+          <a:chExt cx="0" cy="0"/>
+        </a:xfrm>
+      </p:grpSpPr>
       <p:pic>
         <p:nvPicPr>
           <p:cNvPr id="6" name="Picture 5"/>
@@ -6777,7 +6897,7 @@
 </p:sld>
 </file>
 
-<file path=ppt/slides/slide15.xml><?xml version="1.0" encoding="utf-8"?>
+<file path=ppt/slides/slide16.xml><?xml version="1.0" encoding="utf-8"?>
 <p:sld xmlns:a="http://schemas.openxmlformats.org/drawingml/2006/main" xmlns:r="http://schemas.openxmlformats.org/officeDocument/2006/relationships" xmlns:p="http://schemas.openxmlformats.org/presentationml/2006/main">
   <p:cSld>
     <p:spTree>
@@ -13824,11 +13944,11 @@
   <p:clrMapOvr>
     <a:masterClrMapping/>
   </p:clrMapOvr>
-  <mc:AlternateContent xmlns:mc="http://schemas.openxmlformats.org/markup-compatibility/2006">
-    <mc:Choice xmlns:p14="http://schemas.microsoft.com/office/powerpoint/2010/main" Requires="p14">
+  <mc:AlternateContent xmlns:mc="http://schemas.openxmlformats.org/markup-compatibility/2006" xmlns:p14="http://schemas.microsoft.com/office/powerpoint/2010/main">
+    <mc:Choice Requires="p14">
       <p:transition spd="slow" p14:dur="2000"/>
     </mc:Choice>
-    <mc:Fallback>
+    <mc:Fallback xmlns="">
       <p:transition spd="slow"/>
     </mc:Fallback>
   </mc:AlternateContent>

</xml_diff>

<commit_message>
working on null model plots
</commit_message>
<xml_diff>
--- a/output/plots/all_figs_with_legends.pptx
+++ b/output/plots/all_figs_with_legends.pptx
@@ -5,7 +5,7 @@
     <p:sldMasterId id="2147483648" r:id="rId1"/>
   </p:sldMasterIdLst>
   <p:notesMasterIdLst>
-    <p:notesMasterId r:id="rId18"/>
+    <p:notesMasterId r:id="rId19"/>
   </p:notesMasterIdLst>
   <p:sldIdLst>
     <p:sldId id="258" r:id="rId2"/>
@@ -21,9 +21,10 @@
     <p:sldId id="272" r:id="rId12"/>
     <p:sldId id="273" r:id="rId13"/>
     <p:sldId id="274" r:id="rId14"/>
-    <p:sldId id="276" r:id="rId15"/>
-    <p:sldId id="270" r:id="rId16"/>
-    <p:sldId id="269" r:id="rId17"/>
+    <p:sldId id="277" r:id="rId15"/>
+    <p:sldId id="276" r:id="rId16"/>
+    <p:sldId id="270" r:id="rId17"/>
+    <p:sldId id="269" r:id="rId18"/>
   </p:sldIdLst>
   <p:sldSz cx="12192000" cy="6858000"/>
   <p:notesSz cx="6858000" cy="9144000"/>
@@ -6003,10 +6004,9 @@
               <a:lstStyle/>
               <a:p>
                 <a:r>
-                  <a:rPr lang="en-US" sz="2000" dirty="0" err="1" smtClean="0"/>
+                  <a:rPr lang="en-US" sz="2000" dirty="0" smtClean="0"/>
                   <a:t>logseries</a:t>
                 </a:r>
-                <a:endParaRPr lang="en-US" sz="2000" dirty="0" smtClean="0"/>
               </a:p>
               <a:p>
                 <a:endParaRPr lang="en-US" sz="2000" dirty="0"/>
@@ -6226,10 +6226,9 @@
           <a:lstStyle/>
           <a:p>
             <a:r>
-              <a:rPr lang="en-US" dirty="0" err="1" smtClean="0"/>
+              <a:rPr lang="en-US" dirty="0" smtClean="0"/>
               <a:t>logseries</a:t>
             </a:r>
-            <a:endParaRPr lang="en-US" dirty="0" smtClean="0"/>
           </a:p>
           <a:p>
             <a:endParaRPr lang="en-US" dirty="0"/>
@@ -6511,10 +6510,9 @@
               <a:lstStyle/>
               <a:p>
                 <a:r>
-                  <a:rPr lang="en-US" dirty="0" err="1" smtClean="0"/>
+                  <a:rPr lang="en-US" dirty="0" smtClean="0"/>
                   <a:t>logseries</a:t>
                 </a:r>
-                <a:endParaRPr lang="en-US" dirty="0" smtClean="0"/>
               </a:p>
               <a:p>
                 <a:endParaRPr lang="en-US" dirty="0"/>
@@ -6682,6 +6680,230 @@
         </p:nvSpPr>
         <p:spPr>
           <a:xfrm>
+            <a:off x="240671" y="0"/>
+            <a:ext cx="10515600" cy="1325563"/>
+          </a:xfrm>
+        </p:spPr>
+        <p:txBody>
+          <a:bodyPr/>
+          <a:lstStyle/>
+          <a:p>
+            <a:r>
+              <a:rPr lang="en-US" dirty="0" smtClean="0"/>
+              <a:t>1a null</a:t>
+            </a:r>
+            <a:endParaRPr lang="en-US" dirty="0"/>
+          </a:p>
+        </p:txBody>
+      </p:sp>
+      <p:grpSp>
+        <p:nvGrpSpPr>
+          <p:cNvPr id="27" name="Group 26"/>
+          <p:cNvGrpSpPr/>
+          <p:nvPr/>
+        </p:nvGrpSpPr>
+        <p:grpSpPr>
+          <a:xfrm>
+            <a:off x="4094444" y="3493665"/>
+            <a:ext cx="4004270" cy="2693598"/>
+            <a:chOff x="4094444" y="3493665"/>
+            <a:chExt cx="4004270" cy="2693598"/>
+          </a:xfrm>
+        </p:grpSpPr>
+        <p:pic>
+          <p:nvPicPr>
+            <p:cNvPr id="9" name="Picture 8"/>
+            <p:cNvPicPr>
+              <a:picLocks noChangeAspect="1"/>
+            </p:cNvPicPr>
+            <p:nvPr/>
+          </p:nvPicPr>
+          <p:blipFill>
+            <a:blip r:embed="rId2"/>
+            <a:stretch>
+              <a:fillRect/>
+            </a:stretch>
+          </p:blipFill>
+          <p:spPr>
+            <a:xfrm>
+              <a:off x="4094444" y="3493665"/>
+              <a:ext cx="3700590" cy="2291828"/>
+            </a:xfrm>
+            <a:prstGeom prst="rect">
+              <a:avLst/>
+            </a:prstGeom>
+          </p:spPr>
+        </p:pic>
+        <p:pic>
+          <p:nvPicPr>
+            <p:cNvPr id="4" name="Picture 3"/>
+            <p:cNvPicPr>
+              <a:picLocks noChangeAspect="1"/>
+            </p:cNvPicPr>
+            <p:nvPr/>
+          </p:nvPicPr>
+          <p:blipFill rotWithShape="1">
+            <a:blip r:embed="rId3"/>
+            <a:srcRect l="40231" t="-1278" r="27973" b="94532"/>
+            <a:stretch/>
+          </p:blipFill>
+          <p:spPr>
+            <a:xfrm>
+              <a:off x="4943193" y="4146127"/>
+              <a:ext cx="2670772" cy="353084"/>
+            </a:xfrm>
+            <a:prstGeom prst="rect">
+              <a:avLst/>
+            </a:prstGeom>
+          </p:spPr>
+        </p:pic>
+        <p:sp>
+          <p:nvSpPr>
+            <p:cNvPr id="14" name="TextBox 13"/>
+            <p:cNvSpPr txBox="1"/>
+            <p:nvPr/>
+          </p:nvSpPr>
+          <p:spPr>
+            <a:xfrm>
+              <a:off x="4644196" y="5633265"/>
+              <a:ext cx="856923" cy="553998"/>
+            </a:xfrm>
+            <a:prstGeom prst="rect">
+              <a:avLst/>
+            </a:prstGeom>
+            <a:noFill/>
+          </p:spPr>
+          <p:txBody>
+            <a:bodyPr wrap="square" rtlCol="0">
+              <a:spAutoFit/>
+            </a:bodyPr>
+            <a:lstStyle/>
+            <a:p>
+              <a:r>
+                <a:rPr lang="en-US" sz="1200" dirty="0" smtClean="0"/>
+                <a:t>lognormal</a:t>
+              </a:r>
+              <a:endParaRPr lang="en-US" sz="1200" dirty="0" smtClean="0"/>
+            </a:p>
+            <a:p>
+              <a:endParaRPr lang="en-US" dirty="0"/>
+            </a:p>
+          </p:txBody>
+        </p:sp>
+        <p:sp>
+          <p:nvSpPr>
+            <p:cNvPr id="15" name="TextBox 14"/>
+            <p:cNvSpPr txBox="1"/>
+            <p:nvPr/>
+          </p:nvSpPr>
+          <p:spPr>
+            <a:xfrm>
+              <a:off x="6907794" y="5633265"/>
+              <a:ext cx="1190920" cy="553998"/>
+            </a:xfrm>
+            <a:prstGeom prst="rect">
+              <a:avLst/>
+            </a:prstGeom>
+            <a:noFill/>
+          </p:spPr>
+          <p:txBody>
+            <a:bodyPr wrap="square" rtlCol="0">
+              <a:spAutoFit/>
+            </a:bodyPr>
+            <a:lstStyle/>
+            <a:p>
+              <a:r>
+                <a:rPr lang="en-US" sz="1200" dirty="0" smtClean="0"/>
+                <a:t>logseries</a:t>
+              </a:r>
+            </a:p>
+            <a:p>
+              <a:endParaRPr lang="en-US" dirty="0"/>
+            </a:p>
+          </p:txBody>
+        </p:sp>
+        <p:cxnSp>
+          <p:nvCxnSpPr>
+            <p:cNvPr id="17" name="Straight Arrow Connector 16"/>
+            <p:cNvCxnSpPr/>
+            <p:nvPr/>
+          </p:nvCxnSpPr>
+          <p:spPr>
+            <a:xfrm>
+              <a:off x="5498471" y="5785493"/>
+              <a:ext cx="1409323" cy="0"/>
+            </a:xfrm>
+            <a:prstGeom prst="straightConnector1">
+              <a:avLst/>
+            </a:prstGeom>
+            <a:ln w="28575" cap="flat" cmpd="sng" algn="ctr">
+              <a:solidFill>
+                <a:schemeClr val="dk1"/>
+              </a:solidFill>
+              <a:prstDash val="solid"/>
+              <a:round/>
+              <a:headEnd type="arrow" w="med" len="med"/>
+              <a:tailEnd type="arrow" w="med" len="med"/>
+            </a:ln>
+          </p:spPr>
+          <p:style>
+            <a:lnRef idx="0">
+              <a:scrgbClr r="0" g="0" b="0"/>
+            </a:lnRef>
+            <a:fillRef idx="0">
+              <a:scrgbClr r="0" g="0" b="0"/>
+            </a:fillRef>
+            <a:effectRef idx="0">
+              <a:scrgbClr r="0" g="0" b="0"/>
+            </a:effectRef>
+            <a:fontRef idx="minor">
+              <a:schemeClr val="tx1"/>
+            </a:fontRef>
+          </p:style>
+        </p:cxnSp>
+      </p:grpSp>
+    </p:spTree>
+    <p:extLst>
+      <p:ext uri="{BB962C8B-B14F-4D97-AF65-F5344CB8AC3E}">
+        <p14:creationId xmlns:p14="http://schemas.microsoft.com/office/powerpoint/2010/main" val="2049050745"/>
+      </p:ext>
+    </p:extLst>
+  </p:cSld>
+  <p:clrMapOvr>
+    <a:masterClrMapping/>
+  </p:clrMapOvr>
+</p:sld>
+</file>
+
+<file path=ppt/slides/slide15.xml><?xml version="1.0" encoding="utf-8"?>
+<p:sld xmlns:a="http://schemas.openxmlformats.org/drawingml/2006/main" xmlns:r="http://schemas.openxmlformats.org/officeDocument/2006/relationships" xmlns:p="http://schemas.openxmlformats.org/presentationml/2006/main">
+  <p:cSld>
+    <p:spTree>
+      <p:nvGrpSpPr>
+        <p:cNvPr id="1" name=""/>
+        <p:cNvGrpSpPr/>
+        <p:nvPr/>
+      </p:nvGrpSpPr>
+      <p:grpSpPr>
+        <a:xfrm>
+          <a:off x="0" y="0"/>
+          <a:ext cx="0" cy="0"/>
+          <a:chOff x="0" y="0"/>
+          <a:chExt cx="0" cy="0"/>
+        </a:xfrm>
+      </p:grpSpPr>
+      <p:sp>
+        <p:nvSpPr>
+          <p:cNvPr id="2" name="Title 1"/>
+          <p:cNvSpPr>
+            <a:spLocks noGrp="1"/>
+          </p:cNvSpPr>
+          <p:nvPr>
+            <p:ph type="title"/>
+          </p:nvPr>
+        </p:nvSpPr>
+        <p:spPr>
+          <a:xfrm>
             <a:off x="0" y="-69441"/>
             <a:ext cx="10515600" cy="1325563"/>
           </a:xfrm>
@@ -6772,7 +6994,7 @@
 </p:sld>
 </file>
 
-<file path=ppt/slides/slide15.xml><?xml version="1.0" encoding="utf-8"?>
+<file path=ppt/slides/slide16.xml><?xml version="1.0" encoding="utf-8"?>
 <p:sld xmlns:a="http://schemas.openxmlformats.org/drawingml/2006/main" xmlns:r="http://schemas.openxmlformats.org/officeDocument/2006/relationships" xmlns:p="http://schemas.openxmlformats.org/presentationml/2006/main">
   <p:cSld>
     <p:spTree>
@@ -6897,7 +7119,7 @@
 </p:sld>
 </file>
 
-<file path=ppt/slides/slide16.xml><?xml version="1.0" encoding="utf-8"?>
+<file path=ppt/slides/slide17.xml><?xml version="1.0" encoding="utf-8"?>
 <p:sld xmlns:a="http://schemas.openxmlformats.org/drawingml/2006/main" xmlns:r="http://schemas.openxmlformats.org/officeDocument/2006/relationships" xmlns:p="http://schemas.openxmlformats.org/presentationml/2006/main">
   <p:cSld>
     <p:spTree>

</xml_diff>

<commit_message>
supplemental plots updated o include predicted values w new models
</commit_message>
<xml_diff>
--- a/output/plots/all_figs_with_legends.pptx
+++ b/output/plots/all_figs_with_legends.pptx
@@ -213,7 +213,7 @@
           <a:p>
             <a:fld id="{7FA21820-D199-4D82-91AF-C50B1D3B111A}" type="datetimeFigureOut">
               <a:rPr lang="en-US" smtClean="0"/>
-              <a:t>2/8/2018</a:t>
+              <a:t>2/22/2018</a:t>
             </a:fld>
             <a:endParaRPr lang="en-US"/>
           </a:p>
@@ -915,6 +915,90 @@
 </p:notes>
 </file>
 
+<file path=ppt/notesSlides/notesSlide4.xml><?xml version="1.0" encoding="utf-8"?>
+<p:notes xmlns:a="http://schemas.openxmlformats.org/drawingml/2006/main" xmlns:r="http://schemas.openxmlformats.org/officeDocument/2006/relationships" xmlns:p="http://schemas.openxmlformats.org/presentationml/2006/main">
+  <p:cSld>
+    <p:spTree>
+      <p:nvGrpSpPr>
+        <p:cNvPr id="1" name=""/>
+        <p:cNvGrpSpPr/>
+        <p:nvPr/>
+      </p:nvGrpSpPr>
+      <p:grpSpPr>
+        <a:xfrm>
+          <a:off x="0" y="0"/>
+          <a:ext cx="0" cy="0"/>
+          <a:chOff x="0" y="0"/>
+          <a:chExt cx="0" cy="0"/>
+        </a:xfrm>
+      </p:grpSpPr>
+      <p:sp>
+        <p:nvSpPr>
+          <p:cNvPr id="2" name="Slide Image Placeholder 1"/>
+          <p:cNvSpPr>
+            <a:spLocks noGrp="1" noRot="1" noChangeAspect="1"/>
+          </p:cNvSpPr>
+          <p:nvPr>
+            <p:ph type="sldImg"/>
+          </p:nvPr>
+        </p:nvSpPr>
+        <p:spPr/>
+      </p:sp>
+      <p:sp>
+        <p:nvSpPr>
+          <p:cNvPr id="3" name="Notes Placeholder 2"/>
+          <p:cNvSpPr>
+            <a:spLocks noGrp="1"/>
+          </p:cNvSpPr>
+          <p:nvPr>
+            <p:ph type="body" idx="1"/>
+          </p:nvPr>
+        </p:nvSpPr>
+        <p:spPr/>
+        <p:txBody>
+          <a:bodyPr/>
+          <a:lstStyle/>
+          <a:p>
+            <a:endParaRPr lang="en-US" dirty="0"/>
+          </a:p>
+        </p:txBody>
+      </p:sp>
+      <p:sp>
+        <p:nvSpPr>
+          <p:cNvPr id="4" name="Slide Number Placeholder 3"/>
+          <p:cNvSpPr>
+            <a:spLocks noGrp="1"/>
+          </p:cNvSpPr>
+          <p:nvPr>
+            <p:ph type="sldNum" sz="quarter" idx="10"/>
+          </p:nvPr>
+        </p:nvSpPr>
+        <p:spPr/>
+        <p:txBody>
+          <a:bodyPr/>
+          <a:lstStyle/>
+          <a:p>
+            <a:fld id="{0160E3DB-BCAB-42BD-8DDD-04198F92E62D}" type="slidenum">
+              <a:rPr lang="en-US" smtClean="0"/>
+              <a:t>9</a:t>
+            </a:fld>
+            <a:endParaRPr lang="en-US"/>
+          </a:p>
+        </p:txBody>
+      </p:sp>
+    </p:spTree>
+    <p:extLst>
+      <p:ext uri="{BB962C8B-B14F-4D97-AF65-F5344CB8AC3E}">
+        <p14:creationId xmlns:p14="http://schemas.microsoft.com/office/powerpoint/2010/main" val="3767085540"/>
+      </p:ext>
+    </p:extLst>
+  </p:cSld>
+  <p:clrMapOvr>
+    <a:masterClrMapping/>
+  </p:clrMapOvr>
+</p:notes>
+</file>
+
 <file path=ppt/slideLayouts/slideLayout1.xml><?xml version="1.0" encoding="utf-8"?>
 <p:sldLayout xmlns:a="http://schemas.openxmlformats.org/drawingml/2006/main" xmlns:r="http://schemas.openxmlformats.org/officeDocument/2006/relationships" xmlns:p="http://schemas.openxmlformats.org/presentationml/2006/main" type="title" preserve="1">
   <p:cSld name="Title Slide">
@@ -1046,7 +1130,7 @@
           <a:p>
             <a:fld id="{916B8C92-D5E3-4480-8685-D57BEE386DE2}" type="datetimeFigureOut">
               <a:rPr lang="en-US" smtClean="0"/>
-              <a:t>2/8/2018</a:t>
+              <a:t>2/22/2018</a:t>
             </a:fld>
             <a:endParaRPr lang="en-US"/>
           </a:p>
@@ -1216,7 +1300,7 @@
           <a:p>
             <a:fld id="{916B8C92-D5E3-4480-8685-D57BEE386DE2}" type="datetimeFigureOut">
               <a:rPr lang="en-US" smtClean="0"/>
-              <a:t>2/8/2018</a:t>
+              <a:t>2/22/2018</a:t>
             </a:fld>
             <a:endParaRPr lang="en-US"/>
           </a:p>
@@ -1396,7 +1480,7 @@
           <a:p>
             <a:fld id="{916B8C92-D5E3-4480-8685-D57BEE386DE2}" type="datetimeFigureOut">
               <a:rPr lang="en-US" smtClean="0"/>
-              <a:t>2/8/2018</a:t>
+              <a:t>2/22/2018</a:t>
             </a:fld>
             <a:endParaRPr lang="en-US"/>
           </a:p>
@@ -1566,7 +1650,7 @@
           <a:p>
             <a:fld id="{916B8C92-D5E3-4480-8685-D57BEE386DE2}" type="datetimeFigureOut">
               <a:rPr lang="en-US" smtClean="0"/>
-              <a:t>2/8/2018</a:t>
+              <a:t>2/22/2018</a:t>
             </a:fld>
             <a:endParaRPr lang="en-US"/>
           </a:p>
@@ -1812,7 +1896,7 @@
           <a:p>
             <a:fld id="{916B8C92-D5E3-4480-8685-D57BEE386DE2}" type="datetimeFigureOut">
               <a:rPr lang="en-US" smtClean="0"/>
-              <a:t>2/8/2018</a:t>
+              <a:t>2/22/2018</a:t>
             </a:fld>
             <a:endParaRPr lang="en-US"/>
           </a:p>
@@ -2044,7 +2128,7 @@
           <a:p>
             <a:fld id="{916B8C92-D5E3-4480-8685-D57BEE386DE2}" type="datetimeFigureOut">
               <a:rPr lang="en-US" smtClean="0"/>
-              <a:t>2/8/2018</a:t>
+              <a:t>2/22/2018</a:t>
             </a:fld>
             <a:endParaRPr lang="en-US"/>
           </a:p>
@@ -2411,7 +2495,7 @@
           <a:p>
             <a:fld id="{916B8C92-D5E3-4480-8685-D57BEE386DE2}" type="datetimeFigureOut">
               <a:rPr lang="en-US" smtClean="0"/>
-              <a:t>2/8/2018</a:t>
+              <a:t>2/22/2018</a:t>
             </a:fld>
             <a:endParaRPr lang="en-US"/>
           </a:p>
@@ -2529,7 +2613,7 @@
           <a:p>
             <a:fld id="{916B8C92-D5E3-4480-8685-D57BEE386DE2}" type="datetimeFigureOut">
               <a:rPr lang="en-US" smtClean="0"/>
-              <a:t>2/8/2018</a:t>
+              <a:t>2/22/2018</a:t>
             </a:fld>
             <a:endParaRPr lang="en-US"/>
           </a:p>
@@ -2624,7 +2708,7 @@
           <a:p>
             <a:fld id="{916B8C92-D5E3-4480-8685-D57BEE386DE2}" type="datetimeFigureOut">
               <a:rPr lang="en-US" smtClean="0"/>
-              <a:t>2/8/2018</a:t>
+              <a:t>2/22/2018</a:t>
             </a:fld>
             <a:endParaRPr lang="en-US"/>
           </a:p>
@@ -2901,7 +2985,7 @@
           <a:p>
             <a:fld id="{916B8C92-D5E3-4480-8685-D57BEE386DE2}" type="datetimeFigureOut">
               <a:rPr lang="en-US" smtClean="0"/>
-              <a:t>2/8/2018</a:t>
+              <a:t>2/22/2018</a:t>
             </a:fld>
             <a:endParaRPr lang="en-US"/>
           </a:p>
@@ -3154,7 +3238,7 @@
           <a:p>
             <a:fld id="{916B8C92-D5E3-4480-8685-D57BEE386DE2}" type="datetimeFigureOut">
               <a:rPr lang="en-US" smtClean="0"/>
-              <a:t>2/8/2018</a:t>
+              <a:t>2/22/2018</a:t>
             </a:fld>
             <a:endParaRPr lang="en-US"/>
           </a:p>
@@ -3367,7 +3451,7 @@
           <a:p>
             <a:fld id="{916B8C92-D5E3-4480-8685-D57BEE386DE2}" type="datetimeFigureOut">
               <a:rPr lang="en-US" smtClean="0"/>
-              <a:t>2/8/2018</a:t>
+              <a:t>2/22/2018</a:t>
             </a:fld>
             <a:endParaRPr lang="en-US"/>
           </a:p>
@@ -16554,338 +16638,209 @@
       </p:sp>
       <p:grpSp>
         <p:nvGrpSpPr>
-          <p:cNvPr id="2" name="Group 1"/>
+          <p:cNvPr id="6" name="Group 5"/>
           <p:cNvGrpSpPr/>
           <p:nvPr/>
         </p:nvGrpSpPr>
         <p:grpSpPr>
           <a:xfrm>
-            <a:off x="1178521" y="85526"/>
-            <a:ext cx="8825796" cy="6089246"/>
-            <a:chOff x="1178521" y="85526"/>
-            <a:chExt cx="8825796" cy="6089246"/>
+            <a:off x="1093509" y="134914"/>
+            <a:ext cx="8934204" cy="6204546"/>
+            <a:chOff x="1093509" y="4773"/>
+            <a:chExt cx="8934204" cy="6204546"/>
           </a:xfrm>
         </p:grpSpPr>
+        <p:pic>
+          <p:nvPicPr>
+            <p:cNvPr id="2" name="Picture 1"/>
+            <p:cNvPicPr>
+              <a:picLocks noChangeAspect="1"/>
+            </p:cNvPicPr>
+            <p:nvPr/>
+          </p:nvPicPr>
+          <p:blipFill>
+            <a:blip r:embed="rId2"/>
+            <a:stretch>
+              <a:fillRect/>
+            </a:stretch>
+          </p:blipFill>
+          <p:spPr>
+            <a:xfrm>
+              <a:off x="1093509" y="4773"/>
+              <a:ext cx="8934204" cy="5984431"/>
+            </a:xfrm>
+            <a:prstGeom prst="rect">
+              <a:avLst/>
+            </a:prstGeom>
+          </p:spPr>
+        </p:pic>
         <p:grpSp>
           <p:nvGrpSpPr>
-            <p:cNvPr id="11" name="Group 10"/>
+            <p:cNvPr id="3" name="Group 2"/>
             <p:cNvGrpSpPr/>
             <p:nvPr/>
           </p:nvGrpSpPr>
           <p:grpSpPr>
             <a:xfrm>
-              <a:off x="1178521" y="85526"/>
-              <a:ext cx="8825796" cy="6089246"/>
-              <a:chOff x="1178521" y="85526"/>
-              <a:chExt cx="8825796" cy="6089246"/>
+              <a:off x="1912933" y="5814548"/>
+              <a:ext cx="7758274" cy="394771"/>
+              <a:chOff x="1889150" y="5778666"/>
+              <a:chExt cx="7758274" cy="394771"/>
             </a:xfrm>
           </p:grpSpPr>
-          <p:pic>
-            <p:nvPicPr>
-              <p:cNvPr id="10" name="Picture 9"/>
-              <p:cNvPicPr>
-                <a:picLocks noChangeAspect="1"/>
-              </p:cNvPicPr>
-              <p:nvPr/>
-            </p:nvPicPr>
-            <p:blipFill>
-              <a:blip r:embed="rId2"/>
-              <a:stretch>
-                <a:fillRect/>
-              </a:stretch>
-            </p:blipFill>
-            <p:spPr>
-              <a:xfrm>
-                <a:off x="1178521" y="85526"/>
-                <a:ext cx="8825796" cy="5867623"/>
-              </a:xfrm>
-              <a:prstGeom prst="rect">
-                <a:avLst/>
-              </a:prstGeom>
-            </p:spPr>
-          </p:pic>
           <p:grpSp>
             <p:nvGrpSpPr>
-              <p:cNvPr id="3" name="Group 2"/>
+              <p:cNvPr id="16" name="Group 15"/>
               <p:cNvGrpSpPr/>
               <p:nvPr/>
             </p:nvGrpSpPr>
             <p:grpSpPr>
               <a:xfrm>
-                <a:off x="1912933" y="5769926"/>
-                <a:ext cx="7701066" cy="404846"/>
-                <a:chOff x="1889150" y="5734044"/>
-                <a:chExt cx="7701066" cy="404846"/>
+                <a:off x="6640267" y="5781178"/>
+                <a:ext cx="3007157" cy="392259"/>
+                <a:chOff x="2263776" y="1666730"/>
+                <a:chExt cx="3601505" cy="432218"/>
+              </a:xfrm>
+            </p:grpSpPr>
+            <p:pic>
+              <p:nvPicPr>
+                <p:cNvPr id="17" name="Picture 16"/>
+                <p:cNvPicPr>
+                  <a:picLocks noChangeAspect="1"/>
+                </p:cNvPicPr>
+                <p:nvPr/>
+              </p:nvPicPr>
+              <p:blipFill>
+                <a:blip r:embed="rId3"/>
+                <a:stretch>
+                  <a:fillRect/>
+                </a:stretch>
+              </p:blipFill>
+              <p:spPr>
+                <a:xfrm>
+                  <a:off x="2263776" y="1666730"/>
+                  <a:ext cx="655912" cy="396303"/>
+                </a:xfrm>
+                <a:prstGeom prst="rect">
+                  <a:avLst/>
+                </a:prstGeom>
+              </p:spPr>
+            </p:pic>
+            <p:pic>
+              <p:nvPicPr>
+                <p:cNvPr id="18" name="Picture 17"/>
+                <p:cNvPicPr>
+                  <a:picLocks noChangeAspect="1"/>
+                </p:cNvPicPr>
+                <p:nvPr/>
+              </p:nvPicPr>
+              <p:blipFill>
+                <a:blip r:embed="rId4"/>
+                <a:stretch>
+                  <a:fillRect/>
+                </a:stretch>
+              </p:blipFill>
+              <p:spPr>
+                <a:xfrm>
+                  <a:off x="5136803" y="1719389"/>
+                  <a:ext cx="728478" cy="293882"/>
+                </a:xfrm>
+                <a:prstGeom prst="rect">
+                  <a:avLst/>
+                </a:prstGeom>
+              </p:spPr>
+            </p:pic>
+            <p:pic>
+              <p:nvPicPr>
+                <p:cNvPr id="20" name="Picture 19"/>
+                <p:cNvPicPr>
+                  <a:picLocks noChangeAspect="1"/>
+                </p:cNvPicPr>
+                <p:nvPr/>
+              </p:nvPicPr>
+              <p:blipFill>
+                <a:blip r:embed="rId5"/>
+                <a:stretch>
+                  <a:fillRect/>
+                </a:stretch>
+              </p:blipFill>
+              <p:spPr>
+                <a:xfrm>
+                  <a:off x="3707843" y="1690005"/>
+                  <a:ext cx="640805" cy="408943"/>
+                </a:xfrm>
+                <a:prstGeom prst="rect">
+                  <a:avLst/>
+                </a:prstGeom>
+              </p:spPr>
+            </p:pic>
+          </p:grpSp>
+          <p:grpSp>
+            <p:nvGrpSpPr>
+              <p:cNvPr id="7" name="Group 6"/>
+              <p:cNvGrpSpPr/>
+              <p:nvPr/>
+            </p:nvGrpSpPr>
+            <p:grpSpPr>
+              <a:xfrm>
+                <a:off x="1889150" y="5778666"/>
+                <a:ext cx="3379915" cy="344085"/>
+                <a:chOff x="1415503" y="5588783"/>
+                <a:chExt cx="3379915" cy="344085"/>
               </a:xfrm>
             </p:grpSpPr>
             <p:grpSp>
               <p:nvGrpSpPr>
-                <p:cNvPr id="16" name="Group 15"/>
+                <p:cNvPr id="19" name="Group 18"/>
                 <p:cNvGrpSpPr/>
                 <p:nvPr/>
               </p:nvGrpSpPr>
               <p:grpSpPr>
                 <a:xfrm>
-                  <a:off x="6569571" y="5734044"/>
-                  <a:ext cx="3020645" cy="404846"/>
-                  <a:chOff x="2179108" y="1614793"/>
-                  <a:chExt cx="3617660" cy="446087"/>
-                </a:xfrm>
-              </p:grpSpPr>
-              <p:pic>
-                <p:nvPicPr>
-                  <p:cNvPr id="17" name="Picture 16"/>
-                  <p:cNvPicPr>
-                    <a:picLocks noChangeAspect="1"/>
-                  </p:cNvPicPr>
-                  <p:nvPr/>
-                </p:nvPicPr>
-                <p:blipFill>
-                  <a:blip r:embed="rId3"/>
-                  <a:stretch>
-                    <a:fillRect/>
-                  </a:stretch>
-                </p:blipFill>
-                <p:spPr>
-                  <a:xfrm>
-                    <a:off x="2179108" y="1614793"/>
-                    <a:ext cx="655912" cy="396304"/>
-                  </a:xfrm>
-                  <a:prstGeom prst="rect">
-                    <a:avLst/>
-                  </a:prstGeom>
-                </p:spPr>
-              </p:pic>
-              <p:pic>
-                <p:nvPicPr>
-                  <p:cNvPr id="18" name="Picture 17"/>
-                  <p:cNvPicPr>
-                    <a:picLocks noChangeAspect="1"/>
-                  </p:cNvPicPr>
-                  <p:nvPr/>
-                </p:nvPicPr>
-                <p:blipFill>
-                  <a:blip r:embed="rId4"/>
-                  <a:stretch>
-                    <a:fillRect/>
-                  </a:stretch>
-                </p:blipFill>
-                <p:spPr>
-                  <a:xfrm>
-                    <a:off x="5068290" y="1711645"/>
-                    <a:ext cx="728478" cy="293882"/>
-                  </a:xfrm>
-                  <a:prstGeom prst="rect">
-                    <a:avLst/>
-                  </a:prstGeom>
-                </p:spPr>
-              </p:pic>
-              <p:pic>
-                <p:nvPicPr>
-                  <p:cNvPr id="20" name="Picture 19"/>
-                  <p:cNvPicPr>
-                    <a:picLocks noChangeAspect="1"/>
-                  </p:cNvPicPr>
-                  <p:nvPr/>
-                </p:nvPicPr>
-                <p:blipFill>
-                  <a:blip r:embed="rId5"/>
-                  <a:stretch>
-                    <a:fillRect/>
-                  </a:stretch>
-                </p:blipFill>
-                <p:spPr>
-                  <a:xfrm>
-                    <a:off x="3645050" y="1651937"/>
-                    <a:ext cx="640805" cy="408943"/>
-                  </a:xfrm>
-                  <a:prstGeom prst="rect">
-                    <a:avLst/>
-                  </a:prstGeom>
-                </p:spPr>
-              </p:pic>
-            </p:grpSp>
-            <p:grpSp>
-              <p:nvGrpSpPr>
-                <p:cNvPr id="7" name="Group 6"/>
-                <p:cNvGrpSpPr/>
-                <p:nvPr/>
-              </p:nvGrpSpPr>
-              <p:grpSpPr>
-                <a:xfrm>
-                  <a:off x="1889150" y="5778666"/>
-                  <a:ext cx="3379915" cy="344085"/>
-                  <a:chOff x="1415503" y="5588783"/>
-                  <a:chExt cx="3379915" cy="344085"/>
+                  <a:off x="1943831" y="5588783"/>
+                  <a:ext cx="2851587" cy="344085"/>
+                  <a:chOff x="2721670" y="6031203"/>
+                  <a:chExt cx="2261399" cy="238512"/>
                 </a:xfrm>
               </p:grpSpPr>
               <p:grpSp>
                 <p:nvGrpSpPr>
-                  <p:cNvPr id="19" name="Group 18"/>
+                  <p:cNvPr id="24" name="Group 23"/>
                   <p:cNvGrpSpPr/>
                   <p:nvPr/>
                 </p:nvGrpSpPr>
                 <p:grpSpPr>
                   <a:xfrm>
-                    <a:off x="1943831" y="5588783"/>
-                    <a:ext cx="2851587" cy="344085"/>
-                    <a:chOff x="2721670" y="6031203"/>
+                    <a:off x="2721670" y="6031203"/>
+                    <a:ext cx="2261399" cy="238512"/>
+                    <a:chOff x="2887669" y="6031203"/>
                     <a:chExt cx="2261399" cy="238512"/>
                   </a:xfrm>
                 </p:grpSpPr>
-                <p:grpSp>
-                  <p:nvGrpSpPr>
-                    <p:cNvPr id="24" name="Group 23"/>
-                    <p:cNvGrpSpPr/>
-                    <p:nvPr/>
-                  </p:nvGrpSpPr>
-                  <p:grpSpPr>
-                    <a:xfrm>
-                      <a:off x="2721670" y="6031203"/>
-                      <a:ext cx="2261399" cy="238512"/>
-                      <a:chOff x="2887669" y="6031203"/>
-                      <a:chExt cx="2261399" cy="238512"/>
-                    </a:xfrm>
-                  </p:grpSpPr>
-                  <p:pic>
-                    <p:nvPicPr>
-                      <p:cNvPr id="26" name="Picture 25"/>
-                      <p:cNvPicPr>
-                        <a:picLocks noChangeAspect="1"/>
-                      </p:cNvPicPr>
-                      <p:nvPr/>
-                    </p:nvPicPr>
-                    <p:blipFill>
-                      <a:blip r:embed="rId6" cstate="print">
-                        <a:extLst>
-                          <a:ext uri="{28A0092B-C50C-407E-A947-70E740481C1C}">
-                            <a14:useLocalDpi xmlns:a14="http://schemas.microsoft.com/office/drawing/2010/main" val="0"/>
-                          </a:ext>
-                        </a:extLst>
-                      </a:blip>
-                      <a:stretch>
-                        <a:fillRect/>
-                      </a:stretch>
-                    </p:blipFill>
-                    <p:spPr>
-                      <a:xfrm>
-                        <a:off x="3283357" y="6066072"/>
-                        <a:ext cx="325640" cy="161565"/>
-                      </a:xfrm>
-                      <a:prstGeom prst="rect">
-                        <a:avLst/>
-                      </a:prstGeom>
-                    </p:spPr>
-                  </p:pic>
-                  <p:pic>
-                    <p:nvPicPr>
-                      <p:cNvPr id="27" name="Picture 26"/>
-                      <p:cNvPicPr>
-                        <a:picLocks noChangeAspect="1"/>
-                      </p:cNvPicPr>
-                      <p:nvPr/>
-                    </p:nvPicPr>
-                    <p:blipFill>
-                      <a:blip r:embed="rId7" cstate="print">
-                        <a:extLst>
-                          <a:ext uri="{28A0092B-C50C-407E-A947-70E740481C1C}">
-                            <a14:useLocalDpi xmlns:a14="http://schemas.microsoft.com/office/drawing/2010/main" val="0"/>
-                          </a:ext>
-                        </a:extLst>
-                      </a:blip>
-                      <a:stretch>
-                        <a:fillRect/>
-                      </a:stretch>
-                    </p:blipFill>
-                    <p:spPr>
-                      <a:xfrm>
-                        <a:off x="3688952" y="6043152"/>
-                        <a:ext cx="280633" cy="225596"/>
-                      </a:xfrm>
-                      <a:prstGeom prst="rect">
-                        <a:avLst/>
-                      </a:prstGeom>
-                    </p:spPr>
-                  </p:pic>
-                  <p:pic>
-                    <p:nvPicPr>
-                      <p:cNvPr id="28" name="Picture 27"/>
-                      <p:cNvPicPr>
-                        <a:picLocks noChangeAspect="1"/>
-                      </p:cNvPicPr>
-                      <p:nvPr/>
-                    </p:nvPicPr>
-                    <p:blipFill>
-                      <a:blip r:embed="rId8" cstate="print">
-                        <a:extLst>
-                          <a:ext uri="{28A0092B-C50C-407E-A947-70E740481C1C}">
-                            <a14:useLocalDpi xmlns:a14="http://schemas.microsoft.com/office/drawing/2010/main" val="0"/>
-                          </a:ext>
-                        </a:extLst>
-                      </a:blip>
-                      <a:stretch>
-                        <a:fillRect/>
-                      </a:stretch>
-                    </p:blipFill>
-                    <p:spPr>
-                      <a:xfrm>
-                        <a:off x="2887669" y="6044119"/>
-                        <a:ext cx="274386" cy="225596"/>
-                      </a:xfrm>
-                      <a:prstGeom prst="rect">
-                        <a:avLst/>
-                      </a:prstGeom>
-                    </p:spPr>
-                  </p:pic>
-                  <p:pic>
-                    <p:nvPicPr>
-                      <p:cNvPr id="29" name="Picture 28"/>
-                      <p:cNvPicPr>
-                        <a:picLocks noChangeAspect="1"/>
-                      </p:cNvPicPr>
-                      <p:nvPr/>
-                    </p:nvPicPr>
-                    <p:blipFill>
-                      <a:blip r:embed="rId9" cstate="print">
-                        <a:extLst>
-                          <a:ext uri="{28A0092B-C50C-407E-A947-70E740481C1C}">
-                            <a14:useLocalDpi xmlns:a14="http://schemas.microsoft.com/office/drawing/2010/main" val="0"/>
-                          </a:ext>
-                        </a:extLst>
-                      </a:blip>
-                      <a:stretch>
-                        <a:fillRect/>
-                      </a:stretch>
-                    </p:blipFill>
-                    <p:spPr>
-                      <a:xfrm flipH="1">
-                        <a:off x="4893278" y="6031203"/>
-                        <a:ext cx="255790" cy="218495"/>
-                      </a:xfrm>
-                      <a:prstGeom prst="rect">
-                        <a:avLst/>
-                      </a:prstGeom>
-                    </p:spPr>
-                  </p:pic>
-                </p:grpSp>
                 <p:pic>
                   <p:nvPicPr>
-                    <p:cNvPr id="22" name="Picture 21"/>
+                    <p:cNvPr id="26" name="Picture 25"/>
                     <p:cNvPicPr>
                       <a:picLocks noChangeAspect="1"/>
                     </p:cNvPicPr>
                     <p:nvPr/>
                   </p:nvPicPr>
                   <p:blipFill>
-                    <a:blip r:embed="rId10"/>
+                    <a:blip r:embed="rId6" cstate="print">
+                      <a:extLst>
+                        <a:ext uri="{28A0092B-C50C-407E-A947-70E740481C1C}">
+                          <a14:useLocalDpi xmlns:a14="http://schemas.microsoft.com/office/drawing/2010/main" val="0"/>
+                        </a:ext>
+                      </a:extLst>
+                    </a:blip>
                     <a:stretch>
                       <a:fillRect/>
                     </a:stretch>
                   </p:blipFill>
                   <p:spPr>
                     <a:xfrm>
-                      <a:off x="4288906" y="6047587"/>
-                      <a:ext cx="334902" cy="198223"/>
+                      <a:off x="3283357" y="6066072"/>
+                      <a:ext cx="325640" cy="161565"/>
                     </a:xfrm>
                     <a:prstGeom prst="rect">
                       <a:avLst/>
@@ -16894,22 +16849,88 @@
                 </p:pic>
                 <p:pic>
                   <p:nvPicPr>
-                    <p:cNvPr id="23" name="Picture 22"/>
+                    <p:cNvPr id="27" name="Picture 26"/>
                     <p:cNvPicPr>
                       <a:picLocks noChangeAspect="1"/>
                     </p:cNvPicPr>
                     <p:nvPr/>
                   </p:nvPicPr>
                   <p:blipFill>
-                    <a:blip r:embed="rId11"/>
+                    <a:blip r:embed="rId7" cstate="print">
+                      <a:extLst>
+                        <a:ext uri="{28A0092B-C50C-407E-A947-70E740481C1C}">
+                          <a14:useLocalDpi xmlns:a14="http://schemas.microsoft.com/office/drawing/2010/main" val="0"/>
+                        </a:ext>
+                      </a:extLst>
+                    </a:blip>
                     <a:stretch>
                       <a:fillRect/>
                     </a:stretch>
                   </p:blipFill>
                   <p:spPr>
                     <a:xfrm>
-                      <a:off x="3876220" y="6050400"/>
-                      <a:ext cx="327300" cy="196986"/>
+                      <a:off x="3688952" y="6043152"/>
+                      <a:ext cx="280633" cy="225596"/>
+                    </a:xfrm>
+                    <a:prstGeom prst="rect">
+                      <a:avLst/>
+                    </a:prstGeom>
+                  </p:spPr>
+                </p:pic>
+                <p:pic>
+                  <p:nvPicPr>
+                    <p:cNvPr id="28" name="Picture 27"/>
+                    <p:cNvPicPr>
+                      <a:picLocks noChangeAspect="1"/>
+                    </p:cNvPicPr>
+                    <p:nvPr/>
+                  </p:nvPicPr>
+                  <p:blipFill>
+                    <a:blip r:embed="rId8" cstate="print">
+                      <a:extLst>
+                        <a:ext uri="{28A0092B-C50C-407E-A947-70E740481C1C}">
+                          <a14:useLocalDpi xmlns:a14="http://schemas.microsoft.com/office/drawing/2010/main" val="0"/>
+                        </a:ext>
+                      </a:extLst>
+                    </a:blip>
+                    <a:stretch>
+                      <a:fillRect/>
+                    </a:stretch>
+                  </p:blipFill>
+                  <p:spPr>
+                    <a:xfrm>
+                      <a:off x="2887669" y="6044119"/>
+                      <a:ext cx="274386" cy="225596"/>
+                    </a:xfrm>
+                    <a:prstGeom prst="rect">
+                      <a:avLst/>
+                    </a:prstGeom>
+                  </p:spPr>
+                </p:pic>
+                <p:pic>
+                  <p:nvPicPr>
+                    <p:cNvPr id="29" name="Picture 28"/>
+                    <p:cNvPicPr>
+                      <a:picLocks noChangeAspect="1"/>
+                    </p:cNvPicPr>
+                    <p:nvPr/>
+                  </p:nvPicPr>
+                  <p:blipFill>
+                    <a:blip r:embed="rId9" cstate="print">
+                      <a:extLst>
+                        <a:ext uri="{28A0092B-C50C-407E-A947-70E740481C1C}">
+                          <a14:useLocalDpi xmlns:a14="http://schemas.microsoft.com/office/drawing/2010/main" val="0"/>
+                        </a:ext>
+                      </a:extLst>
+                    </a:blip>
+                    <a:stretch>
+                      <a:fillRect/>
+                    </a:stretch>
+                  </p:blipFill>
+                  <p:spPr>
+                    <a:xfrm flipH="1">
+                      <a:off x="4893278" y="6031203"/>
+                      <a:ext cx="255790" cy="218495"/>
                     </a:xfrm>
                     <a:prstGeom prst="rect">
                       <a:avLst/>
@@ -16919,22 +16940,46 @@
               </p:grpSp>
               <p:pic>
                 <p:nvPicPr>
-                  <p:cNvPr id="4" name="Picture 3"/>
+                  <p:cNvPr id="22" name="Picture 21"/>
                   <p:cNvPicPr>
                     <a:picLocks noChangeAspect="1"/>
                   </p:cNvPicPr>
                   <p:nvPr/>
                 </p:nvPicPr>
                 <p:blipFill>
-                  <a:blip r:embed="rId12"/>
+                  <a:blip r:embed="rId10"/>
                   <a:stretch>
                     <a:fillRect/>
                   </a:stretch>
                 </p:blipFill>
                 <p:spPr>
                   <a:xfrm>
-                    <a:off x="1415503" y="5607909"/>
-                    <a:ext cx="373972" cy="294778"/>
+                    <a:off x="4288906" y="6047587"/>
+                    <a:ext cx="334902" cy="198223"/>
+                  </a:xfrm>
+                  <a:prstGeom prst="rect">
+                    <a:avLst/>
+                  </a:prstGeom>
+                </p:spPr>
+              </p:pic>
+              <p:pic>
+                <p:nvPicPr>
+                  <p:cNvPr id="23" name="Picture 22"/>
+                  <p:cNvPicPr>
+                    <a:picLocks noChangeAspect="1"/>
+                  </p:cNvPicPr>
+                  <p:nvPr/>
+                </p:nvPicPr>
+                <p:blipFill>
+                  <a:blip r:embed="rId11"/>
+                  <a:stretch>
+                    <a:fillRect/>
+                  </a:stretch>
+                </p:blipFill>
+                <p:spPr>
+                  <a:xfrm>
+                    <a:off x="3876220" y="6050400"/>
+                    <a:ext cx="327300" cy="196986"/>
                   </a:xfrm>
                   <a:prstGeom prst="rect">
                     <a:avLst/>
@@ -16942,109 +16987,149 @@
                 </p:spPr>
               </p:pic>
             </p:grpSp>
+            <p:pic>
+              <p:nvPicPr>
+                <p:cNvPr id="4" name="Picture 3"/>
+                <p:cNvPicPr>
+                  <a:picLocks noChangeAspect="1"/>
+                </p:cNvPicPr>
+                <p:nvPr/>
+              </p:nvPicPr>
+              <p:blipFill>
+                <a:blip r:embed="rId12"/>
+                <a:stretch>
+                  <a:fillRect/>
+                </a:stretch>
+              </p:blipFill>
+              <p:spPr>
+                <a:xfrm>
+                  <a:off x="1415503" y="5607909"/>
+                  <a:ext cx="373972" cy="294778"/>
+                </a:xfrm>
+                <a:prstGeom prst="rect">
+                  <a:avLst/>
+                </a:prstGeom>
+              </p:spPr>
+            </p:pic>
           </p:grpSp>
         </p:grpSp>
-        <p:sp>
-          <p:nvSpPr>
-            <p:cNvPr id="9" name="TextBox 8"/>
-            <p:cNvSpPr txBox="1"/>
-            <p:nvPr/>
-          </p:nvSpPr>
-          <p:spPr>
-            <a:xfrm>
-              <a:off x="4467846" y="2239176"/>
-              <a:ext cx="825002" cy="307777"/>
-            </a:xfrm>
-            <a:prstGeom prst="rect">
-              <a:avLst/>
-            </a:prstGeom>
-            <a:noFill/>
-          </p:spPr>
-          <p:txBody>
-            <a:bodyPr wrap="square" rtlCol="0">
-              <a:spAutoFit/>
-            </a:bodyPr>
-            <a:lstStyle/>
-            <a:p>
-              <a:r>
-                <a:rPr lang="en-US" sz="1400" dirty="0" smtClean="0"/>
-                <a:t>R</a:t>
-              </a:r>
-              <a:r>
-                <a:rPr lang="en-US" sz="1400" baseline="30000" dirty="0" smtClean="0"/>
-                <a:t>2 </a:t>
-              </a:r>
-              <a:r>
-                <a:rPr lang="en-US" sz="1400" dirty="0" smtClean="0"/>
-                <a:t>= 0.21</a:t>
-              </a:r>
-              <a:endParaRPr lang="en-US" sz="1400" dirty="0"/>
-            </a:p>
-          </p:txBody>
-        </p:sp>
-        <p:sp>
-          <p:nvSpPr>
-            <p:cNvPr id="25" name="TextBox 24"/>
-            <p:cNvSpPr txBox="1"/>
-            <p:nvPr/>
-          </p:nvSpPr>
-          <p:spPr>
-            <a:xfrm>
-              <a:off x="8999455" y="2266112"/>
-              <a:ext cx="921817" cy="307777"/>
-            </a:xfrm>
-            <a:prstGeom prst="rect">
-              <a:avLst/>
-            </a:prstGeom>
-            <a:noFill/>
-          </p:spPr>
-          <p:txBody>
-            <a:bodyPr wrap="square" rtlCol="0">
-              <a:spAutoFit/>
-            </a:bodyPr>
-            <a:lstStyle/>
-            <a:p>
-              <a:r>
-                <a:rPr lang="en-US" sz="1400" dirty="0" smtClean="0"/>
-                <a:t>R</a:t>
-              </a:r>
-              <a:r>
-                <a:rPr lang="en-US" sz="1400" baseline="30000" dirty="0" smtClean="0"/>
-                <a:t>2 </a:t>
-              </a:r>
-              <a:r>
-                <a:rPr lang="en-US" sz="1400" dirty="0" smtClean="0"/>
-                <a:t>= 0.43</a:t>
-              </a:r>
-              <a:endParaRPr lang="en-US" sz="1400" dirty="0"/>
-            </a:p>
-          </p:txBody>
-        </p:sp>
       </p:grpSp>
-      <p:pic>
-        <p:nvPicPr>
-          <p:cNvPr id="6" name="Picture 5"/>
-          <p:cNvPicPr>
-            <a:picLocks noChangeAspect="1"/>
-          </p:cNvPicPr>
+      <p:sp>
+        <p:nvSpPr>
+          <p:cNvPr id="9" name="TextBox 8"/>
+          <p:cNvSpPr txBox="1"/>
           <p:nvPr/>
-        </p:nvPicPr>
-        <p:blipFill>
-          <a:blip r:embed="rId13"/>
-          <a:stretch>
-            <a:fillRect/>
-          </a:stretch>
-        </p:blipFill>
+        </p:nvSpPr>
         <p:spPr>
           <a:xfrm>
-            <a:off x="2614259" y="120227"/>
-            <a:ext cx="8841190" cy="5771139"/>
+            <a:off x="1778884" y="2171584"/>
+            <a:ext cx="1561587" cy="523220"/>
           </a:xfrm>
           <a:prstGeom prst="rect">
             <a:avLst/>
           </a:prstGeom>
+          <a:noFill/>
         </p:spPr>
-      </p:pic>
+        <p:txBody>
+          <a:bodyPr wrap="square" rtlCol="0">
+            <a:spAutoFit/>
+          </a:bodyPr>
+          <a:lstStyle/>
+          <a:p>
+            <a:r>
+              <a:rPr lang="en-US" sz="1400" dirty="0" smtClean="0"/>
+              <a:t>Simple R</a:t>
+            </a:r>
+            <a:r>
+              <a:rPr lang="en-US" sz="1400" baseline="30000" dirty="0" smtClean="0"/>
+              <a:t>2 </a:t>
+            </a:r>
+            <a:r>
+              <a:rPr lang="en-US" sz="1400" dirty="0" smtClean="0"/>
+              <a:t>= </a:t>
+            </a:r>
+            <a:r>
+              <a:rPr lang="en-US" sz="1400" dirty="0" smtClean="0"/>
+              <a:t>0.21</a:t>
+            </a:r>
+          </a:p>
+          <a:p>
+            <a:r>
+              <a:rPr lang="en-US" sz="1400" dirty="0" smtClean="0"/>
+              <a:t>Marginal R</a:t>
+            </a:r>
+            <a:r>
+              <a:rPr lang="en-US" sz="1400" baseline="30000" dirty="0" smtClean="0"/>
+              <a:t>2 </a:t>
+            </a:r>
+            <a:r>
+              <a:rPr lang="en-US" sz="1400" dirty="0"/>
+              <a:t>= 0.04 </a:t>
+            </a:r>
+            <a:endParaRPr lang="en-US" sz="1400" dirty="0"/>
+          </a:p>
+        </p:txBody>
+      </p:sp>
+      <p:sp>
+        <p:nvSpPr>
+          <p:cNvPr id="25" name="TextBox 24"/>
+          <p:cNvSpPr txBox="1"/>
+          <p:nvPr/>
+        </p:nvSpPr>
+        <p:spPr>
+          <a:xfrm>
+            <a:off x="6271049" y="1744116"/>
+            <a:ext cx="1147846" cy="954107"/>
+          </a:xfrm>
+          <a:prstGeom prst="rect">
+            <a:avLst/>
+          </a:prstGeom>
+          <a:noFill/>
+        </p:spPr>
+        <p:txBody>
+          <a:bodyPr wrap="square" rtlCol="0">
+            <a:spAutoFit/>
+          </a:bodyPr>
+          <a:lstStyle/>
+          <a:p>
+            <a:r>
+              <a:rPr lang="en-US" sz="1400" dirty="0" smtClean="0"/>
+              <a:t>Simple R</a:t>
+            </a:r>
+            <a:r>
+              <a:rPr lang="en-US" sz="1400" baseline="30000" dirty="0" smtClean="0"/>
+              <a:t>2 </a:t>
+            </a:r>
+            <a:r>
+              <a:rPr lang="en-US" sz="1400" dirty="0" smtClean="0"/>
+              <a:t>= </a:t>
+            </a:r>
+            <a:r>
+              <a:rPr lang="en-US" sz="1400" dirty="0" smtClean="0"/>
+              <a:t>0.43</a:t>
+            </a:r>
+          </a:p>
+          <a:p>
+            <a:r>
+              <a:rPr lang="en-US" sz="1400" dirty="0"/>
+              <a:t>Marginal R</a:t>
+            </a:r>
+            <a:r>
+              <a:rPr lang="en-US" sz="1400" baseline="30000" dirty="0"/>
+              <a:t>2 </a:t>
+            </a:r>
+            <a:r>
+              <a:rPr lang="en-US" sz="1400" dirty="0"/>
+              <a:t>= </a:t>
+            </a:r>
+            <a:r>
+              <a:rPr lang="en-US" sz="1400" dirty="0" smtClean="0"/>
+              <a:t>0.12</a:t>
+            </a:r>
+            <a:endParaRPr lang="en-US" sz="1400" dirty="0"/>
+          </a:p>
+        </p:txBody>
+      </p:sp>
     </p:spTree>
     <p:extLst>
       <p:ext uri="{BB962C8B-B14F-4D97-AF65-F5344CB8AC3E}">
@@ -17365,6 +17450,30 @@
           <a:chExt cx="0" cy="0"/>
         </a:xfrm>
       </p:grpSpPr>
+      <p:pic>
+        <p:nvPicPr>
+          <p:cNvPr id="5" name="Picture 4"/>
+          <p:cNvPicPr>
+            <a:picLocks noChangeAspect="1"/>
+          </p:cNvPicPr>
+          <p:nvPr/>
+        </p:nvPicPr>
+        <p:blipFill>
+          <a:blip r:embed="rId2"/>
+          <a:stretch>
+            <a:fillRect/>
+          </a:stretch>
+        </p:blipFill>
+        <p:spPr>
+          <a:xfrm>
+            <a:off x="1403286" y="0"/>
+            <a:ext cx="8563803" cy="6674845"/>
+          </a:xfrm>
+          <a:prstGeom prst="rect">
+            <a:avLst/>
+          </a:prstGeom>
+        </p:spPr>
+      </p:pic>
       <p:sp>
         <p:nvSpPr>
           <p:cNvPr id="6" name="TextBox 5"/>
@@ -17397,184 +17506,179 @@
           </a:p>
         </p:txBody>
       </p:sp>
-      <p:grpSp>
-        <p:nvGrpSpPr>
-          <p:cNvPr id="2" name="Group 1"/>
-          <p:cNvGrpSpPr/>
+      <p:pic>
+        <p:nvPicPr>
+          <p:cNvPr id="3" name="Picture 2"/>
+          <p:cNvPicPr>
+            <a:picLocks noChangeAspect="1"/>
+          </p:cNvPicPr>
           <p:nvPr/>
-        </p:nvGrpSpPr>
-        <p:grpSpPr>
+        </p:nvPicPr>
+        <p:blipFill>
+          <a:blip r:embed="rId3"/>
+          <a:stretch>
+            <a:fillRect/>
+          </a:stretch>
+        </p:blipFill>
+        <p:spPr>
           <a:xfrm>
-            <a:off x="1412340" y="0"/>
-            <a:ext cx="8546472" cy="6896940"/>
-            <a:chOff x="1412340" y="0"/>
-            <a:chExt cx="8546472" cy="6896940"/>
-          </a:xfrm>
-        </p:grpSpPr>
-        <p:grpSp>
-          <p:nvGrpSpPr>
-            <p:cNvPr id="9" name="Group 8"/>
-            <p:cNvGrpSpPr/>
-            <p:nvPr/>
-          </p:nvGrpSpPr>
-          <p:grpSpPr>
-            <a:xfrm>
-              <a:off x="1412340" y="0"/>
-              <a:ext cx="8546472" cy="6896940"/>
-              <a:chOff x="1412340" y="0"/>
-              <a:chExt cx="8546472" cy="6896940"/>
-            </a:xfrm>
-          </p:grpSpPr>
-          <p:pic>
-            <p:nvPicPr>
-              <p:cNvPr id="8" name="Picture 7"/>
-              <p:cNvPicPr>
-                <a:picLocks noChangeAspect="1"/>
-              </p:cNvPicPr>
-              <p:nvPr/>
-            </p:nvPicPr>
-            <p:blipFill>
-              <a:blip r:embed="rId2"/>
-              <a:stretch>
-                <a:fillRect/>
-              </a:stretch>
-            </p:blipFill>
-            <p:spPr>
-              <a:xfrm>
-                <a:off x="1412340" y="0"/>
-                <a:ext cx="8546472" cy="6655236"/>
-              </a:xfrm>
-              <a:prstGeom prst="rect">
-                <a:avLst/>
-              </a:prstGeom>
-            </p:spPr>
-          </p:pic>
-          <p:pic>
-            <p:nvPicPr>
-              <p:cNvPr id="3" name="Picture 2"/>
-              <p:cNvPicPr>
-                <a:picLocks noChangeAspect="1"/>
-              </p:cNvPicPr>
-              <p:nvPr/>
-            </p:nvPicPr>
-            <p:blipFill>
-              <a:blip r:embed="rId3"/>
-              <a:stretch>
-                <a:fillRect/>
-              </a:stretch>
-            </p:blipFill>
-            <p:spPr>
-              <a:xfrm>
-                <a:off x="2211754" y="6516594"/>
-                <a:ext cx="3292125" cy="341406"/>
-              </a:xfrm>
-              <a:prstGeom prst="rect">
-                <a:avLst/>
-              </a:prstGeom>
-            </p:spPr>
-          </p:pic>
-          <p:pic>
-            <p:nvPicPr>
-              <p:cNvPr id="4" name="Picture 3"/>
-              <p:cNvPicPr>
-                <a:picLocks noChangeAspect="1"/>
-              </p:cNvPicPr>
-              <p:nvPr/>
-            </p:nvPicPr>
-            <p:blipFill>
-              <a:blip r:embed="rId4"/>
-              <a:stretch>
-                <a:fillRect/>
-              </a:stretch>
-            </p:blipFill>
-            <p:spPr>
-              <a:xfrm>
-                <a:off x="6757469" y="6506762"/>
-                <a:ext cx="2883658" cy="390178"/>
-              </a:xfrm>
-              <a:prstGeom prst="rect">
-                <a:avLst/>
-              </a:prstGeom>
-            </p:spPr>
-          </p:pic>
-        </p:grpSp>
-        <p:sp>
-          <p:nvSpPr>
-            <p:cNvPr id="10" name="TextBox 9"/>
-            <p:cNvSpPr txBox="1"/>
-            <p:nvPr/>
-          </p:nvSpPr>
-          <p:spPr>
-            <a:xfrm>
-              <a:off x="6476084" y="241704"/>
-              <a:ext cx="1998575" cy="307777"/>
-            </a:xfrm>
-            <a:prstGeom prst="rect">
-              <a:avLst/>
-            </a:prstGeom>
-            <a:noFill/>
-          </p:spPr>
-          <p:txBody>
-            <a:bodyPr wrap="square" rtlCol="0">
-              <a:spAutoFit/>
-            </a:bodyPr>
-            <a:lstStyle/>
-            <a:p>
-              <a:r>
-                <a:rPr lang="en-US" sz="1400" dirty="0" smtClean="0"/>
-                <a:t>R</a:t>
-              </a:r>
-              <a:r>
-                <a:rPr lang="en-US" sz="1400" baseline="30000" dirty="0" smtClean="0"/>
-                <a:t>2 </a:t>
-              </a:r>
-              <a:r>
-                <a:rPr lang="en-US" sz="1400" dirty="0" smtClean="0"/>
-                <a:t>= 0.21</a:t>
-              </a:r>
-              <a:endParaRPr lang="en-US" sz="1400" dirty="0"/>
-            </a:p>
-          </p:txBody>
-        </p:sp>
-        <p:sp>
-          <p:nvSpPr>
-            <p:cNvPr id="11" name="TextBox 10"/>
-            <p:cNvSpPr txBox="1"/>
-            <p:nvPr/>
-          </p:nvSpPr>
-          <p:spPr>
-            <a:xfrm>
-              <a:off x="2211754" y="241704"/>
-              <a:ext cx="1998575" cy="307777"/>
-            </a:xfrm>
-            <a:prstGeom prst="rect">
-              <a:avLst/>
-            </a:prstGeom>
-            <a:noFill/>
-          </p:spPr>
-          <p:txBody>
-            <a:bodyPr wrap="square" rtlCol="0">
-              <a:spAutoFit/>
-            </a:bodyPr>
-            <a:lstStyle/>
-            <a:p>
-              <a:r>
-                <a:rPr lang="en-US" sz="1400" dirty="0" smtClean="0"/>
-                <a:t>R</a:t>
-              </a:r>
-              <a:r>
-                <a:rPr lang="en-US" sz="1400" baseline="30000" dirty="0" smtClean="0"/>
-                <a:t>2 </a:t>
-              </a:r>
-              <a:r>
-                <a:rPr lang="en-US" sz="1400" dirty="0" smtClean="0"/>
-                <a:t>= 0.17</a:t>
-              </a:r>
-              <a:endParaRPr lang="en-US" sz="1400" dirty="0"/>
-            </a:p>
-          </p:txBody>
-        </p:sp>
-      </p:grpSp>
+            <a:off x="2211754" y="6516594"/>
+            <a:ext cx="3292125" cy="341406"/>
+          </a:xfrm>
+          <a:prstGeom prst="rect">
+            <a:avLst/>
+          </a:prstGeom>
+        </p:spPr>
+      </p:pic>
+      <p:pic>
+        <p:nvPicPr>
+          <p:cNvPr id="4" name="Picture 3"/>
+          <p:cNvPicPr>
+            <a:picLocks noChangeAspect="1"/>
+          </p:cNvPicPr>
+          <p:nvPr/>
+        </p:nvPicPr>
+        <p:blipFill>
+          <a:blip r:embed="rId4"/>
+          <a:stretch>
+            <a:fillRect/>
+          </a:stretch>
+        </p:blipFill>
+        <p:spPr>
+          <a:xfrm>
+            <a:off x="6757469" y="6506762"/>
+            <a:ext cx="2883658" cy="390178"/>
+          </a:xfrm>
+          <a:prstGeom prst="rect">
+            <a:avLst/>
+          </a:prstGeom>
+        </p:spPr>
+      </p:pic>
+      <p:sp>
+        <p:nvSpPr>
+          <p:cNvPr id="10" name="TextBox 9"/>
+          <p:cNvSpPr txBox="1"/>
+          <p:nvPr/>
+        </p:nvSpPr>
+        <p:spPr>
+          <a:xfrm>
+            <a:off x="6467404" y="1822221"/>
+            <a:ext cx="1064613" cy="954107"/>
+          </a:xfrm>
+          <a:prstGeom prst="rect">
+            <a:avLst/>
+          </a:prstGeom>
+          <a:noFill/>
+        </p:spPr>
+        <p:txBody>
+          <a:bodyPr wrap="square" rtlCol="0">
+            <a:spAutoFit/>
+          </a:bodyPr>
+          <a:lstStyle/>
+          <a:p>
+            <a:r>
+              <a:rPr lang="en-US" sz="1400" dirty="0"/>
+              <a:t>Simple R</a:t>
+            </a:r>
+            <a:r>
+              <a:rPr lang="en-US" sz="1400" baseline="30000" dirty="0"/>
+              <a:t>2 </a:t>
+            </a:r>
+            <a:r>
+              <a:rPr lang="en-US" sz="1400" dirty="0"/>
+              <a:t>= </a:t>
+            </a:r>
+            <a:r>
+              <a:rPr lang="en-US" sz="1400" dirty="0" smtClean="0"/>
+              <a:t>0.04</a:t>
+            </a:r>
+          </a:p>
+          <a:p>
+            <a:r>
+              <a:rPr lang="en-US" sz="1400" dirty="0" smtClean="0"/>
+              <a:t>Marginal </a:t>
+            </a:r>
+            <a:r>
+              <a:rPr lang="en-US" sz="1400" dirty="0"/>
+              <a:t>R</a:t>
+            </a:r>
+            <a:r>
+              <a:rPr lang="en-US" sz="1400" baseline="30000" dirty="0"/>
+              <a:t>2 </a:t>
+            </a:r>
+            <a:r>
+              <a:rPr lang="en-US" sz="1400" dirty="0"/>
+              <a:t>= </a:t>
+            </a:r>
+            <a:r>
+              <a:rPr lang="en-US" sz="1400" dirty="0" smtClean="0"/>
+              <a:t>0.07</a:t>
+            </a:r>
+            <a:endParaRPr lang="en-US" sz="1400" dirty="0"/>
+          </a:p>
+        </p:txBody>
+      </p:sp>
+      <p:sp>
+        <p:nvSpPr>
+          <p:cNvPr id="11" name="TextBox 10"/>
+          <p:cNvSpPr txBox="1"/>
+          <p:nvPr/>
+        </p:nvSpPr>
+        <p:spPr>
+          <a:xfrm>
+            <a:off x="2211754" y="307691"/>
+            <a:ext cx="1998575" cy="523220"/>
+          </a:xfrm>
+          <a:prstGeom prst="rect">
+            <a:avLst/>
+          </a:prstGeom>
+          <a:noFill/>
+        </p:spPr>
+        <p:txBody>
+          <a:bodyPr wrap="square" rtlCol="0">
+            <a:spAutoFit/>
+          </a:bodyPr>
+          <a:lstStyle/>
+          <a:p>
+            <a:r>
+              <a:rPr lang="en-US" sz="1400" dirty="0"/>
+              <a:t>Simple R</a:t>
+            </a:r>
+            <a:r>
+              <a:rPr lang="en-US" sz="1400" baseline="30000" dirty="0"/>
+              <a:t>2 </a:t>
+            </a:r>
+            <a:r>
+              <a:rPr lang="en-US" sz="1400" dirty="0"/>
+              <a:t>= </a:t>
+            </a:r>
+            <a:r>
+              <a:rPr lang="en-US" sz="1400" dirty="0" smtClean="0"/>
+              <a:t>0.05</a:t>
+            </a:r>
+            <a:endParaRPr lang="en-US" sz="1400" dirty="0"/>
+          </a:p>
+          <a:p>
+            <a:r>
+              <a:rPr lang="en-US" sz="1400" dirty="0"/>
+              <a:t>Marginal R</a:t>
+            </a:r>
+            <a:r>
+              <a:rPr lang="en-US" sz="1400" baseline="30000" dirty="0"/>
+              <a:t>2 </a:t>
+            </a:r>
+            <a:r>
+              <a:rPr lang="en-US" sz="1400" dirty="0"/>
+              <a:t>= </a:t>
+            </a:r>
+            <a:r>
+              <a:rPr lang="en-US" sz="1400" dirty="0" smtClean="0"/>
+              <a:t>0.19</a:t>
+            </a:r>
+            <a:endParaRPr lang="en-US" sz="1400" dirty="0"/>
+          </a:p>
+        </p:txBody>
+      </p:sp>
     </p:spTree>
     <p:extLst>
       <p:ext uri="{BB962C8B-B14F-4D97-AF65-F5344CB8AC3E}">
@@ -17612,6 +17716,30 @@
           <a:chExt cx="0" cy="0"/>
         </a:xfrm>
       </p:grpSpPr>
+      <p:pic>
+        <p:nvPicPr>
+          <p:cNvPr id="7" name="Picture 6"/>
+          <p:cNvPicPr>
+            <a:picLocks noChangeAspect="1"/>
+          </p:cNvPicPr>
+          <p:nvPr/>
+        </p:nvPicPr>
+        <p:blipFill>
+          <a:blip r:embed="rId3"/>
+          <a:stretch>
+            <a:fillRect/>
+          </a:stretch>
+        </p:blipFill>
+        <p:spPr>
+          <a:xfrm>
+            <a:off x="2026371" y="0"/>
+            <a:ext cx="8475090" cy="6578622"/>
+          </a:xfrm>
+          <a:prstGeom prst="rect">
+            <a:avLst/>
+          </a:prstGeom>
+        </p:spPr>
+      </p:pic>
       <p:sp>
         <p:nvSpPr>
           <p:cNvPr id="2" name="Title 1"/>
@@ -17646,196 +17774,187 @@
       </p:sp>
       <p:grpSp>
         <p:nvGrpSpPr>
-          <p:cNvPr id="5" name="Group 4"/>
+          <p:cNvPr id="6" name="Group 5"/>
           <p:cNvGrpSpPr/>
           <p:nvPr/>
         </p:nvGrpSpPr>
         <p:grpSpPr>
           <a:xfrm>
-            <a:off x="2049214" y="0"/>
-            <a:ext cx="8560117" cy="6882386"/>
-            <a:chOff x="2049214" y="0"/>
-            <a:chExt cx="8560117" cy="6882386"/>
+            <a:off x="2831575" y="6458113"/>
+            <a:ext cx="7423040" cy="390178"/>
+            <a:chOff x="2831575" y="6512907"/>
+            <a:chExt cx="7423040" cy="390178"/>
           </a:xfrm>
         </p:grpSpPr>
-        <p:grpSp>
-          <p:nvGrpSpPr>
-            <p:cNvPr id="4" name="Group 3"/>
-            <p:cNvGrpSpPr/>
+        <p:pic>
+          <p:nvPicPr>
+            <p:cNvPr id="11" name="Picture 10"/>
+            <p:cNvPicPr>
+              <a:picLocks noChangeAspect="1"/>
+            </p:cNvPicPr>
             <p:nvPr/>
-          </p:nvGrpSpPr>
-          <p:grpSpPr>
-            <a:xfrm>
-              <a:off x="2049214" y="0"/>
-              <a:ext cx="8560117" cy="6882386"/>
-              <a:chOff x="2049214" y="0"/>
-              <a:chExt cx="8560117" cy="6882386"/>
-            </a:xfrm>
-          </p:grpSpPr>
-          <p:pic>
-            <p:nvPicPr>
-              <p:cNvPr id="3" name="Picture 2"/>
-              <p:cNvPicPr>
-                <a:picLocks noChangeAspect="1"/>
-              </p:cNvPicPr>
-              <p:nvPr/>
-            </p:nvPicPr>
-            <p:blipFill>
-              <a:blip r:embed="rId2"/>
-              <a:stretch>
-                <a:fillRect/>
-              </a:stretch>
-            </p:blipFill>
-            <p:spPr>
-              <a:xfrm>
-                <a:off x="2049214" y="0"/>
-                <a:ext cx="8560117" cy="6693031"/>
-              </a:xfrm>
-              <a:prstGeom prst="rect">
-                <a:avLst/>
-              </a:prstGeom>
-            </p:spPr>
-          </p:pic>
-          <p:grpSp>
-            <p:nvGrpSpPr>
-              <p:cNvPr id="6" name="Group 5"/>
-              <p:cNvGrpSpPr/>
-              <p:nvPr/>
-            </p:nvGrpSpPr>
-            <p:grpSpPr>
-              <a:xfrm>
-                <a:off x="2831575" y="6492208"/>
-                <a:ext cx="7477361" cy="390178"/>
-                <a:chOff x="2831575" y="6492208"/>
-                <a:chExt cx="7477361" cy="390178"/>
-              </a:xfrm>
-            </p:grpSpPr>
-            <p:pic>
-              <p:nvPicPr>
-                <p:cNvPr id="11" name="Picture 10"/>
-                <p:cNvPicPr>
-                  <a:picLocks noChangeAspect="1"/>
-                </p:cNvPicPr>
-                <p:nvPr/>
-              </p:nvPicPr>
-              <p:blipFill>
-                <a:blip r:embed="rId3"/>
-                <a:stretch>
-                  <a:fillRect/>
-                </a:stretch>
-              </p:blipFill>
-              <p:spPr>
-                <a:xfrm>
-                  <a:off x="2831575" y="6516594"/>
-                  <a:ext cx="3286029" cy="341406"/>
-                </a:xfrm>
-                <a:prstGeom prst="rect">
-                  <a:avLst/>
-                </a:prstGeom>
-              </p:spPr>
-            </p:pic>
-            <p:pic>
-              <p:nvPicPr>
-                <p:cNvPr id="12" name="Picture 11"/>
-                <p:cNvPicPr>
-                  <a:picLocks noChangeAspect="1"/>
-                </p:cNvPicPr>
-                <p:nvPr/>
-              </p:nvPicPr>
-              <p:blipFill>
-                <a:blip r:embed="rId4"/>
-                <a:stretch>
-                  <a:fillRect/>
-                </a:stretch>
-              </p:blipFill>
-              <p:spPr>
-                <a:xfrm>
-                  <a:off x="7425278" y="6492208"/>
-                  <a:ext cx="2883658" cy="390178"/>
-                </a:xfrm>
-                <a:prstGeom prst="rect">
-                  <a:avLst/>
-                </a:prstGeom>
-              </p:spPr>
-            </p:pic>
-          </p:grpSp>
-        </p:grpSp>
-        <p:sp>
-          <p:nvSpPr>
-            <p:cNvPr id="10" name="TextBox 9"/>
-            <p:cNvSpPr txBox="1"/>
-            <p:nvPr/>
-          </p:nvSpPr>
+          </p:nvPicPr>
+          <p:blipFill>
+            <a:blip r:embed="rId4"/>
+            <a:stretch>
+              <a:fillRect/>
+            </a:stretch>
+          </p:blipFill>
           <p:spPr>
             <a:xfrm>
-              <a:off x="7088826" y="2549897"/>
-              <a:ext cx="1998575" cy="307777"/>
+              <a:off x="2831575" y="6516594"/>
+              <a:ext cx="3286029" cy="341406"/>
             </a:xfrm>
             <a:prstGeom prst="rect">
               <a:avLst/>
             </a:prstGeom>
-            <a:noFill/>
           </p:spPr>
-          <p:txBody>
-            <a:bodyPr wrap="square" rtlCol="0">
-              <a:spAutoFit/>
-            </a:bodyPr>
-            <a:lstStyle/>
-            <a:p>
-              <a:r>
-                <a:rPr lang="en-US" sz="1400" dirty="0" smtClean="0"/>
-                <a:t>R</a:t>
-              </a:r>
-              <a:r>
-                <a:rPr lang="en-US" sz="1400" baseline="30000" dirty="0" smtClean="0"/>
-                <a:t>2 </a:t>
-              </a:r>
-              <a:r>
-                <a:rPr lang="en-US" sz="1400" dirty="0" smtClean="0"/>
-                <a:t>= 0.32</a:t>
-              </a:r>
-            </a:p>
-          </p:txBody>
-        </p:sp>
-        <p:sp>
-          <p:nvSpPr>
-            <p:cNvPr id="13" name="TextBox 12"/>
-            <p:cNvSpPr txBox="1"/>
+        </p:pic>
+        <p:pic>
+          <p:nvPicPr>
+            <p:cNvPr id="12" name="Picture 11"/>
+            <p:cNvPicPr>
+              <a:picLocks noChangeAspect="1"/>
+            </p:cNvPicPr>
             <p:nvPr/>
-          </p:nvSpPr>
+          </p:nvPicPr>
+          <p:blipFill>
+            <a:blip r:embed="rId5"/>
+            <a:stretch>
+              <a:fillRect/>
+            </a:stretch>
+          </p:blipFill>
           <p:spPr>
             <a:xfrm>
-              <a:off x="2758509" y="2549897"/>
-              <a:ext cx="1998575" cy="307777"/>
+              <a:off x="7370957" y="6512907"/>
+              <a:ext cx="2883658" cy="390178"/>
             </a:xfrm>
             <a:prstGeom prst="rect">
               <a:avLst/>
             </a:prstGeom>
-            <a:noFill/>
           </p:spPr>
-          <p:txBody>
-            <a:bodyPr wrap="square" rtlCol="0">
-              <a:spAutoFit/>
-            </a:bodyPr>
-            <a:lstStyle/>
-            <a:p>
-              <a:r>
-                <a:rPr lang="en-US" sz="1400" dirty="0" smtClean="0"/>
-                <a:t>R</a:t>
-              </a:r>
-              <a:r>
-                <a:rPr lang="en-US" sz="1400" baseline="30000" dirty="0" smtClean="0"/>
-                <a:t>2 </a:t>
-              </a:r>
-              <a:r>
-                <a:rPr lang="en-US" sz="1400" dirty="0" smtClean="0"/>
-                <a:t>= 0.17</a:t>
-              </a:r>
-              <a:endParaRPr lang="en-US" sz="1400" dirty="0"/>
-            </a:p>
-          </p:txBody>
-        </p:sp>
+        </p:pic>
       </p:grpSp>
+      <p:sp>
+        <p:nvSpPr>
+          <p:cNvPr id="14" name="TextBox 13"/>
+          <p:cNvSpPr txBox="1"/>
+          <p:nvPr/>
+        </p:nvSpPr>
+        <p:spPr>
+          <a:xfrm>
+            <a:off x="2749845" y="2334454"/>
+            <a:ext cx="1561587" cy="523220"/>
+          </a:xfrm>
+          <a:prstGeom prst="rect">
+            <a:avLst/>
+          </a:prstGeom>
+          <a:noFill/>
+        </p:spPr>
+        <p:txBody>
+          <a:bodyPr wrap="square" rtlCol="0">
+            <a:spAutoFit/>
+          </a:bodyPr>
+          <a:lstStyle/>
+          <a:p>
+            <a:r>
+              <a:rPr lang="en-US" sz="1400" dirty="0" smtClean="0"/>
+              <a:t>Simple R</a:t>
+            </a:r>
+            <a:r>
+              <a:rPr lang="en-US" sz="1400" baseline="30000" dirty="0" smtClean="0"/>
+              <a:t>2 </a:t>
+            </a:r>
+            <a:r>
+              <a:rPr lang="en-US" sz="1400" dirty="0" smtClean="0"/>
+              <a:t>= </a:t>
+            </a:r>
+            <a:r>
+              <a:rPr lang="en-US" sz="1400" dirty="0" smtClean="0"/>
+              <a:t>0.25</a:t>
+            </a:r>
+          </a:p>
+          <a:p>
+            <a:r>
+              <a:rPr lang="en-US" sz="1400" dirty="0" smtClean="0"/>
+              <a:t>Marginal R</a:t>
+            </a:r>
+            <a:r>
+              <a:rPr lang="en-US" sz="1400" baseline="30000" dirty="0" smtClean="0"/>
+              <a:t>2 </a:t>
+            </a:r>
+            <a:r>
+              <a:rPr lang="en-US" sz="1400" dirty="0"/>
+              <a:t>= </a:t>
+            </a:r>
+            <a:r>
+              <a:rPr lang="en-US" sz="1400" dirty="0" smtClean="0"/>
+              <a:t>0.19 </a:t>
+            </a:r>
+            <a:endParaRPr lang="en-US" sz="1400" dirty="0"/>
+          </a:p>
+        </p:txBody>
+      </p:sp>
+      <p:sp>
+        <p:nvSpPr>
+          <p:cNvPr id="15" name="TextBox 14"/>
+          <p:cNvSpPr txBox="1"/>
+          <p:nvPr/>
+        </p:nvSpPr>
+        <p:spPr>
+          <a:xfrm>
+            <a:off x="7079400" y="1903567"/>
+            <a:ext cx="980518" cy="954107"/>
+          </a:xfrm>
+          <a:prstGeom prst="rect">
+            <a:avLst/>
+          </a:prstGeom>
+          <a:noFill/>
+        </p:spPr>
+        <p:txBody>
+          <a:bodyPr wrap="square" rtlCol="0">
+            <a:spAutoFit/>
+          </a:bodyPr>
+          <a:lstStyle/>
+          <a:p>
+            <a:r>
+              <a:rPr lang="en-US" sz="1400" dirty="0" smtClean="0"/>
+              <a:t>Simple R</a:t>
+            </a:r>
+            <a:r>
+              <a:rPr lang="en-US" sz="1400" baseline="30000" dirty="0" smtClean="0"/>
+              <a:t>2 </a:t>
+            </a:r>
+            <a:r>
+              <a:rPr lang="en-US" sz="1400" dirty="0" smtClean="0"/>
+              <a:t>= </a:t>
+            </a:r>
+            <a:r>
+              <a:rPr lang="en-US" sz="1400" dirty="0" smtClean="0"/>
+              <a:t>0.32</a:t>
+            </a:r>
+          </a:p>
+          <a:p>
+            <a:r>
+              <a:rPr lang="en-US" sz="1400" dirty="0" smtClean="0"/>
+              <a:t>Marginal R</a:t>
+            </a:r>
+            <a:r>
+              <a:rPr lang="en-US" sz="1400" baseline="30000" dirty="0" smtClean="0"/>
+              <a:t>2 </a:t>
+            </a:r>
+            <a:r>
+              <a:rPr lang="en-US" sz="1400" dirty="0"/>
+              <a:t>= </a:t>
+            </a:r>
+            <a:r>
+              <a:rPr lang="en-US" sz="1400" dirty="0" smtClean="0"/>
+              <a:t>0.09 </a:t>
+            </a:r>
+            <a:endParaRPr lang="en-US" sz="1400" dirty="0"/>
+          </a:p>
+        </p:txBody>
+      </p:sp>
     </p:spTree>
     <p:extLst>
       <p:ext uri="{BB962C8B-B14F-4D97-AF65-F5344CB8AC3E}">

</xml_diff>

<commit_message>
added number tics to fig 5a
</commit_message>
<xml_diff>
--- a/output/plots/all_figs_with_legends.pptx
+++ b/output/plots/all_figs_with_legends.pptx
@@ -213,7 +213,7 @@
           <a:p>
             <a:fld id="{7FA21820-D199-4D82-91AF-C50B1D3B111A}" type="datetimeFigureOut">
               <a:rPr lang="en-US" smtClean="0"/>
-              <a:t>2/22/2018</a:t>
+              <a:t>3/1/2018</a:t>
             </a:fld>
             <a:endParaRPr lang="en-US"/>
           </a:p>
@@ -1130,7 +1130,7 @@
           <a:p>
             <a:fld id="{916B8C92-D5E3-4480-8685-D57BEE386DE2}" type="datetimeFigureOut">
               <a:rPr lang="en-US" smtClean="0"/>
-              <a:t>2/22/2018</a:t>
+              <a:t>3/1/2018</a:t>
             </a:fld>
             <a:endParaRPr lang="en-US"/>
           </a:p>
@@ -1300,7 +1300,7 @@
           <a:p>
             <a:fld id="{916B8C92-D5E3-4480-8685-D57BEE386DE2}" type="datetimeFigureOut">
               <a:rPr lang="en-US" smtClean="0"/>
-              <a:t>2/22/2018</a:t>
+              <a:t>3/1/2018</a:t>
             </a:fld>
             <a:endParaRPr lang="en-US"/>
           </a:p>
@@ -1480,7 +1480,7 @@
           <a:p>
             <a:fld id="{916B8C92-D5E3-4480-8685-D57BEE386DE2}" type="datetimeFigureOut">
               <a:rPr lang="en-US" smtClean="0"/>
-              <a:t>2/22/2018</a:t>
+              <a:t>3/1/2018</a:t>
             </a:fld>
             <a:endParaRPr lang="en-US"/>
           </a:p>
@@ -1650,7 +1650,7 @@
           <a:p>
             <a:fld id="{916B8C92-D5E3-4480-8685-D57BEE386DE2}" type="datetimeFigureOut">
               <a:rPr lang="en-US" smtClean="0"/>
-              <a:t>2/22/2018</a:t>
+              <a:t>3/1/2018</a:t>
             </a:fld>
             <a:endParaRPr lang="en-US"/>
           </a:p>
@@ -1896,7 +1896,7 @@
           <a:p>
             <a:fld id="{916B8C92-D5E3-4480-8685-D57BEE386DE2}" type="datetimeFigureOut">
               <a:rPr lang="en-US" smtClean="0"/>
-              <a:t>2/22/2018</a:t>
+              <a:t>3/1/2018</a:t>
             </a:fld>
             <a:endParaRPr lang="en-US"/>
           </a:p>
@@ -2128,7 +2128,7 @@
           <a:p>
             <a:fld id="{916B8C92-D5E3-4480-8685-D57BEE386DE2}" type="datetimeFigureOut">
               <a:rPr lang="en-US" smtClean="0"/>
-              <a:t>2/22/2018</a:t>
+              <a:t>3/1/2018</a:t>
             </a:fld>
             <a:endParaRPr lang="en-US"/>
           </a:p>
@@ -2495,7 +2495,7 @@
           <a:p>
             <a:fld id="{916B8C92-D5E3-4480-8685-D57BEE386DE2}" type="datetimeFigureOut">
               <a:rPr lang="en-US" smtClean="0"/>
-              <a:t>2/22/2018</a:t>
+              <a:t>3/1/2018</a:t>
             </a:fld>
             <a:endParaRPr lang="en-US"/>
           </a:p>
@@ -2613,7 +2613,7 @@
           <a:p>
             <a:fld id="{916B8C92-D5E3-4480-8685-D57BEE386DE2}" type="datetimeFigureOut">
               <a:rPr lang="en-US" smtClean="0"/>
-              <a:t>2/22/2018</a:t>
+              <a:t>3/1/2018</a:t>
             </a:fld>
             <a:endParaRPr lang="en-US"/>
           </a:p>
@@ -2708,7 +2708,7 @@
           <a:p>
             <a:fld id="{916B8C92-D5E3-4480-8685-D57BEE386DE2}" type="datetimeFigureOut">
               <a:rPr lang="en-US" smtClean="0"/>
-              <a:t>2/22/2018</a:t>
+              <a:t>3/1/2018</a:t>
             </a:fld>
             <a:endParaRPr lang="en-US"/>
           </a:p>
@@ -2985,7 +2985,7 @@
           <a:p>
             <a:fld id="{916B8C92-D5E3-4480-8685-D57BEE386DE2}" type="datetimeFigureOut">
               <a:rPr lang="en-US" smtClean="0"/>
-              <a:t>2/22/2018</a:t>
+              <a:t>3/1/2018</a:t>
             </a:fld>
             <a:endParaRPr lang="en-US"/>
           </a:p>
@@ -3238,7 +3238,7 @@
           <a:p>
             <a:fld id="{916B8C92-D5E3-4480-8685-D57BEE386DE2}" type="datetimeFigureOut">
               <a:rPr lang="en-US" smtClean="0"/>
-              <a:t>2/22/2018</a:t>
+              <a:t>3/1/2018</a:t>
             </a:fld>
             <a:endParaRPr lang="en-US"/>
           </a:p>
@@ -3451,7 +3451,7 @@
           <a:p>
             <a:fld id="{916B8C92-D5E3-4480-8685-D57BEE386DE2}" type="datetimeFigureOut">
               <a:rPr lang="en-US" smtClean="0"/>
-              <a:t>2/22/2018</a:t>
+              <a:t>3/1/2018</a:t>
             </a:fld>
             <a:endParaRPr lang="en-US"/>
           </a:p>
@@ -5931,7 +5931,7 @@
       </p:grpSpPr>
       <p:grpSp>
         <p:nvGrpSpPr>
-          <p:cNvPr id="11" name="Group 10"/>
+          <p:cNvPr id="12" name="Group 11"/>
           <p:cNvGrpSpPr/>
           <p:nvPr/>
         </p:nvGrpSpPr>
@@ -5943,198 +5943,253 @@
             <a:chExt cx="9224921" cy="6858000"/>
           </a:xfrm>
         </p:grpSpPr>
-        <p:pic>
-          <p:nvPicPr>
-            <p:cNvPr id="10" name="Picture 9"/>
-            <p:cNvPicPr>
-              <a:picLocks noChangeAspect="1"/>
-            </p:cNvPicPr>
-            <p:nvPr/>
-          </p:nvPicPr>
-          <p:blipFill>
-            <a:blip r:embed="rId2"/>
-            <a:stretch>
-              <a:fillRect/>
-            </a:stretch>
-          </p:blipFill>
-          <p:spPr>
-            <a:xfrm>
-              <a:off x="1253441" y="0"/>
-              <a:ext cx="9224921" cy="6858000"/>
-            </a:xfrm>
-            <a:prstGeom prst="rect">
-              <a:avLst/>
-            </a:prstGeom>
-          </p:spPr>
-        </p:pic>
         <p:grpSp>
           <p:nvGrpSpPr>
-            <p:cNvPr id="2" name="Group 1"/>
+            <p:cNvPr id="11" name="Group 10"/>
             <p:cNvGrpSpPr/>
             <p:nvPr/>
           </p:nvGrpSpPr>
           <p:grpSpPr>
             <a:xfrm>
-              <a:off x="2193215" y="0"/>
-              <a:ext cx="8285147" cy="6131578"/>
-              <a:chOff x="2193215" y="0"/>
-              <a:chExt cx="8285147" cy="6131578"/>
+              <a:off x="1253441" y="0"/>
+              <a:ext cx="9224921" cy="6858000"/>
+              <a:chOff x="1253441" y="0"/>
+              <a:chExt cx="9224921" cy="6858000"/>
             </a:xfrm>
           </p:grpSpPr>
           <p:pic>
             <p:nvPicPr>
-              <p:cNvPr id="6" name="Picture 5"/>
+              <p:cNvPr id="10" name="Picture 9"/>
               <p:cNvPicPr>
                 <a:picLocks noChangeAspect="1"/>
               </p:cNvPicPr>
               <p:nvPr/>
             </p:nvPicPr>
             <p:blipFill>
-              <a:blip r:embed="rId3"/>
+              <a:blip r:embed="rId2"/>
               <a:stretch>
                 <a:fillRect/>
               </a:stretch>
             </p:blipFill>
             <p:spPr>
               <a:xfrm>
-                <a:off x="8027558" y="0"/>
-                <a:ext cx="2450804" cy="823031"/>
+                <a:off x="1253441" y="0"/>
+                <a:ext cx="9224921" cy="6858000"/>
               </a:xfrm>
               <a:prstGeom prst="rect">
                 <a:avLst/>
               </a:prstGeom>
             </p:spPr>
           </p:pic>
-          <p:pic>
-            <p:nvPicPr>
-              <p:cNvPr id="7" name="Picture 6"/>
-              <p:cNvPicPr>
-                <a:picLocks noChangeAspect="1"/>
-              </p:cNvPicPr>
+          <p:grpSp>
+            <p:nvGrpSpPr>
+              <p:cNvPr id="2" name="Group 1"/>
+              <p:cNvGrpSpPr/>
               <p:nvPr/>
-            </p:nvPicPr>
-            <p:blipFill>
-              <a:blip r:embed="rId4"/>
-              <a:stretch>
-                <a:fillRect/>
-              </a:stretch>
-            </p:blipFill>
-            <p:spPr>
+            </p:nvGrpSpPr>
+            <p:grpSpPr>
               <a:xfrm>
-                <a:off x="8971626" y="4619134"/>
-                <a:ext cx="1506736" cy="1512444"/>
+                <a:off x="2177486" y="0"/>
+                <a:ext cx="8300876" cy="6131578"/>
+                <a:chOff x="2177486" y="0"/>
+                <a:chExt cx="8300876" cy="6131578"/>
               </a:xfrm>
-              <a:prstGeom prst="rect">
-                <a:avLst/>
-              </a:prstGeom>
-            </p:spPr>
-          </p:pic>
-          <p:sp>
-            <p:nvSpPr>
-              <p:cNvPr id="8" name="TextBox 7"/>
-              <p:cNvSpPr txBox="1"/>
-              <p:nvPr/>
-            </p:nvSpPr>
-            <p:spPr>
-              <a:xfrm>
-                <a:off x="2193215" y="2537382"/>
-                <a:ext cx="1324900" cy="707886"/>
-              </a:xfrm>
-              <a:prstGeom prst="rect">
-                <a:avLst/>
-              </a:prstGeom>
-              <a:noFill/>
-            </p:spPr>
-            <p:txBody>
-              <a:bodyPr wrap="square" rtlCol="0">
-                <a:spAutoFit/>
-              </a:bodyPr>
-              <a:lstStyle/>
-              <a:p>
-                <a:r>
-                  <a:rPr lang="en-US" sz="2000" dirty="0"/>
-                  <a:t>l</a:t>
-                </a:r>
-                <a:r>
-                  <a:rPr lang="en-US" sz="2000" dirty="0" smtClean="0"/>
-                  <a:t>ognormal</a:t>
-                </a:r>
-              </a:p>
-              <a:p>
-                <a:endParaRPr lang="en-US" sz="2000" dirty="0"/>
-              </a:p>
-            </p:txBody>
-          </p:sp>
-          <p:sp>
-            <p:nvSpPr>
-              <p:cNvPr id="9" name="TextBox 8"/>
-              <p:cNvSpPr txBox="1"/>
-              <p:nvPr/>
-            </p:nvSpPr>
-            <p:spPr>
-              <a:xfrm>
-                <a:off x="4478498" y="2537382"/>
-                <a:ext cx="1324900" cy="707886"/>
-              </a:xfrm>
-              <a:prstGeom prst="rect">
-                <a:avLst/>
-              </a:prstGeom>
-              <a:noFill/>
-            </p:spPr>
-            <p:txBody>
-              <a:bodyPr wrap="square" rtlCol="0">
-                <a:spAutoFit/>
-              </a:bodyPr>
-              <a:lstStyle/>
-              <a:p>
-                <a:r>
-                  <a:rPr lang="en-US" sz="2000" dirty="0" smtClean="0"/>
-                  <a:t>logseries</a:t>
-                </a:r>
-              </a:p>
-              <a:p>
-                <a:endParaRPr lang="en-US" sz="2000" dirty="0"/>
-              </a:p>
-            </p:txBody>
-          </p:sp>
-          <p:cxnSp>
-            <p:nvCxnSpPr>
-              <p:cNvPr id="4" name="Straight Arrow Connector 3"/>
-              <p:cNvCxnSpPr/>
-              <p:nvPr/>
-            </p:nvCxnSpPr>
-            <p:spPr>
-              <a:xfrm>
-                <a:off x="3471620" y="2735451"/>
-                <a:ext cx="906650" cy="0"/>
-              </a:xfrm>
-              <a:prstGeom prst="straightConnector1">
-                <a:avLst/>
-              </a:prstGeom>
-              <a:ln w="28575">
-                <a:solidFill>
+            </p:grpSpPr>
+            <p:pic>
+              <p:nvPicPr>
+                <p:cNvPr id="6" name="Picture 5"/>
+                <p:cNvPicPr>
+                  <a:picLocks noChangeAspect="1"/>
+                </p:cNvPicPr>
+                <p:nvPr/>
+              </p:nvPicPr>
+              <p:blipFill>
+                <a:blip r:embed="rId3"/>
+                <a:stretch>
+                  <a:fillRect/>
+                </a:stretch>
+              </p:blipFill>
+              <p:spPr>
+                <a:xfrm>
+                  <a:off x="8027558" y="0"/>
+                  <a:ext cx="2450804" cy="823031"/>
+                </a:xfrm>
+                <a:prstGeom prst="rect">
+                  <a:avLst/>
+                </a:prstGeom>
+              </p:spPr>
+            </p:pic>
+            <p:pic>
+              <p:nvPicPr>
+                <p:cNvPr id="7" name="Picture 6"/>
+                <p:cNvPicPr>
+                  <a:picLocks noChangeAspect="1"/>
+                </p:cNvPicPr>
+                <p:nvPr/>
+              </p:nvPicPr>
+              <p:blipFill>
+                <a:blip r:embed="rId4"/>
+                <a:stretch>
+                  <a:fillRect/>
+                </a:stretch>
+              </p:blipFill>
+              <p:spPr>
+                <a:xfrm>
+                  <a:off x="8971626" y="4619134"/>
+                  <a:ext cx="1506736" cy="1512444"/>
+                </a:xfrm>
+                <a:prstGeom prst="rect">
+                  <a:avLst/>
+                </a:prstGeom>
+              </p:spPr>
+            </p:pic>
+            <p:sp>
+              <p:nvSpPr>
+                <p:cNvPr id="8" name="TextBox 7"/>
+                <p:cNvSpPr txBox="1"/>
+                <p:nvPr/>
+              </p:nvSpPr>
+              <p:spPr>
+                <a:xfrm>
+                  <a:off x="2177486" y="2537382"/>
+                  <a:ext cx="1500599" cy="707886"/>
+                </a:xfrm>
+                <a:prstGeom prst="rect">
+                  <a:avLst/>
+                </a:prstGeom>
+                <a:noFill/>
+              </p:spPr>
+              <p:txBody>
+                <a:bodyPr wrap="square" rtlCol="0">
+                  <a:spAutoFit/>
+                </a:bodyPr>
+                <a:lstStyle/>
+                <a:p>
+                  <a:r>
+                    <a:rPr lang="en-US" sz="2000" dirty="0" smtClean="0"/>
+                    <a:t>0 </a:t>
+                  </a:r>
+                  <a:r>
+                    <a:rPr lang="en-US" dirty="0" smtClean="0"/>
+                    <a:t>lognormal</a:t>
+                  </a:r>
+                  <a:endParaRPr lang="en-US" dirty="0" smtClean="0"/>
+                </a:p>
+                <a:p>
+                  <a:endParaRPr lang="en-US" sz="2000" dirty="0"/>
+                </a:p>
+              </p:txBody>
+            </p:sp>
+            <p:sp>
+              <p:nvSpPr>
+                <p:cNvPr id="9" name="TextBox 8"/>
+                <p:cNvSpPr txBox="1"/>
+                <p:nvPr/>
+              </p:nvSpPr>
+              <p:spPr>
+                <a:xfrm>
+                  <a:off x="4337850" y="2537382"/>
+                  <a:ext cx="1324900" cy="707886"/>
+                </a:xfrm>
+                <a:prstGeom prst="rect">
+                  <a:avLst/>
+                </a:prstGeom>
+                <a:noFill/>
+              </p:spPr>
+              <p:txBody>
+                <a:bodyPr wrap="square" rtlCol="0">
+                  <a:spAutoFit/>
+                </a:bodyPr>
+                <a:lstStyle/>
+                <a:p>
+                  <a:r>
+                    <a:rPr lang="en-US" dirty="0"/>
+                    <a:t>l</a:t>
+                  </a:r>
+                  <a:r>
+                    <a:rPr lang="en-US" dirty="0" smtClean="0"/>
+                    <a:t>ogseries</a:t>
+                  </a:r>
+                  <a:r>
+                    <a:rPr lang="en-US" sz="2000" dirty="0" smtClean="0"/>
+                    <a:t> 1</a:t>
+                  </a:r>
+                  <a:endParaRPr lang="en-US" sz="2000" dirty="0" smtClean="0"/>
+                </a:p>
+                <a:p>
+                  <a:endParaRPr lang="en-US" sz="2000" dirty="0"/>
+                </a:p>
+              </p:txBody>
+            </p:sp>
+            <p:cxnSp>
+              <p:nvCxnSpPr>
+                <p:cNvPr id="4" name="Straight Arrow Connector 3"/>
+                <p:cNvCxnSpPr/>
+                <p:nvPr/>
+              </p:nvCxnSpPr>
+              <p:spPr>
+                <a:xfrm>
+                  <a:off x="3431200" y="2891325"/>
+                  <a:ext cx="906650" cy="0"/>
+                </a:xfrm>
+                <a:prstGeom prst="straightConnector1">
+                  <a:avLst/>
+                </a:prstGeom>
+                <a:ln w="28575">
+                  <a:solidFill>
+                    <a:schemeClr val="tx1"/>
+                  </a:solidFill>
+                  <a:headEnd type="arrow" w="med" len="med"/>
+                  <a:tailEnd type="arrow" w="med" len="med"/>
+                </a:ln>
+              </p:spPr>
+              <p:style>
+                <a:lnRef idx="1">
+                  <a:schemeClr val="accent1"/>
+                </a:lnRef>
+                <a:fillRef idx="0">
+                  <a:schemeClr val="accent1"/>
+                </a:fillRef>
+                <a:effectRef idx="0">
+                  <a:schemeClr val="accent1"/>
+                </a:effectRef>
+                <a:fontRef idx="minor">
                   <a:schemeClr val="tx1"/>
-                </a:solidFill>
-                <a:headEnd type="arrow" w="med" len="med"/>
-                <a:tailEnd type="arrow" w="med" len="med"/>
-              </a:ln>
-            </p:spPr>
-            <p:style>
-              <a:lnRef idx="1">
-                <a:schemeClr val="accent1"/>
-              </a:lnRef>
-              <a:fillRef idx="0">
-                <a:schemeClr val="accent1"/>
-              </a:fillRef>
-              <a:effectRef idx="0">
-                <a:schemeClr val="accent1"/>
-              </a:effectRef>
-              <a:fontRef idx="minor">
-                <a:schemeClr val="tx1"/>
-              </a:fontRef>
-            </p:style>
-          </p:cxnSp>
+                </a:fontRef>
+              </p:style>
+            </p:cxnSp>
+          </p:grpSp>
         </p:grpSp>
+        <p:sp>
+          <p:nvSpPr>
+            <p:cNvPr id="5" name="TextBox 4"/>
+            <p:cNvSpPr txBox="1"/>
+            <p:nvPr/>
+          </p:nvSpPr>
+          <p:spPr>
+            <a:xfrm>
+              <a:off x="3609583" y="2537382"/>
+              <a:ext cx="549883" cy="400110"/>
+            </a:xfrm>
+            <a:prstGeom prst="rect">
+              <a:avLst/>
+            </a:prstGeom>
+            <a:noFill/>
+          </p:spPr>
+          <p:txBody>
+            <a:bodyPr wrap="square" rtlCol="0">
+              <a:spAutoFit/>
+            </a:bodyPr>
+            <a:lstStyle/>
+            <a:p>
+              <a:r>
+                <a:rPr lang="en-US" sz="2000" dirty="0" smtClean="0"/>
+                <a:t>0.5</a:t>
+              </a:r>
+              <a:endParaRPr lang="en-US" sz="2000" dirty="0"/>
+            </a:p>
+          </p:txBody>
+        </p:sp>
       </p:grpSp>
     </p:spTree>
     <p:extLst>
@@ -17046,11 +17101,7 @@
             </a:r>
             <a:r>
               <a:rPr lang="en-US" sz="1400" dirty="0" smtClean="0"/>
-              <a:t>= </a:t>
-            </a:r>
-            <a:r>
-              <a:rPr lang="en-US" sz="1400" dirty="0" smtClean="0"/>
-              <a:t>0.21</a:t>
+              <a:t>= 0.21</a:t>
             </a:r>
           </a:p>
           <a:p>
@@ -17066,7 +17117,6 @@
               <a:rPr lang="en-US" sz="1400" dirty="0"/>
               <a:t>= 0.04 </a:t>
             </a:r>
-            <a:endParaRPr lang="en-US" sz="1400" dirty="0"/>
           </a:p>
         </p:txBody>
       </p:sp>
@@ -17102,11 +17152,7 @@
             </a:r>
             <a:r>
               <a:rPr lang="en-US" sz="1400" dirty="0" smtClean="0"/>
-              <a:t>= </a:t>
-            </a:r>
-            <a:r>
-              <a:rPr lang="en-US" sz="1400" dirty="0" smtClean="0"/>
-              <a:t>0.43</a:t>
+              <a:t>= 0.43</a:t>
             </a:r>
           </a:p>
           <a:p>
@@ -17867,11 +17913,7 @@
             </a:r>
             <a:r>
               <a:rPr lang="en-US" sz="1400" dirty="0" smtClean="0"/>
-              <a:t>= </a:t>
-            </a:r>
-            <a:r>
-              <a:rPr lang="en-US" sz="1400" dirty="0" smtClean="0"/>
-              <a:t>0.25</a:t>
+              <a:t>= 0.25</a:t>
             </a:r>
           </a:p>
           <a:p>
@@ -17927,11 +17969,7 @@
             </a:r>
             <a:r>
               <a:rPr lang="en-US" sz="1400" dirty="0" smtClean="0"/>
-              <a:t>= </a:t>
-            </a:r>
-            <a:r>
-              <a:rPr lang="en-US" sz="1400" dirty="0" smtClean="0"/>
-              <a:t>0.32</a:t>
+              <a:t>= 0.32</a:t>
             </a:r>
           </a:p>
           <a:p>

</xml_diff>

<commit_message>
histograms for 5c and d
</commit_message>
<xml_diff>
--- a/output/plots/all_figs_with_legends.pptx
+++ b/output/plots/all_figs_with_legends.pptx
@@ -6073,7 +6073,6 @@
                     <a:rPr lang="en-US" dirty="0" smtClean="0"/>
                     <a:t>lognormal</a:t>
                   </a:r>
-                  <a:endParaRPr lang="en-US" dirty="0" smtClean="0"/>
                 </a:p>
                 <a:p>
                   <a:endParaRPr lang="en-US" sz="2000" dirty="0"/>
@@ -6114,7 +6113,6 @@
                     <a:rPr lang="en-US" sz="2000" dirty="0" smtClean="0"/>
                     <a:t> 1</a:t>
                   </a:r>
-                  <a:endParaRPr lang="en-US" sz="2000" dirty="0" smtClean="0"/>
                 </a:p>
                 <a:p>
                   <a:endParaRPr lang="en-US" sz="2000" dirty="0"/>
@@ -6191,6 +6189,52 @@
           </p:txBody>
         </p:sp>
       </p:grpSp>
+      <p:pic>
+        <p:nvPicPr>
+          <p:cNvPr id="3" name="Picture 2"/>
+          <p:cNvPicPr>
+            <a:picLocks noChangeAspect="1"/>
+          </p:cNvPicPr>
+          <p:nvPr/>
+        </p:nvPicPr>
+        <p:blipFill rotWithShape="1">
+          <a:blip r:embed="rId5"/>
+          <a:srcRect t="14734" r="13526"/>
+          <a:stretch/>
+        </p:blipFill>
+        <p:spPr>
+          <a:xfrm>
+            <a:off x="2607823" y="3414654"/>
+            <a:ext cx="1551643" cy="1134914"/>
+          </a:xfrm>
+          <a:prstGeom prst="rect">
+            <a:avLst/>
+          </a:prstGeom>
+        </p:spPr>
+      </p:pic>
+      <p:pic>
+        <p:nvPicPr>
+          <p:cNvPr id="13" name="Picture 12"/>
+          <p:cNvPicPr>
+            <a:picLocks noChangeAspect="1"/>
+          </p:cNvPicPr>
+          <p:nvPr/>
+        </p:nvPicPr>
+        <p:blipFill rotWithShape="1">
+          <a:blip r:embed="rId6"/>
+          <a:srcRect t="16225" r="12346"/>
+          <a:stretch/>
+        </p:blipFill>
+        <p:spPr>
+          <a:xfrm>
+            <a:off x="7249220" y="3414653"/>
+            <a:ext cx="1072803" cy="760579"/>
+          </a:xfrm>
+          <a:prstGeom prst="rect">
+            <a:avLst/>
+          </a:prstGeom>
+        </p:spPr>
+      </p:pic>
     </p:spTree>
     <p:extLst>
       <p:ext uri="{BB962C8B-B14F-4D97-AF65-F5344CB8AC3E}">

</xml_diff>

<commit_message>
added SADs to null model
</commit_message>
<xml_diff>
--- a/output/plots/all_figs_with_legends.pptx
+++ b/output/plots/all_figs_with_legends.pptx
@@ -213,7 +213,7 @@
           <a:p>
             <a:fld id="{7FA21820-D199-4D82-91AF-C50B1D3B111A}" type="datetimeFigureOut">
               <a:rPr lang="en-US" smtClean="0"/>
-              <a:t>3/1/2018</a:t>
+              <a:t>3/7/2018</a:t>
             </a:fld>
             <a:endParaRPr lang="en-US"/>
           </a:p>
@@ -1130,7 +1130,7 @@
           <a:p>
             <a:fld id="{916B8C92-D5E3-4480-8685-D57BEE386DE2}" type="datetimeFigureOut">
               <a:rPr lang="en-US" smtClean="0"/>
-              <a:t>3/1/2018</a:t>
+              <a:t>3/7/2018</a:t>
             </a:fld>
             <a:endParaRPr lang="en-US"/>
           </a:p>
@@ -1300,7 +1300,7 @@
           <a:p>
             <a:fld id="{916B8C92-D5E3-4480-8685-D57BEE386DE2}" type="datetimeFigureOut">
               <a:rPr lang="en-US" smtClean="0"/>
-              <a:t>3/1/2018</a:t>
+              <a:t>3/7/2018</a:t>
             </a:fld>
             <a:endParaRPr lang="en-US"/>
           </a:p>
@@ -1480,7 +1480,7 @@
           <a:p>
             <a:fld id="{916B8C92-D5E3-4480-8685-D57BEE386DE2}" type="datetimeFigureOut">
               <a:rPr lang="en-US" smtClean="0"/>
-              <a:t>3/1/2018</a:t>
+              <a:t>3/7/2018</a:t>
             </a:fld>
             <a:endParaRPr lang="en-US"/>
           </a:p>
@@ -1650,7 +1650,7 @@
           <a:p>
             <a:fld id="{916B8C92-D5E3-4480-8685-D57BEE386DE2}" type="datetimeFigureOut">
               <a:rPr lang="en-US" smtClean="0"/>
-              <a:t>3/1/2018</a:t>
+              <a:t>3/7/2018</a:t>
             </a:fld>
             <a:endParaRPr lang="en-US"/>
           </a:p>
@@ -1896,7 +1896,7 @@
           <a:p>
             <a:fld id="{916B8C92-D5E3-4480-8685-D57BEE386DE2}" type="datetimeFigureOut">
               <a:rPr lang="en-US" smtClean="0"/>
-              <a:t>3/1/2018</a:t>
+              <a:t>3/7/2018</a:t>
             </a:fld>
             <a:endParaRPr lang="en-US"/>
           </a:p>
@@ -2128,7 +2128,7 @@
           <a:p>
             <a:fld id="{916B8C92-D5E3-4480-8685-D57BEE386DE2}" type="datetimeFigureOut">
               <a:rPr lang="en-US" smtClean="0"/>
-              <a:t>3/1/2018</a:t>
+              <a:t>3/7/2018</a:t>
             </a:fld>
             <a:endParaRPr lang="en-US"/>
           </a:p>
@@ -2495,7 +2495,7 @@
           <a:p>
             <a:fld id="{916B8C92-D5E3-4480-8685-D57BEE386DE2}" type="datetimeFigureOut">
               <a:rPr lang="en-US" smtClean="0"/>
-              <a:t>3/1/2018</a:t>
+              <a:t>3/7/2018</a:t>
             </a:fld>
             <a:endParaRPr lang="en-US"/>
           </a:p>
@@ -2613,7 +2613,7 @@
           <a:p>
             <a:fld id="{916B8C92-D5E3-4480-8685-D57BEE386DE2}" type="datetimeFigureOut">
               <a:rPr lang="en-US" smtClean="0"/>
-              <a:t>3/1/2018</a:t>
+              <a:t>3/7/2018</a:t>
             </a:fld>
             <a:endParaRPr lang="en-US"/>
           </a:p>
@@ -2708,7 +2708,7 @@
           <a:p>
             <a:fld id="{916B8C92-D5E3-4480-8685-D57BEE386DE2}" type="datetimeFigureOut">
               <a:rPr lang="en-US" smtClean="0"/>
-              <a:t>3/1/2018</a:t>
+              <a:t>3/7/2018</a:t>
             </a:fld>
             <a:endParaRPr lang="en-US"/>
           </a:p>
@@ -2985,7 +2985,7 @@
           <a:p>
             <a:fld id="{916B8C92-D5E3-4480-8685-D57BEE386DE2}" type="datetimeFigureOut">
               <a:rPr lang="en-US" smtClean="0"/>
-              <a:t>3/1/2018</a:t>
+              <a:t>3/7/2018</a:t>
             </a:fld>
             <a:endParaRPr lang="en-US"/>
           </a:p>
@@ -3238,7 +3238,7 @@
           <a:p>
             <a:fld id="{916B8C92-D5E3-4480-8685-D57BEE386DE2}" type="datetimeFigureOut">
               <a:rPr lang="en-US" smtClean="0"/>
-              <a:t>3/1/2018</a:t>
+              <a:t>3/7/2018</a:t>
             </a:fld>
             <a:endParaRPr lang="en-US"/>
           </a:p>
@@ -3451,7 +3451,7 @@
           <a:p>
             <a:fld id="{916B8C92-D5E3-4480-8685-D57BEE386DE2}" type="datetimeFigureOut">
               <a:rPr lang="en-US" smtClean="0"/>
-              <a:t>3/1/2018</a:t>
+              <a:t>3/7/2018</a:t>
             </a:fld>
             <a:endParaRPr lang="en-US"/>
           </a:p>
@@ -14410,21 +14410,21 @@
       </p:sp>
       <p:grpSp>
         <p:nvGrpSpPr>
-          <p:cNvPr id="8" name="Group 7"/>
+          <p:cNvPr id="10" name="Group 9"/>
           <p:cNvGrpSpPr/>
           <p:nvPr/>
         </p:nvGrpSpPr>
         <p:grpSpPr>
           <a:xfrm>
-            <a:off x="2131582" y="29029"/>
-            <a:ext cx="7340816" cy="6733982"/>
-            <a:chOff x="2131582" y="29029"/>
-            <a:chExt cx="7340816" cy="6733982"/>
+            <a:off x="2113178" y="29029"/>
+            <a:ext cx="7309586" cy="6733982"/>
+            <a:chOff x="2113178" y="29029"/>
+            <a:chExt cx="7309586" cy="6733982"/>
           </a:xfrm>
         </p:grpSpPr>
         <p:pic>
           <p:nvPicPr>
-            <p:cNvPr id="4" name="Picture 3"/>
+            <p:cNvPr id="5" name="Picture 4"/>
             <p:cNvPicPr>
               <a:picLocks noChangeAspect="1"/>
             </p:cNvPicPr>
@@ -14438,8 +14438,8 @@
           </p:blipFill>
           <p:spPr>
             <a:xfrm>
-              <a:off x="2131582" y="1342590"/>
-              <a:ext cx="7340816" cy="5348869"/>
+              <a:off x="2113178" y="1333837"/>
+              <a:ext cx="7309586" cy="5360363"/>
             </a:xfrm>
             <a:prstGeom prst="rect">
               <a:avLst/>

</xml_diff>

<commit_message>
needed to call package to get null mods to run
</commit_message>
<xml_diff>
--- a/output/plots/all_figs_with_legends.pptx
+++ b/output/plots/all_figs_with_legends.pptx
@@ -5,7 +5,7 @@
     <p:sldMasterId id="2147483648" r:id="rId1"/>
   </p:sldMasterIdLst>
   <p:notesMasterIdLst>
-    <p:notesMasterId r:id="rId19"/>
+    <p:notesMasterId r:id="rId20"/>
   </p:notesMasterIdLst>
   <p:sldIdLst>
     <p:sldId id="258" r:id="rId2"/>
@@ -23,8 +23,9 @@
     <p:sldId id="274" r:id="rId14"/>
     <p:sldId id="277" r:id="rId15"/>
     <p:sldId id="276" r:id="rId16"/>
-    <p:sldId id="270" r:id="rId17"/>
-    <p:sldId id="269" r:id="rId18"/>
+    <p:sldId id="278" r:id="rId17"/>
+    <p:sldId id="270" r:id="rId18"/>
+    <p:sldId id="269" r:id="rId19"/>
   </p:sldIdLst>
   <p:sldSz cx="12192000" cy="6858000"/>
   <p:notesSz cx="6858000" cy="9144000"/>
@@ -213,7 +214,7 @@
           <a:p>
             <a:fld id="{7FA21820-D199-4D82-91AF-C50B1D3B111A}" type="datetimeFigureOut">
               <a:rPr lang="en-US" smtClean="0"/>
-              <a:t>3/7/2018</a:t>
+              <a:t>3/8/2018</a:t>
             </a:fld>
             <a:endParaRPr lang="en-US"/>
           </a:p>
@@ -1130,7 +1131,7 @@
           <a:p>
             <a:fld id="{916B8C92-D5E3-4480-8685-D57BEE386DE2}" type="datetimeFigureOut">
               <a:rPr lang="en-US" smtClean="0"/>
-              <a:t>3/7/2018</a:t>
+              <a:t>3/8/2018</a:t>
             </a:fld>
             <a:endParaRPr lang="en-US"/>
           </a:p>
@@ -1300,7 +1301,7 @@
           <a:p>
             <a:fld id="{916B8C92-D5E3-4480-8685-D57BEE386DE2}" type="datetimeFigureOut">
               <a:rPr lang="en-US" smtClean="0"/>
-              <a:t>3/7/2018</a:t>
+              <a:t>3/8/2018</a:t>
             </a:fld>
             <a:endParaRPr lang="en-US"/>
           </a:p>
@@ -1480,7 +1481,7 @@
           <a:p>
             <a:fld id="{916B8C92-D5E3-4480-8685-D57BEE386DE2}" type="datetimeFigureOut">
               <a:rPr lang="en-US" smtClean="0"/>
-              <a:t>3/7/2018</a:t>
+              <a:t>3/8/2018</a:t>
             </a:fld>
             <a:endParaRPr lang="en-US"/>
           </a:p>
@@ -1650,7 +1651,7 @@
           <a:p>
             <a:fld id="{916B8C92-D5E3-4480-8685-D57BEE386DE2}" type="datetimeFigureOut">
               <a:rPr lang="en-US" smtClean="0"/>
-              <a:t>3/7/2018</a:t>
+              <a:t>3/8/2018</a:t>
             </a:fld>
             <a:endParaRPr lang="en-US"/>
           </a:p>
@@ -1896,7 +1897,7 @@
           <a:p>
             <a:fld id="{916B8C92-D5E3-4480-8685-D57BEE386DE2}" type="datetimeFigureOut">
               <a:rPr lang="en-US" smtClean="0"/>
-              <a:t>3/7/2018</a:t>
+              <a:t>3/8/2018</a:t>
             </a:fld>
             <a:endParaRPr lang="en-US"/>
           </a:p>
@@ -2128,7 +2129,7 @@
           <a:p>
             <a:fld id="{916B8C92-D5E3-4480-8685-D57BEE386DE2}" type="datetimeFigureOut">
               <a:rPr lang="en-US" smtClean="0"/>
-              <a:t>3/7/2018</a:t>
+              <a:t>3/8/2018</a:t>
             </a:fld>
             <a:endParaRPr lang="en-US"/>
           </a:p>
@@ -2495,7 +2496,7 @@
           <a:p>
             <a:fld id="{916B8C92-D5E3-4480-8685-D57BEE386DE2}" type="datetimeFigureOut">
               <a:rPr lang="en-US" smtClean="0"/>
-              <a:t>3/7/2018</a:t>
+              <a:t>3/8/2018</a:t>
             </a:fld>
             <a:endParaRPr lang="en-US"/>
           </a:p>
@@ -2613,7 +2614,7 @@
           <a:p>
             <a:fld id="{916B8C92-D5E3-4480-8685-D57BEE386DE2}" type="datetimeFigureOut">
               <a:rPr lang="en-US" smtClean="0"/>
-              <a:t>3/7/2018</a:t>
+              <a:t>3/8/2018</a:t>
             </a:fld>
             <a:endParaRPr lang="en-US"/>
           </a:p>
@@ -2708,7 +2709,7 @@
           <a:p>
             <a:fld id="{916B8C92-D5E3-4480-8685-D57BEE386DE2}" type="datetimeFigureOut">
               <a:rPr lang="en-US" smtClean="0"/>
-              <a:t>3/7/2018</a:t>
+              <a:t>3/8/2018</a:t>
             </a:fld>
             <a:endParaRPr lang="en-US"/>
           </a:p>
@@ -2985,7 +2986,7 @@
           <a:p>
             <a:fld id="{916B8C92-D5E3-4480-8685-D57BEE386DE2}" type="datetimeFigureOut">
               <a:rPr lang="en-US" smtClean="0"/>
-              <a:t>3/7/2018</a:t>
+              <a:t>3/8/2018</a:t>
             </a:fld>
             <a:endParaRPr lang="en-US"/>
           </a:p>
@@ -3238,7 +3239,7 @@
           <a:p>
             <a:fld id="{916B8C92-D5E3-4480-8685-D57BEE386DE2}" type="datetimeFigureOut">
               <a:rPr lang="en-US" smtClean="0"/>
-              <a:t>3/7/2018</a:t>
+              <a:t>3/8/2018</a:t>
             </a:fld>
             <a:endParaRPr lang="en-US"/>
           </a:p>
@@ -3451,7 +3452,7 @@
           <a:p>
             <a:fld id="{916B8C92-D5E3-4480-8685-D57BEE386DE2}" type="datetimeFigureOut">
               <a:rPr lang="en-US" smtClean="0"/>
-              <a:t>3/7/2018</a:t>
+              <a:t>3/8/2018</a:t>
             </a:fld>
             <a:endParaRPr lang="en-US"/>
           </a:p>
@@ -7195,6 +7196,79 @@
           <a:chExt cx="0" cy="0"/>
         </a:xfrm>
       </p:grpSpPr>
+      <p:sp>
+        <p:nvSpPr>
+          <p:cNvPr id="2" name="Title 1"/>
+          <p:cNvSpPr>
+            <a:spLocks noGrp="1"/>
+          </p:cNvSpPr>
+          <p:nvPr>
+            <p:ph type="title"/>
+          </p:nvPr>
+        </p:nvSpPr>
+        <p:spPr/>
+        <p:txBody>
+          <a:bodyPr/>
+          <a:lstStyle/>
+          <a:p>
+            <a:endParaRPr lang="en-US"/>
+          </a:p>
+        </p:txBody>
+      </p:sp>
+      <p:pic>
+        <p:nvPicPr>
+          <p:cNvPr id="4" name="Picture 3"/>
+          <p:cNvPicPr>
+            <a:picLocks noChangeAspect="1"/>
+          </p:cNvPicPr>
+          <p:nvPr/>
+        </p:nvPicPr>
+        <p:blipFill>
+          <a:blip r:embed="rId2"/>
+          <a:stretch>
+            <a:fillRect/>
+          </a:stretch>
+        </p:blipFill>
+        <p:spPr>
+          <a:xfrm>
+            <a:off x="838200" y="2462543"/>
+            <a:ext cx="4563639" cy="3057581"/>
+          </a:xfrm>
+          <a:prstGeom prst="rect">
+            <a:avLst/>
+          </a:prstGeom>
+        </p:spPr>
+      </p:pic>
+    </p:spTree>
+    <p:extLst>
+      <p:ext uri="{BB962C8B-B14F-4D97-AF65-F5344CB8AC3E}">
+        <p14:creationId xmlns:p14="http://schemas.microsoft.com/office/powerpoint/2010/main" val="3335049621"/>
+      </p:ext>
+    </p:extLst>
+  </p:cSld>
+  <p:clrMapOvr>
+    <a:masterClrMapping/>
+  </p:clrMapOvr>
+</p:sld>
+</file>
+
+<file path=ppt/slides/slide17.xml><?xml version="1.0" encoding="utf-8"?>
+<p:sld xmlns:a="http://schemas.openxmlformats.org/drawingml/2006/main" xmlns:r="http://schemas.openxmlformats.org/officeDocument/2006/relationships" xmlns:p="http://schemas.openxmlformats.org/presentationml/2006/main">
+  <p:cSld>
+    <p:spTree>
+      <p:nvGrpSpPr>
+        <p:cNvPr id="1" name=""/>
+        <p:cNvGrpSpPr/>
+        <p:nvPr/>
+      </p:nvGrpSpPr>
+      <p:grpSpPr>
+        <a:xfrm>
+          <a:off x="0" y="0"/>
+          <a:ext cx="0" cy="0"/>
+          <a:chOff x="0" y="0"/>
+          <a:chExt cx="0" cy="0"/>
+        </a:xfrm>
+      </p:grpSpPr>
       <p:pic>
         <p:nvPicPr>
           <p:cNvPr id="6" name="Picture 5"/>
@@ -7303,7 +7377,7 @@
 </p:sld>
 </file>
 
-<file path=ppt/slides/slide17.xml><?xml version="1.0" encoding="utf-8"?>
+<file path=ppt/slides/slide18.xml><?xml version="1.0" encoding="utf-8"?>
 <p:sld xmlns:a="http://schemas.openxmlformats.org/drawingml/2006/main" xmlns:r="http://schemas.openxmlformats.org/officeDocument/2006/relationships" xmlns:p="http://schemas.openxmlformats.org/presentationml/2006/main">
   <p:cSld>
     <p:spTree>

</xml_diff>

<commit_message>
moved elev mod from fig 2 to fig 4 script
</commit_message>
<xml_diff>
--- a/output/plots/all_figs_with_legends.pptx
+++ b/output/plots/all_figs_with_legends.pptx
@@ -7196,49 +7196,142 @@
           <a:chExt cx="0" cy="0"/>
         </a:xfrm>
       </p:grpSpPr>
-      <p:sp>
-        <p:nvSpPr>
-          <p:cNvPr id="2" name="Title 1"/>
-          <p:cNvSpPr>
-            <a:spLocks noGrp="1"/>
-          </p:cNvSpPr>
-          <p:nvPr>
-            <p:ph type="title"/>
-          </p:nvPr>
-        </p:nvSpPr>
-        <p:spPr/>
-        <p:txBody>
-          <a:bodyPr/>
-          <a:lstStyle/>
-          <a:p>
-            <a:endParaRPr lang="en-US"/>
-          </a:p>
-        </p:txBody>
-      </p:sp>
-      <p:pic>
-        <p:nvPicPr>
-          <p:cNvPr id="4" name="Picture 3"/>
-          <p:cNvPicPr>
-            <a:picLocks noChangeAspect="1"/>
-          </p:cNvPicPr>
+      <p:grpSp>
+        <p:nvGrpSpPr>
+          <p:cNvPr id="14" name="Group 13"/>
+          <p:cNvGrpSpPr/>
           <p:nvPr/>
-        </p:nvPicPr>
-        <p:blipFill>
-          <a:blip r:embed="rId2"/>
-          <a:stretch>
-            <a:fillRect/>
-          </a:stretch>
-        </p:blipFill>
-        <p:spPr>
+        </p:nvGrpSpPr>
+        <p:grpSpPr>
           <a:xfrm>
-            <a:off x="838200" y="2462543"/>
-            <a:ext cx="4563639" cy="3057581"/>
-          </a:xfrm>
-          <a:prstGeom prst="rect">
-            <a:avLst/>
-          </a:prstGeom>
-        </p:spPr>
-      </p:pic>
+            <a:off x="182134" y="1772816"/>
+            <a:ext cx="11879237" cy="3627991"/>
+            <a:chOff x="182134" y="1772816"/>
+            <a:chExt cx="11879237" cy="3627991"/>
+          </a:xfrm>
+        </p:grpSpPr>
+        <p:grpSp>
+          <p:nvGrpSpPr>
+            <p:cNvPr id="11" name="Group 10"/>
+            <p:cNvGrpSpPr/>
+            <p:nvPr/>
+          </p:nvGrpSpPr>
+          <p:grpSpPr>
+            <a:xfrm>
+              <a:off x="182134" y="1772816"/>
+              <a:ext cx="11879237" cy="3627991"/>
+              <a:chOff x="182134" y="1772816"/>
+              <a:chExt cx="11879237" cy="3627991"/>
+            </a:xfrm>
+          </p:grpSpPr>
+          <p:pic>
+            <p:nvPicPr>
+              <p:cNvPr id="9" name="Picture 8"/>
+              <p:cNvPicPr>
+                <a:picLocks noChangeAspect="1"/>
+              </p:cNvPicPr>
+              <p:nvPr/>
+            </p:nvPicPr>
+            <p:blipFill rotWithShape="1">
+              <a:blip r:embed="rId2"/>
+              <a:srcRect t="14356" r="5996"/>
+              <a:stretch/>
+            </p:blipFill>
+            <p:spPr>
+              <a:xfrm>
+                <a:off x="182134" y="1772816"/>
+                <a:ext cx="5943586" cy="3627991"/>
+              </a:xfrm>
+              <a:prstGeom prst="rect">
+                <a:avLst/>
+              </a:prstGeom>
+            </p:spPr>
+          </p:pic>
+          <p:pic>
+            <p:nvPicPr>
+              <p:cNvPr id="10" name="Picture 9"/>
+              <p:cNvPicPr>
+                <a:picLocks noChangeAspect="1"/>
+              </p:cNvPicPr>
+              <p:nvPr/>
+            </p:nvPicPr>
+            <p:blipFill rotWithShape="1">
+              <a:blip r:embed="rId3"/>
+              <a:srcRect t="14538" r="5939"/>
+              <a:stretch/>
+            </p:blipFill>
+            <p:spPr>
+              <a:xfrm>
+                <a:off x="6114160" y="1780529"/>
+                <a:ext cx="5947211" cy="3620278"/>
+              </a:xfrm>
+              <a:prstGeom prst="rect">
+                <a:avLst/>
+              </a:prstGeom>
+            </p:spPr>
+          </p:pic>
+        </p:grpSp>
+        <p:sp>
+          <p:nvSpPr>
+            <p:cNvPr id="12" name="TextBox 11"/>
+            <p:cNvSpPr txBox="1"/>
+            <p:nvPr/>
+          </p:nvSpPr>
+          <p:spPr>
+            <a:xfrm>
+              <a:off x="7047708" y="1857120"/>
+              <a:ext cx="279918" cy="369332"/>
+            </a:xfrm>
+            <a:prstGeom prst="rect">
+              <a:avLst/>
+            </a:prstGeom>
+            <a:noFill/>
+          </p:spPr>
+          <p:txBody>
+            <a:bodyPr wrap="square" rtlCol="0">
+              <a:spAutoFit/>
+            </a:bodyPr>
+            <a:lstStyle/>
+            <a:p>
+              <a:r>
+                <a:rPr lang="en-US" dirty="0"/>
+                <a:t>B</a:t>
+              </a:r>
+              <a:endParaRPr lang="en-US" dirty="0"/>
+            </a:p>
+          </p:txBody>
+        </p:sp>
+        <p:sp>
+          <p:nvSpPr>
+            <p:cNvPr id="13" name="TextBox 12"/>
+            <p:cNvSpPr txBox="1"/>
+            <p:nvPr/>
+          </p:nvSpPr>
+          <p:spPr>
+            <a:xfrm>
+              <a:off x="1100497" y="1780529"/>
+              <a:ext cx="279918" cy="369332"/>
+            </a:xfrm>
+            <a:prstGeom prst="rect">
+              <a:avLst/>
+            </a:prstGeom>
+            <a:noFill/>
+          </p:spPr>
+          <p:txBody>
+            <a:bodyPr wrap="square" rtlCol="0">
+              <a:spAutoFit/>
+            </a:bodyPr>
+            <a:lstStyle/>
+            <a:p>
+              <a:r>
+                <a:rPr lang="en-US" dirty="0" smtClean="0"/>
+                <a:t>A</a:t>
+              </a:r>
+              <a:endParaRPr lang="en-US" dirty="0"/>
+            </a:p>
+          </p:txBody>
+        </p:sp>
+      </p:grpSp>
     </p:spTree>
     <p:extLst>
       <p:ext uri="{BB962C8B-B14F-4D97-AF65-F5344CB8AC3E}">

</xml_diff>

<commit_message>
edits to 5a and suppl figs
</commit_message>
<xml_diff>
--- a/output/plots/all_figs_with_legends.pptx
+++ b/output/plots/all_figs_with_legends.pptx
@@ -5930,9 +5930,33 @@
           <a:chExt cx="0" cy="0"/>
         </a:xfrm>
       </p:grpSpPr>
+      <p:pic>
+        <p:nvPicPr>
+          <p:cNvPr id="6" name="Picture 5"/>
+          <p:cNvPicPr>
+            <a:picLocks noChangeAspect="1"/>
+          </p:cNvPicPr>
+          <p:nvPr/>
+        </p:nvPicPr>
+        <p:blipFill>
+          <a:blip r:embed="rId2"/>
+          <a:stretch>
+            <a:fillRect/>
+          </a:stretch>
+        </p:blipFill>
+        <p:spPr>
+          <a:xfrm>
+            <a:off x="8027558" y="0"/>
+            <a:ext cx="2450804" cy="823031"/>
+          </a:xfrm>
+          <a:prstGeom prst="rect">
+            <a:avLst/>
+          </a:prstGeom>
+        </p:spPr>
+      </p:pic>
       <p:grpSp>
         <p:nvGrpSpPr>
-          <p:cNvPr id="12" name="Group 11"/>
+          <p:cNvPr id="21" name="Group 20"/>
           <p:cNvGrpSpPr/>
           <p:nvPr/>
         </p:nvGrpSpPr>
@@ -5944,221 +5968,91 @@
             <a:chExt cx="9224921" cy="6858000"/>
           </a:xfrm>
         </p:grpSpPr>
-        <p:grpSp>
-          <p:nvGrpSpPr>
-            <p:cNvPr id="11" name="Group 10"/>
-            <p:cNvGrpSpPr/>
+        <p:pic>
+          <p:nvPicPr>
+            <p:cNvPr id="10" name="Picture 9"/>
+            <p:cNvPicPr>
+              <a:picLocks noChangeAspect="1"/>
+            </p:cNvPicPr>
             <p:nvPr/>
-          </p:nvGrpSpPr>
-          <p:grpSpPr>
+          </p:nvPicPr>
+          <p:blipFill>
+            <a:blip r:embed="rId3"/>
+            <a:stretch>
+              <a:fillRect/>
+            </a:stretch>
+          </p:blipFill>
+          <p:spPr>
             <a:xfrm>
               <a:off x="1253441" y="0"/>
               <a:ext cx="9224921" cy="6858000"/>
-              <a:chOff x="1253441" y="0"/>
-              <a:chExt cx="9224921" cy="6858000"/>
             </a:xfrm>
-          </p:grpSpPr>
-          <p:pic>
-            <p:nvPicPr>
-              <p:cNvPr id="10" name="Picture 9"/>
-              <p:cNvPicPr>
-                <a:picLocks noChangeAspect="1"/>
-              </p:cNvPicPr>
-              <p:nvPr/>
-            </p:nvPicPr>
-            <p:blipFill>
-              <a:blip r:embed="rId2"/>
-              <a:stretch>
-                <a:fillRect/>
-              </a:stretch>
-            </p:blipFill>
-            <p:spPr>
-              <a:xfrm>
-                <a:off x="1253441" y="0"/>
-                <a:ext cx="9224921" cy="6858000"/>
-              </a:xfrm>
-              <a:prstGeom prst="rect">
-                <a:avLst/>
-              </a:prstGeom>
-            </p:spPr>
-          </p:pic>
-          <p:grpSp>
-            <p:nvGrpSpPr>
-              <p:cNvPr id="2" name="Group 1"/>
-              <p:cNvGrpSpPr/>
-              <p:nvPr/>
-            </p:nvGrpSpPr>
-            <p:grpSpPr>
-              <a:xfrm>
-                <a:off x="2177486" y="0"/>
-                <a:ext cx="8300876" cy="6131578"/>
-                <a:chOff x="2177486" y="0"/>
-                <a:chExt cx="8300876" cy="6131578"/>
-              </a:xfrm>
-            </p:grpSpPr>
-            <p:pic>
-              <p:nvPicPr>
-                <p:cNvPr id="6" name="Picture 5"/>
-                <p:cNvPicPr>
-                  <a:picLocks noChangeAspect="1"/>
-                </p:cNvPicPr>
-                <p:nvPr/>
-              </p:nvPicPr>
-              <p:blipFill>
-                <a:blip r:embed="rId3"/>
-                <a:stretch>
-                  <a:fillRect/>
-                </a:stretch>
-              </p:blipFill>
-              <p:spPr>
-                <a:xfrm>
-                  <a:off x="8027558" y="0"/>
-                  <a:ext cx="2450804" cy="823031"/>
-                </a:xfrm>
-                <a:prstGeom prst="rect">
-                  <a:avLst/>
-                </a:prstGeom>
-              </p:spPr>
-            </p:pic>
-            <p:pic>
-              <p:nvPicPr>
-                <p:cNvPr id="7" name="Picture 6"/>
-                <p:cNvPicPr>
-                  <a:picLocks noChangeAspect="1"/>
-                </p:cNvPicPr>
-                <p:nvPr/>
-              </p:nvPicPr>
-              <p:blipFill>
-                <a:blip r:embed="rId4"/>
-                <a:stretch>
-                  <a:fillRect/>
-                </a:stretch>
-              </p:blipFill>
-              <p:spPr>
-                <a:xfrm>
-                  <a:off x="8971626" y="4619134"/>
-                  <a:ext cx="1506736" cy="1512444"/>
-                </a:xfrm>
-                <a:prstGeom prst="rect">
-                  <a:avLst/>
-                </a:prstGeom>
-              </p:spPr>
-            </p:pic>
-            <p:sp>
-              <p:nvSpPr>
-                <p:cNvPr id="8" name="TextBox 7"/>
-                <p:cNvSpPr txBox="1"/>
-                <p:nvPr/>
-              </p:nvSpPr>
-              <p:spPr>
-                <a:xfrm>
-                  <a:off x="2177486" y="2537382"/>
-                  <a:ext cx="1500599" cy="707886"/>
-                </a:xfrm>
-                <a:prstGeom prst="rect">
-                  <a:avLst/>
-                </a:prstGeom>
-                <a:noFill/>
-              </p:spPr>
-              <p:txBody>
-                <a:bodyPr wrap="square" rtlCol="0">
-                  <a:spAutoFit/>
-                </a:bodyPr>
-                <a:lstStyle/>
-                <a:p>
-                  <a:r>
-                    <a:rPr lang="en-US" sz="2000" dirty="0" smtClean="0"/>
-                    <a:t>0 </a:t>
-                  </a:r>
-                  <a:r>
-                    <a:rPr lang="en-US" dirty="0" smtClean="0"/>
-                    <a:t>lognormal</a:t>
-                  </a:r>
-                </a:p>
-                <a:p>
-                  <a:endParaRPr lang="en-US" sz="2000" dirty="0"/>
-                </a:p>
-              </p:txBody>
-            </p:sp>
-            <p:sp>
-              <p:nvSpPr>
-                <p:cNvPr id="9" name="TextBox 8"/>
-                <p:cNvSpPr txBox="1"/>
-                <p:nvPr/>
-              </p:nvSpPr>
-              <p:spPr>
-                <a:xfrm>
-                  <a:off x="4337850" y="2537382"/>
-                  <a:ext cx="1324900" cy="707886"/>
-                </a:xfrm>
-                <a:prstGeom prst="rect">
-                  <a:avLst/>
-                </a:prstGeom>
-                <a:noFill/>
-              </p:spPr>
-              <p:txBody>
-                <a:bodyPr wrap="square" rtlCol="0">
-                  <a:spAutoFit/>
-                </a:bodyPr>
-                <a:lstStyle/>
-                <a:p>
-                  <a:r>
-                    <a:rPr lang="en-US" dirty="0"/>
-                    <a:t>l</a:t>
-                  </a:r>
-                  <a:r>
-                    <a:rPr lang="en-US" dirty="0" smtClean="0"/>
-                    <a:t>ogseries</a:t>
-                  </a:r>
-                  <a:r>
-                    <a:rPr lang="en-US" sz="2000" dirty="0" smtClean="0"/>
-                    <a:t> 1</a:t>
-                  </a:r>
-                </a:p>
-                <a:p>
-                  <a:endParaRPr lang="en-US" sz="2000" dirty="0"/>
-                </a:p>
-              </p:txBody>
-            </p:sp>
-            <p:cxnSp>
-              <p:nvCxnSpPr>
-                <p:cNvPr id="4" name="Straight Arrow Connector 3"/>
-                <p:cNvCxnSpPr/>
-                <p:nvPr/>
-              </p:nvCxnSpPr>
-              <p:spPr>
-                <a:xfrm>
-                  <a:off x="3431200" y="2891325"/>
-                  <a:ext cx="906650" cy="0"/>
-                </a:xfrm>
-                <a:prstGeom prst="straightConnector1">
-                  <a:avLst/>
-                </a:prstGeom>
-                <a:ln w="28575">
-                  <a:solidFill>
-                    <a:schemeClr val="tx1"/>
-                  </a:solidFill>
-                  <a:headEnd type="arrow" w="med" len="med"/>
-                  <a:tailEnd type="arrow" w="med" len="med"/>
-                </a:ln>
-              </p:spPr>
-              <p:style>
-                <a:lnRef idx="1">
-                  <a:schemeClr val="accent1"/>
-                </a:lnRef>
-                <a:fillRef idx="0">
-                  <a:schemeClr val="accent1"/>
-                </a:fillRef>
-                <a:effectRef idx="0">
-                  <a:schemeClr val="accent1"/>
-                </a:effectRef>
-                <a:fontRef idx="minor">
-                  <a:schemeClr val="tx1"/>
-                </a:fontRef>
-              </p:style>
-            </p:cxnSp>
-          </p:grpSp>
-        </p:grpSp>
+            <a:prstGeom prst="rect">
+              <a:avLst/>
+            </a:prstGeom>
+          </p:spPr>
+        </p:pic>
+        <p:pic>
+          <p:nvPicPr>
+            <p:cNvPr id="7" name="Picture 6"/>
+            <p:cNvPicPr>
+              <a:picLocks noChangeAspect="1"/>
+            </p:cNvPicPr>
+            <p:nvPr/>
+          </p:nvPicPr>
+          <p:blipFill>
+            <a:blip r:embed="rId4"/>
+            <a:stretch>
+              <a:fillRect/>
+            </a:stretch>
+          </p:blipFill>
+          <p:spPr>
+            <a:xfrm>
+              <a:off x="8971626" y="4619134"/>
+              <a:ext cx="1506736" cy="1512444"/>
+            </a:xfrm>
+            <a:prstGeom prst="rect">
+              <a:avLst/>
+            </a:prstGeom>
+          </p:spPr>
+        </p:pic>
+        <p:cxnSp>
+          <p:nvCxnSpPr>
+            <p:cNvPr id="4" name="Straight Arrow Connector 3"/>
+            <p:cNvCxnSpPr/>
+            <p:nvPr/>
+          </p:nvCxnSpPr>
+          <p:spPr>
+            <a:xfrm flipV="1">
+              <a:off x="3182390" y="2847528"/>
+              <a:ext cx="1492119" cy="8628"/>
+            </a:xfrm>
+            <a:prstGeom prst="straightConnector1">
+              <a:avLst/>
+            </a:prstGeom>
+            <a:ln w="28575">
+              <a:solidFill>
+                <a:schemeClr val="tx1"/>
+              </a:solidFill>
+              <a:headEnd type="arrow" w="med" len="med"/>
+              <a:tailEnd type="arrow" w="med" len="med"/>
+            </a:ln>
+          </p:spPr>
+          <p:style>
+            <a:lnRef idx="1">
+              <a:schemeClr val="accent1"/>
+            </a:lnRef>
+            <a:fillRef idx="0">
+              <a:schemeClr val="accent1"/>
+            </a:fillRef>
+            <a:effectRef idx="0">
+              <a:schemeClr val="accent1"/>
+            </a:effectRef>
+            <a:fontRef idx="minor">
+              <a:schemeClr val="tx1"/>
+            </a:fontRef>
+          </p:style>
+        </p:cxnSp>
         <p:sp>
           <p:nvSpPr>
             <p:cNvPr id="5" name="TextBox 4"/>
@@ -6167,8 +6061,8 @@
           </p:nvSpPr>
           <p:spPr>
             <a:xfrm>
-              <a:off x="3609583" y="2537382"/>
-              <a:ext cx="549883" cy="400110"/>
+              <a:off x="3697433" y="2538215"/>
+              <a:ext cx="549883" cy="369332"/>
             </a:xfrm>
             <a:prstGeom prst="rect">
               <a:avLst/>
@@ -6182,60 +6076,159 @@
             <a:lstStyle/>
             <a:p>
               <a:r>
-                <a:rPr lang="en-US" sz="2000" dirty="0" smtClean="0"/>
+                <a:rPr lang="en-US" dirty="0" smtClean="0"/>
                 <a:t>0.5</a:t>
               </a:r>
-              <a:endParaRPr lang="en-US" sz="2000" dirty="0"/>
+              <a:endParaRPr lang="en-US" dirty="0"/>
             </a:p>
           </p:txBody>
         </p:sp>
+        <p:sp>
+          <p:nvSpPr>
+            <p:cNvPr id="17" name="Rounded Rectangle 16"/>
+            <p:cNvSpPr/>
+            <p:nvPr/>
+          </p:nvSpPr>
+          <p:spPr>
+            <a:xfrm>
+              <a:off x="2995011" y="2957134"/>
+              <a:ext cx="1786934" cy="399160"/>
+            </a:xfrm>
+            <a:prstGeom prst="roundRect">
+              <a:avLst/>
+            </a:prstGeom>
+            <a:solidFill>
+              <a:schemeClr val="bg1"/>
+            </a:solidFill>
+            <a:ln>
+              <a:noFill/>
+            </a:ln>
+          </p:spPr>
+          <p:style>
+            <a:lnRef idx="2">
+              <a:schemeClr val="accent1">
+                <a:shade val="50000"/>
+              </a:schemeClr>
+            </a:lnRef>
+            <a:fillRef idx="1">
+              <a:schemeClr val="accent1"/>
+            </a:fillRef>
+            <a:effectRef idx="0">
+              <a:schemeClr val="accent1"/>
+            </a:effectRef>
+            <a:fontRef idx="minor">
+              <a:schemeClr val="lt1"/>
+            </a:fontRef>
+          </p:style>
+          <p:txBody>
+            <a:bodyPr rtlCol="0" anchor="ctr"/>
+            <a:lstStyle/>
+            <a:p>
+              <a:pPr algn="ctr"/>
+              <a:endParaRPr lang="en-US"/>
+            </a:p>
+          </p:txBody>
+        </p:sp>
+        <p:sp>
+          <p:nvSpPr>
+            <p:cNvPr id="8" name="TextBox 7"/>
+            <p:cNvSpPr txBox="1"/>
+            <p:nvPr/>
+          </p:nvSpPr>
+          <p:spPr>
+            <a:xfrm>
+              <a:off x="2284683" y="2548380"/>
+              <a:ext cx="1500599" cy="615553"/>
+            </a:xfrm>
+            <a:prstGeom prst="rect">
+              <a:avLst/>
+            </a:prstGeom>
+            <a:noFill/>
+          </p:spPr>
+          <p:txBody>
+            <a:bodyPr wrap="square" rtlCol="0">
+              <a:spAutoFit/>
+            </a:bodyPr>
+            <a:lstStyle/>
+            <a:p>
+              <a:r>
+                <a:rPr lang="en-US" dirty="0" smtClean="0"/>
+                <a:t>0 </a:t>
+              </a:r>
+              <a:endParaRPr lang="en-US" dirty="0" smtClean="0"/>
+            </a:p>
+            <a:p>
+              <a:r>
+                <a:rPr lang="en-US" sz="1600" dirty="0" smtClean="0"/>
+                <a:t>lognormal</a:t>
+              </a:r>
+              <a:endParaRPr lang="en-US" sz="1600" dirty="0" smtClean="0"/>
+            </a:p>
+          </p:txBody>
+        </p:sp>
+        <p:sp>
+          <p:nvSpPr>
+            <p:cNvPr id="9" name="TextBox 8"/>
+            <p:cNvSpPr txBox="1"/>
+            <p:nvPr/>
+          </p:nvSpPr>
+          <p:spPr>
+            <a:xfrm>
+              <a:off x="4159466" y="2537382"/>
+              <a:ext cx="1324900" cy="615553"/>
+            </a:xfrm>
+            <a:prstGeom prst="rect">
+              <a:avLst/>
+            </a:prstGeom>
+            <a:noFill/>
+          </p:spPr>
+          <p:txBody>
+            <a:bodyPr wrap="square" rtlCol="0">
+              <a:spAutoFit/>
+            </a:bodyPr>
+            <a:lstStyle/>
+            <a:p>
+              <a:pPr algn="r"/>
+              <a:r>
+                <a:rPr lang="en-US" dirty="0" smtClean="0"/>
+                <a:t>1</a:t>
+              </a:r>
+              <a:endParaRPr lang="en-US" dirty="0" smtClean="0"/>
+            </a:p>
+            <a:p>
+              <a:pPr algn="r"/>
+              <a:r>
+                <a:rPr lang="en-US" sz="1600" dirty="0" smtClean="0"/>
+                <a:t>logseries </a:t>
+              </a:r>
+              <a:endParaRPr lang="en-US" sz="1600" dirty="0"/>
+            </a:p>
+          </p:txBody>
+        </p:sp>
+        <p:pic>
+          <p:nvPicPr>
+            <p:cNvPr id="18" name="Picture 17"/>
+            <p:cNvPicPr>
+              <a:picLocks noChangeAspect="1"/>
+            </p:cNvPicPr>
+            <p:nvPr/>
+          </p:nvPicPr>
+          <p:blipFill rotWithShape="1">
+            <a:blip r:embed="rId5"/>
+            <a:srcRect l="18363" t="43301" r="61614" b="52607"/>
+            <a:stretch/>
+          </p:blipFill>
+          <p:spPr>
+            <a:xfrm>
+              <a:off x="3048921" y="3111220"/>
+              <a:ext cx="1846907" cy="280657"/>
+            </a:xfrm>
+            <a:prstGeom prst="rect">
+              <a:avLst/>
+            </a:prstGeom>
+          </p:spPr>
+        </p:pic>
       </p:grpSp>
-      <p:pic>
-        <p:nvPicPr>
-          <p:cNvPr id="3" name="Picture 2"/>
-          <p:cNvPicPr>
-            <a:picLocks noChangeAspect="1"/>
-          </p:cNvPicPr>
-          <p:nvPr/>
-        </p:nvPicPr>
-        <p:blipFill rotWithShape="1">
-          <a:blip r:embed="rId5"/>
-          <a:srcRect t="14734" r="13526"/>
-          <a:stretch/>
-        </p:blipFill>
-        <p:spPr>
-          <a:xfrm>
-            <a:off x="2607823" y="3414654"/>
-            <a:ext cx="1551643" cy="1134914"/>
-          </a:xfrm>
-          <a:prstGeom prst="rect">
-            <a:avLst/>
-          </a:prstGeom>
-        </p:spPr>
-      </p:pic>
-      <p:pic>
-        <p:nvPicPr>
-          <p:cNvPr id="13" name="Picture 12"/>
-          <p:cNvPicPr>
-            <a:picLocks noChangeAspect="1"/>
-          </p:cNvPicPr>
-          <p:nvPr/>
-        </p:nvPicPr>
-        <p:blipFill rotWithShape="1">
-          <a:blip r:embed="rId6"/>
-          <a:srcRect t="16225" r="12346"/>
-          <a:stretch/>
-        </p:blipFill>
-        <p:spPr>
-          <a:xfrm>
-            <a:off x="7249220" y="3414653"/>
-            <a:ext cx="1072803" cy="760579"/>
-          </a:xfrm>
-          <a:prstGeom prst="rect">
-            <a:avLst/>
-          </a:prstGeom>
-        </p:spPr>
-      </p:pic>
     </p:spTree>
     <p:extLst>
       <p:ext uri="{BB962C8B-B14F-4D97-AF65-F5344CB8AC3E}">
@@ -6303,30 +6296,248 @@
           </a:p>
         </p:txBody>
       </p:sp>
-      <p:pic>
-        <p:nvPicPr>
-          <p:cNvPr id="4" name="Picture 3"/>
-          <p:cNvPicPr>
-            <a:picLocks noChangeAspect="1"/>
-          </p:cNvPicPr>
+      <p:grpSp>
+        <p:nvGrpSpPr>
+          <p:cNvPr id="16" name="Group 15"/>
+          <p:cNvGrpSpPr/>
           <p:nvPr/>
-        </p:nvPicPr>
-        <p:blipFill>
-          <a:blip r:embed="rId2"/>
-          <a:stretch>
-            <a:fillRect/>
-          </a:stretch>
-        </p:blipFill>
-        <p:spPr>
+        </p:nvGrpSpPr>
+        <p:grpSpPr>
           <a:xfrm>
             <a:off x="1654503" y="0"/>
             <a:ext cx="8888330" cy="6858000"/>
-          </a:xfrm>
-          <a:prstGeom prst="rect">
-            <a:avLst/>
-          </a:prstGeom>
-        </p:spPr>
-      </p:pic>
+            <a:chOff x="1654503" y="0"/>
+            <a:chExt cx="8888330" cy="6858000"/>
+          </a:xfrm>
+        </p:grpSpPr>
+        <p:pic>
+          <p:nvPicPr>
+            <p:cNvPr id="4" name="Picture 3"/>
+            <p:cNvPicPr>
+              <a:picLocks noChangeAspect="1"/>
+            </p:cNvPicPr>
+            <p:nvPr/>
+          </p:nvPicPr>
+          <p:blipFill>
+            <a:blip r:embed="rId2"/>
+            <a:stretch>
+              <a:fillRect/>
+            </a:stretch>
+          </p:blipFill>
+          <p:spPr>
+            <a:xfrm>
+              <a:off x="1654503" y="0"/>
+              <a:ext cx="8888330" cy="6858000"/>
+            </a:xfrm>
+            <a:prstGeom prst="rect">
+              <a:avLst/>
+            </a:prstGeom>
+          </p:spPr>
+        </p:pic>
+        <p:pic>
+          <p:nvPicPr>
+            <p:cNvPr id="3" name="Picture 2"/>
+            <p:cNvPicPr>
+              <a:picLocks noChangeAspect="1"/>
+            </p:cNvPicPr>
+            <p:nvPr/>
+          </p:nvPicPr>
+          <p:blipFill>
+            <a:blip r:embed="rId3"/>
+            <a:stretch>
+              <a:fillRect/>
+            </a:stretch>
+          </p:blipFill>
+          <p:spPr>
+            <a:xfrm>
+              <a:off x="3737265" y="2588359"/>
+              <a:ext cx="1259329" cy="274344"/>
+            </a:xfrm>
+            <a:prstGeom prst="rect">
+              <a:avLst/>
+            </a:prstGeom>
+          </p:spPr>
+        </p:pic>
+        <p:sp>
+          <p:nvSpPr>
+            <p:cNvPr id="10" name="TextBox 9"/>
+            <p:cNvSpPr txBox="1"/>
+            <p:nvPr/>
+          </p:nvSpPr>
+          <p:spPr>
+            <a:xfrm>
+              <a:off x="4097450" y="2376590"/>
+              <a:ext cx="694516" cy="400110"/>
+            </a:xfrm>
+            <a:prstGeom prst="rect">
+              <a:avLst/>
+            </a:prstGeom>
+            <a:noFill/>
+          </p:spPr>
+          <p:txBody>
+            <a:bodyPr wrap="square" rtlCol="0">
+              <a:spAutoFit/>
+            </a:bodyPr>
+            <a:lstStyle/>
+            <a:p>
+              <a:r>
+                <a:rPr lang="en-US" sz="2000" dirty="0" smtClean="0"/>
+                <a:t>0.5</a:t>
+              </a:r>
+              <a:endParaRPr lang="en-US" sz="2000" dirty="0"/>
+            </a:p>
+          </p:txBody>
+        </p:sp>
+        <p:sp>
+          <p:nvSpPr>
+            <p:cNvPr id="14" name="Rounded Rectangle 13"/>
+            <p:cNvSpPr/>
+            <p:nvPr/>
+          </p:nvSpPr>
+          <p:spPr>
+            <a:xfrm>
+              <a:off x="3253050" y="2838691"/>
+              <a:ext cx="2130729" cy="403344"/>
+            </a:xfrm>
+            <a:prstGeom prst="roundRect">
+              <a:avLst/>
+            </a:prstGeom>
+            <a:solidFill>
+              <a:schemeClr val="bg1"/>
+            </a:solidFill>
+            <a:ln>
+              <a:noFill/>
+            </a:ln>
+          </p:spPr>
+          <p:style>
+            <a:lnRef idx="2">
+              <a:schemeClr val="accent1">
+                <a:shade val="50000"/>
+              </a:schemeClr>
+            </a:lnRef>
+            <a:fillRef idx="1">
+              <a:schemeClr val="accent1"/>
+            </a:fillRef>
+            <a:effectRef idx="0">
+              <a:schemeClr val="accent1"/>
+            </a:effectRef>
+            <a:fontRef idx="minor">
+              <a:schemeClr val="lt1"/>
+            </a:fontRef>
+          </p:style>
+          <p:txBody>
+            <a:bodyPr rtlCol="0" anchor="ctr"/>
+            <a:lstStyle/>
+            <a:p>
+              <a:pPr algn="ctr"/>
+              <a:endParaRPr lang="en-US"/>
+            </a:p>
+          </p:txBody>
+        </p:sp>
+        <p:pic>
+          <p:nvPicPr>
+            <p:cNvPr id="13" name="Picture 12"/>
+            <p:cNvPicPr>
+              <a:picLocks noChangeAspect="1"/>
+            </p:cNvPicPr>
+            <p:nvPr/>
+          </p:nvPicPr>
+          <p:blipFill rotWithShape="1">
+            <a:blip r:embed="rId4"/>
+            <a:srcRect l="18363" t="43301" r="61614" b="52607"/>
+            <a:stretch/>
+          </p:blipFill>
+          <p:spPr>
+            <a:xfrm>
+              <a:off x="3216115" y="3020183"/>
+              <a:ext cx="2204597" cy="335012"/>
+            </a:xfrm>
+            <a:prstGeom prst="rect">
+              <a:avLst/>
+            </a:prstGeom>
+          </p:spPr>
+        </p:pic>
+        <p:sp>
+          <p:nvSpPr>
+            <p:cNvPr id="11" name="TextBox 10"/>
+            <p:cNvSpPr txBox="1"/>
+            <p:nvPr/>
+          </p:nvSpPr>
+          <p:spPr>
+            <a:xfrm>
+              <a:off x="2940832" y="2379357"/>
+              <a:ext cx="1156618" cy="646331"/>
+            </a:xfrm>
+            <a:prstGeom prst="rect">
+              <a:avLst/>
+            </a:prstGeom>
+            <a:noFill/>
+          </p:spPr>
+          <p:txBody>
+            <a:bodyPr wrap="square" rtlCol="0">
+              <a:spAutoFit/>
+            </a:bodyPr>
+            <a:lstStyle/>
+            <a:p>
+              <a:r>
+                <a:rPr lang="en-US" sz="2000" dirty="0" smtClean="0"/>
+                <a:t>0</a:t>
+              </a:r>
+              <a:r>
+                <a:rPr lang="en-US" dirty="0" smtClean="0"/>
+                <a:t> </a:t>
+              </a:r>
+              <a:endParaRPr lang="en-US" dirty="0" smtClean="0"/>
+            </a:p>
+            <a:p>
+              <a:r>
+                <a:rPr lang="en-US" sz="1600" dirty="0" smtClean="0"/>
+                <a:t>lognormal</a:t>
+              </a:r>
+              <a:endParaRPr lang="en-US" sz="1600" dirty="0" smtClean="0"/>
+            </a:p>
+          </p:txBody>
+        </p:sp>
+        <p:sp>
+          <p:nvSpPr>
+            <p:cNvPr id="12" name="TextBox 11"/>
+            <p:cNvSpPr txBox="1"/>
+            <p:nvPr/>
+          </p:nvSpPr>
+          <p:spPr>
+            <a:xfrm>
+              <a:off x="4636408" y="2386477"/>
+              <a:ext cx="1021194" cy="646331"/>
+            </a:xfrm>
+            <a:prstGeom prst="rect">
+              <a:avLst/>
+            </a:prstGeom>
+            <a:noFill/>
+          </p:spPr>
+          <p:txBody>
+            <a:bodyPr wrap="square" rtlCol="0">
+              <a:spAutoFit/>
+            </a:bodyPr>
+            <a:lstStyle/>
+            <a:p>
+              <a:pPr algn="r"/>
+              <a:r>
+                <a:rPr lang="en-US" sz="2000" dirty="0" smtClean="0"/>
+                <a:t>1</a:t>
+              </a:r>
+              <a:endParaRPr lang="en-US" sz="2000" dirty="0" smtClean="0"/>
+            </a:p>
+            <a:p>
+              <a:pPr algn="r"/>
+              <a:r>
+                <a:rPr lang="en-US" sz="1600" dirty="0" smtClean="0"/>
+                <a:t>logseries </a:t>
+              </a:r>
+              <a:endParaRPr lang="en-US" sz="1600" dirty="0"/>
+            </a:p>
+          </p:txBody>
+        </p:sp>
+      </p:grpSp>
       <p:pic>
         <p:nvPicPr>
           <p:cNvPr id="5" name="Picture 4"/>
@@ -6336,7 +6547,7 @@
           <p:nvPr/>
         </p:nvPicPr>
         <p:blipFill>
-          <a:blip r:embed="rId3"/>
+          <a:blip r:embed="rId5"/>
           <a:stretch>
             <a:fillRect/>
           </a:stretch>
@@ -6345,98 +6556,6 @@
           <a:xfrm>
             <a:off x="8315163" y="0"/>
             <a:ext cx="2450804" cy="823031"/>
-          </a:xfrm>
-          <a:prstGeom prst="rect">
-            <a:avLst/>
-          </a:prstGeom>
-        </p:spPr>
-      </p:pic>
-      <p:sp>
-        <p:nvSpPr>
-          <p:cNvPr id="6" name="TextBox 5"/>
-          <p:cNvSpPr txBox="1"/>
-          <p:nvPr/>
-        </p:nvSpPr>
-        <p:spPr>
-          <a:xfrm>
-            <a:off x="2820185" y="2385645"/>
-            <a:ext cx="1190920" cy="646331"/>
-          </a:xfrm>
-          <a:prstGeom prst="rect">
-            <a:avLst/>
-          </a:prstGeom>
-          <a:noFill/>
-        </p:spPr>
-        <p:txBody>
-          <a:bodyPr wrap="square" rtlCol="0">
-            <a:spAutoFit/>
-          </a:bodyPr>
-          <a:lstStyle/>
-          <a:p>
-            <a:r>
-              <a:rPr lang="en-US" dirty="0"/>
-              <a:t>l</a:t>
-            </a:r>
-            <a:r>
-              <a:rPr lang="en-US" dirty="0" smtClean="0"/>
-              <a:t>ognormal</a:t>
-            </a:r>
-          </a:p>
-          <a:p>
-            <a:endParaRPr lang="en-US" dirty="0"/>
-          </a:p>
-        </p:txBody>
-      </p:sp>
-      <p:sp>
-        <p:nvSpPr>
-          <p:cNvPr id="7" name="TextBox 6"/>
-          <p:cNvSpPr txBox="1"/>
-          <p:nvPr/>
-        </p:nvSpPr>
-        <p:spPr>
-          <a:xfrm>
-            <a:off x="4799815" y="2385644"/>
-            <a:ext cx="1190920" cy="646331"/>
-          </a:xfrm>
-          <a:prstGeom prst="rect">
-            <a:avLst/>
-          </a:prstGeom>
-          <a:noFill/>
-        </p:spPr>
-        <p:txBody>
-          <a:bodyPr wrap="square" rtlCol="0">
-            <a:spAutoFit/>
-          </a:bodyPr>
-          <a:lstStyle/>
-          <a:p>
-            <a:r>
-              <a:rPr lang="en-US" dirty="0" smtClean="0"/>
-              <a:t>logseries</a:t>
-            </a:r>
-          </a:p>
-          <a:p>
-            <a:endParaRPr lang="en-US" dirty="0"/>
-          </a:p>
-        </p:txBody>
-      </p:sp>
-      <p:pic>
-        <p:nvPicPr>
-          <p:cNvPr id="3" name="Picture 2"/>
-          <p:cNvPicPr>
-            <a:picLocks noChangeAspect="1"/>
-          </p:cNvPicPr>
-          <p:nvPr/>
-        </p:nvPicPr>
-        <p:blipFill>
-          <a:blip r:embed="rId4"/>
-          <a:stretch>
-            <a:fillRect/>
-          </a:stretch>
-        </p:blipFill>
-        <p:spPr>
-          <a:xfrm>
-            <a:off x="3912601" y="2434465"/>
-            <a:ext cx="985718" cy="274344"/>
           </a:xfrm>
           <a:prstGeom prst="rect">
             <a:avLst/>
@@ -6454,7 +6573,7 @@
           </p:nvPr>
         </p:nvPicPr>
         <p:blipFill>
-          <a:blip r:embed="rId5"/>
+          <a:blip r:embed="rId6"/>
           <a:stretch>
             <a:fillRect/>
           </a:stretch>
@@ -6537,7 +6656,7 @@
       </p:sp>
       <p:grpSp>
         <p:nvGrpSpPr>
-          <p:cNvPr id="10" name="Group 9"/>
+          <p:cNvPr id="20" name="Group 19"/>
           <p:cNvGrpSpPr/>
           <p:nvPr/>
         </p:nvGrpSpPr>
@@ -6549,185 +6668,311 @@
             <a:chExt cx="9143820" cy="6858000"/>
           </a:xfrm>
         </p:grpSpPr>
+        <p:grpSp>
+          <p:nvGrpSpPr>
+            <p:cNvPr id="10" name="Group 9"/>
+            <p:cNvGrpSpPr/>
+            <p:nvPr/>
+          </p:nvGrpSpPr>
+          <p:grpSpPr>
+            <a:xfrm>
+              <a:off x="1358196" y="0"/>
+              <a:ext cx="9143820" cy="6858000"/>
+              <a:chOff x="1358196" y="0"/>
+              <a:chExt cx="9143820" cy="6858000"/>
+            </a:xfrm>
+          </p:grpSpPr>
+          <p:pic>
+            <p:nvPicPr>
+              <p:cNvPr id="2" name="Picture 1"/>
+              <p:cNvPicPr>
+                <a:picLocks noChangeAspect="1"/>
+              </p:cNvPicPr>
+              <p:nvPr/>
+            </p:nvPicPr>
+            <p:blipFill>
+              <a:blip r:embed="rId2"/>
+              <a:stretch>
+                <a:fillRect/>
+              </a:stretch>
+            </p:blipFill>
+            <p:spPr>
+              <a:xfrm>
+                <a:off x="1358196" y="0"/>
+                <a:ext cx="8950144" cy="6858000"/>
+              </a:xfrm>
+              <a:prstGeom prst="rect">
+                <a:avLst/>
+              </a:prstGeom>
+            </p:spPr>
+          </p:pic>
+          <p:grpSp>
+            <p:nvGrpSpPr>
+              <p:cNvPr id="4" name="Group 3"/>
+              <p:cNvGrpSpPr/>
+              <p:nvPr/>
+            </p:nvGrpSpPr>
+            <p:grpSpPr>
+              <a:xfrm>
+                <a:off x="3457640" y="66895"/>
+                <a:ext cx="7044376" cy="5791305"/>
+                <a:chOff x="3457640" y="66895"/>
+                <a:chExt cx="7044376" cy="5791305"/>
+              </a:xfrm>
+            </p:grpSpPr>
+            <p:pic>
+              <p:nvPicPr>
+                <p:cNvPr id="5" name="Picture 4"/>
+                <p:cNvPicPr>
+                  <a:picLocks noChangeAspect="1"/>
+                </p:cNvPicPr>
+                <p:nvPr/>
+              </p:nvPicPr>
+              <p:blipFill>
+                <a:blip r:embed="rId3"/>
+                <a:stretch>
+                  <a:fillRect/>
+                </a:stretch>
+              </p:blipFill>
+              <p:spPr>
+                <a:xfrm>
+                  <a:off x="8051212" y="66895"/>
+                  <a:ext cx="2450804" cy="823031"/>
+                </a:xfrm>
+                <a:prstGeom prst="rect">
+                  <a:avLst/>
+                </a:prstGeom>
+              </p:spPr>
+            </p:pic>
+            <p:pic>
+              <p:nvPicPr>
+                <p:cNvPr id="6" name="Picture 5"/>
+                <p:cNvPicPr>
+                  <a:picLocks noChangeAspect="1"/>
+                </p:cNvPicPr>
+                <p:nvPr/>
+              </p:nvPicPr>
+              <p:blipFill>
+                <a:blip r:embed="rId4"/>
+                <a:stretch>
+                  <a:fillRect/>
+                </a:stretch>
+              </p:blipFill>
+              <p:spPr>
+                <a:xfrm>
+                  <a:off x="8995280" y="4345756"/>
+                  <a:ext cx="1506736" cy="1512444"/>
+                </a:xfrm>
+                <a:prstGeom prst="rect">
+                  <a:avLst/>
+                </a:prstGeom>
+              </p:spPr>
+            </p:pic>
+            <p:pic>
+              <p:nvPicPr>
+                <p:cNvPr id="3" name="Picture 2"/>
+                <p:cNvPicPr>
+                  <a:picLocks noChangeAspect="1"/>
+                </p:cNvPicPr>
+                <p:nvPr/>
+              </p:nvPicPr>
+              <p:blipFill>
+                <a:blip r:embed="rId5"/>
+                <a:stretch>
+                  <a:fillRect/>
+                </a:stretch>
+              </p:blipFill>
+              <p:spPr>
+                <a:xfrm>
+                  <a:off x="3457640" y="2597116"/>
+                  <a:ext cx="1250162" cy="274344"/>
+                </a:xfrm>
+                <a:prstGeom prst="rect">
+                  <a:avLst/>
+                </a:prstGeom>
+              </p:spPr>
+            </p:pic>
+          </p:grpSp>
+        </p:grpSp>
+        <p:sp>
+          <p:nvSpPr>
+            <p:cNvPr id="15" name="TextBox 14"/>
+            <p:cNvSpPr txBox="1"/>
+            <p:nvPr/>
+          </p:nvSpPr>
+          <p:spPr>
+            <a:xfrm>
+              <a:off x="3807780" y="2376426"/>
+              <a:ext cx="549883" cy="369332"/>
+            </a:xfrm>
+            <a:prstGeom prst="rect">
+              <a:avLst/>
+            </a:prstGeom>
+            <a:noFill/>
+          </p:spPr>
+          <p:txBody>
+            <a:bodyPr wrap="square" rtlCol="0">
+              <a:spAutoFit/>
+            </a:bodyPr>
+            <a:lstStyle/>
+            <a:p>
+              <a:r>
+                <a:rPr lang="en-US" dirty="0" smtClean="0"/>
+                <a:t>0.5</a:t>
+              </a:r>
+              <a:endParaRPr lang="en-US" dirty="0"/>
+            </a:p>
+          </p:txBody>
+        </p:sp>
+        <p:sp>
+          <p:nvSpPr>
+            <p:cNvPr id="19" name="Rounded Rectangle 18"/>
+            <p:cNvSpPr/>
+            <p:nvPr/>
+          </p:nvSpPr>
+          <p:spPr>
+            <a:xfrm>
+              <a:off x="2987448" y="2815628"/>
+              <a:ext cx="2055137" cy="309840"/>
+            </a:xfrm>
+            <a:prstGeom prst="roundRect">
+              <a:avLst/>
+            </a:prstGeom>
+            <a:solidFill>
+              <a:schemeClr val="bg1"/>
+            </a:solidFill>
+            <a:ln>
+              <a:noFill/>
+            </a:ln>
+          </p:spPr>
+          <p:style>
+            <a:lnRef idx="2">
+              <a:schemeClr val="accent1">
+                <a:shade val="50000"/>
+              </a:schemeClr>
+            </a:lnRef>
+            <a:fillRef idx="1">
+              <a:schemeClr val="accent1"/>
+            </a:fillRef>
+            <a:effectRef idx="0">
+              <a:schemeClr val="accent1"/>
+            </a:effectRef>
+            <a:fontRef idx="minor">
+              <a:schemeClr val="lt1"/>
+            </a:fontRef>
+          </p:style>
+          <p:txBody>
+            <a:bodyPr rtlCol="0" anchor="ctr"/>
+            <a:lstStyle/>
+            <a:p>
+              <a:pPr algn="ctr"/>
+              <a:endParaRPr lang="en-US"/>
+            </a:p>
+          </p:txBody>
+        </p:sp>
+        <p:sp>
+          <p:nvSpPr>
+            <p:cNvPr id="16" name="TextBox 15"/>
+            <p:cNvSpPr txBox="1"/>
+            <p:nvPr/>
+          </p:nvSpPr>
+          <p:spPr>
+            <a:xfrm>
+              <a:off x="2610808" y="2376426"/>
+              <a:ext cx="1149973" cy="646331"/>
+            </a:xfrm>
+            <a:prstGeom prst="rect">
+              <a:avLst/>
+            </a:prstGeom>
+            <a:noFill/>
+          </p:spPr>
+          <p:txBody>
+            <a:bodyPr wrap="square" rtlCol="0">
+              <a:spAutoFit/>
+            </a:bodyPr>
+            <a:lstStyle/>
+            <a:p>
+              <a:r>
+                <a:rPr lang="en-US" sz="2000" dirty="0" smtClean="0"/>
+                <a:t>0</a:t>
+              </a:r>
+              <a:r>
+                <a:rPr lang="en-US" dirty="0" smtClean="0"/>
+                <a:t> </a:t>
+              </a:r>
+              <a:endParaRPr lang="en-US" dirty="0" smtClean="0"/>
+            </a:p>
+            <a:p>
+              <a:r>
+                <a:rPr lang="en-US" sz="1600" dirty="0" smtClean="0"/>
+                <a:t>lognormal</a:t>
+              </a:r>
+              <a:endParaRPr lang="en-US" sz="1600" dirty="0" smtClean="0"/>
+            </a:p>
+          </p:txBody>
+        </p:sp>
+        <p:sp>
+          <p:nvSpPr>
+            <p:cNvPr id="17" name="TextBox 16"/>
+            <p:cNvSpPr txBox="1"/>
+            <p:nvPr/>
+          </p:nvSpPr>
+          <p:spPr>
+            <a:xfrm>
+              <a:off x="4404662" y="2376426"/>
+              <a:ext cx="1030785" cy="646331"/>
+            </a:xfrm>
+            <a:prstGeom prst="rect">
+              <a:avLst/>
+            </a:prstGeom>
+            <a:noFill/>
+          </p:spPr>
+          <p:txBody>
+            <a:bodyPr wrap="square" rtlCol="0">
+              <a:spAutoFit/>
+            </a:bodyPr>
+            <a:lstStyle/>
+            <a:p>
+              <a:pPr algn="r"/>
+              <a:r>
+                <a:rPr lang="en-US" sz="2000" dirty="0" smtClean="0"/>
+                <a:t>1</a:t>
+              </a:r>
+              <a:endParaRPr lang="en-US" sz="2000" dirty="0" smtClean="0"/>
+            </a:p>
+            <a:p>
+              <a:pPr algn="r"/>
+              <a:r>
+                <a:rPr lang="en-US" sz="1600" dirty="0" smtClean="0"/>
+                <a:t>logseries </a:t>
+              </a:r>
+              <a:endParaRPr lang="en-US" sz="1600" dirty="0"/>
+            </a:p>
+          </p:txBody>
+        </p:sp>
         <p:pic>
           <p:nvPicPr>
-            <p:cNvPr id="2" name="Picture 1"/>
+            <p:cNvPr id="18" name="Picture 17"/>
             <p:cNvPicPr>
               <a:picLocks noChangeAspect="1"/>
             </p:cNvPicPr>
             <p:nvPr/>
           </p:nvPicPr>
-          <p:blipFill>
-            <a:blip r:embed="rId2"/>
-            <a:stretch>
-              <a:fillRect/>
-            </a:stretch>
+          <p:blipFill rotWithShape="1">
+            <a:blip r:embed="rId6"/>
+            <a:srcRect l="18363" t="43301" r="61614" b="52607"/>
+            <a:stretch/>
           </p:blipFill>
           <p:spPr>
             <a:xfrm>
-              <a:off x="1358196" y="0"/>
-              <a:ext cx="8950144" cy="6858000"/>
+              <a:off x="2904064" y="2956647"/>
+              <a:ext cx="2221906" cy="337642"/>
             </a:xfrm>
             <a:prstGeom prst="rect">
               <a:avLst/>
             </a:prstGeom>
           </p:spPr>
         </p:pic>
-        <p:grpSp>
-          <p:nvGrpSpPr>
-            <p:cNvPr id="4" name="Group 3"/>
-            <p:cNvGrpSpPr/>
-            <p:nvPr/>
-          </p:nvGrpSpPr>
-          <p:grpSpPr>
-            <a:xfrm>
-              <a:off x="2556234" y="66895"/>
-              <a:ext cx="7945782" cy="5791305"/>
-              <a:chOff x="2556234" y="66895"/>
-              <a:chExt cx="7945782" cy="5791305"/>
-            </a:xfrm>
-          </p:grpSpPr>
-          <p:pic>
-            <p:nvPicPr>
-              <p:cNvPr id="5" name="Picture 4"/>
-              <p:cNvPicPr>
-                <a:picLocks noChangeAspect="1"/>
-              </p:cNvPicPr>
-              <p:nvPr/>
-            </p:nvPicPr>
-            <p:blipFill>
-              <a:blip r:embed="rId3"/>
-              <a:stretch>
-                <a:fillRect/>
-              </a:stretch>
-            </p:blipFill>
-            <p:spPr>
-              <a:xfrm>
-                <a:off x="8051212" y="66895"/>
-                <a:ext cx="2450804" cy="823031"/>
-              </a:xfrm>
-              <a:prstGeom prst="rect">
-                <a:avLst/>
-              </a:prstGeom>
-            </p:spPr>
-          </p:pic>
-          <p:pic>
-            <p:nvPicPr>
-              <p:cNvPr id="6" name="Picture 5"/>
-              <p:cNvPicPr>
-                <a:picLocks noChangeAspect="1"/>
-              </p:cNvPicPr>
-              <p:nvPr/>
-            </p:nvPicPr>
-            <p:blipFill>
-              <a:blip r:embed="rId4"/>
-              <a:stretch>
-                <a:fillRect/>
-              </a:stretch>
-            </p:blipFill>
-            <p:spPr>
-              <a:xfrm>
-                <a:off x="8995280" y="4345756"/>
-                <a:ext cx="1506736" cy="1512444"/>
-              </a:xfrm>
-              <a:prstGeom prst="rect">
-                <a:avLst/>
-              </a:prstGeom>
-            </p:spPr>
-          </p:pic>
-          <p:sp>
-            <p:nvSpPr>
-              <p:cNvPr id="8" name="TextBox 7"/>
-              <p:cNvSpPr txBox="1"/>
-              <p:nvPr/>
-            </p:nvSpPr>
-            <p:spPr>
-              <a:xfrm>
-                <a:off x="2556234" y="2452540"/>
-                <a:ext cx="1190920" cy="646331"/>
-              </a:xfrm>
-              <a:prstGeom prst="rect">
-                <a:avLst/>
-              </a:prstGeom>
-              <a:noFill/>
-            </p:spPr>
-            <p:txBody>
-              <a:bodyPr wrap="square" rtlCol="0">
-                <a:spAutoFit/>
-              </a:bodyPr>
-              <a:lstStyle/>
-              <a:p>
-                <a:r>
-                  <a:rPr lang="en-US" dirty="0"/>
-                  <a:t>l</a:t>
-                </a:r>
-                <a:r>
-                  <a:rPr lang="en-US" dirty="0" smtClean="0"/>
-                  <a:t>ognormal</a:t>
-                </a:r>
-              </a:p>
-              <a:p>
-                <a:endParaRPr lang="en-US" dirty="0"/>
-              </a:p>
-            </p:txBody>
-          </p:sp>
-          <p:sp>
-            <p:nvSpPr>
-              <p:cNvPr id="9" name="TextBox 8"/>
-              <p:cNvSpPr txBox="1"/>
-              <p:nvPr/>
-            </p:nvSpPr>
-            <p:spPr>
-              <a:xfrm>
-                <a:off x="4535864" y="2452539"/>
-                <a:ext cx="1190920" cy="646331"/>
-              </a:xfrm>
-              <a:prstGeom prst="rect">
-                <a:avLst/>
-              </a:prstGeom>
-              <a:noFill/>
-            </p:spPr>
-            <p:txBody>
-              <a:bodyPr wrap="square" rtlCol="0">
-                <a:spAutoFit/>
-              </a:bodyPr>
-              <a:lstStyle/>
-              <a:p>
-                <a:r>
-                  <a:rPr lang="en-US" dirty="0" smtClean="0"/>
-                  <a:t>logseries</a:t>
-                </a:r>
-              </a:p>
-              <a:p>
-                <a:endParaRPr lang="en-US" dirty="0"/>
-              </a:p>
-            </p:txBody>
-          </p:sp>
-          <p:pic>
-            <p:nvPicPr>
-              <p:cNvPr id="3" name="Picture 2"/>
-              <p:cNvPicPr>
-                <a:picLocks noChangeAspect="1"/>
-              </p:cNvPicPr>
-              <p:nvPr/>
-            </p:nvPicPr>
-            <p:blipFill>
-              <a:blip r:embed="rId5"/>
-              <a:stretch>
-                <a:fillRect/>
-              </a:stretch>
-            </p:blipFill>
-            <p:spPr>
-              <a:xfrm>
-                <a:off x="3647690" y="2501360"/>
-                <a:ext cx="987638" cy="274344"/>
-              </a:xfrm>
-              <a:prstGeom prst="rect">
-                <a:avLst/>
-              </a:prstGeom>
-            </p:spPr>
-          </p:pic>
-        </p:grpSp>
       </p:grpSp>
     </p:spTree>
     <p:extLst>
@@ -6953,14 +7198,12 @@
               <a:rPr lang="en-US" sz="2500" dirty="0" smtClean="0"/>
               <a:t>0 </a:t>
             </a:r>
-            <a:endParaRPr lang="en-US" sz="2500" dirty="0" smtClean="0"/>
           </a:p>
           <a:p>
             <a:r>
               <a:rPr lang="en-US" dirty="0" smtClean="0"/>
               <a:t>lognormal</a:t>
             </a:r>
-            <a:endParaRPr lang="en-US" dirty="0" smtClean="0"/>
           </a:p>
           <a:p>
             <a:endParaRPr lang="en-US" sz="2500" dirty="0"/>
@@ -7101,11 +7344,7 @@
           <a:p>
             <a:r>
               <a:rPr lang="en-US" sz="2500" dirty="0" smtClean="0"/>
-              <a:t>Akaike Weight</a:t>
-            </a:r>
-            <a:r>
-              <a:rPr lang="en-US" sz="2500" dirty="0" smtClean="0"/>
-              <a:t> </a:t>
+              <a:t>Akaike Weight </a:t>
             </a:r>
           </a:p>
         </p:txBody>
@@ -7136,7 +7375,6 @@
               <a:rPr lang="en-US" sz="2500" dirty="0" smtClean="0"/>
               <a:t>Frequency</a:t>
        